<commit_message>
Improve overview chapter 🗼
</commit_message>
<xml_diff>
--- a/reports/Graphs/diagrams.pptx
+++ b/reports/Graphs/diagrams.pptx
@@ -117,16 +117,40 @@
 </p:presentation>
 </file>
 
-<file path=ppt/revisionInfo.xml><?xml version="1.0" encoding="utf-8"?>
-<p1510:revInfo xmlns:a="http://schemas.openxmlformats.org/drawingml/2006/main" xmlns:r="http://schemas.openxmlformats.org/officeDocument/2006/relationships" xmlns:p1510="http://schemas.microsoft.com/office/powerpoint/2015/10/main">
-  <p1510:revLst>
-    <p1510:client id="{49E66B90-E8CF-4436-B0D4-F43F17B21F48}" v="122" dt="2023-01-15T08:57:02.269"/>
-  </p1510:revLst>
-</p1510:revInfo>
-</file>
-
 <file path=ppt/changesInfos/changesInfo1.xml><?xml version="1.0" encoding="utf-8"?>
 <pc:chgInfo xmlns:a="http://schemas.openxmlformats.org/drawingml/2006/main" xmlns:r="http://schemas.openxmlformats.org/officeDocument/2006/relationships" xmlns:ac="http://schemas.microsoft.com/office/drawing/2013/main/command" xmlns:pc="http://schemas.microsoft.com/office/powerpoint/2013/main/command">
+  <pc:docChgLst>
+    <pc:chgData name="Markus Bilz" userId="a36021e4bdb9349f" providerId="LiveId" clId="{F9F2BE70-AAED-47FD-A055-7B08EB1371A3}"/>
+    <pc:docChg chg="modSld">
+      <pc:chgData name="Markus Bilz" userId="a36021e4bdb9349f" providerId="LiveId" clId="{F9F2BE70-AAED-47FD-A055-7B08EB1371A3}" dt="2023-01-28T14:06:06.783" v="2" actId="20577"/>
+      <pc:docMkLst>
+        <pc:docMk/>
+      </pc:docMkLst>
+      <pc:sldChg chg="modSp mod">
+        <pc:chgData name="Markus Bilz" userId="a36021e4bdb9349f" providerId="LiveId" clId="{F9F2BE70-AAED-47FD-A055-7B08EB1371A3}" dt="2023-01-28T14:06:06.783" v="2" actId="20577"/>
+        <pc:sldMkLst>
+          <pc:docMk/>
+          <pc:sldMk cId="2836008551" sldId="256"/>
+        </pc:sldMkLst>
+        <pc:spChg chg="mod">
+          <ac:chgData name="Markus Bilz" userId="a36021e4bdb9349f" providerId="LiveId" clId="{F9F2BE70-AAED-47FD-A055-7B08EB1371A3}" dt="2023-01-28T14:06:02.190" v="1" actId="20577"/>
+          <ac:spMkLst>
+            <pc:docMk/>
+            <pc:sldMk cId="2836008551" sldId="256"/>
+            <ac:spMk id="233" creationId="{22826292-593A-4357-FEEB-B7D5B39875EF}"/>
+          </ac:spMkLst>
+        </pc:spChg>
+        <pc:spChg chg="mod">
+          <ac:chgData name="Markus Bilz" userId="a36021e4bdb9349f" providerId="LiveId" clId="{F9F2BE70-AAED-47FD-A055-7B08EB1371A3}" dt="2023-01-28T14:06:06.783" v="2" actId="20577"/>
+          <ac:spMkLst>
+            <pc:docMk/>
+            <pc:sldMk cId="2836008551" sldId="256"/>
+            <ac:spMk id="234" creationId="{29B237C7-6F16-D779-C094-6DB7CEF9786E}"/>
+          </ac:spMkLst>
+        </pc:spChg>
+      </pc:sldChg>
+    </pc:docChg>
+  </pc:docChgLst>
   <pc:docChgLst>
     <pc:chgData name="Markus Bilz" userId="a36021e4bdb9349f" providerId="LiveId" clId="{49E66B90-E8CF-4436-B0D4-F43F17B21F48}"/>
     <pc:docChg chg="undo custSel addSld delSld modSld sldOrd">
@@ -4361,7 +4385,7 @@
           <a:p>
             <a:fld id="{D6A82EB2-151D-4EEE-ACF5-92C73278C09C}" type="datetimeFigureOut">
               <a:rPr lang="en-GB" smtClean="0"/>
-              <a:t>15/01/2023</a:t>
+              <a:t>28/01/2023</a:t>
             </a:fld>
             <a:endParaRPr lang="en-GB"/>
           </a:p>
@@ -4561,7 +4585,7 @@
           <a:p>
             <a:fld id="{D6A82EB2-151D-4EEE-ACF5-92C73278C09C}" type="datetimeFigureOut">
               <a:rPr lang="en-GB" smtClean="0"/>
-              <a:t>15/01/2023</a:t>
+              <a:t>28/01/2023</a:t>
             </a:fld>
             <a:endParaRPr lang="en-GB"/>
           </a:p>
@@ -4771,7 +4795,7 @@
           <a:p>
             <a:fld id="{D6A82EB2-151D-4EEE-ACF5-92C73278C09C}" type="datetimeFigureOut">
               <a:rPr lang="en-GB" smtClean="0"/>
-              <a:t>15/01/2023</a:t>
+              <a:t>28/01/2023</a:t>
             </a:fld>
             <a:endParaRPr lang="en-GB"/>
           </a:p>
@@ -4971,7 +4995,7 @@
           <a:p>
             <a:fld id="{D6A82EB2-151D-4EEE-ACF5-92C73278C09C}" type="datetimeFigureOut">
               <a:rPr lang="en-GB" smtClean="0"/>
-              <a:t>15/01/2023</a:t>
+              <a:t>28/01/2023</a:t>
             </a:fld>
             <a:endParaRPr lang="en-GB"/>
           </a:p>
@@ -5247,7 +5271,7 @@
           <a:p>
             <a:fld id="{D6A82EB2-151D-4EEE-ACF5-92C73278C09C}" type="datetimeFigureOut">
               <a:rPr lang="en-GB" smtClean="0"/>
-              <a:t>15/01/2023</a:t>
+              <a:t>28/01/2023</a:t>
             </a:fld>
             <a:endParaRPr lang="en-GB"/>
           </a:p>
@@ -5515,7 +5539,7 @@
           <a:p>
             <a:fld id="{D6A82EB2-151D-4EEE-ACF5-92C73278C09C}" type="datetimeFigureOut">
               <a:rPr lang="en-GB" smtClean="0"/>
-              <a:t>15/01/2023</a:t>
+              <a:t>28/01/2023</a:t>
             </a:fld>
             <a:endParaRPr lang="en-GB"/>
           </a:p>
@@ -5930,7 +5954,7 @@
           <a:p>
             <a:fld id="{D6A82EB2-151D-4EEE-ACF5-92C73278C09C}" type="datetimeFigureOut">
               <a:rPr lang="en-GB" smtClean="0"/>
-              <a:t>15/01/2023</a:t>
+              <a:t>28/01/2023</a:t>
             </a:fld>
             <a:endParaRPr lang="en-GB"/>
           </a:p>
@@ -6072,7 +6096,7 @@
           <a:p>
             <a:fld id="{D6A82EB2-151D-4EEE-ACF5-92C73278C09C}" type="datetimeFigureOut">
               <a:rPr lang="en-GB" smtClean="0"/>
-              <a:t>15/01/2023</a:t>
+              <a:t>28/01/2023</a:t>
             </a:fld>
             <a:endParaRPr lang="en-GB"/>
           </a:p>
@@ -6185,7 +6209,7 @@
           <a:p>
             <a:fld id="{D6A82EB2-151D-4EEE-ACF5-92C73278C09C}" type="datetimeFigureOut">
               <a:rPr lang="en-GB" smtClean="0"/>
-              <a:t>15/01/2023</a:t>
+              <a:t>28/01/2023</a:t>
             </a:fld>
             <a:endParaRPr lang="en-GB"/>
           </a:p>
@@ -6498,7 +6522,7 @@
           <a:p>
             <a:fld id="{D6A82EB2-151D-4EEE-ACF5-92C73278C09C}" type="datetimeFigureOut">
               <a:rPr lang="en-GB" smtClean="0"/>
-              <a:t>15/01/2023</a:t>
+              <a:t>28/01/2023</a:t>
             </a:fld>
             <a:endParaRPr lang="en-GB"/>
           </a:p>
@@ -6787,7 +6811,7 @@
           <a:p>
             <a:fld id="{D6A82EB2-151D-4EEE-ACF5-92C73278C09C}" type="datetimeFigureOut">
               <a:rPr lang="en-GB" smtClean="0"/>
-              <a:t>15/01/2023</a:t>
+              <a:t>28/01/2023</a:t>
             </a:fld>
             <a:endParaRPr lang="en-GB"/>
           </a:p>
@@ -7030,7 +7054,7 @@
           <a:p>
             <a:fld id="{D6A82EB2-151D-4EEE-ACF5-92C73278C09C}" type="datetimeFigureOut">
               <a:rPr lang="en-GB" smtClean="0"/>
-              <a:t>15/01/2023</a:t>
+              <a:t>28/01/2023</a:t>
             </a:fld>
             <a:endParaRPr lang="en-GB"/>
           </a:p>
@@ -10890,7 +10914,7 @@
               <a:rPr lang="de-DE" sz="1400" dirty="0">
                 <a:latin typeface="+mj-lt"/>
               </a:rPr>
-              <a:t>N×</a:t>
+              <a:t>L×</a:t>
             </a:r>
             <a:endParaRPr lang="en-GB" sz="1400" dirty="0">
               <a:latin typeface="+mj-lt"/>
@@ -10930,7 +10954,7 @@
               <a:rPr lang="de-DE" sz="1400" dirty="0">
                 <a:latin typeface="+mj-lt"/>
               </a:rPr>
-              <a:t>N×</a:t>
+              <a:t>L×</a:t>
             </a:r>
             <a:endParaRPr lang="en-GB" sz="1400" dirty="0">
               <a:latin typeface="+mj-lt"/>

</xml_diff>

<commit_message>
Rework chapters on transformer 🤖 (#134)
Adresses #10.
</commit_message>
<xml_diff>
--- a/reports/Graphs/diagrams.pptx
+++ b/reports/Graphs/diagrams.pptx
@@ -117,16 +117,40 @@
 </p:presentation>
 </file>
 
-<file path=ppt/revisionInfo.xml><?xml version="1.0" encoding="utf-8"?>
-<p1510:revInfo xmlns:a="http://schemas.openxmlformats.org/drawingml/2006/main" xmlns:r="http://schemas.openxmlformats.org/officeDocument/2006/relationships" xmlns:p1510="http://schemas.microsoft.com/office/powerpoint/2015/10/main">
-  <p1510:revLst>
-    <p1510:client id="{49E66B90-E8CF-4436-B0D4-F43F17B21F48}" v="122" dt="2023-01-15T08:57:02.269"/>
-  </p1510:revLst>
-</p1510:revInfo>
-</file>
-
 <file path=ppt/changesInfos/changesInfo1.xml><?xml version="1.0" encoding="utf-8"?>
 <pc:chgInfo xmlns:a="http://schemas.openxmlformats.org/drawingml/2006/main" xmlns:r="http://schemas.openxmlformats.org/officeDocument/2006/relationships" xmlns:ac="http://schemas.microsoft.com/office/drawing/2013/main/command" xmlns:pc="http://schemas.microsoft.com/office/powerpoint/2013/main/command">
+  <pc:docChgLst>
+    <pc:chgData name="Markus Bilz" userId="a36021e4bdb9349f" providerId="LiveId" clId="{F9F2BE70-AAED-47FD-A055-7B08EB1371A3}"/>
+    <pc:docChg chg="modSld">
+      <pc:chgData name="Markus Bilz" userId="a36021e4bdb9349f" providerId="LiveId" clId="{F9F2BE70-AAED-47FD-A055-7B08EB1371A3}" dt="2023-01-28T14:06:06.783" v="2" actId="20577"/>
+      <pc:docMkLst>
+        <pc:docMk/>
+      </pc:docMkLst>
+      <pc:sldChg chg="modSp mod">
+        <pc:chgData name="Markus Bilz" userId="a36021e4bdb9349f" providerId="LiveId" clId="{F9F2BE70-AAED-47FD-A055-7B08EB1371A3}" dt="2023-01-28T14:06:06.783" v="2" actId="20577"/>
+        <pc:sldMkLst>
+          <pc:docMk/>
+          <pc:sldMk cId="2836008551" sldId="256"/>
+        </pc:sldMkLst>
+        <pc:spChg chg="mod">
+          <ac:chgData name="Markus Bilz" userId="a36021e4bdb9349f" providerId="LiveId" clId="{F9F2BE70-AAED-47FD-A055-7B08EB1371A3}" dt="2023-01-28T14:06:02.190" v="1" actId="20577"/>
+          <ac:spMkLst>
+            <pc:docMk/>
+            <pc:sldMk cId="2836008551" sldId="256"/>
+            <ac:spMk id="233" creationId="{22826292-593A-4357-FEEB-B7D5B39875EF}"/>
+          </ac:spMkLst>
+        </pc:spChg>
+        <pc:spChg chg="mod">
+          <ac:chgData name="Markus Bilz" userId="a36021e4bdb9349f" providerId="LiveId" clId="{F9F2BE70-AAED-47FD-A055-7B08EB1371A3}" dt="2023-01-28T14:06:06.783" v="2" actId="20577"/>
+          <ac:spMkLst>
+            <pc:docMk/>
+            <pc:sldMk cId="2836008551" sldId="256"/>
+            <ac:spMk id="234" creationId="{29B237C7-6F16-D779-C094-6DB7CEF9786E}"/>
+          </ac:spMkLst>
+        </pc:spChg>
+      </pc:sldChg>
+    </pc:docChg>
+  </pc:docChgLst>
   <pc:docChgLst>
     <pc:chgData name="Markus Bilz" userId="a36021e4bdb9349f" providerId="LiveId" clId="{49E66B90-E8CF-4436-B0D4-F43F17B21F48}"/>
     <pc:docChg chg="undo custSel addSld delSld modSld sldOrd">
@@ -4361,7 +4385,7 @@
           <a:p>
             <a:fld id="{D6A82EB2-151D-4EEE-ACF5-92C73278C09C}" type="datetimeFigureOut">
               <a:rPr lang="en-GB" smtClean="0"/>
-              <a:t>15/01/2023</a:t>
+              <a:t>28/01/2023</a:t>
             </a:fld>
             <a:endParaRPr lang="en-GB"/>
           </a:p>
@@ -4561,7 +4585,7 @@
           <a:p>
             <a:fld id="{D6A82EB2-151D-4EEE-ACF5-92C73278C09C}" type="datetimeFigureOut">
               <a:rPr lang="en-GB" smtClean="0"/>
-              <a:t>15/01/2023</a:t>
+              <a:t>28/01/2023</a:t>
             </a:fld>
             <a:endParaRPr lang="en-GB"/>
           </a:p>
@@ -4771,7 +4795,7 @@
           <a:p>
             <a:fld id="{D6A82EB2-151D-4EEE-ACF5-92C73278C09C}" type="datetimeFigureOut">
               <a:rPr lang="en-GB" smtClean="0"/>
-              <a:t>15/01/2023</a:t>
+              <a:t>28/01/2023</a:t>
             </a:fld>
             <a:endParaRPr lang="en-GB"/>
           </a:p>
@@ -4971,7 +4995,7 @@
           <a:p>
             <a:fld id="{D6A82EB2-151D-4EEE-ACF5-92C73278C09C}" type="datetimeFigureOut">
               <a:rPr lang="en-GB" smtClean="0"/>
-              <a:t>15/01/2023</a:t>
+              <a:t>28/01/2023</a:t>
             </a:fld>
             <a:endParaRPr lang="en-GB"/>
           </a:p>
@@ -5247,7 +5271,7 @@
           <a:p>
             <a:fld id="{D6A82EB2-151D-4EEE-ACF5-92C73278C09C}" type="datetimeFigureOut">
               <a:rPr lang="en-GB" smtClean="0"/>
-              <a:t>15/01/2023</a:t>
+              <a:t>28/01/2023</a:t>
             </a:fld>
             <a:endParaRPr lang="en-GB"/>
           </a:p>
@@ -5515,7 +5539,7 @@
           <a:p>
             <a:fld id="{D6A82EB2-151D-4EEE-ACF5-92C73278C09C}" type="datetimeFigureOut">
               <a:rPr lang="en-GB" smtClean="0"/>
-              <a:t>15/01/2023</a:t>
+              <a:t>28/01/2023</a:t>
             </a:fld>
             <a:endParaRPr lang="en-GB"/>
           </a:p>
@@ -5930,7 +5954,7 @@
           <a:p>
             <a:fld id="{D6A82EB2-151D-4EEE-ACF5-92C73278C09C}" type="datetimeFigureOut">
               <a:rPr lang="en-GB" smtClean="0"/>
-              <a:t>15/01/2023</a:t>
+              <a:t>28/01/2023</a:t>
             </a:fld>
             <a:endParaRPr lang="en-GB"/>
           </a:p>
@@ -6072,7 +6096,7 @@
           <a:p>
             <a:fld id="{D6A82EB2-151D-4EEE-ACF5-92C73278C09C}" type="datetimeFigureOut">
               <a:rPr lang="en-GB" smtClean="0"/>
-              <a:t>15/01/2023</a:t>
+              <a:t>28/01/2023</a:t>
             </a:fld>
             <a:endParaRPr lang="en-GB"/>
           </a:p>
@@ -6185,7 +6209,7 @@
           <a:p>
             <a:fld id="{D6A82EB2-151D-4EEE-ACF5-92C73278C09C}" type="datetimeFigureOut">
               <a:rPr lang="en-GB" smtClean="0"/>
-              <a:t>15/01/2023</a:t>
+              <a:t>28/01/2023</a:t>
             </a:fld>
             <a:endParaRPr lang="en-GB"/>
           </a:p>
@@ -6498,7 +6522,7 @@
           <a:p>
             <a:fld id="{D6A82EB2-151D-4EEE-ACF5-92C73278C09C}" type="datetimeFigureOut">
               <a:rPr lang="en-GB" smtClean="0"/>
-              <a:t>15/01/2023</a:t>
+              <a:t>28/01/2023</a:t>
             </a:fld>
             <a:endParaRPr lang="en-GB"/>
           </a:p>
@@ -6787,7 +6811,7 @@
           <a:p>
             <a:fld id="{D6A82EB2-151D-4EEE-ACF5-92C73278C09C}" type="datetimeFigureOut">
               <a:rPr lang="en-GB" smtClean="0"/>
-              <a:t>15/01/2023</a:t>
+              <a:t>28/01/2023</a:t>
             </a:fld>
             <a:endParaRPr lang="en-GB"/>
           </a:p>
@@ -7030,7 +7054,7 @@
           <a:p>
             <a:fld id="{D6A82EB2-151D-4EEE-ACF5-92C73278C09C}" type="datetimeFigureOut">
               <a:rPr lang="en-GB" smtClean="0"/>
-              <a:t>15/01/2023</a:t>
+              <a:t>28/01/2023</a:t>
             </a:fld>
             <a:endParaRPr lang="en-GB"/>
           </a:p>
@@ -10890,7 +10914,7 @@
               <a:rPr lang="de-DE" sz="1400" dirty="0">
                 <a:latin typeface="+mj-lt"/>
               </a:rPr>
-              <a:t>N×</a:t>
+              <a:t>L×</a:t>
             </a:r>
             <a:endParaRPr lang="en-GB" sz="1400" dirty="0">
               <a:latin typeface="+mj-lt"/>
@@ -10930,7 +10954,7 @@
               <a:rPr lang="de-DE" sz="1400" dirty="0">
                 <a:latin typeface="+mj-lt"/>
               </a:rPr>
-              <a:t>N×</a:t>
+              <a:t>L×</a:t>
             </a:r>
             <a:endParaRPr lang="en-GB" sz="1400" dirty="0">
               <a:latin typeface="+mj-lt"/>

</xml_diff>

<commit_message>
Improve chapter on residual connections 🔗
</commit_message>
<xml_diff>
--- a/reports/Graphs/diagrams.pptx
+++ b/reports/Graphs/diagrams.pptx
@@ -6,11 +6,12 @@
   </p:sldMasterIdLst>
   <p:sldIdLst>
     <p:sldId id="256" r:id="rId2"/>
-    <p:sldId id="260" r:id="rId3"/>
-    <p:sldId id="261" r:id="rId4"/>
-    <p:sldId id="262" r:id="rId5"/>
-    <p:sldId id="259" r:id="rId6"/>
-    <p:sldId id="257" r:id="rId7"/>
+    <p:sldId id="263" r:id="rId3"/>
+    <p:sldId id="262" r:id="rId4"/>
+    <p:sldId id="260" r:id="rId5"/>
+    <p:sldId id="261" r:id="rId6"/>
+    <p:sldId id="259" r:id="rId7"/>
+    <p:sldId id="257" r:id="rId8"/>
   </p:sldIdLst>
   <p:sldSz cx="12192000" cy="6858000"/>
   <p:notesSz cx="6858000" cy="9144000"/>
@@ -117,12 +118,20 @@
 </p:presentation>
 </file>
 
+<file path=ppt/revisionInfo.xml><?xml version="1.0" encoding="utf-8"?>
+<p1510:revInfo xmlns:a="http://schemas.openxmlformats.org/drawingml/2006/main" xmlns:r="http://schemas.openxmlformats.org/officeDocument/2006/relationships" xmlns:p1510="http://schemas.microsoft.com/office/powerpoint/2015/10/main">
+  <p1510:revLst>
+    <p1510:client id="{F9F2BE70-AAED-47FD-A055-7B08EB1371A3}" v="3" dt="2023-01-30T16:00:54.939"/>
+  </p1510:revLst>
+</p1510:revInfo>
+</file>
+
 <file path=ppt/changesInfos/changesInfo1.xml><?xml version="1.0" encoding="utf-8"?>
 <pc:chgInfo xmlns:a="http://schemas.openxmlformats.org/drawingml/2006/main" xmlns:r="http://schemas.openxmlformats.org/officeDocument/2006/relationships" xmlns:ac="http://schemas.microsoft.com/office/drawing/2013/main/command" xmlns:pc="http://schemas.microsoft.com/office/powerpoint/2013/main/command">
   <pc:docChgLst>
     <pc:chgData name="Markus Bilz" userId="a36021e4bdb9349f" providerId="LiveId" clId="{F9F2BE70-AAED-47FD-A055-7B08EB1371A3}"/>
-    <pc:docChg chg="modSld">
-      <pc:chgData name="Markus Bilz" userId="a36021e4bdb9349f" providerId="LiveId" clId="{F9F2BE70-AAED-47FD-A055-7B08EB1371A3}" dt="2023-01-28T14:06:06.783" v="2" actId="20577"/>
+    <pc:docChg chg="undo custSel addSld modSld sldOrd">
+      <pc:chgData name="Markus Bilz" userId="a36021e4bdb9349f" providerId="LiveId" clId="{F9F2BE70-AAED-47FD-A055-7B08EB1371A3}" dt="2023-01-30T16:05:01.590" v="228" actId="14100"/>
       <pc:docMkLst>
         <pc:docMk/>
       </pc:docMkLst>
@@ -148,6 +157,979 @@
             <ac:spMk id="234" creationId="{29B237C7-6F16-D779-C094-6DB7CEF9786E}"/>
           </ac:spMkLst>
         </pc:spChg>
+      </pc:sldChg>
+      <pc:sldChg chg="modSp mod">
+        <pc:chgData name="Markus Bilz" userId="a36021e4bdb9349f" providerId="LiveId" clId="{F9F2BE70-AAED-47FD-A055-7B08EB1371A3}" dt="2023-01-30T15:54:37.278" v="121" actId="14100"/>
+        <pc:sldMkLst>
+          <pc:docMk/>
+          <pc:sldMk cId="4224251106" sldId="260"/>
+        </pc:sldMkLst>
+        <pc:cxnChg chg="mod">
+          <ac:chgData name="Markus Bilz" userId="a36021e4bdb9349f" providerId="LiveId" clId="{F9F2BE70-AAED-47FD-A055-7B08EB1371A3}" dt="2023-01-30T15:54:37.278" v="121" actId="14100"/>
+          <ac:cxnSpMkLst>
+            <pc:docMk/>
+            <pc:sldMk cId="4224251106" sldId="260"/>
+            <ac:cxnSpMk id="50" creationId="{72EF799B-DD01-284F-666A-C8B7A4ADB1C4}"/>
+          </ac:cxnSpMkLst>
+        </pc:cxnChg>
+      </pc:sldChg>
+      <pc:sldChg chg="ord">
+        <pc:chgData name="Markus Bilz" userId="a36021e4bdb9349f" providerId="LiveId" clId="{F9F2BE70-AAED-47FD-A055-7B08EB1371A3}" dt="2023-01-30T15:45:31.429" v="4"/>
+        <pc:sldMkLst>
+          <pc:docMk/>
+          <pc:sldMk cId="350462512" sldId="262"/>
+        </pc:sldMkLst>
+      </pc:sldChg>
+      <pc:sldChg chg="addSp delSp modSp add mod">
+        <pc:chgData name="Markus Bilz" userId="a36021e4bdb9349f" providerId="LiveId" clId="{F9F2BE70-AAED-47FD-A055-7B08EB1371A3}" dt="2023-01-30T16:05:01.590" v="228" actId="14100"/>
+        <pc:sldMkLst>
+          <pc:docMk/>
+          <pc:sldMk cId="1844608576" sldId="263"/>
+        </pc:sldMkLst>
+        <pc:spChg chg="del">
+          <ac:chgData name="Markus Bilz" userId="a36021e4bdb9349f" providerId="LiveId" clId="{F9F2BE70-AAED-47FD-A055-7B08EB1371A3}" dt="2023-01-30T15:45:48.253" v="6" actId="478"/>
+          <ac:spMkLst>
+            <pc:docMk/>
+            <pc:sldMk cId="1844608576" sldId="263"/>
+            <ac:spMk id="2" creationId="{5CC34145-B5F4-8BDD-0E3A-311D220D3B32}"/>
+          </ac:spMkLst>
+        </pc:spChg>
+        <pc:spChg chg="del">
+          <ac:chgData name="Markus Bilz" userId="a36021e4bdb9349f" providerId="LiveId" clId="{F9F2BE70-AAED-47FD-A055-7B08EB1371A3}" dt="2023-01-30T15:45:50.704" v="7" actId="478"/>
+          <ac:spMkLst>
+            <pc:docMk/>
+            <pc:sldMk cId="1844608576" sldId="263"/>
+            <ac:spMk id="6" creationId="{C9552E09-CEAE-1CE3-AD42-25102E23C69E}"/>
+          </ac:spMkLst>
+        </pc:spChg>
+        <pc:spChg chg="del">
+          <ac:chgData name="Markus Bilz" userId="a36021e4bdb9349f" providerId="LiveId" clId="{F9F2BE70-AAED-47FD-A055-7B08EB1371A3}" dt="2023-01-30T15:45:50.704" v="7" actId="478"/>
+          <ac:spMkLst>
+            <pc:docMk/>
+            <pc:sldMk cId="1844608576" sldId="263"/>
+            <ac:spMk id="8" creationId="{5CDEB47C-8305-563E-91D5-7B56B8D6B92A}"/>
+          </ac:spMkLst>
+        </pc:spChg>
+        <pc:spChg chg="del">
+          <ac:chgData name="Markus Bilz" userId="a36021e4bdb9349f" providerId="LiveId" clId="{F9F2BE70-AAED-47FD-A055-7B08EB1371A3}" dt="2023-01-30T15:45:50.704" v="7" actId="478"/>
+          <ac:spMkLst>
+            <pc:docMk/>
+            <pc:sldMk cId="1844608576" sldId="263"/>
+            <ac:spMk id="10" creationId="{00B8C236-422C-0F3A-2195-02455E198FA4}"/>
+          </ac:spMkLst>
+        </pc:spChg>
+        <pc:spChg chg="del">
+          <ac:chgData name="Markus Bilz" userId="a36021e4bdb9349f" providerId="LiveId" clId="{F9F2BE70-AAED-47FD-A055-7B08EB1371A3}" dt="2023-01-30T15:45:50.704" v="7" actId="478"/>
+          <ac:spMkLst>
+            <pc:docMk/>
+            <pc:sldMk cId="1844608576" sldId="263"/>
+            <ac:spMk id="11" creationId="{DE1E0810-1ECA-16CF-FD0B-A3F1319A10ED}"/>
+          </ac:spMkLst>
+        </pc:spChg>
+        <pc:spChg chg="del">
+          <ac:chgData name="Markus Bilz" userId="a36021e4bdb9349f" providerId="LiveId" clId="{F9F2BE70-AAED-47FD-A055-7B08EB1371A3}" dt="2023-01-30T15:45:50.704" v="7" actId="478"/>
+          <ac:spMkLst>
+            <pc:docMk/>
+            <pc:sldMk cId="1844608576" sldId="263"/>
+            <ac:spMk id="12" creationId="{F0C9DEFE-7018-453B-197A-B3C804BF1D4F}"/>
+          </ac:spMkLst>
+        </pc:spChg>
+        <pc:spChg chg="del">
+          <ac:chgData name="Markus Bilz" userId="a36021e4bdb9349f" providerId="LiveId" clId="{F9F2BE70-AAED-47FD-A055-7B08EB1371A3}" dt="2023-01-30T15:45:50.704" v="7" actId="478"/>
+          <ac:spMkLst>
+            <pc:docMk/>
+            <pc:sldMk cId="1844608576" sldId="263"/>
+            <ac:spMk id="13" creationId="{9A4B1958-A498-0910-FC56-F604B1B4ECEB}"/>
+          </ac:spMkLst>
+        </pc:spChg>
+        <pc:spChg chg="del">
+          <ac:chgData name="Markus Bilz" userId="a36021e4bdb9349f" providerId="LiveId" clId="{F9F2BE70-AAED-47FD-A055-7B08EB1371A3}" dt="2023-01-30T15:45:50.704" v="7" actId="478"/>
+          <ac:spMkLst>
+            <pc:docMk/>
+            <pc:sldMk cId="1844608576" sldId="263"/>
+            <ac:spMk id="14" creationId="{FF5BF12D-AA78-EE30-53C6-6A293BDAE817}"/>
+          </ac:spMkLst>
+        </pc:spChg>
+        <pc:spChg chg="del">
+          <ac:chgData name="Markus Bilz" userId="a36021e4bdb9349f" providerId="LiveId" clId="{F9F2BE70-AAED-47FD-A055-7B08EB1371A3}" dt="2023-01-30T15:45:50.704" v="7" actId="478"/>
+          <ac:spMkLst>
+            <pc:docMk/>
+            <pc:sldMk cId="1844608576" sldId="263"/>
+            <ac:spMk id="15" creationId="{FD86F888-F95A-D598-D12B-E04B43114576}"/>
+          </ac:spMkLst>
+        </pc:spChg>
+        <pc:spChg chg="del mod">
+          <ac:chgData name="Markus Bilz" userId="a36021e4bdb9349f" providerId="LiveId" clId="{F9F2BE70-AAED-47FD-A055-7B08EB1371A3}" dt="2023-01-30T15:56:15.018" v="139" actId="478"/>
+          <ac:spMkLst>
+            <pc:docMk/>
+            <pc:sldMk cId="1844608576" sldId="263"/>
+            <ac:spMk id="61" creationId="{C00FF0EF-2F9D-F942-4F6E-0006C5307219}"/>
+          </ac:spMkLst>
+        </pc:spChg>
+        <pc:spChg chg="del mod">
+          <ac:chgData name="Markus Bilz" userId="a36021e4bdb9349f" providerId="LiveId" clId="{F9F2BE70-AAED-47FD-A055-7B08EB1371A3}" dt="2023-01-30T15:49:09.927" v="45" actId="478"/>
+          <ac:spMkLst>
+            <pc:docMk/>
+            <pc:sldMk cId="1844608576" sldId="263"/>
+            <ac:spMk id="62" creationId="{C0641B72-A83F-2F0C-92F9-BC5B309B52B7}"/>
+          </ac:spMkLst>
+        </pc:spChg>
+        <pc:spChg chg="del mod">
+          <ac:chgData name="Markus Bilz" userId="a36021e4bdb9349f" providerId="LiveId" clId="{F9F2BE70-AAED-47FD-A055-7B08EB1371A3}" dt="2023-01-30T15:46:45.378" v="19" actId="478"/>
+          <ac:spMkLst>
+            <pc:docMk/>
+            <pc:sldMk cId="1844608576" sldId="263"/>
+            <ac:spMk id="63" creationId="{2E94D5CD-A3D0-17C2-6DA2-6C898CDD5E11}"/>
+          </ac:spMkLst>
+        </pc:spChg>
+        <pc:spChg chg="mod">
+          <ac:chgData name="Markus Bilz" userId="a36021e4bdb9349f" providerId="LiveId" clId="{F9F2BE70-AAED-47FD-A055-7B08EB1371A3}" dt="2023-01-30T16:03:04.057" v="200" actId="1076"/>
+          <ac:spMkLst>
+            <pc:docMk/>
+            <pc:sldMk cId="1844608576" sldId="263"/>
+            <ac:spMk id="66" creationId="{7343FA96-205F-7DD7-A660-9E1AE7A16CDD}"/>
+          </ac:spMkLst>
+        </pc:spChg>
+        <pc:spChg chg="mod">
+          <ac:chgData name="Markus Bilz" userId="a36021e4bdb9349f" providerId="LiveId" clId="{F9F2BE70-AAED-47FD-A055-7B08EB1371A3}" dt="2023-01-30T16:03:23.807" v="208" actId="1076"/>
+          <ac:spMkLst>
+            <pc:docMk/>
+            <pc:sldMk cId="1844608576" sldId="263"/>
+            <ac:spMk id="67" creationId="{542CA32F-221D-DD49-7091-4AFC3E421628}"/>
+          </ac:spMkLst>
+        </pc:spChg>
+        <pc:spChg chg="del">
+          <ac:chgData name="Markus Bilz" userId="a36021e4bdb9349f" providerId="LiveId" clId="{F9F2BE70-AAED-47FD-A055-7B08EB1371A3}" dt="2023-01-30T15:45:59.232" v="11" actId="478"/>
+          <ac:spMkLst>
+            <pc:docMk/>
+            <pc:sldMk cId="1844608576" sldId="263"/>
+            <ac:spMk id="69" creationId="{22A20337-1D78-2DE5-B292-B4FD075545EE}"/>
+          </ac:spMkLst>
+        </pc:spChg>
+        <pc:spChg chg="add del mod">
+          <ac:chgData name="Markus Bilz" userId="a36021e4bdb9349f" providerId="LiveId" clId="{F9F2BE70-AAED-47FD-A055-7B08EB1371A3}" dt="2023-01-30T16:03:08.047" v="203" actId="478"/>
+          <ac:spMkLst>
+            <pc:docMk/>
+            <pc:sldMk cId="1844608576" sldId="263"/>
+            <ac:spMk id="72" creationId="{D721CAF9-A250-4EF9-2857-EF744B73DB25}"/>
+          </ac:spMkLst>
+        </pc:spChg>
+        <pc:spChg chg="mod">
+          <ac:chgData name="Markus Bilz" userId="a36021e4bdb9349f" providerId="LiveId" clId="{F9F2BE70-AAED-47FD-A055-7B08EB1371A3}" dt="2023-01-30T16:04:31.767" v="223" actId="14100"/>
+          <ac:spMkLst>
+            <pc:docMk/>
+            <pc:sldMk cId="1844608576" sldId="263"/>
+            <ac:spMk id="80" creationId="{83641231-252D-FDB3-0C23-5CDCCDA26F9E}"/>
+          </ac:spMkLst>
+        </pc:spChg>
+        <pc:spChg chg="del mod">
+          <ac:chgData name="Markus Bilz" userId="a36021e4bdb9349f" providerId="LiveId" clId="{F9F2BE70-AAED-47FD-A055-7B08EB1371A3}" dt="2023-01-30T15:56:15.018" v="139" actId="478"/>
+          <ac:spMkLst>
+            <pc:docMk/>
+            <pc:sldMk cId="1844608576" sldId="263"/>
+            <ac:spMk id="81" creationId="{A0C92E84-AAE1-582E-C601-99B54006B43F}"/>
+          </ac:spMkLst>
+        </pc:spChg>
+        <pc:spChg chg="del">
+          <ac:chgData name="Markus Bilz" userId="a36021e4bdb9349f" providerId="LiveId" clId="{F9F2BE70-AAED-47FD-A055-7B08EB1371A3}" dt="2023-01-30T15:45:50.704" v="7" actId="478"/>
+          <ac:spMkLst>
+            <pc:docMk/>
+            <pc:sldMk cId="1844608576" sldId="263"/>
+            <ac:spMk id="107" creationId="{463FC932-9D87-C17B-7EB6-C92B96B1FAF5}"/>
+          </ac:spMkLst>
+        </pc:spChg>
+        <pc:spChg chg="del">
+          <ac:chgData name="Markus Bilz" userId="a36021e4bdb9349f" providerId="LiveId" clId="{F9F2BE70-AAED-47FD-A055-7B08EB1371A3}" dt="2023-01-30T15:45:50.704" v="7" actId="478"/>
+          <ac:spMkLst>
+            <pc:docMk/>
+            <pc:sldMk cId="1844608576" sldId="263"/>
+            <ac:spMk id="118" creationId="{AD306185-1C55-9FEA-819A-1E221B0845E4}"/>
+          </ac:spMkLst>
+        </pc:spChg>
+        <pc:spChg chg="del">
+          <ac:chgData name="Markus Bilz" userId="a36021e4bdb9349f" providerId="LiveId" clId="{F9F2BE70-AAED-47FD-A055-7B08EB1371A3}" dt="2023-01-30T15:45:50.704" v="7" actId="478"/>
+          <ac:spMkLst>
+            <pc:docMk/>
+            <pc:sldMk cId="1844608576" sldId="263"/>
+            <ac:spMk id="119" creationId="{A27EC82D-FC5B-7F49-978D-78DC3E964621}"/>
+          </ac:spMkLst>
+        </pc:spChg>
+        <pc:spChg chg="del">
+          <ac:chgData name="Markus Bilz" userId="a36021e4bdb9349f" providerId="LiveId" clId="{F9F2BE70-AAED-47FD-A055-7B08EB1371A3}" dt="2023-01-30T15:45:50.704" v="7" actId="478"/>
+          <ac:spMkLst>
+            <pc:docMk/>
+            <pc:sldMk cId="1844608576" sldId="263"/>
+            <ac:spMk id="122" creationId="{011F1C23-4321-C448-C866-900D32931439}"/>
+          </ac:spMkLst>
+        </pc:spChg>
+        <pc:spChg chg="del">
+          <ac:chgData name="Markus Bilz" userId="a36021e4bdb9349f" providerId="LiveId" clId="{F9F2BE70-AAED-47FD-A055-7B08EB1371A3}" dt="2023-01-30T15:45:59.232" v="11" actId="478"/>
+          <ac:spMkLst>
+            <pc:docMk/>
+            <pc:sldMk cId="1844608576" sldId="263"/>
+            <ac:spMk id="149" creationId="{46A7283E-03E0-ADB9-66FC-99A2B01B48C6}"/>
+          </ac:spMkLst>
+        </pc:spChg>
+        <pc:spChg chg="del">
+          <ac:chgData name="Markus Bilz" userId="a36021e4bdb9349f" providerId="LiveId" clId="{F9F2BE70-AAED-47FD-A055-7B08EB1371A3}" dt="2023-01-30T15:45:59.232" v="11" actId="478"/>
+          <ac:spMkLst>
+            <pc:docMk/>
+            <pc:sldMk cId="1844608576" sldId="263"/>
+            <ac:spMk id="150" creationId="{68EAA59B-06AB-B15D-C58F-BF0AA87C7B67}"/>
+          </ac:spMkLst>
+        </pc:spChg>
+        <pc:spChg chg="del">
+          <ac:chgData name="Markus Bilz" userId="a36021e4bdb9349f" providerId="LiveId" clId="{F9F2BE70-AAED-47FD-A055-7B08EB1371A3}" dt="2023-01-30T15:45:59.232" v="11" actId="478"/>
+          <ac:spMkLst>
+            <pc:docMk/>
+            <pc:sldMk cId="1844608576" sldId="263"/>
+            <ac:spMk id="151" creationId="{01181209-191D-1FD0-204A-5AAED1B16037}"/>
+          </ac:spMkLst>
+        </pc:spChg>
+        <pc:spChg chg="del">
+          <ac:chgData name="Markus Bilz" userId="a36021e4bdb9349f" providerId="LiveId" clId="{F9F2BE70-AAED-47FD-A055-7B08EB1371A3}" dt="2023-01-30T15:45:59.232" v="11" actId="478"/>
+          <ac:spMkLst>
+            <pc:docMk/>
+            <pc:sldMk cId="1844608576" sldId="263"/>
+            <ac:spMk id="152" creationId="{C7774FFE-D894-9156-4420-B50F767969B7}"/>
+          </ac:spMkLst>
+        </pc:spChg>
+        <pc:spChg chg="del">
+          <ac:chgData name="Markus Bilz" userId="a36021e4bdb9349f" providerId="LiveId" clId="{F9F2BE70-AAED-47FD-A055-7B08EB1371A3}" dt="2023-01-30T15:45:59.232" v="11" actId="478"/>
+          <ac:spMkLst>
+            <pc:docMk/>
+            <pc:sldMk cId="1844608576" sldId="263"/>
+            <ac:spMk id="153" creationId="{D7749EE7-A30D-5C35-4D3C-A4162A3085A1}"/>
+          </ac:spMkLst>
+        </pc:spChg>
+        <pc:spChg chg="del">
+          <ac:chgData name="Markus Bilz" userId="a36021e4bdb9349f" providerId="LiveId" clId="{F9F2BE70-AAED-47FD-A055-7B08EB1371A3}" dt="2023-01-30T15:45:59.232" v="11" actId="478"/>
+          <ac:spMkLst>
+            <pc:docMk/>
+            <pc:sldMk cId="1844608576" sldId="263"/>
+            <ac:spMk id="154" creationId="{C9992878-B793-38E0-4F6A-4766BC02A7E5}"/>
+          </ac:spMkLst>
+        </pc:spChg>
+        <pc:spChg chg="del">
+          <ac:chgData name="Markus Bilz" userId="a36021e4bdb9349f" providerId="LiveId" clId="{F9F2BE70-AAED-47FD-A055-7B08EB1371A3}" dt="2023-01-30T15:45:59.232" v="11" actId="478"/>
+          <ac:spMkLst>
+            <pc:docMk/>
+            <pc:sldMk cId="1844608576" sldId="263"/>
+            <ac:spMk id="155" creationId="{1BDAC74C-9441-B6BD-8704-8401BC9EACF5}"/>
+          </ac:spMkLst>
+        </pc:spChg>
+        <pc:spChg chg="del">
+          <ac:chgData name="Markus Bilz" userId="a36021e4bdb9349f" providerId="LiveId" clId="{F9F2BE70-AAED-47FD-A055-7B08EB1371A3}" dt="2023-01-30T15:45:59.232" v="11" actId="478"/>
+          <ac:spMkLst>
+            <pc:docMk/>
+            <pc:sldMk cId="1844608576" sldId="263"/>
+            <ac:spMk id="156" creationId="{51115222-C397-F4B7-342E-39B119F314B7}"/>
+          </ac:spMkLst>
+        </pc:spChg>
+        <pc:spChg chg="del mod">
+          <ac:chgData name="Markus Bilz" userId="a36021e4bdb9349f" providerId="LiveId" clId="{F9F2BE70-AAED-47FD-A055-7B08EB1371A3}" dt="2023-01-30T15:56:15.018" v="139" actId="478"/>
+          <ac:spMkLst>
+            <pc:docMk/>
+            <pc:sldMk cId="1844608576" sldId="263"/>
+            <ac:spMk id="159" creationId="{1B9AACAD-6A63-1B0C-2776-E880FD7BC163}"/>
+          </ac:spMkLst>
+        </pc:spChg>
+        <pc:spChg chg="del mod">
+          <ac:chgData name="Markus Bilz" userId="a36021e4bdb9349f" providerId="LiveId" clId="{F9F2BE70-AAED-47FD-A055-7B08EB1371A3}" dt="2023-01-30T15:56:15.018" v="139" actId="478"/>
+          <ac:spMkLst>
+            <pc:docMk/>
+            <pc:sldMk cId="1844608576" sldId="263"/>
+            <ac:spMk id="162" creationId="{C8C65B08-14FE-FF44-47C5-FB5077BC12AB}"/>
+          </ac:spMkLst>
+        </pc:spChg>
+        <pc:spChg chg="del">
+          <ac:chgData name="Markus Bilz" userId="a36021e4bdb9349f" providerId="LiveId" clId="{F9F2BE70-AAED-47FD-A055-7B08EB1371A3}" dt="2023-01-30T15:45:59.232" v="11" actId="478"/>
+          <ac:spMkLst>
+            <pc:docMk/>
+            <pc:sldMk cId="1844608576" sldId="263"/>
+            <ac:spMk id="163" creationId="{7F04DDC7-EF2C-10E2-EB4D-74BB2FCBFC9C}"/>
+          </ac:spMkLst>
+        </pc:spChg>
+        <pc:spChg chg="del mod">
+          <ac:chgData name="Markus Bilz" userId="a36021e4bdb9349f" providerId="LiveId" clId="{F9F2BE70-AAED-47FD-A055-7B08EB1371A3}" dt="2023-01-30T15:56:15.018" v="139" actId="478"/>
+          <ac:spMkLst>
+            <pc:docMk/>
+            <pc:sldMk cId="1844608576" sldId="263"/>
+            <ac:spMk id="164" creationId="{77A93769-7B32-A316-32EA-1FC9143243AF}"/>
+          </ac:spMkLst>
+        </pc:spChg>
+        <pc:spChg chg="del">
+          <ac:chgData name="Markus Bilz" userId="a36021e4bdb9349f" providerId="LiveId" clId="{F9F2BE70-AAED-47FD-A055-7B08EB1371A3}" dt="2023-01-30T15:46:00.257" v="12" actId="478"/>
+          <ac:spMkLst>
+            <pc:docMk/>
+            <pc:sldMk cId="1844608576" sldId="263"/>
+            <ac:spMk id="165" creationId="{279F181B-E7CC-7CD6-A843-CF0D0113A1B9}"/>
+          </ac:spMkLst>
+        </pc:spChg>
+        <pc:spChg chg="del">
+          <ac:chgData name="Markus Bilz" userId="a36021e4bdb9349f" providerId="LiveId" clId="{F9F2BE70-AAED-47FD-A055-7B08EB1371A3}" dt="2023-01-30T15:46:05.637" v="13" actId="478"/>
+          <ac:spMkLst>
+            <pc:docMk/>
+            <pc:sldMk cId="1844608576" sldId="263"/>
+            <ac:spMk id="233" creationId="{22826292-593A-4357-FEEB-B7D5B39875EF}"/>
+          </ac:spMkLst>
+        </pc:spChg>
+        <pc:spChg chg="del">
+          <ac:chgData name="Markus Bilz" userId="a36021e4bdb9349f" providerId="LiveId" clId="{F9F2BE70-AAED-47FD-A055-7B08EB1371A3}" dt="2023-01-30T15:46:10.596" v="14" actId="478"/>
+          <ac:spMkLst>
+            <pc:docMk/>
+            <pc:sldMk cId="1844608576" sldId="263"/>
+            <ac:spMk id="234" creationId="{29B237C7-6F16-D779-C094-6DB7CEF9786E}"/>
+          </ac:spMkLst>
+        </pc:spChg>
+        <pc:spChg chg="del mod">
+          <ac:chgData name="Markus Bilz" userId="a36021e4bdb9349f" providerId="LiveId" clId="{F9F2BE70-AAED-47FD-A055-7B08EB1371A3}" dt="2023-01-30T15:46:57.423" v="29" actId="478"/>
+          <ac:spMkLst>
+            <pc:docMk/>
+            <pc:sldMk cId="1844608576" sldId="263"/>
+            <ac:spMk id="266" creationId="{581F8540-556F-156B-61E8-585BC8A175EB}"/>
+          </ac:spMkLst>
+        </pc:spChg>
+        <pc:spChg chg="del mod">
+          <ac:chgData name="Markus Bilz" userId="a36021e4bdb9349f" providerId="LiveId" clId="{F9F2BE70-AAED-47FD-A055-7B08EB1371A3}" dt="2023-01-30T15:46:52.455" v="22" actId="478"/>
+          <ac:spMkLst>
+            <pc:docMk/>
+            <pc:sldMk cId="1844608576" sldId="263"/>
+            <ac:spMk id="267" creationId="{457B388C-7929-72CD-0559-53E0AA934C74}"/>
+          </ac:spMkLst>
+        </pc:spChg>
+        <pc:spChg chg="del mod">
+          <ac:chgData name="Markus Bilz" userId="a36021e4bdb9349f" providerId="LiveId" clId="{F9F2BE70-AAED-47FD-A055-7B08EB1371A3}" dt="2023-01-30T15:46:55.139" v="27"/>
+          <ac:spMkLst>
+            <pc:docMk/>
+            <pc:sldMk cId="1844608576" sldId="263"/>
+            <ac:spMk id="268" creationId="{BB1549EF-6367-5F54-69BE-C8B0CC0F2CF9}"/>
+          </ac:spMkLst>
+        </pc:spChg>
+        <pc:spChg chg="del">
+          <ac:chgData name="Markus Bilz" userId="a36021e4bdb9349f" providerId="LiveId" clId="{F9F2BE70-AAED-47FD-A055-7B08EB1371A3}" dt="2023-01-30T15:45:59.232" v="11" actId="478"/>
+          <ac:spMkLst>
+            <pc:docMk/>
+            <pc:sldMk cId="1844608576" sldId="263"/>
+            <ac:spMk id="270" creationId="{E2E35661-B07A-5ED6-DF65-8F207CF60416}"/>
+          </ac:spMkLst>
+        </pc:spChg>
+        <pc:spChg chg="del mod">
+          <ac:chgData name="Markus Bilz" userId="a36021e4bdb9349f" providerId="LiveId" clId="{F9F2BE70-AAED-47FD-A055-7B08EB1371A3}" dt="2023-01-30T15:56:15.018" v="139" actId="478"/>
+          <ac:spMkLst>
+            <pc:docMk/>
+            <pc:sldMk cId="1844608576" sldId="263"/>
+            <ac:spMk id="271" creationId="{DD59653E-920D-F48F-9F20-B9322ECB117B}"/>
+          </ac:spMkLst>
+        </pc:spChg>
+        <pc:spChg chg="del">
+          <ac:chgData name="Markus Bilz" userId="a36021e4bdb9349f" providerId="LiveId" clId="{F9F2BE70-AAED-47FD-A055-7B08EB1371A3}" dt="2023-01-30T15:45:50.704" v="7" actId="478"/>
+          <ac:spMkLst>
+            <pc:docMk/>
+            <pc:sldMk cId="1844608576" sldId="263"/>
+            <ac:spMk id="287" creationId="{7BC94CD7-9020-9AD0-0571-38B60DAC6E69}"/>
+          </ac:spMkLst>
+        </pc:spChg>
+        <pc:spChg chg="del">
+          <ac:chgData name="Markus Bilz" userId="a36021e4bdb9349f" providerId="LiveId" clId="{F9F2BE70-AAED-47FD-A055-7B08EB1371A3}" dt="2023-01-30T15:45:50.704" v="7" actId="478"/>
+          <ac:spMkLst>
+            <pc:docMk/>
+            <pc:sldMk cId="1844608576" sldId="263"/>
+            <ac:spMk id="294" creationId="{593E6DFD-9DBE-AB73-D087-56B9E5408E8D}"/>
+          </ac:spMkLst>
+        </pc:spChg>
+        <pc:spChg chg="del">
+          <ac:chgData name="Markus Bilz" userId="a36021e4bdb9349f" providerId="LiveId" clId="{F9F2BE70-AAED-47FD-A055-7B08EB1371A3}" dt="2023-01-30T15:45:59.232" v="11" actId="478"/>
+          <ac:spMkLst>
+            <pc:docMk/>
+            <pc:sldMk cId="1844608576" sldId="263"/>
+            <ac:spMk id="343" creationId="{C6E22160-D866-92DB-BD84-84CE220CD26B}"/>
+          </ac:spMkLst>
+        </pc:spChg>
+        <pc:spChg chg="del">
+          <ac:chgData name="Markus Bilz" userId="a36021e4bdb9349f" providerId="LiveId" clId="{F9F2BE70-AAED-47FD-A055-7B08EB1371A3}" dt="2023-01-30T15:45:59.232" v="11" actId="478"/>
+          <ac:spMkLst>
+            <pc:docMk/>
+            <pc:sldMk cId="1844608576" sldId="263"/>
+            <ac:spMk id="420" creationId="{813B81B3-5B1B-8DB0-17CE-A27F9F8C08FE}"/>
+          </ac:spMkLst>
+        </pc:spChg>
+        <pc:spChg chg="del">
+          <ac:chgData name="Markus Bilz" userId="a36021e4bdb9349f" providerId="LiveId" clId="{F9F2BE70-AAED-47FD-A055-7B08EB1371A3}" dt="2023-01-30T15:45:59.232" v="11" actId="478"/>
+          <ac:spMkLst>
+            <pc:docMk/>
+            <pc:sldMk cId="1844608576" sldId="263"/>
+            <ac:spMk id="421" creationId="{C3FF8B0D-DC5D-9E54-3AFE-22F8293245D7}"/>
+          </ac:spMkLst>
+        </pc:spChg>
+        <pc:spChg chg="del">
+          <ac:chgData name="Markus Bilz" userId="a36021e4bdb9349f" providerId="LiveId" clId="{F9F2BE70-AAED-47FD-A055-7B08EB1371A3}" dt="2023-01-30T15:45:59.232" v="11" actId="478"/>
+          <ac:spMkLst>
+            <pc:docMk/>
+            <pc:sldMk cId="1844608576" sldId="263"/>
+            <ac:spMk id="426" creationId="{AC14FE11-EB73-25C7-EF03-DFB3638AB097}"/>
+          </ac:spMkLst>
+        </pc:spChg>
+        <pc:spChg chg="del">
+          <ac:chgData name="Markus Bilz" userId="a36021e4bdb9349f" providerId="LiveId" clId="{F9F2BE70-AAED-47FD-A055-7B08EB1371A3}" dt="2023-01-30T15:45:59.232" v="11" actId="478"/>
+          <ac:spMkLst>
+            <pc:docMk/>
+            <pc:sldMk cId="1844608576" sldId="263"/>
+            <ac:spMk id="427" creationId="{60ABCD62-1C42-F5AC-5CDC-1DE657983B80}"/>
+          </ac:spMkLst>
+        </pc:spChg>
+        <pc:spChg chg="del">
+          <ac:chgData name="Markus Bilz" userId="a36021e4bdb9349f" providerId="LiveId" clId="{F9F2BE70-AAED-47FD-A055-7B08EB1371A3}" dt="2023-01-30T15:45:59.232" v="11" actId="478"/>
+          <ac:spMkLst>
+            <pc:docMk/>
+            <pc:sldMk cId="1844608576" sldId="263"/>
+            <ac:spMk id="428" creationId="{11BEE9B5-5F39-AAF3-80B1-F91F7926342D}"/>
+          </ac:spMkLst>
+        </pc:spChg>
+        <pc:spChg chg="del">
+          <ac:chgData name="Markus Bilz" userId="a36021e4bdb9349f" providerId="LiveId" clId="{F9F2BE70-AAED-47FD-A055-7B08EB1371A3}" dt="2023-01-30T15:45:59.232" v="11" actId="478"/>
+          <ac:spMkLst>
+            <pc:docMk/>
+            <pc:sldMk cId="1844608576" sldId="263"/>
+            <ac:spMk id="429" creationId="{9227B221-4F93-2B5F-6835-73EFEE9870C5}"/>
+          </ac:spMkLst>
+        </pc:spChg>
+        <pc:spChg chg="del">
+          <ac:chgData name="Markus Bilz" userId="a36021e4bdb9349f" providerId="LiveId" clId="{F9F2BE70-AAED-47FD-A055-7B08EB1371A3}" dt="2023-01-30T15:45:59.232" v="11" actId="478"/>
+          <ac:spMkLst>
+            <pc:docMk/>
+            <pc:sldMk cId="1844608576" sldId="263"/>
+            <ac:spMk id="486" creationId="{89A43354-B2BF-9117-0081-E28B2D479FBB}"/>
+          </ac:spMkLst>
+        </pc:spChg>
+        <pc:spChg chg="del">
+          <ac:chgData name="Markus Bilz" userId="a36021e4bdb9349f" providerId="LiveId" clId="{F9F2BE70-AAED-47FD-A055-7B08EB1371A3}" dt="2023-01-30T15:45:59.232" v="11" actId="478"/>
+          <ac:spMkLst>
+            <pc:docMk/>
+            <pc:sldMk cId="1844608576" sldId="263"/>
+            <ac:spMk id="487" creationId="{C523F78B-F9AC-0948-152B-8079E4788737}"/>
+          </ac:spMkLst>
+        </pc:spChg>
+        <pc:spChg chg="del">
+          <ac:chgData name="Markus Bilz" userId="a36021e4bdb9349f" providerId="LiveId" clId="{F9F2BE70-AAED-47FD-A055-7B08EB1371A3}" dt="2023-01-30T15:45:59.232" v="11" actId="478"/>
+          <ac:spMkLst>
+            <pc:docMk/>
+            <pc:sldMk cId="1844608576" sldId="263"/>
+            <ac:spMk id="488" creationId="{DB0FFA97-307F-B323-9124-F5C4FE8C8754}"/>
+          </ac:spMkLst>
+        </pc:spChg>
+        <pc:grpChg chg="del">
+          <ac:chgData name="Markus Bilz" userId="a36021e4bdb9349f" providerId="LiveId" clId="{F9F2BE70-AAED-47FD-A055-7B08EB1371A3}" dt="2023-01-30T15:45:50.704" v="7" actId="478"/>
+          <ac:grpSpMkLst>
+            <pc:docMk/>
+            <pc:sldMk cId="1844608576" sldId="263"/>
+            <ac:grpSpMk id="299" creationId="{9970B700-7EDF-E2B8-7388-6FFD75031A26}"/>
+          </ac:grpSpMkLst>
+        </pc:grpChg>
+        <pc:grpChg chg="del">
+          <ac:chgData name="Markus Bilz" userId="a36021e4bdb9349f" providerId="LiveId" clId="{F9F2BE70-AAED-47FD-A055-7B08EB1371A3}" dt="2023-01-30T15:45:50.704" v="7" actId="478"/>
+          <ac:grpSpMkLst>
+            <pc:docMk/>
+            <pc:sldMk cId="1844608576" sldId="263"/>
+            <ac:grpSpMk id="300" creationId="{7A793711-B6B5-B301-0D10-6E3D9220EA9D}"/>
+          </ac:grpSpMkLst>
+        </pc:grpChg>
+        <pc:grpChg chg="del">
+          <ac:chgData name="Markus Bilz" userId="a36021e4bdb9349f" providerId="LiveId" clId="{F9F2BE70-AAED-47FD-A055-7B08EB1371A3}" dt="2023-01-30T15:45:50.704" v="7" actId="478"/>
+          <ac:grpSpMkLst>
+            <pc:docMk/>
+            <pc:sldMk cId="1844608576" sldId="263"/>
+            <ac:grpSpMk id="315" creationId="{F2576EEA-C47D-7129-CE11-E6A858A35809}"/>
+          </ac:grpSpMkLst>
+        </pc:grpChg>
+        <pc:cxnChg chg="del">
+          <ac:chgData name="Markus Bilz" userId="a36021e4bdb9349f" providerId="LiveId" clId="{F9F2BE70-AAED-47FD-A055-7B08EB1371A3}" dt="2023-01-30T15:45:50.704" v="7" actId="478"/>
+          <ac:cxnSpMkLst>
+            <pc:docMk/>
+            <pc:sldMk cId="1844608576" sldId="263"/>
+            <ac:cxnSpMk id="26" creationId="{21D951A6-4218-B43E-E721-55F3359A28A6}"/>
+          </ac:cxnSpMkLst>
+        </pc:cxnChg>
+        <pc:cxnChg chg="del mod">
+          <ac:chgData name="Markus Bilz" userId="a36021e4bdb9349f" providerId="LiveId" clId="{F9F2BE70-AAED-47FD-A055-7B08EB1371A3}" dt="2023-01-30T15:45:50.704" v="7" actId="478"/>
+          <ac:cxnSpMkLst>
+            <pc:docMk/>
+            <pc:sldMk cId="1844608576" sldId="263"/>
+            <ac:cxnSpMk id="30" creationId="{91386DC9-B507-24F8-6FA8-0F2992DAF5B1}"/>
+          </ac:cxnSpMkLst>
+        </pc:cxnChg>
+        <pc:cxnChg chg="del mod">
+          <ac:chgData name="Markus Bilz" userId="a36021e4bdb9349f" providerId="LiveId" clId="{F9F2BE70-AAED-47FD-A055-7B08EB1371A3}" dt="2023-01-30T15:45:50.704" v="7" actId="478"/>
+          <ac:cxnSpMkLst>
+            <pc:docMk/>
+            <pc:sldMk cId="1844608576" sldId="263"/>
+            <ac:cxnSpMk id="33" creationId="{F5567272-A972-36E4-BB89-01EF157E3C03}"/>
+          </ac:cxnSpMkLst>
+        </pc:cxnChg>
+        <pc:cxnChg chg="del mod">
+          <ac:chgData name="Markus Bilz" userId="a36021e4bdb9349f" providerId="LiveId" clId="{F9F2BE70-AAED-47FD-A055-7B08EB1371A3}" dt="2023-01-30T15:45:50.704" v="7" actId="478"/>
+          <ac:cxnSpMkLst>
+            <pc:docMk/>
+            <pc:sldMk cId="1844608576" sldId="263"/>
+            <ac:cxnSpMk id="34" creationId="{C62CC081-6FBD-6970-72E7-007111CCFABD}"/>
+          </ac:cxnSpMkLst>
+        </pc:cxnChg>
+        <pc:cxnChg chg="del">
+          <ac:chgData name="Markus Bilz" userId="a36021e4bdb9349f" providerId="LiveId" clId="{F9F2BE70-AAED-47FD-A055-7B08EB1371A3}" dt="2023-01-30T15:45:50.704" v="7" actId="478"/>
+          <ac:cxnSpMkLst>
+            <pc:docMk/>
+            <pc:sldMk cId="1844608576" sldId="263"/>
+            <ac:cxnSpMk id="39" creationId="{AA36ACA5-CFE6-E27A-5EB1-AF46FC4A600F}"/>
+          </ac:cxnSpMkLst>
+        </pc:cxnChg>
+        <pc:cxnChg chg="del">
+          <ac:chgData name="Markus Bilz" userId="a36021e4bdb9349f" providerId="LiveId" clId="{F9F2BE70-AAED-47FD-A055-7B08EB1371A3}" dt="2023-01-30T15:45:50.704" v="7" actId="478"/>
+          <ac:cxnSpMkLst>
+            <pc:docMk/>
+            <pc:sldMk cId="1844608576" sldId="263"/>
+            <ac:cxnSpMk id="40" creationId="{920A9850-64D7-2DCD-EDB1-C8BBD7F50B7F}"/>
+          </ac:cxnSpMkLst>
+        </pc:cxnChg>
+        <pc:cxnChg chg="del">
+          <ac:chgData name="Markus Bilz" userId="a36021e4bdb9349f" providerId="LiveId" clId="{F9F2BE70-AAED-47FD-A055-7B08EB1371A3}" dt="2023-01-30T15:45:50.704" v="7" actId="478"/>
+          <ac:cxnSpMkLst>
+            <pc:docMk/>
+            <pc:sldMk cId="1844608576" sldId="263"/>
+            <ac:cxnSpMk id="44" creationId="{19E86D2C-56C9-BAB6-300A-441CEA2F9FF9}"/>
+          </ac:cxnSpMkLst>
+        </pc:cxnChg>
+        <pc:cxnChg chg="del">
+          <ac:chgData name="Markus Bilz" userId="a36021e4bdb9349f" providerId="LiveId" clId="{F9F2BE70-AAED-47FD-A055-7B08EB1371A3}" dt="2023-01-30T15:45:50.704" v="7" actId="478"/>
+          <ac:cxnSpMkLst>
+            <pc:docMk/>
+            <pc:sldMk cId="1844608576" sldId="263"/>
+            <ac:cxnSpMk id="48" creationId="{422EA331-912B-EC25-F58D-E54B0E513BDC}"/>
+          </ac:cxnSpMkLst>
+        </pc:cxnChg>
+        <pc:cxnChg chg="add del mod">
+          <ac:chgData name="Markus Bilz" userId="a36021e4bdb9349f" providerId="LiveId" clId="{F9F2BE70-AAED-47FD-A055-7B08EB1371A3}" dt="2023-01-30T16:03:09.339" v="204" actId="478"/>
+          <ac:cxnSpMkLst>
+            <pc:docMk/>
+            <pc:sldMk cId="1844608576" sldId="263"/>
+            <ac:cxnSpMk id="50" creationId="{BE90FB5D-6532-BA81-4A14-AD0EFF1C6A21}"/>
+          </ac:cxnSpMkLst>
+        </pc:cxnChg>
+        <pc:cxnChg chg="del">
+          <ac:chgData name="Markus Bilz" userId="a36021e4bdb9349f" providerId="LiveId" clId="{F9F2BE70-AAED-47FD-A055-7B08EB1371A3}" dt="2023-01-30T15:45:50.704" v="7" actId="478"/>
+          <ac:cxnSpMkLst>
+            <pc:docMk/>
+            <pc:sldMk cId="1844608576" sldId="263"/>
+            <ac:cxnSpMk id="52" creationId="{8A62A000-8BE3-2B1A-F351-8831397A01F5}"/>
+          </ac:cxnSpMkLst>
+        </pc:cxnChg>
+        <pc:cxnChg chg="del mod">
+          <ac:chgData name="Markus Bilz" userId="a36021e4bdb9349f" providerId="LiveId" clId="{F9F2BE70-AAED-47FD-A055-7B08EB1371A3}" dt="2023-01-30T15:45:50.704" v="7" actId="478"/>
+          <ac:cxnSpMkLst>
+            <pc:docMk/>
+            <pc:sldMk cId="1844608576" sldId="263"/>
+            <ac:cxnSpMk id="53" creationId="{973795A0-B566-B1E2-61C6-EF94CAE5E7B7}"/>
+          </ac:cxnSpMkLst>
+        </pc:cxnChg>
+        <pc:cxnChg chg="del mod">
+          <ac:chgData name="Markus Bilz" userId="a36021e4bdb9349f" providerId="LiveId" clId="{F9F2BE70-AAED-47FD-A055-7B08EB1371A3}" dt="2023-01-30T15:56:15.018" v="139" actId="478"/>
+          <ac:cxnSpMkLst>
+            <pc:docMk/>
+            <pc:sldMk cId="1844608576" sldId="263"/>
+            <ac:cxnSpMk id="70" creationId="{66C88C84-34E5-DBC0-F118-6C49B6374993}"/>
+          </ac:cxnSpMkLst>
+        </pc:cxnChg>
+        <pc:cxnChg chg="del">
+          <ac:chgData name="Markus Bilz" userId="a36021e4bdb9349f" providerId="LiveId" clId="{F9F2BE70-AAED-47FD-A055-7B08EB1371A3}" dt="2023-01-30T15:45:51.937" v="8" actId="478"/>
+          <ac:cxnSpMkLst>
+            <pc:docMk/>
+            <pc:sldMk cId="1844608576" sldId="263"/>
+            <ac:cxnSpMk id="71" creationId="{E1B8EC65-0002-51B6-8023-BE84A773CCCA}"/>
+          </ac:cxnSpMkLst>
+        </pc:cxnChg>
+        <pc:cxnChg chg="del">
+          <ac:chgData name="Markus Bilz" userId="a36021e4bdb9349f" providerId="LiveId" clId="{F9F2BE70-AAED-47FD-A055-7B08EB1371A3}" dt="2023-01-30T15:45:52.751" v="9" actId="478"/>
+          <ac:cxnSpMkLst>
+            <pc:docMk/>
+            <pc:sldMk cId="1844608576" sldId="263"/>
+            <ac:cxnSpMk id="75" creationId="{385A4530-2D02-8491-CAC4-686A58020F9B}"/>
+          </ac:cxnSpMkLst>
+        </pc:cxnChg>
+        <pc:cxnChg chg="add mod">
+          <ac:chgData name="Markus Bilz" userId="a36021e4bdb9349f" providerId="LiveId" clId="{F9F2BE70-AAED-47FD-A055-7B08EB1371A3}" dt="2023-01-30T16:04:46.107" v="225" actId="14100"/>
+          <ac:cxnSpMkLst>
+            <pc:docMk/>
+            <pc:sldMk cId="1844608576" sldId="263"/>
+            <ac:cxnSpMk id="85" creationId="{620B6CED-9580-DA79-22AE-F82A08CEF70D}"/>
+          </ac:cxnSpMkLst>
+        </pc:cxnChg>
+        <pc:cxnChg chg="mod">
+          <ac:chgData name="Markus Bilz" userId="a36021e4bdb9349f" providerId="LiveId" clId="{F9F2BE70-AAED-47FD-A055-7B08EB1371A3}" dt="2023-01-30T15:45:50.704" v="7" actId="478"/>
+          <ac:cxnSpMkLst>
+            <pc:docMk/>
+            <pc:sldMk cId="1844608576" sldId="263"/>
+            <ac:cxnSpMk id="133" creationId="{C565C46A-61F0-FBD6-EDB6-08CF93E08AAB}"/>
+          </ac:cxnSpMkLst>
+        </pc:cxnChg>
+        <pc:cxnChg chg="mod">
+          <ac:chgData name="Markus Bilz" userId="a36021e4bdb9349f" providerId="LiveId" clId="{F9F2BE70-AAED-47FD-A055-7B08EB1371A3}" dt="2023-01-30T15:45:50.704" v="7" actId="478"/>
+          <ac:cxnSpMkLst>
+            <pc:docMk/>
+            <pc:sldMk cId="1844608576" sldId="263"/>
+            <ac:cxnSpMk id="135" creationId="{F0C55BF1-EAFB-857C-72BE-D149779321C9}"/>
+          </ac:cxnSpMkLst>
+        </pc:cxnChg>
+        <pc:cxnChg chg="del mod">
+          <ac:chgData name="Markus Bilz" userId="a36021e4bdb9349f" providerId="LiveId" clId="{F9F2BE70-AAED-47FD-A055-7B08EB1371A3}" dt="2023-01-30T15:45:50.704" v="7" actId="478"/>
+          <ac:cxnSpMkLst>
+            <pc:docMk/>
+            <pc:sldMk cId="1844608576" sldId="263"/>
+            <ac:cxnSpMk id="136" creationId="{46972D37-C6B9-9F2E-9AC9-C6C157BE5684}"/>
+          </ac:cxnSpMkLst>
+        </pc:cxnChg>
+        <pc:cxnChg chg="del mod">
+          <ac:chgData name="Markus Bilz" userId="a36021e4bdb9349f" providerId="LiveId" clId="{F9F2BE70-AAED-47FD-A055-7B08EB1371A3}" dt="2023-01-30T15:45:50.704" v="7" actId="478"/>
+          <ac:cxnSpMkLst>
+            <pc:docMk/>
+            <pc:sldMk cId="1844608576" sldId="263"/>
+            <ac:cxnSpMk id="137" creationId="{01FD7B06-747A-24BE-3BDE-3930ED70079E}"/>
+          </ac:cxnSpMkLst>
+        </pc:cxnChg>
+        <pc:cxnChg chg="del">
+          <ac:chgData name="Markus Bilz" userId="a36021e4bdb9349f" providerId="LiveId" clId="{F9F2BE70-AAED-47FD-A055-7B08EB1371A3}" dt="2023-01-30T15:45:50.704" v="7" actId="478"/>
+          <ac:cxnSpMkLst>
+            <pc:docMk/>
+            <pc:sldMk cId="1844608576" sldId="263"/>
+            <ac:cxnSpMk id="138" creationId="{7415A9F5-CBC0-E745-8622-85ABD001E06E}"/>
+          </ac:cxnSpMkLst>
+        </pc:cxnChg>
+        <pc:cxnChg chg="del">
+          <ac:chgData name="Markus Bilz" userId="a36021e4bdb9349f" providerId="LiveId" clId="{F9F2BE70-AAED-47FD-A055-7B08EB1371A3}" dt="2023-01-30T15:45:59.232" v="11" actId="478"/>
+          <ac:cxnSpMkLst>
+            <pc:docMk/>
+            <pc:sldMk cId="1844608576" sldId="263"/>
+            <ac:cxnSpMk id="161" creationId="{C4BB376D-94B8-4F3E-094E-5ED81610EE0C}"/>
+          </ac:cxnSpMkLst>
+        </pc:cxnChg>
+        <pc:cxnChg chg="del mod">
+          <ac:chgData name="Markus Bilz" userId="a36021e4bdb9349f" providerId="LiveId" clId="{F9F2BE70-AAED-47FD-A055-7B08EB1371A3}" dt="2023-01-30T15:45:59.232" v="11" actId="478"/>
+          <ac:cxnSpMkLst>
+            <pc:docMk/>
+            <pc:sldMk cId="1844608576" sldId="263"/>
+            <ac:cxnSpMk id="167" creationId="{897178BB-E74C-8862-55A6-E321D41541EC}"/>
+          </ac:cxnSpMkLst>
+        </pc:cxnChg>
+        <pc:cxnChg chg="del mod">
+          <ac:chgData name="Markus Bilz" userId="a36021e4bdb9349f" providerId="LiveId" clId="{F9F2BE70-AAED-47FD-A055-7B08EB1371A3}" dt="2023-01-30T15:45:59.232" v="11" actId="478"/>
+          <ac:cxnSpMkLst>
+            <pc:docMk/>
+            <pc:sldMk cId="1844608576" sldId="263"/>
+            <ac:cxnSpMk id="180" creationId="{171BFB04-5094-BECD-BBB7-124F3371B896}"/>
+          </ac:cxnSpMkLst>
+        </pc:cxnChg>
+        <pc:cxnChg chg="del mod">
+          <ac:chgData name="Markus Bilz" userId="a36021e4bdb9349f" providerId="LiveId" clId="{F9F2BE70-AAED-47FD-A055-7B08EB1371A3}" dt="2023-01-30T15:45:59.232" v="11" actId="478"/>
+          <ac:cxnSpMkLst>
+            <pc:docMk/>
+            <pc:sldMk cId="1844608576" sldId="263"/>
+            <ac:cxnSpMk id="191" creationId="{2B5833C9-C07D-F2D1-2768-2F35F1D7780E}"/>
+          </ac:cxnSpMkLst>
+        </pc:cxnChg>
+        <pc:cxnChg chg="del mod">
+          <ac:chgData name="Markus Bilz" userId="a36021e4bdb9349f" providerId="LiveId" clId="{F9F2BE70-AAED-47FD-A055-7B08EB1371A3}" dt="2023-01-30T15:45:54.414" v="10" actId="478"/>
+          <ac:cxnSpMkLst>
+            <pc:docMk/>
+            <pc:sldMk cId="1844608576" sldId="263"/>
+            <ac:cxnSpMk id="197" creationId="{72266BF9-FEEB-509F-96D4-D41CB350B53F}"/>
+          </ac:cxnSpMkLst>
+        </pc:cxnChg>
+        <pc:cxnChg chg="mod">
+          <ac:chgData name="Markus Bilz" userId="a36021e4bdb9349f" providerId="LiveId" clId="{F9F2BE70-AAED-47FD-A055-7B08EB1371A3}" dt="2023-01-30T16:03:03.710" v="198" actId="1076"/>
+          <ac:cxnSpMkLst>
+            <pc:docMk/>
+            <pc:sldMk cId="1844608576" sldId="263"/>
+            <ac:cxnSpMk id="211" creationId="{845B1465-2D2D-0E46-ACBF-35D587BBC249}"/>
+          </ac:cxnSpMkLst>
+        </pc:cxnChg>
+        <pc:cxnChg chg="mod">
+          <ac:chgData name="Markus Bilz" userId="a36021e4bdb9349f" providerId="LiveId" clId="{F9F2BE70-AAED-47FD-A055-7B08EB1371A3}" dt="2023-01-30T16:03:08.047" v="203" actId="478"/>
+          <ac:cxnSpMkLst>
+            <pc:docMk/>
+            <pc:sldMk cId="1844608576" sldId="263"/>
+            <ac:cxnSpMk id="214" creationId="{0D81CBA5-C3C3-5317-A8A3-8CD616613EDE}"/>
+          </ac:cxnSpMkLst>
+        </pc:cxnChg>
+        <pc:cxnChg chg="del mod">
+          <ac:chgData name="Markus Bilz" userId="a36021e4bdb9349f" providerId="LiveId" clId="{F9F2BE70-AAED-47FD-A055-7B08EB1371A3}" dt="2023-01-30T15:46:51.121" v="21" actId="478"/>
+          <ac:cxnSpMkLst>
+            <pc:docMk/>
+            <pc:sldMk cId="1844608576" sldId="263"/>
+            <ac:cxnSpMk id="217" creationId="{AF17FB98-C9BC-D133-7339-F0C5698E6493}"/>
+          </ac:cxnSpMkLst>
+        </pc:cxnChg>
+        <pc:cxnChg chg="mod">
+          <ac:chgData name="Markus Bilz" userId="a36021e4bdb9349f" providerId="LiveId" clId="{F9F2BE70-AAED-47FD-A055-7B08EB1371A3}" dt="2023-01-30T16:05:01.590" v="228" actId="14100"/>
+          <ac:cxnSpMkLst>
+            <pc:docMk/>
+            <pc:sldMk cId="1844608576" sldId="263"/>
+            <ac:cxnSpMk id="220" creationId="{F71C02ED-6336-D99D-2AAA-7DC8A5931246}"/>
+          </ac:cxnSpMkLst>
+        </pc:cxnChg>
+        <pc:cxnChg chg="del mod">
+          <ac:chgData name="Markus Bilz" userId="a36021e4bdb9349f" providerId="LiveId" clId="{F9F2BE70-AAED-47FD-A055-7B08EB1371A3}" dt="2023-01-30T15:46:47.996" v="20" actId="478"/>
+          <ac:cxnSpMkLst>
+            <pc:docMk/>
+            <pc:sldMk cId="1844608576" sldId="263"/>
+            <ac:cxnSpMk id="226" creationId="{470B009F-AEBC-B736-2071-04407321C553}"/>
+          </ac:cxnSpMkLst>
+        </pc:cxnChg>
+        <pc:cxnChg chg="del mod">
+          <ac:chgData name="Markus Bilz" userId="a36021e4bdb9349f" providerId="LiveId" clId="{F9F2BE70-AAED-47FD-A055-7B08EB1371A3}" dt="2023-01-30T15:46:53.356" v="23" actId="478"/>
+          <ac:cxnSpMkLst>
+            <pc:docMk/>
+            <pc:sldMk cId="1844608576" sldId="263"/>
+            <ac:cxnSpMk id="237" creationId="{036D8E88-6EFA-CAFF-8837-AF527638DCCD}"/>
+          </ac:cxnSpMkLst>
+        </pc:cxnChg>
+        <pc:cxnChg chg="del mod">
+          <ac:chgData name="Markus Bilz" userId="a36021e4bdb9349f" providerId="LiveId" clId="{F9F2BE70-AAED-47FD-A055-7B08EB1371A3}" dt="2023-01-30T15:46:55.860" v="28" actId="478"/>
+          <ac:cxnSpMkLst>
+            <pc:docMk/>
+            <pc:sldMk cId="1844608576" sldId="263"/>
+            <ac:cxnSpMk id="242" creationId="{15A6B20D-82BA-B4F9-68E1-286190BB95EE}"/>
+          </ac:cxnSpMkLst>
+        </pc:cxnChg>
+        <pc:cxnChg chg="del mod">
+          <ac:chgData name="Markus Bilz" userId="a36021e4bdb9349f" providerId="LiveId" clId="{F9F2BE70-AAED-47FD-A055-7B08EB1371A3}" dt="2023-01-30T15:46:55.134" v="25" actId="478"/>
+          <ac:cxnSpMkLst>
+            <pc:docMk/>
+            <pc:sldMk cId="1844608576" sldId="263"/>
+            <ac:cxnSpMk id="249" creationId="{474E23BC-E9EE-6D4C-E9B0-65C585D028C8}"/>
+          </ac:cxnSpMkLst>
+        </pc:cxnChg>
+        <pc:cxnChg chg="del mod">
+          <ac:chgData name="Markus Bilz" userId="a36021e4bdb9349f" providerId="LiveId" clId="{F9F2BE70-AAED-47FD-A055-7B08EB1371A3}" dt="2023-01-30T15:56:15.018" v="139" actId="478"/>
+          <ac:cxnSpMkLst>
+            <pc:docMk/>
+            <pc:sldMk cId="1844608576" sldId="263"/>
+            <ac:cxnSpMk id="250" creationId="{43FB143F-225C-E190-85BD-DDE8D18125DF}"/>
+          </ac:cxnSpMkLst>
+        </pc:cxnChg>
+        <pc:cxnChg chg="del">
+          <ac:chgData name="Markus Bilz" userId="a36021e4bdb9349f" providerId="LiveId" clId="{F9F2BE70-AAED-47FD-A055-7B08EB1371A3}" dt="2023-01-30T15:45:59.232" v="11" actId="478"/>
+          <ac:cxnSpMkLst>
+            <pc:docMk/>
+            <pc:sldMk cId="1844608576" sldId="263"/>
+            <ac:cxnSpMk id="259" creationId="{8AEB88A4-0A71-A877-BF55-F161FED1B9A9}"/>
+          </ac:cxnSpMkLst>
+        </pc:cxnChg>
+        <pc:cxnChg chg="del">
+          <ac:chgData name="Markus Bilz" userId="a36021e4bdb9349f" providerId="LiveId" clId="{F9F2BE70-AAED-47FD-A055-7B08EB1371A3}" dt="2023-01-30T15:45:59.232" v="11" actId="478"/>
+          <ac:cxnSpMkLst>
+            <pc:docMk/>
+            <pc:sldMk cId="1844608576" sldId="263"/>
+            <ac:cxnSpMk id="261" creationId="{10C3370F-9345-7102-AF54-2EABE2964BEB}"/>
+          </ac:cxnSpMkLst>
+        </pc:cxnChg>
+        <pc:cxnChg chg="mod">
+          <ac:chgData name="Markus Bilz" userId="a36021e4bdb9349f" providerId="LiveId" clId="{F9F2BE70-AAED-47FD-A055-7B08EB1371A3}" dt="2023-01-30T15:45:50.704" v="7" actId="478"/>
+          <ac:cxnSpMkLst>
+            <pc:docMk/>
+            <pc:sldMk cId="1844608576" sldId="263"/>
+            <ac:cxnSpMk id="288" creationId="{42CACBA9-8845-6A9F-E1C2-15783AA575F0}"/>
+          </ac:cxnSpMkLst>
+        </pc:cxnChg>
+        <pc:cxnChg chg="del">
+          <ac:chgData name="Markus Bilz" userId="a36021e4bdb9349f" providerId="LiveId" clId="{F9F2BE70-AAED-47FD-A055-7B08EB1371A3}" dt="2023-01-30T15:45:50.704" v="7" actId="478"/>
+          <ac:cxnSpMkLst>
+            <pc:docMk/>
+            <pc:sldMk cId="1844608576" sldId="263"/>
+            <ac:cxnSpMk id="289" creationId="{4C40E824-AB6C-8B4D-EE80-5500ACAD36A2}"/>
+          </ac:cxnSpMkLst>
+        </pc:cxnChg>
+        <pc:cxnChg chg="del mod">
+          <ac:chgData name="Markus Bilz" userId="a36021e4bdb9349f" providerId="LiveId" clId="{F9F2BE70-AAED-47FD-A055-7B08EB1371A3}" dt="2023-01-30T15:45:50.704" v="7" actId="478"/>
+          <ac:cxnSpMkLst>
+            <pc:docMk/>
+            <pc:sldMk cId="1844608576" sldId="263"/>
+            <ac:cxnSpMk id="291" creationId="{83D4D8D6-24DE-EBC5-EE75-7E656C47807A}"/>
+          </ac:cxnSpMkLst>
+        </pc:cxnChg>
+        <pc:cxnChg chg="mod">
+          <ac:chgData name="Markus Bilz" userId="a36021e4bdb9349f" providerId="LiveId" clId="{F9F2BE70-AAED-47FD-A055-7B08EB1371A3}" dt="2023-01-30T15:45:50.704" v="7" actId="478"/>
+          <ac:cxnSpMkLst>
+            <pc:docMk/>
+            <pc:sldMk cId="1844608576" sldId="263"/>
+            <ac:cxnSpMk id="295" creationId="{6E85DBDD-0C29-4269-E80E-B39868FD8E8E}"/>
+          </ac:cxnSpMkLst>
+        </pc:cxnChg>
+        <pc:cxnChg chg="del">
+          <ac:chgData name="Markus Bilz" userId="a36021e4bdb9349f" providerId="LiveId" clId="{F9F2BE70-AAED-47FD-A055-7B08EB1371A3}" dt="2023-01-30T15:45:50.704" v="7" actId="478"/>
+          <ac:cxnSpMkLst>
+            <pc:docMk/>
+            <pc:sldMk cId="1844608576" sldId="263"/>
+            <ac:cxnSpMk id="296" creationId="{6CB49D05-B62D-AF88-9D89-C7BB3FA60E35}"/>
+          </ac:cxnSpMkLst>
+        </pc:cxnChg>
+        <pc:cxnChg chg="del mod">
+          <ac:chgData name="Markus Bilz" userId="a36021e4bdb9349f" providerId="LiveId" clId="{F9F2BE70-AAED-47FD-A055-7B08EB1371A3}" dt="2023-01-30T15:45:50.704" v="7" actId="478"/>
+          <ac:cxnSpMkLst>
+            <pc:docMk/>
+            <pc:sldMk cId="1844608576" sldId="263"/>
+            <ac:cxnSpMk id="298" creationId="{538C5C61-0F57-4BF5-92DD-9797CB18A320}"/>
+          </ac:cxnSpMkLst>
+        </pc:cxnChg>
+        <pc:cxnChg chg="mod">
+          <ac:chgData name="Markus Bilz" userId="a36021e4bdb9349f" providerId="LiveId" clId="{F9F2BE70-AAED-47FD-A055-7B08EB1371A3}" dt="2023-01-30T15:45:50.704" v="7" actId="478"/>
+          <ac:cxnSpMkLst>
+            <pc:docMk/>
+            <pc:sldMk cId="1844608576" sldId="263"/>
+            <ac:cxnSpMk id="304" creationId="{DF259A31-9810-7B92-D77D-E5B2A146383C}"/>
+          </ac:cxnSpMkLst>
+        </pc:cxnChg>
+        <pc:cxnChg chg="mod">
+          <ac:chgData name="Markus Bilz" userId="a36021e4bdb9349f" providerId="LiveId" clId="{F9F2BE70-AAED-47FD-A055-7B08EB1371A3}" dt="2023-01-30T15:45:50.704" v="7" actId="478"/>
+          <ac:cxnSpMkLst>
+            <pc:docMk/>
+            <pc:sldMk cId="1844608576" sldId="263"/>
+            <ac:cxnSpMk id="309" creationId="{264C6CC8-5585-5A09-A872-691550C565E0}"/>
+          </ac:cxnSpMkLst>
+        </pc:cxnChg>
+        <pc:cxnChg chg="mod">
+          <ac:chgData name="Markus Bilz" userId="a36021e4bdb9349f" providerId="LiveId" clId="{F9F2BE70-AAED-47FD-A055-7B08EB1371A3}" dt="2023-01-30T15:45:50.704" v="7" actId="478"/>
+          <ac:cxnSpMkLst>
+            <pc:docMk/>
+            <pc:sldMk cId="1844608576" sldId="263"/>
+            <ac:cxnSpMk id="313" creationId="{836A65F0-73ED-A541-655F-9C814BA8AEB7}"/>
+          </ac:cxnSpMkLst>
+        </pc:cxnChg>
+        <pc:cxnChg chg="mod">
+          <ac:chgData name="Markus Bilz" userId="a36021e4bdb9349f" providerId="LiveId" clId="{F9F2BE70-AAED-47FD-A055-7B08EB1371A3}" dt="2023-01-30T15:45:50.704" v="7" actId="478"/>
+          <ac:cxnSpMkLst>
+            <pc:docMk/>
+            <pc:sldMk cId="1844608576" sldId="263"/>
+            <ac:cxnSpMk id="319" creationId="{3334D5F6-5BFB-013F-386C-C53CF9436B30}"/>
+          </ac:cxnSpMkLst>
+        </pc:cxnChg>
+        <pc:cxnChg chg="mod">
+          <ac:chgData name="Markus Bilz" userId="a36021e4bdb9349f" providerId="LiveId" clId="{F9F2BE70-AAED-47FD-A055-7B08EB1371A3}" dt="2023-01-30T15:45:50.704" v="7" actId="478"/>
+          <ac:cxnSpMkLst>
+            <pc:docMk/>
+            <pc:sldMk cId="1844608576" sldId="263"/>
+            <ac:cxnSpMk id="320" creationId="{76818338-A380-8571-0227-68862B1431D2}"/>
+          </ac:cxnSpMkLst>
+        </pc:cxnChg>
+        <pc:cxnChg chg="mod">
+          <ac:chgData name="Markus Bilz" userId="a36021e4bdb9349f" providerId="LiveId" clId="{F9F2BE70-AAED-47FD-A055-7B08EB1371A3}" dt="2023-01-30T15:45:50.704" v="7" actId="478"/>
+          <ac:cxnSpMkLst>
+            <pc:docMk/>
+            <pc:sldMk cId="1844608576" sldId="263"/>
+            <ac:cxnSpMk id="324" creationId="{63F90467-6631-6F69-AF8C-15E424119BBF}"/>
+          </ac:cxnSpMkLst>
+        </pc:cxnChg>
+        <pc:cxnChg chg="mod">
+          <ac:chgData name="Markus Bilz" userId="a36021e4bdb9349f" providerId="LiveId" clId="{F9F2BE70-AAED-47FD-A055-7B08EB1371A3}" dt="2023-01-30T15:45:50.704" v="7" actId="478"/>
+          <ac:cxnSpMkLst>
+            <pc:docMk/>
+            <pc:sldMk cId="1844608576" sldId="263"/>
+            <ac:cxnSpMk id="328" creationId="{610D4F5D-C2CF-75EC-A5BA-FFB8082194FF}"/>
+          </ac:cxnSpMkLst>
+        </pc:cxnChg>
+        <pc:cxnChg chg="del mod">
+          <ac:chgData name="Markus Bilz" userId="a36021e4bdb9349f" providerId="LiveId" clId="{F9F2BE70-AAED-47FD-A055-7B08EB1371A3}" dt="2023-01-30T15:45:59.232" v="11" actId="478"/>
+          <ac:cxnSpMkLst>
+            <pc:docMk/>
+            <pc:sldMk cId="1844608576" sldId="263"/>
+            <ac:cxnSpMk id="345" creationId="{BE2B4CD1-38C1-B0DE-DB96-36C2254209B4}"/>
+          </ac:cxnSpMkLst>
+        </pc:cxnChg>
+        <pc:cxnChg chg="del mod">
+          <ac:chgData name="Markus Bilz" userId="a36021e4bdb9349f" providerId="LiveId" clId="{F9F2BE70-AAED-47FD-A055-7B08EB1371A3}" dt="2023-01-30T15:45:59.232" v="11" actId="478"/>
+          <ac:cxnSpMkLst>
+            <pc:docMk/>
+            <pc:sldMk cId="1844608576" sldId="263"/>
+            <ac:cxnSpMk id="351" creationId="{68D467CA-359D-10CF-E465-BF265E9D9727}"/>
+          </ac:cxnSpMkLst>
+        </pc:cxnChg>
+        <pc:cxnChg chg="del mod">
+          <ac:chgData name="Markus Bilz" userId="a36021e4bdb9349f" providerId="LiveId" clId="{F9F2BE70-AAED-47FD-A055-7B08EB1371A3}" dt="2023-01-30T15:45:59.232" v="11" actId="478"/>
+          <ac:cxnSpMkLst>
+            <pc:docMk/>
+            <pc:sldMk cId="1844608576" sldId="263"/>
+            <ac:cxnSpMk id="354" creationId="{A8A9749C-158F-8FE5-A9CF-35DCA5D98B73}"/>
+          </ac:cxnSpMkLst>
+        </pc:cxnChg>
+        <pc:cxnChg chg="del mod">
+          <ac:chgData name="Markus Bilz" userId="a36021e4bdb9349f" providerId="LiveId" clId="{F9F2BE70-AAED-47FD-A055-7B08EB1371A3}" dt="2023-01-30T15:45:59.232" v="11" actId="478"/>
+          <ac:cxnSpMkLst>
+            <pc:docMk/>
+            <pc:sldMk cId="1844608576" sldId="263"/>
+            <ac:cxnSpMk id="363" creationId="{EC6733DA-676A-1A14-7522-D892306783B9}"/>
+          </ac:cxnSpMkLst>
+        </pc:cxnChg>
+        <pc:cxnChg chg="del mod">
+          <ac:chgData name="Markus Bilz" userId="a36021e4bdb9349f" providerId="LiveId" clId="{F9F2BE70-AAED-47FD-A055-7B08EB1371A3}" dt="2023-01-30T15:45:59.232" v="11" actId="478"/>
+          <ac:cxnSpMkLst>
+            <pc:docMk/>
+            <pc:sldMk cId="1844608576" sldId="263"/>
+            <ac:cxnSpMk id="366" creationId="{5777D9B2-2213-7E19-2F00-D495870A6B8C}"/>
+          </ac:cxnSpMkLst>
+        </pc:cxnChg>
+        <pc:cxnChg chg="del mod">
+          <ac:chgData name="Markus Bilz" userId="a36021e4bdb9349f" providerId="LiveId" clId="{F9F2BE70-AAED-47FD-A055-7B08EB1371A3}" dt="2023-01-30T15:56:15.018" v="139" actId="478"/>
+          <ac:cxnSpMkLst>
+            <pc:docMk/>
+            <pc:sldMk cId="1844608576" sldId="263"/>
+            <ac:cxnSpMk id="381" creationId="{630D9FB8-05E1-F1B0-DB3B-8A7520917890}"/>
+          </ac:cxnSpMkLst>
+        </pc:cxnChg>
+        <pc:cxnChg chg="del">
+          <ac:chgData name="Markus Bilz" userId="a36021e4bdb9349f" providerId="LiveId" clId="{F9F2BE70-AAED-47FD-A055-7B08EB1371A3}" dt="2023-01-30T15:45:59.232" v="11" actId="478"/>
+          <ac:cxnSpMkLst>
+            <pc:docMk/>
+            <pc:sldMk cId="1844608576" sldId="263"/>
+            <ac:cxnSpMk id="422" creationId="{196FAB25-6411-E003-8719-EB4C50D6E933}"/>
+          </ac:cxnSpMkLst>
+        </pc:cxnChg>
+        <pc:cxnChg chg="del">
+          <ac:chgData name="Markus Bilz" userId="a36021e4bdb9349f" providerId="LiveId" clId="{F9F2BE70-AAED-47FD-A055-7B08EB1371A3}" dt="2023-01-30T15:45:59.232" v="11" actId="478"/>
+          <ac:cxnSpMkLst>
+            <pc:docMk/>
+            <pc:sldMk cId="1844608576" sldId="263"/>
+            <ac:cxnSpMk id="423" creationId="{04F2825D-3D37-A219-796F-C3489D68FD51}"/>
+          </ac:cxnSpMkLst>
+        </pc:cxnChg>
+        <pc:cxnChg chg="del mod">
+          <ac:chgData name="Markus Bilz" userId="a36021e4bdb9349f" providerId="LiveId" clId="{F9F2BE70-AAED-47FD-A055-7B08EB1371A3}" dt="2023-01-30T15:45:59.232" v="11" actId="478"/>
+          <ac:cxnSpMkLst>
+            <pc:docMk/>
+            <pc:sldMk cId="1844608576" sldId="263"/>
+            <ac:cxnSpMk id="424" creationId="{9237CF59-3E77-B75F-212D-2714C58909E7}"/>
+          </ac:cxnSpMkLst>
+        </pc:cxnChg>
+        <pc:cxnChg chg="del">
+          <ac:chgData name="Markus Bilz" userId="a36021e4bdb9349f" providerId="LiveId" clId="{F9F2BE70-AAED-47FD-A055-7B08EB1371A3}" dt="2023-01-30T15:45:59.232" v="11" actId="478"/>
+          <ac:cxnSpMkLst>
+            <pc:docMk/>
+            <pc:sldMk cId="1844608576" sldId="263"/>
+            <ac:cxnSpMk id="425" creationId="{DE679514-9D08-0938-DDF7-610FD3B65B31}"/>
+          </ac:cxnSpMkLst>
+        </pc:cxnChg>
+        <pc:cxnChg chg="del mod">
+          <ac:chgData name="Markus Bilz" userId="a36021e4bdb9349f" providerId="LiveId" clId="{F9F2BE70-AAED-47FD-A055-7B08EB1371A3}" dt="2023-01-30T15:45:59.232" v="11" actId="478"/>
+          <ac:cxnSpMkLst>
+            <pc:docMk/>
+            <pc:sldMk cId="1844608576" sldId="263"/>
+            <ac:cxnSpMk id="430" creationId="{63A4382D-B435-EBB9-C252-A3806B65A1A6}"/>
+          </ac:cxnSpMkLst>
+        </pc:cxnChg>
+        <pc:cxnChg chg="del mod">
+          <ac:chgData name="Markus Bilz" userId="a36021e4bdb9349f" providerId="LiveId" clId="{F9F2BE70-AAED-47FD-A055-7B08EB1371A3}" dt="2023-01-30T15:45:59.232" v="11" actId="478"/>
+          <ac:cxnSpMkLst>
+            <pc:docMk/>
+            <pc:sldMk cId="1844608576" sldId="263"/>
+            <ac:cxnSpMk id="474" creationId="{102CF8D6-653C-EB6E-8C8D-AE62472923C0}"/>
+          </ac:cxnSpMkLst>
+        </pc:cxnChg>
       </pc:sldChg>
     </pc:docChg>
   </pc:docChgLst>
@@ -4385,7 +5367,7 @@
           <a:p>
             <a:fld id="{D6A82EB2-151D-4EEE-ACF5-92C73278C09C}" type="datetimeFigureOut">
               <a:rPr lang="en-GB" smtClean="0"/>
-              <a:t>28/01/2023</a:t>
+              <a:t>30/01/2023</a:t>
             </a:fld>
             <a:endParaRPr lang="en-GB"/>
           </a:p>
@@ -4585,7 +5567,7 @@
           <a:p>
             <a:fld id="{D6A82EB2-151D-4EEE-ACF5-92C73278C09C}" type="datetimeFigureOut">
               <a:rPr lang="en-GB" smtClean="0"/>
-              <a:t>28/01/2023</a:t>
+              <a:t>30/01/2023</a:t>
             </a:fld>
             <a:endParaRPr lang="en-GB"/>
           </a:p>
@@ -4795,7 +5777,7 @@
           <a:p>
             <a:fld id="{D6A82EB2-151D-4EEE-ACF5-92C73278C09C}" type="datetimeFigureOut">
               <a:rPr lang="en-GB" smtClean="0"/>
-              <a:t>28/01/2023</a:t>
+              <a:t>30/01/2023</a:t>
             </a:fld>
             <a:endParaRPr lang="en-GB"/>
           </a:p>
@@ -4995,7 +5977,7 @@
           <a:p>
             <a:fld id="{D6A82EB2-151D-4EEE-ACF5-92C73278C09C}" type="datetimeFigureOut">
               <a:rPr lang="en-GB" smtClean="0"/>
-              <a:t>28/01/2023</a:t>
+              <a:t>30/01/2023</a:t>
             </a:fld>
             <a:endParaRPr lang="en-GB"/>
           </a:p>
@@ -5271,7 +6253,7 @@
           <a:p>
             <a:fld id="{D6A82EB2-151D-4EEE-ACF5-92C73278C09C}" type="datetimeFigureOut">
               <a:rPr lang="en-GB" smtClean="0"/>
-              <a:t>28/01/2023</a:t>
+              <a:t>30/01/2023</a:t>
             </a:fld>
             <a:endParaRPr lang="en-GB"/>
           </a:p>
@@ -5539,7 +6521,7 @@
           <a:p>
             <a:fld id="{D6A82EB2-151D-4EEE-ACF5-92C73278C09C}" type="datetimeFigureOut">
               <a:rPr lang="en-GB" smtClean="0"/>
-              <a:t>28/01/2023</a:t>
+              <a:t>30/01/2023</a:t>
             </a:fld>
             <a:endParaRPr lang="en-GB"/>
           </a:p>
@@ -5954,7 +6936,7 @@
           <a:p>
             <a:fld id="{D6A82EB2-151D-4EEE-ACF5-92C73278C09C}" type="datetimeFigureOut">
               <a:rPr lang="en-GB" smtClean="0"/>
-              <a:t>28/01/2023</a:t>
+              <a:t>30/01/2023</a:t>
             </a:fld>
             <a:endParaRPr lang="en-GB"/>
           </a:p>
@@ -6096,7 +7078,7 @@
           <a:p>
             <a:fld id="{D6A82EB2-151D-4EEE-ACF5-92C73278C09C}" type="datetimeFigureOut">
               <a:rPr lang="en-GB" smtClean="0"/>
-              <a:t>28/01/2023</a:t>
+              <a:t>30/01/2023</a:t>
             </a:fld>
             <a:endParaRPr lang="en-GB"/>
           </a:p>
@@ -6209,7 +7191,7 @@
           <a:p>
             <a:fld id="{D6A82EB2-151D-4EEE-ACF5-92C73278C09C}" type="datetimeFigureOut">
               <a:rPr lang="en-GB" smtClean="0"/>
-              <a:t>28/01/2023</a:t>
+              <a:t>30/01/2023</a:t>
             </a:fld>
             <a:endParaRPr lang="en-GB"/>
           </a:p>
@@ -6522,7 +7504,7 @@
           <a:p>
             <a:fld id="{D6A82EB2-151D-4EEE-ACF5-92C73278C09C}" type="datetimeFigureOut">
               <a:rPr lang="en-GB" smtClean="0"/>
-              <a:t>28/01/2023</a:t>
+              <a:t>30/01/2023</a:t>
             </a:fld>
             <a:endParaRPr lang="en-GB"/>
           </a:p>
@@ -6811,7 +7793,7 @@
           <a:p>
             <a:fld id="{D6A82EB2-151D-4EEE-ACF5-92C73278C09C}" type="datetimeFigureOut">
               <a:rPr lang="en-GB" smtClean="0"/>
-              <a:t>28/01/2023</a:t>
+              <a:t>30/01/2023</a:t>
             </a:fld>
             <a:endParaRPr lang="en-GB"/>
           </a:p>
@@ -7054,7 +8036,7 @@
           <a:p>
             <a:fld id="{D6A82EB2-151D-4EEE-ACF5-92C73278C09C}" type="datetimeFigureOut">
               <a:rPr lang="en-GB" smtClean="0"/>
-              <a:t>28/01/2023</a:t>
+              <a:t>30/01/2023</a:t>
             </a:fld>
             <a:endParaRPr lang="en-GB"/>
           </a:p>
@@ -14038,6 +15020,476 @@
       </p:grpSpPr>
       <p:sp>
         <p:nvSpPr>
+          <p:cNvPr id="66" name="Rectangle: Rounded Corners 65">
+            <a:extLst>
+              <a:ext uri="{FF2B5EF4-FFF2-40B4-BE49-F238E27FC236}">
+                <a16:creationId xmlns:a16="http://schemas.microsoft.com/office/drawing/2014/main" id="{7343FA96-205F-7DD7-A660-9E1AE7A16CDD}"/>
+              </a:ext>
+            </a:extLst>
+          </p:cNvPr>
+          <p:cNvSpPr/>
+          <p:nvPr/>
+        </p:nvSpPr>
+        <p:spPr>
+          <a:xfrm>
+            <a:off x="1330983" y="1027271"/>
+            <a:ext cx="1164431" cy="474504"/>
+          </a:xfrm>
+          <a:prstGeom prst="roundRect">
+            <a:avLst>
+              <a:gd name="adj" fmla="val 15547"/>
+            </a:avLst>
+          </a:prstGeom>
+          <a:solidFill>
+            <a:schemeClr val="bg1">
+              <a:lumMod val="85000"/>
+            </a:schemeClr>
+          </a:solidFill>
+          <a:ln w="19050">
+            <a:headEnd type="none" w="med" len="med"/>
+            <a:tailEnd type="none" w="med" len="med"/>
+          </a:ln>
+        </p:spPr>
+        <p:style>
+          <a:lnRef idx="2">
+            <a:schemeClr val="dk1"/>
+          </a:lnRef>
+          <a:fillRef idx="1">
+            <a:schemeClr val="lt1"/>
+          </a:fillRef>
+          <a:effectRef idx="0">
+            <a:schemeClr val="dk1"/>
+          </a:effectRef>
+          <a:fontRef idx="minor">
+            <a:schemeClr val="dk1"/>
+          </a:fontRef>
+        </p:style>
+        <p:txBody>
+          <a:bodyPr rtlCol="0" anchor="ctr"/>
+          <a:lstStyle/>
+          <a:p>
+            <a:pPr algn="ctr"/>
+            <a:r>
+              <a:rPr lang="de-DE" sz="1100" noProof="1">
+                <a:latin typeface="+mj-lt"/>
+                <a:cs typeface="Arial" panose="020B0604020202020204" pitchFamily="34" charset="0"/>
+              </a:rPr>
+              <a:t>Sublayer</a:t>
+            </a:r>
+          </a:p>
+        </p:txBody>
+      </p:sp>
+      <p:sp>
+        <p:nvSpPr>
+          <p:cNvPr id="67" name="Rectangle: Rounded Corners 66">
+            <a:extLst>
+              <a:ext uri="{FF2B5EF4-FFF2-40B4-BE49-F238E27FC236}">
+                <a16:creationId xmlns:a16="http://schemas.microsoft.com/office/drawing/2014/main" id="{542CA32F-221D-DD49-7091-4AFC3E421628}"/>
+              </a:ext>
+            </a:extLst>
+          </p:cNvPr>
+          <p:cNvSpPr/>
+          <p:nvPr/>
+        </p:nvSpPr>
+        <p:spPr>
+          <a:xfrm>
+            <a:off x="1346066" y="611982"/>
+            <a:ext cx="1164431" cy="242887"/>
+          </a:xfrm>
+          <a:prstGeom prst="roundRect">
+            <a:avLst>
+              <a:gd name="adj" fmla="val 15547"/>
+            </a:avLst>
+          </a:prstGeom>
+          <a:solidFill>
+            <a:srgbClr val="CCD497"/>
+          </a:solidFill>
+          <a:ln w="19050">
+            <a:headEnd type="none" w="med" len="med"/>
+            <a:tailEnd type="none" w="med" len="med"/>
+          </a:ln>
+        </p:spPr>
+        <p:style>
+          <a:lnRef idx="2">
+            <a:schemeClr val="dk1"/>
+          </a:lnRef>
+          <a:fillRef idx="1">
+            <a:schemeClr val="lt1"/>
+          </a:fillRef>
+          <a:effectRef idx="0">
+            <a:schemeClr val="dk1"/>
+          </a:effectRef>
+          <a:fontRef idx="minor">
+            <a:schemeClr val="dk1"/>
+          </a:fontRef>
+        </p:style>
+        <p:txBody>
+          <a:bodyPr rtlCol="0" anchor="ctr"/>
+          <a:lstStyle/>
+          <a:p>
+            <a:pPr algn="ctr"/>
+            <a:r>
+              <a:rPr lang="de-DE" sz="1100" noProof="1">
+                <a:latin typeface="+mj-lt"/>
+                <a:cs typeface="Arial" panose="020B0604020202020204" pitchFamily="34" charset="0"/>
+              </a:rPr>
+              <a:t>Add &amp; Norm</a:t>
+            </a:r>
+          </a:p>
+        </p:txBody>
+      </p:sp>
+      <p:sp>
+        <p:nvSpPr>
+          <p:cNvPr id="80" name="Rectangle: Rounded Corners 79">
+            <a:extLst>
+              <a:ext uri="{FF2B5EF4-FFF2-40B4-BE49-F238E27FC236}">
+                <a16:creationId xmlns:a16="http://schemas.microsoft.com/office/drawing/2014/main" id="{83641231-252D-FDB3-0C23-5CDCCDA26F9E}"/>
+              </a:ext>
+            </a:extLst>
+          </p:cNvPr>
+          <p:cNvSpPr/>
+          <p:nvPr/>
+        </p:nvSpPr>
+        <p:spPr>
+          <a:xfrm>
+            <a:off x="1085850" y="385763"/>
+            <a:ext cx="1611177" cy="1371601"/>
+          </a:xfrm>
+          <a:prstGeom prst="roundRect">
+            <a:avLst>
+              <a:gd name="adj" fmla="val 5838"/>
+            </a:avLst>
+          </a:prstGeom>
+          <a:noFill/>
+          <a:ln>
+            <a:headEnd type="none" w="med" len="med"/>
+            <a:tailEnd type="none" w="med" len="med"/>
+          </a:ln>
+        </p:spPr>
+        <p:style>
+          <a:lnRef idx="2">
+            <a:schemeClr val="dk1"/>
+          </a:lnRef>
+          <a:fillRef idx="1">
+            <a:schemeClr val="lt1"/>
+          </a:fillRef>
+          <a:effectRef idx="0">
+            <a:schemeClr val="dk1"/>
+          </a:effectRef>
+          <a:fontRef idx="minor">
+            <a:schemeClr val="dk1"/>
+          </a:fontRef>
+        </p:style>
+        <p:txBody>
+          <a:bodyPr rtlCol="0" anchor="ctr"/>
+          <a:lstStyle/>
+          <a:p>
+            <a:pPr algn="ctr"/>
+            <a:endParaRPr lang="en-GB"/>
+          </a:p>
+        </p:txBody>
+      </p:sp>
+      <p:cxnSp>
+        <p:nvCxnSpPr>
+          <p:cNvPr id="211" name="Straight Arrow Connector 210">
+            <a:extLst>
+              <a:ext uri="{FF2B5EF4-FFF2-40B4-BE49-F238E27FC236}">
+                <a16:creationId xmlns:a16="http://schemas.microsoft.com/office/drawing/2014/main" id="{845B1465-2D2D-0E46-ACBF-35D587BBC249}"/>
+              </a:ext>
+            </a:extLst>
+          </p:cNvPr>
+          <p:cNvCxnSpPr>
+            <a:cxnSpLocks/>
+          </p:cNvCxnSpPr>
+          <p:nvPr/>
+        </p:nvCxnSpPr>
+        <p:spPr>
+          <a:xfrm flipV="1">
+            <a:off x="1898118" y="1512651"/>
+            <a:ext cx="0" cy="159781"/>
+          </a:xfrm>
+          <a:prstGeom prst="straightConnector1">
+            <a:avLst/>
+          </a:prstGeom>
+          <a:ln w="12700">
+            <a:tailEnd type="triangle"/>
+          </a:ln>
+        </p:spPr>
+        <p:style>
+          <a:lnRef idx="1">
+            <a:schemeClr val="dk1"/>
+          </a:lnRef>
+          <a:fillRef idx="0">
+            <a:schemeClr val="dk1"/>
+          </a:fillRef>
+          <a:effectRef idx="0">
+            <a:schemeClr val="dk1"/>
+          </a:effectRef>
+          <a:fontRef idx="minor">
+            <a:schemeClr val="tx1"/>
+          </a:fontRef>
+        </p:style>
+      </p:cxnSp>
+      <p:cxnSp>
+        <p:nvCxnSpPr>
+          <p:cNvPr id="214" name="Straight Arrow Connector 213">
+            <a:extLst>
+              <a:ext uri="{FF2B5EF4-FFF2-40B4-BE49-F238E27FC236}">
+                <a16:creationId xmlns:a16="http://schemas.microsoft.com/office/drawing/2014/main" id="{0D81CBA5-C3C3-5317-A8A3-8CD616613EDE}"/>
+              </a:ext>
+            </a:extLst>
+          </p:cNvPr>
+          <p:cNvCxnSpPr>
+            <a:cxnSpLocks/>
+            <a:stCxn id="66" idx="0"/>
+          </p:cNvCxnSpPr>
+          <p:nvPr/>
+        </p:nvCxnSpPr>
+        <p:spPr>
+          <a:xfrm flipV="1">
+            <a:off x="1913199" y="862430"/>
+            <a:ext cx="2631" cy="164841"/>
+          </a:xfrm>
+          <a:prstGeom prst="straightConnector1">
+            <a:avLst/>
+          </a:prstGeom>
+          <a:ln w="12700">
+            <a:solidFill>
+              <a:schemeClr val="tx1"/>
+            </a:solidFill>
+            <a:tailEnd type="triangle"/>
+          </a:ln>
+        </p:spPr>
+        <p:style>
+          <a:lnRef idx="1">
+            <a:schemeClr val="dk1"/>
+          </a:lnRef>
+          <a:fillRef idx="0">
+            <a:schemeClr val="dk1"/>
+          </a:fillRef>
+          <a:effectRef idx="0">
+            <a:schemeClr val="dk1"/>
+          </a:effectRef>
+          <a:fontRef idx="minor">
+            <a:schemeClr val="tx1"/>
+          </a:fontRef>
+        </p:style>
+      </p:cxnSp>
+      <p:cxnSp>
+        <p:nvCxnSpPr>
+          <p:cNvPr id="220" name="Connector: Elbow 219">
+            <a:extLst>
+              <a:ext uri="{FF2B5EF4-FFF2-40B4-BE49-F238E27FC236}">
+                <a16:creationId xmlns:a16="http://schemas.microsoft.com/office/drawing/2014/main" id="{F71C02ED-6336-D99D-2AAA-7DC8A5931246}"/>
+              </a:ext>
+            </a:extLst>
+          </p:cNvPr>
+          <p:cNvCxnSpPr>
+            <a:cxnSpLocks/>
+            <a:endCxn id="67" idx="1"/>
+          </p:cNvCxnSpPr>
+          <p:nvPr/>
+        </p:nvCxnSpPr>
+        <p:spPr>
+          <a:xfrm rot="16200000" flipV="1">
+            <a:off x="954021" y="1125471"/>
+            <a:ext cx="1338262" cy="554172"/>
+          </a:xfrm>
+          <a:prstGeom prst="bentConnector4">
+            <a:avLst>
+              <a:gd name="adj1" fmla="val 29449"/>
+              <a:gd name="adj2" fmla="val 133516"/>
+            </a:avLst>
+          </a:prstGeom>
+          <a:ln w="12700">
+            <a:solidFill>
+              <a:schemeClr val="tx1"/>
+            </a:solidFill>
+            <a:tailEnd type="triangle"/>
+          </a:ln>
+        </p:spPr>
+        <p:style>
+          <a:lnRef idx="1">
+            <a:schemeClr val="accent1"/>
+          </a:lnRef>
+          <a:fillRef idx="0">
+            <a:schemeClr val="accent1"/>
+          </a:fillRef>
+          <a:effectRef idx="0">
+            <a:schemeClr val="accent1"/>
+          </a:effectRef>
+          <a:fontRef idx="minor">
+            <a:schemeClr val="tx1"/>
+          </a:fontRef>
+        </p:style>
+      </p:cxnSp>
+      <p:cxnSp>
+        <p:nvCxnSpPr>
+          <p:cNvPr id="85" name="Straight Arrow Connector 84">
+            <a:extLst>
+              <a:ext uri="{FF2B5EF4-FFF2-40B4-BE49-F238E27FC236}">
+                <a16:creationId xmlns:a16="http://schemas.microsoft.com/office/drawing/2014/main" id="{620B6CED-9580-DA79-22AE-F82A08CEF70D}"/>
+              </a:ext>
+            </a:extLst>
+          </p:cNvPr>
+          <p:cNvCxnSpPr>
+            <a:cxnSpLocks/>
+            <a:stCxn id="67" idx="0"/>
+          </p:cNvCxnSpPr>
+          <p:nvPr/>
+        </p:nvCxnSpPr>
+        <p:spPr>
+          <a:xfrm flipV="1">
+            <a:off x="1928282" y="71438"/>
+            <a:ext cx="0" cy="540544"/>
+          </a:xfrm>
+          <a:prstGeom prst="straightConnector1">
+            <a:avLst/>
+          </a:prstGeom>
+          <a:ln w="12700">
+            <a:solidFill>
+              <a:schemeClr val="tx1"/>
+            </a:solidFill>
+            <a:tailEnd type="triangle"/>
+          </a:ln>
+        </p:spPr>
+        <p:style>
+          <a:lnRef idx="1">
+            <a:schemeClr val="dk1"/>
+          </a:lnRef>
+          <a:fillRef idx="0">
+            <a:schemeClr val="dk1"/>
+          </a:fillRef>
+          <a:effectRef idx="0">
+            <a:schemeClr val="dk1"/>
+          </a:effectRef>
+          <a:fontRef idx="minor">
+            <a:schemeClr val="tx1"/>
+          </a:fontRef>
+        </p:style>
+      </p:cxnSp>
+    </p:spTree>
+    <p:extLst>
+      <p:ext uri="{BB962C8B-B14F-4D97-AF65-F5344CB8AC3E}">
+        <p14:creationId xmlns:p14="http://schemas.microsoft.com/office/powerpoint/2010/main" val="1844608576"/>
+      </p:ext>
+    </p:extLst>
+  </p:cSld>
+  <p:clrMapOvr>
+    <a:masterClrMapping/>
+  </p:clrMapOvr>
+</p:sld>
+</file>
+
+<file path=ppt/slides/slide3.xml><?xml version="1.0" encoding="utf-8"?>
+<p:sld xmlns:a="http://schemas.openxmlformats.org/drawingml/2006/main" xmlns:r="http://schemas.openxmlformats.org/officeDocument/2006/relationships" xmlns:p="http://schemas.openxmlformats.org/presentationml/2006/main">
+  <p:cSld>
+    <p:spTree>
+      <p:nvGrpSpPr>
+        <p:cNvPr id="1" name=""/>
+        <p:cNvGrpSpPr/>
+        <p:nvPr/>
+      </p:nvGrpSpPr>
+      <p:grpSpPr>
+        <a:xfrm>
+          <a:off x="0" y="0"/>
+          <a:ext cx="0" cy="0"/>
+          <a:chOff x="0" y="0"/>
+          <a:chExt cx="0" cy="0"/>
+        </a:xfrm>
+      </p:grpSpPr>
+      <p:sp>
+        <p:nvSpPr>
+          <p:cNvPr id="2" name="Title 1">
+            <a:extLst>
+              <a:ext uri="{FF2B5EF4-FFF2-40B4-BE49-F238E27FC236}">
+                <a16:creationId xmlns:a16="http://schemas.microsoft.com/office/drawing/2014/main" id="{A0293965-D629-2279-04FB-29ACD69DD2D6}"/>
+              </a:ext>
+            </a:extLst>
+          </p:cNvPr>
+          <p:cNvSpPr>
+            <a:spLocks noGrp="1"/>
+          </p:cNvSpPr>
+          <p:nvPr>
+            <p:ph type="title"/>
+          </p:nvPr>
+        </p:nvSpPr>
+        <p:spPr/>
+        <p:txBody>
+          <a:bodyPr/>
+          <a:lstStyle/>
+          <a:p>
+            <a:endParaRPr lang="en-GB" dirty="0"/>
+          </a:p>
+        </p:txBody>
+      </p:sp>
+      <p:pic>
+        <p:nvPicPr>
+          <p:cNvPr id="5" name="Content Placeholder 4" descr="Diagram&#10;&#10;Description automatically generated">
+            <a:extLst>
+              <a:ext uri="{FF2B5EF4-FFF2-40B4-BE49-F238E27FC236}">
+                <a16:creationId xmlns:a16="http://schemas.microsoft.com/office/drawing/2014/main" id="{6A20F21E-4163-B9F0-D304-FA503742EB56}"/>
+              </a:ext>
+            </a:extLst>
+          </p:cNvPr>
+          <p:cNvPicPr>
+            <a:picLocks noGrp="1" noChangeAspect="1"/>
+          </p:cNvPicPr>
+          <p:nvPr>
+            <p:ph idx="1"/>
+          </p:nvPr>
+        </p:nvPicPr>
+        <p:blipFill>
+          <a:blip r:embed="rId2">
+            <a:extLst>
+              <a:ext uri="{28A0092B-C50C-407E-A947-70E740481C1C}">
+                <a14:useLocalDpi xmlns:a14="http://schemas.microsoft.com/office/drawing/2010/main" val="0"/>
+              </a:ext>
+            </a:extLst>
+          </a:blip>
+          <a:stretch>
+            <a:fillRect/>
+          </a:stretch>
+        </p:blipFill>
+        <p:spPr>
+          <a:xfrm>
+            <a:off x="2228144" y="1825625"/>
+            <a:ext cx="7735712" cy="4351338"/>
+          </a:xfrm>
+        </p:spPr>
+      </p:pic>
+    </p:spTree>
+    <p:extLst>
+      <p:ext uri="{BB962C8B-B14F-4D97-AF65-F5344CB8AC3E}">
+        <p14:creationId xmlns:p14="http://schemas.microsoft.com/office/powerpoint/2010/main" val="350462512"/>
+      </p:ext>
+    </p:extLst>
+  </p:cSld>
+  <p:clrMapOvr>
+    <a:masterClrMapping/>
+  </p:clrMapOvr>
+</p:sld>
+</file>
+
+<file path=ppt/slides/slide4.xml><?xml version="1.0" encoding="utf-8"?>
+<p:sld xmlns:a="http://schemas.openxmlformats.org/drawingml/2006/main" xmlns:r="http://schemas.openxmlformats.org/officeDocument/2006/relationships" xmlns:p="http://schemas.openxmlformats.org/presentationml/2006/main">
+  <p:cSld>
+    <p:spTree>
+      <p:nvGrpSpPr>
+        <p:cNvPr id="1" name=""/>
+        <p:cNvGrpSpPr/>
+        <p:nvPr/>
+      </p:nvGrpSpPr>
+      <p:grpSpPr>
+        <a:xfrm>
+          <a:off x="0" y="0"/>
+          <a:ext cx="0" cy="0"/>
+          <a:chOff x="0" y="0"/>
+          <a:chExt cx="0" cy="0"/>
+        </a:xfrm>
+      </p:grpSpPr>
+      <p:sp>
+        <p:nvSpPr>
           <p:cNvPr id="61" name="Rectangle: Rounded Corners 60">
             <a:extLst>
               <a:ext uri="{FF2B5EF4-FFF2-40B4-BE49-F238E27FC236}">
@@ -15685,14 +17137,14 @@
           </p:cNvPr>
           <p:cNvCxnSpPr>
             <a:cxnSpLocks/>
-            <a:stCxn id="80" idx="0"/>
+            <a:stCxn id="67" idx="0"/>
           </p:cNvCxnSpPr>
           <p:nvPr/>
         </p:nvCxnSpPr>
         <p:spPr>
           <a:xfrm flipV="1">
-            <a:off x="5462111" y="2538413"/>
-            <a:ext cx="0" cy="224254"/>
+            <a:off x="5506165" y="2527300"/>
+            <a:ext cx="0" cy="477857"/>
           </a:xfrm>
           <a:prstGeom prst="straightConnector1">
             <a:avLst/>
@@ -15828,7 +17280,7 @@
 </p:sld>
 </file>
 
-<file path=ppt/slides/slide3.xml><?xml version="1.0" encoding="utf-8"?>
+<file path=ppt/slides/slide5.xml><?xml version="1.0" encoding="utf-8"?>
 <p:sld xmlns:a="http://schemas.openxmlformats.org/drawingml/2006/main" xmlns:r="http://schemas.openxmlformats.org/officeDocument/2006/relationships" xmlns:p="http://schemas.openxmlformats.org/presentationml/2006/main">
   <p:cSld>
     <p:spTree>
@@ -17371,7 +18823,7 @@
 </p:sld>
 </file>
 
-<file path=ppt/slides/slide4.xml><?xml version="1.0" encoding="utf-8"?>
+<file path=ppt/slides/slide6.xml><?xml version="1.0" encoding="utf-8"?>
 <p:sld xmlns:a="http://schemas.openxmlformats.org/drawingml/2006/main" xmlns:r="http://schemas.openxmlformats.org/officeDocument/2006/relationships" xmlns:p="http://schemas.openxmlformats.org/presentationml/2006/main">
   <p:cSld>
     <p:spTree>
@@ -17393,96 +18845,6 @@
           <p:cNvPr id="2" name="Title 1">
             <a:extLst>
               <a:ext uri="{FF2B5EF4-FFF2-40B4-BE49-F238E27FC236}">
-                <a16:creationId xmlns:a16="http://schemas.microsoft.com/office/drawing/2014/main" id="{A0293965-D629-2279-04FB-29ACD69DD2D6}"/>
-              </a:ext>
-            </a:extLst>
-          </p:cNvPr>
-          <p:cNvSpPr>
-            <a:spLocks noGrp="1"/>
-          </p:cNvSpPr>
-          <p:nvPr>
-            <p:ph type="title"/>
-          </p:nvPr>
-        </p:nvSpPr>
-        <p:spPr/>
-        <p:txBody>
-          <a:bodyPr/>
-          <a:lstStyle/>
-          <a:p>
-            <a:endParaRPr lang="en-GB" dirty="0"/>
-          </a:p>
-        </p:txBody>
-      </p:sp>
-      <p:pic>
-        <p:nvPicPr>
-          <p:cNvPr id="5" name="Content Placeholder 4" descr="Diagram&#10;&#10;Description automatically generated">
-            <a:extLst>
-              <a:ext uri="{FF2B5EF4-FFF2-40B4-BE49-F238E27FC236}">
-                <a16:creationId xmlns:a16="http://schemas.microsoft.com/office/drawing/2014/main" id="{6A20F21E-4163-B9F0-D304-FA503742EB56}"/>
-              </a:ext>
-            </a:extLst>
-          </p:cNvPr>
-          <p:cNvPicPr>
-            <a:picLocks noGrp="1" noChangeAspect="1"/>
-          </p:cNvPicPr>
-          <p:nvPr>
-            <p:ph idx="1"/>
-          </p:nvPr>
-        </p:nvPicPr>
-        <p:blipFill>
-          <a:blip r:embed="rId2">
-            <a:extLst>
-              <a:ext uri="{28A0092B-C50C-407E-A947-70E740481C1C}">
-                <a14:useLocalDpi xmlns:a14="http://schemas.microsoft.com/office/drawing/2010/main" val="0"/>
-              </a:ext>
-            </a:extLst>
-          </a:blip>
-          <a:stretch>
-            <a:fillRect/>
-          </a:stretch>
-        </p:blipFill>
-        <p:spPr>
-          <a:xfrm>
-            <a:off x="2228144" y="1825625"/>
-            <a:ext cx="7735712" cy="4351338"/>
-          </a:xfrm>
-        </p:spPr>
-      </p:pic>
-    </p:spTree>
-    <p:extLst>
-      <p:ext uri="{BB962C8B-B14F-4D97-AF65-F5344CB8AC3E}">
-        <p14:creationId xmlns:p14="http://schemas.microsoft.com/office/powerpoint/2010/main" val="350462512"/>
-      </p:ext>
-    </p:extLst>
-  </p:cSld>
-  <p:clrMapOvr>
-    <a:masterClrMapping/>
-  </p:clrMapOvr>
-</p:sld>
-</file>
-
-<file path=ppt/slides/slide5.xml><?xml version="1.0" encoding="utf-8"?>
-<p:sld xmlns:a="http://schemas.openxmlformats.org/drawingml/2006/main" xmlns:r="http://schemas.openxmlformats.org/officeDocument/2006/relationships" xmlns:p="http://schemas.openxmlformats.org/presentationml/2006/main">
-  <p:cSld>
-    <p:spTree>
-      <p:nvGrpSpPr>
-        <p:cNvPr id="1" name=""/>
-        <p:cNvGrpSpPr/>
-        <p:nvPr/>
-      </p:nvGrpSpPr>
-      <p:grpSpPr>
-        <a:xfrm>
-          <a:off x="0" y="0"/>
-          <a:ext cx="0" cy="0"/>
-          <a:chOff x="0" y="0"/>
-          <a:chExt cx="0" cy="0"/>
-        </a:xfrm>
-      </p:grpSpPr>
-      <p:sp>
-        <p:nvSpPr>
-          <p:cNvPr id="2" name="Title 1">
-            <a:extLst>
-              <a:ext uri="{FF2B5EF4-FFF2-40B4-BE49-F238E27FC236}">
                 <a16:creationId xmlns:a16="http://schemas.microsoft.com/office/drawing/2014/main" id="{9C25A884-0014-7B87-1AF5-C2A758D258BB}"/>
               </a:ext>
             </a:extLst>
@@ -17571,7 +18933,7 @@
 </p:sld>
 </file>
 
-<file path=ppt/slides/slide6.xml><?xml version="1.0" encoding="utf-8"?>
+<file path=ppt/slides/slide7.xml><?xml version="1.0" encoding="utf-8"?>
 <p:sld xmlns:a="http://schemas.openxmlformats.org/drawingml/2006/main" xmlns:r="http://schemas.openxmlformats.org/officeDocument/2006/relationships" xmlns:p="http://schemas.openxmlformats.org/presentationml/2006/main">
   <p:cSld>
     <p:spTree>

</xml_diff>

<commit_message>
Rewrite FTTransformer chapter for clarity 🤖
</commit_message>
<xml_diff>
--- a/reports/Graphs/diagrams.pptx
+++ b/reports/Graphs/diagrams.pptx
@@ -121,7 +121,7 @@
 <file path=ppt/revisionInfo.xml><?xml version="1.0" encoding="utf-8"?>
 <p1510:revInfo xmlns:a="http://schemas.openxmlformats.org/drawingml/2006/main" xmlns:r="http://schemas.openxmlformats.org/officeDocument/2006/relationships" xmlns:p1510="http://schemas.microsoft.com/office/powerpoint/2015/10/main">
   <p1510:revLst>
-    <p1510:client id="{F9F2BE70-AAED-47FD-A055-7B08EB1371A3}" v="3" dt="2023-01-30T16:00:54.939"/>
+    <p1510:client id="{F9F2BE70-AAED-47FD-A055-7B08EB1371A3}" v="5" dt="2023-01-31T14:58:08.605"/>
   </p1510:revLst>
 </p1510:revInfo>
 </file>
@@ -131,7 +131,7 @@
   <pc:docChgLst>
     <pc:chgData name="Markus Bilz" userId="a36021e4bdb9349f" providerId="LiveId" clId="{F9F2BE70-AAED-47FD-A055-7B08EB1371A3}"/>
     <pc:docChg chg="undo custSel addSld modSld sldOrd">
-      <pc:chgData name="Markus Bilz" userId="a36021e4bdb9349f" providerId="LiveId" clId="{F9F2BE70-AAED-47FD-A055-7B08EB1371A3}" dt="2023-01-30T16:05:01.590" v="228" actId="14100"/>
+      <pc:chgData name="Markus Bilz" userId="a36021e4bdb9349f" providerId="LiveId" clId="{F9F2BE70-AAED-47FD-A055-7B08EB1371A3}" dt="2023-01-31T14:58:11.698" v="242" actId="1076"/>
       <pc:docMkLst>
         <pc:docMk/>
       </pc:docMkLst>
@@ -159,17 +159,264 @@
         </pc:spChg>
       </pc:sldChg>
       <pc:sldChg chg="modSp mod">
-        <pc:chgData name="Markus Bilz" userId="a36021e4bdb9349f" providerId="LiveId" clId="{F9F2BE70-AAED-47FD-A055-7B08EB1371A3}" dt="2023-01-30T15:54:37.278" v="121" actId="14100"/>
+        <pc:chgData name="Markus Bilz" userId="a36021e4bdb9349f" providerId="LiveId" clId="{F9F2BE70-AAED-47FD-A055-7B08EB1371A3}" dt="2023-01-31T14:55:29.812" v="236" actId="1076"/>
         <pc:sldMkLst>
           <pc:docMk/>
           <pc:sldMk cId="4224251106" sldId="260"/>
         </pc:sldMkLst>
+        <pc:picChg chg="mod">
+          <ac:chgData name="Markus Bilz" userId="a36021e4bdb9349f" providerId="LiveId" clId="{F9F2BE70-AAED-47FD-A055-7B08EB1371A3}" dt="2023-01-31T14:55:29.812" v="236" actId="1076"/>
+          <ac:picMkLst>
+            <pc:docMk/>
+            <pc:sldMk cId="4224251106" sldId="260"/>
+            <ac:picMk id="3" creationId="{5525967E-1280-E19C-67DF-3A1888502E9D}"/>
+          </ac:picMkLst>
+        </pc:picChg>
         <pc:cxnChg chg="mod">
           <ac:chgData name="Markus Bilz" userId="a36021e4bdb9349f" providerId="LiveId" clId="{F9F2BE70-AAED-47FD-A055-7B08EB1371A3}" dt="2023-01-30T15:54:37.278" v="121" actId="14100"/>
           <ac:cxnSpMkLst>
             <pc:docMk/>
             <pc:sldMk cId="4224251106" sldId="260"/>
             <ac:cxnSpMk id="50" creationId="{72EF799B-DD01-284F-666A-C8B7A4ADB1C4}"/>
+          </ac:cxnSpMkLst>
+        </pc:cxnChg>
+      </pc:sldChg>
+      <pc:sldChg chg="addSp delSp modSp mod">
+        <pc:chgData name="Markus Bilz" userId="a36021e4bdb9349f" providerId="LiveId" clId="{F9F2BE70-AAED-47FD-A055-7B08EB1371A3}" dt="2023-01-31T14:58:11.698" v="242" actId="1076"/>
+        <pc:sldMkLst>
+          <pc:docMk/>
+          <pc:sldMk cId="2878173059" sldId="261"/>
+        </pc:sldMkLst>
+        <pc:spChg chg="mod">
+          <ac:chgData name="Markus Bilz" userId="a36021e4bdb9349f" providerId="LiveId" clId="{F9F2BE70-AAED-47FD-A055-7B08EB1371A3}" dt="2023-01-31T14:54:07.949" v="231" actId="1076"/>
+          <ac:spMkLst>
+            <pc:docMk/>
+            <pc:sldMk cId="2878173059" sldId="261"/>
+            <ac:spMk id="23" creationId="{8F8800C0-1CF3-F5CA-4394-35FFEBF5E5A3}"/>
+          </ac:spMkLst>
+        </pc:spChg>
+        <pc:spChg chg="mod">
+          <ac:chgData name="Markus Bilz" userId="a36021e4bdb9349f" providerId="LiveId" clId="{F9F2BE70-AAED-47FD-A055-7B08EB1371A3}" dt="2023-01-31T14:54:07.949" v="231" actId="1076"/>
+          <ac:spMkLst>
+            <pc:docMk/>
+            <pc:sldMk cId="2878173059" sldId="261"/>
+            <ac:spMk id="25" creationId="{64F421B8-8DB7-34EA-C921-76E85E24F0A2}"/>
+          </ac:spMkLst>
+        </pc:spChg>
+        <pc:spChg chg="mod">
+          <ac:chgData name="Markus Bilz" userId="a36021e4bdb9349f" providerId="LiveId" clId="{F9F2BE70-AAED-47FD-A055-7B08EB1371A3}" dt="2023-01-31T14:54:07.949" v="231" actId="1076"/>
+          <ac:spMkLst>
+            <pc:docMk/>
+            <pc:sldMk cId="2878173059" sldId="261"/>
+            <ac:spMk id="27" creationId="{A827FEA6-F17E-CA57-7B37-D1BAA16BED3F}"/>
+          </ac:spMkLst>
+        </pc:spChg>
+        <pc:spChg chg="mod">
+          <ac:chgData name="Markus Bilz" userId="a36021e4bdb9349f" providerId="LiveId" clId="{F9F2BE70-AAED-47FD-A055-7B08EB1371A3}" dt="2023-01-31T14:54:07.949" v="231" actId="1076"/>
+          <ac:spMkLst>
+            <pc:docMk/>
+            <pc:sldMk cId="2878173059" sldId="261"/>
+            <ac:spMk id="31" creationId="{F00536E0-E48A-70AD-633B-4384867F30A5}"/>
+          </ac:spMkLst>
+        </pc:spChg>
+        <pc:spChg chg="mod">
+          <ac:chgData name="Markus Bilz" userId="a36021e4bdb9349f" providerId="LiveId" clId="{F9F2BE70-AAED-47FD-A055-7B08EB1371A3}" dt="2023-01-31T14:54:07.949" v="231" actId="1076"/>
+          <ac:spMkLst>
+            <pc:docMk/>
+            <pc:sldMk cId="2878173059" sldId="261"/>
+            <ac:spMk id="61" creationId="{C00FF0EF-2F9D-F942-4F6E-0006C5307219}"/>
+          </ac:spMkLst>
+        </pc:spChg>
+        <pc:spChg chg="mod">
+          <ac:chgData name="Markus Bilz" userId="a36021e4bdb9349f" providerId="LiveId" clId="{F9F2BE70-AAED-47FD-A055-7B08EB1371A3}" dt="2023-01-31T14:54:07.949" v="231" actId="1076"/>
+          <ac:spMkLst>
+            <pc:docMk/>
+            <pc:sldMk cId="2878173059" sldId="261"/>
+            <ac:spMk id="62" creationId="{C0641B72-A83F-2F0C-92F9-BC5B309B52B7}"/>
+          </ac:spMkLst>
+        </pc:spChg>
+        <pc:spChg chg="mod">
+          <ac:chgData name="Markus Bilz" userId="a36021e4bdb9349f" providerId="LiveId" clId="{F9F2BE70-AAED-47FD-A055-7B08EB1371A3}" dt="2023-01-31T14:54:07.949" v="231" actId="1076"/>
+          <ac:spMkLst>
+            <pc:docMk/>
+            <pc:sldMk cId="2878173059" sldId="261"/>
+            <ac:spMk id="63" creationId="{2E94D5CD-A3D0-17C2-6DA2-6C898CDD5E11}"/>
+          </ac:spMkLst>
+        </pc:spChg>
+        <pc:spChg chg="mod">
+          <ac:chgData name="Markus Bilz" userId="a36021e4bdb9349f" providerId="LiveId" clId="{F9F2BE70-AAED-47FD-A055-7B08EB1371A3}" dt="2023-01-31T14:54:07.949" v="231" actId="1076"/>
+          <ac:spMkLst>
+            <pc:docMk/>
+            <pc:sldMk cId="2878173059" sldId="261"/>
+            <ac:spMk id="66" creationId="{7343FA96-205F-7DD7-A660-9E1AE7A16CDD}"/>
+          </ac:spMkLst>
+        </pc:spChg>
+        <pc:spChg chg="mod">
+          <ac:chgData name="Markus Bilz" userId="a36021e4bdb9349f" providerId="LiveId" clId="{F9F2BE70-AAED-47FD-A055-7B08EB1371A3}" dt="2023-01-31T14:54:07.949" v="231" actId="1076"/>
+          <ac:spMkLst>
+            <pc:docMk/>
+            <pc:sldMk cId="2878173059" sldId="261"/>
+            <ac:spMk id="67" creationId="{542CA32F-221D-DD49-7091-4AFC3E421628}"/>
+          </ac:spMkLst>
+        </pc:spChg>
+        <pc:spChg chg="mod">
+          <ac:chgData name="Markus Bilz" userId="a36021e4bdb9349f" providerId="LiveId" clId="{F9F2BE70-AAED-47FD-A055-7B08EB1371A3}" dt="2023-01-31T14:54:07.949" v="231" actId="1076"/>
+          <ac:spMkLst>
+            <pc:docMk/>
+            <pc:sldMk cId="2878173059" sldId="261"/>
+            <ac:spMk id="80" creationId="{83641231-252D-FDB3-0C23-5CDCCDA26F9E}"/>
+          </ac:spMkLst>
+        </pc:spChg>
+        <pc:spChg chg="mod">
+          <ac:chgData name="Markus Bilz" userId="a36021e4bdb9349f" providerId="LiveId" clId="{F9F2BE70-AAED-47FD-A055-7B08EB1371A3}" dt="2023-01-31T14:54:07.949" v="231" actId="1076"/>
+          <ac:spMkLst>
+            <pc:docMk/>
+            <pc:sldMk cId="2878173059" sldId="261"/>
+            <ac:spMk id="162" creationId="{C8C65B08-14FE-FF44-47C5-FB5077BC12AB}"/>
+          </ac:spMkLst>
+        </pc:spChg>
+        <pc:spChg chg="mod">
+          <ac:chgData name="Markus Bilz" userId="a36021e4bdb9349f" providerId="LiveId" clId="{F9F2BE70-AAED-47FD-A055-7B08EB1371A3}" dt="2023-01-31T14:54:07.949" v="231" actId="1076"/>
+          <ac:spMkLst>
+            <pc:docMk/>
+            <pc:sldMk cId="2878173059" sldId="261"/>
+            <ac:spMk id="233" creationId="{22826292-593A-4357-FEEB-B7D5B39875EF}"/>
+          </ac:spMkLst>
+        </pc:spChg>
+        <pc:spChg chg="mod">
+          <ac:chgData name="Markus Bilz" userId="a36021e4bdb9349f" providerId="LiveId" clId="{F9F2BE70-AAED-47FD-A055-7B08EB1371A3}" dt="2023-01-31T14:54:07.949" v="231" actId="1076"/>
+          <ac:spMkLst>
+            <pc:docMk/>
+            <pc:sldMk cId="2878173059" sldId="261"/>
+            <ac:spMk id="266" creationId="{581F8540-556F-156B-61E8-585BC8A175EB}"/>
+          </ac:spMkLst>
+        </pc:spChg>
+        <pc:spChg chg="mod">
+          <ac:chgData name="Markus Bilz" userId="a36021e4bdb9349f" providerId="LiveId" clId="{F9F2BE70-AAED-47FD-A055-7B08EB1371A3}" dt="2023-01-31T14:54:07.949" v="231" actId="1076"/>
+          <ac:spMkLst>
+            <pc:docMk/>
+            <pc:sldMk cId="2878173059" sldId="261"/>
+            <ac:spMk id="267" creationId="{457B388C-7929-72CD-0559-53E0AA934C74}"/>
+          </ac:spMkLst>
+        </pc:spChg>
+        <pc:spChg chg="mod">
+          <ac:chgData name="Markus Bilz" userId="a36021e4bdb9349f" providerId="LiveId" clId="{F9F2BE70-AAED-47FD-A055-7B08EB1371A3}" dt="2023-01-31T14:54:07.949" v="231" actId="1076"/>
+          <ac:spMkLst>
+            <pc:docMk/>
+            <pc:sldMk cId="2878173059" sldId="261"/>
+            <ac:spMk id="268" creationId="{BB1549EF-6367-5F54-69BE-C8B0CC0F2CF9}"/>
+          </ac:spMkLst>
+        </pc:spChg>
+        <pc:picChg chg="add del mod">
+          <ac:chgData name="Markus Bilz" userId="a36021e4bdb9349f" providerId="LiveId" clId="{F9F2BE70-AAED-47FD-A055-7B08EB1371A3}" dt="2023-01-31T14:55:35.158" v="238" actId="478"/>
+          <ac:picMkLst>
+            <pc:docMk/>
+            <pc:sldMk cId="2878173059" sldId="261"/>
+            <ac:picMk id="5" creationId="{75A1F732-0752-E94B-223C-A6116CAEEF5D}"/>
+          </ac:picMkLst>
+        </pc:picChg>
+        <pc:picChg chg="add mod">
+          <ac:chgData name="Markus Bilz" userId="a36021e4bdb9349f" providerId="LiveId" clId="{F9F2BE70-AAED-47FD-A055-7B08EB1371A3}" dt="2023-01-31T14:58:11.698" v="242" actId="1076"/>
+          <ac:picMkLst>
+            <pc:docMk/>
+            <pc:sldMk cId="2878173059" sldId="261"/>
+            <ac:picMk id="7" creationId="{57DC4ADF-749C-6BDC-3F46-33B4726B5B13}"/>
+          </ac:picMkLst>
+        </pc:picChg>
+        <pc:cxnChg chg="mod">
+          <ac:chgData name="Markus Bilz" userId="a36021e4bdb9349f" providerId="LiveId" clId="{F9F2BE70-AAED-47FD-A055-7B08EB1371A3}" dt="2023-01-31T14:54:07.949" v="231" actId="1076"/>
+          <ac:cxnSpMkLst>
+            <pc:docMk/>
+            <pc:sldMk cId="2878173059" sldId="261"/>
+            <ac:cxnSpMk id="3" creationId="{1B21BEEA-0718-A8BF-CA7A-FD95D29662F1}"/>
+          </ac:cxnSpMkLst>
+        </pc:cxnChg>
+        <pc:cxnChg chg="mod">
+          <ac:chgData name="Markus Bilz" userId="a36021e4bdb9349f" providerId="LiveId" clId="{F9F2BE70-AAED-47FD-A055-7B08EB1371A3}" dt="2023-01-31T14:54:07.949" v="231" actId="1076"/>
+          <ac:cxnSpMkLst>
+            <pc:docMk/>
+            <pc:sldMk cId="2878173059" sldId="261"/>
+            <ac:cxnSpMk id="28" creationId="{8A6ED71D-102A-0459-C60D-99BC3B322234}"/>
+          </ac:cxnSpMkLst>
+        </pc:cxnChg>
+        <pc:cxnChg chg="mod">
+          <ac:chgData name="Markus Bilz" userId="a36021e4bdb9349f" providerId="LiveId" clId="{F9F2BE70-AAED-47FD-A055-7B08EB1371A3}" dt="2023-01-31T14:54:07.949" v="231" actId="1076"/>
+          <ac:cxnSpMkLst>
+            <pc:docMk/>
+            <pc:sldMk cId="2878173059" sldId="261"/>
+            <ac:cxnSpMk id="29" creationId="{ADCE3843-0FDE-285C-7733-2A6A7A7A0AC7}"/>
+          </ac:cxnSpMkLst>
+        </pc:cxnChg>
+        <pc:cxnChg chg="mod">
+          <ac:chgData name="Markus Bilz" userId="a36021e4bdb9349f" providerId="LiveId" clId="{F9F2BE70-AAED-47FD-A055-7B08EB1371A3}" dt="2023-01-31T14:54:07.949" v="231" actId="1076"/>
+          <ac:cxnSpMkLst>
+            <pc:docMk/>
+            <pc:sldMk cId="2878173059" sldId="261"/>
+            <ac:cxnSpMk id="65" creationId="{28EE4F0F-C008-F011-6402-C667E69D8B21}"/>
+          </ac:cxnSpMkLst>
+        </pc:cxnChg>
+        <pc:cxnChg chg="mod">
+          <ac:chgData name="Markus Bilz" userId="a36021e4bdb9349f" providerId="LiveId" clId="{F9F2BE70-AAED-47FD-A055-7B08EB1371A3}" dt="2023-01-31T14:54:07.949" v="231" actId="1076"/>
+          <ac:cxnSpMkLst>
+            <pc:docMk/>
+            <pc:sldMk cId="2878173059" sldId="261"/>
+            <ac:cxnSpMk id="70" creationId="{66C88C84-34E5-DBC0-F118-6C49B6374993}"/>
+          </ac:cxnSpMkLst>
+        </pc:cxnChg>
+        <pc:cxnChg chg="mod">
+          <ac:chgData name="Markus Bilz" userId="a36021e4bdb9349f" providerId="LiveId" clId="{F9F2BE70-AAED-47FD-A055-7B08EB1371A3}" dt="2023-01-31T14:54:07.949" v="231" actId="1076"/>
+          <ac:cxnSpMkLst>
+            <pc:docMk/>
+            <pc:sldMk cId="2878173059" sldId="261"/>
+            <ac:cxnSpMk id="101" creationId="{C9A8426B-62F8-8EC1-CB9F-6E9E7AD7B88A}"/>
+          </ac:cxnSpMkLst>
+        </pc:cxnChg>
+        <pc:cxnChg chg="mod">
+          <ac:chgData name="Markus Bilz" userId="a36021e4bdb9349f" providerId="LiveId" clId="{F9F2BE70-AAED-47FD-A055-7B08EB1371A3}" dt="2023-01-31T14:54:07.949" v="231" actId="1076"/>
+          <ac:cxnSpMkLst>
+            <pc:docMk/>
+            <pc:sldMk cId="2878173059" sldId="261"/>
+            <ac:cxnSpMk id="214" creationId="{0D81CBA5-C3C3-5317-A8A3-8CD616613EDE}"/>
+          </ac:cxnSpMkLst>
+        </pc:cxnChg>
+        <pc:cxnChg chg="mod">
+          <ac:chgData name="Markus Bilz" userId="a36021e4bdb9349f" providerId="LiveId" clId="{F9F2BE70-AAED-47FD-A055-7B08EB1371A3}" dt="2023-01-31T14:54:07.949" v="231" actId="1076"/>
+          <ac:cxnSpMkLst>
+            <pc:docMk/>
+            <pc:sldMk cId="2878173059" sldId="261"/>
+            <ac:cxnSpMk id="217" creationId="{AF17FB98-C9BC-D133-7339-F0C5698E6493}"/>
+          </ac:cxnSpMkLst>
+        </pc:cxnChg>
+        <pc:cxnChg chg="mod">
+          <ac:chgData name="Markus Bilz" userId="a36021e4bdb9349f" providerId="LiveId" clId="{F9F2BE70-AAED-47FD-A055-7B08EB1371A3}" dt="2023-01-31T14:54:07.949" v="231" actId="1076"/>
+          <ac:cxnSpMkLst>
+            <pc:docMk/>
+            <pc:sldMk cId="2878173059" sldId="261"/>
+            <ac:cxnSpMk id="220" creationId="{F71C02ED-6336-D99D-2AAA-7DC8A5931246}"/>
+          </ac:cxnSpMkLst>
+        </pc:cxnChg>
+        <pc:cxnChg chg="mod">
+          <ac:chgData name="Markus Bilz" userId="a36021e4bdb9349f" providerId="LiveId" clId="{F9F2BE70-AAED-47FD-A055-7B08EB1371A3}" dt="2023-01-31T14:54:07.949" v="231" actId="1076"/>
+          <ac:cxnSpMkLst>
+            <pc:docMk/>
+            <pc:sldMk cId="2878173059" sldId="261"/>
+            <ac:cxnSpMk id="226" creationId="{470B009F-AEBC-B736-2071-04407321C553}"/>
+          </ac:cxnSpMkLst>
+        </pc:cxnChg>
+        <pc:cxnChg chg="mod">
+          <ac:chgData name="Markus Bilz" userId="a36021e4bdb9349f" providerId="LiveId" clId="{F9F2BE70-AAED-47FD-A055-7B08EB1371A3}" dt="2023-01-31T14:54:07.949" v="231" actId="1076"/>
+          <ac:cxnSpMkLst>
+            <pc:docMk/>
+            <pc:sldMk cId="2878173059" sldId="261"/>
+            <ac:cxnSpMk id="242" creationId="{15A6B20D-82BA-B4F9-68E1-286190BB95EE}"/>
+          </ac:cxnSpMkLst>
+        </pc:cxnChg>
+        <pc:cxnChg chg="mod">
+          <ac:chgData name="Markus Bilz" userId="a36021e4bdb9349f" providerId="LiveId" clId="{F9F2BE70-AAED-47FD-A055-7B08EB1371A3}" dt="2023-01-31T14:54:07.949" v="231" actId="1076"/>
+          <ac:cxnSpMkLst>
+            <pc:docMk/>
+            <pc:sldMk cId="2878173059" sldId="261"/>
+            <ac:cxnSpMk id="249" creationId="{474E23BC-E9EE-6D4C-E9B0-65C585D028C8}"/>
           </ac:cxnSpMkLst>
         </pc:cxnChg>
       </pc:sldChg>
@@ -5367,7 +5614,7 @@
           <a:p>
             <a:fld id="{D6A82EB2-151D-4EEE-ACF5-92C73278C09C}" type="datetimeFigureOut">
               <a:rPr lang="en-GB" smtClean="0"/>
-              <a:t>30/01/2023</a:t>
+              <a:t>31/01/2023</a:t>
             </a:fld>
             <a:endParaRPr lang="en-GB"/>
           </a:p>
@@ -5567,7 +5814,7 @@
           <a:p>
             <a:fld id="{D6A82EB2-151D-4EEE-ACF5-92C73278C09C}" type="datetimeFigureOut">
               <a:rPr lang="en-GB" smtClean="0"/>
-              <a:t>30/01/2023</a:t>
+              <a:t>31/01/2023</a:t>
             </a:fld>
             <a:endParaRPr lang="en-GB"/>
           </a:p>
@@ -5777,7 +6024,7 @@
           <a:p>
             <a:fld id="{D6A82EB2-151D-4EEE-ACF5-92C73278C09C}" type="datetimeFigureOut">
               <a:rPr lang="en-GB" smtClean="0"/>
-              <a:t>30/01/2023</a:t>
+              <a:t>31/01/2023</a:t>
             </a:fld>
             <a:endParaRPr lang="en-GB"/>
           </a:p>
@@ -5977,7 +6224,7 @@
           <a:p>
             <a:fld id="{D6A82EB2-151D-4EEE-ACF5-92C73278C09C}" type="datetimeFigureOut">
               <a:rPr lang="en-GB" smtClean="0"/>
-              <a:t>30/01/2023</a:t>
+              <a:t>31/01/2023</a:t>
             </a:fld>
             <a:endParaRPr lang="en-GB"/>
           </a:p>
@@ -6253,7 +6500,7 @@
           <a:p>
             <a:fld id="{D6A82EB2-151D-4EEE-ACF5-92C73278C09C}" type="datetimeFigureOut">
               <a:rPr lang="en-GB" smtClean="0"/>
-              <a:t>30/01/2023</a:t>
+              <a:t>31/01/2023</a:t>
             </a:fld>
             <a:endParaRPr lang="en-GB"/>
           </a:p>
@@ -6521,7 +6768,7 @@
           <a:p>
             <a:fld id="{D6A82EB2-151D-4EEE-ACF5-92C73278C09C}" type="datetimeFigureOut">
               <a:rPr lang="en-GB" smtClean="0"/>
-              <a:t>30/01/2023</a:t>
+              <a:t>31/01/2023</a:t>
             </a:fld>
             <a:endParaRPr lang="en-GB"/>
           </a:p>
@@ -6936,7 +7183,7 @@
           <a:p>
             <a:fld id="{D6A82EB2-151D-4EEE-ACF5-92C73278C09C}" type="datetimeFigureOut">
               <a:rPr lang="en-GB" smtClean="0"/>
-              <a:t>30/01/2023</a:t>
+              <a:t>31/01/2023</a:t>
             </a:fld>
             <a:endParaRPr lang="en-GB"/>
           </a:p>
@@ -7078,7 +7325,7 @@
           <a:p>
             <a:fld id="{D6A82EB2-151D-4EEE-ACF5-92C73278C09C}" type="datetimeFigureOut">
               <a:rPr lang="en-GB" smtClean="0"/>
-              <a:t>30/01/2023</a:t>
+              <a:t>31/01/2023</a:t>
             </a:fld>
             <a:endParaRPr lang="en-GB"/>
           </a:p>
@@ -7191,7 +7438,7 @@
           <a:p>
             <a:fld id="{D6A82EB2-151D-4EEE-ACF5-92C73278C09C}" type="datetimeFigureOut">
               <a:rPr lang="en-GB" smtClean="0"/>
-              <a:t>30/01/2023</a:t>
+              <a:t>31/01/2023</a:t>
             </a:fld>
             <a:endParaRPr lang="en-GB"/>
           </a:p>
@@ -7504,7 +7751,7 @@
           <a:p>
             <a:fld id="{D6A82EB2-151D-4EEE-ACF5-92C73278C09C}" type="datetimeFigureOut">
               <a:rPr lang="en-GB" smtClean="0"/>
-              <a:t>30/01/2023</a:t>
+              <a:t>31/01/2023</a:t>
             </a:fld>
             <a:endParaRPr lang="en-GB"/>
           </a:p>
@@ -7793,7 +8040,7 @@
           <a:p>
             <a:fld id="{D6A82EB2-151D-4EEE-ACF5-92C73278C09C}" type="datetimeFigureOut">
               <a:rPr lang="en-GB" smtClean="0"/>
-              <a:t>30/01/2023</a:t>
+              <a:t>31/01/2023</a:t>
             </a:fld>
             <a:endParaRPr lang="en-GB"/>
           </a:p>
@@ -8036,7 +8283,7 @@
           <a:p>
             <a:fld id="{D6A82EB2-151D-4EEE-ACF5-92C73278C09C}" type="datetimeFigureOut">
               <a:rPr lang="en-GB" smtClean="0"/>
-              <a:t>30/01/2023</a:t>
+              <a:t>31/01/2023</a:t>
             </a:fld>
             <a:endParaRPr lang="en-GB"/>
           </a:p>
@@ -16588,7 +16835,7 @@
         </p:blipFill>
         <p:spPr>
           <a:xfrm>
-            <a:off x="13068515" y="1958861"/>
+            <a:off x="12192000" y="1692161"/>
             <a:ext cx="3670110" cy="4224894"/>
           </a:xfrm>
           <a:prstGeom prst="rect">
@@ -17311,7 +17558,7 @@
         </p:nvSpPr>
         <p:spPr>
           <a:xfrm>
-            <a:off x="4957763" y="5664101"/>
+            <a:off x="8940828" y="5679599"/>
             <a:ext cx="1745456" cy="328612"/>
           </a:xfrm>
           <a:prstGeom prst="roundRect">
@@ -17370,7 +17617,7 @@
         </p:nvSpPr>
         <p:spPr>
           <a:xfrm>
-            <a:off x="5283993" y="4233289"/>
+            <a:off x="9267058" y="4248787"/>
             <a:ext cx="1159669" cy="458984"/>
           </a:xfrm>
           <a:prstGeom prst="roundRect">
@@ -17439,7 +17686,7 @@
         </p:nvSpPr>
         <p:spPr>
           <a:xfrm>
-            <a:off x="5281612" y="3876694"/>
+            <a:off x="9264677" y="3892192"/>
             <a:ext cx="1164431" cy="242887"/>
           </a:xfrm>
           <a:prstGeom prst="roundRect">
@@ -17498,7 +17745,7 @@
         </p:nvSpPr>
         <p:spPr>
           <a:xfrm>
-            <a:off x="5279231" y="3357580"/>
+            <a:off x="9262296" y="3373078"/>
             <a:ext cx="1164431" cy="329011"/>
           </a:xfrm>
           <a:prstGeom prst="roundRect">
@@ -17557,7 +17804,7 @@
         </p:nvSpPr>
         <p:spPr>
           <a:xfrm>
-            <a:off x="5279231" y="2986107"/>
+            <a:off x="9262296" y="3001605"/>
             <a:ext cx="1164431" cy="242887"/>
           </a:xfrm>
           <a:prstGeom prst="roundRect">
@@ -17618,7 +17865,7 @@
         </p:nvCxnSpPr>
         <p:spPr>
           <a:xfrm flipV="1">
-            <a:off x="5831965" y="5999859"/>
+            <a:off x="9815030" y="6015357"/>
             <a:ext cx="0" cy="225622"/>
           </a:xfrm>
           <a:prstGeom prst="straightConnector1">
@@ -17657,7 +17904,7 @@
         </p:nvSpPr>
         <p:spPr>
           <a:xfrm>
-            <a:off x="4986337" y="2636937"/>
+            <a:off x="8969402" y="2652435"/>
             <a:ext cx="1633537" cy="2557463"/>
           </a:xfrm>
           <a:prstGeom prst="roundRect">
@@ -17708,7 +17955,7 @@
         </p:nvSpPr>
         <p:spPr>
           <a:xfrm>
-            <a:off x="4486275" y="6245423"/>
+            <a:off x="8469340" y="6260921"/>
             <a:ext cx="2686050" cy="307777"/>
           </a:xfrm>
           <a:prstGeom prst="rect">
@@ -17776,7 +18023,7 @@
         </p:nvCxnSpPr>
         <p:spPr>
           <a:xfrm flipV="1">
-            <a:off x="5861447" y="3228994"/>
+            <a:off x="9844512" y="3244492"/>
             <a:ext cx="0" cy="128586"/>
           </a:xfrm>
           <a:prstGeom prst="straightConnector1">
@@ -17822,7 +18069,7 @@
         </p:nvCxnSpPr>
         <p:spPr>
           <a:xfrm flipV="1">
-            <a:off x="5863828" y="4119581"/>
+            <a:off x="9846893" y="4135079"/>
             <a:ext cx="0" cy="113708"/>
           </a:xfrm>
           <a:prstGeom prst="straightConnector1">
@@ -17868,7 +18115,7 @@
         </p:nvCxnSpPr>
         <p:spPr>
           <a:xfrm rot="16200000" flipV="1">
-            <a:off x="5186959" y="3199824"/>
+            <a:off x="9170024" y="3215322"/>
             <a:ext cx="769143" cy="584597"/>
           </a:xfrm>
           <a:prstGeom prst="bentConnector4">
@@ -17915,7 +18162,7 @@
         </p:nvCxnSpPr>
         <p:spPr>
           <a:xfrm rot="16200000" flipV="1">
-            <a:off x="4723071" y="4559061"/>
+            <a:off x="8706136" y="4574559"/>
             <a:ext cx="1665963" cy="548879"/>
           </a:xfrm>
           <a:prstGeom prst="bentConnector4">
@@ -17960,7 +18207,7 @@
         </p:nvSpPr>
         <p:spPr>
           <a:xfrm>
-            <a:off x="4410075" y="3667323"/>
+            <a:off x="8393140" y="3682821"/>
             <a:ext cx="571500" cy="307777"/>
           </a:xfrm>
           <a:prstGeom prst="rect">
@@ -18002,7 +18249,7 @@
         </p:nvCxnSpPr>
         <p:spPr>
           <a:xfrm flipV="1">
-            <a:off x="5831684" y="4694557"/>
+            <a:off x="9814749" y="4710055"/>
             <a:ext cx="338133" cy="253204"/>
           </a:xfrm>
           <a:prstGeom prst="bentConnector3">
@@ -18048,7 +18295,7 @@
         </p:nvCxnSpPr>
         <p:spPr>
           <a:xfrm flipV="1">
-            <a:off x="5830490" y="4697036"/>
+            <a:off x="9813555" y="4712534"/>
             <a:ext cx="0" cy="246439"/>
           </a:xfrm>
           <a:prstGeom prst="straightConnector1">
@@ -18090,7 +18337,7 @@
         </p:nvSpPr>
         <p:spPr>
           <a:xfrm>
-            <a:off x="5922169" y="4678086"/>
+            <a:off x="9905234" y="4693584"/>
             <a:ext cx="264318" cy="261610"/>
           </a:xfrm>
           <a:prstGeom prst="rect">
@@ -18133,7 +18380,7 @@
         </p:nvSpPr>
         <p:spPr>
           <a:xfrm>
-            <a:off x="5267326" y="4682847"/>
+            <a:off x="9250391" y="4698345"/>
             <a:ext cx="264318" cy="261610"/>
           </a:xfrm>
           <a:prstGeom prst="rect">
@@ -18176,7 +18423,7 @@
         </p:nvSpPr>
         <p:spPr>
           <a:xfrm>
-            <a:off x="5572124" y="4680467"/>
+            <a:off x="9555189" y="4695965"/>
             <a:ext cx="264318" cy="261610"/>
           </a:xfrm>
           <a:prstGeom prst="rect">
@@ -18267,7 +18514,7 @@
         </p:nvCxnSpPr>
         <p:spPr>
           <a:xfrm flipH="1" flipV="1">
-            <a:off x="5856909" y="2358727"/>
+            <a:off x="9839974" y="2374225"/>
             <a:ext cx="4538" cy="627380"/>
           </a:xfrm>
           <a:prstGeom prst="straightConnector1">
@@ -18369,7 +18616,7 @@
         </p:nvSpPr>
         <p:spPr>
           <a:xfrm>
-            <a:off x="5215320" y="679013"/>
+            <a:off x="9198385" y="694511"/>
             <a:ext cx="1196340" cy="523220"/>
           </a:xfrm>
           <a:prstGeom prst="rect">
@@ -18419,7 +18666,7 @@
         </p:nvSpPr>
         <p:spPr>
           <a:xfrm>
-            <a:off x="5272088" y="1704347"/>
+            <a:off x="9255153" y="1719845"/>
             <a:ext cx="1164431" cy="242887"/>
           </a:xfrm>
           <a:prstGeom prst="roundRect">
@@ -18478,7 +18725,7 @@
         </p:nvSpPr>
         <p:spPr>
           <a:xfrm>
-            <a:off x="5272088" y="1294773"/>
+            <a:off x="9255153" y="1310271"/>
             <a:ext cx="1164431" cy="242887"/>
           </a:xfrm>
           <a:prstGeom prst="roundRect">
@@ -18541,7 +18788,7 @@
         </p:nvCxnSpPr>
         <p:spPr>
           <a:xfrm flipV="1">
-            <a:off x="5854304" y="1537660"/>
+            <a:off x="9837369" y="1553158"/>
             <a:ext cx="0" cy="166687"/>
           </a:xfrm>
           <a:prstGeom prst="straightConnector1">
@@ -18585,7 +18832,7 @@
         </p:nvCxnSpPr>
         <p:spPr>
           <a:xfrm flipV="1">
-            <a:off x="5855097" y="1948822"/>
+            <a:off x="9838162" y="1964320"/>
             <a:ext cx="0" cy="159470"/>
           </a:xfrm>
           <a:prstGeom prst="straightConnector1">
@@ -18627,7 +18874,7 @@
         </p:nvSpPr>
         <p:spPr>
           <a:xfrm>
-            <a:off x="5274693" y="2115840"/>
+            <a:off x="9257758" y="2131338"/>
             <a:ext cx="1164431" cy="242887"/>
           </a:xfrm>
           <a:prstGeom prst="roundRect">
@@ -18688,7 +18935,7 @@
         </p:nvCxnSpPr>
         <p:spPr>
           <a:xfrm flipV="1">
-            <a:off x="5863829" y="3693734"/>
+            <a:off x="9846894" y="3709232"/>
             <a:ext cx="0" cy="103883"/>
           </a:xfrm>
           <a:prstGeom prst="straightConnector1">
@@ -18732,7 +18979,7 @@
         </p:nvCxnSpPr>
         <p:spPr>
           <a:xfrm flipV="1">
-            <a:off x="5530452" y="4690586"/>
+            <a:off x="9513517" y="4706084"/>
             <a:ext cx="0" cy="250032"/>
           </a:xfrm>
           <a:prstGeom prst="straightConnector1">
@@ -18810,6 +19057,42 @@
           </a:p>
         </p:txBody>
       </p:sp>
+      <p:pic>
+        <p:nvPicPr>
+          <p:cNvPr id="7" name="Picture 6" descr="Diagram&#10;&#10;Description automatically generated with low confidence">
+            <a:extLst>
+              <a:ext uri="{FF2B5EF4-FFF2-40B4-BE49-F238E27FC236}">
+                <a16:creationId xmlns:a16="http://schemas.microsoft.com/office/drawing/2014/main" id="{57DC4ADF-749C-6BDC-3F46-33B4726B5B13}"/>
+              </a:ext>
+            </a:extLst>
+          </p:cNvPr>
+          <p:cNvPicPr>
+            <a:picLocks noChangeAspect="1"/>
+          </p:cNvPicPr>
+          <p:nvPr/>
+        </p:nvPicPr>
+        <p:blipFill>
+          <a:blip r:embed="rId4">
+            <a:extLst>
+              <a:ext uri="{28A0092B-C50C-407E-A947-70E740481C1C}">
+                <a14:useLocalDpi xmlns:a14="http://schemas.microsoft.com/office/drawing/2010/main" val="0"/>
+              </a:ext>
+            </a:extLst>
+          </a:blip>
+          <a:stretch>
+            <a:fillRect/>
+          </a:stretch>
+        </p:blipFill>
+        <p:spPr>
+          <a:xfrm>
+            <a:off x="12505728" y="4943170"/>
+            <a:ext cx="8554644" cy="4363059"/>
+          </a:xfrm>
+          <a:prstGeom prst="rect">
+            <a:avLst/>
+          </a:prstGeom>
+        </p:spPr>
+      </p:pic>
     </p:spTree>
     <p:extLst>
       <p:ext uri="{BB962C8B-B14F-4D97-AF65-F5344CB8AC3E}">

</xml_diff>

<commit_message>
Add chapter on Lee and Ready algorithm + proofreading 🔢 (#154)
Adresses #10 and #9
</commit_message>
<xml_diff>
--- a/reports/Graphs/diagrams.pptx
+++ b/reports/Graphs/diagrams.pptx
@@ -8,10 +8,11 @@
     <p:sldId id="256" r:id="rId2"/>
     <p:sldId id="263" r:id="rId3"/>
     <p:sldId id="262" r:id="rId4"/>
-    <p:sldId id="260" r:id="rId5"/>
-    <p:sldId id="261" r:id="rId6"/>
-    <p:sldId id="259" r:id="rId7"/>
-    <p:sldId id="257" r:id="rId8"/>
+    <p:sldId id="264" r:id="rId5"/>
+    <p:sldId id="260" r:id="rId6"/>
+    <p:sldId id="261" r:id="rId7"/>
+    <p:sldId id="259" r:id="rId8"/>
+    <p:sldId id="257" r:id="rId9"/>
   </p:sldIdLst>
   <p:sldSz cx="12192000" cy="6858000"/>
   <p:notesSz cx="6858000" cy="9144000"/>
@@ -121,7 +122,7 @@
 <file path=ppt/revisionInfo.xml><?xml version="1.0" encoding="utf-8"?>
 <p1510:revInfo xmlns:a="http://schemas.openxmlformats.org/drawingml/2006/main" xmlns:r="http://schemas.openxmlformats.org/officeDocument/2006/relationships" xmlns:p1510="http://schemas.microsoft.com/office/powerpoint/2015/10/main">
   <p1510:revLst>
-    <p1510:client id="{F9F2BE70-AAED-47FD-A055-7B08EB1371A3}" v="5" dt="2023-01-31T14:58:08.605"/>
+    <p1510:client id="{F9F2BE70-AAED-47FD-A055-7B08EB1371A3}" v="61" dt="2023-02-11T11:01:55.090"/>
   </p1510:revLst>
 </p1510:revInfo>
 </file>
@@ -131,17 +132,25 @@
   <pc:docChgLst>
     <pc:chgData name="Markus Bilz" userId="a36021e4bdb9349f" providerId="LiveId" clId="{F9F2BE70-AAED-47FD-A055-7B08EB1371A3}"/>
     <pc:docChg chg="undo custSel addSld modSld sldOrd">
-      <pc:chgData name="Markus Bilz" userId="a36021e4bdb9349f" providerId="LiveId" clId="{F9F2BE70-AAED-47FD-A055-7B08EB1371A3}" dt="2023-01-31T14:58:11.698" v="242" actId="1076"/>
+      <pc:chgData name="Markus Bilz" userId="a36021e4bdb9349f" providerId="LiveId" clId="{F9F2BE70-AAED-47FD-A055-7B08EB1371A3}" dt="2023-02-11T11:01:55.584" v="812" actId="14100"/>
       <pc:docMkLst>
         <pc:docMk/>
       </pc:docMkLst>
       <pc:sldChg chg="modSp mod">
-        <pc:chgData name="Markus Bilz" userId="a36021e4bdb9349f" providerId="LiveId" clId="{F9F2BE70-AAED-47FD-A055-7B08EB1371A3}" dt="2023-01-28T14:06:06.783" v="2" actId="20577"/>
+        <pc:chgData name="Markus Bilz" userId="a36021e4bdb9349f" providerId="LiveId" clId="{F9F2BE70-AAED-47FD-A055-7B08EB1371A3}" dt="2023-02-11T09:33:35.734" v="493" actId="108"/>
         <pc:sldMkLst>
           <pc:docMk/>
           <pc:sldMk cId="2836008551" sldId="256"/>
         </pc:sldMkLst>
         <pc:spChg chg="mod">
+          <ac:chgData name="Markus Bilz" userId="a36021e4bdb9349f" providerId="LiveId" clId="{F9F2BE70-AAED-47FD-A055-7B08EB1371A3}" dt="2023-02-11T09:33:35.734" v="493" actId="108"/>
+          <ac:spMkLst>
+            <pc:docMk/>
+            <pc:sldMk cId="2836008551" sldId="256"/>
+            <ac:spMk id="61" creationId="{C00FF0EF-2F9D-F942-4F6E-0006C5307219}"/>
+          </ac:spMkLst>
+        </pc:spChg>
+        <pc:spChg chg="mod">
           <ac:chgData name="Markus Bilz" userId="a36021e4bdb9349f" providerId="LiveId" clId="{F9F2BE70-AAED-47FD-A055-7B08EB1371A3}" dt="2023-01-28T14:06:02.190" v="1" actId="20577"/>
           <ac:spMkLst>
             <pc:docMk/>
@@ -157,6 +166,21 @@
             <ac:spMk id="234" creationId="{29B237C7-6F16-D779-C094-6DB7CEF9786E}"/>
           </ac:spMkLst>
         </pc:spChg>
+      </pc:sldChg>
+      <pc:sldChg chg="modSp mod">
+        <pc:chgData name="Markus Bilz" userId="a36021e4bdb9349f" providerId="LiveId" clId="{F9F2BE70-AAED-47FD-A055-7B08EB1371A3}" dt="2023-02-11T10:05:14.779" v="753" actId="1076"/>
+        <pc:sldMkLst>
+          <pc:docMk/>
+          <pc:sldMk cId="1975984209" sldId="259"/>
+        </pc:sldMkLst>
+        <pc:picChg chg="mod">
+          <ac:chgData name="Markus Bilz" userId="a36021e4bdb9349f" providerId="LiveId" clId="{F9F2BE70-AAED-47FD-A055-7B08EB1371A3}" dt="2023-02-11T10:05:14.779" v="753" actId="1076"/>
+          <ac:picMkLst>
+            <pc:docMk/>
+            <pc:sldMk cId="1975984209" sldId="259"/>
+            <ac:picMk id="4" creationId="{B7DB29C0-B5C8-8508-A26E-50B1D221C83C}"/>
+          </ac:picMkLst>
+        </pc:picChg>
       </pc:sldChg>
       <pc:sldChg chg="modSp mod">
         <pc:chgData name="Markus Bilz" userId="a36021e4bdb9349f" providerId="LiveId" clId="{F9F2BE70-AAED-47FD-A055-7B08EB1371A3}" dt="2023-01-31T14:55:29.812" v="236" actId="1076"/>
@@ -420,12 +444,20 @@
           </ac:cxnSpMkLst>
         </pc:cxnChg>
       </pc:sldChg>
-      <pc:sldChg chg="ord">
-        <pc:chgData name="Markus Bilz" userId="a36021e4bdb9349f" providerId="LiveId" clId="{F9F2BE70-AAED-47FD-A055-7B08EB1371A3}" dt="2023-01-30T15:45:31.429" v="4"/>
+      <pc:sldChg chg="modSp mod ord">
+        <pc:chgData name="Markus Bilz" userId="a36021e4bdb9349f" providerId="LiveId" clId="{F9F2BE70-AAED-47FD-A055-7B08EB1371A3}" dt="2023-02-11T09:05:52.063" v="245" actId="1076"/>
         <pc:sldMkLst>
           <pc:docMk/>
           <pc:sldMk cId="350462512" sldId="262"/>
         </pc:sldMkLst>
+        <pc:picChg chg="mod">
+          <ac:chgData name="Markus Bilz" userId="a36021e4bdb9349f" providerId="LiveId" clId="{F9F2BE70-AAED-47FD-A055-7B08EB1371A3}" dt="2023-02-11T09:05:52.063" v="245" actId="1076"/>
+          <ac:picMkLst>
+            <pc:docMk/>
+            <pc:sldMk cId="350462512" sldId="262"/>
+            <ac:picMk id="5" creationId="{6A20F21E-4163-B9F0-D304-FA503742EB56}"/>
+          </ac:picMkLst>
+        </pc:picChg>
       </pc:sldChg>
       <pc:sldChg chg="addSp delSp modSp add mod">
         <pc:chgData name="Markus Bilz" userId="a36021e4bdb9349f" providerId="LiveId" clId="{F9F2BE70-AAED-47FD-A055-7B08EB1371A3}" dt="2023-01-30T16:05:01.590" v="228" actId="14100"/>
@@ -1375,6 +1407,1029 @@
             <pc:docMk/>
             <pc:sldMk cId="1844608576" sldId="263"/>
             <ac:cxnSpMk id="474" creationId="{102CF8D6-653C-EB6E-8C8D-AE62472923C0}"/>
+          </ac:cxnSpMkLst>
+        </pc:cxnChg>
+      </pc:sldChg>
+      <pc:sldChg chg="addSp delSp modSp add mod">
+        <pc:chgData name="Markus Bilz" userId="a36021e4bdb9349f" providerId="LiveId" clId="{F9F2BE70-AAED-47FD-A055-7B08EB1371A3}" dt="2023-02-11T11:01:55.584" v="812" actId="14100"/>
+        <pc:sldMkLst>
+          <pc:docMk/>
+          <pc:sldMk cId="46556285" sldId="264"/>
+        </pc:sldMkLst>
+        <pc:spChg chg="del">
+          <ac:chgData name="Markus Bilz" userId="a36021e4bdb9349f" providerId="LiveId" clId="{F9F2BE70-AAED-47FD-A055-7B08EB1371A3}" dt="2023-02-11T09:06:00.496" v="249" actId="478"/>
+          <ac:spMkLst>
+            <pc:docMk/>
+            <pc:sldMk cId="46556285" sldId="264"/>
+            <ac:spMk id="2" creationId="{A0293965-D629-2279-04FB-29ACD69DD2D6}"/>
+          </ac:spMkLst>
+        </pc:spChg>
+        <pc:spChg chg="add del mod">
+          <ac:chgData name="Markus Bilz" userId="a36021e4bdb9349f" providerId="LiveId" clId="{F9F2BE70-AAED-47FD-A055-7B08EB1371A3}" dt="2023-02-11T11:01:55.090" v="810"/>
+          <ac:spMkLst>
+            <pc:docMk/>
+            <pc:sldMk cId="46556285" sldId="264"/>
+            <ac:spMk id="2" creationId="{B450D4CB-F1C2-848F-39C9-9605CCACB94F}"/>
+          </ac:spMkLst>
+        </pc:spChg>
+        <pc:spChg chg="add del mod">
+          <ac:chgData name="Markus Bilz" userId="a36021e4bdb9349f" providerId="LiveId" clId="{F9F2BE70-AAED-47FD-A055-7B08EB1371A3}" dt="2023-02-11T09:13:30.847" v="292" actId="478"/>
+          <ac:spMkLst>
+            <pc:docMk/>
+            <pc:sldMk cId="46556285" sldId="264"/>
+            <ac:spMk id="6" creationId="{CF22A376-C4F5-AA85-F66A-935EC23D2C2C}"/>
+          </ac:spMkLst>
+        </pc:spChg>
+        <pc:spChg chg="add del mod">
+          <ac:chgData name="Markus Bilz" userId="a36021e4bdb9349f" providerId="LiveId" clId="{F9F2BE70-AAED-47FD-A055-7B08EB1371A3}" dt="2023-02-11T09:12:08.384" v="288" actId="478"/>
+          <ac:spMkLst>
+            <pc:docMk/>
+            <pc:sldMk cId="46556285" sldId="264"/>
+            <ac:spMk id="11" creationId="{6F6460AC-0BD6-9529-B571-2D135E723E0F}"/>
+          </ac:spMkLst>
+        </pc:spChg>
+        <pc:spChg chg="add del mod">
+          <ac:chgData name="Markus Bilz" userId="a36021e4bdb9349f" providerId="LiveId" clId="{F9F2BE70-AAED-47FD-A055-7B08EB1371A3}" dt="2023-02-11T09:21:31.402" v="392" actId="478"/>
+          <ac:spMkLst>
+            <pc:docMk/>
+            <pc:sldMk cId="46556285" sldId="264"/>
+            <ac:spMk id="12" creationId="{2EA4E4E7-3F73-F2E5-8798-6404E8E83D99}"/>
+          </ac:spMkLst>
+        </pc:spChg>
+        <pc:spChg chg="add del mod">
+          <ac:chgData name="Markus Bilz" userId="a36021e4bdb9349f" providerId="LiveId" clId="{F9F2BE70-AAED-47FD-A055-7B08EB1371A3}" dt="2023-02-11T09:21:33.459" v="393" actId="478"/>
+          <ac:spMkLst>
+            <pc:docMk/>
+            <pc:sldMk cId="46556285" sldId="264"/>
+            <ac:spMk id="13" creationId="{F7DA3A78-8B98-BE0A-01D4-D5C4B55CFE75}"/>
+          </ac:spMkLst>
+        </pc:spChg>
+        <pc:spChg chg="add del mod">
+          <ac:chgData name="Markus Bilz" userId="a36021e4bdb9349f" providerId="LiveId" clId="{F9F2BE70-AAED-47FD-A055-7B08EB1371A3}" dt="2023-02-11T09:41:20.788" v="580" actId="478"/>
+          <ac:spMkLst>
+            <pc:docMk/>
+            <pc:sldMk cId="46556285" sldId="264"/>
+            <ac:spMk id="14" creationId="{1AC239B5-49DA-D05C-262A-2D9551131E07}"/>
+          </ac:spMkLst>
+        </pc:spChg>
+        <pc:spChg chg="add del mod">
+          <ac:chgData name="Markus Bilz" userId="a36021e4bdb9349f" providerId="LiveId" clId="{F9F2BE70-AAED-47FD-A055-7B08EB1371A3}" dt="2023-02-11T09:41:20.788" v="580" actId="478"/>
+          <ac:spMkLst>
+            <pc:docMk/>
+            <pc:sldMk cId="46556285" sldId="264"/>
+            <ac:spMk id="15" creationId="{A82D415E-49EC-3FCD-9209-256D63C3D833}"/>
+          </ac:spMkLst>
+        </pc:spChg>
+        <pc:spChg chg="add mod">
+          <ac:chgData name="Markus Bilz" userId="a36021e4bdb9349f" providerId="LiveId" clId="{F9F2BE70-AAED-47FD-A055-7B08EB1371A3}" dt="2023-02-11T10:04:38.357" v="750" actId="1076"/>
+          <ac:spMkLst>
+            <pc:docMk/>
+            <pc:sldMk cId="46556285" sldId="264"/>
+            <ac:spMk id="16" creationId="{23F0A351-4582-96BB-41DB-B2076B852011}"/>
+          </ac:spMkLst>
+        </pc:spChg>
+        <pc:spChg chg="add mod">
+          <ac:chgData name="Markus Bilz" userId="a36021e4bdb9349f" providerId="LiveId" clId="{F9F2BE70-AAED-47FD-A055-7B08EB1371A3}" dt="2023-02-11T10:04:38.357" v="750" actId="1076"/>
+          <ac:spMkLst>
+            <pc:docMk/>
+            <pc:sldMk cId="46556285" sldId="264"/>
+            <ac:spMk id="17" creationId="{8E7823CC-2312-D341-E44A-3763CE6A05CF}"/>
+          </ac:spMkLst>
+        </pc:spChg>
+        <pc:spChg chg="add mod">
+          <ac:chgData name="Markus Bilz" userId="a36021e4bdb9349f" providerId="LiveId" clId="{F9F2BE70-AAED-47FD-A055-7B08EB1371A3}" dt="2023-02-11T10:04:38.357" v="750" actId="1076"/>
+          <ac:spMkLst>
+            <pc:docMk/>
+            <pc:sldMk cId="46556285" sldId="264"/>
+            <ac:spMk id="18" creationId="{0ACC3183-53D4-C562-650C-7B76EC539D85}"/>
+          </ac:spMkLst>
+        </pc:spChg>
+        <pc:spChg chg="add del mod">
+          <ac:chgData name="Markus Bilz" userId="a36021e4bdb9349f" providerId="LiveId" clId="{F9F2BE70-AAED-47FD-A055-7B08EB1371A3}" dt="2023-02-11T09:41:20.788" v="580" actId="478"/>
+          <ac:spMkLst>
+            <pc:docMk/>
+            <pc:sldMk cId="46556285" sldId="264"/>
+            <ac:spMk id="19" creationId="{06FBC2B3-BA0B-7AD0-14B9-0A80EC1CF33E}"/>
+          </ac:spMkLst>
+        </pc:spChg>
+        <pc:spChg chg="add del mod">
+          <ac:chgData name="Markus Bilz" userId="a36021e4bdb9349f" providerId="LiveId" clId="{F9F2BE70-AAED-47FD-A055-7B08EB1371A3}" dt="2023-02-11T09:41:20.788" v="580" actId="478"/>
+          <ac:spMkLst>
+            <pc:docMk/>
+            <pc:sldMk cId="46556285" sldId="264"/>
+            <ac:spMk id="20" creationId="{C5600059-046F-1E08-AEED-B21C868CABE7}"/>
+          </ac:spMkLst>
+        </pc:spChg>
+        <pc:spChg chg="add del mod">
+          <ac:chgData name="Markus Bilz" userId="a36021e4bdb9349f" providerId="LiveId" clId="{F9F2BE70-AAED-47FD-A055-7B08EB1371A3}" dt="2023-02-11T09:41:20.788" v="580" actId="478"/>
+          <ac:spMkLst>
+            <pc:docMk/>
+            <pc:sldMk cId="46556285" sldId="264"/>
+            <ac:spMk id="21" creationId="{934A40E5-CA78-E770-7D8F-28EB48260019}"/>
+          </ac:spMkLst>
+        </pc:spChg>
+        <pc:spChg chg="add del mod">
+          <ac:chgData name="Markus Bilz" userId="a36021e4bdb9349f" providerId="LiveId" clId="{F9F2BE70-AAED-47FD-A055-7B08EB1371A3}" dt="2023-02-11T09:22:40.217" v="399" actId="478"/>
+          <ac:spMkLst>
+            <pc:docMk/>
+            <pc:sldMk cId="46556285" sldId="264"/>
+            <ac:spMk id="25" creationId="{859B922B-EDC5-6621-07D9-CA756CD3B828}"/>
+          </ac:spMkLst>
+        </pc:spChg>
+        <pc:spChg chg="add del mod">
+          <ac:chgData name="Markus Bilz" userId="a36021e4bdb9349f" providerId="LiveId" clId="{F9F2BE70-AAED-47FD-A055-7B08EB1371A3}" dt="2023-02-11T09:22:40.217" v="399" actId="478"/>
+          <ac:spMkLst>
+            <pc:docMk/>
+            <pc:sldMk cId="46556285" sldId="264"/>
+            <ac:spMk id="26" creationId="{FF3B2A21-BC57-006D-B114-6640859C8EA2}"/>
+          </ac:spMkLst>
+        </pc:spChg>
+        <pc:spChg chg="add del mod">
+          <ac:chgData name="Markus Bilz" userId="a36021e4bdb9349f" providerId="LiveId" clId="{F9F2BE70-AAED-47FD-A055-7B08EB1371A3}" dt="2023-02-11T09:22:40.217" v="399" actId="478"/>
+          <ac:spMkLst>
+            <pc:docMk/>
+            <pc:sldMk cId="46556285" sldId="264"/>
+            <ac:spMk id="27" creationId="{34C85211-C89E-6B26-7AF0-D01EE5918B5E}"/>
+          </ac:spMkLst>
+        </pc:spChg>
+        <pc:spChg chg="add del mod">
+          <ac:chgData name="Markus Bilz" userId="a36021e4bdb9349f" providerId="LiveId" clId="{F9F2BE70-AAED-47FD-A055-7B08EB1371A3}" dt="2023-02-11T09:22:44.665" v="401" actId="478"/>
+          <ac:spMkLst>
+            <pc:docMk/>
+            <pc:sldMk cId="46556285" sldId="264"/>
+            <ac:spMk id="28" creationId="{3FD5977A-491E-C143-3660-28390E4C04C5}"/>
+          </ac:spMkLst>
+        </pc:spChg>
+        <pc:spChg chg="add del mod">
+          <ac:chgData name="Markus Bilz" userId="a36021e4bdb9349f" providerId="LiveId" clId="{F9F2BE70-AAED-47FD-A055-7B08EB1371A3}" dt="2023-02-11T09:22:40.217" v="399" actId="478"/>
+          <ac:spMkLst>
+            <pc:docMk/>
+            <pc:sldMk cId="46556285" sldId="264"/>
+            <ac:spMk id="29" creationId="{ADFA7528-03C5-38BD-B416-7A4301483642}"/>
+          </ac:spMkLst>
+        </pc:spChg>
+        <pc:spChg chg="add del mod">
+          <ac:chgData name="Markus Bilz" userId="a36021e4bdb9349f" providerId="LiveId" clId="{F9F2BE70-AAED-47FD-A055-7B08EB1371A3}" dt="2023-02-11T09:22:40.217" v="399" actId="478"/>
+          <ac:spMkLst>
+            <pc:docMk/>
+            <pc:sldMk cId="46556285" sldId="264"/>
+            <ac:spMk id="30" creationId="{9419F1D9-7A62-0D11-9393-73AE96ED7F44}"/>
+          </ac:spMkLst>
+        </pc:spChg>
+        <pc:spChg chg="add del mod">
+          <ac:chgData name="Markus Bilz" userId="a36021e4bdb9349f" providerId="LiveId" clId="{F9F2BE70-AAED-47FD-A055-7B08EB1371A3}" dt="2023-02-11T09:22:40.217" v="399" actId="478"/>
+          <ac:spMkLst>
+            <pc:docMk/>
+            <pc:sldMk cId="46556285" sldId="264"/>
+            <ac:spMk id="31" creationId="{E7AE97E9-F6DB-A9FF-1C5E-0990EC798311}"/>
+          </ac:spMkLst>
+        </pc:spChg>
+        <pc:spChg chg="add del mod">
+          <ac:chgData name="Markus Bilz" userId="a36021e4bdb9349f" providerId="LiveId" clId="{F9F2BE70-AAED-47FD-A055-7B08EB1371A3}" dt="2023-02-11T09:22:40.217" v="399" actId="478"/>
+          <ac:spMkLst>
+            <pc:docMk/>
+            <pc:sldMk cId="46556285" sldId="264"/>
+            <ac:spMk id="32" creationId="{82D7908E-9682-E6DD-002D-38EFC8268C3F}"/>
+          </ac:spMkLst>
+        </pc:spChg>
+        <pc:spChg chg="add del mod">
+          <ac:chgData name="Markus Bilz" userId="a36021e4bdb9349f" providerId="LiveId" clId="{F9F2BE70-AAED-47FD-A055-7B08EB1371A3}" dt="2023-02-11T09:22:42.641" v="400" actId="478"/>
+          <ac:spMkLst>
+            <pc:docMk/>
+            <pc:sldMk cId="46556285" sldId="264"/>
+            <ac:spMk id="36" creationId="{9BEB79DE-91E8-F43A-DBEB-64EA684332A7}"/>
+          </ac:spMkLst>
+        </pc:spChg>
+        <pc:spChg chg="add del mod">
+          <ac:chgData name="Markus Bilz" userId="a36021e4bdb9349f" providerId="LiveId" clId="{F9F2BE70-AAED-47FD-A055-7B08EB1371A3}" dt="2023-02-11T09:22:40.217" v="399" actId="478"/>
+          <ac:spMkLst>
+            <pc:docMk/>
+            <pc:sldMk cId="46556285" sldId="264"/>
+            <ac:spMk id="37" creationId="{FC5ED31A-9709-7FC9-338B-672A97B6D8A3}"/>
+          </ac:spMkLst>
+        </pc:spChg>
+        <pc:spChg chg="add del mod">
+          <ac:chgData name="Markus Bilz" userId="a36021e4bdb9349f" providerId="LiveId" clId="{F9F2BE70-AAED-47FD-A055-7B08EB1371A3}" dt="2023-02-11T09:22:40.217" v="399" actId="478"/>
+          <ac:spMkLst>
+            <pc:docMk/>
+            <pc:sldMk cId="46556285" sldId="264"/>
+            <ac:spMk id="38" creationId="{D2C83F7D-AD6C-621B-6DD1-608A72D09303}"/>
+          </ac:spMkLst>
+        </pc:spChg>
+        <pc:spChg chg="add del mod">
+          <ac:chgData name="Markus Bilz" userId="a36021e4bdb9349f" providerId="LiveId" clId="{F9F2BE70-AAED-47FD-A055-7B08EB1371A3}" dt="2023-02-11T09:22:40.217" v="399" actId="478"/>
+          <ac:spMkLst>
+            <pc:docMk/>
+            <pc:sldMk cId="46556285" sldId="264"/>
+            <ac:spMk id="39" creationId="{B2C4FB62-9F87-0EF1-A1B8-15B16D60818A}"/>
+          </ac:spMkLst>
+        </pc:spChg>
+        <pc:spChg chg="add del mod">
+          <ac:chgData name="Markus Bilz" userId="a36021e4bdb9349f" providerId="LiveId" clId="{F9F2BE70-AAED-47FD-A055-7B08EB1371A3}" dt="2023-02-11T09:22:40.217" v="399" actId="478"/>
+          <ac:spMkLst>
+            <pc:docMk/>
+            <pc:sldMk cId="46556285" sldId="264"/>
+            <ac:spMk id="40" creationId="{DB3676B0-A861-D33B-8527-5061FD2E5960}"/>
+          </ac:spMkLst>
+        </pc:spChg>
+        <pc:spChg chg="add del mod">
+          <ac:chgData name="Markus Bilz" userId="a36021e4bdb9349f" providerId="LiveId" clId="{F9F2BE70-AAED-47FD-A055-7B08EB1371A3}" dt="2023-02-11T09:22:40.217" v="399" actId="478"/>
+          <ac:spMkLst>
+            <pc:docMk/>
+            <pc:sldMk cId="46556285" sldId="264"/>
+            <ac:spMk id="41" creationId="{CA7C937F-0E8B-D6E1-C38C-AB0160D5FBA6}"/>
+          </ac:spMkLst>
+        </pc:spChg>
+        <pc:spChg chg="add del mod">
+          <ac:chgData name="Markus Bilz" userId="a36021e4bdb9349f" providerId="LiveId" clId="{F9F2BE70-AAED-47FD-A055-7B08EB1371A3}" dt="2023-02-11T09:22:42.641" v="400" actId="478"/>
+          <ac:spMkLst>
+            <pc:docMk/>
+            <pc:sldMk cId="46556285" sldId="264"/>
+            <ac:spMk id="42" creationId="{AD405924-CCA7-BC7D-E881-36442D612DCB}"/>
+          </ac:spMkLst>
+        </pc:spChg>
+        <pc:spChg chg="add del mod">
+          <ac:chgData name="Markus Bilz" userId="a36021e4bdb9349f" providerId="LiveId" clId="{F9F2BE70-AAED-47FD-A055-7B08EB1371A3}" dt="2023-02-11T09:22:42.641" v="400" actId="478"/>
+          <ac:spMkLst>
+            <pc:docMk/>
+            <pc:sldMk cId="46556285" sldId="264"/>
+            <ac:spMk id="43" creationId="{46F63EA1-1818-1D34-BFFD-107D4DC4402B}"/>
+          </ac:spMkLst>
+        </pc:spChg>
+        <pc:spChg chg="add del mod">
+          <ac:chgData name="Markus Bilz" userId="a36021e4bdb9349f" providerId="LiveId" clId="{F9F2BE70-AAED-47FD-A055-7B08EB1371A3}" dt="2023-02-11T09:38:22.338" v="544" actId="478"/>
+          <ac:spMkLst>
+            <pc:docMk/>
+            <pc:sldMk cId="46556285" sldId="264"/>
+            <ac:spMk id="56" creationId="{47138919-9F8B-4FE1-BA6B-5B2BF1172222}"/>
+          </ac:spMkLst>
+        </pc:spChg>
+        <pc:spChg chg="add del mod">
+          <ac:chgData name="Markus Bilz" userId="a36021e4bdb9349f" providerId="LiveId" clId="{F9F2BE70-AAED-47FD-A055-7B08EB1371A3}" dt="2023-02-11T09:38:22.338" v="544" actId="478"/>
+          <ac:spMkLst>
+            <pc:docMk/>
+            <pc:sldMk cId="46556285" sldId="264"/>
+            <ac:spMk id="57" creationId="{F7A4D933-C85B-31D4-975D-67EF83E76D69}"/>
+          </ac:spMkLst>
+        </pc:spChg>
+        <pc:spChg chg="add del mod">
+          <ac:chgData name="Markus Bilz" userId="a36021e4bdb9349f" providerId="LiveId" clId="{F9F2BE70-AAED-47FD-A055-7B08EB1371A3}" dt="2023-02-11T09:25:41.888" v="409" actId="478"/>
+          <ac:spMkLst>
+            <pc:docMk/>
+            <pc:sldMk cId="46556285" sldId="264"/>
+            <ac:spMk id="58" creationId="{0F08DC18-06B5-F2C8-8C57-8516802327D7}"/>
+          </ac:spMkLst>
+        </pc:spChg>
+        <pc:spChg chg="add del mod">
+          <ac:chgData name="Markus Bilz" userId="a36021e4bdb9349f" providerId="LiveId" clId="{F9F2BE70-AAED-47FD-A055-7B08EB1371A3}" dt="2023-02-11T09:25:44.043" v="410" actId="478"/>
+          <ac:spMkLst>
+            <pc:docMk/>
+            <pc:sldMk cId="46556285" sldId="264"/>
+            <ac:spMk id="59" creationId="{D90364E3-40AB-8E93-8879-B1F4D1C8EA53}"/>
+          </ac:spMkLst>
+        </pc:spChg>
+        <pc:spChg chg="add del mod">
+          <ac:chgData name="Markus Bilz" userId="a36021e4bdb9349f" providerId="LiveId" clId="{F9F2BE70-AAED-47FD-A055-7B08EB1371A3}" dt="2023-02-11T09:25:46.184" v="411" actId="478"/>
+          <ac:spMkLst>
+            <pc:docMk/>
+            <pc:sldMk cId="46556285" sldId="264"/>
+            <ac:spMk id="60" creationId="{5DDB5D12-5534-EA92-C24A-C2C816E93C15}"/>
+          </ac:spMkLst>
+        </pc:spChg>
+        <pc:spChg chg="add del mod">
+          <ac:chgData name="Markus Bilz" userId="a36021e4bdb9349f" providerId="LiveId" clId="{F9F2BE70-AAED-47FD-A055-7B08EB1371A3}" dt="2023-02-11T09:38:24.161" v="545" actId="478"/>
+          <ac:spMkLst>
+            <pc:docMk/>
+            <pc:sldMk cId="46556285" sldId="264"/>
+            <ac:spMk id="61" creationId="{ED96D742-B788-2284-C5E7-453B5CF977C0}"/>
+          </ac:spMkLst>
+        </pc:spChg>
+        <pc:spChg chg="add del mod">
+          <ac:chgData name="Markus Bilz" userId="a36021e4bdb9349f" providerId="LiveId" clId="{F9F2BE70-AAED-47FD-A055-7B08EB1371A3}" dt="2023-02-11T09:38:22.338" v="544" actId="478"/>
+          <ac:spMkLst>
+            <pc:docMk/>
+            <pc:sldMk cId="46556285" sldId="264"/>
+            <ac:spMk id="62" creationId="{C29DDC89-06E6-D821-D8B3-502F66FD2731}"/>
+          </ac:spMkLst>
+        </pc:spChg>
+        <pc:spChg chg="add del mod">
+          <ac:chgData name="Markus Bilz" userId="a36021e4bdb9349f" providerId="LiveId" clId="{F9F2BE70-AAED-47FD-A055-7B08EB1371A3}" dt="2023-02-11T09:38:22.338" v="544" actId="478"/>
+          <ac:spMkLst>
+            <pc:docMk/>
+            <pc:sldMk cId="46556285" sldId="264"/>
+            <ac:spMk id="63" creationId="{DE8D74ED-81D8-1400-C4DD-5DDA41E14247}"/>
+          </ac:spMkLst>
+        </pc:spChg>
+        <pc:spChg chg="add del mod">
+          <ac:chgData name="Markus Bilz" userId="a36021e4bdb9349f" providerId="LiveId" clId="{F9F2BE70-AAED-47FD-A055-7B08EB1371A3}" dt="2023-02-11T09:27:09.266" v="421" actId="478"/>
+          <ac:spMkLst>
+            <pc:docMk/>
+            <pc:sldMk cId="46556285" sldId="264"/>
+            <ac:spMk id="69" creationId="{0A90DFDB-BC12-1B17-7D8B-2DF1C77D4A78}"/>
+          </ac:spMkLst>
+        </pc:spChg>
+        <pc:spChg chg="add del mod">
+          <ac:chgData name="Markus Bilz" userId="a36021e4bdb9349f" providerId="LiveId" clId="{F9F2BE70-AAED-47FD-A055-7B08EB1371A3}" dt="2023-02-11T09:27:07.003" v="420" actId="478"/>
+          <ac:spMkLst>
+            <pc:docMk/>
+            <pc:sldMk cId="46556285" sldId="264"/>
+            <ac:spMk id="70" creationId="{9607F68E-C6BE-ED89-03DF-ADDB40136D86}"/>
+          </ac:spMkLst>
+        </pc:spChg>
+        <pc:spChg chg="add del mod">
+          <ac:chgData name="Markus Bilz" userId="a36021e4bdb9349f" providerId="LiveId" clId="{F9F2BE70-AAED-47FD-A055-7B08EB1371A3}" dt="2023-02-11T09:27:02.925" v="418" actId="478"/>
+          <ac:spMkLst>
+            <pc:docMk/>
+            <pc:sldMk cId="46556285" sldId="264"/>
+            <ac:spMk id="71" creationId="{0FE2E589-8BD9-F8AD-E2D3-30DB0A7FE37F}"/>
+          </ac:spMkLst>
+        </pc:spChg>
+        <pc:spChg chg="add del mod">
+          <ac:chgData name="Markus Bilz" userId="a36021e4bdb9349f" providerId="LiveId" clId="{F9F2BE70-AAED-47FD-A055-7B08EB1371A3}" dt="2023-02-11T09:27:05.349" v="419" actId="478"/>
+          <ac:spMkLst>
+            <pc:docMk/>
+            <pc:sldMk cId="46556285" sldId="264"/>
+            <ac:spMk id="72" creationId="{E792C6AB-B27A-7EBD-659B-BA900BCB02F0}"/>
+          </ac:spMkLst>
+        </pc:spChg>
+        <pc:spChg chg="add del mod">
+          <ac:chgData name="Markus Bilz" userId="a36021e4bdb9349f" providerId="LiveId" clId="{F9F2BE70-AAED-47FD-A055-7B08EB1371A3}" dt="2023-02-11T09:31:31.615" v="460" actId="478"/>
+          <ac:spMkLst>
+            <pc:docMk/>
+            <pc:sldMk cId="46556285" sldId="264"/>
+            <ac:spMk id="73" creationId="{562A93CA-9B8F-8CBC-4537-A1EB24003611}"/>
+          </ac:spMkLst>
+        </pc:spChg>
+        <pc:spChg chg="add mod">
+          <ac:chgData name="Markus Bilz" userId="a36021e4bdb9349f" providerId="LiveId" clId="{F9F2BE70-AAED-47FD-A055-7B08EB1371A3}" dt="2023-02-11T11:01:55.584" v="812" actId="14100"/>
+          <ac:spMkLst>
+            <pc:docMk/>
+            <pc:sldMk cId="46556285" sldId="264"/>
+            <ac:spMk id="74" creationId="{36D1AE21-BD7B-027C-55BE-F44DC9AA37CA}"/>
+          </ac:spMkLst>
+        </pc:spChg>
+        <pc:spChg chg="add mod">
+          <ac:chgData name="Markus Bilz" userId="a36021e4bdb9349f" providerId="LiveId" clId="{F9F2BE70-AAED-47FD-A055-7B08EB1371A3}" dt="2023-02-11T11:01:53.867" v="805" actId="1076"/>
+          <ac:spMkLst>
+            <pc:docMk/>
+            <pc:sldMk cId="46556285" sldId="264"/>
+            <ac:spMk id="75" creationId="{22D2EB51-762E-E07F-687B-4816F4E53131}"/>
+          </ac:spMkLst>
+        </pc:spChg>
+        <pc:spChg chg="add mod">
+          <ac:chgData name="Markus Bilz" userId="a36021e4bdb9349f" providerId="LiveId" clId="{F9F2BE70-AAED-47FD-A055-7B08EB1371A3}" dt="2023-02-11T11:01:53.867" v="805" actId="1076"/>
+          <ac:spMkLst>
+            <pc:docMk/>
+            <pc:sldMk cId="46556285" sldId="264"/>
+            <ac:spMk id="76" creationId="{2FE971C9-C360-A714-0671-6CF02666DE52}"/>
+          </ac:spMkLst>
+        </pc:spChg>
+        <pc:spChg chg="add del mod">
+          <ac:chgData name="Markus Bilz" userId="a36021e4bdb9349f" providerId="LiveId" clId="{F9F2BE70-AAED-47FD-A055-7B08EB1371A3}" dt="2023-02-11T09:45:14.825" v="604" actId="478"/>
+          <ac:spMkLst>
+            <pc:docMk/>
+            <pc:sldMk cId="46556285" sldId="264"/>
+            <ac:spMk id="77" creationId="{87148100-8FE8-D56D-4376-4FF4C3F4371F}"/>
+          </ac:spMkLst>
+        </pc:spChg>
+        <pc:spChg chg="add del mod">
+          <ac:chgData name="Markus Bilz" userId="a36021e4bdb9349f" providerId="LiveId" clId="{F9F2BE70-AAED-47FD-A055-7B08EB1371A3}" dt="2023-02-11T09:45:09.361" v="603" actId="478"/>
+          <ac:spMkLst>
+            <pc:docMk/>
+            <pc:sldMk cId="46556285" sldId="264"/>
+            <ac:spMk id="78" creationId="{DEECE159-E2B3-FB57-033C-9E4AF26C1694}"/>
+          </ac:spMkLst>
+        </pc:spChg>
+        <pc:spChg chg="add del mod">
+          <ac:chgData name="Markus Bilz" userId="a36021e4bdb9349f" providerId="LiveId" clId="{F9F2BE70-AAED-47FD-A055-7B08EB1371A3}" dt="2023-02-11T09:45:09.361" v="603" actId="478"/>
+          <ac:spMkLst>
+            <pc:docMk/>
+            <pc:sldMk cId="46556285" sldId="264"/>
+            <ac:spMk id="79" creationId="{21B84879-E2CD-B81B-F1E2-2CAA35252BF9}"/>
+          </ac:spMkLst>
+        </pc:spChg>
+        <pc:spChg chg="add del mod">
+          <ac:chgData name="Markus Bilz" userId="a36021e4bdb9349f" providerId="LiveId" clId="{F9F2BE70-AAED-47FD-A055-7B08EB1371A3}" dt="2023-02-11T09:45:09.361" v="603" actId="478"/>
+          <ac:spMkLst>
+            <pc:docMk/>
+            <pc:sldMk cId="46556285" sldId="264"/>
+            <ac:spMk id="80" creationId="{61F4B552-B323-3E34-2B6B-81175E2B2E0D}"/>
+          </ac:spMkLst>
+        </pc:spChg>
+        <pc:spChg chg="add del mod">
+          <ac:chgData name="Markus Bilz" userId="a36021e4bdb9349f" providerId="LiveId" clId="{F9F2BE70-AAED-47FD-A055-7B08EB1371A3}" dt="2023-02-11T09:45:09.361" v="603" actId="478"/>
+          <ac:spMkLst>
+            <pc:docMk/>
+            <pc:sldMk cId="46556285" sldId="264"/>
+            <ac:spMk id="81" creationId="{56C72451-C725-D16F-6176-457CF498802E}"/>
+          </ac:spMkLst>
+        </pc:spChg>
+        <pc:spChg chg="add del mod">
+          <ac:chgData name="Markus Bilz" userId="a36021e4bdb9349f" providerId="LiveId" clId="{F9F2BE70-AAED-47FD-A055-7B08EB1371A3}" dt="2023-02-11T09:45:09.361" v="603" actId="478"/>
+          <ac:spMkLst>
+            <pc:docMk/>
+            <pc:sldMk cId="46556285" sldId="264"/>
+            <ac:spMk id="82" creationId="{6BC1D42D-E9B6-AAE7-E5E8-4574F12C33CB}"/>
+          </ac:spMkLst>
+        </pc:spChg>
+        <pc:spChg chg="add del mod">
+          <ac:chgData name="Markus Bilz" userId="a36021e4bdb9349f" providerId="LiveId" clId="{F9F2BE70-AAED-47FD-A055-7B08EB1371A3}" dt="2023-02-11T09:45:09.361" v="603" actId="478"/>
+          <ac:spMkLst>
+            <pc:docMk/>
+            <pc:sldMk cId="46556285" sldId="264"/>
+            <ac:spMk id="83" creationId="{C04D91D8-ED4B-1439-DBA7-2B6D19159798}"/>
+          </ac:spMkLst>
+        </pc:spChg>
+        <pc:spChg chg="add del mod">
+          <ac:chgData name="Markus Bilz" userId="a36021e4bdb9349f" providerId="LiveId" clId="{F9F2BE70-AAED-47FD-A055-7B08EB1371A3}" dt="2023-02-11T09:45:09.361" v="603" actId="478"/>
+          <ac:spMkLst>
+            <pc:docMk/>
+            <pc:sldMk cId="46556285" sldId="264"/>
+            <ac:spMk id="84" creationId="{750F197D-D415-13A5-33D8-58E45FD914A0}"/>
+          </ac:spMkLst>
+        </pc:spChg>
+        <pc:spChg chg="add del mod">
+          <ac:chgData name="Markus Bilz" userId="a36021e4bdb9349f" providerId="LiveId" clId="{F9F2BE70-AAED-47FD-A055-7B08EB1371A3}" dt="2023-02-11T09:38:41.497" v="546" actId="478"/>
+          <ac:spMkLst>
+            <pc:docMk/>
+            <pc:sldMk cId="46556285" sldId="264"/>
+            <ac:spMk id="85" creationId="{3C8792A3-5C40-75A4-DC54-6B01AE5DA634}"/>
+          </ac:spMkLst>
+        </pc:spChg>
+        <pc:spChg chg="add mod">
+          <ac:chgData name="Markus Bilz" userId="a36021e4bdb9349f" providerId="LiveId" clId="{F9F2BE70-AAED-47FD-A055-7B08EB1371A3}" dt="2023-02-11T10:04:38.357" v="750" actId="1076"/>
+          <ac:spMkLst>
+            <pc:docMk/>
+            <pc:sldMk cId="46556285" sldId="264"/>
+            <ac:spMk id="88" creationId="{906C47EB-AD61-7ACE-76A0-F9172022ABCD}"/>
+          </ac:spMkLst>
+        </pc:spChg>
+        <pc:spChg chg="add del mod">
+          <ac:chgData name="Markus Bilz" userId="a36021e4bdb9349f" providerId="LiveId" clId="{F9F2BE70-AAED-47FD-A055-7B08EB1371A3}" dt="2023-02-11T09:39:37.805" v="569" actId="478"/>
+          <ac:spMkLst>
+            <pc:docMk/>
+            <pc:sldMk cId="46556285" sldId="264"/>
+            <ac:spMk id="89" creationId="{FF36CA2A-C56D-64BE-2CFD-A3AC6E8D7738}"/>
+          </ac:spMkLst>
+        </pc:spChg>
+        <pc:spChg chg="add mod ord">
+          <ac:chgData name="Markus Bilz" userId="a36021e4bdb9349f" providerId="LiveId" clId="{F9F2BE70-AAED-47FD-A055-7B08EB1371A3}" dt="2023-02-11T10:04:38.357" v="750" actId="1076"/>
+          <ac:spMkLst>
+            <pc:docMk/>
+            <pc:sldMk cId="46556285" sldId="264"/>
+            <ac:spMk id="90" creationId="{164557EA-9DAD-9EAC-67E1-8F8AB1F8C97C}"/>
+          </ac:spMkLst>
+        </pc:spChg>
+        <pc:spChg chg="add mod ord">
+          <ac:chgData name="Markus Bilz" userId="a36021e4bdb9349f" providerId="LiveId" clId="{F9F2BE70-AAED-47FD-A055-7B08EB1371A3}" dt="2023-02-11T10:04:38.357" v="750" actId="1076"/>
+          <ac:spMkLst>
+            <pc:docMk/>
+            <pc:sldMk cId="46556285" sldId="264"/>
+            <ac:spMk id="91" creationId="{F474268A-B82E-9805-7CD2-7D29F7A3645C}"/>
+          </ac:spMkLst>
+        </pc:spChg>
+        <pc:spChg chg="add mod">
+          <ac:chgData name="Markus Bilz" userId="a36021e4bdb9349f" providerId="LiveId" clId="{F9F2BE70-AAED-47FD-A055-7B08EB1371A3}" dt="2023-02-11T10:04:38.357" v="750" actId="1076"/>
+          <ac:spMkLst>
+            <pc:docMk/>
+            <pc:sldMk cId="46556285" sldId="264"/>
+            <ac:spMk id="96" creationId="{FDC0E662-F332-71DA-D808-03B2BBCDCA22}"/>
+          </ac:spMkLst>
+        </pc:spChg>
+        <pc:spChg chg="add del mod">
+          <ac:chgData name="Markus Bilz" userId="a36021e4bdb9349f" providerId="LiveId" clId="{F9F2BE70-AAED-47FD-A055-7B08EB1371A3}" dt="2023-02-11T09:49:22.771" v="647" actId="478"/>
+          <ac:spMkLst>
+            <pc:docMk/>
+            <pc:sldMk cId="46556285" sldId="264"/>
+            <ac:spMk id="97" creationId="{0C9CD445-3AF4-F36D-3679-5D7066D2C7B6}"/>
+          </ac:spMkLst>
+        </pc:spChg>
+        <pc:spChg chg="add del mod">
+          <ac:chgData name="Markus Bilz" userId="a36021e4bdb9349f" providerId="LiveId" clId="{F9F2BE70-AAED-47FD-A055-7B08EB1371A3}" dt="2023-02-11T09:46:20.163" v="614" actId="478"/>
+          <ac:spMkLst>
+            <pc:docMk/>
+            <pc:sldMk cId="46556285" sldId="264"/>
+            <ac:spMk id="98" creationId="{F8B4F8F0-CD51-0221-F36C-402C959B31A2}"/>
+          </ac:spMkLst>
+        </pc:spChg>
+        <pc:spChg chg="add mod">
+          <ac:chgData name="Markus Bilz" userId="a36021e4bdb9349f" providerId="LiveId" clId="{F9F2BE70-AAED-47FD-A055-7B08EB1371A3}" dt="2023-02-11T10:04:38.357" v="750" actId="1076"/>
+          <ac:spMkLst>
+            <pc:docMk/>
+            <pc:sldMk cId="46556285" sldId="264"/>
+            <ac:spMk id="99" creationId="{3922EFF8-9A2B-5432-7B17-3D312C510E5F}"/>
+          </ac:spMkLst>
+        </pc:spChg>
+        <pc:spChg chg="add del mod">
+          <ac:chgData name="Markus Bilz" userId="a36021e4bdb9349f" providerId="LiveId" clId="{F9F2BE70-AAED-47FD-A055-7B08EB1371A3}" dt="2023-02-11T09:47:25.601" v="629" actId="478"/>
+          <ac:spMkLst>
+            <pc:docMk/>
+            <pc:sldMk cId="46556285" sldId="264"/>
+            <ac:spMk id="100" creationId="{516C3073-8C94-5AD6-4492-59874A7D5EEC}"/>
+          </ac:spMkLst>
+        </pc:spChg>
+        <pc:spChg chg="add mod">
+          <ac:chgData name="Markus Bilz" userId="a36021e4bdb9349f" providerId="LiveId" clId="{F9F2BE70-AAED-47FD-A055-7B08EB1371A3}" dt="2023-02-11T10:04:38.357" v="750" actId="1076"/>
+          <ac:spMkLst>
+            <pc:docMk/>
+            <pc:sldMk cId="46556285" sldId="264"/>
+            <ac:spMk id="101" creationId="{77735B34-F151-78D8-A7BD-2302FD6086E3}"/>
+          </ac:spMkLst>
+        </pc:spChg>
+        <pc:spChg chg="add mod">
+          <ac:chgData name="Markus Bilz" userId="a36021e4bdb9349f" providerId="LiveId" clId="{F9F2BE70-AAED-47FD-A055-7B08EB1371A3}" dt="2023-02-11T10:04:38.357" v="750" actId="1076"/>
+          <ac:spMkLst>
+            <pc:docMk/>
+            <pc:sldMk cId="46556285" sldId="264"/>
+            <ac:spMk id="102" creationId="{EA6CA36F-DC0D-9024-6CE8-1140AC4183CD}"/>
+          </ac:spMkLst>
+        </pc:spChg>
+        <pc:spChg chg="add del mod">
+          <ac:chgData name="Markus Bilz" userId="a36021e4bdb9349f" providerId="LiveId" clId="{F9F2BE70-AAED-47FD-A055-7B08EB1371A3}" dt="2023-02-11T09:48:43.346" v="643" actId="478"/>
+          <ac:spMkLst>
+            <pc:docMk/>
+            <pc:sldMk cId="46556285" sldId="264"/>
+            <ac:spMk id="103" creationId="{737B7924-8F26-70FB-70CD-263C5EBE8B5E}"/>
+          </ac:spMkLst>
+        </pc:spChg>
+        <pc:spChg chg="add mod">
+          <ac:chgData name="Markus Bilz" userId="a36021e4bdb9349f" providerId="LiveId" clId="{F9F2BE70-AAED-47FD-A055-7B08EB1371A3}" dt="2023-02-11T10:04:38.357" v="750" actId="1076"/>
+          <ac:spMkLst>
+            <pc:docMk/>
+            <pc:sldMk cId="46556285" sldId="264"/>
+            <ac:spMk id="104" creationId="{FF3230AF-BE60-F490-FC5F-F5CF3EABA02C}"/>
+          </ac:spMkLst>
+        </pc:spChg>
+        <pc:spChg chg="add mod">
+          <ac:chgData name="Markus Bilz" userId="a36021e4bdb9349f" providerId="LiveId" clId="{F9F2BE70-AAED-47FD-A055-7B08EB1371A3}" dt="2023-02-11T10:04:38.357" v="750" actId="1076"/>
+          <ac:spMkLst>
+            <pc:docMk/>
+            <pc:sldMk cId="46556285" sldId="264"/>
+            <ac:spMk id="105" creationId="{411D4D92-E79C-FEB5-5C88-08AF89C95640}"/>
+          </ac:spMkLst>
+        </pc:spChg>
+        <pc:spChg chg="add del mod">
+          <ac:chgData name="Markus Bilz" userId="a36021e4bdb9349f" providerId="LiveId" clId="{F9F2BE70-AAED-47FD-A055-7B08EB1371A3}" dt="2023-02-11T09:50:30.422" v="656" actId="478"/>
+          <ac:spMkLst>
+            <pc:docMk/>
+            <pc:sldMk cId="46556285" sldId="264"/>
+            <ac:spMk id="106" creationId="{F246FBDB-2312-4FA6-D713-CA37A1563860}"/>
+          </ac:spMkLst>
+        </pc:spChg>
+        <pc:spChg chg="add mod">
+          <ac:chgData name="Markus Bilz" userId="a36021e4bdb9349f" providerId="LiveId" clId="{F9F2BE70-AAED-47FD-A055-7B08EB1371A3}" dt="2023-02-11T10:04:38.357" v="750" actId="1076"/>
+          <ac:spMkLst>
+            <pc:docMk/>
+            <pc:sldMk cId="46556285" sldId="264"/>
+            <ac:spMk id="107" creationId="{63B2BF83-E8BD-710B-9FA9-E37853BCAF55}"/>
+          </ac:spMkLst>
+        </pc:spChg>
+        <pc:spChg chg="add mod">
+          <ac:chgData name="Markus Bilz" userId="a36021e4bdb9349f" providerId="LiveId" clId="{F9F2BE70-AAED-47FD-A055-7B08EB1371A3}" dt="2023-02-11T10:04:38.357" v="750" actId="1076"/>
+          <ac:spMkLst>
+            <pc:docMk/>
+            <pc:sldMk cId="46556285" sldId="264"/>
+            <ac:spMk id="108" creationId="{314141A1-F184-A050-4CC8-042212917CD5}"/>
+          </ac:spMkLst>
+        </pc:spChg>
+        <pc:spChg chg="add del mod">
+          <ac:chgData name="Markus Bilz" userId="a36021e4bdb9349f" providerId="LiveId" clId="{F9F2BE70-AAED-47FD-A055-7B08EB1371A3}" dt="2023-02-11T09:51:10.875" v="663" actId="478"/>
+          <ac:spMkLst>
+            <pc:docMk/>
+            <pc:sldMk cId="46556285" sldId="264"/>
+            <ac:spMk id="109" creationId="{BA89578B-FAA3-52F2-B3C3-E83BCE3D6C7E}"/>
+          </ac:spMkLst>
+        </pc:spChg>
+        <pc:spChg chg="add mod">
+          <ac:chgData name="Markus Bilz" userId="a36021e4bdb9349f" providerId="LiveId" clId="{F9F2BE70-AAED-47FD-A055-7B08EB1371A3}" dt="2023-02-11T10:04:38.357" v="750" actId="1076"/>
+          <ac:spMkLst>
+            <pc:docMk/>
+            <pc:sldMk cId="46556285" sldId="264"/>
+            <ac:spMk id="110" creationId="{9F4F3805-0B09-C164-7BE4-0789BDBF82FE}"/>
+          </ac:spMkLst>
+        </pc:spChg>
+        <pc:spChg chg="add mod">
+          <ac:chgData name="Markus Bilz" userId="a36021e4bdb9349f" providerId="LiveId" clId="{F9F2BE70-AAED-47FD-A055-7B08EB1371A3}" dt="2023-02-11T10:04:38.357" v="750" actId="1076"/>
+          <ac:spMkLst>
+            <pc:docMk/>
+            <pc:sldMk cId="46556285" sldId="264"/>
+            <ac:spMk id="111" creationId="{F8CEEFAF-0140-6F45-9886-456FC1B6749A}"/>
+          </ac:spMkLst>
+        </pc:spChg>
+        <pc:spChg chg="add mod">
+          <ac:chgData name="Markus Bilz" userId="a36021e4bdb9349f" providerId="LiveId" clId="{F9F2BE70-AAED-47FD-A055-7B08EB1371A3}" dt="2023-02-11T10:04:38.357" v="750" actId="1076"/>
+          <ac:spMkLst>
+            <pc:docMk/>
+            <pc:sldMk cId="46556285" sldId="264"/>
+            <ac:spMk id="114" creationId="{04ADBCB6-E2ED-33ED-1FE7-C8C9ED3A63F8}"/>
+          </ac:spMkLst>
+        </pc:spChg>
+        <pc:spChg chg="add mod">
+          <ac:chgData name="Markus Bilz" userId="a36021e4bdb9349f" providerId="LiveId" clId="{F9F2BE70-AAED-47FD-A055-7B08EB1371A3}" dt="2023-02-11T10:04:38.357" v="750" actId="1076"/>
+          <ac:spMkLst>
+            <pc:docMk/>
+            <pc:sldMk cId="46556285" sldId="264"/>
+            <ac:spMk id="115" creationId="{AB321A9A-FD04-53D5-91F4-A0C65B8D5FFF}"/>
+          </ac:spMkLst>
+        </pc:spChg>
+        <pc:spChg chg="add del mod">
+          <ac:chgData name="Markus Bilz" userId="a36021e4bdb9349f" providerId="LiveId" clId="{F9F2BE70-AAED-47FD-A055-7B08EB1371A3}" dt="2023-02-11T10:04:44.881" v="752" actId="478"/>
+          <ac:spMkLst>
+            <pc:docMk/>
+            <pc:sldMk cId="46556285" sldId="264"/>
+            <ac:spMk id="144" creationId="{DB45D975-36BA-D358-6343-E90942C6C6ED}"/>
+          </ac:spMkLst>
+        </pc:spChg>
+        <pc:grpChg chg="add mod">
+          <ac:chgData name="Markus Bilz" userId="a36021e4bdb9349f" providerId="LiveId" clId="{F9F2BE70-AAED-47FD-A055-7B08EB1371A3}" dt="2023-02-11T10:04:38.357" v="750" actId="1076"/>
+          <ac:grpSpMkLst>
+            <pc:docMk/>
+            <pc:sldMk cId="46556285" sldId="264"/>
+            <ac:grpSpMk id="124" creationId="{2244F4BB-BB2D-31B7-9A51-FFEADCE56E9E}"/>
+          </ac:grpSpMkLst>
+        </pc:grpChg>
+        <pc:grpChg chg="add mod ord">
+          <ac:chgData name="Markus Bilz" userId="a36021e4bdb9349f" providerId="LiveId" clId="{F9F2BE70-AAED-47FD-A055-7B08EB1371A3}" dt="2023-02-11T10:04:38.357" v="750" actId="1076"/>
+          <ac:grpSpMkLst>
+            <pc:docMk/>
+            <pc:sldMk cId="46556285" sldId="264"/>
+            <ac:grpSpMk id="125" creationId="{AB4F8EBF-01AD-B69D-6A21-45BD78F61BD1}"/>
+          </ac:grpSpMkLst>
+        </pc:grpChg>
+        <pc:grpChg chg="add mod ord">
+          <ac:chgData name="Markus Bilz" userId="a36021e4bdb9349f" providerId="LiveId" clId="{F9F2BE70-AAED-47FD-A055-7B08EB1371A3}" dt="2023-02-11T10:04:38.357" v="750" actId="1076"/>
+          <ac:grpSpMkLst>
+            <pc:docMk/>
+            <pc:sldMk cId="46556285" sldId="264"/>
+            <ac:grpSpMk id="131" creationId="{07B69A3C-21DA-D590-07FD-AB494CBC52F0}"/>
+          </ac:grpSpMkLst>
+        </pc:grpChg>
+        <pc:grpChg chg="add mod ord">
+          <ac:chgData name="Markus Bilz" userId="a36021e4bdb9349f" providerId="LiveId" clId="{F9F2BE70-AAED-47FD-A055-7B08EB1371A3}" dt="2023-02-11T11:01:54.048" v="806" actId="14100"/>
+          <ac:grpSpMkLst>
+            <pc:docMk/>
+            <pc:sldMk cId="46556285" sldId="264"/>
+            <ac:grpSpMk id="137" creationId="{3909BD29-37A1-9168-370E-1561BD62E282}"/>
+          </ac:grpSpMkLst>
+        </pc:grpChg>
+        <pc:picChg chg="add del mod">
+          <ac:chgData name="Markus Bilz" userId="a36021e4bdb9349f" providerId="LiveId" clId="{F9F2BE70-AAED-47FD-A055-7B08EB1371A3}" dt="2023-02-11T10:04:28.299" v="749" actId="478"/>
+          <ac:picMkLst>
+            <pc:docMk/>
+            <pc:sldMk cId="46556285" sldId="264"/>
+            <ac:picMk id="4" creationId="{E70A977A-C796-9B30-135E-C3AAF29DA747}"/>
+          </ac:picMkLst>
+        </pc:picChg>
+        <pc:picChg chg="del mod">
+          <ac:chgData name="Markus Bilz" userId="a36021e4bdb9349f" providerId="LiveId" clId="{F9F2BE70-AAED-47FD-A055-7B08EB1371A3}" dt="2023-02-11T10:04:40.670" v="751" actId="478"/>
+          <ac:picMkLst>
+            <pc:docMk/>
+            <pc:sldMk cId="46556285" sldId="264"/>
+            <ac:picMk id="5" creationId="{6A20F21E-4163-B9F0-D304-FA503742EB56}"/>
+          </ac:picMkLst>
+        </pc:picChg>
+        <pc:cxnChg chg="add del mod">
+          <ac:chgData name="Markus Bilz" userId="a36021e4bdb9349f" providerId="LiveId" clId="{F9F2BE70-AAED-47FD-A055-7B08EB1371A3}" dt="2023-02-11T09:41:22.663" v="581" actId="478"/>
+          <ac:cxnSpMkLst>
+            <pc:docMk/>
+            <pc:sldMk cId="46556285" sldId="264"/>
+            <ac:cxnSpMk id="8" creationId="{42D80AD7-7966-33F0-A9CB-BEE8BEC5F9B1}"/>
+          </ac:cxnSpMkLst>
+        </pc:cxnChg>
+        <pc:cxnChg chg="add del mod">
+          <ac:chgData name="Markus Bilz" userId="a36021e4bdb9349f" providerId="LiveId" clId="{F9F2BE70-AAED-47FD-A055-7B08EB1371A3}" dt="2023-02-11T09:41:24.916" v="583" actId="478"/>
+          <ac:cxnSpMkLst>
+            <pc:docMk/>
+            <pc:sldMk cId="46556285" sldId="264"/>
+            <ac:cxnSpMk id="9" creationId="{361B2F73-4771-8348-7C53-568916A12C86}"/>
+          </ac:cxnSpMkLst>
+        </pc:cxnChg>
+        <pc:cxnChg chg="add del mod">
+          <ac:chgData name="Markus Bilz" userId="a36021e4bdb9349f" providerId="LiveId" clId="{F9F2BE70-AAED-47FD-A055-7B08EB1371A3}" dt="2023-02-11T09:41:23.517" v="582" actId="478"/>
+          <ac:cxnSpMkLst>
+            <pc:docMk/>
+            <pc:sldMk cId="46556285" sldId="264"/>
+            <ac:cxnSpMk id="10" creationId="{A7891626-B602-FCB6-0759-B49BC9E5B9BC}"/>
+          </ac:cxnSpMkLst>
+        </pc:cxnChg>
+        <pc:cxnChg chg="add del mod">
+          <ac:chgData name="Markus Bilz" userId="a36021e4bdb9349f" providerId="LiveId" clId="{F9F2BE70-AAED-47FD-A055-7B08EB1371A3}" dt="2023-02-11T09:22:40.217" v="399" actId="478"/>
+          <ac:cxnSpMkLst>
+            <pc:docMk/>
+            <pc:sldMk cId="46556285" sldId="264"/>
+            <ac:cxnSpMk id="22" creationId="{05457888-4532-2FC4-ABEE-C354F2B1D56C}"/>
+          </ac:cxnSpMkLst>
+        </pc:cxnChg>
+        <pc:cxnChg chg="add del mod">
+          <ac:chgData name="Markus Bilz" userId="a36021e4bdb9349f" providerId="LiveId" clId="{F9F2BE70-AAED-47FD-A055-7B08EB1371A3}" dt="2023-02-11T09:22:40.217" v="399" actId="478"/>
+          <ac:cxnSpMkLst>
+            <pc:docMk/>
+            <pc:sldMk cId="46556285" sldId="264"/>
+            <ac:cxnSpMk id="23" creationId="{7359A266-65C9-0284-BA16-572E5BED63A5}"/>
+          </ac:cxnSpMkLst>
+        </pc:cxnChg>
+        <pc:cxnChg chg="add del mod">
+          <ac:chgData name="Markus Bilz" userId="a36021e4bdb9349f" providerId="LiveId" clId="{F9F2BE70-AAED-47FD-A055-7B08EB1371A3}" dt="2023-02-11T09:22:40.217" v="399" actId="478"/>
+          <ac:cxnSpMkLst>
+            <pc:docMk/>
+            <pc:sldMk cId="46556285" sldId="264"/>
+            <ac:cxnSpMk id="24" creationId="{099C4CE4-D257-6AD6-46F5-D1BA823699F2}"/>
+          </ac:cxnSpMkLst>
+        </pc:cxnChg>
+        <pc:cxnChg chg="add del mod">
+          <ac:chgData name="Markus Bilz" userId="a36021e4bdb9349f" providerId="LiveId" clId="{F9F2BE70-AAED-47FD-A055-7B08EB1371A3}" dt="2023-02-11T09:22:40.217" v="399" actId="478"/>
+          <ac:cxnSpMkLst>
+            <pc:docMk/>
+            <pc:sldMk cId="46556285" sldId="264"/>
+            <ac:cxnSpMk id="33" creationId="{C58B9E06-F4B5-9816-480E-90CBCDE8D50E}"/>
+          </ac:cxnSpMkLst>
+        </pc:cxnChg>
+        <pc:cxnChg chg="add del mod">
+          <ac:chgData name="Markus Bilz" userId="a36021e4bdb9349f" providerId="LiveId" clId="{F9F2BE70-AAED-47FD-A055-7B08EB1371A3}" dt="2023-02-11T09:22:40.217" v="399" actId="478"/>
+          <ac:cxnSpMkLst>
+            <pc:docMk/>
+            <pc:sldMk cId="46556285" sldId="264"/>
+            <ac:cxnSpMk id="34" creationId="{7E89E9A7-F7BC-7618-1FE2-582B6A7C20C1}"/>
+          </ac:cxnSpMkLst>
+        </pc:cxnChg>
+        <pc:cxnChg chg="add del mod">
+          <ac:chgData name="Markus Bilz" userId="a36021e4bdb9349f" providerId="LiveId" clId="{F9F2BE70-AAED-47FD-A055-7B08EB1371A3}" dt="2023-02-11T09:22:40.217" v="399" actId="478"/>
+          <ac:cxnSpMkLst>
+            <pc:docMk/>
+            <pc:sldMk cId="46556285" sldId="264"/>
+            <ac:cxnSpMk id="35" creationId="{6858DD52-E7E4-9DC4-51D7-71F43D777338}"/>
+          </ac:cxnSpMkLst>
+        </pc:cxnChg>
+        <pc:cxnChg chg="add del mod">
+          <ac:chgData name="Markus Bilz" userId="a36021e4bdb9349f" providerId="LiveId" clId="{F9F2BE70-AAED-47FD-A055-7B08EB1371A3}" dt="2023-02-11T09:38:22.338" v="544" actId="478"/>
+          <ac:cxnSpMkLst>
+            <pc:docMk/>
+            <pc:sldMk cId="46556285" sldId="264"/>
+            <ac:cxnSpMk id="53" creationId="{EF17A3EE-15D2-3B70-14FD-3E59AB081F70}"/>
+          </ac:cxnSpMkLst>
+        </pc:cxnChg>
+        <pc:cxnChg chg="add del mod">
+          <ac:chgData name="Markus Bilz" userId="a36021e4bdb9349f" providerId="LiveId" clId="{F9F2BE70-AAED-47FD-A055-7B08EB1371A3}" dt="2023-02-11T09:38:22.338" v="544" actId="478"/>
+          <ac:cxnSpMkLst>
+            <pc:docMk/>
+            <pc:sldMk cId="46556285" sldId="264"/>
+            <ac:cxnSpMk id="54" creationId="{A1976BDF-944E-D177-D318-9065C05C8003}"/>
+          </ac:cxnSpMkLst>
+        </pc:cxnChg>
+        <pc:cxnChg chg="add del mod">
+          <ac:chgData name="Markus Bilz" userId="a36021e4bdb9349f" providerId="LiveId" clId="{F9F2BE70-AAED-47FD-A055-7B08EB1371A3}" dt="2023-02-11T09:38:22.338" v="544" actId="478"/>
+          <ac:cxnSpMkLst>
+            <pc:docMk/>
+            <pc:sldMk cId="46556285" sldId="264"/>
+            <ac:cxnSpMk id="55" creationId="{E7EDDB80-C420-E3A6-7FEF-6D4B3414FF91}"/>
+          </ac:cxnSpMkLst>
+        </pc:cxnChg>
+        <pc:cxnChg chg="add del mod">
+          <ac:chgData name="Markus Bilz" userId="a36021e4bdb9349f" providerId="LiveId" clId="{F9F2BE70-AAED-47FD-A055-7B08EB1371A3}" dt="2023-02-11T09:26:16.017" v="414" actId="478"/>
+          <ac:cxnSpMkLst>
+            <pc:docMk/>
+            <pc:sldMk cId="46556285" sldId="264"/>
+            <ac:cxnSpMk id="65" creationId="{7F7B8AB2-34CB-EC76-A4E2-358495A643C1}"/>
+          </ac:cxnSpMkLst>
+        </pc:cxnChg>
+        <pc:cxnChg chg="add del mod">
+          <ac:chgData name="Markus Bilz" userId="a36021e4bdb9349f" providerId="LiveId" clId="{F9F2BE70-AAED-47FD-A055-7B08EB1371A3}" dt="2023-02-11T09:38:18.719" v="543" actId="478"/>
+          <ac:cxnSpMkLst>
+            <pc:docMk/>
+            <pc:sldMk cId="46556285" sldId="264"/>
+            <ac:cxnSpMk id="66" creationId="{D7A2DCCF-662D-9EB5-9B75-22B93C9D7781}"/>
+          </ac:cxnSpMkLst>
+        </pc:cxnChg>
+        <pc:cxnChg chg="add del mod">
+          <ac:chgData name="Markus Bilz" userId="a36021e4bdb9349f" providerId="LiveId" clId="{F9F2BE70-AAED-47FD-A055-7B08EB1371A3}" dt="2023-02-11T09:38:17.112" v="542" actId="478"/>
+          <ac:cxnSpMkLst>
+            <pc:docMk/>
+            <pc:sldMk cId="46556285" sldId="264"/>
+            <ac:cxnSpMk id="67" creationId="{7E027EB1-7192-2D38-BB29-54ADD74DB196}"/>
+          </ac:cxnSpMkLst>
+        </pc:cxnChg>
+        <pc:cxnChg chg="add del mod">
+          <ac:chgData name="Markus Bilz" userId="a36021e4bdb9349f" providerId="LiveId" clId="{F9F2BE70-AAED-47FD-A055-7B08EB1371A3}" dt="2023-02-11T09:38:17.112" v="542" actId="478"/>
+          <ac:cxnSpMkLst>
+            <pc:docMk/>
+            <pc:sldMk cId="46556285" sldId="264"/>
+            <ac:cxnSpMk id="68" creationId="{AA9DFE79-1EB8-CBFB-70A6-0BFF402F46BC}"/>
+          </ac:cxnSpMkLst>
+        </pc:cxnChg>
+        <pc:cxnChg chg="add mod ord">
+          <ac:chgData name="Markus Bilz" userId="a36021e4bdb9349f" providerId="LiveId" clId="{F9F2BE70-AAED-47FD-A055-7B08EB1371A3}" dt="2023-02-11T10:08:42.020" v="782" actId="14100"/>
+          <ac:cxnSpMkLst>
+            <pc:docMk/>
+            <pc:sldMk cId="46556285" sldId="264"/>
+            <ac:cxnSpMk id="86" creationId="{0386F30D-10FA-7F0D-3352-6615D2D0C02F}"/>
+          </ac:cxnSpMkLst>
+        </pc:cxnChg>
+        <pc:cxnChg chg="add mod ord">
+          <ac:chgData name="Markus Bilz" userId="a36021e4bdb9349f" providerId="LiveId" clId="{F9F2BE70-AAED-47FD-A055-7B08EB1371A3}" dt="2023-02-11T10:02:02.653" v="735" actId="1076"/>
+          <ac:cxnSpMkLst>
+            <pc:docMk/>
+            <pc:sldMk cId="46556285" sldId="264"/>
+            <ac:cxnSpMk id="94" creationId="{EBB37B5A-DCDD-FDD3-3DE2-FEC939EFA3ED}"/>
+          </ac:cxnSpMkLst>
+        </pc:cxnChg>
+        <pc:cxnChg chg="add mod ord">
+          <ac:chgData name="Markus Bilz" userId="a36021e4bdb9349f" providerId="LiveId" clId="{F9F2BE70-AAED-47FD-A055-7B08EB1371A3}" dt="2023-02-11T10:01:57.925" v="734" actId="1076"/>
+          <ac:cxnSpMkLst>
+            <pc:docMk/>
+            <pc:sldMk cId="46556285" sldId="264"/>
+            <ac:cxnSpMk id="95" creationId="{8C274EA9-5CE4-49D7-7B2B-4DA3CDA7EAD6}"/>
+          </ac:cxnSpMkLst>
+        </pc:cxnChg>
+        <pc:cxnChg chg="add mod ord">
+          <ac:chgData name="Markus Bilz" userId="a36021e4bdb9349f" providerId="LiveId" clId="{F9F2BE70-AAED-47FD-A055-7B08EB1371A3}" dt="2023-02-11T10:01:22.750" v="730" actId="1076"/>
+          <ac:cxnSpMkLst>
+            <pc:docMk/>
+            <pc:sldMk cId="46556285" sldId="264"/>
+            <ac:cxnSpMk id="112" creationId="{029CBB9B-6089-3EC3-8114-6E6D3B5A0FA0}"/>
+          </ac:cxnSpMkLst>
+        </pc:cxnChg>
+        <pc:cxnChg chg="add mod ord">
+          <ac:chgData name="Markus Bilz" userId="a36021e4bdb9349f" providerId="LiveId" clId="{F9F2BE70-AAED-47FD-A055-7B08EB1371A3}" dt="2023-02-11T10:01:02.663" v="729" actId="14100"/>
+          <ac:cxnSpMkLst>
+            <pc:docMk/>
+            <pc:sldMk cId="46556285" sldId="264"/>
+            <ac:cxnSpMk id="113" creationId="{A8321910-BA84-1E2C-9238-A71E688F0532}"/>
+          </ac:cxnSpMkLst>
+        </pc:cxnChg>
+        <pc:cxnChg chg="add del mod">
+          <ac:chgData name="Markus Bilz" userId="a36021e4bdb9349f" providerId="LiveId" clId="{F9F2BE70-AAED-47FD-A055-7B08EB1371A3}" dt="2023-02-11T09:59:13.033" v="718" actId="478"/>
+          <ac:cxnSpMkLst>
+            <pc:docMk/>
+            <pc:sldMk cId="46556285" sldId="264"/>
+            <ac:cxnSpMk id="116" creationId="{D55ED20F-0EB5-CFDF-DC1B-866B4708D494}"/>
+          </ac:cxnSpMkLst>
+        </pc:cxnChg>
+        <pc:cxnChg chg="add del mod">
+          <ac:chgData name="Markus Bilz" userId="a36021e4bdb9349f" providerId="LiveId" clId="{F9F2BE70-AAED-47FD-A055-7B08EB1371A3}" dt="2023-02-11T10:02:21.405" v="738" actId="478"/>
+          <ac:cxnSpMkLst>
+            <pc:docMk/>
+            <pc:sldMk cId="46556285" sldId="264"/>
+            <ac:cxnSpMk id="123" creationId="{40AA8BCB-3E33-64EA-F012-6E079B9B7736}"/>
+          </ac:cxnSpMkLst>
+        </pc:cxnChg>
+        <pc:cxnChg chg="mod">
+          <ac:chgData name="Markus Bilz" userId="a36021e4bdb9349f" providerId="LiveId" clId="{F9F2BE70-AAED-47FD-A055-7B08EB1371A3}" dt="2023-02-11T10:02:56.500" v="740"/>
+          <ac:cxnSpMkLst>
+            <pc:docMk/>
+            <pc:sldMk cId="46556285" sldId="264"/>
+            <ac:cxnSpMk id="126" creationId="{134B8A47-24F9-00C0-A92E-5FDD9D4126CE}"/>
+          </ac:cxnSpMkLst>
+        </pc:cxnChg>
+        <pc:cxnChg chg="mod">
+          <ac:chgData name="Markus Bilz" userId="a36021e4bdb9349f" providerId="LiveId" clId="{F9F2BE70-AAED-47FD-A055-7B08EB1371A3}" dt="2023-02-11T10:02:56.500" v="740"/>
+          <ac:cxnSpMkLst>
+            <pc:docMk/>
+            <pc:sldMk cId="46556285" sldId="264"/>
+            <ac:cxnSpMk id="127" creationId="{40D708CD-5125-DE38-FFC5-DBB1912AC14B}"/>
+          </ac:cxnSpMkLst>
+        </pc:cxnChg>
+        <pc:cxnChg chg="mod">
+          <ac:chgData name="Markus Bilz" userId="a36021e4bdb9349f" providerId="LiveId" clId="{F9F2BE70-AAED-47FD-A055-7B08EB1371A3}" dt="2023-02-11T10:02:56.500" v="740"/>
+          <ac:cxnSpMkLst>
+            <pc:docMk/>
+            <pc:sldMk cId="46556285" sldId="264"/>
+            <ac:cxnSpMk id="128" creationId="{34AF6990-E5D1-FEE8-0916-298DFF5E39FC}"/>
+          </ac:cxnSpMkLst>
+        </pc:cxnChg>
+        <pc:cxnChg chg="mod">
+          <ac:chgData name="Markus Bilz" userId="a36021e4bdb9349f" providerId="LiveId" clId="{F9F2BE70-AAED-47FD-A055-7B08EB1371A3}" dt="2023-02-11T10:02:56.500" v="740"/>
+          <ac:cxnSpMkLst>
+            <pc:docMk/>
+            <pc:sldMk cId="46556285" sldId="264"/>
+            <ac:cxnSpMk id="129" creationId="{161D42A6-492C-E676-4D70-89F4145B6D26}"/>
+          </ac:cxnSpMkLst>
+        </pc:cxnChg>
+        <pc:cxnChg chg="mod">
+          <ac:chgData name="Markus Bilz" userId="a36021e4bdb9349f" providerId="LiveId" clId="{F9F2BE70-AAED-47FD-A055-7B08EB1371A3}" dt="2023-02-11T10:02:56.500" v="740"/>
+          <ac:cxnSpMkLst>
+            <pc:docMk/>
+            <pc:sldMk cId="46556285" sldId="264"/>
+            <ac:cxnSpMk id="130" creationId="{ACB0926E-422D-2C8F-702E-CB6E65842C24}"/>
+          </ac:cxnSpMkLst>
+        </pc:cxnChg>
+        <pc:cxnChg chg="mod">
+          <ac:chgData name="Markus Bilz" userId="a36021e4bdb9349f" providerId="LiveId" clId="{F9F2BE70-AAED-47FD-A055-7B08EB1371A3}" dt="2023-02-11T10:03:11.195" v="742"/>
+          <ac:cxnSpMkLst>
+            <pc:docMk/>
+            <pc:sldMk cId="46556285" sldId="264"/>
+            <ac:cxnSpMk id="132" creationId="{A64E4DD7-6D18-7E9E-0600-9C7879620A3A}"/>
+          </ac:cxnSpMkLst>
+        </pc:cxnChg>
+        <pc:cxnChg chg="mod">
+          <ac:chgData name="Markus Bilz" userId="a36021e4bdb9349f" providerId="LiveId" clId="{F9F2BE70-AAED-47FD-A055-7B08EB1371A3}" dt="2023-02-11T10:03:11.195" v="742"/>
+          <ac:cxnSpMkLst>
+            <pc:docMk/>
+            <pc:sldMk cId="46556285" sldId="264"/>
+            <ac:cxnSpMk id="133" creationId="{A383301E-09DB-CA6E-3A0F-0578BDBD2CAA}"/>
+          </ac:cxnSpMkLst>
+        </pc:cxnChg>
+        <pc:cxnChg chg="mod">
+          <ac:chgData name="Markus Bilz" userId="a36021e4bdb9349f" providerId="LiveId" clId="{F9F2BE70-AAED-47FD-A055-7B08EB1371A3}" dt="2023-02-11T10:03:11.195" v="742"/>
+          <ac:cxnSpMkLst>
+            <pc:docMk/>
+            <pc:sldMk cId="46556285" sldId="264"/>
+            <ac:cxnSpMk id="134" creationId="{C93E0498-4A57-CD28-E4C1-B4CDE4CFF956}"/>
+          </ac:cxnSpMkLst>
+        </pc:cxnChg>
+        <pc:cxnChg chg="mod">
+          <ac:chgData name="Markus Bilz" userId="a36021e4bdb9349f" providerId="LiveId" clId="{F9F2BE70-AAED-47FD-A055-7B08EB1371A3}" dt="2023-02-11T10:03:11.195" v="742"/>
+          <ac:cxnSpMkLst>
+            <pc:docMk/>
+            <pc:sldMk cId="46556285" sldId="264"/>
+            <ac:cxnSpMk id="135" creationId="{9B1DFF46-0354-8960-C03F-B397D9D38944}"/>
+          </ac:cxnSpMkLst>
+        </pc:cxnChg>
+        <pc:cxnChg chg="mod">
+          <ac:chgData name="Markus Bilz" userId="a36021e4bdb9349f" providerId="LiveId" clId="{F9F2BE70-AAED-47FD-A055-7B08EB1371A3}" dt="2023-02-11T10:03:11.195" v="742"/>
+          <ac:cxnSpMkLst>
+            <pc:docMk/>
+            <pc:sldMk cId="46556285" sldId="264"/>
+            <ac:cxnSpMk id="136" creationId="{8824C2EF-190A-F64C-5976-2F93ADEC79B9}"/>
+          </ac:cxnSpMkLst>
+        </pc:cxnChg>
+        <pc:cxnChg chg="mod">
+          <ac:chgData name="Markus Bilz" userId="a36021e4bdb9349f" providerId="LiveId" clId="{F9F2BE70-AAED-47FD-A055-7B08EB1371A3}" dt="2023-02-11T10:03:23.197" v="744"/>
+          <ac:cxnSpMkLst>
+            <pc:docMk/>
+            <pc:sldMk cId="46556285" sldId="264"/>
+            <ac:cxnSpMk id="138" creationId="{B0AA4247-10B1-385E-EC79-A8352759F5BD}"/>
+          </ac:cxnSpMkLst>
+        </pc:cxnChg>
+        <pc:cxnChg chg="mod">
+          <ac:chgData name="Markus Bilz" userId="a36021e4bdb9349f" providerId="LiveId" clId="{F9F2BE70-AAED-47FD-A055-7B08EB1371A3}" dt="2023-02-11T10:03:23.197" v="744"/>
+          <ac:cxnSpMkLst>
+            <pc:docMk/>
+            <pc:sldMk cId="46556285" sldId="264"/>
+            <ac:cxnSpMk id="139" creationId="{5102983F-36E7-BD02-8ED4-A903092054AE}"/>
+          </ac:cxnSpMkLst>
+        </pc:cxnChg>
+        <pc:cxnChg chg="mod">
+          <ac:chgData name="Markus Bilz" userId="a36021e4bdb9349f" providerId="LiveId" clId="{F9F2BE70-AAED-47FD-A055-7B08EB1371A3}" dt="2023-02-11T10:03:23.197" v="744"/>
+          <ac:cxnSpMkLst>
+            <pc:docMk/>
+            <pc:sldMk cId="46556285" sldId="264"/>
+            <ac:cxnSpMk id="140" creationId="{B65B3F9A-A5A4-779A-1BF4-F079B6D04B7F}"/>
+          </ac:cxnSpMkLst>
+        </pc:cxnChg>
+        <pc:cxnChg chg="mod">
+          <ac:chgData name="Markus Bilz" userId="a36021e4bdb9349f" providerId="LiveId" clId="{F9F2BE70-AAED-47FD-A055-7B08EB1371A3}" dt="2023-02-11T10:03:23.197" v="744"/>
+          <ac:cxnSpMkLst>
+            <pc:docMk/>
+            <pc:sldMk cId="46556285" sldId="264"/>
+            <ac:cxnSpMk id="141" creationId="{A6C1D843-AD1A-4B91-2AF9-BBF77506EF31}"/>
+          </ac:cxnSpMkLst>
+        </pc:cxnChg>
+        <pc:cxnChg chg="mod">
+          <ac:chgData name="Markus Bilz" userId="a36021e4bdb9349f" providerId="LiveId" clId="{F9F2BE70-AAED-47FD-A055-7B08EB1371A3}" dt="2023-02-11T10:03:23.197" v="744"/>
+          <ac:cxnSpMkLst>
+            <pc:docMk/>
+            <pc:sldMk cId="46556285" sldId="264"/>
+            <ac:cxnSpMk id="142" creationId="{2F215BA5-170C-890F-44FE-19C9BCE111D1}"/>
+          </ac:cxnSpMkLst>
+        </pc:cxnChg>
+        <pc:cxnChg chg="add del mod">
+          <ac:chgData name="Markus Bilz" userId="a36021e4bdb9349f" providerId="LiveId" clId="{F9F2BE70-AAED-47FD-A055-7B08EB1371A3}" dt="2023-02-11T10:08:47.076" v="791"/>
+          <ac:cxnSpMkLst>
+            <pc:docMk/>
+            <pc:sldMk cId="46556285" sldId="264"/>
+            <ac:cxnSpMk id="145" creationId="{B8A52E84-53EF-7669-054A-D96ADC43C8FD}"/>
+          </ac:cxnSpMkLst>
+        </pc:cxnChg>
+        <pc:cxnChg chg="add del mod">
+          <ac:chgData name="Markus Bilz" userId="a36021e4bdb9349f" providerId="LiveId" clId="{F9F2BE70-AAED-47FD-A055-7B08EB1371A3}" dt="2023-02-11T10:08:45.199" v="788"/>
+          <ac:cxnSpMkLst>
+            <pc:docMk/>
+            <pc:sldMk cId="46556285" sldId="264"/>
+            <ac:cxnSpMk id="148" creationId="{001ED41C-47D7-26DC-6CB4-0A398CE21B90}"/>
+          </ac:cxnSpMkLst>
+        </pc:cxnChg>
+        <pc:cxnChg chg="add del mod">
+          <ac:chgData name="Markus Bilz" userId="a36021e4bdb9349f" providerId="LiveId" clId="{F9F2BE70-AAED-47FD-A055-7B08EB1371A3}" dt="2023-02-11T10:08:41.401" v="781"/>
+          <ac:cxnSpMkLst>
+            <pc:docMk/>
+            <pc:sldMk cId="46556285" sldId="264"/>
+            <ac:cxnSpMk id="152" creationId="{5BBCE23B-25F3-B344-53B7-D4B2D15E6400}"/>
+          </ac:cxnSpMkLst>
+        </pc:cxnChg>
+        <pc:cxnChg chg="add del mod">
+          <ac:chgData name="Markus Bilz" userId="a36021e4bdb9349f" providerId="LiveId" clId="{F9F2BE70-AAED-47FD-A055-7B08EB1371A3}" dt="2023-02-11T10:08:40.627" v="779"/>
+          <ac:cxnSpMkLst>
+            <pc:docMk/>
+            <pc:sldMk cId="46556285" sldId="264"/>
+            <ac:cxnSpMk id="153" creationId="{1B2A426B-800A-347E-6FE3-2426E80E1716}"/>
+          </ac:cxnSpMkLst>
+        </pc:cxnChg>
+        <pc:cxnChg chg="add del mod">
+          <ac:chgData name="Markus Bilz" userId="a36021e4bdb9349f" providerId="LiveId" clId="{F9F2BE70-AAED-47FD-A055-7B08EB1371A3}" dt="2023-02-11T10:08:39.474" v="776"/>
+          <ac:cxnSpMkLst>
+            <pc:docMk/>
+            <pc:sldMk cId="46556285" sldId="264"/>
+            <ac:cxnSpMk id="155" creationId="{187CA740-ECBD-3C15-E2B0-22241DC820F1}"/>
           </ac:cxnSpMkLst>
         </pc:cxnChg>
       </pc:sldChg>
@@ -5614,7 +6669,7 @@
           <a:p>
             <a:fld id="{D6A82EB2-151D-4EEE-ACF5-92C73278C09C}" type="datetimeFigureOut">
               <a:rPr lang="en-GB" smtClean="0"/>
-              <a:t>31/01/2023</a:t>
+              <a:t>11/02/2023</a:t>
             </a:fld>
             <a:endParaRPr lang="en-GB"/>
           </a:p>
@@ -5814,7 +6869,7 @@
           <a:p>
             <a:fld id="{D6A82EB2-151D-4EEE-ACF5-92C73278C09C}" type="datetimeFigureOut">
               <a:rPr lang="en-GB" smtClean="0"/>
-              <a:t>31/01/2023</a:t>
+              <a:t>11/02/2023</a:t>
             </a:fld>
             <a:endParaRPr lang="en-GB"/>
           </a:p>
@@ -6024,7 +7079,7 @@
           <a:p>
             <a:fld id="{D6A82EB2-151D-4EEE-ACF5-92C73278C09C}" type="datetimeFigureOut">
               <a:rPr lang="en-GB" smtClean="0"/>
-              <a:t>31/01/2023</a:t>
+              <a:t>11/02/2023</a:t>
             </a:fld>
             <a:endParaRPr lang="en-GB"/>
           </a:p>
@@ -6224,7 +7279,7 @@
           <a:p>
             <a:fld id="{D6A82EB2-151D-4EEE-ACF5-92C73278C09C}" type="datetimeFigureOut">
               <a:rPr lang="en-GB" smtClean="0"/>
-              <a:t>31/01/2023</a:t>
+              <a:t>11/02/2023</a:t>
             </a:fld>
             <a:endParaRPr lang="en-GB"/>
           </a:p>
@@ -6500,7 +7555,7 @@
           <a:p>
             <a:fld id="{D6A82EB2-151D-4EEE-ACF5-92C73278C09C}" type="datetimeFigureOut">
               <a:rPr lang="en-GB" smtClean="0"/>
-              <a:t>31/01/2023</a:t>
+              <a:t>11/02/2023</a:t>
             </a:fld>
             <a:endParaRPr lang="en-GB"/>
           </a:p>
@@ -6768,7 +7823,7 @@
           <a:p>
             <a:fld id="{D6A82EB2-151D-4EEE-ACF5-92C73278C09C}" type="datetimeFigureOut">
               <a:rPr lang="en-GB" smtClean="0"/>
-              <a:t>31/01/2023</a:t>
+              <a:t>11/02/2023</a:t>
             </a:fld>
             <a:endParaRPr lang="en-GB"/>
           </a:p>
@@ -7183,7 +8238,7 @@
           <a:p>
             <a:fld id="{D6A82EB2-151D-4EEE-ACF5-92C73278C09C}" type="datetimeFigureOut">
               <a:rPr lang="en-GB" smtClean="0"/>
-              <a:t>31/01/2023</a:t>
+              <a:t>11/02/2023</a:t>
             </a:fld>
             <a:endParaRPr lang="en-GB"/>
           </a:p>
@@ -7325,7 +8380,7 @@
           <a:p>
             <a:fld id="{D6A82EB2-151D-4EEE-ACF5-92C73278C09C}" type="datetimeFigureOut">
               <a:rPr lang="en-GB" smtClean="0"/>
-              <a:t>31/01/2023</a:t>
+              <a:t>11/02/2023</a:t>
             </a:fld>
             <a:endParaRPr lang="en-GB"/>
           </a:p>
@@ -7438,7 +8493,7 @@
           <a:p>
             <a:fld id="{D6A82EB2-151D-4EEE-ACF5-92C73278C09C}" type="datetimeFigureOut">
               <a:rPr lang="en-GB" smtClean="0"/>
-              <a:t>31/01/2023</a:t>
+              <a:t>11/02/2023</a:t>
             </a:fld>
             <a:endParaRPr lang="en-GB"/>
           </a:p>
@@ -7751,7 +8806,7 @@
           <a:p>
             <a:fld id="{D6A82EB2-151D-4EEE-ACF5-92C73278C09C}" type="datetimeFigureOut">
               <a:rPr lang="en-GB" smtClean="0"/>
-              <a:t>31/01/2023</a:t>
+              <a:t>11/02/2023</a:t>
             </a:fld>
             <a:endParaRPr lang="en-GB"/>
           </a:p>
@@ -8040,7 +9095,7 @@
           <a:p>
             <a:fld id="{D6A82EB2-151D-4EEE-ACF5-92C73278C09C}" type="datetimeFigureOut">
               <a:rPr lang="en-GB" smtClean="0"/>
-              <a:t>31/01/2023</a:t>
+              <a:t>11/02/2023</a:t>
             </a:fld>
             <a:endParaRPr lang="en-GB"/>
           </a:p>
@@ -8283,7 +9338,7 @@
           <a:p>
             <a:fld id="{D6A82EB2-151D-4EEE-ACF5-92C73278C09C}" type="datetimeFigureOut">
               <a:rPr lang="en-GB" smtClean="0"/>
-              <a:t>31/01/2023</a:t>
+              <a:t>11/02/2023</a:t>
             </a:fld>
             <a:endParaRPr lang="en-GB"/>
           </a:p>
@@ -15700,7 +16755,7 @@
         </p:blipFill>
         <p:spPr>
           <a:xfrm>
-            <a:off x="2228144" y="1825625"/>
+            <a:off x="2116001" y="764575"/>
             <a:ext cx="7735712" cy="4351338"/>
           </a:xfrm>
         </p:spPr>
@@ -15719,6 +16774,2224 @@
 </file>
 
 <file path=ppt/slides/slide4.xml><?xml version="1.0" encoding="utf-8"?>
+<p:sld xmlns:a="http://schemas.openxmlformats.org/drawingml/2006/main" xmlns:r="http://schemas.openxmlformats.org/officeDocument/2006/relationships" xmlns:p="http://schemas.openxmlformats.org/presentationml/2006/main">
+  <p:cSld>
+    <p:spTree>
+      <p:nvGrpSpPr>
+        <p:cNvPr id="1" name=""/>
+        <p:cNvGrpSpPr/>
+        <p:nvPr/>
+      </p:nvGrpSpPr>
+      <p:grpSpPr>
+        <a:xfrm>
+          <a:off x="0" y="0"/>
+          <a:ext cx="0" cy="0"/>
+          <a:chOff x="0" y="0"/>
+          <a:chExt cx="0" cy="0"/>
+        </a:xfrm>
+      </p:grpSpPr>
+      <p:grpSp>
+        <p:nvGrpSpPr>
+          <p:cNvPr id="125" name="Group 124">
+            <a:extLst>
+              <a:ext uri="{FF2B5EF4-FFF2-40B4-BE49-F238E27FC236}">
+                <a16:creationId xmlns:a16="http://schemas.microsoft.com/office/drawing/2014/main" id="{AB4F8EBF-01AD-B69D-6A21-45BD78F61BD1}"/>
+              </a:ext>
+            </a:extLst>
+          </p:cNvPr>
+          <p:cNvGrpSpPr/>
+          <p:nvPr/>
+        </p:nvGrpSpPr>
+        <p:grpSpPr>
+          <a:xfrm>
+            <a:off x="3580130" y="2284195"/>
+            <a:ext cx="1342160" cy="2003584"/>
+            <a:chOff x="687705" y="3392270"/>
+            <a:chExt cx="1342160" cy="2003584"/>
+          </a:xfrm>
+        </p:grpSpPr>
+        <p:cxnSp>
+          <p:nvCxnSpPr>
+            <p:cNvPr id="126" name="Straight Connector 125">
+              <a:extLst>
+                <a:ext uri="{FF2B5EF4-FFF2-40B4-BE49-F238E27FC236}">
+                  <a16:creationId xmlns:a16="http://schemas.microsoft.com/office/drawing/2014/main" id="{134B8A47-24F9-00C0-A92E-5FDD9D4126CE}"/>
+                </a:ext>
+              </a:extLst>
+            </p:cNvPr>
+            <p:cNvCxnSpPr>
+              <a:cxnSpLocks/>
+            </p:cNvCxnSpPr>
+            <p:nvPr/>
+          </p:nvCxnSpPr>
+          <p:spPr>
+            <a:xfrm>
+              <a:off x="689610" y="5395854"/>
+              <a:ext cx="1332000" cy="0"/>
+            </a:xfrm>
+            <a:prstGeom prst="line">
+              <a:avLst/>
+            </a:prstGeom>
+            <a:ln w="12700">
+              <a:solidFill>
+                <a:schemeClr val="tx1"/>
+              </a:solidFill>
+              <a:prstDash val="dash"/>
+            </a:ln>
+          </p:spPr>
+          <p:style>
+            <a:lnRef idx="1">
+              <a:schemeClr val="accent3"/>
+            </a:lnRef>
+            <a:fillRef idx="0">
+              <a:schemeClr val="accent3"/>
+            </a:fillRef>
+            <a:effectRef idx="0">
+              <a:schemeClr val="accent3"/>
+            </a:effectRef>
+            <a:fontRef idx="minor">
+              <a:schemeClr val="tx1"/>
+            </a:fontRef>
+          </p:style>
+        </p:cxnSp>
+        <p:cxnSp>
+          <p:nvCxnSpPr>
+            <p:cNvPr id="127" name="Straight Connector 126">
+              <a:extLst>
+                <a:ext uri="{FF2B5EF4-FFF2-40B4-BE49-F238E27FC236}">
+                  <a16:creationId xmlns:a16="http://schemas.microsoft.com/office/drawing/2014/main" id="{40D708CD-5125-DE38-FFC5-DBB1912AC14B}"/>
+                </a:ext>
+              </a:extLst>
+            </p:cNvPr>
+            <p:cNvCxnSpPr>
+              <a:cxnSpLocks/>
+            </p:cNvCxnSpPr>
+            <p:nvPr/>
+          </p:nvCxnSpPr>
+          <p:spPr>
+            <a:xfrm>
+              <a:off x="690562" y="4398586"/>
+              <a:ext cx="1332000" cy="0"/>
+            </a:xfrm>
+            <a:prstGeom prst="line">
+              <a:avLst/>
+            </a:prstGeom>
+            <a:ln w="12700">
+              <a:solidFill>
+                <a:schemeClr val="tx1"/>
+              </a:solidFill>
+              <a:prstDash val="dash"/>
+            </a:ln>
+          </p:spPr>
+          <p:style>
+            <a:lnRef idx="1">
+              <a:schemeClr val="accent3"/>
+            </a:lnRef>
+            <a:fillRef idx="0">
+              <a:schemeClr val="accent3"/>
+            </a:fillRef>
+            <a:effectRef idx="0">
+              <a:schemeClr val="accent3"/>
+            </a:effectRef>
+            <a:fontRef idx="minor">
+              <a:schemeClr val="tx1"/>
+            </a:fontRef>
+          </p:style>
+        </p:cxnSp>
+        <p:cxnSp>
+          <p:nvCxnSpPr>
+            <p:cNvPr id="128" name="Straight Connector 127">
+              <a:extLst>
+                <a:ext uri="{FF2B5EF4-FFF2-40B4-BE49-F238E27FC236}">
+                  <a16:creationId xmlns:a16="http://schemas.microsoft.com/office/drawing/2014/main" id="{34AF6990-E5D1-FEE8-0916-298DFF5E39FC}"/>
+                </a:ext>
+              </a:extLst>
+            </p:cNvPr>
+            <p:cNvCxnSpPr>
+              <a:cxnSpLocks/>
+            </p:cNvCxnSpPr>
+            <p:nvPr/>
+          </p:nvCxnSpPr>
+          <p:spPr>
+            <a:xfrm>
+              <a:off x="688657" y="3392270"/>
+              <a:ext cx="1332000" cy="0"/>
+            </a:xfrm>
+            <a:prstGeom prst="line">
+              <a:avLst/>
+            </a:prstGeom>
+            <a:ln w="12700">
+              <a:solidFill>
+                <a:schemeClr val="tx1"/>
+              </a:solidFill>
+              <a:prstDash val="dash"/>
+            </a:ln>
+          </p:spPr>
+          <p:style>
+            <a:lnRef idx="1">
+              <a:schemeClr val="accent3"/>
+            </a:lnRef>
+            <a:fillRef idx="0">
+              <a:schemeClr val="accent3"/>
+            </a:fillRef>
+            <a:effectRef idx="0">
+              <a:schemeClr val="accent3"/>
+            </a:effectRef>
+            <a:fontRef idx="minor">
+              <a:schemeClr val="tx1"/>
+            </a:fontRef>
+          </p:style>
+        </p:cxnSp>
+        <p:cxnSp>
+          <p:nvCxnSpPr>
+            <p:cNvPr id="129" name="Straight Connector 128">
+              <a:extLst>
+                <a:ext uri="{FF2B5EF4-FFF2-40B4-BE49-F238E27FC236}">
+                  <a16:creationId xmlns:a16="http://schemas.microsoft.com/office/drawing/2014/main" id="{161D42A6-492C-E676-4D70-89F4145B6D26}"/>
+                </a:ext>
+              </a:extLst>
+            </p:cNvPr>
+            <p:cNvCxnSpPr>
+              <a:cxnSpLocks/>
+            </p:cNvCxnSpPr>
+            <p:nvPr/>
+          </p:nvCxnSpPr>
+          <p:spPr>
+            <a:xfrm>
+              <a:off x="697865" y="4846420"/>
+              <a:ext cx="1332000" cy="0"/>
+            </a:xfrm>
+            <a:prstGeom prst="line">
+              <a:avLst/>
+            </a:prstGeom>
+            <a:ln w="12700">
+              <a:prstDash val="dash"/>
+            </a:ln>
+          </p:spPr>
+          <p:style>
+            <a:lnRef idx="1">
+              <a:schemeClr val="accent3"/>
+            </a:lnRef>
+            <a:fillRef idx="0">
+              <a:schemeClr val="accent3"/>
+            </a:fillRef>
+            <a:effectRef idx="0">
+              <a:schemeClr val="accent3"/>
+            </a:effectRef>
+            <a:fontRef idx="minor">
+              <a:schemeClr val="tx1"/>
+            </a:fontRef>
+          </p:style>
+        </p:cxnSp>
+        <p:cxnSp>
+          <p:nvCxnSpPr>
+            <p:cNvPr id="130" name="Straight Connector 129">
+              <a:extLst>
+                <a:ext uri="{FF2B5EF4-FFF2-40B4-BE49-F238E27FC236}">
+                  <a16:creationId xmlns:a16="http://schemas.microsoft.com/office/drawing/2014/main" id="{ACB0926E-422D-2C8F-702E-CB6E65842C24}"/>
+                </a:ext>
+              </a:extLst>
+            </p:cNvPr>
+            <p:cNvCxnSpPr>
+              <a:cxnSpLocks/>
+            </p:cNvCxnSpPr>
+            <p:nvPr/>
+          </p:nvCxnSpPr>
+          <p:spPr>
+            <a:xfrm>
+              <a:off x="687705" y="3949165"/>
+              <a:ext cx="1332000" cy="0"/>
+            </a:xfrm>
+            <a:prstGeom prst="line">
+              <a:avLst/>
+            </a:prstGeom>
+            <a:ln w="12700">
+              <a:prstDash val="dash"/>
+            </a:ln>
+          </p:spPr>
+          <p:style>
+            <a:lnRef idx="1">
+              <a:schemeClr val="accent3"/>
+            </a:lnRef>
+            <a:fillRef idx="0">
+              <a:schemeClr val="accent3"/>
+            </a:fillRef>
+            <a:effectRef idx="0">
+              <a:schemeClr val="accent3"/>
+            </a:effectRef>
+            <a:fontRef idx="minor">
+              <a:schemeClr val="tx1"/>
+            </a:fontRef>
+          </p:style>
+        </p:cxnSp>
+      </p:grpSp>
+      <p:grpSp>
+        <p:nvGrpSpPr>
+          <p:cNvPr id="131" name="Group 130">
+            <a:extLst>
+              <a:ext uri="{FF2B5EF4-FFF2-40B4-BE49-F238E27FC236}">
+                <a16:creationId xmlns:a16="http://schemas.microsoft.com/office/drawing/2014/main" id="{07B69A3C-21DA-D590-07FD-AB494CBC52F0}"/>
+              </a:ext>
+            </a:extLst>
+          </p:cNvPr>
+          <p:cNvGrpSpPr/>
+          <p:nvPr/>
+        </p:nvGrpSpPr>
+        <p:grpSpPr>
+          <a:xfrm>
+            <a:off x="5289867" y="2284195"/>
+            <a:ext cx="1342160" cy="2003584"/>
+            <a:chOff x="687705" y="3392270"/>
+            <a:chExt cx="1342160" cy="2003584"/>
+          </a:xfrm>
+        </p:grpSpPr>
+        <p:cxnSp>
+          <p:nvCxnSpPr>
+            <p:cNvPr id="132" name="Straight Connector 131">
+              <a:extLst>
+                <a:ext uri="{FF2B5EF4-FFF2-40B4-BE49-F238E27FC236}">
+                  <a16:creationId xmlns:a16="http://schemas.microsoft.com/office/drawing/2014/main" id="{A64E4DD7-6D18-7E9E-0600-9C7879620A3A}"/>
+                </a:ext>
+              </a:extLst>
+            </p:cNvPr>
+            <p:cNvCxnSpPr>
+              <a:cxnSpLocks/>
+            </p:cNvCxnSpPr>
+            <p:nvPr/>
+          </p:nvCxnSpPr>
+          <p:spPr>
+            <a:xfrm>
+              <a:off x="689610" y="5395854"/>
+              <a:ext cx="1332000" cy="0"/>
+            </a:xfrm>
+            <a:prstGeom prst="line">
+              <a:avLst/>
+            </a:prstGeom>
+            <a:ln w="12700">
+              <a:solidFill>
+                <a:schemeClr val="tx1"/>
+              </a:solidFill>
+              <a:prstDash val="dash"/>
+            </a:ln>
+          </p:spPr>
+          <p:style>
+            <a:lnRef idx="1">
+              <a:schemeClr val="accent3"/>
+            </a:lnRef>
+            <a:fillRef idx="0">
+              <a:schemeClr val="accent3"/>
+            </a:fillRef>
+            <a:effectRef idx="0">
+              <a:schemeClr val="accent3"/>
+            </a:effectRef>
+            <a:fontRef idx="minor">
+              <a:schemeClr val="tx1"/>
+            </a:fontRef>
+          </p:style>
+        </p:cxnSp>
+        <p:cxnSp>
+          <p:nvCxnSpPr>
+            <p:cNvPr id="133" name="Straight Connector 132">
+              <a:extLst>
+                <a:ext uri="{FF2B5EF4-FFF2-40B4-BE49-F238E27FC236}">
+                  <a16:creationId xmlns:a16="http://schemas.microsoft.com/office/drawing/2014/main" id="{A383301E-09DB-CA6E-3A0F-0578BDBD2CAA}"/>
+                </a:ext>
+              </a:extLst>
+            </p:cNvPr>
+            <p:cNvCxnSpPr>
+              <a:cxnSpLocks/>
+            </p:cNvCxnSpPr>
+            <p:nvPr/>
+          </p:nvCxnSpPr>
+          <p:spPr>
+            <a:xfrm>
+              <a:off x="690562" y="4398586"/>
+              <a:ext cx="1332000" cy="0"/>
+            </a:xfrm>
+            <a:prstGeom prst="line">
+              <a:avLst/>
+            </a:prstGeom>
+            <a:ln w="12700">
+              <a:solidFill>
+                <a:schemeClr val="tx1"/>
+              </a:solidFill>
+              <a:prstDash val="dash"/>
+            </a:ln>
+          </p:spPr>
+          <p:style>
+            <a:lnRef idx="1">
+              <a:schemeClr val="accent3"/>
+            </a:lnRef>
+            <a:fillRef idx="0">
+              <a:schemeClr val="accent3"/>
+            </a:fillRef>
+            <a:effectRef idx="0">
+              <a:schemeClr val="accent3"/>
+            </a:effectRef>
+            <a:fontRef idx="minor">
+              <a:schemeClr val="tx1"/>
+            </a:fontRef>
+          </p:style>
+        </p:cxnSp>
+        <p:cxnSp>
+          <p:nvCxnSpPr>
+            <p:cNvPr id="134" name="Straight Connector 133">
+              <a:extLst>
+                <a:ext uri="{FF2B5EF4-FFF2-40B4-BE49-F238E27FC236}">
+                  <a16:creationId xmlns:a16="http://schemas.microsoft.com/office/drawing/2014/main" id="{C93E0498-4A57-CD28-E4C1-B4CDE4CFF956}"/>
+                </a:ext>
+              </a:extLst>
+            </p:cNvPr>
+            <p:cNvCxnSpPr>
+              <a:cxnSpLocks/>
+            </p:cNvCxnSpPr>
+            <p:nvPr/>
+          </p:nvCxnSpPr>
+          <p:spPr>
+            <a:xfrm>
+              <a:off x="688657" y="3392270"/>
+              <a:ext cx="1332000" cy="0"/>
+            </a:xfrm>
+            <a:prstGeom prst="line">
+              <a:avLst/>
+            </a:prstGeom>
+            <a:ln w="12700">
+              <a:solidFill>
+                <a:schemeClr val="tx1"/>
+              </a:solidFill>
+              <a:prstDash val="dash"/>
+            </a:ln>
+          </p:spPr>
+          <p:style>
+            <a:lnRef idx="1">
+              <a:schemeClr val="accent3"/>
+            </a:lnRef>
+            <a:fillRef idx="0">
+              <a:schemeClr val="accent3"/>
+            </a:fillRef>
+            <a:effectRef idx="0">
+              <a:schemeClr val="accent3"/>
+            </a:effectRef>
+            <a:fontRef idx="minor">
+              <a:schemeClr val="tx1"/>
+            </a:fontRef>
+          </p:style>
+        </p:cxnSp>
+        <p:cxnSp>
+          <p:nvCxnSpPr>
+            <p:cNvPr id="135" name="Straight Connector 134">
+              <a:extLst>
+                <a:ext uri="{FF2B5EF4-FFF2-40B4-BE49-F238E27FC236}">
+                  <a16:creationId xmlns:a16="http://schemas.microsoft.com/office/drawing/2014/main" id="{9B1DFF46-0354-8960-C03F-B397D9D38944}"/>
+                </a:ext>
+              </a:extLst>
+            </p:cNvPr>
+            <p:cNvCxnSpPr>
+              <a:cxnSpLocks/>
+            </p:cNvCxnSpPr>
+            <p:nvPr/>
+          </p:nvCxnSpPr>
+          <p:spPr>
+            <a:xfrm>
+              <a:off x="697865" y="4846420"/>
+              <a:ext cx="1332000" cy="0"/>
+            </a:xfrm>
+            <a:prstGeom prst="line">
+              <a:avLst/>
+            </a:prstGeom>
+            <a:ln w="12700">
+              <a:prstDash val="dash"/>
+            </a:ln>
+          </p:spPr>
+          <p:style>
+            <a:lnRef idx="1">
+              <a:schemeClr val="accent3"/>
+            </a:lnRef>
+            <a:fillRef idx="0">
+              <a:schemeClr val="accent3"/>
+            </a:fillRef>
+            <a:effectRef idx="0">
+              <a:schemeClr val="accent3"/>
+            </a:effectRef>
+            <a:fontRef idx="minor">
+              <a:schemeClr val="tx1"/>
+            </a:fontRef>
+          </p:style>
+        </p:cxnSp>
+        <p:cxnSp>
+          <p:nvCxnSpPr>
+            <p:cNvPr id="136" name="Straight Connector 135">
+              <a:extLst>
+                <a:ext uri="{FF2B5EF4-FFF2-40B4-BE49-F238E27FC236}">
+                  <a16:creationId xmlns:a16="http://schemas.microsoft.com/office/drawing/2014/main" id="{8824C2EF-190A-F64C-5976-2F93ADEC79B9}"/>
+                </a:ext>
+              </a:extLst>
+            </p:cNvPr>
+            <p:cNvCxnSpPr>
+              <a:cxnSpLocks/>
+            </p:cNvCxnSpPr>
+            <p:nvPr/>
+          </p:nvCxnSpPr>
+          <p:spPr>
+            <a:xfrm>
+              <a:off x="687705" y="3949165"/>
+              <a:ext cx="1332000" cy="0"/>
+            </a:xfrm>
+            <a:prstGeom prst="line">
+              <a:avLst/>
+            </a:prstGeom>
+            <a:ln w="12700">
+              <a:prstDash val="dash"/>
+            </a:ln>
+          </p:spPr>
+          <p:style>
+            <a:lnRef idx="1">
+              <a:schemeClr val="accent3"/>
+            </a:lnRef>
+            <a:fillRef idx="0">
+              <a:schemeClr val="accent3"/>
+            </a:fillRef>
+            <a:effectRef idx="0">
+              <a:schemeClr val="accent3"/>
+            </a:effectRef>
+            <a:fontRef idx="minor">
+              <a:schemeClr val="tx1"/>
+            </a:fontRef>
+          </p:style>
+        </p:cxnSp>
+      </p:grpSp>
+      <p:grpSp>
+        <p:nvGrpSpPr>
+          <p:cNvPr id="137" name="Group 136">
+            <a:extLst>
+              <a:ext uri="{FF2B5EF4-FFF2-40B4-BE49-F238E27FC236}">
+                <a16:creationId xmlns:a16="http://schemas.microsoft.com/office/drawing/2014/main" id="{3909BD29-37A1-9168-370E-1561BD62E282}"/>
+              </a:ext>
+            </a:extLst>
+          </p:cNvPr>
+          <p:cNvGrpSpPr/>
+          <p:nvPr/>
+        </p:nvGrpSpPr>
+        <p:grpSpPr>
+          <a:xfrm>
+            <a:off x="6828154" y="2288957"/>
+            <a:ext cx="3223895" cy="2003584"/>
+            <a:chOff x="687705" y="3392270"/>
+            <a:chExt cx="1342160" cy="2003584"/>
+          </a:xfrm>
+        </p:grpSpPr>
+        <p:cxnSp>
+          <p:nvCxnSpPr>
+            <p:cNvPr id="138" name="Straight Connector 137">
+              <a:extLst>
+                <a:ext uri="{FF2B5EF4-FFF2-40B4-BE49-F238E27FC236}">
+                  <a16:creationId xmlns:a16="http://schemas.microsoft.com/office/drawing/2014/main" id="{B0AA4247-10B1-385E-EC79-A8352759F5BD}"/>
+                </a:ext>
+              </a:extLst>
+            </p:cNvPr>
+            <p:cNvCxnSpPr>
+              <a:cxnSpLocks/>
+            </p:cNvCxnSpPr>
+            <p:nvPr/>
+          </p:nvCxnSpPr>
+          <p:spPr>
+            <a:xfrm>
+              <a:off x="689610" y="5395854"/>
+              <a:ext cx="1332000" cy="0"/>
+            </a:xfrm>
+            <a:prstGeom prst="line">
+              <a:avLst/>
+            </a:prstGeom>
+            <a:ln w="12700">
+              <a:solidFill>
+                <a:schemeClr val="tx1"/>
+              </a:solidFill>
+              <a:prstDash val="dash"/>
+            </a:ln>
+          </p:spPr>
+          <p:style>
+            <a:lnRef idx="1">
+              <a:schemeClr val="accent3"/>
+            </a:lnRef>
+            <a:fillRef idx="0">
+              <a:schemeClr val="accent3"/>
+            </a:fillRef>
+            <a:effectRef idx="0">
+              <a:schemeClr val="accent3"/>
+            </a:effectRef>
+            <a:fontRef idx="minor">
+              <a:schemeClr val="tx1"/>
+            </a:fontRef>
+          </p:style>
+        </p:cxnSp>
+        <p:cxnSp>
+          <p:nvCxnSpPr>
+            <p:cNvPr id="139" name="Straight Connector 138">
+              <a:extLst>
+                <a:ext uri="{FF2B5EF4-FFF2-40B4-BE49-F238E27FC236}">
+                  <a16:creationId xmlns:a16="http://schemas.microsoft.com/office/drawing/2014/main" id="{5102983F-36E7-BD02-8ED4-A903092054AE}"/>
+                </a:ext>
+              </a:extLst>
+            </p:cNvPr>
+            <p:cNvCxnSpPr>
+              <a:cxnSpLocks/>
+            </p:cNvCxnSpPr>
+            <p:nvPr/>
+          </p:nvCxnSpPr>
+          <p:spPr>
+            <a:xfrm>
+              <a:off x="690562" y="4398586"/>
+              <a:ext cx="1332000" cy="0"/>
+            </a:xfrm>
+            <a:prstGeom prst="line">
+              <a:avLst/>
+            </a:prstGeom>
+            <a:ln w="12700">
+              <a:solidFill>
+                <a:schemeClr val="tx1"/>
+              </a:solidFill>
+              <a:prstDash val="dash"/>
+            </a:ln>
+          </p:spPr>
+          <p:style>
+            <a:lnRef idx="1">
+              <a:schemeClr val="accent3"/>
+            </a:lnRef>
+            <a:fillRef idx="0">
+              <a:schemeClr val="accent3"/>
+            </a:fillRef>
+            <a:effectRef idx="0">
+              <a:schemeClr val="accent3"/>
+            </a:effectRef>
+            <a:fontRef idx="minor">
+              <a:schemeClr val="tx1"/>
+            </a:fontRef>
+          </p:style>
+        </p:cxnSp>
+        <p:cxnSp>
+          <p:nvCxnSpPr>
+            <p:cNvPr id="140" name="Straight Connector 139">
+              <a:extLst>
+                <a:ext uri="{FF2B5EF4-FFF2-40B4-BE49-F238E27FC236}">
+                  <a16:creationId xmlns:a16="http://schemas.microsoft.com/office/drawing/2014/main" id="{B65B3F9A-A5A4-779A-1BF4-F079B6D04B7F}"/>
+                </a:ext>
+              </a:extLst>
+            </p:cNvPr>
+            <p:cNvCxnSpPr>
+              <a:cxnSpLocks/>
+            </p:cNvCxnSpPr>
+            <p:nvPr/>
+          </p:nvCxnSpPr>
+          <p:spPr>
+            <a:xfrm>
+              <a:off x="688657" y="3392270"/>
+              <a:ext cx="1332000" cy="0"/>
+            </a:xfrm>
+            <a:prstGeom prst="line">
+              <a:avLst/>
+            </a:prstGeom>
+            <a:ln w="12700">
+              <a:solidFill>
+                <a:schemeClr val="tx1"/>
+              </a:solidFill>
+              <a:prstDash val="dash"/>
+            </a:ln>
+          </p:spPr>
+          <p:style>
+            <a:lnRef idx="1">
+              <a:schemeClr val="accent3"/>
+            </a:lnRef>
+            <a:fillRef idx="0">
+              <a:schemeClr val="accent3"/>
+            </a:fillRef>
+            <a:effectRef idx="0">
+              <a:schemeClr val="accent3"/>
+            </a:effectRef>
+            <a:fontRef idx="minor">
+              <a:schemeClr val="tx1"/>
+            </a:fontRef>
+          </p:style>
+        </p:cxnSp>
+        <p:cxnSp>
+          <p:nvCxnSpPr>
+            <p:cNvPr id="141" name="Straight Connector 140">
+              <a:extLst>
+                <a:ext uri="{FF2B5EF4-FFF2-40B4-BE49-F238E27FC236}">
+                  <a16:creationId xmlns:a16="http://schemas.microsoft.com/office/drawing/2014/main" id="{A6C1D843-AD1A-4B91-2AF9-BBF77506EF31}"/>
+                </a:ext>
+              </a:extLst>
+            </p:cNvPr>
+            <p:cNvCxnSpPr>
+              <a:cxnSpLocks/>
+            </p:cNvCxnSpPr>
+            <p:nvPr/>
+          </p:nvCxnSpPr>
+          <p:spPr>
+            <a:xfrm>
+              <a:off x="697865" y="4846420"/>
+              <a:ext cx="1332000" cy="0"/>
+            </a:xfrm>
+            <a:prstGeom prst="line">
+              <a:avLst/>
+            </a:prstGeom>
+            <a:ln w="12700">
+              <a:prstDash val="dash"/>
+            </a:ln>
+          </p:spPr>
+          <p:style>
+            <a:lnRef idx="1">
+              <a:schemeClr val="accent3"/>
+            </a:lnRef>
+            <a:fillRef idx="0">
+              <a:schemeClr val="accent3"/>
+            </a:fillRef>
+            <a:effectRef idx="0">
+              <a:schemeClr val="accent3"/>
+            </a:effectRef>
+            <a:fontRef idx="minor">
+              <a:schemeClr val="tx1"/>
+            </a:fontRef>
+          </p:style>
+        </p:cxnSp>
+        <p:cxnSp>
+          <p:nvCxnSpPr>
+            <p:cNvPr id="142" name="Straight Connector 141">
+              <a:extLst>
+                <a:ext uri="{FF2B5EF4-FFF2-40B4-BE49-F238E27FC236}">
+                  <a16:creationId xmlns:a16="http://schemas.microsoft.com/office/drawing/2014/main" id="{2F215BA5-170C-890F-44FE-19C9BCE111D1}"/>
+                </a:ext>
+              </a:extLst>
+            </p:cNvPr>
+            <p:cNvCxnSpPr>
+              <a:cxnSpLocks/>
+            </p:cNvCxnSpPr>
+            <p:nvPr/>
+          </p:nvCxnSpPr>
+          <p:spPr>
+            <a:xfrm>
+              <a:off x="687705" y="3949165"/>
+              <a:ext cx="1332000" cy="0"/>
+            </a:xfrm>
+            <a:prstGeom prst="line">
+              <a:avLst/>
+            </a:prstGeom>
+            <a:ln w="12700">
+              <a:prstDash val="dash"/>
+            </a:ln>
+          </p:spPr>
+          <p:style>
+            <a:lnRef idx="1">
+              <a:schemeClr val="accent3"/>
+            </a:lnRef>
+            <a:fillRef idx="0">
+              <a:schemeClr val="accent3"/>
+            </a:fillRef>
+            <a:effectRef idx="0">
+              <a:schemeClr val="accent3"/>
+            </a:effectRef>
+            <a:fontRef idx="minor">
+              <a:schemeClr val="tx1"/>
+            </a:fontRef>
+          </p:style>
+        </p:cxnSp>
+      </p:grpSp>
+      <p:grpSp>
+        <p:nvGrpSpPr>
+          <p:cNvPr id="124" name="Group 123">
+            <a:extLst>
+              <a:ext uri="{FF2B5EF4-FFF2-40B4-BE49-F238E27FC236}">
+                <a16:creationId xmlns:a16="http://schemas.microsoft.com/office/drawing/2014/main" id="{2244F4BB-BB2D-31B7-9A51-FFEADCE56E9E}"/>
+              </a:ext>
+            </a:extLst>
+          </p:cNvPr>
+          <p:cNvGrpSpPr/>
+          <p:nvPr/>
+        </p:nvGrpSpPr>
+        <p:grpSpPr>
+          <a:xfrm>
+            <a:off x="2110105" y="2287370"/>
+            <a:ext cx="1342160" cy="2003584"/>
+            <a:chOff x="687705" y="3392270"/>
+            <a:chExt cx="1342160" cy="2003584"/>
+          </a:xfrm>
+        </p:grpSpPr>
+        <p:cxnSp>
+          <p:nvCxnSpPr>
+            <p:cNvPr id="95" name="Straight Connector 94">
+              <a:extLst>
+                <a:ext uri="{FF2B5EF4-FFF2-40B4-BE49-F238E27FC236}">
+                  <a16:creationId xmlns:a16="http://schemas.microsoft.com/office/drawing/2014/main" id="{8C274EA9-5CE4-49D7-7B2B-4DA3CDA7EAD6}"/>
+                </a:ext>
+              </a:extLst>
+            </p:cNvPr>
+            <p:cNvCxnSpPr>
+              <a:cxnSpLocks/>
+            </p:cNvCxnSpPr>
+            <p:nvPr/>
+          </p:nvCxnSpPr>
+          <p:spPr>
+            <a:xfrm>
+              <a:off x="689610" y="5395854"/>
+              <a:ext cx="1332000" cy="0"/>
+            </a:xfrm>
+            <a:prstGeom prst="line">
+              <a:avLst/>
+            </a:prstGeom>
+            <a:ln w="12700">
+              <a:solidFill>
+                <a:schemeClr val="tx1"/>
+              </a:solidFill>
+              <a:prstDash val="dash"/>
+            </a:ln>
+          </p:spPr>
+          <p:style>
+            <a:lnRef idx="1">
+              <a:schemeClr val="accent3"/>
+            </a:lnRef>
+            <a:fillRef idx="0">
+              <a:schemeClr val="accent3"/>
+            </a:fillRef>
+            <a:effectRef idx="0">
+              <a:schemeClr val="accent3"/>
+            </a:effectRef>
+            <a:fontRef idx="minor">
+              <a:schemeClr val="tx1"/>
+            </a:fontRef>
+          </p:style>
+        </p:cxnSp>
+        <p:cxnSp>
+          <p:nvCxnSpPr>
+            <p:cNvPr id="86" name="Straight Connector 85">
+              <a:extLst>
+                <a:ext uri="{FF2B5EF4-FFF2-40B4-BE49-F238E27FC236}">
+                  <a16:creationId xmlns:a16="http://schemas.microsoft.com/office/drawing/2014/main" id="{0386F30D-10FA-7F0D-3352-6615D2D0C02F}"/>
+                </a:ext>
+              </a:extLst>
+            </p:cNvPr>
+            <p:cNvCxnSpPr>
+              <a:cxnSpLocks/>
+            </p:cNvCxnSpPr>
+            <p:nvPr/>
+          </p:nvCxnSpPr>
+          <p:spPr>
+            <a:xfrm>
+              <a:off x="690562" y="4398586"/>
+              <a:ext cx="1332000" cy="0"/>
+            </a:xfrm>
+            <a:prstGeom prst="line">
+              <a:avLst/>
+            </a:prstGeom>
+            <a:ln w="12700">
+              <a:solidFill>
+                <a:schemeClr val="tx1"/>
+              </a:solidFill>
+              <a:prstDash val="dash"/>
+            </a:ln>
+          </p:spPr>
+          <p:style>
+            <a:lnRef idx="1">
+              <a:schemeClr val="accent3"/>
+            </a:lnRef>
+            <a:fillRef idx="0">
+              <a:schemeClr val="accent3"/>
+            </a:fillRef>
+            <a:effectRef idx="0">
+              <a:schemeClr val="accent3"/>
+            </a:effectRef>
+            <a:fontRef idx="minor">
+              <a:schemeClr val="tx1"/>
+            </a:fontRef>
+          </p:style>
+        </p:cxnSp>
+        <p:cxnSp>
+          <p:nvCxnSpPr>
+            <p:cNvPr id="94" name="Straight Connector 93">
+              <a:extLst>
+                <a:ext uri="{FF2B5EF4-FFF2-40B4-BE49-F238E27FC236}">
+                  <a16:creationId xmlns:a16="http://schemas.microsoft.com/office/drawing/2014/main" id="{EBB37B5A-DCDD-FDD3-3DE2-FEC939EFA3ED}"/>
+                </a:ext>
+              </a:extLst>
+            </p:cNvPr>
+            <p:cNvCxnSpPr>
+              <a:cxnSpLocks/>
+            </p:cNvCxnSpPr>
+            <p:nvPr/>
+          </p:nvCxnSpPr>
+          <p:spPr>
+            <a:xfrm>
+              <a:off x="688657" y="3392270"/>
+              <a:ext cx="1332000" cy="0"/>
+            </a:xfrm>
+            <a:prstGeom prst="line">
+              <a:avLst/>
+            </a:prstGeom>
+            <a:ln w="12700">
+              <a:solidFill>
+                <a:schemeClr val="tx1"/>
+              </a:solidFill>
+              <a:prstDash val="dash"/>
+            </a:ln>
+          </p:spPr>
+          <p:style>
+            <a:lnRef idx="1">
+              <a:schemeClr val="accent3"/>
+            </a:lnRef>
+            <a:fillRef idx="0">
+              <a:schemeClr val="accent3"/>
+            </a:fillRef>
+            <a:effectRef idx="0">
+              <a:schemeClr val="accent3"/>
+            </a:effectRef>
+            <a:fontRef idx="minor">
+              <a:schemeClr val="tx1"/>
+            </a:fontRef>
+          </p:style>
+        </p:cxnSp>
+        <p:cxnSp>
+          <p:nvCxnSpPr>
+            <p:cNvPr id="112" name="Straight Connector 111">
+              <a:extLst>
+                <a:ext uri="{FF2B5EF4-FFF2-40B4-BE49-F238E27FC236}">
+                  <a16:creationId xmlns:a16="http://schemas.microsoft.com/office/drawing/2014/main" id="{029CBB9B-6089-3EC3-8114-6E6D3B5A0FA0}"/>
+                </a:ext>
+              </a:extLst>
+            </p:cNvPr>
+            <p:cNvCxnSpPr>
+              <a:cxnSpLocks/>
+            </p:cNvCxnSpPr>
+            <p:nvPr/>
+          </p:nvCxnSpPr>
+          <p:spPr>
+            <a:xfrm>
+              <a:off x="697865" y="4846420"/>
+              <a:ext cx="1332000" cy="0"/>
+            </a:xfrm>
+            <a:prstGeom prst="line">
+              <a:avLst/>
+            </a:prstGeom>
+            <a:ln w="12700">
+              <a:prstDash val="dash"/>
+            </a:ln>
+          </p:spPr>
+          <p:style>
+            <a:lnRef idx="1">
+              <a:schemeClr val="accent3"/>
+            </a:lnRef>
+            <a:fillRef idx="0">
+              <a:schemeClr val="accent3"/>
+            </a:fillRef>
+            <a:effectRef idx="0">
+              <a:schemeClr val="accent3"/>
+            </a:effectRef>
+            <a:fontRef idx="minor">
+              <a:schemeClr val="tx1"/>
+            </a:fontRef>
+          </p:style>
+        </p:cxnSp>
+        <p:cxnSp>
+          <p:nvCxnSpPr>
+            <p:cNvPr id="113" name="Straight Connector 112">
+              <a:extLst>
+                <a:ext uri="{FF2B5EF4-FFF2-40B4-BE49-F238E27FC236}">
+                  <a16:creationId xmlns:a16="http://schemas.microsoft.com/office/drawing/2014/main" id="{A8321910-BA84-1E2C-9238-A71E688F0532}"/>
+                </a:ext>
+              </a:extLst>
+            </p:cNvPr>
+            <p:cNvCxnSpPr>
+              <a:cxnSpLocks/>
+            </p:cNvCxnSpPr>
+            <p:nvPr/>
+          </p:nvCxnSpPr>
+          <p:spPr>
+            <a:xfrm>
+              <a:off x="687705" y="3949165"/>
+              <a:ext cx="1332000" cy="0"/>
+            </a:xfrm>
+            <a:prstGeom prst="line">
+              <a:avLst/>
+            </a:prstGeom>
+            <a:ln w="12700">
+              <a:prstDash val="dash"/>
+            </a:ln>
+          </p:spPr>
+          <p:style>
+            <a:lnRef idx="1">
+              <a:schemeClr val="accent3"/>
+            </a:lnRef>
+            <a:fillRef idx="0">
+              <a:schemeClr val="accent3"/>
+            </a:fillRef>
+            <a:effectRef idx="0">
+              <a:schemeClr val="accent3"/>
+            </a:effectRef>
+            <a:fontRef idx="minor">
+              <a:schemeClr val="tx1"/>
+            </a:fontRef>
+          </p:style>
+        </p:cxnSp>
+      </p:grpSp>
+      <p:sp>
+        <p:nvSpPr>
+          <p:cNvPr id="16" name="TextBox 15">
+            <a:extLst>
+              <a:ext uri="{FF2B5EF4-FFF2-40B4-BE49-F238E27FC236}">
+                <a16:creationId xmlns:a16="http://schemas.microsoft.com/office/drawing/2014/main" id="{23F0A351-4582-96BB-41DB-B2076B852011}"/>
+              </a:ext>
+            </a:extLst>
+          </p:cNvPr>
+          <p:cNvSpPr txBox="1"/>
+          <p:nvPr/>
+        </p:nvSpPr>
+        <p:spPr>
+          <a:xfrm>
+            <a:off x="1692275" y="2162810"/>
+            <a:ext cx="381836" cy="261610"/>
+          </a:xfrm>
+          <a:prstGeom prst="rect">
+            <a:avLst/>
+          </a:prstGeom>
+          <a:noFill/>
+        </p:spPr>
+        <p:txBody>
+          <a:bodyPr wrap="none" rtlCol="0">
+            <a:spAutoFit/>
+          </a:bodyPr>
+          <a:lstStyle/>
+          <a:p>
+            <a:r>
+              <a:rPr lang="de-DE" sz="1100" dirty="0">
+                <a:solidFill>
+                  <a:schemeClr val="dk1"/>
+                </a:solidFill>
+                <a:latin typeface="+mj-lt"/>
+                <a:cs typeface="Arial" panose="020B0604020202020204" pitchFamily="34" charset="0"/>
+              </a:rPr>
+              <a:t>Ask</a:t>
+            </a:r>
+            <a:endParaRPr lang="en-GB" sz="1100" dirty="0">
+              <a:solidFill>
+                <a:schemeClr val="dk1"/>
+              </a:solidFill>
+              <a:latin typeface="+mj-lt"/>
+              <a:cs typeface="Arial" panose="020B0604020202020204" pitchFamily="34" charset="0"/>
+            </a:endParaRPr>
+          </a:p>
+        </p:txBody>
+      </p:sp>
+      <p:sp>
+        <p:nvSpPr>
+          <p:cNvPr id="17" name="TextBox 16">
+            <a:extLst>
+              <a:ext uri="{FF2B5EF4-FFF2-40B4-BE49-F238E27FC236}">
+                <a16:creationId xmlns:a16="http://schemas.microsoft.com/office/drawing/2014/main" id="{8E7823CC-2312-D341-E44A-3763CE6A05CF}"/>
+              </a:ext>
+            </a:extLst>
+          </p:cNvPr>
+          <p:cNvSpPr txBox="1"/>
+          <p:nvPr/>
+        </p:nvSpPr>
+        <p:spPr>
+          <a:xfrm>
+            <a:off x="1730375" y="3161030"/>
+            <a:ext cx="407484" cy="261610"/>
+          </a:xfrm>
+          <a:prstGeom prst="rect">
+            <a:avLst/>
+          </a:prstGeom>
+          <a:noFill/>
+        </p:spPr>
+        <p:txBody>
+          <a:bodyPr wrap="none" rtlCol="0">
+            <a:spAutoFit/>
+          </a:bodyPr>
+          <a:lstStyle/>
+          <a:p>
+            <a:r>
+              <a:rPr lang="de-DE" sz="1100" dirty="0">
+                <a:solidFill>
+                  <a:schemeClr val="dk1"/>
+                </a:solidFill>
+                <a:latin typeface="+mj-lt"/>
+                <a:cs typeface="Arial" panose="020B0604020202020204" pitchFamily="34" charset="0"/>
+              </a:rPr>
+              <a:t>Mid</a:t>
+            </a:r>
+            <a:endParaRPr lang="en-GB" sz="1100" dirty="0">
+              <a:solidFill>
+                <a:schemeClr val="dk1"/>
+              </a:solidFill>
+              <a:latin typeface="+mj-lt"/>
+              <a:cs typeface="Arial" panose="020B0604020202020204" pitchFamily="34" charset="0"/>
+            </a:endParaRPr>
+          </a:p>
+        </p:txBody>
+      </p:sp>
+      <p:sp>
+        <p:nvSpPr>
+          <p:cNvPr id="18" name="TextBox 17">
+            <a:extLst>
+              <a:ext uri="{FF2B5EF4-FFF2-40B4-BE49-F238E27FC236}">
+                <a16:creationId xmlns:a16="http://schemas.microsoft.com/office/drawing/2014/main" id="{0ACC3183-53D4-C562-650C-7B76EC539D85}"/>
+              </a:ext>
+            </a:extLst>
+          </p:cNvPr>
+          <p:cNvSpPr txBox="1"/>
+          <p:nvPr/>
+        </p:nvSpPr>
+        <p:spPr>
+          <a:xfrm>
+            <a:off x="1730375" y="4128770"/>
+            <a:ext cx="364202" cy="261610"/>
+          </a:xfrm>
+          <a:prstGeom prst="rect">
+            <a:avLst/>
+          </a:prstGeom>
+          <a:noFill/>
+        </p:spPr>
+        <p:txBody>
+          <a:bodyPr wrap="none" rtlCol="0">
+            <a:spAutoFit/>
+          </a:bodyPr>
+          <a:lstStyle/>
+          <a:p>
+            <a:r>
+              <a:rPr lang="de-DE" sz="1100" dirty="0" err="1">
+                <a:solidFill>
+                  <a:schemeClr val="dk1"/>
+                </a:solidFill>
+                <a:latin typeface="+mj-lt"/>
+                <a:cs typeface="Arial" panose="020B0604020202020204" pitchFamily="34" charset="0"/>
+              </a:rPr>
+              <a:t>Bid</a:t>
+            </a:r>
+            <a:endParaRPr lang="en-GB" sz="1100" dirty="0">
+              <a:solidFill>
+                <a:schemeClr val="dk1"/>
+              </a:solidFill>
+              <a:latin typeface="+mj-lt"/>
+              <a:cs typeface="Arial" panose="020B0604020202020204" pitchFamily="34" charset="0"/>
+            </a:endParaRPr>
+          </a:p>
+        </p:txBody>
+      </p:sp>
+      <p:sp>
+        <p:nvSpPr>
+          <p:cNvPr id="74" name="Rectangle: Rounded Corners 73">
+            <a:extLst>
+              <a:ext uri="{FF2B5EF4-FFF2-40B4-BE49-F238E27FC236}">
+                <a16:creationId xmlns:a16="http://schemas.microsoft.com/office/drawing/2014/main" id="{36D1AE21-BD7B-027C-55BE-F44DC9AA37CA}"/>
+              </a:ext>
+            </a:extLst>
+          </p:cNvPr>
+          <p:cNvSpPr/>
+          <p:nvPr/>
+        </p:nvSpPr>
+        <p:spPr>
+          <a:xfrm>
+            <a:off x="7031608" y="1638299"/>
+            <a:ext cx="847725" cy="3343275"/>
+          </a:xfrm>
+          <a:prstGeom prst="roundRect">
+            <a:avLst>
+              <a:gd name="adj" fmla="val 5856"/>
+            </a:avLst>
+          </a:prstGeom>
+          <a:solidFill>
+            <a:srgbClr val="FFFF99"/>
+          </a:solidFill>
+          <a:ln w="19050">
+            <a:headEnd type="none" w="med" len="med"/>
+            <a:tailEnd type="none" w="med" len="med"/>
+          </a:ln>
+        </p:spPr>
+        <p:style>
+          <a:lnRef idx="2">
+            <a:schemeClr val="dk1"/>
+          </a:lnRef>
+          <a:fillRef idx="1">
+            <a:schemeClr val="lt1"/>
+          </a:fillRef>
+          <a:effectRef idx="0">
+            <a:schemeClr val="dk1"/>
+          </a:effectRef>
+          <a:fontRef idx="minor">
+            <a:schemeClr val="dk1"/>
+          </a:fontRef>
+        </p:style>
+        <p:txBody>
+          <a:bodyPr rtlCol="0" anchor="ctr"/>
+          <a:lstStyle/>
+          <a:p>
+            <a:pPr algn="ctr"/>
+            <a:r>
+              <a:rPr lang="de-DE" sz="1100" dirty="0">
+                <a:latin typeface="+mj-lt"/>
+                <a:cs typeface="Arial" panose="020B0604020202020204" pitchFamily="34" charset="0"/>
+              </a:rPr>
+              <a:t>Trade Size Rule</a:t>
+            </a:r>
+            <a:endParaRPr lang="en-GB" sz="1100" dirty="0">
+              <a:latin typeface="+mj-lt"/>
+              <a:cs typeface="Arial" panose="020B0604020202020204" pitchFamily="34" charset="0"/>
+            </a:endParaRPr>
+          </a:p>
+        </p:txBody>
+      </p:sp>
+      <p:sp>
+        <p:nvSpPr>
+          <p:cNvPr id="75" name="Rectangle: Rounded Corners 74">
+            <a:extLst>
+              <a:ext uri="{FF2B5EF4-FFF2-40B4-BE49-F238E27FC236}">
+                <a16:creationId xmlns:a16="http://schemas.microsoft.com/office/drawing/2014/main" id="{22D2EB51-762E-E07F-687B-4816F4E53131}"/>
+              </a:ext>
+            </a:extLst>
+          </p:cNvPr>
+          <p:cNvSpPr/>
+          <p:nvPr/>
+        </p:nvSpPr>
+        <p:spPr>
+          <a:xfrm>
+            <a:off x="7936482" y="3151480"/>
+            <a:ext cx="828676" cy="257175"/>
+          </a:xfrm>
+          <a:prstGeom prst="roundRect">
+            <a:avLst>
+              <a:gd name="adj" fmla="val 5856"/>
+            </a:avLst>
+          </a:prstGeom>
+          <a:solidFill>
+            <a:srgbClr val="D2C4B2"/>
+          </a:solidFill>
+          <a:ln w="19050">
+            <a:headEnd type="none" w="med" len="med"/>
+            <a:tailEnd type="none" w="med" len="med"/>
+          </a:ln>
+        </p:spPr>
+        <p:style>
+          <a:lnRef idx="2">
+            <a:schemeClr val="dk1"/>
+          </a:lnRef>
+          <a:fillRef idx="1">
+            <a:schemeClr val="lt1"/>
+          </a:fillRef>
+          <a:effectRef idx="0">
+            <a:schemeClr val="dk1"/>
+          </a:effectRef>
+          <a:fontRef idx="minor">
+            <a:schemeClr val="dk1"/>
+          </a:fontRef>
+        </p:style>
+        <p:txBody>
+          <a:bodyPr rtlCol="0" anchor="ctr"/>
+          <a:lstStyle/>
+          <a:p>
+            <a:pPr algn="ctr"/>
+            <a:r>
+              <a:rPr lang="de-DE" sz="1100">
+                <a:latin typeface="+mj-lt"/>
+                <a:cs typeface="Arial" panose="020B0604020202020204" pitchFamily="34" charset="0"/>
+              </a:rPr>
+              <a:t>Depth Rule</a:t>
+            </a:r>
+            <a:endParaRPr lang="en-GB" sz="1100" dirty="0">
+              <a:latin typeface="+mj-lt"/>
+              <a:cs typeface="Arial" panose="020B0604020202020204" pitchFamily="34" charset="0"/>
+            </a:endParaRPr>
+          </a:p>
+        </p:txBody>
+      </p:sp>
+      <p:sp>
+        <p:nvSpPr>
+          <p:cNvPr id="76" name="Rectangle: Rounded Corners 75">
+            <a:extLst>
+              <a:ext uri="{FF2B5EF4-FFF2-40B4-BE49-F238E27FC236}">
+                <a16:creationId xmlns:a16="http://schemas.microsoft.com/office/drawing/2014/main" id="{2FE971C9-C360-A714-0671-6CF02666DE52}"/>
+              </a:ext>
+            </a:extLst>
+          </p:cNvPr>
+          <p:cNvSpPr/>
+          <p:nvPr/>
+        </p:nvSpPr>
+        <p:spPr>
+          <a:xfrm>
+            <a:off x="8831833" y="1641474"/>
+            <a:ext cx="971550" cy="3352801"/>
+          </a:xfrm>
+          <a:prstGeom prst="roundRect">
+            <a:avLst>
+              <a:gd name="adj" fmla="val 5856"/>
+            </a:avLst>
+          </a:prstGeom>
+          <a:solidFill>
+            <a:srgbClr val="E4D6EA"/>
+          </a:solidFill>
+          <a:ln w="19050">
+            <a:headEnd type="none" w="med" len="med"/>
+            <a:tailEnd type="none" w="med" len="med"/>
+          </a:ln>
+        </p:spPr>
+        <p:style>
+          <a:lnRef idx="2">
+            <a:schemeClr val="dk1"/>
+          </a:lnRef>
+          <a:fillRef idx="1">
+            <a:schemeClr val="lt1"/>
+          </a:fillRef>
+          <a:effectRef idx="0">
+            <a:schemeClr val="dk1"/>
+          </a:effectRef>
+          <a:fontRef idx="minor">
+            <a:schemeClr val="dk1"/>
+          </a:fontRef>
+        </p:style>
+        <p:txBody>
+          <a:bodyPr lIns="0" rIns="0" rtlCol="0" anchor="ctr"/>
+          <a:lstStyle/>
+          <a:p>
+            <a:pPr algn="ctr"/>
+            <a:r>
+              <a:rPr lang="de-DE" sz="1100">
+                <a:latin typeface="+mj-lt"/>
+                <a:cs typeface="Arial" panose="020B0604020202020204" pitchFamily="34" charset="0"/>
+              </a:rPr>
+              <a:t>Misc</a:t>
+            </a:r>
+            <a:endParaRPr lang="en-GB" sz="1100" dirty="0">
+              <a:latin typeface="+mj-lt"/>
+              <a:cs typeface="Arial" panose="020B0604020202020204" pitchFamily="34" charset="0"/>
+            </a:endParaRPr>
+          </a:p>
+        </p:txBody>
+      </p:sp>
+      <p:sp>
+        <p:nvSpPr>
+          <p:cNvPr id="88" name="Rectangle: Rounded Corners 87">
+            <a:extLst>
+              <a:ext uri="{FF2B5EF4-FFF2-40B4-BE49-F238E27FC236}">
+                <a16:creationId xmlns:a16="http://schemas.microsoft.com/office/drawing/2014/main" id="{906C47EB-AD61-7ACE-76A0-F9172022ABCD}"/>
+              </a:ext>
+            </a:extLst>
+          </p:cNvPr>
+          <p:cNvSpPr/>
+          <p:nvPr/>
+        </p:nvSpPr>
+        <p:spPr>
+          <a:xfrm>
+            <a:off x="2352372" y="3168601"/>
+            <a:ext cx="828676" cy="257175"/>
+          </a:xfrm>
+          <a:prstGeom prst="roundRect">
+            <a:avLst>
+              <a:gd name="adj" fmla="val 5856"/>
+            </a:avLst>
+          </a:prstGeom>
+          <a:solidFill>
+            <a:srgbClr val="A8D1EE"/>
+          </a:solidFill>
+          <a:ln w="19050">
+            <a:headEnd type="none" w="med" len="med"/>
+            <a:tailEnd type="none" w="med" len="med"/>
+          </a:ln>
+        </p:spPr>
+        <p:style>
+          <a:lnRef idx="2">
+            <a:schemeClr val="dk1"/>
+          </a:lnRef>
+          <a:fillRef idx="1">
+            <a:schemeClr val="lt1"/>
+          </a:fillRef>
+          <a:effectRef idx="0">
+            <a:schemeClr val="dk1"/>
+          </a:effectRef>
+          <a:fontRef idx="minor">
+            <a:schemeClr val="dk1"/>
+          </a:fontRef>
+        </p:style>
+        <p:txBody>
+          <a:bodyPr rtlCol="0" anchor="ctr"/>
+          <a:lstStyle/>
+          <a:p>
+            <a:pPr algn="ctr"/>
+            <a:r>
+              <a:rPr lang="de-DE" sz="1100">
+                <a:latin typeface="+mj-lt"/>
+                <a:cs typeface="Arial" panose="020B0604020202020204" pitchFamily="34" charset="0"/>
+              </a:rPr>
+              <a:t>Tick Rule</a:t>
+            </a:r>
+            <a:endParaRPr lang="en-GB" sz="1100" dirty="0">
+              <a:latin typeface="+mj-lt"/>
+              <a:cs typeface="Arial" panose="020B0604020202020204" pitchFamily="34" charset="0"/>
+            </a:endParaRPr>
+          </a:p>
+        </p:txBody>
+      </p:sp>
+      <p:sp>
+        <p:nvSpPr>
+          <p:cNvPr id="90" name="Rectangle: Rounded Corners 89">
+            <a:extLst>
+              <a:ext uri="{FF2B5EF4-FFF2-40B4-BE49-F238E27FC236}">
+                <a16:creationId xmlns:a16="http://schemas.microsoft.com/office/drawing/2014/main" id="{164557EA-9DAD-9EAC-67E1-8F8AB1F8C97C}"/>
+              </a:ext>
+            </a:extLst>
+          </p:cNvPr>
+          <p:cNvSpPr/>
+          <p:nvPr/>
+        </p:nvSpPr>
+        <p:spPr>
+          <a:xfrm>
+            <a:off x="2349303" y="3462877"/>
+            <a:ext cx="847725" cy="1513936"/>
+          </a:xfrm>
+          <a:prstGeom prst="roundRect">
+            <a:avLst>
+              <a:gd name="adj" fmla="val 5856"/>
+            </a:avLst>
+          </a:prstGeom>
+          <a:solidFill>
+            <a:srgbClr val="CCD497"/>
+          </a:solidFill>
+          <a:ln w="19050">
+            <a:headEnd type="none" w="med" len="med"/>
+            <a:tailEnd type="none" w="med" len="med"/>
+          </a:ln>
+        </p:spPr>
+        <p:style>
+          <a:lnRef idx="2">
+            <a:schemeClr val="dk1"/>
+          </a:lnRef>
+          <a:fillRef idx="1">
+            <a:schemeClr val="lt1"/>
+          </a:fillRef>
+          <a:effectRef idx="0">
+            <a:schemeClr val="dk1"/>
+          </a:effectRef>
+          <a:fontRef idx="minor">
+            <a:schemeClr val="dk1"/>
+          </a:fontRef>
+        </p:style>
+        <p:txBody>
+          <a:bodyPr rtlCol="0" anchor="ctr"/>
+          <a:lstStyle/>
+          <a:p>
+            <a:pPr algn="ctr"/>
+            <a:r>
+              <a:rPr lang="de-DE" sz="1100">
+                <a:latin typeface="+mj-lt"/>
+                <a:cs typeface="Arial" panose="020B0604020202020204" pitchFamily="34" charset="0"/>
+              </a:rPr>
+              <a:t>Quote Rule</a:t>
+            </a:r>
+            <a:endParaRPr lang="en-GB" sz="1100" dirty="0">
+              <a:latin typeface="+mj-lt"/>
+              <a:cs typeface="Arial" panose="020B0604020202020204" pitchFamily="34" charset="0"/>
+            </a:endParaRPr>
+          </a:p>
+        </p:txBody>
+      </p:sp>
+      <p:sp>
+        <p:nvSpPr>
+          <p:cNvPr id="91" name="Rectangle: Rounded Corners 90">
+            <a:extLst>
+              <a:ext uri="{FF2B5EF4-FFF2-40B4-BE49-F238E27FC236}">
+                <a16:creationId xmlns:a16="http://schemas.microsoft.com/office/drawing/2014/main" id="{F474268A-B82E-9805-7CD2-7D29F7A3645C}"/>
+              </a:ext>
+            </a:extLst>
+          </p:cNvPr>
+          <p:cNvSpPr/>
+          <p:nvPr/>
+        </p:nvSpPr>
+        <p:spPr>
+          <a:xfrm>
+            <a:off x="2334063" y="1638300"/>
+            <a:ext cx="847725" cy="1494791"/>
+          </a:xfrm>
+          <a:prstGeom prst="roundRect">
+            <a:avLst>
+              <a:gd name="adj" fmla="val 5856"/>
+            </a:avLst>
+          </a:prstGeom>
+          <a:solidFill>
+            <a:srgbClr val="CCD497"/>
+          </a:solidFill>
+          <a:ln w="19050">
+            <a:headEnd type="none" w="med" len="med"/>
+            <a:tailEnd type="none" w="med" len="med"/>
+          </a:ln>
+        </p:spPr>
+        <p:style>
+          <a:lnRef idx="2">
+            <a:schemeClr val="dk1"/>
+          </a:lnRef>
+          <a:fillRef idx="1">
+            <a:schemeClr val="lt1"/>
+          </a:fillRef>
+          <a:effectRef idx="0">
+            <a:schemeClr val="dk1"/>
+          </a:effectRef>
+          <a:fontRef idx="minor">
+            <a:schemeClr val="dk1"/>
+          </a:fontRef>
+        </p:style>
+        <p:txBody>
+          <a:bodyPr rtlCol="0" anchor="ctr"/>
+          <a:lstStyle/>
+          <a:p>
+            <a:pPr algn="ctr"/>
+            <a:r>
+              <a:rPr lang="de-DE" sz="1100">
+                <a:latin typeface="+mj-lt"/>
+                <a:cs typeface="Arial" panose="020B0604020202020204" pitchFamily="34" charset="0"/>
+              </a:rPr>
+              <a:t>Quote Rule</a:t>
+            </a:r>
+            <a:endParaRPr lang="en-GB" sz="1100" dirty="0">
+              <a:latin typeface="+mj-lt"/>
+              <a:cs typeface="Arial" panose="020B0604020202020204" pitchFamily="34" charset="0"/>
+            </a:endParaRPr>
+          </a:p>
+        </p:txBody>
+      </p:sp>
+      <p:sp>
+        <p:nvSpPr>
+          <p:cNvPr id="96" name="Rectangle: Rounded Corners 95">
+            <a:extLst>
+              <a:ext uri="{FF2B5EF4-FFF2-40B4-BE49-F238E27FC236}">
+                <a16:creationId xmlns:a16="http://schemas.microsoft.com/office/drawing/2014/main" id="{FDC0E662-F332-71DA-D808-03B2BBCDCA22}"/>
+              </a:ext>
+            </a:extLst>
+          </p:cNvPr>
+          <p:cNvSpPr/>
+          <p:nvPr/>
+        </p:nvSpPr>
+        <p:spPr>
+          <a:xfrm>
+            <a:off x="3803347" y="1628775"/>
+            <a:ext cx="828676" cy="501602"/>
+          </a:xfrm>
+          <a:prstGeom prst="roundRect">
+            <a:avLst>
+              <a:gd name="adj" fmla="val 5856"/>
+            </a:avLst>
+          </a:prstGeom>
+          <a:solidFill>
+            <a:srgbClr val="A8D1EE"/>
+          </a:solidFill>
+          <a:ln w="19050">
+            <a:headEnd type="none" w="med" len="med"/>
+            <a:tailEnd type="none" w="med" len="med"/>
+          </a:ln>
+        </p:spPr>
+        <p:style>
+          <a:lnRef idx="2">
+            <a:schemeClr val="dk1"/>
+          </a:lnRef>
+          <a:fillRef idx="1">
+            <a:schemeClr val="lt1"/>
+          </a:fillRef>
+          <a:effectRef idx="0">
+            <a:schemeClr val="dk1"/>
+          </a:effectRef>
+          <a:fontRef idx="minor">
+            <a:schemeClr val="dk1"/>
+          </a:fontRef>
+        </p:style>
+        <p:txBody>
+          <a:bodyPr rtlCol="0" anchor="ctr"/>
+          <a:lstStyle/>
+          <a:p>
+            <a:pPr algn="ctr"/>
+            <a:r>
+              <a:rPr lang="de-DE" sz="1100">
+                <a:latin typeface="+mj-lt"/>
+                <a:cs typeface="Arial" panose="020B0604020202020204" pitchFamily="34" charset="0"/>
+              </a:rPr>
+              <a:t>Tick Rule</a:t>
+            </a:r>
+            <a:endParaRPr lang="en-GB" sz="1100" dirty="0">
+              <a:latin typeface="+mj-lt"/>
+              <a:cs typeface="Arial" panose="020B0604020202020204" pitchFamily="34" charset="0"/>
+            </a:endParaRPr>
+          </a:p>
+        </p:txBody>
+      </p:sp>
+      <p:sp>
+        <p:nvSpPr>
+          <p:cNvPr id="99" name="Rectangle: Rounded Corners 98">
+            <a:extLst>
+              <a:ext uri="{FF2B5EF4-FFF2-40B4-BE49-F238E27FC236}">
+                <a16:creationId xmlns:a16="http://schemas.microsoft.com/office/drawing/2014/main" id="{3922EFF8-9A2B-5432-7B17-3D312C510E5F}"/>
+              </a:ext>
+            </a:extLst>
+          </p:cNvPr>
+          <p:cNvSpPr/>
+          <p:nvPr/>
+        </p:nvSpPr>
+        <p:spPr>
+          <a:xfrm>
+            <a:off x="3803347" y="2168476"/>
+            <a:ext cx="828676" cy="257175"/>
+          </a:xfrm>
+          <a:prstGeom prst="roundRect">
+            <a:avLst>
+              <a:gd name="adj" fmla="val 5856"/>
+            </a:avLst>
+          </a:prstGeom>
+          <a:solidFill>
+            <a:srgbClr val="CCD497"/>
+          </a:solidFill>
+          <a:ln w="19050">
+            <a:headEnd type="none" w="med" len="med"/>
+            <a:tailEnd type="none" w="med" len="med"/>
+          </a:ln>
+        </p:spPr>
+        <p:style>
+          <a:lnRef idx="2">
+            <a:schemeClr val="dk1"/>
+          </a:lnRef>
+          <a:fillRef idx="1">
+            <a:schemeClr val="lt1"/>
+          </a:fillRef>
+          <a:effectRef idx="0">
+            <a:schemeClr val="dk1"/>
+          </a:effectRef>
+          <a:fontRef idx="minor">
+            <a:schemeClr val="dk1"/>
+          </a:fontRef>
+        </p:style>
+        <p:txBody>
+          <a:bodyPr rtlCol="0" anchor="ctr"/>
+          <a:lstStyle/>
+          <a:p>
+            <a:pPr algn="ctr"/>
+            <a:r>
+              <a:rPr lang="de-DE" sz="1100" dirty="0">
+                <a:latin typeface="+mj-lt"/>
+                <a:cs typeface="Arial" panose="020B0604020202020204" pitchFamily="34" charset="0"/>
+              </a:rPr>
+              <a:t>Quote Rule</a:t>
+            </a:r>
+            <a:endParaRPr lang="en-GB" sz="1100" dirty="0">
+              <a:latin typeface="+mj-lt"/>
+              <a:cs typeface="Arial" panose="020B0604020202020204" pitchFamily="34" charset="0"/>
+            </a:endParaRPr>
+          </a:p>
+        </p:txBody>
+      </p:sp>
+      <p:sp>
+        <p:nvSpPr>
+          <p:cNvPr id="101" name="Rectangle: Rounded Corners 100">
+            <a:extLst>
+              <a:ext uri="{FF2B5EF4-FFF2-40B4-BE49-F238E27FC236}">
+                <a16:creationId xmlns:a16="http://schemas.microsoft.com/office/drawing/2014/main" id="{77735B34-F151-78D8-A7BD-2302FD6086E3}"/>
+              </a:ext>
+            </a:extLst>
+          </p:cNvPr>
+          <p:cNvSpPr/>
+          <p:nvPr/>
+        </p:nvSpPr>
+        <p:spPr>
+          <a:xfrm>
+            <a:off x="3812872" y="2473276"/>
+            <a:ext cx="828676" cy="1670099"/>
+          </a:xfrm>
+          <a:prstGeom prst="roundRect">
+            <a:avLst>
+              <a:gd name="adj" fmla="val 5856"/>
+            </a:avLst>
+          </a:prstGeom>
+          <a:solidFill>
+            <a:srgbClr val="A8D1EE"/>
+          </a:solidFill>
+          <a:ln w="19050">
+            <a:headEnd type="none" w="med" len="med"/>
+            <a:tailEnd type="none" w="med" len="med"/>
+          </a:ln>
+        </p:spPr>
+        <p:style>
+          <a:lnRef idx="2">
+            <a:schemeClr val="dk1"/>
+          </a:lnRef>
+          <a:fillRef idx="1">
+            <a:schemeClr val="lt1"/>
+          </a:fillRef>
+          <a:effectRef idx="0">
+            <a:schemeClr val="dk1"/>
+          </a:effectRef>
+          <a:fontRef idx="minor">
+            <a:schemeClr val="dk1"/>
+          </a:fontRef>
+        </p:style>
+        <p:txBody>
+          <a:bodyPr rtlCol="0" anchor="ctr"/>
+          <a:lstStyle/>
+          <a:p>
+            <a:pPr algn="ctr"/>
+            <a:r>
+              <a:rPr lang="de-DE" sz="1100" dirty="0">
+                <a:latin typeface="+mj-lt"/>
+                <a:cs typeface="Arial" panose="020B0604020202020204" pitchFamily="34" charset="0"/>
+              </a:rPr>
+              <a:t>Tick Rule</a:t>
+            </a:r>
+            <a:endParaRPr lang="en-GB" sz="1100" dirty="0">
+              <a:latin typeface="+mj-lt"/>
+              <a:cs typeface="Arial" panose="020B0604020202020204" pitchFamily="34" charset="0"/>
+            </a:endParaRPr>
+          </a:p>
+        </p:txBody>
+      </p:sp>
+      <p:sp>
+        <p:nvSpPr>
+          <p:cNvPr id="102" name="Rectangle: Rounded Corners 101">
+            <a:extLst>
+              <a:ext uri="{FF2B5EF4-FFF2-40B4-BE49-F238E27FC236}">
+                <a16:creationId xmlns:a16="http://schemas.microsoft.com/office/drawing/2014/main" id="{EA6CA36F-DC0D-9024-6CE8-1140AC4183CD}"/>
+              </a:ext>
+            </a:extLst>
+          </p:cNvPr>
+          <p:cNvSpPr/>
+          <p:nvPr/>
+        </p:nvSpPr>
+        <p:spPr>
+          <a:xfrm>
+            <a:off x="3822397" y="4178251"/>
+            <a:ext cx="828676" cy="257175"/>
+          </a:xfrm>
+          <a:prstGeom prst="roundRect">
+            <a:avLst>
+              <a:gd name="adj" fmla="val 5856"/>
+            </a:avLst>
+          </a:prstGeom>
+          <a:solidFill>
+            <a:srgbClr val="CCD497"/>
+          </a:solidFill>
+          <a:ln w="19050">
+            <a:headEnd type="none" w="med" len="med"/>
+            <a:tailEnd type="none" w="med" len="med"/>
+          </a:ln>
+        </p:spPr>
+        <p:style>
+          <a:lnRef idx="2">
+            <a:schemeClr val="dk1"/>
+          </a:lnRef>
+          <a:fillRef idx="1">
+            <a:schemeClr val="lt1"/>
+          </a:fillRef>
+          <a:effectRef idx="0">
+            <a:schemeClr val="dk1"/>
+          </a:effectRef>
+          <a:fontRef idx="minor">
+            <a:schemeClr val="dk1"/>
+          </a:fontRef>
+        </p:style>
+        <p:txBody>
+          <a:bodyPr rtlCol="0" anchor="ctr"/>
+          <a:lstStyle/>
+          <a:p>
+            <a:pPr algn="ctr"/>
+            <a:r>
+              <a:rPr lang="de-DE" sz="1100" dirty="0">
+                <a:latin typeface="+mj-lt"/>
+                <a:cs typeface="Arial" panose="020B0604020202020204" pitchFamily="34" charset="0"/>
+              </a:rPr>
+              <a:t>Quote Rule</a:t>
+            </a:r>
+            <a:endParaRPr lang="en-GB" sz="1100" dirty="0">
+              <a:latin typeface="+mj-lt"/>
+              <a:cs typeface="Arial" panose="020B0604020202020204" pitchFamily="34" charset="0"/>
+            </a:endParaRPr>
+          </a:p>
+        </p:txBody>
+      </p:sp>
+      <p:sp>
+        <p:nvSpPr>
+          <p:cNvPr id="104" name="Rectangle: Rounded Corners 103">
+            <a:extLst>
+              <a:ext uri="{FF2B5EF4-FFF2-40B4-BE49-F238E27FC236}">
+                <a16:creationId xmlns:a16="http://schemas.microsoft.com/office/drawing/2014/main" id="{FF3230AF-BE60-F490-FC5F-F5CF3EABA02C}"/>
+              </a:ext>
+            </a:extLst>
+          </p:cNvPr>
+          <p:cNvSpPr/>
+          <p:nvPr/>
+        </p:nvSpPr>
+        <p:spPr>
+          <a:xfrm>
+            <a:off x="3822397" y="4471988"/>
+            <a:ext cx="828676" cy="501602"/>
+          </a:xfrm>
+          <a:prstGeom prst="roundRect">
+            <a:avLst>
+              <a:gd name="adj" fmla="val 5856"/>
+            </a:avLst>
+          </a:prstGeom>
+          <a:solidFill>
+            <a:srgbClr val="A8D1EE"/>
+          </a:solidFill>
+          <a:ln w="19050">
+            <a:headEnd type="none" w="med" len="med"/>
+            <a:tailEnd type="none" w="med" len="med"/>
+          </a:ln>
+        </p:spPr>
+        <p:style>
+          <a:lnRef idx="2">
+            <a:schemeClr val="dk1"/>
+          </a:lnRef>
+          <a:fillRef idx="1">
+            <a:schemeClr val="lt1"/>
+          </a:fillRef>
+          <a:effectRef idx="0">
+            <a:schemeClr val="dk1"/>
+          </a:effectRef>
+          <a:fontRef idx="minor">
+            <a:schemeClr val="dk1"/>
+          </a:fontRef>
+        </p:style>
+        <p:txBody>
+          <a:bodyPr rtlCol="0" anchor="ctr"/>
+          <a:lstStyle/>
+          <a:p>
+            <a:pPr algn="ctr"/>
+            <a:r>
+              <a:rPr lang="de-DE" sz="1100">
+                <a:latin typeface="+mj-lt"/>
+                <a:cs typeface="Arial" panose="020B0604020202020204" pitchFamily="34" charset="0"/>
+              </a:rPr>
+              <a:t>Tick Rule</a:t>
+            </a:r>
+            <a:endParaRPr lang="en-GB" sz="1100" dirty="0">
+              <a:latin typeface="+mj-lt"/>
+              <a:cs typeface="Arial" panose="020B0604020202020204" pitchFamily="34" charset="0"/>
+            </a:endParaRPr>
+          </a:p>
+        </p:txBody>
+      </p:sp>
+      <p:sp>
+        <p:nvSpPr>
+          <p:cNvPr id="105" name="Rectangle: Rounded Corners 104">
+            <a:extLst>
+              <a:ext uri="{FF2B5EF4-FFF2-40B4-BE49-F238E27FC236}">
+                <a16:creationId xmlns:a16="http://schemas.microsoft.com/office/drawing/2014/main" id="{411D4D92-E79C-FEB5-5C88-08AF89C95640}"/>
+              </a:ext>
+            </a:extLst>
+          </p:cNvPr>
+          <p:cNvSpPr/>
+          <p:nvPr/>
+        </p:nvSpPr>
+        <p:spPr>
+          <a:xfrm>
+            <a:off x="5515258" y="1647825"/>
+            <a:ext cx="828676" cy="614069"/>
+          </a:xfrm>
+          <a:prstGeom prst="roundRect">
+            <a:avLst>
+              <a:gd name="adj" fmla="val 5856"/>
+            </a:avLst>
+          </a:prstGeom>
+          <a:solidFill>
+            <a:srgbClr val="A8D1EE"/>
+          </a:solidFill>
+          <a:ln w="19050">
+            <a:headEnd type="none" w="med" len="med"/>
+            <a:tailEnd type="none" w="med" len="med"/>
+          </a:ln>
+        </p:spPr>
+        <p:style>
+          <a:lnRef idx="2">
+            <a:schemeClr val="dk1"/>
+          </a:lnRef>
+          <a:fillRef idx="1">
+            <a:schemeClr val="lt1"/>
+          </a:fillRef>
+          <a:effectRef idx="0">
+            <a:schemeClr val="dk1"/>
+          </a:effectRef>
+          <a:fontRef idx="minor">
+            <a:schemeClr val="dk1"/>
+          </a:fontRef>
+        </p:style>
+        <p:txBody>
+          <a:bodyPr rtlCol="0" anchor="ctr"/>
+          <a:lstStyle/>
+          <a:p>
+            <a:pPr algn="ctr"/>
+            <a:r>
+              <a:rPr lang="de-DE" sz="1100">
+                <a:latin typeface="+mj-lt"/>
+                <a:cs typeface="Arial" panose="020B0604020202020204" pitchFamily="34" charset="0"/>
+              </a:rPr>
+              <a:t>Tick Rule</a:t>
+            </a:r>
+            <a:endParaRPr lang="en-GB" sz="1100" dirty="0">
+              <a:latin typeface="+mj-lt"/>
+              <a:cs typeface="Arial" panose="020B0604020202020204" pitchFamily="34" charset="0"/>
+            </a:endParaRPr>
+          </a:p>
+        </p:txBody>
+      </p:sp>
+      <p:sp>
+        <p:nvSpPr>
+          <p:cNvPr id="107" name="Rectangle: Rounded Corners 106">
+            <a:extLst>
+              <a:ext uri="{FF2B5EF4-FFF2-40B4-BE49-F238E27FC236}">
+                <a16:creationId xmlns:a16="http://schemas.microsoft.com/office/drawing/2014/main" id="{63B2BF83-E8BD-710B-9FA9-E37853BCAF55}"/>
+              </a:ext>
+            </a:extLst>
+          </p:cNvPr>
+          <p:cNvSpPr/>
+          <p:nvPr/>
+        </p:nvSpPr>
+        <p:spPr>
+          <a:xfrm>
+            <a:off x="5524783" y="2877845"/>
+            <a:ext cx="828676" cy="841375"/>
+          </a:xfrm>
+          <a:prstGeom prst="roundRect">
+            <a:avLst>
+              <a:gd name="adj" fmla="val 5856"/>
+            </a:avLst>
+          </a:prstGeom>
+          <a:solidFill>
+            <a:srgbClr val="A8D1EE"/>
+          </a:solidFill>
+          <a:ln w="19050">
+            <a:headEnd type="none" w="med" len="med"/>
+            <a:tailEnd type="none" w="med" len="med"/>
+          </a:ln>
+        </p:spPr>
+        <p:style>
+          <a:lnRef idx="2">
+            <a:schemeClr val="dk1"/>
+          </a:lnRef>
+          <a:fillRef idx="1">
+            <a:schemeClr val="lt1"/>
+          </a:fillRef>
+          <a:effectRef idx="0">
+            <a:schemeClr val="dk1"/>
+          </a:effectRef>
+          <a:fontRef idx="minor">
+            <a:schemeClr val="dk1"/>
+          </a:fontRef>
+        </p:style>
+        <p:txBody>
+          <a:bodyPr rtlCol="0" anchor="ctr"/>
+          <a:lstStyle/>
+          <a:p>
+            <a:pPr algn="ctr"/>
+            <a:r>
+              <a:rPr lang="de-DE" sz="1100" dirty="0">
+                <a:latin typeface="+mj-lt"/>
+                <a:cs typeface="Arial" panose="020B0604020202020204" pitchFamily="34" charset="0"/>
+              </a:rPr>
+              <a:t>Tick Rule</a:t>
+            </a:r>
+            <a:endParaRPr lang="en-GB" sz="1100" dirty="0">
+              <a:latin typeface="+mj-lt"/>
+              <a:cs typeface="Arial" panose="020B0604020202020204" pitchFamily="34" charset="0"/>
+            </a:endParaRPr>
+          </a:p>
+        </p:txBody>
+      </p:sp>
+      <p:sp>
+        <p:nvSpPr>
+          <p:cNvPr id="108" name="Rectangle: Rounded Corners 107">
+            <a:extLst>
+              <a:ext uri="{FF2B5EF4-FFF2-40B4-BE49-F238E27FC236}">
+                <a16:creationId xmlns:a16="http://schemas.microsoft.com/office/drawing/2014/main" id="{314141A1-F184-A050-4CC8-042212917CD5}"/>
+              </a:ext>
+            </a:extLst>
+          </p:cNvPr>
+          <p:cNvSpPr/>
+          <p:nvPr/>
+        </p:nvSpPr>
+        <p:spPr>
+          <a:xfrm>
+            <a:off x="5524783" y="3757321"/>
+            <a:ext cx="828676" cy="511126"/>
+          </a:xfrm>
+          <a:prstGeom prst="roundRect">
+            <a:avLst>
+              <a:gd name="adj" fmla="val 5856"/>
+            </a:avLst>
+          </a:prstGeom>
+          <a:solidFill>
+            <a:srgbClr val="CCD497"/>
+          </a:solidFill>
+          <a:ln w="19050">
+            <a:headEnd type="none" w="med" len="med"/>
+            <a:tailEnd type="none" w="med" len="med"/>
+          </a:ln>
+        </p:spPr>
+        <p:style>
+          <a:lnRef idx="2">
+            <a:schemeClr val="dk1"/>
+          </a:lnRef>
+          <a:fillRef idx="1">
+            <a:schemeClr val="lt1"/>
+          </a:fillRef>
+          <a:effectRef idx="0">
+            <a:schemeClr val="dk1"/>
+          </a:effectRef>
+          <a:fontRef idx="minor">
+            <a:schemeClr val="dk1"/>
+          </a:fontRef>
+        </p:style>
+        <p:txBody>
+          <a:bodyPr rtlCol="0" anchor="ctr"/>
+          <a:lstStyle/>
+          <a:p>
+            <a:pPr algn="ctr"/>
+            <a:r>
+              <a:rPr lang="de-DE" sz="1100" dirty="0">
+                <a:latin typeface="+mj-lt"/>
+                <a:cs typeface="Arial" panose="020B0604020202020204" pitchFamily="34" charset="0"/>
+              </a:rPr>
+              <a:t>Quote Rule</a:t>
+            </a:r>
+            <a:endParaRPr lang="en-GB" sz="1100" dirty="0">
+              <a:latin typeface="+mj-lt"/>
+              <a:cs typeface="Arial" panose="020B0604020202020204" pitchFamily="34" charset="0"/>
+            </a:endParaRPr>
+          </a:p>
+        </p:txBody>
+      </p:sp>
+      <p:sp>
+        <p:nvSpPr>
+          <p:cNvPr id="110" name="Rectangle: Rounded Corners 109">
+            <a:extLst>
+              <a:ext uri="{FF2B5EF4-FFF2-40B4-BE49-F238E27FC236}">
+                <a16:creationId xmlns:a16="http://schemas.microsoft.com/office/drawing/2014/main" id="{9F4F3805-0B09-C164-7BE4-0789BDBF82FE}"/>
+              </a:ext>
+            </a:extLst>
+          </p:cNvPr>
+          <p:cNvSpPr/>
+          <p:nvPr/>
+        </p:nvSpPr>
+        <p:spPr>
+          <a:xfrm>
+            <a:off x="5521608" y="2315871"/>
+            <a:ext cx="828676" cy="511126"/>
+          </a:xfrm>
+          <a:prstGeom prst="roundRect">
+            <a:avLst>
+              <a:gd name="adj" fmla="val 5856"/>
+            </a:avLst>
+          </a:prstGeom>
+          <a:solidFill>
+            <a:srgbClr val="CCD497"/>
+          </a:solidFill>
+          <a:ln w="19050">
+            <a:headEnd type="none" w="med" len="med"/>
+            <a:tailEnd type="none" w="med" len="med"/>
+          </a:ln>
+        </p:spPr>
+        <p:style>
+          <a:lnRef idx="2">
+            <a:schemeClr val="dk1"/>
+          </a:lnRef>
+          <a:fillRef idx="1">
+            <a:schemeClr val="lt1"/>
+          </a:fillRef>
+          <a:effectRef idx="0">
+            <a:schemeClr val="dk1"/>
+          </a:effectRef>
+          <a:fontRef idx="minor">
+            <a:schemeClr val="dk1"/>
+          </a:fontRef>
+        </p:style>
+        <p:txBody>
+          <a:bodyPr rtlCol="0" anchor="ctr"/>
+          <a:lstStyle/>
+          <a:p>
+            <a:pPr algn="ctr"/>
+            <a:r>
+              <a:rPr lang="de-DE" sz="1100" dirty="0">
+                <a:latin typeface="+mj-lt"/>
+                <a:cs typeface="Arial" panose="020B0604020202020204" pitchFamily="34" charset="0"/>
+              </a:rPr>
+              <a:t>Quote Rule</a:t>
+            </a:r>
+            <a:endParaRPr lang="en-GB" sz="1100" dirty="0">
+              <a:latin typeface="+mj-lt"/>
+              <a:cs typeface="Arial" panose="020B0604020202020204" pitchFamily="34" charset="0"/>
+            </a:endParaRPr>
+          </a:p>
+        </p:txBody>
+      </p:sp>
+      <p:sp>
+        <p:nvSpPr>
+          <p:cNvPr id="111" name="Rectangle: Rounded Corners 110">
+            <a:extLst>
+              <a:ext uri="{FF2B5EF4-FFF2-40B4-BE49-F238E27FC236}">
+                <a16:creationId xmlns:a16="http://schemas.microsoft.com/office/drawing/2014/main" id="{F8CEEFAF-0140-6F45-9886-456FC1B6749A}"/>
+              </a:ext>
+            </a:extLst>
+          </p:cNvPr>
+          <p:cNvSpPr/>
+          <p:nvPr/>
+        </p:nvSpPr>
+        <p:spPr>
+          <a:xfrm>
+            <a:off x="5527958" y="4322469"/>
+            <a:ext cx="828676" cy="638175"/>
+          </a:xfrm>
+          <a:prstGeom prst="roundRect">
+            <a:avLst>
+              <a:gd name="adj" fmla="val 5856"/>
+            </a:avLst>
+          </a:prstGeom>
+          <a:solidFill>
+            <a:srgbClr val="A8D1EE"/>
+          </a:solidFill>
+          <a:ln w="19050">
+            <a:headEnd type="none" w="med" len="med"/>
+            <a:tailEnd type="none" w="med" len="med"/>
+          </a:ln>
+        </p:spPr>
+        <p:style>
+          <a:lnRef idx="2">
+            <a:schemeClr val="dk1"/>
+          </a:lnRef>
+          <a:fillRef idx="1">
+            <a:schemeClr val="lt1"/>
+          </a:fillRef>
+          <a:effectRef idx="0">
+            <a:schemeClr val="dk1"/>
+          </a:effectRef>
+          <a:fontRef idx="minor">
+            <a:schemeClr val="dk1"/>
+          </a:fontRef>
+        </p:style>
+        <p:txBody>
+          <a:bodyPr rtlCol="0" anchor="ctr"/>
+          <a:lstStyle/>
+          <a:p>
+            <a:pPr algn="ctr"/>
+            <a:r>
+              <a:rPr lang="de-DE" sz="1100">
+                <a:latin typeface="+mj-lt"/>
+                <a:cs typeface="Arial" panose="020B0604020202020204" pitchFamily="34" charset="0"/>
+              </a:rPr>
+              <a:t>Tick Rule</a:t>
+            </a:r>
+            <a:endParaRPr lang="en-GB" sz="1100" dirty="0">
+              <a:latin typeface="+mj-lt"/>
+              <a:cs typeface="Arial" panose="020B0604020202020204" pitchFamily="34" charset="0"/>
+            </a:endParaRPr>
+          </a:p>
+        </p:txBody>
+      </p:sp>
+      <p:sp>
+        <p:nvSpPr>
+          <p:cNvPr id="114" name="TextBox 113">
+            <a:extLst>
+              <a:ext uri="{FF2B5EF4-FFF2-40B4-BE49-F238E27FC236}">
+                <a16:creationId xmlns:a16="http://schemas.microsoft.com/office/drawing/2014/main" id="{04ADBCB6-E2ED-33ED-1FE7-C8C9ED3A63F8}"/>
+              </a:ext>
+            </a:extLst>
+          </p:cNvPr>
+          <p:cNvSpPr txBox="1"/>
+          <p:nvPr/>
+        </p:nvSpPr>
+        <p:spPr>
+          <a:xfrm>
+            <a:off x="1679575" y="3596005"/>
+            <a:ext cx="452368" cy="261610"/>
+          </a:xfrm>
+          <a:prstGeom prst="rect">
+            <a:avLst/>
+          </a:prstGeom>
+          <a:noFill/>
+        </p:spPr>
+        <p:txBody>
+          <a:bodyPr wrap="none" rtlCol="0">
+            <a:spAutoFit/>
+          </a:bodyPr>
+          <a:lstStyle/>
+          <a:p>
+            <a:r>
+              <a:rPr lang="de-DE" sz="1100" dirty="0">
+                <a:solidFill>
+                  <a:srgbClr val="A5A5A5"/>
+                </a:solidFill>
+                <a:latin typeface="+mj-lt"/>
+                <a:cs typeface="Arial" panose="020B0604020202020204" pitchFamily="34" charset="0"/>
+              </a:rPr>
+              <a:t>3/10</a:t>
+            </a:r>
+            <a:endParaRPr lang="en-GB" sz="1100" dirty="0">
+              <a:solidFill>
+                <a:srgbClr val="A5A5A5"/>
+              </a:solidFill>
+              <a:latin typeface="+mj-lt"/>
+              <a:cs typeface="Arial" panose="020B0604020202020204" pitchFamily="34" charset="0"/>
+            </a:endParaRPr>
+          </a:p>
+        </p:txBody>
+      </p:sp>
+      <p:sp>
+        <p:nvSpPr>
+          <p:cNvPr id="115" name="TextBox 114">
+            <a:extLst>
+              <a:ext uri="{FF2B5EF4-FFF2-40B4-BE49-F238E27FC236}">
+                <a16:creationId xmlns:a16="http://schemas.microsoft.com/office/drawing/2014/main" id="{AB321A9A-FD04-53D5-91F4-A0C65B8D5FFF}"/>
+              </a:ext>
+            </a:extLst>
+          </p:cNvPr>
+          <p:cNvSpPr txBox="1"/>
+          <p:nvPr/>
+        </p:nvSpPr>
+        <p:spPr>
+          <a:xfrm>
+            <a:off x="1695450" y="2713355"/>
+            <a:ext cx="452368" cy="261610"/>
+          </a:xfrm>
+          <a:prstGeom prst="rect">
+            <a:avLst/>
+          </a:prstGeom>
+          <a:noFill/>
+        </p:spPr>
+        <p:txBody>
+          <a:bodyPr wrap="none" rtlCol="0">
+            <a:spAutoFit/>
+          </a:bodyPr>
+          <a:lstStyle/>
+          <a:p>
+            <a:r>
+              <a:rPr lang="de-DE" sz="1100" dirty="0">
+                <a:solidFill>
+                  <a:srgbClr val="A5A5A5"/>
+                </a:solidFill>
+                <a:latin typeface="+mj-lt"/>
+                <a:cs typeface="Arial" panose="020B0604020202020204" pitchFamily="34" charset="0"/>
+              </a:rPr>
+              <a:t>7/10</a:t>
+            </a:r>
+            <a:endParaRPr lang="en-GB" sz="1100" dirty="0">
+              <a:solidFill>
+                <a:srgbClr val="A5A5A5"/>
+              </a:solidFill>
+              <a:latin typeface="+mj-lt"/>
+              <a:cs typeface="Arial" panose="020B0604020202020204" pitchFamily="34" charset="0"/>
+            </a:endParaRPr>
+          </a:p>
+        </p:txBody>
+      </p:sp>
+    </p:spTree>
+    <p:extLst>
+      <p:ext uri="{BB962C8B-B14F-4D97-AF65-F5344CB8AC3E}">
+        <p14:creationId xmlns:p14="http://schemas.microsoft.com/office/powerpoint/2010/main" val="46556285"/>
+      </p:ext>
+    </p:extLst>
+  </p:cSld>
+  <p:clrMapOvr>
+    <a:masterClrMapping/>
+  </p:clrMapOvr>
+</p:sld>
+</file>
+
+<file path=ppt/slides/slide5.xml><?xml version="1.0" encoding="utf-8"?>
 <p:sld xmlns:a="http://schemas.openxmlformats.org/drawingml/2006/main" xmlns:r="http://schemas.openxmlformats.org/officeDocument/2006/relationships" xmlns:p="http://schemas.openxmlformats.org/presentationml/2006/main">
   <p:cSld>
     <p:spTree>
@@ -17527,7 +20800,7 @@
 </p:sld>
 </file>
 
-<file path=ppt/slides/slide5.xml><?xml version="1.0" encoding="utf-8"?>
+<file path=ppt/slides/slide6.xml><?xml version="1.0" encoding="utf-8"?>
 <p:sld xmlns:a="http://schemas.openxmlformats.org/drawingml/2006/main" xmlns:r="http://schemas.openxmlformats.org/officeDocument/2006/relationships" xmlns:p="http://schemas.openxmlformats.org/presentationml/2006/main">
   <p:cSld>
     <p:spTree>
@@ -19106,7 +22379,7 @@
 </p:sld>
 </file>
 
-<file path=ppt/slides/slide6.xml><?xml version="1.0" encoding="utf-8"?>
+<file path=ppt/slides/slide7.xml><?xml version="1.0" encoding="utf-8"?>
 <p:sld xmlns:a="http://schemas.openxmlformats.org/drawingml/2006/main" xmlns:r="http://schemas.openxmlformats.org/officeDocument/2006/relationships" xmlns:p="http://schemas.openxmlformats.org/presentationml/2006/main">
   <p:cSld>
     <p:spTree>
@@ -19195,7 +22468,7 @@
         </p:blipFill>
         <p:spPr>
           <a:xfrm>
-            <a:off x="333375" y="0"/>
+            <a:off x="400050" y="-314325"/>
             <a:ext cx="11675147" cy="6858000"/>
           </a:xfrm>
           <a:prstGeom prst="rect">
@@ -19216,7 +22489,7 @@
 </p:sld>
 </file>
 
-<file path=ppt/slides/slide7.xml><?xml version="1.0" encoding="utf-8"?>
+<file path=ppt/slides/slide8.xml><?xml version="1.0" encoding="utf-8"?>
 <p:sld xmlns:a="http://schemas.openxmlformats.org/drawingml/2006/main" xmlns:r="http://schemas.openxmlformats.org/officeDocument/2006/relationships" xmlns:p="http://schemas.openxmlformats.org/presentationml/2006/main">
   <p:cSld>
     <p:spTree>

</xml_diff>

<commit_message>
Add visualization of stacked rules 🎨
</commit_message>
<xml_diff>
--- a/reports/Graphs/diagrams.pptx
+++ b/reports/Graphs/diagrams.pptx
@@ -133,12 +133,12 @@
   <pc:docChgLst>
     <pc:chgData name="Markus Bilz" userId="a36021e4bdb9349f" providerId="LiveId" clId="{F9F2BE70-AAED-47FD-A055-7B08EB1371A3}"/>
     <pc:docChg chg="undo custSel addSld modSld sldOrd">
-      <pc:chgData name="Markus Bilz" userId="a36021e4bdb9349f" providerId="LiveId" clId="{F9F2BE70-AAED-47FD-A055-7B08EB1371A3}" dt="2023-02-13T09:52:22.184" v="1394" actId="478"/>
+      <pc:chgData name="Markus Bilz" userId="a36021e4bdb9349f" providerId="LiveId" clId="{F9F2BE70-AAED-47FD-A055-7B08EB1371A3}" dt="2023-02-13T12:40:40.683" v="1395" actId="207"/>
       <pc:docMkLst>
         <pc:docMk/>
       </pc:docMkLst>
       <pc:sldChg chg="modSp mod">
-        <pc:chgData name="Markus Bilz" userId="a36021e4bdb9349f" providerId="LiveId" clId="{F9F2BE70-AAED-47FD-A055-7B08EB1371A3}" dt="2023-02-11T09:33:35.734" v="493" actId="108"/>
+        <pc:chgData name="Markus Bilz" userId="a36021e4bdb9349f" providerId="LiveId" clId="{F9F2BE70-AAED-47FD-A055-7B08EB1371A3}" dt="2023-02-13T12:40:40.683" v="1395" actId="207"/>
         <pc:sldMkLst>
           <pc:docMk/>
           <pc:sldMk cId="2836008551" sldId="256"/>
@@ -149,6 +149,14 @@
             <pc:docMk/>
             <pc:sldMk cId="2836008551" sldId="256"/>
             <ac:spMk id="61" creationId="{C00FF0EF-2F9D-F942-4F6E-0006C5307219}"/>
+          </ac:spMkLst>
+        </pc:spChg>
+        <pc:spChg chg="mod">
+          <ac:chgData name="Markus Bilz" userId="a36021e4bdb9349f" providerId="LiveId" clId="{F9F2BE70-AAED-47FD-A055-7B08EB1371A3}" dt="2023-02-13T12:40:40.683" v="1395" actId="207"/>
+          <ac:spMkLst>
+            <pc:docMk/>
+            <pc:sldMk cId="2836008551" sldId="256"/>
+            <ac:spMk id="62" creationId="{C0641B72-A83F-2F0C-92F9-BC5B309B52B7}"/>
           </ac:spMkLst>
         </pc:spChg>
         <pc:spChg chg="mod">

</xml_diff>

<commit_message>
Refactor and enhance stacked hybrid rules to separate chapter 🔢 (#155)
Adresses #10
</commit_message>
<xml_diff>
--- a/reports/Graphs/diagrams.pptx
+++ b/reports/Graphs/diagrams.pptx
@@ -9,10 +9,11 @@
     <p:sldId id="263" r:id="rId3"/>
     <p:sldId id="262" r:id="rId4"/>
     <p:sldId id="264" r:id="rId5"/>
-    <p:sldId id="260" r:id="rId6"/>
-    <p:sldId id="261" r:id="rId7"/>
-    <p:sldId id="259" r:id="rId8"/>
-    <p:sldId id="257" r:id="rId9"/>
+    <p:sldId id="265" r:id="rId6"/>
+    <p:sldId id="260" r:id="rId7"/>
+    <p:sldId id="261" r:id="rId8"/>
+    <p:sldId id="259" r:id="rId9"/>
+    <p:sldId id="257" r:id="rId10"/>
   </p:sldIdLst>
   <p:sldSz cx="12192000" cy="6858000"/>
   <p:notesSz cx="6858000" cy="9144000"/>
@@ -122,7 +123,7 @@
 <file path=ppt/revisionInfo.xml><?xml version="1.0" encoding="utf-8"?>
 <p1510:revInfo xmlns:a="http://schemas.openxmlformats.org/drawingml/2006/main" xmlns:r="http://schemas.openxmlformats.org/officeDocument/2006/relationships" xmlns:p1510="http://schemas.microsoft.com/office/powerpoint/2015/10/main">
   <p1510:revLst>
-    <p1510:client id="{F9F2BE70-AAED-47FD-A055-7B08EB1371A3}" v="61" dt="2023-02-11T11:01:55.090"/>
+    <p1510:client id="{F9F2BE70-AAED-47FD-A055-7B08EB1371A3}" v="137" dt="2023-02-13T09:48:54.349"/>
   </p1510:revLst>
 </p1510:revInfo>
 </file>
@@ -132,12 +133,12 @@
   <pc:docChgLst>
     <pc:chgData name="Markus Bilz" userId="a36021e4bdb9349f" providerId="LiveId" clId="{F9F2BE70-AAED-47FD-A055-7B08EB1371A3}"/>
     <pc:docChg chg="undo custSel addSld modSld sldOrd">
-      <pc:chgData name="Markus Bilz" userId="a36021e4bdb9349f" providerId="LiveId" clId="{F9F2BE70-AAED-47FD-A055-7B08EB1371A3}" dt="2023-02-11T11:01:55.584" v="812" actId="14100"/>
+      <pc:chgData name="Markus Bilz" userId="a36021e4bdb9349f" providerId="LiveId" clId="{F9F2BE70-AAED-47FD-A055-7B08EB1371A3}" dt="2023-02-14T08:31:01.716" v="1397" actId="108"/>
       <pc:docMkLst>
         <pc:docMk/>
       </pc:docMkLst>
       <pc:sldChg chg="modSp mod">
-        <pc:chgData name="Markus Bilz" userId="a36021e4bdb9349f" providerId="LiveId" clId="{F9F2BE70-AAED-47FD-A055-7B08EB1371A3}" dt="2023-02-11T09:33:35.734" v="493" actId="108"/>
+        <pc:chgData name="Markus Bilz" userId="a36021e4bdb9349f" providerId="LiveId" clId="{F9F2BE70-AAED-47FD-A055-7B08EB1371A3}" dt="2023-02-13T12:40:40.683" v="1395" actId="207"/>
         <pc:sldMkLst>
           <pc:docMk/>
           <pc:sldMk cId="2836008551" sldId="256"/>
@@ -148,6 +149,14 @@
             <pc:docMk/>
             <pc:sldMk cId="2836008551" sldId="256"/>
             <ac:spMk id="61" creationId="{C00FF0EF-2F9D-F942-4F6E-0006C5307219}"/>
+          </ac:spMkLst>
+        </pc:spChg>
+        <pc:spChg chg="mod">
+          <ac:chgData name="Markus Bilz" userId="a36021e4bdb9349f" providerId="LiveId" clId="{F9F2BE70-AAED-47FD-A055-7B08EB1371A3}" dt="2023-02-13T12:40:40.683" v="1395" actId="207"/>
+          <ac:spMkLst>
+            <pc:docMk/>
+            <pc:sldMk cId="2836008551" sldId="256"/>
+            <ac:spMk id="62" creationId="{C0641B72-A83F-2F0C-92F9-BC5B309B52B7}"/>
           </ac:spMkLst>
         </pc:spChg>
         <pc:spChg chg="mod">
@@ -1411,11 +1420,19 @@
         </pc:cxnChg>
       </pc:sldChg>
       <pc:sldChg chg="addSp delSp modSp add mod">
-        <pc:chgData name="Markus Bilz" userId="a36021e4bdb9349f" providerId="LiveId" clId="{F9F2BE70-AAED-47FD-A055-7B08EB1371A3}" dt="2023-02-11T11:01:55.584" v="812" actId="14100"/>
+        <pc:chgData name="Markus Bilz" userId="a36021e4bdb9349f" providerId="LiveId" clId="{F9F2BE70-AAED-47FD-A055-7B08EB1371A3}" dt="2023-02-14T08:31:01.716" v="1397" actId="108"/>
         <pc:sldMkLst>
           <pc:docMk/>
           <pc:sldMk cId="46556285" sldId="264"/>
         </pc:sldMkLst>
+        <pc:spChg chg="add mod">
+          <ac:chgData name="Markus Bilz" userId="a36021e4bdb9349f" providerId="LiveId" clId="{F9F2BE70-AAED-47FD-A055-7B08EB1371A3}" dt="2023-02-13T05:14:03.447" v="874" actId="1076"/>
+          <ac:spMkLst>
+            <pc:docMk/>
+            <pc:sldMk cId="46556285" sldId="264"/>
+            <ac:spMk id="2" creationId="{979CA419-571C-AAA5-5ACE-3A8CAC909C6C}"/>
+          </ac:spMkLst>
+        </pc:spChg>
         <pc:spChg chg="del">
           <ac:chgData name="Markus Bilz" userId="a36021e4bdb9349f" providerId="LiveId" clId="{F9F2BE70-AAED-47FD-A055-7B08EB1371A3}" dt="2023-02-11T09:06:00.496" v="249" actId="478"/>
           <ac:spMkLst>
@@ -1432,6 +1449,14 @@
             <ac:spMk id="2" creationId="{B450D4CB-F1C2-848F-39C9-9605CCACB94F}"/>
           </ac:spMkLst>
         </pc:spChg>
+        <pc:spChg chg="add mod">
+          <ac:chgData name="Markus Bilz" userId="a36021e4bdb9349f" providerId="LiveId" clId="{F9F2BE70-AAED-47FD-A055-7B08EB1371A3}" dt="2023-02-13T05:00:00.611" v="864" actId="1076"/>
+          <ac:spMkLst>
+            <pc:docMk/>
+            <pc:sldMk cId="46556285" sldId="264"/>
+            <ac:spMk id="3" creationId="{98FB6394-CD33-2063-909B-BCF709DC878B}"/>
+          </ac:spMkLst>
+        </pc:spChg>
         <pc:spChg chg="add del mod">
           <ac:chgData name="Markus Bilz" userId="a36021e4bdb9349f" providerId="LiveId" clId="{F9F2BE70-AAED-47FD-A055-7B08EB1371A3}" dt="2023-02-11T09:13:30.847" v="292" actId="478"/>
           <ac:spMkLst>
@@ -1481,7 +1506,7 @@
           </ac:spMkLst>
         </pc:spChg>
         <pc:spChg chg="add mod">
-          <ac:chgData name="Markus Bilz" userId="a36021e4bdb9349f" providerId="LiveId" clId="{F9F2BE70-AAED-47FD-A055-7B08EB1371A3}" dt="2023-02-11T10:04:38.357" v="750" actId="1076"/>
+          <ac:chgData name="Markus Bilz" userId="a36021e4bdb9349f" providerId="LiveId" clId="{F9F2BE70-AAED-47FD-A055-7B08EB1371A3}" dt="2023-02-13T04:47:35.811" v="815" actId="2711"/>
           <ac:spMkLst>
             <pc:docMk/>
             <pc:sldMk cId="46556285" sldId="264"/>
@@ -1489,7 +1514,7 @@
           </ac:spMkLst>
         </pc:spChg>
         <pc:spChg chg="add mod">
-          <ac:chgData name="Markus Bilz" userId="a36021e4bdb9349f" providerId="LiveId" clId="{F9F2BE70-AAED-47FD-A055-7B08EB1371A3}" dt="2023-02-11T10:04:38.357" v="750" actId="1076"/>
+          <ac:chgData name="Markus Bilz" userId="a36021e4bdb9349f" providerId="LiveId" clId="{F9F2BE70-AAED-47FD-A055-7B08EB1371A3}" dt="2023-02-13T04:47:35.811" v="815" actId="2711"/>
           <ac:spMkLst>
             <pc:docMk/>
             <pc:sldMk cId="46556285" sldId="264"/>
@@ -1497,7 +1522,7 @@
           </ac:spMkLst>
         </pc:spChg>
         <pc:spChg chg="add mod">
-          <ac:chgData name="Markus Bilz" userId="a36021e4bdb9349f" providerId="LiveId" clId="{F9F2BE70-AAED-47FD-A055-7B08EB1371A3}" dt="2023-02-11T10:04:38.357" v="750" actId="1076"/>
+          <ac:chgData name="Markus Bilz" userId="a36021e4bdb9349f" providerId="LiveId" clId="{F9F2BE70-AAED-47FD-A055-7B08EB1371A3}" dt="2023-02-13T04:47:35.811" v="815" actId="2711"/>
           <ac:spMkLst>
             <pc:docMk/>
             <pc:sldMk cId="46556285" sldId="264"/>
@@ -1761,7 +1786,7 @@
           </ac:spMkLst>
         </pc:spChg>
         <pc:spChg chg="add mod">
-          <ac:chgData name="Markus Bilz" userId="a36021e4bdb9349f" providerId="LiveId" clId="{F9F2BE70-AAED-47FD-A055-7B08EB1371A3}" dt="2023-02-11T11:01:55.584" v="812" actId="14100"/>
+          <ac:chgData name="Markus Bilz" userId="a36021e4bdb9349f" providerId="LiveId" clId="{F9F2BE70-AAED-47FD-A055-7B08EB1371A3}" dt="2023-02-13T04:53:10.758" v="850" actId="207"/>
           <ac:spMkLst>
             <pc:docMk/>
             <pc:sldMk cId="46556285" sldId="264"/>
@@ -1769,7 +1794,7 @@
           </ac:spMkLst>
         </pc:spChg>
         <pc:spChg chg="add mod">
-          <ac:chgData name="Markus Bilz" userId="a36021e4bdb9349f" providerId="LiveId" clId="{F9F2BE70-AAED-47FD-A055-7B08EB1371A3}" dt="2023-02-11T11:01:53.867" v="805" actId="1076"/>
+          <ac:chgData name="Markus Bilz" userId="a36021e4bdb9349f" providerId="LiveId" clId="{F9F2BE70-AAED-47FD-A055-7B08EB1371A3}" dt="2023-02-13T04:58:14.880" v="862" actId="207"/>
           <ac:spMkLst>
             <pc:docMk/>
             <pc:sldMk cId="46556285" sldId="264"/>
@@ -1777,7 +1802,7 @@
           </ac:spMkLst>
         </pc:spChg>
         <pc:spChg chg="add mod">
-          <ac:chgData name="Markus Bilz" userId="a36021e4bdb9349f" providerId="LiveId" clId="{F9F2BE70-AAED-47FD-A055-7B08EB1371A3}" dt="2023-02-11T11:01:53.867" v="805" actId="1076"/>
+          <ac:chgData name="Markus Bilz" userId="a36021e4bdb9349f" providerId="LiveId" clId="{F9F2BE70-AAED-47FD-A055-7B08EB1371A3}" dt="2023-02-13T04:56:06.398" v="858" actId="207"/>
           <ac:spMkLst>
             <pc:docMk/>
             <pc:sldMk cId="46556285" sldId="264"/>
@@ -1857,7 +1882,7 @@
           </ac:spMkLst>
         </pc:spChg>
         <pc:spChg chg="add mod">
-          <ac:chgData name="Markus Bilz" userId="a36021e4bdb9349f" providerId="LiveId" clId="{F9F2BE70-AAED-47FD-A055-7B08EB1371A3}" dt="2023-02-11T10:04:38.357" v="750" actId="1076"/>
+          <ac:chgData name="Markus Bilz" userId="a36021e4bdb9349f" providerId="LiveId" clId="{F9F2BE70-AAED-47FD-A055-7B08EB1371A3}" dt="2023-02-13T04:58:02.939" v="861" actId="207"/>
           <ac:spMkLst>
             <pc:docMk/>
             <pc:sldMk cId="46556285" sldId="264"/>
@@ -1873,7 +1898,7 @@
           </ac:spMkLst>
         </pc:spChg>
         <pc:spChg chg="add mod ord">
-          <ac:chgData name="Markus Bilz" userId="a36021e4bdb9349f" providerId="LiveId" clId="{F9F2BE70-AAED-47FD-A055-7B08EB1371A3}" dt="2023-02-11T10:04:38.357" v="750" actId="1076"/>
+          <ac:chgData name="Markus Bilz" userId="a36021e4bdb9349f" providerId="LiveId" clId="{F9F2BE70-AAED-47FD-A055-7B08EB1371A3}" dt="2023-02-13T04:58:30.144" v="863" actId="207"/>
           <ac:spMkLst>
             <pc:docMk/>
             <pc:sldMk cId="46556285" sldId="264"/>
@@ -1881,7 +1906,7 @@
           </ac:spMkLst>
         </pc:spChg>
         <pc:spChg chg="add mod ord">
-          <ac:chgData name="Markus Bilz" userId="a36021e4bdb9349f" providerId="LiveId" clId="{F9F2BE70-AAED-47FD-A055-7B08EB1371A3}" dt="2023-02-11T10:04:38.357" v="750" actId="1076"/>
+          <ac:chgData name="Markus Bilz" userId="a36021e4bdb9349f" providerId="LiveId" clId="{F9F2BE70-AAED-47FD-A055-7B08EB1371A3}" dt="2023-02-13T04:58:30.144" v="863" actId="207"/>
           <ac:spMkLst>
             <pc:docMk/>
             <pc:sldMk cId="46556285" sldId="264"/>
@@ -1889,7 +1914,7 @@
           </ac:spMkLst>
         </pc:spChg>
         <pc:spChg chg="add mod">
-          <ac:chgData name="Markus Bilz" userId="a36021e4bdb9349f" providerId="LiveId" clId="{F9F2BE70-AAED-47FD-A055-7B08EB1371A3}" dt="2023-02-11T10:04:38.357" v="750" actId="1076"/>
+          <ac:chgData name="Markus Bilz" userId="a36021e4bdb9349f" providerId="LiveId" clId="{F9F2BE70-AAED-47FD-A055-7B08EB1371A3}" dt="2023-02-13T04:58:02.939" v="861" actId="207"/>
           <ac:spMkLst>
             <pc:docMk/>
             <pc:sldMk cId="46556285" sldId="264"/>
@@ -1913,7 +1938,7 @@
           </ac:spMkLst>
         </pc:spChg>
         <pc:spChg chg="add mod">
-          <ac:chgData name="Markus Bilz" userId="a36021e4bdb9349f" providerId="LiveId" clId="{F9F2BE70-AAED-47FD-A055-7B08EB1371A3}" dt="2023-02-11T10:04:38.357" v="750" actId="1076"/>
+          <ac:chgData name="Markus Bilz" userId="a36021e4bdb9349f" providerId="LiveId" clId="{F9F2BE70-AAED-47FD-A055-7B08EB1371A3}" dt="2023-02-13T04:58:30.144" v="863" actId="207"/>
           <ac:spMkLst>
             <pc:docMk/>
             <pc:sldMk cId="46556285" sldId="264"/>
@@ -1929,7 +1954,7 @@
           </ac:spMkLst>
         </pc:spChg>
         <pc:spChg chg="add mod">
-          <ac:chgData name="Markus Bilz" userId="a36021e4bdb9349f" providerId="LiveId" clId="{F9F2BE70-AAED-47FD-A055-7B08EB1371A3}" dt="2023-02-11T10:04:38.357" v="750" actId="1076"/>
+          <ac:chgData name="Markus Bilz" userId="a36021e4bdb9349f" providerId="LiveId" clId="{F9F2BE70-AAED-47FD-A055-7B08EB1371A3}" dt="2023-02-13T04:58:02.939" v="861" actId="207"/>
           <ac:spMkLst>
             <pc:docMk/>
             <pc:sldMk cId="46556285" sldId="264"/>
@@ -1937,7 +1962,7 @@
           </ac:spMkLst>
         </pc:spChg>
         <pc:spChg chg="add mod">
-          <ac:chgData name="Markus Bilz" userId="a36021e4bdb9349f" providerId="LiveId" clId="{F9F2BE70-AAED-47FD-A055-7B08EB1371A3}" dt="2023-02-11T10:04:38.357" v="750" actId="1076"/>
+          <ac:chgData name="Markus Bilz" userId="a36021e4bdb9349f" providerId="LiveId" clId="{F9F2BE70-AAED-47FD-A055-7B08EB1371A3}" dt="2023-02-14T08:31:01.716" v="1397" actId="108"/>
           <ac:spMkLst>
             <pc:docMk/>
             <pc:sldMk cId="46556285" sldId="264"/>
@@ -1953,7 +1978,7 @@
           </ac:spMkLst>
         </pc:spChg>
         <pc:spChg chg="add mod">
-          <ac:chgData name="Markus Bilz" userId="a36021e4bdb9349f" providerId="LiveId" clId="{F9F2BE70-AAED-47FD-A055-7B08EB1371A3}" dt="2023-02-11T10:04:38.357" v="750" actId="1076"/>
+          <ac:chgData name="Markus Bilz" userId="a36021e4bdb9349f" providerId="LiveId" clId="{F9F2BE70-AAED-47FD-A055-7B08EB1371A3}" dt="2023-02-13T04:58:02.939" v="861" actId="207"/>
           <ac:spMkLst>
             <pc:docMk/>
             <pc:sldMk cId="46556285" sldId="264"/>
@@ -1961,7 +1986,7 @@
           </ac:spMkLst>
         </pc:spChg>
         <pc:spChg chg="add mod">
-          <ac:chgData name="Markus Bilz" userId="a36021e4bdb9349f" providerId="LiveId" clId="{F9F2BE70-AAED-47FD-A055-7B08EB1371A3}" dt="2023-02-11T10:04:38.357" v="750" actId="1076"/>
+          <ac:chgData name="Markus Bilz" userId="a36021e4bdb9349f" providerId="LiveId" clId="{F9F2BE70-AAED-47FD-A055-7B08EB1371A3}" dt="2023-02-13T04:53:55.593" v="854" actId="207"/>
           <ac:spMkLst>
             <pc:docMk/>
             <pc:sldMk cId="46556285" sldId="264"/>
@@ -1977,7 +2002,7 @@
           </ac:spMkLst>
         </pc:spChg>
         <pc:spChg chg="add mod">
-          <ac:chgData name="Markus Bilz" userId="a36021e4bdb9349f" providerId="LiveId" clId="{F9F2BE70-AAED-47FD-A055-7B08EB1371A3}" dt="2023-02-11T10:04:38.357" v="750" actId="1076"/>
+          <ac:chgData name="Markus Bilz" userId="a36021e4bdb9349f" providerId="LiveId" clId="{F9F2BE70-AAED-47FD-A055-7B08EB1371A3}" dt="2023-02-13T04:53:55.593" v="854" actId="207"/>
           <ac:spMkLst>
             <pc:docMk/>
             <pc:sldMk cId="46556285" sldId="264"/>
@@ -1985,7 +2010,7 @@
           </ac:spMkLst>
         </pc:spChg>
         <pc:spChg chg="add mod">
-          <ac:chgData name="Markus Bilz" userId="a36021e4bdb9349f" providerId="LiveId" clId="{F9F2BE70-AAED-47FD-A055-7B08EB1371A3}" dt="2023-02-11T10:04:38.357" v="750" actId="1076"/>
+          <ac:chgData name="Markus Bilz" userId="a36021e4bdb9349f" providerId="LiveId" clId="{F9F2BE70-AAED-47FD-A055-7B08EB1371A3}" dt="2023-02-13T04:58:30.144" v="863" actId="207"/>
           <ac:spMkLst>
             <pc:docMk/>
             <pc:sldMk cId="46556285" sldId="264"/>
@@ -2001,7 +2026,7 @@
           </ac:spMkLst>
         </pc:spChg>
         <pc:spChg chg="add mod">
-          <ac:chgData name="Markus Bilz" userId="a36021e4bdb9349f" providerId="LiveId" clId="{F9F2BE70-AAED-47FD-A055-7B08EB1371A3}" dt="2023-02-11T10:04:38.357" v="750" actId="1076"/>
+          <ac:chgData name="Markus Bilz" userId="a36021e4bdb9349f" providerId="LiveId" clId="{F9F2BE70-AAED-47FD-A055-7B08EB1371A3}" dt="2023-02-13T04:58:30.144" v="863" actId="207"/>
           <ac:spMkLst>
             <pc:docMk/>
             <pc:sldMk cId="46556285" sldId="264"/>
@@ -2009,7 +2034,7 @@
           </ac:spMkLst>
         </pc:spChg>
         <pc:spChg chg="add mod">
-          <ac:chgData name="Markus Bilz" userId="a36021e4bdb9349f" providerId="LiveId" clId="{F9F2BE70-AAED-47FD-A055-7B08EB1371A3}" dt="2023-02-11T10:04:38.357" v="750" actId="1076"/>
+          <ac:chgData name="Markus Bilz" userId="a36021e4bdb9349f" providerId="LiveId" clId="{F9F2BE70-AAED-47FD-A055-7B08EB1371A3}" dt="2023-02-13T04:53:55.593" v="854" actId="207"/>
           <ac:spMkLst>
             <pc:docMk/>
             <pc:sldMk cId="46556285" sldId="264"/>
@@ -2017,7 +2042,7 @@
           </ac:spMkLst>
         </pc:spChg>
         <pc:spChg chg="add mod">
-          <ac:chgData name="Markus Bilz" userId="a36021e4bdb9349f" providerId="LiveId" clId="{F9F2BE70-AAED-47FD-A055-7B08EB1371A3}" dt="2023-02-11T10:04:38.357" v="750" actId="1076"/>
+          <ac:chgData name="Markus Bilz" userId="a36021e4bdb9349f" providerId="LiveId" clId="{F9F2BE70-AAED-47FD-A055-7B08EB1371A3}" dt="2023-02-13T04:47:35.811" v="815" actId="2711"/>
           <ac:spMkLst>
             <pc:docMk/>
             <pc:sldMk cId="46556285" sldId="264"/>
@@ -2025,7 +2050,7 @@
           </ac:spMkLst>
         </pc:spChg>
         <pc:spChg chg="add mod">
-          <ac:chgData name="Markus Bilz" userId="a36021e4bdb9349f" providerId="LiveId" clId="{F9F2BE70-AAED-47FD-A055-7B08EB1371A3}" dt="2023-02-11T10:04:38.357" v="750" actId="1076"/>
+          <ac:chgData name="Markus Bilz" userId="a36021e4bdb9349f" providerId="LiveId" clId="{F9F2BE70-AAED-47FD-A055-7B08EB1371A3}" dt="2023-02-13T04:47:35.811" v="815" actId="2711"/>
           <ac:spMkLst>
             <pc:docMk/>
             <pc:sldMk cId="46556285" sldId="264"/>
@@ -2430,6 +2455,701 @@
             <pc:docMk/>
             <pc:sldMk cId="46556285" sldId="264"/>
             <ac:cxnSpMk id="155" creationId="{187CA740-ECBD-3C15-E2B0-22241DC820F1}"/>
+          </ac:cxnSpMkLst>
+        </pc:cxnChg>
+      </pc:sldChg>
+      <pc:sldChg chg="addSp delSp modSp add mod">
+        <pc:chgData name="Markus Bilz" userId="a36021e4bdb9349f" providerId="LiveId" clId="{F9F2BE70-AAED-47FD-A055-7B08EB1371A3}" dt="2023-02-13T09:52:22.184" v="1394" actId="478"/>
+        <pc:sldMkLst>
+          <pc:docMk/>
+          <pc:sldMk cId="2880998982" sldId="265"/>
+        </pc:sldMkLst>
+        <pc:spChg chg="del">
+          <ac:chgData name="Markus Bilz" userId="a36021e4bdb9349f" providerId="LiveId" clId="{F9F2BE70-AAED-47FD-A055-7B08EB1371A3}" dt="2023-02-13T09:40:34.808" v="1326" actId="478"/>
+          <ac:spMkLst>
+            <pc:docMk/>
+            <pc:sldMk cId="2880998982" sldId="265"/>
+            <ac:spMk id="2" creationId="{979CA419-571C-AAA5-5ACE-3A8CAC909C6C}"/>
+          </ac:spMkLst>
+        </pc:spChg>
+        <pc:spChg chg="add del mod">
+          <ac:chgData name="Markus Bilz" userId="a36021e4bdb9349f" providerId="LiveId" clId="{F9F2BE70-AAED-47FD-A055-7B08EB1371A3}" dt="2023-02-13T08:32:30.813" v="890" actId="478"/>
+          <ac:spMkLst>
+            <pc:docMk/>
+            <pc:sldMk cId="2880998982" sldId="265"/>
+            <ac:spMk id="6" creationId="{CF0F7418-C246-C912-D4F7-60132B0620F7}"/>
+          </ac:spMkLst>
+        </pc:spChg>
+        <pc:spChg chg="del">
+          <ac:chgData name="Markus Bilz" userId="a36021e4bdb9349f" providerId="LiveId" clId="{F9F2BE70-AAED-47FD-A055-7B08EB1371A3}" dt="2023-02-13T08:30:58.216" v="876" actId="478"/>
+          <ac:spMkLst>
+            <pc:docMk/>
+            <pc:sldMk cId="2880998982" sldId="265"/>
+            <ac:spMk id="16" creationId="{23F0A351-4582-96BB-41DB-B2076B852011}"/>
+          </ac:spMkLst>
+        </pc:spChg>
+        <pc:spChg chg="del">
+          <ac:chgData name="Markus Bilz" userId="a36021e4bdb9349f" providerId="LiveId" clId="{F9F2BE70-AAED-47FD-A055-7B08EB1371A3}" dt="2023-02-13T08:30:58.216" v="876" actId="478"/>
+          <ac:spMkLst>
+            <pc:docMk/>
+            <pc:sldMk cId="2880998982" sldId="265"/>
+            <ac:spMk id="17" creationId="{8E7823CC-2312-D341-E44A-3763CE6A05CF}"/>
+          </ac:spMkLst>
+        </pc:spChg>
+        <pc:spChg chg="del">
+          <ac:chgData name="Markus Bilz" userId="a36021e4bdb9349f" providerId="LiveId" clId="{F9F2BE70-AAED-47FD-A055-7B08EB1371A3}" dt="2023-02-13T08:30:58.216" v="876" actId="478"/>
+          <ac:spMkLst>
+            <pc:docMk/>
+            <pc:sldMk cId="2880998982" sldId="265"/>
+            <ac:spMk id="18" creationId="{0ACC3183-53D4-C562-650C-7B76EC539D85}"/>
+          </ac:spMkLst>
+        </pc:spChg>
+        <pc:spChg chg="add mod ord">
+          <ac:chgData name="Markus Bilz" userId="a36021e4bdb9349f" providerId="LiveId" clId="{F9F2BE70-AAED-47FD-A055-7B08EB1371A3}" dt="2023-02-13T09:50:19.911" v="1387" actId="1582"/>
+          <ac:spMkLst>
+            <pc:docMk/>
+            <pc:sldMk cId="2880998982" sldId="265"/>
+            <ac:spMk id="26" creationId="{ADC6D3CC-F3CC-01D1-B479-F52423AC9248}"/>
+          </ac:spMkLst>
+        </pc:spChg>
+        <pc:spChg chg="add mod ord">
+          <ac:chgData name="Markus Bilz" userId="a36021e4bdb9349f" providerId="LiveId" clId="{F9F2BE70-AAED-47FD-A055-7B08EB1371A3}" dt="2023-02-13T09:50:19.911" v="1387" actId="1582"/>
+          <ac:spMkLst>
+            <pc:docMk/>
+            <pc:sldMk cId="2880998982" sldId="265"/>
+            <ac:spMk id="27" creationId="{6949C08B-8EFA-AF50-6765-A70EC8FEAB55}"/>
+          </ac:spMkLst>
+        </pc:spChg>
+        <pc:spChg chg="add mod ord">
+          <ac:chgData name="Markus Bilz" userId="a36021e4bdb9349f" providerId="LiveId" clId="{F9F2BE70-AAED-47FD-A055-7B08EB1371A3}" dt="2023-02-13T09:50:25.109" v="1388" actId="1582"/>
+          <ac:spMkLst>
+            <pc:docMk/>
+            <pc:sldMk cId="2880998982" sldId="265"/>
+            <ac:spMk id="28" creationId="{349BFA3A-B63D-3F62-F88C-6B1D7C181744}"/>
+          </ac:spMkLst>
+        </pc:spChg>
+        <pc:spChg chg="add del mod">
+          <ac:chgData name="Markus Bilz" userId="a36021e4bdb9349f" providerId="LiveId" clId="{F9F2BE70-AAED-47FD-A055-7B08EB1371A3}" dt="2023-02-13T09:16:37.648" v="1166" actId="478"/>
+          <ac:spMkLst>
+            <pc:docMk/>
+            <pc:sldMk cId="2880998982" sldId="265"/>
+            <ac:spMk id="29" creationId="{56F4E106-E677-A696-B705-2002D87626EE}"/>
+          </ac:spMkLst>
+        </pc:spChg>
+        <pc:spChg chg="add mod">
+          <ac:chgData name="Markus Bilz" userId="a36021e4bdb9349f" providerId="LiveId" clId="{F9F2BE70-AAED-47FD-A055-7B08EB1371A3}" dt="2023-02-13T09:05:44.873" v="1040" actId="1076"/>
+          <ac:spMkLst>
+            <pc:docMk/>
+            <pc:sldMk cId="2880998982" sldId="265"/>
+            <ac:spMk id="73" creationId="{6D07C23C-F7A3-527E-6B2D-7D9459719B5A}"/>
+          </ac:spMkLst>
+        </pc:spChg>
+        <pc:spChg chg="del">
+          <ac:chgData name="Markus Bilz" userId="a36021e4bdb9349f" providerId="LiveId" clId="{F9F2BE70-AAED-47FD-A055-7B08EB1371A3}" dt="2023-02-13T08:30:58.216" v="876" actId="478"/>
+          <ac:spMkLst>
+            <pc:docMk/>
+            <pc:sldMk cId="2880998982" sldId="265"/>
+            <ac:spMk id="74" creationId="{36D1AE21-BD7B-027C-55BE-F44DC9AA37CA}"/>
+          </ac:spMkLst>
+        </pc:spChg>
+        <pc:spChg chg="del">
+          <ac:chgData name="Markus Bilz" userId="a36021e4bdb9349f" providerId="LiveId" clId="{F9F2BE70-AAED-47FD-A055-7B08EB1371A3}" dt="2023-02-13T08:30:58.216" v="876" actId="478"/>
+          <ac:spMkLst>
+            <pc:docMk/>
+            <pc:sldMk cId="2880998982" sldId="265"/>
+            <ac:spMk id="75" creationId="{22D2EB51-762E-E07F-687B-4816F4E53131}"/>
+          </ac:spMkLst>
+        </pc:spChg>
+        <pc:spChg chg="del">
+          <ac:chgData name="Markus Bilz" userId="a36021e4bdb9349f" providerId="LiveId" clId="{F9F2BE70-AAED-47FD-A055-7B08EB1371A3}" dt="2023-02-13T08:30:58.216" v="876" actId="478"/>
+          <ac:spMkLst>
+            <pc:docMk/>
+            <pc:sldMk cId="2880998982" sldId="265"/>
+            <ac:spMk id="76" creationId="{2FE971C9-C360-A714-0671-6CF02666DE52}"/>
+          </ac:spMkLst>
+        </pc:spChg>
+        <pc:spChg chg="add mod ord">
+          <ac:chgData name="Markus Bilz" userId="a36021e4bdb9349f" providerId="LiveId" clId="{F9F2BE70-AAED-47FD-A055-7B08EB1371A3}" dt="2023-02-13T09:50:19.911" v="1387" actId="1582"/>
+          <ac:spMkLst>
+            <pc:docMk/>
+            <pc:sldMk cId="2880998982" sldId="265"/>
+            <ac:spMk id="78" creationId="{4BAEFB87-5237-7748-1305-84B5643223C4}"/>
+          </ac:spMkLst>
+        </pc:spChg>
+        <pc:spChg chg="add del mod">
+          <ac:chgData name="Markus Bilz" userId="a36021e4bdb9349f" providerId="LiveId" clId="{F9F2BE70-AAED-47FD-A055-7B08EB1371A3}" dt="2023-02-13T09:06:41.990" v="1047" actId="478"/>
+          <ac:spMkLst>
+            <pc:docMk/>
+            <pc:sldMk cId="2880998982" sldId="265"/>
+            <ac:spMk id="79" creationId="{5B4D39D0-099F-FE18-7998-6616AA1ECCE7}"/>
+          </ac:spMkLst>
+        </pc:spChg>
+        <pc:spChg chg="del">
+          <ac:chgData name="Markus Bilz" userId="a36021e4bdb9349f" providerId="LiveId" clId="{F9F2BE70-AAED-47FD-A055-7B08EB1371A3}" dt="2023-02-13T08:30:58.216" v="876" actId="478"/>
+          <ac:spMkLst>
+            <pc:docMk/>
+            <pc:sldMk cId="2880998982" sldId="265"/>
+            <ac:spMk id="88" creationId="{906C47EB-AD61-7ACE-76A0-F9172022ABCD}"/>
+          </ac:spMkLst>
+        </pc:spChg>
+        <pc:spChg chg="del">
+          <ac:chgData name="Markus Bilz" userId="a36021e4bdb9349f" providerId="LiveId" clId="{F9F2BE70-AAED-47FD-A055-7B08EB1371A3}" dt="2023-02-13T08:30:58.216" v="876" actId="478"/>
+          <ac:spMkLst>
+            <pc:docMk/>
+            <pc:sldMk cId="2880998982" sldId="265"/>
+            <ac:spMk id="90" creationId="{164557EA-9DAD-9EAC-67E1-8F8AB1F8C97C}"/>
+          </ac:spMkLst>
+        </pc:spChg>
+        <pc:spChg chg="del">
+          <ac:chgData name="Markus Bilz" userId="a36021e4bdb9349f" providerId="LiveId" clId="{F9F2BE70-AAED-47FD-A055-7B08EB1371A3}" dt="2023-02-13T08:30:58.216" v="876" actId="478"/>
+          <ac:spMkLst>
+            <pc:docMk/>
+            <pc:sldMk cId="2880998982" sldId="265"/>
+            <ac:spMk id="91" creationId="{F474268A-B82E-9805-7CD2-7D29F7A3645C}"/>
+          </ac:spMkLst>
+        </pc:spChg>
+        <pc:spChg chg="del">
+          <ac:chgData name="Markus Bilz" userId="a36021e4bdb9349f" providerId="LiveId" clId="{F9F2BE70-AAED-47FD-A055-7B08EB1371A3}" dt="2023-02-13T08:30:58.216" v="876" actId="478"/>
+          <ac:spMkLst>
+            <pc:docMk/>
+            <pc:sldMk cId="2880998982" sldId="265"/>
+            <ac:spMk id="96" creationId="{FDC0E662-F332-71DA-D808-03B2BBCDCA22}"/>
+          </ac:spMkLst>
+        </pc:spChg>
+        <pc:spChg chg="add mod">
+          <ac:chgData name="Markus Bilz" userId="a36021e4bdb9349f" providerId="LiveId" clId="{F9F2BE70-AAED-47FD-A055-7B08EB1371A3}" dt="2023-02-13T09:31:47.471" v="1251" actId="1076"/>
+          <ac:spMkLst>
+            <pc:docMk/>
+            <pc:sldMk cId="2880998982" sldId="265"/>
+            <ac:spMk id="98" creationId="{DFDFBB86-DCB6-B9A6-1A31-4410A008DEEB}"/>
+          </ac:spMkLst>
+        </pc:spChg>
+        <pc:spChg chg="del">
+          <ac:chgData name="Markus Bilz" userId="a36021e4bdb9349f" providerId="LiveId" clId="{F9F2BE70-AAED-47FD-A055-7B08EB1371A3}" dt="2023-02-13T08:30:58.216" v="876" actId="478"/>
+          <ac:spMkLst>
+            <pc:docMk/>
+            <pc:sldMk cId="2880998982" sldId="265"/>
+            <ac:spMk id="99" creationId="{3922EFF8-9A2B-5432-7B17-3D312C510E5F}"/>
+          </ac:spMkLst>
+        </pc:spChg>
+        <pc:spChg chg="del">
+          <ac:chgData name="Markus Bilz" userId="a36021e4bdb9349f" providerId="LiveId" clId="{F9F2BE70-AAED-47FD-A055-7B08EB1371A3}" dt="2023-02-13T08:30:58.216" v="876" actId="478"/>
+          <ac:spMkLst>
+            <pc:docMk/>
+            <pc:sldMk cId="2880998982" sldId="265"/>
+            <ac:spMk id="101" creationId="{77735B34-F151-78D8-A7BD-2302FD6086E3}"/>
+          </ac:spMkLst>
+        </pc:spChg>
+        <pc:spChg chg="del">
+          <ac:chgData name="Markus Bilz" userId="a36021e4bdb9349f" providerId="LiveId" clId="{F9F2BE70-AAED-47FD-A055-7B08EB1371A3}" dt="2023-02-13T08:30:58.216" v="876" actId="478"/>
+          <ac:spMkLst>
+            <pc:docMk/>
+            <pc:sldMk cId="2880998982" sldId="265"/>
+            <ac:spMk id="102" creationId="{EA6CA36F-DC0D-9024-6CE8-1140AC4183CD}"/>
+          </ac:spMkLst>
+        </pc:spChg>
+        <pc:spChg chg="del">
+          <ac:chgData name="Markus Bilz" userId="a36021e4bdb9349f" providerId="LiveId" clId="{F9F2BE70-AAED-47FD-A055-7B08EB1371A3}" dt="2023-02-13T08:30:58.216" v="876" actId="478"/>
+          <ac:spMkLst>
+            <pc:docMk/>
+            <pc:sldMk cId="2880998982" sldId="265"/>
+            <ac:spMk id="104" creationId="{FF3230AF-BE60-F490-FC5F-F5CF3EABA02C}"/>
+          </ac:spMkLst>
+        </pc:spChg>
+        <pc:spChg chg="del">
+          <ac:chgData name="Markus Bilz" userId="a36021e4bdb9349f" providerId="LiveId" clId="{F9F2BE70-AAED-47FD-A055-7B08EB1371A3}" dt="2023-02-13T08:30:58.216" v="876" actId="478"/>
+          <ac:spMkLst>
+            <pc:docMk/>
+            <pc:sldMk cId="2880998982" sldId="265"/>
+            <ac:spMk id="105" creationId="{411D4D92-E79C-FEB5-5C88-08AF89C95640}"/>
+          </ac:spMkLst>
+        </pc:spChg>
+        <pc:spChg chg="del">
+          <ac:chgData name="Markus Bilz" userId="a36021e4bdb9349f" providerId="LiveId" clId="{F9F2BE70-AAED-47FD-A055-7B08EB1371A3}" dt="2023-02-13T08:30:58.216" v="876" actId="478"/>
+          <ac:spMkLst>
+            <pc:docMk/>
+            <pc:sldMk cId="2880998982" sldId="265"/>
+            <ac:spMk id="107" creationId="{63B2BF83-E8BD-710B-9FA9-E37853BCAF55}"/>
+          </ac:spMkLst>
+        </pc:spChg>
+        <pc:spChg chg="del">
+          <ac:chgData name="Markus Bilz" userId="a36021e4bdb9349f" providerId="LiveId" clId="{F9F2BE70-AAED-47FD-A055-7B08EB1371A3}" dt="2023-02-13T08:30:58.216" v="876" actId="478"/>
+          <ac:spMkLst>
+            <pc:docMk/>
+            <pc:sldMk cId="2880998982" sldId="265"/>
+            <ac:spMk id="108" creationId="{314141A1-F184-A050-4CC8-042212917CD5}"/>
+          </ac:spMkLst>
+        </pc:spChg>
+        <pc:spChg chg="del">
+          <ac:chgData name="Markus Bilz" userId="a36021e4bdb9349f" providerId="LiveId" clId="{F9F2BE70-AAED-47FD-A055-7B08EB1371A3}" dt="2023-02-13T08:30:58.216" v="876" actId="478"/>
+          <ac:spMkLst>
+            <pc:docMk/>
+            <pc:sldMk cId="2880998982" sldId="265"/>
+            <ac:spMk id="110" creationId="{9F4F3805-0B09-C164-7BE4-0789BDBF82FE}"/>
+          </ac:spMkLst>
+        </pc:spChg>
+        <pc:spChg chg="del">
+          <ac:chgData name="Markus Bilz" userId="a36021e4bdb9349f" providerId="LiveId" clId="{F9F2BE70-AAED-47FD-A055-7B08EB1371A3}" dt="2023-02-13T08:30:58.216" v="876" actId="478"/>
+          <ac:spMkLst>
+            <pc:docMk/>
+            <pc:sldMk cId="2880998982" sldId="265"/>
+            <ac:spMk id="111" creationId="{F8CEEFAF-0140-6F45-9886-456FC1B6749A}"/>
+          </ac:spMkLst>
+        </pc:spChg>
+        <pc:spChg chg="del">
+          <ac:chgData name="Markus Bilz" userId="a36021e4bdb9349f" providerId="LiveId" clId="{F9F2BE70-AAED-47FD-A055-7B08EB1371A3}" dt="2023-02-13T08:30:58.216" v="876" actId="478"/>
+          <ac:spMkLst>
+            <pc:docMk/>
+            <pc:sldMk cId="2880998982" sldId="265"/>
+            <ac:spMk id="114" creationId="{04ADBCB6-E2ED-33ED-1FE7-C8C9ED3A63F8}"/>
+          </ac:spMkLst>
+        </pc:spChg>
+        <pc:spChg chg="del">
+          <ac:chgData name="Markus Bilz" userId="a36021e4bdb9349f" providerId="LiveId" clId="{F9F2BE70-AAED-47FD-A055-7B08EB1371A3}" dt="2023-02-13T08:30:58.216" v="876" actId="478"/>
+          <ac:spMkLst>
+            <pc:docMk/>
+            <pc:sldMk cId="2880998982" sldId="265"/>
+            <ac:spMk id="115" creationId="{AB321A9A-FD04-53D5-91F4-A0C65B8D5FFF}"/>
+          </ac:spMkLst>
+        </pc:spChg>
+        <pc:spChg chg="add mod">
+          <ac:chgData name="Markus Bilz" userId="a36021e4bdb9349f" providerId="LiveId" clId="{F9F2BE70-AAED-47FD-A055-7B08EB1371A3}" dt="2023-02-13T09:13:09.155" v="1127" actId="14100"/>
+          <ac:spMkLst>
+            <pc:docMk/>
+            <pc:sldMk cId="2880998982" sldId="265"/>
+            <ac:spMk id="158" creationId="{61265EE5-F275-52D6-7BC4-D841F2B382BE}"/>
+          </ac:spMkLst>
+        </pc:spChg>
+        <pc:spChg chg="add mod">
+          <ac:chgData name="Markus Bilz" userId="a36021e4bdb9349f" providerId="LiveId" clId="{F9F2BE70-AAED-47FD-A055-7B08EB1371A3}" dt="2023-02-13T09:39:29.239" v="1325" actId="207"/>
+          <ac:spMkLst>
+            <pc:docMk/>
+            <pc:sldMk cId="2880998982" sldId="265"/>
+            <ac:spMk id="216" creationId="{DA2E687C-6A9B-145A-2B2E-807A0E3660D8}"/>
+          </ac:spMkLst>
+        </pc:spChg>
+        <pc:spChg chg="add mod">
+          <ac:chgData name="Markus Bilz" userId="a36021e4bdb9349f" providerId="LiveId" clId="{F9F2BE70-AAED-47FD-A055-7B08EB1371A3}" dt="2023-02-13T09:39:16.718" v="1324" actId="207"/>
+          <ac:spMkLst>
+            <pc:docMk/>
+            <pc:sldMk cId="2880998982" sldId="265"/>
+            <ac:spMk id="217" creationId="{7CE10BE5-7DBD-5A3F-A8EA-F01F02D3E14F}"/>
+          </ac:spMkLst>
+        </pc:spChg>
+        <pc:spChg chg="add mod">
+          <ac:chgData name="Markus Bilz" userId="a36021e4bdb9349f" providerId="LiveId" clId="{F9F2BE70-AAED-47FD-A055-7B08EB1371A3}" dt="2023-02-13T09:33:25.686" v="1260" actId="207"/>
+          <ac:spMkLst>
+            <pc:docMk/>
+            <pc:sldMk cId="2880998982" sldId="265"/>
+            <ac:spMk id="218" creationId="{31FFF19A-7F9E-ABE6-7E28-2ADB75642A28}"/>
+          </ac:spMkLst>
+        </pc:spChg>
+        <pc:spChg chg="add del mod">
+          <ac:chgData name="Markus Bilz" userId="a36021e4bdb9349f" providerId="LiveId" clId="{F9F2BE70-AAED-47FD-A055-7B08EB1371A3}" dt="2023-02-13T09:35:07.273" v="1288" actId="478"/>
+          <ac:spMkLst>
+            <pc:docMk/>
+            <pc:sldMk cId="2880998982" sldId="265"/>
+            <ac:spMk id="219" creationId="{3191AE5A-BBA2-90FA-F77A-05C71D1D7202}"/>
+          </ac:spMkLst>
+        </pc:spChg>
+        <pc:spChg chg="add del mod">
+          <ac:chgData name="Markus Bilz" userId="a36021e4bdb9349f" providerId="LiveId" clId="{F9F2BE70-AAED-47FD-A055-7B08EB1371A3}" dt="2023-02-13T09:35:08.801" v="1289" actId="478"/>
+          <ac:spMkLst>
+            <pc:docMk/>
+            <pc:sldMk cId="2880998982" sldId="265"/>
+            <ac:spMk id="225" creationId="{9C541A77-E8F9-D0C9-2B41-B85A7F050E35}"/>
+          </ac:spMkLst>
+        </pc:spChg>
+        <pc:spChg chg="add mod">
+          <ac:chgData name="Markus Bilz" userId="a36021e4bdb9349f" providerId="LiveId" clId="{F9F2BE70-AAED-47FD-A055-7B08EB1371A3}" dt="2023-02-13T09:34:57.722" v="1284" actId="1076"/>
+          <ac:spMkLst>
+            <pc:docMk/>
+            <pc:sldMk cId="2880998982" sldId="265"/>
+            <ac:spMk id="226" creationId="{25EA19D8-7F68-1FAA-616B-6168A7030EFF}"/>
+          </ac:spMkLst>
+        </pc:spChg>
+        <pc:spChg chg="add mod">
+          <ac:chgData name="Markus Bilz" userId="a36021e4bdb9349f" providerId="LiveId" clId="{F9F2BE70-AAED-47FD-A055-7B08EB1371A3}" dt="2023-02-13T09:35:14.319" v="1291" actId="1076"/>
+          <ac:spMkLst>
+            <pc:docMk/>
+            <pc:sldMk cId="2880998982" sldId="265"/>
+            <ac:spMk id="227" creationId="{99A206CD-141B-B9D3-D0BF-5CB722B479DC}"/>
+          </ac:spMkLst>
+        </pc:spChg>
+        <pc:spChg chg="add mod">
+          <ac:chgData name="Markus Bilz" userId="a36021e4bdb9349f" providerId="LiveId" clId="{F9F2BE70-AAED-47FD-A055-7B08EB1371A3}" dt="2023-02-13T09:35:20.791" v="1294" actId="20577"/>
+          <ac:spMkLst>
+            <pc:docMk/>
+            <pc:sldMk cId="2880998982" sldId="265"/>
+            <ac:spMk id="228" creationId="{5876D75B-D1A8-84D9-B8E5-DA939986585D}"/>
+          </ac:spMkLst>
+        </pc:spChg>
+        <pc:spChg chg="add mod">
+          <ac:chgData name="Markus Bilz" userId="a36021e4bdb9349f" providerId="LiveId" clId="{F9F2BE70-AAED-47FD-A055-7B08EB1371A3}" dt="2023-02-13T09:36:08.915" v="1297" actId="20577"/>
+          <ac:spMkLst>
+            <pc:docMk/>
+            <pc:sldMk cId="2880998982" sldId="265"/>
+            <ac:spMk id="229" creationId="{98625714-F596-9AB6-ACB3-FB2839764AB3}"/>
+          </ac:spMkLst>
+        </pc:spChg>
+        <pc:spChg chg="add mod">
+          <ac:chgData name="Markus Bilz" userId="a36021e4bdb9349f" providerId="LiveId" clId="{F9F2BE70-AAED-47FD-A055-7B08EB1371A3}" dt="2023-02-13T09:36:17.210" v="1300" actId="20577"/>
+          <ac:spMkLst>
+            <pc:docMk/>
+            <pc:sldMk cId="2880998982" sldId="265"/>
+            <ac:spMk id="230" creationId="{4D2D15A0-7DC9-B759-B9E0-032236ED11A0}"/>
+          </ac:spMkLst>
+        </pc:spChg>
+        <pc:spChg chg="add mod">
+          <ac:chgData name="Markus Bilz" userId="a36021e4bdb9349f" providerId="LiveId" clId="{F9F2BE70-AAED-47FD-A055-7B08EB1371A3}" dt="2023-02-13T09:36:26.166" v="1304" actId="20577"/>
+          <ac:spMkLst>
+            <pc:docMk/>
+            <pc:sldMk cId="2880998982" sldId="265"/>
+            <ac:spMk id="231" creationId="{BBA4559E-272C-9C88-5331-377F0DBFAD39}"/>
+          </ac:spMkLst>
+        </pc:spChg>
+        <pc:spChg chg="add mod">
+          <ac:chgData name="Markus Bilz" userId="a36021e4bdb9349f" providerId="LiveId" clId="{F9F2BE70-AAED-47FD-A055-7B08EB1371A3}" dt="2023-02-13T09:36:53.416" v="1322" actId="1076"/>
+          <ac:spMkLst>
+            <pc:docMk/>
+            <pc:sldMk cId="2880998982" sldId="265"/>
+            <ac:spMk id="232" creationId="{CB6FA8C0-5E68-D647-7090-9392F2FE449D}"/>
+          </ac:spMkLst>
+        </pc:spChg>
+        <pc:spChg chg="add del mod ord">
+          <ac:chgData name="Markus Bilz" userId="a36021e4bdb9349f" providerId="LiveId" clId="{F9F2BE70-AAED-47FD-A055-7B08EB1371A3}" dt="2023-02-13T09:51:59.026" v="1391" actId="1076"/>
+          <ac:spMkLst>
+            <pc:docMk/>
+            <pc:sldMk cId="2880998982" sldId="265"/>
+            <ac:spMk id="233" creationId="{C80462C7-5562-1F4F-146B-702719C60EE1}"/>
+          </ac:spMkLst>
+        </pc:spChg>
+        <pc:spChg chg="add del mod ord">
+          <ac:chgData name="Markus Bilz" userId="a36021e4bdb9349f" providerId="LiveId" clId="{F9F2BE70-AAED-47FD-A055-7B08EB1371A3}" dt="2023-02-13T09:51:16.970" v="1389" actId="207"/>
+          <ac:spMkLst>
+            <pc:docMk/>
+            <pc:sldMk cId="2880998982" sldId="265"/>
+            <ac:spMk id="234" creationId="{516BA130-8D2C-1714-6086-0662FEF00BE6}"/>
+          </ac:spMkLst>
+        </pc:spChg>
+        <pc:spChg chg="add del mod">
+          <ac:chgData name="Markus Bilz" userId="a36021e4bdb9349f" providerId="LiveId" clId="{F9F2BE70-AAED-47FD-A055-7B08EB1371A3}" dt="2023-02-13T09:48:52.131" v="1379" actId="11529"/>
+          <ac:spMkLst>
+            <pc:docMk/>
+            <pc:sldMk cId="2880998982" sldId="265"/>
+            <ac:spMk id="235" creationId="{A3A42825-6BBE-A301-5238-D5501C53FBD8}"/>
+          </ac:spMkLst>
+        </pc:spChg>
+        <pc:spChg chg="add del">
+          <ac:chgData name="Markus Bilz" userId="a36021e4bdb9349f" providerId="LiveId" clId="{F9F2BE70-AAED-47FD-A055-7B08EB1371A3}" dt="2023-02-13T09:52:22.184" v="1394" actId="478"/>
+          <ac:spMkLst>
+            <pc:docMk/>
+            <pc:sldMk cId="2880998982" sldId="265"/>
+            <ac:spMk id="236" creationId="{5EE045F9-0B45-C012-753E-621CB49997E5}"/>
+          </ac:spMkLst>
+        </pc:spChg>
+        <pc:grpChg chg="add del">
+          <ac:chgData name="Markus Bilz" userId="a36021e4bdb9349f" providerId="LiveId" clId="{F9F2BE70-AAED-47FD-A055-7B08EB1371A3}" dt="2023-02-13T08:53:39.852" v="906" actId="164"/>
+          <ac:grpSpMkLst>
+            <pc:docMk/>
+            <pc:sldMk cId="2880998982" sldId="265"/>
+            <ac:grpSpMk id="22" creationId="{F5E66585-B9E2-44C1-4C28-045F9BF475BD}"/>
+          </ac:grpSpMkLst>
+        </pc:grpChg>
+        <pc:grpChg chg="add del mod">
+          <ac:chgData name="Markus Bilz" userId="a36021e4bdb9349f" providerId="LiveId" clId="{F9F2BE70-AAED-47FD-A055-7B08EB1371A3}" dt="2023-02-13T08:55:20.242" v="925" actId="478"/>
+          <ac:grpSpMkLst>
+            <pc:docMk/>
+            <pc:sldMk cId="2880998982" sldId="265"/>
+            <ac:grpSpMk id="25" creationId="{29D31F71-BA03-D515-1D65-05986E5AADF5}"/>
+          </ac:grpSpMkLst>
+        </pc:grpChg>
+        <pc:grpChg chg="del">
+          <ac:chgData name="Markus Bilz" userId="a36021e4bdb9349f" providerId="LiveId" clId="{F9F2BE70-AAED-47FD-A055-7B08EB1371A3}" dt="2023-02-13T08:30:58.216" v="876" actId="478"/>
+          <ac:grpSpMkLst>
+            <pc:docMk/>
+            <pc:sldMk cId="2880998982" sldId="265"/>
+            <ac:grpSpMk id="124" creationId="{2244F4BB-BB2D-31B7-9A51-FFEADCE56E9E}"/>
+          </ac:grpSpMkLst>
+        </pc:grpChg>
+        <pc:grpChg chg="del">
+          <ac:chgData name="Markus Bilz" userId="a36021e4bdb9349f" providerId="LiveId" clId="{F9F2BE70-AAED-47FD-A055-7B08EB1371A3}" dt="2023-02-13T08:30:58.216" v="876" actId="478"/>
+          <ac:grpSpMkLst>
+            <pc:docMk/>
+            <pc:sldMk cId="2880998982" sldId="265"/>
+            <ac:grpSpMk id="125" creationId="{AB4F8EBF-01AD-B69D-6A21-45BD78F61BD1}"/>
+          </ac:grpSpMkLst>
+        </pc:grpChg>
+        <pc:grpChg chg="del">
+          <ac:chgData name="Markus Bilz" userId="a36021e4bdb9349f" providerId="LiveId" clId="{F9F2BE70-AAED-47FD-A055-7B08EB1371A3}" dt="2023-02-13T08:30:58.216" v="876" actId="478"/>
+          <ac:grpSpMkLst>
+            <pc:docMk/>
+            <pc:sldMk cId="2880998982" sldId="265"/>
+            <ac:grpSpMk id="131" creationId="{07B69A3C-21DA-D590-07FD-AB494CBC52F0}"/>
+          </ac:grpSpMkLst>
+        </pc:grpChg>
+        <pc:grpChg chg="del">
+          <ac:chgData name="Markus Bilz" userId="a36021e4bdb9349f" providerId="LiveId" clId="{F9F2BE70-AAED-47FD-A055-7B08EB1371A3}" dt="2023-02-13T08:30:58.216" v="876" actId="478"/>
+          <ac:grpSpMkLst>
+            <pc:docMk/>
+            <pc:sldMk cId="2880998982" sldId="265"/>
+            <ac:grpSpMk id="137" creationId="{3909BD29-37A1-9168-370E-1561BD62E282}"/>
+          </ac:grpSpMkLst>
+        </pc:grpChg>
+        <pc:picChg chg="add del mod ord topLvl">
+          <ac:chgData name="Markus Bilz" userId="a36021e4bdb9349f" providerId="LiveId" clId="{F9F2BE70-AAED-47FD-A055-7B08EB1371A3}" dt="2023-02-13T09:31:34.949" v="1250" actId="478"/>
+          <ac:picMkLst>
+            <pc:docMk/>
+            <pc:sldMk cId="2880998982" sldId="265"/>
+            <ac:picMk id="5" creationId="{52AB538E-3246-94F7-B2DF-9957E84FC7D6}"/>
+          </ac:picMkLst>
+        </pc:picChg>
+        <pc:cxnChg chg="add mod topLvl">
+          <ac:chgData name="Markus Bilz" userId="a36021e4bdb9349f" providerId="LiveId" clId="{F9F2BE70-AAED-47FD-A055-7B08EB1371A3}" dt="2023-02-13T08:53:41.226" v="909" actId="208"/>
+          <ac:cxnSpMkLst>
+            <pc:docMk/>
+            <pc:sldMk cId="2880998982" sldId="265"/>
+            <ac:cxnSpMk id="8" creationId="{B28CEB2E-9DB0-BDB7-A02E-ED7223135785}"/>
+          </ac:cxnSpMkLst>
+        </pc:cxnChg>
+        <pc:cxnChg chg="add mod">
+          <ac:chgData name="Markus Bilz" userId="a36021e4bdb9349f" providerId="LiveId" clId="{F9F2BE70-AAED-47FD-A055-7B08EB1371A3}" dt="2023-02-13T08:53:41.693" v="910" actId="14100"/>
+          <ac:cxnSpMkLst>
+            <pc:docMk/>
+            <pc:sldMk cId="2880998982" sldId="265"/>
+            <ac:cxnSpMk id="11" creationId="{8886822B-16A3-2482-2315-3EE78C8BFE7E}"/>
+          </ac:cxnSpMkLst>
+        </pc:cxnChg>
+        <pc:cxnChg chg="add mod topLvl">
+          <ac:chgData name="Markus Bilz" userId="a36021e4bdb9349f" providerId="LiveId" clId="{F9F2BE70-AAED-47FD-A055-7B08EB1371A3}" dt="2023-02-13T08:53:42.531" v="912" actId="14100"/>
+          <ac:cxnSpMkLst>
+            <pc:docMk/>
+            <pc:sldMk cId="2880998982" sldId="265"/>
+            <ac:cxnSpMk id="13" creationId="{065F0E82-35B3-0FAF-37E9-5A8434527CD1}"/>
+          </ac:cxnSpMkLst>
+        </pc:cxnChg>
+        <pc:cxnChg chg="add">
+          <ac:chgData name="Markus Bilz" userId="a36021e4bdb9349f" providerId="LiveId" clId="{F9F2BE70-AAED-47FD-A055-7B08EB1371A3}" dt="2023-02-13T08:53:53.688" v="913" actId="11529"/>
+          <ac:cxnSpMkLst>
+            <pc:docMk/>
+            <pc:sldMk cId="2880998982" sldId="265"/>
+            <ac:cxnSpMk id="24" creationId="{CC0F779F-34E0-596F-08E1-A805EAB01B3C}"/>
+          </ac:cxnSpMkLst>
+        </pc:cxnChg>
+        <pc:cxnChg chg="add mod">
+          <ac:chgData name="Markus Bilz" userId="a36021e4bdb9349f" providerId="LiveId" clId="{F9F2BE70-AAED-47FD-A055-7B08EB1371A3}" dt="2023-02-13T09:06:08.492" v="1042" actId="14100"/>
+          <ac:cxnSpMkLst>
+            <pc:docMk/>
+            <pc:sldMk cId="2880998982" sldId="265"/>
+            <ac:cxnSpMk id="31" creationId="{0ADD5BA8-25F4-1DFD-B5EA-AF948AB45B04}"/>
+          </ac:cxnSpMkLst>
+        </pc:cxnChg>
+        <pc:cxnChg chg="add mod ord">
+          <ac:chgData name="Markus Bilz" userId="a36021e4bdb9349f" providerId="LiveId" clId="{F9F2BE70-AAED-47FD-A055-7B08EB1371A3}" dt="2023-02-13T09:43:21.230" v="1341" actId="167"/>
+          <ac:cxnSpMkLst>
+            <pc:docMk/>
+            <pc:sldMk cId="2880998982" sldId="265"/>
+            <ac:cxnSpMk id="68" creationId="{D664DDFD-5F6A-E779-BBCB-6A6C9F82324E}"/>
+          </ac:cxnSpMkLst>
+        </pc:cxnChg>
+        <pc:cxnChg chg="add mod">
+          <ac:chgData name="Markus Bilz" userId="a36021e4bdb9349f" providerId="LiveId" clId="{F9F2BE70-AAED-47FD-A055-7B08EB1371A3}" dt="2023-02-13T09:07:37.318" v="1059" actId="14100"/>
+          <ac:cxnSpMkLst>
+            <pc:docMk/>
+            <pc:sldMk cId="2880998982" sldId="265"/>
+            <ac:cxnSpMk id="80" creationId="{8D49391C-4D60-485D-4672-EFF8148FB8A4}"/>
+          </ac:cxnSpMkLst>
+        </pc:cxnChg>
+        <pc:cxnChg chg="add mod">
+          <ac:chgData name="Markus Bilz" userId="a36021e4bdb9349f" providerId="LiveId" clId="{F9F2BE70-AAED-47FD-A055-7B08EB1371A3}" dt="2023-02-13T09:07:45.916" v="1060" actId="14100"/>
+          <ac:cxnSpMkLst>
+            <pc:docMk/>
+            <pc:sldMk cId="2880998982" sldId="265"/>
+            <ac:cxnSpMk id="82" creationId="{FFBC87FB-1594-1B85-B936-0F095727EE2C}"/>
+          </ac:cxnSpMkLst>
+        </pc:cxnChg>
+        <pc:cxnChg chg="add del mod">
+          <ac:chgData name="Markus Bilz" userId="a36021e4bdb9349f" providerId="LiveId" clId="{F9F2BE70-AAED-47FD-A055-7B08EB1371A3}" dt="2023-02-13T09:09:12.596" v="1076" actId="478"/>
+          <ac:cxnSpMkLst>
+            <pc:docMk/>
+            <pc:sldMk cId="2880998982" sldId="265"/>
+            <ac:cxnSpMk id="103" creationId="{D86D8BDE-D2BC-BA24-17F7-268661FB3FB4}"/>
+          </ac:cxnSpMkLst>
+        </pc:cxnChg>
+        <pc:cxnChg chg="add mod ord">
+          <ac:chgData name="Markus Bilz" userId="a36021e4bdb9349f" providerId="LiveId" clId="{F9F2BE70-AAED-47FD-A055-7B08EB1371A3}" dt="2023-02-13T09:25:20.693" v="1230" actId="166"/>
+          <ac:cxnSpMkLst>
+            <pc:docMk/>
+            <pc:sldMk cId="2880998982" sldId="265"/>
+            <ac:cxnSpMk id="117" creationId="{01C43FA3-13F3-D2E7-53BD-C3F3DD277BDA}"/>
+          </ac:cxnSpMkLst>
+        </pc:cxnChg>
+        <pc:cxnChg chg="add mod">
+          <ac:chgData name="Markus Bilz" userId="a36021e4bdb9349f" providerId="LiveId" clId="{F9F2BE70-AAED-47FD-A055-7B08EB1371A3}" dt="2023-02-13T09:24:02.422" v="1218" actId="14100"/>
+          <ac:cxnSpMkLst>
+            <pc:docMk/>
+            <pc:sldMk cId="2880998982" sldId="265"/>
+            <ac:cxnSpMk id="119" creationId="{571D9EC8-192B-6696-4205-17BCC50FA492}"/>
+          </ac:cxnSpMkLst>
+        </pc:cxnChg>
+        <pc:cxnChg chg="add mod">
+          <ac:chgData name="Markus Bilz" userId="a36021e4bdb9349f" providerId="LiveId" clId="{F9F2BE70-AAED-47FD-A055-7B08EB1371A3}" dt="2023-02-13T09:18:55.655" v="1178" actId="693"/>
+          <ac:cxnSpMkLst>
+            <pc:docMk/>
+            <pc:sldMk cId="2880998982" sldId="265"/>
+            <ac:cxnSpMk id="143" creationId="{A4AD7C7E-8887-23F0-64B9-4D3809B2954B}"/>
+          </ac:cxnSpMkLst>
+        </pc:cxnChg>
+        <pc:cxnChg chg="add del mod">
+          <ac:chgData name="Markus Bilz" userId="a36021e4bdb9349f" providerId="LiveId" clId="{F9F2BE70-AAED-47FD-A055-7B08EB1371A3}" dt="2023-02-13T09:45:03.278" v="1356" actId="478"/>
+          <ac:cxnSpMkLst>
+            <pc:docMk/>
+            <pc:sldMk cId="2880998982" sldId="265"/>
+            <ac:cxnSpMk id="146" creationId="{9EF4F094-62DF-B0A3-0F05-94BF5D7E7C53}"/>
+          </ac:cxnSpMkLst>
+        </pc:cxnChg>
+        <pc:cxnChg chg="add mod">
+          <ac:chgData name="Markus Bilz" userId="a36021e4bdb9349f" providerId="LiveId" clId="{F9F2BE70-AAED-47FD-A055-7B08EB1371A3}" dt="2023-02-13T09:18:55.655" v="1178" actId="693"/>
+          <ac:cxnSpMkLst>
+            <pc:docMk/>
+            <pc:sldMk cId="2880998982" sldId="265"/>
+            <ac:cxnSpMk id="149" creationId="{1642AE36-18F7-627A-3BBD-349ED1EE87CA}"/>
+          </ac:cxnSpMkLst>
+        </pc:cxnChg>
+        <pc:cxnChg chg="add mod">
+          <ac:chgData name="Markus Bilz" userId="a36021e4bdb9349f" providerId="LiveId" clId="{F9F2BE70-AAED-47FD-A055-7B08EB1371A3}" dt="2023-02-13T09:52:10.159" v="1392" actId="13822"/>
+          <ac:cxnSpMkLst>
+            <pc:docMk/>
+            <pc:sldMk cId="2880998982" sldId="265"/>
+            <ac:cxnSpMk id="150" creationId="{2A6DFED4-2A5A-5890-BD86-979CE6C3DB6F}"/>
+          </ac:cxnSpMkLst>
+        </pc:cxnChg>
+        <pc:cxnChg chg="add del mod">
+          <ac:chgData name="Markus Bilz" userId="a36021e4bdb9349f" providerId="LiveId" clId="{F9F2BE70-AAED-47FD-A055-7B08EB1371A3}" dt="2023-02-13T09:19:33.979" v="1185" actId="478"/>
+          <ac:cxnSpMkLst>
+            <pc:docMk/>
+            <pc:sldMk cId="2880998982" sldId="265"/>
+            <ac:cxnSpMk id="151" creationId="{3915AB08-01C5-0B4A-45A7-0711A3335495}"/>
+          </ac:cxnSpMkLst>
+        </pc:cxnChg>
+        <pc:cxnChg chg="add mod">
+          <ac:chgData name="Markus Bilz" userId="a36021e4bdb9349f" providerId="LiveId" clId="{F9F2BE70-AAED-47FD-A055-7B08EB1371A3}" dt="2023-02-13T09:18:55.655" v="1178" actId="693"/>
+          <ac:cxnSpMkLst>
+            <pc:docMk/>
+            <pc:sldMk cId="2880998982" sldId="265"/>
+            <ac:cxnSpMk id="152" creationId="{4C93ED00-F6DA-2453-C62C-96CD6BD590E1}"/>
+          </ac:cxnSpMkLst>
+        </pc:cxnChg>
+        <pc:cxnChg chg="add del mod">
+          <ac:chgData name="Markus Bilz" userId="a36021e4bdb9349f" providerId="LiveId" clId="{F9F2BE70-AAED-47FD-A055-7B08EB1371A3}" dt="2023-02-13T09:19:36.397" v="1186" actId="478"/>
+          <ac:cxnSpMkLst>
+            <pc:docMk/>
+            <pc:sldMk cId="2880998982" sldId="265"/>
+            <ac:cxnSpMk id="155" creationId="{A47475A2-6A82-B2C2-C955-DECF61F2D357}"/>
+          </ac:cxnSpMkLst>
+        </pc:cxnChg>
+        <pc:cxnChg chg="add mod">
+          <ac:chgData name="Markus Bilz" userId="a36021e4bdb9349f" providerId="LiveId" clId="{F9F2BE70-AAED-47FD-A055-7B08EB1371A3}" dt="2023-02-13T09:13:32.327" v="1133" actId="1076"/>
+          <ac:cxnSpMkLst>
+            <pc:docMk/>
+            <pc:sldMk cId="2880998982" sldId="265"/>
+            <ac:cxnSpMk id="159" creationId="{EB9B2D69-69C8-CB4C-9149-FF72DBF99D22}"/>
+          </ac:cxnSpMkLst>
+        </pc:cxnChg>
+        <pc:cxnChg chg="add del mod ord">
+          <ac:chgData name="Markus Bilz" userId="a36021e4bdb9349f" providerId="LiveId" clId="{F9F2BE70-AAED-47FD-A055-7B08EB1371A3}" dt="2023-02-13T09:30:06.957" v="1248" actId="478"/>
+          <ac:cxnSpMkLst>
+            <pc:docMk/>
+            <pc:sldMk cId="2880998982" sldId="265"/>
+            <ac:cxnSpMk id="160" creationId="{9DBCBB9C-BF0C-F1CA-C1EA-AF2DE38A09A2}"/>
+          </ac:cxnSpMkLst>
+        </pc:cxnChg>
+        <pc:cxnChg chg="add mod ord">
+          <ac:chgData name="Markus Bilz" userId="a36021e4bdb9349f" providerId="LiveId" clId="{F9F2BE70-AAED-47FD-A055-7B08EB1371A3}" dt="2023-02-13T09:43:45.518" v="1345" actId="1076"/>
+          <ac:cxnSpMkLst>
+            <pc:docMk/>
+            <pc:sldMk cId="2880998982" sldId="265"/>
+            <ac:cxnSpMk id="163" creationId="{67BBCCFA-0862-B48C-B521-C14D39C6C5BB}"/>
+          </ac:cxnSpMkLst>
+        </pc:cxnChg>
+        <pc:cxnChg chg="add del mod">
+          <ac:chgData name="Markus Bilz" userId="a36021e4bdb9349f" providerId="LiveId" clId="{F9F2BE70-AAED-47FD-A055-7B08EB1371A3}" dt="2023-02-13T09:19:40.384" v="1187" actId="14100"/>
+          <ac:cxnSpMkLst>
+            <pc:docMk/>
+            <pc:sldMk cId="2880998982" sldId="265"/>
+            <ac:cxnSpMk id="167" creationId="{E90D09B3-79AF-E131-D355-6B05FB8BCB94}"/>
+          </ac:cxnSpMkLst>
+        </pc:cxnChg>
+        <pc:cxnChg chg="add del mod">
+          <ac:chgData name="Markus Bilz" userId="a36021e4bdb9349f" providerId="LiveId" clId="{F9F2BE70-AAED-47FD-A055-7B08EB1371A3}" dt="2023-02-13T09:30:02.899" v="1246" actId="478"/>
+          <ac:cxnSpMkLst>
+            <pc:docMk/>
+            <pc:sldMk cId="2880998982" sldId="265"/>
+            <ac:cxnSpMk id="171" creationId="{2A71BF6A-1DF6-0CFB-E4D7-84E8B9523815}"/>
+          </ac:cxnSpMkLst>
+        </pc:cxnChg>
+        <pc:cxnChg chg="add del mod ord">
+          <ac:chgData name="Markus Bilz" userId="a36021e4bdb9349f" providerId="LiveId" clId="{F9F2BE70-AAED-47FD-A055-7B08EB1371A3}" dt="2023-02-13T09:33:29.149" v="1261" actId="478"/>
+          <ac:cxnSpMkLst>
+            <pc:docMk/>
+            <pc:sldMk cId="2880998982" sldId="265"/>
+            <ac:cxnSpMk id="174" creationId="{A5656651-E846-4B96-393F-AD02E2D5E312}"/>
+          </ac:cxnSpMkLst>
+        </pc:cxnChg>
+        <pc:cxnChg chg="add del mod">
+          <ac:chgData name="Markus Bilz" userId="a36021e4bdb9349f" providerId="LiveId" clId="{F9F2BE70-AAED-47FD-A055-7B08EB1371A3}" dt="2023-02-13T09:30:05.618" v="1247" actId="478"/>
+          <ac:cxnSpMkLst>
+            <pc:docMk/>
+            <pc:sldMk cId="2880998982" sldId="265"/>
+            <ac:cxnSpMk id="177" creationId="{12EF3D51-B8F3-6312-22B2-3DAB1565A38C}"/>
+          </ac:cxnSpMkLst>
+        </pc:cxnChg>
+        <pc:cxnChg chg="add mod">
+          <ac:chgData name="Markus Bilz" userId="a36021e4bdb9349f" providerId="LiveId" clId="{F9F2BE70-AAED-47FD-A055-7B08EB1371A3}" dt="2023-02-13T09:18:55.655" v="1178" actId="693"/>
+          <ac:cxnSpMkLst>
+            <pc:docMk/>
+            <pc:sldMk cId="2880998982" sldId="265"/>
+            <ac:cxnSpMk id="179" creationId="{F2170481-CF30-3739-DB64-AD809DCA32F2}"/>
+          </ac:cxnSpMkLst>
+        </pc:cxnChg>
+        <pc:cxnChg chg="add mod ord">
+          <ac:chgData name="Markus Bilz" userId="a36021e4bdb9349f" providerId="LiveId" clId="{F9F2BE70-AAED-47FD-A055-7B08EB1371A3}" dt="2023-02-13T09:24:06.830" v="1219" actId="14100"/>
+          <ac:cxnSpMkLst>
+            <pc:docMk/>
+            <pc:sldMk cId="2880998982" sldId="265"/>
+            <ac:cxnSpMk id="187" creationId="{12B2A41C-5CE8-D5B0-3CC6-CACF10E38335}"/>
+          </ac:cxnSpMkLst>
+        </pc:cxnChg>
+        <pc:cxnChg chg="add mod">
+          <ac:chgData name="Markus Bilz" userId="a36021e4bdb9349f" providerId="LiveId" clId="{F9F2BE70-AAED-47FD-A055-7B08EB1371A3}" dt="2023-02-13T09:52:10.159" v="1392" actId="13822"/>
+          <ac:cxnSpMkLst>
+            <pc:docMk/>
+            <pc:sldMk cId="2880998982" sldId="265"/>
+            <ac:cxnSpMk id="202" creationId="{461F8D24-43A6-0ADE-B70C-EB21ED697FA2}"/>
+          </ac:cxnSpMkLst>
+        </pc:cxnChg>
+        <pc:cxnChg chg="add mod">
+          <ac:chgData name="Markus Bilz" userId="a36021e4bdb9349f" providerId="LiveId" clId="{F9F2BE70-AAED-47FD-A055-7B08EB1371A3}" dt="2023-02-13T09:52:10.159" v="1392" actId="13822"/>
+          <ac:cxnSpMkLst>
+            <pc:docMk/>
+            <pc:sldMk cId="2880998982" sldId="265"/>
+            <ac:cxnSpMk id="206" creationId="{763C3EF5-5ED4-0D5A-8E11-1FC0EB8772D9}"/>
+          </ac:cxnSpMkLst>
+        </pc:cxnChg>
+        <pc:cxnChg chg="add del mod">
+          <ac:chgData name="Markus Bilz" userId="a36021e4bdb9349f" providerId="LiveId" clId="{F9F2BE70-AAED-47FD-A055-7B08EB1371A3}" dt="2023-02-13T09:45:03.278" v="1356" actId="478"/>
+          <ac:cxnSpMkLst>
+            <pc:docMk/>
+            <pc:sldMk cId="2880998982" sldId="265"/>
+            <ac:cxnSpMk id="211" creationId="{62A7CF4B-474D-154E-F354-9F19354C7EDD}"/>
+          </ac:cxnSpMkLst>
+        </pc:cxnChg>
+        <pc:cxnChg chg="add del mod">
+          <ac:chgData name="Markus Bilz" userId="a36021e4bdb9349f" providerId="LiveId" clId="{F9F2BE70-AAED-47FD-A055-7B08EB1371A3}" dt="2023-02-13T09:44:20.723" v="1352" actId="478"/>
+          <ac:cxnSpMkLst>
+            <pc:docMk/>
+            <pc:sldMk cId="2880998982" sldId="265"/>
+            <ac:cxnSpMk id="221" creationId="{2069F4A2-2326-B2BA-ADB3-D03EC15A6F1D}"/>
           </ac:cxnSpMkLst>
         </pc:cxnChg>
       </pc:sldChg>
@@ -6669,7 +7389,7 @@
           <a:p>
             <a:fld id="{D6A82EB2-151D-4EEE-ACF5-92C73278C09C}" type="datetimeFigureOut">
               <a:rPr lang="en-GB" smtClean="0"/>
-              <a:t>11/02/2023</a:t>
+              <a:t>14/02/2023</a:t>
             </a:fld>
             <a:endParaRPr lang="en-GB"/>
           </a:p>
@@ -6869,7 +7589,7 @@
           <a:p>
             <a:fld id="{D6A82EB2-151D-4EEE-ACF5-92C73278C09C}" type="datetimeFigureOut">
               <a:rPr lang="en-GB" smtClean="0"/>
-              <a:t>11/02/2023</a:t>
+              <a:t>14/02/2023</a:t>
             </a:fld>
             <a:endParaRPr lang="en-GB"/>
           </a:p>
@@ -7079,7 +7799,7 @@
           <a:p>
             <a:fld id="{D6A82EB2-151D-4EEE-ACF5-92C73278C09C}" type="datetimeFigureOut">
               <a:rPr lang="en-GB" smtClean="0"/>
-              <a:t>11/02/2023</a:t>
+              <a:t>14/02/2023</a:t>
             </a:fld>
             <a:endParaRPr lang="en-GB"/>
           </a:p>
@@ -7279,7 +7999,7 @@
           <a:p>
             <a:fld id="{D6A82EB2-151D-4EEE-ACF5-92C73278C09C}" type="datetimeFigureOut">
               <a:rPr lang="en-GB" smtClean="0"/>
-              <a:t>11/02/2023</a:t>
+              <a:t>14/02/2023</a:t>
             </a:fld>
             <a:endParaRPr lang="en-GB"/>
           </a:p>
@@ -7555,7 +8275,7 @@
           <a:p>
             <a:fld id="{D6A82EB2-151D-4EEE-ACF5-92C73278C09C}" type="datetimeFigureOut">
               <a:rPr lang="en-GB" smtClean="0"/>
-              <a:t>11/02/2023</a:t>
+              <a:t>14/02/2023</a:t>
             </a:fld>
             <a:endParaRPr lang="en-GB"/>
           </a:p>
@@ -7823,7 +8543,7 @@
           <a:p>
             <a:fld id="{D6A82EB2-151D-4EEE-ACF5-92C73278C09C}" type="datetimeFigureOut">
               <a:rPr lang="en-GB" smtClean="0"/>
-              <a:t>11/02/2023</a:t>
+              <a:t>14/02/2023</a:t>
             </a:fld>
             <a:endParaRPr lang="en-GB"/>
           </a:p>
@@ -8238,7 +8958,7 @@
           <a:p>
             <a:fld id="{D6A82EB2-151D-4EEE-ACF5-92C73278C09C}" type="datetimeFigureOut">
               <a:rPr lang="en-GB" smtClean="0"/>
-              <a:t>11/02/2023</a:t>
+              <a:t>14/02/2023</a:t>
             </a:fld>
             <a:endParaRPr lang="en-GB"/>
           </a:p>
@@ -8380,7 +9100,7 @@
           <a:p>
             <a:fld id="{D6A82EB2-151D-4EEE-ACF5-92C73278C09C}" type="datetimeFigureOut">
               <a:rPr lang="en-GB" smtClean="0"/>
-              <a:t>11/02/2023</a:t>
+              <a:t>14/02/2023</a:t>
             </a:fld>
             <a:endParaRPr lang="en-GB"/>
           </a:p>
@@ -8493,7 +9213,7 @@
           <a:p>
             <a:fld id="{D6A82EB2-151D-4EEE-ACF5-92C73278C09C}" type="datetimeFigureOut">
               <a:rPr lang="en-GB" smtClean="0"/>
-              <a:t>11/02/2023</a:t>
+              <a:t>14/02/2023</a:t>
             </a:fld>
             <a:endParaRPr lang="en-GB"/>
           </a:p>
@@ -8806,7 +9526,7 @@
           <a:p>
             <a:fld id="{D6A82EB2-151D-4EEE-ACF5-92C73278C09C}" type="datetimeFigureOut">
               <a:rPr lang="en-GB" smtClean="0"/>
-              <a:t>11/02/2023</a:t>
+              <a:t>14/02/2023</a:t>
             </a:fld>
             <a:endParaRPr lang="en-GB"/>
           </a:p>
@@ -9095,7 +9815,7 @@
           <a:p>
             <a:fld id="{D6A82EB2-151D-4EEE-ACF5-92C73278C09C}" type="datetimeFigureOut">
               <a:rPr lang="en-GB" smtClean="0"/>
-              <a:t>11/02/2023</a:t>
+              <a:t>14/02/2023</a:t>
             </a:fld>
             <a:endParaRPr lang="en-GB"/>
           </a:p>
@@ -9338,7 +10058,7 @@
           <a:p>
             <a:fld id="{D6A82EB2-151D-4EEE-ACF5-92C73278C09C}" type="datetimeFigureOut">
               <a:rPr lang="en-GB" smtClean="0"/>
-              <a:t>11/02/2023</a:t>
+              <a:t>14/02/2023</a:t>
             </a:fld>
             <a:endParaRPr lang="en-GB"/>
           </a:p>
@@ -17745,7 +18465,7 @@
         <p:spPr>
           <a:xfrm>
             <a:off x="1692275" y="2162810"/>
-            <a:ext cx="381836" cy="261610"/>
+            <a:ext cx="396262" cy="261610"/>
           </a:xfrm>
           <a:prstGeom prst="rect">
             <a:avLst/>
@@ -17763,7 +18483,7 @@
                 <a:solidFill>
                   <a:schemeClr val="dk1"/>
                 </a:solidFill>
-                <a:latin typeface="+mj-lt"/>
+                <a:latin typeface="cmss12" panose="020B0500000000000000" pitchFamily="34" charset="0"/>
                 <a:cs typeface="Arial" panose="020B0604020202020204" pitchFamily="34" charset="0"/>
               </a:rPr>
               <a:t>Ask</a:t>
@@ -17772,7 +18492,7 @@
               <a:solidFill>
                 <a:schemeClr val="dk1"/>
               </a:solidFill>
-              <a:latin typeface="+mj-lt"/>
+              <a:latin typeface="cmss12" panose="020B0500000000000000" pitchFamily="34" charset="0"/>
               <a:cs typeface="Arial" panose="020B0604020202020204" pitchFamily="34" charset="0"/>
             </a:endParaRPr>
           </a:p>
@@ -17811,7 +18531,7 @@
                 <a:solidFill>
                   <a:schemeClr val="dk1"/>
                 </a:solidFill>
-                <a:latin typeface="+mj-lt"/>
+                <a:latin typeface="cmss12" panose="020B0500000000000000" pitchFamily="34" charset="0"/>
                 <a:cs typeface="Arial" panose="020B0604020202020204" pitchFamily="34" charset="0"/>
               </a:rPr>
               <a:t>Mid</a:t>
@@ -17820,7 +18540,7 @@
               <a:solidFill>
                 <a:schemeClr val="dk1"/>
               </a:solidFill>
-              <a:latin typeface="+mj-lt"/>
+              <a:latin typeface="cmss12" panose="020B0500000000000000" pitchFamily="34" charset="0"/>
               <a:cs typeface="Arial" panose="020B0604020202020204" pitchFamily="34" charset="0"/>
             </a:endParaRPr>
           </a:p>
@@ -17841,7 +18561,7 @@
         <p:spPr>
           <a:xfrm>
             <a:off x="1730375" y="4128770"/>
-            <a:ext cx="364202" cy="261610"/>
+            <a:ext cx="378630" cy="261610"/>
           </a:xfrm>
           <a:prstGeom prst="rect">
             <a:avLst/>
@@ -17859,7 +18579,7 @@
                 <a:solidFill>
                   <a:schemeClr val="dk1"/>
                 </a:solidFill>
-                <a:latin typeface="+mj-lt"/>
+                <a:latin typeface="cmss12" panose="020B0500000000000000" pitchFamily="34" charset="0"/>
                 <a:cs typeface="Arial" panose="020B0604020202020204" pitchFamily="34" charset="0"/>
               </a:rPr>
               <a:t>Bid</a:t>
@@ -17868,7 +18588,7 @@
               <a:solidFill>
                 <a:schemeClr val="dk1"/>
               </a:solidFill>
-              <a:latin typeface="+mj-lt"/>
+              <a:latin typeface="cmss12" panose="020B0500000000000000" pitchFamily="34" charset="0"/>
               <a:cs typeface="Arial" panose="020B0604020202020204" pitchFamily="34" charset="0"/>
             </a:endParaRPr>
           </a:p>
@@ -17897,7 +18617,7 @@
             </a:avLst>
           </a:prstGeom>
           <a:solidFill>
-            <a:srgbClr val="FFFF99"/>
+            <a:srgbClr val="FFBDE6"/>
           </a:solidFill>
           <a:ln w="19050">
             <a:headEnd type="none" w="med" len="med"/>
@@ -17919,19 +18639,21 @@
           </a:fontRef>
         </p:style>
         <p:txBody>
-          <a:bodyPr rtlCol="0" anchor="ctr"/>
+          <a:bodyPr rtlCol="0" anchor="ctr">
+            <a:normAutofit/>
+          </a:bodyPr>
           <a:lstStyle/>
           <a:p>
             <a:pPr algn="ctr"/>
             <a:r>
               <a:rPr lang="de-DE" sz="1100" dirty="0">
-                <a:latin typeface="+mj-lt"/>
+                <a:latin typeface="cmss12" panose="020B0500000000000000" pitchFamily="34" charset="0"/>
                 <a:cs typeface="Arial" panose="020B0604020202020204" pitchFamily="34" charset="0"/>
               </a:rPr>
               <a:t>Trade Size Rule</a:t>
             </a:r>
             <a:endParaRPr lang="en-GB" sz="1100" dirty="0">
-              <a:latin typeface="+mj-lt"/>
+              <a:latin typeface="cmss12" panose="020B0500000000000000" pitchFamily="34" charset="0"/>
               <a:cs typeface="Arial" panose="020B0604020202020204" pitchFamily="34" charset="0"/>
             </a:endParaRPr>
           </a:p>
@@ -17960,7 +18682,7 @@
             </a:avLst>
           </a:prstGeom>
           <a:solidFill>
-            <a:srgbClr val="D2C4B2"/>
+            <a:srgbClr val="BFFFBD"/>
           </a:solidFill>
           <a:ln w="19050">
             <a:headEnd type="none" w="med" len="med"/>
@@ -17982,19 +18704,21 @@
           </a:fontRef>
         </p:style>
         <p:txBody>
-          <a:bodyPr rtlCol="0" anchor="ctr"/>
+          <a:bodyPr rtlCol="0" anchor="ctr">
+            <a:normAutofit fontScale="92500"/>
+          </a:bodyPr>
           <a:lstStyle/>
           <a:p>
             <a:pPr algn="ctr"/>
             <a:r>
-              <a:rPr lang="de-DE" sz="1100">
-                <a:latin typeface="+mj-lt"/>
+              <a:rPr lang="de-DE" sz="1100" dirty="0">
+                <a:latin typeface="cmss12" panose="020B0500000000000000" pitchFamily="34" charset="0"/>
                 <a:cs typeface="Arial" panose="020B0604020202020204" pitchFamily="34" charset="0"/>
               </a:rPr>
               <a:t>Depth Rule</a:t>
             </a:r>
             <a:endParaRPr lang="en-GB" sz="1100" dirty="0">
-              <a:latin typeface="+mj-lt"/>
+              <a:latin typeface="cmss12" panose="020B0500000000000000" pitchFamily="34" charset="0"/>
               <a:cs typeface="Arial" panose="020B0604020202020204" pitchFamily="34" charset="0"/>
             </a:endParaRPr>
           </a:p>
@@ -18023,7 +18747,7 @@
             </a:avLst>
           </a:prstGeom>
           <a:solidFill>
-            <a:srgbClr val="E4D6EA"/>
+            <a:srgbClr val="C0BDFF"/>
           </a:solidFill>
           <a:ln w="19050">
             <a:headEnd type="none" w="med" len="med"/>
@@ -18045,19 +18769,21 @@
           </a:fontRef>
         </p:style>
         <p:txBody>
-          <a:bodyPr lIns="0" rIns="0" rtlCol="0" anchor="ctr"/>
+          <a:bodyPr lIns="0" rIns="0" rtlCol="0" anchor="ctr">
+            <a:normAutofit/>
+          </a:bodyPr>
           <a:lstStyle/>
           <a:p>
             <a:pPr algn="ctr"/>
             <a:r>
               <a:rPr lang="de-DE" sz="1100">
-                <a:latin typeface="+mj-lt"/>
+                <a:latin typeface="cmss12" panose="020B0500000000000000" pitchFamily="34" charset="0"/>
                 <a:cs typeface="Arial" panose="020B0604020202020204" pitchFamily="34" charset="0"/>
               </a:rPr>
               <a:t>Misc</a:t>
             </a:r>
             <a:endParaRPr lang="en-GB" sz="1100" dirty="0">
-              <a:latin typeface="+mj-lt"/>
+              <a:latin typeface="cmss12" panose="020B0500000000000000" pitchFamily="34" charset="0"/>
               <a:cs typeface="Arial" panose="020B0604020202020204" pitchFamily="34" charset="0"/>
             </a:endParaRPr>
           </a:p>
@@ -18086,7 +18812,7 @@
             </a:avLst>
           </a:prstGeom>
           <a:solidFill>
-            <a:srgbClr val="A8D1EE"/>
+            <a:srgbClr val="FFE9BD"/>
           </a:solidFill>
           <a:ln w="19050">
             <a:headEnd type="none" w="med" len="med"/>
@@ -18108,19 +18834,21 @@
           </a:fontRef>
         </p:style>
         <p:txBody>
-          <a:bodyPr rtlCol="0" anchor="ctr"/>
+          <a:bodyPr rtlCol="0" anchor="ctr">
+            <a:normAutofit lnSpcReduction="10000"/>
+          </a:bodyPr>
           <a:lstStyle/>
           <a:p>
             <a:pPr algn="ctr"/>
             <a:r>
-              <a:rPr lang="de-DE" sz="1100">
-                <a:latin typeface="+mj-lt"/>
+              <a:rPr lang="de-DE" sz="1100" dirty="0">
+                <a:latin typeface="cmss12" panose="020B0500000000000000" pitchFamily="34" charset="0"/>
                 <a:cs typeface="Arial" panose="020B0604020202020204" pitchFamily="34" charset="0"/>
               </a:rPr>
               <a:t>Tick Rule</a:t>
             </a:r>
             <a:endParaRPr lang="en-GB" sz="1100" dirty="0">
-              <a:latin typeface="+mj-lt"/>
+              <a:latin typeface="cmss12" panose="020B0500000000000000" pitchFamily="34" charset="0"/>
               <a:cs typeface="Arial" panose="020B0604020202020204" pitchFamily="34" charset="0"/>
             </a:endParaRPr>
           </a:p>
@@ -18149,7 +18877,7 @@
             </a:avLst>
           </a:prstGeom>
           <a:solidFill>
-            <a:srgbClr val="CCD497"/>
+            <a:srgbClr val="BDFFFF"/>
           </a:solidFill>
           <a:ln w="19050">
             <a:headEnd type="none" w="med" len="med"/>
@@ -18171,19 +18899,21 @@
           </a:fontRef>
         </p:style>
         <p:txBody>
-          <a:bodyPr rtlCol="0" anchor="ctr"/>
+          <a:bodyPr rtlCol="0" anchor="ctr">
+            <a:normAutofit/>
+          </a:bodyPr>
           <a:lstStyle/>
           <a:p>
             <a:pPr algn="ctr"/>
             <a:r>
-              <a:rPr lang="de-DE" sz="1100">
-                <a:latin typeface="+mj-lt"/>
+              <a:rPr lang="de-DE" sz="1100" dirty="0">
+                <a:latin typeface="cmss12" panose="020B0500000000000000" pitchFamily="34" charset="0"/>
                 <a:cs typeface="Arial" panose="020B0604020202020204" pitchFamily="34" charset="0"/>
               </a:rPr>
               <a:t>Quote Rule</a:t>
             </a:r>
             <a:endParaRPr lang="en-GB" sz="1100" dirty="0">
-              <a:latin typeface="+mj-lt"/>
+              <a:latin typeface="cmss12" panose="020B0500000000000000" pitchFamily="34" charset="0"/>
               <a:cs typeface="Arial" panose="020B0604020202020204" pitchFamily="34" charset="0"/>
             </a:endParaRPr>
           </a:p>
@@ -18212,7 +18942,7 @@
             </a:avLst>
           </a:prstGeom>
           <a:solidFill>
-            <a:srgbClr val="CCD497"/>
+            <a:srgbClr val="BDFFFF"/>
           </a:solidFill>
           <a:ln w="19050">
             <a:headEnd type="none" w="med" len="med"/>
@@ -18234,19 +18964,21 @@
           </a:fontRef>
         </p:style>
         <p:txBody>
-          <a:bodyPr rtlCol="0" anchor="ctr"/>
+          <a:bodyPr rtlCol="0" anchor="ctr">
+            <a:normAutofit/>
+          </a:bodyPr>
           <a:lstStyle/>
           <a:p>
             <a:pPr algn="ctr"/>
             <a:r>
               <a:rPr lang="de-DE" sz="1100">
-                <a:latin typeface="+mj-lt"/>
+                <a:latin typeface="cmss12" panose="020B0500000000000000" pitchFamily="34" charset="0"/>
                 <a:cs typeface="Arial" panose="020B0604020202020204" pitchFamily="34" charset="0"/>
               </a:rPr>
               <a:t>Quote Rule</a:t>
             </a:r>
             <a:endParaRPr lang="en-GB" sz="1100" dirty="0">
-              <a:latin typeface="+mj-lt"/>
+              <a:latin typeface="cmss12" panose="020B0500000000000000" pitchFamily="34" charset="0"/>
               <a:cs typeface="Arial" panose="020B0604020202020204" pitchFamily="34" charset="0"/>
             </a:endParaRPr>
           </a:p>
@@ -18275,7 +19007,7 @@
             </a:avLst>
           </a:prstGeom>
           <a:solidFill>
-            <a:srgbClr val="A8D1EE"/>
+            <a:srgbClr val="FFE9BD"/>
           </a:solidFill>
           <a:ln w="19050">
             <a:headEnd type="none" w="med" len="med"/>
@@ -18297,19 +19029,21 @@
           </a:fontRef>
         </p:style>
         <p:txBody>
-          <a:bodyPr rtlCol="0" anchor="ctr"/>
+          <a:bodyPr rtlCol="0" anchor="ctr">
+            <a:normAutofit/>
+          </a:bodyPr>
           <a:lstStyle/>
           <a:p>
             <a:pPr algn="ctr"/>
             <a:r>
               <a:rPr lang="de-DE" sz="1100">
-                <a:latin typeface="+mj-lt"/>
+                <a:latin typeface="cmss12" panose="020B0500000000000000" pitchFamily="34" charset="0"/>
                 <a:cs typeface="Arial" panose="020B0604020202020204" pitchFamily="34" charset="0"/>
               </a:rPr>
               <a:t>Tick Rule</a:t>
             </a:r>
             <a:endParaRPr lang="en-GB" sz="1100" dirty="0">
-              <a:latin typeface="+mj-lt"/>
+              <a:latin typeface="cmss12" panose="020B0500000000000000" pitchFamily="34" charset="0"/>
               <a:cs typeface="Arial" panose="020B0604020202020204" pitchFamily="34" charset="0"/>
             </a:endParaRPr>
           </a:p>
@@ -18338,7 +19072,7 @@
             </a:avLst>
           </a:prstGeom>
           <a:solidFill>
-            <a:srgbClr val="CCD497"/>
+            <a:srgbClr val="BDFFFF"/>
           </a:solidFill>
           <a:ln w="19050">
             <a:headEnd type="none" w="med" len="med"/>
@@ -18360,19 +19094,21 @@
           </a:fontRef>
         </p:style>
         <p:txBody>
-          <a:bodyPr rtlCol="0" anchor="ctr"/>
+          <a:bodyPr rtlCol="0" anchor="ctr">
+            <a:normAutofit fontScale="92500"/>
+          </a:bodyPr>
           <a:lstStyle/>
           <a:p>
             <a:pPr algn="ctr"/>
             <a:r>
               <a:rPr lang="de-DE" sz="1100" dirty="0">
-                <a:latin typeface="+mj-lt"/>
+                <a:latin typeface="cmss12" panose="020B0500000000000000" pitchFamily="34" charset="0"/>
                 <a:cs typeface="Arial" panose="020B0604020202020204" pitchFamily="34" charset="0"/>
               </a:rPr>
               <a:t>Quote Rule</a:t>
             </a:r>
             <a:endParaRPr lang="en-GB" sz="1100" dirty="0">
-              <a:latin typeface="+mj-lt"/>
+              <a:latin typeface="cmss12" panose="020B0500000000000000" pitchFamily="34" charset="0"/>
               <a:cs typeface="Arial" panose="020B0604020202020204" pitchFamily="34" charset="0"/>
             </a:endParaRPr>
           </a:p>
@@ -18401,7 +19137,7 @@
             </a:avLst>
           </a:prstGeom>
           <a:solidFill>
-            <a:srgbClr val="A8D1EE"/>
+            <a:srgbClr val="FFE9BD"/>
           </a:solidFill>
           <a:ln w="19050">
             <a:headEnd type="none" w="med" len="med"/>
@@ -18423,19 +19159,21 @@
           </a:fontRef>
         </p:style>
         <p:txBody>
-          <a:bodyPr rtlCol="0" anchor="ctr"/>
+          <a:bodyPr rtlCol="0" anchor="ctr">
+            <a:normAutofit/>
+          </a:bodyPr>
           <a:lstStyle/>
           <a:p>
             <a:pPr algn="ctr"/>
             <a:r>
               <a:rPr lang="de-DE" sz="1100" dirty="0">
-                <a:latin typeface="+mj-lt"/>
+                <a:latin typeface="cmss12" panose="020B0500000000000000" pitchFamily="34" charset="0"/>
                 <a:cs typeface="Arial" panose="020B0604020202020204" pitchFamily="34" charset="0"/>
               </a:rPr>
               <a:t>Tick Rule</a:t>
             </a:r>
             <a:endParaRPr lang="en-GB" sz="1100" dirty="0">
-              <a:latin typeface="+mj-lt"/>
+              <a:latin typeface="cmss12" panose="020B0500000000000000" pitchFamily="34" charset="0"/>
               <a:cs typeface="Arial" panose="020B0604020202020204" pitchFamily="34" charset="0"/>
             </a:endParaRPr>
           </a:p>
@@ -18464,7 +19202,7 @@
             </a:avLst>
           </a:prstGeom>
           <a:solidFill>
-            <a:srgbClr val="CCD497"/>
+            <a:srgbClr val="BDFFFF"/>
           </a:solidFill>
           <a:ln w="19050">
             <a:headEnd type="none" w="med" len="med"/>
@@ -18486,19 +19224,21 @@
           </a:fontRef>
         </p:style>
         <p:txBody>
-          <a:bodyPr rtlCol="0" anchor="ctr"/>
+          <a:bodyPr rtlCol="0" anchor="ctr">
+            <a:normAutofit fontScale="92500"/>
+          </a:bodyPr>
           <a:lstStyle/>
           <a:p>
             <a:pPr algn="ctr"/>
             <a:r>
-              <a:rPr lang="de-DE" sz="1100" dirty="0">
-                <a:latin typeface="+mj-lt"/>
+              <a:rPr lang="de-DE" sz="1100">
+                <a:latin typeface="cmss12" panose="020B0500000000000000" pitchFamily="34" charset="0"/>
                 <a:cs typeface="Arial" panose="020B0604020202020204" pitchFamily="34" charset="0"/>
               </a:rPr>
               <a:t>Quote Rule</a:t>
             </a:r>
             <a:endParaRPr lang="en-GB" sz="1100" dirty="0">
-              <a:latin typeface="+mj-lt"/>
+              <a:latin typeface="cmss12" panose="020B0500000000000000" pitchFamily="34" charset="0"/>
               <a:cs typeface="Arial" panose="020B0604020202020204" pitchFamily="34" charset="0"/>
             </a:endParaRPr>
           </a:p>
@@ -18527,7 +19267,7 @@
             </a:avLst>
           </a:prstGeom>
           <a:solidFill>
-            <a:srgbClr val="A8D1EE"/>
+            <a:srgbClr val="FFE9BD"/>
           </a:solidFill>
           <a:ln w="19050">
             <a:headEnd type="none" w="med" len="med"/>
@@ -18549,19 +19289,21 @@
           </a:fontRef>
         </p:style>
         <p:txBody>
-          <a:bodyPr rtlCol="0" anchor="ctr"/>
+          <a:bodyPr rtlCol="0" anchor="ctr">
+            <a:normAutofit/>
+          </a:bodyPr>
           <a:lstStyle/>
           <a:p>
             <a:pPr algn="ctr"/>
             <a:r>
               <a:rPr lang="de-DE" sz="1100">
-                <a:latin typeface="+mj-lt"/>
+                <a:latin typeface="cmss12" panose="020B0500000000000000" pitchFamily="34" charset="0"/>
                 <a:cs typeface="Arial" panose="020B0604020202020204" pitchFamily="34" charset="0"/>
               </a:rPr>
               <a:t>Tick Rule</a:t>
             </a:r>
             <a:endParaRPr lang="en-GB" sz="1100" dirty="0">
-              <a:latin typeface="+mj-lt"/>
+              <a:latin typeface="cmss12" panose="020B0500000000000000" pitchFamily="34" charset="0"/>
               <a:cs typeface="Arial" panose="020B0604020202020204" pitchFamily="34" charset="0"/>
             </a:endParaRPr>
           </a:p>
@@ -18590,7 +19332,7 @@
             </a:avLst>
           </a:prstGeom>
           <a:solidFill>
-            <a:srgbClr val="A8D1EE"/>
+            <a:srgbClr val="FFE9BD"/>
           </a:solidFill>
           <a:ln w="19050">
             <a:headEnd type="none" w="med" len="med"/>
@@ -18612,19 +19354,21 @@
           </a:fontRef>
         </p:style>
         <p:txBody>
-          <a:bodyPr rtlCol="0" anchor="ctr"/>
+          <a:bodyPr rtlCol="0" anchor="ctr">
+            <a:normAutofit/>
+          </a:bodyPr>
           <a:lstStyle/>
           <a:p>
             <a:pPr algn="ctr"/>
             <a:r>
               <a:rPr lang="de-DE" sz="1100">
-                <a:latin typeface="+mj-lt"/>
+                <a:latin typeface="cmss12" panose="020B0500000000000000" pitchFamily="34" charset="0"/>
                 <a:cs typeface="Arial" panose="020B0604020202020204" pitchFamily="34" charset="0"/>
               </a:rPr>
               <a:t>Tick Rule</a:t>
             </a:r>
             <a:endParaRPr lang="en-GB" sz="1100" dirty="0">
-              <a:latin typeface="+mj-lt"/>
+              <a:latin typeface="cmss12" panose="020B0500000000000000" pitchFamily="34" charset="0"/>
               <a:cs typeface="Arial" panose="020B0604020202020204" pitchFamily="34" charset="0"/>
             </a:endParaRPr>
           </a:p>
@@ -18653,7 +19397,7 @@
             </a:avLst>
           </a:prstGeom>
           <a:solidFill>
-            <a:srgbClr val="A8D1EE"/>
+            <a:srgbClr val="FFE9BD"/>
           </a:solidFill>
           <a:ln w="19050">
             <a:headEnd type="none" w="med" len="med"/>
@@ -18675,19 +19419,21 @@
           </a:fontRef>
         </p:style>
         <p:txBody>
-          <a:bodyPr rtlCol="0" anchor="ctr"/>
+          <a:bodyPr rtlCol="0" anchor="ctr">
+            <a:normAutofit/>
+          </a:bodyPr>
           <a:lstStyle/>
           <a:p>
             <a:pPr algn="ctr"/>
             <a:r>
               <a:rPr lang="de-DE" sz="1100" dirty="0">
-                <a:latin typeface="+mj-lt"/>
+                <a:latin typeface="cmss12" panose="020B0500000000000000" pitchFamily="34" charset="0"/>
                 <a:cs typeface="Arial" panose="020B0604020202020204" pitchFamily="34" charset="0"/>
               </a:rPr>
               <a:t>Tick Rule</a:t>
             </a:r>
             <a:endParaRPr lang="en-GB" sz="1100" dirty="0">
-              <a:latin typeface="+mj-lt"/>
+              <a:latin typeface="cmss12" panose="020B0500000000000000" pitchFamily="34" charset="0"/>
               <a:cs typeface="Arial" panose="020B0604020202020204" pitchFamily="34" charset="0"/>
             </a:endParaRPr>
           </a:p>
@@ -18716,7 +19462,7 @@
             </a:avLst>
           </a:prstGeom>
           <a:solidFill>
-            <a:srgbClr val="CCD497"/>
+            <a:srgbClr val="BDFFFF"/>
           </a:solidFill>
           <a:ln w="19050">
             <a:headEnd type="none" w="med" len="med"/>
@@ -18738,19 +19484,21 @@
           </a:fontRef>
         </p:style>
         <p:txBody>
-          <a:bodyPr rtlCol="0" anchor="ctr"/>
+          <a:bodyPr rtlCol="0" anchor="ctr">
+            <a:normAutofit/>
+          </a:bodyPr>
           <a:lstStyle/>
           <a:p>
             <a:pPr algn="ctr"/>
             <a:r>
               <a:rPr lang="de-DE" sz="1100" dirty="0">
-                <a:latin typeface="+mj-lt"/>
+                <a:latin typeface="cmss12" panose="020B0500000000000000" pitchFamily="34" charset="0"/>
                 <a:cs typeface="Arial" panose="020B0604020202020204" pitchFamily="34" charset="0"/>
               </a:rPr>
               <a:t>Quote Rule</a:t>
             </a:r>
             <a:endParaRPr lang="en-GB" sz="1100" dirty="0">
-              <a:latin typeface="+mj-lt"/>
+              <a:latin typeface="cmss12" panose="020B0500000000000000" pitchFamily="34" charset="0"/>
               <a:cs typeface="Arial" panose="020B0604020202020204" pitchFamily="34" charset="0"/>
             </a:endParaRPr>
           </a:p>
@@ -18779,7 +19527,7 @@
             </a:avLst>
           </a:prstGeom>
           <a:solidFill>
-            <a:srgbClr val="CCD497"/>
+            <a:srgbClr val="BDFFFF"/>
           </a:solidFill>
           <a:ln w="19050">
             <a:headEnd type="none" w="med" len="med"/>
@@ -18801,19 +19549,21 @@
           </a:fontRef>
         </p:style>
         <p:txBody>
-          <a:bodyPr rtlCol="0" anchor="ctr"/>
+          <a:bodyPr rtlCol="0" anchor="ctr">
+            <a:normAutofit/>
+          </a:bodyPr>
           <a:lstStyle/>
           <a:p>
             <a:pPr algn="ctr"/>
             <a:r>
               <a:rPr lang="de-DE" sz="1100" dirty="0">
-                <a:latin typeface="+mj-lt"/>
+                <a:latin typeface="cmss12" panose="020B0500000000000000" pitchFamily="34" charset="0"/>
                 <a:cs typeface="Arial" panose="020B0604020202020204" pitchFamily="34" charset="0"/>
               </a:rPr>
               <a:t>Quote Rule</a:t>
             </a:r>
             <a:endParaRPr lang="en-GB" sz="1100" dirty="0">
-              <a:latin typeface="+mj-lt"/>
+              <a:latin typeface="cmss12" panose="020B0500000000000000" pitchFamily="34" charset="0"/>
               <a:cs typeface="Arial" panose="020B0604020202020204" pitchFamily="34" charset="0"/>
             </a:endParaRPr>
           </a:p>
@@ -18842,7 +19592,7 @@
             </a:avLst>
           </a:prstGeom>
           <a:solidFill>
-            <a:srgbClr val="A8D1EE"/>
+            <a:srgbClr val="FFE9BD"/>
           </a:solidFill>
           <a:ln w="19050">
             <a:headEnd type="none" w="med" len="med"/>
@@ -18864,19 +19614,21 @@
           </a:fontRef>
         </p:style>
         <p:txBody>
-          <a:bodyPr rtlCol="0" anchor="ctr"/>
+          <a:bodyPr rtlCol="0" anchor="ctr">
+            <a:normAutofit/>
+          </a:bodyPr>
           <a:lstStyle/>
           <a:p>
             <a:pPr algn="ctr"/>
             <a:r>
               <a:rPr lang="de-DE" sz="1100">
-                <a:latin typeface="+mj-lt"/>
+                <a:latin typeface="cmss12" panose="020B0500000000000000" pitchFamily="34" charset="0"/>
                 <a:cs typeface="Arial" panose="020B0604020202020204" pitchFamily="34" charset="0"/>
               </a:rPr>
               <a:t>Tick Rule</a:t>
             </a:r>
             <a:endParaRPr lang="en-GB" sz="1100" dirty="0">
-              <a:latin typeface="+mj-lt"/>
+              <a:latin typeface="cmss12" panose="020B0500000000000000" pitchFamily="34" charset="0"/>
               <a:cs typeface="Arial" panose="020B0604020202020204" pitchFamily="34" charset="0"/>
             </a:endParaRPr>
           </a:p>
@@ -18897,7 +19649,7 @@
         <p:spPr>
           <a:xfrm>
             <a:off x="1679575" y="3596005"/>
-            <a:ext cx="452368" cy="261610"/>
+            <a:ext cx="460382" cy="261610"/>
           </a:xfrm>
           <a:prstGeom prst="rect">
             <a:avLst/>
@@ -18915,7 +19667,7 @@
                 <a:solidFill>
                   <a:srgbClr val="A5A5A5"/>
                 </a:solidFill>
-                <a:latin typeface="+mj-lt"/>
+                <a:latin typeface="cmss12" panose="020B0500000000000000" pitchFamily="34" charset="0"/>
                 <a:cs typeface="Arial" panose="020B0604020202020204" pitchFamily="34" charset="0"/>
               </a:rPr>
               <a:t>3/10</a:t>
@@ -18924,7 +19676,7 @@
               <a:solidFill>
                 <a:srgbClr val="A5A5A5"/>
               </a:solidFill>
-              <a:latin typeface="+mj-lt"/>
+              <a:latin typeface="cmss12" panose="020B0500000000000000" pitchFamily="34" charset="0"/>
               <a:cs typeface="Arial" panose="020B0604020202020204" pitchFamily="34" charset="0"/>
             </a:endParaRPr>
           </a:p>
@@ -18945,7 +19697,7 @@
         <p:spPr>
           <a:xfrm>
             <a:off x="1695450" y="2713355"/>
-            <a:ext cx="452368" cy="261610"/>
+            <a:ext cx="460382" cy="261610"/>
           </a:xfrm>
           <a:prstGeom prst="rect">
             <a:avLst/>
@@ -18963,7 +19715,7 @@
                 <a:solidFill>
                   <a:srgbClr val="A5A5A5"/>
                 </a:solidFill>
-                <a:latin typeface="+mj-lt"/>
+                <a:latin typeface="cmss12" panose="020B0500000000000000" pitchFamily="34" charset="0"/>
                 <a:cs typeface="Arial" panose="020B0604020202020204" pitchFamily="34" charset="0"/>
               </a:rPr>
               <a:t>7/10</a:t>
@@ -18972,9 +19724,83 @@
               <a:solidFill>
                 <a:srgbClr val="A5A5A5"/>
               </a:solidFill>
-              <a:latin typeface="+mj-lt"/>
+              <a:latin typeface="cmss12" panose="020B0500000000000000" pitchFamily="34" charset="0"/>
               <a:cs typeface="Arial" panose="020B0604020202020204" pitchFamily="34" charset="0"/>
             </a:endParaRPr>
+          </a:p>
+        </p:txBody>
+      </p:sp>
+      <p:sp>
+        <p:nvSpPr>
+          <p:cNvPr id="3" name="TextBox 2">
+            <a:extLst>
+              <a:ext uri="{FF2B5EF4-FFF2-40B4-BE49-F238E27FC236}">
+                <a16:creationId xmlns:a16="http://schemas.microsoft.com/office/drawing/2014/main" id="{98FB6394-CD33-2063-909B-BCF709DC878B}"/>
+              </a:ext>
+            </a:extLst>
+          </p:cNvPr>
+          <p:cNvSpPr txBox="1"/>
+          <p:nvPr/>
+        </p:nvSpPr>
+        <p:spPr>
+          <a:xfrm>
+            <a:off x="787160" y="215986"/>
+            <a:ext cx="6094562" cy="646331"/>
+          </a:xfrm>
+          <a:prstGeom prst="rect">
+            <a:avLst/>
+          </a:prstGeom>
+          <a:noFill/>
+        </p:spPr>
+        <p:txBody>
+          <a:bodyPr wrap="square">
+            <a:spAutoFit/>
+          </a:bodyPr>
+          <a:lstStyle/>
+          <a:p>
+            <a:r>
+              <a:rPr lang="en-GB" dirty="0">
+                <a:latin typeface="cmss12" panose="020B0500000000000000" pitchFamily="34" charset="0"/>
+              </a:rPr>
+              <a:t>https://brushingupscience.com/2016/02/02/design-using-hsl-colour-space/</a:t>
+            </a:r>
+          </a:p>
+        </p:txBody>
+      </p:sp>
+      <p:sp>
+        <p:nvSpPr>
+          <p:cNvPr id="2" name="TextBox 1">
+            <a:extLst>
+              <a:ext uri="{FF2B5EF4-FFF2-40B4-BE49-F238E27FC236}">
+                <a16:creationId xmlns:a16="http://schemas.microsoft.com/office/drawing/2014/main" id="{979CA419-571C-AAA5-5ACE-3A8CAC909C6C}"/>
+              </a:ext>
+            </a:extLst>
+          </p:cNvPr>
+          <p:cNvSpPr txBox="1"/>
+          <p:nvPr/>
+        </p:nvSpPr>
+        <p:spPr>
+          <a:xfrm>
+            <a:off x="784285" y="860091"/>
+            <a:ext cx="6094562" cy="369332"/>
+          </a:xfrm>
+          <a:prstGeom prst="rect">
+            <a:avLst/>
+          </a:prstGeom>
+          <a:noFill/>
+        </p:spPr>
+        <p:txBody>
+          <a:bodyPr wrap="square">
+            <a:spAutoFit/>
+          </a:bodyPr>
+          <a:lstStyle/>
+          <a:p>
+            <a:r>
+              <a:rPr lang="en-GB" dirty="0">
+                <a:latin typeface="cmss12" panose="020B0500000000000000" pitchFamily="34" charset="0"/>
+              </a:rPr>
+              <a:t>Figure 1</a:t>
+            </a:r>
           </a:p>
         </p:txBody>
       </p:sp>
@@ -18992,6 +19818,2269 @@
 </file>
 
 <file path=ppt/slides/slide5.xml><?xml version="1.0" encoding="utf-8"?>
+<p:sld xmlns:a="http://schemas.openxmlformats.org/drawingml/2006/main" xmlns:r="http://schemas.openxmlformats.org/officeDocument/2006/relationships" xmlns:p="http://schemas.openxmlformats.org/presentationml/2006/main">
+  <p:cSld>
+    <p:spTree>
+      <p:nvGrpSpPr>
+        <p:cNvPr id="1" name=""/>
+        <p:cNvGrpSpPr/>
+        <p:nvPr/>
+      </p:nvGrpSpPr>
+      <p:grpSpPr>
+        <a:xfrm>
+          <a:off x="0" y="0"/>
+          <a:ext cx="0" cy="0"/>
+          <a:chOff x="0" y="0"/>
+          <a:chExt cx="0" cy="0"/>
+        </a:xfrm>
+      </p:grpSpPr>
+      <p:sp>
+        <p:nvSpPr>
+          <p:cNvPr id="234" name="Rectangle 232">
+            <a:extLst>
+              <a:ext uri="{FF2B5EF4-FFF2-40B4-BE49-F238E27FC236}">
+                <a16:creationId xmlns:a16="http://schemas.microsoft.com/office/drawing/2014/main" id="{516BA130-8D2C-1714-6086-0662FEF00BE6}"/>
+              </a:ext>
+            </a:extLst>
+          </p:cNvPr>
+          <p:cNvSpPr/>
+          <p:nvPr/>
+        </p:nvSpPr>
+        <p:spPr>
+          <a:xfrm flipH="1">
+            <a:off x="3213098" y="2252663"/>
+            <a:ext cx="1180307" cy="2630487"/>
+          </a:xfrm>
+          <a:custGeom>
+            <a:avLst/>
+            <a:gdLst>
+              <a:gd name="connsiteX0" fmla="*/ 0 w 2266950"/>
+              <a:gd name="connsiteY0" fmla="*/ 0 h 1339850"/>
+              <a:gd name="connsiteX1" fmla="*/ 2266950 w 2266950"/>
+              <a:gd name="connsiteY1" fmla="*/ 0 h 1339850"/>
+              <a:gd name="connsiteX2" fmla="*/ 2266950 w 2266950"/>
+              <a:gd name="connsiteY2" fmla="*/ 1339850 h 1339850"/>
+              <a:gd name="connsiteX3" fmla="*/ 0 w 2266950"/>
+              <a:gd name="connsiteY3" fmla="*/ 1339850 h 1339850"/>
+              <a:gd name="connsiteX4" fmla="*/ 0 w 2266950"/>
+              <a:gd name="connsiteY4" fmla="*/ 0 h 1339850"/>
+              <a:gd name="connsiteX0" fmla="*/ 0 w 2266950"/>
+              <a:gd name="connsiteY0" fmla="*/ 0 h 1981200"/>
+              <a:gd name="connsiteX1" fmla="*/ 2266950 w 2266950"/>
+              <a:gd name="connsiteY1" fmla="*/ 0 h 1981200"/>
+              <a:gd name="connsiteX2" fmla="*/ 2266950 w 2266950"/>
+              <a:gd name="connsiteY2" fmla="*/ 1339850 h 1981200"/>
+              <a:gd name="connsiteX3" fmla="*/ 1092200 w 2266950"/>
+              <a:gd name="connsiteY3" fmla="*/ 1981200 h 1981200"/>
+              <a:gd name="connsiteX4" fmla="*/ 0 w 2266950"/>
+              <a:gd name="connsiteY4" fmla="*/ 0 h 1981200"/>
+              <a:gd name="connsiteX0" fmla="*/ 76200 w 1174750"/>
+              <a:gd name="connsiteY0" fmla="*/ 0 h 2622550"/>
+              <a:gd name="connsiteX1" fmla="*/ 1174750 w 1174750"/>
+              <a:gd name="connsiteY1" fmla="*/ 641350 h 2622550"/>
+              <a:gd name="connsiteX2" fmla="*/ 1174750 w 1174750"/>
+              <a:gd name="connsiteY2" fmla="*/ 1981200 h 2622550"/>
+              <a:gd name="connsiteX3" fmla="*/ 0 w 1174750"/>
+              <a:gd name="connsiteY3" fmla="*/ 2622550 h 2622550"/>
+              <a:gd name="connsiteX4" fmla="*/ 76200 w 1174750"/>
+              <a:gd name="connsiteY4" fmla="*/ 0 h 2622550"/>
+              <a:gd name="connsiteX0" fmla="*/ 76200 w 1174750"/>
+              <a:gd name="connsiteY0" fmla="*/ 0 h 2622550"/>
+              <a:gd name="connsiteX1" fmla="*/ 1168400 w 1174750"/>
+              <a:gd name="connsiteY1" fmla="*/ 641350 h 2622550"/>
+              <a:gd name="connsiteX2" fmla="*/ 1174750 w 1174750"/>
+              <a:gd name="connsiteY2" fmla="*/ 1981200 h 2622550"/>
+              <a:gd name="connsiteX3" fmla="*/ 0 w 1174750"/>
+              <a:gd name="connsiteY3" fmla="*/ 2622550 h 2622550"/>
+              <a:gd name="connsiteX4" fmla="*/ 76200 w 1174750"/>
+              <a:gd name="connsiteY4" fmla="*/ 0 h 2622550"/>
+              <a:gd name="connsiteX0" fmla="*/ 0 w 1098550"/>
+              <a:gd name="connsiteY0" fmla="*/ 0 h 2635281"/>
+              <a:gd name="connsiteX1" fmla="*/ 1092200 w 1098550"/>
+              <a:gd name="connsiteY1" fmla="*/ 641350 h 2635281"/>
+              <a:gd name="connsiteX2" fmla="*/ 1098550 w 1098550"/>
+              <a:gd name="connsiteY2" fmla="*/ 1981200 h 2635281"/>
+              <a:gd name="connsiteX3" fmla="*/ 43064 w 1098550"/>
+              <a:gd name="connsiteY3" fmla="*/ 2635281 h 2635281"/>
+              <a:gd name="connsiteX4" fmla="*/ 0 w 1098550"/>
+              <a:gd name="connsiteY4" fmla="*/ 0 h 2635281"/>
+              <a:gd name="connsiteX0" fmla="*/ 0 w 1098550"/>
+              <a:gd name="connsiteY0" fmla="*/ 0 h 2635281"/>
+              <a:gd name="connsiteX1" fmla="*/ 1092200 w 1098550"/>
+              <a:gd name="connsiteY1" fmla="*/ 641350 h 2635281"/>
+              <a:gd name="connsiteX2" fmla="*/ 1098550 w 1098550"/>
+              <a:gd name="connsiteY2" fmla="*/ 1949392 h 2635281"/>
+              <a:gd name="connsiteX3" fmla="*/ 43064 w 1098550"/>
+              <a:gd name="connsiteY3" fmla="*/ 2635281 h 2635281"/>
+              <a:gd name="connsiteX4" fmla="*/ 0 w 1098550"/>
+              <a:gd name="connsiteY4" fmla="*/ 0 h 2635281"/>
+            </a:gdLst>
+            <a:ahLst/>
+            <a:cxnLst>
+              <a:cxn ang="0">
+                <a:pos x="connsiteX0" y="connsiteY0"/>
+              </a:cxn>
+              <a:cxn ang="0">
+                <a:pos x="connsiteX1" y="connsiteY1"/>
+              </a:cxn>
+              <a:cxn ang="0">
+                <a:pos x="connsiteX2" y="connsiteY2"/>
+              </a:cxn>
+              <a:cxn ang="0">
+                <a:pos x="connsiteX3" y="connsiteY3"/>
+              </a:cxn>
+              <a:cxn ang="0">
+                <a:pos x="connsiteX4" y="connsiteY4"/>
+              </a:cxn>
+            </a:cxnLst>
+            <a:rect l="l" t="t" r="r" b="b"/>
+            <a:pathLst>
+              <a:path w="1098550" h="2635281">
+                <a:moveTo>
+                  <a:pt x="0" y="0"/>
+                </a:moveTo>
+                <a:lnTo>
+                  <a:pt x="1092200" y="641350"/>
+                </a:lnTo>
+                <a:cubicBezTo>
+                  <a:pt x="1094317" y="1087967"/>
+                  <a:pt x="1096433" y="1502775"/>
+                  <a:pt x="1098550" y="1949392"/>
+                </a:cubicBezTo>
+                <a:lnTo>
+                  <a:pt x="43064" y="2635281"/>
+                </a:lnTo>
+                <a:lnTo>
+                  <a:pt x="0" y="0"/>
+                </a:lnTo>
+                <a:close/>
+              </a:path>
+            </a:pathLst>
+          </a:custGeom>
+          <a:solidFill>
+            <a:srgbClr val="FFBDE6"/>
+          </a:solidFill>
+          <a:ln w="9525">
+            <a:solidFill>
+              <a:schemeClr val="tx1"/>
+            </a:solidFill>
+          </a:ln>
+        </p:spPr>
+        <p:style>
+          <a:lnRef idx="2">
+            <a:schemeClr val="accent1">
+              <a:shade val="50000"/>
+            </a:schemeClr>
+          </a:lnRef>
+          <a:fillRef idx="1">
+            <a:schemeClr val="accent1"/>
+          </a:fillRef>
+          <a:effectRef idx="0">
+            <a:schemeClr val="accent1"/>
+          </a:effectRef>
+          <a:fontRef idx="minor">
+            <a:schemeClr val="lt1"/>
+          </a:fontRef>
+        </p:style>
+        <p:txBody>
+          <a:bodyPr rtlCol="0" anchor="ctr"/>
+          <a:lstStyle/>
+          <a:p>
+            <a:pPr algn="ctr"/>
+            <a:endParaRPr lang="en-GB">
+              <a:solidFill>
+                <a:srgbClr val="BDCBFF"/>
+              </a:solidFill>
+            </a:endParaRPr>
+          </a:p>
+        </p:txBody>
+      </p:sp>
+      <p:sp>
+        <p:nvSpPr>
+          <p:cNvPr id="27" name="Right Triangle 25">
+            <a:extLst>
+              <a:ext uri="{FF2B5EF4-FFF2-40B4-BE49-F238E27FC236}">
+                <a16:creationId xmlns:a16="http://schemas.microsoft.com/office/drawing/2014/main" id="{6949C08B-8EFA-AF50-6765-A70EC8FEAB55}"/>
+              </a:ext>
+            </a:extLst>
+          </p:cNvPr>
+          <p:cNvSpPr/>
+          <p:nvPr/>
+        </p:nvSpPr>
+        <p:spPr>
+          <a:xfrm rot="18058911">
+            <a:off x="6314729" y="1877762"/>
+            <a:ext cx="1124507" cy="1268467"/>
+          </a:xfrm>
+          <a:custGeom>
+            <a:avLst/>
+            <a:gdLst>
+              <a:gd name="connsiteX0" fmla="*/ 0 w 914400"/>
+              <a:gd name="connsiteY0" fmla="*/ 914400 h 914400"/>
+              <a:gd name="connsiteX1" fmla="*/ 0 w 914400"/>
+              <a:gd name="connsiteY1" fmla="*/ 0 h 914400"/>
+              <a:gd name="connsiteX2" fmla="*/ 914400 w 914400"/>
+              <a:gd name="connsiteY2" fmla="*/ 914400 h 914400"/>
+              <a:gd name="connsiteX3" fmla="*/ 0 w 914400"/>
+              <a:gd name="connsiteY3" fmla="*/ 914400 h 914400"/>
+              <a:gd name="connsiteX0" fmla="*/ 0 w 924114"/>
+              <a:gd name="connsiteY0" fmla="*/ 1189651 h 1189651"/>
+              <a:gd name="connsiteX1" fmla="*/ 9714 w 924114"/>
+              <a:gd name="connsiteY1" fmla="*/ 0 h 1189651"/>
+              <a:gd name="connsiteX2" fmla="*/ 924114 w 924114"/>
+              <a:gd name="connsiteY2" fmla="*/ 914400 h 1189651"/>
+              <a:gd name="connsiteX3" fmla="*/ 0 w 924114"/>
+              <a:gd name="connsiteY3" fmla="*/ 1189651 h 1189651"/>
+              <a:gd name="connsiteX0" fmla="*/ 0 w 1124507"/>
+              <a:gd name="connsiteY0" fmla="*/ 1189651 h 1189651"/>
+              <a:gd name="connsiteX1" fmla="*/ 9714 w 1124507"/>
+              <a:gd name="connsiteY1" fmla="*/ 0 h 1189651"/>
+              <a:gd name="connsiteX2" fmla="*/ 1124507 w 1124507"/>
+              <a:gd name="connsiteY2" fmla="*/ 521883 h 1189651"/>
+              <a:gd name="connsiteX3" fmla="*/ 0 w 1124507"/>
+              <a:gd name="connsiteY3" fmla="*/ 1189651 h 1189651"/>
+              <a:gd name="connsiteX0" fmla="*/ 0 w 1124507"/>
+              <a:gd name="connsiteY0" fmla="*/ 1268467 h 1268467"/>
+              <a:gd name="connsiteX1" fmla="*/ 6830 w 1124507"/>
+              <a:gd name="connsiteY1" fmla="*/ 0 h 1268467"/>
+              <a:gd name="connsiteX2" fmla="*/ 1124507 w 1124507"/>
+              <a:gd name="connsiteY2" fmla="*/ 600699 h 1268467"/>
+              <a:gd name="connsiteX3" fmla="*/ 0 w 1124507"/>
+              <a:gd name="connsiteY3" fmla="*/ 1268467 h 1268467"/>
+            </a:gdLst>
+            <a:ahLst/>
+            <a:cxnLst>
+              <a:cxn ang="0">
+                <a:pos x="connsiteX0" y="connsiteY0"/>
+              </a:cxn>
+              <a:cxn ang="0">
+                <a:pos x="connsiteX1" y="connsiteY1"/>
+              </a:cxn>
+              <a:cxn ang="0">
+                <a:pos x="connsiteX2" y="connsiteY2"/>
+              </a:cxn>
+              <a:cxn ang="0">
+                <a:pos x="connsiteX3" y="connsiteY3"/>
+              </a:cxn>
+            </a:cxnLst>
+            <a:rect l="l" t="t" r="r" b="b"/>
+            <a:pathLst>
+              <a:path w="1124507" h="1268467">
+                <a:moveTo>
+                  <a:pt x="0" y="1268467"/>
+                </a:moveTo>
+                <a:cubicBezTo>
+                  <a:pt x="2277" y="845645"/>
+                  <a:pt x="4553" y="422822"/>
+                  <a:pt x="6830" y="0"/>
+                </a:cubicBezTo>
+                <a:lnTo>
+                  <a:pt x="1124507" y="600699"/>
+                </a:lnTo>
+                <a:lnTo>
+                  <a:pt x="0" y="1268467"/>
+                </a:lnTo>
+                <a:close/>
+              </a:path>
+            </a:pathLst>
+          </a:custGeom>
+          <a:solidFill>
+            <a:srgbClr val="BDFFFF"/>
+          </a:solidFill>
+          <a:ln w="9525">
+            <a:solidFill>
+              <a:schemeClr val="tx1"/>
+            </a:solidFill>
+          </a:ln>
+        </p:spPr>
+        <p:style>
+          <a:lnRef idx="2">
+            <a:schemeClr val="accent1">
+              <a:shade val="50000"/>
+            </a:schemeClr>
+          </a:lnRef>
+          <a:fillRef idx="1">
+            <a:schemeClr val="accent1"/>
+          </a:fillRef>
+          <a:effectRef idx="0">
+            <a:schemeClr val="accent1"/>
+          </a:effectRef>
+          <a:fontRef idx="minor">
+            <a:schemeClr val="lt1"/>
+          </a:fontRef>
+        </p:style>
+        <p:txBody>
+          <a:bodyPr rtlCol="0" anchor="ctr"/>
+          <a:lstStyle/>
+          <a:p>
+            <a:pPr algn="ctr"/>
+            <a:endParaRPr lang="en-GB" dirty="0"/>
+          </a:p>
+        </p:txBody>
+      </p:sp>
+      <p:cxnSp>
+        <p:nvCxnSpPr>
+          <p:cNvPr id="68" name="Straight Arrow Connector 67">
+            <a:extLst>
+              <a:ext uri="{FF2B5EF4-FFF2-40B4-BE49-F238E27FC236}">
+                <a16:creationId xmlns:a16="http://schemas.microsoft.com/office/drawing/2014/main" id="{D664DDFD-5F6A-E779-BBCB-6A6C9F82324E}"/>
+              </a:ext>
+            </a:extLst>
+          </p:cNvPr>
+          <p:cNvCxnSpPr>
+            <a:cxnSpLocks/>
+          </p:cNvCxnSpPr>
+          <p:nvPr/>
+        </p:nvCxnSpPr>
+        <p:spPr>
+          <a:xfrm>
+            <a:off x="6061470" y="2666838"/>
+            <a:ext cx="1080954" cy="665071"/>
+          </a:xfrm>
+          <a:prstGeom prst="straightConnector1">
+            <a:avLst/>
+          </a:prstGeom>
+          <a:ln>
+            <a:tailEnd type="triangle"/>
+          </a:ln>
+        </p:spPr>
+        <p:style>
+          <a:lnRef idx="1">
+            <a:schemeClr val="dk1"/>
+          </a:lnRef>
+          <a:fillRef idx="0">
+            <a:schemeClr val="dk1"/>
+          </a:fillRef>
+          <a:effectRef idx="0">
+            <a:schemeClr val="dk1"/>
+          </a:effectRef>
+          <a:fontRef idx="minor">
+            <a:schemeClr val="tx1"/>
+          </a:fontRef>
+        </p:style>
+      </p:cxnSp>
+      <p:sp>
+        <p:nvSpPr>
+          <p:cNvPr id="28" name="Right Triangle 25">
+            <a:extLst>
+              <a:ext uri="{FF2B5EF4-FFF2-40B4-BE49-F238E27FC236}">
+                <a16:creationId xmlns:a16="http://schemas.microsoft.com/office/drawing/2014/main" id="{349BFA3A-B63D-3F62-F88C-6B1D7C181744}"/>
+              </a:ext>
+            </a:extLst>
+          </p:cNvPr>
+          <p:cNvSpPr/>
+          <p:nvPr/>
+        </p:nvSpPr>
+        <p:spPr>
+          <a:xfrm rot="236942">
+            <a:off x="6009713" y="1384833"/>
+            <a:ext cx="1126265" cy="1325921"/>
+          </a:xfrm>
+          <a:custGeom>
+            <a:avLst/>
+            <a:gdLst>
+              <a:gd name="connsiteX0" fmla="*/ 0 w 914400"/>
+              <a:gd name="connsiteY0" fmla="*/ 914400 h 914400"/>
+              <a:gd name="connsiteX1" fmla="*/ 0 w 914400"/>
+              <a:gd name="connsiteY1" fmla="*/ 0 h 914400"/>
+              <a:gd name="connsiteX2" fmla="*/ 914400 w 914400"/>
+              <a:gd name="connsiteY2" fmla="*/ 914400 h 914400"/>
+              <a:gd name="connsiteX3" fmla="*/ 0 w 914400"/>
+              <a:gd name="connsiteY3" fmla="*/ 914400 h 914400"/>
+              <a:gd name="connsiteX0" fmla="*/ 0 w 924114"/>
+              <a:gd name="connsiteY0" fmla="*/ 1189651 h 1189651"/>
+              <a:gd name="connsiteX1" fmla="*/ 9714 w 924114"/>
+              <a:gd name="connsiteY1" fmla="*/ 0 h 1189651"/>
+              <a:gd name="connsiteX2" fmla="*/ 924114 w 924114"/>
+              <a:gd name="connsiteY2" fmla="*/ 914400 h 1189651"/>
+              <a:gd name="connsiteX3" fmla="*/ 0 w 924114"/>
+              <a:gd name="connsiteY3" fmla="*/ 1189651 h 1189651"/>
+              <a:gd name="connsiteX0" fmla="*/ 0 w 1124507"/>
+              <a:gd name="connsiteY0" fmla="*/ 1189651 h 1189651"/>
+              <a:gd name="connsiteX1" fmla="*/ 9714 w 1124507"/>
+              <a:gd name="connsiteY1" fmla="*/ 0 h 1189651"/>
+              <a:gd name="connsiteX2" fmla="*/ 1124507 w 1124507"/>
+              <a:gd name="connsiteY2" fmla="*/ 521883 h 1189651"/>
+              <a:gd name="connsiteX3" fmla="*/ 0 w 1124507"/>
+              <a:gd name="connsiteY3" fmla="*/ 1189651 h 1189651"/>
+              <a:gd name="connsiteX0" fmla="*/ 0 w 1124507"/>
+              <a:gd name="connsiteY0" fmla="*/ 1268467 h 1268467"/>
+              <a:gd name="connsiteX1" fmla="*/ 6830 w 1124507"/>
+              <a:gd name="connsiteY1" fmla="*/ 0 h 1268467"/>
+              <a:gd name="connsiteX2" fmla="*/ 1124507 w 1124507"/>
+              <a:gd name="connsiteY2" fmla="*/ 600699 h 1268467"/>
+              <a:gd name="connsiteX3" fmla="*/ 0 w 1124507"/>
+              <a:gd name="connsiteY3" fmla="*/ 1268467 h 1268467"/>
+              <a:gd name="connsiteX0" fmla="*/ 83190 w 1207697"/>
+              <a:gd name="connsiteY0" fmla="*/ 1201644 h 1201644"/>
+              <a:gd name="connsiteX1" fmla="*/ 43 w 1207697"/>
+              <a:gd name="connsiteY1" fmla="*/ 0 h 1201644"/>
+              <a:gd name="connsiteX2" fmla="*/ 1207697 w 1207697"/>
+              <a:gd name="connsiteY2" fmla="*/ 533876 h 1201644"/>
+              <a:gd name="connsiteX3" fmla="*/ 83190 w 1207697"/>
+              <a:gd name="connsiteY3" fmla="*/ 1201644 h 1201644"/>
+              <a:gd name="connsiteX0" fmla="*/ 83147 w 1207654"/>
+              <a:gd name="connsiteY0" fmla="*/ 1201644 h 1201644"/>
+              <a:gd name="connsiteX1" fmla="*/ 0 w 1207654"/>
+              <a:gd name="connsiteY1" fmla="*/ 0 h 1201644"/>
+              <a:gd name="connsiteX2" fmla="*/ 1207654 w 1207654"/>
+              <a:gd name="connsiteY2" fmla="*/ 533876 h 1201644"/>
+              <a:gd name="connsiteX3" fmla="*/ 83147 w 1207654"/>
+              <a:gd name="connsiteY3" fmla="*/ 1201644 h 1201644"/>
+              <a:gd name="connsiteX0" fmla="*/ 83147 w 1207654"/>
+              <a:gd name="connsiteY0" fmla="*/ 1201644 h 1201644"/>
+              <a:gd name="connsiteX1" fmla="*/ 0 w 1207654"/>
+              <a:gd name="connsiteY1" fmla="*/ 0 h 1201644"/>
+              <a:gd name="connsiteX2" fmla="*/ 1207654 w 1207654"/>
+              <a:gd name="connsiteY2" fmla="*/ 533876 h 1201644"/>
+              <a:gd name="connsiteX3" fmla="*/ 83147 w 1207654"/>
+              <a:gd name="connsiteY3" fmla="*/ 1201644 h 1201644"/>
+            </a:gdLst>
+            <a:ahLst/>
+            <a:cxnLst>
+              <a:cxn ang="0">
+                <a:pos x="connsiteX0" y="connsiteY0"/>
+              </a:cxn>
+              <a:cxn ang="0">
+                <a:pos x="connsiteX1" y="connsiteY1"/>
+              </a:cxn>
+              <a:cxn ang="0">
+                <a:pos x="connsiteX2" y="connsiteY2"/>
+              </a:cxn>
+              <a:cxn ang="0">
+                <a:pos x="connsiteX3" y="connsiteY3"/>
+              </a:cxn>
+            </a:cxnLst>
+            <a:rect l="l" t="t" r="r" b="b"/>
+            <a:pathLst>
+              <a:path w="1207654" h="1201644">
+                <a:moveTo>
+                  <a:pt x="83147" y="1201644"/>
+                </a:moveTo>
+                <a:cubicBezTo>
+                  <a:pt x="85424" y="778822"/>
+                  <a:pt x="20816" y="421463"/>
+                  <a:pt x="0" y="0"/>
+                </a:cubicBezTo>
+                <a:lnTo>
+                  <a:pt x="1207654" y="533876"/>
+                </a:lnTo>
+                <a:lnTo>
+                  <a:pt x="83147" y="1201644"/>
+                </a:lnTo>
+                <a:close/>
+              </a:path>
+            </a:pathLst>
+          </a:custGeom>
+          <a:solidFill>
+            <a:srgbClr val="BDFFFF"/>
+          </a:solidFill>
+          <a:ln w="9525">
+            <a:solidFill>
+              <a:schemeClr val="tx1"/>
+            </a:solidFill>
+          </a:ln>
+        </p:spPr>
+        <p:style>
+          <a:lnRef idx="2">
+            <a:schemeClr val="accent1">
+              <a:shade val="50000"/>
+            </a:schemeClr>
+          </a:lnRef>
+          <a:fillRef idx="1">
+            <a:schemeClr val="accent1"/>
+          </a:fillRef>
+          <a:effectRef idx="0">
+            <a:schemeClr val="accent1"/>
+          </a:effectRef>
+          <a:fontRef idx="minor">
+            <a:schemeClr val="lt1"/>
+          </a:fontRef>
+        </p:style>
+        <p:txBody>
+          <a:bodyPr rtlCol="0" anchor="ctr"/>
+          <a:lstStyle/>
+          <a:p>
+            <a:pPr algn="ctr"/>
+            <a:endParaRPr lang="en-GB" dirty="0"/>
+          </a:p>
+        </p:txBody>
+      </p:sp>
+      <p:sp>
+        <p:nvSpPr>
+          <p:cNvPr id="26" name="Right Triangle 25">
+            <a:extLst>
+              <a:ext uri="{FF2B5EF4-FFF2-40B4-BE49-F238E27FC236}">
+                <a16:creationId xmlns:a16="http://schemas.microsoft.com/office/drawing/2014/main" id="{ADC6D3CC-F3CC-01D1-B479-F52423AC9248}"/>
+              </a:ext>
+            </a:extLst>
+          </p:cNvPr>
+          <p:cNvSpPr/>
+          <p:nvPr/>
+        </p:nvSpPr>
+        <p:spPr>
+          <a:xfrm rot="18058911">
+            <a:off x="5440862" y="2339293"/>
+            <a:ext cx="1140882" cy="1278304"/>
+          </a:xfrm>
+          <a:custGeom>
+            <a:avLst/>
+            <a:gdLst>
+              <a:gd name="connsiteX0" fmla="*/ 0 w 914400"/>
+              <a:gd name="connsiteY0" fmla="*/ 914400 h 914400"/>
+              <a:gd name="connsiteX1" fmla="*/ 0 w 914400"/>
+              <a:gd name="connsiteY1" fmla="*/ 0 h 914400"/>
+              <a:gd name="connsiteX2" fmla="*/ 914400 w 914400"/>
+              <a:gd name="connsiteY2" fmla="*/ 914400 h 914400"/>
+              <a:gd name="connsiteX3" fmla="*/ 0 w 914400"/>
+              <a:gd name="connsiteY3" fmla="*/ 914400 h 914400"/>
+              <a:gd name="connsiteX0" fmla="*/ 0 w 924114"/>
+              <a:gd name="connsiteY0" fmla="*/ 1189651 h 1189651"/>
+              <a:gd name="connsiteX1" fmla="*/ 9714 w 924114"/>
+              <a:gd name="connsiteY1" fmla="*/ 0 h 1189651"/>
+              <a:gd name="connsiteX2" fmla="*/ 924114 w 924114"/>
+              <a:gd name="connsiteY2" fmla="*/ 914400 h 1189651"/>
+              <a:gd name="connsiteX3" fmla="*/ 0 w 924114"/>
+              <a:gd name="connsiteY3" fmla="*/ 1189651 h 1189651"/>
+              <a:gd name="connsiteX0" fmla="*/ 0 w 1124507"/>
+              <a:gd name="connsiteY0" fmla="*/ 1189651 h 1189651"/>
+              <a:gd name="connsiteX1" fmla="*/ 9714 w 1124507"/>
+              <a:gd name="connsiteY1" fmla="*/ 0 h 1189651"/>
+              <a:gd name="connsiteX2" fmla="*/ 1124507 w 1124507"/>
+              <a:gd name="connsiteY2" fmla="*/ 521883 h 1189651"/>
+              <a:gd name="connsiteX3" fmla="*/ 0 w 1124507"/>
+              <a:gd name="connsiteY3" fmla="*/ 1189651 h 1189651"/>
+              <a:gd name="connsiteX0" fmla="*/ 0 w 1124507"/>
+              <a:gd name="connsiteY0" fmla="*/ 1268467 h 1268467"/>
+              <a:gd name="connsiteX1" fmla="*/ 6830 w 1124507"/>
+              <a:gd name="connsiteY1" fmla="*/ 0 h 1268467"/>
+              <a:gd name="connsiteX2" fmla="*/ 1124507 w 1124507"/>
+              <a:gd name="connsiteY2" fmla="*/ 600699 h 1268467"/>
+              <a:gd name="connsiteX3" fmla="*/ 0 w 1124507"/>
+              <a:gd name="connsiteY3" fmla="*/ 1268467 h 1268467"/>
+            </a:gdLst>
+            <a:ahLst/>
+            <a:cxnLst>
+              <a:cxn ang="0">
+                <a:pos x="connsiteX0" y="connsiteY0"/>
+              </a:cxn>
+              <a:cxn ang="0">
+                <a:pos x="connsiteX1" y="connsiteY1"/>
+              </a:cxn>
+              <a:cxn ang="0">
+                <a:pos x="connsiteX2" y="connsiteY2"/>
+              </a:cxn>
+              <a:cxn ang="0">
+                <a:pos x="connsiteX3" y="connsiteY3"/>
+              </a:cxn>
+            </a:cxnLst>
+            <a:rect l="l" t="t" r="r" b="b"/>
+            <a:pathLst>
+              <a:path w="1124507" h="1268467">
+                <a:moveTo>
+                  <a:pt x="0" y="1268467"/>
+                </a:moveTo>
+                <a:cubicBezTo>
+                  <a:pt x="2277" y="845645"/>
+                  <a:pt x="4553" y="422822"/>
+                  <a:pt x="6830" y="0"/>
+                </a:cubicBezTo>
+                <a:lnTo>
+                  <a:pt x="1124507" y="600699"/>
+                </a:lnTo>
+                <a:lnTo>
+                  <a:pt x="0" y="1268467"/>
+                </a:lnTo>
+                <a:close/>
+              </a:path>
+            </a:pathLst>
+          </a:custGeom>
+          <a:solidFill>
+            <a:srgbClr val="FFE9BD"/>
+          </a:solidFill>
+          <a:ln w="9525">
+            <a:solidFill>
+              <a:schemeClr val="tx1"/>
+            </a:solidFill>
+          </a:ln>
+        </p:spPr>
+        <p:style>
+          <a:lnRef idx="2">
+            <a:schemeClr val="accent1">
+              <a:shade val="50000"/>
+            </a:schemeClr>
+          </a:lnRef>
+          <a:fillRef idx="1">
+            <a:schemeClr val="accent1"/>
+          </a:fillRef>
+          <a:effectRef idx="0">
+            <a:schemeClr val="accent1"/>
+          </a:effectRef>
+          <a:fontRef idx="minor">
+            <a:schemeClr val="lt1"/>
+          </a:fontRef>
+        </p:style>
+        <p:txBody>
+          <a:bodyPr rtlCol="0" anchor="ctr"/>
+          <a:lstStyle/>
+          <a:p>
+            <a:pPr algn="ctr"/>
+            <a:endParaRPr lang="en-GB" dirty="0"/>
+          </a:p>
+        </p:txBody>
+      </p:sp>
+      <p:sp>
+        <p:nvSpPr>
+          <p:cNvPr id="78" name="Right Triangle 25">
+            <a:extLst>
+              <a:ext uri="{FF2B5EF4-FFF2-40B4-BE49-F238E27FC236}">
+                <a16:creationId xmlns:a16="http://schemas.microsoft.com/office/drawing/2014/main" id="{4BAEFB87-5237-7748-1305-84B5643223C4}"/>
+              </a:ext>
+            </a:extLst>
+          </p:cNvPr>
+          <p:cNvSpPr/>
+          <p:nvPr/>
+        </p:nvSpPr>
+        <p:spPr>
+          <a:xfrm rot="236942">
+            <a:off x="5123715" y="1816517"/>
+            <a:ext cx="1129426" cy="1331485"/>
+          </a:xfrm>
+          <a:custGeom>
+            <a:avLst/>
+            <a:gdLst>
+              <a:gd name="connsiteX0" fmla="*/ 0 w 914400"/>
+              <a:gd name="connsiteY0" fmla="*/ 914400 h 914400"/>
+              <a:gd name="connsiteX1" fmla="*/ 0 w 914400"/>
+              <a:gd name="connsiteY1" fmla="*/ 0 h 914400"/>
+              <a:gd name="connsiteX2" fmla="*/ 914400 w 914400"/>
+              <a:gd name="connsiteY2" fmla="*/ 914400 h 914400"/>
+              <a:gd name="connsiteX3" fmla="*/ 0 w 914400"/>
+              <a:gd name="connsiteY3" fmla="*/ 914400 h 914400"/>
+              <a:gd name="connsiteX0" fmla="*/ 0 w 924114"/>
+              <a:gd name="connsiteY0" fmla="*/ 1189651 h 1189651"/>
+              <a:gd name="connsiteX1" fmla="*/ 9714 w 924114"/>
+              <a:gd name="connsiteY1" fmla="*/ 0 h 1189651"/>
+              <a:gd name="connsiteX2" fmla="*/ 924114 w 924114"/>
+              <a:gd name="connsiteY2" fmla="*/ 914400 h 1189651"/>
+              <a:gd name="connsiteX3" fmla="*/ 0 w 924114"/>
+              <a:gd name="connsiteY3" fmla="*/ 1189651 h 1189651"/>
+              <a:gd name="connsiteX0" fmla="*/ 0 w 1124507"/>
+              <a:gd name="connsiteY0" fmla="*/ 1189651 h 1189651"/>
+              <a:gd name="connsiteX1" fmla="*/ 9714 w 1124507"/>
+              <a:gd name="connsiteY1" fmla="*/ 0 h 1189651"/>
+              <a:gd name="connsiteX2" fmla="*/ 1124507 w 1124507"/>
+              <a:gd name="connsiteY2" fmla="*/ 521883 h 1189651"/>
+              <a:gd name="connsiteX3" fmla="*/ 0 w 1124507"/>
+              <a:gd name="connsiteY3" fmla="*/ 1189651 h 1189651"/>
+              <a:gd name="connsiteX0" fmla="*/ 0 w 1124507"/>
+              <a:gd name="connsiteY0" fmla="*/ 1268467 h 1268467"/>
+              <a:gd name="connsiteX1" fmla="*/ 6830 w 1124507"/>
+              <a:gd name="connsiteY1" fmla="*/ 0 h 1268467"/>
+              <a:gd name="connsiteX2" fmla="*/ 1124507 w 1124507"/>
+              <a:gd name="connsiteY2" fmla="*/ 600699 h 1268467"/>
+              <a:gd name="connsiteX3" fmla="*/ 0 w 1124507"/>
+              <a:gd name="connsiteY3" fmla="*/ 1268467 h 1268467"/>
+              <a:gd name="connsiteX0" fmla="*/ 83190 w 1207697"/>
+              <a:gd name="connsiteY0" fmla="*/ 1201644 h 1201644"/>
+              <a:gd name="connsiteX1" fmla="*/ 43 w 1207697"/>
+              <a:gd name="connsiteY1" fmla="*/ 0 h 1201644"/>
+              <a:gd name="connsiteX2" fmla="*/ 1207697 w 1207697"/>
+              <a:gd name="connsiteY2" fmla="*/ 533876 h 1201644"/>
+              <a:gd name="connsiteX3" fmla="*/ 83190 w 1207697"/>
+              <a:gd name="connsiteY3" fmla="*/ 1201644 h 1201644"/>
+              <a:gd name="connsiteX0" fmla="*/ 83147 w 1207654"/>
+              <a:gd name="connsiteY0" fmla="*/ 1201644 h 1201644"/>
+              <a:gd name="connsiteX1" fmla="*/ 0 w 1207654"/>
+              <a:gd name="connsiteY1" fmla="*/ 0 h 1201644"/>
+              <a:gd name="connsiteX2" fmla="*/ 1207654 w 1207654"/>
+              <a:gd name="connsiteY2" fmla="*/ 533876 h 1201644"/>
+              <a:gd name="connsiteX3" fmla="*/ 83147 w 1207654"/>
+              <a:gd name="connsiteY3" fmla="*/ 1201644 h 1201644"/>
+              <a:gd name="connsiteX0" fmla="*/ 83147 w 1207654"/>
+              <a:gd name="connsiteY0" fmla="*/ 1201644 h 1201644"/>
+              <a:gd name="connsiteX1" fmla="*/ 0 w 1207654"/>
+              <a:gd name="connsiteY1" fmla="*/ 0 h 1201644"/>
+              <a:gd name="connsiteX2" fmla="*/ 1207654 w 1207654"/>
+              <a:gd name="connsiteY2" fmla="*/ 533876 h 1201644"/>
+              <a:gd name="connsiteX3" fmla="*/ 83147 w 1207654"/>
+              <a:gd name="connsiteY3" fmla="*/ 1201644 h 1201644"/>
+            </a:gdLst>
+            <a:ahLst/>
+            <a:cxnLst>
+              <a:cxn ang="0">
+                <a:pos x="connsiteX0" y="connsiteY0"/>
+              </a:cxn>
+              <a:cxn ang="0">
+                <a:pos x="connsiteX1" y="connsiteY1"/>
+              </a:cxn>
+              <a:cxn ang="0">
+                <a:pos x="connsiteX2" y="connsiteY2"/>
+              </a:cxn>
+              <a:cxn ang="0">
+                <a:pos x="connsiteX3" y="connsiteY3"/>
+              </a:cxn>
+            </a:cxnLst>
+            <a:rect l="l" t="t" r="r" b="b"/>
+            <a:pathLst>
+              <a:path w="1207654" h="1201644">
+                <a:moveTo>
+                  <a:pt x="83147" y="1201644"/>
+                </a:moveTo>
+                <a:cubicBezTo>
+                  <a:pt x="85424" y="778822"/>
+                  <a:pt x="20816" y="421463"/>
+                  <a:pt x="0" y="0"/>
+                </a:cubicBezTo>
+                <a:lnTo>
+                  <a:pt x="1207654" y="533876"/>
+                </a:lnTo>
+                <a:lnTo>
+                  <a:pt x="83147" y="1201644"/>
+                </a:lnTo>
+                <a:close/>
+              </a:path>
+            </a:pathLst>
+          </a:custGeom>
+          <a:solidFill>
+            <a:srgbClr val="FFE9BD"/>
+          </a:solidFill>
+          <a:ln w="9525">
+            <a:solidFill>
+              <a:schemeClr val="tx1"/>
+            </a:solidFill>
+          </a:ln>
+        </p:spPr>
+        <p:style>
+          <a:lnRef idx="2">
+            <a:schemeClr val="accent1">
+              <a:shade val="50000"/>
+            </a:schemeClr>
+          </a:lnRef>
+          <a:fillRef idx="1">
+            <a:schemeClr val="accent1"/>
+          </a:fillRef>
+          <a:effectRef idx="0">
+            <a:schemeClr val="accent1"/>
+          </a:effectRef>
+          <a:fontRef idx="minor">
+            <a:schemeClr val="lt1"/>
+          </a:fontRef>
+        </p:style>
+        <p:txBody>
+          <a:bodyPr rtlCol="0" anchor="ctr"/>
+          <a:lstStyle/>
+          <a:p>
+            <a:pPr algn="ctr"/>
+            <a:endParaRPr lang="en-GB" dirty="0">
+              <a:solidFill>
+                <a:srgbClr val="FFE9BD"/>
+              </a:solidFill>
+            </a:endParaRPr>
+          </a:p>
+        </p:txBody>
+      </p:sp>
+      <p:sp>
+        <p:nvSpPr>
+          <p:cNvPr id="233" name="Rectangle 232">
+            <a:extLst>
+              <a:ext uri="{FF2B5EF4-FFF2-40B4-BE49-F238E27FC236}">
+                <a16:creationId xmlns:a16="http://schemas.microsoft.com/office/drawing/2014/main" id="{C80462C7-5562-1F4F-146B-702719C60EE1}"/>
+              </a:ext>
+            </a:extLst>
+          </p:cNvPr>
+          <p:cNvSpPr/>
+          <p:nvPr/>
+        </p:nvSpPr>
+        <p:spPr>
+          <a:xfrm>
+            <a:off x="4312920" y="2259330"/>
+            <a:ext cx="1188720" cy="2622550"/>
+          </a:xfrm>
+          <a:custGeom>
+            <a:avLst/>
+            <a:gdLst>
+              <a:gd name="connsiteX0" fmla="*/ 0 w 2266950"/>
+              <a:gd name="connsiteY0" fmla="*/ 0 h 1339850"/>
+              <a:gd name="connsiteX1" fmla="*/ 2266950 w 2266950"/>
+              <a:gd name="connsiteY1" fmla="*/ 0 h 1339850"/>
+              <a:gd name="connsiteX2" fmla="*/ 2266950 w 2266950"/>
+              <a:gd name="connsiteY2" fmla="*/ 1339850 h 1339850"/>
+              <a:gd name="connsiteX3" fmla="*/ 0 w 2266950"/>
+              <a:gd name="connsiteY3" fmla="*/ 1339850 h 1339850"/>
+              <a:gd name="connsiteX4" fmla="*/ 0 w 2266950"/>
+              <a:gd name="connsiteY4" fmla="*/ 0 h 1339850"/>
+              <a:gd name="connsiteX0" fmla="*/ 0 w 2266950"/>
+              <a:gd name="connsiteY0" fmla="*/ 0 h 1981200"/>
+              <a:gd name="connsiteX1" fmla="*/ 2266950 w 2266950"/>
+              <a:gd name="connsiteY1" fmla="*/ 0 h 1981200"/>
+              <a:gd name="connsiteX2" fmla="*/ 2266950 w 2266950"/>
+              <a:gd name="connsiteY2" fmla="*/ 1339850 h 1981200"/>
+              <a:gd name="connsiteX3" fmla="*/ 1092200 w 2266950"/>
+              <a:gd name="connsiteY3" fmla="*/ 1981200 h 1981200"/>
+              <a:gd name="connsiteX4" fmla="*/ 0 w 2266950"/>
+              <a:gd name="connsiteY4" fmla="*/ 0 h 1981200"/>
+              <a:gd name="connsiteX0" fmla="*/ 76200 w 1174750"/>
+              <a:gd name="connsiteY0" fmla="*/ 0 h 2622550"/>
+              <a:gd name="connsiteX1" fmla="*/ 1174750 w 1174750"/>
+              <a:gd name="connsiteY1" fmla="*/ 641350 h 2622550"/>
+              <a:gd name="connsiteX2" fmla="*/ 1174750 w 1174750"/>
+              <a:gd name="connsiteY2" fmla="*/ 1981200 h 2622550"/>
+              <a:gd name="connsiteX3" fmla="*/ 0 w 1174750"/>
+              <a:gd name="connsiteY3" fmla="*/ 2622550 h 2622550"/>
+              <a:gd name="connsiteX4" fmla="*/ 76200 w 1174750"/>
+              <a:gd name="connsiteY4" fmla="*/ 0 h 2622550"/>
+              <a:gd name="connsiteX0" fmla="*/ 76200 w 1174750"/>
+              <a:gd name="connsiteY0" fmla="*/ 0 h 2622550"/>
+              <a:gd name="connsiteX1" fmla="*/ 1168400 w 1174750"/>
+              <a:gd name="connsiteY1" fmla="*/ 641350 h 2622550"/>
+              <a:gd name="connsiteX2" fmla="*/ 1174750 w 1174750"/>
+              <a:gd name="connsiteY2" fmla="*/ 1981200 h 2622550"/>
+              <a:gd name="connsiteX3" fmla="*/ 0 w 1174750"/>
+              <a:gd name="connsiteY3" fmla="*/ 2622550 h 2622550"/>
+              <a:gd name="connsiteX4" fmla="*/ 76200 w 1174750"/>
+              <a:gd name="connsiteY4" fmla="*/ 0 h 2622550"/>
+            </a:gdLst>
+            <a:ahLst/>
+            <a:cxnLst>
+              <a:cxn ang="0">
+                <a:pos x="connsiteX0" y="connsiteY0"/>
+              </a:cxn>
+              <a:cxn ang="0">
+                <a:pos x="connsiteX1" y="connsiteY1"/>
+              </a:cxn>
+              <a:cxn ang="0">
+                <a:pos x="connsiteX2" y="connsiteY2"/>
+              </a:cxn>
+              <a:cxn ang="0">
+                <a:pos x="connsiteX3" y="connsiteY3"/>
+              </a:cxn>
+              <a:cxn ang="0">
+                <a:pos x="connsiteX4" y="connsiteY4"/>
+              </a:cxn>
+            </a:cxnLst>
+            <a:rect l="l" t="t" r="r" b="b"/>
+            <a:pathLst>
+              <a:path w="1174750" h="2622550">
+                <a:moveTo>
+                  <a:pt x="76200" y="0"/>
+                </a:moveTo>
+                <a:lnTo>
+                  <a:pt x="1168400" y="641350"/>
+                </a:lnTo>
+                <a:cubicBezTo>
+                  <a:pt x="1170517" y="1087967"/>
+                  <a:pt x="1172633" y="1534583"/>
+                  <a:pt x="1174750" y="1981200"/>
+                </a:cubicBezTo>
+                <a:lnTo>
+                  <a:pt x="0" y="2622550"/>
+                </a:lnTo>
+                <a:lnTo>
+                  <a:pt x="76200" y="0"/>
+                </a:lnTo>
+                <a:close/>
+              </a:path>
+            </a:pathLst>
+          </a:custGeom>
+          <a:solidFill>
+            <a:srgbClr val="FFBDE6"/>
+          </a:solidFill>
+          <a:ln w="9525">
+            <a:solidFill>
+              <a:schemeClr val="tx1"/>
+            </a:solidFill>
+          </a:ln>
+        </p:spPr>
+        <p:style>
+          <a:lnRef idx="2">
+            <a:schemeClr val="accent1">
+              <a:shade val="50000"/>
+            </a:schemeClr>
+          </a:lnRef>
+          <a:fillRef idx="1">
+            <a:schemeClr val="accent1"/>
+          </a:fillRef>
+          <a:effectRef idx="0">
+            <a:schemeClr val="accent1"/>
+          </a:effectRef>
+          <a:fontRef idx="minor">
+            <a:schemeClr val="lt1"/>
+          </a:fontRef>
+        </p:style>
+        <p:txBody>
+          <a:bodyPr rtlCol="0" anchor="ctr"/>
+          <a:lstStyle/>
+          <a:p>
+            <a:pPr algn="ctr"/>
+            <a:endParaRPr lang="en-GB">
+              <a:solidFill>
+                <a:srgbClr val="BDCBFF"/>
+              </a:solidFill>
+            </a:endParaRPr>
+          </a:p>
+        </p:txBody>
+      </p:sp>
+      <p:sp>
+        <p:nvSpPr>
+          <p:cNvPr id="3" name="TextBox 2">
+            <a:extLst>
+              <a:ext uri="{FF2B5EF4-FFF2-40B4-BE49-F238E27FC236}">
+                <a16:creationId xmlns:a16="http://schemas.microsoft.com/office/drawing/2014/main" id="{98FB6394-CD33-2063-909B-BCF709DC878B}"/>
+              </a:ext>
+            </a:extLst>
+          </p:cNvPr>
+          <p:cNvSpPr txBox="1"/>
+          <p:nvPr/>
+        </p:nvSpPr>
+        <p:spPr>
+          <a:xfrm>
+            <a:off x="787160" y="215986"/>
+            <a:ext cx="6094562" cy="646331"/>
+          </a:xfrm>
+          <a:prstGeom prst="rect">
+            <a:avLst/>
+          </a:prstGeom>
+          <a:noFill/>
+        </p:spPr>
+        <p:txBody>
+          <a:bodyPr wrap="square">
+            <a:spAutoFit/>
+          </a:bodyPr>
+          <a:lstStyle/>
+          <a:p>
+            <a:r>
+              <a:rPr lang="en-GB" dirty="0">
+                <a:latin typeface="cmss12" panose="020B0500000000000000" pitchFamily="34" charset="0"/>
+              </a:rPr>
+              <a:t>https://brushingupscience.com/2016/02/02/design-using-hsl-colour-space/</a:t>
+            </a:r>
+          </a:p>
+        </p:txBody>
+      </p:sp>
+      <p:cxnSp>
+        <p:nvCxnSpPr>
+          <p:cNvPr id="31" name="Straight Arrow Connector 30">
+            <a:extLst>
+              <a:ext uri="{FF2B5EF4-FFF2-40B4-BE49-F238E27FC236}">
+                <a16:creationId xmlns:a16="http://schemas.microsoft.com/office/drawing/2014/main" id="{0ADD5BA8-25F4-1DFD-B5EA-AF948AB45B04}"/>
+              </a:ext>
+            </a:extLst>
+          </p:cNvPr>
+          <p:cNvCxnSpPr>
+            <a:cxnSpLocks/>
+            <a:endCxn id="28" idx="1"/>
+          </p:cNvCxnSpPr>
+          <p:nvPr/>
+        </p:nvCxnSpPr>
+        <p:spPr>
+          <a:xfrm flipV="1">
+            <a:off x="6056708" y="1347625"/>
+            <a:ext cx="0" cy="990763"/>
+          </a:xfrm>
+          <a:prstGeom prst="straightConnector1">
+            <a:avLst/>
+          </a:prstGeom>
+          <a:ln>
+            <a:tailEnd type="triangle"/>
+          </a:ln>
+        </p:spPr>
+        <p:style>
+          <a:lnRef idx="1">
+            <a:schemeClr val="dk1"/>
+          </a:lnRef>
+          <a:fillRef idx="0">
+            <a:schemeClr val="dk1"/>
+          </a:fillRef>
+          <a:effectRef idx="0">
+            <a:schemeClr val="dk1"/>
+          </a:effectRef>
+          <a:fontRef idx="minor">
+            <a:schemeClr val="tx1"/>
+          </a:fontRef>
+        </p:style>
+      </p:cxnSp>
+      <p:sp>
+        <p:nvSpPr>
+          <p:cNvPr id="73" name="TextBox 72">
+            <a:extLst>
+              <a:ext uri="{FF2B5EF4-FFF2-40B4-BE49-F238E27FC236}">
+                <a16:creationId xmlns:a16="http://schemas.microsoft.com/office/drawing/2014/main" id="{6D07C23C-F7A3-527E-6B2D-7D9459719B5A}"/>
+              </a:ext>
+            </a:extLst>
+          </p:cNvPr>
+          <p:cNvSpPr txBox="1"/>
+          <p:nvPr/>
+        </p:nvSpPr>
+        <p:spPr>
+          <a:xfrm>
+            <a:off x="6829424" y="3333750"/>
+            <a:ext cx="704851" cy="246221"/>
+          </a:xfrm>
+          <a:prstGeom prst="rect">
+            <a:avLst/>
+          </a:prstGeom>
+          <a:noFill/>
+        </p:spPr>
+        <p:txBody>
+          <a:bodyPr wrap="square" rtlCol="0">
+            <a:spAutoFit/>
+          </a:bodyPr>
+          <a:lstStyle/>
+          <a:p>
+            <a:r>
+              <a:rPr lang="de-DE" sz="1000" dirty="0">
+                <a:solidFill>
+                  <a:schemeClr val="dk1"/>
+                </a:solidFill>
+                <a:latin typeface="cmss12" panose="020B0500000000000000" pitchFamily="34" charset="0"/>
+                <a:cs typeface="Arial" panose="020B0604020202020204" pitchFamily="34" charset="0"/>
+              </a:rPr>
+              <a:t>Tick Rule</a:t>
+            </a:r>
+            <a:endParaRPr lang="en-GB" sz="1000" dirty="0">
+              <a:solidFill>
+                <a:schemeClr val="dk1"/>
+              </a:solidFill>
+              <a:latin typeface="cmss12" panose="020B0500000000000000" pitchFamily="34" charset="0"/>
+              <a:cs typeface="Arial" panose="020B0604020202020204" pitchFamily="34" charset="0"/>
+            </a:endParaRPr>
+          </a:p>
+        </p:txBody>
+      </p:sp>
+      <p:cxnSp>
+        <p:nvCxnSpPr>
+          <p:cNvPr id="80" name="Straight Arrow Connector 79">
+            <a:extLst>
+              <a:ext uri="{FF2B5EF4-FFF2-40B4-BE49-F238E27FC236}">
+                <a16:creationId xmlns:a16="http://schemas.microsoft.com/office/drawing/2014/main" id="{8D49391C-4D60-485D-4672-EFF8148FB8A4}"/>
+              </a:ext>
+            </a:extLst>
+          </p:cNvPr>
+          <p:cNvCxnSpPr>
+            <a:cxnSpLocks/>
+          </p:cNvCxnSpPr>
+          <p:nvPr/>
+        </p:nvCxnSpPr>
+        <p:spPr>
+          <a:xfrm>
+            <a:off x="5155406" y="3121819"/>
+            <a:ext cx="1108869" cy="678656"/>
+          </a:xfrm>
+          <a:prstGeom prst="straightConnector1">
+            <a:avLst/>
+          </a:prstGeom>
+          <a:ln>
+            <a:tailEnd type="triangle"/>
+          </a:ln>
+        </p:spPr>
+        <p:style>
+          <a:lnRef idx="1">
+            <a:schemeClr val="dk1"/>
+          </a:lnRef>
+          <a:fillRef idx="0">
+            <a:schemeClr val="dk1"/>
+          </a:fillRef>
+          <a:effectRef idx="0">
+            <a:schemeClr val="dk1"/>
+          </a:effectRef>
+          <a:fontRef idx="minor">
+            <a:schemeClr val="tx1"/>
+          </a:fontRef>
+        </p:style>
+      </p:cxnSp>
+      <p:cxnSp>
+        <p:nvCxnSpPr>
+          <p:cNvPr id="82" name="Straight Arrow Connector 81">
+            <a:extLst>
+              <a:ext uri="{FF2B5EF4-FFF2-40B4-BE49-F238E27FC236}">
+                <a16:creationId xmlns:a16="http://schemas.microsoft.com/office/drawing/2014/main" id="{FFBC87FB-1594-1B85-B936-0F095727EE2C}"/>
+              </a:ext>
+            </a:extLst>
+          </p:cNvPr>
+          <p:cNvCxnSpPr>
+            <a:cxnSpLocks/>
+            <a:endCxn id="78" idx="1"/>
+          </p:cNvCxnSpPr>
+          <p:nvPr/>
+        </p:nvCxnSpPr>
+        <p:spPr>
+          <a:xfrm flipV="1">
+            <a:off x="5153025" y="1779206"/>
+            <a:ext cx="17880" cy="1344994"/>
+          </a:xfrm>
+          <a:prstGeom prst="straightConnector1">
+            <a:avLst/>
+          </a:prstGeom>
+          <a:ln>
+            <a:tailEnd type="triangle"/>
+          </a:ln>
+        </p:spPr>
+        <p:style>
+          <a:lnRef idx="1">
+            <a:schemeClr val="dk1"/>
+          </a:lnRef>
+          <a:fillRef idx="0">
+            <a:schemeClr val="dk1"/>
+          </a:fillRef>
+          <a:effectRef idx="0">
+            <a:schemeClr val="dk1"/>
+          </a:effectRef>
+          <a:fontRef idx="minor">
+            <a:schemeClr val="tx1"/>
+          </a:fontRef>
+        </p:style>
+      </p:cxnSp>
+      <p:sp>
+        <p:nvSpPr>
+          <p:cNvPr id="98" name="TextBox 97">
+            <a:extLst>
+              <a:ext uri="{FF2B5EF4-FFF2-40B4-BE49-F238E27FC236}">
+                <a16:creationId xmlns:a16="http://schemas.microsoft.com/office/drawing/2014/main" id="{DFDFBB86-DCB6-B9A6-1A31-4410A008DEEB}"/>
+              </a:ext>
+            </a:extLst>
+          </p:cNvPr>
+          <p:cNvSpPr txBox="1"/>
+          <p:nvPr/>
+        </p:nvSpPr>
+        <p:spPr>
+          <a:xfrm>
+            <a:off x="5851524" y="3773488"/>
+            <a:ext cx="871539" cy="246221"/>
+          </a:xfrm>
+          <a:prstGeom prst="rect">
+            <a:avLst/>
+          </a:prstGeom>
+          <a:noFill/>
+        </p:spPr>
+        <p:txBody>
+          <a:bodyPr wrap="square" rtlCol="0">
+            <a:spAutoFit/>
+          </a:bodyPr>
+          <a:lstStyle/>
+          <a:p>
+            <a:r>
+              <a:rPr lang="de-DE" sz="1000" dirty="0">
+                <a:solidFill>
+                  <a:schemeClr val="dk1"/>
+                </a:solidFill>
+                <a:latin typeface="cmss12" panose="020B0500000000000000" pitchFamily="34" charset="0"/>
+                <a:cs typeface="Arial" panose="020B0604020202020204" pitchFamily="34" charset="0"/>
+              </a:rPr>
+              <a:t>Quote  Rule</a:t>
+            </a:r>
+            <a:endParaRPr lang="en-GB" sz="1000" dirty="0">
+              <a:solidFill>
+                <a:schemeClr val="dk1"/>
+              </a:solidFill>
+              <a:latin typeface="cmss12" panose="020B0500000000000000" pitchFamily="34" charset="0"/>
+              <a:cs typeface="Arial" panose="020B0604020202020204" pitchFamily="34" charset="0"/>
+            </a:endParaRPr>
+          </a:p>
+        </p:txBody>
+      </p:sp>
+      <p:cxnSp>
+        <p:nvCxnSpPr>
+          <p:cNvPr id="119" name="Straight Connector 118">
+            <a:extLst>
+              <a:ext uri="{FF2B5EF4-FFF2-40B4-BE49-F238E27FC236}">
+                <a16:creationId xmlns:a16="http://schemas.microsoft.com/office/drawing/2014/main" id="{571D9EC8-192B-6696-4205-17BCC50FA492}"/>
+              </a:ext>
+            </a:extLst>
+          </p:cNvPr>
+          <p:cNvCxnSpPr>
+            <a:cxnSpLocks/>
+          </p:cNvCxnSpPr>
+          <p:nvPr/>
+        </p:nvCxnSpPr>
+        <p:spPr>
+          <a:xfrm flipV="1">
+            <a:off x="5145881" y="2349500"/>
+            <a:ext cx="200819" cy="1693863"/>
+          </a:xfrm>
+          <a:prstGeom prst="line">
+            <a:avLst/>
+          </a:prstGeom>
+          <a:ln w="12700">
+            <a:prstDash val="dash"/>
+            <a:tailEnd type="triangle"/>
+          </a:ln>
+        </p:spPr>
+        <p:style>
+          <a:lnRef idx="1">
+            <a:schemeClr val="accent3"/>
+          </a:lnRef>
+          <a:fillRef idx="0">
+            <a:schemeClr val="accent3"/>
+          </a:fillRef>
+          <a:effectRef idx="0">
+            <a:schemeClr val="accent3"/>
+          </a:effectRef>
+          <a:fontRef idx="minor">
+            <a:schemeClr val="tx1"/>
+          </a:fontRef>
+        </p:style>
+      </p:cxnSp>
+      <p:cxnSp>
+        <p:nvCxnSpPr>
+          <p:cNvPr id="143" name="Straight Connector 142">
+            <a:extLst>
+              <a:ext uri="{FF2B5EF4-FFF2-40B4-BE49-F238E27FC236}">
+                <a16:creationId xmlns:a16="http://schemas.microsoft.com/office/drawing/2014/main" id="{A4AD7C7E-8887-23F0-64B9-4D3809B2954B}"/>
+              </a:ext>
+            </a:extLst>
+          </p:cNvPr>
+          <p:cNvCxnSpPr>
+            <a:cxnSpLocks/>
+          </p:cNvCxnSpPr>
+          <p:nvPr/>
+        </p:nvCxnSpPr>
+        <p:spPr>
+          <a:xfrm>
+            <a:off x="4386263" y="2257425"/>
+            <a:ext cx="1087437" cy="666750"/>
+          </a:xfrm>
+          <a:prstGeom prst="line">
+            <a:avLst/>
+          </a:prstGeom>
+          <a:ln>
+            <a:prstDash val="sysDot"/>
+          </a:ln>
+        </p:spPr>
+        <p:style>
+          <a:lnRef idx="1">
+            <a:schemeClr val="accent3"/>
+          </a:lnRef>
+          <a:fillRef idx="0">
+            <a:schemeClr val="accent3"/>
+          </a:fillRef>
+          <a:effectRef idx="0">
+            <a:schemeClr val="accent3"/>
+          </a:effectRef>
+          <a:fontRef idx="minor">
+            <a:schemeClr val="tx1"/>
+          </a:fontRef>
+        </p:style>
+      </p:cxnSp>
+      <p:cxnSp>
+        <p:nvCxnSpPr>
+          <p:cNvPr id="149" name="Straight Connector 148">
+            <a:extLst>
+              <a:ext uri="{FF2B5EF4-FFF2-40B4-BE49-F238E27FC236}">
+                <a16:creationId xmlns:a16="http://schemas.microsoft.com/office/drawing/2014/main" id="{1642AE36-18F7-627A-3BBD-349ED1EE87CA}"/>
+              </a:ext>
+            </a:extLst>
+          </p:cNvPr>
+          <p:cNvCxnSpPr>
+            <a:cxnSpLocks/>
+          </p:cNvCxnSpPr>
+          <p:nvPr/>
+        </p:nvCxnSpPr>
+        <p:spPr>
+          <a:xfrm>
+            <a:off x="5481637" y="2919413"/>
+            <a:ext cx="0" cy="1323975"/>
+          </a:xfrm>
+          <a:prstGeom prst="line">
+            <a:avLst/>
+          </a:prstGeom>
+          <a:ln>
+            <a:prstDash val="sysDot"/>
+          </a:ln>
+        </p:spPr>
+        <p:style>
+          <a:lnRef idx="1">
+            <a:schemeClr val="accent3"/>
+          </a:lnRef>
+          <a:fillRef idx="0">
+            <a:schemeClr val="accent3"/>
+          </a:fillRef>
+          <a:effectRef idx="0">
+            <a:schemeClr val="accent3"/>
+          </a:effectRef>
+          <a:fontRef idx="minor">
+            <a:schemeClr val="tx1"/>
+          </a:fontRef>
+        </p:style>
+      </p:cxnSp>
+      <p:cxnSp>
+        <p:nvCxnSpPr>
+          <p:cNvPr id="150" name="Straight Connector 149">
+            <a:extLst>
+              <a:ext uri="{FF2B5EF4-FFF2-40B4-BE49-F238E27FC236}">
+                <a16:creationId xmlns:a16="http://schemas.microsoft.com/office/drawing/2014/main" id="{2A6DFED4-2A5A-5890-BD86-979CE6C3DB6F}"/>
+              </a:ext>
+            </a:extLst>
+          </p:cNvPr>
+          <p:cNvCxnSpPr>
+            <a:cxnSpLocks/>
+          </p:cNvCxnSpPr>
+          <p:nvPr/>
+        </p:nvCxnSpPr>
+        <p:spPr>
+          <a:xfrm>
+            <a:off x="4314824" y="3559969"/>
+            <a:ext cx="0" cy="1312069"/>
+          </a:xfrm>
+          <a:prstGeom prst="line">
+            <a:avLst/>
+          </a:prstGeom>
+          <a:ln/>
+        </p:spPr>
+        <p:style>
+          <a:lnRef idx="1">
+            <a:schemeClr val="dk1"/>
+          </a:lnRef>
+          <a:fillRef idx="0">
+            <a:schemeClr val="dk1"/>
+          </a:fillRef>
+          <a:effectRef idx="0">
+            <a:schemeClr val="dk1"/>
+          </a:effectRef>
+          <a:fontRef idx="minor">
+            <a:schemeClr val="tx1"/>
+          </a:fontRef>
+        </p:style>
+      </p:cxnSp>
+      <p:cxnSp>
+        <p:nvCxnSpPr>
+          <p:cNvPr id="152" name="Straight Connector 151">
+            <a:extLst>
+              <a:ext uri="{FF2B5EF4-FFF2-40B4-BE49-F238E27FC236}">
+                <a16:creationId xmlns:a16="http://schemas.microsoft.com/office/drawing/2014/main" id="{4C93ED00-F6DA-2453-C62C-96CD6BD590E1}"/>
+              </a:ext>
+            </a:extLst>
+          </p:cNvPr>
+          <p:cNvCxnSpPr>
+            <a:cxnSpLocks/>
+          </p:cNvCxnSpPr>
+          <p:nvPr/>
+        </p:nvCxnSpPr>
+        <p:spPr>
+          <a:xfrm flipH="1">
+            <a:off x="3224213" y="2257425"/>
+            <a:ext cx="1157287" cy="628650"/>
+          </a:xfrm>
+          <a:prstGeom prst="line">
+            <a:avLst/>
+          </a:prstGeom>
+          <a:ln>
+            <a:prstDash val="sysDot"/>
+          </a:ln>
+        </p:spPr>
+        <p:style>
+          <a:lnRef idx="1">
+            <a:schemeClr val="accent3"/>
+          </a:lnRef>
+          <a:fillRef idx="0">
+            <a:schemeClr val="accent3"/>
+          </a:fillRef>
+          <a:effectRef idx="0">
+            <a:schemeClr val="accent3"/>
+          </a:effectRef>
+          <a:fontRef idx="minor">
+            <a:schemeClr val="tx1"/>
+          </a:fontRef>
+        </p:style>
+      </p:cxnSp>
+      <p:sp>
+        <p:nvSpPr>
+          <p:cNvPr id="158" name="TextBox 157">
+            <a:extLst>
+              <a:ext uri="{FF2B5EF4-FFF2-40B4-BE49-F238E27FC236}">
+                <a16:creationId xmlns:a16="http://schemas.microsoft.com/office/drawing/2014/main" id="{61265EE5-F275-52D6-7BC4-D841F2B382BE}"/>
+              </a:ext>
+            </a:extLst>
+          </p:cNvPr>
+          <p:cNvSpPr txBox="1"/>
+          <p:nvPr/>
+        </p:nvSpPr>
+        <p:spPr>
+          <a:xfrm>
+            <a:off x="4338636" y="4838700"/>
+            <a:ext cx="1147764" cy="246221"/>
+          </a:xfrm>
+          <a:prstGeom prst="rect">
+            <a:avLst/>
+          </a:prstGeom>
+          <a:noFill/>
+        </p:spPr>
+        <p:txBody>
+          <a:bodyPr wrap="square" rtlCol="0">
+            <a:spAutoFit/>
+          </a:bodyPr>
+          <a:lstStyle/>
+          <a:p>
+            <a:r>
+              <a:rPr lang="de-DE" sz="1000" dirty="0">
+                <a:solidFill>
+                  <a:schemeClr val="dk1"/>
+                </a:solidFill>
+                <a:latin typeface="cmss12" panose="020B0500000000000000" pitchFamily="34" charset="0"/>
+                <a:cs typeface="Arial" panose="020B0604020202020204" pitchFamily="34" charset="0"/>
+              </a:rPr>
+              <a:t>Trade Size  Rule</a:t>
+            </a:r>
+            <a:endParaRPr lang="en-GB" sz="1000" dirty="0">
+              <a:solidFill>
+                <a:schemeClr val="dk1"/>
+              </a:solidFill>
+              <a:latin typeface="cmss12" panose="020B0500000000000000" pitchFamily="34" charset="0"/>
+              <a:cs typeface="Arial" panose="020B0604020202020204" pitchFamily="34" charset="0"/>
+            </a:endParaRPr>
+          </a:p>
+        </p:txBody>
+      </p:sp>
+      <p:cxnSp>
+        <p:nvCxnSpPr>
+          <p:cNvPr id="159" name="Straight Arrow Connector 158">
+            <a:extLst>
+              <a:ext uri="{FF2B5EF4-FFF2-40B4-BE49-F238E27FC236}">
+                <a16:creationId xmlns:a16="http://schemas.microsoft.com/office/drawing/2014/main" id="{EB9B2D69-69C8-CB4C-9149-FF72DBF99D22}"/>
+              </a:ext>
+            </a:extLst>
+          </p:cNvPr>
+          <p:cNvCxnSpPr>
+            <a:cxnSpLocks/>
+          </p:cNvCxnSpPr>
+          <p:nvPr/>
+        </p:nvCxnSpPr>
+        <p:spPr>
+          <a:xfrm>
+            <a:off x="3221830" y="4198144"/>
+            <a:ext cx="1108869" cy="678656"/>
+          </a:xfrm>
+          <a:prstGeom prst="straightConnector1">
+            <a:avLst/>
+          </a:prstGeom>
+          <a:ln>
+            <a:tailEnd type="triangle"/>
+          </a:ln>
+        </p:spPr>
+        <p:style>
+          <a:lnRef idx="1">
+            <a:schemeClr val="dk1"/>
+          </a:lnRef>
+          <a:fillRef idx="0">
+            <a:schemeClr val="dk1"/>
+          </a:fillRef>
+          <a:effectRef idx="0">
+            <a:schemeClr val="dk1"/>
+          </a:effectRef>
+          <a:fontRef idx="minor">
+            <a:schemeClr val="tx1"/>
+          </a:fontRef>
+        </p:style>
+      </p:cxnSp>
+      <p:cxnSp>
+        <p:nvCxnSpPr>
+          <p:cNvPr id="167" name="Straight Arrow Connector 166">
+            <a:extLst>
+              <a:ext uri="{FF2B5EF4-FFF2-40B4-BE49-F238E27FC236}">
+                <a16:creationId xmlns:a16="http://schemas.microsoft.com/office/drawing/2014/main" id="{E90D09B3-79AF-E131-D355-6B05FB8BCB94}"/>
+              </a:ext>
+            </a:extLst>
+          </p:cNvPr>
+          <p:cNvCxnSpPr>
+            <a:cxnSpLocks/>
+          </p:cNvCxnSpPr>
+          <p:nvPr/>
+        </p:nvCxnSpPr>
+        <p:spPr>
+          <a:xfrm flipV="1">
+            <a:off x="3214688" y="2893219"/>
+            <a:ext cx="0" cy="1312069"/>
+          </a:xfrm>
+          <a:prstGeom prst="straightConnector1">
+            <a:avLst/>
+          </a:prstGeom>
+          <a:ln>
+            <a:tailEnd type="triangle"/>
+          </a:ln>
+        </p:spPr>
+        <p:style>
+          <a:lnRef idx="1">
+            <a:schemeClr val="dk1"/>
+          </a:lnRef>
+          <a:fillRef idx="0">
+            <a:schemeClr val="dk1"/>
+          </a:fillRef>
+          <a:effectRef idx="0">
+            <a:schemeClr val="dk1"/>
+          </a:effectRef>
+          <a:fontRef idx="minor">
+            <a:schemeClr val="tx1"/>
+          </a:fontRef>
+        </p:style>
+      </p:cxnSp>
+      <p:cxnSp>
+        <p:nvCxnSpPr>
+          <p:cNvPr id="179" name="Straight Connector 178">
+            <a:extLst>
+              <a:ext uri="{FF2B5EF4-FFF2-40B4-BE49-F238E27FC236}">
+                <a16:creationId xmlns:a16="http://schemas.microsoft.com/office/drawing/2014/main" id="{F2170481-CF30-3739-DB64-AD809DCA32F2}"/>
+              </a:ext>
+            </a:extLst>
+          </p:cNvPr>
+          <p:cNvCxnSpPr>
+            <a:cxnSpLocks/>
+          </p:cNvCxnSpPr>
+          <p:nvPr/>
+        </p:nvCxnSpPr>
+        <p:spPr>
+          <a:xfrm flipH="1">
+            <a:off x="4321175" y="4248150"/>
+            <a:ext cx="1165225" cy="625475"/>
+          </a:xfrm>
+          <a:prstGeom prst="line">
+            <a:avLst/>
+          </a:prstGeom>
+          <a:ln>
+            <a:prstDash val="sysDot"/>
+          </a:ln>
+        </p:spPr>
+        <p:style>
+          <a:lnRef idx="1">
+            <a:schemeClr val="accent3"/>
+          </a:lnRef>
+          <a:fillRef idx="0">
+            <a:schemeClr val="accent3"/>
+          </a:fillRef>
+          <a:effectRef idx="0">
+            <a:schemeClr val="accent3"/>
+          </a:effectRef>
+          <a:fontRef idx="minor">
+            <a:schemeClr val="tx1"/>
+          </a:fontRef>
+        </p:style>
+      </p:cxnSp>
+      <p:cxnSp>
+        <p:nvCxnSpPr>
+          <p:cNvPr id="202" name="Straight Connector 201">
+            <a:extLst>
+              <a:ext uri="{FF2B5EF4-FFF2-40B4-BE49-F238E27FC236}">
+                <a16:creationId xmlns:a16="http://schemas.microsoft.com/office/drawing/2014/main" id="{461F8D24-43A6-0ADE-B70C-EB21ED697FA2}"/>
+              </a:ext>
+            </a:extLst>
+          </p:cNvPr>
+          <p:cNvCxnSpPr>
+            <a:cxnSpLocks/>
+          </p:cNvCxnSpPr>
+          <p:nvPr/>
+        </p:nvCxnSpPr>
+        <p:spPr>
+          <a:xfrm flipH="1">
+            <a:off x="4312444" y="2930525"/>
+            <a:ext cx="1173956" cy="619919"/>
+          </a:xfrm>
+          <a:prstGeom prst="line">
+            <a:avLst/>
+          </a:prstGeom>
+          <a:ln/>
+        </p:spPr>
+        <p:style>
+          <a:lnRef idx="1">
+            <a:schemeClr val="dk1"/>
+          </a:lnRef>
+          <a:fillRef idx="0">
+            <a:schemeClr val="dk1"/>
+          </a:fillRef>
+          <a:effectRef idx="0">
+            <a:schemeClr val="dk1"/>
+          </a:effectRef>
+          <a:fontRef idx="minor">
+            <a:schemeClr val="tx1"/>
+          </a:fontRef>
+        </p:style>
+      </p:cxnSp>
+      <p:cxnSp>
+        <p:nvCxnSpPr>
+          <p:cNvPr id="206" name="Straight Connector 205">
+            <a:extLst>
+              <a:ext uri="{FF2B5EF4-FFF2-40B4-BE49-F238E27FC236}">
+                <a16:creationId xmlns:a16="http://schemas.microsoft.com/office/drawing/2014/main" id="{763C3EF5-5ED4-0D5A-8E11-1FC0EB8772D9}"/>
+              </a:ext>
+            </a:extLst>
+          </p:cNvPr>
+          <p:cNvCxnSpPr>
+            <a:cxnSpLocks/>
+          </p:cNvCxnSpPr>
+          <p:nvPr/>
+        </p:nvCxnSpPr>
+        <p:spPr>
+          <a:xfrm>
+            <a:off x="3224213" y="2893219"/>
+            <a:ext cx="1090612" cy="657225"/>
+          </a:xfrm>
+          <a:prstGeom prst="line">
+            <a:avLst/>
+          </a:prstGeom>
+          <a:ln/>
+        </p:spPr>
+        <p:style>
+          <a:lnRef idx="1">
+            <a:schemeClr val="dk1"/>
+          </a:lnRef>
+          <a:fillRef idx="0">
+            <a:schemeClr val="dk1"/>
+          </a:fillRef>
+          <a:effectRef idx="0">
+            <a:schemeClr val="dk1"/>
+          </a:effectRef>
+          <a:fontRef idx="minor">
+            <a:schemeClr val="tx1"/>
+          </a:fontRef>
+        </p:style>
+      </p:cxnSp>
+      <p:cxnSp>
+        <p:nvCxnSpPr>
+          <p:cNvPr id="163" name="Straight Arrow Connector 162">
+            <a:extLst>
+              <a:ext uri="{FF2B5EF4-FFF2-40B4-BE49-F238E27FC236}">
+                <a16:creationId xmlns:a16="http://schemas.microsoft.com/office/drawing/2014/main" id="{67BBCCFA-0862-B48C-B521-C14D39C6C5BB}"/>
+              </a:ext>
+            </a:extLst>
+          </p:cNvPr>
+          <p:cNvCxnSpPr>
+            <a:cxnSpLocks/>
+          </p:cNvCxnSpPr>
+          <p:nvPr/>
+        </p:nvCxnSpPr>
+        <p:spPr>
+          <a:xfrm flipV="1">
+            <a:off x="4332288" y="4235450"/>
+            <a:ext cx="1176337" cy="638175"/>
+          </a:xfrm>
+          <a:prstGeom prst="straightConnector1">
+            <a:avLst/>
+          </a:prstGeom>
+          <a:ln>
+            <a:tailEnd type="triangle"/>
+          </a:ln>
+        </p:spPr>
+        <p:style>
+          <a:lnRef idx="1">
+            <a:schemeClr val="dk1"/>
+          </a:lnRef>
+          <a:fillRef idx="0">
+            <a:schemeClr val="dk1"/>
+          </a:fillRef>
+          <a:effectRef idx="0">
+            <a:schemeClr val="dk1"/>
+          </a:effectRef>
+          <a:fontRef idx="minor">
+            <a:schemeClr val="tx1"/>
+          </a:fontRef>
+        </p:style>
+      </p:cxnSp>
+      <p:cxnSp>
+        <p:nvCxnSpPr>
+          <p:cNvPr id="187" name="Straight Connector 186">
+            <a:extLst>
+              <a:ext uri="{FF2B5EF4-FFF2-40B4-BE49-F238E27FC236}">
+                <a16:creationId xmlns:a16="http://schemas.microsoft.com/office/drawing/2014/main" id="{12B2A41C-5CE8-D5B0-3CC6-CACF10E38335}"/>
+              </a:ext>
+            </a:extLst>
+          </p:cNvPr>
+          <p:cNvCxnSpPr>
+            <a:cxnSpLocks/>
+          </p:cNvCxnSpPr>
+          <p:nvPr/>
+        </p:nvCxnSpPr>
+        <p:spPr>
+          <a:xfrm flipV="1">
+            <a:off x="3236119" y="4042859"/>
+            <a:ext cx="1913823" cy="276729"/>
+          </a:xfrm>
+          <a:prstGeom prst="line">
+            <a:avLst/>
+          </a:prstGeom>
+          <a:ln>
+            <a:solidFill>
+              <a:schemeClr val="tx1"/>
+            </a:solidFill>
+            <a:tailEnd type="triangle"/>
+          </a:ln>
+        </p:spPr>
+        <p:style>
+          <a:lnRef idx="1">
+            <a:schemeClr val="dk1"/>
+          </a:lnRef>
+          <a:fillRef idx="0">
+            <a:schemeClr val="dk1"/>
+          </a:fillRef>
+          <a:effectRef idx="0">
+            <a:schemeClr val="dk1"/>
+          </a:effectRef>
+          <a:fontRef idx="minor">
+            <a:schemeClr val="tx1"/>
+          </a:fontRef>
+        </p:style>
+      </p:cxnSp>
+      <p:sp>
+        <p:nvSpPr>
+          <p:cNvPr id="216" name="TextBox 215">
+            <a:extLst>
+              <a:ext uri="{FF2B5EF4-FFF2-40B4-BE49-F238E27FC236}">
+                <a16:creationId xmlns:a16="http://schemas.microsoft.com/office/drawing/2014/main" id="{DA2E687C-6A9B-145A-2B2E-807A0E3660D8}"/>
+              </a:ext>
+            </a:extLst>
+          </p:cNvPr>
+          <p:cNvSpPr txBox="1"/>
+          <p:nvPr/>
+        </p:nvSpPr>
+        <p:spPr>
+          <a:xfrm>
+            <a:off x="5229225" y="2219720"/>
+            <a:ext cx="168725" cy="249637"/>
+          </a:xfrm>
+          <a:prstGeom prst="rect">
+            <a:avLst/>
+          </a:prstGeom>
+          <a:noFill/>
+        </p:spPr>
+        <p:txBody>
+          <a:bodyPr wrap="square" rtlCol="0">
+            <a:spAutoFit/>
+          </a:bodyPr>
+          <a:lstStyle/>
+          <a:p>
+            <a:r>
+              <a:rPr lang="de-DE" sz="1000" dirty="0">
+                <a:solidFill>
+                  <a:schemeClr val="bg2">
+                    <a:lumMod val="50000"/>
+                  </a:schemeClr>
+                </a:solidFill>
+                <a:latin typeface="cmss12" panose="020B0500000000000000" pitchFamily="34" charset="0"/>
+                <a:cs typeface="Arial" panose="020B0604020202020204" pitchFamily="34" charset="0"/>
+              </a:rPr>
+              <a:t>x</a:t>
+            </a:r>
+            <a:endParaRPr lang="en-GB" sz="1000" dirty="0">
+              <a:solidFill>
+                <a:schemeClr val="bg2">
+                  <a:lumMod val="50000"/>
+                </a:schemeClr>
+              </a:solidFill>
+              <a:latin typeface="cmss12" panose="020B0500000000000000" pitchFamily="34" charset="0"/>
+              <a:cs typeface="Arial" panose="020B0604020202020204" pitchFamily="34" charset="0"/>
+            </a:endParaRPr>
+          </a:p>
+        </p:txBody>
+      </p:sp>
+      <p:sp>
+        <p:nvSpPr>
+          <p:cNvPr id="217" name="TextBox 216">
+            <a:extLst>
+              <a:ext uri="{FF2B5EF4-FFF2-40B4-BE49-F238E27FC236}">
+                <a16:creationId xmlns:a16="http://schemas.microsoft.com/office/drawing/2014/main" id="{7CE10BE5-7DBD-5A3F-A8EA-F01F02D3E14F}"/>
+              </a:ext>
+            </a:extLst>
+          </p:cNvPr>
+          <p:cNvSpPr txBox="1"/>
+          <p:nvPr/>
+        </p:nvSpPr>
+        <p:spPr>
+          <a:xfrm rot="857354">
+            <a:off x="6370658" y="2010169"/>
+            <a:ext cx="172673" cy="246221"/>
+          </a:xfrm>
+          <a:prstGeom prst="rect">
+            <a:avLst/>
+          </a:prstGeom>
+          <a:noFill/>
+        </p:spPr>
+        <p:txBody>
+          <a:bodyPr wrap="square" rtlCol="0">
+            <a:spAutoFit/>
+          </a:bodyPr>
+          <a:lstStyle/>
+          <a:p>
+            <a:r>
+              <a:rPr lang="de-DE" sz="1000" dirty="0">
+                <a:solidFill>
+                  <a:schemeClr val="accent3">
+                    <a:lumMod val="50000"/>
+                  </a:schemeClr>
+                </a:solidFill>
+                <a:latin typeface="cmss12" panose="020B0500000000000000" pitchFamily="34" charset="0"/>
+                <a:cs typeface="Arial" panose="020B0604020202020204" pitchFamily="34" charset="0"/>
+              </a:rPr>
+              <a:t>x</a:t>
+            </a:r>
+            <a:endParaRPr lang="en-GB" sz="1000" dirty="0">
+              <a:solidFill>
+                <a:schemeClr val="accent3">
+                  <a:lumMod val="50000"/>
+                </a:schemeClr>
+              </a:solidFill>
+              <a:latin typeface="cmss12" panose="020B0500000000000000" pitchFamily="34" charset="0"/>
+              <a:cs typeface="Arial" panose="020B0604020202020204" pitchFamily="34" charset="0"/>
+            </a:endParaRPr>
+          </a:p>
+        </p:txBody>
+      </p:sp>
+      <p:cxnSp>
+        <p:nvCxnSpPr>
+          <p:cNvPr id="117" name="Straight Connector 116">
+            <a:extLst>
+              <a:ext uri="{FF2B5EF4-FFF2-40B4-BE49-F238E27FC236}">
+                <a16:creationId xmlns:a16="http://schemas.microsoft.com/office/drawing/2014/main" id="{01C43FA3-13F3-D2E7-53BD-C3F3DD277BDA}"/>
+              </a:ext>
+            </a:extLst>
+          </p:cNvPr>
+          <p:cNvCxnSpPr>
+            <a:cxnSpLocks/>
+          </p:cNvCxnSpPr>
+          <p:nvPr/>
+        </p:nvCxnSpPr>
+        <p:spPr>
+          <a:xfrm flipV="1">
+            <a:off x="5343525" y="2148940"/>
+            <a:ext cx="1141818" cy="200560"/>
+          </a:xfrm>
+          <a:prstGeom prst="line">
+            <a:avLst/>
+          </a:prstGeom>
+          <a:ln w="12700">
+            <a:prstDash val="dash"/>
+            <a:tailEnd type="triangle"/>
+          </a:ln>
+        </p:spPr>
+        <p:style>
+          <a:lnRef idx="1">
+            <a:schemeClr val="accent3"/>
+          </a:lnRef>
+          <a:fillRef idx="0">
+            <a:schemeClr val="accent3"/>
+          </a:fillRef>
+          <a:effectRef idx="0">
+            <a:schemeClr val="accent3"/>
+          </a:effectRef>
+          <a:fontRef idx="minor">
+            <a:schemeClr val="tx1"/>
+          </a:fontRef>
+        </p:style>
+      </p:cxnSp>
+      <p:sp>
+        <p:nvSpPr>
+          <p:cNvPr id="218" name="TextBox 217">
+            <a:extLst>
+              <a:ext uri="{FF2B5EF4-FFF2-40B4-BE49-F238E27FC236}">
+                <a16:creationId xmlns:a16="http://schemas.microsoft.com/office/drawing/2014/main" id="{31FFF19A-7F9E-ABE6-7E28-2ADB75642A28}"/>
+              </a:ext>
+            </a:extLst>
+          </p:cNvPr>
+          <p:cNvSpPr txBox="1"/>
+          <p:nvPr/>
+        </p:nvSpPr>
+        <p:spPr>
+          <a:xfrm rot="857354">
+            <a:off x="5032395" y="3910408"/>
+            <a:ext cx="172673" cy="246221"/>
+          </a:xfrm>
+          <a:prstGeom prst="rect">
+            <a:avLst/>
+          </a:prstGeom>
+          <a:noFill/>
+        </p:spPr>
+        <p:txBody>
+          <a:bodyPr wrap="square" rtlCol="0">
+            <a:spAutoFit/>
+          </a:bodyPr>
+          <a:lstStyle/>
+          <a:p>
+            <a:r>
+              <a:rPr lang="de-DE" sz="1000" dirty="0">
+                <a:solidFill>
+                  <a:srgbClr val="FF0000"/>
+                </a:solidFill>
+                <a:latin typeface="cmss12" panose="020B0500000000000000" pitchFamily="34" charset="0"/>
+                <a:cs typeface="Arial" panose="020B0604020202020204" pitchFamily="34" charset="0"/>
+              </a:rPr>
+              <a:t>x</a:t>
+            </a:r>
+            <a:endParaRPr lang="en-GB" sz="1000" dirty="0">
+              <a:solidFill>
+                <a:srgbClr val="FF0000"/>
+              </a:solidFill>
+              <a:latin typeface="cmss12" panose="020B0500000000000000" pitchFamily="34" charset="0"/>
+              <a:cs typeface="Arial" panose="020B0604020202020204" pitchFamily="34" charset="0"/>
+            </a:endParaRPr>
+          </a:p>
+        </p:txBody>
+      </p:sp>
+      <p:sp>
+        <p:nvSpPr>
+          <p:cNvPr id="226" name="TextBox 225">
+            <a:extLst>
+              <a:ext uri="{FF2B5EF4-FFF2-40B4-BE49-F238E27FC236}">
+                <a16:creationId xmlns:a16="http://schemas.microsoft.com/office/drawing/2014/main" id="{25EA19D8-7F68-1FAA-616B-6168A7030EFF}"/>
+              </a:ext>
+            </a:extLst>
+          </p:cNvPr>
+          <p:cNvSpPr txBox="1"/>
+          <p:nvPr/>
+        </p:nvSpPr>
+        <p:spPr>
+          <a:xfrm>
+            <a:off x="2874961" y="3571875"/>
+            <a:ext cx="306389" cy="215444"/>
+          </a:xfrm>
+          <a:prstGeom prst="rect">
+            <a:avLst/>
+          </a:prstGeom>
+          <a:noFill/>
+        </p:spPr>
+        <p:txBody>
+          <a:bodyPr wrap="square" rtlCol="0">
+            <a:spAutoFit/>
+          </a:bodyPr>
+          <a:lstStyle/>
+          <a:p>
+            <a:r>
+              <a:rPr lang="de-DE" sz="800" dirty="0">
+                <a:solidFill>
+                  <a:schemeClr val="dk1"/>
+                </a:solidFill>
+                <a:latin typeface="cmss12" panose="020B0500000000000000" pitchFamily="34" charset="0"/>
+                <a:cs typeface="Arial" panose="020B0604020202020204" pitchFamily="34" charset="0"/>
+              </a:rPr>
+              <a:t>a~</a:t>
+            </a:r>
+            <a:endParaRPr lang="en-GB" sz="800" dirty="0">
+              <a:solidFill>
+                <a:schemeClr val="dk1"/>
+              </a:solidFill>
+              <a:latin typeface="cmss12" panose="020B0500000000000000" pitchFamily="34" charset="0"/>
+              <a:cs typeface="Arial" panose="020B0604020202020204" pitchFamily="34" charset="0"/>
+            </a:endParaRPr>
+          </a:p>
+        </p:txBody>
+      </p:sp>
+      <p:sp>
+        <p:nvSpPr>
+          <p:cNvPr id="227" name="TextBox 226">
+            <a:extLst>
+              <a:ext uri="{FF2B5EF4-FFF2-40B4-BE49-F238E27FC236}">
+                <a16:creationId xmlns:a16="http://schemas.microsoft.com/office/drawing/2014/main" id="{99A206CD-141B-B9D3-D0BF-5CB722B479DC}"/>
+              </a:ext>
+            </a:extLst>
+          </p:cNvPr>
+          <p:cNvSpPr txBox="1"/>
+          <p:nvPr/>
+        </p:nvSpPr>
+        <p:spPr>
+          <a:xfrm>
+            <a:off x="3446461" y="4486275"/>
+            <a:ext cx="306389" cy="215444"/>
+          </a:xfrm>
+          <a:prstGeom prst="rect">
+            <a:avLst/>
+          </a:prstGeom>
+          <a:noFill/>
+        </p:spPr>
+        <p:txBody>
+          <a:bodyPr wrap="square" rtlCol="0">
+            <a:spAutoFit/>
+          </a:bodyPr>
+          <a:lstStyle/>
+          <a:p>
+            <a:r>
+              <a:rPr lang="de-DE" sz="800" dirty="0">
+                <a:solidFill>
+                  <a:schemeClr val="dk1"/>
+                </a:solidFill>
+                <a:latin typeface="cmss12" panose="020B0500000000000000" pitchFamily="34" charset="0"/>
+                <a:cs typeface="Arial" panose="020B0604020202020204" pitchFamily="34" charset="0"/>
+              </a:rPr>
+              <a:t>p~</a:t>
+            </a:r>
+            <a:endParaRPr lang="en-GB" sz="800" dirty="0">
+              <a:solidFill>
+                <a:schemeClr val="dk1"/>
+              </a:solidFill>
+              <a:latin typeface="cmss12" panose="020B0500000000000000" pitchFamily="34" charset="0"/>
+              <a:cs typeface="Arial" panose="020B0604020202020204" pitchFamily="34" charset="0"/>
+            </a:endParaRPr>
+          </a:p>
+        </p:txBody>
+      </p:sp>
+      <p:sp>
+        <p:nvSpPr>
+          <p:cNvPr id="228" name="TextBox 227">
+            <a:extLst>
+              <a:ext uri="{FF2B5EF4-FFF2-40B4-BE49-F238E27FC236}">
+                <a16:creationId xmlns:a16="http://schemas.microsoft.com/office/drawing/2014/main" id="{5876D75B-D1A8-84D9-B8E5-DA939986585D}"/>
+              </a:ext>
+            </a:extLst>
+          </p:cNvPr>
+          <p:cNvSpPr txBox="1"/>
+          <p:nvPr/>
+        </p:nvSpPr>
+        <p:spPr>
+          <a:xfrm>
+            <a:off x="3817936" y="3806825"/>
+            <a:ext cx="306389" cy="215444"/>
+          </a:xfrm>
+          <a:prstGeom prst="rect">
+            <a:avLst/>
+          </a:prstGeom>
+          <a:noFill/>
+        </p:spPr>
+        <p:txBody>
+          <a:bodyPr wrap="square" rtlCol="0">
+            <a:spAutoFit/>
+          </a:bodyPr>
+          <a:lstStyle/>
+          <a:p>
+            <a:r>
+              <a:rPr lang="de-DE" sz="800" dirty="0">
+                <a:solidFill>
+                  <a:schemeClr val="dk1"/>
+                </a:solidFill>
+                <a:latin typeface="cmss12" panose="020B0500000000000000" pitchFamily="34" charset="0"/>
+                <a:cs typeface="Arial" panose="020B0604020202020204" pitchFamily="34" charset="0"/>
+              </a:rPr>
+              <a:t>b~</a:t>
+            </a:r>
+            <a:endParaRPr lang="en-GB" sz="800" dirty="0">
+              <a:solidFill>
+                <a:schemeClr val="dk1"/>
+              </a:solidFill>
+              <a:latin typeface="cmss12" panose="020B0500000000000000" pitchFamily="34" charset="0"/>
+              <a:cs typeface="Arial" panose="020B0604020202020204" pitchFamily="34" charset="0"/>
+            </a:endParaRPr>
+          </a:p>
+        </p:txBody>
+      </p:sp>
+      <p:sp>
+        <p:nvSpPr>
+          <p:cNvPr id="229" name="TextBox 228">
+            <a:extLst>
+              <a:ext uri="{FF2B5EF4-FFF2-40B4-BE49-F238E27FC236}">
+                <a16:creationId xmlns:a16="http://schemas.microsoft.com/office/drawing/2014/main" id="{98625714-F596-9AB6-ACB3-FB2839764AB3}"/>
+              </a:ext>
+            </a:extLst>
+          </p:cNvPr>
+          <p:cNvSpPr txBox="1"/>
+          <p:nvPr/>
+        </p:nvSpPr>
+        <p:spPr>
+          <a:xfrm>
+            <a:off x="4887911" y="2149475"/>
+            <a:ext cx="306389" cy="215444"/>
+          </a:xfrm>
+          <a:prstGeom prst="rect">
+            <a:avLst/>
+          </a:prstGeom>
+          <a:noFill/>
+        </p:spPr>
+        <p:txBody>
+          <a:bodyPr wrap="square" rtlCol="0">
+            <a:spAutoFit/>
+          </a:bodyPr>
+          <a:lstStyle/>
+          <a:p>
+            <a:r>
+              <a:rPr lang="de-DE" sz="800" dirty="0">
+                <a:solidFill>
+                  <a:schemeClr val="dk1"/>
+                </a:solidFill>
+                <a:latin typeface="cmss12" panose="020B0500000000000000" pitchFamily="34" charset="0"/>
+                <a:cs typeface="Arial" panose="020B0604020202020204" pitchFamily="34" charset="0"/>
+              </a:rPr>
+              <a:t>p</a:t>
+            </a:r>
+            <a:endParaRPr lang="en-GB" sz="800" dirty="0">
+              <a:solidFill>
+                <a:schemeClr val="dk1"/>
+              </a:solidFill>
+              <a:latin typeface="cmss12" panose="020B0500000000000000" pitchFamily="34" charset="0"/>
+              <a:cs typeface="Arial" panose="020B0604020202020204" pitchFamily="34" charset="0"/>
+            </a:endParaRPr>
+          </a:p>
+        </p:txBody>
+      </p:sp>
+      <p:sp>
+        <p:nvSpPr>
+          <p:cNvPr id="230" name="TextBox 229">
+            <a:extLst>
+              <a:ext uri="{FF2B5EF4-FFF2-40B4-BE49-F238E27FC236}">
+                <a16:creationId xmlns:a16="http://schemas.microsoft.com/office/drawing/2014/main" id="{4D2D15A0-7DC9-B759-B9E0-032236ED11A0}"/>
+              </a:ext>
+            </a:extLst>
+          </p:cNvPr>
+          <p:cNvSpPr txBox="1"/>
+          <p:nvPr/>
+        </p:nvSpPr>
+        <p:spPr>
+          <a:xfrm>
+            <a:off x="5586411" y="3482975"/>
+            <a:ext cx="306389" cy="215444"/>
+          </a:xfrm>
+          <a:prstGeom prst="rect">
+            <a:avLst/>
+          </a:prstGeom>
+          <a:noFill/>
+        </p:spPr>
+        <p:txBody>
+          <a:bodyPr wrap="square" rtlCol="0">
+            <a:spAutoFit/>
+          </a:bodyPr>
+          <a:lstStyle/>
+          <a:p>
+            <a:r>
+              <a:rPr lang="de-DE" sz="800" dirty="0">
+                <a:solidFill>
+                  <a:schemeClr val="dk1"/>
+                </a:solidFill>
+                <a:latin typeface="cmss12" panose="020B0500000000000000" pitchFamily="34" charset="0"/>
+                <a:cs typeface="Arial" panose="020B0604020202020204" pitchFamily="34" charset="0"/>
+              </a:rPr>
+              <a:t>m</a:t>
+            </a:r>
+            <a:endParaRPr lang="en-GB" sz="800" dirty="0">
+              <a:solidFill>
+                <a:schemeClr val="dk1"/>
+              </a:solidFill>
+              <a:latin typeface="cmss12" panose="020B0500000000000000" pitchFamily="34" charset="0"/>
+              <a:cs typeface="Arial" panose="020B0604020202020204" pitchFamily="34" charset="0"/>
+            </a:endParaRPr>
+          </a:p>
+        </p:txBody>
+      </p:sp>
+      <p:sp>
+        <p:nvSpPr>
+          <p:cNvPr id="231" name="TextBox 230">
+            <a:extLst>
+              <a:ext uri="{FF2B5EF4-FFF2-40B4-BE49-F238E27FC236}">
+                <a16:creationId xmlns:a16="http://schemas.microsoft.com/office/drawing/2014/main" id="{BBA4559E-272C-9C88-5331-377F0DBFAD39}"/>
+              </a:ext>
+            </a:extLst>
+          </p:cNvPr>
+          <p:cNvSpPr txBox="1"/>
+          <p:nvPr/>
+        </p:nvSpPr>
+        <p:spPr>
+          <a:xfrm>
+            <a:off x="6481761" y="3057525"/>
+            <a:ext cx="306389" cy="215444"/>
+          </a:xfrm>
+          <a:prstGeom prst="rect">
+            <a:avLst/>
+          </a:prstGeom>
+          <a:noFill/>
+        </p:spPr>
+        <p:txBody>
+          <a:bodyPr wrap="square" rtlCol="0">
+            <a:spAutoFit/>
+          </a:bodyPr>
+          <a:lstStyle/>
+          <a:p>
+            <a:r>
+              <a:rPr lang="de-DE" sz="800" dirty="0">
+                <a:solidFill>
+                  <a:schemeClr val="dk1"/>
+                </a:solidFill>
+                <a:latin typeface="cmss12" panose="020B0500000000000000" pitchFamily="34" charset="0"/>
+                <a:cs typeface="Arial" panose="020B0604020202020204" pitchFamily="34" charset="0"/>
+              </a:rPr>
+              <a:t>p</a:t>
+            </a:r>
+            <a:endParaRPr lang="en-GB" sz="800" dirty="0">
+              <a:solidFill>
+                <a:schemeClr val="dk1"/>
+              </a:solidFill>
+              <a:latin typeface="cmss12" panose="020B0500000000000000" pitchFamily="34" charset="0"/>
+              <a:cs typeface="Arial" panose="020B0604020202020204" pitchFamily="34" charset="0"/>
+            </a:endParaRPr>
+          </a:p>
+        </p:txBody>
+      </p:sp>
+      <p:sp>
+        <p:nvSpPr>
+          <p:cNvPr id="232" name="TextBox 231">
+            <a:extLst>
+              <a:ext uri="{FF2B5EF4-FFF2-40B4-BE49-F238E27FC236}">
+                <a16:creationId xmlns:a16="http://schemas.microsoft.com/office/drawing/2014/main" id="{CB6FA8C0-5E68-D647-7090-9392F2FE449D}"/>
+              </a:ext>
+            </a:extLst>
+          </p:cNvPr>
+          <p:cNvSpPr txBox="1"/>
+          <p:nvPr/>
+        </p:nvSpPr>
+        <p:spPr>
+          <a:xfrm>
+            <a:off x="5575301" y="1476375"/>
+            <a:ext cx="527049" cy="215444"/>
+          </a:xfrm>
+          <a:prstGeom prst="rect">
+            <a:avLst/>
+          </a:prstGeom>
+          <a:noFill/>
+        </p:spPr>
+        <p:txBody>
+          <a:bodyPr wrap="square" rtlCol="0">
+            <a:spAutoFit/>
+          </a:bodyPr>
+          <a:lstStyle/>
+          <a:p>
+            <a:r>
+              <a:rPr lang="de-DE" sz="800" dirty="0">
+                <a:solidFill>
+                  <a:schemeClr val="dk1"/>
+                </a:solidFill>
+                <a:latin typeface="cmss12" panose="020B0500000000000000" pitchFamily="34" charset="0"/>
+                <a:cs typeface="Arial" panose="020B0604020202020204" pitchFamily="34" charset="0"/>
+              </a:rPr>
+              <a:t>p (</a:t>
+            </a:r>
+            <a:r>
+              <a:rPr lang="de-DE" sz="800" dirty="0" err="1">
+                <a:solidFill>
+                  <a:schemeClr val="dk1"/>
+                </a:solidFill>
+                <a:latin typeface="cmss12" panose="020B0500000000000000" pitchFamily="34" charset="0"/>
+                <a:cs typeface="Arial" panose="020B0604020202020204" pitchFamily="34" charset="0"/>
+              </a:rPr>
+              <a:t>prev</a:t>
+            </a:r>
+            <a:r>
+              <a:rPr lang="de-DE" sz="800" dirty="0">
+                <a:solidFill>
+                  <a:schemeClr val="dk1"/>
+                </a:solidFill>
+                <a:latin typeface="cmss12" panose="020B0500000000000000" pitchFamily="34" charset="0"/>
+                <a:cs typeface="Arial" panose="020B0604020202020204" pitchFamily="34" charset="0"/>
+              </a:rPr>
+              <a:t>)</a:t>
+            </a:r>
+            <a:endParaRPr lang="en-GB" sz="800" dirty="0">
+              <a:solidFill>
+                <a:schemeClr val="dk1"/>
+              </a:solidFill>
+              <a:latin typeface="cmss12" panose="020B0500000000000000" pitchFamily="34" charset="0"/>
+              <a:cs typeface="Arial" panose="020B0604020202020204" pitchFamily="34" charset="0"/>
+            </a:endParaRPr>
+          </a:p>
+        </p:txBody>
+      </p:sp>
+    </p:spTree>
+    <p:extLst>
+      <p:ext uri="{BB962C8B-B14F-4D97-AF65-F5344CB8AC3E}">
+        <p14:creationId xmlns:p14="http://schemas.microsoft.com/office/powerpoint/2010/main" val="2880998982"/>
+      </p:ext>
+    </p:extLst>
+  </p:cSld>
+  <p:clrMapOvr>
+    <a:masterClrMapping/>
+  </p:clrMapOvr>
+</p:sld>
+</file>
+
+<file path=ppt/slides/slide6.xml><?xml version="1.0" encoding="utf-8"?>
 <p:sld xmlns:a="http://schemas.openxmlformats.org/drawingml/2006/main" xmlns:r="http://schemas.openxmlformats.org/officeDocument/2006/relationships" xmlns:p="http://schemas.openxmlformats.org/presentationml/2006/main">
   <p:cSld>
     <p:spTree>
@@ -20800,7 +23889,7 @@
 </p:sld>
 </file>
 
-<file path=ppt/slides/slide6.xml><?xml version="1.0" encoding="utf-8"?>
+<file path=ppt/slides/slide7.xml><?xml version="1.0" encoding="utf-8"?>
 <p:sld xmlns:a="http://schemas.openxmlformats.org/drawingml/2006/main" xmlns:r="http://schemas.openxmlformats.org/officeDocument/2006/relationships" xmlns:p="http://schemas.openxmlformats.org/presentationml/2006/main">
   <p:cSld>
     <p:spTree>
@@ -22379,7 +25468,7 @@
 </p:sld>
 </file>
 
-<file path=ppt/slides/slide7.xml><?xml version="1.0" encoding="utf-8"?>
+<file path=ppt/slides/slide8.xml><?xml version="1.0" encoding="utf-8"?>
 <p:sld xmlns:a="http://schemas.openxmlformats.org/drawingml/2006/main" xmlns:r="http://schemas.openxmlformats.org/officeDocument/2006/relationships" xmlns:p="http://schemas.openxmlformats.org/presentationml/2006/main">
   <p:cSld>
     <p:spTree>
@@ -22489,7 +25578,7 @@
 </p:sld>
 </file>
 
-<file path=ppt/slides/slide8.xml><?xml version="1.0" encoding="utf-8"?>
+<file path=ppt/slides/slide9.xml><?xml version="1.0" encoding="utf-8"?>
 <p:sld xmlns:a="http://schemas.openxmlformats.org/drawingml/2006/main" xmlns:r="http://schemas.openxmlformats.org/officeDocument/2006/relationships" xmlns:p="http://schemas.openxmlformats.org/presentationml/2006/main">
   <p:cSld>
     <p:spTree>

</xml_diff>

<commit_message>
Add Transformer for Tabular Data
</commit_message>
<xml_diff>
--- a/reports/Graphs/diagrams.pptx
+++ b/reports/Graphs/diagrams.pptx
@@ -133,7 +133,7 @@
   <pc:docChgLst>
     <pc:chgData name="Markus Bilz" userId="a36021e4bdb9349f" providerId="LiveId" clId="{F9F2BE70-AAED-47FD-A055-7B08EB1371A3}"/>
     <pc:docChg chg="undo custSel addSld modSld sldOrd">
-      <pc:chgData name="Markus Bilz" userId="a36021e4bdb9349f" providerId="LiveId" clId="{F9F2BE70-AAED-47FD-A055-7B08EB1371A3}" dt="2023-02-14T08:31:01.716" v="1397" actId="108"/>
+      <pc:chgData name="Markus Bilz" userId="a36021e4bdb9349f" providerId="LiveId" clId="{F9F2BE70-AAED-47FD-A055-7B08EB1371A3}" dt="2023-02-18T14:18:35.121" v="1399" actId="20577"/>
       <pc:docMkLst>
         <pc:docMk/>
       </pc:docMkLst>
@@ -215,7 +215,7 @@
         </pc:cxnChg>
       </pc:sldChg>
       <pc:sldChg chg="addSp delSp modSp mod">
-        <pc:chgData name="Markus Bilz" userId="a36021e4bdb9349f" providerId="LiveId" clId="{F9F2BE70-AAED-47FD-A055-7B08EB1371A3}" dt="2023-01-31T14:58:11.698" v="242" actId="1076"/>
+        <pc:chgData name="Markus Bilz" userId="a36021e4bdb9349f" providerId="LiveId" clId="{F9F2BE70-AAED-47FD-A055-7B08EB1371A3}" dt="2023-02-18T14:18:35.121" v="1399" actId="20577"/>
         <pc:sldMkLst>
           <pc:docMk/>
           <pc:sldMk cId="2878173059" sldId="261"/>
@@ -301,7 +301,7 @@
           </ac:spMkLst>
         </pc:spChg>
         <pc:spChg chg="mod">
-          <ac:chgData name="Markus Bilz" userId="a36021e4bdb9349f" providerId="LiveId" clId="{F9F2BE70-AAED-47FD-A055-7B08EB1371A3}" dt="2023-01-31T14:54:07.949" v="231" actId="1076"/>
+          <ac:chgData name="Markus Bilz" userId="a36021e4bdb9349f" providerId="LiveId" clId="{F9F2BE70-AAED-47FD-A055-7B08EB1371A3}" dt="2023-02-18T14:18:35.121" v="1399" actId="20577"/>
           <ac:spMkLst>
             <pc:docMk/>
             <pc:sldMk cId="2878173059" sldId="261"/>
@@ -7389,7 +7389,7 @@
           <a:p>
             <a:fld id="{D6A82EB2-151D-4EEE-ACF5-92C73278C09C}" type="datetimeFigureOut">
               <a:rPr lang="en-GB" smtClean="0"/>
-              <a:t>14/02/2023</a:t>
+              <a:t>18/02/2023</a:t>
             </a:fld>
             <a:endParaRPr lang="en-GB"/>
           </a:p>
@@ -7589,7 +7589,7 @@
           <a:p>
             <a:fld id="{D6A82EB2-151D-4EEE-ACF5-92C73278C09C}" type="datetimeFigureOut">
               <a:rPr lang="en-GB" smtClean="0"/>
-              <a:t>14/02/2023</a:t>
+              <a:t>18/02/2023</a:t>
             </a:fld>
             <a:endParaRPr lang="en-GB"/>
           </a:p>
@@ -7799,7 +7799,7 @@
           <a:p>
             <a:fld id="{D6A82EB2-151D-4EEE-ACF5-92C73278C09C}" type="datetimeFigureOut">
               <a:rPr lang="en-GB" smtClean="0"/>
-              <a:t>14/02/2023</a:t>
+              <a:t>18/02/2023</a:t>
             </a:fld>
             <a:endParaRPr lang="en-GB"/>
           </a:p>
@@ -7999,7 +7999,7 @@
           <a:p>
             <a:fld id="{D6A82EB2-151D-4EEE-ACF5-92C73278C09C}" type="datetimeFigureOut">
               <a:rPr lang="en-GB" smtClean="0"/>
-              <a:t>14/02/2023</a:t>
+              <a:t>18/02/2023</a:t>
             </a:fld>
             <a:endParaRPr lang="en-GB"/>
           </a:p>
@@ -8275,7 +8275,7 @@
           <a:p>
             <a:fld id="{D6A82EB2-151D-4EEE-ACF5-92C73278C09C}" type="datetimeFigureOut">
               <a:rPr lang="en-GB" smtClean="0"/>
-              <a:t>14/02/2023</a:t>
+              <a:t>18/02/2023</a:t>
             </a:fld>
             <a:endParaRPr lang="en-GB"/>
           </a:p>
@@ -8543,7 +8543,7 @@
           <a:p>
             <a:fld id="{D6A82EB2-151D-4EEE-ACF5-92C73278C09C}" type="datetimeFigureOut">
               <a:rPr lang="en-GB" smtClean="0"/>
-              <a:t>14/02/2023</a:t>
+              <a:t>18/02/2023</a:t>
             </a:fld>
             <a:endParaRPr lang="en-GB"/>
           </a:p>
@@ -8958,7 +8958,7 @@
           <a:p>
             <a:fld id="{D6A82EB2-151D-4EEE-ACF5-92C73278C09C}" type="datetimeFigureOut">
               <a:rPr lang="en-GB" smtClean="0"/>
-              <a:t>14/02/2023</a:t>
+              <a:t>18/02/2023</a:t>
             </a:fld>
             <a:endParaRPr lang="en-GB"/>
           </a:p>
@@ -9100,7 +9100,7 @@
           <a:p>
             <a:fld id="{D6A82EB2-151D-4EEE-ACF5-92C73278C09C}" type="datetimeFigureOut">
               <a:rPr lang="en-GB" smtClean="0"/>
-              <a:t>14/02/2023</a:t>
+              <a:t>18/02/2023</a:t>
             </a:fld>
             <a:endParaRPr lang="en-GB"/>
           </a:p>
@@ -9213,7 +9213,7 @@
           <a:p>
             <a:fld id="{D6A82EB2-151D-4EEE-ACF5-92C73278C09C}" type="datetimeFigureOut">
               <a:rPr lang="en-GB" smtClean="0"/>
-              <a:t>14/02/2023</a:t>
+              <a:t>18/02/2023</a:t>
             </a:fld>
             <a:endParaRPr lang="en-GB"/>
           </a:p>
@@ -9526,7 +9526,7 @@
           <a:p>
             <a:fld id="{D6A82EB2-151D-4EEE-ACF5-92C73278C09C}" type="datetimeFigureOut">
               <a:rPr lang="en-GB" smtClean="0"/>
-              <a:t>14/02/2023</a:t>
+              <a:t>18/02/2023</a:t>
             </a:fld>
             <a:endParaRPr lang="en-GB"/>
           </a:p>
@@ -9815,7 +9815,7 @@
           <a:p>
             <a:fld id="{D6A82EB2-151D-4EEE-ACF5-92C73278C09C}" type="datetimeFigureOut">
               <a:rPr lang="en-GB" smtClean="0"/>
-              <a:t>14/02/2023</a:t>
+              <a:t>18/02/2023</a:t>
             </a:fld>
             <a:endParaRPr lang="en-GB"/>
           </a:p>
@@ -10058,7 +10058,7 @@
           <a:p>
             <a:fld id="{D6A82EB2-151D-4EEE-ACF5-92C73278C09C}" type="datetimeFigureOut">
               <a:rPr lang="en-GB" smtClean="0"/>
-              <a:t>14/02/2023</a:t>
+              <a:t>18/02/2023</a:t>
             </a:fld>
             <a:endParaRPr lang="en-GB"/>
           </a:p>
@@ -24335,7 +24335,7 @@
               <a:rPr lang="de-DE" sz="1400" dirty="0" err="1">
                 <a:latin typeface="+mj-lt"/>
               </a:rPr>
-              <a:t>Categorical</a:t>
+              <a:t>categorical</a:t>
             </a:r>
             <a:r>
               <a:rPr lang="de-DE" sz="1400" dirty="0">

</xml_diff>

<commit_message>
Add visualization of FTTransformer 🤖
</commit_message>
<xml_diff>
--- a/reports/Graphs/diagrams.pptx
+++ b/reports/Graphs/diagrams.pptx
@@ -123,7 +123,7 @@
 <file path=ppt/revisionInfo.xml><?xml version="1.0" encoding="utf-8"?>
 <p1510:revInfo xmlns:a="http://schemas.openxmlformats.org/drawingml/2006/main" xmlns:r="http://schemas.openxmlformats.org/officeDocument/2006/relationships" xmlns:p1510="http://schemas.microsoft.com/office/powerpoint/2015/10/main">
   <p1510:revLst>
-    <p1510:client id="{F9F2BE70-AAED-47FD-A055-7B08EB1371A3}" v="137" dt="2023-02-13T09:48:54.349"/>
+    <p1510:client id="{F9F2BE70-AAED-47FD-A055-7B08EB1371A3}" v="142" dt="2023-02-18T15:20:12.629"/>
   </p1510:revLst>
 </p1510:revInfo>
 </file>
@@ -133,7 +133,7 @@
   <pc:docChgLst>
     <pc:chgData name="Markus Bilz" userId="a36021e4bdb9349f" providerId="LiveId" clId="{F9F2BE70-AAED-47FD-A055-7B08EB1371A3}"/>
     <pc:docChg chg="undo custSel addSld modSld sldOrd">
-      <pc:chgData name="Markus Bilz" userId="a36021e4bdb9349f" providerId="LiveId" clId="{F9F2BE70-AAED-47FD-A055-7B08EB1371A3}" dt="2023-02-18T14:18:35.121" v="1399" actId="20577"/>
+      <pc:chgData name="Markus Bilz" userId="a36021e4bdb9349f" providerId="LiveId" clId="{F9F2BE70-AAED-47FD-A055-7B08EB1371A3}" dt="2023-02-18T15:27:46.052" v="1534" actId="478"/>
       <pc:docMkLst>
         <pc:docMk/>
       </pc:docMkLst>
@@ -215,17 +215,129 @@
         </pc:cxnChg>
       </pc:sldChg>
       <pc:sldChg chg="addSp delSp modSp mod">
-        <pc:chgData name="Markus Bilz" userId="a36021e4bdb9349f" providerId="LiveId" clId="{F9F2BE70-AAED-47FD-A055-7B08EB1371A3}" dt="2023-02-18T14:18:35.121" v="1399" actId="20577"/>
+        <pc:chgData name="Markus Bilz" userId="a36021e4bdb9349f" providerId="LiveId" clId="{F9F2BE70-AAED-47FD-A055-7B08EB1371A3}" dt="2023-02-18T15:27:46.052" v="1534" actId="478"/>
         <pc:sldMkLst>
           <pc:docMk/>
           <pc:sldMk cId="2878173059" sldId="261"/>
         </pc:sldMkLst>
+        <pc:spChg chg="add mod">
+          <ac:chgData name="Markus Bilz" userId="a36021e4bdb9349f" providerId="LiveId" clId="{F9F2BE70-AAED-47FD-A055-7B08EB1371A3}" dt="2023-02-18T15:21:19.274" v="1505" actId="1076"/>
+          <ac:spMkLst>
+            <pc:docMk/>
+            <pc:sldMk cId="2878173059" sldId="261"/>
+            <ac:spMk id="6" creationId="{37E7B1D8-1BF8-FDFE-D966-2445914F8910}"/>
+          </ac:spMkLst>
+        </pc:spChg>
+        <pc:spChg chg="add mod">
+          <ac:chgData name="Markus Bilz" userId="a36021e4bdb9349f" providerId="LiveId" clId="{F9F2BE70-AAED-47FD-A055-7B08EB1371A3}" dt="2023-02-18T15:19:12.474" v="1476" actId="1076"/>
+          <ac:spMkLst>
+            <pc:docMk/>
+            <pc:sldMk cId="2878173059" sldId="261"/>
+            <ac:spMk id="19" creationId="{1AE337DA-87E6-6A46-773B-22A52F746B75}"/>
+          </ac:spMkLst>
+        </pc:spChg>
+        <pc:spChg chg="mod">
+          <ac:chgData name="Markus Bilz" userId="a36021e4bdb9349f" providerId="LiveId" clId="{F9F2BE70-AAED-47FD-A055-7B08EB1371A3}" dt="2023-02-18T15:23:06.984" v="1509" actId="1076"/>
+          <ac:spMkLst>
+            <pc:docMk/>
+            <pc:sldMk cId="2878173059" sldId="261"/>
+            <ac:spMk id="23" creationId="{8F8800C0-1CF3-F5CA-4394-35FFEBF5E5A3}"/>
+          </ac:spMkLst>
+        </pc:spChg>
+        <pc:spChg chg="mod">
+          <ac:chgData name="Markus Bilz" userId="a36021e4bdb9349f" providerId="LiveId" clId="{F9F2BE70-AAED-47FD-A055-7B08EB1371A3}" dt="2023-02-18T15:23:06.984" v="1509" actId="1076"/>
+          <ac:spMkLst>
+            <pc:docMk/>
+            <pc:sldMk cId="2878173059" sldId="261"/>
+            <ac:spMk id="25" creationId="{64F421B8-8DB7-34EA-C921-76E85E24F0A2}"/>
+          </ac:spMkLst>
+        </pc:spChg>
+        <pc:spChg chg="mod">
+          <ac:chgData name="Markus Bilz" userId="a36021e4bdb9349f" providerId="LiveId" clId="{F9F2BE70-AAED-47FD-A055-7B08EB1371A3}" dt="2023-02-18T15:23:06.984" v="1509" actId="1076"/>
+          <ac:spMkLst>
+            <pc:docMk/>
+            <pc:sldMk cId="2878173059" sldId="261"/>
+            <ac:spMk id="27" creationId="{A827FEA6-F17E-CA57-7B37-D1BAA16BED3F}"/>
+          </ac:spMkLst>
+        </pc:spChg>
+        <pc:spChg chg="mod">
+          <ac:chgData name="Markus Bilz" userId="a36021e4bdb9349f" providerId="LiveId" clId="{F9F2BE70-AAED-47FD-A055-7B08EB1371A3}" dt="2023-02-18T15:23:06.984" v="1509" actId="1076"/>
+          <ac:spMkLst>
+            <pc:docMk/>
+            <pc:sldMk cId="2878173059" sldId="261"/>
+            <ac:spMk id="31" creationId="{F00536E0-E48A-70AD-633B-4384867F30A5}"/>
+          </ac:spMkLst>
+        </pc:spChg>
+        <pc:spChg chg="mod">
+          <ac:chgData name="Markus Bilz" userId="a36021e4bdb9349f" providerId="LiveId" clId="{F9F2BE70-AAED-47FD-A055-7B08EB1371A3}" dt="2023-02-18T15:19:43.933" v="1485" actId="1076"/>
+          <ac:spMkLst>
+            <pc:docMk/>
+            <pc:sldMk cId="2878173059" sldId="261"/>
+            <ac:spMk id="61" creationId="{C00FF0EF-2F9D-F942-4F6E-0006C5307219}"/>
+          </ac:spMkLst>
+        </pc:spChg>
+        <pc:spChg chg="mod">
+          <ac:chgData name="Markus Bilz" userId="a36021e4bdb9349f" providerId="LiveId" clId="{F9F2BE70-AAED-47FD-A055-7B08EB1371A3}" dt="2023-02-18T15:19:25.064" v="1479" actId="1076"/>
+          <ac:spMkLst>
+            <pc:docMk/>
+            <pc:sldMk cId="2878173059" sldId="261"/>
+            <ac:spMk id="62" creationId="{C0641B72-A83F-2F0C-92F9-BC5B309B52B7}"/>
+          </ac:spMkLst>
+        </pc:spChg>
+        <pc:spChg chg="mod">
+          <ac:chgData name="Markus Bilz" userId="a36021e4bdb9349f" providerId="LiveId" clId="{F9F2BE70-AAED-47FD-A055-7B08EB1371A3}" dt="2023-02-18T15:19:14.712" v="1477" actId="1076"/>
+          <ac:spMkLst>
+            <pc:docMk/>
+            <pc:sldMk cId="2878173059" sldId="261"/>
+            <ac:spMk id="63" creationId="{2E94D5CD-A3D0-17C2-6DA2-6C898CDD5E11}"/>
+          </ac:spMkLst>
+        </pc:spChg>
+        <pc:spChg chg="mod">
+          <ac:chgData name="Markus Bilz" userId="a36021e4bdb9349f" providerId="LiveId" clId="{F9F2BE70-AAED-47FD-A055-7B08EB1371A3}" dt="2023-02-18T15:18:54.869" v="1471" actId="1076"/>
+          <ac:spMkLst>
+            <pc:docMk/>
+            <pc:sldMk cId="2878173059" sldId="261"/>
+            <ac:spMk id="66" creationId="{7343FA96-205F-7DD7-A660-9E1AE7A16CDD}"/>
+          </ac:spMkLst>
+        </pc:spChg>
+        <pc:spChg chg="mod">
+          <ac:chgData name="Markus Bilz" userId="a36021e4bdb9349f" providerId="LiveId" clId="{F9F2BE70-AAED-47FD-A055-7B08EB1371A3}" dt="2023-02-18T15:17:22.593" v="1435" actId="1076"/>
+          <ac:spMkLst>
+            <pc:docMk/>
+            <pc:sldMk cId="2878173059" sldId="261"/>
+            <ac:spMk id="67" creationId="{542CA32F-221D-DD49-7091-4AFC3E421628}"/>
+          </ac:spMkLst>
+        </pc:spChg>
+        <pc:spChg chg="mod">
+          <ac:chgData name="Markus Bilz" userId="a36021e4bdb9349f" providerId="LiveId" clId="{F9F2BE70-AAED-47FD-A055-7B08EB1371A3}" dt="2023-02-18T15:14:40.440" v="1404" actId="14100"/>
+          <ac:spMkLst>
+            <pc:docMk/>
+            <pc:sldMk cId="2878173059" sldId="261"/>
+            <ac:spMk id="80" creationId="{83641231-252D-FDB3-0C23-5CDCCDA26F9E}"/>
+          </ac:spMkLst>
+        </pc:spChg>
+        <pc:spChg chg="mod">
+          <ac:chgData name="Markus Bilz" userId="a36021e4bdb9349f" providerId="LiveId" clId="{F9F2BE70-AAED-47FD-A055-7B08EB1371A3}" dt="2023-02-18T15:23:21.306" v="1511" actId="1076"/>
+          <ac:spMkLst>
+            <pc:docMk/>
+            <pc:sldMk cId="2878173059" sldId="261"/>
+            <ac:spMk id="162" creationId="{C8C65B08-14FE-FF44-47C5-FB5077BC12AB}"/>
+          </ac:spMkLst>
+        </pc:spChg>
+        <pc:spChg chg="mod">
+          <ac:chgData name="Markus Bilz" userId="a36021e4bdb9349f" providerId="LiveId" clId="{F9F2BE70-AAED-47FD-A055-7B08EB1371A3}" dt="2023-02-18T15:21:06.412" v="1504" actId="1076"/>
+          <ac:spMkLst>
+            <pc:docMk/>
+            <pc:sldMk cId="2878173059" sldId="261"/>
+            <ac:spMk id="233" creationId="{22826292-593A-4357-FEEB-B7D5B39875EF}"/>
+          </ac:spMkLst>
+        </pc:spChg>
         <pc:spChg chg="mod">
           <ac:chgData name="Markus Bilz" userId="a36021e4bdb9349f" providerId="LiveId" clId="{F9F2BE70-AAED-47FD-A055-7B08EB1371A3}" dt="2023-01-31T14:54:07.949" v="231" actId="1076"/>
           <ac:spMkLst>
             <pc:docMk/>
             <pc:sldMk cId="2878173059" sldId="261"/>
-            <ac:spMk id="23" creationId="{8F8800C0-1CF3-F5CA-4394-35FFEBF5E5A3}"/>
+            <ac:spMk id="266" creationId="{581F8540-556F-156B-61E8-585BC8A175EB}"/>
           </ac:spMkLst>
         </pc:spChg>
         <pc:spChg chg="mod">
@@ -233,113 +345,25 @@
           <ac:spMkLst>
             <pc:docMk/>
             <pc:sldMk cId="2878173059" sldId="261"/>
-            <ac:spMk id="25" creationId="{64F421B8-8DB7-34EA-C921-76E85E24F0A2}"/>
+            <ac:spMk id="267" creationId="{457B388C-7929-72CD-0559-53E0AA934C74}"/>
           </ac:spMkLst>
         </pc:spChg>
         <pc:spChg chg="mod">
-          <ac:chgData name="Markus Bilz" userId="a36021e4bdb9349f" providerId="LiveId" clId="{F9F2BE70-AAED-47FD-A055-7B08EB1371A3}" dt="2023-01-31T14:54:07.949" v="231" actId="1076"/>
-          <ac:spMkLst>
-            <pc:docMk/>
-            <pc:sldMk cId="2878173059" sldId="261"/>
-            <ac:spMk id="27" creationId="{A827FEA6-F17E-CA57-7B37-D1BAA16BED3F}"/>
-          </ac:spMkLst>
-        </pc:spChg>
-        <pc:spChg chg="mod">
-          <ac:chgData name="Markus Bilz" userId="a36021e4bdb9349f" providerId="LiveId" clId="{F9F2BE70-AAED-47FD-A055-7B08EB1371A3}" dt="2023-01-31T14:54:07.949" v="231" actId="1076"/>
-          <ac:spMkLst>
-            <pc:docMk/>
-            <pc:sldMk cId="2878173059" sldId="261"/>
-            <ac:spMk id="31" creationId="{F00536E0-E48A-70AD-633B-4384867F30A5}"/>
-          </ac:spMkLst>
-        </pc:spChg>
-        <pc:spChg chg="mod">
-          <ac:chgData name="Markus Bilz" userId="a36021e4bdb9349f" providerId="LiveId" clId="{F9F2BE70-AAED-47FD-A055-7B08EB1371A3}" dt="2023-01-31T14:54:07.949" v="231" actId="1076"/>
-          <ac:spMkLst>
-            <pc:docMk/>
-            <pc:sldMk cId="2878173059" sldId="261"/>
-            <ac:spMk id="61" creationId="{C00FF0EF-2F9D-F942-4F6E-0006C5307219}"/>
-          </ac:spMkLst>
-        </pc:spChg>
-        <pc:spChg chg="mod">
-          <ac:chgData name="Markus Bilz" userId="a36021e4bdb9349f" providerId="LiveId" clId="{F9F2BE70-AAED-47FD-A055-7B08EB1371A3}" dt="2023-01-31T14:54:07.949" v="231" actId="1076"/>
-          <ac:spMkLst>
-            <pc:docMk/>
-            <pc:sldMk cId="2878173059" sldId="261"/>
-            <ac:spMk id="62" creationId="{C0641B72-A83F-2F0C-92F9-BC5B309B52B7}"/>
-          </ac:spMkLst>
-        </pc:spChg>
-        <pc:spChg chg="mod">
-          <ac:chgData name="Markus Bilz" userId="a36021e4bdb9349f" providerId="LiveId" clId="{F9F2BE70-AAED-47FD-A055-7B08EB1371A3}" dt="2023-01-31T14:54:07.949" v="231" actId="1076"/>
-          <ac:spMkLst>
-            <pc:docMk/>
-            <pc:sldMk cId="2878173059" sldId="261"/>
-            <ac:spMk id="63" creationId="{2E94D5CD-A3D0-17C2-6DA2-6C898CDD5E11}"/>
-          </ac:spMkLst>
-        </pc:spChg>
-        <pc:spChg chg="mod">
-          <ac:chgData name="Markus Bilz" userId="a36021e4bdb9349f" providerId="LiveId" clId="{F9F2BE70-AAED-47FD-A055-7B08EB1371A3}" dt="2023-01-31T14:54:07.949" v="231" actId="1076"/>
-          <ac:spMkLst>
-            <pc:docMk/>
-            <pc:sldMk cId="2878173059" sldId="261"/>
-            <ac:spMk id="66" creationId="{7343FA96-205F-7DD7-A660-9E1AE7A16CDD}"/>
-          </ac:spMkLst>
-        </pc:spChg>
-        <pc:spChg chg="mod">
-          <ac:chgData name="Markus Bilz" userId="a36021e4bdb9349f" providerId="LiveId" clId="{F9F2BE70-AAED-47FD-A055-7B08EB1371A3}" dt="2023-01-31T14:54:07.949" v="231" actId="1076"/>
-          <ac:spMkLst>
-            <pc:docMk/>
-            <pc:sldMk cId="2878173059" sldId="261"/>
-            <ac:spMk id="67" creationId="{542CA32F-221D-DD49-7091-4AFC3E421628}"/>
-          </ac:spMkLst>
-        </pc:spChg>
-        <pc:spChg chg="mod">
-          <ac:chgData name="Markus Bilz" userId="a36021e4bdb9349f" providerId="LiveId" clId="{F9F2BE70-AAED-47FD-A055-7B08EB1371A3}" dt="2023-01-31T14:54:07.949" v="231" actId="1076"/>
-          <ac:spMkLst>
-            <pc:docMk/>
-            <pc:sldMk cId="2878173059" sldId="261"/>
-            <ac:spMk id="80" creationId="{83641231-252D-FDB3-0C23-5CDCCDA26F9E}"/>
-          </ac:spMkLst>
-        </pc:spChg>
-        <pc:spChg chg="mod">
-          <ac:chgData name="Markus Bilz" userId="a36021e4bdb9349f" providerId="LiveId" clId="{F9F2BE70-AAED-47FD-A055-7B08EB1371A3}" dt="2023-02-18T14:18:35.121" v="1399" actId="20577"/>
-          <ac:spMkLst>
-            <pc:docMk/>
-            <pc:sldMk cId="2878173059" sldId="261"/>
-            <ac:spMk id="162" creationId="{C8C65B08-14FE-FF44-47C5-FB5077BC12AB}"/>
-          </ac:spMkLst>
-        </pc:spChg>
-        <pc:spChg chg="mod">
-          <ac:chgData name="Markus Bilz" userId="a36021e4bdb9349f" providerId="LiveId" clId="{F9F2BE70-AAED-47FD-A055-7B08EB1371A3}" dt="2023-01-31T14:54:07.949" v="231" actId="1076"/>
-          <ac:spMkLst>
-            <pc:docMk/>
-            <pc:sldMk cId="2878173059" sldId="261"/>
-            <ac:spMk id="233" creationId="{22826292-593A-4357-FEEB-B7D5B39875EF}"/>
-          </ac:spMkLst>
-        </pc:spChg>
-        <pc:spChg chg="mod">
-          <ac:chgData name="Markus Bilz" userId="a36021e4bdb9349f" providerId="LiveId" clId="{F9F2BE70-AAED-47FD-A055-7B08EB1371A3}" dt="2023-01-31T14:54:07.949" v="231" actId="1076"/>
-          <ac:spMkLst>
-            <pc:docMk/>
-            <pc:sldMk cId="2878173059" sldId="261"/>
-            <ac:spMk id="266" creationId="{581F8540-556F-156B-61E8-585BC8A175EB}"/>
-          </ac:spMkLst>
-        </pc:spChg>
-        <pc:spChg chg="mod">
-          <ac:chgData name="Markus Bilz" userId="a36021e4bdb9349f" providerId="LiveId" clId="{F9F2BE70-AAED-47FD-A055-7B08EB1371A3}" dt="2023-01-31T14:54:07.949" v="231" actId="1076"/>
-          <ac:spMkLst>
-            <pc:docMk/>
-            <pc:sldMk cId="2878173059" sldId="261"/>
-            <ac:spMk id="267" creationId="{457B388C-7929-72CD-0559-53E0AA934C74}"/>
-          </ac:spMkLst>
-        </pc:spChg>
-        <pc:spChg chg="mod">
-          <ac:chgData name="Markus Bilz" userId="a36021e4bdb9349f" providerId="LiveId" clId="{F9F2BE70-AAED-47FD-A055-7B08EB1371A3}" dt="2023-01-31T14:54:07.949" v="231" actId="1076"/>
+          <ac:chgData name="Markus Bilz" userId="a36021e4bdb9349f" providerId="LiveId" clId="{F9F2BE70-AAED-47FD-A055-7B08EB1371A3}" dt="2023-02-18T15:26:51.611" v="1522" actId="14100"/>
           <ac:spMkLst>
             <pc:docMk/>
             <pc:sldMk cId="2878173059" sldId="261"/>
             <ac:spMk id="268" creationId="{BB1549EF-6367-5F54-69BE-C8B0CC0F2CF9}"/>
           </ac:spMkLst>
         </pc:spChg>
+        <pc:picChg chg="add mod">
+          <ac:chgData name="Markus Bilz" userId="a36021e4bdb9349f" providerId="LiveId" clId="{F9F2BE70-AAED-47FD-A055-7B08EB1371A3}" dt="2023-02-18T15:14:26.487" v="1403" actId="1076"/>
+          <ac:picMkLst>
+            <pc:docMk/>
+            <pc:sldMk cId="2878173059" sldId="261"/>
+            <ac:picMk id="5" creationId="{7295174F-DD3B-430A-4AAD-CB8716281370}"/>
+          </ac:picMkLst>
+        </pc:picChg>
         <pc:picChg chg="add del mod">
           <ac:chgData name="Markus Bilz" userId="a36021e4bdb9349f" providerId="LiveId" clId="{F9F2BE70-AAED-47FD-A055-7B08EB1371A3}" dt="2023-01-31T14:55:35.158" v="238" actId="478"/>
           <ac:picMkLst>
@@ -357,7 +381,7 @@
           </ac:picMkLst>
         </pc:picChg>
         <pc:cxnChg chg="mod">
-          <ac:chgData name="Markus Bilz" userId="a36021e4bdb9349f" providerId="LiveId" clId="{F9F2BE70-AAED-47FD-A055-7B08EB1371A3}" dt="2023-01-31T14:54:07.949" v="231" actId="1076"/>
+          <ac:chgData name="Markus Bilz" userId="a36021e4bdb9349f" providerId="LiveId" clId="{F9F2BE70-AAED-47FD-A055-7B08EB1371A3}" dt="2023-02-18T15:23:06.984" v="1509" actId="1076"/>
           <ac:cxnSpMkLst>
             <pc:docMk/>
             <pc:sldMk cId="2878173059" sldId="261"/>
@@ -365,7 +389,7 @@
           </ac:cxnSpMkLst>
         </pc:cxnChg>
         <pc:cxnChg chg="mod">
-          <ac:chgData name="Markus Bilz" userId="a36021e4bdb9349f" providerId="LiveId" clId="{F9F2BE70-AAED-47FD-A055-7B08EB1371A3}" dt="2023-01-31T14:54:07.949" v="231" actId="1076"/>
+          <ac:chgData name="Markus Bilz" userId="a36021e4bdb9349f" providerId="LiveId" clId="{F9F2BE70-AAED-47FD-A055-7B08EB1371A3}" dt="2023-02-18T15:23:06.984" v="1509" actId="1076"/>
           <ac:cxnSpMkLst>
             <pc:docMk/>
             <pc:sldMk cId="2878173059" sldId="261"/>
@@ -373,83 +397,131 @@
           </ac:cxnSpMkLst>
         </pc:cxnChg>
         <pc:cxnChg chg="mod">
-          <ac:chgData name="Markus Bilz" userId="a36021e4bdb9349f" providerId="LiveId" clId="{F9F2BE70-AAED-47FD-A055-7B08EB1371A3}" dt="2023-01-31T14:54:07.949" v="231" actId="1076"/>
+          <ac:chgData name="Markus Bilz" userId="a36021e4bdb9349f" providerId="LiveId" clId="{F9F2BE70-AAED-47FD-A055-7B08EB1371A3}" dt="2023-02-18T15:23:06.984" v="1509" actId="1076"/>
           <ac:cxnSpMkLst>
             <pc:docMk/>
             <pc:sldMk cId="2878173059" sldId="261"/>
             <ac:cxnSpMk id="29" creationId="{ADCE3843-0FDE-285C-7733-2A6A7A7A0AC7}"/>
           </ac:cxnSpMkLst>
         </pc:cxnChg>
+        <pc:cxnChg chg="add mod">
+          <ac:chgData name="Markus Bilz" userId="a36021e4bdb9349f" providerId="LiveId" clId="{F9F2BE70-AAED-47FD-A055-7B08EB1371A3}" dt="2023-02-18T15:25:41.862" v="1515" actId="14100"/>
+          <ac:cxnSpMkLst>
+            <pc:docMk/>
+            <pc:sldMk cId="2878173059" sldId="261"/>
+            <ac:cxnSpMk id="39" creationId="{F9F26774-D4F9-74AB-B575-2F6F78375116}"/>
+          </ac:cxnSpMkLst>
+        </pc:cxnChg>
+        <pc:cxnChg chg="mod">
+          <ac:chgData name="Markus Bilz" userId="a36021e4bdb9349f" providerId="LiveId" clId="{F9F2BE70-AAED-47FD-A055-7B08EB1371A3}" dt="2023-02-18T15:19:14.712" v="1477" actId="1076"/>
+          <ac:cxnSpMkLst>
+            <pc:docMk/>
+            <pc:sldMk cId="2878173059" sldId="261"/>
+            <ac:cxnSpMk id="65" creationId="{28EE4F0F-C008-F011-6402-C667E69D8B21}"/>
+          </ac:cxnSpMkLst>
+        </pc:cxnChg>
+        <pc:cxnChg chg="mod">
+          <ac:chgData name="Markus Bilz" userId="a36021e4bdb9349f" providerId="LiveId" clId="{F9F2BE70-AAED-47FD-A055-7B08EB1371A3}" dt="2023-02-18T15:23:21.306" v="1511" actId="1076"/>
+          <ac:cxnSpMkLst>
+            <pc:docMk/>
+            <pc:sldMk cId="2878173059" sldId="261"/>
+            <ac:cxnSpMk id="70" creationId="{66C88C84-34E5-DBC0-F118-6C49B6374993}"/>
+          </ac:cxnSpMkLst>
+        </pc:cxnChg>
+        <pc:cxnChg chg="del mod">
+          <ac:chgData name="Markus Bilz" userId="a36021e4bdb9349f" providerId="LiveId" clId="{F9F2BE70-AAED-47FD-A055-7B08EB1371A3}" dt="2023-02-18T15:27:46.052" v="1534" actId="478"/>
+          <ac:cxnSpMkLst>
+            <pc:docMk/>
+            <pc:sldMk cId="2878173059" sldId="261"/>
+            <ac:cxnSpMk id="101" creationId="{C9A8426B-62F8-8EC1-CB9F-6E9E7AD7B88A}"/>
+          </ac:cxnSpMkLst>
+        </pc:cxnChg>
+        <pc:cxnChg chg="mod">
+          <ac:chgData name="Markus Bilz" userId="a36021e4bdb9349f" providerId="LiveId" clId="{F9F2BE70-AAED-47FD-A055-7B08EB1371A3}" dt="2023-02-18T15:18:54.869" v="1471" actId="1076"/>
+          <ac:cxnSpMkLst>
+            <pc:docMk/>
+            <pc:sldMk cId="2878173059" sldId="261"/>
+            <ac:cxnSpMk id="214" creationId="{0D81CBA5-C3C3-5317-A8A3-8CD616613EDE}"/>
+          </ac:cxnSpMkLst>
+        </pc:cxnChg>
+        <pc:cxnChg chg="mod">
+          <ac:chgData name="Markus Bilz" userId="a36021e4bdb9349f" providerId="LiveId" clId="{F9F2BE70-AAED-47FD-A055-7B08EB1371A3}" dt="2023-02-18T15:19:25.064" v="1479" actId="1076"/>
+          <ac:cxnSpMkLst>
+            <pc:docMk/>
+            <pc:sldMk cId="2878173059" sldId="261"/>
+            <ac:cxnSpMk id="217" creationId="{AF17FB98-C9BC-D133-7339-F0C5698E6493}"/>
+          </ac:cxnSpMkLst>
+        </pc:cxnChg>
+        <pc:cxnChg chg="mod">
+          <ac:chgData name="Markus Bilz" userId="a36021e4bdb9349f" providerId="LiveId" clId="{F9F2BE70-AAED-47FD-A055-7B08EB1371A3}" dt="2023-02-18T15:19:18.518" v="1478" actId="14100"/>
+          <ac:cxnSpMkLst>
+            <pc:docMk/>
+            <pc:sldMk cId="2878173059" sldId="261"/>
+            <ac:cxnSpMk id="220" creationId="{F71C02ED-6336-D99D-2AAA-7DC8A5931246}"/>
+          </ac:cxnSpMkLst>
+        </pc:cxnChg>
+        <pc:cxnChg chg="del mod">
+          <ac:chgData name="Markus Bilz" userId="a36021e4bdb9349f" providerId="LiveId" clId="{F9F2BE70-AAED-47FD-A055-7B08EB1371A3}" dt="2023-02-18T15:19:30.778" v="1480" actId="478"/>
+          <ac:cxnSpMkLst>
+            <pc:docMk/>
+            <pc:sldMk cId="2878173059" sldId="261"/>
+            <ac:cxnSpMk id="226" creationId="{470B009F-AEBC-B736-2071-04407321C553}"/>
+          </ac:cxnSpMkLst>
+        </pc:cxnChg>
+        <pc:cxnChg chg="add mod">
+          <ac:chgData name="Markus Bilz" userId="a36021e4bdb9349f" providerId="LiveId" clId="{F9F2BE70-AAED-47FD-A055-7B08EB1371A3}" dt="2023-02-18T15:19:12.474" v="1476" actId="1076"/>
+          <ac:cxnSpMkLst>
+            <pc:docMk/>
+            <pc:sldMk cId="2878173059" sldId="261"/>
+            <ac:cxnSpMk id="241" creationId="{647D61CA-2D51-3BFE-D9EB-260D494A7DAC}"/>
+          </ac:cxnSpMkLst>
+        </pc:cxnChg>
         <pc:cxnChg chg="mod">
           <ac:chgData name="Markus Bilz" userId="a36021e4bdb9349f" providerId="LiveId" clId="{F9F2BE70-AAED-47FD-A055-7B08EB1371A3}" dt="2023-01-31T14:54:07.949" v="231" actId="1076"/>
           <ac:cxnSpMkLst>
             <pc:docMk/>
             <pc:sldMk cId="2878173059" sldId="261"/>
-            <ac:cxnSpMk id="65" creationId="{28EE4F0F-C008-F011-6402-C667E69D8B21}"/>
+            <ac:cxnSpMk id="242" creationId="{15A6B20D-82BA-B4F9-68E1-286190BB95EE}"/>
           </ac:cxnSpMkLst>
         </pc:cxnChg>
         <pc:cxnChg chg="mod">
-          <ac:chgData name="Markus Bilz" userId="a36021e4bdb9349f" providerId="LiveId" clId="{F9F2BE70-AAED-47FD-A055-7B08EB1371A3}" dt="2023-01-31T14:54:07.949" v="231" actId="1076"/>
-          <ac:cxnSpMkLst>
-            <pc:docMk/>
-            <pc:sldMk cId="2878173059" sldId="261"/>
-            <ac:cxnSpMk id="70" creationId="{66C88C84-34E5-DBC0-F118-6C49B6374993}"/>
-          </ac:cxnSpMkLst>
-        </pc:cxnChg>
-        <pc:cxnChg chg="mod">
-          <ac:chgData name="Markus Bilz" userId="a36021e4bdb9349f" providerId="LiveId" clId="{F9F2BE70-AAED-47FD-A055-7B08EB1371A3}" dt="2023-01-31T14:54:07.949" v="231" actId="1076"/>
-          <ac:cxnSpMkLst>
-            <pc:docMk/>
-            <pc:sldMk cId="2878173059" sldId="261"/>
-            <ac:cxnSpMk id="101" creationId="{C9A8426B-62F8-8EC1-CB9F-6E9E7AD7B88A}"/>
-          </ac:cxnSpMkLst>
-        </pc:cxnChg>
-        <pc:cxnChg chg="mod">
-          <ac:chgData name="Markus Bilz" userId="a36021e4bdb9349f" providerId="LiveId" clId="{F9F2BE70-AAED-47FD-A055-7B08EB1371A3}" dt="2023-01-31T14:54:07.949" v="231" actId="1076"/>
-          <ac:cxnSpMkLst>
-            <pc:docMk/>
-            <pc:sldMk cId="2878173059" sldId="261"/>
-            <ac:cxnSpMk id="214" creationId="{0D81CBA5-C3C3-5317-A8A3-8CD616613EDE}"/>
-          </ac:cxnSpMkLst>
-        </pc:cxnChg>
-        <pc:cxnChg chg="mod">
-          <ac:chgData name="Markus Bilz" userId="a36021e4bdb9349f" providerId="LiveId" clId="{F9F2BE70-AAED-47FD-A055-7B08EB1371A3}" dt="2023-01-31T14:54:07.949" v="231" actId="1076"/>
-          <ac:cxnSpMkLst>
-            <pc:docMk/>
-            <pc:sldMk cId="2878173059" sldId="261"/>
-            <ac:cxnSpMk id="217" creationId="{AF17FB98-C9BC-D133-7339-F0C5698E6493}"/>
-          </ac:cxnSpMkLst>
-        </pc:cxnChg>
-        <pc:cxnChg chg="mod">
-          <ac:chgData name="Markus Bilz" userId="a36021e4bdb9349f" providerId="LiveId" clId="{F9F2BE70-AAED-47FD-A055-7B08EB1371A3}" dt="2023-01-31T14:54:07.949" v="231" actId="1076"/>
-          <ac:cxnSpMkLst>
-            <pc:docMk/>
-            <pc:sldMk cId="2878173059" sldId="261"/>
-            <ac:cxnSpMk id="220" creationId="{F71C02ED-6336-D99D-2AAA-7DC8A5931246}"/>
-          </ac:cxnSpMkLst>
-        </pc:cxnChg>
-        <pc:cxnChg chg="mod">
-          <ac:chgData name="Markus Bilz" userId="a36021e4bdb9349f" providerId="LiveId" clId="{F9F2BE70-AAED-47FD-A055-7B08EB1371A3}" dt="2023-01-31T14:54:07.949" v="231" actId="1076"/>
-          <ac:cxnSpMkLst>
-            <pc:docMk/>
-            <pc:sldMk cId="2878173059" sldId="261"/>
-            <ac:cxnSpMk id="226" creationId="{470B009F-AEBC-B736-2071-04407321C553}"/>
-          </ac:cxnSpMkLst>
-        </pc:cxnChg>
-        <pc:cxnChg chg="mod">
-          <ac:chgData name="Markus Bilz" userId="a36021e4bdb9349f" providerId="LiveId" clId="{F9F2BE70-AAED-47FD-A055-7B08EB1371A3}" dt="2023-01-31T14:54:07.949" v="231" actId="1076"/>
-          <ac:cxnSpMkLst>
-            <pc:docMk/>
-            <pc:sldMk cId="2878173059" sldId="261"/>
-            <ac:cxnSpMk id="242" creationId="{15A6B20D-82BA-B4F9-68E1-286190BB95EE}"/>
-          </ac:cxnSpMkLst>
-        </pc:cxnChg>
-        <pc:cxnChg chg="mod">
-          <ac:chgData name="Markus Bilz" userId="a36021e4bdb9349f" providerId="LiveId" clId="{F9F2BE70-AAED-47FD-A055-7B08EB1371A3}" dt="2023-01-31T14:54:07.949" v="231" actId="1076"/>
+          <ac:chgData name="Markus Bilz" userId="a36021e4bdb9349f" providerId="LiveId" clId="{F9F2BE70-AAED-47FD-A055-7B08EB1371A3}" dt="2023-02-18T15:20:58.645" v="1503" actId="1076"/>
           <ac:cxnSpMkLst>
             <pc:docMk/>
             <pc:sldMk cId="2878173059" sldId="261"/>
             <ac:cxnSpMk id="249" creationId="{474E23BC-E9EE-6D4C-E9B0-65C585D028C8}"/>
+          </ac:cxnSpMkLst>
+        </pc:cxnChg>
+        <pc:cxnChg chg="add mod">
+          <ac:chgData name="Markus Bilz" userId="a36021e4bdb9349f" providerId="LiveId" clId="{F9F2BE70-AAED-47FD-A055-7B08EB1371A3}" dt="2023-02-18T15:27:01.159" v="1525" actId="14100"/>
+          <ac:cxnSpMkLst>
+            <pc:docMk/>
+            <pc:sldMk cId="2878173059" sldId="261"/>
+            <ac:cxnSpMk id="255" creationId="{37A65A15-9D02-19D0-A9DA-DEA04BF5E7CC}"/>
+          </ac:cxnSpMkLst>
+        </pc:cxnChg>
+        <pc:cxnChg chg="add del mod">
+          <ac:chgData name="Markus Bilz" userId="a36021e4bdb9349f" providerId="LiveId" clId="{F9F2BE70-AAED-47FD-A055-7B08EB1371A3}" dt="2023-02-18T15:26:52.482" v="1524" actId="11529"/>
+          <ac:cxnSpMkLst>
+            <pc:docMk/>
+            <pc:sldMk cId="2878173059" sldId="261"/>
+            <ac:cxnSpMk id="257" creationId="{DB547BFB-73A6-DD51-1DB2-32DE374FCA9C}"/>
+          </ac:cxnSpMkLst>
+        </pc:cxnChg>
+        <pc:cxnChg chg="add del mod">
+          <ac:chgData name="Markus Bilz" userId="a36021e4bdb9349f" providerId="LiveId" clId="{F9F2BE70-AAED-47FD-A055-7B08EB1371A3}" dt="2023-02-18T15:27:22.731" v="1529" actId="478"/>
+          <ac:cxnSpMkLst>
+            <pc:docMk/>
+            <pc:sldMk cId="2878173059" sldId="261"/>
+            <ac:cxnSpMk id="261" creationId="{EEEB3D91-CDDA-94A5-42DD-314DD8526D2C}"/>
+          </ac:cxnSpMkLst>
+        </pc:cxnChg>
+        <pc:cxnChg chg="add mod">
+          <ac:chgData name="Markus Bilz" userId="a36021e4bdb9349f" providerId="LiveId" clId="{F9F2BE70-AAED-47FD-A055-7B08EB1371A3}" dt="2023-02-18T15:27:44.060" v="1533" actId="14100"/>
+          <ac:cxnSpMkLst>
+            <pc:docMk/>
+            <pc:sldMk cId="2878173059" sldId="261"/>
+            <ac:cxnSpMk id="264" creationId="{16F9191E-FF68-381B-DBB7-8107DC518EDC}"/>
           </ac:cxnSpMkLst>
         </pc:cxnChg>
       </pc:sldChg>
@@ -23920,7 +23992,7 @@
         </p:nvSpPr>
         <p:spPr>
           <a:xfrm>
-            <a:off x="8940828" y="5679599"/>
+            <a:off x="8950352" y="5679599"/>
             <a:ext cx="1745456" cy="328612"/>
           </a:xfrm>
           <a:prstGeom prst="roundRect">
@@ -23979,7 +24051,7 @@
         </p:nvSpPr>
         <p:spPr>
           <a:xfrm>
-            <a:off x="9267058" y="4248787"/>
+            <a:off x="9260139" y="4245612"/>
             <a:ext cx="1159669" cy="458984"/>
           </a:xfrm>
           <a:prstGeom prst="roundRect">
@@ -24048,7 +24120,7 @@
         </p:nvSpPr>
         <p:spPr>
           <a:xfrm>
-            <a:off x="9264677" y="3892192"/>
+            <a:off x="9257758" y="3892192"/>
             <a:ext cx="1164431" cy="242887"/>
           </a:xfrm>
           <a:prstGeom prst="roundRect">
@@ -24088,7 +24160,7 @@
                 <a:latin typeface="+mj-lt"/>
                 <a:cs typeface="Arial" panose="020B0604020202020204" pitchFamily="34" charset="0"/>
               </a:rPr>
-              <a:t>Add &amp; Norm</a:t>
+              <a:t>Add</a:t>
             </a:r>
           </a:p>
         </p:txBody>
@@ -24107,7 +24179,7 @@
         </p:nvSpPr>
         <p:spPr>
           <a:xfrm>
-            <a:off x="9262296" y="3373078"/>
+            <a:off x="9257758" y="3089711"/>
             <a:ext cx="1164431" cy="329011"/>
           </a:xfrm>
           <a:prstGeom prst="roundRect">
@@ -24166,7 +24238,7 @@
         </p:nvSpPr>
         <p:spPr>
           <a:xfrm>
-            <a:off x="9262296" y="3001605"/>
+            <a:off x="9257758" y="2725380"/>
             <a:ext cx="1164431" cy="242887"/>
           </a:xfrm>
           <a:prstGeom prst="roundRect">
@@ -24222,13 +24294,15 @@
           </p:cNvPr>
           <p:cNvCxnSpPr>
             <a:cxnSpLocks/>
+            <a:stCxn id="162" idx="0"/>
+            <a:endCxn id="61" idx="2"/>
           </p:cNvCxnSpPr>
           <p:nvPr/>
         </p:nvCxnSpPr>
         <p:spPr>
           <a:xfrm flipV="1">
-            <a:off x="9815030" y="6015357"/>
-            <a:ext cx="0" cy="225622"/>
+            <a:off x="9823080" y="6008211"/>
+            <a:ext cx="0" cy="252710"/>
           </a:xfrm>
           <a:prstGeom prst="straightConnector1">
             <a:avLst/>
@@ -24267,7 +24341,7 @@
         <p:spPr>
           <a:xfrm>
             <a:off x="8969402" y="2652435"/>
-            <a:ext cx="1633537" cy="2557463"/>
+            <a:ext cx="1633537" cy="2910165"/>
           </a:xfrm>
           <a:prstGeom prst="roundRect">
             <a:avLst>
@@ -24317,7 +24391,7 @@
         </p:nvSpPr>
         <p:spPr>
           <a:xfrm>
-            <a:off x="8469340" y="6260921"/>
+            <a:off x="8480055" y="6260921"/>
             <a:ext cx="2686050" cy="307777"/>
           </a:xfrm>
           <a:prstGeom prst="rect">
@@ -24385,8 +24459,8 @@
         </p:nvCxnSpPr>
         <p:spPr>
           <a:xfrm flipV="1">
-            <a:off x="9844512" y="3244492"/>
-            <a:ext cx="0" cy="128586"/>
+            <a:off x="9839974" y="2968267"/>
+            <a:ext cx="0" cy="121444"/>
           </a:xfrm>
           <a:prstGeom prst="straightConnector1">
             <a:avLst/>
@@ -24431,8 +24505,8 @@
         </p:nvCxnSpPr>
         <p:spPr>
           <a:xfrm flipV="1">
-            <a:off x="9846893" y="4135079"/>
-            <a:ext cx="0" cy="113708"/>
+            <a:off x="9839974" y="4135079"/>
+            <a:ext cx="0" cy="110533"/>
           </a:xfrm>
           <a:prstGeom prst="straightConnector1">
             <a:avLst/>
@@ -24477,60 +24551,13 @@
         </p:nvCxnSpPr>
         <p:spPr>
           <a:xfrm rot="16200000" flipV="1">
-            <a:off x="9170024" y="3215322"/>
-            <a:ext cx="769143" cy="584597"/>
+            <a:off x="9026182" y="3078400"/>
+            <a:ext cx="1045368" cy="582216"/>
           </a:xfrm>
           <a:prstGeom prst="bentConnector4">
             <a:avLst>
-              <a:gd name="adj1" fmla="val 10526"/>
-              <a:gd name="adj2" fmla="val 128921"/>
-            </a:avLst>
-          </a:prstGeom>
-          <a:ln w="12700">
-            <a:solidFill>
-              <a:schemeClr val="tx1"/>
-            </a:solidFill>
-            <a:tailEnd type="triangle"/>
-          </a:ln>
-        </p:spPr>
-        <p:style>
-          <a:lnRef idx="1">
-            <a:schemeClr val="accent1"/>
-          </a:lnRef>
-          <a:fillRef idx="0">
-            <a:schemeClr val="accent1"/>
-          </a:fillRef>
-          <a:effectRef idx="0">
-            <a:schemeClr val="accent1"/>
-          </a:effectRef>
-          <a:fontRef idx="minor">
-            <a:schemeClr val="tx1"/>
-          </a:fontRef>
-        </p:style>
-      </p:cxnSp>
-      <p:cxnSp>
-        <p:nvCxnSpPr>
-          <p:cNvPr id="226" name="Connector: Elbow 225">
-            <a:extLst>
-              <a:ext uri="{FF2B5EF4-FFF2-40B4-BE49-F238E27FC236}">
-                <a16:creationId xmlns:a16="http://schemas.microsoft.com/office/drawing/2014/main" id="{470B009F-AEBC-B736-2071-04407321C553}"/>
-              </a:ext>
-            </a:extLst>
-          </p:cNvPr>
-          <p:cNvCxnSpPr>
-            <a:cxnSpLocks/>
-          </p:cNvCxnSpPr>
-          <p:nvPr/>
-        </p:nvCxnSpPr>
-        <p:spPr>
-          <a:xfrm rot="16200000" flipV="1">
-            <a:off x="8706136" y="4574559"/>
-            <a:ext cx="1665963" cy="548879"/>
-          </a:xfrm>
-          <a:prstGeom prst="bentConnector4">
-            <a:avLst>
-              <a:gd name="adj1" fmla="val 43210"/>
-              <a:gd name="adj2" fmla="val 132104"/>
+              <a:gd name="adj1" fmla="val 3644"/>
+              <a:gd name="adj2" fmla="val 139264"/>
             </a:avLst>
           </a:prstGeom>
           <a:ln w="12700">
@@ -24569,7 +24596,7 @@
         </p:nvSpPr>
         <p:spPr>
           <a:xfrm>
-            <a:off x="8393140" y="3682821"/>
+            <a:off x="8478865" y="3682821"/>
             <a:ext cx="571500" cy="307777"/>
           </a:xfrm>
           <a:prstGeom prst="rect">
@@ -24587,7 +24614,7 @@
               <a:rPr lang="de-DE" sz="1400" dirty="0">
                 <a:latin typeface="+mj-lt"/>
               </a:rPr>
-              <a:t>N×</a:t>
+              <a:t>L×</a:t>
             </a:r>
             <a:endParaRPr lang="en-GB" sz="1400" dirty="0">
               <a:latin typeface="+mj-lt"/>
@@ -24657,7 +24684,7 @@
         </p:nvCxnSpPr>
         <p:spPr>
           <a:xfrm flipV="1">
-            <a:off x="9813555" y="4712534"/>
+            <a:off x="9823080" y="4717296"/>
             <a:ext cx="0" cy="246439"/>
           </a:xfrm>
           <a:prstGeom prst="straightConnector1">
@@ -24785,7 +24812,7 @@
         </p:nvSpPr>
         <p:spPr>
           <a:xfrm>
-            <a:off x="9555189" y="4695965"/>
+            <a:off x="9548045" y="4691202"/>
             <a:ext cx="264318" cy="261610"/>
           </a:xfrm>
           <a:prstGeom prst="rect">
@@ -24875,9 +24902,9 @@
           <p:nvPr/>
         </p:nvCxnSpPr>
         <p:spPr>
-          <a:xfrm flipH="1" flipV="1">
-            <a:off x="9839974" y="2374225"/>
-            <a:ext cx="4538" cy="627380"/>
+          <a:xfrm flipV="1">
+            <a:off x="9839974" y="2495668"/>
+            <a:ext cx="0" cy="229712"/>
           </a:xfrm>
           <a:prstGeom prst="straightConnector1">
             <a:avLst/>
@@ -24978,7 +25005,7 @@
         </p:nvSpPr>
         <p:spPr>
           <a:xfrm>
-            <a:off x="9198385" y="694511"/>
+            <a:off x="9198385" y="815954"/>
             <a:ext cx="1196340" cy="523220"/>
           </a:xfrm>
           <a:prstGeom prst="rect">
@@ -25028,7 +25055,7 @@
         </p:nvSpPr>
         <p:spPr>
           <a:xfrm>
-            <a:off x="9255153" y="1719845"/>
+            <a:off x="9255153" y="1841288"/>
             <a:ext cx="1164431" cy="242887"/>
           </a:xfrm>
           <a:prstGeom prst="roundRect">
@@ -25087,7 +25114,7 @@
         </p:nvSpPr>
         <p:spPr>
           <a:xfrm>
-            <a:off x="9255153" y="1310271"/>
+            <a:off x="9255153" y="1431714"/>
             <a:ext cx="1164431" cy="242887"/>
           </a:xfrm>
           <a:prstGeom prst="roundRect">
@@ -25150,7 +25177,7 @@
         </p:nvCxnSpPr>
         <p:spPr>
           <a:xfrm flipV="1">
-            <a:off x="9837369" y="1553158"/>
+            <a:off x="9837369" y="1674601"/>
             <a:ext cx="0" cy="166687"/>
           </a:xfrm>
           <a:prstGeom prst="straightConnector1">
@@ -25194,7 +25221,7 @@
         </p:nvCxnSpPr>
         <p:spPr>
           <a:xfrm flipV="1">
-            <a:off x="9838162" y="1964320"/>
+            <a:off x="9838162" y="2085763"/>
             <a:ext cx="0" cy="159470"/>
           </a:xfrm>
           <a:prstGeom prst="straightConnector1">
@@ -25236,7 +25263,7 @@
         </p:nvSpPr>
         <p:spPr>
           <a:xfrm>
-            <a:off x="9257758" y="2131338"/>
+            <a:off x="9257758" y="2252781"/>
             <a:ext cx="1164431" cy="242887"/>
           </a:xfrm>
           <a:prstGeom prst="roundRect">
@@ -25292,57 +25319,15 @@
           </p:cNvPr>
           <p:cNvCxnSpPr>
             <a:cxnSpLocks/>
+            <a:stCxn id="63" idx="0"/>
+            <a:endCxn id="19" idx="2"/>
           </p:cNvCxnSpPr>
           <p:nvPr/>
         </p:nvCxnSpPr>
         <p:spPr>
           <a:xfrm flipV="1">
-            <a:off x="9846894" y="3709232"/>
-            <a:ext cx="0" cy="103883"/>
-          </a:xfrm>
-          <a:prstGeom prst="straightConnector1">
-            <a:avLst/>
-          </a:prstGeom>
-          <a:ln w="12700">
-            <a:solidFill>
-              <a:schemeClr val="tx1"/>
-            </a:solidFill>
-            <a:tailEnd type="triangle"/>
-          </a:ln>
-        </p:spPr>
-        <p:style>
-          <a:lnRef idx="1">
-            <a:schemeClr val="dk1"/>
-          </a:lnRef>
-          <a:fillRef idx="0">
-            <a:schemeClr val="dk1"/>
-          </a:fillRef>
-          <a:effectRef idx="0">
-            <a:schemeClr val="dk1"/>
-          </a:effectRef>
-          <a:fontRef idx="minor">
-            <a:schemeClr val="tx1"/>
-          </a:fontRef>
-        </p:style>
-      </p:cxnSp>
-      <p:cxnSp>
-        <p:nvCxnSpPr>
-          <p:cNvPr id="101" name="Straight Arrow Connector 100">
-            <a:extLst>
-              <a:ext uri="{FF2B5EF4-FFF2-40B4-BE49-F238E27FC236}">
-                <a16:creationId xmlns:a16="http://schemas.microsoft.com/office/drawing/2014/main" id="{C9A8426B-62F8-8EC1-CB9F-6E9E7AD7B88A}"/>
-              </a:ext>
-            </a:extLst>
-          </p:cNvPr>
-          <p:cNvCxnSpPr>
-            <a:cxnSpLocks/>
-          </p:cNvCxnSpPr>
-          <p:nvPr/>
-        </p:nvCxnSpPr>
-        <p:spPr>
-          <a:xfrm flipV="1">
-            <a:off x="9513517" y="4706084"/>
-            <a:ext cx="0" cy="250032"/>
+            <a:off x="9839974" y="3754079"/>
+            <a:ext cx="0" cy="138113"/>
           </a:xfrm>
           <a:prstGeom prst="straightConnector1">
             <a:avLst/>
@@ -25455,6 +25440,338 @@
           </a:prstGeom>
         </p:spPr>
       </p:pic>
+      <p:pic>
+        <p:nvPicPr>
+          <p:cNvPr id="5" name="Picture 4">
+            <a:extLst>
+              <a:ext uri="{FF2B5EF4-FFF2-40B4-BE49-F238E27FC236}">
+                <a16:creationId xmlns:a16="http://schemas.microsoft.com/office/drawing/2014/main" id="{7295174F-DD3B-430A-4AAD-CB8716281370}"/>
+              </a:ext>
+            </a:extLst>
+          </p:cNvPr>
+          <p:cNvPicPr>
+            <a:picLocks noChangeAspect="1"/>
+          </p:cNvPicPr>
+          <p:nvPr/>
+        </p:nvPicPr>
+        <p:blipFill>
+          <a:blip r:embed="rId5"/>
+          <a:stretch>
+            <a:fillRect/>
+          </a:stretch>
+        </p:blipFill>
+        <p:spPr>
+          <a:xfrm>
+            <a:off x="2671762" y="1976437"/>
+            <a:ext cx="4314825" cy="2676525"/>
+          </a:xfrm>
+          <a:prstGeom prst="rect">
+            <a:avLst/>
+          </a:prstGeom>
+        </p:spPr>
+      </p:pic>
+      <p:sp>
+        <p:nvSpPr>
+          <p:cNvPr id="6" name="Rectangle: Rounded Corners 5">
+            <a:extLst>
+              <a:ext uri="{FF2B5EF4-FFF2-40B4-BE49-F238E27FC236}">
+                <a16:creationId xmlns:a16="http://schemas.microsoft.com/office/drawing/2014/main" id="{37E7B1D8-1BF8-FDFE-D966-2445914F8910}"/>
+              </a:ext>
+            </a:extLst>
+          </p:cNvPr>
+          <p:cNvSpPr/>
+          <p:nvPr/>
+        </p:nvSpPr>
+        <p:spPr>
+          <a:xfrm>
+            <a:off x="9240864" y="5117743"/>
+            <a:ext cx="1164431" cy="242887"/>
+          </a:xfrm>
+          <a:prstGeom prst="roundRect">
+            <a:avLst>
+              <a:gd name="adj" fmla="val 15547"/>
+            </a:avLst>
+          </a:prstGeom>
+          <a:solidFill>
+            <a:srgbClr val="CCD497"/>
+          </a:solidFill>
+          <a:ln w="19050">
+            <a:headEnd type="none" w="med" len="med"/>
+            <a:tailEnd type="none" w="med" len="med"/>
+          </a:ln>
+        </p:spPr>
+        <p:style>
+          <a:lnRef idx="2">
+            <a:schemeClr val="dk1"/>
+          </a:lnRef>
+          <a:fillRef idx="1">
+            <a:schemeClr val="lt1"/>
+          </a:fillRef>
+          <a:effectRef idx="0">
+            <a:schemeClr val="dk1"/>
+          </a:effectRef>
+          <a:fontRef idx="minor">
+            <a:schemeClr val="dk1"/>
+          </a:fontRef>
+        </p:style>
+        <p:txBody>
+          <a:bodyPr rtlCol="0" anchor="ctr"/>
+          <a:lstStyle/>
+          <a:p>
+            <a:pPr algn="ctr"/>
+            <a:r>
+              <a:rPr lang="de-DE" sz="1100" noProof="1">
+                <a:latin typeface="+mj-lt"/>
+                <a:cs typeface="Arial" panose="020B0604020202020204" pitchFamily="34" charset="0"/>
+              </a:rPr>
+              <a:t>Layer Norm</a:t>
+            </a:r>
+          </a:p>
+        </p:txBody>
+      </p:sp>
+      <p:sp>
+        <p:nvSpPr>
+          <p:cNvPr id="19" name="Rectangle: Rounded Corners 18">
+            <a:extLst>
+              <a:ext uri="{FF2B5EF4-FFF2-40B4-BE49-F238E27FC236}">
+                <a16:creationId xmlns:a16="http://schemas.microsoft.com/office/drawing/2014/main" id="{1AE337DA-87E6-6A46-773B-22A52F746B75}"/>
+              </a:ext>
+            </a:extLst>
+          </p:cNvPr>
+          <p:cNvSpPr/>
+          <p:nvPr/>
+        </p:nvSpPr>
+        <p:spPr>
+          <a:xfrm>
+            <a:off x="9257758" y="3511192"/>
+            <a:ext cx="1164431" cy="242887"/>
+          </a:xfrm>
+          <a:prstGeom prst="roundRect">
+            <a:avLst>
+              <a:gd name="adj" fmla="val 15547"/>
+            </a:avLst>
+          </a:prstGeom>
+          <a:solidFill>
+            <a:srgbClr val="CCD497"/>
+          </a:solidFill>
+          <a:ln w="19050">
+            <a:headEnd type="none" w="med" len="med"/>
+            <a:tailEnd type="none" w="med" len="med"/>
+          </a:ln>
+        </p:spPr>
+        <p:style>
+          <a:lnRef idx="2">
+            <a:schemeClr val="dk1"/>
+          </a:lnRef>
+          <a:fillRef idx="1">
+            <a:schemeClr val="lt1"/>
+          </a:fillRef>
+          <a:effectRef idx="0">
+            <a:schemeClr val="dk1"/>
+          </a:effectRef>
+          <a:fontRef idx="minor">
+            <a:schemeClr val="dk1"/>
+          </a:fontRef>
+        </p:style>
+        <p:txBody>
+          <a:bodyPr rtlCol="0" anchor="ctr"/>
+          <a:lstStyle/>
+          <a:p>
+            <a:pPr algn="ctr"/>
+            <a:r>
+              <a:rPr lang="de-DE" sz="1100" noProof="1">
+                <a:latin typeface="+mj-lt"/>
+                <a:cs typeface="Arial" panose="020B0604020202020204" pitchFamily="34" charset="0"/>
+              </a:rPr>
+              <a:t>Layer Norm</a:t>
+            </a:r>
+          </a:p>
+        </p:txBody>
+      </p:sp>
+      <p:cxnSp>
+        <p:nvCxnSpPr>
+          <p:cNvPr id="241" name="Straight Arrow Connector 240">
+            <a:extLst>
+              <a:ext uri="{FF2B5EF4-FFF2-40B4-BE49-F238E27FC236}">
+                <a16:creationId xmlns:a16="http://schemas.microsoft.com/office/drawing/2014/main" id="{647D61CA-2D51-3BFE-D9EB-260D494A7DAC}"/>
+              </a:ext>
+            </a:extLst>
+          </p:cNvPr>
+          <p:cNvCxnSpPr>
+            <a:cxnSpLocks/>
+            <a:stCxn id="19" idx="0"/>
+            <a:endCxn id="66" idx="2"/>
+          </p:cNvCxnSpPr>
+          <p:nvPr/>
+        </p:nvCxnSpPr>
+        <p:spPr>
+          <a:xfrm flipV="1">
+            <a:off x="9839974" y="3418722"/>
+            <a:ext cx="0" cy="92470"/>
+          </a:xfrm>
+          <a:prstGeom prst="straightConnector1">
+            <a:avLst/>
+          </a:prstGeom>
+          <a:ln w="12700">
+            <a:solidFill>
+              <a:schemeClr val="tx1"/>
+            </a:solidFill>
+            <a:tailEnd type="triangle"/>
+          </a:ln>
+        </p:spPr>
+        <p:style>
+          <a:lnRef idx="1">
+            <a:schemeClr val="dk1"/>
+          </a:lnRef>
+          <a:fillRef idx="0">
+            <a:schemeClr val="dk1"/>
+          </a:fillRef>
+          <a:effectRef idx="0">
+            <a:schemeClr val="dk1"/>
+          </a:effectRef>
+          <a:fontRef idx="minor">
+            <a:schemeClr val="tx1"/>
+          </a:fontRef>
+        </p:style>
+      </p:cxnSp>
+      <p:cxnSp>
+        <p:nvCxnSpPr>
+          <p:cNvPr id="255" name="Straight Arrow Connector 254">
+            <a:extLst>
+              <a:ext uri="{FF2B5EF4-FFF2-40B4-BE49-F238E27FC236}">
+                <a16:creationId xmlns:a16="http://schemas.microsoft.com/office/drawing/2014/main" id="{37A65A15-9D02-19D0-A9DA-DEA04BF5E7CC}"/>
+              </a:ext>
+            </a:extLst>
+          </p:cNvPr>
+          <p:cNvCxnSpPr>
+            <a:cxnSpLocks/>
+            <a:stCxn id="61" idx="0"/>
+            <a:endCxn id="6" idx="2"/>
+          </p:cNvCxnSpPr>
+          <p:nvPr/>
+        </p:nvCxnSpPr>
+        <p:spPr>
+          <a:xfrm flipV="1">
+            <a:off x="9823080" y="5360630"/>
+            <a:ext cx="0" cy="318969"/>
+          </a:xfrm>
+          <a:prstGeom prst="straightConnector1">
+            <a:avLst/>
+          </a:prstGeom>
+          <a:ln w="12700">
+            <a:solidFill>
+              <a:schemeClr val="tx1"/>
+            </a:solidFill>
+            <a:tailEnd type="triangle"/>
+          </a:ln>
+        </p:spPr>
+        <p:style>
+          <a:lnRef idx="1">
+            <a:schemeClr val="dk1"/>
+          </a:lnRef>
+          <a:fillRef idx="0">
+            <a:schemeClr val="dk1"/>
+          </a:fillRef>
+          <a:effectRef idx="0">
+            <a:schemeClr val="dk1"/>
+          </a:effectRef>
+          <a:fontRef idx="minor">
+            <a:schemeClr val="tx1"/>
+          </a:fontRef>
+        </p:style>
+      </p:cxnSp>
+      <p:cxnSp>
+        <p:nvCxnSpPr>
+          <p:cNvPr id="39" name="Connector: Elbow 38">
+            <a:extLst>
+              <a:ext uri="{FF2B5EF4-FFF2-40B4-BE49-F238E27FC236}">
+                <a16:creationId xmlns:a16="http://schemas.microsoft.com/office/drawing/2014/main" id="{F9F26774-D4F9-74AB-B575-2F6F78375116}"/>
+              </a:ext>
+            </a:extLst>
+          </p:cNvPr>
+          <p:cNvCxnSpPr>
+            <a:cxnSpLocks/>
+            <a:stCxn id="61" idx="0"/>
+            <a:endCxn id="63" idx="1"/>
+          </p:cNvCxnSpPr>
+          <p:nvPr/>
+        </p:nvCxnSpPr>
+        <p:spPr>
+          <a:xfrm rot="16200000" flipV="1">
+            <a:off x="8707438" y="4563957"/>
+            <a:ext cx="1665963" cy="565322"/>
+          </a:xfrm>
+          <a:prstGeom prst="bentConnector4">
+            <a:avLst>
+              <a:gd name="adj1" fmla="val 9586"/>
+              <a:gd name="adj2" fmla="val 141459"/>
+            </a:avLst>
+          </a:prstGeom>
+          <a:ln w="12700">
+            <a:solidFill>
+              <a:schemeClr val="tx1"/>
+            </a:solidFill>
+            <a:tailEnd type="triangle"/>
+          </a:ln>
+        </p:spPr>
+        <p:style>
+          <a:lnRef idx="1">
+            <a:schemeClr val="accent1"/>
+          </a:lnRef>
+          <a:fillRef idx="0">
+            <a:schemeClr val="accent1"/>
+          </a:fillRef>
+          <a:effectRef idx="0">
+            <a:schemeClr val="accent1"/>
+          </a:effectRef>
+          <a:fontRef idx="minor">
+            <a:schemeClr val="tx1"/>
+          </a:fontRef>
+        </p:style>
+      </p:cxnSp>
+      <p:cxnSp>
+        <p:nvCxnSpPr>
+          <p:cNvPr id="264" name="Connector: Elbow 263">
+            <a:extLst>
+              <a:ext uri="{FF2B5EF4-FFF2-40B4-BE49-F238E27FC236}">
+                <a16:creationId xmlns:a16="http://schemas.microsoft.com/office/drawing/2014/main" id="{16F9191E-FF68-381B-DBB7-8107DC518EDC}"/>
+              </a:ext>
+            </a:extLst>
+          </p:cNvPr>
+          <p:cNvCxnSpPr>
+            <a:stCxn id="6" idx="0"/>
+          </p:cNvCxnSpPr>
+          <p:nvPr/>
+        </p:nvCxnSpPr>
+        <p:spPr>
+          <a:xfrm rot="16200000" flipV="1">
+            <a:off x="9459510" y="4754172"/>
+            <a:ext cx="412393" cy="314749"/>
+          </a:xfrm>
+          <a:prstGeom prst="bentConnector3">
+            <a:avLst>
+              <a:gd name="adj1" fmla="val 37297"/>
+            </a:avLst>
+          </a:prstGeom>
+          <a:ln w="12700">
+            <a:tailEnd type="triangle"/>
+          </a:ln>
+        </p:spPr>
+        <p:style>
+          <a:lnRef idx="1">
+            <a:schemeClr val="dk1"/>
+          </a:lnRef>
+          <a:fillRef idx="0">
+            <a:schemeClr val="dk1"/>
+          </a:fillRef>
+          <a:effectRef idx="0">
+            <a:schemeClr val="dk1"/>
+          </a:effectRef>
+          <a:fontRef idx="minor">
+            <a:schemeClr val="tx1"/>
+          </a:fontRef>
+        </p:style>
+      </p:cxnSp>
     </p:spTree>
     <p:extLst>
       <p:ext uri="{BB962C8B-B14F-4D97-AF65-F5344CB8AC3E}">

</xml_diff>

<commit_message>
Fix visualizations of Transformer 🤖
</commit_message>
<xml_diff>
--- a/reports/Graphs/diagrams.pptx
+++ b/reports/Graphs/diagrams.pptx
@@ -133,7 +133,7 @@
   <pc:docChgLst>
     <pc:chgData name="Markus Bilz" userId="a36021e4bdb9349f" providerId="LiveId" clId="{F9F2BE70-AAED-47FD-A055-7B08EB1371A3}"/>
     <pc:docChg chg="undo custSel addSld modSld sldOrd">
-      <pc:chgData name="Markus Bilz" userId="a36021e4bdb9349f" providerId="LiveId" clId="{F9F2BE70-AAED-47FD-A055-7B08EB1371A3}" dt="2023-02-18T15:27:46.052" v="1534" actId="478"/>
+      <pc:chgData name="Markus Bilz" userId="a36021e4bdb9349f" providerId="LiveId" clId="{F9F2BE70-AAED-47FD-A055-7B08EB1371A3}" dt="2023-02-18T15:57:02.801" v="1567" actId="20577"/>
       <pc:docMkLst>
         <pc:docMk/>
       </pc:docMkLst>
@@ -215,7 +215,7 @@
         </pc:cxnChg>
       </pc:sldChg>
       <pc:sldChg chg="addSp delSp modSp mod">
-        <pc:chgData name="Markus Bilz" userId="a36021e4bdb9349f" providerId="LiveId" clId="{F9F2BE70-AAED-47FD-A055-7B08EB1371A3}" dt="2023-02-18T15:27:46.052" v="1534" actId="478"/>
+        <pc:chgData name="Markus Bilz" userId="a36021e4bdb9349f" providerId="LiveId" clId="{F9F2BE70-AAED-47FD-A055-7B08EB1371A3}" dt="2023-02-18T15:57:02.801" v="1567" actId="20577"/>
         <pc:sldMkLst>
           <pc:docMk/>
           <pc:sldMk cId="2878173059" sldId="261"/>
@@ -237,7 +237,7 @@
           </ac:spMkLst>
         </pc:spChg>
         <pc:spChg chg="mod">
-          <ac:chgData name="Markus Bilz" userId="a36021e4bdb9349f" providerId="LiveId" clId="{F9F2BE70-AAED-47FD-A055-7B08EB1371A3}" dt="2023-02-18T15:23:06.984" v="1509" actId="1076"/>
+          <ac:chgData name="Markus Bilz" userId="a36021e4bdb9349f" providerId="LiveId" clId="{F9F2BE70-AAED-47FD-A055-7B08EB1371A3}" dt="2023-02-18T15:57:02.801" v="1567" actId="20577"/>
           <ac:spMkLst>
             <pc:docMk/>
             <pc:sldMk cId="2878173059" sldId="261"/>
@@ -25005,8 +25005,8 @@
         </p:nvSpPr>
         <p:spPr>
           <a:xfrm>
-            <a:off x="9198385" y="815954"/>
-            <a:ext cx="1196340" cy="523220"/>
+            <a:off x="8309499" y="1091161"/>
+            <a:ext cx="3080551" cy="307777"/>
           </a:xfrm>
           <a:prstGeom prst="rect">
             <a:avLst/>
@@ -25021,19 +25021,22 @@
           <a:p>
             <a:pPr algn="ctr"/>
             <a:r>
+              <a:rPr lang="de-DE" sz="1400" dirty="0" err="1">
+                <a:latin typeface="+mj-lt"/>
+              </a:rPr>
+              <a:t>output</a:t>
+            </a:r>
+            <a:r>
               <a:rPr lang="de-DE" sz="1400" dirty="0">
                 <a:latin typeface="+mj-lt"/>
               </a:rPr>
-              <a:t>Output</a:t>
+              <a:t> </a:t>
             </a:r>
-          </a:p>
-          <a:p>
-            <a:pPr algn="ctr"/>
             <a:r>
               <a:rPr lang="de-DE" sz="1400" dirty="0" err="1">
                 <a:latin typeface="+mj-lt"/>
               </a:rPr>
-              <a:t>Probabilities</a:t>
+              <a:t>probabilities</a:t>
             </a:r>
             <a:endParaRPr lang="en-GB" sz="1400" dirty="0">
               <a:latin typeface="+mj-lt"/>

</xml_diff>

<commit_message>
Add visualizations of Transformer for tabular data🖼️ (#165)
Addresses #10 .
</commit_message>
<xml_diff>
--- a/reports/Graphs/diagrams.pptx
+++ b/reports/Graphs/diagrams.pptx
@@ -123,7 +123,7 @@
 <file path=ppt/revisionInfo.xml><?xml version="1.0" encoding="utf-8"?>
 <p1510:revInfo xmlns:a="http://schemas.openxmlformats.org/drawingml/2006/main" xmlns:r="http://schemas.openxmlformats.org/officeDocument/2006/relationships" xmlns:p1510="http://schemas.microsoft.com/office/powerpoint/2015/10/main">
   <p1510:revLst>
-    <p1510:client id="{F9F2BE70-AAED-47FD-A055-7B08EB1371A3}" v="137" dt="2023-02-13T09:48:54.349"/>
+    <p1510:client id="{F9F2BE70-AAED-47FD-A055-7B08EB1371A3}" v="142" dt="2023-02-18T15:20:12.629"/>
   </p1510:revLst>
 </p1510:revInfo>
 </file>
@@ -133,7 +133,7 @@
   <pc:docChgLst>
     <pc:chgData name="Markus Bilz" userId="a36021e4bdb9349f" providerId="LiveId" clId="{F9F2BE70-AAED-47FD-A055-7B08EB1371A3}"/>
     <pc:docChg chg="undo custSel addSld modSld sldOrd">
-      <pc:chgData name="Markus Bilz" userId="a36021e4bdb9349f" providerId="LiveId" clId="{F9F2BE70-AAED-47FD-A055-7B08EB1371A3}" dt="2023-02-14T08:31:01.716" v="1397" actId="108"/>
+      <pc:chgData name="Markus Bilz" userId="a36021e4bdb9349f" providerId="LiveId" clId="{F9F2BE70-AAED-47FD-A055-7B08EB1371A3}" dt="2023-02-18T15:57:02.801" v="1567" actId="20577"/>
       <pc:docMkLst>
         <pc:docMk/>
       </pc:docMkLst>
@@ -215,17 +215,129 @@
         </pc:cxnChg>
       </pc:sldChg>
       <pc:sldChg chg="addSp delSp modSp mod">
-        <pc:chgData name="Markus Bilz" userId="a36021e4bdb9349f" providerId="LiveId" clId="{F9F2BE70-AAED-47FD-A055-7B08EB1371A3}" dt="2023-01-31T14:58:11.698" v="242" actId="1076"/>
+        <pc:chgData name="Markus Bilz" userId="a36021e4bdb9349f" providerId="LiveId" clId="{F9F2BE70-AAED-47FD-A055-7B08EB1371A3}" dt="2023-02-18T15:57:02.801" v="1567" actId="20577"/>
         <pc:sldMkLst>
           <pc:docMk/>
           <pc:sldMk cId="2878173059" sldId="261"/>
         </pc:sldMkLst>
+        <pc:spChg chg="add mod">
+          <ac:chgData name="Markus Bilz" userId="a36021e4bdb9349f" providerId="LiveId" clId="{F9F2BE70-AAED-47FD-A055-7B08EB1371A3}" dt="2023-02-18T15:21:19.274" v="1505" actId="1076"/>
+          <ac:spMkLst>
+            <pc:docMk/>
+            <pc:sldMk cId="2878173059" sldId="261"/>
+            <ac:spMk id="6" creationId="{37E7B1D8-1BF8-FDFE-D966-2445914F8910}"/>
+          </ac:spMkLst>
+        </pc:spChg>
+        <pc:spChg chg="add mod">
+          <ac:chgData name="Markus Bilz" userId="a36021e4bdb9349f" providerId="LiveId" clId="{F9F2BE70-AAED-47FD-A055-7B08EB1371A3}" dt="2023-02-18T15:19:12.474" v="1476" actId="1076"/>
+          <ac:spMkLst>
+            <pc:docMk/>
+            <pc:sldMk cId="2878173059" sldId="261"/>
+            <ac:spMk id="19" creationId="{1AE337DA-87E6-6A46-773B-22A52F746B75}"/>
+          </ac:spMkLst>
+        </pc:spChg>
+        <pc:spChg chg="mod">
+          <ac:chgData name="Markus Bilz" userId="a36021e4bdb9349f" providerId="LiveId" clId="{F9F2BE70-AAED-47FD-A055-7B08EB1371A3}" dt="2023-02-18T15:57:02.801" v="1567" actId="20577"/>
+          <ac:spMkLst>
+            <pc:docMk/>
+            <pc:sldMk cId="2878173059" sldId="261"/>
+            <ac:spMk id="23" creationId="{8F8800C0-1CF3-F5CA-4394-35FFEBF5E5A3}"/>
+          </ac:spMkLst>
+        </pc:spChg>
+        <pc:spChg chg="mod">
+          <ac:chgData name="Markus Bilz" userId="a36021e4bdb9349f" providerId="LiveId" clId="{F9F2BE70-AAED-47FD-A055-7B08EB1371A3}" dt="2023-02-18T15:23:06.984" v="1509" actId="1076"/>
+          <ac:spMkLst>
+            <pc:docMk/>
+            <pc:sldMk cId="2878173059" sldId="261"/>
+            <ac:spMk id="25" creationId="{64F421B8-8DB7-34EA-C921-76E85E24F0A2}"/>
+          </ac:spMkLst>
+        </pc:spChg>
+        <pc:spChg chg="mod">
+          <ac:chgData name="Markus Bilz" userId="a36021e4bdb9349f" providerId="LiveId" clId="{F9F2BE70-AAED-47FD-A055-7B08EB1371A3}" dt="2023-02-18T15:23:06.984" v="1509" actId="1076"/>
+          <ac:spMkLst>
+            <pc:docMk/>
+            <pc:sldMk cId="2878173059" sldId="261"/>
+            <ac:spMk id="27" creationId="{A827FEA6-F17E-CA57-7B37-D1BAA16BED3F}"/>
+          </ac:spMkLst>
+        </pc:spChg>
+        <pc:spChg chg="mod">
+          <ac:chgData name="Markus Bilz" userId="a36021e4bdb9349f" providerId="LiveId" clId="{F9F2BE70-AAED-47FD-A055-7B08EB1371A3}" dt="2023-02-18T15:23:06.984" v="1509" actId="1076"/>
+          <ac:spMkLst>
+            <pc:docMk/>
+            <pc:sldMk cId="2878173059" sldId="261"/>
+            <ac:spMk id="31" creationId="{F00536E0-E48A-70AD-633B-4384867F30A5}"/>
+          </ac:spMkLst>
+        </pc:spChg>
+        <pc:spChg chg="mod">
+          <ac:chgData name="Markus Bilz" userId="a36021e4bdb9349f" providerId="LiveId" clId="{F9F2BE70-AAED-47FD-A055-7B08EB1371A3}" dt="2023-02-18T15:19:43.933" v="1485" actId="1076"/>
+          <ac:spMkLst>
+            <pc:docMk/>
+            <pc:sldMk cId="2878173059" sldId="261"/>
+            <ac:spMk id="61" creationId="{C00FF0EF-2F9D-F942-4F6E-0006C5307219}"/>
+          </ac:spMkLst>
+        </pc:spChg>
+        <pc:spChg chg="mod">
+          <ac:chgData name="Markus Bilz" userId="a36021e4bdb9349f" providerId="LiveId" clId="{F9F2BE70-AAED-47FD-A055-7B08EB1371A3}" dt="2023-02-18T15:19:25.064" v="1479" actId="1076"/>
+          <ac:spMkLst>
+            <pc:docMk/>
+            <pc:sldMk cId="2878173059" sldId="261"/>
+            <ac:spMk id="62" creationId="{C0641B72-A83F-2F0C-92F9-BC5B309B52B7}"/>
+          </ac:spMkLst>
+        </pc:spChg>
+        <pc:spChg chg="mod">
+          <ac:chgData name="Markus Bilz" userId="a36021e4bdb9349f" providerId="LiveId" clId="{F9F2BE70-AAED-47FD-A055-7B08EB1371A3}" dt="2023-02-18T15:19:14.712" v="1477" actId="1076"/>
+          <ac:spMkLst>
+            <pc:docMk/>
+            <pc:sldMk cId="2878173059" sldId="261"/>
+            <ac:spMk id="63" creationId="{2E94D5CD-A3D0-17C2-6DA2-6C898CDD5E11}"/>
+          </ac:spMkLst>
+        </pc:spChg>
+        <pc:spChg chg="mod">
+          <ac:chgData name="Markus Bilz" userId="a36021e4bdb9349f" providerId="LiveId" clId="{F9F2BE70-AAED-47FD-A055-7B08EB1371A3}" dt="2023-02-18T15:18:54.869" v="1471" actId="1076"/>
+          <ac:spMkLst>
+            <pc:docMk/>
+            <pc:sldMk cId="2878173059" sldId="261"/>
+            <ac:spMk id="66" creationId="{7343FA96-205F-7DD7-A660-9E1AE7A16CDD}"/>
+          </ac:spMkLst>
+        </pc:spChg>
+        <pc:spChg chg="mod">
+          <ac:chgData name="Markus Bilz" userId="a36021e4bdb9349f" providerId="LiveId" clId="{F9F2BE70-AAED-47FD-A055-7B08EB1371A3}" dt="2023-02-18T15:17:22.593" v="1435" actId="1076"/>
+          <ac:spMkLst>
+            <pc:docMk/>
+            <pc:sldMk cId="2878173059" sldId="261"/>
+            <ac:spMk id="67" creationId="{542CA32F-221D-DD49-7091-4AFC3E421628}"/>
+          </ac:spMkLst>
+        </pc:spChg>
+        <pc:spChg chg="mod">
+          <ac:chgData name="Markus Bilz" userId="a36021e4bdb9349f" providerId="LiveId" clId="{F9F2BE70-AAED-47FD-A055-7B08EB1371A3}" dt="2023-02-18T15:14:40.440" v="1404" actId="14100"/>
+          <ac:spMkLst>
+            <pc:docMk/>
+            <pc:sldMk cId="2878173059" sldId="261"/>
+            <ac:spMk id="80" creationId="{83641231-252D-FDB3-0C23-5CDCCDA26F9E}"/>
+          </ac:spMkLst>
+        </pc:spChg>
+        <pc:spChg chg="mod">
+          <ac:chgData name="Markus Bilz" userId="a36021e4bdb9349f" providerId="LiveId" clId="{F9F2BE70-AAED-47FD-A055-7B08EB1371A3}" dt="2023-02-18T15:23:21.306" v="1511" actId="1076"/>
+          <ac:spMkLst>
+            <pc:docMk/>
+            <pc:sldMk cId="2878173059" sldId="261"/>
+            <ac:spMk id="162" creationId="{C8C65B08-14FE-FF44-47C5-FB5077BC12AB}"/>
+          </ac:spMkLst>
+        </pc:spChg>
+        <pc:spChg chg="mod">
+          <ac:chgData name="Markus Bilz" userId="a36021e4bdb9349f" providerId="LiveId" clId="{F9F2BE70-AAED-47FD-A055-7B08EB1371A3}" dt="2023-02-18T15:21:06.412" v="1504" actId="1076"/>
+          <ac:spMkLst>
+            <pc:docMk/>
+            <pc:sldMk cId="2878173059" sldId="261"/>
+            <ac:spMk id="233" creationId="{22826292-593A-4357-FEEB-B7D5B39875EF}"/>
+          </ac:spMkLst>
+        </pc:spChg>
         <pc:spChg chg="mod">
           <ac:chgData name="Markus Bilz" userId="a36021e4bdb9349f" providerId="LiveId" clId="{F9F2BE70-AAED-47FD-A055-7B08EB1371A3}" dt="2023-01-31T14:54:07.949" v="231" actId="1076"/>
           <ac:spMkLst>
             <pc:docMk/>
             <pc:sldMk cId="2878173059" sldId="261"/>
-            <ac:spMk id="23" creationId="{8F8800C0-1CF3-F5CA-4394-35FFEBF5E5A3}"/>
+            <ac:spMk id="266" creationId="{581F8540-556F-156B-61E8-585BC8A175EB}"/>
           </ac:spMkLst>
         </pc:spChg>
         <pc:spChg chg="mod">
@@ -233,113 +345,25 @@
           <ac:spMkLst>
             <pc:docMk/>
             <pc:sldMk cId="2878173059" sldId="261"/>
-            <ac:spMk id="25" creationId="{64F421B8-8DB7-34EA-C921-76E85E24F0A2}"/>
+            <ac:spMk id="267" creationId="{457B388C-7929-72CD-0559-53E0AA934C74}"/>
           </ac:spMkLst>
         </pc:spChg>
         <pc:spChg chg="mod">
-          <ac:chgData name="Markus Bilz" userId="a36021e4bdb9349f" providerId="LiveId" clId="{F9F2BE70-AAED-47FD-A055-7B08EB1371A3}" dt="2023-01-31T14:54:07.949" v="231" actId="1076"/>
-          <ac:spMkLst>
-            <pc:docMk/>
-            <pc:sldMk cId="2878173059" sldId="261"/>
-            <ac:spMk id="27" creationId="{A827FEA6-F17E-CA57-7B37-D1BAA16BED3F}"/>
-          </ac:spMkLst>
-        </pc:spChg>
-        <pc:spChg chg="mod">
-          <ac:chgData name="Markus Bilz" userId="a36021e4bdb9349f" providerId="LiveId" clId="{F9F2BE70-AAED-47FD-A055-7B08EB1371A3}" dt="2023-01-31T14:54:07.949" v="231" actId="1076"/>
-          <ac:spMkLst>
-            <pc:docMk/>
-            <pc:sldMk cId="2878173059" sldId="261"/>
-            <ac:spMk id="31" creationId="{F00536E0-E48A-70AD-633B-4384867F30A5}"/>
-          </ac:spMkLst>
-        </pc:spChg>
-        <pc:spChg chg="mod">
-          <ac:chgData name="Markus Bilz" userId="a36021e4bdb9349f" providerId="LiveId" clId="{F9F2BE70-AAED-47FD-A055-7B08EB1371A3}" dt="2023-01-31T14:54:07.949" v="231" actId="1076"/>
-          <ac:spMkLst>
-            <pc:docMk/>
-            <pc:sldMk cId="2878173059" sldId="261"/>
-            <ac:spMk id="61" creationId="{C00FF0EF-2F9D-F942-4F6E-0006C5307219}"/>
-          </ac:spMkLst>
-        </pc:spChg>
-        <pc:spChg chg="mod">
-          <ac:chgData name="Markus Bilz" userId="a36021e4bdb9349f" providerId="LiveId" clId="{F9F2BE70-AAED-47FD-A055-7B08EB1371A3}" dt="2023-01-31T14:54:07.949" v="231" actId="1076"/>
-          <ac:spMkLst>
-            <pc:docMk/>
-            <pc:sldMk cId="2878173059" sldId="261"/>
-            <ac:spMk id="62" creationId="{C0641B72-A83F-2F0C-92F9-BC5B309B52B7}"/>
-          </ac:spMkLst>
-        </pc:spChg>
-        <pc:spChg chg="mod">
-          <ac:chgData name="Markus Bilz" userId="a36021e4bdb9349f" providerId="LiveId" clId="{F9F2BE70-AAED-47FD-A055-7B08EB1371A3}" dt="2023-01-31T14:54:07.949" v="231" actId="1076"/>
-          <ac:spMkLst>
-            <pc:docMk/>
-            <pc:sldMk cId="2878173059" sldId="261"/>
-            <ac:spMk id="63" creationId="{2E94D5CD-A3D0-17C2-6DA2-6C898CDD5E11}"/>
-          </ac:spMkLst>
-        </pc:spChg>
-        <pc:spChg chg="mod">
-          <ac:chgData name="Markus Bilz" userId="a36021e4bdb9349f" providerId="LiveId" clId="{F9F2BE70-AAED-47FD-A055-7B08EB1371A3}" dt="2023-01-31T14:54:07.949" v="231" actId="1076"/>
-          <ac:spMkLst>
-            <pc:docMk/>
-            <pc:sldMk cId="2878173059" sldId="261"/>
-            <ac:spMk id="66" creationId="{7343FA96-205F-7DD7-A660-9E1AE7A16CDD}"/>
-          </ac:spMkLst>
-        </pc:spChg>
-        <pc:spChg chg="mod">
-          <ac:chgData name="Markus Bilz" userId="a36021e4bdb9349f" providerId="LiveId" clId="{F9F2BE70-AAED-47FD-A055-7B08EB1371A3}" dt="2023-01-31T14:54:07.949" v="231" actId="1076"/>
-          <ac:spMkLst>
-            <pc:docMk/>
-            <pc:sldMk cId="2878173059" sldId="261"/>
-            <ac:spMk id="67" creationId="{542CA32F-221D-DD49-7091-4AFC3E421628}"/>
-          </ac:spMkLst>
-        </pc:spChg>
-        <pc:spChg chg="mod">
-          <ac:chgData name="Markus Bilz" userId="a36021e4bdb9349f" providerId="LiveId" clId="{F9F2BE70-AAED-47FD-A055-7B08EB1371A3}" dt="2023-01-31T14:54:07.949" v="231" actId="1076"/>
-          <ac:spMkLst>
-            <pc:docMk/>
-            <pc:sldMk cId="2878173059" sldId="261"/>
-            <ac:spMk id="80" creationId="{83641231-252D-FDB3-0C23-5CDCCDA26F9E}"/>
-          </ac:spMkLst>
-        </pc:spChg>
-        <pc:spChg chg="mod">
-          <ac:chgData name="Markus Bilz" userId="a36021e4bdb9349f" providerId="LiveId" clId="{F9F2BE70-AAED-47FD-A055-7B08EB1371A3}" dt="2023-01-31T14:54:07.949" v="231" actId="1076"/>
-          <ac:spMkLst>
-            <pc:docMk/>
-            <pc:sldMk cId="2878173059" sldId="261"/>
-            <ac:spMk id="162" creationId="{C8C65B08-14FE-FF44-47C5-FB5077BC12AB}"/>
-          </ac:spMkLst>
-        </pc:spChg>
-        <pc:spChg chg="mod">
-          <ac:chgData name="Markus Bilz" userId="a36021e4bdb9349f" providerId="LiveId" clId="{F9F2BE70-AAED-47FD-A055-7B08EB1371A3}" dt="2023-01-31T14:54:07.949" v="231" actId="1076"/>
-          <ac:spMkLst>
-            <pc:docMk/>
-            <pc:sldMk cId="2878173059" sldId="261"/>
-            <ac:spMk id="233" creationId="{22826292-593A-4357-FEEB-B7D5B39875EF}"/>
-          </ac:spMkLst>
-        </pc:spChg>
-        <pc:spChg chg="mod">
-          <ac:chgData name="Markus Bilz" userId="a36021e4bdb9349f" providerId="LiveId" clId="{F9F2BE70-AAED-47FD-A055-7B08EB1371A3}" dt="2023-01-31T14:54:07.949" v="231" actId="1076"/>
-          <ac:spMkLst>
-            <pc:docMk/>
-            <pc:sldMk cId="2878173059" sldId="261"/>
-            <ac:spMk id="266" creationId="{581F8540-556F-156B-61E8-585BC8A175EB}"/>
-          </ac:spMkLst>
-        </pc:spChg>
-        <pc:spChg chg="mod">
-          <ac:chgData name="Markus Bilz" userId="a36021e4bdb9349f" providerId="LiveId" clId="{F9F2BE70-AAED-47FD-A055-7B08EB1371A3}" dt="2023-01-31T14:54:07.949" v="231" actId="1076"/>
-          <ac:spMkLst>
-            <pc:docMk/>
-            <pc:sldMk cId="2878173059" sldId="261"/>
-            <ac:spMk id="267" creationId="{457B388C-7929-72CD-0559-53E0AA934C74}"/>
-          </ac:spMkLst>
-        </pc:spChg>
-        <pc:spChg chg="mod">
-          <ac:chgData name="Markus Bilz" userId="a36021e4bdb9349f" providerId="LiveId" clId="{F9F2BE70-AAED-47FD-A055-7B08EB1371A3}" dt="2023-01-31T14:54:07.949" v="231" actId="1076"/>
+          <ac:chgData name="Markus Bilz" userId="a36021e4bdb9349f" providerId="LiveId" clId="{F9F2BE70-AAED-47FD-A055-7B08EB1371A3}" dt="2023-02-18T15:26:51.611" v="1522" actId="14100"/>
           <ac:spMkLst>
             <pc:docMk/>
             <pc:sldMk cId="2878173059" sldId="261"/>
             <ac:spMk id="268" creationId="{BB1549EF-6367-5F54-69BE-C8B0CC0F2CF9}"/>
           </ac:spMkLst>
         </pc:spChg>
+        <pc:picChg chg="add mod">
+          <ac:chgData name="Markus Bilz" userId="a36021e4bdb9349f" providerId="LiveId" clId="{F9F2BE70-AAED-47FD-A055-7B08EB1371A3}" dt="2023-02-18T15:14:26.487" v="1403" actId="1076"/>
+          <ac:picMkLst>
+            <pc:docMk/>
+            <pc:sldMk cId="2878173059" sldId="261"/>
+            <ac:picMk id="5" creationId="{7295174F-DD3B-430A-4AAD-CB8716281370}"/>
+          </ac:picMkLst>
+        </pc:picChg>
         <pc:picChg chg="add del mod">
           <ac:chgData name="Markus Bilz" userId="a36021e4bdb9349f" providerId="LiveId" clId="{F9F2BE70-AAED-47FD-A055-7B08EB1371A3}" dt="2023-01-31T14:55:35.158" v="238" actId="478"/>
           <ac:picMkLst>
@@ -357,7 +381,7 @@
           </ac:picMkLst>
         </pc:picChg>
         <pc:cxnChg chg="mod">
-          <ac:chgData name="Markus Bilz" userId="a36021e4bdb9349f" providerId="LiveId" clId="{F9F2BE70-AAED-47FD-A055-7B08EB1371A3}" dt="2023-01-31T14:54:07.949" v="231" actId="1076"/>
+          <ac:chgData name="Markus Bilz" userId="a36021e4bdb9349f" providerId="LiveId" clId="{F9F2BE70-AAED-47FD-A055-7B08EB1371A3}" dt="2023-02-18T15:23:06.984" v="1509" actId="1076"/>
           <ac:cxnSpMkLst>
             <pc:docMk/>
             <pc:sldMk cId="2878173059" sldId="261"/>
@@ -365,7 +389,7 @@
           </ac:cxnSpMkLst>
         </pc:cxnChg>
         <pc:cxnChg chg="mod">
-          <ac:chgData name="Markus Bilz" userId="a36021e4bdb9349f" providerId="LiveId" clId="{F9F2BE70-AAED-47FD-A055-7B08EB1371A3}" dt="2023-01-31T14:54:07.949" v="231" actId="1076"/>
+          <ac:chgData name="Markus Bilz" userId="a36021e4bdb9349f" providerId="LiveId" clId="{F9F2BE70-AAED-47FD-A055-7B08EB1371A3}" dt="2023-02-18T15:23:06.984" v="1509" actId="1076"/>
           <ac:cxnSpMkLst>
             <pc:docMk/>
             <pc:sldMk cId="2878173059" sldId="261"/>
@@ -373,83 +397,131 @@
           </ac:cxnSpMkLst>
         </pc:cxnChg>
         <pc:cxnChg chg="mod">
-          <ac:chgData name="Markus Bilz" userId="a36021e4bdb9349f" providerId="LiveId" clId="{F9F2BE70-AAED-47FD-A055-7B08EB1371A3}" dt="2023-01-31T14:54:07.949" v="231" actId="1076"/>
+          <ac:chgData name="Markus Bilz" userId="a36021e4bdb9349f" providerId="LiveId" clId="{F9F2BE70-AAED-47FD-A055-7B08EB1371A3}" dt="2023-02-18T15:23:06.984" v="1509" actId="1076"/>
           <ac:cxnSpMkLst>
             <pc:docMk/>
             <pc:sldMk cId="2878173059" sldId="261"/>
             <ac:cxnSpMk id="29" creationId="{ADCE3843-0FDE-285C-7733-2A6A7A7A0AC7}"/>
           </ac:cxnSpMkLst>
         </pc:cxnChg>
+        <pc:cxnChg chg="add mod">
+          <ac:chgData name="Markus Bilz" userId="a36021e4bdb9349f" providerId="LiveId" clId="{F9F2BE70-AAED-47FD-A055-7B08EB1371A3}" dt="2023-02-18T15:25:41.862" v="1515" actId="14100"/>
+          <ac:cxnSpMkLst>
+            <pc:docMk/>
+            <pc:sldMk cId="2878173059" sldId="261"/>
+            <ac:cxnSpMk id="39" creationId="{F9F26774-D4F9-74AB-B575-2F6F78375116}"/>
+          </ac:cxnSpMkLst>
+        </pc:cxnChg>
+        <pc:cxnChg chg="mod">
+          <ac:chgData name="Markus Bilz" userId="a36021e4bdb9349f" providerId="LiveId" clId="{F9F2BE70-AAED-47FD-A055-7B08EB1371A3}" dt="2023-02-18T15:19:14.712" v="1477" actId="1076"/>
+          <ac:cxnSpMkLst>
+            <pc:docMk/>
+            <pc:sldMk cId="2878173059" sldId="261"/>
+            <ac:cxnSpMk id="65" creationId="{28EE4F0F-C008-F011-6402-C667E69D8B21}"/>
+          </ac:cxnSpMkLst>
+        </pc:cxnChg>
+        <pc:cxnChg chg="mod">
+          <ac:chgData name="Markus Bilz" userId="a36021e4bdb9349f" providerId="LiveId" clId="{F9F2BE70-AAED-47FD-A055-7B08EB1371A3}" dt="2023-02-18T15:23:21.306" v="1511" actId="1076"/>
+          <ac:cxnSpMkLst>
+            <pc:docMk/>
+            <pc:sldMk cId="2878173059" sldId="261"/>
+            <ac:cxnSpMk id="70" creationId="{66C88C84-34E5-DBC0-F118-6C49B6374993}"/>
+          </ac:cxnSpMkLst>
+        </pc:cxnChg>
+        <pc:cxnChg chg="del mod">
+          <ac:chgData name="Markus Bilz" userId="a36021e4bdb9349f" providerId="LiveId" clId="{F9F2BE70-AAED-47FD-A055-7B08EB1371A3}" dt="2023-02-18T15:27:46.052" v="1534" actId="478"/>
+          <ac:cxnSpMkLst>
+            <pc:docMk/>
+            <pc:sldMk cId="2878173059" sldId="261"/>
+            <ac:cxnSpMk id="101" creationId="{C9A8426B-62F8-8EC1-CB9F-6E9E7AD7B88A}"/>
+          </ac:cxnSpMkLst>
+        </pc:cxnChg>
+        <pc:cxnChg chg="mod">
+          <ac:chgData name="Markus Bilz" userId="a36021e4bdb9349f" providerId="LiveId" clId="{F9F2BE70-AAED-47FD-A055-7B08EB1371A3}" dt="2023-02-18T15:18:54.869" v="1471" actId="1076"/>
+          <ac:cxnSpMkLst>
+            <pc:docMk/>
+            <pc:sldMk cId="2878173059" sldId="261"/>
+            <ac:cxnSpMk id="214" creationId="{0D81CBA5-C3C3-5317-A8A3-8CD616613EDE}"/>
+          </ac:cxnSpMkLst>
+        </pc:cxnChg>
+        <pc:cxnChg chg="mod">
+          <ac:chgData name="Markus Bilz" userId="a36021e4bdb9349f" providerId="LiveId" clId="{F9F2BE70-AAED-47FD-A055-7B08EB1371A3}" dt="2023-02-18T15:19:25.064" v="1479" actId="1076"/>
+          <ac:cxnSpMkLst>
+            <pc:docMk/>
+            <pc:sldMk cId="2878173059" sldId="261"/>
+            <ac:cxnSpMk id="217" creationId="{AF17FB98-C9BC-D133-7339-F0C5698E6493}"/>
+          </ac:cxnSpMkLst>
+        </pc:cxnChg>
+        <pc:cxnChg chg="mod">
+          <ac:chgData name="Markus Bilz" userId="a36021e4bdb9349f" providerId="LiveId" clId="{F9F2BE70-AAED-47FD-A055-7B08EB1371A3}" dt="2023-02-18T15:19:18.518" v="1478" actId="14100"/>
+          <ac:cxnSpMkLst>
+            <pc:docMk/>
+            <pc:sldMk cId="2878173059" sldId="261"/>
+            <ac:cxnSpMk id="220" creationId="{F71C02ED-6336-D99D-2AAA-7DC8A5931246}"/>
+          </ac:cxnSpMkLst>
+        </pc:cxnChg>
+        <pc:cxnChg chg="del mod">
+          <ac:chgData name="Markus Bilz" userId="a36021e4bdb9349f" providerId="LiveId" clId="{F9F2BE70-AAED-47FD-A055-7B08EB1371A3}" dt="2023-02-18T15:19:30.778" v="1480" actId="478"/>
+          <ac:cxnSpMkLst>
+            <pc:docMk/>
+            <pc:sldMk cId="2878173059" sldId="261"/>
+            <ac:cxnSpMk id="226" creationId="{470B009F-AEBC-B736-2071-04407321C553}"/>
+          </ac:cxnSpMkLst>
+        </pc:cxnChg>
+        <pc:cxnChg chg="add mod">
+          <ac:chgData name="Markus Bilz" userId="a36021e4bdb9349f" providerId="LiveId" clId="{F9F2BE70-AAED-47FD-A055-7B08EB1371A3}" dt="2023-02-18T15:19:12.474" v="1476" actId="1076"/>
+          <ac:cxnSpMkLst>
+            <pc:docMk/>
+            <pc:sldMk cId="2878173059" sldId="261"/>
+            <ac:cxnSpMk id="241" creationId="{647D61CA-2D51-3BFE-D9EB-260D494A7DAC}"/>
+          </ac:cxnSpMkLst>
+        </pc:cxnChg>
         <pc:cxnChg chg="mod">
           <ac:chgData name="Markus Bilz" userId="a36021e4bdb9349f" providerId="LiveId" clId="{F9F2BE70-AAED-47FD-A055-7B08EB1371A3}" dt="2023-01-31T14:54:07.949" v="231" actId="1076"/>
           <ac:cxnSpMkLst>
             <pc:docMk/>
             <pc:sldMk cId="2878173059" sldId="261"/>
-            <ac:cxnSpMk id="65" creationId="{28EE4F0F-C008-F011-6402-C667E69D8B21}"/>
+            <ac:cxnSpMk id="242" creationId="{15A6B20D-82BA-B4F9-68E1-286190BB95EE}"/>
           </ac:cxnSpMkLst>
         </pc:cxnChg>
         <pc:cxnChg chg="mod">
-          <ac:chgData name="Markus Bilz" userId="a36021e4bdb9349f" providerId="LiveId" clId="{F9F2BE70-AAED-47FD-A055-7B08EB1371A3}" dt="2023-01-31T14:54:07.949" v="231" actId="1076"/>
-          <ac:cxnSpMkLst>
-            <pc:docMk/>
-            <pc:sldMk cId="2878173059" sldId="261"/>
-            <ac:cxnSpMk id="70" creationId="{66C88C84-34E5-DBC0-F118-6C49B6374993}"/>
-          </ac:cxnSpMkLst>
-        </pc:cxnChg>
-        <pc:cxnChg chg="mod">
-          <ac:chgData name="Markus Bilz" userId="a36021e4bdb9349f" providerId="LiveId" clId="{F9F2BE70-AAED-47FD-A055-7B08EB1371A3}" dt="2023-01-31T14:54:07.949" v="231" actId="1076"/>
-          <ac:cxnSpMkLst>
-            <pc:docMk/>
-            <pc:sldMk cId="2878173059" sldId="261"/>
-            <ac:cxnSpMk id="101" creationId="{C9A8426B-62F8-8EC1-CB9F-6E9E7AD7B88A}"/>
-          </ac:cxnSpMkLst>
-        </pc:cxnChg>
-        <pc:cxnChg chg="mod">
-          <ac:chgData name="Markus Bilz" userId="a36021e4bdb9349f" providerId="LiveId" clId="{F9F2BE70-AAED-47FD-A055-7B08EB1371A3}" dt="2023-01-31T14:54:07.949" v="231" actId="1076"/>
-          <ac:cxnSpMkLst>
-            <pc:docMk/>
-            <pc:sldMk cId="2878173059" sldId="261"/>
-            <ac:cxnSpMk id="214" creationId="{0D81CBA5-C3C3-5317-A8A3-8CD616613EDE}"/>
-          </ac:cxnSpMkLst>
-        </pc:cxnChg>
-        <pc:cxnChg chg="mod">
-          <ac:chgData name="Markus Bilz" userId="a36021e4bdb9349f" providerId="LiveId" clId="{F9F2BE70-AAED-47FD-A055-7B08EB1371A3}" dt="2023-01-31T14:54:07.949" v="231" actId="1076"/>
-          <ac:cxnSpMkLst>
-            <pc:docMk/>
-            <pc:sldMk cId="2878173059" sldId="261"/>
-            <ac:cxnSpMk id="217" creationId="{AF17FB98-C9BC-D133-7339-F0C5698E6493}"/>
-          </ac:cxnSpMkLst>
-        </pc:cxnChg>
-        <pc:cxnChg chg="mod">
-          <ac:chgData name="Markus Bilz" userId="a36021e4bdb9349f" providerId="LiveId" clId="{F9F2BE70-AAED-47FD-A055-7B08EB1371A3}" dt="2023-01-31T14:54:07.949" v="231" actId="1076"/>
-          <ac:cxnSpMkLst>
-            <pc:docMk/>
-            <pc:sldMk cId="2878173059" sldId="261"/>
-            <ac:cxnSpMk id="220" creationId="{F71C02ED-6336-D99D-2AAA-7DC8A5931246}"/>
-          </ac:cxnSpMkLst>
-        </pc:cxnChg>
-        <pc:cxnChg chg="mod">
-          <ac:chgData name="Markus Bilz" userId="a36021e4bdb9349f" providerId="LiveId" clId="{F9F2BE70-AAED-47FD-A055-7B08EB1371A3}" dt="2023-01-31T14:54:07.949" v="231" actId="1076"/>
-          <ac:cxnSpMkLst>
-            <pc:docMk/>
-            <pc:sldMk cId="2878173059" sldId="261"/>
-            <ac:cxnSpMk id="226" creationId="{470B009F-AEBC-B736-2071-04407321C553}"/>
-          </ac:cxnSpMkLst>
-        </pc:cxnChg>
-        <pc:cxnChg chg="mod">
-          <ac:chgData name="Markus Bilz" userId="a36021e4bdb9349f" providerId="LiveId" clId="{F9F2BE70-AAED-47FD-A055-7B08EB1371A3}" dt="2023-01-31T14:54:07.949" v="231" actId="1076"/>
-          <ac:cxnSpMkLst>
-            <pc:docMk/>
-            <pc:sldMk cId="2878173059" sldId="261"/>
-            <ac:cxnSpMk id="242" creationId="{15A6B20D-82BA-B4F9-68E1-286190BB95EE}"/>
-          </ac:cxnSpMkLst>
-        </pc:cxnChg>
-        <pc:cxnChg chg="mod">
-          <ac:chgData name="Markus Bilz" userId="a36021e4bdb9349f" providerId="LiveId" clId="{F9F2BE70-AAED-47FD-A055-7B08EB1371A3}" dt="2023-01-31T14:54:07.949" v="231" actId="1076"/>
+          <ac:chgData name="Markus Bilz" userId="a36021e4bdb9349f" providerId="LiveId" clId="{F9F2BE70-AAED-47FD-A055-7B08EB1371A3}" dt="2023-02-18T15:20:58.645" v="1503" actId="1076"/>
           <ac:cxnSpMkLst>
             <pc:docMk/>
             <pc:sldMk cId="2878173059" sldId="261"/>
             <ac:cxnSpMk id="249" creationId="{474E23BC-E9EE-6D4C-E9B0-65C585D028C8}"/>
+          </ac:cxnSpMkLst>
+        </pc:cxnChg>
+        <pc:cxnChg chg="add mod">
+          <ac:chgData name="Markus Bilz" userId="a36021e4bdb9349f" providerId="LiveId" clId="{F9F2BE70-AAED-47FD-A055-7B08EB1371A3}" dt="2023-02-18T15:27:01.159" v="1525" actId="14100"/>
+          <ac:cxnSpMkLst>
+            <pc:docMk/>
+            <pc:sldMk cId="2878173059" sldId="261"/>
+            <ac:cxnSpMk id="255" creationId="{37A65A15-9D02-19D0-A9DA-DEA04BF5E7CC}"/>
+          </ac:cxnSpMkLst>
+        </pc:cxnChg>
+        <pc:cxnChg chg="add del mod">
+          <ac:chgData name="Markus Bilz" userId="a36021e4bdb9349f" providerId="LiveId" clId="{F9F2BE70-AAED-47FD-A055-7B08EB1371A3}" dt="2023-02-18T15:26:52.482" v="1524" actId="11529"/>
+          <ac:cxnSpMkLst>
+            <pc:docMk/>
+            <pc:sldMk cId="2878173059" sldId="261"/>
+            <ac:cxnSpMk id="257" creationId="{DB547BFB-73A6-DD51-1DB2-32DE374FCA9C}"/>
+          </ac:cxnSpMkLst>
+        </pc:cxnChg>
+        <pc:cxnChg chg="add del mod">
+          <ac:chgData name="Markus Bilz" userId="a36021e4bdb9349f" providerId="LiveId" clId="{F9F2BE70-AAED-47FD-A055-7B08EB1371A3}" dt="2023-02-18T15:27:22.731" v="1529" actId="478"/>
+          <ac:cxnSpMkLst>
+            <pc:docMk/>
+            <pc:sldMk cId="2878173059" sldId="261"/>
+            <ac:cxnSpMk id="261" creationId="{EEEB3D91-CDDA-94A5-42DD-314DD8526D2C}"/>
+          </ac:cxnSpMkLst>
+        </pc:cxnChg>
+        <pc:cxnChg chg="add mod">
+          <ac:chgData name="Markus Bilz" userId="a36021e4bdb9349f" providerId="LiveId" clId="{F9F2BE70-AAED-47FD-A055-7B08EB1371A3}" dt="2023-02-18T15:27:44.060" v="1533" actId="14100"/>
+          <ac:cxnSpMkLst>
+            <pc:docMk/>
+            <pc:sldMk cId="2878173059" sldId="261"/>
+            <ac:cxnSpMk id="264" creationId="{16F9191E-FF68-381B-DBB7-8107DC518EDC}"/>
           </ac:cxnSpMkLst>
         </pc:cxnChg>
       </pc:sldChg>
@@ -7389,7 +7461,7 @@
           <a:p>
             <a:fld id="{D6A82EB2-151D-4EEE-ACF5-92C73278C09C}" type="datetimeFigureOut">
               <a:rPr lang="en-GB" smtClean="0"/>
-              <a:t>14/02/2023</a:t>
+              <a:t>18/02/2023</a:t>
             </a:fld>
             <a:endParaRPr lang="en-GB"/>
           </a:p>
@@ -7589,7 +7661,7 @@
           <a:p>
             <a:fld id="{D6A82EB2-151D-4EEE-ACF5-92C73278C09C}" type="datetimeFigureOut">
               <a:rPr lang="en-GB" smtClean="0"/>
-              <a:t>14/02/2023</a:t>
+              <a:t>18/02/2023</a:t>
             </a:fld>
             <a:endParaRPr lang="en-GB"/>
           </a:p>
@@ -7799,7 +7871,7 @@
           <a:p>
             <a:fld id="{D6A82EB2-151D-4EEE-ACF5-92C73278C09C}" type="datetimeFigureOut">
               <a:rPr lang="en-GB" smtClean="0"/>
-              <a:t>14/02/2023</a:t>
+              <a:t>18/02/2023</a:t>
             </a:fld>
             <a:endParaRPr lang="en-GB"/>
           </a:p>
@@ -7999,7 +8071,7 @@
           <a:p>
             <a:fld id="{D6A82EB2-151D-4EEE-ACF5-92C73278C09C}" type="datetimeFigureOut">
               <a:rPr lang="en-GB" smtClean="0"/>
-              <a:t>14/02/2023</a:t>
+              <a:t>18/02/2023</a:t>
             </a:fld>
             <a:endParaRPr lang="en-GB"/>
           </a:p>
@@ -8275,7 +8347,7 @@
           <a:p>
             <a:fld id="{D6A82EB2-151D-4EEE-ACF5-92C73278C09C}" type="datetimeFigureOut">
               <a:rPr lang="en-GB" smtClean="0"/>
-              <a:t>14/02/2023</a:t>
+              <a:t>18/02/2023</a:t>
             </a:fld>
             <a:endParaRPr lang="en-GB"/>
           </a:p>
@@ -8543,7 +8615,7 @@
           <a:p>
             <a:fld id="{D6A82EB2-151D-4EEE-ACF5-92C73278C09C}" type="datetimeFigureOut">
               <a:rPr lang="en-GB" smtClean="0"/>
-              <a:t>14/02/2023</a:t>
+              <a:t>18/02/2023</a:t>
             </a:fld>
             <a:endParaRPr lang="en-GB"/>
           </a:p>
@@ -8958,7 +9030,7 @@
           <a:p>
             <a:fld id="{D6A82EB2-151D-4EEE-ACF5-92C73278C09C}" type="datetimeFigureOut">
               <a:rPr lang="en-GB" smtClean="0"/>
-              <a:t>14/02/2023</a:t>
+              <a:t>18/02/2023</a:t>
             </a:fld>
             <a:endParaRPr lang="en-GB"/>
           </a:p>
@@ -9100,7 +9172,7 @@
           <a:p>
             <a:fld id="{D6A82EB2-151D-4EEE-ACF5-92C73278C09C}" type="datetimeFigureOut">
               <a:rPr lang="en-GB" smtClean="0"/>
-              <a:t>14/02/2023</a:t>
+              <a:t>18/02/2023</a:t>
             </a:fld>
             <a:endParaRPr lang="en-GB"/>
           </a:p>
@@ -9213,7 +9285,7 @@
           <a:p>
             <a:fld id="{D6A82EB2-151D-4EEE-ACF5-92C73278C09C}" type="datetimeFigureOut">
               <a:rPr lang="en-GB" smtClean="0"/>
-              <a:t>14/02/2023</a:t>
+              <a:t>18/02/2023</a:t>
             </a:fld>
             <a:endParaRPr lang="en-GB"/>
           </a:p>
@@ -9526,7 +9598,7 @@
           <a:p>
             <a:fld id="{D6A82EB2-151D-4EEE-ACF5-92C73278C09C}" type="datetimeFigureOut">
               <a:rPr lang="en-GB" smtClean="0"/>
-              <a:t>14/02/2023</a:t>
+              <a:t>18/02/2023</a:t>
             </a:fld>
             <a:endParaRPr lang="en-GB"/>
           </a:p>
@@ -9815,7 +9887,7 @@
           <a:p>
             <a:fld id="{D6A82EB2-151D-4EEE-ACF5-92C73278C09C}" type="datetimeFigureOut">
               <a:rPr lang="en-GB" smtClean="0"/>
-              <a:t>14/02/2023</a:t>
+              <a:t>18/02/2023</a:t>
             </a:fld>
             <a:endParaRPr lang="en-GB"/>
           </a:p>
@@ -10058,7 +10130,7 @@
           <a:p>
             <a:fld id="{D6A82EB2-151D-4EEE-ACF5-92C73278C09C}" type="datetimeFigureOut">
               <a:rPr lang="en-GB" smtClean="0"/>
-              <a:t>14/02/2023</a:t>
+              <a:t>18/02/2023</a:t>
             </a:fld>
             <a:endParaRPr lang="en-GB"/>
           </a:p>
@@ -23920,7 +23992,7 @@
         </p:nvSpPr>
         <p:spPr>
           <a:xfrm>
-            <a:off x="8940828" y="5679599"/>
+            <a:off x="8950352" y="5679599"/>
             <a:ext cx="1745456" cy="328612"/>
           </a:xfrm>
           <a:prstGeom prst="roundRect">
@@ -23979,7 +24051,7 @@
         </p:nvSpPr>
         <p:spPr>
           <a:xfrm>
-            <a:off x="9267058" y="4248787"/>
+            <a:off x="9260139" y="4245612"/>
             <a:ext cx="1159669" cy="458984"/>
           </a:xfrm>
           <a:prstGeom prst="roundRect">
@@ -24048,7 +24120,7 @@
         </p:nvSpPr>
         <p:spPr>
           <a:xfrm>
-            <a:off x="9264677" y="3892192"/>
+            <a:off x="9257758" y="3892192"/>
             <a:ext cx="1164431" cy="242887"/>
           </a:xfrm>
           <a:prstGeom prst="roundRect">
@@ -24088,7 +24160,7 @@
                 <a:latin typeface="+mj-lt"/>
                 <a:cs typeface="Arial" panose="020B0604020202020204" pitchFamily="34" charset="0"/>
               </a:rPr>
-              <a:t>Add &amp; Norm</a:t>
+              <a:t>Add</a:t>
             </a:r>
           </a:p>
         </p:txBody>
@@ -24107,7 +24179,7 @@
         </p:nvSpPr>
         <p:spPr>
           <a:xfrm>
-            <a:off x="9262296" y="3373078"/>
+            <a:off x="9257758" y="3089711"/>
             <a:ext cx="1164431" cy="329011"/>
           </a:xfrm>
           <a:prstGeom prst="roundRect">
@@ -24166,7 +24238,7 @@
         </p:nvSpPr>
         <p:spPr>
           <a:xfrm>
-            <a:off x="9262296" y="3001605"/>
+            <a:off x="9257758" y="2725380"/>
             <a:ext cx="1164431" cy="242887"/>
           </a:xfrm>
           <a:prstGeom prst="roundRect">
@@ -24222,13 +24294,15 @@
           </p:cNvPr>
           <p:cNvCxnSpPr>
             <a:cxnSpLocks/>
+            <a:stCxn id="162" idx="0"/>
+            <a:endCxn id="61" idx="2"/>
           </p:cNvCxnSpPr>
           <p:nvPr/>
         </p:nvCxnSpPr>
         <p:spPr>
           <a:xfrm flipV="1">
-            <a:off x="9815030" y="6015357"/>
-            <a:ext cx="0" cy="225622"/>
+            <a:off x="9823080" y="6008211"/>
+            <a:ext cx="0" cy="252710"/>
           </a:xfrm>
           <a:prstGeom prst="straightConnector1">
             <a:avLst/>
@@ -24267,7 +24341,7 @@
         <p:spPr>
           <a:xfrm>
             <a:off x="8969402" y="2652435"/>
-            <a:ext cx="1633537" cy="2557463"/>
+            <a:ext cx="1633537" cy="2910165"/>
           </a:xfrm>
           <a:prstGeom prst="roundRect">
             <a:avLst>
@@ -24317,7 +24391,7 @@
         </p:nvSpPr>
         <p:spPr>
           <a:xfrm>
-            <a:off x="8469340" y="6260921"/>
+            <a:off x="8480055" y="6260921"/>
             <a:ext cx="2686050" cy="307777"/>
           </a:xfrm>
           <a:prstGeom prst="rect">
@@ -24335,7 +24409,7 @@
               <a:rPr lang="de-DE" sz="1400" dirty="0" err="1">
                 <a:latin typeface="+mj-lt"/>
               </a:rPr>
-              <a:t>Categorical</a:t>
+              <a:t>categorical</a:t>
             </a:r>
             <a:r>
               <a:rPr lang="de-DE" sz="1400" dirty="0">
@@ -24385,8 +24459,8 @@
         </p:nvCxnSpPr>
         <p:spPr>
           <a:xfrm flipV="1">
-            <a:off x="9844512" y="3244492"/>
-            <a:ext cx="0" cy="128586"/>
+            <a:off x="9839974" y="2968267"/>
+            <a:ext cx="0" cy="121444"/>
           </a:xfrm>
           <a:prstGeom prst="straightConnector1">
             <a:avLst/>
@@ -24431,8 +24505,8 @@
         </p:nvCxnSpPr>
         <p:spPr>
           <a:xfrm flipV="1">
-            <a:off x="9846893" y="4135079"/>
-            <a:ext cx="0" cy="113708"/>
+            <a:off x="9839974" y="4135079"/>
+            <a:ext cx="0" cy="110533"/>
           </a:xfrm>
           <a:prstGeom prst="straightConnector1">
             <a:avLst/>
@@ -24477,60 +24551,13 @@
         </p:nvCxnSpPr>
         <p:spPr>
           <a:xfrm rot="16200000" flipV="1">
-            <a:off x="9170024" y="3215322"/>
-            <a:ext cx="769143" cy="584597"/>
+            <a:off x="9026182" y="3078400"/>
+            <a:ext cx="1045368" cy="582216"/>
           </a:xfrm>
           <a:prstGeom prst="bentConnector4">
             <a:avLst>
-              <a:gd name="adj1" fmla="val 10526"/>
-              <a:gd name="adj2" fmla="val 128921"/>
-            </a:avLst>
-          </a:prstGeom>
-          <a:ln w="12700">
-            <a:solidFill>
-              <a:schemeClr val="tx1"/>
-            </a:solidFill>
-            <a:tailEnd type="triangle"/>
-          </a:ln>
-        </p:spPr>
-        <p:style>
-          <a:lnRef idx="1">
-            <a:schemeClr val="accent1"/>
-          </a:lnRef>
-          <a:fillRef idx="0">
-            <a:schemeClr val="accent1"/>
-          </a:fillRef>
-          <a:effectRef idx="0">
-            <a:schemeClr val="accent1"/>
-          </a:effectRef>
-          <a:fontRef idx="minor">
-            <a:schemeClr val="tx1"/>
-          </a:fontRef>
-        </p:style>
-      </p:cxnSp>
-      <p:cxnSp>
-        <p:nvCxnSpPr>
-          <p:cNvPr id="226" name="Connector: Elbow 225">
-            <a:extLst>
-              <a:ext uri="{FF2B5EF4-FFF2-40B4-BE49-F238E27FC236}">
-                <a16:creationId xmlns:a16="http://schemas.microsoft.com/office/drawing/2014/main" id="{470B009F-AEBC-B736-2071-04407321C553}"/>
-              </a:ext>
-            </a:extLst>
-          </p:cNvPr>
-          <p:cNvCxnSpPr>
-            <a:cxnSpLocks/>
-          </p:cNvCxnSpPr>
-          <p:nvPr/>
-        </p:nvCxnSpPr>
-        <p:spPr>
-          <a:xfrm rot="16200000" flipV="1">
-            <a:off x="8706136" y="4574559"/>
-            <a:ext cx="1665963" cy="548879"/>
-          </a:xfrm>
-          <a:prstGeom prst="bentConnector4">
-            <a:avLst>
-              <a:gd name="adj1" fmla="val 43210"/>
-              <a:gd name="adj2" fmla="val 132104"/>
+              <a:gd name="adj1" fmla="val 3644"/>
+              <a:gd name="adj2" fmla="val 139264"/>
             </a:avLst>
           </a:prstGeom>
           <a:ln w="12700">
@@ -24569,7 +24596,7 @@
         </p:nvSpPr>
         <p:spPr>
           <a:xfrm>
-            <a:off x="8393140" y="3682821"/>
+            <a:off x="8478865" y="3682821"/>
             <a:ext cx="571500" cy="307777"/>
           </a:xfrm>
           <a:prstGeom prst="rect">
@@ -24587,7 +24614,7 @@
               <a:rPr lang="de-DE" sz="1400" dirty="0">
                 <a:latin typeface="+mj-lt"/>
               </a:rPr>
-              <a:t>N×</a:t>
+              <a:t>L×</a:t>
             </a:r>
             <a:endParaRPr lang="en-GB" sz="1400" dirty="0">
               <a:latin typeface="+mj-lt"/>
@@ -24657,7 +24684,7 @@
         </p:nvCxnSpPr>
         <p:spPr>
           <a:xfrm flipV="1">
-            <a:off x="9813555" y="4712534"/>
+            <a:off x="9823080" y="4717296"/>
             <a:ext cx="0" cy="246439"/>
           </a:xfrm>
           <a:prstGeom prst="straightConnector1">
@@ -24785,7 +24812,7 @@
         </p:nvSpPr>
         <p:spPr>
           <a:xfrm>
-            <a:off x="9555189" y="4695965"/>
+            <a:off x="9548045" y="4691202"/>
             <a:ext cx="264318" cy="261610"/>
           </a:xfrm>
           <a:prstGeom prst="rect">
@@ -24875,9 +24902,9 @@
           <p:nvPr/>
         </p:nvCxnSpPr>
         <p:spPr>
-          <a:xfrm flipH="1" flipV="1">
-            <a:off x="9839974" y="2374225"/>
-            <a:ext cx="4538" cy="627380"/>
+          <a:xfrm flipV="1">
+            <a:off x="9839974" y="2495668"/>
+            <a:ext cx="0" cy="229712"/>
           </a:xfrm>
           <a:prstGeom prst="straightConnector1">
             <a:avLst/>
@@ -24978,8 +25005,8 @@
         </p:nvSpPr>
         <p:spPr>
           <a:xfrm>
-            <a:off x="9198385" y="694511"/>
-            <a:ext cx="1196340" cy="523220"/>
+            <a:off x="8309499" y="1091161"/>
+            <a:ext cx="3080551" cy="307777"/>
           </a:xfrm>
           <a:prstGeom prst="rect">
             <a:avLst/>
@@ -24994,19 +25021,22 @@
           <a:p>
             <a:pPr algn="ctr"/>
             <a:r>
+              <a:rPr lang="de-DE" sz="1400" dirty="0" err="1">
+                <a:latin typeface="+mj-lt"/>
+              </a:rPr>
+              <a:t>output</a:t>
+            </a:r>
+            <a:r>
               <a:rPr lang="de-DE" sz="1400" dirty="0">
                 <a:latin typeface="+mj-lt"/>
               </a:rPr>
-              <a:t>Output</a:t>
+              <a:t> </a:t>
             </a:r>
-          </a:p>
-          <a:p>
-            <a:pPr algn="ctr"/>
             <a:r>
               <a:rPr lang="de-DE" sz="1400" dirty="0" err="1">
                 <a:latin typeface="+mj-lt"/>
               </a:rPr>
-              <a:t>Probabilities</a:t>
+              <a:t>probabilities</a:t>
             </a:r>
             <a:endParaRPr lang="en-GB" sz="1400" dirty="0">
               <a:latin typeface="+mj-lt"/>
@@ -25028,7 +25058,7 @@
         </p:nvSpPr>
         <p:spPr>
           <a:xfrm>
-            <a:off x="9255153" y="1719845"/>
+            <a:off x="9255153" y="1841288"/>
             <a:ext cx="1164431" cy="242887"/>
           </a:xfrm>
           <a:prstGeom prst="roundRect">
@@ -25087,7 +25117,7 @@
         </p:nvSpPr>
         <p:spPr>
           <a:xfrm>
-            <a:off x="9255153" y="1310271"/>
+            <a:off x="9255153" y="1431714"/>
             <a:ext cx="1164431" cy="242887"/>
           </a:xfrm>
           <a:prstGeom prst="roundRect">
@@ -25150,7 +25180,7 @@
         </p:nvCxnSpPr>
         <p:spPr>
           <a:xfrm flipV="1">
-            <a:off x="9837369" y="1553158"/>
+            <a:off x="9837369" y="1674601"/>
             <a:ext cx="0" cy="166687"/>
           </a:xfrm>
           <a:prstGeom prst="straightConnector1">
@@ -25194,7 +25224,7 @@
         </p:nvCxnSpPr>
         <p:spPr>
           <a:xfrm flipV="1">
-            <a:off x="9838162" y="1964320"/>
+            <a:off x="9838162" y="2085763"/>
             <a:ext cx="0" cy="159470"/>
           </a:xfrm>
           <a:prstGeom prst="straightConnector1">
@@ -25236,7 +25266,7 @@
         </p:nvSpPr>
         <p:spPr>
           <a:xfrm>
-            <a:off x="9257758" y="2131338"/>
+            <a:off x="9257758" y="2252781"/>
             <a:ext cx="1164431" cy="242887"/>
           </a:xfrm>
           <a:prstGeom prst="roundRect">
@@ -25292,57 +25322,15 @@
           </p:cNvPr>
           <p:cNvCxnSpPr>
             <a:cxnSpLocks/>
+            <a:stCxn id="63" idx="0"/>
+            <a:endCxn id="19" idx="2"/>
           </p:cNvCxnSpPr>
           <p:nvPr/>
         </p:nvCxnSpPr>
         <p:spPr>
           <a:xfrm flipV="1">
-            <a:off x="9846894" y="3709232"/>
-            <a:ext cx="0" cy="103883"/>
-          </a:xfrm>
-          <a:prstGeom prst="straightConnector1">
-            <a:avLst/>
-          </a:prstGeom>
-          <a:ln w="12700">
-            <a:solidFill>
-              <a:schemeClr val="tx1"/>
-            </a:solidFill>
-            <a:tailEnd type="triangle"/>
-          </a:ln>
-        </p:spPr>
-        <p:style>
-          <a:lnRef idx="1">
-            <a:schemeClr val="dk1"/>
-          </a:lnRef>
-          <a:fillRef idx="0">
-            <a:schemeClr val="dk1"/>
-          </a:fillRef>
-          <a:effectRef idx="0">
-            <a:schemeClr val="dk1"/>
-          </a:effectRef>
-          <a:fontRef idx="minor">
-            <a:schemeClr val="tx1"/>
-          </a:fontRef>
-        </p:style>
-      </p:cxnSp>
-      <p:cxnSp>
-        <p:nvCxnSpPr>
-          <p:cNvPr id="101" name="Straight Arrow Connector 100">
-            <a:extLst>
-              <a:ext uri="{FF2B5EF4-FFF2-40B4-BE49-F238E27FC236}">
-                <a16:creationId xmlns:a16="http://schemas.microsoft.com/office/drawing/2014/main" id="{C9A8426B-62F8-8EC1-CB9F-6E9E7AD7B88A}"/>
-              </a:ext>
-            </a:extLst>
-          </p:cNvPr>
-          <p:cNvCxnSpPr>
-            <a:cxnSpLocks/>
-          </p:cNvCxnSpPr>
-          <p:nvPr/>
-        </p:nvCxnSpPr>
-        <p:spPr>
-          <a:xfrm flipV="1">
-            <a:off x="9513517" y="4706084"/>
-            <a:ext cx="0" cy="250032"/>
+            <a:off x="9839974" y="3754079"/>
+            <a:ext cx="0" cy="138113"/>
           </a:xfrm>
           <a:prstGeom prst="straightConnector1">
             <a:avLst/>
@@ -25455,6 +25443,338 @@
           </a:prstGeom>
         </p:spPr>
       </p:pic>
+      <p:pic>
+        <p:nvPicPr>
+          <p:cNvPr id="5" name="Picture 4">
+            <a:extLst>
+              <a:ext uri="{FF2B5EF4-FFF2-40B4-BE49-F238E27FC236}">
+                <a16:creationId xmlns:a16="http://schemas.microsoft.com/office/drawing/2014/main" id="{7295174F-DD3B-430A-4AAD-CB8716281370}"/>
+              </a:ext>
+            </a:extLst>
+          </p:cNvPr>
+          <p:cNvPicPr>
+            <a:picLocks noChangeAspect="1"/>
+          </p:cNvPicPr>
+          <p:nvPr/>
+        </p:nvPicPr>
+        <p:blipFill>
+          <a:blip r:embed="rId5"/>
+          <a:stretch>
+            <a:fillRect/>
+          </a:stretch>
+        </p:blipFill>
+        <p:spPr>
+          <a:xfrm>
+            <a:off x="2671762" y="1976437"/>
+            <a:ext cx="4314825" cy="2676525"/>
+          </a:xfrm>
+          <a:prstGeom prst="rect">
+            <a:avLst/>
+          </a:prstGeom>
+        </p:spPr>
+      </p:pic>
+      <p:sp>
+        <p:nvSpPr>
+          <p:cNvPr id="6" name="Rectangle: Rounded Corners 5">
+            <a:extLst>
+              <a:ext uri="{FF2B5EF4-FFF2-40B4-BE49-F238E27FC236}">
+                <a16:creationId xmlns:a16="http://schemas.microsoft.com/office/drawing/2014/main" id="{37E7B1D8-1BF8-FDFE-D966-2445914F8910}"/>
+              </a:ext>
+            </a:extLst>
+          </p:cNvPr>
+          <p:cNvSpPr/>
+          <p:nvPr/>
+        </p:nvSpPr>
+        <p:spPr>
+          <a:xfrm>
+            <a:off x="9240864" y="5117743"/>
+            <a:ext cx="1164431" cy="242887"/>
+          </a:xfrm>
+          <a:prstGeom prst="roundRect">
+            <a:avLst>
+              <a:gd name="adj" fmla="val 15547"/>
+            </a:avLst>
+          </a:prstGeom>
+          <a:solidFill>
+            <a:srgbClr val="CCD497"/>
+          </a:solidFill>
+          <a:ln w="19050">
+            <a:headEnd type="none" w="med" len="med"/>
+            <a:tailEnd type="none" w="med" len="med"/>
+          </a:ln>
+        </p:spPr>
+        <p:style>
+          <a:lnRef idx="2">
+            <a:schemeClr val="dk1"/>
+          </a:lnRef>
+          <a:fillRef idx="1">
+            <a:schemeClr val="lt1"/>
+          </a:fillRef>
+          <a:effectRef idx="0">
+            <a:schemeClr val="dk1"/>
+          </a:effectRef>
+          <a:fontRef idx="minor">
+            <a:schemeClr val="dk1"/>
+          </a:fontRef>
+        </p:style>
+        <p:txBody>
+          <a:bodyPr rtlCol="0" anchor="ctr"/>
+          <a:lstStyle/>
+          <a:p>
+            <a:pPr algn="ctr"/>
+            <a:r>
+              <a:rPr lang="de-DE" sz="1100" noProof="1">
+                <a:latin typeface="+mj-lt"/>
+                <a:cs typeface="Arial" panose="020B0604020202020204" pitchFamily="34" charset="0"/>
+              </a:rPr>
+              <a:t>Layer Norm</a:t>
+            </a:r>
+          </a:p>
+        </p:txBody>
+      </p:sp>
+      <p:sp>
+        <p:nvSpPr>
+          <p:cNvPr id="19" name="Rectangle: Rounded Corners 18">
+            <a:extLst>
+              <a:ext uri="{FF2B5EF4-FFF2-40B4-BE49-F238E27FC236}">
+                <a16:creationId xmlns:a16="http://schemas.microsoft.com/office/drawing/2014/main" id="{1AE337DA-87E6-6A46-773B-22A52F746B75}"/>
+              </a:ext>
+            </a:extLst>
+          </p:cNvPr>
+          <p:cNvSpPr/>
+          <p:nvPr/>
+        </p:nvSpPr>
+        <p:spPr>
+          <a:xfrm>
+            <a:off x="9257758" y="3511192"/>
+            <a:ext cx="1164431" cy="242887"/>
+          </a:xfrm>
+          <a:prstGeom prst="roundRect">
+            <a:avLst>
+              <a:gd name="adj" fmla="val 15547"/>
+            </a:avLst>
+          </a:prstGeom>
+          <a:solidFill>
+            <a:srgbClr val="CCD497"/>
+          </a:solidFill>
+          <a:ln w="19050">
+            <a:headEnd type="none" w="med" len="med"/>
+            <a:tailEnd type="none" w="med" len="med"/>
+          </a:ln>
+        </p:spPr>
+        <p:style>
+          <a:lnRef idx="2">
+            <a:schemeClr val="dk1"/>
+          </a:lnRef>
+          <a:fillRef idx="1">
+            <a:schemeClr val="lt1"/>
+          </a:fillRef>
+          <a:effectRef idx="0">
+            <a:schemeClr val="dk1"/>
+          </a:effectRef>
+          <a:fontRef idx="minor">
+            <a:schemeClr val="dk1"/>
+          </a:fontRef>
+        </p:style>
+        <p:txBody>
+          <a:bodyPr rtlCol="0" anchor="ctr"/>
+          <a:lstStyle/>
+          <a:p>
+            <a:pPr algn="ctr"/>
+            <a:r>
+              <a:rPr lang="de-DE" sz="1100" noProof="1">
+                <a:latin typeface="+mj-lt"/>
+                <a:cs typeface="Arial" panose="020B0604020202020204" pitchFamily="34" charset="0"/>
+              </a:rPr>
+              <a:t>Layer Norm</a:t>
+            </a:r>
+          </a:p>
+        </p:txBody>
+      </p:sp>
+      <p:cxnSp>
+        <p:nvCxnSpPr>
+          <p:cNvPr id="241" name="Straight Arrow Connector 240">
+            <a:extLst>
+              <a:ext uri="{FF2B5EF4-FFF2-40B4-BE49-F238E27FC236}">
+                <a16:creationId xmlns:a16="http://schemas.microsoft.com/office/drawing/2014/main" id="{647D61CA-2D51-3BFE-D9EB-260D494A7DAC}"/>
+              </a:ext>
+            </a:extLst>
+          </p:cNvPr>
+          <p:cNvCxnSpPr>
+            <a:cxnSpLocks/>
+            <a:stCxn id="19" idx="0"/>
+            <a:endCxn id="66" idx="2"/>
+          </p:cNvCxnSpPr>
+          <p:nvPr/>
+        </p:nvCxnSpPr>
+        <p:spPr>
+          <a:xfrm flipV="1">
+            <a:off x="9839974" y="3418722"/>
+            <a:ext cx="0" cy="92470"/>
+          </a:xfrm>
+          <a:prstGeom prst="straightConnector1">
+            <a:avLst/>
+          </a:prstGeom>
+          <a:ln w="12700">
+            <a:solidFill>
+              <a:schemeClr val="tx1"/>
+            </a:solidFill>
+            <a:tailEnd type="triangle"/>
+          </a:ln>
+        </p:spPr>
+        <p:style>
+          <a:lnRef idx="1">
+            <a:schemeClr val="dk1"/>
+          </a:lnRef>
+          <a:fillRef idx="0">
+            <a:schemeClr val="dk1"/>
+          </a:fillRef>
+          <a:effectRef idx="0">
+            <a:schemeClr val="dk1"/>
+          </a:effectRef>
+          <a:fontRef idx="minor">
+            <a:schemeClr val="tx1"/>
+          </a:fontRef>
+        </p:style>
+      </p:cxnSp>
+      <p:cxnSp>
+        <p:nvCxnSpPr>
+          <p:cNvPr id="255" name="Straight Arrow Connector 254">
+            <a:extLst>
+              <a:ext uri="{FF2B5EF4-FFF2-40B4-BE49-F238E27FC236}">
+                <a16:creationId xmlns:a16="http://schemas.microsoft.com/office/drawing/2014/main" id="{37A65A15-9D02-19D0-A9DA-DEA04BF5E7CC}"/>
+              </a:ext>
+            </a:extLst>
+          </p:cNvPr>
+          <p:cNvCxnSpPr>
+            <a:cxnSpLocks/>
+            <a:stCxn id="61" idx="0"/>
+            <a:endCxn id="6" idx="2"/>
+          </p:cNvCxnSpPr>
+          <p:nvPr/>
+        </p:nvCxnSpPr>
+        <p:spPr>
+          <a:xfrm flipV="1">
+            <a:off x="9823080" y="5360630"/>
+            <a:ext cx="0" cy="318969"/>
+          </a:xfrm>
+          <a:prstGeom prst="straightConnector1">
+            <a:avLst/>
+          </a:prstGeom>
+          <a:ln w="12700">
+            <a:solidFill>
+              <a:schemeClr val="tx1"/>
+            </a:solidFill>
+            <a:tailEnd type="triangle"/>
+          </a:ln>
+        </p:spPr>
+        <p:style>
+          <a:lnRef idx="1">
+            <a:schemeClr val="dk1"/>
+          </a:lnRef>
+          <a:fillRef idx="0">
+            <a:schemeClr val="dk1"/>
+          </a:fillRef>
+          <a:effectRef idx="0">
+            <a:schemeClr val="dk1"/>
+          </a:effectRef>
+          <a:fontRef idx="minor">
+            <a:schemeClr val="tx1"/>
+          </a:fontRef>
+        </p:style>
+      </p:cxnSp>
+      <p:cxnSp>
+        <p:nvCxnSpPr>
+          <p:cNvPr id="39" name="Connector: Elbow 38">
+            <a:extLst>
+              <a:ext uri="{FF2B5EF4-FFF2-40B4-BE49-F238E27FC236}">
+                <a16:creationId xmlns:a16="http://schemas.microsoft.com/office/drawing/2014/main" id="{F9F26774-D4F9-74AB-B575-2F6F78375116}"/>
+              </a:ext>
+            </a:extLst>
+          </p:cNvPr>
+          <p:cNvCxnSpPr>
+            <a:cxnSpLocks/>
+            <a:stCxn id="61" idx="0"/>
+            <a:endCxn id="63" idx="1"/>
+          </p:cNvCxnSpPr>
+          <p:nvPr/>
+        </p:nvCxnSpPr>
+        <p:spPr>
+          <a:xfrm rot="16200000" flipV="1">
+            <a:off x="8707438" y="4563957"/>
+            <a:ext cx="1665963" cy="565322"/>
+          </a:xfrm>
+          <a:prstGeom prst="bentConnector4">
+            <a:avLst>
+              <a:gd name="adj1" fmla="val 9586"/>
+              <a:gd name="adj2" fmla="val 141459"/>
+            </a:avLst>
+          </a:prstGeom>
+          <a:ln w="12700">
+            <a:solidFill>
+              <a:schemeClr val="tx1"/>
+            </a:solidFill>
+            <a:tailEnd type="triangle"/>
+          </a:ln>
+        </p:spPr>
+        <p:style>
+          <a:lnRef idx="1">
+            <a:schemeClr val="accent1"/>
+          </a:lnRef>
+          <a:fillRef idx="0">
+            <a:schemeClr val="accent1"/>
+          </a:fillRef>
+          <a:effectRef idx="0">
+            <a:schemeClr val="accent1"/>
+          </a:effectRef>
+          <a:fontRef idx="minor">
+            <a:schemeClr val="tx1"/>
+          </a:fontRef>
+        </p:style>
+      </p:cxnSp>
+      <p:cxnSp>
+        <p:nvCxnSpPr>
+          <p:cNvPr id="264" name="Connector: Elbow 263">
+            <a:extLst>
+              <a:ext uri="{FF2B5EF4-FFF2-40B4-BE49-F238E27FC236}">
+                <a16:creationId xmlns:a16="http://schemas.microsoft.com/office/drawing/2014/main" id="{16F9191E-FF68-381B-DBB7-8107DC518EDC}"/>
+              </a:ext>
+            </a:extLst>
+          </p:cNvPr>
+          <p:cNvCxnSpPr>
+            <a:stCxn id="6" idx="0"/>
+          </p:cNvCxnSpPr>
+          <p:nvPr/>
+        </p:nvCxnSpPr>
+        <p:spPr>
+          <a:xfrm rot="16200000" flipV="1">
+            <a:off x="9459510" y="4754172"/>
+            <a:ext cx="412393" cy="314749"/>
+          </a:xfrm>
+          <a:prstGeom prst="bentConnector3">
+            <a:avLst>
+              <a:gd name="adj1" fmla="val 37297"/>
+            </a:avLst>
+          </a:prstGeom>
+          <a:ln w="12700">
+            <a:tailEnd type="triangle"/>
+          </a:ln>
+        </p:spPr>
+        <p:style>
+          <a:lnRef idx="1">
+            <a:schemeClr val="dk1"/>
+          </a:lnRef>
+          <a:fillRef idx="0">
+            <a:schemeClr val="dk1"/>
+          </a:fillRef>
+          <a:effectRef idx="0">
+            <a:schemeClr val="dk1"/>
+          </a:effectRef>
+          <a:fontRef idx="minor">
+            <a:schemeClr val="tx1"/>
+          </a:fontRef>
+        </p:style>
+      </p:cxnSp>
     </p:spTree>
     <p:extLst>
       <p:ext uri="{BB962C8B-B14F-4D97-AF65-F5344CB8AC3E}">

</xml_diff>

<commit_message>
Add post-norm viz 👩‍💻
</commit_message>
<xml_diff>
--- a/reports/Graphs/diagrams.pptx
+++ b/reports/Graphs/diagrams.pptx
@@ -123,7 +123,7 @@
 <file path=ppt/revisionInfo.xml><?xml version="1.0" encoding="utf-8"?>
 <p1510:revInfo xmlns:a="http://schemas.openxmlformats.org/drawingml/2006/main" xmlns:r="http://schemas.openxmlformats.org/officeDocument/2006/relationships" xmlns:p1510="http://schemas.microsoft.com/office/powerpoint/2015/10/main">
   <p1510:revLst>
-    <p1510:client id="{F9F2BE70-AAED-47FD-A055-7B08EB1371A3}" v="142" dt="2023-02-18T15:20:12.629"/>
+    <p1510:client id="{F9F2BE70-AAED-47FD-A055-7B08EB1371A3}" v="150" dt="2023-02-22T08:59:57.067"/>
   </p1510:revLst>
 </p1510:revInfo>
 </file>
@@ -133,7 +133,7 @@
   <pc:docChgLst>
     <pc:chgData name="Markus Bilz" userId="a36021e4bdb9349f" providerId="LiveId" clId="{F9F2BE70-AAED-47FD-A055-7B08EB1371A3}"/>
     <pc:docChg chg="undo custSel addSld modSld sldOrd">
-      <pc:chgData name="Markus Bilz" userId="a36021e4bdb9349f" providerId="LiveId" clId="{F9F2BE70-AAED-47FD-A055-7B08EB1371A3}" dt="2023-02-18T15:57:02.801" v="1567" actId="20577"/>
+      <pc:chgData name="Markus Bilz" userId="a36021e4bdb9349f" providerId="LiveId" clId="{F9F2BE70-AAED-47FD-A055-7B08EB1371A3}" dt="2023-02-22T09:08:41.542" v="1781" actId="14100"/>
       <pc:docMkLst>
         <pc:docMk/>
       </pc:docMkLst>
@@ -541,7 +541,7 @@
         </pc:picChg>
       </pc:sldChg>
       <pc:sldChg chg="addSp delSp modSp add mod">
-        <pc:chgData name="Markus Bilz" userId="a36021e4bdb9349f" providerId="LiveId" clId="{F9F2BE70-AAED-47FD-A055-7B08EB1371A3}" dt="2023-01-30T16:05:01.590" v="228" actId="14100"/>
+        <pc:chgData name="Markus Bilz" userId="a36021e4bdb9349f" providerId="LiveId" clId="{F9F2BE70-AAED-47FD-A055-7B08EB1371A3}" dt="2023-02-22T09:08:41.542" v="1781" actId="14100"/>
         <pc:sldMkLst>
           <pc:docMk/>
           <pc:sldMk cId="1844608576" sldId="263"/>
@@ -578,6 +578,14 @@
             <ac:spMk id="10" creationId="{00B8C236-422C-0F3A-2195-02455E198FA4}"/>
           </ac:spMkLst>
         </pc:spChg>
+        <pc:spChg chg="add del mod">
+          <ac:chgData name="Markus Bilz" userId="a36021e4bdb9349f" providerId="LiveId" clId="{F9F2BE70-AAED-47FD-A055-7B08EB1371A3}" dt="2023-02-22T08:53:45.407" v="1707" actId="478"/>
+          <ac:spMkLst>
+            <pc:docMk/>
+            <pc:sldMk cId="1844608576" sldId="263"/>
+            <ac:spMk id="10" creationId="{E47B1989-23B1-6B34-E1D3-8193677E94CB}"/>
+          </ac:spMkLst>
+        </pc:spChg>
         <pc:spChg chg="del">
           <ac:chgData name="Markus Bilz" userId="a36021e4bdb9349f" providerId="LiveId" clId="{F9F2BE70-AAED-47FD-A055-7B08EB1371A3}" dt="2023-01-30T15:45:50.704" v="7" actId="478"/>
           <ac:spMkLst>
@@ -610,6 +618,14 @@
             <ac:spMk id="14" creationId="{FF5BF12D-AA78-EE30-53C6-6A293BDAE817}"/>
           </ac:spMkLst>
         </pc:spChg>
+        <pc:spChg chg="add mod">
+          <ac:chgData name="Markus Bilz" userId="a36021e4bdb9349f" providerId="LiveId" clId="{F9F2BE70-AAED-47FD-A055-7B08EB1371A3}" dt="2023-02-22T08:45:32.606" v="1592" actId="1076"/>
+          <ac:spMkLst>
+            <pc:docMk/>
+            <pc:sldMk cId="1844608576" sldId="263"/>
+            <ac:spMk id="15" creationId="{E8133E75-162F-B9D7-4F2C-61241AF6B53D}"/>
+          </ac:spMkLst>
+        </pc:spChg>
         <pc:spChg chg="del">
           <ac:chgData name="Markus Bilz" userId="a36021e4bdb9349f" providerId="LiveId" clId="{F9F2BE70-AAED-47FD-A055-7B08EB1371A3}" dt="2023-01-30T15:45:50.704" v="7" actId="478"/>
           <ac:spMkLst>
@@ -618,6 +634,22 @@
             <ac:spMk id="15" creationId="{FD86F888-F95A-D598-D12B-E04B43114576}"/>
           </ac:spMkLst>
         </pc:spChg>
+        <pc:spChg chg="add mod">
+          <ac:chgData name="Markus Bilz" userId="a36021e4bdb9349f" providerId="LiveId" clId="{F9F2BE70-AAED-47FD-A055-7B08EB1371A3}" dt="2023-02-22T08:55:00.085" v="1711" actId="1076"/>
+          <ac:spMkLst>
+            <pc:docMk/>
+            <pc:sldMk cId="1844608576" sldId="263"/>
+            <ac:spMk id="26" creationId="{3F01F5F2-C867-1EF5-6585-E4346DDBC353}"/>
+          </ac:spMkLst>
+        </pc:spChg>
+        <pc:spChg chg="add mod">
+          <ac:chgData name="Markus Bilz" userId="a36021e4bdb9349f" providerId="LiveId" clId="{F9F2BE70-AAED-47FD-A055-7B08EB1371A3}" dt="2023-02-22T09:08:41.542" v="1781" actId="14100"/>
+          <ac:spMkLst>
+            <pc:docMk/>
+            <pc:sldMk cId="1844608576" sldId="263"/>
+            <ac:spMk id="28" creationId="{C68EF78B-5C83-C0E6-D42D-88D80ABC2387}"/>
+          </ac:spMkLst>
+        </pc:spChg>
         <pc:spChg chg="del mod">
           <ac:chgData name="Markus Bilz" userId="a36021e4bdb9349f" providerId="LiveId" clId="{F9F2BE70-AAED-47FD-A055-7B08EB1371A3}" dt="2023-01-30T15:56:15.018" v="139" actId="478"/>
           <ac:spMkLst>
@@ -643,7 +675,7 @@
           </ac:spMkLst>
         </pc:spChg>
         <pc:spChg chg="mod">
-          <ac:chgData name="Markus Bilz" userId="a36021e4bdb9349f" providerId="LiveId" clId="{F9F2BE70-AAED-47FD-A055-7B08EB1371A3}" dt="2023-01-30T16:03:04.057" v="200" actId="1076"/>
+          <ac:chgData name="Markus Bilz" userId="a36021e4bdb9349f" providerId="LiveId" clId="{F9F2BE70-AAED-47FD-A055-7B08EB1371A3}" dt="2023-02-22T08:52:37.664" v="1692" actId="14100"/>
           <ac:spMkLst>
             <pc:docMk/>
             <pc:sldMk cId="1844608576" sldId="263"/>
@@ -651,7 +683,7 @@
           </ac:spMkLst>
         </pc:spChg>
         <pc:spChg chg="mod">
-          <ac:chgData name="Markus Bilz" userId="a36021e4bdb9349f" providerId="LiveId" clId="{F9F2BE70-AAED-47FD-A055-7B08EB1371A3}" dt="2023-01-30T16:03:23.807" v="208" actId="1076"/>
+          <ac:chgData name="Markus Bilz" userId="a36021e4bdb9349f" providerId="LiveId" clId="{F9F2BE70-AAED-47FD-A055-7B08EB1371A3}" dt="2023-02-22T09:01:08.909" v="1769" actId="255"/>
           <ac:spMkLst>
             <pc:docMk/>
             <pc:sldMk cId="1844608576" sldId="263"/>
@@ -674,8 +706,8 @@
             <ac:spMk id="72" creationId="{D721CAF9-A250-4EF9-2857-EF744B73DB25}"/>
           </ac:spMkLst>
         </pc:spChg>
-        <pc:spChg chg="mod">
-          <ac:chgData name="Markus Bilz" userId="a36021e4bdb9349f" providerId="LiveId" clId="{F9F2BE70-AAED-47FD-A055-7B08EB1371A3}" dt="2023-01-30T16:04:31.767" v="223" actId="14100"/>
+        <pc:spChg chg="del mod">
+          <ac:chgData name="Markus Bilz" userId="a36021e4bdb9349f" providerId="LiveId" clId="{F9F2BE70-AAED-47FD-A055-7B08EB1371A3}" dt="2023-02-22T08:55:12.904" v="1712" actId="478"/>
           <ac:spMkLst>
             <pc:docMk/>
             <pc:sldMk cId="1844608576" sldId="263"/>
@@ -690,6 +722,22 @@
             <ac:spMk id="81" creationId="{A0C92E84-AAE1-582E-C601-99B54006B43F}"/>
           </ac:spMkLst>
         </pc:spChg>
+        <pc:spChg chg="add mod">
+          <ac:chgData name="Markus Bilz" userId="a36021e4bdb9349f" providerId="LiveId" clId="{F9F2BE70-AAED-47FD-A055-7B08EB1371A3}" dt="2023-02-22T09:01:12.869" v="1770" actId="255"/>
+          <ac:spMkLst>
+            <pc:docMk/>
+            <pc:sldMk cId="1844608576" sldId="263"/>
+            <ac:spMk id="93" creationId="{671F1362-E500-05A6-E86F-3C1CB5CCD44D}"/>
+          </ac:spMkLst>
+        </pc:spChg>
+        <pc:spChg chg="add mod">
+          <ac:chgData name="Markus Bilz" userId="a36021e4bdb9349f" providerId="LiveId" clId="{F9F2BE70-AAED-47FD-A055-7B08EB1371A3}" dt="2023-02-22T08:57:44.031" v="1752" actId="108"/>
+          <ac:spMkLst>
+            <pc:docMk/>
+            <pc:sldMk cId="1844608576" sldId="263"/>
+            <ac:spMk id="94" creationId="{2523B3A1-A1A0-B768-99F1-32A20559DD27}"/>
+          </ac:spMkLst>
+        </pc:spChg>
         <pc:spChg chg="del">
           <ac:chgData name="Markus Bilz" userId="a36021e4bdb9349f" providerId="LiveId" clId="{F9F2BE70-AAED-47FD-A055-7B08EB1371A3}" dt="2023-01-30T15:45:50.704" v="7" actId="478"/>
           <ac:spMkLst>
@@ -824,6 +872,46 @@
             <pc:docMk/>
             <pc:sldMk cId="1844608576" sldId="263"/>
             <ac:spMk id="165" creationId="{279F181B-E7CC-7CD6-A843-CF0D0113A1B9}"/>
+          </ac:spMkLst>
+        </pc:spChg>
+        <pc:spChg chg="add mod">
+          <ac:chgData name="Markus Bilz" userId="a36021e4bdb9349f" providerId="LiveId" clId="{F9F2BE70-AAED-47FD-A055-7B08EB1371A3}" dt="2023-02-22T08:56:40.977" v="1728" actId="1076"/>
+          <ac:spMkLst>
+            <pc:docMk/>
+            <pc:sldMk cId="1844608576" sldId="263"/>
+            <ac:spMk id="195" creationId="{EE401D95-5407-A19B-E61D-AB1030A25C0C}"/>
+          </ac:spMkLst>
+        </pc:spChg>
+        <pc:spChg chg="add mod">
+          <ac:chgData name="Markus Bilz" userId="a36021e4bdb9349f" providerId="LiveId" clId="{F9F2BE70-AAED-47FD-A055-7B08EB1371A3}" dt="2023-02-22T08:55:36.042" v="1715" actId="1076"/>
+          <ac:spMkLst>
+            <pc:docMk/>
+            <pc:sldMk cId="1844608576" sldId="263"/>
+            <ac:spMk id="196" creationId="{D2BF1CC6-08EF-9DE9-0F91-0E6D29DD0175}"/>
+          </ac:spMkLst>
+        </pc:spChg>
+        <pc:spChg chg="add mod">
+          <ac:chgData name="Markus Bilz" userId="a36021e4bdb9349f" providerId="LiveId" clId="{F9F2BE70-AAED-47FD-A055-7B08EB1371A3}" dt="2023-02-22T09:08:29.676" v="1779" actId="14100"/>
+          <ac:spMkLst>
+            <pc:docMk/>
+            <pc:sldMk cId="1844608576" sldId="263"/>
+            <ac:spMk id="197" creationId="{74FF516F-666F-D0E7-5C2E-185F2C88C5FB}"/>
+          </ac:spMkLst>
+        </pc:spChg>
+        <pc:spChg chg="add mod">
+          <ac:chgData name="Markus Bilz" userId="a36021e4bdb9349f" providerId="LiveId" clId="{F9F2BE70-AAED-47FD-A055-7B08EB1371A3}" dt="2023-02-22T08:59:54.486" v="1764" actId="20577"/>
+          <ac:spMkLst>
+            <pc:docMk/>
+            <pc:sldMk cId="1844608576" sldId="263"/>
+            <ac:spMk id="213" creationId="{1589835F-2FFC-271A-7EB2-719A536F4B4B}"/>
+          </ac:spMkLst>
+        </pc:spChg>
+        <pc:spChg chg="add mod">
+          <ac:chgData name="Markus Bilz" userId="a36021e4bdb9349f" providerId="LiveId" clId="{F9F2BE70-AAED-47FD-A055-7B08EB1371A3}" dt="2023-02-22T09:00:02.624" v="1768" actId="20577"/>
+          <ac:spMkLst>
+            <pc:docMk/>
+            <pc:sldMk cId="1844608576" sldId="263"/>
+            <ac:spMk id="215" creationId="{AA116659-2760-21F2-F809-E4320983C7EA}"/>
           </ac:spMkLst>
         </pc:spChg>
         <pc:spChg chg="del">
@@ -1002,6 +1090,14 @@
             <ac:grpSpMk id="315" creationId="{F2576EEA-C47D-7129-CE11-E6A858A35809}"/>
           </ac:grpSpMkLst>
         </pc:grpChg>
+        <pc:picChg chg="add mod">
+          <ac:chgData name="Markus Bilz" userId="a36021e4bdb9349f" providerId="LiveId" clId="{F9F2BE70-AAED-47FD-A055-7B08EB1371A3}" dt="2023-02-22T08:43:59.717" v="1572" actId="1076"/>
+          <ac:picMkLst>
+            <pc:docMk/>
+            <pc:sldMk cId="1844608576" sldId="263"/>
+            <ac:picMk id="3" creationId="{96722123-71A7-17FC-A1D1-AF5B326757C5}"/>
+          </ac:picMkLst>
+        </pc:picChg>
         <pc:cxnChg chg="del">
           <ac:chgData name="Markus Bilz" userId="a36021e4bdb9349f" providerId="LiveId" clId="{F9F2BE70-AAED-47FD-A055-7B08EB1371A3}" dt="2023-01-30T15:45:50.704" v="7" actId="478"/>
           <ac:cxnSpMkLst>
@@ -1106,6 +1202,14 @@
             <ac:cxnSpMk id="71" creationId="{E1B8EC65-0002-51B6-8023-BE84A773CCCA}"/>
           </ac:cxnSpMkLst>
         </pc:cxnChg>
+        <pc:cxnChg chg="add mod">
+          <ac:chgData name="Markus Bilz" userId="a36021e4bdb9349f" providerId="LiveId" clId="{F9F2BE70-AAED-47FD-A055-7B08EB1371A3}" dt="2023-02-22T08:53:29.370" v="1705" actId="14100"/>
+          <ac:cxnSpMkLst>
+            <pc:docMk/>
+            <pc:sldMk cId="1844608576" sldId="263"/>
+            <ac:cxnSpMk id="74" creationId="{45034EB7-A2C2-833C-6950-F5376C1D7711}"/>
+          </ac:cxnSpMkLst>
+        </pc:cxnChg>
         <pc:cxnChg chg="del">
           <ac:chgData name="Markus Bilz" userId="a36021e4bdb9349f" providerId="LiveId" clId="{F9F2BE70-AAED-47FD-A055-7B08EB1371A3}" dt="2023-01-30T15:45:52.751" v="9" actId="478"/>
           <ac:cxnSpMkLst>
@@ -1115,13 +1219,21 @@
           </ac:cxnSpMkLst>
         </pc:cxnChg>
         <pc:cxnChg chg="add mod">
-          <ac:chgData name="Markus Bilz" userId="a36021e4bdb9349f" providerId="LiveId" clId="{F9F2BE70-AAED-47FD-A055-7B08EB1371A3}" dt="2023-01-30T16:04:46.107" v="225" actId="14100"/>
+          <ac:chgData name="Markus Bilz" userId="a36021e4bdb9349f" providerId="LiveId" clId="{F9F2BE70-AAED-47FD-A055-7B08EB1371A3}" dt="2023-02-22T08:54:51.491" v="1708" actId="14100"/>
           <ac:cxnSpMkLst>
             <pc:docMk/>
             <pc:sldMk cId="1844608576" sldId="263"/>
             <ac:cxnSpMk id="85" creationId="{620B6CED-9580-DA79-22AE-F82A08CEF70D}"/>
           </ac:cxnSpMkLst>
         </pc:cxnChg>
+        <pc:cxnChg chg="add mod">
+          <ac:chgData name="Markus Bilz" userId="a36021e4bdb9349f" providerId="LiveId" clId="{F9F2BE70-AAED-47FD-A055-7B08EB1371A3}" dt="2023-02-22T08:55:52.232" v="1720" actId="14100"/>
+          <ac:cxnSpMkLst>
+            <pc:docMk/>
+            <pc:sldMk cId="1844608576" sldId="263"/>
+            <ac:cxnSpMk id="95" creationId="{2A3476EF-77D7-9FBB-A947-F75560E54658}"/>
+          </ac:cxnSpMkLst>
+        </pc:cxnChg>
         <pc:cxnChg chg="mod">
           <ac:chgData name="Markus Bilz" userId="a36021e4bdb9349f" providerId="LiveId" clId="{F9F2BE70-AAED-47FD-A055-7B08EB1371A3}" dt="2023-01-30T15:45:50.704" v="7" actId="478"/>
           <ac:cxnSpMkLst>
@@ -1194,6 +1306,30 @@
             <ac:cxnSpMk id="191" creationId="{2B5833C9-C07D-F2D1-2768-2F35F1D7780E}"/>
           </ac:cxnSpMkLst>
         </pc:cxnChg>
+        <pc:cxnChg chg="add mod">
+          <ac:chgData name="Markus Bilz" userId="a36021e4bdb9349f" providerId="LiveId" clId="{F9F2BE70-AAED-47FD-A055-7B08EB1371A3}" dt="2023-02-22T08:57:18.503" v="1732" actId="1076"/>
+          <ac:cxnSpMkLst>
+            <pc:docMk/>
+            <pc:sldMk cId="1844608576" sldId="263"/>
+            <ac:cxnSpMk id="192" creationId="{79936518-1DA3-3C30-DA38-F2C3F2F18C02}"/>
+          </ac:cxnSpMkLst>
+        </pc:cxnChg>
+        <pc:cxnChg chg="add mod">
+          <ac:chgData name="Markus Bilz" userId="a36021e4bdb9349f" providerId="LiveId" clId="{F9F2BE70-AAED-47FD-A055-7B08EB1371A3}" dt="2023-02-22T09:08:35.691" v="1780" actId="14100"/>
+          <ac:cxnSpMkLst>
+            <pc:docMk/>
+            <pc:sldMk cId="1844608576" sldId="263"/>
+            <ac:cxnSpMk id="193" creationId="{CD4D7F8D-ACFF-6E58-7554-64E68DE7F1EB}"/>
+          </ac:cxnSpMkLst>
+        </pc:cxnChg>
+        <pc:cxnChg chg="add mod">
+          <ac:chgData name="Markus Bilz" userId="a36021e4bdb9349f" providerId="LiveId" clId="{F9F2BE70-AAED-47FD-A055-7B08EB1371A3}" dt="2023-02-22T08:57:20.535" v="1733" actId="14100"/>
+          <ac:cxnSpMkLst>
+            <pc:docMk/>
+            <pc:sldMk cId="1844608576" sldId="263"/>
+            <ac:cxnSpMk id="194" creationId="{A533FB3A-4776-A7FD-BCF2-A8E1C483A990}"/>
+          </ac:cxnSpMkLst>
+        </pc:cxnChg>
         <pc:cxnChg chg="del mod">
           <ac:chgData name="Markus Bilz" userId="a36021e4bdb9349f" providerId="LiveId" clId="{F9F2BE70-AAED-47FD-A055-7B08EB1371A3}" dt="2023-01-30T15:45:54.414" v="10" actId="478"/>
           <ac:cxnSpMkLst>
@@ -1202,8 +1338,16 @@
             <ac:cxnSpMk id="197" creationId="{72266BF9-FEEB-509F-96D4-D41CB350B53F}"/>
           </ac:cxnSpMkLst>
         </pc:cxnChg>
+        <pc:cxnChg chg="add mod">
+          <ac:chgData name="Markus Bilz" userId="a36021e4bdb9349f" providerId="LiveId" clId="{F9F2BE70-AAED-47FD-A055-7B08EB1371A3}" dt="2023-02-22T08:55:36.042" v="1715" actId="1076"/>
+          <ac:cxnSpMkLst>
+            <pc:docMk/>
+            <pc:sldMk cId="1844608576" sldId="263"/>
+            <ac:cxnSpMk id="198" creationId="{111866D8-FAED-B118-4BC1-98E555EC188A}"/>
+          </ac:cxnSpMkLst>
+        </pc:cxnChg>
         <pc:cxnChg chg="mod">
-          <ac:chgData name="Markus Bilz" userId="a36021e4bdb9349f" providerId="LiveId" clId="{F9F2BE70-AAED-47FD-A055-7B08EB1371A3}" dt="2023-01-30T16:03:03.710" v="198" actId="1076"/>
+          <ac:chgData name="Markus Bilz" userId="a36021e4bdb9349f" providerId="LiveId" clId="{F9F2BE70-AAED-47FD-A055-7B08EB1371A3}" dt="2023-02-22T08:53:17.418" v="1701" actId="14100"/>
           <ac:cxnSpMkLst>
             <pc:docMk/>
             <pc:sldMk cId="1844608576" sldId="263"/>
@@ -1211,7 +1355,7 @@
           </ac:cxnSpMkLst>
         </pc:cxnChg>
         <pc:cxnChg chg="mod">
-          <ac:chgData name="Markus Bilz" userId="a36021e4bdb9349f" providerId="LiveId" clId="{F9F2BE70-AAED-47FD-A055-7B08EB1371A3}" dt="2023-01-30T16:03:08.047" v="203" actId="478"/>
+          <ac:chgData name="Markus Bilz" userId="a36021e4bdb9349f" providerId="LiveId" clId="{F9F2BE70-AAED-47FD-A055-7B08EB1371A3}" dt="2023-02-22T08:52:37.664" v="1692" actId="14100"/>
           <ac:cxnSpMkLst>
             <pc:docMk/>
             <pc:sldMk cId="1844608576" sldId="263"/>
@@ -1227,7 +1371,7 @@
           </ac:cxnSpMkLst>
         </pc:cxnChg>
         <pc:cxnChg chg="mod">
-          <ac:chgData name="Markus Bilz" userId="a36021e4bdb9349f" providerId="LiveId" clId="{F9F2BE70-AAED-47FD-A055-7B08EB1371A3}" dt="2023-01-30T16:05:01.590" v="228" actId="14100"/>
+          <ac:chgData name="Markus Bilz" userId="a36021e4bdb9349f" providerId="LiveId" clId="{F9F2BE70-AAED-47FD-A055-7B08EB1371A3}" dt="2023-02-22T09:08:41.542" v="1781" actId="14100"/>
           <ac:cxnSpMkLst>
             <pc:docMk/>
             <pc:sldMk cId="1844608576" sldId="263"/>
@@ -7461,7 +7605,7 @@
           <a:p>
             <a:fld id="{D6A82EB2-151D-4EEE-ACF5-92C73278C09C}" type="datetimeFigureOut">
               <a:rPr lang="en-GB" smtClean="0"/>
-              <a:t>18/02/2023</a:t>
+              <a:t>22/02/2023</a:t>
             </a:fld>
             <a:endParaRPr lang="en-GB"/>
           </a:p>
@@ -7661,7 +7805,7 @@
           <a:p>
             <a:fld id="{D6A82EB2-151D-4EEE-ACF5-92C73278C09C}" type="datetimeFigureOut">
               <a:rPr lang="en-GB" smtClean="0"/>
-              <a:t>18/02/2023</a:t>
+              <a:t>22/02/2023</a:t>
             </a:fld>
             <a:endParaRPr lang="en-GB"/>
           </a:p>
@@ -7871,7 +8015,7 @@
           <a:p>
             <a:fld id="{D6A82EB2-151D-4EEE-ACF5-92C73278C09C}" type="datetimeFigureOut">
               <a:rPr lang="en-GB" smtClean="0"/>
-              <a:t>18/02/2023</a:t>
+              <a:t>22/02/2023</a:t>
             </a:fld>
             <a:endParaRPr lang="en-GB"/>
           </a:p>
@@ -8071,7 +8215,7 @@
           <a:p>
             <a:fld id="{D6A82EB2-151D-4EEE-ACF5-92C73278C09C}" type="datetimeFigureOut">
               <a:rPr lang="en-GB" smtClean="0"/>
-              <a:t>18/02/2023</a:t>
+              <a:t>22/02/2023</a:t>
             </a:fld>
             <a:endParaRPr lang="en-GB"/>
           </a:p>
@@ -8347,7 +8491,7 @@
           <a:p>
             <a:fld id="{D6A82EB2-151D-4EEE-ACF5-92C73278C09C}" type="datetimeFigureOut">
               <a:rPr lang="en-GB" smtClean="0"/>
-              <a:t>18/02/2023</a:t>
+              <a:t>22/02/2023</a:t>
             </a:fld>
             <a:endParaRPr lang="en-GB"/>
           </a:p>
@@ -8615,7 +8759,7 @@
           <a:p>
             <a:fld id="{D6A82EB2-151D-4EEE-ACF5-92C73278C09C}" type="datetimeFigureOut">
               <a:rPr lang="en-GB" smtClean="0"/>
-              <a:t>18/02/2023</a:t>
+              <a:t>22/02/2023</a:t>
             </a:fld>
             <a:endParaRPr lang="en-GB"/>
           </a:p>
@@ -9030,7 +9174,7 @@
           <a:p>
             <a:fld id="{D6A82EB2-151D-4EEE-ACF5-92C73278C09C}" type="datetimeFigureOut">
               <a:rPr lang="en-GB" smtClean="0"/>
-              <a:t>18/02/2023</a:t>
+              <a:t>22/02/2023</a:t>
             </a:fld>
             <a:endParaRPr lang="en-GB"/>
           </a:p>
@@ -9172,7 +9316,7 @@
           <a:p>
             <a:fld id="{D6A82EB2-151D-4EEE-ACF5-92C73278C09C}" type="datetimeFigureOut">
               <a:rPr lang="en-GB" smtClean="0"/>
-              <a:t>18/02/2023</a:t>
+              <a:t>22/02/2023</a:t>
             </a:fld>
             <a:endParaRPr lang="en-GB"/>
           </a:p>
@@ -9285,7 +9429,7 @@
           <a:p>
             <a:fld id="{D6A82EB2-151D-4EEE-ACF5-92C73278C09C}" type="datetimeFigureOut">
               <a:rPr lang="en-GB" smtClean="0"/>
-              <a:t>18/02/2023</a:t>
+              <a:t>22/02/2023</a:t>
             </a:fld>
             <a:endParaRPr lang="en-GB"/>
           </a:p>
@@ -9598,7 +9742,7 @@
           <a:p>
             <a:fld id="{D6A82EB2-151D-4EEE-ACF5-92C73278C09C}" type="datetimeFigureOut">
               <a:rPr lang="en-GB" smtClean="0"/>
-              <a:t>18/02/2023</a:t>
+              <a:t>22/02/2023</a:t>
             </a:fld>
             <a:endParaRPr lang="en-GB"/>
           </a:p>
@@ -9887,7 +10031,7 @@
           <a:p>
             <a:fld id="{D6A82EB2-151D-4EEE-ACF5-92C73278C09C}" type="datetimeFigureOut">
               <a:rPr lang="en-GB" smtClean="0"/>
-              <a:t>18/02/2023</a:t>
+              <a:t>22/02/2023</a:t>
             </a:fld>
             <a:endParaRPr lang="en-GB"/>
           </a:p>
@@ -10130,7 +10274,7 @@
           <a:p>
             <a:fld id="{D6A82EB2-151D-4EEE-ACF5-92C73278C09C}" type="datetimeFigureOut">
               <a:rPr lang="en-GB" smtClean="0"/>
-              <a:t>18/02/2023</a:t>
+              <a:t>22/02/2023</a:t>
             </a:fld>
             <a:endParaRPr lang="en-GB"/>
           </a:p>
@@ -17126,8 +17270,8 @@
         </p:nvSpPr>
         <p:spPr>
           <a:xfrm>
-            <a:off x="1330983" y="1027271"/>
-            <a:ext cx="1164431" cy="474504"/>
+            <a:off x="3905250" y="2664146"/>
+            <a:ext cx="720000" cy="237252"/>
           </a:xfrm>
           <a:prstGeom prst="roundRect">
             <a:avLst>
@@ -17187,8 +17331,8 @@
         </p:nvSpPr>
         <p:spPr>
           <a:xfrm>
-            <a:off x="1346066" y="611982"/>
-            <a:ext cx="1164431" cy="242887"/>
+            <a:off x="3002755" y="2661328"/>
+            <a:ext cx="720000" cy="242887"/>
           </a:xfrm>
           <a:prstGeom prst="roundRect">
             <a:avLst>
@@ -17223,63 +17367,12 @@
           <a:p>
             <a:pPr algn="ctr"/>
             <a:r>
-              <a:rPr lang="de-DE" sz="1100" noProof="1">
+              <a:rPr lang="de-DE" sz="800" noProof="1">
                 <a:latin typeface="+mj-lt"/>
                 <a:cs typeface="Arial" panose="020B0604020202020204" pitchFamily="34" charset="0"/>
               </a:rPr>
-              <a:t>Add &amp; Norm</a:t>
+              <a:t>Layer Norm</a:t>
             </a:r>
-          </a:p>
-        </p:txBody>
-      </p:sp>
-      <p:sp>
-        <p:nvSpPr>
-          <p:cNvPr id="80" name="Rectangle: Rounded Corners 79">
-            <a:extLst>
-              <a:ext uri="{FF2B5EF4-FFF2-40B4-BE49-F238E27FC236}">
-                <a16:creationId xmlns:a16="http://schemas.microsoft.com/office/drawing/2014/main" id="{83641231-252D-FDB3-0C23-5CDCCDA26F9E}"/>
-              </a:ext>
-            </a:extLst>
-          </p:cNvPr>
-          <p:cNvSpPr/>
-          <p:nvPr/>
-        </p:nvSpPr>
-        <p:spPr>
-          <a:xfrm>
-            <a:off x="1085850" y="385763"/>
-            <a:ext cx="1611177" cy="1371601"/>
-          </a:xfrm>
-          <a:prstGeom prst="roundRect">
-            <a:avLst>
-              <a:gd name="adj" fmla="val 5838"/>
-            </a:avLst>
-          </a:prstGeom>
-          <a:noFill/>
-          <a:ln>
-            <a:headEnd type="none" w="med" len="med"/>
-            <a:tailEnd type="none" w="med" len="med"/>
-          </a:ln>
-        </p:spPr>
-        <p:style>
-          <a:lnRef idx="2">
-            <a:schemeClr val="dk1"/>
-          </a:lnRef>
-          <a:fillRef idx="1">
-            <a:schemeClr val="lt1"/>
-          </a:fillRef>
-          <a:effectRef idx="0">
-            <a:schemeClr val="dk1"/>
-          </a:effectRef>
-          <a:fontRef idx="minor">
-            <a:schemeClr val="dk1"/>
-          </a:fontRef>
-        </p:style>
-        <p:txBody>
-          <a:bodyPr rtlCol="0" anchor="ctr"/>
-          <a:lstStyle/>
-          <a:p>
-            <a:pPr algn="ctr"/>
-            <a:endParaRPr lang="en-GB"/>
           </a:p>
         </p:txBody>
       </p:sp>
@@ -17294,13 +17387,15 @@
           </p:cNvPr>
           <p:cNvCxnSpPr>
             <a:cxnSpLocks/>
+            <a:stCxn id="67" idx="3"/>
+            <a:endCxn id="66" idx="1"/>
           </p:cNvCxnSpPr>
           <p:nvPr/>
         </p:nvCxnSpPr>
         <p:spPr>
-          <a:xfrm flipV="1">
-            <a:off x="1898118" y="1512651"/>
-            <a:ext cx="0" cy="159781"/>
+          <a:xfrm>
+            <a:off x="3722755" y="2782772"/>
+            <a:ext cx="182495" cy="0"/>
           </a:xfrm>
           <a:prstGeom prst="straightConnector1">
             <a:avLst/>
@@ -17335,14 +17430,15 @@
           </p:cNvPr>
           <p:cNvCxnSpPr>
             <a:cxnSpLocks/>
-            <a:stCxn id="66" idx="0"/>
+            <a:stCxn id="66" idx="3"/>
+            <a:endCxn id="15" idx="2"/>
           </p:cNvCxnSpPr>
           <p:nvPr/>
         </p:nvCxnSpPr>
         <p:spPr>
-          <a:xfrm flipV="1">
-            <a:off x="1913199" y="862430"/>
-            <a:ext cx="2631" cy="164841"/>
+          <a:xfrm>
+            <a:off x="4625250" y="2782772"/>
+            <a:ext cx="178207" cy="4818"/>
           </a:xfrm>
           <a:prstGeom prst="straightConnector1">
             <a:avLst/>
@@ -17380,19 +17476,19 @@
           </p:cNvPr>
           <p:cNvCxnSpPr>
             <a:cxnSpLocks/>
-            <a:endCxn id="67" idx="1"/>
+            <a:stCxn id="28" idx="0"/>
+            <a:endCxn id="15" idx="0"/>
           </p:cNvCxnSpPr>
           <p:nvPr/>
         </p:nvCxnSpPr>
         <p:spPr>
-          <a:xfrm rot="16200000" flipV="1">
-            <a:off x="954021" y="1125471"/>
-            <a:ext cx="1338262" cy="554172"/>
-          </a:xfrm>
-          <a:prstGeom prst="bentConnector4">
+          <a:xfrm rot="16200000" flipH="1">
+            <a:off x="3774609" y="1608371"/>
+            <a:ext cx="52961" cy="2155933"/>
+          </a:xfrm>
+          <a:prstGeom prst="bentConnector3">
             <a:avLst>
-              <a:gd name="adj1" fmla="val 29449"/>
-              <a:gd name="adj2" fmla="val 133516"/>
+              <a:gd name="adj1" fmla="val -431638"/>
             </a:avLst>
           </a:prstGeom>
           <a:ln w="12700">
@@ -17428,14 +17524,14 @@
           </p:cNvPr>
           <p:cNvCxnSpPr>
             <a:cxnSpLocks/>
-            <a:stCxn id="67" idx="0"/>
+            <a:stCxn id="15" idx="6"/>
           </p:cNvCxnSpPr>
           <p:nvPr/>
         </p:nvCxnSpPr>
         <p:spPr>
-          <a:xfrm flipV="1">
-            <a:off x="1928282" y="71438"/>
-            <a:ext cx="0" cy="540544"/>
+          <a:xfrm>
+            <a:off x="4954657" y="2787590"/>
+            <a:ext cx="180000" cy="0"/>
           </a:xfrm>
           <a:prstGeom prst="straightConnector1">
             <a:avLst/>
@@ -17462,6 +17558,807 @@
           </a:fontRef>
         </p:style>
       </p:cxnSp>
+      <p:pic>
+        <p:nvPicPr>
+          <p:cNvPr id="3" name="Picture 2" descr="A picture containing diagram&#10;&#10;Description automatically generated">
+            <a:extLst>
+              <a:ext uri="{FF2B5EF4-FFF2-40B4-BE49-F238E27FC236}">
+                <a16:creationId xmlns:a16="http://schemas.microsoft.com/office/drawing/2014/main" id="{96722123-71A7-17FC-A1D1-AF5B326757C5}"/>
+              </a:ext>
+            </a:extLst>
+          </p:cNvPr>
+          <p:cNvPicPr>
+            <a:picLocks noChangeAspect="1"/>
+          </p:cNvPicPr>
+          <p:nvPr/>
+        </p:nvPicPr>
+        <p:blipFill>
+          <a:blip r:embed="rId2">
+            <a:extLst>
+              <a:ext uri="{28A0092B-C50C-407E-A947-70E740481C1C}">
+                <a14:useLocalDpi xmlns:a14="http://schemas.microsoft.com/office/drawing/2010/main" val="0"/>
+              </a:ext>
+            </a:extLst>
+          </a:blip>
+          <a:stretch>
+            <a:fillRect/>
+          </a:stretch>
+        </p:blipFill>
+        <p:spPr>
+          <a:xfrm>
+            <a:off x="7699703" y="641500"/>
+            <a:ext cx="4314825" cy="2676525"/>
+          </a:xfrm>
+          <a:prstGeom prst="rect">
+            <a:avLst/>
+          </a:prstGeom>
+        </p:spPr>
+      </p:pic>
+      <p:sp>
+        <p:nvSpPr>
+          <p:cNvPr id="15" name="Oval 14">
+            <a:extLst>
+              <a:ext uri="{FF2B5EF4-FFF2-40B4-BE49-F238E27FC236}">
+                <a16:creationId xmlns:a16="http://schemas.microsoft.com/office/drawing/2014/main" id="{E8133E75-162F-B9D7-4F2C-61241AF6B53D}"/>
+              </a:ext>
+            </a:extLst>
+          </p:cNvPr>
+          <p:cNvSpPr/>
+          <p:nvPr/>
+        </p:nvSpPr>
+        <p:spPr>
+          <a:xfrm>
+            <a:off x="4803457" y="2712818"/>
+            <a:ext cx="151200" cy="149544"/>
+          </a:xfrm>
+          <a:prstGeom prst="ellipse">
+            <a:avLst/>
+          </a:prstGeom>
+          <a:noFill/>
+          <a:ln>
+            <a:solidFill>
+              <a:schemeClr val="tx1"/>
+            </a:solidFill>
+          </a:ln>
+        </p:spPr>
+        <p:style>
+          <a:lnRef idx="2">
+            <a:schemeClr val="accent1">
+              <a:shade val="50000"/>
+            </a:schemeClr>
+          </a:lnRef>
+          <a:fillRef idx="1">
+            <a:schemeClr val="accent1"/>
+          </a:fillRef>
+          <a:effectRef idx="0">
+            <a:schemeClr val="accent1"/>
+          </a:effectRef>
+          <a:fontRef idx="minor">
+            <a:schemeClr val="lt1"/>
+          </a:fontRef>
+        </p:style>
+        <p:txBody>
+          <a:bodyPr rtlCol="0" anchor="ctr"/>
+          <a:lstStyle/>
+          <a:p>
+            <a:pPr algn="ctr"/>
+            <a:r>
+              <a:rPr lang="de-DE" sz="1100" dirty="0">
+                <a:solidFill>
+                  <a:schemeClr val="tx1"/>
+                </a:solidFill>
+              </a:rPr>
+              <a:t>+</a:t>
+            </a:r>
+            <a:endParaRPr lang="en-GB" sz="1100" dirty="0">
+              <a:solidFill>
+                <a:schemeClr val="tx1"/>
+              </a:solidFill>
+            </a:endParaRPr>
+          </a:p>
+        </p:txBody>
+      </p:sp>
+      <p:sp>
+        <p:nvSpPr>
+          <p:cNvPr id="26" name="TextBox 25">
+            <a:extLst>
+              <a:ext uri="{FF2B5EF4-FFF2-40B4-BE49-F238E27FC236}">
+                <a16:creationId xmlns:a16="http://schemas.microsoft.com/office/drawing/2014/main" id="{3F01F5F2-C867-1EF5-6585-E4346DDBC353}"/>
+              </a:ext>
+            </a:extLst>
+          </p:cNvPr>
+          <p:cNvSpPr txBox="1"/>
+          <p:nvPr/>
+        </p:nvSpPr>
+        <p:spPr>
+          <a:xfrm>
+            <a:off x="5140325" y="2657475"/>
+            <a:ext cx="1118255" cy="261610"/>
+          </a:xfrm>
+          <a:prstGeom prst="rect">
+            <a:avLst/>
+          </a:prstGeom>
+          <a:noFill/>
+        </p:spPr>
+        <p:txBody>
+          <a:bodyPr wrap="none" lIns="0" rtlCol="0">
+            <a:spAutoFit/>
+          </a:bodyPr>
+          <a:lstStyle/>
+          <a:p>
+            <a:r>
+              <a:rPr lang="de-DE" sz="1100" dirty="0"/>
+              <a:t>$\</a:t>
+            </a:r>
+            <a:r>
+              <a:rPr lang="de-DE" sz="1100" dirty="0" err="1"/>
+              <a:t>boldsymbol</a:t>
+            </a:r>
+            <a:r>
+              <a:rPr lang="de-DE" sz="1100" dirty="0"/>
+              <a:t>{X}$</a:t>
+            </a:r>
+            <a:endParaRPr lang="en-GB" sz="1100" dirty="0"/>
+          </a:p>
+        </p:txBody>
+      </p:sp>
+      <p:sp>
+        <p:nvSpPr>
+          <p:cNvPr id="28" name="TextBox 27">
+            <a:extLst>
+              <a:ext uri="{FF2B5EF4-FFF2-40B4-BE49-F238E27FC236}">
+                <a16:creationId xmlns:a16="http://schemas.microsoft.com/office/drawing/2014/main" id="{C68EF78B-5C83-C0E6-D42D-88D80ABC2387}"/>
+              </a:ext>
+            </a:extLst>
+          </p:cNvPr>
+          <p:cNvSpPr txBox="1"/>
+          <p:nvPr/>
+        </p:nvSpPr>
+        <p:spPr>
+          <a:xfrm>
+            <a:off x="2621756" y="2659857"/>
+            <a:ext cx="202736" cy="2462213"/>
+          </a:xfrm>
+          <a:prstGeom prst="rect">
+            <a:avLst/>
+          </a:prstGeom>
+          <a:noFill/>
+        </p:spPr>
+        <p:txBody>
+          <a:bodyPr wrap="square" lIns="0" rtlCol="0">
+            <a:spAutoFit/>
+          </a:bodyPr>
+          <a:lstStyle/>
+          <a:p>
+            <a:r>
+              <a:rPr lang="de-DE" sz="1100" dirty="0"/>
+              <a:t>$\</a:t>
+            </a:r>
+            <a:r>
+              <a:rPr lang="de-DE" sz="1100" dirty="0" err="1"/>
+              <a:t>boldsymbol</a:t>
+            </a:r>
+            <a:r>
+              <a:rPr lang="de-DE" sz="1100" dirty="0"/>
+              <a:t>{X}$</a:t>
+            </a:r>
+            <a:endParaRPr lang="en-GB" sz="1100" dirty="0"/>
+          </a:p>
+        </p:txBody>
+      </p:sp>
+      <p:cxnSp>
+        <p:nvCxnSpPr>
+          <p:cNvPr id="74" name="Straight Arrow Connector 73">
+            <a:extLst>
+              <a:ext uri="{FF2B5EF4-FFF2-40B4-BE49-F238E27FC236}">
+                <a16:creationId xmlns:a16="http://schemas.microsoft.com/office/drawing/2014/main" id="{45034EB7-A2C2-833C-6950-F5376C1D7711}"/>
+              </a:ext>
+            </a:extLst>
+          </p:cNvPr>
+          <p:cNvCxnSpPr>
+            <a:cxnSpLocks/>
+            <a:endCxn id="67" idx="1"/>
+          </p:cNvCxnSpPr>
+          <p:nvPr/>
+        </p:nvCxnSpPr>
+        <p:spPr>
+          <a:xfrm>
+            <a:off x="2824163" y="2781300"/>
+            <a:ext cx="178592" cy="1472"/>
+          </a:xfrm>
+          <a:prstGeom prst="straightConnector1">
+            <a:avLst/>
+          </a:prstGeom>
+          <a:ln w="12700">
+            <a:tailEnd type="triangle"/>
+          </a:ln>
+        </p:spPr>
+        <p:style>
+          <a:lnRef idx="1">
+            <a:schemeClr val="dk1"/>
+          </a:lnRef>
+          <a:fillRef idx="0">
+            <a:schemeClr val="dk1"/>
+          </a:fillRef>
+          <a:effectRef idx="0">
+            <a:schemeClr val="dk1"/>
+          </a:effectRef>
+          <a:fontRef idx="minor">
+            <a:schemeClr val="tx1"/>
+          </a:fontRef>
+        </p:style>
+      </p:cxnSp>
+      <p:sp>
+        <p:nvSpPr>
+          <p:cNvPr id="93" name="Rectangle: Rounded Corners 92">
+            <a:extLst>
+              <a:ext uri="{FF2B5EF4-FFF2-40B4-BE49-F238E27FC236}">
+                <a16:creationId xmlns:a16="http://schemas.microsoft.com/office/drawing/2014/main" id="{671F1362-E500-05A6-E86F-3C1CB5CCD44D}"/>
+              </a:ext>
+            </a:extLst>
+          </p:cNvPr>
+          <p:cNvSpPr/>
+          <p:nvPr/>
+        </p:nvSpPr>
+        <p:spPr>
+          <a:xfrm>
+            <a:off x="4156482" y="397989"/>
+            <a:ext cx="720000" cy="237252"/>
+          </a:xfrm>
+          <a:prstGeom prst="roundRect">
+            <a:avLst>
+              <a:gd name="adj" fmla="val 15547"/>
+            </a:avLst>
+          </a:prstGeom>
+          <a:solidFill>
+            <a:srgbClr val="CCD497"/>
+          </a:solidFill>
+          <a:ln w="19050">
+            <a:headEnd type="none" w="med" len="med"/>
+            <a:tailEnd type="none" w="med" len="med"/>
+          </a:ln>
+        </p:spPr>
+        <p:style>
+          <a:lnRef idx="2">
+            <a:schemeClr val="dk1"/>
+          </a:lnRef>
+          <a:fillRef idx="1">
+            <a:schemeClr val="lt1"/>
+          </a:fillRef>
+          <a:effectRef idx="0">
+            <a:schemeClr val="dk1"/>
+          </a:effectRef>
+          <a:fontRef idx="minor">
+            <a:schemeClr val="dk1"/>
+          </a:fontRef>
+        </p:style>
+        <p:txBody>
+          <a:bodyPr rtlCol="0" anchor="ctr"/>
+          <a:lstStyle/>
+          <a:p>
+            <a:pPr algn="ctr"/>
+            <a:r>
+              <a:rPr lang="de-DE" sz="800" noProof="1">
+                <a:latin typeface="+mj-lt"/>
+                <a:cs typeface="Arial" panose="020B0604020202020204" pitchFamily="34" charset="0"/>
+              </a:rPr>
+              <a:t>Layer Norm</a:t>
+            </a:r>
+          </a:p>
+        </p:txBody>
+      </p:sp>
+      <p:sp>
+        <p:nvSpPr>
+          <p:cNvPr id="94" name="Rectangle: Rounded Corners 93">
+            <a:extLst>
+              <a:ext uri="{FF2B5EF4-FFF2-40B4-BE49-F238E27FC236}">
+                <a16:creationId xmlns:a16="http://schemas.microsoft.com/office/drawing/2014/main" id="{2523B3A1-A1A0-B768-99F1-32A20559DD27}"/>
+              </a:ext>
+            </a:extLst>
+          </p:cNvPr>
+          <p:cNvSpPr/>
+          <p:nvPr/>
+        </p:nvSpPr>
+        <p:spPr>
+          <a:xfrm>
+            <a:off x="2913855" y="388028"/>
+            <a:ext cx="720000" cy="242887"/>
+          </a:xfrm>
+          <a:prstGeom prst="roundRect">
+            <a:avLst>
+              <a:gd name="adj" fmla="val 15547"/>
+            </a:avLst>
+          </a:prstGeom>
+          <a:solidFill>
+            <a:schemeClr val="bg1">
+              <a:lumMod val="85000"/>
+            </a:schemeClr>
+          </a:solidFill>
+          <a:ln w="19050">
+            <a:headEnd type="none" w="med" len="med"/>
+            <a:tailEnd type="none" w="med" len="med"/>
+          </a:ln>
+        </p:spPr>
+        <p:style>
+          <a:lnRef idx="2">
+            <a:schemeClr val="dk1"/>
+          </a:lnRef>
+          <a:fillRef idx="1">
+            <a:schemeClr val="lt1"/>
+          </a:fillRef>
+          <a:effectRef idx="0">
+            <a:schemeClr val="dk1"/>
+          </a:effectRef>
+          <a:fontRef idx="minor">
+            <a:schemeClr val="dk1"/>
+          </a:fontRef>
+        </p:style>
+        <p:txBody>
+          <a:bodyPr rtlCol="0" anchor="ctr"/>
+          <a:lstStyle/>
+          <a:p>
+            <a:pPr algn="ctr"/>
+            <a:r>
+              <a:rPr lang="de-DE" sz="1100" noProof="1">
+                <a:latin typeface="+mj-lt"/>
+                <a:cs typeface="Arial" panose="020B0604020202020204" pitchFamily="34" charset="0"/>
+              </a:rPr>
+              <a:t>Sublayer</a:t>
+            </a:r>
+          </a:p>
+        </p:txBody>
+      </p:sp>
+      <p:cxnSp>
+        <p:nvCxnSpPr>
+          <p:cNvPr id="95" name="Straight Arrow Connector 94">
+            <a:extLst>
+              <a:ext uri="{FF2B5EF4-FFF2-40B4-BE49-F238E27FC236}">
+                <a16:creationId xmlns:a16="http://schemas.microsoft.com/office/drawing/2014/main" id="{2A3476EF-77D7-9FBB-A947-F75560E54658}"/>
+              </a:ext>
+            </a:extLst>
+          </p:cNvPr>
+          <p:cNvCxnSpPr>
+            <a:cxnSpLocks/>
+            <a:stCxn id="94" idx="3"/>
+          </p:cNvCxnSpPr>
+          <p:nvPr/>
+        </p:nvCxnSpPr>
+        <p:spPr>
+          <a:xfrm>
+            <a:off x="3633854" y="509472"/>
+            <a:ext cx="180000" cy="0"/>
+          </a:xfrm>
+          <a:prstGeom prst="straightConnector1">
+            <a:avLst/>
+          </a:prstGeom>
+          <a:ln w="12700">
+            <a:tailEnd type="triangle"/>
+          </a:ln>
+        </p:spPr>
+        <p:style>
+          <a:lnRef idx="1">
+            <a:schemeClr val="dk1"/>
+          </a:lnRef>
+          <a:fillRef idx="0">
+            <a:schemeClr val="dk1"/>
+          </a:fillRef>
+          <a:effectRef idx="0">
+            <a:schemeClr val="dk1"/>
+          </a:effectRef>
+          <a:fontRef idx="minor">
+            <a:schemeClr val="tx1"/>
+          </a:fontRef>
+        </p:style>
+      </p:cxnSp>
+      <p:cxnSp>
+        <p:nvCxnSpPr>
+          <p:cNvPr id="192" name="Straight Arrow Connector 191">
+            <a:extLst>
+              <a:ext uri="{FF2B5EF4-FFF2-40B4-BE49-F238E27FC236}">
+                <a16:creationId xmlns:a16="http://schemas.microsoft.com/office/drawing/2014/main" id="{79936518-1DA3-3C30-DA38-F2C3F2F18C02}"/>
+              </a:ext>
+            </a:extLst>
+          </p:cNvPr>
+          <p:cNvCxnSpPr>
+            <a:cxnSpLocks/>
+            <a:stCxn id="93" idx="3"/>
+          </p:cNvCxnSpPr>
+          <p:nvPr/>
+        </p:nvCxnSpPr>
+        <p:spPr>
+          <a:xfrm>
+            <a:off x="4876481" y="516615"/>
+            <a:ext cx="180000" cy="0"/>
+          </a:xfrm>
+          <a:prstGeom prst="straightConnector1">
+            <a:avLst/>
+          </a:prstGeom>
+          <a:ln w="12700">
+            <a:solidFill>
+              <a:schemeClr val="tx1"/>
+            </a:solidFill>
+            <a:tailEnd type="triangle"/>
+          </a:ln>
+        </p:spPr>
+        <p:style>
+          <a:lnRef idx="1">
+            <a:schemeClr val="dk1"/>
+          </a:lnRef>
+          <a:fillRef idx="0">
+            <a:schemeClr val="dk1"/>
+          </a:fillRef>
+          <a:effectRef idx="0">
+            <a:schemeClr val="dk1"/>
+          </a:effectRef>
+          <a:fontRef idx="minor">
+            <a:schemeClr val="tx1"/>
+          </a:fontRef>
+        </p:style>
+      </p:cxnSp>
+      <p:cxnSp>
+        <p:nvCxnSpPr>
+          <p:cNvPr id="193" name="Connector: Elbow 192">
+            <a:extLst>
+              <a:ext uri="{FF2B5EF4-FFF2-40B4-BE49-F238E27FC236}">
+                <a16:creationId xmlns:a16="http://schemas.microsoft.com/office/drawing/2014/main" id="{CD4D7F8D-ACFF-6E58-7554-64E68DE7F1EB}"/>
+              </a:ext>
+            </a:extLst>
+          </p:cNvPr>
+          <p:cNvCxnSpPr>
+            <a:cxnSpLocks/>
+            <a:stCxn id="197" idx="0"/>
+            <a:endCxn id="195" idx="0"/>
+          </p:cNvCxnSpPr>
+          <p:nvPr/>
+        </p:nvCxnSpPr>
+        <p:spPr>
+          <a:xfrm rot="16200000" flipH="1">
+            <a:off x="3244898" y="-212771"/>
+            <a:ext cx="32324" cy="1267492"/>
+          </a:xfrm>
+          <a:prstGeom prst="bentConnector3">
+            <a:avLst>
+              <a:gd name="adj1" fmla="val -707214"/>
+            </a:avLst>
+          </a:prstGeom>
+          <a:ln w="12700">
+            <a:solidFill>
+              <a:schemeClr val="tx1"/>
+            </a:solidFill>
+            <a:tailEnd type="triangle"/>
+          </a:ln>
+        </p:spPr>
+        <p:style>
+          <a:lnRef idx="1">
+            <a:schemeClr val="accent1"/>
+          </a:lnRef>
+          <a:fillRef idx="0">
+            <a:schemeClr val="accent1"/>
+          </a:fillRef>
+          <a:effectRef idx="0">
+            <a:schemeClr val="accent1"/>
+          </a:effectRef>
+          <a:fontRef idx="minor">
+            <a:schemeClr val="tx1"/>
+          </a:fontRef>
+        </p:style>
+      </p:cxnSp>
+      <p:cxnSp>
+        <p:nvCxnSpPr>
+          <p:cNvPr id="194" name="Straight Arrow Connector 193">
+            <a:extLst>
+              <a:ext uri="{FF2B5EF4-FFF2-40B4-BE49-F238E27FC236}">
+                <a16:creationId xmlns:a16="http://schemas.microsoft.com/office/drawing/2014/main" id="{A533FB3A-4776-A7FD-BCF2-A8E1C483A990}"/>
+              </a:ext>
+            </a:extLst>
+          </p:cNvPr>
+          <p:cNvCxnSpPr>
+            <a:cxnSpLocks/>
+            <a:stCxn id="195" idx="6"/>
+            <a:endCxn id="93" idx="1"/>
+          </p:cNvCxnSpPr>
+          <p:nvPr/>
+        </p:nvCxnSpPr>
+        <p:spPr>
+          <a:xfrm>
+            <a:off x="3970406" y="511909"/>
+            <a:ext cx="186076" cy="4706"/>
+          </a:xfrm>
+          <a:prstGeom prst="straightConnector1">
+            <a:avLst/>
+          </a:prstGeom>
+          <a:ln w="12700">
+            <a:solidFill>
+              <a:schemeClr val="tx1"/>
+            </a:solidFill>
+            <a:tailEnd type="triangle"/>
+          </a:ln>
+        </p:spPr>
+        <p:style>
+          <a:lnRef idx="1">
+            <a:schemeClr val="dk1"/>
+          </a:lnRef>
+          <a:fillRef idx="0">
+            <a:schemeClr val="dk1"/>
+          </a:fillRef>
+          <a:effectRef idx="0">
+            <a:schemeClr val="dk1"/>
+          </a:effectRef>
+          <a:fontRef idx="minor">
+            <a:schemeClr val="tx1"/>
+          </a:fontRef>
+        </p:style>
+      </p:cxnSp>
+      <p:sp>
+        <p:nvSpPr>
+          <p:cNvPr id="195" name="Oval 194">
+            <a:extLst>
+              <a:ext uri="{FF2B5EF4-FFF2-40B4-BE49-F238E27FC236}">
+                <a16:creationId xmlns:a16="http://schemas.microsoft.com/office/drawing/2014/main" id="{EE401D95-5407-A19B-E61D-AB1030A25C0C}"/>
+              </a:ext>
+            </a:extLst>
+          </p:cNvPr>
+          <p:cNvSpPr/>
+          <p:nvPr/>
+        </p:nvSpPr>
+        <p:spPr>
+          <a:xfrm>
+            <a:off x="3819206" y="437137"/>
+            <a:ext cx="151200" cy="149544"/>
+          </a:xfrm>
+          <a:prstGeom prst="ellipse">
+            <a:avLst/>
+          </a:prstGeom>
+          <a:noFill/>
+          <a:ln>
+            <a:solidFill>
+              <a:schemeClr val="tx1"/>
+            </a:solidFill>
+          </a:ln>
+        </p:spPr>
+        <p:style>
+          <a:lnRef idx="2">
+            <a:schemeClr val="accent1">
+              <a:shade val="50000"/>
+            </a:schemeClr>
+          </a:lnRef>
+          <a:fillRef idx="1">
+            <a:schemeClr val="accent1"/>
+          </a:fillRef>
+          <a:effectRef idx="0">
+            <a:schemeClr val="accent1"/>
+          </a:effectRef>
+          <a:fontRef idx="minor">
+            <a:schemeClr val="lt1"/>
+          </a:fontRef>
+        </p:style>
+        <p:txBody>
+          <a:bodyPr rtlCol="0" anchor="ctr"/>
+          <a:lstStyle/>
+          <a:p>
+            <a:pPr algn="ctr"/>
+            <a:r>
+              <a:rPr lang="de-DE" sz="1100" dirty="0">
+                <a:solidFill>
+                  <a:schemeClr val="tx1"/>
+                </a:solidFill>
+              </a:rPr>
+              <a:t>+</a:t>
+            </a:r>
+            <a:endParaRPr lang="en-GB" sz="1100" dirty="0">
+              <a:solidFill>
+                <a:schemeClr val="tx1"/>
+              </a:solidFill>
+            </a:endParaRPr>
+          </a:p>
+        </p:txBody>
+      </p:sp>
+      <p:sp>
+        <p:nvSpPr>
+          <p:cNvPr id="196" name="TextBox 195">
+            <a:extLst>
+              <a:ext uri="{FF2B5EF4-FFF2-40B4-BE49-F238E27FC236}">
+                <a16:creationId xmlns:a16="http://schemas.microsoft.com/office/drawing/2014/main" id="{D2BF1CC6-08EF-9DE9-0F91-0E6D29DD0175}"/>
+              </a:ext>
+            </a:extLst>
+          </p:cNvPr>
+          <p:cNvSpPr txBox="1"/>
+          <p:nvPr/>
+        </p:nvSpPr>
+        <p:spPr>
+          <a:xfrm>
+            <a:off x="5051425" y="384175"/>
+            <a:ext cx="1118255" cy="261610"/>
+          </a:xfrm>
+          <a:prstGeom prst="rect">
+            <a:avLst/>
+          </a:prstGeom>
+          <a:noFill/>
+        </p:spPr>
+        <p:txBody>
+          <a:bodyPr wrap="none" lIns="0" rtlCol="0">
+            <a:spAutoFit/>
+          </a:bodyPr>
+          <a:lstStyle/>
+          <a:p>
+            <a:r>
+              <a:rPr lang="de-DE" sz="1100" dirty="0"/>
+              <a:t>$\</a:t>
+            </a:r>
+            <a:r>
+              <a:rPr lang="de-DE" sz="1100" dirty="0" err="1"/>
+              <a:t>boldsymbol</a:t>
+            </a:r>
+            <a:r>
+              <a:rPr lang="de-DE" sz="1100" dirty="0"/>
+              <a:t>{X}$</a:t>
+            </a:r>
+            <a:endParaRPr lang="en-GB" sz="1100" dirty="0"/>
+          </a:p>
+        </p:txBody>
+      </p:sp>
+      <p:sp>
+        <p:nvSpPr>
+          <p:cNvPr id="197" name="TextBox 196">
+            <a:extLst>
+              <a:ext uri="{FF2B5EF4-FFF2-40B4-BE49-F238E27FC236}">
+                <a16:creationId xmlns:a16="http://schemas.microsoft.com/office/drawing/2014/main" id="{74FF516F-666F-D0E7-5C2E-185F2C88C5FB}"/>
+              </a:ext>
+            </a:extLst>
+          </p:cNvPr>
+          <p:cNvSpPr txBox="1"/>
+          <p:nvPr/>
+        </p:nvSpPr>
+        <p:spPr>
+          <a:xfrm>
+            <a:off x="2520952" y="386557"/>
+            <a:ext cx="212723" cy="1077218"/>
+          </a:xfrm>
+          <a:prstGeom prst="rect">
+            <a:avLst/>
+          </a:prstGeom>
+          <a:noFill/>
+        </p:spPr>
+        <p:txBody>
+          <a:bodyPr wrap="square" lIns="0" rtlCol="0">
+            <a:spAutoFit/>
+          </a:bodyPr>
+          <a:lstStyle/>
+          <a:p>
+            <a:r>
+              <a:rPr lang="de-DE" sz="800" dirty="0"/>
+              <a:t>$\</a:t>
+            </a:r>
+            <a:r>
+              <a:rPr lang="de-DE" sz="800" dirty="0" err="1"/>
+              <a:t>boldsymbol</a:t>
+            </a:r>
+            <a:r>
+              <a:rPr lang="de-DE" sz="800" dirty="0"/>
+              <a:t>{X}$</a:t>
+            </a:r>
+            <a:endParaRPr lang="en-GB" sz="800" dirty="0"/>
+          </a:p>
+        </p:txBody>
+      </p:sp>
+      <p:cxnSp>
+        <p:nvCxnSpPr>
+          <p:cNvPr id="198" name="Straight Arrow Connector 197">
+            <a:extLst>
+              <a:ext uri="{FF2B5EF4-FFF2-40B4-BE49-F238E27FC236}">
+                <a16:creationId xmlns:a16="http://schemas.microsoft.com/office/drawing/2014/main" id="{111866D8-FAED-B118-4BC1-98E555EC188A}"/>
+              </a:ext>
+            </a:extLst>
+          </p:cNvPr>
+          <p:cNvCxnSpPr>
+            <a:cxnSpLocks/>
+            <a:endCxn id="94" idx="1"/>
+          </p:cNvCxnSpPr>
+          <p:nvPr/>
+        </p:nvCxnSpPr>
+        <p:spPr>
+          <a:xfrm>
+            <a:off x="2735263" y="508000"/>
+            <a:ext cx="178592" cy="1472"/>
+          </a:xfrm>
+          <a:prstGeom prst="straightConnector1">
+            <a:avLst/>
+          </a:prstGeom>
+          <a:ln w="12700">
+            <a:tailEnd type="triangle"/>
+          </a:ln>
+        </p:spPr>
+        <p:style>
+          <a:lnRef idx="1">
+            <a:schemeClr val="dk1"/>
+          </a:lnRef>
+          <a:fillRef idx="0">
+            <a:schemeClr val="dk1"/>
+          </a:fillRef>
+          <a:effectRef idx="0">
+            <a:schemeClr val="dk1"/>
+          </a:effectRef>
+          <a:fontRef idx="minor">
+            <a:schemeClr val="tx1"/>
+          </a:fontRef>
+        </p:style>
+      </p:cxnSp>
+      <p:sp>
+        <p:nvSpPr>
+          <p:cNvPr id="213" name="TextBox 212">
+            <a:extLst>
+              <a:ext uri="{FF2B5EF4-FFF2-40B4-BE49-F238E27FC236}">
+                <a16:creationId xmlns:a16="http://schemas.microsoft.com/office/drawing/2014/main" id="{1589835F-2FFC-271A-7EB2-719A536F4B4B}"/>
+              </a:ext>
+            </a:extLst>
+          </p:cNvPr>
+          <p:cNvSpPr txBox="1"/>
+          <p:nvPr/>
+        </p:nvSpPr>
+        <p:spPr>
+          <a:xfrm>
+            <a:off x="503238" y="265113"/>
+            <a:ext cx="680636" cy="261610"/>
+          </a:xfrm>
+          <a:prstGeom prst="rect">
+            <a:avLst/>
+          </a:prstGeom>
+          <a:noFill/>
+        </p:spPr>
+        <p:txBody>
+          <a:bodyPr wrap="none" lIns="0" rtlCol="0">
+            <a:spAutoFit/>
+          </a:bodyPr>
+          <a:lstStyle/>
+          <a:p>
+            <a:r>
+              <a:rPr lang="de-DE" sz="1100" dirty="0"/>
+              <a:t>Post norm</a:t>
+            </a:r>
+            <a:endParaRPr lang="en-GB" sz="1100" dirty="0"/>
+          </a:p>
+        </p:txBody>
+      </p:sp>
+      <p:sp>
+        <p:nvSpPr>
+          <p:cNvPr id="215" name="TextBox 214">
+            <a:extLst>
+              <a:ext uri="{FF2B5EF4-FFF2-40B4-BE49-F238E27FC236}">
+                <a16:creationId xmlns:a16="http://schemas.microsoft.com/office/drawing/2014/main" id="{AA116659-2760-21F2-F809-E4320983C7EA}"/>
+              </a:ext>
+            </a:extLst>
+          </p:cNvPr>
+          <p:cNvSpPr txBox="1"/>
+          <p:nvPr/>
+        </p:nvSpPr>
+        <p:spPr>
+          <a:xfrm>
+            <a:off x="508001" y="2389188"/>
+            <a:ext cx="626133" cy="261610"/>
+          </a:xfrm>
+          <a:prstGeom prst="rect">
+            <a:avLst/>
+          </a:prstGeom>
+          <a:noFill/>
+        </p:spPr>
+        <p:txBody>
+          <a:bodyPr wrap="none" lIns="0" rtlCol="0">
+            <a:spAutoFit/>
+          </a:bodyPr>
+          <a:lstStyle/>
+          <a:p>
+            <a:r>
+              <a:rPr lang="de-DE" sz="1100" dirty="0" err="1"/>
+              <a:t>Pre</a:t>
+            </a:r>
+            <a:r>
+              <a:rPr lang="de-DE" sz="1100" dirty="0"/>
+              <a:t> norm</a:t>
+            </a:r>
+            <a:endParaRPr lang="en-GB" sz="1100" dirty="0"/>
+          </a:p>
+        </p:txBody>
+      </p:sp>
     </p:spTree>
     <p:extLst>
       <p:ext uri="{BB962C8B-B14F-4D97-AF65-F5344CB8AC3E}">

</xml_diff>

<commit_message>
Add visualizations for layer norm🍇 (#178)
Adresses #10
</commit_message>
<xml_diff>
--- a/reports/Graphs/diagrams.pptx
+++ b/reports/Graphs/diagrams.pptx
@@ -123,7 +123,7 @@
 <file path=ppt/revisionInfo.xml><?xml version="1.0" encoding="utf-8"?>
 <p1510:revInfo xmlns:a="http://schemas.openxmlformats.org/drawingml/2006/main" xmlns:r="http://schemas.openxmlformats.org/officeDocument/2006/relationships" xmlns:p1510="http://schemas.microsoft.com/office/powerpoint/2015/10/main">
   <p1510:revLst>
-    <p1510:client id="{F9F2BE70-AAED-47FD-A055-7B08EB1371A3}" v="142" dt="2023-02-18T15:20:12.629"/>
+    <p1510:client id="{F9F2BE70-AAED-47FD-A055-7B08EB1371A3}" v="152" dt="2023-02-22T15:47:34.699"/>
   </p1510:revLst>
 </p1510:revInfo>
 </file>
@@ -133,7 +133,7 @@
   <pc:docChgLst>
     <pc:chgData name="Markus Bilz" userId="a36021e4bdb9349f" providerId="LiveId" clId="{F9F2BE70-AAED-47FD-A055-7B08EB1371A3}"/>
     <pc:docChg chg="undo custSel addSld modSld sldOrd">
-      <pc:chgData name="Markus Bilz" userId="a36021e4bdb9349f" providerId="LiveId" clId="{F9F2BE70-AAED-47FD-A055-7B08EB1371A3}" dt="2023-02-18T15:57:02.801" v="1567" actId="20577"/>
+      <pc:chgData name="Markus Bilz" userId="a36021e4bdb9349f" providerId="LiveId" clId="{F9F2BE70-AAED-47FD-A055-7B08EB1371A3}" dt="2023-02-22T15:50:17.970" v="1876" actId="1076"/>
       <pc:docMkLst>
         <pc:docMk/>
       </pc:docMkLst>
@@ -541,7 +541,7 @@
         </pc:picChg>
       </pc:sldChg>
       <pc:sldChg chg="addSp delSp modSp add mod">
-        <pc:chgData name="Markus Bilz" userId="a36021e4bdb9349f" providerId="LiveId" clId="{F9F2BE70-AAED-47FD-A055-7B08EB1371A3}" dt="2023-01-30T16:05:01.590" v="228" actId="14100"/>
+        <pc:chgData name="Markus Bilz" userId="a36021e4bdb9349f" providerId="LiveId" clId="{F9F2BE70-AAED-47FD-A055-7B08EB1371A3}" dt="2023-02-22T15:50:17.970" v="1876" actId="1076"/>
         <pc:sldMkLst>
           <pc:docMk/>
           <pc:sldMk cId="1844608576" sldId="263"/>
@@ -554,6 +554,14 @@
             <ac:spMk id="2" creationId="{5CC34145-B5F4-8BDD-0E3A-311D220D3B32}"/>
           </ac:spMkLst>
         </pc:spChg>
+        <pc:spChg chg="add mod">
+          <ac:chgData name="Markus Bilz" userId="a36021e4bdb9349f" providerId="LiveId" clId="{F9F2BE70-AAED-47FD-A055-7B08EB1371A3}" dt="2023-02-22T15:27:37.677" v="1822" actId="1076"/>
+          <ac:spMkLst>
+            <pc:docMk/>
+            <pc:sldMk cId="1844608576" sldId="263"/>
+            <ac:spMk id="2" creationId="{AA016958-3168-A01D-32D3-1859970EA6AC}"/>
+          </ac:spMkLst>
+        </pc:spChg>
         <pc:spChg chg="del">
           <ac:chgData name="Markus Bilz" userId="a36021e4bdb9349f" providerId="LiveId" clId="{F9F2BE70-AAED-47FD-A055-7B08EB1371A3}" dt="2023-01-30T15:45:50.704" v="7" actId="478"/>
           <ac:spMkLst>
@@ -578,6 +586,14 @@
             <ac:spMk id="10" creationId="{00B8C236-422C-0F3A-2195-02455E198FA4}"/>
           </ac:spMkLst>
         </pc:spChg>
+        <pc:spChg chg="add del mod">
+          <ac:chgData name="Markus Bilz" userId="a36021e4bdb9349f" providerId="LiveId" clId="{F9F2BE70-AAED-47FD-A055-7B08EB1371A3}" dt="2023-02-22T08:53:45.407" v="1707" actId="478"/>
+          <ac:spMkLst>
+            <pc:docMk/>
+            <pc:sldMk cId="1844608576" sldId="263"/>
+            <ac:spMk id="10" creationId="{E47B1989-23B1-6B34-E1D3-8193677E94CB}"/>
+          </ac:spMkLst>
+        </pc:spChg>
         <pc:spChg chg="del">
           <ac:chgData name="Markus Bilz" userId="a36021e4bdb9349f" providerId="LiveId" clId="{F9F2BE70-AAED-47FD-A055-7B08EB1371A3}" dt="2023-01-30T15:45:50.704" v="7" actId="478"/>
           <ac:spMkLst>
@@ -610,6 +626,14 @@
             <ac:spMk id="14" creationId="{FF5BF12D-AA78-EE30-53C6-6A293BDAE817}"/>
           </ac:spMkLst>
         </pc:spChg>
+        <pc:spChg chg="add mod">
+          <ac:chgData name="Markus Bilz" userId="a36021e4bdb9349f" providerId="LiveId" clId="{F9F2BE70-AAED-47FD-A055-7B08EB1371A3}" dt="2023-02-22T08:45:32.606" v="1592" actId="1076"/>
+          <ac:spMkLst>
+            <pc:docMk/>
+            <pc:sldMk cId="1844608576" sldId="263"/>
+            <ac:spMk id="15" creationId="{E8133E75-162F-B9D7-4F2C-61241AF6B53D}"/>
+          </ac:spMkLst>
+        </pc:spChg>
         <pc:spChg chg="del">
           <ac:chgData name="Markus Bilz" userId="a36021e4bdb9349f" providerId="LiveId" clId="{F9F2BE70-AAED-47FD-A055-7B08EB1371A3}" dt="2023-01-30T15:45:50.704" v="7" actId="478"/>
           <ac:spMkLst>
@@ -618,6 +642,22 @@
             <ac:spMk id="15" creationId="{FD86F888-F95A-D598-D12B-E04B43114576}"/>
           </ac:spMkLst>
         </pc:spChg>
+        <pc:spChg chg="add mod">
+          <ac:chgData name="Markus Bilz" userId="a36021e4bdb9349f" providerId="LiveId" clId="{F9F2BE70-AAED-47FD-A055-7B08EB1371A3}" dt="2023-02-22T08:55:00.085" v="1711" actId="1076"/>
+          <ac:spMkLst>
+            <pc:docMk/>
+            <pc:sldMk cId="1844608576" sldId="263"/>
+            <ac:spMk id="26" creationId="{3F01F5F2-C867-1EF5-6585-E4346DDBC353}"/>
+          </ac:spMkLst>
+        </pc:spChg>
+        <pc:spChg chg="add mod">
+          <ac:chgData name="Markus Bilz" userId="a36021e4bdb9349f" providerId="LiveId" clId="{F9F2BE70-AAED-47FD-A055-7B08EB1371A3}" dt="2023-02-22T09:08:41.542" v="1781" actId="14100"/>
+          <ac:spMkLst>
+            <pc:docMk/>
+            <pc:sldMk cId="1844608576" sldId="263"/>
+            <ac:spMk id="28" creationId="{C68EF78B-5C83-C0E6-D42D-88D80ABC2387}"/>
+          </ac:spMkLst>
+        </pc:spChg>
         <pc:spChg chg="del mod">
           <ac:chgData name="Markus Bilz" userId="a36021e4bdb9349f" providerId="LiveId" clId="{F9F2BE70-AAED-47FD-A055-7B08EB1371A3}" dt="2023-01-30T15:56:15.018" v="139" actId="478"/>
           <ac:spMkLst>
@@ -643,7 +683,7 @@
           </ac:spMkLst>
         </pc:spChg>
         <pc:spChg chg="mod">
-          <ac:chgData name="Markus Bilz" userId="a36021e4bdb9349f" providerId="LiveId" clId="{F9F2BE70-AAED-47FD-A055-7B08EB1371A3}" dt="2023-01-30T16:03:04.057" v="200" actId="1076"/>
+          <ac:chgData name="Markus Bilz" userId="a36021e4bdb9349f" providerId="LiveId" clId="{F9F2BE70-AAED-47FD-A055-7B08EB1371A3}" dt="2023-02-22T08:52:37.664" v="1692" actId="14100"/>
           <ac:spMkLst>
             <pc:docMk/>
             <pc:sldMk cId="1844608576" sldId="263"/>
@@ -651,7 +691,7 @@
           </ac:spMkLst>
         </pc:spChg>
         <pc:spChg chg="mod">
-          <ac:chgData name="Markus Bilz" userId="a36021e4bdb9349f" providerId="LiveId" clId="{F9F2BE70-AAED-47FD-A055-7B08EB1371A3}" dt="2023-01-30T16:03:23.807" v="208" actId="1076"/>
+          <ac:chgData name="Markus Bilz" userId="a36021e4bdb9349f" providerId="LiveId" clId="{F9F2BE70-AAED-47FD-A055-7B08EB1371A3}" dt="2023-02-22T09:01:08.909" v="1769" actId="255"/>
           <ac:spMkLst>
             <pc:docMk/>
             <pc:sldMk cId="1844608576" sldId="263"/>
@@ -666,6 +706,30 @@
             <ac:spMk id="69" creationId="{22A20337-1D78-2DE5-B292-B4FD075545EE}"/>
           </ac:spMkLst>
         </pc:spChg>
+        <pc:spChg chg="add mod">
+          <ac:chgData name="Markus Bilz" userId="a36021e4bdb9349f" providerId="LiveId" clId="{F9F2BE70-AAED-47FD-A055-7B08EB1371A3}" dt="2023-02-22T15:47:14.506" v="1858" actId="1076"/>
+          <ac:spMkLst>
+            <pc:docMk/>
+            <pc:sldMk cId="1844608576" sldId="263"/>
+            <ac:spMk id="70" creationId="{E1C4352A-6FB0-A2F6-7BD7-C1AA82F43FA6}"/>
+          </ac:spMkLst>
+        </pc:spChg>
+        <pc:spChg chg="add mod">
+          <ac:chgData name="Markus Bilz" userId="a36021e4bdb9349f" providerId="LiveId" clId="{F9F2BE70-AAED-47FD-A055-7B08EB1371A3}" dt="2023-02-22T15:50:17.970" v="1876" actId="1076"/>
+          <ac:spMkLst>
+            <pc:docMk/>
+            <pc:sldMk cId="1844608576" sldId="263"/>
+            <ac:spMk id="71" creationId="{987843DF-B74C-1D89-D259-56ED2F0EDD96}"/>
+          </ac:spMkLst>
+        </pc:spChg>
+        <pc:spChg chg="add mod">
+          <ac:chgData name="Markus Bilz" userId="a36021e4bdb9349f" providerId="LiveId" clId="{F9F2BE70-AAED-47FD-A055-7B08EB1371A3}" dt="2023-02-22T15:50:17.970" v="1876" actId="1076"/>
+          <ac:spMkLst>
+            <pc:docMk/>
+            <pc:sldMk cId="1844608576" sldId="263"/>
+            <ac:spMk id="72" creationId="{44275E91-3DA7-3A19-0647-D6747170CC1F}"/>
+          </ac:spMkLst>
+        </pc:spChg>
         <pc:spChg chg="add del mod">
           <ac:chgData name="Markus Bilz" userId="a36021e4bdb9349f" providerId="LiveId" clId="{F9F2BE70-AAED-47FD-A055-7B08EB1371A3}" dt="2023-01-30T16:03:08.047" v="203" actId="478"/>
           <ac:spMkLst>
@@ -674,14 +738,38 @@
             <ac:spMk id="72" creationId="{D721CAF9-A250-4EF9-2857-EF744B73DB25}"/>
           </ac:spMkLst>
         </pc:spChg>
-        <pc:spChg chg="mod">
-          <ac:chgData name="Markus Bilz" userId="a36021e4bdb9349f" providerId="LiveId" clId="{F9F2BE70-AAED-47FD-A055-7B08EB1371A3}" dt="2023-01-30T16:04:31.767" v="223" actId="14100"/>
+        <pc:spChg chg="add mod">
+          <ac:chgData name="Markus Bilz" userId="a36021e4bdb9349f" providerId="LiveId" clId="{F9F2BE70-AAED-47FD-A055-7B08EB1371A3}" dt="2023-02-22T15:50:17.970" v="1876" actId="1076"/>
+          <ac:spMkLst>
+            <pc:docMk/>
+            <pc:sldMk cId="1844608576" sldId="263"/>
+            <ac:spMk id="78" creationId="{D5A7D820-0D39-A0D9-BC5A-37EE959371E7}"/>
+          </ac:spMkLst>
+        </pc:spChg>
+        <pc:spChg chg="add mod">
+          <ac:chgData name="Markus Bilz" userId="a36021e4bdb9349f" providerId="LiveId" clId="{F9F2BE70-AAED-47FD-A055-7B08EB1371A3}" dt="2023-02-22T15:50:17.970" v="1876" actId="1076"/>
+          <ac:spMkLst>
+            <pc:docMk/>
+            <pc:sldMk cId="1844608576" sldId="263"/>
+            <ac:spMk id="79" creationId="{D9914F06-18C1-BAB9-3662-78C08C0F5189}"/>
+          </ac:spMkLst>
+        </pc:spChg>
+        <pc:spChg chg="del mod">
+          <ac:chgData name="Markus Bilz" userId="a36021e4bdb9349f" providerId="LiveId" clId="{F9F2BE70-AAED-47FD-A055-7B08EB1371A3}" dt="2023-02-22T08:55:12.904" v="1712" actId="478"/>
           <ac:spMkLst>
             <pc:docMk/>
             <pc:sldMk cId="1844608576" sldId="263"/>
             <ac:spMk id="80" creationId="{83641231-252D-FDB3-0C23-5CDCCDA26F9E}"/>
           </ac:spMkLst>
         </pc:spChg>
+        <pc:spChg chg="add mod">
+          <ac:chgData name="Markus Bilz" userId="a36021e4bdb9349f" providerId="LiveId" clId="{F9F2BE70-AAED-47FD-A055-7B08EB1371A3}" dt="2023-02-22T15:47:42.921" v="1861" actId="1076"/>
+          <ac:spMkLst>
+            <pc:docMk/>
+            <pc:sldMk cId="1844608576" sldId="263"/>
+            <ac:spMk id="81" creationId="{775418FD-706B-FF60-E5C3-280F02E15E76}"/>
+          </ac:spMkLst>
+        </pc:spChg>
         <pc:spChg chg="del mod">
           <ac:chgData name="Markus Bilz" userId="a36021e4bdb9349f" providerId="LiveId" clId="{F9F2BE70-AAED-47FD-A055-7B08EB1371A3}" dt="2023-01-30T15:56:15.018" v="139" actId="478"/>
           <ac:spMkLst>
@@ -690,6 +778,30 @@
             <ac:spMk id="81" creationId="{A0C92E84-AAE1-582E-C601-99B54006B43F}"/>
           </ac:spMkLst>
         </pc:spChg>
+        <pc:spChg chg="add mod">
+          <ac:chgData name="Markus Bilz" userId="a36021e4bdb9349f" providerId="LiveId" clId="{F9F2BE70-AAED-47FD-A055-7B08EB1371A3}" dt="2023-02-22T15:50:17.970" v="1876" actId="1076"/>
+          <ac:spMkLst>
+            <pc:docMk/>
+            <pc:sldMk cId="1844608576" sldId="263"/>
+            <ac:spMk id="82" creationId="{0E0F7373-2628-1428-6892-4EEA6645EBA5}"/>
+          </ac:spMkLst>
+        </pc:spChg>
+        <pc:spChg chg="add mod topLvl">
+          <ac:chgData name="Markus Bilz" userId="a36021e4bdb9349f" providerId="LiveId" clId="{F9F2BE70-AAED-47FD-A055-7B08EB1371A3}" dt="2023-02-22T15:47:19.841" v="1859" actId="20577"/>
+          <ac:spMkLst>
+            <pc:docMk/>
+            <pc:sldMk cId="1844608576" sldId="263"/>
+            <ac:spMk id="93" creationId="{671F1362-E500-05A6-E86F-3C1CB5CCD44D}"/>
+          </ac:spMkLst>
+        </pc:spChg>
+        <pc:spChg chg="add mod topLvl">
+          <ac:chgData name="Markus Bilz" userId="a36021e4bdb9349f" providerId="LiveId" clId="{F9F2BE70-AAED-47FD-A055-7B08EB1371A3}" dt="2023-02-22T15:31:20.981" v="1845" actId="1582"/>
+          <ac:spMkLst>
+            <pc:docMk/>
+            <pc:sldMk cId="1844608576" sldId="263"/>
+            <ac:spMk id="94" creationId="{2523B3A1-A1A0-B768-99F1-32A20559DD27}"/>
+          </ac:spMkLst>
+        </pc:spChg>
         <pc:spChg chg="del">
           <ac:chgData name="Markus Bilz" userId="a36021e4bdb9349f" providerId="LiveId" clId="{F9F2BE70-AAED-47FD-A055-7B08EB1371A3}" dt="2023-01-30T15:45:50.704" v="7" actId="478"/>
           <ac:spMkLst>
@@ -826,6 +938,46 @@
             <ac:spMk id="165" creationId="{279F181B-E7CC-7CD6-A843-CF0D0113A1B9}"/>
           </ac:spMkLst>
         </pc:spChg>
+        <pc:spChg chg="add mod topLvl">
+          <ac:chgData name="Markus Bilz" userId="a36021e4bdb9349f" providerId="LiveId" clId="{F9F2BE70-AAED-47FD-A055-7B08EB1371A3}" dt="2023-02-22T15:31:37.905" v="1846" actId="1582"/>
+          <ac:spMkLst>
+            <pc:docMk/>
+            <pc:sldMk cId="1844608576" sldId="263"/>
+            <ac:spMk id="195" creationId="{EE401D95-5407-A19B-E61D-AB1030A25C0C}"/>
+          </ac:spMkLst>
+        </pc:spChg>
+        <pc:spChg chg="add del mod topLvl">
+          <ac:chgData name="Markus Bilz" userId="a36021e4bdb9349f" providerId="LiveId" clId="{F9F2BE70-AAED-47FD-A055-7B08EB1371A3}" dt="2023-02-22T15:46:54.323" v="1853" actId="14100"/>
+          <ac:spMkLst>
+            <pc:docMk/>
+            <pc:sldMk cId="1844608576" sldId="263"/>
+            <ac:spMk id="196" creationId="{D2BF1CC6-08EF-9DE9-0F91-0E6D29DD0175}"/>
+          </ac:spMkLst>
+        </pc:spChg>
+        <pc:spChg chg="add del mod topLvl">
+          <ac:chgData name="Markus Bilz" userId="a36021e4bdb9349f" providerId="LiveId" clId="{F9F2BE70-AAED-47FD-A055-7B08EB1371A3}" dt="2023-02-22T15:46:47.074" v="1851" actId="478"/>
+          <ac:spMkLst>
+            <pc:docMk/>
+            <pc:sldMk cId="1844608576" sldId="263"/>
+            <ac:spMk id="197" creationId="{74FF516F-666F-D0E7-5C2E-185F2C88C5FB}"/>
+          </ac:spMkLst>
+        </pc:spChg>
+        <pc:spChg chg="add mod">
+          <ac:chgData name="Markus Bilz" userId="a36021e4bdb9349f" providerId="LiveId" clId="{F9F2BE70-AAED-47FD-A055-7B08EB1371A3}" dt="2023-02-22T08:59:54.486" v="1764" actId="20577"/>
+          <ac:spMkLst>
+            <pc:docMk/>
+            <pc:sldMk cId="1844608576" sldId="263"/>
+            <ac:spMk id="213" creationId="{1589835F-2FFC-271A-7EB2-719A536F4B4B}"/>
+          </ac:spMkLst>
+        </pc:spChg>
+        <pc:spChg chg="add mod">
+          <ac:chgData name="Markus Bilz" userId="a36021e4bdb9349f" providerId="LiveId" clId="{F9F2BE70-AAED-47FD-A055-7B08EB1371A3}" dt="2023-02-22T09:00:02.624" v="1768" actId="20577"/>
+          <ac:spMkLst>
+            <pc:docMk/>
+            <pc:sldMk cId="1844608576" sldId="263"/>
+            <ac:spMk id="215" creationId="{AA116659-2760-21F2-F809-E4320983C7EA}"/>
+          </ac:spMkLst>
+        </pc:spChg>
         <pc:spChg chg="del">
           <ac:chgData name="Markus Bilz" userId="a36021e4bdb9349f" providerId="LiveId" clId="{F9F2BE70-AAED-47FD-A055-7B08EB1371A3}" dt="2023-01-30T15:46:05.637" v="13" actId="478"/>
           <ac:spMkLst>
@@ -978,6 +1130,14 @@
             <ac:spMk id="488" creationId="{DB0FFA97-307F-B323-9124-F5C4FE8C8754}"/>
           </ac:spMkLst>
         </pc:spChg>
+        <pc:grpChg chg="add del mod">
+          <ac:chgData name="Markus Bilz" userId="a36021e4bdb9349f" providerId="LiveId" clId="{F9F2BE70-AAED-47FD-A055-7B08EB1371A3}" dt="2023-02-22T15:26:11.384" v="1808" actId="165"/>
+          <ac:grpSpMkLst>
+            <pc:docMk/>
+            <pc:sldMk cId="1844608576" sldId="263"/>
+            <ac:grpSpMk id="4" creationId="{DDA638D4-A1C5-12F1-4D79-3663D9D5B1FB}"/>
+          </ac:grpSpMkLst>
+        </pc:grpChg>
         <pc:grpChg chg="del">
           <ac:chgData name="Markus Bilz" userId="a36021e4bdb9349f" providerId="LiveId" clId="{F9F2BE70-AAED-47FD-A055-7B08EB1371A3}" dt="2023-01-30T15:45:50.704" v="7" actId="478"/>
           <ac:grpSpMkLst>
@@ -1002,6 +1162,14 @@
             <ac:grpSpMk id="315" creationId="{F2576EEA-C47D-7129-CE11-E6A858A35809}"/>
           </ac:grpSpMkLst>
         </pc:grpChg>
+        <pc:picChg chg="add mod">
+          <ac:chgData name="Markus Bilz" userId="a36021e4bdb9349f" providerId="LiveId" clId="{F9F2BE70-AAED-47FD-A055-7B08EB1371A3}" dt="2023-02-22T15:46:39.206" v="1849" actId="1076"/>
+          <ac:picMkLst>
+            <pc:docMk/>
+            <pc:sldMk cId="1844608576" sldId="263"/>
+            <ac:picMk id="3" creationId="{96722123-71A7-17FC-A1D1-AF5B326757C5}"/>
+          </ac:picMkLst>
+        </pc:picChg>
         <pc:cxnChg chg="del">
           <ac:chgData name="Markus Bilz" userId="a36021e4bdb9349f" providerId="LiveId" clId="{F9F2BE70-AAED-47FD-A055-7B08EB1371A3}" dt="2023-01-30T15:45:50.704" v="7" actId="478"/>
           <ac:cxnSpMkLst>
@@ -1106,6 +1274,30 @@
             <ac:cxnSpMk id="71" creationId="{E1B8EC65-0002-51B6-8023-BE84A773CCCA}"/>
           </ac:cxnSpMkLst>
         </pc:cxnChg>
+        <pc:cxnChg chg="add mod">
+          <ac:chgData name="Markus Bilz" userId="a36021e4bdb9349f" providerId="LiveId" clId="{F9F2BE70-AAED-47FD-A055-7B08EB1371A3}" dt="2023-02-22T15:50:17.970" v="1876" actId="1076"/>
+          <ac:cxnSpMkLst>
+            <pc:docMk/>
+            <pc:sldMk cId="1844608576" sldId="263"/>
+            <ac:cxnSpMk id="73" creationId="{2D41AA52-F79D-2133-DC1F-9E5158C2BB05}"/>
+          </ac:cxnSpMkLst>
+        </pc:cxnChg>
+        <pc:cxnChg chg="add mod">
+          <ac:chgData name="Markus Bilz" userId="a36021e4bdb9349f" providerId="LiveId" clId="{F9F2BE70-AAED-47FD-A055-7B08EB1371A3}" dt="2023-02-22T08:53:29.370" v="1705" actId="14100"/>
+          <ac:cxnSpMkLst>
+            <pc:docMk/>
+            <pc:sldMk cId="1844608576" sldId="263"/>
+            <ac:cxnSpMk id="74" creationId="{45034EB7-A2C2-833C-6950-F5376C1D7711}"/>
+          </ac:cxnSpMkLst>
+        </pc:cxnChg>
+        <pc:cxnChg chg="add mod">
+          <ac:chgData name="Markus Bilz" userId="a36021e4bdb9349f" providerId="LiveId" clId="{F9F2BE70-AAED-47FD-A055-7B08EB1371A3}" dt="2023-02-22T15:50:17.970" v="1876" actId="1076"/>
+          <ac:cxnSpMkLst>
+            <pc:docMk/>
+            <pc:sldMk cId="1844608576" sldId="263"/>
+            <ac:cxnSpMk id="75" creationId="{04B2AE1A-EEEE-400A-1B15-E72247E381F2}"/>
+          </ac:cxnSpMkLst>
+        </pc:cxnChg>
         <pc:cxnChg chg="del">
           <ac:chgData name="Markus Bilz" userId="a36021e4bdb9349f" providerId="LiveId" clId="{F9F2BE70-AAED-47FD-A055-7B08EB1371A3}" dt="2023-01-30T15:45:52.751" v="9" actId="478"/>
           <ac:cxnSpMkLst>
@@ -1115,13 +1307,45 @@
           </ac:cxnSpMkLst>
         </pc:cxnChg>
         <pc:cxnChg chg="add mod">
-          <ac:chgData name="Markus Bilz" userId="a36021e4bdb9349f" providerId="LiveId" clId="{F9F2BE70-AAED-47FD-A055-7B08EB1371A3}" dt="2023-01-30T16:04:46.107" v="225" actId="14100"/>
+          <ac:chgData name="Markus Bilz" userId="a36021e4bdb9349f" providerId="LiveId" clId="{F9F2BE70-AAED-47FD-A055-7B08EB1371A3}" dt="2023-02-22T15:50:17.970" v="1876" actId="1076"/>
+          <ac:cxnSpMkLst>
+            <pc:docMk/>
+            <pc:sldMk cId="1844608576" sldId="263"/>
+            <ac:cxnSpMk id="76" creationId="{CA9C9995-6651-39CA-E5EF-37CC662A2BF2}"/>
+          </ac:cxnSpMkLst>
+        </pc:cxnChg>
+        <pc:cxnChg chg="add mod">
+          <ac:chgData name="Markus Bilz" userId="a36021e4bdb9349f" providerId="LiveId" clId="{F9F2BE70-AAED-47FD-A055-7B08EB1371A3}" dt="2023-02-22T15:50:17.970" v="1876" actId="1076"/>
+          <ac:cxnSpMkLst>
+            <pc:docMk/>
+            <pc:sldMk cId="1844608576" sldId="263"/>
+            <ac:cxnSpMk id="77" creationId="{EA7E582D-7470-3F6D-ECEE-5C38A3451FD7}"/>
+          </ac:cxnSpMkLst>
+        </pc:cxnChg>
+        <pc:cxnChg chg="add mod">
+          <ac:chgData name="Markus Bilz" userId="a36021e4bdb9349f" providerId="LiveId" clId="{F9F2BE70-AAED-47FD-A055-7B08EB1371A3}" dt="2023-02-22T15:50:17.970" v="1876" actId="1076"/>
+          <ac:cxnSpMkLst>
+            <pc:docMk/>
+            <pc:sldMk cId="1844608576" sldId="263"/>
+            <ac:cxnSpMk id="80" creationId="{6713BC6C-0942-6560-E236-A4DE821B93CA}"/>
+          </ac:cxnSpMkLst>
+        </pc:cxnChg>
+        <pc:cxnChg chg="add mod">
+          <ac:chgData name="Markus Bilz" userId="a36021e4bdb9349f" providerId="LiveId" clId="{F9F2BE70-AAED-47FD-A055-7B08EB1371A3}" dt="2023-02-22T08:54:51.491" v="1708" actId="14100"/>
           <ac:cxnSpMkLst>
             <pc:docMk/>
             <pc:sldMk cId="1844608576" sldId="263"/>
             <ac:cxnSpMk id="85" creationId="{620B6CED-9580-DA79-22AE-F82A08CEF70D}"/>
           </ac:cxnSpMkLst>
         </pc:cxnChg>
+        <pc:cxnChg chg="add mod topLvl">
+          <ac:chgData name="Markus Bilz" userId="a36021e4bdb9349f" providerId="LiveId" clId="{F9F2BE70-AAED-47FD-A055-7B08EB1371A3}" dt="2023-02-22T15:31:37.905" v="1846" actId="1582"/>
+          <ac:cxnSpMkLst>
+            <pc:docMk/>
+            <pc:sldMk cId="1844608576" sldId="263"/>
+            <ac:cxnSpMk id="95" creationId="{2A3476EF-77D7-9FBB-A947-F75560E54658}"/>
+          </ac:cxnSpMkLst>
+        </pc:cxnChg>
         <pc:cxnChg chg="mod">
           <ac:chgData name="Markus Bilz" userId="a36021e4bdb9349f" providerId="LiveId" clId="{F9F2BE70-AAED-47FD-A055-7B08EB1371A3}" dt="2023-01-30T15:45:50.704" v="7" actId="478"/>
           <ac:cxnSpMkLst>
@@ -1194,6 +1418,30 @@
             <ac:cxnSpMk id="191" creationId="{2B5833C9-C07D-F2D1-2768-2F35F1D7780E}"/>
           </ac:cxnSpMkLst>
         </pc:cxnChg>
+        <pc:cxnChg chg="add mod topLvl">
+          <ac:chgData name="Markus Bilz" userId="a36021e4bdb9349f" providerId="LiveId" clId="{F9F2BE70-AAED-47FD-A055-7B08EB1371A3}" dt="2023-02-22T15:29:51.928" v="1839" actId="14100"/>
+          <ac:cxnSpMkLst>
+            <pc:docMk/>
+            <pc:sldMk cId="1844608576" sldId="263"/>
+            <ac:cxnSpMk id="192" creationId="{79936518-1DA3-3C30-DA38-F2C3F2F18C02}"/>
+          </ac:cxnSpMkLst>
+        </pc:cxnChg>
+        <pc:cxnChg chg="add mod topLvl">
+          <ac:chgData name="Markus Bilz" userId="a36021e4bdb9349f" providerId="LiveId" clId="{F9F2BE70-AAED-47FD-A055-7B08EB1371A3}" dt="2023-02-22T15:46:47.074" v="1851" actId="478"/>
+          <ac:cxnSpMkLst>
+            <pc:docMk/>
+            <pc:sldMk cId="1844608576" sldId="263"/>
+            <ac:cxnSpMk id="193" creationId="{CD4D7F8D-ACFF-6E58-7554-64E68DE7F1EB}"/>
+          </ac:cxnSpMkLst>
+        </pc:cxnChg>
+        <pc:cxnChg chg="add mod topLvl">
+          <ac:chgData name="Markus Bilz" userId="a36021e4bdb9349f" providerId="LiveId" clId="{F9F2BE70-AAED-47FD-A055-7B08EB1371A3}" dt="2023-02-22T15:31:37.905" v="1846" actId="1582"/>
+          <ac:cxnSpMkLst>
+            <pc:docMk/>
+            <pc:sldMk cId="1844608576" sldId="263"/>
+            <ac:cxnSpMk id="194" creationId="{A533FB3A-4776-A7FD-BCF2-A8E1C483A990}"/>
+          </ac:cxnSpMkLst>
+        </pc:cxnChg>
         <pc:cxnChg chg="del mod">
           <ac:chgData name="Markus Bilz" userId="a36021e4bdb9349f" providerId="LiveId" clId="{F9F2BE70-AAED-47FD-A055-7B08EB1371A3}" dt="2023-01-30T15:45:54.414" v="10" actId="478"/>
           <ac:cxnSpMkLst>
@@ -1202,8 +1450,16 @@
             <ac:cxnSpMk id="197" creationId="{72266BF9-FEEB-509F-96D4-D41CB350B53F}"/>
           </ac:cxnSpMkLst>
         </pc:cxnChg>
+        <pc:cxnChg chg="add mod topLvl">
+          <ac:chgData name="Markus Bilz" userId="a36021e4bdb9349f" providerId="LiveId" clId="{F9F2BE70-AAED-47FD-A055-7B08EB1371A3}" dt="2023-02-22T15:31:37.905" v="1846" actId="1582"/>
+          <ac:cxnSpMkLst>
+            <pc:docMk/>
+            <pc:sldMk cId="1844608576" sldId="263"/>
+            <ac:cxnSpMk id="198" creationId="{111866D8-FAED-B118-4BC1-98E555EC188A}"/>
+          </ac:cxnSpMkLst>
+        </pc:cxnChg>
         <pc:cxnChg chg="mod">
-          <ac:chgData name="Markus Bilz" userId="a36021e4bdb9349f" providerId="LiveId" clId="{F9F2BE70-AAED-47FD-A055-7B08EB1371A3}" dt="2023-01-30T16:03:03.710" v="198" actId="1076"/>
+          <ac:chgData name="Markus Bilz" userId="a36021e4bdb9349f" providerId="LiveId" clId="{F9F2BE70-AAED-47FD-A055-7B08EB1371A3}" dt="2023-02-22T08:53:17.418" v="1701" actId="14100"/>
           <ac:cxnSpMkLst>
             <pc:docMk/>
             <pc:sldMk cId="1844608576" sldId="263"/>
@@ -1211,7 +1467,7 @@
           </ac:cxnSpMkLst>
         </pc:cxnChg>
         <pc:cxnChg chg="mod">
-          <ac:chgData name="Markus Bilz" userId="a36021e4bdb9349f" providerId="LiveId" clId="{F9F2BE70-AAED-47FD-A055-7B08EB1371A3}" dt="2023-01-30T16:03:08.047" v="203" actId="478"/>
+          <ac:chgData name="Markus Bilz" userId="a36021e4bdb9349f" providerId="LiveId" clId="{F9F2BE70-AAED-47FD-A055-7B08EB1371A3}" dt="2023-02-22T08:52:37.664" v="1692" actId="14100"/>
           <ac:cxnSpMkLst>
             <pc:docMk/>
             <pc:sldMk cId="1844608576" sldId="263"/>
@@ -1226,8 +1482,8 @@
             <ac:cxnSpMk id="217" creationId="{AF17FB98-C9BC-D133-7339-F0C5698E6493}"/>
           </ac:cxnSpMkLst>
         </pc:cxnChg>
-        <pc:cxnChg chg="mod">
-          <ac:chgData name="Markus Bilz" userId="a36021e4bdb9349f" providerId="LiveId" clId="{F9F2BE70-AAED-47FD-A055-7B08EB1371A3}" dt="2023-01-30T16:05:01.590" v="228" actId="14100"/>
+        <pc:cxnChg chg="del mod">
+          <ac:chgData name="Markus Bilz" userId="a36021e4bdb9349f" providerId="LiveId" clId="{F9F2BE70-AAED-47FD-A055-7B08EB1371A3}" dt="2023-02-22T15:46:33.749" v="1848" actId="478"/>
           <ac:cxnSpMkLst>
             <pc:docMk/>
             <pc:sldMk cId="1844608576" sldId="263"/>
@@ -7461,7 +7717,7 @@
           <a:p>
             <a:fld id="{D6A82EB2-151D-4EEE-ACF5-92C73278C09C}" type="datetimeFigureOut">
               <a:rPr lang="en-GB" smtClean="0"/>
-              <a:t>18/02/2023</a:t>
+              <a:t>22/02/2023</a:t>
             </a:fld>
             <a:endParaRPr lang="en-GB"/>
           </a:p>
@@ -7661,7 +7917,7 @@
           <a:p>
             <a:fld id="{D6A82EB2-151D-4EEE-ACF5-92C73278C09C}" type="datetimeFigureOut">
               <a:rPr lang="en-GB" smtClean="0"/>
-              <a:t>18/02/2023</a:t>
+              <a:t>22/02/2023</a:t>
             </a:fld>
             <a:endParaRPr lang="en-GB"/>
           </a:p>
@@ -7871,7 +8127,7 @@
           <a:p>
             <a:fld id="{D6A82EB2-151D-4EEE-ACF5-92C73278C09C}" type="datetimeFigureOut">
               <a:rPr lang="en-GB" smtClean="0"/>
-              <a:t>18/02/2023</a:t>
+              <a:t>22/02/2023</a:t>
             </a:fld>
             <a:endParaRPr lang="en-GB"/>
           </a:p>
@@ -8071,7 +8327,7 @@
           <a:p>
             <a:fld id="{D6A82EB2-151D-4EEE-ACF5-92C73278C09C}" type="datetimeFigureOut">
               <a:rPr lang="en-GB" smtClean="0"/>
-              <a:t>18/02/2023</a:t>
+              <a:t>22/02/2023</a:t>
             </a:fld>
             <a:endParaRPr lang="en-GB"/>
           </a:p>
@@ -8347,7 +8603,7 @@
           <a:p>
             <a:fld id="{D6A82EB2-151D-4EEE-ACF5-92C73278C09C}" type="datetimeFigureOut">
               <a:rPr lang="en-GB" smtClean="0"/>
-              <a:t>18/02/2023</a:t>
+              <a:t>22/02/2023</a:t>
             </a:fld>
             <a:endParaRPr lang="en-GB"/>
           </a:p>
@@ -8615,7 +8871,7 @@
           <a:p>
             <a:fld id="{D6A82EB2-151D-4EEE-ACF5-92C73278C09C}" type="datetimeFigureOut">
               <a:rPr lang="en-GB" smtClean="0"/>
-              <a:t>18/02/2023</a:t>
+              <a:t>22/02/2023</a:t>
             </a:fld>
             <a:endParaRPr lang="en-GB"/>
           </a:p>
@@ -9030,7 +9286,7 @@
           <a:p>
             <a:fld id="{D6A82EB2-151D-4EEE-ACF5-92C73278C09C}" type="datetimeFigureOut">
               <a:rPr lang="en-GB" smtClean="0"/>
-              <a:t>18/02/2023</a:t>
+              <a:t>22/02/2023</a:t>
             </a:fld>
             <a:endParaRPr lang="en-GB"/>
           </a:p>
@@ -9172,7 +9428,7 @@
           <a:p>
             <a:fld id="{D6A82EB2-151D-4EEE-ACF5-92C73278C09C}" type="datetimeFigureOut">
               <a:rPr lang="en-GB" smtClean="0"/>
-              <a:t>18/02/2023</a:t>
+              <a:t>22/02/2023</a:t>
             </a:fld>
             <a:endParaRPr lang="en-GB"/>
           </a:p>
@@ -9285,7 +9541,7 @@
           <a:p>
             <a:fld id="{D6A82EB2-151D-4EEE-ACF5-92C73278C09C}" type="datetimeFigureOut">
               <a:rPr lang="en-GB" smtClean="0"/>
-              <a:t>18/02/2023</a:t>
+              <a:t>22/02/2023</a:t>
             </a:fld>
             <a:endParaRPr lang="en-GB"/>
           </a:p>
@@ -9598,7 +9854,7 @@
           <a:p>
             <a:fld id="{D6A82EB2-151D-4EEE-ACF5-92C73278C09C}" type="datetimeFigureOut">
               <a:rPr lang="en-GB" smtClean="0"/>
-              <a:t>18/02/2023</a:t>
+              <a:t>22/02/2023</a:t>
             </a:fld>
             <a:endParaRPr lang="en-GB"/>
           </a:p>
@@ -9887,7 +10143,7 @@
           <a:p>
             <a:fld id="{D6A82EB2-151D-4EEE-ACF5-92C73278C09C}" type="datetimeFigureOut">
               <a:rPr lang="en-GB" smtClean="0"/>
-              <a:t>18/02/2023</a:t>
+              <a:t>22/02/2023</a:t>
             </a:fld>
             <a:endParaRPr lang="en-GB"/>
           </a:p>
@@ -10130,7 +10386,7 @@
           <a:p>
             <a:fld id="{D6A82EB2-151D-4EEE-ACF5-92C73278C09C}" type="datetimeFigureOut">
               <a:rPr lang="en-GB" smtClean="0"/>
-              <a:t>18/02/2023</a:t>
+              <a:t>22/02/2023</a:t>
             </a:fld>
             <a:endParaRPr lang="en-GB"/>
           </a:p>
@@ -17126,8 +17382,8 @@
         </p:nvSpPr>
         <p:spPr>
           <a:xfrm>
-            <a:off x="1330983" y="1027271"/>
-            <a:ext cx="1164431" cy="474504"/>
+            <a:off x="3905250" y="2664146"/>
+            <a:ext cx="720000" cy="237252"/>
           </a:xfrm>
           <a:prstGeom prst="roundRect">
             <a:avLst>
@@ -17187,8 +17443,8 @@
         </p:nvSpPr>
         <p:spPr>
           <a:xfrm>
-            <a:off x="1346066" y="611982"/>
-            <a:ext cx="1164431" cy="242887"/>
+            <a:off x="3002755" y="2661328"/>
+            <a:ext cx="720000" cy="242887"/>
           </a:xfrm>
           <a:prstGeom prst="roundRect">
             <a:avLst>
@@ -17223,63 +17479,12 @@
           <a:p>
             <a:pPr algn="ctr"/>
             <a:r>
-              <a:rPr lang="de-DE" sz="1100" noProof="1">
+              <a:rPr lang="de-DE" sz="800" noProof="1">
                 <a:latin typeface="+mj-lt"/>
                 <a:cs typeface="Arial" panose="020B0604020202020204" pitchFamily="34" charset="0"/>
               </a:rPr>
-              <a:t>Add &amp; Norm</a:t>
+              <a:t>Layer Norm</a:t>
             </a:r>
-          </a:p>
-        </p:txBody>
-      </p:sp>
-      <p:sp>
-        <p:nvSpPr>
-          <p:cNvPr id="80" name="Rectangle: Rounded Corners 79">
-            <a:extLst>
-              <a:ext uri="{FF2B5EF4-FFF2-40B4-BE49-F238E27FC236}">
-                <a16:creationId xmlns:a16="http://schemas.microsoft.com/office/drawing/2014/main" id="{83641231-252D-FDB3-0C23-5CDCCDA26F9E}"/>
-              </a:ext>
-            </a:extLst>
-          </p:cNvPr>
-          <p:cNvSpPr/>
-          <p:nvPr/>
-        </p:nvSpPr>
-        <p:spPr>
-          <a:xfrm>
-            <a:off x="1085850" y="385763"/>
-            <a:ext cx="1611177" cy="1371601"/>
-          </a:xfrm>
-          <a:prstGeom prst="roundRect">
-            <a:avLst>
-              <a:gd name="adj" fmla="val 5838"/>
-            </a:avLst>
-          </a:prstGeom>
-          <a:noFill/>
-          <a:ln>
-            <a:headEnd type="none" w="med" len="med"/>
-            <a:tailEnd type="none" w="med" len="med"/>
-          </a:ln>
-        </p:spPr>
-        <p:style>
-          <a:lnRef idx="2">
-            <a:schemeClr val="dk1"/>
-          </a:lnRef>
-          <a:fillRef idx="1">
-            <a:schemeClr val="lt1"/>
-          </a:fillRef>
-          <a:effectRef idx="0">
-            <a:schemeClr val="dk1"/>
-          </a:effectRef>
-          <a:fontRef idx="minor">
-            <a:schemeClr val="dk1"/>
-          </a:fontRef>
-        </p:style>
-        <p:txBody>
-          <a:bodyPr rtlCol="0" anchor="ctr"/>
-          <a:lstStyle/>
-          <a:p>
-            <a:pPr algn="ctr"/>
-            <a:endParaRPr lang="en-GB"/>
           </a:p>
         </p:txBody>
       </p:sp>
@@ -17294,13 +17499,15 @@
           </p:cNvPr>
           <p:cNvCxnSpPr>
             <a:cxnSpLocks/>
+            <a:stCxn id="67" idx="3"/>
+            <a:endCxn id="66" idx="1"/>
           </p:cNvCxnSpPr>
           <p:nvPr/>
         </p:nvCxnSpPr>
         <p:spPr>
-          <a:xfrm flipV="1">
-            <a:off x="1898118" y="1512651"/>
-            <a:ext cx="0" cy="159781"/>
+          <a:xfrm>
+            <a:off x="3722755" y="2782772"/>
+            <a:ext cx="182495" cy="0"/>
           </a:xfrm>
           <a:prstGeom prst="straightConnector1">
             <a:avLst/>
@@ -17335,14 +17542,15 @@
           </p:cNvPr>
           <p:cNvCxnSpPr>
             <a:cxnSpLocks/>
-            <a:stCxn id="66" idx="0"/>
+            <a:stCxn id="66" idx="3"/>
+            <a:endCxn id="15" idx="2"/>
           </p:cNvCxnSpPr>
           <p:nvPr/>
         </p:nvCxnSpPr>
         <p:spPr>
-          <a:xfrm flipV="1">
-            <a:off x="1913199" y="862430"/>
-            <a:ext cx="2631" cy="164841"/>
+          <a:xfrm>
+            <a:off x="4625250" y="2782772"/>
+            <a:ext cx="178207" cy="4818"/>
           </a:xfrm>
           <a:prstGeom prst="straightConnector1">
             <a:avLst/>
@@ -17371,10 +17579,243 @@
       </p:cxnSp>
       <p:cxnSp>
         <p:nvCxnSpPr>
-          <p:cNvPr id="220" name="Connector: Elbow 219">
-            <a:extLst>
-              <a:ext uri="{FF2B5EF4-FFF2-40B4-BE49-F238E27FC236}">
-                <a16:creationId xmlns:a16="http://schemas.microsoft.com/office/drawing/2014/main" id="{F71C02ED-6336-D99D-2AAA-7DC8A5931246}"/>
+          <p:cNvPr id="85" name="Straight Arrow Connector 84">
+            <a:extLst>
+              <a:ext uri="{FF2B5EF4-FFF2-40B4-BE49-F238E27FC236}">
+                <a16:creationId xmlns:a16="http://schemas.microsoft.com/office/drawing/2014/main" id="{620B6CED-9580-DA79-22AE-F82A08CEF70D}"/>
+              </a:ext>
+            </a:extLst>
+          </p:cNvPr>
+          <p:cNvCxnSpPr>
+            <a:cxnSpLocks/>
+            <a:stCxn id="15" idx="6"/>
+          </p:cNvCxnSpPr>
+          <p:nvPr/>
+        </p:nvCxnSpPr>
+        <p:spPr>
+          <a:xfrm>
+            <a:off x="4954657" y="2787590"/>
+            <a:ext cx="180000" cy="0"/>
+          </a:xfrm>
+          <a:prstGeom prst="straightConnector1">
+            <a:avLst/>
+          </a:prstGeom>
+          <a:ln w="12700">
+            <a:solidFill>
+              <a:schemeClr val="tx1"/>
+            </a:solidFill>
+            <a:tailEnd type="triangle"/>
+          </a:ln>
+        </p:spPr>
+        <p:style>
+          <a:lnRef idx="1">
+            <a:schemeClr val="dk1"/>
+          </a:lnRef>
+          <a:fillRef idx="0">
+            <a:schemeClr val="dk1"/>
+          </a:fillRef>
+          <a:effectRef idx="0">
+            <a:schemeClr val="dk1"/>
+          </a:effectRef>
+          <a:fontRef idx="minor">
+            <a:schemeClr val="tx1"/>
+          </a:fontRef>
+        </p:style>
+      </p:cxnSp>
+      <p:pic>
+        <p:nvPicPr>
+          <p:cNvPr id="3" name="Picture 2" descr="A picture containing diagram&#10;&#10;Description automatically generated">
+            <a:extLst>
+              <a:ext uri="{FF2B5EF4-FFF2-40B4-BE49-F238E27FC236}">
+                <a16:creationId xmlns:a16="http://schemas.microsoft.com/office/drawing/2014/main" id="{96722123-71A7-17FC-A1D1-AF5B326757C5}"/>
+              </a:ext>
+            </a:extLst>
+          </p:cNvPr>
+          <p:cNvPicPr>
+            <a:picLocks noChangeAspect="1"/>
+          </p:cNvPicPr>
+          <p:nvPr/>
+        </p:nvPicPr>
+        <p:blipFill>
+          <a:blip r:embed="rId2">
+            <a:extLst>
+              <a:ext uri="{28A0092B-C50C-407E-A947-70E740481C1C}">
+                <a14:useLocalDpi xmlns:a14="http://schemas.microsoft.com/office/drawing/2010/main" val="0"/>
+              </a:ext>
+            </a:extLst>
+          </a:blip>
+          <a:stretch>
+            <a:fillRect/>
+          </a:stretch>
+        </p:blipFill>
+        <p:spPr>
+          <a:xfrm>
+            <a:off x="3196283" y="3483760"/>
+            <a:ext cx="4314825" cy="2676525"/>
+          </a:xfrm>
+          <a:prstGeom prst="rect">
+            <a:avLst/>
+          </a:prstGeom>
+        </p:spPr>
+      </p:pic>
+      <p:sp>
+        <p:nvSpPr>
+          <p:cNvPr id="15" name="Oval 14">
+            <a:extLst>
+              <a:ext uri="{FF2B5EF4-FFF2-40B4-BE49-F238E27FC236}">
+                <a16:creationId xmlns:a16="http://schemas.microsoft.com/office/drawing/2014/main" id="{E8133E75-162F-B9D7-4F2C-61241AF6B53D}"/>
+              </a:ext>
+            </a:extLst>
+          </p:cNvPr>
+          <p:cNvSpPr/>
+          <p:nvPr/>
+        </p:nvSpPr>
+        <p:spPr>
+          <a:xfrm>
+            <a:off x="4803457" y="2712818"/>
+            <a:ext cx="151200" cy="149544"/>
+          </a:xfrm>
+          <a:prstGeom prst="ellipse">
+            <a:avLst/>
+          </a:prstGeom>
+          <a:noFill/>
+          <a:ln>
+            <a:solidFill>
+              <a:schemeClr val="tx1"/>
+            </a:solidFill>
+          </a:ln>
+        </p:spPr>
+        <p:style>
+          <a:lnRef idx="2">
+            <a:schemeClr val="accent1">
+              <a:shade val="50000"/>
+            </a:schemeClr>
+          </a:lnRef>
+          <a:fillRef idx="1">
+            <a:schemeClr val="accent1"/>
+          </a:fillRef>
+          <a:effectRef idx="0">
+            <a:schemeClr val="accent1"/>
+          </a:effectRef>
+          <a:fontRef idx="minor">
+            <a:schemeClr val="lt1"/>
+          </a:fontRef>
+        </p:style>
+        <p:txBody>
+          <a:bodyPr rtlCol="0" anchor="ctr"/>
+          <a:lstStyle/>
+          <a:p>
+            <a:pPr algn="ctr"/>
+            <a:r>
+              <a:rPr lang="de-DE" sz="1100" dirty="0">
+                <a:solidFill>
+                  <a:schemeClr val="tx1"/>
+                </a:solidFill>
+              </a:rPr>
+              <a:t>+</a:t>
+            </a:r>
+            <a:endParaRPr lang="en-GB" sz="1100" dirty="0">
+              <a:solidFill>
+                <a:schemeClr val="tx1"/>
+              </a:solidFill>
+            </a:endParaRPr>
+          </a:p>
+        </p:txBody>
+      </p:sp>
+      <p:sp>
+        <p:nvSpPr>
+          <p:cNvPr id="26" name="TextBox 25">
+            <a:extLst>
+              <a:ext uri="{FF2B5EF4-FFF2-40B4-BE49-F238E27FC236}">
+                <a16:creationId xmlns:a16="http://schemas.microsoft.com/office/drawing/2014/main" id="{3F01F5F2-C867-1EF5-6585-E4346DDBC353}"/>
+              </a:ext>
+            </a:extLst>
+          </p:cNvPr>
+          <p:cNvSpPr txBox="1"/>
+          <p:nvPr/>
+        </p:nvSpPr>
+        <p:spPr>
+          <a:xfrm>
+            <a:off x="5140325" y="2657475"/>
+            <a:ext cx="1118255" cy="261610"/>
+          </a:xfrm>
+          <a:prstGeom prst="rect">
+            <a:avLst/>
+          </a:prstGeom>
+          <a:noFill/>
+        </p:spPr>
+        <p:txBody>
+          <a:bodyPr wrap="none" lIns="0" rtlCol="0">
+            <a:spAutoFit/>
+          </a:bodyPr>
+          <a:lstStyle/>
+          <a:p>
+            <a:r>
+              <a:rPr lang="de-DE" sz="1100" dirty="0"/>
+              <a:t>$\</a:t>
+            </a:r>
+            <a:r>
+              <a:rPr lang="de-DE" sz="1100" dirty="0" err="1"/>
+              <a:t>boldsymbol</a:t>
+            </a:r>
+            <a:r>
+              <a:rPr lang="de-DE" sz="1100" dirty="0"/>
+              <a:t>{X}$</a:t>
+            </a:r>
+            <a:endParaRPr lang="en-GB" sz="1100" dirty="0"/>
+          </a:p>
+        </p:txBody>
+      </p:sp>
+      <p:sp>
+        <p:nvSpPr>
+          <p:cNvPr id="28" name="TextBox 27">
+            <a:extLst>
+              <a:ext uri="{FF2B5EF4-FFF2-40B4-BE49-F238E27FC236}">
+                <a16:creationId xmlns:a16="http://schemas.microsoft.com/office/drawing/2014/main" id="{C68EF78B-5C83-C0E6-D42D-88D80ABC2387}"/>
+              </a:ext>
+            </a:extLst>
+          </p:cNvPr>
+          <p:cNvSpPr txBox="1"/>
+          <p:nvPr/>
+        </p:nvSpPr>
+        <p:spPr>
+          <a:xfrm>
+            <a:off x="2621756" y="2659857"/>
+            <a:ext cx="202736" cy="2462213"/>
+          </a:xfrm>
+          <a:prstGeom prst="rect">
+            <a:avLst/>
+          </a:prstGeom>
+          <a:noFill/>
+        </p:spPr>
+        <p:txBody>
+          <a:bodyPr wrap="square" lIns="0" rtlCol="0">
+            <a:spAutoFit/>
+          </a:bodyPr>
+          <a:lstStyle/>
+          <a:p>
+            <a:r>
+              <a:rPr lang="de-DE" sz="1100" dirty="0"/>
+              <a:t>$\</a:t>
+            </a:r>
+            <a:r>
+              <a:rPr lang="de-DE" sz="1100" dirty="0" err="1"/>
+              <a:t>boldsymbol</a:t>
+            </a:r>
+            <a:r>
+              <a:rPr lang="de-DE" sz="1100" dirty="0"/>
+              <a:t>{X}$</a:t>
+            </a:r>
+            <a:endParaRPr lang="en-GB" sz="1100" dirty="0"/>
+          </a:p>
+        </p:txBody>
+      </p:sp>
+      <p:cxnSp>
+        <p:nvCxnSpPr>
+          <p:cNvPr id="74" name="Straight Arrow Connector 73">
+            <a:extLst>
+              <a:ext uri="{FF2B5EF4-FFF2-40B4-BE49-F238E27FC236}">
+                <a16:creationId xmlns:a16="http://schemas.microsoft.com/office/drawing/2014/main" id="{45034EB7-A2C2-833C-6950-F5376C1D7711}"/>
               </a:ext>
             </a:extLst>
           </p:cNvPr>
@@ -17385,14 +17826,262 @@
           <p:nvPr/>
         </p:nvCxnSpPr>
         <p:spPr>
-          <a:xfrm rot="16200000" flipV="1">
-            <a:off x="954021" y="1125471"/>
-            <a:ext cx="1338262" cy="554172"/>
-          </a:xfrm>
-          <a:prstGeom prst="bentConnector4">
+          <a:xfrm>
+            <a:off x="2824163" y="2781300"/>
+            <a:ext cx="178592" cy="1472"/>
+          </a:xfrm>
+          <a:prstGeom prst="straightConnector1">
+            <a:avLst/>
+          </a:prstGeom>
+          <a:ln w="12700">
+            <a:tailEnd type="triangle"/>
+          </a:ln>
+        </p:spPr>
+        <p:style>
+          <a:lnRef idx="1">
+            <a:schemeClr val="dk1"/>
+          </a:lnRef>
+          <a:fillRef idx="0">
+            <a:schemeClr val="dk1"/>
+          </a:fillRef>
+          <a:effectRef idx="0">
+            <a:schemeClr val="dk1"/>
+          </a:effectRef>
+          <a:fontRef idx="minor">
+            <a:schemeClr val="tx1"/>
+          </a:fontRef>
+        </p:style>
+      </p:cxnSp>
+      <p:sp>
+        <p:nvSpPr>
+          <p:cNvPr id="93" name="Rectangle: Rounded Corners 92">
+            <a:extLst>
+              <a:ext uri="{FF2B5EF4-FFF2-40B4-BE49-F238E27FC236}">
+                <a16:creationId xmlns:a16="http://schemas.microsoft.com/office/drawing/2014/main" id="{671F1362-E500-05A6-E86F-3C1CB5CCD44D}"/>
+              </a:ext>
+            </a:extLst>
+          </p:cNvPr>
+          <p:cNvSpPr/>
+          <p:nvPr/>
+        </p:nvSpPr>
+        <p:spPr>
+          <a:xfrm>
+            <a:off x="3957101" y="501651"/>
+            <a:ext cx="678400" cy="254794"/>
+          </a:xfrm>
+          <a:prstGeom prst="roundRect">
             <a:avLst>
-              <a:gd name="adj1" fmla="val 29449"/>
-              <a:gd name="adj2" fmla="val 133516"/>
+              <a:gd name="adj" fmla="val 15547"/>
+            </a:avLst>
+          </a:prstGeom>
+          <a:solidFill>
+            <a:srgbClr val="CCD497"/>
+          </a:solidFill>
+          <a:ln w="12700">
+            <a:headEnd type="none" w="med" len="med"/>
+            <a:tailEnd type="none" w="med" len="med"/>
+          </a:ln>
+        </p:spPr>
+        <p:style>
+          <a:lnRef idx="2">
+            <a:schemeClr val="dk1"/>
+          </a:lnRef>
+          <a:fillRef idx="1">
+            <a:schemeClr val="lt1"/>
+          </a:fillRef>
+          <a:effectRef idx="0">
+            <a:schemeClr val="dk1"/>
+          </a:effectRef>
+          <a:fontRef idx="minor">
+            <a:schemeClr val="dk1"/>
+          </a:fontRef>
+        </p:style>
+        <p:txBody>
+          <a:bodyPr rtlCol="0" anchor="ctr"/>
+          <a:lstStyle/>
+          <a:p>
+            <a:pPr algn="ctr"/>
+            <a:r>
+              <a:rPr lang="de-DE" sz="800" noProof="1">
+                <a:latin typeface="+mj-lt"/>
+                <a:cs typeface="Arial" panose="020B0604020202020204" pitchFamily="34" charset="0"/>
+              </a:rPr>
+              <a:t>Layer</a:t>
+            </a:r>
+          </a:p>
+        </p:txBody>
+      </p:sp>
+      <p:sp>
+        <p:nvSpPr>
+          <p:cNvPr id="94" name="Rectangle: Rounded Corners 93">
+            <a:extLst>
+              <a:ext uri="{FF2B5EF4-FFF2-40B4-BE49-F238E27FC236}">
+                <a16:creationId xmlns:a16="http://schemas.microsoft.com/office/drawing/2014/main" id="{2523B3A1-A1A0-B768-99F1-32A20559DD27}"/>
+              </a:ext>
+            </a:extLst>
+          </p:cNvPr>
+          <p:cNvSpPr/>
+          <p:nvPr/>
+        </p:nvSpPr>
+        <p:spPr>
+          <a:xfrm>
+            <a:off x="2961482" y="492125"/>
+            <a:ext cx="676514" cy="268361"/>
+          </a:xfrm>
+          <a:prstGeom prst="roundRect">
+            <a:avLst>
+              <a:gd name="adj" fmla="val 15547"/>
+            </a:avLst>
+          </a:prstGeom>
+          <a:solidFill>
+            <a:schemeClr val="bg1">
+              <a:lumMod val="85000"/>
+            </a:schemeClr>
+          </a:solidFill>
+          <a:ln w="12700">
+            <a:headEnd type="none" w="med" len="med"/>
+            <a:tailEnd type="none" w="med" len="med"/>
+          </a:ln>
+        </p:spPr>
+        <p:style>
+          <a:lnRef idx="2">
+            <a:schemeClr val="dk1"/>
+          </a:lnRef>
+          <a:fillRef idx="1">
+            <a:schemeClr val="lt1"/>
+          </a:fillRef>
+          <a:effectRef idx="0">
+            <a:schemeClr val="dk1"/>
+          </a:effectRef>
+          <a:fontRef idx="minor">
+            <a:schemeClr val="dk1"/>
+          </a:fontRef>
+        </p:style>
+        <p:txBody>
+          <a:bodyPr rtlCol="0" anchor="ctr"/>
+          <a:lstStyle/>
+          <a:p>
+            <a:pPr algn="ctr"/>
+            <a:r>
+              <a:rPr lang="de-DE" sz="1000" noProof="1">
+                <a:cs typeface="Arial" panose="020B0604020202020204" pitchFamily="34" charset="0"/>
+              </a:rPr>
+              <a:t>Sublayer</a:t>
+            </a:r>
+          </a:p>
+        </p:txBody>
+      </p:sp>
+      <p:cxnSp>
+        <p:nvCxnSpPr>
+          <p:cNvPr id="95" name="Straight Arrow Connector 94">
+            <a:extLst>
+              <a:ext uri="{FF2B5EF4-FFF2-40B4-BE49-F238E27FC236}">
+                <a16:creationId xmlns:a16="http://schemas.microsoft.com/office/drawing/2014/main" id="{2A3476EF-77D7-9FBB-A947-F75560E54658}"/>
+              </a:ext>
+            </a:extLst>
+          </p:cNvPr>
+          <p:cNvCxnSpPr>
+            <a:cxnSpLocks/>
+            <a:stCxn id="94" idx="3"/>
+            <a:endCxn id="195" idx="2"/>
+          </p:cNvCxnSpPr>
+          <p:nvPr/>
+        </p:nvCxnSpPr>
+        <p:spPr>
+          <a:xfrm flipV="1">
+            <a:off x="3637996" y="625416"/>
+            <a:ext cx="116245" cy="890"/>
+          </a:xfrm>
+          <a:prstGeom prst="straightConnector1">
+            <a:avLst/>
+          </a:prstGeom>
+          <a:ln w="12700">
+            <a:tailEnd type="triangle"/>
+          </a:ln>
+        </p:spPr>
+        <p:style>
+          <a:lnRef idx="1">
+            <a:schemeClr val="dk1"/>
+          </a:lnRef>
+          <a:fillRef idx="0">
+            <a:schemeClr val="dk1"/>
+          </a:fillRef>
+          <a:effectRef idx="0">
+            <a:schemeClr val="dk1"/>
+          </a:effectRef>
+          <a:fontRef idx="minor">
+            <a:schemeClr val="tx1"/>
+          </a:fontRef>
+        </p:style>
+      </p:cxnSp>
+      <p:cxnSp>
+        <p:nvCxnSpPr>
+          <p:cNvPr id="192" name="Straight Arrow Connector 191">
+            <a:extLst>
+              <a:ext uri="{FF2B5EF4-FFF2-40B4-BE49-F238E27FC236}">
+                <a16:creationId xmlns:a16="http://schemas.microsoft.com/office/drawing/2014/main" id="{79936518-1DA3-3C30-DA38-F2C3F2F18C02}"/>
+              </a:ext>
+            </a:extLst>
+          </p:cNvPr>
+          <p:cNvCxnSpPr>
+            <a:cxnSpLocks/>
+            <a:endCxn id="94" idx="1"/>
+          </p:cNvCxnSpPr>
+          <p:nvPr/>
+        </p:nvCxnSpPr>
+        <p:spPr>
+          <a:xfrm>
+            <a:off x="2832100" y="626306"/>
+            <a:ext cx="115200" cy="0"/>
+          </a:xfrm>
+          <a:prstGeom prst="straightConnector1">
+            <a:avLst/>
+          </a:prstGeom>
+          <a:ln w="12700">
+            <a:solidFill>
+              <a:schemeClr val="tx1"/>
+            </a:solidFill>
+            <a:tailEnd type="triangle"/>
+          </a:ln>
+        </p:spPr>
+        <p:style>
+          <a:lnRef idx="1">
+            <a:schemeClr val="dk1"/>
+          </a:lnRef>
+          <a:fillRef idx="0">
+            <a:schemeClr val="dk1"/>
+          </a:fillRef>
+          <a:effectRef idx="0">
+            <a:schemeClr val="dk1"/>
+          </a:effectRef>
+          <a:fontRef idx="minor">
+            <a:schemeClr val="tx1"/>
+          </a:fontRef>
+        </p:style>
+      </p:cxnSp>
+      <p:cxnSp>
+        <p:nvCxnSpPr>
+          <p:cNvPr id="193" name="Connector: Elbow 192">
+            <a:extLst>
+              <a:ext uri="{FF2B5EF4-FFF2-40B4-BE49-F238E27FC236}">
+                <a16:creationId xmlns:a16="http://schemas.microsoft.com/office/drawing/2014/main" id="{CD4D7F8D-ACFF-6E58-7554-64E68DE7F1EB}"/>
+              </a:ext>
+            </a:extLst>
+          </p:cNvPr>
+          <p:cNvCxnSpPr>
+            <a:cxnSpLocks/>
+            <a:endCxn id="195" idx="0"/>
+          </p:cNvCxnSpPr>
+          <p:nvPr/>
+        </p:nvCxnSpPr>
+        <p:spPr>
+          <a:xfrm rot="16200000" flipH="1">
+            <a:off x="3279722" y="59461"/>
+            <a:ext cx="52524" cy="987455"/>
+          </a:xfrm>
+          <a:prstGeom prst="bentConnector3">
+            <a:avLst>
+              <a:gd name="adj1" fmla="val -435230"/>
             </a:avLst>
           </a:prstGeom>
           <a:ln w="12700">
@@ -17419,23 +18108,24 @@
       </p:cxnSp>
       <p:cxnSp>
         <p:nvCxnSpPr>
-          <p:cNvPr id="85" name="Straight Arrow Connector 84">
-            <a:extLst>
-              <a:ext uri="{FF2B5EF4-FFF2-40B4-BE49-F238E27FC236}">
-                <a16:creationId xmlns:a16="http://schemas.microsoft.com/office/drawing/2014/main" id="{620B6CED-9580-DA79-22AE-F82A08CEF70D}"/>
+          <p:cNvPr id="194" name="Straight Arrow Connector 193">
+            <a:extLst>
+              <a:ext uri="{FF2B5EF4-FFF2-40B4-BE49-F238E27FC236}">
+                <a16:creationId xmlns:a16="http://schemas.microsoft.com/office/drawing/2014/main" id="{A533FB3A-4776-A7FD-BCF2-A8E1C483A990}"/>
               </a:ext>
             </a:extLst>
           </p:cNvPr>
           <p:cNvCxnSpPr>
             <a:cxnSpLocks/>
-            <a:stCxn id="67" idx="0"/>
+            <a:stCxn id="195" idx="6"/>
+            <a:endCxn id="93" idx="1"/>
           </p:cNvCxnSpPr>
           <p:nvPr/>
         </p:nvCxnSpPr>
         <p:spPr>
-          <a:xfrm flipV="1">
-            <a:off x="1928282" y="71438"/>
-            <a:ext cx="0" cy="540544"/>
+          <a:xfrm>
+            <a:off x="3845182" y="625416"/>
+            <a:ext cx="111919" cy="3632"/>
           </a:xfrm>
           <a:prstGeom prst="straightConnector1">
             <a:avLst/>
@@ -17462,6 +18152,832 @@
           </a:fontRef>
         </p:style>
       </p:cxnSp>
+      <p:sp>
+        <p:nvSpPr>
+          <p:cNvPr id="195" name="Oval 194">
+            <a:extLst>
+              <a:ext uri="{FF2B5EF4-FFF2-40B4-BE49-F238E27FC236}">
+                <a16:creationId xmlns:a16="http://schemas.microsoft.com/office/drawing/2014/main" id="{EE401D95-5407-A19B-E61D-AB1030A25C0C}"/>
+              </a:ext>
+            </a:extLst>
+          </p:cNvPr>
+          <p:cNvSpPr/>
+          <p:nvPr/>
+        </p:nvSpPr>
+        <p:spPr>
+          <a:xfrm>
+            <a:off x="3754241" y="579450"/>
+            <a:ext cx="90941" cy="91931"/>
+          </a:xfrm>
+          <a:prstGeom prst="ellipse">
+            <a:avLst/>
+          </a:prstGeom>
+          <a:noFill/>
+          <a:ln w="12700">
+            <a:solidFill>
+              <a:schemeClr val="tx1"/>
+            </a:solidFill>
+          </a:ln>
+        </p:spPr>
+        <p:style>
+          <a:lnRef idx="2">
+            <a:schemeClr val="accent1">
+              <a:shade val="50000"/>
+            </a:schemeClr>
+          </a:lnRef>
+          <a:fillRef idx="1">
+            <a:schemeClr val="accent1"/>
+          </a:fillRef>
+          <a:effectRef idx="0">
+            <a:schemeClr val="accent1"/>
+          </a:effectRef>
+          <a:fontRef idx="minor">
+            <a:schemeClr val="lt1"/>
+          </a:fontRef>
+        </p:style>
+        <p:txBody>
+          <a:bodyPr rtlCol="0" anchor="ctr"/>
+          <a:lstStyle/>
+          <a:p>
+            <a:pPr algn="ctr"/>
+            <a:r>
+              <a:rPr lang="de-DE" sz="1100" dirty="0">
+                <a:solidFill>
+                  <a:schemeClr val="tx1"/>
+                </a:solidFill>
+              </a:rPr>
+              <a:t>+</a:t>
+            </a:r>
+            <a:endParaRPr lang="en-GB" sz="1100" dirty="0">
+              <a:solidFill>
+                <a:schemeClr val="tx1"/>
+              </a:solidFill>
+            </a:endParaRPr>
+          </a:p>
+        </p:txBody>
+      </p:sp>
+      <p:sp>
+        <p:nvSpPr>
+          <p:cNvPr id="196" name="TextBox 195">
+            <a:extLst>
+              <a:ext uri="{FF2B5EF4-FFF2-40B4-BE49-F238E27FC236}">
+                <a16:creationId xmlns:a16="http://schemas.microsoft.com/office/drawing/2014/main" id="{D2BF1CC6-08EF-9DE9-0F91-0E6D29DD0175}"/>
+              </a:ext>
+            </a:extLst>
+          </p:cNvPr>
+          <p:cNvSpPr txBox="1"/>
+          <p:nvPr/>
+        </p:nvSpPr>
+        <p:spPr>
+          <a:xfrm>
+            <a:off x="4753344" y="507205"/>
+            <a:ext cx="169176" cy="246221"/>
+          </a:xfrm>
+          <a:prstGeom prst="rect">
+            <a:avLst/>
+          </a:prstGeom>
+          <a:noFill/>
+        </p:spPr>
+        <p:txBody>
+          <a:bodyPr wrap="square" lIns="0" rtlCol="0">
+            <a:spAutoFit/>
+          </a:bodyPr>
+          <a:lstStyle/>
+          <a:p>
+            <a:r>
+              <a:rPr lang="de-DE" sz="1000" dirty="0"/>
+              <a:t>b</a:t>
+            </a:r>
+            <a:endParaRPr lang="en-GB" sz="1000" dirty="0"/>
+          </a:p>
+        </p:txBody>
+      </p:sp>
+      <p:cxnSp>
+        <p:nvCxnSpPr>
+          <p:cNvPr id="198" name="Straight Arrow Connector 197">
+            <a:extLst>
+              <a:ext uri="{FF2B5EF4-FFF2-40B4-BE49-F238E27FC236}">
+                <a16:creationId xmlns:a16="http://schemas.microsoft.com/office/drawing/2014/main" id="{111866D8-FAED-B118-4BC1-98E555EC188A}"/>
+              </a:ext>
+            </a:extLst>
+          </p:cNvPr>
+          <p:cNvCxnSpPr>
+            <a:cxnSpLocks/>
+            <a:stCxn id="93" idx="3"/>
+          </p:cNvCxnSpPr>
+          <p:nvPr/>
+        </p:nvCxnSpPr>
+        <p:spPr>
+          <a:xfrm>
+            <a:off x="4635501" y="629048"/>
+            <a:ext cx="115200" cy="0"/>
+          </a:xfrm>
+          <a:prstGeom prst="straightConnector1">
+            <a:avLst/>
+          </a:prstGeom>
+          <a:ln w="12700">
+            <a:tailEnd type="triangle"/>
+          </a:ln>
+        </p:spPr>
+        <p:style>
+          <a:lnRef idx="1">
+            <a:schemeClr val="dk1"/>
+          </a:lnRef>
+          <a:fillRef idx="0">
+            <a:schemeClr val="dk1"/>
+          </a:fillRef>
+          <a:effectRef idx="0">
+            <a:schemeClr val="dk1"/>
+          </a:effectRef>
+          <a:fontRef idx="minor">
+            <a:schemeClr val="tx1"/>
+          </a:fontRef>
+        </p:style>
+      </p:cxnSp>
+      <p:sp>
+        <p:nvSpPr>
+          <p:cNvPr id="213" name="TextBox 212">
+            <a:extLst>
+              <a:ext uri="{FF2B5EF4-FFF2-40B4-BE49-F238E27FC236}">
+                <a16:creationId xmlns:a16="http://schemas.microsoft.com/office/drawing/2014/main" id="{1589835F-2FFC-271A-7EB2-719A536F4B4B}"/>
+              </a:ext>
+            </a:extLst>
+          </p:cNvPr>
+          <p:cNvSpPr txBox="1"/>
+          <p:nvPr/>
+        </p:nvSpPr>
+        <p:spPr>
+          <a:xfrm>
+            <a:off x="503238" y="265113"/>
+            <a:ext cx="680636" cy="261610"/>
+          </a:xfrm>
+          <a:prstGeom prst="rect">
+            <a:avLst/>
+          </a:prstGeom>
+          <a:noFill/>
+        </p:spPr>
+        <p:txBody>
+          <a:bodyPr wrap="none" lIns="0" rtlCol="0">
+            <a:spAutoFit/>
+          </a:bodyPr>
+          <a:lstStyle/>
+          <a:p>
+            <a:r>
+              <a:rPr lang="de-DE" sz="1100" dirty="0"/>
+              <a:t>Post norm</a:t>
+            </a:r>
+            <a:endParaRPr lang="en-GB" sz="1100" dirty="0"/>
+          </a:p>
+        </p:txBody>
+      </p:sp>
+      <p:sp>
+        <p:nvSpPr>
+          <p:cNvPr id="215" name="TextBox 214">
+            <a:extLst>
+              <a:ext uri="{FF2B5EF4-FFF2-40B4-BE49-F238E27FC236}">
+                <a16:creationId xmlns:a16="http://schemas.microsoft.com/office/drawing/2014/main" id="{AA116659-2760-21F2-F809-E4320983C7EA}"/>
+              </a:ext>
+            </a:extLst>
+          </p:cNvPr>
+          <p:cNvSpPr txBox="1"/>
+          <p:nvPr/>
+        </p:nvSpPr>
+        <p:spPr>
+          <a:xfrm>
+            <a:off x="508001" y="2389188"/>
+            <a:ext cx="626133" cy="261610"/>
+          </a:xfrm>
+          <a:prstGeom prst="rect">
+            <a:avLst/>
+          </a:prstGeom>
+          <a:noFill/>
+        </p:spPr>
+        <p:txBody>
+          <a:bodyPr wrap="none" lIns="0" rtlCol="0">
+            <a:spAutoFit/>
+          </a:bodyPr>
+          <a:lstStyle/>
+          <a:p>
+            <a:r>
+              <a:rPr lang="de-DE" sz="1100" dirty="0" err="1"/>
+              <a:t>Pre</a:t>
+            </a:r>
+            <a:r>
+              <a:rPr lang="de-DE" sz="1100" dirty="0"/>
+              <a:t> norm</a:t>
+            </a:r>
+            <a:endParaRPr lang="en-GB" sz="1100" dirty="0"/>
+          </a:p>
+        </p:txBody>
+      </p:sp>
+      <p:sp>
+        <p:nvSpPr>
+          <p:cNvPr id="2" name="Rectangle 1">
+            <a:extLst>
+              <a:ext uri="{FF2B5EF4-FFF2-40B4-BE49-F238E27FC236}">
+                <a16:creationId xmlns:a16="http://schemas.microsoft.com/office/drawing/2014/main" id="{AA016958-3168-A01D-32D3-1859970EA6AC}"/>
+              </a:ext>
+            </a:extLst>
+          </p:cNvPr>
+          <p:cNvSpPr/>
+          <p:nvPr/>
+        </p:nvSpPr>
+        <p:spPr>
+          <a:xfrm>
+            <a:off x="2560320" y="0"/>
+            <a:ext cx="2520000" cy="1440000"/>
+          </a:xfrm>
+          <a:prstGeom prst="rect">
+            <a:avLst/>
+          </a:prstGeom>
+          <a:noFill/>
+        </p:spPr>
+        <p:style>
+          <a:lnRef idx="2">
+            <a:schemeClr val="accent1">
+              <a:shade val="50000"/>
+            </a:schemeClr>
+          </a:lnRef>
+          <a:fillRef idx="1">
+            <a:schemeClr val="accent1"/>
+          </a:fillRef>
+          <a:effectRef idx="0">
+            <a:schemeClr val="accent1"/>
+          </a:effectRef>
+          <a:fontRef idx="minor">
+            <a:schemeClr val="lt1"/>
+          </a:fontRef>
+        </p:style>
+        <p:txBody>
+          <a:bodyPr rtlCol="0" anchor="ctr"/>
+          <a:lstStyle/>
+          <a:p>
+            <a:pPr algn="ctr"/>
+            <a:endParaRPr lang="en-GB"/>
+          </a:p>
+        </p:txBody>
+      </p:sp>
+      <p:sp>
+        <p:nvSpPr>
+          <p:cNvPr id="70" name="TextBox 69">
+            <a:extLst>
+              <a:ext uri="{FF2B5EF4-FFF2-40B4-BE49-F238E27FC236}">
+                <a16:creationId xmlns:a16="http://schemas.microsoft.com/office/drawing/2014/main" id="{E1C4352A-6FB0-A2F6-7BD7-C1AA82F43FA6}"/>
+              </a:ext>
+            </a:extLst>
+          </p:cNvPr>
+          <p:cNvSpPr txBox="1"/>
+          <p:nvPr/>
+        </p:nvSpPr>
+        <p:spPr>
+          <a:xfrm>
+            <a:off x="2745950" y="496886"/>
+            <a:ext cx="168700" cy="246221"/>
+          </a:xfrm>
+          <a:prstGeom prst="rect">
+            <a:avLst/>
+          </a:prstGeom>
+          <a:noFill/>
+        </p:spPr>
+        <p:txBody>
+          <a:bodyPr wrap="square" lIns="0" rtlCol="0">
+            <a:spAutoFit/>
+          </a:bodyPr>
+          <a:lstStyle/>
+          <a:p>
+            <a:r>
+              <a:rPr lang="de-DE" sz="1000" dirty="0"/>
+              <a:t>b</a:t>
+            </a:r>
+            <a:endParaRPr lang="en-GB" sz="1000" dirty="0"/>
+          </a:p>
+        </p:txBody>
+      </p:sp>
+      <p:sp>
+        <p:nvSpPr>
+          <p:cNvPr id="71" name="Rectangle: Rounded Corners 70">
+            <a:extLst>
+              <a:ext uri="{FF2B5EF4-FFF2-40B4-BE49-F238E27FC236}">
+                <a16:creationId xmlns:a16="http://schemas.microsoft.com/office/drawing/2014/main" id="{987843DF-B74C-1D89-D259-56ED2F0EDD96}"/>
+              </a:ext>
+            </a:extLst>
+          </p:cNvPr>
+          <p:cNvSpPr/>
+          <p:nvPr/>
+        </p:nvSpPr>
+        <p:spPr>
+          <a:xfrm>
+            <a:off x="8973284" y="3526633"/>
+            <a:ext cx="678400" cy="254794"/>
+          </a:xfrm>
+          <a:prstGeom prst="roundRect">
+            <a:avLst>
+              <a:gd name="adj" fmla="val 15547"/>
+            </a:avLst>
+          </a:prstGeom>
+          <a:solidFill>
+            <a:srgbClr val="CCD497"/>
+          </a:solidFill>
+          <a:ln w="12700">
+            <a:headEnd type="none" w="med" len="med"/>
+            <a:tailEnd type="none" w="med" len="med"/>
+          </a:ln>
+        </p:spPr>
+        <p:style>
+          <a:lnRef idx="2">
+            <a:schemeClr val="dk1"/>
+          </a:lnRef>
+          <a:fillRef idx="1">
+            <a:schemeClr val="lt1"/>
+          </a:fillRef>
+          <a:effectRef idx="0">
+            <a:schemeClr val="dk1"/>
+          </a:effectRef>
+          <a:fontRef idx="minor">
+            <a:schemeClr val="dk1"/>
+          </a:fontRef>
+        </p:style>
+        <p:txBody>
+          <a:bodyPr rtlCol="0" anchor="ctr"/>
+          <a:lstStyle/>
+          <a:p>
+            <a:pPr algn="ctr"/>
+            <a:r>
+              <a:rPr lang="de-DE" sz="800" noProof="1">
+                <a:latin typeface="+mj-lt"/>
+                <a:cs typeface="Arial" panose="020B0604020202020204" pitchFamily="34" charset="0"/>
+              </a:rPr>
+              <a:t>Layer</a:t>
+            </a:r>
+          </a:p>
+        </p:txBody>
+      </p:sp>
+      <p:sp>
+        <p:nvSpPr>
+          <p:cNvPr id="72" name="Rectangle: Rounded Corners 71">
+            <a:extLst>
+              <a:ext uri="{FF2B5EF4-FFF2-40B4-BE49-F238E27FC236}">
+                <a16:creationId xmlns:a16="http://schemas.microsoft.com/office/drawing/2014/main" id="{44275E91-3DA7-3A19-0647-D6747170CC1F}"/>
+              </a:ext>
+            </a:extLst>
+          </p:cNvPr>
+          <p:cNvSpPr/>
+          <p:nvPr/>
+        </p:nvSpPr>
+        <p:spPr>
+          <a:xfrm>
+            <a:off x="8188802" y="3516313"/>
+            <a:ext cx="676514" cy="268361"/>
+          </a:xfrm>
+          <a:prstGeom prst="roundRect">
+            <a:avLst>
+              <a:gd name="adj" fmla="val 15547"/>
+            </a:avLst>
+          </a:prstGeom>
+          <a:solidFill>
+            <a:schemeClr val="bg1">
+              <a:lumMod val="85000"/>
+            </a:schemeClr>
+          </a:solidFill>
+          <a:ln w="12700">
+            <a:headEnd type="none" w="med" len="med"/>
+            <a:tailEnd type="none" w="med" len="med"/>
+          </a:ln>
+        </p:spPr>
+        <p:style>
+          <a:lnRef idx="2">
+            <a:schemeClr val="dk1"/>
+          </a:lnRef>
+          <a:fillRef idx="1">
+            <a:schemeClr val="lt1"/>
+          </a:fillRef>
+          <a:effectRef idx="0">
+            <a:schemeClr val="dk1"/>
+          </a:effectRef>
+          <a:fontRef idx="minor">
+            <a:schemeClr val="dk1"/>
+          </a:fontRef>
+        </p:style>
+        <p:txBody>
+          <a:bodyPr rtlCol="0" anchor="ctr"/>
+          <a:lstStyle/>
+          <a:p>
+            <a:pPr algn="ctr"/>
+            <a:r>
+              <a:rPr lang="de-DE" sz="1000" noProof="1">
+                <a:cs typeface="Arial" panose="020B0604020202020204" pitchFamily="34" charset="0"/>
+              </a:rPr>
+              <a:t>Sublayer</a:t>
+            </a:r>
+          </a:p>
+        </p:txBody>
+      </p:sp>
+      <p:cxnSp>
+        <p:nvCxnSpPr>
+          <p:cNvPr id="73" name="Straight Arrow Connector 72">
+            <a:extLst>
+              <a:ext uri="{FF2B5EF4-FFF2-40B4-BE49-F238E27FC236}">
+                <a16:creationId xmlns:a16="http://schemas.microsoft.com/office/drawing/2014/main" id="{2D41AA52-F79D-2133-DC1F-9E5158C2BB05}"/>
+              </a:ext>
+            </a:extLst>
+          </p:cNvPr>
+          <p:cNvCxnSpPr>
+            <a:cxnSpLocks/>
+            <a:endCxn id="78" idx="2"/>
+          </p:cNvCxnSpPr>
+          <p:nvPr/>
+        </p:nvCxnSpPr>
+        <p:spPr>
+          <a:xfrm flipV="1">
+            <a:off x="9649541" y="3655954"/>
+            <a:ext cx="116245" cy="890"/>
+          </a:xfrm>
+          <a:prstGeom prst="straightConnector1">
+            <a:avLst/>
+          </a:prstGeom>
+          <a:ln w="12700">
+            <a:tailEnd type="triangle"/>
+          </a:ln>
+        </p:spPr>
+        <p:style>
+          <a:lnRef idx="1">
+            <a:schemeClr val="dk1"/>
+          </a:lnRef>
+          <a:fillRef idx="0">
+            <a:schemeClr val="dk1"/>
+          </a:fillRef>
+          <a:effectRef idx="0">
+            <a:schemeClr val="dk1"/>
+          </a:effectRef>
+          <a:fontRef idx="minor">
+            <a:schemeClr val="tx1"/>
+          </a:fontRef>
+        </p:style>
+      </p:cxnSp>
+      <p:cxnSp>
+        <p:nvCxnSpPr>
+          <p:cNvPr id="75" name="Straight Arrow Connector 74">
+            <a:extLst>
+              <a:ext uri="{FF2B5EF4-FFF2-40B4-BE49-F238E27FC236}">
+                <a16:creationId xmlns:a16="http://schemas.microsoft.com/office/drawing/2014/main" id="{04B2AE1A-EEEE-400A-1B15-E72247E381F2}"/>
+              </a:ext>
+            </a:extLst>
+          </p:cNvPr>
+          <p:cNvCxnSpPr>
+            <a:cxnSpLocks/>
+            <a:endCxn id="72" idx="1"/>
+          </p:cNvCxnSpPr>
+          <p:nvPr/>
+        </p:nvCxnSpPr>
+        <p:spPr>
+          <a:xfrm>
+            <a:off x="8059420" y="3650494"/>
+            <a:ext cx="115200" cy="0"/>
+          </a:xfrm>
+          <a:prstGeom prst="straightConnector1">
+            <a:avLst/>
+          </a:prstGeom>
+          <a:ln w="12700">
+            <a:solidFill>
+              <a:schemeClr val="tx1"/>
+            </a:solidFill>
+            <a:tailEnd type="triangle"/>
+          </a:ln>
+        </p:spPr>
+        <p:style>
+          <a:lnRef idx="1">
+            <a:schemeClr val="dk1"/>
+          </a:lnRef>
+          <a:fillRef idx="0">
+            <a:schemeClr val="dk1"/>
+          </a:fillRef>
+          <a:effectRef idx="0">
+            <a:schemeClr val="dk1"/>
+          </a:effectRef>
+          <a:fontRef idx="minor">
+            <a:schemeClr val="tx1"/>
+          </a:fontRef>
+        </p:style>
+      </p:cxnSp>
+      <p:cxnSp>
+        <p:nvCxnSpPr>
+          <p:cNvPr id="76" name="Connector: Elbow 75">
+            <a:extLst>
+              <a:ext uri="{FF2B5EF4-FFF2-40B4-BE49-F238E27FC236}">
+                <a16:creationId xmlns:a16="http://schemas.microsoft.com/office/drawing/2014/main" id="{CA9C9995-6651-39CA-E5EF-37CC662A2BF2}"/>
+              </a:ext>
+            </a:extLst>
+          </p:cNvPr>
+          <p:cNvCxnSpPr>
+            <a:cxnSpLocks/>
+            <a:stCxn id="82" idx="0"/>
+            <a:endCxn id="78" idx="0"/>
+          </p:cNvCxnSpPr>
+          <p:nvPr/>
+        </p:nvCxnSpPr>
+        <p:spPr>
+          <a:xfrm rot="16200000" flipH="1">
+            <a:off x="8868894" y="2667625"/>
+            <a:ext cx="88914" cy="1795812"/>
+          </a:xfrm>
+          <a:prstGeom prst="bentConnector3">
+            <a:avLst>
+              <a:gd name="adj1" fmla="val -257102"/>
+            </a:avLst>
+          </a:prstGeom>
+          <a:ln w="12700">
+            <a:solidFill>
+              <a:schemeClr val="tx1"/>
+            </a:solidFill>
+            <a:tailEnd type="triangle"/>
+          </a:ln>
+        </p:spPr>
+        <p:style>
+          <a:lnRef idx="1">
+            <a:schemeClr val="accent1"/>
+          </a:lnRef>
+          <a:fillRef idx="0">
+            <a:schemeClr val="accent1"/>
+          </a:fillRef>
+          <a:effectRef idx="0">
+            <a:schemeClr val="accent1"/>
+          </a:effectRef>
+          <a:fontRef idx="minor">
+            <a:schemeClr val="tx1"/>
+          </a:fontRef>
+        </p:style>
+      </p:cxnSp>
+      <p:cxnSp>
+        <p:nvCxnSpPr>
+          <p:cNvPr id="77" name="Straight Arrow Connector 76">
+            <a:extLst>
+              <a:ext uri="{FF2B5EF4-FFF2-40B4-BE49-F238E27FC236}">
+                <a16:creationId xmlns:a16="http://schemas.microsoft.com/office/drawing/2014/main" id="{EA7E582D-7470-3F6D-ECEE-5C38A3451FD7}"/>
+              </a:ext>
+            </a:extLst>
+          </p:cNvPr>
+          <p:cNvCxnSpPr>
+            <a:cxnSpLocks/>
+            <a:stCxn id="78" idx="6"/>
+          </p:cNvCxnSpPr>
+          <p:nvPr/>
+        </p:nvCxnSpPr>
+        <p:spPr>
+          <a:xfrm>
+            <a:off x="9856727" y="3655954"/>
+            <a:ext cx="114361" cy="0"/>
+          </a:xfrm>
+          <a:prstGeom prst="straightConnector1">
+            <a:avLst/>
+          </a:prstGeom>
+          <a:ln w="12700">
+            <a:solidFill>
+              <a:schemeClr val="tx1"/>
+            </a:solidFill>
+            <a:tailEnd type="triangle"/>
+          </a:ln>
+        </p:spPr>
+        <p:style>
+          <a:lnRef idx="1">
+            <a:schemeClr val="dk1"/>
+          </a:lnRef>
+          <a:fillRef idx="0">
+            <a:schemeClr val="dk1"/>
+          </a:fillRef>
+          <a:effectRef idx="0">
+            <a:schemeClr val="dk1"/>
+          </a:effectRef>
+          <a:fontRef idx="minor">
+            <a:schemeClr val="tx1"/>
+          </a:fontRef>
+        </p:style>
+      </p:cxnSp>
+      <p:sp>
+        <p:nvSpPr>
+          <p:cNvPr id="78" name="Oval 77">
+            <a:extLst>
+              <a:ext uri="{FF2B5EF4-FFF2-40B4-BE49-F238E27FC236}">
+                <a16:creationId xmlns:a16="http://schemas.microsoft.com/office/drawing/2014/main" id="{D5A7D820-0D39-A0D9-BC5A-37EE959371E7}"/>
+              </a:ext>
+            </a:extLst>
+          </p:cNvPr>
+          <p:cNvSpPr/>
+          <p:nvPr/>
+        </p:nvSpPr>
+        <p:spPr>
+          <a:xfrm>
+            <a:off x="9765786" y="3609988"/>
+            <a:ext cx="90941" cy="91931"/>
+          </a:xfrm>
+          <a:prstGeom prst="ellipse">
+            <a:avLst/>
+          </a:prstGeom>
+          <a:noFill/>
+          <a:ln w="12700">
+            <a:solidFill>
+              <a:schemeClr val="tx1"/>
+            </a:solidFill>
+          </a:ln>
+        </p:spPr>
+        <p:style>
+          <a:lnRef idx="2">
+            <a:schemeClr val="accent1">
+              <a:shade val="50000"/>
+            </a:schemeClr>
+          </a:lnRef>
+          <a:fillRef idx="1">
+            <a:schemeClr val="accent1"/>
+          </a:fillRef>
+          <a:effectRef idx="0">
+            <a:schemeClr val="accent1"/>
+          </a:effectRef>
+          <a:fontRef idx="minor">
+            <a:schemeClr val="lt1"/>
+          </a:fontRef>
+        </p:style>
+        <p:txBody>
+          <a:bodyPr rtlCol="0" anchor="ctr"/>
+          <a:lstStyle/>
+          <a:p>
+            <a:pPr algn="ctr"/>
+            <a:r>
+              <a:rPr lang="de-DE" sz="1100" dirty="0">
+                <a:solidFill>
+                  <a:schemeClr val="tx1"/>
+                </a:solidFill>
+              </a:rPr>
+              <a:t>+</a:t>
+            </a:r>
+            <a:endParaRPr lang="en-GB" sz="1100" dirty="0">
+              <a:solidFill>
+                <a:schemeClr val="tx1"/>
+              </a:solidFill>
+            </a:endParaRPr>
+          </a:p>
+        </p:txBody>
+      </p:sp>
+      <p:sp>
+        <p:nvSpPr>
+          <p:cNvPr id="79" name="TextBox 78">
+            <a:extLst>
+              <a:ext uri="{FF2B5EF4-FFF2-40B4-BE49-F238E27FC236}">
+                <a16:creationId xmlns:a16="http://schemas.microsoft.com/office/drawing/2014/main" id="{D9914F06-18C1-BAB9-3662-78C08C0F5189}"/>
+              </a:ext>
+            </a:extLst>
+          </p:cNvPr>
+          <p:cNvSpPr txBox="1"/>
+          <p:nvPr/>
+        </p:nvSpPr>
+        <p:spPr>
+          <a:xfrm>
+            <a:off x="9980664" y="3531393"/>
+            <a:ext cx="169176" cy="246221"/>
+          </a:xfrm>
+          <a:prstGeom prst="rect">
+            <a:avLst/>
+          </a:prstGeom>
+          <a:noFill/>
+        </p:spPr>
+        <p:txBody>
+          <a:bodyPr wrap="square" lIns="0" rtlCol="0">
+            <a:spAutoFit/>
+          </a:bodyPr>
+          <a:lstStyle/>
+          <a:p>
+            <a:r>
+              <a:rPr lang="de-DE" sz="1000" dirty="0"/>
+              <a:t>b</a:t>
+            </a:r>
+            <a:endParaRPr lang="en-GB" sz="1000" dirty="0"/>
+          </a:p>
+        </p:txBody>
+      </p:sp>
+      <p:cxnSp>
+        <p:nvCxnSpPr>
+          <p:cNvPr id="80" name="Straight Arrow Connector 79">
+            <a:extLst>
+              <a:ext uri="{FF2B5EF4-FFF2-40B4-BE49-F238E27FC236}">
+                <a16:creationId xmlns:a16="http://schemas.microsoft.com/office/drawing/2014/main" id="{6713BC6C-0942-6560-E236-A4DE821B93CA}"/>
+              </a:ext>
+            </a:extLst>
+          </p:cNvPr>
+          <p:cNvCxnSpPr>
+            <a:cxnSpLocks/>
+            <a:stCxn id="72" idx="3"/>
+            <a:endCxn id="71" idx="1"/>
+          </p:cNvCxnSpPr>
+          <p:nvPr/>
+        </p:nvCxnSpPr>
+        <p:spPr>
+          <a:xfrm>
+            <a:off x="8865316" y="3650494"/>
+            <a:ext cx="107968" cy="3536"/>
+          </a:xfrm>
+          <a:prstGeom prst="straightConnector1">
+            <a:avLst/>
+          </a:prstGeom>
+          <a:ln w="12700">
+            <a:tailEnd type="triangle"/>
+          </a:ln>
+        </p:spPr>
+        <p:style>
+          <a:lnRef idx="1">
+            <a:schemeClr val="dk1"/>
+          </a:lnRef>
+          <a:fillRef idx="0">
+            <a:schemeClr val="dk1"/>
+          </a:fillRef>
+          <a:effectRef idx="0">
+            <a:schemeClr val="dk1"/>
+          </a:effectRef>
+          <a:fontRef idx="minor">
+            <a:schemeClr val="tx1"/>
+          </a:fontRef>
+        </p:style>
+      </p:cxnSp>
+      <p:sp>
+        <p:nvSpPr>
+          <p:cNvPr id="81" name="Rectangle 80">
+            <a:extLst>
+              <a:ext uri="{FF2B5EF4-FFF2-40B4-BE49-F238E27FC236}">
+                <a16:creationId xmlns:a16="http://schemas.microsoft.com/office/drawing/2014/main" id="{775418FD-706B-FF60-E5C3-280F02E15E76}"/>
+              </a:ext>
+            </a:extLst>
+          </p:cNvPr>
+          <p:cNvSpPr/>
+          <p:nvPr/>
+        </p:nvSpPr>
+        <p:spPr>
+          <a:xfrm>
+            <a:off x="7787640" y="2895600"/>
+            <a:ext cx="2520000" cy="1440000"/>
+          </a:xfrm>
+          <a:prstGeom prst="rect">
+            <a:avLst/>
+          </a:prstGeom>
+          <a:noFill/>
+        </p:spPr>
+        <p:style>
+          <a:lnRef idx="2">
+            <a:schemeClr val="accent1">
+              <a:shade val="50000"/>
+            </a:schemeClr>
+          </a:lnRef>
+          <a:fillRef idx="1">
+            <a:schemeClr val="accent1"/>
+          </a:fillRef>
+          <a:effectRef idx="0">
+            <a:schemeClr val="accent1"/>
+          </a:effectRef>
+          <a:fontRef idx="minor">
+            <a:schemeClr val="lt1"/>
+          </a:fontRef>
+        </p:style>
+        <p:txBody>
+          <a:bodyPr rtlCol="0" anchor="ctr"/>
+          <a:lstStyle/>
+          <a:p>
+            <a:pPr algn="ctr"/>
+            <a:endParaRPr lang="en-GB"/>
+          </a:p>
+        </p:txBody>
+      </p:sp>
+      <p:sp>
+        <p:nvSpPr>
+          <p:cNvPr id="82" name="TextBox 81">
+            <a:extLst>
+              <a:ext uri="{FF2B5EF4-FFF2-40B4-BE49-F238E27FC236}">
+                <a16:creationId xmlns:a16="http://schemas.microsoft.com/office/drawing/2014/main" id="{0E0F7373-2628-1428-6892-4EEA6645EBA5}"/>
+              </a:ext>
+            </a:extLst>
+          </p:cNvPr>
+          <p:cNvSpPr txBox="1"/>
+          <p:nvPr/>
+        </p:nvSpPr>
+        <p:spPr>
+          <a:xfrm>
+            <a:off x="7973270" y="3521074"/>
+            <a:ext cx="84350" cy="246221"/>
+          </a:xfrm>
+          <a:prstGeom prst="rect">
+            <a:avLst/>
+          </a:prstGeom>
+          <a:noFill/>
+        </p:spPr>
+        <p:txBody>
+          <a:bodyPr wrap="square" lIns="0" rtlCol="0">
+            <a:spAutoFit/>
+          </a:bodyPr>
+          <a:lstStyle/>
+          <a:p>
+            <a:r>
+              <a:rPr lang="de-DE" sz="1000" dirty="0"/>
+              <a:t>b</a:t>
+            </a:r>
+            <a:endParaRPr lang="en-GB" sz="1000" dirty="0"/>
+          </a:p>
+        </p:txBody>
+      </p:sp>
     </p:spTree>
     <p:extLst>
       <p:ext uri="{BB962C8B-B14F-4D97-AF65-F5344CB8AC3E}">

</xml_diff>

<commit_message>
Chapter on pre-training of Transformer🤖 Fixes #266
</commit_message>
<xml_diff>
--- a/reports/Graphs/diagrams.pptx
+++ b/reports/Graphs/diagrams.pptx
@@ -12,8 +12,9 @@
     <p:sldId id="265" r:id="rId6"/>
     <p:sldId id="260" r:id="rId7"/>
     <p:sldId id="261" r:id="rId8"/>
-    <p:sldId id="259" r:id="rId9"/>
-    <p:sldId id="257" r:id="rId10"/>
+    <p:sldId id="266" r:id="rId9"/>
+    <p:sldId id="259" r:id="rId10"/>
+    <p:sldId id="257" r:id="rId11"/>
   </p:sldIdLst>
   <p:sldSz cx="12192000" cy="6858000"/>
   <p:notesSz cx="6858000" cy="9144000"/>
@@ -123,7 +124,7 @@
 <file path=ppt/revisionInfo.xml><?xml version="1.0" encoding="utf-8"?>
 <p1510:revInfo xmlns:a="http://schemas.openxmlformats.org/drawingml/2006/main" xmlns:r="http://schemas.openxmlformats.org/officeDocument/2006/relationships" xmlns:p1510="http://schemas.microsoft.com/office/powerpoint/2015/10/main">
   <p1510:revLst>
-    <p1510:client id="{F9F2BE70-AAED-47FD-A055-7B08EB1371A3}" v="152" dt="2023-02-22T15:47:34.699"/>
+    <p1510:client id="{9CD03640-CC4F-4034-8161-8D1D39C001C5}" v="17" dt="2023-04-24T16:44:44.361"/>
   </p1510:revLst>
 </p1510:revInfo>
 </file>
@@ -7562,6 +7563,862 @@
             <ac:picMk id="5" creationId="{6A20F21E-4163-B9F0-D304-FA503742EB56}"/>
           </ac:picMkLst>
         </pc:picChg>
+      </pc:sldChg>
+    </pc:docChg>
+  </pc:docChgLst>
+  <pc:docChgLst>
+    <pc:chgData name="Markus Bilz" userId="a36021e4bdb9349f" providerId="LiveId" clId="{9CD03640-CC4F-4034-8161-8D1D39C001C5}"/>
+    <pc:docChg chg="undo custSel addSld modSld">
+      <pc:chgData name="Markus Bilz" userId="a36021e4bdb9349f" providerId="LiveId" clId="{9CD03640-CC4F-4034-8161-8D1D39C001C5}" dt="2023-04-24T16:49:10.995" v="231" actId="164"/>
+      <pc:docMkLst>
+        <pc:docMk/>
+      </pc:docMkLst>
+      <pc:sldChg chg="addSp delSp modSp add mod">
+        <pc:chgData name="Markus Bilz" userId="a36021e4bdb9349f" providerId="LiveId" clId="{9CD03640-CC4F-4034-8161-8D1D39C001C5}" dt="2023-04-24T16:49:10.995" v="231" actId="164"/>
+        <pc:sldMkLst>
+          <pc:docMk/>
+          <pc:sldMk cId="864514952" sldId="266"/>
+        </pc:sldMkLst>
+        <pc:spChg chg="mod">
+          <ac:chgData name="Markus Bilz" userId="a36021e4bdb9349f" providerId="LiveId" clId="{9CD03640-CC4F-4034-8161-8D1D39C001C5}" dt="2023-04-24T16:35:19.127" v="32" actId="6549"/>
+          <ac:spMkLst>
+            <pc:docMk/>
+            <pc:sldMk cId="864514952" sldId="266"/>
+            <ac:spMk id="6" creationId="{37E7B1D8-1BF8-FDFE-D966-2445914F8910}"/>
+          </ac:spMkLst>
+        </pc:spChg>
+        <pc:spChg chg="mod">
+          <ac:chgData name="Markus Bilz" userId="a36021e4bdb9349f" providerId="LiveId" clId="{9CD03640-CC4F-4034-8161-8D1D39C001C5}" dt="2023-04-24T16:35:50.142" v="36"/>
+          <ac:spMkLst>
+            <pc:docMk/>
+            <pc:sldMk cId="864514952" sldId="266"/>
+            <ac:spMk id="11" creationId="{1BACB48A-7F1C-006D-BB8D-A2A0E24B7599}"/>
+          </ac:spMkLst>
+        </pc:spChg>
+        <pc:spChg chg="mod">
+          <ac:chgData name="Markus Bilz" userId="a36021e4bdb9349f" providerId="LiveId" clId="{9CD03640-CC4F-4034-8161-8D1D39C001C5}" dt="2023-04-24T16:35:50.142" v="36"/>
+          <ac:spMkLst>
+            <pc:docMk/>
+            <pc:sldMk cId="864514952" sldId="266"/>
+            <ac:spMk id="12" creationId="{A4389547-0C08-585B-17AF-FB591FC56A22}"/>
+          </ac:spMkLst>
+        </pc:spChg>
+        <pc:spChg chg="mod">
+          <ac:chgData name="Markus Bilz" userId="a36021e4bdb9349f" providerId="LiveId" clId="{9CD03640-CC4F-4034-8161-8D1D39C001C5}" dt="2023-04-24T16:35:50.142" v="36"/>
+          <ac:spMkLst>
+            <pc:docMk/>
+            <pc:sldMk cId="864514952" sldId="266"/>
+            <ac:spMk id="13" creationId="{5D3EC5F7-E779-86C7-F78C-81422CDA3285}"/>
+          </ac:spMkLst>
+        </pc:spChg>
+        <pc:spChg chg="mod">
+          <ac:chgData name="Markus Bilz" userId="a36021e4bdb9349f" providerId="LiveId" clId="{9CD03640-CC4F-4034-8161-8D1D39C001C5}" dt="2023-04-24T16:35:50.142" v="36"/>
+          <ac:spMkLst>
+            <pc:docMk/>
+            <pc:sldMk cId="864514952" sldId="266"/>
+            <ac:spMk id="14" creationId="{8EE72784-020E-8EB2-C727-78BBE842826F}"/>
+          </ac:spMkLst>
+        </pc:spChg>
+        <pc:spChg chg="mod">
+          <ac:chgData name="Markus Bilz" userId="a36021e4bdb9349f" providerId="LiveId" clId="{9CD03640-CC4F-4034-8161-8D1D39C001C5}" dt="2023-04-24T16:35:50.142" v="36"/>
+          <ac:spMkLst>
+            <pc:docMk/>
+            <pc:sldMk cId="864514952" sldId="266"/>
+            <ac:spMk id="15" creationId="{BADA3648-FB28-54A8-8A67-7AD5235800E2}"/>
+          </ac:spMkLst>
+        </pc:spChg>
+        <pc:spChg chg="mod">
+          <ac:chgData name="Markus Bilz" userId="a36021e4bdb9349f" providerId="LiveId" clId="{9CD03640-CC4F-4034-8161-8D1D39C001C5}" dt="2023-04-24T16:35:50.142" v="36"/>
+          <ac:spMkLst>
+            <pc:docMk/>
+            <pc:sldMk cId="864514952" sldId="266"/>
+            <ac:spMk id="16" creationId="{F8A43F7D-4F3F-37D1-8E37-3284727C7576}"/>
+          </ac:spMkLst>
+        </pc:spChg>
+        <pc:spChg chg="mod">
+          <ac:chgData name="Markus Bilz" userId="a36021e4bdb9349f" providerId="LiveId" clId="{9CD03640-CC4F-4034-8161-8D1D39C001C5}" dt="2023-04-24T16:35:50.142" v="36"/>
+          <ac:spMkLst>
+            <pc:docMk/>
+            <pc:sldMk cId="864514952" sldId="266"/>
+            <ac:spMk id="17" creationId="{E018FE88-24CC-F7F7-DC73-8753AB8DF629}"/>
+          </ac:spMkLst>
+        </pc:spChg>
+        <pc:spChg chg="add mod">
+          <ac:chgData name="Markus Bilz" userId="a36021e4bdb9349f" providerId="LiveId" clId="{9CD03640-CC4F-4034-8161-8D1D39C001C5}" dt="2023-04-24T16:40:49.210" v="97" actId="1076"/>
+          <ac:spMkLst>
+            <pc:docMk/>
+            <pc:sldMk cId="864514952" sldId="266"/>
+            <ac:spMk id="18" creationId="{5F336B26-8B16-7823-45C3-15CFB7295479}"/>
+          </ac:spMkLst>
+        </pc:spChg>
+        <pc:spChg chg="del mod">
+          <ac:chgData name="Markus Bilz" userId="a36021e4bdb9349f" providerId="LiveId" clId="{9CD03640-CC4F-4034-8161-8D1D39C001C5}" dt="2023-04-24T16:38:34.746" v="78" actId="478"/>
+          <ac:spMkLst>
+            <pc:docMk/>
+            <pc:sldMk cId="864514952" sldId="266"/>
+            <ac:spMk id="19" creationId="{1AE337DA-87E6-6A46-773B-22A52F746B75}"/>
+          </ac:spMkLst>
+        </pc:spChg>
+        <pc:spChg chg="add del mod">
+          <ac:chgData name="Markus Bilz" userId="a36021e4bdb9349f" providerId="LiveId" clId="{9CD03640-CC4F-4034-8161-8D1D39C001C5}" dt="2023-04-24T16:36:41.239" v="53" actId="478"/>
+          <ac:spMkLst>
+            <pc:docMk/>
+            <pc:sldMk cId="864514952" sldId="266"/>
+            <ac:spMk id="21" creationId="{C3CE9287-8D7C-BA55-BEF2-995FF1D66A93}"/>
+          </ac:spMkLst>
+        </pc:spChg>
+        <pc:spChg chg="del">
+          <ac:chgData name="Markus Bilz" userId="a36021e4bdb9349f" providerId="LiveId" clId="{9CD03640-CC4F-4034-8161-8D1D39C001C5}" dt="2023-04-24T16:34:52.128" v="17" actId="478"/>
+          <ac:spMkLst>
+            <pc:docMk/>
+            <pc:sldMk cId="864514952" sldId="266"/>
+            <ac:spMk id="23" creationId="{8F8800C0-1CF3-F5CA-4394-35FFEBF5E5A3}"/>
+          </ac:spMkLst>
+        </pc:spChg>
+        <pc:spChg chg="del">
+          <ac:chgData name="Markus Bilz" userId="a36021e4bdb9349f" providerId="LiveId" clId="{9CD03640-CC4F-4034-8161-8D1D39C001C5}" dt="2023-04-24T16:34:50.289" v="16" actId="478"/>
+          <ac:spMkLst>
+            <pc:docMk/>
+            <pc:sldMk cId="864514952" sldId="266"/>
+            <ac:spMk id="25" creationId="{64F421B8-8DB7-34EA-C921-76E85E24F0A2}"/>
+          </ac:spMkLst>
+        </pc:spChg>
+        <pc:spChg chg="mod">
+          <ac:chgData name="Markus Bilz" userId="a36021e4bdb9349f" providerId="LiveId" clId="{9CD03640-CC4F-4034-8161-8D1D39C001C5}" dt="2023-04-24T16:36:48.993" v="55"/>
+          <ac:spMkLst>
+            <pc:docMk/>
+            <pc:sldMk cId="864514952" sldId="266"/>
+            <ac:spMk id="26" creationId="{D7171B68-D938-403F-DCAC-AFA3295A9E80}"/>
+          </ac:spMkLst>
+        </pc:spChg>
+        <pc:spChg chg="del">
+          <ac:chgData name="Markus Bilz" userId="a36021e4bdb9349f" providerId="LiveId" clId="{9CD03640-CC4F-4034-8161-8D1D39C001C5}" dt="2023-04-24T16:34:50.289" v="16" actId="478"/>
+          <ac:spMkLst>
+            <pc:docMk/>
+            <pc:sldMk cId="864514952" sldId="266"/>
+            <ac:spMk id="27" creationId="{A827FEA6-F17E-CA57-7B37-D1BAA16BED3F}"/>
+          </ac:spMkLst>
+        </pc:spChg>
+        <pc:spChg chg="mod">
+          <ac:chgData name="Markus Bilz" userId="a36021e4bdb9349f" providerId="LiveId" clId="{9CD03640-CC4F-4034-8161-8D1D39C001C5}" dt="2023-04-24T16:36:48.993" v="55"/>
+          <ac:spMkLst>
+            <pc:docMk/>
+            <pc:sldMk cId="864514952" sldId="266"/>
+            <ac:spMk id="30" creationId="{37B18278-3455-ED2A-66DE-AEB3115150F4}"/>
+          </ac:spMkLst>
+        </pc:spChg>
+        <pc:spChg chg="del">
+          <ac:chgData name="Markus Bilz" userId="a36021e4bdb9349f" providerId="LiveId" clId="{9CD03640-CC4F-4034-8161-8D1D39C001C5}" dt="2023-04-24T16:34:50.289" v="16" actId="478"/>
+          <ac:spMkLst>
+            <pc:docMk/>
+            <pc:sldMk cId="864514952" sldId="266"/>
+            <ac:spMk id="31" creationId="{F00536E0-E48A-70AD-633B-4384867F30A5}"/>
+          </ac:spMkLst>
+        </pc:spChg>
+        <pc:spChg chg="add mod">
+          <ac:chgData name="Markus Bilz" userId="a36021e4bdb9349f" providerId="LiveId" clId="{9CD03640-CC4F-4034-8161-8D1D39C001C5}" dt="2023-04-24T16:47:15.949" v="216" actId="1076"/>
+          <ac:spMkLst>
+            <pc:docMk/>
+            <pc:sldMk cId="864514952" sldId="266"/>
+            <ac:spMk id="32" creationId="{217921D7-1AFF-38E6-8C8D-79EE8D6165D2}"/>
+          </ac:spMkLst>
+        </pc:spChg>
+        <pc:spChg chg="add mod">
+          <ac:chgData name="Markus Bilz" userId="a36021e4bdb9349f" providerId="LiveId" clId="{9CD03640-CC4F-4034-8161-8D1D39C001C5}" dt="2023-04-24T16:48:06.031" v="224" actId="1076"/>
+          <ac:spMkLst>
+            <pc:docMk/>
+            <pc:sldMk cId="864514952" sldId="266"/>
+            <ac:spMk id="35" creationId="{15BAAEA6-2D12-98BE-1FFC-5E23C675AFBB}"/>
+          </ac:spMkLst>
+        </pc:spChg>
+        <pc:spChg chg="add mod">
+          <ac:chgData name="Markus Bilz" userId="a36021e4bdb9349f" providerId="LiveId" clId="{9CD03640-CC4F-4034-8161-8D1D39C001C5}" dt="2023-04-24T16:43:31.579" v="138" actId="1076"/>
+          <ac:spMkLst>
+            <pc:docMk/>
+            <pc:sldMk cId="864514952" sldId="266"/>
+            <ac:spMk id="40" creationId="{3A84FAC7-3BE5-1415-4075-2FBDAFBE7ED7}"/>
+          </ac:spMkLst>
+        </pc:spChg>
+        <pc:spChg chg="add mod">
+          <ac:chgData name="Markus Bilz" userId="a36021e4bdb9349f" providerId="LiveId" clId="{9CD03640-CC4F-4034-8161-8D1D39C001C5}" dt="2023-04-24T16:46:28.273" v="206" actId="1076"/>
+          <ac:spMkLst>
+            <pc:docMk/>
+            <pc:sldMk cId="864514952" sldId="266"/>
+            <ac:spMk id="41" creationId="{20B23E45-B90D-6C15-5C4D-1B38E646C22C}"/>
+          </ac:spMkLst>
+        </pc:spChg>
+        <pc:spChg chg="add mod">
+          <ac:chgData name="Markus Bilz" userId="a36021e4bdb9349f" providerId="LiveId" clId="{9CD03640-CC4F-4034-8161-8D1D39C001C5}" dt="2023-04-24T16:47:10.504" v="215" actId="1076"/>
+          <ac:spMkLst>
+            <pc:docMk/>
+            <pc:sldMk cId="864514952" sldId="266"/>
+            <ac:spMk id="42" creationId="{246FF801-2417-05B1-6D85-DD9531C2FCDF}"/>
+          </ac:spMkLst>
+        </pc:spChg>
+        <pc:spChg chg="add mod">
+          <ac:chgData name="Markus Bilz" userId="a36021e4bdb9349f" providerId="LiveId" clId="{9CD03640-CC4F-4034-8161-8D1D39C001C5}" dt="2023-04-24T16:48:02.173" v="223" actId="1076"/>
+          <ac:spMkLst>
+            <pc:docMk/>
+            <pc:sldMk cId="864514952" sldId="266"/>
+            <ac:spMk id="45" creationId="{F3382335-27A4-EB43-E521-12EF9A23F641}"/>
+          </ac:spMkLst>
+        </pc:spChg>
+        <pc:spChg chg="add mod">
+          <ac:chgData name="Markus Bilz" userId="a36021e4bdb9349f" providerId="LiveId" clId="{9CD03640-CC4F-4034-8161-8D1D39C001C5}" dt="2023-04-24T16:44:59.842" v="168" actId="20577"/>
+          <ac:spMkLst>
+            <pc:docMk/>
+            <pc:sldMk cId="864514952" sldId="266"/>
+            <ac:spMk id="49" creationId="{0080246C-F957-B959-D84D-4F7A128562C3}"/>
+          </ac:spMkLst>
+        </pc:spChg>
+        <pc:spChg chg="add mod">
+          <ac:chgData name="Markus Bilz" userId="a36021e4bdb9349f" providerId="LiveId" clId="{9CD03640-CC4F-4034-8161-8D1D39C001C5}" dt="2023-04-24T16:47:41.825" v="220" actId="1076"/>
+          <ac:spMkLst>
+            <pc:docMk/>
+            <pc:sldMk cId="864514952" sldId="266"/>
+            <ac:spMk id="50" creationId="{B2DA9DBA-8EB0-DDFE-DF90-5538590BE241}"/>
+          </ac:spMkLst>
+        </pc:spChg>
+        <pc:spChg chg="add mod">
+          <ac:chgData name="Markus Bilz" userId="a36021e4bdb9349f" providerId="LiveId" clId="{9CD03640-CC4F-4034-8161-8D1D39C001C5}" dt="2023-04-24T16:47:04.312" v="213" actId="1076"/>
+          <ac:spMkLst>
+            <pc:docMk/>
+            <pc:sldMk cId="864514952" sldId="266"/>
+            <ac:spMk id="51" creationId="{C4957AE8-EA45-4D8A-A482-AD8DDE339906}"/>
+          </ac:spMkLst>
+        </pc:spChg>
+        <pc:spChg chg="add mod">
+          <ac:chgData name="Markus Bilz" userId="a36021e4bdb9349f" providerId="LiveId" clId="{9CD03640-CC4F-4034-8161-8D1D39C001C5}" dt="2023-04-24T16:47:56.400" v="222" actId="1076"/>
+          <ac:spMkLst>
+            <pc:docMk/>
+            <pc:sldMk cId="864514952" sldId="266"/>
+            <ac:spMk id="54" creationId="{43144A8C-89D5-D08F-66F3-FE9E5AF52C63}"/>
+          </ac:spMkLst>
+        </pc:spChg>
+        <pc:spChg chg="add mod">
+          <ac:chgData name="Markus Bilz" userId="a36021e4bdb9349f" providerId="LiveId" clId="{9CD03640-CC4F-4034-8161-8D1D39C001C5}" dt="2023-04-24T16:44:39.067" v="158" actId="1076"/>
+          <ac:spMkLst>
+            <pc:docMk/>
+            <pc:sldMk cId="864514952" sldId="266"/>
+            <ac:spMk id="58" creationId="{663E79CF-E40D-9D92-E7AB-9FFBCC78273E}"/>
+          </ac:spMkLst>
+        </pc:spChg>
+        <pc:spChg chg="add mod">
+          <ac:chgData name="Markus Bilz" userId="a36021e4bdb9349f" providerId="LiveId" clId="{9CD03640-CC4F-4034-8161-8D1D39C001C5}" dt="2023-04-24T16:47:49.366" v="221" actId="1076"/>
+          <ac:spMkLst>
+            <pc:docMk/>
+            <pc:sldMk cId="864514952" sldId="266"/>
+            <ac:spMk id="59" creationId="{900411C4-4D95-CD7E-8897-769308952745}"/>
+          </ac:spMkLst>
+        </pc:spChg>
+        <pc:spChg chg="add mod">
+          <ac:chgData name="Markus Bilz" userId="a36021e4bdb9349f" providerId="LiveId" clId="{9CD03640-CC4F-4034-8161-8D1D39C001C5}" dt="2023-04-24T16:47:07.847" v="214" actId="1076"/>
+          <ac:spMkLst>
+            <pc:docMk/>
+            <pc:sldMk cId="864514952" sldId="266"/>
+            <ac:spMk id="60" creationId="{5550293D-6B34-E2B8-4868-3188E8355117}"/>
+          </ac:spMkLst>
+        </pc:spChg>
+        <pc:spChg chg="del">
+          <ac:chgData name="Markus Bilz" userId="a36021e4bdb9349f" providerId="LiveId" clId="{9CD03640-CC4F-4034-8161-8D1D39C001C5}" dt="2023-04-24T16:34:36.049" v="9" actId="478"/>
+          <ac:spMkLst>
+            <pc:docMk/>
+            <pc:sldMk cId="864514952" sldId="266"/>
+            <ac:spMk id="61" creationId="{C00FF0EF-2F9D-F942-4F6E-0006C5307219}"/>
+          </ac:spMkLst>
+        </pc:spChg>
+        <pc:spChg chg="mod">
+          <ac:chgData name="Markus Bilz" userId="a36021e4bdb9349f" providerId="LiveId" clId="{9CD03640-CC4F-4034-8161-8D1D39C001C5}" dt="2023-04-24T16:39:00.884" v="85" actId="1076"/>
+          <ac:spMkLst>
+            <pc:docMk/>
+            <pc:sldMk cId="864514952" sldId="266"/>
+            <ac:spMk id="62" creationId="{C0641B72-A83F-2F0C-92F9-BC5B309B52B7}"/>
+          </ac:spMkLst>
+        </pc:spChg>
+        <pc:spChg chg="mod">
+          <ac:chgData name="Markus Bilz" userId="a36021e4bdb9349f" providerId="LiveId" clId="{9CD03640-CC4F-4034-8161-8D1D39C001C5}" dt="2023-04-24T16:38:56.882" v="84" actId="1076"/>
+          <ac:spMkLst>
+            <pc:docMk/>
+            <pc:sldMk cId="864514952" sldId="266"/>
+            <ac:spMk id="63" creationId="{2E94D5CD-A3D0-17C2-6DA2-6C898CDD5E11}"/>
+          </ac:spMkLst>
+        </pc:spChg>
+        <pc:spChg chg="mod">
+          <ac:chgData name="Markus Bilz" userId="a36021e4bdb9349f" providerId="LiveId" clId="{9CD03640-CC4F-4034-8161-8D1D39C001C5}" dt="2023-04-24T16:38:55.263" v="83" actId="1076"/>
+          <ac:spMkLst>
+            <pc:docMk/>
+            <pc:sldMk cId="864514952" sldId="266"/>
+            <ac:spMk id="66" creationId="{7343FA96-205F-7DD7-A660-9E1AE7A16CDD}"/>
+          </ac:spMkLst>
+        </pc:spChg>
+        <pc:spChg chg="mod">
+          <ac:chgData name="Markus Bilz" userId="a36021e4bdb9349f" providerId="LiveId" clId="{9CD03640-CC4F-4034-8161-8D1D39C001C5}" dt="2023-04-24T16:34:59.443" v="19" actId="6549"/>
+          <ac:spMkLst>
+            <pc:docMk/>
+            <pc:sldMk cId="864514952" sldId="266"/>
+            <ac:spMk id="67" creationId="{542CA32F-221D-DD49-7091-4AFC3E421628}"/>
+          </ac:spMkLst>
+        </pc:spChg>
+        <pc:spChg chg="mod">
+          <ac:chgData name="Markus Bilz" userId="a36021e4bdb9349f" providerId="LiveId" clId="{9CD03640-CC4F-4034-8161-8D1D39C001C5}" dt="2023-04-24T16:36:48.993" v="55"/>
+          <ac:spMkLst>
+            <pc:docMk/>
+            <pc:sldMk cId="864514952" sldId="266"/>
+            <ac:spMk id="224" creationId="{9E0B1385-D3EF-5E83-EEF8-07612AFC7DCC}"/>
+          </ac:spMkLst>
+        </pc:spChg>
+        <pc:spChg chg="mod">
+          <ac:chgData name="Markus Bilz" userId="a36021e4bdb9349f" providerId="LiveId" clId="{9CD03640-CC4F-4034-8161-8D1D39C001C5}" dt="2023-04-24T16:36:48.993" v="55"/>
+          <ac:spMkLst>
+            <pc:docMk/>
+            <pc:sldMk cId="864514952" sldId="266"/>
+            <ac:spMk id="225" creationId="{4BE8AF46-F70D-174E-AF6B-50FCDDC9F714}"/>
+          </ac:spMkLst>
+        </pc:spChg>
+        <pc:spChg chg="mod">
+          <ac:chgData name="Markus Bilz" userId="a36021e4bdb9349f" providerId="LiveId" clId="{9CD03640-CC4F-4034-8161-8D1D39C001C5}" dt="2023-04-24T16:36:48.993" v="55"/>
+          <ac:spMkLst>
+            <pc:docMk/>
+            <pc:sldMk cId="864514952" sldId="266"/>
+            <ac:spMk id="226" creationId="{E9BDAF28-B1EA-2A42-5858-9CCEAFF5E059}"/>
+          </ac:spMkLst>
+        </pc:spChg>
+        <pc:spChg chg="mod">
+          <ac:chgData name="Markus Bilz" userId="a36021e4bdb9349f" providerId="LiveId" clId="{9CD03640-CC4F-4034-8161-8D1D39C001C5}" dt="2023-04-24T16:36:48.993" v="55"/>
+          <ac:spMkLst>
+            <pc:docMk/>
+            <pc:sldMk cId="864514952" sldId="266"/>
+            <ac:spMk id="227" creationId="{52375B26-A9E4-1549-11F9-01CF1245BE80}"/>
+          </ac:spMkLst>
+        </pc:spChg>
+        <pc:spChg chg="mod">
+          <ac:chgData name="Markus Bilz" userId="a36021e4bdb9349f" providerId="LiveId" clId="{9CD03640-CC4F-4034-8161-8D1D39C001C5}" dt="2023-04-24T16:36:48.993" v="55"/>
+          <ac:spMkLst>
+            <pc:docMk/>
+            <pc:sldMk cId="864514952" sldId="266"/>
+            <ac:spMk id="228" creationId="{063678CE-611E-6F57-BE0F-1C190A7ECD1F}"/>
+          </ac:spMkLst>
+        </pc:spChg>
+        <pc:spChg chg="add mod">
+          <ac:chgData name="Markus Bilz" userId="a36021e4bdb9349f" providerId="LiveId" clId="{9CD03640-CC4F-4034-8161-8D1D39C001C5}" dt="2023-04-24T16:40:25.033" v="96" actId="1076"/>
+          <ac:spMkLst>
+            <pc:docMk/>
+            <pc:sldMk cId="864514952" sldId="266"/>
+            <ac:spMk id="229" creationId="{40CB5ADD-0540-E6D3-5F0C-712C49407505}"/>
+          </ac:spMkLst>
+        </pc:spChg>
+        <pc:spChg chg="add mod">
+          <ac:chgData name="Markus Bilz" userId="a36021e4bdb9349f" providerId="LiveId" clId="{9CD03640-CC4F-4034-8161-8D1D39C001C5}" dt="2023-04-24T16:47:34.137" v="219" actId="1076"/>
+          <ac:spMkLst>
+            <pc:docMk/>
+            <pc:sldMk cId="864514952" sldId="266"/>
+            <ac:spMk id="230" creationId="{BDF876BA-D339-4B53-D461-93A77EEE3D86}"/>
+          </ac:spMkLst>
+        </pc:spChg>
+        <pc:spChg chg="add mod">
+          <ac:chgData name="Markus Bilz" userId="a36021e4bdb9349f" providerId="LiveId" clId="{9CD03640-CC4F-4034-8161-8D1D39C001C5}" dt="2023-04-24T16:47:19.666" v="217" actId="1076"/>
+          <ac:spMkLst>
+            <pc:docMk/>
+            <pc:sldMk cId="864514952" sldId="266"/>
+            <ac:spMk id="231" creationId="{FBEA45D8-D738-696D-BD58-566FF923A38A}"/>
+          </ac:spMkLst>
+        </pc:spChg>
+        <pc:spChg chg="del">
+          <ac:chgData name="Markus Bilz" userId="a36021e4bdb9349f" providerId="LiveId" clId="{9CD03640-CC4F-4034-8161-8D1D39C001C5}" dt="2023-04-24T16:34:56.601" v="18" actId="478"/>
+          <ac:spMkLst>
+            <pc:docMk/>
+            <pc:sldMk cId="864514952" sldId="266"/>
+            <ac:spMk id="233" creationId="{22826292-593A-4357-FEEB-B7D5B39875EF}"/>
+          </ac:spMkLst>
+        </pc:spChg>
+        <pc:spChg chg="mod">
+          <ac:chgData name="Markus Bilz" userId="a36021e4bdb9349f" providerId="LiveId" clId="{9CD03640-CC4F-4034-8161-8D1D39C001C5}" dt="2023-04-24T16:40:07.186" v="93"/>
+          <ac:spMkLst>
+            <pc:docMk/>
+            <pc:sldMk cId="864514952" sldId="266"/>
+            <ac:spMk id="239" creationId="{731CB360-1528-E1CB-9AA3-A43C56DD8090}"/>
+          </ac:spMkLst>
+        </pc:spChg>
+        <pc:spChg chg="mod">
+          <ac:chgData name="Markus Bilz" userId="a36021e4bdb9349f" providerId="LiveId" clId="{9CD03640-CC4F-4034-8161-8D1D39C001C5}" dt="2023-04-24T16:40:07.186" v="93"/>
+          <ac:spMkLst>
+            <pc:docMk/>
+            <pc:sldMk cId="864514952" sldId="266"/>
+            <ac:spMk id="240" creationId="{58EA490F-2ADC-437C-2E12-82586401378D}"/>
+          </ac:spMkLst>
+        </pc:spChg>
+        <pc:spChg chg="mod">
+          <ac:chgData name="Markus Bilz" userId="a36021e4bdb9349f" providerId="LiveId" clId="{9CD03640-CC4F-4034-8161-8D1D39C001C5}" dt="2023-04-24T16:40:07.186" v="93"/>
+          <ac:spMkLst>
+            <pc:docMk/>
+            <pc:sldMk cId="864514952" sldId="266"/>
+            <ac:spMk id="243" creationId="{96A5131F-4926-742B-2CDA-3FDAF0530C35}"/>
+          </ac:spMkLst>
+        </pc:spChg>
+        <pc:spChg chg="mod">
+          <ac:chgData name="Markus Bilz" userId="a36021e4bdb9349f" providerId="LiveId" clId="{9CD03640-CC4F-4034-8161-8D1D39C001C5}" dt="2023-04-24T16:40:07.186" v="93"/>
+          <ac:spMkLst>
+            <pc:docMk/>
+            <pc:sldMk cId="864514952" sldId="266"/>
+            <ac:spMk id="244" creationId="{B00CBD93-4C47-43AA-5B94-FA07E509EAFC}"/>
+          </ac:spMkLst>
+        </pc:spChg>
+        <pc:spChg chg="mod">
+          <ac:chgData name="Markus Bilz" userId="a36021e4bdb9349f" providerId="LiveId" clId="{9CD03640-CC4F-4034-8161-8D1D39C001C5}" dt="2023-04-24T16:40:07.186" v="93"/>
+          <ac:spMkLst>
+            <pc:docMk/>
+            <pc:sldMk cId="864514952" sldId="266"/>
+            <ac:spMk id="245" creationId="{6C7C1B0E-C140-27FB-F2F0-F396C070CD3D}"/>
+          </ac:spMkLst>
+        </pc:spChg>
+        <pc:spChg chg="mod">
+          <ac:chgData name="Markus Bilz" userId="a36021e4bdb9349f" providerId="LiveId" clId="{9CD03640-CC4F-4034-8161-8D1D39C001C5}" dt="2023-04-24T16:40:07.186" v="93"/>
+          <ac:spMkLst>
+            <pc:docMk/>
+            <pc:sldMk cId="864514952" sldId="266"/>
+            <ac:spMk id="246" creationId="{7EBA5B1C-50E5-C80F-7362-E81AFFAB887D}"/>
+          </ac:spMkLst>
+        </pc:spChg>
+        <pc:spChg chg="add mod">
+          <ac:chgData name="Markus Bilz" userId="a36021e4bdb9349f" providerId="LiveId" clId="{9CD03640-CC4F-4034-8161-8D1D39C001C5}" dt="2023-04-24T16:48:13.648" v="225" actId="1076"/>
+          <ac:spMkLst>
+            <pc:docMk/>
+            <pc:sldMk cId="864514952" sldId="266"/>
+            <ac:spMk id="248" creationId="{6AF29941-846E-C683-4567-93F5FD136B64}"/>
+          </ac:spMkLst>
+        </pc:spChg>
+        <pc:spChg chg="add mod">
+          <ac:chgData name="Markus Bilz" userId="a36021e4bdb9349f" providerId="LiveId" clId="{9CD03640-CC4F-4034-8161-8D1D39C001C5}" dt="2023-04-24T16:42:48.170" v="136" actId="20577"/>
+          <ac:spMkLst>
+            <pc:docMk/>
+            <pc:sldMk cId="864514952" sldId="266"/>
+            <ac:spMk id="253" creationId="{EC5DEF8F-3AC9-983D-49B4-7733921FBA6E}"/>
+          </ac:spMkLst>
+        </pc:spChg>
+        <pc:spChg chg="add mod">
+          <ac:chgData name="Markus Bilz" userId="a36021e4bdb9349f" providerId="LiveId" clId="{9CD03640-CC4F-4034-8161-8D1D39C001C5}" dt="2023-04-24T16:47:25.989" v="218" actId="1076"/>
+          <ac:spMkLst>
+            <pc:docMk/>
+            <pc:sldMk cId="864514952" sldId="266"/>
+            <ac:spMk id="254" creationId="{2712C93F-92CB-FE3F-85BB-A70AFD230B66}"/>
+          </ac:spMkLst>
+        </pc:spChg>
+        <pc:spChg chg="add mod">
+          <ac:chgData name="Markus Bilz" userId="a36021e4bdb9349f" providerId="LiveId" clId="{9CD03640-CC4F-4034-8161-8D1D39C001C5}" dt="2023-04-24T16:45:07.258" v="173" actId="1076"/>
+          <ac:spMkLst>
+            <pc:docMk/>
+            <pc:sldMk cId="864514952" sldId="266"/>
+            <ac:spMk id="258" creationId="{78768205-86A3-D9D5-18D5-FC3A2BCD02AF}"/>
+          </ac:spMkLst>
+        </pc:spChg>
+        <pc:spChg chg="add mod">
+          <ac:chgData name="Markus Bilz" userId="a36021e4bdb9349f" providerId="LiveId" clId="{9CD03640-CC4F-4034-8161-8D1D39C001C5}" dt="2023-04-24T16:44:51.637" v="160" actId="1076"/>
+          <ac:spMkLst>
+            <pc:docMk/>
+            <pc:sldMk cId="864514952" sldId="266"/>
+            <ac:spMk id="262" creationId="{3E9E8AF5-B556-DE0D-CF25-0ED8151A4F4D}"/>
+          </ac:spMkLst>
+        </pc:spChg>
+        <pc:spChg chg="del">
+          <ac:chgData name="Markus Bilz" userId="a36021e4bdb9349f" providerId="LiveId" clId="{9CD03640-CC4F-4034-8161-8D1D39C001C5}" dt="2023-04-24T16:34:31.443" v="6" actId="478"/>
+          <ac:spMkLst>
+            <pc:docMk/>
+            <pc:sldMk cId="864514952" sldId="266"/>
+            <ac:spMk id="266" creationId="{581F8540-556F-156B-61E8-585BC8A175EB}"/>
+          </ac:spMkLst>
+        </pc:spChg>
+        <pc:spChg chg="del">
+          <ac:chgData name="Markus Bilz" userId="a36021e4bdb9349f" providerId="LiveId" clId="{9CD03640-CC4F-4034-8161-8D1D39C001C5}" dt="2023-04-24T16:35:12.568" v="26" actId="478"/>
+          <ac:spMkLst>
+            <pc:docMk/>
+            <pc:sldMk cId="864514952" sldId="266"/>
+            <ac:spMk id="267" creationId="{457B388C-7929-72CD-0559-53E0AA934C74}"/>
+          </ac:spMkLst>
+        </pc:spChg>
+        <pc:spChg chg="del">
+          <ac:chgData name="Markus Bilz" userId="a36021e4bdb9349f" providerId="LiveId" clId="{9CD03640-CC4F-4034-8161-8D1D39C001C5}" dt="2023-04-24T16:35:15.027" v="29" actId="478"/>
+          <ac:spMkLst>
+            <pc:docMk/>
+            <pc:sldMk cId="864514952" sldId="266"/>
+            <ac:spMk id="268" creationId="{BB1549EF-6367-5F54-69BE-C8B0CC0F2CF9}"/>
+          </ac:spMkLst>
+        </pc:spChg>
+        <pc:grpChg chg="add mod">
+          <ac:chgData name="Markus Bilz" userId="a36021e4bdb9349f" providerId="LiveId" clId="{9CD03640-CC4F-4034-8161-8D1D39C001C5}" dt="2023-04-24T16:40:17.837" v="95" actId="1076"/>
+          <ac:grpSpMkLst>
+            <pc:docMk/>
+            <pc:sldMk cId="864514952" sldId="266"/>
+            <ac:grpSpMk id="9" creationId="{C32E5919-6D95-84C0-C2B4-588BD8F1D087}"/>
+          </ac:grpSpMkLst>
+        </pc:grpChg>
+        <pc:grpChg chg="add del mod">
+          <ac:chgData name="Markus Bilz" userId="a36021e4bdb9349f" providerId="LiveId" clId="{9CD03640-CC4F-4034-8161-8D1D39C001C5}" dt="2023-04-24T16:36:42.682" v="54" actId="478"/>
+          <ac:grpSpMkLst>
+            <pc:docMk/>
+            <pc:sldMk cId="864514952" sldId="266"/>
+            <ac:grpSpMk id="10" creationId="{C5365B73-39EC-87C2-6566-6B6C00579EB1}"/>
+          </ac:grpSpMkLst>
+        </pc:grpChg>
+        <pc:grpChg chg="add del mod">
+          <ac:chgData name="Markus Bilz" userId="a36021e4bdb9349f" providerId="LiveId" clId="{9CD03640-CC4F-4034-8161-8D1D39C001C5}" dt="2023-04-24T16:38:39.763" v="80" actId="478"/>
+          <ac:grpSpMkLst>
+            <pc:docMk/>
+            <pc:sldMk cId="864514952" sldId="266"/>
+            <ac:grpSpMk id="24" creationId="{504C6AB5-4530-96BD-BE08-EAFCD2ED02D1}"/>
+          </ac:grpSpMkLst>
+        </pc:grpChg>
+        <pc:grpChg chg="add mod">
+          <ac:chgData name="Markus Bilz" userId="a36021e4bdb9349f" providerId="LiveId" clId="{9CD03640-CC4F-4034-8161-8D1D39C001C5}" dt="2023-04-24T16:40:15.722" v="94" actId="1076"/>
+          <ac:grpSpMkLst>
+            <pc:docMk/>
+            <pc:sldMk cId="864514952" sldId="266"/>
+            <ac:grpSpMk id="238" creationId="{F480E401-07C9-A65C-382E-9DDFFDDCDE46}"/>
+          </ac:grpSpMkLst>
+        </pc:grpChg>
+        <pc:grpChg chg="add">
+          <ac:chgData name="Markus Bilz" userId="a36021e4bdb9349f" providerId="LiveId" clId="{9CD03640-CC4F-4034-8161-8D1D39C001C5}" dt="2023-04-24T16:49:10.995" v="231" actId="164"/>
+          <ac:grpSpMkLst>
+            <pc:docMk/>
+            <pc:sldMk cId="864514952" sldId="266"/>
+            <ac:grpSpMk id="263" creationId="{B91516EA-A878-C95E-E73C-E46A9230D80F}"/>
+          </ac:grpSpMkLst>
+        </pc:grpChg>
+        <pc:picChg chg="del">
+          <ac:chgData name="Markus Bilz" userId="a36021e4bdb9349f" providerId="LiveId" clId="{9CD03640-CC4F-4034-8161-8D1D39C001C5}" dt="2023-04-24T16:34:13.526" v="1" actId="478"/>
+          <ac:picMkLst>
+            <pc:docMk/>
+            <pc:sldMk cId="864514952" sldId="266"/>
+            <ac:picMk id="5" creationId="{7295174F-DD3B-430A-4AAD-CB8716281370}"/>
+          </ac:picMkLst>
+        </pc:picChg>
+        <pc:picChg chg="add del mod">
+          <ac:chgData name="Markus Bilz" userId="a36021e4bdb9349f" providerId="LiveId" clId="{9CD03640-CC4F-4034-8161-8D1D39C001C5}" dt="2023-04-24T16:48:55.328" v="230" actId="478"/>
+          <ac:picMkLst>
+            <pc:docMk/>
+            <pc:sldMk cId="864514952" sldId="266"/>
+            <ac:picMk id="8" creationId="{04B01B87-F2CB-71DC-E1C7-30AD3383FA85}"/>
+          </ac:picMkLst>
+        </pc:picChg>
+        <pc:cxnChg chg="del mod">
+          <ac:chgData name="Markus Bilz" userId="a36021e4bdb9349f" providerId="LiveId" clId="{9CD03640-CC4F-4034-8161-8D1D39C001C5}" dt="2023-04-24T16:34:42.558" v="15" actId="478"/>
+          <ac:cxnSpMkLst>
+            <pc:docMk/>
+            <pc:sldMk cId="864514952" sldId="266"/>
+            <ac:cxnSpMk id="3" creationId="{1B21BEEA-0718-A8BF-CA7A-FD95D29662F1}"/>
+          </ac:cxnSpMkLst>
+        </pc:cxnChg>
+        <pc:cxnChg chg="del mod">
+          <ac:chgData name="Markus Bilz" userId="a36021e4bdb9349f" providerId="LiveId" clId="{9CD03640-CC4F-4034-8161-8D1D39C001C5}" dt="2023-04-24T16:34:50.289" v="16" actId="478"/>
+          <ac:cxnSpMkLst>
+            <pc:docMk/>
+            <pc:sldMk cId="864514952" sldId="266"/>
+            <ac:cxnSpMk id="28" creationId="{8A6ED71D-102A-0459-C60D-99BC3B322234}"/>
+          </ac:cxnSpMkLst>
+        </pc:cxnChg>
+        <pc:cxnChg chg="del">
+          <ac:chgData name="Markus Bilz" userId="a36021e4bdb9349f" providerId="LiveId" clId="{9CD03640-CC4F-4034-8161-8D1D39C001C5}" dt="2023-04-24T16:34:50.289" v="16" actId="478"/>
+          <ac:cxnSpMkLst>
+            <pc:docMk/>
+            <pc:sldMk cId="864514952" sldId="266"/>
+            <ac:cxnSpMk id="29" creationId="{ADCE3843-0FDE-285C-7733-2A6A7A7A0AC7}"/>
+          </ac:cxnSpMkLst>
+        </pc:cxnChg>
+        <pc:cxnChg chg="add mod">
+          <ac:chgData name="Markus Bilz" userId="a36021e4bdb9349f" providerId="LiveId" clId="{9CD03640-CC4F-4034-8161-8D1D39C001C5}" dt="2023-04-24T16:43:31.579" v="138" actId="1076"/>
+          <ac:cxnSpMkLst>
+            <pc:docMk/>
+            <pc:sldMk cId="864514952" sldId="266"/>
+            <ac:cxnSpMk id="33" creationId="{5DD08E79-440E-6EFD-DEB6-FFF662C82D80}"/>
+          </ac:cxnSpMkLst>
+        </pc:cxnChg>
+        <pc:cxnChg chg="add mod">
+          <ac:chgData name="Markus Bilz" userId="a36021e4bdb9349f" providerId="LiveId" clId="{9CD03640-CC4F-4034-8161-8D1D39C001C5}" dt="2023-04-24T16:43:31.579" v="138" actId="1076"/>
+          <ac:cxnSpMkLst>
+            <pc:docMk/>
+            <pc:sldMk cId="864514952" sldId="266"/>
+            <ac:cxnSpMk id="34" creationId="{67DF4F7C-E0D4-F9FD-2D44-3DE3E954C809}"/>
+          </ac:cxnSpMkLst>
+        </pc:cxnChg>
+        <pc:cxnChg chg="add del mod">
+          <ac:chgData name="Markus Bilz" userId="a36021e4bdb9349f" providerId="LiveId" clId="{9CD03640-CC4F-4034-8161-8D1D39C001C5}" dt="2023-04-24T16:48:25.183" v="228" actId="478"/>
+          <ac:cxnSpMkLst>
+            <pc:docMk/>
+            <pc:sldMk cId="864514952" sldId="266"/>
+            <ac:cxnSpMk id="36" creationId="{AF4337F6-B356-36E6-2783-A1725AEFFC4D}"/>
+          </ac:cxnSpMkLst>
+        </pc:cxnChg>
+        <pc:cxnChg chg="add mod">
+          <ac:chgData name="Markus Bilz" userId="a36021e4bdb9349f" providerId="LiveId" clId="{9CD03640-CC4F-4034-8161-8D1D39C001C5}" dt="2023-04-24T16:43:31.579" v="138" actId="1076"/>
+          <ac:cxnSpMkLst>
+            <pc:docMk/>
+            <pc:sldMk cId="864514952" sldId="266"/>
+            <ac:cxnSpMk id="37" creationId="{3CA0507A-2302-3D0E-E9A0-34003CF1E055}"/>
+          </ac:cxnSpMkLst>
+        </pc:cxnChg>
+        <pc:cxnChg chg="add mod">
+          <ac:chgData name="Markus Bilz" userId="a36021e4bdb9349f" providerId="LiveId" clId="{9CD03640-CC4F-4034-8161-8D1D39C001C5}" dt="2023-04-24T16:43:31.579" v="138" actId="1076"/>
+          <ac:cxnSpMkLst>
+            <pc:docMk/>
+            <pc:sldMk cId="864514952" sldId="266"/>
+            <ac:cxnSpMk id="38" creationId="{9BEF3E0A-EFD8-08ED-621D-59B34C13E983}"/>
+          </ac:cxnSpMkLst>
+        </pc:cxnChg>
+        <pc:cxnChg chg="del mod">
+          <ac:chgData name="Markus Bilz" userId="a36021e4bdb9349f" providerId="LiveId" clId="{9CD03640-CC4F-4034-8161-8D1D39C001C5}" dt="2023-04-24T16:34:32.594" v="7" actId="478"/>
+          <ac:cxnSpMkLst>
+            <pc:docMk/>
+            <pc:sldMk cId="864514952" sldId="266"/>
+            <ac:cxnSpMk id="39" creationId="{F9F26774-D4F9-74AB-B575-2F6F78375116}"/>
+          </ac:cxnSpMkLst>
+        </pc:cxnChg>
+        <pc:cxnChg chg="add mod">
+          <ac:chgData name="Markus Bilz" userId="a36021e4bdb9349f" providerId="LiveId" clId="{9CD03640-CC4F-4034-8161-8D1D39C001C5}" dt="2023-04-24T16:44:25.306" v="156" actId="1076"/>
+          <ac:cxnSpMkLst>
+            <pc:docMk/>
+            <pc:sldMk cId="864514952" sldId="266"/>
+            <ac:cxnSpMk id="43" creationId="{75F0FCDC-50F1-2328-5ECF-17AB8C6C3E21}"/>
+          </ac:cxnSpMkLst>
+        </pc:cxnChg>
+        <pc:cxnChg chg="add mod">
+          <ac:chgData name="Markus Bilz" userId="a36021e4bdb9349f" providerId="LiveId" clId="{9CD03640-CC4F-4034-8161-8D1D39C001C5}" dt="2023-04-24T16:44:25.306" v="156" actId="1076"/>
+          <ac:cxnSpMkLst>
+            <pc:docMk/>
+            <pc:sldMk cId="864514952" sldId="266"/>
+            <ac:cxnSpMk id="44" creationId="{0198B279-4BC8-D979-6F21-9E60F5ED5B87}"/>
+          </ac:cxnSpMkLst>
+        </pc:cxnChg>
+        <pc:cxnChg chg="add mod">
+          <ac:chgData name="Markus Bilz" userId="a36021e4bdb9349f" providerId="LiveId" clId="{9CD03640-CC4F-4034-8161-8D1D39C001C5}" dt="2023-04-24T16:48:39.572" v="229" actId="693"/>
+          <ac:cxnSpMkLst>
+            <pc:docMk/>
+            <pc:sldMk cId="864514952" sldId="266"/>
+            <ac:cxnSpMk id="46" creationId="{E429196B-0B7E-F38C-566A-81AED5C9EDA9}"/>
+          </ac:cxnSpMkLst>
+        </pc:cxnChg>
+        <pc:cxnChg chg="add mod">
+          <ac:chgData name="Markus Bilz" userId="a36021e4bdb9349f" providerId="LiveId" clId="{9CD03640-CC4F-4034-8161-8D1D39C001C5}" dt="2023-04-24T16:44:25.306" v="156" actId="1076"/>
+          <ac:cxnSpMkLst>
+            <pc:docMk/>
+            <pc:sldMk cId="864514952" sldId="266"/>
+            <ac:cxnSpMk id="47" creationId="{007EEFA8-ACF5-5E22-1349-3FA299CFB8F9}"/>
+          </ac:cxnSpMkLst>
+        </pc:cxnChg>
+        <pc:cxnChg chg="add mod">
+          <ac:chgData name="Markus Bilz" userId="a36021e4bdb9349f" providerId="LiveId" clId="{9CD03640-CC4F-4034-8161-8D1D39C001C5}" dt="2023-04-24T16:44:25.306" v="156" actId="1076"/>
+          <ac:cxnSpMkLst>
+            <pc:docMk/>
+            <pc:sldMk cId="864514952" sldId="266"/>
+            <ac:cxnSpMk id="48" creationId="{5FD4D2C3-1DE2-4BBC-63D2-2EF777D82FC8}"/>
+          </ac:cxnSpMkLst>
+        </pc:cxnChg>
+        <pc:cxnChg chg="add mod">
+          <ac:chgData name="Markus Bilz" userId="a36021e4bdb9349f" providerId="LiveId" clId="{9CD03640-CC4F-4034-8161-8D1D39C001C5}" dt="2023-04-24T16:44:39.067" v="158" actId="1076"/>
+          <ac:cxnSpMkLst>
+            <pc:docMk/>
+            <pc:sldMk cId="864514952" sldId="266"/>
+            <ac:cxnSpMk id="52" creationId="{129DDE14-8C80-5433-51C6-A8AA41D4CA02}"/>
+          </ac:cxnSpMkLst>
+        </pc:cxnChg>
+        <pc:cxnChg chg="add mod">
+          <ac:chgData name="Markus Bilz" userId="a36021e4bdb9349f" providerId="LiveId" clId="{9CD03640-CC4F-4034-8161-8D1D39C001C5}" dt="2023-04-24T16:44:39.067" v="158" actId="1076"/>
+          <ac:cxnSpMkLst>
+            <pc:docMk/>
+            <pc:sldMk cId="864514952" sldId="266"/>
+            <ac:cxnSpMk id="53" creationId="{AFE9ED2C-56B5-5DFA-5BD9-30F020E41C7F}"/>
+          </ac:cxnSpMkLst>
+        </pc:cxnChg>
+        <pc:cxnChg chg="add del mod">
+          <ac:chgData name="Markus Bilz" userId="a36021e4bdb9349f" providerId="LiveId" clId="{9CD03640-CC4F-4034-8161-8D1D39C001C5}" dt="2023-04-24T16:48:22.291" v="226" actId="478"/>
+          <ac:cxnSpMkLst>
+            <pc:docMk/>
+            <pc:sldMk cId="864514952" sldId="266"/>
+            <ac:cxnSpMk id="55" creationId="{6F4C9F52-BAE5-DE4A-69AC-AE97666AF011}"/>
+          </ac:cxnSpMkLst>
+        </pc:cxnChg>
+        <pc:cxnChg chg="add mod">
+          <ac:chgData name="Markus Bilz" userId="a36021e4bdb9349f" providerId="LiveId" clId="{9CD03640-CC4F-4034-8161-8D1D39C001C5}" dt="2023-04-24T16:44:39.067" v="158" actId="1076"/>
+          <ac:cxnSpMkLst>
+            <pc:docMk/>
+            <pc:sldMk cId="864514952" sldId="266"/>
+            <ac:cxnSpMk id="56" creationId="{64C293DD-21BB-C879-37DA-2E181048A591}"/>
+          </ac:cxnSpMkLst>
+        </pc:cxnChg>
+        <pc:cxnChg chg="add mod">
+          <ac:chgData name="Markus Bilz" userId="a36021e4bdb9349f" providerId="LiveId" clId="{9CD03640-CC4F-4034-8161-8D1D39C001C5}" dt="2023-04-24T16:44:39.067" v="158" actId="1076"/>
+          <ac:cxnSpMkLst>
+            <pc:docMk/>
+            <pc:sldMk cId="864514952" sldId="266"/>
+            <ac:cxnSpMk id="57" creationId="{37EAA4F1-CA02-ABE0-B997-29874121DF5A}"/>
+          </ac:cxnSpMkLst>
+        </pc:cxnChg>
+        <pc:cxnChg chg="del mod">
+          <ac:chgData name="Markus Bilz" userId="a36021e4bdb9349f" providerId="LiveId" clId="{9CD03640-CC4F-4034-8161-8D1D39C001C5}" dt="2023-04-24T16:34:39.725" v="12" actId="478"/>
+          <ac:cxnSpMkLst>
+            <pc:docMk/>
+            <pc:sldMk cId="864514952" sldId="266"/>
+            <ac:cxnSpMk id="65" creationId="{28EE4F0F-C008-F011-6402-C667E69D8B21}"/>
+          </ac:cxnSpMkLst>
+        </pc:cxnChg>
+        <pc:cxnChg chg="del mod">
+          <ac:chgData name="Markus Bilz" userId="a36021e4bdb9349f" providerId="LiveId" clId="{9CD03640-CC4F-4034-8161-8D1D39C001C5}" dt="2023-04-24T16:34:37.035" v="10" actId="478"/>
+          <ac:cxnSpMkLst>
+            <pc:docMk/>
+            <pc:sldMk cId="864514952" sldId="266"/>
+            <ac:cxnSpMk id="70" creationId="{66C88C84-34E5-DBC0-F118-6C49B6374993}"/>
+          </ac:cxnSpMkLst>
+        </pc:cxnChg>
+        <pc:cxnChg chg="del mod">
+          <ac:chgData name="Markus Bilz" userId="a36021e4bdb9349f" providerId="LiveId" clId="{9CD03640-CC4F-4034-8161-8D1D39C001C5}" dt="2023-04-24T16:34:41.810" v="14" actId="478"/>
+          <ac:cxnSpMkLst>
+            <pc:docMk/>
+            <pc:sldMk cId="864514952" sldId="266"/>
+            <ac:cxnSpMk id="214" creationId="{0D81CBA5-C3C3-5317-A8A3-8CD616613EDE}"/>
+          </ac:cxnSpMkLst>
+        </pc:cxnChg>
+        <pc:cxnChg chg="del mod">
+          <ac:chgData name="Markus Bilz" userId="a36021e4bdb9349f" providerId="LiveId" clId="{9CD03640-CC4F-4034-8161-8D1D39C001C5}" dt="2023-04-24T16:35:17.543" v="31" actId="478"/>
+          <ac:cxnSpMkLst>
+            <pc:docMk/>
+            <pc:sldMk cId="864514952" sldId="266"/>
+            <ac:cxnSpMk id="217" creationId="{AF17FB98-C9BC-D133-7339-F0C5698E6493}"/>
+          </ac:cxnSpMkLst>
+        </pc:cxnChg>
+        <pc:cxnChg chg="del mod">
+          <ac:chgData name="Markus Bilz" userId="a36021e4bdb9349f" providerId="LiveId" clId="{9CD03640-CC4F-4034-8161-8D1D39C001C5}" dt="2023-04-24T16:34:38.502" v="11" actId="478"/>
+          <ac:cxnSpMkLst>
+            <pc:docMk/>
+            <pc:sldMk cId="864514952" sldId="266"/>
+            <ac:cxnSpMk id="220" creationId="{F71C02ED-6336-D99D-2AAA-7DC8A5931246}"/>
+          </ac:cxnSpMkLst>
+        </pc:cxnChg>
+        <pc:cxnChg chg="add del">
+          <ac:chgData name="Markus Bilz" userId="a36021e4bdb9349f" providerId="LiveId" clId="{9CD03640-CC4F-4034-8161-8D1D39C001C5}" dt="2023-04-24T16:39:40.714" v="89" actId="478"/>
+          <ac:cxnSpMkLst>
+            <pc:docMk/>
+            <pc:sldMk cId="864514952" sldId="266"/>
+            <ac:cxnSpMk id="234" creationId="{50BAA6FE-A991-6CA4-6308-BE9BCE8479E7}"/>
+          </ac:cxnSpMkLst>
+        </pc:cxnChg>
+        <pc:cxnChg chg="add mod">
+          <ac:chgData name="Markus Bilz" userId="a36021e4bdb9349f" providerId="LiveId" clId="{9CD03640-CC4F-4034-8161-8D1D39C001C5}" dt="2023-04-24T16:39:47.886" v="91" actId="14100"/>
+          <ac:cxnSpMkLst>
+            <pc:docMk/>
+            <pc:sldMk cId="864514952" sldId="266"/>
+            <ac:cxnSpMk id="235" creationId="{C3DA3678-3D95-A41B-A9D2-02227709CA69}"/>
+          </ac:cxnSpMkLst>
+        </pc:cxnChg>
+        <pc:cxnChg chg="del mod">
+          <ac:chgData name="Markus Bilz" userId="a36021e4bdb9349f" providerId="LiveId" clId="{9CD03640-CC4F-4034-8161-8D1D39C001C5}" dt="2023-04-24T16:34:40.974" v="13" actId="478"/>
+          <ac:cxnSpMkLst>
+            <pc:docMk/>
+            <pc:sldMk cId="864514952" sldId="266"/>
+            <ac:cxnSpMk id="241" creationId="{647D61CA-2D51-3BFE-D9EB-260D494A7DAC}"/>
+          </ac:cxnSpMkLst>
+        </pc:cxnChg>
+        <pc:cxnChg chg="del">
+          <ac:chgData name="Markus Bilz" userId="a36021e4bdb9349f" providerId="LiveId" clId="{9CD03640-CC4F-4034-8161-8D1D39C001C5}" dt="2023-04-24T16:35:14.261" v="28" actId="478"/>
+          <ac:cxnSpMkLst>
+            <pc:docMk/>
+            <pc:sldMk cId="864514952" sldId="266"/>
+            <ac:cxnSpMk id="242" creationId="{15A6B20D-82BA-B4F9-68E1-286190BB95EE}"/>
+          </ac:cxnSpMkLst>
+        </pc:cxnChg>
+        <pc:cxnChg chg="add mod">
+          <ac:chgData name="Markus Bilz" userId="a36021e4bdb9349f" providerId="LiveId" clId="{9CD03640-CC4F-4034-8161-8D1D39C001C5}" dt="2023-04-24T16:41:46.278" v="118" actId="1076"/>
+          <ac:cxnSpMkLst>
+            <pc:docMk/>
+            <pc:sldMk cId="864514952" sldId="266"/>
+            <ac:cxnSpMk id="247" creationId="{B57F3CDD-AC70-F737-8C91-716AC2ADE388}"/>
+          </ac:cxnSpMkLst>
+        </pc:cxnChg>
+        <pc:cxnChg chg="del">
+          <ac:chgData name="Markus Bilz" userId="a36021e4bdb9349f" providerId="LiveId" clId="{9CD03640-CC4F-4034-8161-8D1D39C001C5}" dt="2023-04-24T16:35:16.209" v="30" actId="478"/>
+          <ac:cxnSpMkLst>
+            <pc:docMk/>
+            <pc:sldMk cId="864514952" sldId="266"/>
+            <ac:cxnSpMk id="249" creationId="{474E23BC-E9EE-6D4C-E9B0-65C585D028C8}"/>
+          </ac:cxnSpMkLst>
+        </pc:cxnChg>
+        <pc:cxnChg chg="add mod">
+          <ac:chgData name="Markus Bilz" userId="a36021e4bdb9349f" providerId="LiveId" clId="{9CD03640-CC4F-4034-8161-8D1D39C001C5}" dt="2023-04-24T16:48:39.572" v="229" actId="693"/>
+          <ac:cxnSpMkLst>
+            <pc:docMk/>
+            <pc:sldMk cId="864514952" sldId="266"/>
+            <ac:cxnSpMk id="250" creationId="{59F29DE5-486E-BFE9-4847-43007836CB38}"/>
+          </ac:cxnSpMkLst>
+        </pc:cxnChg>
+        <pc:cxnChg chg="add mod">
+          <ac:chgData name="Markus Bilz" userId="a36021e4bdb9349f" providerId="LiveId" clId="{9CD03640-CC4F-4034-8161-8D1D39C001C5}" dt="2023-04-24T16:42:25.915" v="124" actId="1076"/>
+          <ac:cxnSpMkLst>
+            <pc:docMk/>
+            <pc:sldMk cId="864514952" sldId="266"/>
+            <ac:cxnSpMk id="251" creationId="{4A209874-1154-FD9C-DD63-118CF294F905}"/>
+          </ac:cxnSpMkLst>
+        </pc:cxnChg>
+        <pc:cxnChg chg="add mod">
+          <ac:chgData name="Markus Bilz" userId="a36021e4bdb9349f" providerId="LiveId" clId="{9CD03640-CC4F-4034-8161-8D1D39C001C5}" dt="2023-04-24T16:42:39.507" v="126" actId="1076"/>
+          <ac:cxnSpMkLst>
+            <pc:docMk/>
+            <pc:sldMk cId="864514952" sldId="266"/>
+            <ac:cxnSpMk id="252" creationId="{242EB6C1-D759-C004-77B6-FBD486BBDB2F}"/>
+          </ac:cxnSpMkLst>
+        </pc:cxnChg>
+        <pc:cxnChg chg="del mod">
+          <ac:chgData name="Markus Bilz" userId="a36021e4bdb9349f" providerId="LiveId" clId="{9CD03640-CC4F-4034-8161-8D1D39C001C5}" dt="2023-04-24T16:34:33.602" v="8" actId="478"/>
+          <ac:cxnSpMkLst>
+            <pc:docMk/>
+            <pc:sldMk cId="864514952" sldId="266"/>
+            <ac:cxnSpMk id="255" creationId="{37A65A15-9D02-19D0-A9DA-DEA04BF5E7CC}"/>
+          </ac:cxnSpMkLst>
+        </pc:cxnChg>
+        <pc:cxnChg chg="add mod">
+          <ac:chgData name="Markus Bilz" userId="a36021e4bdb9349f" providerId="LiveId" clId="{9CD03640-CC4F-4034-8161-8D1D39C001C5}" dt="2023-04-24T16:44:51.637" v="160" actId="1076"/>
+          <ac:cxnSpMkLst>
+            <pc:docMk/>
+            <pc:sldMk cId="864514952" sldId="266"/>
+            <ac:cxnSpMk id="256" creationId="{70C78A24-927E-E888-F2F5-6E2FE13CADE0}"/>
+          </ac:cxnSpMkLst>
+        </pc:cxnChg>
+        <pc:cxnChg chg="add mod">
+          <ac:chgData name="Markus Bilz" userId="a36021e4bdb9349f" providerId="LiveId" clId="{9CD03640-CC4F-4034-8161-8D1D39C001C5}" dt="2023-04-24T16:44:51.637" v="160" actId="1076"/>
+          <ac:cxnSpMkLst>
+            <pc:docMk/>
+            <pc:sldMk cId="864514952" sldId="266"/>
+            <ac:cxnSpMk id="257" creationId="{2132ECBE-C5C8-0AE7-6993-4920648225E5}"/>
+          </ac:cxnSpMkLst>
+        </pc:cxnChg>
+        <pc:cxnChg chg="add del mod">
+          <ac:chgData name="Markus Bilz" userId="a36021e4bdb9349f" providerId="LiveId" clId="{9CD03640-CC4F-4034-8161-8D1D39C001C5}" dt="2023-04-24T16:48:23.259" v="227" actId="478"/>
+          <ac:cxnSpMkLst>
+            <pc:docMk/>
+            <pc:sldMk cId="864514952" sldId="266"/>
+            <ac:cxnSpMk id="259" creationId="{4FB11FD3-620A-25C8-BA92-E5C9679C3BA9}"/>
+          </ac:cxnSpMkLst>
+        </pc:cxnChg>
+        <pc:cxnChg chg="add mod">
+          <ac:chgData name="Markus Bilz" userId="a36021e4bdb9349f" providerId="LiveId" clId="{9CD03640-CC4F-4034-8161-8D1D39C001C5}" dt="2023-04-24T16:44:51.637" v="160" actId="1076"/>
+          <ac:cxnSpMkLst>
+            <pc:docMk/>
+            <pc:sldMk cId="864514952" sldId="266"/>
+            <ac:cxnSpMk id="260" creationId="{FE239940-86F5-59A7-6D0D-19B7DF3D0205}"/>
+          </ac:cxnSpMkLst>
+        </pc:cxnChg>
+        <pc:cxnChg chg="add mod">
+          <ac:chgData name="Markus Bilz" userId="a36021e4bdb9349f" providerId="LiveId" clId="{9CD03640-CC4F-4034-8161-8D1D39C001C5}" dt="2023-04-24T16:44:51.637" v="160" actId="1076"/>
+          <ac:cxnSpMkLst>
+            <pc:docMk/>
+            <pc:sldMk cId="864514952" sldId="266"/>
+            <ac:cxnSpMk id="261" creationId="{FDEE6B90-8A2F-7C9D-3778-9A809B9AC567}"/>
+          </ac:cxnSpMkLst>
+        </pc:cxnChg>
+        <pc:cxnChg chg="del mod">
+          <ac:chgData name="Markus Bilz" userId="a36021e4bdb9349f" providerId="LiveId" clId="{9CD03640-CC4F-4034-8161-8D1D39C001C5}" dt="2023-04-24T16:35:13.467" v="27" actId="478"/>
+          <ac:cxnSpMkLst>
+            <pc:docMk/>
+            <pc:sldMk cId="864514952" sldId="266"/>
+            <ac:cxnSpMk id="264" creationId="{16F9191E-FF68-381B-DBB7-8107DC518EDC}"/>
+          </ac:cxnSpMkLst>
+        </pc:cxnChg>
       </pc:sldChg>
     </pc:docChg>
   </pc:docChgLst>
@@ -7717,7 +8574,7 @@
           <a:p>
             <a:fld id="{D6A82EB2-151D-4EEE-ACF5-92C73278C09C}" type="datetimeFigureOut">
               <a:rPr lang="en-GB" smtClean="0"/>
-              <a:t>22/02/2023</a:t>
+              <a:t>24/04/2023</a:t>
             </a:fld>
             <a:endParaRPr lang="en-GB"/>
           </a:p>
@@ -7917,7 +8774,7 @@
           <a:p>
             <a:fld id="{D6A82EB2-151D-4EEE-ACF5-92C73278C09C}" type="datetimeFigureOut">
               <a:rPr lang="en-GB" smtClean="0"/>
-              <a:t>22/02/2023</a:t>
+              <a:t>24/04/2023</a:t>
             </a:fld>
             <a:endParaRPr lang="en-GB"/>
           </a:p>
@@ -8127,7 +8984,7 @@
           <a:p>
             <a:fld id="{D6A82EB2-151D-4EEE-ACF5-92C73278C09C}" type="datetimeFigureOut">
               <a:rPr lang="en-GB" smtClean="0"/>
-              <a:t>22/02/2023</a:t>
+              <a:t>24/04/2023</a:t>
             </a:fld>
             <a:endParaRPr lang="en-GB"/>
           </a:p>
@@ -8327,7 +9184,7 @@
           <a:p>
             <a:fld id="{D6A82EB2-151D-4EEE-ACF5-92C73278C09C}" type="datetimeFigureOut">
               <a:rPr lang="en-GB" smtClean="0"/>
-              <a:t>22/02/2023</a:t>
+              <a:t>24/04/2023</a:t>
             </a:fld>
             <a:endParaRPr lang="en-GB"/>
           </a:p>
@@ -8603,7 +9460,7 @@
           <a:p>
             <a:fld id="{D6A82EB2-151D-4EEE-ACF5-92C73278C09C}" type="datetimeFigureOut">
               <a:rPr lang="en-GB" smtClean="0"/>
-              <a:t>22/02/2023</a:t>
+              <a:t>24/04/2023</a:t>
             </a:fld>
             <a:endParaRPr lang="en-GB"/>
           </a:p>
@@ -8871,7 +9728,7 @@
           <a:p>
             <a:fld id="{D6A82EB2-151D-4EEE-ACF5-92C73278C09C}" type="datetimeFigureOut">
               <a:rPr lang="en-GB" smtClean="0"/>
-              <a:t>22/02/2023</a:t>
+              <a:t>24/04/2023</a:t>
             </a:fld>
             <a:endParaRPr lang="en-GB"/>
           </a:p>
@@ -9286,7 +10143,7 @@
           <a:p>
             <a:fld id="{D6A82EB2-151D-4EEE-ACF5-92C73278C09C}" type="datetimeFigureOut">
               <a:rPr lang="en-GB" smtClean="0"/>
-              <a:t>22/02/2023</a:t>
+              <a:t>24/04/2023</a:t>
             </a:fld>
             <a:endParaRPr lang="en-GB"/>
           </a:p>
@@ -9428,7 +10285,7 @@
           <a:p>
             <a:fld id="{D6A82EB2-151D-4EEE-ACF5-92C73278C09C}" type="datetimeFigureOut">
               <a:rPr lang="en-GB" smtClean="0"/>
-              <a:t>22/02/2023</a:t>
+              <a:t>24/04/2023</a:t>
             </a:fld>
             <a:endParaRPr lang="en-GB"/>
           </a:p>
@@ -9541,7 +10398,7 @@
           <a:p>
             <a:fld id="{D6A82EB2-151D-4EEE-ACF5-92C73278C09C}" type="datetimeFigureOut">
               <a:rPr lang="en-GB" smtClean="0"/>
-              <a:t>22/02/2023</a:t>
+              <a:t>24/04/2023</a:t>
             </a:fld>
             <a:endParaRPr lang="en-GB"/>
           </a:p>
@@ -9854,7 +10711,7 @@
           <a:p>
             <a:fld id="{D6A82EB2-151D-4EEE-ACF5-92C73278C09C}" type="datetimeFigureOut">
               <a:rPr lang="en-GB" smtClean="0"/>
-              <a:t>22/02/2023</a:t>
+              <a:t>24/04/2023</a:t>
             </a:fld>
             <a:endParaRPr lang="en-GB"/>
           </a:p>
@@ -10143,7 +11000,7 @@
           <a:p>
             <a:fld id="{D6A82EB2-151D-4EEE-ACF5-92C73278C09C}" type="datetimeFigureOut">
               <a:rPr lang="en-GB" smtClean="0"/>
-              <a:t>22/02/2023</a:t>
+              <a:t>24/04/2023</a:t>
             </a:fld>
             <a:endParaRPr lang="en-GB"/>
           </a:p>
@@ -10386,7 +11243,7 @@
           <a:p>
             <a:fld id="{D6A82EB2-151D-4EEE-ACF5-92C73278C09C}" type="datetimeFigureOut">
               <a:rPr lang="en-GB" smtClean="0"/>
-              <a:t>22/02/2023</a:t>
+              <a:t>24/04/2023</a:t>
             </a:fld>
             <a:endParaRPr lang="en-GB"/>
           </a:p>
@@ -17351,6 +18208,96 @@
 </p:sld>
 </file>
 
+<file path=ppt/slides/slide10.xml><?xml version="1.0" encoding="utf-8"?>
+<p:sld xmlns:a="http://schemas.openxmlformats.org/drawingml/2006/main" xmlns:r="http://schemas.openxmlformats.org/officeDocument/2006/relationships" xmlns:p="http://schemas.openxmlformats.org/presentationml/2006/main">
+  <p:cSld>
+    <p:spTree>
+      <p:nvGrpSpPr>
+        <p:cNvPr id="1" name=""/>
+        <p:cNvGrpSpPr/>
+        <p:nvPr/>
+      </p:nvGrpSpPr>
+      <p:grpSpPr>
+        <a:xfrm>
+          <a:off x="0" y="0"/>
+          <a:ext cx="0" cy="0"/>
+          <a:chOff x="0" y="0"/>
+          <a:chExt cx="0" cy="0"/>
+        </a:xfrm>
+      </p:grpSpPr>
+      <p:pic>
+        <p:nvPicPr>
+          <p:cNvPr id="5" name="Picture 4">
+            <a:extLst>
+              <a:ext uri="{FF2B5EF4-FFF2-40B4-BE49-F238E27FC236}">
+                <a16:creationId xmlns:a16="http://schemas.microsoft.com/office/drawing/2014/main" id="{E9048B29-D23C-3F4A-8CFD-CC2CD996A4A6}"/>
+              </a:ext>
+            </a:extLst>
+          </p:cNvPr>
+          <p:cNvPicPr>
+            <a:picLocks noChangeAspect="1"/>
+          </p:cNvPicPr>
+          <p:nvPr/>
+        </p:nvPicPr>
+        <p:blipFill>
+          <a:blip r:embed="rId2"/>
+          <a:stretch>
+            <a:fillRect/>
+          </a:stretch>
+        </p:blipFill>
+        <p:spPr>
+          <a:xfrm>
+            <a:off x="258426" y="0"/>
+            <a:ext cx="11675147" cy="6858000"/>
+          </a:xfrm>
+          <a:prstGeom prst="rect">
+            <a:avLst/>
+          </a:prstGeom>
+        </p:spPr>
+      </p:pic>
+      <p:pic>
+        <p:nvPicPr>
+          <p:cNvPr id="3" name="Picture 2">
+            <a:extLst>
+              <a:ext uri="{FF2B5EF4-FFF2-40B4-BE49-F238E27FC236}">
+                <a16:creationId xmlns:a16="http://schemas.microsoft.com/office/drawing/2014/main" id="{4AEA4B46-C438-5924-D392-B8FE886DDBB4}"/>
+              </a:ext>
+            </a:extLst>
+          </p:cNvPr>
+          <p:cNvPicPr>
+            <a:picLocks noChangeAspect="1"/>
+          </p:cNvPicPr>
+          <p:nvPr/>
+        </p:nvPicPr>
+        <p:blipFill>
+          <a:blip r:embed="rId3"/>
+          <a:stretch>
+            <a:fillRect/>
+          </a:stretch>
+        </p:blipFill>
+        <p:spPr>
+          <a:xfrm>
+            <a:off x="3157281" y="1380830"/>
+            <a:ext cx="3667637" cy="4229690"/>
+          </a:xfrm>
+          <a:prstGeom prst="rect">
+            <a:avLst/>
+          </a:prstGeom>
+        </p:spPr>
+      </p:pic>
+    </p:spTree>
+    <p:extLst>
+      <p:ext uri="{BB962C8B-B14F-4D97-AF65-F5344CB8AC3E}">
+        <p14:creationId xmlns:p14="http://schemas.microsoft.com/office/powerpoint/2010/main" val="4091855300"/>
+      </p:ext>
+    </p:extLst>
+  </p:cSld>
+  <p:clrMapOvr>
+    <a:masterClrMapping/>
+  </p:clrMapOvr>
+</p:sld>
+</file>
+
 <file path=ppt/slides/slide2.xml><?xml version="1.0" encoding="utf-8"?>
 <p:sld xmlns:a="http://schemas.openxmlformats.org/drawingml/2006/main" xmlns:r="http://schemas.openxmlformats.org/officeDocument/2006/relationships" xmlns:p="http://schemas.openxmlformats.org/presentationml/2006/main">
   <p:cSld>
@@ -27323,60 +28270,118 @@
       </p:grpSpPr>
       <p:sp>
         <p:nvSpPr>
-          <p:cNvPr id="2" name="Title 1">
-            <a:extLst>
-              <a:ext uri="{FF2B5EF4-FFF2-40B4-BE49-F238E27FC236}">
-                <a16:creationId xmlns:a16="http://schemas.microsoft.com/office/drawing/2014/main" id="{9C25A884-0014-7B87-1AF5-C2A758D258BB}"/>
-              </a:ext>
-            </a:extLst>
-          </p:cNvPr>
-          <p:cNvSpPr>
-            <a:spLocks noGrp="1"/>
-          </p:cNvSpPr>
-          <p:nvPr>
-            <p:ph type="title"/>
-          </p:nvPr>
+          <p:cNvPr id="162" name="TextBox 161">
+            <a:extLst>
+              <a:ext uri="{FF2B5EF4-FFF2-40B4-BE49-F238E27FC236}">
+                <a16:creationId xmlns:a16="http://schemas.microsoft.com/office/drawing/2014/main" id="{C8C65B08-14FE-FF44-47C5-FB5077BC12AB}"/>
+              </a:ext>
+            </a:extLst>
+          </p:cNvPr>
+          <p:cNvSpPr txBox="1"/>
+          <p:nvPr/>
         </p:nvSpPr>
-        <p:spPr/>
+        <p:spPr>
+          <a:xfrm>
+            <a:off x="8480055" y="6260921"/>
+            <a:ext cx="2686050" cy="307777"/>
+          </a:xfrm>
+          <a:prstGeom prst="rect">
+            <a:avLst/>
+          </a:prstGeom>
+          <a:noFill/>
+        </p:spPr>
         <p:txBody>
-          <a:bodyPr/>
+          <a:bodyPr wrap="square" rtlCol="0">
+            <a:spAutoFit/>
+          </a:bodyPr>
           <a:lstStyle/>
           <a:p>
-            <a:endParaRPr lang="en-GB"/>
+            <a:r>
+              <a:rPr lang="de-DE" sz="1400" dirty="0" err="1">
+                <a:latin typeface="+mj-lt"/>
+              </a:rPr>
+              <a:t>categorical</a:t>
+            </a:r>
+            <a:r>
+              <a:rPr lang="de-DE" sz="1400" dirty="0">
+                <a:latin typeface="+mj-lt"/>
+              </a:rPr>
+              <a:t> and </a:t>
+            </a:r>
+            <a:r>
+              <a:rPr lang="de-DE" sz="1400" dirty="0" err="1">
+                <a:latin typeface="+mj-lt"/>
+              </a:rPr>
+              <a:t>continuous</a:t>
+            </a:r>
+            <a:r>
+              <a:rPr lang="de-DE" sz="1400" dirty="0">
+                <a:latin typeface="+mj-lt"/>
+              </a:rPr>
+              <a:t> </a:t>
+            </a:r>
+            <a:r>
+              <a:rPr lang="de-DE" sz="1400" dirty="0" err="1">
+                <a:latin typeface="+mj-lt"/>
+              </a:rPr>
+              <a:t>inputs</a:t>
+            </a:r>
+            <a:endParaRPr lang="en-GB" sz="1400" dirty="0">
+              <a:latin typeface="+mj-lt"/>
+            </a:endParaRPr>
           </a:p>
         </p:txBody>
       </p:sp>
       <p:sp>
         <p:nvSpPr>
-          <p:cNvPr id="3" name="Content Placeholder 2">
-            <a:extLst>
-              <a:ext uri="{FF2B5EF4-FFF2-40B4-BE49-F238E27FC236}">
-                <a16:creationId xmlns:a16="http://schemas.microsoft.com/office/drawing/2014/main" id="{EFD32671-D437-757C-1EA5-C048C3504F41}"/>
-              </a:ext>
-            </a:extLst>
-          </p:cNvPr>
-          <p:cNvSpPr>
-            <a:spLocks noGrp="1"/>
-          </p:cNvSpPr>
-          <p:nvPr>
-            <p:ph idx="1"/>
-          </p:nvPr>
+          <p:cNvPr id="2" name="TextBox 1">
+            <a:extLst>
+              <a:ext uri="{FF2B5EF4-FFF2-40B4-BE49-F238E27FC236}">
+                <a16:creationId xmlns:a16="http://schemas.microsoft.com/office/drawing/2014/main" id="{5CC34145-B5F4-8BDD-0E3A-311D220D3B32}"/>
+              </a:ext>
+            </a:extLst>
+          </p:cNvPr>
+          <p:cNvSpPr txBox="1"/>
+          <p:nvPr/>
         </p:nvSpPr>
-        <p:spPr/>
+        <p:spPr>
+          <a:xfrm>
+            <a:off x="12676516" y="534119"/>
+            <a:ext cx="1649083" cy="369332"/>
+          </a:xfrm>
+          <a:prstGeom prst="rect">
+            <a:avLst/>
+          </a:prstGeom>
+          <a:noFill/>
+        </p:spPr>
         <p:txBody>
-          <a:bodyPr/>
+          <a:bodyPr wrap="square" rtlCol="0">
+            <a:spAutoFit/>
+          </a:bodyPr>
           <a:lstStyle/>
           <a:p>
-            <a:endParaRPr lang="en-GB"/>
+            <a:r>
+              <a:rPr lang="de-DE" dirty="0" err="1">
+                <a:solidFill>
+                  <a:srgbClr val="FF0000"/>
+                </a:solidFill>
+              </a:rPr>
+              <a:t>FTTransformer</a:t>
+            </a:r>
+            <a:endParaRPr lang="en-GB" dirty="0">
+              <a:solidFill>
+                <a:srgbClr val="FF0000"/>
+              </a:solidFill>
+            </a:endParaRPr>
           </a:p>
         </p:txBody>
       </p:sp>
       <p:pic>
         <p:nvPicPr>
-          <p:cNvPr id="4" name="Picture 3">
-            <a:extLst>
-              <a:ext uri="{FF2B5EF4-FFF2-40B4-BE49-F238E27FC236}">
-                <a16:creationId xmlns:a16="http://schemas.microsoft.com/office/drawing/2014/main" id="{B7DB29C0-B5C8-8508-A26E-50B1D221C83C}"/>
+          <p:cNvPr id="20" name="Picture 19">
+            <a:extLst>
+              <a:ext uri="{FF2B5EF4-FFF2-40B4-BE49-F238E27FC236}">
+                <a16:creationId xmlns:a16="http://schemas.microsoft.com/office/drawing/2014/main" id="{A196CD09-47BF-0D15-9004-DF22882B1653}"/>
               </a:ext>
             </a:extLst>
           </p:cNvPr>
@@ -27393,18 +28398,2637 @@
         </p:blipFill>
         <p:spPr>
           <a:xfrm>
-            <a:off x="400050" y="-314325"/>
-            <a:ext cx="11675147" cy="6858000"/>
+            <a:off x="12512874" y="1570185"/>
+            <a:ext cx="4568048" cy="535880"/>
           </a:xfrm>
           <a:prstGeom prst="rect">
             <a:avLst/>
           </a:prstGeom>
         </p:spPr>
       </p:pic>
+      <p:pic>
+        <p:nvPicPr>
+          <p:cNvPr id="22" name="Picture 21">
+            <a:extLst>
+              <a:ext uri="{FF2B5EF4-FFF2-40B4-BE49-F238E27FC236}">
+                <a16:creationId xmlns:a16="http://schemas.microsoft.com/office/drawing/2014/main" id="{B3F065FF-1246-4995-8C99-938F1D891CC8}"/>
+              </a:ext>
+            </a:extLst>
+          </p:cNvPr>
+          <p:cNvPicPr>
+            <a:picLocks noChangeAspect="1"/>
+          </p:cNvPicPr>
+          <p:nvPr/>
+        </p:nvPicPr>
+        <p:blipFill>
+          <a:blip r:embed="rId3"/>
+          <a:stretch>
+            <a:fillRect/>
+          </a:stretch>
+        </p:blipFill>
+        <p:spPr>
+          <a:xfrm>
+            <a:off x="12501391" y="2395104"/>
+            <a:ext cx="4168352" cy="2264656"/>
+          </a:xfrm>
+          <a:prstGeom prst="rect">
+            <a:avLst/>
+          </a:prstGeom>
+        </p:spPr>
+      </p:pic>
+      <p:sp>
+        <p:nvSpPr>
+          <p:cNvPr id="126" name="Rectangle 125">
+            <a:extLst>
+              <a:ext uri="{FF2B5EF4-FFF2-40B4-BE49-F238E27FC236}">
+                <a16:creationId xmlns:a16="http://schemas.microsoft.com/office/drawing/2014/main" id="{EA267B89-DFC7-624F-46FE-3C954DAF346E}"/>
+              </a:ext>
+            </a:extLst>
+          </p:cNvPr>
+          <p:cNvSpPr/>
+          <p:nvPr/>
+        </p:nvSpPr>
+        <p:spPr>
+          <a:xfrm>
+            <a:off x="0" y="0"/>
+            <a:ext cx="12192000" cy="6858000"/>
+          </a:xfrm>
+          <a:prstGeom prst="rect">
+            <a:avLst/>
+          </a:prstGeom>
+          <a:noFill/>
+          <a:ln>
+            <a:noFill/>
+          </a:ln>
+        </p:spPr>
+        <p:style>
+          <a:lnRef idx="2">
+            <a:schemeClr val="accent1">
+              <a:shade val="50000"/>
+            </a:schemeClr>
+          </a:lnRef>
+          <a:fillRef idx="1">
+            <a:schemeClr val="accent1"/>
+          </a:fillRef>
+          <a:effectRef idx="0">
+            <a:schemeClr val="accent1"/>
+          </a:effectRef>
+          <a:fontRef idx="minor">
+            <a:schemeClr val="lt1"/>
+          </a:fontRef>
+        </p:style>
+        <p:txBody>
+          <a:bodyPr rtlCol="0" anchor="ctr"/>
+          <a:lstStyle/>
+          <a:p>
+            <a:pPr algn="ctr"/>
+            <a:endParaRPr lang="en-GB"/>
+          </a:p>
+        </p:txBody>
+      </p:sp>
+      <p:pic>
+        <p:nvPicPr>
+          <p:cNvPr id="7" name="Picture 6" descr="Diagram&#10;&#10;Description automatically generated with low confidence">
+            <a:extLst>
+              <a:ext uri="{FF2B5EF4-FFF2-40B4-BE49-F238E27FC236}">
+                <a16:creationId xmlns:a16="http://schemas.microsoft.com/office/drawing/2014/main" id="{57DC4ADF-749C-6BDC-3F46-33B4726B5B13}"/>
+              </a:ext>
+            </a:extLst>
+          </p:cNvPr>
+          <p:cNvPicPr>
+            <a:picLocks noChangeAspect="1"/>
+          </p:cNvPicPr>
+          <p:nvPr/>
+        </p:nvPicPr>
+        <p:blipFill>
+          <a:blip r:embed="rId4">
+            <a:extLst>
+              <a:ext uri="{28A0092B-C50C-407E-A947-70E740481C1C}">
+                <a14:useLocalDpi xmlns:a14="http://schemas.microsoft.com/office/drawing/2010/main" val="0"/>
+              </a:ext>
+            </a:extLst>
+          </a:blip>
+          <a:stretch>
+            <a:fillRect/>
+          </a:stretch>
+        </p:blipFill>
+        <p:spPr>
+          <a:xfrm>
+            <a:off x="12505728" y="4943170"/>
+            <a:ext cx="8554644" cy="4363059"/>
+          </a:xfrm>
+          <a:prstGeom prst="rect">
+            <a:avLst/>
+          </a:prstGeom>
+        </p:spPr>
+      </p:pic>
+      <p:grpSp>
+        <p:nvGrpSpPr>
+          <p:cNvPr id="263" name="Group 262">
+            <a:extLst>
+              <a:ext uri="{FF2B5EF4-FFF2-40B4-BE49-F238E27FC236}">
+                <a16:creationId xmlns:a16="http://schemas.microsoft.com/office/drawing/2014/main" id="{B91516EA-A878-C95E-E73C-E46A9230D80F}"/>
+              </a:ext>
+            </a:extLst>
+          </p:cNvPr>
+          <p:cNvGrpSpPr/>
+          <p:nvPr/>
+        </p:nvGrpSpPr>
+        <p:grpSpPr>
+          <a:xfrm>
+            <a:off x="788988" y="2676525"/>
+            <a:ext cx="6209343" cy="1771094"/>
+            <a:chOff x="788988" y="2676525"/>
+            <a:chExt cx="6209343" cy="1771094"/>
+          </a:xfrm>
+        </p:grpSpPr>
+        <p:grpSp>
+          <p:nvGrpSpPr>
+            <p:cNvPr id="9" name="Group 8">
+              <a:extLst>
+                <a:ext uri="{FF2B5EF4-FFF2-40B4-BE49-F238E27FC236}">
+                  <a16:creationId xmlns:a16="http://schemas.microsoft.com/office/drawing/2014/main" id="{C32E5919-6D95-84C0-C2B4-588BD8F1D087}"/>
+                </a:ext>
+              </a:extLst>
+            </p:cNvPr>
+            <p:cNvGrpSpPr/>
+            <p:nvPr/>
+          </p:nvGrpSpPr>
+          <p:grpSpPr>
+            <a:xfrm>
+              <a:off x="3174436" y="2767305"/>
+              <a:ext cx="650726" cy="1159276"/>
+              <a:chOff x="8969402" y="2652435"/>
+              <a:chExt cx="1633537" cy="2910165"/>
+            </a:xfrm>
+          </p:grpSpPr>
+          <p:sp>
+            <p:nvSpPr>
+              <p:cNvPr id="62" name="Rectangle: Rounded Corners 61">
+                <a:extLst>
+                  <a:ext uri="{FF2B5EF4-FFF2-40B4-BE49-F238E27FC236}">
+                    <a16:creationId xmlns:a16="http://schemas.microsoft.com/office/drawing/2014/main" id="{C0641B72-A83F-2F0C-92F9-BC5B309B52B7}"/>
+                  </a:ext>
+                </a:extLst>
+              </p:cNvPr>
+              <p:cNvSpPr/>
+              <p:nvPr/>
+            </p:nvSpPr>
+            <p:spPr>
+              <a:xfrm>
+                <a:off x="9244198" y="4357197"/>
+                <a:ext cx="1159670" cy="458984"/>
+              </a:xfrm>
+              <a:prstGeom prst="roundRect">
+                <a:avLst>
+                  <a:gd name="adj" fmla="val 15547"/>
+                </a:avLst>
+              </a:prstGeom>
+              <a:solidFill>
+                <a:srgbClr val="EFABAA"/>
+              </a:solidFill>
+              <a:ln w="19050">
+                <a:headEnd type="none" w="med" len="med"/>
+                <a:tailEnd type="none" w="med" len="med"/>
+              </a:ln>
+            </p:spPr>
+            <p:style>
+              <a:lnRef idx="2">
+                <a:schemeClr val="dk1"/>
+              </a:lnRef>
+              <a:fillRef idx="1">
+                <a:schemeClr val="lt1"/>
+              </a:fillRef>
+              <a:effectRef idx="0">
+                <a:schemeClr val="dk1"/>
+              </a:effectRef>
+              <a:fontRef idx="minor">
+                <a:schemeClr val="dk1"/>
+              </a:fontRef>
+            </p:style>
+            <p:txBody>
+              <a:bodyPr lIns="0" rIns="0" rtlCol="0" anchor="ctr"/>
+              <a:lstStyle/>
+              <a:p>
+                <a:pPr algn="ctr"/>
+                <a:endParaRPr lang="de-DE" sz="1200" noProof="1">
+                  <a:latin typeface="+mj-lt"/>
+                  <a:cs typeface="Arial" panose="020B0604020202020204" pitchFamily="34" charset="0"/>
+                </a:endParaRPr>
+              </a:p>
+            </p:txBody>
+          </p:sp>
+          <p:sp>
+            <p:nvSpPr>
+              <p:cNvPr id="63" name="Rectangle: Rounded Corners 62">
+                <a:extLst>
+                  <a:ext uri="{FF2B5EF4-FFF2-40B4-BE49-F238E27FC236}">
+                    <a16:creationId xmlns:a16="http://schemas.microsoft.com/office/drawing/2014/main" id="{2E94D5CD-A3D0-17C2-6DA2-6C898CDD5E11}"/>
+                  </a:ext>
+                </a:extLst>
+              </p:cNvPr>
+              <p:cNvSpPr/>
+              <p:nvPr/>
+            </p:nvSpPr>
+            <p:spPr>
+              <a:xfrm>
+                <a:off x="9257759" y="3828429"/>
+                <a:ext cx="1164432" cy="242887"/>
+              </a:xfrm>
+              <a:prstGeom prst="roundRect">
+                <a:avLst>
+                  <a:gd name="adj" fmla="val 15547"/>
+                </a:avLst>
+              </a:prstGeom>
+              <a:solidFill>
+                <a:srgbClr val="CCD497"/>
+              </a:solidFill>
+              <a:ln w="19050">
+                <a:headEnd type="none" w="med" len="med"/>
+                <a:tailEnd type="none" w="med" len="med"/>
+              </a:ln>
+            </p:spPr>
+            <p:style>
+              <a:lnRef idx="2">
+                <a:schemeClr val="dk1"/>
+              </a:lnRef>
+              <a:fillRef idx="1">
+                <a:schemeClr val="lt1"/>
+              </a:fillRef>
+              <a:effectRef idx="0">
+                <a:schemeClr val="dk1"/>
+              </a:effectRef>
+              <a:fontRef idx="minor">
+                <a:schemeClr val="dk1"/>
+              </a:fontRef>
+            </p:style>
+            <p:txBody>
+              <a:bodyPr rtlCol="0" anchor="ctr"/>
+              <a:lstStyle/>
+              <a:p>
+                <a:pPr algn="ctr"/>
+                <a:endParaRPr lang="de-DE" sz="1100" noProof="1">
+                  <a:latin typeface="+mj-lt"/>
+                  <a:cs typeface="Arial" panose="020B0604020202020204" pitchFamily="34" charset="0"/>
+                </a:endParaRPr>
+              </a:p>
+            </p:txBody>
+          </p:sp>
+          <p:sp>
+            <p:nvSpPr>
+              <p:cNvPr id="66" name="Rectangle: Rounded Corners 65">
+                <a:extLst>
+                  <a:ext uri="{FF2B5EF4-FFF2-40B4-BE49-F238E27FC236}">
+                    <a16:creationId xmlns:a16="http://schemas.microsoft.com/office/drawing/2014/main" id="{7343FA96-205F-7DD7-A660-9E1AE7A16CDD}"/>
+                  </a:ext>
+                </a:extLst>
+              </p:cNvPr>
+              <p:cNvSpPr/>
+              <p:nvPr/>
+            </p:nvSpPr>
+            <p:spPr>
+              <a:xfrm>
+                <a:off x="9241818" y="3265058"/>
+                <a:ext cx="1164432" cy="329011"/>
+              </a:xfrm>
+              <a:prstGeom prst="roundRect">
+                <a:avLst>
+                  <a:gd name="adj" fmla="val 15547"/>
+                </a:avLst>
+              </a:prstGeom>
+              <a:solidFill>
+                <a:srgbClr val="A8D1EE"/>
+              </a:solidFill>
+              <a:ln w="19050">
+                <a:headEnd type="none" w="med" len="med"/>
+                <a:tailEnd type="none" w="med" len="med"/>
+              </a:ln>
+            </p:spPr>
+            <p:style>
+              <a:lnRef idx="2">
+                <a:schemeClr val="dk1"/>
+              </a:lnRef>
+              <a:fillRef idx="1">
+                <a:schemeClr val="lt1"/>
+              </a:fillRef>
+              <a:effectRef idx="0">
+                <a:schemeClr val="dk1"/>
+              </a:effectRef>
+              <a:fontRef idx="minor">
+                <a:schemeClr val="dk1"/>
+              </a:fontRef>
+            </p:style>
+            <p:txBody>
+              <a:bodyPr rtlCol="0" anchor="ctr"/>
+              <a:lstStyle/>
+              <a:p>
+                <a:pPr algn="ctr"/>
+                <a:endParaRPr lang="de-DE" sz="1100" noProof="1">
+                  <a:latin typeface="+mj-lt"/>
+                  <a:cs typeface="Arial" panose="020B0604020202020204" pitchFamily="34" charset="0"/>
+                </a:endParaRPr>
+              </a:p>
+            </p:txBody>
+          </p:sp>
+          <p:sp>
+            <p:nvSpPr>
+              <p:cNvPr id="67" name="Rectangle: Rounded Corners 66">
+                <a:extLst>
+                  <a:ext uri="{FF2B5EF4-FFF2-40B4-BE49-F238E27FC236}">
+                    <a16:creationId xmlns:a16="http://schemas.microsoft.com/office/drawing/2014/main" id="{542CA32F-221D-DD49-7091-4AFC3E421628}"/>
+                  </a:ext>
+                </a:extLst>
+              </p:cNvPr>
+              <p:cNvSpPr/>
+              <p:nvPr/>
+            </p:nvSpPr>
+            <p:spPr>
+              <a:xfrm>
+                <a:off x="9257758" y="2725380"/>
+                <a:ext cx="1164431" cy="242887"/>
+              </a:xfrm>
+              <a:prstGeom prst="roundRect">
+                <a:avLst>
+                  <a:gd name="adj" fmla="val 15547"/>
+                </a:avLst>
+              </a:prstGeom>
+              <a:solidFill>
+                <a:srgbClr val="CCD497"/>
+              </a:solidFill>
+              <a:ln w="19050">
+                <a:headEnd type="none" w="med" len="med"/>
+                <a:tailEnd type="none" w="med" len="med"/>
+              </a:ln>
+            </p:spPr>
+            <p:style>
+              <a:lnRef idx="2">
+                <a:schemeClr val="dk1"/>
+              </a:lnRef>
+              <a:fillRef idx="1">
+                <a:schemeClr val="lt1"/>
+              </a:fillRef>
+              <a:effectRef idx="0">
+                <a:schemeClr val="dk1"/>
+              </a:effectRef>
+              <a:fontRef idx="minor">
+                <a:schemeClr val="dk1"/>
+              </a:fontRef>
+            </p:style>
+            <p:txBody>
+              <a:bodyPr rtlCol="0" anchor="ctr"/>
+              <a:lstStyle/>
+              <a:p>
+                <a:pPr algn="ctr"/>
+                <a:endParaRPr lang="de-DE" sz="1100" noProof="1">
+                  <a:latin typeface="+mj-lt"/>
+                  <a:cs typeface="Arial" panose="020B0604020202020204" pitchFamily="34" charset="0"/>
+                </a:endParaRPr>
+              </a:p>
+            </p:txBody>
+          </p:sp>
+          <p:sp>
+            <p:nvSpPr>
+              <p:cNvPr id="80" name="Rectangle: Rounded Corners 79">
+                <a:extLst>
+                  <a:ext uri="{FF2B5EF4-FFF2-40B4-BE49-F238E27FC236}">
+                    <a16:creationId xmlns:a16="http://schemas.microsoft.com/office/drawing/2014/main" id="{83641231-252D-FDB3-0C23-5CDCCDA26F9E}"/>
+                  </a:ext>
+                </a:extLst>
+              </p:cNvPr>
+              <p:cNvSpPr/>
+              <p:nvPr/>
+            </p:nvSpPr>
+            <p:spPr>
+              <a:xfrm>
+                <a:off x="8969402" y="2652435"/>
+                <a:ext cx="1633537" cy="2910165"/>
+              </a:xfrm>
+              <a:prstGeom prst="roundRect">
+                <a:avLst>
+                  <a:gd name="adj" fmla="val 5838"/>
+                </a:avLst>
+              </a:prstGeom>
+              <a:noFill/>
+              <a:ln>
+                <a:headEnd type="none" w="med" len="med"/>
+                <a:tailEnd type="none" w="med" len="med"/>
+              </a:ln>
+            </p:spPr>
+            <p:style>
+              <a:lnRef idx="2">
+                <a:schemeClr val="dk1"/>
+              </a:lnRef>
+              <a:fillRef idx="1">
+                <a:schemeClr val="lt1"/>
+              </a:fillRef>
+              <a:effectRef idx="0">
+                <a:schemeClr val="dk1"/>
+              </a:effectRef>
+              <a:fontRef idx="minor">
+                <a:schemeClr val="dk1"/>
+              </a:fontRef>
+            </p:style>
+            <p:txBody>
+              <a:bodyPr rtlCol="0" anchor="ctr"/>
+              <a:lstStyle/>
+              <a:p>
+                <a:pPr algn="ctr"/>
+                <a:endParaRPr lang="en-GB"/>
+              </a:p>
+            </p:txBody>
+          </p:sp>
+          <p:sp>
+            <p:nvSpPr>
+              <p:cNvPr id="6" name="Rectangle: Rounded Corners 5">
+                <a:extLst>
+                  <a:ext uri="{FF2B5EF4-FFF2-40B4-BE49-F238E27FC236}">
+                    <a16:creationId xmlns:a16="http://schemas.microsoft.com/office/drawing/2014/main" id="{37E7B1D8-1BF8-FDFE-D966-2445914F8910}"/>
+                  </a:ext>
+                </a:extLst>
+              </p:cNvPr>
+              <p:cNvSpPr/>
+              <p:nvPr/>
+            </p:nvSpPr>
+            <p:spPr>
+              <a:xfrm>
+                <a:off x="9240864" y="5117743"/>
+                <a:ext cx="1164431" cy="242887"/>
+              </a:xfrm>
+              <a:prstGeom prst="roundRect">
+                <a:avLst>
+                  <a:gd name="adj" fmla="val 15547"/>
+                </a:avLst>
+              </a:prstGeom>
+              <a:solidFill>
+                <a:srgbClr val="CCD497"/>
+              </a:solidFill>
+              <a:ln w="19050">
+                <a:headEnd type="none" w="med" len="med"/>
+                <a:tailEnd type="none" w="med" len="med"/>
+              </a:ln>
+            </p:spPr>
+            <p:style>
+              <a:lnRef idx="2">
+                <a:schemeClr val="dk1"/>
+              </a:lnRef>
+              <a:fillRef idx="1">
+                <a:schemeClr val="lt1"/>
+              </a:fillRef>
+              <a:effectRef idx="0">
+                <a:schemeClr val="dk1"/>
+              </a:effectRef>
+              <a:fontRef idx="minor">
+                <a:schemeClr val="dk1"/>
+              </a:fontRef>
+            </p:style>
+            <p:txBody>
+              <a:bodyPr rtlCol="0" anchor="ctr"/>
+              <a:lstStyle/>
+              <a:p>
+                <a:pPr algn="ctr"/>
+                <a:endParaRPr lang="de-DE" sz="1100" noProof="1">
+                  <a:latin typeface="+mj-lt"/>
+                  <a:cs typeface="Arial" panose="020B0604020202020204" pitchFamily="34" charset="0"/>
+                </a:endParaRPr>
+              </a:p>
+            </p:txBody>
+          </p:sp>
+        </p:grpSp>
+        <p:sp>
+          <p:nvSpPr>
+            <p:cNvPr id="18" name="TextBox 17">
+              <a:extLst>
+                <a:ext uri="{FF2B5EF4-FFF2-40B4-BE49-F238E27FC236}">
+                  <a16:creationId xmlns:a16="http://schemas.microsoft.com/office/drawing/2014/main" id="{5F336B26-8B16-7823-45C3-15CFB7295479}"/>
+                </a:ext>
+              </a:extLst>
+            </p:cNvPr>
+            <p:cNvSpPr txBox="1"/>
+            <p:nvPr/>
+          </p:nvSpPr>
+          <p:spPr>
+            <a:xfrm>
+              <a:off x="2938463" y="4073525"/>
+              <a:ext cx="1143775" cy="369332"/>
+            </a:xfrm>
+            <a:prstGeom prst="rect">
+              <a:avLst/>
+            </a:prstGeom>
+            <a:noFill/>
+          </p:spPr>
+          <p:txBody>
+            <a:bodyPr wrap="none" rtlCol="0">
+              <a:spAutoFit/>
+            </a:bodyPr>
+            <a:lstStyle/>
+            <a:p>
+              <a:r>
+                <a:rPr lang="de-DE" dirty="0"/>
+                <a:t>Generator</a:t>
+              </a:r>
+              <a:endParaRPr lang="en-GB" dirty="0"/>
+            </a:p>
+          </p:txBody>
+        </p:sp>
+        <p:sp>
+          <p:nvSpPr>
+            <p:cNvPr id="229" name="TextBox 228">
+              <a:extLst>
+                <a:ext uri="{FF2B5EF4-FFF2-40B4-BE49-F238E27FC236}">
+                  <a16:creationId xmlns:a16="http://schemas.microsoft.com/office/drawing/2014/main" id="{40CB5ADD-0540-E6D3-5F0C-712C49407505}"/>
+                </a:ext>
+              </a:extLst>
+            </p:cNvPr>
+            <p:cNvSpPr txBox="1"/>
+            <p:nvPr/>
+          </p:nvSpPr>
+          <p:spPr>
+            <a:xfrm>
+              <a:off x="4776787" y="4078287"/>
+              <a:ext cx="1445076" cy="369332"/>
+            </a:xfrm>
+            <a:prstGeom prst="rect">
+              <a:avLst/>
+            </a:prstGeom>
+            <a:noFill/>
+          </p:spPr>
+          <p:txBody>
+            <a:bodyPr wrap="none" rtlCol="0">
+              <a:spAutoFit/>
+            </a:bodyPr>
+            <a:lstStyle/>
+            <a:p>
+              <a:r>
+                <a:rPr lang="de-DE" dirty="0" err="1"/>
+                <a:t>Discriminator</a:t>
+              </a:r>
+              <a:endParaRPr lang="en-GB" dirty="0"/>
+            </a:p>
+          </p:txBody>
+        </p:sp>
+        <p:sp>
+          <p:nvSpPr>
+            <p:cNvPr id="230" name="TextBox 229">
+              <a:extLst>
+                <a:ext uri="{FF2B5EF4-FFF2-40B4-BE49-F238E27FC236}">
+                  <a16:creationId xmlns:a16="http://schemas.microsoft.com/office/drawing/2014/main" id="{BDF876BA-D339-4B53-D461-93A77EEE3D86}"/>
+                </a:ext>
+              </a:extLst>
+            </p:cNvPr>
+            <p:cNvSpPr txBox="1"/>
+            <p:nvPr/>
+          </p:nvSpPr>
+          <p:spPr>
+            <a:xfrm>
+              <a:off x="827087" y="2676525"/>
+              <a:ext cx="498855" cy="369332"/>
+            </a:xfrm>
+            <a:prstGeom prst="rect">
+              <a:avLst/>
+            </a:prstGeom>
+            <a:noFill/>
+          </p:spPr>
+          <p:txBody>
+            <a:bodyPr wrap="none" rtlCol="0">
+              <a:spAutoFit/>
+            </a:bodyPr>
+            <a:lstStyle/>
+            <a:p>
+              <a:r>
+                <a:rPr lang="de-DE" dirty="0" err="1"/>
+                <a:t>the</a:t>
+              </a:r>
+              <a:endParaRPr lang="en-GB" dirty="0"/>
+            </a:p>
+          </p:txBody>
+        </p:sp>
+        <p:sp>
+          <p:nvSpPr>
+            <p:cNvPr id="231" name="TextBox 230">
+              <a:extLst>
+                <a:ext uri="{FF2B5EF4-FFF2-40B4-BE49-F238E27FC236}">
+                  <a16:creationId xmlns:a16="http://schemas.microsoft.com/office/drawing/2014/main" id="{FBEA45D8-D738-696D-BD58-566FF923A38A}"/>
+                </a:ext>
+              </a:extLst>
+            </p:cNvPr>
+            <p:cNvSpPr txBox="1"/>
+            <p:nvPr/>
+          </p:nvSpPr>
+          <p:spPr>
+            <a:xfrm>
+              <a:off x="1971676" y="2676525"/>
+              <a:ext cx="1990160" cy="369332"/>
+            </a:xfrm>
+            <a:prstGeom prst="rect">
+              <a:avLst/>
+            </a:prstGeom>
+            <a:noFill/>
+          </p:spPr>
+          <p:txBody>
+            <a:bodyPr wrap="none" rtlCol="0">
+              <a:spAutoFit/>
+            </a:bodyPr>
+            <a:lstStyle/>
+            <a:p>
+              <a:r>
+                <a:rPr lang="de-DE" dirty="0"/>
+                <a:t>$\</a:t>
+              </a:r>
+              <a:r>
+                <a:rPr lang="de-DE" dirty="0" err="1"/>
+                <a:t>mathtt</a:t>
+              </a:r>
+              <a:r>
+                <a:rPr lang="de-DE" dirty="0"/>
+                <a:t>{[MASK]}$</a:t>
+              </a:r>
+              <a:endParaRPr lang="en-GB" dirty="0"/>
+            </a:p>
+          </p:txBody>
+        </p:sp>
+        <p:cxnSp>
+          <p:nvCxnSpPr>
+            <p:cNvPr id="235" name="Straight Arrow Connector 234">
+              <a:extLst>
+                <a:ext uri="{FF2B5EF4-FFF2-40B4-BE49-F238E27FC236}">
+                  <a16:creationId xmlns:a16="http://schemas.microsoft.com/office/drawing/2014/main" id="{C3DA3678-3D95-A41B-A9D2-02227709CA69}"/>
+                </a:ext>
+              </a:extLst>
+            </p:cNvPr>
+            <p:cNvCxnSpPr>
+              <a:cxnSpLocks/>
+            </p:cNvCxnSpPr>
+            <p:nvPr/>
+          </p:nvCxnSpPr>
+          <p:spPr>
+            <a:xfrm>
+              <a:off x="1614488" y="2881313"/>
+              <a:ext cx="357187" cy="0"/>
+            </a:xfrm>
+            <a:prstGeom prst="straightConnector1">
+              <a:avLst/>
+            </a:prstGeom>
+            <a:ln w="12700">
+              <a:solidFill>
+                <a:schemeClr val="tx1"/>
+              </a:solidFill>
+              <a:tailEnd type="triangle"/>
+            </a:ln>
+          </p:spPr>
+          <p:style>
+            <a:lnRef idx="1">
+              <a:schemeClr val="dk1"/>
+            </a:lnRef>
+            <a:fillRef idx="0">
+              <a:schemeClr val="dk1"/>
+            </a:fillRef>
+            <a:effectRef idx="0">
+              <a:schemeClr val="dk1"/>
+            </a:effectRef>
+            <a:fontRef idx="minor">
+              <a:schemeClr val="tx1"/>
+            </a:fontRef>
+          </p:style>
+        </p:cxnSp>
+        <p:grpSp>
+          <p:nvGrpSpPr>
+            <p:cNvPr id="238" name="Group 237">
+              <a:extLst>
+                <a:ext uri="{FF2B5EF4-FFF2-40B4-BE49-F238E27FC236}">
+                  <a16:creationId xmlns:a16="http://schemas.microsoft.com/office/drawing/2014/main" id="{F480E401-07C9-A65C-382E-9DDFFDDCDE46}"/>
+                </a:ext>
+              </a:extLst>
+            </p:cNvPr>
+            <p:cNvGrpSpPr/>
+            <p:nvPr/>
+          </p:nvGrpSpPr>
+          <p:grpSpPr>
+            <a:xfrm>
+              <a:off x="5060386" y="2767305"/>
+              <a:ext cx="650726" cy="1159276"/>
+              <a:chOff x="8969402" y="2652435"/>
+              <a:chExt cx="1633537" cy="2910165"/>
+            </a:xfrm>
+          </p:grpSpPr>
+          <p:sp>
+            <p:nvSpPr>
+              <p:cNvPr id="239" name="Rectangle: Rounded Corners 238">
+                <a:extLst>
+                  <a:ext uri="{FF2B5EF4-FFF2-40B4-BE49-F238E27FC236}">
+                    <a16:creationId xmlns:a16="http://schemas.microsoft.com/office/drawing/2014/main" id="{731CB360-1528-E1CB-9AA3-A43C56DD8090}"/>
+                  </a:ext>
+                </a:extLst>
+              </p:cNvPr>
+              <p:cNvSpPr/>
+              <p:nvPr/>
+            </p:nvSpPr>
+            <p:spPr>
+              <a:xfrm>
+                <a:off x="9244198" y="4357197"/>
+                <a:ext cx="1159670" cy="458984"/>
+              </a:xfrm>
+              <a:prstGeom prst="roundRect">
+                <a:avLst>
+                  <a:gd name="adj" fmla="val 15547"/>
+                </a:avLst>
+              </a:prstGeom>
+              <a:solidFill>
+                <a:srgbClr val="EFABAA"/>
+              </a:solidFill>
+              <a:ln w="19050">
+                <a:headEnd type="none" w="med" len="med"/>
+                <a:tailEnd type="none" w="med" len="med"/>
+              </a:ln>
+            </p:spPr>
+            <p:style>
+              <a:lnRef idx="2">
+                <a:schemeClr val="dk1"/>
+              </a:lnRef>
+              <a:fillRef idx="1">
+                <a:schemeClr val="lt1"/>
+              </a:fillRef>
+              <a:effectRef idx="0">
+                <a:schemeClr val="dk1"/>
+              </a:effectRef>
+              <a:fontRef idx="minor">
+                <a:schemeClr val="dk1"/>
+              </a:fontRef>
+            </p:style>
+            <p:txBody>
+              <a:bodyPr lIns="0" rIns="0" rtlCol="0" anchor="ctr"/>
+              <a:lstStyle/>
+              <a:p>
+                <a:pPr algn="ctr"/>
+                <a:endParaRPr lang="de-DE" sz="1200" noProof="1">
+                  <a:latin typeface="+mj-lt"/>
+                  <a:cs typeface="Arial" panose="020B0604020202020204" pitchFamily="34" charset="0"/>
+                </a:endParaRPr>
+              </a:p>
+            </p:txBody>
+          </p:sp>
+          <p:sp>
+            <p:nvSpPr>
+              <p:cNvPr id="240" name="Rectangle: Rounded Corners 239">
+                <a:extLst>
+                  <a:ext uri="{FF2B5EF4-FFF2-40B4-BE49-F238E27FC236}">
+                    <a16:creationId xmlns:a16="http://schemas.microsoft.com/office/drawing/2014/main" id="{58EA490F-2ADC-437C-2E12-82586401378D}"/>
+                  </a:ext>
+                </a:extLst>
+              </p:cNvPr>
+              <p:cNvSpPr/>
+              <p:nvPr/>
+            </p:nvSpPr>
+            <p:spPr>
+              <a:xfrm>
+                <a:off x="9257759" y="3828429"/>
+                <a:ext cx="1164432" cy="242887"/>
+              </a:xfrm>
+              <a:prstGeom prst="roundRect">
+                <a:avLst>
+                  <a:gd name="adj" fmla="val 15547"/>
+                </a:avLst>
+              </a:prstGeom>
+              <a:solidFill>
+                <a:srgbClr val="CCD497"/>
+              </a:solidFill>
+              <a:ln w="19050">
+                <a:headEnd type="none" w="med" len="med"/>
+                <a:tailEnd type="none" w="med" len="med"/>
+              </a:ln>
+            </p:spPr>
+            <p:style>
+              <a:lnRef idx="2">
+                <a:schemeClr val="dk1"/>
+              </a:lnRef>
+              <a:fillRef idx="1">
+                <a:schemeClr val="lt1"/>
+              </a:fillRef>
+              <a:effectRef idx="0">
+                <a:schemeClr val="dk1"/>
+              </a:effectRef>
+              <a:fontRef idx="minor">
+                <a:schemeClr val="dk1"/>
+              </a:fontRef>
+            </p:style>
+            <p:txBody>
+              <a:bodyPr rtlCol="0" anchor="ctr"/>
+              <a:lstStyle/>
+              <a:p>
+                <a:pPr algn="ctr"/>
+                <a:endParaRPr lang="de-DE" sz="1100" noProof="1">
+                  <a:latin typeface="+mj-lt"/>
+                  <a:cs typeface="Arial" panose="020B0604020202020204" pitchFamily="34" charset="0"/>
+                </a:endParaRPr>
+              </a:p>
+            </p:txBody>
+          </p:sp>
+          <p:sp>
+            <p:nvSpPr>
+              <p:cNvPr id="243" name="Rectangle: Rounded Corners 242">
+                <a:extLst>
+                  <a:ext uri="{FF2B5EF4-FFF2-40B4-BE49-F238E27FC236}">
+                    <a16:creationId xmlns:a16="http://schemas.microsoft.com/office/drawing/2014/main" id="{96A5131F-4926-742B-2CDA-3FDAF0530C35}"/>
+                  </a:ext>
+                </a:extLst>
+              </p:cNvPr>
+              <p:cNvSpPr/>
+              <p:nvPr/>
+            </p:nvSpPr>
+            <p:spPr>
+              <a:xfrm>
+                <a:off x="9241818" y="3265058"/>
+                <a:ext cx="1164432" cy="329011"/>
+              </a:xfrm>
+              <a:prstGeom prst="roundRect">
+                <a:avLst>
+                  <a:gd name="adj" fmla="val 15547"/>
+                </a:avLst>
+              </a:prstGeom>
+              <a:solidFill>
+                <a:srgbClr val="A8D1EE"/>
+              </a:solidFill>
+              <a:ln w="19050">
+                <a:headEnd type="none" w="med" len="med"/>
+                <a:tailEnd type="none" w="med" len="med"/>
+              </a:ln>
+            </p:spPr>
+            <p:style>
+              <a:lnRef idx="2">
+                <a:schemeClr val="dk1"/>
+              </a:lnRef>
+              <a:fillRef idx="1">
+                <a:schemeClr val="lt1"/>
+              </a:fillRef>
+              <a:effectRef idx="0">
+                <a:schemeClr val="dk1"/>
+              </a:effectRef>
+              <a:fontRef idx="minor">
+                <a:schemeClr val="dk1"/>
+              </a:fontRef>
+            </p:style>
+            <p:txBody>
+              <a:bodyPr rtlCol="0" anchor="ctr"/>
+              <a:lstStyle/>
+              <a:p>
+                <a:pPr algn="ctr"/>
+                <a:endParaRPr lang="de-DE" sz="1100" noProof="1">
+                  <a:latin typeface="+mj-lt"/>
+                  <a:cs typeface="Arial" panose="020B0604020202020204" pitchFamily="34" charset="0"/>
+                </a:endParaRPr>
+              </a:p>
+            </p:txBody>
+          </p:sp>
+          <p:sp>
+            <p:nvSpPr>
+              <p:cNvPr id="244" name="Rectangle: Rounded Corners 243">
+                <a:extLst>
+                  <a:ext uri="{FF2B5EF4-FFF2-40B4-BE49-F238E27FC236}">
+                    <a16:creationId xmlns:a16="http://schemas.microsoft.com/office/drawing/2014/main" id="{B00CBD93-4C47-43AA-5B94-FA07E509EAFC}"/>
+                  </a:ext>
+                </a:extLst>
+              </p:cNvPr>
+              <p:cNvSpPr/>
+              <p:nvPr/>
+            </p:nvSpPr>
+            <p:spPr>
+              <a:xfrm>
+                <a:off x="9257758" y="2725380"/>
+                <a:ext cx="1164431" cy="242887"/>
+              </a:xfrm>
+              <a:prstGeom prst="roundRect">
+                <a:avLst>
+                  <a:gd name="adj" fmla="val 15547"/>
+                </a:avLst>
+              </a:prstGeom>
+              <a:solidFill>
+                <a:srgbClr val="CCD497"/>
+              </a:solidFill>
+              <a:ln w="19050">
+                <a:headEnd type="none" w="med" len="med"/>
+                <a:tailEnd type="none" w="med" len="med"/>
+              </a:ln>
+            </p:spPr>
+            <p:style>
+              <a:lnRef idx="2">
+                <a:schemeClr val="dk1"/>
+              </a:lnRef>
+              <a:fillRef idx="1">
+                <a:schemeClr val="lt1"/>
+              </a:fillRef>
+              <a:effectRef idx="0">
+                <a:schemeClr val="dk1"/>
+              </a:effectRef>
+              <a:fontRef idx="minor">
+                <a:schemeClr val="dk1"/>
+              </a:fontRef>
+            </p:style>
+            <p:txBody>
+              <a:bodyPr rtlCol="0" anchor="ctr"/>
+              <a:lstStyle/>
+              <a:p>
+                <a:pPr algn="ctr"/>
+                <a:endParaRPr lang="de-DE" sz="1100" noProof="1">
+                  <a:latin typeface="+mj-lt"/>
+                  <a:cs typeface="Arial" panose="020B0604020202020204" pitchFamily="34" charset="0"/>
+                </a:endParaRPr>
+              </a:p>
+            </p:txBody>
+          </p:sp>
+          <p:sp>
+            <p:nvSpPr>
+              <p:cNvPr id="245" name="Rectangle: Rounded Corners 244">
+                <a:extLst>
+                  <a:ext uri="{FF2B5EF4-FFF2-40B4-BE49-F238E27FC236}">
+                    <a16:creationId xmlns:a16="http://schemas.microsoft.com/office/drawing/2014/main" id="{6C7C1B0E-C140-27FB-F2F0-F396C070CD3D}"/>
+                  </a:ext>
+                </a:extLst>
+              </p:cNvPr>
+              <p:cNvSpPr/>
+              <p:nvPr/>
+            </p:nvSpPr>
+            <p:spPr>
+              <a:xfrm>
+                <a:off x="8969402" y="2652435"/>
+                <a:ext cx="1633537" cy="2910165"/>
+              </a:xfrm>
+              <a:prstGeom prst="roundRect">
+                <a:avLst>
+                  <a:gd name="adj" fmla="val 5838"/>
+                </a:avLst>
+              </a:prstGeom>
+              <a:noFill/>
+              <a:ln>
+                <a:headEnd type="none" w="med" len="med"/>
+                <a:tailEnd type="none" w="med" len="med"/>
+              </a:ln>
+            </p:spPr>
+            <p:style>
+              <a:lnRef idx="2">
+                <a:schemeClr val="dk1"/>
+              </a:lnRef>
+              <a:fillRef idx="1">
+                <a:schemeClr val="lt1"/>
+              </a:fillRef>
+              <a:effectRef idx="0">
+                <a:schemeClr val="dk1"/>
+              </a:effectRef>
+              <a:fontRef idx="minor">
+                <a:schemeClr val="dk1"/>
+              </a:fontRef>
+            </p:style>
+            <p:txBody>
+              <a:bodyPr rtlCol="0" anchor="ctr"/>
+              <a:lstStyle/>
+              <a:p>
+                <a:pPr algn="ctr"/>
+                <a:endParaRPr lang="en-GB"/>
+              </a:p>
+            </p:txBody>
+          </p:sp>
+          <p:sp>
+            <p:nvSpPr>
+              <p:cNvPr id="246" name="Rectangle: Rounded Corners 245">
+                <a:extLst>
+                  <a:ext uri="{FF2B5EF4-FFF2-40B4-BE49-F238E27FC236}">
+                    <a16:creationId xmlns:a16="http://schemas.microsoft.com/office/drawing/2014/main" id="{7EBA5B1C-50E5-C80F-7362-E81AFFAB887D}"/>
+                  </a:ext>
+                </a:extLst>
+              </p:cNvPr>
+              <p:cNvSpPr/>
+              <p:nvPr/>
+            </p:nvSpPr>
+            <p:spPr>
+              <a:xfrm>
+                <a:off x="9240864" y="5117743"/>
+                <a:ext cx="1164431" cy="242887"/>
+              </a:xfrm>
+              <a:prstGeom prst="roundRect">
+                <a:avLst>
+                  <a:gd name="adj" fmla="val 15547"/>
+                </a:avLst>
+              </a:prstGeom>
+              <a:solidFill>
+                <a:srgbClr val="CCD497"/>
+              </a:solidFill>
+              <a:ln w="19050">
+                <a:headEnd type="none" w="med" len="med"/>
+                <a:tailEnd type="none" w="med" len="med"/>
+              </a:ln>
+            </p:spPr>
+            <p:style>
+              <a:lnRef idx="2">
+                <a:schemeClr val="dk1"/>
+              </a:lnRef>
+              <a:fillRef idx="1">
+                <a:schemeClr val="lt1"/>
+              </a:fillRef>
+              <a:effectRef idx="0">
+                <a:schemeClr val="dk1"/>
+              </a:effectRef>
+              <a:fontRef idx="minor">
+                <a:schemeClr val="dk1"/>
+              </a:fontRef>
+            </p:style>
+            <p:txBody>
+              <a:bodyPr rtlCol="0" anchor="ctr"/>
+              <a:lstStyle/>
+              <a:p>
+                <a:pPr algn="ctr"/>
+                <a:endParaRPr lang="de-DE" sz="1100" noProof="1">
+                  <a:latin typeface="+mj-lt"/>
+                  <a:cs typeface="Arial" panose="020B0604020202020204" pitchFamily="34" charset="0"/>
+                </a:endParaRPr>
+              </a:p>
+            </p:txBody>
+          </p:sp>
+        </p:grpSp>
+        <p:cxnSp>
+          <p:nvCxnSpPr>
+            <p:cNvPr id="247" name="Straight Arrow Connector 246">
+              <a:extLst>
+                <a:ext uri="{FF2B5EF4-FFF2-40B4-BE49-F238E27FC236}">
+                  <a16:creationId xmlns:a16="http://schemas.microsoft.com/office/drawing/2014/main" id="{B57F3CDD-AC70-F737-8C91-716AC2ADE388}"/>
+                </a:ext>
+              </a:extLst>
+            </p:cNvPr>
+            <p:cNvCxnSpPr>
+              <a:cxnSpLocks/>
+            </p:cNvCxnSpPr>
+            <p:nvPr/>
+          </p:nvCxnSpPr>
+          <p:spPr>
+            <a:xfrm>
+              <a:off x="2786063" y="2886075"/>
+              <a:ext cx="357187" cy="0"/>
+            </a:xfrm>
+            <a:prstGeom prst="straightConnector1">
+              <a:avLst/>
+            </a:prstGeom>
+            <a:ln w="12700">
+              <a:solidFill>
+                <a:schemeClr val="tx1"/>
+              </a:solidFill>
+              <a:tailEnd type="triangle"/>
+            </a:ln>
+          </p:spPr>
+          <p:style>
+            <a:lnRef idx="1">
+              <a:schemeClr val="dk1"/>
+            </a:lnRef>
+            <a:fillRef idx="0">
+              <a:schemeClr val="dk1"/>
+            </a:fillRef>
+            <a:effectRef idx="0">
+              <a:schemeClr val="dk1"/>
+            </a:effectRef>
+            <a:fontRef idx="minor">
+              <a:schemeClr val="tx1"/>
+            </a:fontRef>
+          </p:style>
+        </p:cxnSp>
+        <p:sp>
+          <p:nvSpPr>
+            <p:cNvPr id="248" name="TextBox 247">
+              <a:extLst>
+                <a:ext uri="{FF2B5EF4-FFF2-40B4-BE49-F238E27FC236}">
+                  <a16:creationId xmlns:a16="http://schemas.microsoft.com/office/drawing/2014/main" id="{6AF29941-846E-C683-4567-93F5FD136B64}"/>
+                </a:ext>
+              </a:extLst>
+            </p:cNvPr>
+            <p:cNvSpPr txBox="1"/>
+            <p:nvPr/>
+          </p:nvSpPr>
+          <p:spPr>
+            <a:xfrm>
+              <a:off x="4143376" y="2695575"/>
+              <a:ext cx="498855" cy="369332"/>
+            </a:xfrm>
+            <a:prstGeom prst="rect">
+              <a:avLst/>
+            </a:prstGeom>
+            <a:noFill/>
+          </p:spPr>
+          <p:txBody>
+            <a:bodyPr wrap="none" rtlCol="0">
+              <a:spAutoFit/>
+            </a:bodyPr>
+            <a:lstStyle/>
+            <a:p>
+              <a:r>
+                <a:rPr lang="de-DE" dirty="0" err="1"/>
+                <a:t>the</a:t>
+              </a:r>
+              <a:endParaRPr lang="en-GB" dirty="0"/>
+            </a:p>
+          </p:txBody>
+        </p:sp>
+        <p:cxnSp>
+          <p:nvCxnSpPr>
+            <p:cNvPr id="250" name="Straight Arrow Connector 249">
+              <a:extLst>
+                <a:ext uri="{FF2B5EF4-FFF2-40B4-BE49-F238E27FC236}">
+                  <a16:creationId xmlns:a16="http://schemas.microsoft.com/office/drawing/2014/main" id="{59F29DE5-486E-BFE9-4847-43007836CB38}"/>
+                </a:ext>
+              </a:extLst>
+            </p:cNvPr>
+            <p:cNvCxnSpPr>
+              <a:cxnSpLocks/>
+            </p:cNvCxnSpPr>
+            <p:nvPr/>
+          </p:nvCxnSpPr>
+          <p:spPr>
+            <a:xfrm>
+              <a:off x="3857626" y="2900363"/>
+              <a:ext cx="357187" cy="0"/>
+            </a:xfrm>
+            <a:prstGeom prst="straightConnector1">
+              <a:avLst/>
+            </a:prstGeom>
+            <a:ln w="12700">
+              <a:solidFill>
+                <a:schemeClr val="tx1"/>
+              </a:solidFill>
+              <a:prstDash val="dash"/>
+              <a:tailEnd type="triangle"/>
+            </a:ln>
+          </p:spPr>
+          <p:style>
+            <a:lnRef idx="1">
+              <a:schemeClr val="dk1"/>
+            </a:lnRef>
+            <a:fillRef idx="0">
+              <a:schemeClr val="dk1"/>
+            </a:fillRef>
+            <a:effectRef idx="0">
+              <a:schemeClr val="dk1"/>
+            </a:effectRef>
+            <a:fontRef idx="minor">
+              <a:schemeClr val="tx1"/>
+            </a:fontRef>
+          </p:style>
+        </p:cxnSp>
+        <p:cxnSp>
+          <p:nvCxnSpPr>
+            <p:cNvPr id="251" name="Straight Arrow Connector 250">
+              <a:extLst>
+                <a:ext uri="{FF2B5EF4-FFF2-40B4-BE49-F238E27FC236}">
+                  <a16:creationId xmlns:a16="http://schemas.microsoft.com/office/drawing/2014/main" id="{4A209874-1154-FD9C-DD63-118CF294F905}"/>
+                </a:ext>
+              </a:extLst>
+            </p:cNvPr>
+            <p:cNvCxnSpPr>
+              <a:cxnSpLocks/>
+            </p:cNvCxnSpPr>
+            <p:nvPr/>
+          </p:nvCxnSpPr>
+          <p:spPr>
+            <a:xfrm>
+              <a:off x="4705351" y="2905125"/>
+              <a:ext cx="357187" cy="0"/>
+            </a:xfrm>
+            <a:prstGeom prst="straightConnector1">
+              <a:avLst/>
+            </a:prstGeom>
+            <a:ln w="12700">
+              <a:solidFill>
+                <a:schemeClr val="tx1"/>
+              </a:solidFill>
+              <a:tailEnd type="triangle"/>
+            </a:ln>
+          </p:spPr>
+          <p:style>
+            <a:lnRef idx="1">
+              <a:schemeClr val="dk1"/>
+            </a:lnRef>
+            <a:fillRef idx="0">
+              <a:schemeClr val="dk1"/>
+            </a:fillRef>
+            <a:effectRef idx="0">
+              <a:schemeClr val="dk1"/>
+            </a:effectRef>
+            <a:fontRef idx="minor">
+              <a:schemeClr val="tx1"/>
+            </a:fontRef>
+          </p:style>
+        </p:cxnSp>
+        <p:cxnSp>
+          <p:nvCxnSpPr>
+            <p:cNvPr id="252" name="Straight Arrow Connector 251">
+              <a:extLst>
+                <a:ext uri="{FF2B5EF4-FFF2-40B4-BE49-F238E27FC236}">
+                  <a16:creationId xmlns:a16="http://schemas.microsoft.com/office/drawing/2014/main" id="{242EB6C1-D759-C004-77B6-FBD486BBDB2F}"/>
+                </a:ext>
+              </a:extLst>
+            </p:cNvPr>
+            <p:cNvCxnSpPr>
+              <a:cxnSpLocks/>
+            </p:cNvCxnSpPr>
+            <p:nvPr/>
+          </p:nvCxnSpPr>
+          <p:spPr>
+            <a:xfrm>
+              <a:off x="5710238" y="2919413"/>
+              <a:ext cx="357187" cy="0"/>
+            </a:xfrm>
+            <a:prstGeom prst="straightConnector1">
+              <a:avLst/>
+            </a:prstGeom>
+            <a:ln w="12700">
+              <a:solidFill>
+                <a:schemeClr val="tx1"/>
+              </a:solidFill>
+              <a:tailEnd type="triangle"/>
+            </a:ln>
+          </p:spPr>
+          <p:style>
+            <a:lnRef idx="1">
+              <a:schemeClr val="dk1"/>
+            </a:lnRef>
+            <a:fillRef idx="0">
+              <a:schemeClr val="dk1"/>
+            </a:fillRef>
+            <a:effectRef idx="0">
+              <a:schemeClr val="dk1"/>
+            </a:effectRef>
+            <a:fontRef idx="minor">
+              <a:schemeClr val="tx1"/>
+            </a:fontRef>
+          </p:style>
+        </p:cxnSp>
+        <p:sp>
+          <p:nvSpPr>
+            <p:cNvPr id="253" name="TextBox 252">
+              <a:extLst>
+                <a:ext uri="{FF2B5EF4-FFF2-40B4-BE49-F238E27FC236}">
+                  <a16:creationId xmlns:a16="http://schemas.microsoft.com/office/drawing/2014/main" id="{EC5DEF8F-3AC9-983D-49B4-7733921FBA6E}"/>
+                </a:ext>
+              </a:extLst>
+            </p:cNvPr>
+            <p:cNvSpPr txBox="1"/>
+            <p:nvPr/>
+          </p:nvSpPr>
+          <p:spPr>
+            <a:xfrm>
+              <a:off x="6005513" y="2728913"/>
+              <a:ext cx="886781" cy="369332"/>
+            </a:xfrm>
+            <a:prstGeom prst="rect">
+              <a:avLst/>
+            </a:prstGeom>
+            <a:noFill/>
+          </p:spPr>
+          <p:txBody>
+            <a:bodyPr wrap="none" rtlCol="0">
+              <a:spAutoFit/>
+            </a:bodyPr>
+            <a:lstStyle/>
+            <a:p>
+              <a:r>
+                <a:rPr lang="de-DE" dirty="0"/>
+                <a:t>original</a:t>
+              </a:r>
+              <a:endParaRPr lang="en-GB" dirty="0"/>
+            </a:p>
+          </p:txBody>
+        </p:sp>
+        <p:sp>
+          <p:nvSpPr>
+            <p:cNvPr id="254" name="TextBox 253">
+              <a:extLst>
+                <a:ext uri="{FF2B5EF4-FFF2-40B4-BE49-F238E27FC236}">
+                  <a16:creationId xmlns:a16="http://schemas.microsoft.com/office/drawing/2014/main" id="{2712C93F-92CB-FE3F-85BB-A70AFD230B66}"/>
+                </a:ext>
+              </a:extLst>
+            </p:cNvPr>
+            <p:cNvSpPr txBox="1"/>
+            <p:nvPr/>
+          </p:nvSpPr>
+          <p:spPr>
+            <a:xfrm>
+              <a:off x="803275" y="2881312"/>
+              <a:ext cx="588174" cy="369332"/>
+            </a:xfrm>
+            <a:prstGeom prst="rect">
+              <a:avLst/>
+            </a:prstGeom>
+            <a:noFill/>
+          </p:spPr>
+          <p:txBody>
+            <a:bodyPr wrap="none" rtlCol="0">
+              <a:spAutoFit/>
+            </a:bodyPr>
+            <a:lstStyle/>
+            <a:p>
+              <a:r>
+                <a:rPr lang="de-DE" dirty="0" err="1"/>
+                <a:t>chef</a:t>
+              </a:r>
+              <a:endParaRPr lang="en-GB" dirty="0"/>
+            </a:p>
+          </p:txBody>
+        </p:sp>
+        <p:sp>
+          <p:nvSpPr>
+            <p:cNvPr id="32" name="TextBox 31">
+              <a:extLst>
+                <a:ext uri="{FF2B5EF4-FFF2-40B4-BE49-F238E27FC236}">
+                  <a16:creationId xmlns:a16="http://schemas.microsoft.com/office/drawing/2014/main" id="{217921D7-1AFF-38E6-8C8D-79EE8D6165D2}"/>
+                </a:ext>
+              </a:extLst>
+            </p:cNvPr>
+            <p:cNvSpPr txBox="1"/>
+            <p:nvPr/>
+          </p:nvSpPr>
+          <p:spPr>
+            <a:xfrm>
+              <a:off x="1976437" y="2876550"/>
+              <a:ext cx="588174" cy="369332"/>
+            </a:xfrm>
+            <a:prstGeom prst="rect">
+              <a:avLst/>
+            </a:prstGeom>
+            <a:noFill/>
+          </p:spPr>
+          <p:txBody>
+            <a:bodyPr wrap="none" rtlCol="0">
+              <a:spAutoFit/>
+            </a:bodyPr>
+            <a:lstStyle/>
+            <a:p>
+              <a:r>
+                <a:rPr lang="de-DE" dirty="0" err="1"/>
+                <a:t>chef</a:t>
+              </a:r>
+              <a:endParaRPr lang="en-GB" dirty="0"/>
+            </a:p>
+          </p:txBody>
+        </p:sp>
+        <p:cxnSp>
+          <p:nvCxnSpPr>
+            <p:cNvPr id="33" name="Straight Arrow Connector 32">
+              <a:extLst>
+                <a:ext uri="{FF2B5EF4-FFF2-40B4-BE49-F238E27FC236}">
+                  <a16:creationId xmlns:a16="http://schemas.microsoft.com/office/drawing/2014/main" id="{5DD08E79-440E-6EFD-DEB6-FFF662C82D80}"/>
+                </a:ext>
+              </a:extLst>
+            </p:cNvPr>
+            <p:cNvCxnSpPr>
+              <a:cxnSpLocks/>
+            </p:cNvCxnSpPr>
+            <p:nvPr/>
+          </p:nvCxnSpPr>
+          <p:spPr>
+            <a:xfrm>
+              <a:off x="1609725" y="3090863"/>
+              <a:ext cx="357187" cy="0"/>
+            </a:xfrm>
+            <a:prstGeom prst="straightConnector1">
+              <a:avLst/>
+            </a:prstGeom>
+            <a:ln w="12700">
+              <a:solidFill>
+                <a:schemeClr val="tx1"/>
+              </a:solidFill>
+              <a:tailEnd type="triangle"/>
+            </a:ln>
+          </p:spPr>
+          <p:style>
+            <a:lnRef idx="1">
+              <a:schemeClr val="dk1"/>
+            </a:lnRef>
+            <a:fillRef idx="0">
+              <a:schemeClr val="dk1"/>
+            </a:fillRef>
+            <a:effectRef idx="0">
+              <a:schemeClr val="dk1"/>
+            </a:effectRef>
+            <a:fontRef idx="minor">
+              <a:schemeClr val="tx1"/>
+            </a:fontRef>
+          </p:style>
+        </p:cxnSp>
+        <p:cxnSp>
+          <p:nvCxnSpPr>
+            <p:cNvPr id="34" name="Straight Arrow Connector 33">
+              <a:extLst>
+                <a:ext uri="{FF2B5EF4-FFF2-40B4-BE49-F238E27FC236}">
+                  <a16:creationId xmlns:a16="http://schemas.microsoft.com/office/drawing/2014/main" id="{67DF4F7C-E0D4-F9FD-2D44-3DE3E954C809}"/>
+                </a:ext>
+              </a:extLst>
+            </p:cNvPr>
+            <p:cNvCxnSpPr>
+              <a:cxnSpLocks/>
+            </p:cNvCxnSpPr>
+            <p:nvPr/>
+          </p:nvCxnSpPr>
+          <p:spPr>
+            <a:xfrm>
+              <a:off x="2781300" y="3095625"/>
+              <a:ext cx="357187" cy="0"/>
+            </a:xfrm>
+            <a:prstGeom prst="straightConnector1">
+              <a:avLst/>
+            </a:prstGeom>
+            <a:ln w="12700">
+              <a:solidFill>
+                <a:schemeClr val="tx1"/>
+              </a:solidFill>
+              <a:tailEnd type="triangle"/>
+            </a:ln>
+          </p:spPr>
+          <p:style>
+            <a:lnRef idx="1">
+              <a:schemeClr val="dk1"/>
+            </a:lnRef>
+            <a:fillRef idx="0">
+              <a:schemeClr val="dk1"/>
+            </a:fillRef>
+            <a:effectRef idx="0">
+              <a:schemeClr val="dk1"/>
+            </a:effectRef>
+            <a:fontRef idx="minor">
+              <a:schemeClr val="tx1"/>
+            </a:fontRef>
+          </p:style>
+        </p:cxnSp>
+        <p:sp>
+          <p:nvSpPr>
+            <p:cNvPr id="35" name="TextBox 34">
+              <a:extLst>
+                <a:ext uri="{FF2B5EF4-FFF2-40B4-BE49-F238E27FC236}">
+                  <a16:creationId xmlns:a16="http://schemas.microsoft.com/office/drawing/2014/main" id="{15BAAEA6-2D12-98BE-1FFC-5E23C675AFBB}"/>
+                </a:ext>
+              </a:extLst>
+            </p:cNvPr>
+            <p:cNvSpPr txBox="1"/>
+            <p:nvPr/>
+          </p:nvSpPr>
+          <p:spPr>
+            <a:xfrm>
+              <a:off x="4133850" y="2909888"/>
+              <a:ext cx="588174" cy="369332"/>
+            </a:xfrm>
+            <a:prstGeom prst="rect">
+              <a:avLst/>
+            </a:prstGeom>
+            <a:noFill/>
+          </p:spPr>
+          <p:txBody>
+            <a:bodyPr wrap="none" rtlCol="0">
+              <a:spAutoFit/>
+            </a:bodyPr>
+            <a:lstStyle/>
+            <a:p>
+              <a:r>
+                <a:rPr lang="de-DE" dirty="0" err="1"/>
+                <a:t>chef</a:t>
+              </a:r>
+              <a:endParaRPr lang="en-GB" dirty="0"/>
+            </a:p>
+          </p:txBody>
+        </p:sp>
+        <p:cxnSp>
+          <p:nvCxnSpPr>
+            <p:cNvPr id="37" name="Straight Arrow Connector 36">
+              <a:extLst>
+                <a:ext uri="{FF2B5EF4-FFF2-40B4-BE49-F238E27FC236}">
+                  <a16:creationId xmlns:a16="http://schemas.microsoft.com/office/drawing/2014/main" id="{3CA0507A-2302-3D0E-E9A0-34003CF1E055}"/>
+                </a:ext>
+              </a:extLst>
+            </p:cNvPr>
+            <p:cNvCxnSpPr>
+              <a:cxnSpLocks/>
+            </p:cNvCxnSpPr>
+            <p:nvPr/>
+          </p:nvCxnSpPr>
+          <p:spPr>
+            <a:xfrm>
+              <a:off x="4700588" y="3114675"/>
+              <a:ext cx="357187" cy="0"/>
+            </a:xfrm>
+            <a:prstGeom prst="straightConnector1">
+              <a:avLst/>
+            </a:prstGeom>
+            <a:ln w="12700">
+              <a:solidFill>
+                <a:schemeClr val="tx1"/>
+              </a:solidFill>
+              <a:tailEnd type="triangle"/>
+            </a:ln>
+          </p:spPr>
+          <p:style>
+            <a:lnRef idx="1">
+              <a:schemeClr val="dk1"/>
+            </a:lnRef>
+            <a:fillRef idx="0">
+              <a:schemeClr val="dk1"/>
+            </a:fillRef>
+            <a:effectRef idx="0">
+              <a:schemeClr val="dk1"/>
+            </a:effectRef>
+            <a:fontRef idx="minor">
+              <a:schemeClr val="tx1"/>
+            </a:fontRef>
+          </p:style>
+        </p:cxnSp>
+        <p:cxnSp>
+          <p:nvCxnSpPr>
+            <p:cNvPr id="38" name="Straight Arrow Connector 37">
+              <a:extLst>
+                <a:ext uri="{FF2B5EF4-FFF2-40B4-BE49-F238E27FC236}">
+                  <a16:creationId xmlns:a16="http://schemas.microsoft.com/office/drawing/2014/main" id="{9BEF3E0A-EFD8-08ED-621D-59B34C13E983}"/>
+                </a:ext>
+              </a:extLst>
+            </p:cNvPr>
+            <p:cNvCxnSpPr>
+              <a:cxnSpLocks/>
+            </p:cNvCxnSpPr>
+            <p:nvPr/>
+          </p:nvCxnSpPr>
+          <p:spPr>
+            <a:xfrm>
+              <a:off x="5705475" y="3128963"/>
+              <a:ext cx="357187" cy="0"/>
+            </a:xfrm>
+            <a:prstGeom prst="straightConnector1">
+              <a:avLst/>
+            </a:prstGeom>
+            <a:ln w="12700">
+              <a:solidFill>
+                <a:schemeClr val="tx1"/>
+              </a:solidFill>
+              <a:tailEnd type="triangle"/>
+            </a:ln>
+          </p:spPr>
+          <p:style>
+            <a:lnRef idx="1">
+              <a:schemeClr val="dk1"/>
+            </a:lnRef>
+            <a:fillRef idx="0">
+              <a:schemeClr val="dk1"/>
+            </a:fillRef>
+            <a:effectRef idx="0">
+              <a:schemeClr val="dk1"/>
+            </a:effectRef>
+            <a:fontRef idx="minor">
+              <a:schemeClr val="tx1"/>
+            </a:fontRef>
+          </p:style>
+        </p:cxnSp>
+        <p:sp>
+          <p:nvSpPr>
+            <p:cNvPr id="40" name="TextBox 39">
+              <a:extLst>
+                <a:ext uri="{FF2B5EF4-FFF2-40B4-BE49-F238E27FC236}">
+                  <a16:creationId xmlns:a16="http://schemas.microsoft.com/office/drawing/2014/main" id="{3A84FAC7-3BE5-1415-4075-2FBDAFBE7ED7}"/>
+                </a:ext>
+              </a:extLst>
+            </p:cNvPr>
+            <p:cNvSpPr txBox="1"/>
+            <p:nvPr/>
+          </p:nvSpPr>
+          <p:spPr>
+            <a:xfrm>
+              <a:off x="6000750" y="2938463"/>
+              <a:ext cx="886781" cy="369332"/>
+            </a:xfrm>
+            <a:prstGeom prst="rect">
+              <a:avLst/>
+            </a:prstGeom>
+            <a:noFill/>
+          </p:spPr>
+          <p:txBody>
+            <a:bodyPr wrap="none" rtlCol="0">
+              <a:spAutoFit/>
+            </a:bodyPr>
+            <a:lstStyle/>
+            <a:p>
+              <a:r>
+                <a:rPr lang="de-DE" dirty="0"/>
+                <a:t>original</a:t>
+              </a:r>
+              <a:endParaRPr lang="en-GB" dirty="0"/>
+            </a:p>
+          </p:txBody>
+        </p:sp>
+        <p:sp>
+          <p:nvSpPr>
+            <p:cNvPr id="41" name="TextBox 40">
+              <a:extLst>
+                <a:ext uri="{FF2B5EF4-FFF2-40B4-BE49-F238E27FC236}">
+                  <a16:creationId xmlns:a16="http://schemas.microsoft.com/office/drawing/2014/main" id="{20B23E45-B90D-6C15-5C4D-1B38E646C22C}"/>
+                </a:ext>
+              </a:extLst>
+            </p:cNvPr>
+            <p:cNvSpPr txBox="1"/>
+            <p:nvPr/>
+          </p:nvSpPr>
+          <p:spPr>
+            <a:xfrm>
+              <a:off x="793750" y="3086101"/>
+              <a:ext cx="858184" cy="369332"/>
+            </a:xfrm>
+            <a:prstGeom prst="rect">
+              <a:avLst/>
+            </a:prstGeom>
+            <a:noFill/>
+          </p:spPr>
+          <p:txBody>
+            <a:bodyPr wrap="square" rtlCol="0">
+              <a:spAutoFit/>
+            </a:bodyPr>
+            <a:lstStyle/>
+            <a:p>
+              <a:r>
+                <a:rPr lang="de-DE" dirty="0" err="1"/>
+                <a:t>cooked</a:t>
+              </a:r>
+              <a:endParaRPr lang="en-GB" dirty="0"/>
+            </a:p>
+          </p:txBody>
+        </p:sp>
+        <p:sp>
+          <p:nvSpPr>
+            <p:cNvPr id="42" name="TextBox 41">
+              <a:extLst>
+                <a:ext uri="{FF2B5EF4-FFF2-40B4-BE49-F238E27FC236}">
+                  <a16:creationId xmlns:a16="http://schemas.microsoft.com/office/drawing/2014/main" id="{246FF801-2417-05B1-6D85-DD9531C2FCDF}"/>
+                </a:ext>
+              </a:extLst>
+            </p:cNvPr>
+            <p:cNvSpPr txBox="1"/>
+            <p:nvPr/>
+          </p:nvSpPr>
+          <p:spPr>
+            <a:xfrm>
+              <a:off x="1981200" y="3105150"/>
+              <a:ext cx="1990160" cy="369332"/>
+            </a:xfrm>
+            <a:prstGeom prst="rect">
+              <a:avLst/>
+            </a:prstGeom>
+            <a:noFill/>
+          </p:spPr>
+          <p:txBody>
+            <a:bodyPr wrap="none" rtlCol="0">
+              <a:spAutoFit/>
+            </a:bodyPr>
+            <a:lstStyle/>
+            <a:p>
+              <a:r>
+                <a:rPr lang="de-DE" dirty="0"/>
+                <a:t>$\</a:t>
+              </a:r>
+              <a:r>
+                <a:rPr lang="de-DE" dirty="0" err="1"/>
+                <a:t>mathtt</a:t>
+              </a:r>
+              <a:r>
+                <a:rPr lang="de-DE" dirty="0"/>
+                <a:t>{[MASK]}$</a:t>
+              </a:r>
+              <a:endParaRPr lang="en-GB" dirty="0"/>
+            </a:p>
+          </p:txBody>
+        </p:sp>
+        <p:cxnSp>
+          <p:nvCxnSpPr>
+            <p:cNvPr id="43" name="Straight Arrow Connector 42">
+              <a:extLst>
+                <a:ext uri="{FF2B5EF4-FFF2-40B4-BE49-F238E27FC236}">
+                  <a16:creationId xmlns:a16="http://schemas.microsoft.com/office/drawing/2014/main" id="{75F0FCDC-50F1-2328-5ECF-17AB8C6C3E21}"/>
+                </a:ext>
+              </a:extLst>
+            </p:cNvPr>
+            <p:cNvCxnSpPr>
+              <a:cxnSpLocks/>
+            </p:cNvCxnSpPr>
+            <p:nvPr/>
+          </p:nvCxnSpPr>
+          <p:spPr>
+            <a:xfrm>
+              <a:off x="1609725" y="3300413"/>
+              <a:ext cx="357187" cy="0"/>
+            </a:xfrm>
+            <a:prstGeom prst="straightConnector1">
+              <a:avLst/>
+            </a:prstGeom>
+            <a:ln w="12700">
+              <a:solidFill>
+                <a:schemeClr val="tx1"/>
+              </a:solidFill>
+              <a:tailEnd type="triangle"/>
+            </a:ln>
+          </p:spPr>
+          <p:style>
+            <a:lnRef idx="1">
+              <a:schemeClr val="dk1"/>
+            </a:lnRef>
+            <a:fillRef idx="0">
+              <a:schemeClr val="dk1"/>
+            </a:fillRef>
+            <a:effectRef idx="0">
+              <a:schemeClr val="dk1"/>
+            </a:effectRef>
+            <a:fontRef idx="minor">
+              <a:schemeClr val="tx1"/>
+            </a:fontRef>
+          </p:style>
+        </p:cxnSp>
+        <p:cxnSp>
+          <p:nvCxnSpPr>
+            <p:cNvPr id="44" name="Straight Arrow Connector 43">
+              <a:extLst>
+                <a:ext uri="{FF2B5EF4-FFF2-40B4-BE49-F238E27FC236}">
+                  <a16:creationId xmlns:a16="http://schemas.microsoft.com/office/drawing/2014/main" id="{0198B279-4BC8-D979-6F21-9E60F5ED5B87}"/>
+                </a:ext>
+              </a:extLst>
+            </p:cNvPr>
+            <p:cNvCxnSpPr>
+              <a:cxnSpLocks/>
+            </p:cNvCxnSpPr>
+            <p:nvPr/>
+          </p:nvCxnSpPr>
+          <p:spPr>
+            <a:xfrm>
+              <a:off x="2781300" y="3305175"/>
+              <a:ext cx="357187" cy="0"/>
+            </a:xfrm>
+            <a:prstGeom prst="straightConnector1">
+              <a:avLst/>
+            </a:prstGeom>
+            <a:ln w="12700">
+              <a:solidFill>
+                <a:schemeClr val="tx1"/>
+              </a:solidFill>
+              <a:tailEnd type="triangle"/>
+            </a:ln>
+          </p:spPr>
+          <p:style>
+            <a:lnRef idx="1">
+              <a:schemeClr val="dk1"/>
+            </a:lnRef>
+            <a:fillRef idx="0">
+              <a:schemeClr val="dk1"/>
+            </a:fillRef>
+            <a:effectRef idx="0">
+              <a:schemeClr val="dk1"/>
+            </a:effectRef>
+            <a:fontRef idx="minor">
+              <a:schemeClr val="tx1"/>
+            </a:fontRef>
+          </p:style>
+        </p:cxnSp>
+        <p:sp>
+          <p:nvSpPr>
+            <p:cNvPr id="45" name="TextBox 44">
+              <a:extLst>
+                <a:ext uri="{FF2B5EF4-FFF2-40B4-BE49-F238E27FC236}">
+                  <a16:creationId xmlns:a16="http://schemas.microsoft.com/office/drawing/2014/main" id="{F3382335-27A4-EB43-E521-12EF9A23F641}"/>
+                </a:ext>
+              </a:extLst>
+            </p:cNvPr>
+            <p:cNvSpPr txBox="1"/>
+            <p:nvPr/>
+          </p:nvSpPr>
+          <p:spPr>
+            <a:xfrm>
+              <a:off x="4133850" y="3119438"/>
+              <a:ext cx="483017" cy="369332"/>
+            </a:xfrm>
+            <a:prstGeom prst="rect">
+              <a:avLst/>
+            </a:prstGeom>
+            <a:noFill/>
+          </p:spPr>
+          <p:txBody>
+            <a:bodyPr wrap="none" rtlCol="0">
+              <a:spAutoFit/>
+            </a:bodyPr>
+            <a:lstStyle/>
+            <a:p>
+              <a:r>
+                <a:rPr lang="de-DE" dirty="0" err="1"/>
+                <a:t>ate</a:t>
+              </a:r>
+              <a:endParaRPr lang="en-GB" dirty="0"/>
+            </a:p>
+          </p:txBody>
+        </p:sp>
+        <p:cxnSp>
+          <p:nvCxnSpPr>
+            <p:cNvPr id="46" name="Straight Arrow Connector 45">
+              <a:extLst>
+                <a:ext uri="{FF2B5EF4-FFF2-40B4-BE49-F238E27FC236}">
+                  <a16:creationId xmlns:a16="http://schemas.microsoft.com/office/drawing/2014/main" id="{E429196B-0B7E-F38C-566A-81AED5C9EDA9}"/>
+                </a:ext>
+              </a:extLst>
+            </p:cNvPr>
+            <p:cNvCxnSpPr>
+              <a:cxnSpLocks/>
+            </p:cNvCxnSpPr>
+            <p:nvPr/>
+          </p:nvCxnSpPr>
+          <p:spPr>
+            <a:xfrm>
+              <a:off x="3852863" y="3319463"/>
+              <a:ext cx="357187" cy="0"/>
+            </a:xfrm>
+            <a:prstGeom prst="straightConnector1">
+              <a:avLst/>
+            </a:prstGeom>
+            <a:ln w="12700">
+              <a:solidFill>
+                <a:schemeClr val="tx1"/>
+              </a:solidFill>
+              <a:prstDash val="dash"/>
+              <a:tailEnd type="triangle"/>
+            </a:ln>
+          </p:spPr>
+          <p:style>
+            <a:lnRef idx="1">
+              <a:schemeClr val="dk1"/>
+            </a:lnRef>
+            <a:fillRef idx="0">
+              <a:schemeClr val="dk1"/>
+            </a:fillRef>
+            <a:effectRef idx="0">
+              <a:schemeClr val="dk1"/>
+            </a:effectRef>
+            <a:fontRef idx="minor">
+              <a:schemeClr val="tx1"/>
+            </a:fontRef>
+          </p:style>
+        </p:cxnSp>
+        <p:cxnSp>
+          <p:nvCxnSpPr>
+            <p:cNvPr id="47" name="Straight Arrow Connector 46">
+              <a:extLst>
+                <a:ext uri="{FF2B5EF4-FFF2-40B4-BE49-F238E27FC236}">
+                  <a16:creationId xmlns:a16="http://schemas.microsoft.com/office/drawing/2014/main" id="{007EEFA8-ACF5-5E22-1349-3FA299CFB8F9}"/>
+                </a:ext>
+              </a:extLst>
+            </p:cNvPr>
+            <p:cNvCxnSpPr>
+              <a:cxnSpLocks/>
+            </p:cNvCxnSpPr>
+            <p:nvPr/>
+          </p:nvCxnSpPr>
+          <p:spPr>
+            <a:xfrm>
+              <a:off x="4700588" y="3324225"/>
+              <a:ext cx="357187" cy="0"/>
+            </a:xfrm>
+            <a:prstGeom prst="straightConnector1">
+              <a:avLst/>
+            </a:prstGeom>
+            <a:ln w="12700">
+              <a:solidFill>
+                <a:schemeClr val="tx1"/>
+              </a:solidFill>
+              <a:tailEnd type="triangle"/>
+            </a:ln>
+          </p:spPr>
+          <p:style>
+            <a:lnRef idx="1">
+              <a:schemeClr val="dk1"/>
+            </a:lnRef>
+            <a:fillRef idx="0">
+              <a:schemeClr val="dk1"/>
+            </a:fillRef>
+            <a:effectRef idx="0">
+              <a:schemeClr val="dk1"/>
+            </a:effectRef>
+            <a:fontRef idx="minor">
+              <a:schemeClr val="tx1"/>
+            </a:fontRef>
+          </p:style>
+        </p:cxnSp>
+        <p:cxnSp>
+          <p:nvCxnSpPr>
+            <p:cNvPr id="48" name="Straight Arrow Connector 47">
+              <a:extLst>
+                <a:ext uri="{FF2B5EF4-FFF2-40B4-BE49-F238E27FC236}">
+                  <a16:creationId xmlns:a16="http://schemas.microsoft.com/office/drawing/2014/main" id="{5FD4D2C3-1DE2-4BBC-63D2-2EF777D82FC8}"/>
+                </a:ext>
+              </a:extLst>
+            </p:cNvPr>
+            <p:cNvCxnSpPr>
+              <a:cxnSpLocks/>
+            </p:cNvCxnSpPr>
+            <p:nvPr/>
+          </p:nvCxnSpPr>
+          <p:spPr>
+            <a:xfrm>
+              <a:off x="5705475" y="3338513"/>
+              <a:ext cx="357187" cy="0"/>
+            </a:xfrm>
+            <a:prstGeom prst="straightConnector1">
+              <a:avLst/>
+            </a:prstGeom>
+            <a:ln w="12700">
+              <a:solidFill>
+                <a:schemeClr val="tx1"/>
+              </a:solidFill>
+              <a:tailEnd type="triangle"/>
+            </a:ln>
+          </p:spPr>
+          <p:style>
+            <a:lnRef idx="1">
+              <a:schemeClr val="dk1"/>
+            </a:lnRef>
+            <a:fillRef idx="0">
+              <a:schemeClr val="dk1"/>
+            </a:fillRef>
+            <a:effectRef idx="0">
+              <a:schemeClr val="dk1"/>
+            </a:effectRef>
+            <a:fontRef idx="minor">
+              <a:schemeClr val="tx1"/>
+            </a:fontRef>
+          </p:style>
+        </p:cxnSp>
+        <p:sp>
+          <p:nvSpPr>
+            <p:cNvPr id="49" name="TextBox 48">
+              <a:extLst>
+                <a:ext uri="{FF2B5EF4-FFF2-40B4-BE49-F238E27FC236}">
+                  <a16:creationId xmlns:a16="http://schemas.microsoft.com/office/drawing/2014/main" id="{0080246C-F957-B959-D84D-4F7A128562C3}"/>
+                </a:ext>
+              </a:extLst>
+            </p:cNvPr>
+            <p:cNvSpPr txBox="1"/>
+            <p:nvPr/>
+          </p:nvSpPr>
+          <p:spPr>
+            <a:xfrm>
+              <a:off x="6000750" y="3148013"/>
+              <a:ext cx="997581" cy="369332"/>
+            </a:xfrm>
+            <a:prstGeom prst="rect">
+              <a:avLst/>
+            </a:prstGeom>
+            <a:noFill/>
+          </p:spPr>
+          <p:txBody>
+            <a:bodyPr wrap="none" rtlCol="0">
+              <a:spAutoFit/>
+            </a:bodyPr>
+            <a:lstStyle/>
+            <a:p>
+              <a:r>
+                <a:rPr lang="de-DE" dirty="0" err="1"/>
+                <a:t>replaced</a:t>
+              </a:r>
+              <a:endParaRPr lang="en-GB" dirty="0"/>
+            </a:p>
+          </p:txBody>
+        </p:sp>
+        <p:sp>
+          <p:nvSpPr>
+            <p:cNvPr id="50" name="TextBox 49">
+              <a:extLst>
+                <a:ext uri="{FF2B5EF4-FFF2-40B4-BE49-F238E27FC236}">
+                  <a16:creationId xmlns:a16="http://schemas.microsoft.com/office/drawing/2014/main" id="{B2DA9DBA-8EB0-DDFE-DF90-5538590BE241}"/>
+                </a:ext>
+              </a:extLst>
+            </p:cNvPr>
+            <p:cNvSpPr txBox="1"/>
+            <p:nvPr/>
+          </p:nvSpPr>
+          <p:spPr>
+            <a:xfrm>
+              <a:off x="788988" y="3305174"/>
+              <a:ext cx="498855" cy="369332"/>
+            </a:xfrm>
+            <a:prstGeom prst="rect">
+              <a:avLst/>
+            </a:prstGeom>
+            <a:noFill/>
+          </p:spPr>
+          <p:txBody>
+            <a:bodyPr wrap="none" rtlCol="0">
+              <a:spAutoFit/>
+            </a:bodyPr>
+            <a:lstStyle/>
+            <a:p>
+              <a:r>
+                <a:rPr lang="de-DE" dirty="0" err="1"/>
+                <a:t>the</a:t>
+              </a:r>
+              <a:endParaRPr lang="en-GB" dirty="0"/>
+            </a:p>
+          </p:txBody>
+        </p:sp>
+        <p:sp>
+          <p:nvSpPr>
+            <p:cNvPr id="51" name="TextBox 50">
+              <a:extLst>
+                <a:ext uri="{FF2B5EF4-FFF2-40B4-BE49-F238E27FC236}">
+                  <a16:creationId xmlns:a16="http://schemas.microsoft.com/office/drawing/2014/main" id="{C4957AE8-EA45-4D8A-A482-AD8DDE339906}"/>
+                </a:ext>
+              </a:extLst>
+            </p:cNvPr>
+            <p:cNvSpPr txBox="1"/>
+            <p:nvPr/>
+          </p:nvSpPr>
+          <p:spPr>
+            <a:xfrm>
+              <a:off x="1995487" y="3338511"/>
+              <a:ext cx="498855" cy="369332"/>
+            </a:xfrm>
+            <a:prstGeom prst="rect">
+              <a:avLst/>
+            </a:prstGeom>
+            <a:noFill/>
+          </p:spPr>
+          <p:txBody>
+            <a:bodyPr wrap="none" rtlCol="0">
+              <a:spAutoFit/>
+            </a:bodyPr>
+            <a:lstStyle/>
+            <a:p>
+              <a:r>
+                <a:rPr lang="de-DE" dirty="0" err="1"/>
+                <a:t>the</a:t>
+              </a:r>
+              <a:endParaRPr lang="en-GB" dirty="0"/>
+            </a:p>
+          </p:txBody>
+        </p:sp>
+        <p:cxnSp>
+          <p:nvCxnSpPr>
+            <p:cNvPr id="52" name="Straight Arrow Connector 51">
+              <a:extLst>
+                <a:ext uri="{FF2B5EF4-FFF2-40B4-BE49-F238E27FC236}">
+                  <a16:creationId xmlns:a16="http://schemas.microsoft.com/office/drawing/2014/main" id="{129DDE14-8C80-5433-51C6-A8AA41D4CA02}"/>
+                </a:ext>
+              </a:extLst>
+            </p:cNvPr>
+            <p:cNvCxnSpPr>
+              <a:cxnSpLocks/>
+            </p:cNvCxnSpPr>
+            <p:nvPr/>
+          </p:nvCxnSpPr>
+          <p:spPr>
+            <a:xfrm>
+              <a:off x="1609725" y="3514725"/>
+              <a:ext cx="357187" cy="0"/>
+            </a:xfrm>
+            <a:prstGeom prst="straightConnector1">
+              <a:avLst/>
+            </a:prstGeom>
+            <a:ln w="12700">
+              <a:solidFill>
+                <a:schemeClr val="tx1"/>
+              </a:solidFill>
+              <a:tailEnd type="triangle"/>
+            </a:ln>
+          </p:spPr>
+          <p:style>
+            <a:lnRef idx="1">
+              <a:schemeClr val="dk1"/>
+            </a:lnRef>
+            <a:fillRef idx="0">
+              <a:schemeClr val="dk1"/>
+            </a:fillRef>
+            <a:effectRef idx="0">
+              <a:schemeClr val="dk1"/>
+            </a:effectRef>
+            <a:fontRef idx="minor">
+              <a:schemeClr val="tx1"/>
+            </a:fontRef>
+          </p:style>
+        </p:cxnSp>
+        <p:cxnSp>
+          <p:nvCxnSpPr>
+            <p:cNvPr id="53" name="Straight Arrow Connector 52">
+              <a:extLst>
+                <a:ext uri="{FF2B5EF4-FFF2-40B4-BE49-F238E27FC236}">
+                  <a16:creationId xmlns:a16="http://schemas.microsoft.com/office/drawing/2014/main" id="{AFE9ED2C-56B5-5DFA-5BD9-30F020E41C7F}"/>
+                </a:ext>
+              </a:extLst>
+            </p:cNvPr>
+            <p:cNvCxnSpPr>
+              <a:cxnSpLocks/>
+            </p:cNvCxnSpPr>
+            <p:nvPr/>
+          </p:nvCxnSpPr>
+          <p:spPr>
+            <a:xfrm>
+              <a:off x="2781300" y="3519487"/>
+              <a:ext cx="357187" cy="0"/>
+            </a:xfrm>
+            <a:prstGeom prst="straightConnector1">
+              <a:avLst/>
+            </a:prstGeom>
+            <a:ln w="12700">
+              <a:solidFill>
+                <a:schemeClr val="tx1"/>
+              </a:solidFill>
+              <a:tailEnd type="triangle"/>
+            </a:ln>
+          </p:spPr>
+          <p:style>
+            <a:lnRef idx="1">
+              <a:schemeClr val="dk1"/>
+            </a:lnRef>
+            <a:fillRef idx="0">
+              <a:schemeClr val="dk1"/>
+            </a:fillRef>
+            <a:effectRef idx="0">
+              <a:schemeClr val="dk1"/>
+            </a:effectRef>
+            <a:fontRef idx="minor">
+              <a:schemeClr val="tx1"/>
+            </a:fontRef>
+          </p:style>
+        </p:cxnSp>
+        <p:sp>
+          <p:nvSpPr>
+            <p:cNvPr id="54" name="TextBox 53">
+              <a:extLst>
+                <a:ext uri="{FF2B5EF4-FFF2-40B4-BE49-F238E27FC236}">
+                  <a16:creationId xmlns:a16="http://schemas.microsoft.com/office/drawing/2014/main" id="{43144A8C-89D5-D08F-66F3-FE9E5AF52C63}"/>
+                </a:ext>
+              </a:extLst>
+            </p:cNvPr>
+            <p:cNvSpPr txBox="1"/>
+            <p:nvPr/>
+          </p:nvSpPr>
+          <p:spPr>
+            <a:xfrm>
+              <a:off x="4133851" y="3324225"/>
+              <a:ext cx="498855" cy="369332"/>
+            </a:xfrm>
+            <a:prstGeom prst="rect">
+              <a:avLst/>
+            </a:prstGeom>
+            <a:noFill/>
+          </p:spPr>
+          <p:txBody>
+            <a:bodyPr wrap="none" rtlCol="0">
+              <a:spAutoFit/>
+            </a:bodyPr>
+            <a:lstStyle/>
+            <a:p>
+              <a:r>
+                <a:rPr lang="de-DE" dirty="0" err="1"/>
+                <a:t>the</a:t>
+              </a:r>
+              <a:endParaRPr lang="en-GB" dirty="0"/>
+            </a:p>
+          </p:txBody>
+        </p:sp>
+        <p:cxnSp>
+          <p:nvCxnSpPr>
+            <p:cNvPr id="56" name="Straight Arrow Connector 55">
+              <a:extLst>
+                <a:ext uri="{FF2B5EF4-FFF2-40B4-BE49-F238E27FC236}">
+                  <a16:creationId xmlns:a16="http://schemas.microsoft.com/office/drawing/2014/main" id="{64C293DD-21BB-C879-37DA-2E181048A591}"/>
+                </a:ext>
+              </a:extLst>
+            </p:cNvPr>
+            <p:cNvCxnSpPr>
+              <a:cxnSpLocks/>
+            </p:cNvCxnSpPr>
+            <p:nvPr/>
+          </p:nvCxnSpPr>
+          <p:spPr>
+            <a:xfrm>
+              <a:off x="4700588" y="3538537"/>
+              <a:ext cx="357187" cy="0"/>
+            </a:xfrm>
+            <a:prstGeom prst="straightConnector1">
+              <a:avLst/>
+            </a:prstGeom>
+            <a:ln w="12700">
+              <a:solidFill>
+                <a:schemeClr val="tx1"/>
+              </a:solidFill>
+              <a:tailEnd type="triangle"/>
+            </a:ln>
+          </p:spPr>
+          <p:style>
+            <a:lnRef idx="1">
+              <a:schemeClr val="dk1"/>
+            </a:lnRef>
+            <a:fillRef idx="0">
+              <a:schemeClr val="dk1"/>
+            </a:fillRef>
+            <a:effectRef idx="0">
+              <a:schemeClr val="dk1"/>
+            </a:effectRef>
+            <a:fontRef idx="minor">
+              <a:schemeClr val="tx1"/>
+            </a:fontRef>
+          </p:style>
+        </p:cxnSp>
+        <p:cxnSp>
+          <p:nvCxnSpPr>
+            <p:cNvPr id="57" name="Straight Arrow Connector 56">
+              <a:extLst>
+                <a:ext uri="{FF2B5EF4-FFF2-40B4-BE49-F238E27FC236}">
+                  <a16:creationId xmlns:a16="http://schemas.microsoft.com/office/drawing/2014/main" id="{37EAA4F1-CA02-ABE0-B997-29874121DF5A}"/>
+                </a:ext>
+              </a:extLst>
+            </p:cNvPr>
+            <p:cNvCxnSpPr>
+              <a:cxnSpLocks/>
+            </p:cNvCxnSpPr>
+            <p:nvPr/>
+          </p:nvCxnSpPr>
+          <p:spPr>
+            <a:xfrm>
+              <a:off x="5705475" y="3552825"/>
+              <a:ext cx="357187" cy="0"/>
+            </a:xfrm>
+            <a:prstGeom prst="straightConnector1">
+              <a:avLst/>
+            </a:prstGeom>
+            <a:ln w="12700">
+              <a:solidFill>
+                <a:schemeClr val="tx1"/>
+              </a:solidFill>
+              <a:tailEnd type="triangle"/>
+            </a:ln>
+          </p:spPr>
+          <p:style>
+            <a:lnRef idx="1">
+              <a:schemeClr val="dk1"/>
+            </a:lnRef>
+            <a:fillRef idx="0">
+              <a:schemeClr val="dk1"/>
+            </a:fillRef>
+            <a:effectRef idx="0">
+              <a:schemeClr val="dk1"/>
+            </a:effectRef>
+            <a:fontRef idx="minor">
+              <a:schemeClr val="tx1"/>
+            </a:fontRef>
+          </p:style>
+        </p:cxnSp>
+        <p:sp>
+          <p:nvSpPr>
+            <p:cNvPr id="58" name="TextBox 57">
+              <a:extLst>
+                <a:ext uri="{FF2B5EF4-FFF2-40B4-BE49-F238E27FC236}">
+                  <a16:creationId xmlns:a16="http://schemas.microsoft.com/office/drawing/2014/main" id="{663E79CF-E40D-9D92-E7AB-9FFBCC78273E}"/>
+                </a:ext>
+              </a:extLst>
+            </p:cNvPr>
+            <p:cNvSpPr txBox="1"/>
+            <p:nvPr/>
+          </p:nvSpPr>
+          <p:spPr>
+            <a:xfrm>
+              <a:off x="6000750" y="3362325"/>
+              <a:ext cx="886781" cy="369332"/>
+            </a:xfrm>
+            <a:prstGeom prst="rect">
+              <a:avLst/>
+            </a:prstGeom>
+            <a:noFill/>
+          </p:spPr>
+          <p:txBody>
+            <a:bodyPr wrap="none" rtlCol="0">
+              <a:spAutoFit/>
+            </a:bodyPr>
+            <a:lstStyle/>
+            <a:p>
+              <a:r>
+                <a:rPr lang="de-DE" dirty="0"/>
+                <a:t>original</a:t>
+              </a:r>
+              <a:endParaRPr lang="en-GB" dirty="0"/>
+            </a:p>
+          </p:txBody>
+        </p:sp>
+        <p:sp>
+          <p:nvSpPr>
+            <p:cNvPr id="59" name="TextBox 58">
+              <a:extLst>
+                <a:ext uri="{FF2B5EF4-FFF2-40B4-BE49-F238E27FC236}">
+                  <a16:creationId xmlns:a16="http://schemas.microsoft.com/office/drawing/2014/main" id="{900411C4-4D95-CD7E-8897-769308952745}"/>
+                </a:ext>
+              </a:extLst>
+            </p:cNvPr>
+            <p:cNvSpPr txBox="1"/>
+            <p:nvPr/>
+          </p:nvSpPr>
+          <p:spPr>
+            <a:xfrm>
+              <a:off x="788988" y="3505198"/>
+              <a:ext cx="647934" cy="369332"/>
+            </a:xfrm>
+            <a:prstGeom prst="rect">
+              <a:avLst/>
+            </a:prstGeom>
+            <a:noFill/>
+          </p:spPr>
+          <p:txBody>
+            <a:bodyPr wrap="none" rtlCol="0">
+              <a:spAutoFit/>
+            </a:bodyPr>
+            <a:lstStyle/>
+            <a:p>
+              <a:r>
+                <a:rPr lang="de-DE" dirty="0" err="1"/>
+                <a:t>meal</a:t>
+              </a:r>
+              <a:endParaRPr lang="en-GB" dirty="0"/>
+            </a:p>
+          </p:txBody>
+        </p:sp>
+        <p:sp>
+          <p:nvSpPr>
+            <p:cNvPr id="60" name="TextBox 59">
+              <a:extLst>
+                <a:ext uri="{FF2B5EF4-FFF2-40B4-BE49-F238E27FC236}">
+                  <a16:creationId xmlns:a16="http://schemas.microsoft.com/office/drawing/2014/main" id="{5550293D-6B34-E2B8-4868-3188E8355117}"/>
+                </a:ext>
+              </a:extLst>
+            </p:cNvPr>
+            <p:cNvSpPr txBox="1"/>
+            <p:nvPr/>
+          </p:nvSpPr>
+          <p:spPr>
+            <a:xfrm>
+              <a:off x="2000249" y="3514724"/>
+              <a:ext cx="647934" cy="369332"/>
+            </a:xfrm>
+            <a:prstGeom prst="rect">
+              <a:avLst/>
+            </a:prstGeom>
+            <a:noFill/>
+          </p:spPr>
+          <p:txBody>
+            <a:bodyPr wrap="none" rtlCol="0">
+              <a:spAutoFit/>
+            </a:bodyPr>
+            <a:lstStyle/>
+            <a:p>
+              <a:r>
+                <a:rPr lang="de-DE" dirty="0" err="1"/>
+                <a:t>meal</a:t>
+              </a:r>
+              <a:endParaRPr lang="en-GB" dirty="0"/>
+            </a:p>
+          </p:txBody>
+        </p:sp>
+        <p:cxnSp>
+          <p:nvCxnSpPr>
+            <p:cNvPr id="256" name="Straight Arrow Connector 255">
+              <a:extLst>
+                <a:ext uri="{FF2B5EF4-FFF2-40B4-BE49-F238E27FC236}">
+                  <a16:creationId xmlns:a16="http://schemas.microsoft.com/office/drawing/2014/main" id="{70C78A24-927E-E888-F2F5-6E2FE13CADE0}"/>
+                </a:ext>
+              </a:extLst>
+            </p:cNvPr>
+            <p:cNvCxnSpPr>
+              <a:cxnSpLocks/>
+            </p:cNvCxnSpPr>
+            <p:nvPr/>
+          </p:nvCxnSpPr>
+          <p:spPr>
+            <a:xfrm>
+              <a:off x="1614487" y="3709987"/>
+              <a:ext cx="357187" cy="0"/>
+            </a:xfrm>
+            <a:prstGeom prst="straightConnector1">
+              <a:avLst/>
+            </a:prstGeom>
+            <a:ln w="12700">
+              <a:solidFill>
+                <a:schemeClr val="tx1"/>
+              </a:solidFill>
+              <a:tailEnd type="triangle"/>
+            </a:ln>
+          </p:spPr>
+          <p:style>
+            <a:lnRef idx="1">
+              <a:schemeClr val="dk1"/>
+            </a:lnRef>
+            <a:fillRef idx="0">
+              <a:schemeClr val="dk1"/>
+            </a:fillRef>
+            <a:effectRef idx="0">
+              <a:schemeClr val="dk1"/>
+            </a:effectRef>
+            <a:fontRef idx="minor">
+              <a:schemeClr val="tx1"/>
+            </a:fontRef>
+          </p:style>
+        </p:cxnSp>
+        <p:cxnSp>
+          <p:nvCxnSpPr>
+            <p:cNvPr id="257" name="Straight Arrow Connector 256">
+              <a:extLst>
+                <a:ext uri="{FF2B5EF4-FFF2-40B4-BE49-F238E27FC236}">
+                  <a16:creationId xmlns:a16="http://schemas.microsoft.com/office/drawing/2014/main" id="{2132ECBE-C5C8-0AE7-6993-4920648225E5}"/>
+                </a:ext>
+              </a:extLst>
+            </p:cNvPr>
+            <p:cNvCxnSpPr>
+              <a:cxnSpLocks/>
+            </p:cNvCxnSpPr>
+            <p:nvPr/>
+          </p:nvCxnSpPr>
+          <p:spPr>
+            <a:xfrm>
+              <a:off x="2786062" y="3714749"/>
+              <a:ext cx="357187" cy="0"/>
+            </a:xfrm>
+            <a:prstGeom prst="straightConnector1">
+              <a:avLst/>
+            </a:prstGeom>
+            <a:ln w="12700">
+              <a:solidFill>
+                <a:schemeClr val="tx1"/>
+              </a:solidFill>
+              <a:tailEnd type="triangle"/>
+            </a:ln>
+          </p:spPr>
+          <p:style>
+            <a:lnRef idx="1">
+              <a:schemeClr val="dk1"/>
+            </a:lnRef>
+            <a:fillRef idx="0">
+              <a:schemeClr val="dk1"/>
+            </a:fillRef>
+            <a:effectRef idx="0">
+              <a:schemeClr val="dk1"/>
+            </a:effectRef>
+            <a:fontRef idx="minor">
+              <a:schemeClr val="tx1"/>
+            </a:fontRef>
+          </p:style>
+        </p:cxnSp>
+        <p:sp>
+          <p:nvSpPr>
+            <p:cNvPr id="258" name="TextBox 257">
+              <a:extLst>
+                <a:ext uri="{FF2B5EF4-FFF2-40B4-BE49-F238E27FC236}">
+                  <a16:creationId xmlns:a16="http://schemas.microsoft.com/office/drawing/2014/main" id="{78768205-86A3-D9D5-18D5-FC3A2BCD02AF}"/>
+                </a:ext>
+              </a:extLst>
+            </p:cNvPr>
+            <p:cNvSpPr txBox="1"/>
+            <p:nvPr/>
+          </p:nvSpPr>
+          <p:spPr>
+            <a:xfrm>
+              <a:off x="4129088" y="3533775"/>
+              <a:ext cx="647934" cy="369332"/>
+            </a:xfrm>
+            <a:prstGeom prst="rect">
+              <a:avLst/>
+            </a:prstGeom>
+            <a:noFill/>
+          </p:spPr>
+          <p:txBody>
+            <a:bodyPr wrap="none" rtlCol="0">
+              <a:spAutoFit/>
+            </a:bodyPr>
+            <a:lstStyle/>
+            <a:p>
+              <a:r>
+                <a:rPr lang="de-DE" dirty="0" err="1"/>
+                <a:t>meal</a:t>
+              </a:r>
+              <a:endParaRPr lang="en-GB" dirty="0"/>
+            </a:p>
+          </p:txBody>
+        </p:sp>
+        <p:cxnSp>
+          <p:nvCxnSpPr>
+            <p:cNvPr id="260" name="Straight Arrow Connector 259">
+              <a:extLst>
+                <a:ext uri="{FF2B5EF4-FFF2-40B4-BE49-F238E27FC236}">
+                  <a16:creationId xmlns:a16="http://schemas.microsoft.com/office/drawing/2014/main" id="{FE239940-86F5-59A7-6D0D-19B7DF3D0205}"/>
+                </a:ext>
+              </a:extLst>
+            </p:cNvPr>
+            <p:cNvCxnSpPr>
+              <a:cxnSpLocks/>
+            </p:cNvCxnSpPr>
+            <p:nvPr/>
+          </p:nvCxnSpPr>
+          <p:spPr>
+            <a:xfrm>
+              <a:off x="4705350" y="3733799"/>
+              <a:ext cx="357187" cy="0"/>
+            </a:xfrm>
+            <a:prstGeom prst="straightConnector1">
+              <a:avLst/>
+            </a:prstGeom>
+            <a:ln w="12700">
+              <a:solidFill>
+                <a:schemeClr val="tx1"/>
+              </a:solidFill>
+              <a:tailEnd type="triangle"/>
+            </a:ln>
+          </p:spPr>
+          <p:style>
+            <a:lnRef idx="1">
+              <a:schemeClr val="dk1"/>
+            </a:lnRef>
+            <a:fillRef idx="0">
+              <a:schemeClr val="dk1"/>
+            </a:fillRef>
+            <a:effectRef idx="0">
+              <a:schemeClr val="dk1"/>
+            </a:effectRef>
+            <a:fontRef idx="minor">
+              <a:schemeClr val="tx1"/>
+            </a:fontRef>
+          </p:style>
+        </p:cxnSp>
+        <p:cxnSp>
+          <p:nvCxnSpPr>
+            <p:cNvPr id="261" name="Straight Arrow Connector 260">
+              <a:extLst>
+                <a:ext uri="{FF2B5EF4-FFF2-40B4-BE49-F238E27FC236}">
+                  <a16:creationId xmlns:a16="http://schemas.microsoft.com/office/drawing/2014/main" id="{FDEE6B90-8A2F-7C9D-3778-9A809B9AC567}"/>
+                </a:ext>
+              </a:extLst>
+            </p:cNvPr>
+            <p:cNvCxnSpPr>
+              <a:cxnSpLocks/>
+            </p:cNvCxnSpPr>
+            <p:nvPr/>
+          </p:nvCxnSpPr>
+          <p:spPr>
+            <a:xfrm>
+              <a:off x="5710237" y="3748087"/>
+              <a:ext cx="357187" cy="0"/>
+            </a:xfrm>
+            <a:prstGeom prst="straightConnector1">
+              <a:avLst/>
+            </a:prstGeom>
+            <a:ln w="12700">
+              <a:solidFill>
+                <a:schemeClr val="tx1"/>
+              </a:solidFill>
+              <a:tailEnd type="triangle"/>
+            </a:ln>
+          </p:spPr>
+          <p:style>
+            <a:lnRef idx="1">
+              <a:schemeClr val="dk1"/>
+            </a:lnRef>
+            <a:fillRef idx="0">
+              <a:schemeClr val="dk1"/>
+            </a:fillRef>
+            <a:effectRef idx="0">
+              <a:schemeClr val="dk1"/>
+            </a:effectRef>
+            <a:fontRef idx="minor">
+              <a:schemeClr val="tx1"/>
+            </a:fontRef>
+          </p:style>
+        </p:cxnSp>
+        <p:sp>
+          <p:nvSpPr>
+            <p:cNvPr id="262" name="TextBox 261">
+              <a:extLst>
+                <a:ext uri="{FF2B5EF4-FFF2-40B4-BE49-F238E27FC236}">
+                  <a16:creationId xmlns:a16="http://schemas.microsoft.com/office/drawing/2014/main" id="{3E9E8AF5-B556-DE0D-CF25-0ED8151A4F4D}"/>
+                </a:ext>
+              </a:extLst>
+            </p:cNvPr>
+            <p:cNvSpPr txBox="1"/>
+            <p:nvPr/>
+          </p:nvSpPr>
+          <p:spPr>
+            <a:xfrm>
+              <a:off x="6005512" y="3557587"/>
+              <a:ext cx="886781" cy="369332"/>
+            </a:xfrm>
+            <a:prstGeom prst="rect">
+              <a:avLst/>
+            </a:prstGeom>
+            <a:noFill/>
+          </p:spPr>
+          <p:txBody>
+            <a:bodyPr wrap="none" rtlCol="0">
+              <a:spAutoFit/>
+            </a:bodyPr>
+            <a:lstStyle/>
+            <a:p>
+              <a:r>
+                <a:rPr lang="de-DE" dirty="0"/>
+                <a:t>original</a:t>
+              </a:r>
+              <a:endParaRPr lang="en-GB" dirty="0"/>
+            </a:p>
+          </p:txBody>
+        </p:sp>
+      </p:grpSp>
     </p:spTree>
     <p:extLst>
       <p:ext uri="{BB962C8B-B14F-4D97-AF65-F5344CB8AC3E}">
-        <p14:creationId xmlns:p14="http://schemas.microsoft.com/office/powerpoint/2010/main" val="1975984209"/>
+        <p14:creationId xmlns:p14="http://schemas.microsoft.com/office/powerpoint/2010/main" val="864514952"/>
       </p:ext>
     </p:extLst>
   </p:cSld>
@@ -27431,12 +31055,62 @@
           <a:chExt cx="0" cy="0"/>
         </a:xfrm>
       </p:grpSpPr>
+      <p:sp>
+        <p:nvSpPr>
+          <p:cNvPr id="2" name="Title 1">
+            <a:extLst>
+              <a:ext uri="{FF2B5EF4-FFF2-40B4-BE49-F238E27FC236}">
+                <a16:creationId xmlns:a16="http://schemas.microsoft.com/office/drawing/2014/main" id="{9C25A884-0014-7B87-1AF5-C2A758D258BB}"/>
+              </a:ext>
+            </a:extLst>
+          </p:cNvPr>
+          <p:cNvSpPr>
+            <a:spLocks noGrp="1"/>
+          </p:cNvSpPr>
+          <p:nvPr>
+            <p:ph type="title"/>
+          </p:nvPr>
+        </p:nvSpPr>
+        <p:spPr/>
+        <p:txBody>
+          <a:bodyPr/>
+          <a:lstStyle/>
+          <a:p>
+            <a:endParaRPr lang="en-GB"/>
+          </a:p>
+        </p:txBody>
+      </p:sp>
+      <p:sp>
+        <p:nvSpPr>
+          <p:cNvPr id="3" name="Content Placeholder 2">
+            <a:extLst>
+              <a:ext uri="{FF2B5EF4-FFF2-40B4-BE49-F238E27FC236}">
+                <a16:creationId xmlns:a16="http://schemas.microsoft.com/office/drawing/2014/main" id="{EFD32671-D437-757C-1EA5-C048C3504F41}"/>
+              </a:ext>
+            </a:extLst>
+          </p:cNvPr>
+          <p:cNvSpPr>
+            <a:spLocks noGrp="1"/>
+          </p:cNvSpPr>
+          <p:nvPr>
+            <p:ph idx="1"/>
+          </p:nvPr>
+        </p:nvSpPr>
+        <p:spPr/>
+        <p:txBody>
+          <a:bodyPr/>
+          <a:lstStyle/>
+          <a:p>
+            <a:endParaRPr lang="en-GB"/>
+          </a:p>
+        </p:txBody>
+      </p:sp>
       <p:pic>
         <p:nvPicPr>
-          <p:cNvPr id="5" name="Picture 4">
-            <a:extLst>
-              <a:ext uri="{FF2B5EF4-FFF2-40B4-BE49-F238E27FC236}">
-                <a16:creationId xmlns:a16="http://schemas.microsoft.com/office/drawing/2014/main" id="{E9048B29-D23C-3F4A-8CFD-CC2CD996A4A6}"/>
+          <p:cNvPr id="4" name="Picture 3">
+            <a:extLst>
+              <a:ext uri="{FF2B5EF4-FFF2-40B4-BE49-F238E27FC236}">
+                <a16:creationId xmlns:a16="http://schemas.microsoft.com/office/drawing/2014/main" id="{B7DB29C0-B5C8-8508-A26E-50B1D221C83C}"/>
               </a:ext>
             </a:extLst>
           </p:cNvPr>
@@ -27453,38 +31127,8 @@
         </p:blipFill>
         <p:spPr>
           <a:xfrm>
-            <a:off x="258426" y="0"/>
+            <a:off x="400050" y="-314325"/>
             <a:ext cx="11675147" cy="6858000"/>
-          </a:xfrm>
-          <a:prstGeom prst="rect">
-            <a:avLst/>
-          </a:prstGeom>
-        </p:spPr>
-      </p:pic>
-      <p:pic>
-        <p:nvPicPr>
-          <p:cNvPr id="3" name="Picture 2">
-            <a:extLst>
-              <a:ext uri="{FF2B5EF4-FFF2-40B4-BE49-F238E27FC236}">
-                <a16:creationId xmlns:a16="http://schemas.microsoft.com/office/drawing/2014/main" id="{4AEA4B46-C438-5924-D392-B8FE886DDBB4}"/>
-              </a:ext>
-            </a:extLst>
-          </p:cNvPr>
-          <p:cNvPicPr>
-            <a:picLocks noChangeAspect="1"/>
-          </p:cNvPicPr>
-          <p:nvPr/>
-        </p:nvPicPr>
-        <p:blipFill>
-          <a:blip r:embed="rId3"/>
-          <a:stretch>
-            <a:fillRect/>
-          </a:stretch>
-        </p:blipFill>
-        <p:spPr>
-          <a:xfrm>
-            <a:off x="3157281" y="1380830"/>
-            <a:ext cx="3667637" cy="4229690"/>
           </a:xfrm>
           <a:prstGeom prst="rect">
             <a:avLst/>
@@ -27494,7 +31138,7 @@
     </p:spTree>
     <p:extLst>
       <p:ext uri="{BB962C8B-B14F-4D97-AF65-F5344CB8AC3E}">
-        <p14:creationId xmlns:p14="http://schemas.microsoft.com/office/powerpoint/2010/main" val="4091855300"/>
+        <p14:creationId xmlns:p14="http://schemas.microsoft.com/office/powerpoint/2010/main" val="1975984209"/>
       </p:ext>
     </p:extLst>
   </p:cSld>

</xml_diff>

<commit_message>
Rewrite chapter on Pre-Training and Rewrite selection of semi-supervised methods🤖 (#316)
See PR.
</commit_message>
<xml_diff>
--- a/reports/Graphs/diagrams.pptx
+++ b/reports/Graphs/diagrams.pptx
@@ -12,8 +12,9 @@
     <p:sldId id="265" r:id="rId6"/>
     <p:sldId id="260" r:id="rId7"/>
     <p:sldId id="261" r:id="rId8"/>
-    <p:sldId id="259" r:id="rId9"/>
-    <p:sldId id="257" r:id="rId10"/>
+    <p:sldId id="266" r:id="rId9"/>
+    <p:sldId id="259" r:id="rId10"/>
+    <p:sldId id="257" r:id="rId11"/>
   </p:sldIdLst>
   <p:sldSz cx="12192000" cy="6858000"/>
   <p:notesSz cx="6858000" cy="9144000"/>
@@ -123,7 +124,7 @@
 <file path=ppt/revisionInfo.xml><?xml version="1.0" encoding="utf-8"?>
 <p1510:revInfo xmlns:a="http://schemas.openxmlformats.org/drawingml/2006/main" xmlns:r="http://schemas.openxmlformats.org/officeDocument/2006/relationships" xmlns:p1510="http://schemas.microsoft.com/office/powerpoint/2015/10/main">
   <p1510:revLst>
-    <p1510:client id="{F9F2BE70-AAED-47FD-A055-7B08EB1371A3}" v="152" dt="2023-02-22T15:47:34.699"/>
+    <p1510:client id="{9CD03640-CC4F-4034-8161-8D1D39C001C5}" v="17" dt="2023-04-24T16:44:44.361"/>
   </p1510:revLst>
 </p1510:revInfo>
 </file>
@@ -7562,6 +7563,862 @@
             <ac:picMk id="5" creationId="{6A20F21E-4163-B9F0-D304-FA503742EB56}"/>
           </ac:picMkLst>
         </pc:picChg>
+      </pc:sldChg>
+    </pc:docChg>
+  </pc:docChgLst>
+  <pc:docChgLst>
+    <pc:chgData name="Markus Bilz" userId="a36021e4bdb9349f" providerId="LiveId" clId="{9CD03640-CC4F-4034-8161-8D1D39C001C5}"/>
+    <pc:docChg chg="undo custSel addSld modSld">
+      <pc:chgData name="Markus Bilz" userId="a36021e4bdb9349f" providerId="LiveId" clId="{9CD03640-CC4F-4034-8161-8D1D39C001C5}" dt="2023-04-24T16:49:10.995" v="231" actId="164"/>
+      <pc:docMkLst>
+        <pc:docMk/>
+      </pc:docMkLst>
+      <pc:sldChg chg="addSp delSp modSp add mod">
+        <pc:chgData name="Markus Bilz" userId="a36021e4bdb9349f" providerId="LiveId" clId="{9CD03640-CC4F-4034-8161-8D1D39C001C5}" dt="2023-04-24T16:49:10.995" v="231" actId="164"/>
+        <pc:sldMkLst>
+          <pc:docMk/>
+          <pc:sldMk cId="864514952" sldId="266"/>
+        </pc:sldMkLst>
+        <pc:spChg chg="mod">
+          <ac:chgData name="Markus Bilz" userId="a36021e4bdb9349f" providerId="LiveId" clId="{9CD03640-CC4F-4034-8161-8D1D39C001C5}" dt="2023-04-24T16:35:19.127" v="32" actId="6549"/>
+          <ac:spMkLst>
+            <pc:docMk/>
+            <pc:sldMk cId="864514952" sldId="266"/>
+            <ac:spMk id="6" creationId="{37E7B1D8-1BF8-FDFE-D966-2445914F8910}"/>
+          </ac:spMkLst>
+        </pc:spChg>
+        <pc:spChg chg="mod">
+          <ac:chgData name="Markus Bilz" userId="a36021e4bdb9349f" providerId="LiveId" clId="{9CD03640-CC4F-4034-8161-8D1D39C001C5}" dt="2023-04-24T16:35:50.142" v="36"/>
+          <ac:spMkLst>
+            <pc:docMk/>
+            <pc:sldMk cId="864514952" sldId="266"/>
+            <ac:spMk id="11" creationId="{1BACB48A-7F1C-006D-BB8D-A2A0E24B7599}"/>
+          </ac:spMkLst>
+        </pc:spChg>
+        <pc:spChg chg="mod">
+          <ac:chgData name="Markus Bilz" userId="a36021e4bdb9349f" providerId="LiveId" clId="{9CD03640-CC4F-4034-8161-8D1D39C001C5}" dt="2023-04-24T16:35:50.142" v="36"/>
+          <ac:spMkLst>
+            <pc:docMk/>
+            <pc:sldMk cId="864514952" sldId="266"/>
+            <ac:spMk id="12" creationId="{A4389547-0C08-585B-17AF-FB591FC56A22}"/>
+          </ac:spMkLst>
+        </pc:spChg>
+        <pc:spChg chg="mod">
+          <ac:chgData name="Markus Bilz" userId="a36021e4bdb9349f" providerId="LiveId" clId="{9CD03640-CC4F-4034-8161-8D1D39C001C5}" dt="2023-04-24T16:35:50.142" v="36"/>
+          <ac:spMkLst>
+            <pc:docMk/>
+            <pc:sldMk cId="864514952" sldId="266"/>
+            <ac:spMk id="13" creationId="{5D3EC5F7-E779-86C7-F78C-81422CDA3285}"/>
+          </ac:spMkLst>
+        </pc:spChg>
+        <pc:spChg chg="mod">
+          <ac:chgData name="Markus Bilz" userId="a36021e4bdb9349f" providerId="LiveId" clId="{9CD03640-CC4F-4034-8161-8D1D39C001C5}" dt="2023-04-24T16:35:50.142" v="36"/>
+          <ac:spMkLst>
+            <pc:docMk/>
+            <pc:sldMk cId="864514952" sldId="266"/>
+            <ac:spMk id="14" creationId="{8EE72784-020E-8EB2-C727-78BBE842826F}"/>
+          </ac:spMkLst>
+        </pc:spChg>
+        <pc:spChg chg="mod">
+          <ac:chgData name="Markus Bilz" userId="a36021e4bdb9349f" providerId="LiveId" clId="{9CD03640-CC4F-4034-8161-8D1D39C001C5}" dt="2023-04-24T16:35:50.142" v="36"/>
+          <ac:spMkLst>
+            <pc:docMk/>
+            <pc:sldMk cId="864514952" sldId="266"/>
+            <ac:spMk id="15" creationId="{BADA3648-FB28-54A8-8A67-7AD5235800E2}"/>
+          </ac:spMkLst>
+        </pc:spChg>
+        <pc:spChg chg="mod">
+          <ac:chgData name="Markus Bilz" userId="a36021e4bdb9349f" providerId="LiveId" clId="{9CD03640-CC4F-4034-8161-8D1D39C001C5}" dt="2023-04-24T16:35:50.142" v="36"/>
+          <ac:spMkLst>
+            <pc:docMk/>
+            <pc:sldMk cId="864514952" sldId="266"/>
+            <ac:spMk id="16" creationId="{F8A43F7D-4F3F-37D1-8E37-3284727C7576}"/>
+          </ac:spMkLst>
+        </pc:spChg>
+        <pc:spChg chg="mod">
+          <ac:chgData name="Markus Bilz" userId="a36021e4bdb9349f" providerId="LiveId" clId="{9CD03640-CC4F-4034-8161-8D1D39C001C5}" dt="2023-04-24T16:35:50.142" v="36"/>
+          <ac:spMkLst>
+            <pc:docMk/>
+            <pc:sldMk cId="864514952" sldId="266"/>
+            <ac:spMk id="17" creationId="{E018FE88-24CC-F7F7-DC73-8753AB8DF629}"/>
+          </ac:spMkLst>
+        </pc:spChg>
+        <pc:spChg chg="add mod">
+          <ac:chgData name="Markus Bilz" userId="a36021e4bdb9349f" providerId="LiveId" clId="{9CD03640-CC4F-4034-8161-8D1D39C001C5}" dt="2023-04-24T16:40:49.210" v="97" actId="1076"/>
+          <ac:spMkLst>
+            <pc:docMk/>
+            <pc:sldMk cId="864514952" sldId="266"/>
+            <ac:spMk id="18" creationId="{5F336B26-8B16-7823-45C3-15CFB7295479}"/>
+          </ac:spMkLst>
+        </pc:spChg>
+        <pc:spChg chg="del mod">
+          <ac:chgData name="Markus Bilz" userId="a36021e4bdb9349f" providerId="LiveId" clId="{9CD03640-CC4F-4034-8161-8D1D39C001C5}" dt="2023-04-24T16:38:34.746" v="78" actId="478"/>
+          <ac:spMkLst>
+            <pc:docMk/>
+            <pc:sldMk cId="864514952" sldId="266"/>
+            <ac:spMk id="19" creationId="{1AE337DA-87E6-6A46-773B-22A52F746B75}"/>
+          </ac:spMkLst>
+        </pc:spChg>
+        <pc:spChg chg="add del mod">
+          <ac:chgData name="Markus Bilz" userId="a36021e4bdb9349f" providerId="LiveId" clId="{9CD03640-CC4F-4034-8161-8D1D39C001C5}" dt="2023-04-24T16:36:41.239" v="53" actId="478"/>
+          <ac:spMkLst>
+            <pc:docMk/>
+            <pc:sldMk cId="864514952" sldId="266"/>
+            <ac:spMk id="21" creationId="{C3CE9287-8D7C-BA55-BEF2-995FF1D66A93}"/>
+          </ac:spMkLst>
+        </pc:spChg>
+        <pc:spChg chg="del">
+          <ac:chgData name="Markus Bilz" userId="a36021e4bdb9349f" providerId="LiveId" clId="{9CD03640-CC4F-4034-8161-8D1D39C001C5}" dt="2023-04-24T16:34:52.128" v="17" actId="478"/>
+          <ac:spMkLst>
+            <pc:docMk/>
+            <pc:sldMk cId="864514952" sldId="266"/>
+            <ac:spMk id="23" creationId="{8F8800C0-1CF3-F5CA-4394-35FFEBF5E5A3}"/>
+          </ac:spMkLst>
+        </pc:spChg>
+        <pc:spChg chg="del">
+          <ac:chgData name="Markus Bilz" userId="a36021e4bdb9349f" providerId="LiveId" clId="{9CD03640-CC4F-4034-8161-8D1D39C001C5}" dt="2023-04-24T16:34:50.289" v="16" actId="478"/>
+          <ac:spMkLst>
+            <pc:docMk/>
+            <pc:sldMk cId="864514952" sldId="266"/>
+            <ac:spMk id="25" creationId="{64F421B8-8DB7-34EA-C921-76E85E24F0A2}"/>
+          </ac:spMkLst>
+        </pc:spChg>
+        <pc:spChg chg="mod">
+          <ac:chgData name="Markus Bilz" userId="a36021e4bdb9349f" providerId="LiveId" clId="{9CD03640-CC4F-4034-8161-8D1D39C001C5}" dt="2023-04-24T16:36:48.993" v="55"/>
+          <ac:spMkLst>
+            <pc:docMk/>
+            <pc:sldMk cId="864514952" sldId="266"/>
+            <ac:spMk id="26" creationId="{D7171B68-D938-403F-DCAC-AFA3295A9E80}"/>
+          </ac:spMkLst>
+        </pc:spChg>
+        <pc:spChg chg="del">
+          <ac:chgData name="Markus Bilz" userId="a36021e4bdb9349f" providerId="LiveId" clId="{9CD03640-CC4F-4034-8161-8D1D39C001C5}" dt="2023-04-24T16:34:50.289" v="16" actId="478"/>
+          <ac:spMkLst>
+            <pc:docMk/>
+            <pc:sldMk cId="864514952" sldId="266"/>
+            <ac:spMk id="27" creationId="{A827FEA6-F17E-CA57-7B37-D1BAA16BED3F}"/>
+          </ac:spMkLst>
+        </pc:spChg>
+        <pc:spChg chg="mod">
+          <ac:chgData name="Markus Bilz" userId="a36021e4bdb9349f" providerId="LiveId" clId="{9CD03640-CC4F-4034-8161-8D1D39C001C5}" dt="2023-04-24T16:36:48.993" v="55"/>
+          <ac:spMkLst>
+            <pc:docMk/>
+            <pc:sldMk cId="864514952" sldId="266"/>
+            <ac:spMk id="30" creationId="{37B18278-3455-ED2A-66DE-AEB3115150F4}"/>
+          </ac:spMkLst>
+        </pc:spChg>
+        <pc:spChg chg="del">
+          <ac:chgData name="Markus Bilz" userId="a36021e4bdb9349f" providerId="LiveId" clId="{9CD03640-CC4F-4034-8161-8D1D39C001C5}" dt="2023-04-24T16:34:50.289" v="16" actId="478"/>
+          <ac:spMkLst>
+            <pc:docMk/>
+            <pc:sldMk cId="864514952" sldId="266"/>
+            <ac:spMk id="31" creationId="{F00536E0-E48A-70AD-633B-4384867F30A5}"/>
+          </ac:spMkLst>
+        </pc:spChg>
+        <pc:spChg chg="add mod">
+          <ac:chgData name="Markus Bilz" userId="a36021e4bdb9349f" providerId="LiveId" clId="{9CD03640-CC4F-4034-8161-8D1D39C001C5}" dt="2023-04-24T16:47:15.949" v="216" actId="1076"/>
+          <ac:spMkLst>
+            <pc:docMk/>
+            <pc:sldMk cId="864514952" sldId="266"/>
+            <ac:spMk id="32" creationId="{217921D7-1AFF-38E6-8C8D-79EE8D6165D2}"/>
+          </ac:spMkLst>
+        </pc:spChg>
+        <pc:spChg chg="add mod">
+          <ac:chgData name="Markus Bilz" userId="a36021e4bdb9349f" providerId="LiveId" clId="{9CD03640-CC4F-4034-8161-8D1D39C001C5}" dt="2023-04-24T16:48:06.031" v="224" actId="1076"/>
+          <ac:spMkLst>
+            <pc:docMk/>
+            <pc:sldMk cId="864514952" sldId="266"/>
+            <ac:spMk id="35" creationId="{15BAAEA6-2D12-98BE-1FFC-5E23C675AFBB}"/>
+          </ac:spMkLst>
+        </pc:spChg>
+        <pc:spChg chg="add mod">
+          <ac:chgData name="Markus Bilz" userId="a36021e4bdb9349f" providerId="LiveId" clId="{9CD03640-CC4F-4034-8161-8D1D39C001C5}" dt="2023-04-24T16:43:31.579" v="138" actId="1076"/>
+          <ac:spMkLst>
+            <pc:docMk/>
+            <pc:sldMk cId="864514952" sldId="266"/>
+            <ac:spMk id="40" creationId="{3A84FAC7-3BE5-1415-4075-2FBDAFBE7ED7}"/>
+          </ac:spMkLst>
+        </pc:spChg>
+        <pc:spChg chg="add mod">
+          <ac:chgData name="Markus Bilz" userId="a36021e4bdb9349f" providerId="LiveId" clId="{9CD03640-CC4F-4034-8161-8D1D39C001C5}" dt="2023-04-24T16:46:28.273" v="206" actId="1076"/>
+          <ac:spMkLst>
+            <pc:docMk/>
+            <pc:sldMk cId="864514952" sldId="266"/>
+            <ac:spMk id="41" creationId="{20B23E45-B90D-6C15-5C4D-1B38E646C22C}"/>
+          </ac:spMkLst>
+        </pc:spChg>
+        <pc:spChg chg="add mod">
+          <ac:chgData name="Markus Bilz" userId="a36021e4bdb9349f" providerId="LiveId" clId="{9CD03640-CC4F-4034-8161-8D1D39C001C5}" dt="2023-04-24T16:47:10.504" v="215" actId="1076"/>
+          <ac:spMkLst>
+            <pc:docMk/>
+            <pc:sldMk cId="864514952" sldId="266"/>
+            <ac:spMk id="42" creationId="{246FF801-2417-05B1-6D85-DD9531C2FCDF}"/>
+          </ac:spMkLst>
+        </pc:spChg>
+        <pc:spChg chg="add mod">
+          <ac:chgData name="Markus Bilz" userId="a36021e4bdb9349f" providerId="LiveId" clId="{9CD03640-CC4F-4034-8161-8D1D39C001C5}" dt="2023-04-24T16:48:02.173" v="223" actId="1076"/>
+          <ac:spMkLst>
+            <pc:docMk/>
+            <pc:sldMk cId="864514952" sldId="266"/>
+            <ac:spMk id="45" creationId="{F3382335-27A4-EB43-E521-12EF9A23F641}"/>
+          </ac:spMkLst>
+        </pc:spChg>
+        <pc:spChg chg="add mod">
+          <ac:chgData name="Markus Bilz" userId="a36021e4bdb9349f" providerId="LiveId" clId="{9CD03640-CC4F-4034-8161-8D1D39C001C5}" dt="2023-04-24T16:44:59.842" v="168" actId="20577"/>
+          <ac:spMkLst>
+            <pc:docMk/>
+            <pc:sldMk cId="864514952" sldId="266"/>
+            <ac:spMk id="49" creationId="{0080246C-F957-B959-D84D-4F7A128562C3}"/>
+          </ac:spMkLst>
+        </pc:spChg>
+        <pc:spChg chg="add mod">
+          <ac:chgData name="Markus Bilz" userId="a36021e4bdb9349f" providerId="LiveId" clId="{9CD03640-CC4F-4034-8161-8D1D39C001C5}" dt="2023-04-24T16:47:41.825" v="220" actId="1076"/>
+          <ac:spMkLst>
+            <pc:docMk/>
+            <pc:sldMk cId="864514952" sldId="266"/>
+            <ac:spMk id="50" creationId="{B2DA9DBA-8EB0-DDFE-DF90-5538590BE241}"/>
+          </ac:spMkLst>
+        </pc:spChg>
+        <pc:spChg chg="add mod">
+          <ac:chgData name="Markus Bilz" userId="a36021e4bdb9349f" providerId="LiveId" clId="{9CD03640-CC4F-4034-8161-8D1D39C001C5}" dt="2023-04-24T16:47:04.312" v="213" actId="1076"/>
+          <ac:spMkLst>
+            <pc:docMk/>
+            <pc:sldMk cId="864514952" sldId="266"/>
+            <ac:spMk id="51" creationId="{C4957AE8-EA45-4D8A-A482-AD8DDE339906}"/>
+          </ac:spMkLst>
+        </pc:spChg>
+        <pc:spChg chg="add mod">
+          <ac:chgData name="Markus Bilz" userId="a36021e4bdb9349f" providerId="LiveId" clId="{9CD03640-CC4F-4034-8161-8D1D39C001C5}" dt="2023-04-24T16:47:56.400" v="222" actId="1076"/>
+          <ac:spMkLst>
+            <pc:docMk/>
+            <pc:sldMk cId="864514952" sldId="266"/>
+            <ac:spMk id="54" creationId="{43144A8C-89D5-D08F-66F3-FE9E5AF52C63}"/>
+          </ac:spMkLst>
+        </pc:spChg>
+        <pc:spChg chg="add mod">
+          <ac:chgData name="Markus Bilz" userId="a36021e4bdb9349f" providerId="LiveId" clId="{9CD03640-CC4F-4034-8161-8D1D39C001C5}" dt="2023-04-24T16:44:39.067" v="158" actId="1076"/>
+          <ac:spMkLst>
+            <pc:docMk/>
+            <pc:sldMk cId="864514952" sldId="266"/>
+            <ac:spMk id="58" creationId="{663E79CF-E40D-9D92-E7AB-9FFBCC78273E}"/>
+          </ac:spMkLst>
+        </pc:spChg>
+        <pc:spChg chg="add mod">
+          <ac:chgData name="Markus Bilz" userId="a36021e4bdb9349f" providerId="LiveId" clId="{9CD03640-CC4F-4034-8161-8D1D39C001C5}" dt="2023-04-24T16:47:49.366" v="221" actId="1076"/>
+          <ac:spMkLst>
+            <pc:docMk/>
+            <pc:sldMk cId="864514952" sldId="266"/>
+            <ac:spMk id="59" creationId="{900411C4-4D95-CD7E-8897-769308952745}"/>
+          </ac:spMkLst>
+        </pc:spChg>
+        <pc:spChg chg="add mod">
+          <ac:chgData name="Markus Bilz" userId="a36021e4bdb9349f" providerId="LiveId" clId="{9CD03640-CC4F-4034-8161-8D1D39C001C5}" dt="2023-04-24T16:47:07.847" v="214" actId="1076"/>
+          <ac:spMkLst>
+            <pc:docMk/>
+            <pc:sldMk cId="864514952" sldId="266"/>
+            <ac:spMk id="60" creationId="{5550293D-6B34-E2B8-4868-3188E8355117}"/>
+          </ac:spMkLst>
+        </pc:spChg>
+        <pc:spChg chg="del">
+          <ac:chgData name="Markus Bilz" userId="a36021e4bdb9349f" providerId="LiveId" clId="{9CD03640-CC4F-4034-8161-8D1D39C001C5}" dt="2023-04-24T16:34:36.049" v="9" actId="478"/>
+          <ac:spMkLst>
+            <pc:docMk/>
+            <pc:sldMk cId="864514952" sldId="266"/>
+            <ac:spMk id="61" creationId="{C00FF0EF-2F9D-F942-4F6E-0006C5307219}"/>
+          </ac:spMkLst>
+        </pc:spChg>
+        <pc:spChg chg="mod">
+          <ac:chgData name="Markus Bilz" userId="a36021e4bdb9349f" providerId="LiveId" clId="{9CD03640-CC4F-4034-8161-8D1D39C001C5}" dt="2023-04-24T16:39:00.884" v="85" actId="1076"/>
+          <ac:spMkLst>
+            <pc:docMk/>
+            <pc:sldMk cId="864514952" sldId="266"/>
+            <ac:spMk id="62" creationId="{C0641B72-A83F-2F0C-92F9-BC5B309B52B7}"/>
+          </ac:spMkLst>
+        </pc:spChg>
+        <pc:spChg chg="mod">
+          <ac:chgData name="Markus Bilz" userId="a36021e4bdb9349f" providerId="LiveId" clId="{9CD03640-CC4F-4034-8161-8D1D39C001C5}" dt="2023-04-24T16:38:56.882" v="84" actId="1076"/>
+          <ac:spMkLst>
+            <pc:docMk/>
+            <pc:sldMk cId="864514952" sldId="266"/>
+            <ac:spMk id="63" creationId="{2E94D5CD-A3D0-17C2-6DA2-6C898CDD5E11}"/>
+          </ac:spMkLst>
+        </pc:spChg>
+        <pc:spChg chg="mod">
+          <ac:chgData name="Markus Bilz" userId="a36021e4bdb9349f" providerId="LiveId" clId="{9CD03640-CC4F-4034-8161-8D1D39C001C5}" dt="2023-04-24T16:38:55.263" v="83" actId="1076"/>
+          <ac:spMkLst>
+            <pc:docMk/>
+            <pc:sldMk cId="864514952" sldId="266"/>
+            <ac:spMk id="66" creationId="{7343FA96-205F-7DD7-A660-9E1AE7A16CDD}"/>
+          </ac:spMkLst>
+        </pc:spChg>
+        <pc:spChg chg="mod">
+          <ac:chgData name="Markus Bilz" userId="a36021e4bdb9349f" providerId="LiveId" clId="{9CD03640-CC4F-4034-8161-8D1D39C001C5}" dt="2023-04-24T16:34:59.443" v="19" actId="6549"/>
+          <ac:spMkLst>
+            <pc:docMk/>
+            <pc:sldMk cId="864514952" sldId="266"/>
+            <ac:spMk id="67" creationId="{542CA32F-221D-DD49-7091-4AFC3E421628}"/>
+          </ac:spMkLst>
+        </pc:spChg>
+        <pc:spChg chg="mod">
+          <ac:chgData name="Markus Bilz" userId="a36021e4bdb9349f" providerId="LiveId" clId="{9CD03640-CC4F-4034-8161-8D1D39C001C5}" dt="2023-04-24T16:36:48.993" v="55"/>
+          <ac:spMkLst>
+            <pc:docMk/>
+            <pc:sldMk cId="864514952" sldId="266"/>
+            <ac:spMk id="224" creationId="{9E0B1385-D3EF-5E83-EEF8-07612AFC7DCC}"/>
+          </ac:spMkLst>
+        </pc:spChg>
+        <pc:spChg chg="mod">
+          <ac:chgData name="Markus Bilz" userId="a36021e4bdb9349f" providerId="LiveId" clId="{9CD03640-CC4F-4034-8161-8D1D39C001C5}" dt="2023-04-24T16:36:48.993" v="55"/>
+          <ac:spMkLst>
+            <pc:docMk/>
+            <pc:sldMk cId="864514952" sldId="266"/>
+            <ac:spMk id="225" creationId="{4BE8AF46-F70D-174E-AF6B-50FCDDC9F714}"/>
+          </ac:spMkLst>
+        </pc:spChg>
+        <pc:spChg chg="mod">
+          <ac:chgData name="Markus Bilz" userId="a36021e4bdb9349f" providerId="LiveId" clId="{9CD03640-CC4F-4034-8161-8D1D39C001C5}" dt="2023-04-24T16:36:48.993" v="55"/>
+          <ac:spMkLst>
+            <pc:docMk/>
+            <pc:sldMk cId="864514952" sldId="266"/>
+            <ac:spMk id="226" creationId="{E9BDAF28-B1EA-2A42-5858-9CCEAFF5E059}"/>
+          </ac:spMkLst>
+        </pc:spChg>
+        <pc:spChg chg="mod">
+          <ac:chgData name="Markus Bilz" userId="a36021e4bdb9349f" providerId="LiveId" clId="{9CD03640-CC4F-4034-8161-8D1D39C001C5}" dt="2023-04-24T16:36:48.993" v="55"/>
+          <ac:spMkLst>
+            <pc:docMk/>
+            <pc:sldMk cId="864514952" sldId="266"/>
+            <ac:spMk id="227" creationId="{52375B26-A9E4-1549-11F9-01CF1245BE80}"/>
+          </ac:spMkLst>
+        </pc:spChg>
+        <pc:spChg chg="mod">
+          <ac:chgData name="Markus Bilz" userId="a36021e4bdb9349f" providerId="LiveId" clId="{9CD03640-CC4F-4034-8161-8D1D39C001C5}" dt="2023-04-24T16:36:48.993" v="55"/>
+          <ac:spMkLst>
+            <pc:docMk/>
+            <pc:sldMk cId="864514952" sldId="266"/>
+            <ac:spMk id="228" creationId="{063678CE-611E-6F57-BE0F-1C190A7ECD1F}"/>
+          </ac:spMkLst>
+        </pc:spChg>
+        <pc:spChg chg="add mod">
+          <ac:chgData name="Markus Bilz" userId="a36021e4bdb9349f" providerId="LiveId" clId="{9CD03640-CC4F-4034-8161-8D1D39C001C5}" dt="2023-04-24T16:40:25.033" v="96" actId="1076"/>
+          <ac:spMkLst>
+            <pc:docMk/>
+            <pc:sldMk cId="864514952" sldId="266"/>
+            <ac:spMk id="229" creationId="{40CB5ADD-0540-E6D3-5F0C-712C49407505}"/>
+          </ac:spMkLst>
+        </pc:spChg>
+        <pc:spChg chg="add mod">
+          <ac:chgData name="Markus Bilz" userId="a36021e4bdb9349f" providerId="LiveId" clId="{9CD03640-CC4F-4034-8161-8D1D39C001C5}" dt="2023-04-24T16:47:34.137" v="219" actId="1076"/>
+          <ac:spMkLst>
+            <pc:docMk/>
+            <pc:sldMk cId="864514952" sldId="266"/>
+            <ac:spMk id="230" creationId="{BDF876BA-D339-4B53-D461-93A77EEE3D86}"/>
+          </ac:spMkLst>
+        </pc:spChg>
+        <pc:spChg chg="add mod">
+          <ac:chgData name="Markus Bilz" userId="a36021e4bdb9349f" providerId="LiveId" clId="{9CD03640-CC4F-4034-8161-8D1D39C001C5}" dt="2023-04-24T16:47:19.666" v="217" actId="1076"/>
+          <ac:spMkLst>
+            <pc:docMk/>
+            <pc:sldMk cId="864514952" sldId="266"/>
+            <ac:spMk id="231" creationId="{FBEA45D8-D738-696D-BD58-566FF923A38A}"/>
+          </ac:spMkLst>
+        </pc:spChg>
+        <pc:spChg chg="del">
+          <ac:chgData name="Markus Bilz" userId="a36021e4bdb9349f" providerId="LiveId" clId="{9CD03640-CC4F-4034-8161-8D1D39C001C5}" dt="2023-04-24T16:34:56.601" v="18" actId="478"/>
+          <ac:spMkLst>
+            <pc:docMk/>
+            <pc:sldMk cId="864514952" sldId="266"/>
+            <ac:spMk id="233" creationId="{22826292-593A-4357-FEEB-B7D5B39875EF}"/>
+          </ac:spMkLst>
+        </pc:spChg>
+        <pc:spChg chg="mod">
+          <ac:chgData name="Markus Bilz" userId="a36021e4bdb9349f" providerId="LiveId" clId="{9CD03640-CC4F-4034-8161-8D1D39C001C5}" dt="2023-04-24T16:40:07.186" v="93"/>
+          <ac:spMkLst>
+            <pc:docMk/>
+            <pc:sldMk cId="864514952" sldId="266"/>
+            <ac:spMk id="239" creationId="{731CB360-1528-E1CB-9AA3-A43C56DD8090}"/>
+          </ac:spMkLst>
+        </pc:spChg>
+        <pc:spChg chg="mod">
+          <ac:chgData name="Markus Bilz" userId="a36021e4bdb9349f" providerId="LiveId" clId="{9CD03640-CC4F-4034-8161-8D1D39C001C5}" dt="2023-04-24T16:40:07.186" v="93"/>
+          <ac:spMkLst>
+            <pc:docMk/>
+            <pc:sldMk cId="864514952" sldId="266"/>
+            <ac:spMk id="240" creationId="{58EA490F-2ADC-437C-2E12-82586401378D}"/>
+          </ac:spMkLst>
+        </pc:spChg>
+        <pc:spChg chg="mod">
+          <ac:chgData name="Markus Bilz" userId="a36021e4bdb9349f" providerId="LiveId" clId="{9CD03640-CC4F-4034-8161-8D1D39C001C5}" dt="2023-04-24T16:40:07.186" v="93"/>
+          <ac:spMkLst>
+            <pc:docMk/>
+            <pc:sldMk cId="864514952" sldId="266"/>
+            <ac:spMk id="243" creationId="{96A5131F-4926-742B-2CDA-3FDAF0530C35}"/>
+          </ac:spMkLst>
+        </pc:spChg>
+        <pc:spChg chg="mod">
+          <ac:chgData name="Markus Bilz" userId="a36021e4bdb9349f" providerId="LiveId" clId="{9CD03640-CC4F-4034-8161-8D1D39C001C5}" dt="2023-04-24T16:40:07.186" v="93"/>
+          <ac:spMkLst>
+            <pc:docMk/>
+            <pc:sldMk cId="864514952" sldId="266"/>
+            <ac:spMk id="244" creationId="{B00CBD93-4C47-43AA-5B94-FA07E509EAFC}"/>
+          </ac:spMkLst>
+        </pc:spChg>
+        <pc:spChg chg="mod">
+          <ac:chgData name="Markus Bilz" userId="a36021e4bdb9349f" providerId="LiveId" clId="{9CD03640-CC4F-4034-8161-8D1D39C001C5}" dt="2023-04-24T16:40:07.186" v="93"/>
+          <ac:spMkLst>
+            <pc:docMk/>
+            <pc:sldMk cId="864514952" sldId="266"/>
+            <ac:spMk id="245" creationId="{6C7C1B0E-C140-27FB-F2F0-F396C070CD3D}"/>
+          </ac:spMkLst>
+        </pc:spChg>
+        <pc:spChg chg="mod">
+          <ac:chgData name="Markus Bilz" userId="a36021e4bdb9349f" providerId="LiveId" clId="{9CD03640-CC4F-4034-8161-8D1D39C001C5}" dt="2023-04-24T16:40:07.186" v="93"/>
+          <ac:spMkLst>
+            <pc:docMk/>
+            <pc:sldMk cId="864514952" sldId="266"/>
+            <ac:spMk id="246" creationId="{7EBA5B1C-50E5-C80F-7362-E81AFFAB887D}"/>
+          </ac:spMkLst>
+        </pc:spChg>
+        <pc:spChg chg="add mod">
+          <ac:chgData name="Markus Bilz" userId="a36021e4bdb9349f" providerId="LiveId" clId="{9CD03640-CC4F-4034-8161-8D1D39C001C5}" dt="2023-04-24T16:48:13.648" v="225" actId="1076"/>
+          <ac:spMkLst>
+            <pc:docMk/>
+            <pc:sldMk cId="864514952" sldId="266"/>
+            <ac:spMk id="248" creationId="{6AF29941-846E-C683-4567-93F5FD136B64}"/>
+          </ac:spMkLst>
+        </pc:spChg>
+        <pc:spChg chg="add mod">
+          <ac:chgData name="Markus Bilz" userId="a36021e4bdb9349f" providerId="LiveId" clId="{9CD03640-CC4F-4034-8161-8D1D39C001C5}" dt="2023-04-24T16:42:48.170" v="136" actId="20577"/>
+          <ac:spMkLst>
+            <pc:docMk/>
+            <pc:sldMk cId="864514952" sldId="266"/>
+            <ac:spMk id="253" creationId="{EC5DEF8F-3AC9-983D-49B4-7733921FBA6E}"/>
+          </ac:spMkLst>
+        </pc:spChg>
+        <pc:spChg chg="add mod">
+          <ac:chgData name="Markus Bilz" userId="a36021e4bdb9349f" providerId="LiveId" clId="{9CD03640-CC4F-4034-8161-8D1D39C001C5}" dt="2023-04-24T16:47:25.989" v="218" actId="1076"/>
+          <ac:spMkLst>
+            <pc:docMk/>
+            <pc:sldMk cId="864514952" sldId="266"/>
+            <ac:spMk id="254" creationId="{2712C93F-92CB-FE3F-85BB-A70AFD230B66}"/>
+          </ac:spMkLst>
+        </pc:spChg>
+        <pc:spChg chg="add mod">
+          <ac:chgData name="Markus Bilz" userId="a36021e4bdb9349f" providerId="LiveId" clId="{9CD03640-CC4F-4034-8161-8D1D39C001C5}" dt="2023-04-24T16:45:07.258" v="173" actId="1076"/>
+          <ac:spMkLst>
+            <pc:docMk/>
+            <pc:sldMk cId="864514952" sldId="266"/>
+            <ac:spMk id="258" creationId="{78768205-86A3-D9D5-18D5-FC3A2BCD02AF}"/>
+          </ac:spMkLst>
+        </pc:spChg>
+        <pc:spChg chg="add mod">
+          <ac:chgData name="Markus Bilz" userId="a36021e4bdb9349f" providerId="LiveId" clId="{9CD03640-CC4F-4034-8161-8D1D39C001C5}" dt="2023-04-24T16:44:51.637" v="160" actId="1076"/>
+          <ac:spMkLst>
+            <pc:docMk/>
+            <pc:sldMk cId="864514952" sldId="266"/>
+            <ac:spMk id="262" creationId="{3E9E8AF5-B556-DE0D-CF25-0ED8151A4F4D}"/>
+          </ac:spMkLst>
+        </pc:spChg>
+        <pc:spChg chg="del">
+          <ac:chgData name="Markus Bilz" userId="a36021e4bdb9349f" providerId="LiveId" clId="{9CD03640-CC4F-4034-8161-8D1D39C001C5}" dt="2023-04-24T16:34:31.443" v="6" actId="478"/>
+          <ac:spMkLst>
+            <pc:docMk/>
+            <pc:sldMk cId="864514952" sldId="266"/>
+            <ac:spMk id="266" creationId="{581F8540-556F-156B-61E8-585BC8A175EB}"/>
+          </ac:spMkLst>
+        </pc:spChg>
+        <pc:spChg chg="del">
+          <ac:chgData name="Markus Bilz" userId="a36021e4bdb9349f" providerId="LiveId" clId="{9CD03640-CC4F-4034-8161-8D1D39C001C5}" dt="2023-04-24T16:35:12.568" v="26" actId="478"/>
+          <ac:spMkLst>
+            <pc:docMk/>
+            <pc:sldMk cId="864514952" sldId="266"/>
+            <ac:spMk id="267" creationId="{457B388C-7929-72CD-0559-53E0AA934C74}"/>
+          </ac:spMkLst>
+        </pc:spChg>
+        <pc:spChg chg="del">
+          <ac:chgData name="Markus Bilz" userId="a36021e4bdb9349f" providerId="LiveId" clId="{9CD03640-CC4F-4034-8161-8D1D39C001C5}" dt="2023-04-24T16:35:15.027" v="29" actId="478"/>
+          <ac:spMkLst>
+            <pc:docMk/>
+            <pc:sldMk cId="864514952" sldId="266"/>
+            <ac:spMk id="268" creationId="{BB1549EF-6367-5F54-69BE-C8B0CC0F2CF9}"/>
+          </ac:spMkLst>
+        </pc:spChg>
+        <pc:grpChg chg="add mod">
+          <ac:chgData name="Markus Bilz" userId="a36021e4bdb9349f" providerId="LiveId" clId="{9CD03640-CC4F-4034-8161-8D1D39C001C5}" dt="2023-04-24T16:40:17.837" v="95" actId="1076"/>
+          <ac:grpSpMkLst>
+            <pc:docMk/>
+            <pc:sldMk cId="864514952" sldId="266"/>
+            <ac:grpSpMk id="9" creationId="{C32E5919-6D95-84C0-C2B4-588BD8F1D087}"/>
+          </ac:grpSpMkLst>
+        </pc:grpChg>
+        <pc:grpChg chg="add del mod">
+          <ac:chgData name="Markus Bilz" userId="a36021e4bdb9349f" providerId="LiveId" clId="{9CD03640-CC4F-4034-8161-8D1D39C001C5}" dt="2023-04-24T16:36:42.682" v="54" actId="478"/>
+          <ac:grpSpMkLst>
+            <pc:docMk/>
+            <pc:sldMk cId="864514952" sldId="266"/>
+            <ac:grpSpMk id="10" creationId="{C5365B73-39EC-87C2-6566-6B6C00579EB1}"/>
+          </ac:grpSpMkLst>
+        </pc:grpChg>
+        <pc:grpChg chg="add del mod">
+          <ac:chgData name="Markus Bilz" userId="a36021e4bdb9349f" providerId="LiveId" clId="{9CD03640-CC4F-4034-8161-8D1D39C001C5}" dt="2023-04-24T16:38:39.763" v="80" actId="478"/>
+          <ac:grpSpMkLst>
+            <pc:docMk/>
+            <pc:sldMk cId="864514952" sldId="266"/>
+            <ac:grpSpMk id="24" creationId="{504C6AB5-4530-96BD-BE08-EAFCD2ED02D1}"/>
+          </ac:grpSpMkLst>
+        </pc:grpChg>
+        <pc:grpChg chg="add mod">
+          <ac:chgData name="Markus Bilz" userId="a36021e4bdb9349f" providerId="LiveId" clId="{9CD03640-CC4F-4034-8161-8D1D39C001C5}" dt="2023-04-24T16:40:15.722" v="94" actId="1076"/>
+          <ac:grpSpMkLst>
+            <pc:docMk/>
+            <pc:sldMk cId="864514952" sldId="266"/>
+            <ac:grpSpMk id="238" creationId="{F480E401-07C9-A65C-382E-9DDFFDDCDE46}"/>
+          </ac:grpSpMkLst>
+        </pc:grpChg>
+        <pc:grpChg chg="add">
+          <ac:chgData name="Markus Bilz" userId="a36021e4bdb9349f" providerId="LiveId" clId="{9CD03640-CC4F-4034-8161-8D1D39C001C5}" dt="2023-04-24T16:49:10.995" v="231" actId="164"/>
+          <ac:grpSpMkLst>
+            <pc:docMk/>
+            <pc:sldMk cId="864514952" sldId="266"/>
+            <ac:grpSpMk id="263" creationId="{B91516EA-A878-C95E-E73C-E46A9230D80F}"/>
+          </ac:grpSpMkLst>
+        </pc:grpChg>
+        <pc:picChg chg="del">
+          <ac:chgData name="Markus Bilz" userId="a36021e4bdb9349f" providerId="LiveId" clId="{9CD03640-CC4F-4034-8161-8D1D39C001C5}" dt="2023-04-24T16:34:13.526" v="1" actId="478"/>
+          <ac:picMkLst>
+            <pc:docMk/>
+            <pc:sldMk cId="864514952" sldId="266"/>
+            <ac:picMk id="5" creationId="{7295174F-DD3B-430A-4AAD-CB8716281370}"/>
+          </ac:picMkLst>
+        </pc:picChg>
+        <pc:picChg chg="add del mod">
+          <ac:chgData name="Markus Bilz" userId="a36021e4bdb9349f" providerId="LiveId" clId="{9CD03640-CC4F-4034-8161-8D1D39C001C5}" dt="2023-04-24T16:48:55.328" v="230" actId="478"/>
+          <ac:picMkLst>
+            <pc:docMk/>
+            <pc:sldMk cId="864514952" sldId="266"/>
+            <ac:picMk id="8" creationId="{04B01B87-F2CB-71DC-E1C7-30AD3383FA85}"/>
+          </ac:picMkLst>
+        </pc:picChg>
+        <pc:cxnChg chg="del mod">
+          <ac:chgData name="Markus Bilz" userId="a36021e4bdb9349f" providerId="LiveId" clId="{9CD03640-CC4F-4034-8161-8D1D39C001C5}" dt="2023-04-24T16:34:42.558" v="15" actId="478"/>
+          <ac:cxnSpMkLst>
+            <pc:docMk/>
+            <pc:sldMk cId="864514952" sldId="266"/>
+            <ac:cxnSpMk id="3" creationId="{1B21BEEA-0718-A8BF-CA7A-FD95D29662F1}"/>
+          </ac:cxnSpMkLst>
+        </pc:cxnChg>
+        <pc:cxnChg chg="del mod">
+          <ac:chgData name="Markus Bilz" userId="a36021e4bdb9349f" providerId="LiveId" clId="{9CD03640-CC4F-4034-8161-8D1D39C001C5}" dt="2023-04-24T16:34:50.289" v="16" actId="478"/>
+          <ac:cxnSpMkLst>
+            <pc:docMk/>
+            <pc:sldMk cId="864514952" sldId="266"/>
+            <ac:cxnSpMk id="28" creationId="{8A6ED71D-102A-0459-C60D-99BC3B322234}"/>
+          </ac:cxnSpMkLst>
+        </pc:cxnChg>
+        <pc:cxnChg chg="del">
+          <ac:chgData name="Markus Bilz" userId="a36021e4bdb9349f" providerId="LiveId" clId="{9CD03640-CC4F-4034-8161-8D1D39C001C5}" dt="2023-04-24T16:34:50.289" v="16" actId="478"/>
+          <ac:cxnSpMkLst>
+            <pc:docMk/>
+            <pc:sldMk cId="864514952" sldId="266"/>
+            <ac:cxnSpMk id="29" creationId="{ADCE3843-0FDE-285C-7733-2A6A7A7A0AC7}"/>
+          </ac:cxnSpMkLst>
+        </pc:cxnChg>
+        <pc:cxnChg chg="add mod">
+          <ac:chgData name="Markus Bilz" userId="a36021e4bdb9349f" providerId="LiveId" clId="{9CD03640-CC4F-4034-8161-8D1D39C001C5}" dt="2023-04-24T16:43:31.579" v="138" actId="1076"/>
+          <ac:cxnSpMkLst>
+            <pc:docMk/>
+            <pc:sldMk cId="864514952" sldId="266"/>
+            <ac:cxnSpMk id="33" creationId="{5DD08E79-440E-6EFD-DEB6-FFF662C82D80}"/>
+          </ac:cxnSpMkLst>
+        </pc:cxnChg>
+        <pc:cxnChg chg="add mod">
+          <ac:chgData name="Markus Bilz" userId="a36021e4bdb9349f" providerId="LiveId" clId="{9CD03640-CC4F-4034-8161-8D1D39C001C5}" dt="2023-04-24T16:43:31.579" v="138" actId="1076"/>
+          <ac:cxnSpMkLst>
+            <pc:docMk/>
+            <pc:sldMk cId="864514952" sldId="266"/>
+            <ac:cxnSpMk id="34" creationId="{67DF4F7C-E0D4-F9FD-2D44-3DE3E954C809}"/>
+          </ac:cxnSpMkLst>
+        </pc:cxnChg>
+        <pc:cxnChg chg="add del mod">
+          <ac:chgData name="Markus Bilz" userId="a36021e4bdb9349f" providerId="LiveId" clId="{9CD03640-CC4F-4034-8161-8D1D39C001C5}" dt="2023-04-24T16:48:25.183" v="228" actId="478"/>
+          <ac:cxnSpMkLst>
+            <pc:docMk/>
+            <pc:sldMk cId="864514952" sldId="266"/>
+            <ac:cxnSpMk id="36" creationId="{AF4337F6-B356-36E6-2783-A1725AEFFC4D}"/>
+          </ac:cxnSpMkLst>
+        </pc:cxnChg>
+        <pc:cxnChg chg="add mod">
+          <ac:chgData name="Markus Bilz" userId="a36021e4bdb9349f" providerId="LiveId" clId="{9CD03640-CC4F-4034-8161-8D1D39C001C5}" dt="2023-04-24T16:43:31.579" v="138" actId="1076"/>
+          <ac:cxnSpMkLst>
+            <pc:docMk/>
+            <pc:sldMk cId="864514952" sldId="266"/>
+            <ac:cxnSpMk id="37" creationId="{3CA0507A-2302-3D0E-E9A0-34003CF1E055}"/>
+          </ac:cxnSpMkLst>
+        </pc:cxnChg>
+        <pc:cxnChg chg="add mod">
+          <ac:chgData name="Markus Bilz" userId="a36021e4bdb9349f" providerId="LiveId" clId="{9CD03640-CC4F-4034-8161-8D1D39C001C5}" dt="2023-04-24T16:43:31.579" v="138" actId="1076"/>
+          <ac:cxnSpMkLst>
+            <pc:docMk/>
+            <pc:sldMk cId="864514952" sldId="266"/>
+            <ac:cxnSpMk id="38" creationId="{9BEF3E0A-EFD8-08ED-621D-59B34C13E983}"/>
+          </ac:cxnSpMkLst>
+        </pc:cxnChg>
+        <pc:cxnChg chg="del mod">
+          <ac:chgData name="Markus Bilz" userId="a36021e4bdb9349f" providerId="LiveId" clId="{9CD03640-CC4F-4034-8161-8D1D39C001C5}" dt="2023-04-24T16:34:32.594" v="7" actId="478"/>
+          <ac:cxnSpMkLst>
+            <pc:docMk/>
+            <pc:sldMk cId="864514952" sldId="266"/>
+            <ac:cxnSpMk id="39" creationId="{F9F26774-D4F9-74AB-B575-2F6F78375116}"/>
+          </ac:cxnSpMkLst>
+        </pc:cxnChg>
+        <pc:cxnChg chg="add mod">
+          <ac:chgData name="Markus Bilz" userId="a36021e4bdb9349f" providerId="LiveId" clId="{9CD03640-CC4F-4034-8161-8D1D39C001C5}" dt="2023-04-24T16:44:25.306" v="156" actId="1076"/>
+          <ac:cxnSpMkLst>
+            <pc:docMk/>
+            <pc:sldMk cId="864514952" sldId="266"/>
+            <ac:cxnSpMk id="43" creationId="{75F0FCDC-50F1-2328-5ECF-17AB8C6C3E21}"/>
+          </ac:cxnSpMkLst>
+        </pc:cxnChg>
+        <pc:cxnChg chg="add mod">
+          <ac:chgData name="Markus Bilz" userId="a36021e4bdb9349f" providerId="LiveId" clId="{9CD03640-CC4F-4034-8161-8D1D39C001C5}" dt="2023-04-24T16:44:25.306" v="156" actId="1076"/>
+          <ac:cxnSpMkLst>
+            <pc:docMk/>
+            <pc:sldMk cId="864514952" sldId="266"/>
+            <ac:cxnSpMk id="44" creationId="{0198B279-4BC8-D979-6F21-9E60F5ED5B87}"/>
+          </ac:cxnSpMkLst>
+        </pc:cxnChg>
+        <pc:cxnChg chg="add mod">
+          <ac:chgData name="Markus Bilz" userId="a36021e4bdb9349f" providerId="LiveId" clId="{9CD03640-CC4F-4034-8161-8D1D39C001C5}" dt="2023-04-24T16:48:39.572" v="229" actId="693"/>
+          <ac:cxnSpMkLst>
+            <pc:docMk/>
+            <pc:sldMk cId="864514952" sldId="266"/>
+            <ac:cxnSpMk id="46" creationId="{E429196B-0B7E-F38C-566A-81AED5C9EDA9}"/>
+          </ac:cxnSpMkLst>
+        </pc:cxnChg>
+        <pc:cxnChg chg="add mod">
+          <ac:chgData name="Markus Bilz" userId="a36021e4bdb9349f" providerId="LiveId" clId="{9CD03640-CC4F-4034-8161-8D1D39C001C5}" dt="2023-04-24T16:44:25.306" v="156" actId="1076"/>
+          <ac:cxnSpMkLst>
+            <pc:docMk/>
+            <pc:sldMk cId="864514952" sldId="266"/>
+            <ac:cxnSpMk id="47" creationId="{007EEFA8-ACF5-5E22-1349-3FA299CFB8F9}"/>
+          </ac:cxnSpMkLst>
+        </pc:cxnChg>
+        <pc:cxnChg chg="add mod">
+          <ac:chgData name="Markus Bilz" userId="a36021e4bdb9349f" providerId="LiveId" clId="{9CD03640-CC4F-4034-8161-8D1D39C001C5}" dt="2023-04-24T16:44:25.306" v="156" actId="1076"/>
+          <ac:cxnSpMkLst>
+            <pc:docMk/>
+            <pc:sldMk cId="864514952" sldId="266"/>
+            <ac:cxnSpMk id="48" creationId="{5FD4D2C3-1DE2-4BBC-63D2-2EF777D82FC8}"/>
+          </ac:cxnSpMkLst>
+        </pc:cxnChg>
+        <pc:cxnChg chg="add mod">
+          <ac:chgData name="Markus Bilz" userId="a36021e4bdb9349f" providerId="LiveId" clId="{9CD03640-CC4F-4034-8161-8D1D39C001C5}" dt="2023-04-24T16:44:39.067" v="158" actId="1076"/>
+          <ac:cxnSpMkLst>
+            <pc:docMk/>
+            <pc:sldMk cId="864514952" sldId="266"/>
+            <ac:cxnSpMk id="52" creationId="{129DDE14-8C80-5433-51C6-A8AA41D4CA02}"/>
+          </ac:cxnSpMkLst>
+        </pc:cxnChg>
+        <pc:cxnChg chg="add mod">
+          <ac:chgData name="Markus Bilz" userId="a36021e4bdb9349f" providerId="LiveId" clId="{9CD03640-CC4F-4034-8161-8D1D39C001C5}" dt="2023-04-24T16:44:39.067" v="158" actId="1076"/>
+          <ac:cxnSpMkLst>
+            <pc:docMk/>
+            <pc:sldMk cId="864514952" sldId="266"/>
+            <ac:cxnSpMk id="53" creationId="{AFE9ED2C-56B5-5DFA-5BD9-30F020E41C7F}"/>
+          </ac:cxnSpMkLst>
+        </pc:cxnChg>
+        <pc:cxnChg chg="add del mod">
+          <ac:chgData name="Markus Bilz" userId="a36021e4bdb9349f" providerId="LiveId" clId="{9CD03640-CC4F-4034-8161-8D1D39C001C5}" dt="2023-04-24T16:48:22.291" v="226" actId="478"/>
+          <ac:cxnSpMkLst>
+            <pc:docMk/>
+            <pc:sldMk cId="864514952" sldId="266"/>
+            <ac:cxnSpMk id="55" creationId="{6F4C9F52-BAE5-DE4A-69AC-AE97666AF011}"/>
+          </ac:cxnSpMkLst>
+        </pc:cxnChg>
+        <pc:cxnChg chg="add mod">
+          <ac:chgData name="Markus Bilz" userId="a36021e4bdb9349f" providerId="LiveId" clId="{9CD03640-CC4F-4034-8161-8D1D39C001C5}" dt="2023-04-24T16:44:39.067" v="158" actId="1076"/>
+          <ac:cxnSpMkLst>
+            <pc:docMk/>
+            <pc:sldMk cId="864514952" sldId="266"/>
+            <ac:cxnSpMk id="56" creationId="{64C293DD-21BB-C879-37DA-2E181048A591}"/>
+          </ac:cxnSpMkLst>
+        </pc:cxnChg>
+        <pc:cxnChg chg="add mod">
+          <ac:chgData name="Markus Bilz" userId="a36021e4bdb9349f" providerId="LiveId" clId="{9CD03640-CC4F-4034-8161-8D1D39C001C5}" dt="2023-04-24T16:44:39.067" v="158" actId="1076"/>
+          <ac:cxnSpMkLst>
+            <pc:docMk/>
+            <pc:sldMk cId="864514952" sldId="266"/>
+            <ac:cxnSpMk id="57" creationId="{37EAA4F1-CA02-ABE0-B997-29874121DF5A}"/>
+          </ac:cxnSpMkLst>
+        </pc:cxnChg>
+        <pc:cxnChg chg="del mod">
+          <ac:chgData name="Markus Bilz" userId="a36021e4bdb9349f" providerId="LiveId" clId="{9CD03640-CC4F-4034-8161-8D1D39C001C5}" dt="2023-04-24T16:34:39.725" v="12" actId="478"/>
+          <ac:cxnSpMkLst>
+            <pc:docMk/>
+            <pc:sldMk cId="864514952" sldId="266"/>
+            <ac:cxnSpMk id="65" creationId="{28EE4F0F-C008-F011-6402-C667E69D8B21}"/>
+          </ac:cxnSpMkLst>
+        </pc:cxnChg>
+        <pc:cxnChg chg="del mod">
+          <ac:chgData name="Markus Bilz" userId="a36021e4bdb9349f" providerId="LiveId" clId="{9CD03640-CC4F-4034-8161-8D1D39C001C5}" dt="2023-04-24T16:34:37.035" v="10" actId="478"/>
+          <ac:cxnSpMkLst>
+            <pc:docMk/>
+            <pc:sldMk cId="864514952" sldId="266"/>
+            <ac:cxnSpMk id="70" creationId="{66C88C84-34E5-DBC0-F118-6C49B6374993}"/>
+          </ac:cxnSpMkLst>
+        </pc:cxnChg>
+        <pc:cxnChg chg="del mod">
+          <ac:chgData name="Markus Bilz" userId="a36021e4bdb9349f" providerId="LiveId" clId="{9CD03640-CC4F-4034-8161-8D1D39C001C5}" dt="2023-04-24T16:34:41.810" v="14" actId="478"/>
+          <ac:cxnSpMkLst>
+            <pc:docMk/>
+            <pc:sldMk cId="864514952" sldId="266"/>
+            <ac:cxnSpMk id="214" creationId="{0D81CBA5-C3C3-5317-A8A3-8CD616613EDE}"/>
+          </ac:cxnSpMkLst>
+        </pc:cxnChg>
+        <pc:cxnChg chg="del mod">
+          <ac:chgData name="Markus Bilz" userId="a36021e4bdb9349f" providerId="LiveId" clId="{9CD03640-CC4F-4034-8161-8D1D39C001C5}" dt="2023-04-24T16:35:17.543" v="31" actId="478"/>
+          <ac:cxnSpMkLst>
+            <pc:docMk/>
+            <pc:sldMk cId="864514952" sldId="266"/>
+            <ac:cxnSpMk id="217" creationId="{AF17FB98-C9BC-D133-7339-F0C5698E6493}"/>
+          </ac:cxnSpMkLst>
+        </pc:cxnChg>
+        <pc:cxnChg chg="del mod">
+          <ac:chgData name="Markus Bilz" userId="a36021e4bdb9349f" providerId="LiveId" clId="{9CD03640-CC4F-4034-8161-8D1D39C001C5}" dt="2023-04-24T16:34:38.502" v="11" actId="478"/>
+          <ac:cxnSpMkLst>
+            <pc:docMk/>
+            <pc:sldMk cId="864514952" sldId="266"/>
+            <ac:cxnSpMk id="220" creationId="{F71C02ED-6336-D99D-2AAA-7DC8A5931246}"/>
+          </ac:cxnSpMkLst>
+        </pc:cxnChg>
+        <pc:cxnChg chg="add del">
+          <ac:chgData name="Markus Bilz" userId="a36021e4bdb9349f" providerId="LiveId" clId="{9CD03640-CC4F-4034-8161-8D1D39C001C5}" dt="2023-04-24T16:39:40.714" v="89" actId="478"/>
+          <ac:cxnSpMkLst>
+            <pc:docMk/>
+            <pc:sldMk cId="864514952" sldId="266"/>
+            <ac:cxnSpMk id="234" creationId="{50BAA6FE-A991-6CA4-6308-BE9BCE8479E7}"/>
+          </ac:cxnSpMkLst>
+        </pc:cxnChg>
+        <pc:cxnChg chg="add mod">
+          <ac:chgData name="Markus Bilz" userId="a36021e4bdb9349f" providerId="LiveId" clId="{9CD03640-CC4F-4034-8161-8D1D39C001C5}" dt="2023-04-24T16:39:47.886" v="91" actId="14100"/>
+          <ac:cxnSpMkLst>
+            <pc:docMk/>
+            <pc:sldMk cId="864514952" sldId="266"/>
+            <ac:cxnSpMk id="235" creationId="{C3DA3678-3D95-A41B-A9D2-02227709CA69}"/>
+          </ac:cxnSpMkLst>
+        </pc:cxnChg>
+        <pc:cxnChg chg="del mod">
+          <ac:chgData name="Markus Bilz" userId="a36021e4bdb9349f" providerId="LiveId" clId="{9CD03640-CC4F-4034-8161-8D1D39C001C5}" dt="2023-04-24T16:34:40.974" v="13" actId="478"/>
+          <ac:cxnSpMkLst>
+            <pc:docMk/>
+            <pc:sldMk cId="864514952" sldId="266"/>
+            <ac:cxnSpMk id="241" creationId="{647D61CA-2D51-3BFE-D9EB-260D494A7DAC}"/>
+          </ac:cxnSpMkLst>
+        </pc:cxnChg>
+        <pc:cxnChg chg="del">
+          <ac:chgData name="Markus Bilz" userId="a36021e4bdb9349f" providerId="LiveId" clId="{9CD03640-CC4F-4034-8161-8D1D39C001C5}" dt="2023-04-24T16:35:14.261" v="28" actId="478"/>
+          <ac:cxnSpMkLst>
+            <pc:docMk/>
+            <pc:sldMk cId="864514952" sldId="266"/>
+            <ac:cxnSpMk id="242" creationId="{15A6B20D-82BA-B4F9-68E1-286190BB95EE}"/>
+          </ac:cxnSpMkLst>
+        </pc:cxnChg>
+        <pc:cxnChg chg="add mod">
+          <ac:chgData name="Markus Bilz" userId="a36021e4bdb9349f" providerId="LiveId" clId="{9CD03640-CC4F-4034-8161-8D1D39C001C5}" dt="2023-04-24T16:41:46.278" v="118" actId="1076"/>
+          <ac:cxnSpMkLst>
+            <pc:docMk/>
+            <pc:sldMk cId="864514952" sldId="266"/>
+            <ac:cxnSpMk id="247" creationId="{B57F3CDD-AC70-F737-8C91-716AC2ADE388}"/>
+          </ac:cxnSpMkLst>
+        </pc:cxnChg>
+        <pc:cxnChg chg="del">
+          <ac:chgData name="Markus Bilz" userId="a36021e4bdb9349f" providerId="LiveId" clId="{9CD03640-CC4F-4034-8161-8D1D39C001C5}" dt="2023-04-24T16:35:16.209" v="30" actId="478"/>
+          <ac:cxnSpMkLst>
+            <pc:docMk/>
+            <pc:sldMk cId="864514952" sldId="266"/>
+            <ac:cxnSpMk id="249" creationId="{474E23BC-E9EE-6D4C-E9B0-65C585D028C8}"/>
+          </ac:cxnSpMkLst>
+        </pc:cxnChg>
+        <pc:cxnChg chg="add mod">
+          <ac:chgData name="Markus Bilz" userId="a36021e4bdb9349f" providerId="LiveId" clId="{9CD03640-CC4F-4034-8161-8D1D39C001C5}" dt="2023-04-24T16:48:39.572" v="229" actId="693"/>
+          <ac:cxnSpMkLst>
+            <pc:docMk/>
+            <pc:sldMk cId="864514952" sldId="266"/>
+            <ac:cxnSpMk id="250" creationId="{59F29DE5-486E-BFE9-4847-43007836CB38}"/>
+          </ac:cxnSpMkLst>
+        </pc:cxnChg>
+        <pc:cxnChg chg="add mod">
+          <ac:chgData name="Markus Bilz" userId="a36021e4bdb9349f" providerId="LiveId" clId="{9CD03640-CC4F-4034-8161-8D1D39C001C5}" dt="2023-04-24T16:42:25.915" v="124" actId="1076"/>
+          <ac:cxnSpMkLst>
+            <pc:docMk/>
+            <pc:sldMk cId="864514952" sldId="266"/>
+            <ac:cxnSpMk id="251" creationId="{4A209874-1154-FD9C-DD63-118CF294F905}"/>
+          </ac:cxnSpMkLst>
+        </pc:cxnChg>
+        <pc:cxnChg chg="add mod">
+          <ac:chgData name="Markus Bilz" userId="a36021e4bdb9349f" providerId="LiveId" clId="{9CD03640-CC4F-4034-8161-8D1D39C001C5}" dt="2023-04-24T16:42:39.507" v="126" actId="1076"/>
+          <ac:cxnSpMkLst>
+            <pc:docMk/>
+            <pc:sldMk cId="864514952" sldId="266"/>
+            <ac:cxnSpMk id="252" creationId="{242EB6C1-D759-C004-77B6-FBD486BBDB2F}"/>
+          </ac:cxnSpMkLst>
+        </pc:cxnChg>
+        <pc:cxnChg chg="del mod">
+          <ac:chgData name="Markus Bilz" userId="a36021e4bdb9349f" providerId="LiveId" clId="{9CD03640-CC4F-4034-8161-8D1D39C001C5}" dt="2023-04-24T16:34:33.602" v="8" actId="478"/>
+          <ac:cxnSpMkLst>
+            <pc:docMk/>
+            <pc:sldMk cId="864514952" sldId="266"/>
+            <ac:cxnSpMk id="255" creationId="{37A65A15-9D02-19D0-A9DA-DEA04BF5E7CC}"/>
+          </ac:cxnSpMkLst>
+        </pc:cxnChg>
+        <pc:cxnChg chg="add mod">
+          <ac:chgData name="Markus Bilz" userId="a36021e4bdb9349f" providerId="LiveId" clId="{9CD03640-CC4F-4034-8161-8D1D39C001C5}" dt="2023-04-24T16:44:51.637" v="160" actId="1076"/>
+          <ac:cxnSpMkLst>
+            <pc:docMk/>
+            <pc:sldMk cId="864514952" sldId="266"/>
+            <ac:cxnSpMk id="256" creationId="{70C78A24-927E-E888-F2F5-6E2FE13CADE0}"/>
+          </ac:cxnSpMkLst>
+        </pc:cxnChg>
+        <pc:cxnChg chg="add mod">
+          <ac:chgData name="Markus Bilz" userId="a36021e4bdb9349f" providerId="LiveId" clId="{9CD03640-CC4F-4034-8161-8D1D39C001C5}" dt="2023-04-24T16:44:51.637" v="160" actId="1076"/>
+          <ac:cxnSpMkLst>
+            <pc:docMk/>
+            <pc:sldMk cId="864514952" sldId="266"/>
+            <ac:cxnSpMk id="257" creationId="{2132ECBE-C5C8-0AE7-6993-4920648225E5}"/>
+          </ac:cxnSpMkLst>
+        </pc:cxnChg>
+        <pc:cxnChg chg="add del mod">
+          <ac:chgData name="Markus Bilz" userId="a36021e4bdb9349f" providerId="LiveId" clId="{9CD03640-CC4F-4034-8161-8D1D39C001C5}" dt="2023-04-24T16:48:23.259" v="227" actId="478"/>
+          <ac:cxnSpMkLst>
+            <pc:docMk/>
+            <pc:sldMk cId="864514952" sldId="266"/>
+            <ac:cxnSpMk id="259" creationId="{4FB11FD3-620A-25C8-BA92-E5C9679C3BA9}"/>
+          </ac:cxnSpMkLst>
+        </pc:cxnChg>
+        <pc:cxnChg chg="add mod">
+          <ac:chgData name="Markus Bilz" userId="a36021e4bdb9349f" providerId="LiveId" clId="{9CD03640-CC4F-4034-8161-8D1D39C001C5}" dt="2023-04-24T16:44:51.637" v="160" actId="1076"/>
+          <ac:cxnSpMkLst>
+            <pc:docMk/>
+            <pc:sldMk cId="864514952" sldId="266"/>
+            <ac:cxnSpMk id="260" creationId="{FE239940-86F5-59A7-6D0D-19B7DF3D0205}"/>
+          </ac:cxnSpMkLst>
+        </pc:cxnChg>
+        <pc:cxnChg chg="add mod">
+          <ac:chgData name="Markus Bilz" userId="a36021e4bdb9349f" providerId="LiveId" clId="{9CD03640-CC4F-4034-8161-8D1D39C001C5}" dt="2023-04-24T16:44:51.637" v="160" actId="1076"/>
+          <ac:cxnSpMkLst>
+            <pc:docMk/>
+            <pc:sldMk cId="864514952" sldId="266"/>
+            <ac:cxnSpMk id="261" creationId="{FDEE6B90-8A2F-7C9D-3778-9A809B9AC567}"/>
+          </ac:cxnSpMkLst>
+        </pc:cxnChg>
+        <pc:cxnChg chg="del mod">
+          <ac:chgData name="Markus Bilz" userId="a36021e4bdb9349f" providerId="LiveId" clId="{9CD03640-CC4F-4034-8161-8D1D39C001C5}" dt="2023-04-24T16:35:13.467" v="27" actId="478"/>
+          <ac:cxnSpMkLst>
+            <pc:docMk/>
+            <pc:sldMk cId="864514952" sldId="266"/>
+            <ac:cxnSpMk id="264" creationId="{16F9191E-FF68-381B-DBB7-8107DC518EDC}"/>
+          </ac:cxnSpMkLst>
+        </pc:cxnChg>
       </pc:sldChg>
     </pc:docChg>
   </pc:docChgLst>
@@ -7717,7 +8574,7 @@
           <a:p>
             <a:fld id="{D6A82EB2-151D-4EEE-ACF5-92C73278C09C}" type="datetimeFigureOut">
               <a:rPr lang="en-GB" smtClean="0"/>
-              <a:t>22/02/2023</a:t>
+              <a:t>24/04/2023</a:t>
             </a:fld>
             <a:endParaRPr lang="en-GB"/>
           </a:p>
@@ -7917,7 +8774,7 @@
           <a:p>
             <a:fld id="{D6A82EB2-151D-4EEE-ACF5-92C73278C09C}" type="datetimeFigureOut">
               <a:rPr lang="en-GB" smtClean="0"/>
-              <a:t>22/02/2023</a:t>
+              <a:t>24/04/2023</a:t>
             </a:fld>
             <a:endParaRPr lang="en-GB"/>
           </a:p>
@@ -8127,7 +8984,7 @@
           <a:p>
             <a:fld id="{D6A82EB2-151D-4EEE-ACF5-92C73278C09C}" type="datetimeFigureOut">
               <a:rPr lang="en-GB" smtClean="0"/>
-              <a:t>22/02/2023</a:t>
+              <a:t>24/04/2023</a:t>
             </a:fld>
             <a:endParaRPr lang="en-GB"/>
           </a:p>
@@ -8327,7 +9184,7 @@
           <a:p>
             <a:fld id="{D6A82EB2-151D-4EEE-ACF5-92C73278C09C}" type="datetimeFigureOut">
               <a:rPr lang="en-GB" smtClean="0"/>
-              <a:t>22/02/2023</a:t>
+              <a:t>24/04/2023</a:t>
             </a:fld>
             <a:endParaRPr lang="en-GB"/>
           </a:p>
@@ -8603,7 +9460,7 @@
           <a:p>
             <a:fld id="{D6A82EB2-151D-4EEE-ACF5-92C73278C09C}" type="datetimeFigureOut">
               <a:rPr lang="en-GB" smtClean="0"/>
-              <a:t>22/02/2023</a:t>
+              <a:t>24/04/2023</a:t>
             </a:fld>
             <a:endParaRPr lang="en-GB"/>
           </a:p>
@@ -8871,7 +9728,7 @@
           <a:p>
             <a:fld id="{D6A82EB2-151D-4EEE-ACF5-92C73278C09C}" type="datetimeFigureOut">
               <a:rPr lang="en-GB" smtClean="0"/>
-              <a:t>22/02/2023</a:t>
+              <a:t>24/04/2023</a:t>
             </a:fld>
             <a:endParaRPr lang="en-GB"/>
           </a:p>
@@ -9286,7 +10143,7 @@
           <a:p>
             <a:fld id="{D6A82EB2-151D-4EEE-ACF5-92C73278C09C}" type="datetimeFigureOut">
               <a:rPr lang="en-GB" smtClean="0"/>
-              <a:t>22/02/2023</a:t>
+              <a:t>24/04/2023</a:t>
             </a:fld>
             <a:endParaRPr lang="en-GB"/>
           </a:p>
@@ -9428,7 +10285,7 @@
           <a:p>
             <a:fld id="{D6A82EB2-151D-4EEE-ACF5-92C73278C09C}" type="datetimeFigureOut">
               <a:rPr lang="en-GB" smtClean="0"/>
-              <a:t>22/02/2023</a:t>
+              <a:t>24/04/2023</a:t>
             </a:fld>
             <a:endParaRPr lang="en-GB"/>
           </a:p>
@@ -9541,7 +10398,7 @@
           <a:p>
             <a:fld id="{D6A82EB2-151D-4EEE-ACF5-92C73278C09C}" type="datetimeFigureOut">
               <a:rPr lang="en-GB" smtClean="0"/>
-              <a:t>22/02/2023</a:t>
+              <a:t>24/04/2023</a:t>
             </a:fld>
             <a:endParaRPr lang="en-GB"/>
           </a:p>
@@ -9854,7 +10711,7 @@
           <a:p>
             <a:fld id="{D6A82EB2-151D-4EEE-ACF5-92C73278C09C}" type="datetimeFigureOut">
               <a:rPr lang="en-GB" smtClean="0"/>
-              <a:t>22/02/2023</a:t>
+              <a:t>24/04/2023</a:t>
             </a:fld>
             <a:endParaRPr lang="en-GB"/>
           </a:p>
@@ -10143,7 +11000,7 @@
           <a:p>
             <a:fld id="{D6A82EB2-151D-4EEE-ACF5-92C73278C09C}" type="datetimeFigureOut">
               <a:rPr lang="en-GB" smtClean="0"/>
-              <a:t>22/02/2023</a:t>
+              <a:t>24/04/2023</a:t>
             </a:fld>
             <a:endParaRPr lang="en-GB"/>
           </a:p>
@@ -10386,7 +11243,7 @@
           <a:p>
             <a:fld id="{D6A82EB2-151D-4EEE-ACF5-92C73278C09C}" type="datetimeFigureOut">
               <a:rPr lang="en-GB" smtClean="0"/>
-              <a:t>22/02/2023</a:t>
+              <a:t>24/04/2023</a:t>
             </a:fld>
             <a:endParaRPr lang="en-GB"/>
           </a:p>
@@ -17351,6 +18208,96 @@
 </p:sld>
 </file>
 
+<file path=ppt/slides/slide10.xml><?xml version="1.0" encoding="utf-8"?>
+<p:sld xmlns:a="http://schemas.openxmlformats.org/drawingml/2006/main" xmlns:r="http://schemas.openxmlformats.org/officeDocument/2006/relationships" xmlns:p="http://schemas.openxmlformats.org/presentationml/2006/main">
+  <p:cSld>
+    <p:spTree>
+      <p:nvGrpSpPr>
+        <p:cNvPr id="1" name=""/>
+        <p:cNvGrpSpPr/>
+        <p:nvPr/>
+      </p:nvGrpSpPr>
+      <p:grpSpPr>
+        <a:xfrm>
+          <a:off x="0" y="0"/>
+          <a:ext cx="0" cy="0"/>
+          <a:chOff x="0" y="0"/>
+          <a:chExt cx="0" cy="0"/>
+        </a:xfrm>
+      </p:grpSpPr>
+      <p:pic>
+        <p:nvPicPr>
+          <p:cNvPr id="5" name="Picture 4">
+            <a:extLst>
+              <a:ext uri="{FF2B5EF4-FFF2-40B4-BE49-F238E27FC236}">
+                <a16:creationId xmlns:a16="http://schemas.microsoft.com/office/drawing/2014/main" id="{E9048B29-D23C-3F4A-8CFD-CC2CD996A4A6}"/>
+              </a:ext>
+            </a:extLst>
+          </p:cNvPr>
+          <p:cNvPicPr>
+            <a:picLocks noChangeAspect="1"/>
+          </p:cNvPicPr>
+          <p:nvPr/>
+        </p:nvPicPr>
+        <p:blipFill>
+          <a:blip r:embed="rId2"/>
+          <a:stretch>
+            <a:fillRect/>
+          </a:stretch>
+        </p:blipFill>
+        <p:spPr>
+          <a:xfrm>
+            <a:off x="258426" y="0"/>
+            <a:ext cx="11675147" cy="6858000"/>
+          </a:xfrm>
+          <a:prstGeom prst="rect">
+            <a:avLst/>
+          </a:prstGeom>
+        </p:spPr>
+      </p:pic>
+      <p:pic>
+        <p:nvPicPr>
+          <p:cNvPr id="3" name="Picture 2">
+            <a:extLst>
+              <a:ext uri="{FF2B5EF4-FFF2-40B4-BE49-F238E27FC236}">
+                <a16:creationId xmlns:a16="http://schemas.microsoft.com/office/drawing/2014/main" id="{4AEA4B46-C438-5924-D392-B8FE886DDBB4}"/>
+              </a:ext>
+            </a:extLst>
+          </p:cNvPr>
+          <p:cNvPicPr>
+            <a:picLocks noChangeAspect="1"/>
+          </p:cNvPicPr>
+          <p:nvPr/>
+        </p:nvPicPr>
+        <p:blipFill>
+          <a:blip r:embed="rId3"/>
+          <a:stretch>
+            <a:fillRect/>
+          </a:stretch>
+        </p:blipFill>
+        <p:spPr>
+          <a:xfrm>
+            <a:off x="3157281" y="1380830"/>
+            <a:ext cx="3667637" cy="4229690"/>
+          </a:xfrm>
+          <a:prstGeom prst="rect">
+            <a:avLst/>
+          </a:prstGeom>
+        </p:spPr>
+      </p:pic>
+    </p:spTree>
+    <p:extLst>
+      <p:ext uri="{BB962C8B-B14F-4D97-AF65-F5344CB8AC3E}">
+        <p14:creationId xmlns:p14="http://schemas.microsoft.com/office/powerpoint/2010/main" val="4091855300"/>
+      </p:ext>
+    </p:extLst>
+  </p:cSld>
+  <p:clrMapOvr>
+    <a:masterClrMapping/>
+  </p:clrMapOvr>
+</p:sld>
+</file>
+
 <file path=ppt/slides/slide2.xml><?xml version="1.0" encoding="utf-8"?>
 <p:sld xmlns:a="http://schemas.openxmlformats.org/drawingml/2006/main" xmlns:r="http://schemas.openxmlformats.org/officeDocument/2006/relationships" xmlns:p="http://schemas.openxmlformats.org/presentationml/2006/main">
   <p:cSld>
@@ -27323,60 +28270,118 @@
       </p:grpSpPr>
       <p:sp>
         <p:nvSpPr>
-          <p:cNvPr id="2" name="Title 1">
-            <a:extLst>
-              <a:ext uri="{FF2B5EF4-FFF2-40B4-BE49-F238E27FC236}">
-                <a16:creationId xmlns:a16="http://schemas.microsoft.com/office/drawing/2014/main" id="{9C25A884-0014-7B87-1AF5-C2A758D258BB}"/>
-              </a:ext>
-            </a:extLst>
-          </p:cNvPr>
-          <p:cNvSpPr>
-            <a:spLocks noGrp="1"/>
-          </p:cNvSpPr>
-          <p:nvPr>
-            <p:ph type="title"/>
-          </p:nvPr>
+          <p:cNvPr id="162" name="TextBox 161">
+            <a:extLst>
+              <a:ext uri="{FF2B5EF4-FFF2-40B4-BE49-F238E27FC236}">
+                <a16:creationId xmlns:a16="http://schemas.microsoft.com/office/drawing/2014/main" id="{C8C65B08-14FE-FF44-47C5-FB5077BC12AB}"/>
+              </a:ext>
+            </a:extLst>
+          </p:cNvPr>
+          <p:cNvSpPr txBox="1"/>
+          <p:nvPr/>
         </p:nvSpPr>
-        <p:spPr/>
+        <p:spPr>
+          <a:xfrm>
+            <a:off x="8480055" y="6260921"/>
+            <a:ext cx="2686050" cy="307777"/>
+          </a:xfrm>
+          <a:prstGeom prst="rect">
+            <a:avLst/>
+          </a:prstGeom>
+          <a:noFill/>
+        </p:spPr>
         <p:txBody>
-          <a:bodyPr/>
+          <a:bodyPr wrap="square" rtlCol="0">
+            <a:spAutoFit/>
+          </a:bodyPr>
           <a:lstStyle/>
           <a:p>
-            <a:endParaRPr lang="en-GB"/>
+            <a:r>
+              <a:rPr lang="de-DE" sz="1400" dirty="0" err="1">
+                <a:latin typeface="+mj-lt"/>
+              </a:rPr>
+              <a:t>categorical</a:t>
+            </a:r>
+            <a:r>
+              <a:rPr lang="de-DE" sz="1400" dirty="0">
+                <a:latin typeface="+mj-lt"/>
+              </a:rPr>
+              <a:t> and </a:t>
+            </a:r>
+            <a:r>
+              <a:rPr lang="de-DE" sz="1400" dirty="0" err="1">
+                <a:latin typeface="+mj-lt"/>
+              </a:rPr>
+              <a:t>continuous</a:t>
+            </a:r>
+            <a:r>
+              <a:rPr lang="de-DE" sz="1400" dirty="0">
+                <a:latin typeface="+mj-lt"/>
+              </a:rPr>
+              <a:t> </a:t>
+            </a:r>
+            <a:r>
+              <a:rPr lang="de-DE" sz="1400" dirty="0" err="1">
+                <a:latin typeface="+mj-lt"/>
+              </a:rPr>
+              <a:t>inputs</a:t>
+            </a:r>
+            <a:endParaRPr lang="en-GB" sz="1400" dirty="0">
+              <a:latin typeface="+mj-lt"/>
+            </a:endParaRPr>
           </a:p>
         </p:txBody>
       </p:sp>
       <p:sp>
         <p:nvSpPr>
-          <p:cNvPr id="3" name="Content Placeholder 2">
-            <a:extLst>
-              <a:ext uri="{FF2B5EF4-FFF2-40B4-BE49-F238E27FC236}">
-                <a16:creationId xmlns:a16="http://schemas.microsoft.com/office/drawing/2014/main" id="{EFD32671-D437-757C-1EA5-C048C3504F41}"/>
-              </a:ext>
-            </a:extLst>
-          </p:cNvPr>
-          <p:cNvSpPr>
-            <a:spLocks noGrp="1"/>
-          </p:cNvSpPr>
-          <p:nvPr>
-            <p:ph idx="1"/>
-          </p:nvPr>
+          <p:cNvPr id="2" name="TextBox 1">
+            <a:extLst>
+              <a:ext uri="{FF2B5EF4-FFF2-40B4-BE49-F238E27FC236}">
+                <a16:creationId xmlns:a16="http://schemas.microsoft.com/office/drawing/2014/main" id="{5CC34145-B5F4-8BDD-0E3A-311D220D3B32}"/>
+              </a:ext>
+            </a:extLst>
+          </p:cNvPr>
+          <p:cNvSpPr txBox="1"/>
+          <p:nvPr/>
         </p:nvSpPr>
-        <p:spPr/>
+        <p:spPr>
+          <a:xfrm>
+            <a:off x="12676516" y="534119"/>
+            <a:ext cx="1649083" cy="369332"/>
+          </a:xfrm>
+          <a:prstGeom prst="rect">
+            <a:avLst/>
+          </a:prstGeom>
+          <a:noFill/>
+        </p:spPr>
         <p:txBody>
-          <a:bodyPr/>
+          <a:bodyPr wrap="square" rtlCol="0">
+            <a:spAutoFit/>
+          </a:bodyPr>
           <a:lstStyle/>
           <a:p>
-            <a:endParaRPr lang="en-GB"/>
+            <a:r>
+              <a:rPr lang="de-DE" dirty="0" err="1">
+                <a:solidFill>
+                  <a:srgbClr val="FF0000"/>
+                </a:solidFill>
+              </a:rPr>
+              <a:t>FTTransformer</a:t>
+            </a:r>
+            <a:endParaRPr lang="en-GB" dirty="0">
+              <a:solidFill>
+                <a:srgbClr val="FF0000"/>
+              </a:solidFill>
+            </a:endParaRPr>
           </a:p>
         </p:txBody>
       </p:sp>
       <p:pic>
         <p:nvPicPr>
-          <p:cNvPr id="4" name="Picture 3">
-            <a:extLst>
-              <a:ext uri="{FF2B5EF4-FFF2-40B4-BE49-F238E27FC236}">
-                <a16:creationId xmlns:a16="http://schemas.microsoft.com/office/drawing/2014/main" id="{B7DB29C0-B5C8-8508-A26E-50B1D221C83C}"/>
+          <p:cNvPr id="20" name="Picture 19">
+            <a:extLst>
+              <a:ext uri="{FF2B5EF4-FFF2-40B4-BE49-F238E27FC236}">
+                <a16:creationId xmlns:a16="http://schemas.microsoft.com/office/drawing/2014/main" id="{A196CD09-47BF-0D15-9004-DF22882B1653}"/>
               </a:ext>
             </a:extLst>
           </p:cNvPr>
@@ -27393,18 +28398,2637 @@
         </p:blipFill>
         <p:spPr>
           <a:xfrm>
-            <a:off x="400050" y="-314325"/>
-            <a:ext cx="11675147" cy="6858000"/>
+            <a:off x="12512874" y="1570185"/>
+            <a:ext cx="4568048" cy="535880"/>
           </a:xfrm>
           <a:prstGeom prst="rect">
             <a:avLst/>
           </a:prstGeom>
         </p:spPr>
       </p:pic>
+      <p:pic>
+        <p:nvPicPr>
+          <p:cNvPr id="22" name="Picture 21">
+            <a:extLst>
+              <a:ext uri="{FF2B5EF4-FFF2-40B4-BE49-F238E27FC236}">
+                <a16:creationId xmlns:a16="http://schemas.microsoft.com/office/drawing/2014/main" id="{B3F065FF-1246-4995-8C99-938F1D891CC8}"/>
+              </a:ext>
+            </a:extLst>
+          </p:cNvPr>
+          <p:cNvPicPr>
+            <a:picLocks noChangeAspect="1"/>
+          </p:cNvPicPr>
+          <p:nvPr/>
+        </p:nvPicPr>
+        <p:blipFill>
+          <a:blip r:embed="rId3"/>
+          <a:stretch>
+            <a:fillRect/>
+          </a:stretch>
+        </p:blipFill>
+        <p:spPr>
+          <a:xfrm>
+            <a:off x="12501391" y="2395104"/>
+            <a:ext cx="4168352" cy="2264656"/>
+          </a:xfrm>
+          <a:prstGeom prst="rect">
+            <a:avLst/>
+          </a:prstGeom>
+        </p:spPr>
+      </p:pic>
+      <p:sp>
+        <p:nvSpPr>
+          <p:cNvPr id="126" name="Rectangle 125">
+            <a:extLst>
+              <a:ext uri="{FF2B5EF4-FFF2-40B4-BE49-F238E27FC236}">
+                <a16:creationId xmlns:a16="http://schemas.microsoft.com/office/drawing/2014/main" id="{EA267B89-DFC7-624F-46FE-3C954DAF346E}"/>
+              </a:ext>
+            </a:extLst>
+          </p:cNvPr>
+          <p:cNvSpPr/>
+          <p:nvPr/>
+        </p:nvSpPr>
+        <p:spPr>
+          <a:xfrm>
+            <a:off x="0" y="0"/>
+            <a:ext cx="12192000" cy="6858000"/>
+          </a:xfrm>
+          <a:prstGeom prst="rect">
+            <a:avLst/>
+          </a:prstGeom>
+          <a:noFill/>
+          <a:ln>
+            <a:noFill/>
+          </a:ln>
+        </p:spPr>
+        <p:style>
+          <a:lnRef idx="2">
+            <a:schemeClr val="accent1">
+              <a:shade val="50000"/>
+            </a:schemeClr>
+          </a:lnRef>
+          <a:fillRef idx="1">
+            <a:schemeClr val="accent1"/>
+          </a:fillRef>
+          <a:effectRef idx="0">
+            <a:schemeClr val="accent1"/>
+          </a:effectRef>
+          <a:fontRef idx="minor">
+            <a:schemeClr val="lt1"/>
+          </a:fontRef>
+        </p:style>
+        <p:txBody>
+          <a:bodyPr rtlCol="0" anchor="ctr"/>
+          <a:lstStyle/>
+          <a:p>
+            <a:pPr algn="ctr"/>
+            <a:endParaRPr lang="en-GB"/>
+          </a:p>
+        </p:txBody>
+      </p:sp>
+      <p:pic>
+        <p:nvPicPr>
+          <p:cNvPr id="7" name="Picture 6" descr="Diagram&#10;&#10;Description automatically generated with low confidence">
+            <a:extLst>
+              <a:ext uri="{FF2B5EF4-FFF2-40B4-BE49-F238E27FC236}">
+                <a16:creationId xmlns:a16="http://schemas.microsoft.com/office/drawing/2014/main" id="{57DC4ADF-749C-6BDC-3F46-33B4726B5B13}"/>
+              </a:ext>
+            </a:extLst>
+          </p:cNvPr>
+          <p:cNvPicPr>
+            <a:picLocks noChangeAspect="1"/>
+          </p:cNvPicPr>
+          <p:nvPr/>
+        </p:nvPicPr>
+        <p:blipFill>
+          <a:blip r:embed="rId4">
+            <a:extLst>
+              <a:ext uri="{28A0092B-C50C-407E-A947-70E740481C1C}">
+                <a14:useLocalDpi xmlns:a14="http://schemas.microsoft.com/office/drawing/2010/main" val="0"/>
+              </a:ext>
+            </a:extLst>
+          </a:blip>
+          <a:stretch>
+            <a:fillRect/>
+          </a:stretch>
+        </p:blipFill>
+        <p:spPr>
+          <a:xfrm>
+            <a:off x="12505728" y="4943170"/>
+            <a:ext cx="8554644" cy="4363059"/>
+          </a:xfrm>
+          <a:prstGeom prst="rect">
+            <a:avLst/>
+          </a:prstGeom>
+        </p:spPr>
+      </p:pic>
+      <p:grpSp>
+        <p:nvGrpSpPr>
+          <p:cNvPr id="263" name="Group 262">
+            <a:extLst>
+              <a:ext uri="{FF2B5EF4-FFF2-40B4-BE49-F238E27FC236}">
+                <a16:creationId xmlns:a16="http://schemas.microsoft.com/office/drawing/2014/main" id="{B91516EA-A878-C95E-E73C-E46A9230D80F}"/>
+              </a:ext>
+            </a:extLst>
+          </p:cNvPr>
+          <p:cNvGrpSpPr/>
+          <p:nvPr/>
+        </p:nvGrpSpPr>
+        <p:grpSpPr>
+          <a:xfrm>
+            <a:off x="788988" y="2676525"/>
+            <a:ext cx="6209343" cy="1771094"/>
+            <a:chOff x="788988" y="2676525"/>
+            <a:chExt cx="6209343" cy="1771094"/>
+          </a:xfrm>
+        </p:grpSpPr>
+        <p:grpSp>
+          <p:nvGrpSpPr>
+            <p:cNvPr id="9" name="Group 8">
+              <a:extLst>
+                <a:ext uri="{FF2B5EF4-FFF2-40B4-BE49-F238E27FC236}">
+                  <a16:creationId xmlns:a16="http://schemas.microsoft.com/office/drawing/2014/main" id="{C32E5919-6D95-84C0-C2B4-588BD8F1D087}"/>
+                </a:ext>
+              </a:extLst>
+            </p:cNvPr>
+            <p:cNvGrpSpPr/>
+            <p:nvPr/>
+          </p:nvGrpSpPr>
+          <p:grpSpPr>
+            <a:xfrm>
+              <a:off x="3174436" y="2767305"/>
+              <a:ext cx="650726" cy="1159276"/>
+              <a:chOff x="8969402" y="2652435"/>
+              <a:chExt cx="1633537" cy="2910165"/>
+            </a:xfrm>
+          </p:grpSpPr>
+          <p:sp>
+            <p:nvSpPr>
+              <p:cNvPr id="62" name="Rectangle: Rounded Corners 61">
+                <a:extLst>
+                  <a:ext uri="{FF2B5EF4-FFF2-40B4-BE49-F238E27FC236}">
+                    <a16:creationId xmlns:a16="http://schemas.microsoft.com/office/drawing/2014/main" id="{C0641B72-A83F-2F0C-92F9-BC5B309B52B7}"/>
+                  </a:ext>
+                </a:extLst>
+              </p:cNvPr>
+              <p:cNvSpPr/>
+              <p:nvPr/>
+            </p:nvSpPr>
+            <p:spPr>
+              <a:xfrm>
+                <a:off x="9244198" y="4357197"/>
+                <a:ext cx="1159670" cy="458984"/>
+              </a:xfrm>
+              <a:prstGeom prst="roundRect">
+                <a:avLst>
+                  <a:gd name="adj" fmla="val 15547"/>
+                </a:avLst>
+              </a:prstGeom>
+              <a:solidFill>
+                <a:srgbClr val="EFABAA"/>
+              </a:solidFill>
+              <a:ln w="19050">
+                <a:headEnd type="none" w="med" len="med"/>
+                <a:tailEnd type="none" w="med" len="med"/>
+              </a:ln>
+            </p:spPr>
+            <p:style>
+              <a:lnRef idx="2">
+                <a:schemeClr val="dk1"/>
+              </a:lnRef>
+              <a:fillRef idx="1">
+                <a:schemeClr val="lt1"/>
+              </a:fillRef>
+              <a:effectRef idx="0">
+                <a:schemeClr val="dk1"/>
+              </a:effectRef>
+              <a:fontRef idx="minor">
+                <a:schemeClr val="dk1"/>
+              </a:fontRef>
+            </p:style>
+            <p:txBody>
+              <a:bodyPr lIns="0" rIns="0" rtlCol="0" anchor="ctr"/>
+              <a:lstStyle/>
+              <a:p>
+                <a:pPr algn="ctr"/>
+                <a:endParaRPr lang="de-DE" sz="1200" noProof="1">
+                  <a:latin typeface="+mj-lt"/>
+                  <a:cs typeface="Arial" panose="020B0604020202020204" pitchFamily="34" charset="0"/>
+                </a:endParaRPr>
+              </a:p>
+            </p:txBody>
+          </p:sp>
+          <p:sp>
+            <p:nvSpPr>
+              <p:cNvPr id="63" name="Rectangle: Rounded Corners 62">
+                <a:extLst>
+                  <a:ext uri="{FF2B5EF4-FFF2-40B4-BE49-F238E27FC236}">
+                    <a16:creationId xmlns:a16="http://schemas.microsoft.com/office/drawing/2014/main" id="{2E94D5CD-A3D0-17C2-6DA2-6C898CDD5E11}"/>
+                  </a:ext>
+                </a:extLst>
+              </p:cNvPr>
+              <p:cNvSpPr/>
+              <p:nvPr/>
+            </p:nvSpPr>
+            <p:spPr>
+              <a:xfrm>
+                <a:off x="9257759" y="3828429"/>
+                <a:ext cx="1164432" cy="242887"/>
+              </a:xfrm>
+              <a:prstGeom prst="roundRect">
+                <a:avLst>
+                  <a:gd name="adj" fmla="val 15547"/>
+                </a:avLst>
+              </a:prstGeom>
+              <a:solidFill>
+                <a:srgbClr val="CCD497"/>
+              </a:solidFill>
+              <a:ln w="19050">
+                <a:headEnd type="none" w="med" len="med"/>
+                <a:tailEnd type="none" w="med" len="med"/>
+              </a:ln>
+            </p:spPr>
+            <p:style>
+              <a:lnRef idx="2">
+                <a:schemeClr val="dk1"/>
+              </a:lnRef>
+              <a:fillRef idx="1">
+                <a:schemeClr val="lt1"/>
+              </a:fillRef>
+              <a:effectRef idx="0">
+                <a:schemeClr val="dk1"/>
+              </a:effectRef>
+              <a:fontRef idx="minor">
+                <a:schemeClr val="dk1"/>
+              </a:fontRef>
+            </p:style>
+            <p:txBody>
+              <a:bodyPr rtlCol="0" anchor="ctr"/>
+              <a:lstStyle/>
+              <a:p>
+                <a:pPr algn="ctr"/>
+                <a:endParaRPr lang="de-DE" sz="1100" noProof="1">
+                  <a:latin typeface="+mj-lt"/>
+                  <a:cs typeface="Arial" panose="020B0604020202020204" pitchFamily="34" charset="0"/>
+                </a:endParaRPr>
+              </a:p>
+            </p:txBody>
+          </p:sp>
+          <p:sp>
+            <p:nvSpPr>
+              <p:cNvPr id="66" name="Rectangle: Rounded Corners 65">
+                <a:extLst>
+                  <a:ext uri="{FF2B5EF4-FFF2-40B4-BE49-F238E27FC236}">
+                    <a16:creationId xmlns:a16="http://schemas.microsoft.com/office/drawing/2014/main" id="{7343FA96-205F-7DD7-A660-9E1AE7A16CDD}"/>
+                  </a:ext>
+                </a:extLst>
+              </p:cNvPr>
+              <p:cNvSpPr/>
+              <p:nvPr/>
+            </p:nvSpPr>
+            <p:spPr>
+              <a:xfrm>
+                <a:off x="9241818" y="3265058"/>
+                <a:ext cx="1164432" cy="329011"/>
+              </a:xfrm>
+              <a:prstGeom prst="roundRect">
+                <a:avLst>
+                  <a:gd name="adj" fmla="val 15547"/>
+                </a:avLst>
+              </a:prstGeom>
+              <a:solidFill>
+                <a:srgbClr val="A8D1EE"/>
+              </a:solidFill>
+              <a:ln w="19050">
+                <a:headEnd type="none" w="med" len="med"/>
+                <a:tailEnd type="none" w="med" len="med"/>
+              </a:ln>
+            </p:spPr>
+            <p:style>
+              <a:lnRef idx="2">
+                <a:schemeClr val="dk1"/>
+              </a:lnRef>
+              <a:fillRef idx="1">
+                <a:schemeClr val="lt1"/>
+              </a:fillRef>
+              <a:effectRef idx="0">
+                <a:schemeClr val="dk1"/>
+              </a:effectRef>
+              <a:fontRef idx="minor">
+                <a:schemeClr val="dk1"/>
+              </a:fontRef>
+            </p:style>
+            <p:txBody>
+              <a:bodyPr rtlCol="0" anchor="ctr"/>
+              <a:lstStyle/>
+              <a:p>
+                <a:pPr algn="ctr"/>
+                <a:endParaRPr lang="de-DE" sz="1100" noProof="1">
+                  <a:latin typeface="+mj-lt"/>
+                  <a:cs typeface="Arial" panose="020B0604020202020204" pitchFamily="34" charset="0"/>
+                </a:endParaRPr>
+              </a:p>
+            </p:txBody>
+          </p:sp>
+          <p:sp>
+            <p:nvSpPr>
+              <p:cNvPr id="67" name="Rectangle: Rounded Corners 66">
+                <a:extLst>
+                  <a:ext uri="{FF2B5EF4-FFF2-40B4-BE49-F238E27FC236}">
+                    <a16:creationId xmlns:a16="http://schemas.microsoft.com/office/drawing/2014/main" id="{542CA32F-221D-DD49-7091-4AFC3E421628}"/>
+                  </a:ext>
+                </a:extLst>
+              </p:cNvPr>
+              <p:cNvSpPr/>
+              <p:nvPr/>
+            </p:nvSpPr>
+            <p:spPr>
+              <a:xfrm>
+                <a:off x="9257758" y="2725380"/>
+                <a:ext cx="1164431" cy="242887"/>
+              </a:xfrm>
+              <a:prstGeom prst="roundRect">
+                <a:avLst>
+                  <a:gd name="adj" fmla="val 15547"/>
+                </a:avLst>
+              </a:prstGeom>
+              <a:solidFill>
+                <a:srgbClr val="CCD497"/>
+              </a:solidFill>
+              <a:ln w="19050">
+                <a:headEnd type="none" w="med" len="med"/>
+                <a:tailEnd type="none" w="med" len="med"/>
+              </a:ln>
+            </p:spPr>
+            <p:style>
+              <a:lnRef idx="2">
+                <a:schemeClr val="dk1"/>
+              </a:lnRef>
+              <a:fillRef idx="1">
+                <a:schemeClr val="lt1"/>
+              </a:fillRef>
+              <a:effectRef idx="0">
+                <a:schemeClr val="dk1"/>
+              </a:effectRef>
+              <a:fontRef idx="minor">
+                <a:schemeClr val="dk1"/>
+              </a:fontRef>
+            </p:style>
+            <p:txBody>
+              <a:bodyPr rtlCol="0" anchor="ctr"/>
+              <a:lstStyle/>
+              <a:p>
+                <a:pPr algn="ctr"/>
+                <a:endParaRPr lang="de-DE" sz="1100" noProof="1">
+                  <a:latin typeface="+mj-lt"/>
+                  <a:cs typeface="Arial" panose="020B0604020202020204" pitchFamily="34" charset="0"/>
+                </a:endParaRPr>
+              </a:p>
+            </p:txBody>
+          </p:sp>
+          <p:sp>
+            <p:nvSpPr>
+              <p:cNvPr id="80" name="Rectangle: Rounded Corners 79">
+                <a:extLst>
+                  <a:ext uri="{FF2B5EF4-FFF2-40B4-BE49-F238E27FC236}">
+                    <a16:creationId xmlns:a16="http://schemas.microsoft.com/office/drawing/2014/main" id="{83641231-252D-FDB3-0C23-5CDCCDA26F9E}"/>
+                  </a:ext>
+                </a:extLst>
+              </p:cNvPr>
+              <p:cNvSpPr/>
+              <p:nvPr/>
+            </p:nvSpPr>
+            <p:spPr>
+              <a:xfrm>
+                <a:off x="8969402" y="2652435"/>
+                <a:ext cx="1633537" cy="2910165"/>
+              </a:xfrm>
+              <a:prstGeom prst="roundRect">
+                <a:avLst>
+                  <a:gd name="adj" fmla="val 5838"/>
+                </a:avLst>
+              </a:prstGeom>
+              <a:noFill/>
+              <a:ln>
+                <a:headEnd type="none" w="med" len="med"/>
+                <a:tailEnd type="none" w="med" len="med"/>
+              </a:ln>
+            </p:spPr>
+            <p:style>
+              <a:lnRef idx="2">
+                <a:schemeClr val="dk1"/>
+              </a:lnRef>
+              <a:fillRef idx="1">
+                <a:schemeClr val="lt1"/>
+              </a:fillRef>
+              <a:effectRef idx="0">
+                <a:schemeClr val="dk1"/>
+              </a:effectRef>
+              <a:fontRef idx="minor">
+                <a:schemeClr val="dk1"/>
+              </a:fontRef>
+            </p:style>
+            <p:txBody>
+              <a:bodyPr rtlCol="0" anchor="ctr"/>
+              <a:lstStyle/>
+              <a:p>
+                <a:pPr algn="ctr"/>
+                <a:endParaRPr lang="en-GB"/>
+              </a:p>
+            </p:txBody>
+          </p:sp>
+          <p:sp>
+            <p:nvSpPr>
+              <p:cNvPr id="6" name="Rectangle: Rounded Corners 5">
+                <a:extLst>
+                  <a:ext uri="{FF2B5EF4-FFF2-40B4-BE49-F238E27FC236}">
+                    <a16:creationId xmlns:a16="http://schemas.microsoft.com/office/drawing/2014/main" id="{37E7B1D8-1BF8-FDFE-D966-2445914F8910}"/>
+                  </a:ext>
+                </a:extLst>
+              </p:cNvPr>
+              <p:cNvSpPr/>
+              <p:nvPr/>
+            </p:nvSpPr>
+            <p:spPr>
+              <a:xfrm>
+                <a:off x="9240864" y="5117743"/>
+                <a:ext cx="1164431" cy="242887"/>
+              </a:xfrm>
+              <a:prstGeom prst="roundRect">
+                <a:avLst>
+                  <a:gd name="adj" fmla="val 15547"/>
+                </a:avLst>
+              </a:prstGeom>
+              <a:solidFill>
+                <a:srgbClr val="CCD497"/>
+              </a:solidFill>
+              <a:ln w="19050">
+                <a:headEnd type="none" w="med" len="med"/>
+                <a:tailEnd type="none" w="med" len="med"/>
+              </a:ln>
+            </p:spPr>
+            <p:style>
+              <a:lnRef idx="2">
+                <a:schemeClr val="dk1"/>
+              </a:lnRef>
+              <a:fillRef idx="1">
+                <a:schemeClr val="lt1"/>
+              </a:fillRef>
+              <a:effectRef idx="0">
+                <a:schemeClr val="dk1"/>
+              </a:effectRef>
+              <a:fontRef idx="minor">
+                <a:schemeClr val="dk1"/>
+              </a:fontRef>
+            </p:style>
+            <p:txBody>
+              <a:bodyPr rtlCol="0" anchor="ctr"/>
+              <a:lstStyle/>
+              <a:p>
+                <a:pPr algn="ctr"/>
+                <a:endParaRPr lang="de-DE" sz="1100" noProof="1">
+                  <a:latin typeface="+mj-lt"/>
+                  <a:cs typeface="Arial" panose="020B0604020202020204" pitchFamily="34" charset="0"/>
+                </a:endParaRPr>
+              </a:p>
+            </p:txBody>
+          </p:sp>
+        </p:grpSp>
+        <p:sp>
+          <p:nvSpPr>
+            <p:cNvPr id="18" name="TextBox 17">
+              <a:extLst>
+                <a:ext uri="{FF2B5EF4-FFF2-40B4-BE49-F238E27FC236}">
+                  <a16:creationId xmlns:a16="http://schemas.microsoft.com/office/drawing/2014/main" id="{5F336B26-8B16-7823-45C3-15CFB7295479}"/>
+                </a:ext>
+              </a:extLst>
+            </p:cNvPr>
+            <p:cNvSpPr txBox="1"/>
+            <p:nvPr/>
+          </p:nvSpPr>
+          <p:spPr>
+            <a:xfrm>
+              <a:off x="2938463" y="4073525"/>
+              <a:ext cx="1143775" cy="369332"/>
+            </a:xfrm>
+            <a:prstGeom prst="rect">
+              <a:avLst/>
+            </a:prstGeom>
+            <a:noFill/>
+          </p:spPr>
+          <p:txBody>
+            <a:bodyPr wrap="none" rtlCol="0">
+              <a:spAutoFit/>
+            </a:bodyPr>
+            <a:lstStyle/>
+            <a:p>
+              <a:r>
+                <a:rPr lang="de-DE" dirty="0"/>
+                <a:t>Generator</a:t>
+              </a:r>
+              <a:endParaRPr lang="en-GB" dirty="0"/>
+            </a:p>
+          </p:txBody>
+        </p:sp>
+        <p:sp>
+          <p:nvSpPr>
+            <p:cNvPr id="229" name="TextBox 228">
+              <a:extLst>
+                <a:ext uri="{FF2B5EF4-FFF2-40B4-BE49-F238E27FC236}">
+                  <a16:creationId xmlns:a16="http://schemas.microsoft.com/office/drawing/2014/main" id="{40CB5ADD-0540-E6D3-5F0C-712C49407505}"/>
+                </a:ext>
+              </a:extLst>
+            </p:cNvPr>
+            <p:cNvSpPr txBox="1"/>
+            <p:nvPr/>
+          </p:nvSpPr>
+          <p:spPr>
+            <a:xfrm>
+              <a:off x="4776787" y="4078287"/>
+              <a:ext cx="1445076" cy="369332"/>
+            </a:xfrm>
+            <a:prstGeom prst="rect">
+              <a:avLst/>
+            </a:prstGeom>
+            <a:noFill/>
+          </p:spPr>
+          <p:txBody>
+            <a:bodyPr wrap="none" rtlCol="0">
+              <a:spAutoFit/>
+            </a:bodyPr>
+            <a:lstStyle/>
+            <a:p>
+              <a:r>
+                <a:rPr lang="de-DE" dirty="0" err="1"/>
+                <a:t>Discriminator</a:t>
+              </a:r>
+              <a:endParaRPr lang="en-GB" dirty="0"/>
+            </a:p>
+          </p:txBody>
+        </p:sp>
+        <p:sp>
+          <p:nvSpPr>
+            <p:cNvPr id="230" name="TextBox 229">
+              <a:extLst>
+                <a:ext uri="{FF2B5EF4-FFF2-40B4-BE49-F238E27FC236}">
+                  <a16:creationId xmlns:a16="http://schemas.microsoft.com/office/drawing/2014/main" id="{BDF876BA-D339-4B53-D461-93A77EEE3D86}"/>
+                </a:ext>
+              </a:extLst>
+            </p:cNvPr>
+            <p:cNvSpPr txBox="1"/>
+            <p:nvPr/>
+          </p:nvSpPr>
+          <p:spPr>
+            <a:xfrm>
+              <a:off x="827087" y="2676525"/>
+              <a:ext cx="498855" cy="369332"/>
+            </a:xfrm>
+            <a:prstGeom prst="rect">
+              <a:avLst/>
+            </a:prstGeom>
+            <a:noFill/>
+          </p:spPr>
+          <p:txBody>
+            <a:bodyPr wrap="none" rtlCol="0">
+              <a:spAutoFit/>
+            </a:bodyPr>
+            <a:lstStyle/>
+            <a:p>
+              <a:r>
+                <a:rPr lang="de-DE" dirty="0" err="1"/>
+                <a:t>the</a:t>
+              </a:r>
+              <a:endParaRPr lang="en-GB" dirty="0"/>
+            </a:p>
+          </p:txBody>
+        </p:sp>
+        <p:sp>
+          <p:nvSpPr>
+            <p:cNvPr id="231" name="TextBox 230">
+              <a:extLst>
+                <a:ext uri="{FF2B5EF4-FFF2-40B4-BE49-F238E27FC236}">
+                  <a16:creationId xmlns:a16="http://schemas.microsoft.com/office/drawing/2014/main" id="{FBEA45D8-D738-696D-BD58-566FF923A38A}"/>
+                </a:ext>
+              </a:extLst>
+            </p:cNvPr>
+            <p:cNvSpPr txBox="1"/>
+            <p:nvPr/>
+          </p:nvSpPr>
+          <p:spPr>
+            <a:xfrm>
+              <a:off x="1971676" y="2676525"/>
+              <a:ext cx="1990160" cy="369332"/>
+            </a:xfrm>
+            <a:prstGeom prst="rect">
+              <a:avLst/>
+            </a:prstGeom>
+            <a:noFill/>
+          </p:spPr>
+          <p:txBody>
+            <a:bodyPr wrap="none" rtlCol="0">
+              <a:spAutoFit/>
+            </a:bodyPr>
+            <a:lstStyle/>
+            <a:p>
+              <a:r>
+                <a:rPr lang="de-DE" dirty="0"/>
+                <a:t>$\</a:t>
+              </a:r>
+              <a:r>
+                <a:rPr lang="de-DE" dirty="0" err="1"/>
+                <a:t>mathtt</a:t>
+              </a:r>
+              <a:r>
+                <a:rPr lang="de-DE" dirty="0"/>
+                <a:t>{[MASK]}$</a:t>
+              </a:r>
+              <a:endParaRPr lang="en-GB" dirty="0"/>
+            </a:p>
+          </p:txBody>
+        </p:sp>
+        <p:cxnSp>
+          <p:nvCxnSpPr>
+            <p:cNvPr id="235" name="Straight Arrow Connector 234">
+              <a:extLst>
+                <a:ext uri="{FF2B5EF4-FFF2-40B4-BE49-F238E27FC236}">
+                  <a16:creationId xmlns:a16="http://schemas.microsoft.com/office/drawing/2014/main" id="{C3DA3678-3D95-A41B-A9D2-02227709CA69}"/>
+                </a:ext>
+              </a:extLst>
+            </p:cNvPr>
+            <p:cNvCxnSpPr>
+              <a:cxnSpLocks/>
+            </p:cNvCxnSpPr>
+            <p:nvPr/>
+          </p:nvCxnSpPr>
+          <p:spPr>
+            <a:xfrm>
+              <a:off x="1614488" y="2881313"/>
+              <a:ext cx="357187" cy="0"/>
+            </a:xfrm>
+            <a:prstGeom prst="straightConnector1">
+              <a:avLst/>
+            </a:prstGeom>
+            <a:ln w="12700">
+              <a:solidFill>
+                <a:schemeClr val="tx1"/>
+              </a:solidFill>
+              <a:tailEnd type="triangle"/>
+            </a:ln>
+          </p:spPr>
+          <p:style>
+            <a:lnRef idx="1">
+              <a:schemeClr val="dk1"/>
+            </a:lnRef>
+            <a:fillRef idx="0">
+              <a:schemeClr val="dk1"/>
+            </a:fillRef>
+            <a:effectRef idx="0">
+              <a:schemeClr val="dk1"/>
+            </a:effectRef>
+            <a:fontRef idx="minor">
+              <a:schemeClr val="tx1"/>
+            </a:fontRef>
+          </p:style>
+        </p:cxnSp>
+        <p:grpSp>
+          <p:nvGrpSpPr>
+            <p:cNvPr id="238" name="Group 237">
+              <a:extLst>
+                <a:ext uri="{FF2B5EF4-FFF2-40B4-BE49-F238E27FC236}">
+                  <a16:creationId xmlns:a16="http://schemas.microsoft.com/office/drawing/2014/main" id="{F480E401-07C9-A65C-382E-9DDFFDDCDE46}"/>
+                </a:ext>
+              </a:extLst>
+            </p:cNvPr>
+            <p:cNvGrpSpPr/>
+            <p:nvPr/>
+          </p:nvGrpSpPr>
+          <p:grpSpPr>
+            <a:xfrm>
+              <a:off x="5060386" y="2767305"/>
+              <a:ext cx="650726" cy="1159276"/>
+              <a:chOff x="8969402" y="2652435"/>
+              <a:chExt cx="1633537" cy="2910165"/>
+            </a:xfrm>
+          </p:grpSpPr>
+          <p:sp>
+            <p:nvSpPr>
+              <p:cNvPr id="239" name="Rectangle: Rounded Corners 238">
+                <a:extLst>
+                  <a:ext uri="{FF2B5EF4-FFF2-40B4-BE49-F238E27FC236}">
+                    <a16:creationId xmlns:a16="http://schemas.microsoft.com/office/drawing/2014/main" id="{731CB360-1528-E1CB-9AA3-A43C56DD8090}"/>
+                  </a:ext>
+                </a:extLst>
+              </p:cNvPr>
+              <p:cNvSpPr/>
+              <p:nvPr/>
+            </p:nvSpPr>
+            <p:spPr>
+              <a:xfrm>
+                <a:off x="9244198" y="4357197"/>
+                <a:ext cx="1159670" cy="458984"/>
+              </a:xfrm>
+              <a:prstGeom prst="roundRect">
+                <a:avLst>
+                  <a:gd name="adj" fmla="val 15547"/>
+                </a:avLst>
+              </a:prstGeom>
+              <a:solidFill>
+                <a:srgbClr val="EFABAA"/>
+              </a:solidFill>
+              <a:ln w="19050">
+                <a:headEnd type="none" w="med" len="med"/>
+                <a:tailEnd type="none" w="med" len="med"/>
+              </a:ln>
+            </p:spPr>
+            <p:style>
+              <a:lnRef idx="2">
+                <a:schemeClr val="dk1"/>
+              </a:lnRef>
+              <a:fillRef idx="1">
+                <a:schemeClr val="lt1"/>
+              </a:fillRef>
+              <a:effectRef idx="0">
+                <a:schemeClr val="dk1"/>
+              </a:effectRef>
+              <a:fontRef idx="minor">
+                <a:schemeClr val="dk1"/>
+              </a:fontRef>
+            </p:style>
+            <p:txBody>
+              <a:bodyPr lIns="0" rIns="0" rtlCol="0" anchor="ctr"/>
+              <a:lstStyle/>
+              <a:p>
+                <a:pPr algn="ctr"/>
+                <a:endParaRPr lang="de-DE" sz="1200" noProof="1">
+                  <a:latin typeface="+mj-lt"/>
+                  <a:cs typeface="Arial" panose="020B0604020202020204" pitchFamily="34" charset="0"/>
+                </a:endParaRPr>
+              </a:p>
+            </p:txBody>
+          </p:sp>
+          <p:sp>
+            <p:nvSpPr>
+              <p:cNvPr id="240" name="Rectangle: Rounded Corners 239">
+                <a:extLst>
+                  <a:ext uri="{FF2B5EF4-FFF2-40B4-BE49-F238E27FC236}">
+                    <a16:creationId xmlns:a16="http://schemas.microsoft.com/office/drawing/2014/main" id="{58EA490F-2ADC-437C-2E12-82586401378D}"/>
+                  </a:ext>
+                </a:extLst>
+              </p:cNvPr>
+              <p:cNvSpPr/>
+              <p:nvPr/>
+            </p:nvSpPr>
+            <p:spPr>
+              <a:xfrm>
+                <a:off x="9257759" y="3828429"/>
+                <a:ext cx="1164432" cy="242887"/>
+              </a:xfrm>
+              <a:prstGeom prst="roundRect">
+                <a:avLst>
+                  <a:gd name="adj" fmla="val 15547"/>
+                </a:avLst>
+              </a:prstGeom>
+              <a:solidFill>
+                <a:srgbClr val="CCD497"/>
+              </a:solidFill>
+              <a:ln w="19050">
+                <a:headEnd type="none" w="med" len="med"/>
+                <a:tailEnd type="none" w="med" len="med"/>
+              </a:ln>
+            </p:spPr>
+            <p:style>
+              <a:lnRef idx="2">
+                <a:schemeClr val="dk1"/>
+              </a:lnRef>
+              <a:fillRef idx="1">
+                <a:schemeClr val="lt1"/>
+              </a:fillRef>
+              <a:effectRef idx="0">
+                <a:schemeClr val="dk1"/>
+              </a:effectRef>
+              <a:fontRef idx="minor">
+                <a:schemeClr val="dk1"/>
+              </a:fontRef>
+            </p:style>
+            <p:txBody>
+              <a:bodyPr rtlCol="0" anchor="ctr"/>
+              <a:lstStyle/>
+              <a:p>
+                <a:pPr algn="ctr"/>
+                <a:endParaRPr lang="de-DE" sz="1100" noProof="1">
+                  <a:latin typeface="+mj-lt"/>
+                  <a:cs typeface="Arial" panose="020B0604020202020204" pitchFamily="34" charset="0"/>
+                </a:endParaRPr>
+              </a:p>
+            </p:txBody>
+          </p:sp>
+          <p:sp>
+            <p:nvSpPr>
+              <p:cNvPr id="243" name="Rectangle: Rounded Corners 242">
+                <a:extLst>
+                  <a:ext uri="{FF2B5EF4-FFF2-40B4-BE49-F238E27FC236}">
+                    <a16:creationId xmlns:a16="http://schemas.microsoft.com/office/drawing/2014/main" id="{96A5131F-4926-742B-2CDA-3FDAF0530C35}"/>
+                  </a:ext>
+                </a:extLst>
+              </p:cNvPr>
+              <p:cNvSpPr/>
+              <p:nvPr/>
+            </p:nvSpPr>
+            <p:spPr>
+              <a:xfrm>
+                <a:off x="9241818" y="3265058"/>
+                <a:ext cx="1164432" cy="329011"/>
+              </a:xfrm>
+              <a:prstGeom prst="roundRect">
+                <a:avLst>
+                  <a:gd name="adj" fmla="val 15547"/>
+                </a:avLst>
+              </a:prstGeom>
+              <a:solidFill>
+                <a:srgbClr val="A8D1EE"/>
+              </a:solidFill>
+              <a:ln w="19050">
+                <a:headEnd type="none" w="med" len="med"/>
+                <a:tailEnd type="none" w="med" len="med"/>
+              </a:ln>
+            </p:spPr>
+            <p:style>
+              <a:lnRef idx="2">
+                <a:schemeClr val="dk1"/>
+              </a:lnRef>
+              <a:fillRef idx="1">
+                <a:schemeClr val="lt1"/>
+              </a:fillRef>
+              <a:effectRef idx="0">
+                <a:schemeClr val="dk1"/>
+              </a:effectRef>
+              <a:fontRef idx="minor">
+                <a:schemeClr val="dk1"/>
+              </a:fontRef>
+            </p:style>
+            <p:txBody>
+              <a:bodyPr rtlCol="0" anchor="ctr"/>
+              <a:lstStyle/>
+              <a:p>
+                <a:pPr algn="ctr"/>
+                <a:endParaRPr lang="de-DE" sz="1100" noProof="1">
+                  <a:latin typeface="+mj-lt"/>
+                  <a:cs typeface="Arial" panose="020B0604020202020204" pitchFamily="34" charset="0"/>
+                </a:endParaRPr>
+              </a:p>
+            </p:txBody>
+          </p:sp>
+          <p:sp>
+            <p:nvSpPr>
+              <p:cNvPr id="244" name="Rectangle: Rounded Corners 243">
+                <a:extLst>
+                  <a:ext uri="{FF2B5EF4-FFF2-40B4-BE49-F238E27FC236}">
+                    <a16:creationId xmlns:a16="http://schemas.microsoft.com/office/drawing/2014/main" id="{B00CBD93-4C47-43AA-5B94-FA07E509EAFC}"/>
+                  </a:ext>
+                </a:extLst>
+              </p:cNvPr>
+              <p:cNvSpPr/>
+              <p:nvPr/>
+            </p:nvSpPr>
+            <p:spPr>
+              <a:xfrm>
+                <a:off x="9257758" y="2725380"/>
+                <a:ext cx="1164431" cy="242887"/>
+              </a:xfrm>
+              <a:prstGeom prst="roundRect">
+                <a:avLst>
+                  <a:gd name="adj" fmla="val 15547"/>
+                </a:avLst>
+              </a:prstGeom>
+              <a:solidFill>
+                <a:srgbClr val="CCD497"/>
+              </a:solidFill>
+              <a:ln w="19050">
+                <a:headEnd type="none" w="med" len="med"/>
+                <a:tailEnd type="none" w="med" len="med"/>
+              </a:ln>
+            </p:spPr>
+            <p:style>
+              <a:lnRef idx="2">
+                <a:schemeClr val="dk1"/>
+              </a:lnRef>
+              <a:fillRef idx="1">
+                <a:schemeClr val="lt1"/>
+              </a:fillRef>
+              <a:effectRef idx="0">
+                <a:schemeClr val="dk1"/>
+              </a:effectRef>
+              <a:fontRef idx="minor">
+                <a:schemeClr val="dk1"/>
+              </a:fontRef>
+            </p:style>
+            <p:txBody>
+              <a:bodyPr rtlCol="0" anchor="ctr"/>
+              <a:lstStyle/>
+              <a:p>
+                <a:pPr algn="ctr"/>
+                <a:endParaRPr lang="de-DE" sz="1100" noProof="1">
+                  <a:latin typeface="+mj-lt"/>
+                  <a:cs typeface="Arial" panose="020B0604020202020204" pitchFamily="34" charset="0"/>
+                </a:endParaRPr>
+              </a:p>
+            </p:txBody>
+          </p:sp>
+          <p:sp>
+            <p:nvSpPr>
+              <p:cNvPr id="245" name="Rectangle: Rounded Corners 244">
+                <a:extLst>
+                  <a:ext uri="{FF2B5EF4-FFF2-40B4-BE49-F238E27FC236}">
+                    <a16:creationId xmlns:a16="http://schemas.microsoft.com/office/drawing/2014/main" id="{6C7C1B0E-C140-27FB-F2F0-F396C070CD3D}"/>
+                  </a:ext>
+                </a:extLst>
+              </p:cNvPr>
+              <p:cNvSpPr/>
+              <p:nvPr/>
+            </p:nvSpPr>
+            <p:spPr>
+              <a:xfrm>
+                <a:off x="8969402" y="2652435"/>
+                <a:ext cx="1633537" cy="2910165"/>
+              </a:xfrm>
+              <a:prstGeom prst="roundRect">
+                <a:avLst>
+                  <a:gd name="adj" fmla="val 5838"/>
+                </a:avLst>
+              </a:prstGeom>
+              <a:noFill/>
+              <a:ln>
+                <a:headEnd type="none" w="med" len="med"/>
+                <a:tailEnd type="none" w="med" len="med"/>
+              </a:ln>
+            </p:spPr>
+            <p:style>
+              <a:lnRef idx="2">
+                <a:schemeClr val="dk1"/>
+              </a:lnRef>
+              <a:fillRef idx="1">
+                <a:schemeClr val="lt1"/>
+              </a:fillRef>
+              <a:effectRef idx="0">
+                <a:schemeClr val="dk1"/>
+              </a:effectRef>
+              <a:fontRef idx="minor">
+                <a:schemeClr val="dk1"/>
+              </a:fontRef>
+            </p:style>
+            <p:txBody>
+              <a:bodyPr rtlCol="0" anchor="ctr"/>
+              <a:lstStyle/>
+              <a:p>
+                <a:pPr algn="ctr"/>
+                <a:endParaRPr lang="en-GB"/>
+              </a:p>
+            </p:txBody>
+          </p:sp>
+          <p:sp>
+            <p:nvSpPr>
+              <p:cNvPr id="246" name="Rectangle: Rounded Corners 245">
+                <a:extLst>
+                  <a:ext uri="{FF2B5EF4-FFF2-40B4-BE49-F238E27FC236}">
+                    <a16:creationId xmlns:a16="http://schemas.microsoft.com/office/drawing/2014/main" id="{7EBA5B1C-50E5-C80F-7362-E81AFFAB887D}"/>
+                  </a:ext>
+                </a:extLst>
+              </p:cNvPr>
+              <p:cNvSpPr/>
+              <p:nvPr/>
+            </p:nvSpPr>
+            <p:spPr>
+              <a:xfrm>
+                <a:off x="9240864" y="5117743"/>
+                <a:ext cx="1164431" cy="242887"/>
+              </a:xfrm>
+              <a:prstGeom prst="roundRect">
+                <a:avLst>
+                  <a:gd name="adj" fmla="val 15547"/>
+                </a:avLst>
+              </a:prstGeom>
+              <a:solidFill>
+                <a:srgbClr val="CCD497"/>
+              </a:solidFill>
+              <a:ln w="19050">
+                <a:headEnd type="none" w="med" len="med"/>
+                <a:tailEnd type="none" w="med" len="med"/>
+              </a:ln>
+            </p:spPr>
+            <p:style>
+              <a:lnRef idx="2">
+                <a:schemeClr val="dk1"/>
+              </a:lnRef>
+              <a:fillRef idx="1">
+                <a:schemeClr val="lt1"/>
+              </a:fillRef>
+              <a:effectRef idx="0">
+                <a:schemeClr val="dk1"/>
+              </a:effectRef>
+              <a:fontRef idx="minor">
+                <a:schemeClr val="dk1"/>
+              </a:fontRef>
+            </p:style>
+            <p:txBody>
+              <a:bodyPr rtlCol="0" anchor="ctr"/>
+              <a:lstStyle/>
+              <a:p>
+                <a:pPr algn="ctr"/>
+                <a:endParaRPr lang="de-DE" sz="1100" noProof="1">
+                  <a:latin typeface="+mj-lt"/>
+                  <a:cs typeface="Arial" panose="020B0604020202020204" pitchFamily="34" charset="0"/>
+                </a:endParaRPr>
+              </a:p>
+            </p:txBody>
+          </p:sp>
+        </p:grpSp>
+        <p:cxnSp>
+          <p:nvCxnSpPr>
+            <p:cNvPr id="247" name="Straight Arrow Connector 246">
+              <a:extLst>
+                <a:ext uri="{FF2B5EF4-FFF2-40B4-BE49-F238E27FC236}">
+                  <a16:creationId xmlns:a16="http://schemas.microsoft.com/office/drawing/2014/main" id="{B57F3CDD-AC70-F737-8C91-716AC2ADE388}"/>
+                </a:ext>
+              </a:extLst>
+            </p:cNvPr>
+            <p:cNvCxnSpPr>
+              <a:cxnSpLocks/>
+            </p:cNvCxnSpPr>
+            <p:nvPr/>
+          </p:nvCxnSpPr>
+          <p:spPr>
+            <a:xfrm>
+              <a:off x="2786063" y="2886075"/>
+              <a:ext cx="357187" cy="0"/>
+            </a:xfrm>
+            <a:prstGeom prst="straightConnector1">
+              <a:avLst/>
+            </a:prstGeom>
+            <a:ln w="12700">
+              <a:solidFill>
+                <a:schemeClr val="tx1"/>
+              </a:solidFill>
+              <a:tailEnd type="triangle"/>
+            </a:ln>
+          </p:spPr>
+          <p:style>
+            <a:lnRef idx="1">
+              <a:schemeClr val="dk1"/>
+            </a:lnRef>
+            <a:fillRef idx="0">
+              <a:schemeClr val="dk1"/>
+            </a:fillRef>
+            <a:effectRef idx="0">
+              <a:schemeClr val="dk1"/>
+            </a:effectRef>
+            <a:fontRef idx="minor">
+              <a:schemeClr val="tx1"/>
+            </a:fontRef>
+          </p:style>
+        </p:cxnSp>
+        <p:sp>
+          <p:nvSpPr>
+            <p:cNvPr id="248" name="TextBox 247">
+              <a:extLst>
+                <a:ext uri="{FF2B5EF4-FFF2-40B4-BE49-F238E27FC236}">
+                  <a16:creationId xmlns:a16="http://schemas.microsoft.com/office/drawing/2014/main" id="{6AF29941-846E-C683-4567-93F5FD136B64}"/>
+                </a:ext>
+              </a:extLst>
+            </p:cNvPr>
+            <p:cNvSpPr txBox="1"/>
+            <p:nvPr/>
+          </p:nvSpPr>
+          <p:spPr>
+            <a:xfrm>
+              <a:off x="4143376" y="2695575"/>
+              <a:ext cx="498855" cy="369332"/>
+            </a:xfrm>
+            <a:prstGeom prst="rect">
+              <a:avLst/>
+            </a:prstGeom>
+            <a:noFill/>
+          </p:spPr>
+          <p:txBody>
+            <a:bodyPr wrap="none" rtlCol="0">
+              <a:spAutoFit/>
+            </a:bodyPr>
+            <a:lstStyle/>
+            <a:p>
+              <a:r>
+                <a:rPr lang="de-DE" dirty="0" err="1"/>
+                <a:t>the</a:t>
+              </a:r>
+              <a:endParaRPr lang="en-GB" dirty="0"/>
+            </a:p>
+          </p:txBody>
+        </p:sp>
+        <p:cxnSp>
+          <p:nvCxnSpPr>
+            <p:cNvPr id="250" name="Straight Arrow Connector 249">
+              <a:extLst>
+                <a:ext uri="{FF2B5EF4-FFF2-40B4-BE49-F238E27FC236}">
+                  <a16:creationId xmlns:a16="http://schemas.microsoft.com/office/drawing/2014/main" id="{59F29DE5-486E-BFE9-4847-43007836CB38}"/>
+                </a:ext>
+              </a:extLst>
+            </p:cNvPr>
+            <p:cNvCxnSpPr>
+              <a:cxnSpLocks/>
+            </p:cNvCxnSpPr>
+            <p:nvPr/>
+          </p:nvCxnSpPr>
+          <p:spPr>
+            <a:xfrm>
+              <a:off x="3857626" y="2900363"/>
+              <a:ext cx="357187" cy="0"/>
+            </a:xfrm>
+            <a:prstGeom prst="straightConnector1">
+              <a:avLst/>
+            </a:prstGeom>
+            <a:ln w="12700">
+              <a:solidFill>
+                <a:schemeClr val="tx1"/>
+              </a:solidFill>
+              <a:prstDash val="dash"/>
+              <a:tailEnd type="triangle"/>
+            </a:ln>
+          </p:spPr>
+          <p:style>
+            <a:lnRef idx="1">
+              <a:schemeClr val="dk1"/>
+            </a:lnRef>
+            <a:fillRef idx="0">
+              <a:schemeClr val="dk1"/>
+            </a:fillRef>
+            <a:effectRef idx="0">
+              <a:schemeClr val="dk1"/>
+            </a:effectRef>
+            <a:fontRef idx="minor">
+              <a:schemeClr val="tx1"/>
+            </a:fontRef>
+          </p:style>
+        </p:cxnSp>
+        <p:cxnSp>
+          <p:nvCxnSpPr>
+            <p:cNvPr id="251" name="Straight Arrow Connector 250">
+              <a:extLst>
+                <a:ext uri="{FF2B5EF4-FFF2-40B4-BE49-F238E27FC236}">
+                  <a16:creationId xmlns:a16="http://schemas.microsoft.com/office/drawing/2014/main" id="{4A209874-1154-FD9C-DD63-118CF294F905}"/>
+                </a:ext>
+              </a:extLst>
+            </p:cNvPr>
+            <p:cNvCxnSpPr>
+              <a:cxnSpLocks/>
+            </p:cNvCxnSpPr>
+            <p:nvPr/>
+          </p:nvCxnSpPr>
+          <p:spPr>
+            <a:xfrm>
+              <a:off x="4705351" y="2905125"/>
+              <a:ext cx="357187" cy="0"/>
+            </a:xfrm>
+            <a:prstGeom prst="straightConnector1">
+              <a:avLst/>
+            </a:prstGeom>
+            <a:ln w="12700">
+              <a:solidFill>
+                <a:schemeClr val="tx1"/>
+              </a:solidFill>
+              <a:tailEnd type="triangle"/>
+            </a:ln>
+          </p:spPr>
+          <p:style>
+            <a:lnRef idx="1">
+              <a:schemeClr val="dk1"/>
+            </a:lnRef>
+            <a:fillRef idx="0">
+              <a:schemeClr val="dk1"/>
+            </a:fillRef>
+            <a:effectRef idx="0">
+              <a:schemeClr val="dk1"/>
+            </a:effectRef>
+            <a:fontRef idx="minor">
+              <a:schemeClr val="tx1"/>
+            </a:fontRef>
+          </p:style>
+        </p:cxnSp>
+        <p:cxnSp>
+          <p:nvCxnSpPr>
+            <p:cNvPr id="252" name="Straight Arrow Connector 251">
+              <a:extLst>
+                <a:ext uri="{FF2B5EF4-FFF2-40B4-BE49-F238E27FC236}">
+                  <a16:creationId xmlns:a16="http://schemas.microsoft.com/office/drawing/2014/main" id="{242EB6C1-D759-C004-77B6-FBD486BBDB2F}"/>
+                </a:ext>
+              </a:extLst>
+            </p:cNvPr>
+            <p:cNvCxnSpPr>
+              <a:cxnSpLocks/>
+            </p:cNvCxnSpPr>
+            <p:nvPr/>
+          </p:nvCxnSpPr>
+          <p:spPr>
+            <a:xfrm>
+              <a:off x="5710238" y="2919413"/>
+              <a:ext cx="357187" cy="0"/>
+            </a:xfrm>
+            <a:prstGeom prst="straightConnector1">
+              <a:avLst/>
+            </a:prstGeom>
+            <a:ln w="12700">
+              <a:solidFill>
+                <a:schemeClr val="tx1"/>
+              </a:solidFill>
+              <a:tailEnd type="triangle"/>
+            </a:ln>
+          </p:spPr>
+          <p:style>
+            <a:lnRef idx="1">
+              <a:schemeClr val="dk1"/>
+            </a:lnRef>
+            <a:fillRef idx="0">
+              <a:schemeClr val="dk1"/>
+            </a:fillRef>
+            <a:effectRef idx="0">
+              <a:schemeClr val="dk1"/>
+            </a:effectRef>
+            <a:fontRef idx="minor">
+              <a:schemeClr val="tx1"/>
+            </a:fontRef>
+          </p:style>
+        </p:cxnSp>
+        <p:sp>
+          <p:nvSpPr>
+            <p:cNvPr id="253" name="TextBox 252">
+              <a:extLst>
+                <a:ext uri="{FF2B5EF4-FFF2-40B4-BE49-F238E27FC236}">
+                  <a16:creationId xmlns:a16="http://schemas.microsoft.com/office/drawing/2014/main" id="{EC5DEF8F-3AC9-983D-49B4-7733921FBA6E}"/>
+                </a:ext>
+              </a:extLst>
+            </p:cNvPr>
+            <p:cNvSpPr txBox="1"/>
+            <p:nvPr/>
+          </p:nvSpPr>
+          <p:spPr>
+            <a:xfrm>
+              <a:off x="6005513" y="2728913"/>
+              <a:ext cx="886781" cy="369332"/>
+            </a:xfrm>
+            <a:prstGeom prst="rect">
+              <a:avLst/>
+            </a:prstGeom>
+            <a:noFill/>
+          </p:spPr>
+          <p:txBody>
+            <a:bodyPr wrap="none" rtlCol="0">
+              <a:spAutoFit/>
+            </a:bodyPr>
+            <a:lstStyle/>
+            <a:p>
+              <a:r>
+                <a:rPr lang="de-DE" dirty="0"/>
+                <a:t>original</a:t>
+              </a:r>
+              <a:endParaRPr lang="en-GB" dirty="0"/>
+            </a:p>
+          </p:txBody>
+        </p:sp>
+        <p:sp>
+          <p:nvSpPr>
+            <p:cNvPr id="254" name="TextBox 253">
+              <a:extLst>
+                <a:ext uri="{FF2B5EF4-FFF2-40B4-BE49-F238E27FC236}">
+                  <a16:creationId xmlns:a16="http://schemas.microsoft.com/office/drawing/2014/main" id="{2712C93F-92CB-FE3F-85BB-A70AFD230B66}"/>
+                </a:ext>
+              </a:extLst>
+            </p:cNvPr>
+            <p:cNvSpPr txBox="1"/>
+            <p:nvPr/>
+          </p:nvSpPr>
+          <p:spPr>
+            <a:xfrm>
+              <a:off x="803275" y="2881312"/>
+              <a:ext cx="588174" cy="369332"/>
+            </a:xfrm>
+            <a:prstGeom prst="rect">
+              <a:avLst/>
+            </a:prstGeom>
+            <a:noFill/>
+          </p:spPr>
+          <p:txBody>
+            <a:bodyPr wrap="none" rtlCol="0">
+              <a:spAutoFit/>
+            </a:bodyPr>
+            <a:lstStyle/>
+            <a:p>
+              <a:r>
+                <a:rPr lang="de-DE" dirty="0" err="1"/>
+                <a:t>chef</a:t>
+              </a:r>
+              <a:endParaRPr lang="en-GB" dirty="0"/>
+            </a:p>
+          </p:txBody>
+        </p:sp>
+        <p:sp>
+          <p:nvSpPr>
+            <p:cNvPr id="32" name="TextBox 31">
+              <a:extLst>
+                <a:ext uri="{FF2B5EF4-FFF2-40B4-BE49-F238E27FC236}">
+                  <a16:creationId xmlns:a16="http://schemas.microsoft.com/office/drawing/2014/main" id="{217921D7-1AFF-38E6-8C8D-79EE8D6165D2}"/>
+                </a:ext>
+              </a:extLst>
+            </p:cNvPr>
+            <p:cNvSpPr txBox="1"/>
+            <p:nvPr/>
+          </p:nvSpPr>
+          <p:spPr>
+            <a:xfrm>
+              <a:off x="1976437" y="2876550"/>
+              <a:ext cx="588174" cy="369332"/>
+            </a:xfrm>
+            <a:prstGeom prst="rect">
+              <a:avLst/>
+            </a:prstGeom>
+            <a:noFill/>
+          </p:spPr>
+          <p:txBody>
+            <a:bodyPr wrap="none" rtlCol="0">
+              <a:spAutoFit/>
+            </a:bodyPr>
+            <a:lstStyle/>
+            <a:p>
+              <a:r>
+                <a:rPr lang="de-DE" dirty="0" err="1"/>
+                <a:t>chef</a:t>
+              </a:r>
+              <a:endParaRPr lang="en-GB" dirty="0"/>
+            </a:p>
+          </p:txBody>
+        </p:sp>
+        <p:cxnSp>
+          <p:nvCxnSpPr>
+            <p:cNvPr id="33" name="Straight Arrow Connector 32">
+              <a:extLst>
+                <a:ext uri="{FF2B5EF4-FFF2-40B4-BE49-F238E27FC236}">
+                  <a16:creationId xmlns:a16="http://schemas.microsoft.com/office/drawing/2014/main" id="{5DD08E79-440E-6EFD-DEB6-FFF662C82D80}"/>
+                </a:ext>
+              </a:extLst>
+            </p:cNvPr>
+            <p:cNvCxnSpPr>
+              <a:cxnSpLocks/>
+            </p:cNvCxnSpPr>
+            <p:nvPr/>
+          </p:nvCxnSpPr>
+          <p:spPr>
+            <a:xfrm>
+              <a:off x="1609725" y="3090863"/>
+              <a:ext cx="357187" cy="0"/>
+            </a:xfrm>
+            <a:prstGeom prst="straightConnector1">
+              <a:avLst/>
+            </a:prstGeom>
+            <a:ln w="12700">
+              <a:solidFill>
+                <a:schemeClr val="tx1"/>
+              </a:solidFill>
+              <a:tailEnd type="triangle"/>
+            </a:ln>
+          </p:spPr>
+          <p:style>
+            <a:lnRef idx="1">
+              <a:schemeClr val="dk1"/>
+            </a:lnRef>
+            <a:fillRef idx="0">
+              <a:schemeClr val="dk1"/>
+            </a:fillRef>
+            <a:effectRef idx="0">
+              <a:schemeClr val="dk1"/>
+            </a:effectRef>
+            <a:fontRef idx="minor">
+              <a:schemeClr val="tx1"/>
+            </a:fontRef>
+          </p:style>
+        </p:cxnSp>
+        <p:cxnSp>
+          <p:nvCxnSpPr>
+            <p:cNvPr id="34" name="Straight Arrow Connector 33">
+              <a:extLst>
+                <a:ext uri="{FF2B5EF4-FFF2-40B4-BE49-F238E27FC236}">
+                  <a16:creationId xmlns:a16="http://schemas.microsoft.com/office/drawing/2014/main" id="{67DF4F7C-E0D4-F9FD-2D44-3DE3E954C809}"/>
+                </a:ext>
+              </a:extLst>
+            </p:cNvPr>
+            <p:cNvCxnSpPr>
+              <a:cxnSpLocks/>
+            </p:cNvCxnSpPr>
+            <p:nvPr/>
+          </p:nvCxnSpPr>
+          <p:spPr>
+            <a:xfrm>
+              <a:off x="2781300" y="3095625"/>
+              <a:ext cx="357187" cy="0"/>
+            </a:xfrm>
+            <a:prstGeom prst="straightConnector1">
+              <a:avLst/>
+            </a:prstGeom>
+            <a:ln w="12700">
+              <a:solidFill>
+                <a:schemeClr val="tx1"/>
+              </a:solidFill>
+              <a:tailEnd type="triangle"/>
+            </a:ln>
+          </p:spPr>
+          <p:style>
+            <a:lnRef idx="1">
+              <a:schemeClr val="dk1"/>
+            </a:lnRef>
+            <a:fillRef idx="0">
+              <a:schemeClr val="dk1"/>
+            </a:fillRef>
+            <a:effectRef idx="0">
+              <a:schemeClr val="dk1"/>
+            </a:effectRef>
+            <a:fontRef idx="minor">
+              <a:schemeClr val="tx1"/>
+            </a:fontRef>
+          </p:style>
+        </p:cxnSp>
+        <p:sp>
+          <p:nvSpPr>
+            <p:cNvPr id="35" name="TextBox 34">
+              <a:extLst>
+                <a:ext uri="{FF2B5EF4-FFF2-40B4-BE49-F238E27FC236}">
+                  <a16:creationId xmlns:a16="http://schemas.microsoft.com/office/drawing/2014/main" id="{15BAAEA6-2D12-98BE-1FFC-5E23C675AFBB}"/>
+                </a:ext>
+              </a:extLst>
+            </p:cNvPr>
+            <p:cNvSpPr txBox="1"/>
+            <p:nvPr/>
+          </p:nvSpPr>
+          <p:spPr>
+            <a:xfrm>
+              <a:off x="4133850" y="2909888"/>
+              <a:ext cx="588174" cy="369332"/>
+            </a:xfrm>
+            <a:prstGeom prst="rect">
+              <a:avLst/>
+            </a:prstGeom>
+            <a:noFill/>
+          </p:spPr>
+          <p:txBody>
+            <a:bodyPr wrap="none" rtlCol="0">
+              <a:spAutoFit/>
+            </a:bodyPr>
+            <a:lstStyle/>
+            <a:p>
+              <a:r>
+                <a:rPr lang="de-DE" dirty="0" err="1"/>
+                <a:t>chef</a:t>
+              </a:r>
+              <a:endParaRPr lang="en-GB" dirty="0"/>
+            </a:p>
+          </p:txBody>
+        </p:sp>
+        <p:cxnSp>
+          <p:nvCxnSpPr>
+            <p:cNvPr id="37" name="Straight Arrow Connector 36">
+              <a:extLst>
+                <a:ext uri="{FF2B5EF4-FFF2-40B4-BE49-F238E27FC236}">
+                  <a16:creationId xmlns:a16="http://schemas.microsoft.com/office/drawing/2014/main" id="{3CA0507A-2302-3D0E-E9A0-34003CF1E055}"/>
+                </a:ext>
+              </a:extLst>
+            </p:cNvPr>
+            <p:cNvCxnSpPr>
+              <a:cxnSpLocks/>
+            </p:cNvCxnSpPr>
+            <p:nvPr/>
+          </p:nvCxnSpPr>
+          <p:spPr>
+            <a:xfrm>
+              <a:off x="4700588" y="3114675"/>
+              <a:ext cx="357187" cy="0"/>
+            </a:xfrm>
+            <a:prstGeom prst="straightConnector1">
+              <a:avLst/>
+            </a:prstGeom>
+            <a:ln w="12700">
+              <a:solidFill>
+                <a:schemeClr val="tx1"/>
+              </a:solidFill>
+              <a:tailEnd type="triangle"/>
+            </a:ln>
+          </p:spPr>
+          <p:style>
+            <a:lnRef idx="1">
+              <a:schemeClr val="dk1"/>
+            </a:lnRef>
+            <a:fillRef idx="0">
+              <a:schemeClr val="dk1"/>
+            </a:fillRef>
+            <a:effectRef idx="0">
+              <a:schemeClr val="dk1"/>
+            </a:effectRef>
+            <a:fontRef idx="minor">
+              <a:schemeClr val="tx1"/>
+            </a:fontRef>
+          </p:style>
+        </p:cxnSp>
+        <p:cxnSp>
+          <p:nvCxnSpPr>
+            <p:cNvPr id="38" name="Straight Arrow Connector 37">
+              <a:extLst>
+                <a:ext uri="{FF2B5EF4-FFF2-40B4-BE49-F238E27FC236}">
+                  <a16:creationId xmlns:a16="http://schemas.microsoft.com/office/drawing/2014/main" id="{9BEF3E0A-EFD8-08ED-621D-59B34C13E983}"/>
+                </a:ext>
+              </a:extLst>
+            </p:cNvPr>
+            <p:cNvCxnSpPr>
+              <a:cxnSpLocks/>
+            </p:cNvCxnSpPr>
+            <p:nvPr/>
+          </p:nvCxnSpPr>
+          <p:spPr>
+            <a:xfrm>
+              <a:off x="5705475" y="3128963"/>
+              <a:ext cx="357187" cy="0"/>
+            </a:xfrm>
+            <a:prstGeom prst="straightConnector1">
+              <a:avLst/>
+            </a:prstGeom>
+            <a:ln w="12700">
+              <a:solidFill>
+                <a:schemeClr val="tx1"/>
+              </a:solidFill>
+              <a:tailEnd type="triangle"/>
+            </a:ln>
+          </p:spPr>
+          <p:style>
+            <a:lnRef idx="1">
+              <a:schemeClr val="dk1"/>
+            </a:lnRef>
+            <a:fillRef idx="0">
+              <a:schemeClr val="dk1"/>
+            </a:fillRef>
+            <a:effectRef idx="0">
+              <a:schemeClr val="dk1"/>
+            </a:effectRef>
+            <a:fontRef idx="minor">
+              <a:schemeClr val="tx1"/>
+            </a:fontRef>
+          </p:style>
+        </p:cxnSp>
+        <p:sp>
+          <p:nvSpPr>
+            <p:cNvPr id="40" name="TextBox 39">
+              <a:extLst>
+                <a:ext uri="{FF2B5EF4-FFF2-40B4-BE49-F238E27FC236}">
+                  <a16:creationId xmlns:a16="http://schemas.microsoft.com/office/drawing/2014/main" id="{3A84FAC7-3BE5-1415-4075-2FBDAFBE7ED7}"/>
+                </a:ext>
+              </a:extLst>
+            </p:cNvPr>
+            <p:cNvSpPr txBox="1"/>
+            <p:nvPr/>
+          </p:nvSpPr>
+          <p:spPr>
+            <a:xfrm>
+              <a:off x="6000750" y="2938463"/>
+              <a:ext cx="886781" cy="369332"/>
+            </a:xfrm>
+            <a:prstGeom prst="rect">
+              <a:avLst/>
+            </a:prstGeom>
+            <a:noFill/>
+          </p:spPr>
+          <p:txBody>
+            <a:bodyPr wrap="none" rtlCol="0">
+              <a:spAutoFit/>
+            </a:bodyPr>
+            <a:lstStyle/>
+            <a:p>
+              <a:r>
+                <a:rPr lang="de-DE" dirty="0"/>
+                <a:t>original</a:t>
+              </a:r>
+              <a:endParaRPr lang="en-GB" dirty="0"/>
+            </a:p>
+          </p:txBody>
+        </p:sp>
+        <p:sp>
+          <p:nvSpPr>
+            <p:cNvPr id="41" name="TextBox 40">
+              <a:extLst>
+                <a:ext uri="{FF2B5EF4-FFF2-40B4-BE49-F238E27FC236}">
+                  <a16:creationId xmlns:a16="http://schemas.microsoft.com/office/drawing/2014/main" id="{20B23E45-B90D-6C15-5C4D-1B38E646C22C}"/>
+                </a:ext>
+              </a:extLst>
+            </p:cNvPr>
+            <p:cNvSpPr txBox="1"/>
+            <p:nvPr/>
+          </p:nvSpPr>
+          <p:spPr>
+            <a:xfrm>
+              <a:off x="793750" y="3086101"/>
+              <a:ext cx="858184" cy="369332"/>
+            </a:xfrm>
+            <a:prstGeom prst="rect">
+              <a:avLst/>
+            </a:prstGeom>
+            <a:noFill/>
+          </p:spPr>
+          <p:txBody>
+            <a:bodyPr wrap="square" rtlCol="0">
+              <a:spAutoFit/>
+            </a:bodyPr>
+            <a:lstStyle/>
+            <a:p>
+              <a:r>
+                <a:rPr lang="de-DE" dirty="0" err="1"/>
+                <a:t>cooked</a:t>
+              </a:r>
+              <a:endParaRPr lang="en-GB" dirty="0"/>
+            </a:p>
+          </p:txBody>
+        </p:sp>
+        <p:sp>
+          <p:nvSpPr>
+            <p:cNvPr id="42" name="TextBox 41">
+              <a:extLst>
+                <a:ext uri="{FF2B5EF4-FFF2-40B4-BE49-F238E27FC236}">
+                  <a16:creationId xmlns:a16="http://schemas.microsoft.com/office/drawing/2014/main" id="{246FF801-2417-05B1-6D85-DD9531C2FCDF}"/>
+                </a:ext>
+              </a:extLst>
+            </p:cNvPr>
+            <p:cNvSpPr txBox="1"/>
+            <p:nvPr/>
+          </p:nvSpPr>
+          <p:spPr>
+            <a:xfrm>
+              <a:off x="1981200" y="3105150"/>
+              <a:ext cx="1990160" cy="369332"/>
+            </a:xfrm>
+            <a:prstGeom prst="rect">
+              <a:avLst/>
+            </a:prstGeom>
+            <a:noFill/>
+          </p:spPr>
+          <p:txBody>
+            <a:bodyPr wrap="none" rtlCol="0">
+              <a:spAutoFit/>
+            </a:bodyPr>
+            <a:lstStyle/>
+            <a:p>
+              <a:r>
+                <a:rPr lang="de-DE" dirty="0"/>
+                <a:t>$\</a:t>
+              </a:r>
+              <a:r>
+                <a:rPr lang="de-DE" dirty="0" err="1"/>
+                <a:t>mathtt</a:t>
+              </a:r>
+              <a:r>
+                <a:rPr lang="de-DE" dirty="0"/>
+                <a:t>{[MASK]}$</a:t>
+              </a:r>
+              <a:endParaRPr lang="en-GB" dirty="0"/>
+            </a:p>
+          </p:txBody>
+        </p:sp>
+        <p:cxnSp>
+          <p:nvCxnSpPr>
+            <p:cNvPr id="43" name="Straight Arrow Connector 42">
+              <a:extLst>
+                <a:ext uri="{FF2B5EF4-FFF2-40B4-BE49-F238E27FC236}">
+                  <a16:creationId xmlns:a16="http://schemas.microsoft.com/office/drawing/2014/main" id="{75F0FCDC-50F1-2328-5ECF-17AB8C6C3E21}"/>
+                </a:ext>
+              </a:extLst>
+            </p:cNvPr>
+            <p:cNvCxnSpPr>
+              <a:cxnSpLocks/>
+            </p:cNvCxnSpPr>
+            <p:nvPr/>
+          </p:nvCxnSpPr>
+          <p:spPr>
+            <a:xfrm>
+              <a:off x="1609725" y="3300413"/>
+              <a:ext cx="357187" cy="0"/>
+            </a:xfrm>
+            <a:prstGeom prst="straightConnector1">
+              <a:avLst/>
+            </a:prstGeom>
+            <a:ln w="12700">
+              <a:solidFill>
+                <a:schemeClr val="tx1"/>
+              </a:solidFill>
+              <a:tailEnd type="triangle"/>
+            </a:ln>
+          </p:spPr>
+          <p:style>
+            <a:lnRef idx="1">
+              <a:schemeClr val="dk1"/>
+            </a:lnRef>
+            <a:fillRef idx="0">
+              <a:schemeClr val="dk1"/>
+            </a:fillRef>
+            <a:effectRef idx="0">
+              <a:schemeClr val="dk1"/>
+            </a:effectRef>
+            <a:fontRef idx="minor">
+              <a:schemeClr val="tx1"/>
+            </a:fontRef>
+          </p:style>
+        </p:cxnSp>
+        <p:cxnSp>
+          <p:nvCxnSpPr>
+            <p:cNvPr id="44" name="Straight Arrow Connector 43">
+              <a:extLst>
+                <a:ext uri="{FF2B5EF4-FFF2-40B4-BE49-F238E27FC236}">
+                  <a16:creationId xmlns:a16="http://schemas.microsoft.com/office/drawing/2014/main" id="{0198B279-4BC8-D979-6F21-9E60F5ED5B87}"/>
+                </a:ext>
+              </a:extLst>
+            </p:cNvPr>
+            <p:cNvCxnSpPr>
+              <a:cxnSpLocks/>
+            </p:cNvCxnSpPr>
+            <p:nvPr/>
+          </p:nvCxnSpPr>
+          <p:spPr>
+            <a:xfrm>
+              <a:off x="2781300" y="3305175"/>
+              <a:ext cx="357187" cy="0"/>
+            </a:xfrm>
+            <a:prstGeom prst="straightConnector1">
+              <a:avLst/>
+            </a:prstGeom>
+            <a:ln w="12700">
+              <a:solidFill>
+                <a:schemeClr val="tx1"/>
+              </a:solidFill>
+              <a:tailEnd type="triangle"/>
+            </a:ln>
+          </p:spPr>
+          <p:style>
+            <a:lnRef idx="1">
+              <a:schemeClr val="dk1"/>
+            </a:lnRef>
+            <a:fillRef idx="0">
+              <a:schemeClr val="dk1"/>
+            </a:fillRef>
+            <a:effectRef idx="0">
+              <a:schemeClr val="dk1"/>
+            </a:effectRef>
+            <a:fontRef idx="minor">
+              <a:schemeClr val="tx1"/>
+            </a:fontRef>
+          </p:style>
+        </p:cxnSp>
+        <p:sp>
+          <p:nvSpPr>
+            <p:cNvPr id="45" name="TextBox 44">
+              <a:extLst>
+                <a:ext uri="{FF2B5EF4-FFF2-40B4-BE49-F238E27FC236}">
+                  <a16:creationId xmlns:a16="http://schemas.microsoft.com/office/drawing/2014/main" id="{F3382335-27A4-EB43-E521-12EF9A23F641}"/>
+                </a:ext>
+              </a:extLst>
+            </p:cNvPr>
+            <p:cNvSpPr txBox="1"/>
+            <p:nvPr/>
+          </p:nvSpPr>
+          <p:spPr>
+            <a:xfrm>
+              <a:off x="4133850" y="3119438"/>
+              <a:ext cx="483017" cy="369332"/>
+            </a:xfrm>
+            <a:prstGeom prst="rect">
+              <a:avLst/>
+            </a:prstGeom>
+            <a:noFill/>
+          </p:spPr>
+          <p:txBody>
+            <a:bodyPr wrap="none" rtlCol="0">
+              <a:spAutoFit/>
+            </a:bodyPr>
+            <a:lstStyle/>
+            <a:p>
+              <a:r>
+                <a:rPr lang="de-DE" dirty="0" err="1"/>
+                <a:t>ate</a:t>
+              </a:r>
+              <a:endParaRPr lang="en-GB" dirty="0"/>
+            </a:p>
+          </p:txBody>
+        </p:sp>
+        <p:cxnSp>
+          <p:nvCxnSpPr>
+            <p:cNvPr id="46" name="Straight Arrow Connector 45">
+              <a:extLst>
+                <a:ext uri="{FF2B5EF4-FFF2-40B4-BE49-F238E27FC236}">
+                  <a16:creationId xmlns:a16="http://schemas.microsoft.com/office/drawing/2014/main" id="{E429196B-0B7E-F38C-566A-81AED5C9EDA9}"/>
+                </a:ext>
+              </a:extLst>
+            </p:cNvPr>
+            <p:cNvCxnSpPr>
+              <a:cxnSpLocks/>
+            </p:cNvCxnSpPr>
+            <p:nvPr/>
+          </p:nvCxnSpPr>
+          <p:spPr>
+            <a:xfrm>
+              <a:off x="3852863" y="3319463"/>
+              <a:ext cx="357187" cy="0"/>
+            </a:xfrm>
+            <a:prstGeom prst="straightConnector1">
+              <a:avLst/>
+            </a:prstGeom>
+            <a:ln w="12700">
+              <a:solidFill>
+                <a:schemeClr val="tx1"/>
+              </a:solidFill>
+              <a:prstDash val="dash"/>
+              <a:tailEnd type="triangle"/>
+            </a:ln>
+          </p:spPr>
+          <p:style>
+            <a:lnRef idx="1">
+              <a:schemeClr val="dk1"/>
+            </a:lnRef>
+            <a:fillRef idx="0">
+              <a:schemeClr val="dk1"/>
+            </a:fillRef>
+            <a:effectRef idx="0">
+              <a:schemeClr val="dk1"/>
+            </a:effectRef>
+            <a:fontRef idx="minor">
+              <a:schemeClr val="tx1"/>
+            </a:fontRef>
+          </p:style>
+        </p:cxnSp>
+        <p:cxnSp>
+          <p:nvCxnSpPr>
+            <p:cNvPr id="47" name="Straight Arrow Connector 46">
+              <a:extLst>
+                <a:ext uri="{FF2B5EF4-FFF2-40B4-BE49-F238E27FC236}">
+                  <a16:creationId xmlns:a16="http://schemas.microsoft.com/office/drawing/2014/main" id="{007EEFA8-ACF5-5E22-1349-3FA299CFB8F9}"/>
+                </a:ext>
+              </a:extLst>
+            </p:cNvPr>
+            <p:cNvCxnSpPr>
+              <a:cxnSpLocks/>
+            </p:cNvCxnSpPr>
+            <p:nvPr/>
+          </p:nvCxnSpPr>
+          <p:spPr>
+            <a:xfrm>
+              <a:off x="4700588" y="3324225"/>
+              <a:ext cx="357187" cy="0"/>
+            </a:xfrm>
+            <a:prstGeom prst="straightConnector1">
+              <a:avLst/>
+            </a:prstGeom>
+            <a:ln w="12700">
+              <a:solidFill>
+                <a:schemeClr val="tx1"/>
+              </a:solidFill>
+              <a:tailEnd type="triangle"/>
+            </a:ln>
+          </p:spPr>
+          <p:style>
+            <a:lnRef idx="1">
+              <a:schemeClr val="dk1"/>
+            </a:lnRef>
+            <a:fillRef idx="0">
+              <a:schemeClr val="dk1"/>
+            </a:fillRef>
+            <a:effectRef idx="0">
+              <a:schemeClr val="dk1"/>
+            </a:effectRef>
+            <a:fontRef idx="minor">
+              <a:schemeClr val="tx1"/>
+            </a:fontRef>
+          </p:style>
+        </p:cxnSp>
+        <p:cxnSp>
+          <p:nvCxnSpPr>
+            <p:cNvPr id="48" name="Straight Arrow Connector 47">
+              <a:extLst>
+                <a:ext uri="{FF2B5EF4-FFF2-40B4-BE49-F238E27FC236}">
+                  <a16:creationId xmlns:a16="http://schemas.microsoft.com/office/drawing/2014/main" id="{5FD4D2C3-1DE2-4BBC-63D2-2EF777D82FC8}"/>
+                </a:ext>
+              </a:extLst>
+            </p:cNvPr>
+            <p:cNvCxnSpPr>
+              <a:cxnSpLocks/>
+            </p:cNvCxnSpPr>
+            <p:nvPr/>
+          </p:nvCxnSpPr>
+          <p:spPr>
+            <a:xfrm>
+              <a:off x="5705475" y="3338513"/>
+              <a:ext cx="357187" cy="0"/>
+            </a:xfrm>
+            <a:prstGeom prst="straightConnector1">
+              <a:avLst/>
+            </a:prstGeom>
+            <a:ln w="12700">
+              <a:solidFill>
+                <a:schemeClr val="tx1"/>
+              </a:solidFill>
+              <a:tailEnd type="triangle"/>
+            </a:ln>
+          </p:spPr>
+          <p:style>
+            <a:lnRef idx="1">
+              <a:schemeClr val="dk1"/>
+            </a:lnRef>
+            <a:fillRef idx="0">
+              <a:schemeClr val="dk1"/>
+            </a:fillRef>
+            <a:effectRef idx="0">
+              <a:schemeClr val="dk1"/>
+            </a:effectRef>
+            <a:fontRef idx="minor">
+              <a:schemeClr val="tx1"/>
+            </a:fontRef>
+          </p:style>
+        </p:cxnSp>
+        <p:sp>
+          <p:nvSpPr>
+            <p:cNvPr id="49" name="TextBox 48">
+              <a:extLst>
+                <a:ext uri="{FF2B5EF4-FFF2-40B4-BE49-F238E27FC236}">
+                  <a16:creationId xmlns:a16="http://schemas.microsoft.com/office/drawing/2014/main" id="{0080246C-F957-B959-D84D-4F7A128562C3}"/>
+                </a:ext>
+              </a:extLst>
+            </p:cNvPr>
+            <p:cNvSpPr txBox="1"/>
+            <p:nvPr/>
+          </p:nvSpPr>
+          <p:spPr>
+            <a:xfrm>
+              <a:off x="6000750" y="3148013"/>
+              <a:ext cx="997581" cy="369332"/>
+            </a:xfrm>
+            <a:prstGeom prst="rect">
+              <a:avLst/>
+            </a:prstGeom>
+            <a:noFill/>
+          </p:spPr>
+          <p:txBody>
+            <a:bodyPr wrap="none" rtlCol="0">
+              <a:spAutoFit/>
+            </a:bodyPr>
+            <a:lstStyle/>
+            <a:p>
+              <a:r>
+                <a:rPr lang="de-DE" dirty="0" err="1"/>
+                <a:t>replaced</a:t>
+              </a:r>
+              <a:endParaRPr lang="en-GB" dirty="0"/>
+            </a:p>
+          </p:txBody>
+        </p:sp>
+        <p:sp>
+          <p:nvSpPr>
+            <p:cNvPr id="50" name="TextBox 49">
+              <a:extLst>
+                <a:ext uri="{FF2B5EF4-FFF2-40B4-BE49-F238E27FC236}">
+                  <a16:creationId xmlns:a16="http://schemas.microsoft.com/office/drawing/2014/main" id="{B2DA9DBA-8EB0-DDFE-DF90-5538590BE241}"/>
+                </a:ext>
+              </a:extLst>
+            </p:cNvPr>
+            <p:cNvSpPr txBox="1"/>
+            <p:nvPr/>
+          </p:nvSpPr>
+          <p:spPr>
+            <a:xfrm>
+              <a:off x="788988" y="3305174"/>
+              <a:ext cx="498855" cy="369332"/>
+            </a:xfrm>
+            <a:prstGeom prst="rect">
+              <a:avLst/>
+            </a:prstGeom>
+            <a:noFill/>
+          </p:spPr>
+          <p:txBody>
+            <a:bodyPr wrap="none" rtlCol="0">
+              <a:spAutoFit/>
+            </a:bodyPr>
+            <a:lstStyle/>
+            <a:p>
+              <a:r>
+                <a:rPr lang="de-DE" dirty="0" err="1"/>
+                <a:t>the</a:t>
+              </a:r>
+              <a:endParaRPr lang="en-GB" dirty="0"/>
+            </a:p>
+          </p:txBody>
+        </p:sp>
+        <p:sp>
+          <p:nvSpPr>
+            <p:cNvPr id="51" name="TextBox 50">
+              <a:extLst>
+                <a:ext uri="{FF2B5EF4-FFF2-40B4-BE49-F238E27FC236}">
+                  <a16:creationId xmlns:a16="http://schemas.microsoft.com/office/drawing/2014/main" id="{C4957AE8-EA45-4D8A-A482-AD8DDE339906}"/>
+                </a:ext>
+              </a:extLst>
+            </p:cNvPr>
+            <p:cNvSpPr txBox="1"/>
+            <p:nvPr/>
+          </p:nvSpPr>
+          <p:spPr>
+            <a:xfrm>
+              <a:off x="1995487" y="3338511"/>
+              <a:ext cx="498855" cy="369332"/>
+            </a:xfrm>
+            <a:prstGeom prst="rect">
+              <a:avLst/>
+            </a:prstGeom>
+            <a:noFill/>
+          </p:spPr>
+          <p:txBody>
+            <a:bodyPr wrap="none" rtlCol="0">
+              <a:spAutoFit/>
+            </a:bodyPr>
+            <a:lstStyle/>
+            <a:p>
+              <a:r>
+                <a:rPr lang="de-DE" dirty="0" err="1"/>
+                <a:t>the</a:t>
+              </a:r>
+              <a:endParaRPr lang="en-GB" dirty="0"/>
+            </a:p>
+          </p:txBody>
+        </p:sp>
+        <p:cxnSp>
+          <p:nvCxnSpPr>
+            <p:cNvPr id="52" name="Straight Arrow Connector 51">
+              <a:extLst>
+                <a:ext uri="{FF2B5EF4-FFF2-40B4-BE49-F238E27FC236}">
+                  <a16:creationId xmlns:a16="http://schemas.microsoft.com/office/drawing/2014/main" id="{129DDE14-8C80-5433-51C6-A8AA41D4CA02}"/>
+                </a:ext>
+              </a:extLst>
+            </p:cNvPr>
+            <p:cNvCxnSpPr>
+              <a:cxnSpLocks/>
+            </p:cNvCxnSpPr>
+            <p:nvPr/>
+          </p:nvCxnSpPr>
+          <p:spPr>
+            <a:xfrm>
+              <a:off x="1609725" y="3514725"/>
+              <a:ext cx="357187" cy="0"/>
+            </a:xfrm>
+            <a:prstGeom prst="straightConnector1">
+              <a:avLst/>
+            </a:prstGeom>
+            <a:ln w="12700">
+              <a:solidFill>
+                <a:schemeClr val="tx1"/>
+              </a:solidFill>
+              <a:tailEnd type="triangle"/>
+            </a:ln>
+          </p:spPr>
+          <p:style>
+            <a:lnRef idx="1">
+              <a:schemeClr val="dk1"/>
+            </a:lnRef>
+            <a:fillRef idx="0">
+              <a:schemeClr val="dk1"/>
+            </a:fillRef>
+            <a:effectRef idx="0">
+              <a:schemeClr val="dk1"/>
+            </a:effectRef>
+            <a:fontRef idx="minor">
+              <a:schemeClr val="tx1"/>
+            </a:fontRef>
+          </p:style>
+        </p:cxnSp>
+        <p:cxnSp>
+          <p:nvCxnSpPr>
+            <p:cNvPr id="53" name="Straight Arrow Connector 52">
+              <a:extLst>
+                <a:ext uri="{FF2B5EF4-FFF2-40B4-BE49-F238E27FC236}">
+                  <a16:creationId xmlns:a16="http://schemas.microsoft.com/office/drawing/2014/main" id="{AFE9ED2C-56B5-5DFA-5BD9-30F020E41C7F}"/>
+                </a:ext>
+              </a:extLst>
+            </p:cNvPr>
+            <p:cNvCxnSpPr>
+              <a:cxnSpLocks/>
+            </p:cNvCxnSpPr>
+            <p:nvPr/>
+          </p:nvCxnSpPr>
+          <p:spPr>
+            <a:xfrm>
+              <a:off x="2781300" y="3519487"/>
+              <a:ext cx="357187" cy="0"/>
+            </a:xfrm>
+            <a:prstGeom prst="straightConnector1">
+              <a:avLst/>
+            </a:prstGeom>
+            <a:ln w="12700">
+              <a:solidFill>
+                <a:schemeClr val="tx1"/>
+              </a:solidFill>
+              <a:tailEnd type="triangle"/>
+            </a:ln>
+          </p:spPr>
+          <p:style>
+            <a:lnRef idx="1">
+              <a:schemeClr val="dk1"/>
+            </a:lnRef>
+            <a:fillRef idx="0">
+              <a:schemeClr val="dk1"/>
+            </a:fillRef>
+            <a:effectRef idx="0">
+              <a:schemeClr val="dk1"/>
+            </a:effectRef>
+            <a:fontRef idx="minor">
+              <a:schemeClr val="tx1"/>
+            </a:fontRef>
+          </p:style>
+        </p:cxnSp>
+        <p:sp>
+          <p:nvSpPr>
+            <p:cNvPr id="54" name="TextBox 53">
+              <a:extLst>
+                <a:ext uri="{FF2B5EF4-FFF2-40B4-BE49-F238E27FC236}">
+                  <a16:creationId xmlns:a16="http://schemas.microsoft.com/office/drawing/2014/main" id="{43144A8C-89D5-D08F-66F3-FE9E5AF52C63}"/>
+                </a:ext>
+              </a:extLst>
+            </p:cNvPr>
+            <p:cNvSpPr txBox="1"/>
+            <p:nvPr/>
+          </p:nvSpPr>
+          <p:spPr>
+            <a:xfrm>
+              <a:off x="4133851" y="3324225"/>
+              <a:ext cx="498855" cy="369332"/>
+            </a:xfrm>
+            <a:prstGeom prst="rect">
+              <a:avLst/>
+            </a:prstGeom>
+            <a:noFill/>
+          </p:spPr>
+          <p:txBody>
+            <a:bodyPr wrap="none" rtlCol="0">
+              <a:spAutoFit/>
+            </a:bodyPr>
+            <a:lstStyle/>
+            <a:p>
+              <a:r>
+                <a:rPr lang="de-DE" dirty="0" err="1"/>
+                <a:t>the</a:t>
+              </a:r>
+              <a:endParaRPr lang="en-GB" dirty="0"/>
+            </a:p>
+          </p:txBody>
+        </p:sp>
+        <p:cxnSp>
+          <p:nvCxnSpPr>
+            <p:cNvPr id="56" name="Straight Arrow Connector 55">
+              <a:extLst>
+                <a:ext uri="{FF2B5EF4-FFF2-40B4-BE49-F238E27FC236}">
+                  <a16:creationId xmlns:a16="http://schemas.microsoft.com/office/drawing/2014/main" id="{64C293DD-21BB-C879-37DA-2E181048A591}"/>
+                </a:ext>
+              </a:extLst>
+            </p:cNvPr>
+            <p:cNvCxnSpPr>
+              <a:cxnSpLocks/>
+            </p:cNvCxnSpPr>
+            <p:nvPr/>
+          </p:nvCxnSpPr>
+          <p:spPr>
+            <a:xfrm>
+              <a:off x="4700588" y="3538537"/>
+              <a:ext cx="357187" cy="0"/>
+            </a:xfrm>
+            <a:prstGeom prst="straightConnector1">
+              <a:avLst/>
+            </a:prstGeom>
+            <a:ln w="12700">
+              <a:solidFill>
+                <a:schemeClr val="tx1"/>
+              </a:solidFill>
+              <a:tailEnd type="triangle"/>
+            </a:ln>
+          </p:spPr>
+          <p:style>
+            <a:lnRef idx="1">
+              <a:schemeClr val="dk1"/>
+            </a:lnRef>
+            <a:fillRef idx="0">
+              <a:schemeClr val="dk1"/>
+            </a:fillRef>
+            <a:effectRef idx="0">
+              <a:schemeClr val="dk1"/>
+            </a:effectRef>
+            <a:fontRef idx="minor">
+              <a:schemeClr val="tx1"/>
+            </a:fontRef>
+          </p:style>
+        </p:cxnSp>
+        <p:cxnSp>
+          <p:nvCxnSpPr>
+            <p:cNvPr id="57" name="Straight Arrow Connector 56">
+              <a:extLst>
+                <a:ext uri="{FF2B5EF4-FFF2-40B4-BE49-F238E27FC236}">
+                  <a16:creationId xmlns:a16="http://schemas.microsoft.com/office/drawing/2014/main" id="{37EAA4F1-CA02-ABE0-B997-29874121DF5A}"/>
+                </a:ext>
+              </a:extLst>
+            </p:cNvPr>
+            <p:cNvCxnSpPr>
+              <a:cxnSpLocks/>
+            </p:cNvCxnSpPr>
+            <p:nvPr/>
+          </p:nvCxnSpPr>
+          <p:spPr>
+            <a:xfrm>
+              <a:off x="5705475" y="3552825"/>
+              <a:ext cx="357187" cy="0"/>
+            </a:xfrm>
+            <a:prstGeom prst="straightConnector1">
+              <a:avLst/>
+            </a:prstGeom>
+            <a:ln w="12700">
+              <a:solidFill>
+                <a:schemeClr val="tx1"/>
+              </a:solidFill>
+              <a:tailEnd type="triangle"/>
+            </a:ln>
+          </p:spPr>
+          <p:style>
+            <a:lnRef idx="1">
+              <a:schemeClr val="dk1"/>
+            </a:lnRef>
+            <a:fillRef idx="0">
+              <a:schemeClr val="dk1"/>
+            </a:fillRef>
+            <a:effectRef idx="0">
+              <a:schemeClr val="dk1"/>
+            </a:effectRef>
+            <a:fontRef idx="minor">
+              <a:schemeClr val="tx1"/>
+            </a:fontRef>
+          </p:style>
+        </p:cxnSp>
+        <p:sp>
+          <p:nvSpPr>
+            <p:cNvPr id="58" name="TextBox 57">
+              <a:extLst>
+                <a:ext uri="{FF2B5EF4-FFF2-40B4-BE49-F238E27FC236}">
+                  <a16:creationId xmlns:a16="http://schemas.microsoft.com/office/drawing/2014/main" id="{663E79CF-E40D-9D92-E7AB-9FFBCC78273E}"/>
+                </a:ext>
+              </a:extLst>
+            </p:cNvPr>
+            <p:cNvSpPr txBox="1"/>
+            <p:nvPr/>
+          </p:nvSpPr>
+          <p:spPr>
+            <a:xfrm>
+              <a:off x="6000750" y="3362325"/>
+              <a:ext cx="886781" cy="369332"/>
+            </a:xfrm>
+            <a:prstGeom prst="rect">
+              <a:avLst/>
+            </a:prstGeom>
+            <a:noFill/>
+          </p:spPr>
+          <p:txBody>
+            <a:bodyPr wrap="none" rtlCol="0">
+              <a:spAutoFit/>
+            </a:bodyPr>
+            <a:lstStyle/>
+            <a:p>
+              <a:r>
+                <a:rPr lang="de-DE" dirty="0"/>
+                <a:t>original</a:t>
+              </a:r>
+              <a:endParaRPr lang="en-GB" dirty="0"/>
+            </a:p>
+          </p:txBody>
+        </p:sp>
+        <p:sp>
+          <p:nvSpPr>
+            <p:cNvPr id="59" name="TextBox 58">
+              <a:extLst>
+                <a:ext uri="{FF2B5EF4-FFF2-40B4-BE49-F238E27FC236}">
+                  <a16:creationId xmlns:a16="http://schemas.microsoft.com/office/drawing/2014/main" id="{900411C4-4D95-CD7E-8897-769308952745}"/>
+                </a:ext>
+              </a:extLst>
+            </p:cNvPr>
+            <p:cNvSpPr txBox="1"/>
+            <p:nvPr/>
+          </p:nvSpPr>
+          <p:spPr>
+            <a:xfrm>
+              <a:off x="788988" y="3505198"/>
+              <a:ext cx="647934" cy="369332"/>
+            </a:xfrm>
+            <a:prstGeom prst="rect">
+              <a:avLst/>
+            </a:prstGeom>
+            <a:noFill/>
+          </p:spPr>
+          <p:txBody>
+            <a:bodyPr wrap="none" rtlCol="0">
+              <a:spAutoFit/>
+            </a:bodyPr>
+            <a:lstStyle/>
+            <a:p>
+              <a:r>
+                <a:rPr lang="de-DE" dirty="0" err="1"/>
+                <a:t>meal</a:t>
+              </a:r>
+              <a:endParaRPr lang="en-GB" dirty="0"/>
+            </a:p>
+          </p:txBody>
+        </p:sp>
+        <p:sp>
+          <p:nvSpPr>
+            <p:cNvPr id="60" name="TextBox 59">
+              <a:extLst>
+                <a:ext uri="{FF2B5EF4-FFF2-40B4-BE49-F238E27FC236}">
+                  <a16:creationId xmlns:a16="http://schemas.microsoft.com/office/drawing/2014/main" id="{5550293D-6B34-E2B8-4868-3188E8355117}"/>
+                </a:ext>
+              </a:extLst>
+            </p:cNvPr>
+            <p:cNvSpPr txBox="1"/>
+            <p:nvPr/>
+          </p:nvSpPr>
+          <p:spPr>
+            <a:xfrm>
+              <a:off x="2000249" y="3514724"/>
+              <a:ext cx="647934" cy="369332"/>
+            </a:xfrm>
+            <a:prstGeom prst="rect">
+              <a:avLst/>
+            </a:prstGeom>
+            <a:noFill/>
+          </p:spPr>
+          <p:txBody>
+            <a:bodyPr wrap="none" rtlCol="0">
+              <a:spAutoFit/>
+            </a:bodyPr>
+            <a:lstStyle/>
+            <a:p>
+              <a:r>
+                <a:rPr lang="de-DE" dirty="0" err="1"/>
+                <a:t>meal</a:t>
+              </a:r>
+              <a:endParaRPr lang="en-GB" dirty="0"/>
+            </a:p>
+          </p:txBody>
+        </p:sp>
+        <p:cxnSp>
+          <p:nvCxnSpPr>
+            <p:cNvPr id="256" name="Straight Arrow Connector 255">
+              <a:extLst>
+                <a:ext uri="{FF2B5EF4-FFF2-40B4-BE49-F238E27FC236}">
+                  <a16:creationId xmlns:a16="http://schemas.microsoft.com/office/drawing/2014/main" id="{70C78A24-927E-E888-F2F5-6E2FE13CADE0}"/>
+                </a:ext>
+              </a:extLst>
+            </p:cNvPr>
+            <p:cNvCxnSpPr>
+              <a:cxnSpLocks/>
+            </p:cNvCxnSpPr>
+            <p:nvPr/>
+          </p:nvCxnSpPr>
+          <p:spPr>
+            <a:xfrm>
+              <a:off x="1614487" y="3709987"/>
+              <a:ext cx="357187" cy="0"/>
+            </a:xfrm>
+            <a:prstGeom prst="straightConnector1">
+              <a:avLst/>
+            </a:prstGeom>
+            <a:ln w="12700">
+              <a:solidFill>
+                <a:schemeClr val="tx1"/>
+              </a:solidFill>
+              <a:tailEnd type="triangle"/>
+            </a:ln>
+          </p:spPr>
+          <p:style>
+            <a:lnRef idx="1">
+              <a:schemeClr val="dk1"/>
+            </a:lnRef>
+            <a:fillRef idx="0">
+              <a:schemeClr val="dk1"/>
+            </a:fillRef>
+            <a:effectRef idx="0">
+              <a:schemeClr val="dk1"/>
+            </a:effectRef>
+            <a:fontRef idx="minor">
+              <a:schemeClr val="tx1"/>
+            </a:fontRef>
+          </p:style>
+        </p:cxnSp>
+        <p:cxnSp>
+          <p:nvCxnSpPr>
+            <p:cNvPr id="257" name="Straight Arrow Connector 256">
+              <a:extLst>
+                <a:ext uri="{FF2B5EF4-FFF2-40B4-BE49-F238E27FC236}">
+                  <a16:creationId xmlns:a16="http://schemas.microsoft.com/office/drawing/2014/main" id="{2132ECBE-C5C8-0AE7-6993-4920648225E5}"/>
+                </a:ext>
+              </a:extLst>
+            </p:cNvPr>
+            <p:cNvCxnSpPr>
+              <a:cxnSpLocks/>
+            </p:cNvCxnSpPr>
+            <p:nvPr/>
+          </p:nvCxnSpPr>
+          <p:spPr>
+            <a:xfrm>
+              <a:off x="2786062" y="3714749"/>
+              <a:ext cx="357187" cy="0"/>
+            </a:xfrm>
+            <a:prstGeom prst="straightConnector1">
+              <a:avLst/>
+            </a:prstGeom>
+            <a:ln w="12700">
+              <a:solidFill>
+                <a:schemeClr val="tx1"/>
+              </a:solidFill>
+              <a:tailEnd type="triangle"/>
+            </a:ln>
+          </p:spPr>
+          <p:style>
+            <a:lnRef idx="1">
+              <a:schemeClr val="dk1"/>
+            </a:lnRef>
+            <a:fillRef idx="0">
+              <a:schemeClr val="dk1"/>
+            </a:fillRef>
+            <a:effectRef idx="0">
+              <a:schemeClr val="dk1"/>
+            </a:effectRef>
+            <a:fontRef idx="minor">
+              <a:schemeClr val="tx1"/>
+            </a:fontRef>
+          </p:style>
+        </p:cxnSp>
+        <p:sp>
+          <p:nvSpPr>
+            <p:cNvPr id="258" name="TextBox 257">
+              <a:extLst>
+                <a:ext uri="{FF2B5EF4-FFF2-40B4-BE49-F238E27FC236}">
+                  <a16:creationId xmlns:a16="http://schemas.microsoft.com/office/drawing/2014/main" id="{78768205-86A3-D9D5-18D5-FC3A2BCD02AF}"/>
+                </a:ext>
+              </a:extLst>
+            </p:cNvPr>
+            <p:cNvSpPr txBox="1"/>
+            <p:nvPr/>
+          </p:nvSpPr>
+          <p:spPr>
+            <a:xfrm>
+              <a:off x="4129088" y="3533775"/>
+              <a:ext cx="647934" cy="369332"/>
+            </a:xfrm>
+            <a:prstGeom prst="rect">
+              <a:avLst/>
+            </a:prstGeom>
+            <a:noFill/>
+          </p:spPr>
+          <p:txBody>
+            <a:bodyPr wrap="none" rtlCol="0">
+              <a:spAutoFit/>
+            </a:bodyPr>
+            <a:lstStyle/>
+            <a:p>
+              <a:r>
+                <a:rPr lang="de-DE" dirty="0" err="1"/>
+                <a:t>meal</a:t>
+              </a:r>
+              <a:endParaRPr lang="en-GB" dirty="0"/>
+            </a:p>
+          </p:txBody>
+        </p:sp>
+        <p:cxnSp>
+          <p:nvCxnSpPr>
+            <p:cNvPr id="260" name="Straight Arrow Connector 259">
+              <a:extLst>
+                <a:ext uri="{FF2B5EF4-FFF2-40B4-BE49-F238E27FC236}">
+                  <a16:creationId xmlns:a16="http://schemas.microsoft.com/office/drawing/2014/main" id="{FE239940-86F5-59A7-6D0D-19B7DF3D0205}"/>
+                </a:ext>
+              </a:extLst>
+            </p:cNvPr>
+            <p:cNvCxnSpPr>
+              <a:cxnSpLocks/>
+            </p:cNvCxnSpPr>
+            <p:nvPr/>
+          </p:nvCxnSpPr>
+          <p:spPr>
+            <a:xfrm>
+              <a:off x="4705350" y="3733799"/>
+              <a:ext cx="357187" cy="0"/>
+            </a:xfrm>
+            <a:prstGeom prst="straightConnector1">
+              <a:avLst/>
+            </a:prstGeom>
+            <a:ln w="12700">
+              <a:solidFill>
+                <a:schemeClr val="tx1"/>
+              </a:solidFill>
+              <a:tailEnd type="triangle"/>
+            </a:ln>
+          </p:spPr>
+          <p:style>
+            <a:lnRef idx="1">
+              <a:schemeClr val="dk1"/>
+            </a:lnRef>
+            <a:fillRef idx="0">
+              <a:schemeClr val="dk1"/>
+            </a:fillRef>
+            <a:effectRef idx="0">
+              <a:schemeClr val="dk1"/>
+            </a:effectRef>
+            <a:fontRef idx="minor">
+              <a:schemeClr val="tx1"/>
+            </a:fontRef>
+          </p:style>
+        </p:cxnSp>
+        <p:cxnSp>
+          <p:nvCxnSpPr>
+            <p:cNvPr id="261" name="Straight Arrow Connector 260">
+              <a:extLst>
+                <a:ext uri="{FF2B5EF4-FFF2-40B4-BE49-F238E27FC236}">
+                  <a16:creationId xmlns:a16="http://schemas.microsoft.com/office/drawing/2014/main" id="{FDEE6B90-8A2F-7C9D-3778-9A809B9AC567}"/>
+                </a:ext>
+              </a:extLst>
+            </p:cNvPr>
+            <p:cNvCxnSpPr>
+              <a:cxnSpLocks/>
+            </p:cNvCxnSpPr>
+            <p:nvPr/>
+          </p:nvCxnSpPr>
+          <p:spPr>
+            <a:xfrm>
+              <a:off x="5710237" y="3748087"/>
+              <a:ext cx="357187" cy="0"/>
+            </a:xfrm>
+            <a:prstGeom prst="straightConnector1">
+              <a:avLst/>
+            </a:prstGeom>
+            <a:ln w="12700">
+              <a:solidFill>
+                <a:schemeClr val="tx1"/>
+              </a:solidFill>
+              <a:tailEnd type="triangle"/>
+            </a:ln>
+          </p:spPr>
+          <p:style>
+            <a:lnRef idx="1">
+              <a:schemeClr val="dk1"/>
+            </a:lnRef>
+            <a:fillRef idx="0">
+              <a:schemeClr val="dk1"/>
+            </a:fillRef>
+            <a:effectRef idx="0">
+              <a:schemeClr val="dk1"/>
+            </a:effectRef>
+            <a:fontRef idx="minor">
+              <a:schemeClr val="tx1"/>
+            </a:fontRef>
+          </p:style>
+        </p:cxnSp>
+        <p:sp>
+          <p:nvSpPr>
+            <p:cNvPr id="262" name="TextBox 261">
+              <a:extLst>
+                <a:ext uri="{FF2B5EF4-FFF2-40B4-BE49-F238E27FC236}">
+                  <a16:creationId xmlns:a16="http://schemas.microsoft.com/office/drawing/2014/main" id="{3E9E8AF5-B556-DE0D-CF25-0ED8151A4F4D}"/>
+                </a:ext>
+              </a:extLst>
+            </p:cNvPr>
+            <p:cNvSpPr txBox="1"/>
+            <p:nvPr/>
+          </p:nvSpPr>
+          <p:spPr>
+            <a:xfrm>
+              <a:off x="6005512" y="3557587"/>
+              <a:ext cx="886781" cy="369332"/>
+            </a:xfrm>
+            <a:prstGeom prst="rect">
+              <a:avLst/>
+            </a:prstGeom>
+            <a:noFill/>
+          </p:spPr>
+          <p:txBody>
+            <a:bodyPr wrap="none" rtlCol="0">
+              <a:spAutoFit/>
+            </a:bodyPr>
+            <a:lstStyle/>
+            <a:p>
+              <a:r>
+                <a:rPr lang="de-DE" dirty="0"/>
+                <a:t>original</a:t>
+              </a:r>
+              <a:endParaRPr lang="en-GB" dirty="0"/>
+            </a:p>
+          </p:txBody>
+        </p:sp>
+      </p:grpSp>
     </p:spTree>
     <p:extLst>
       <p:ext uri="{BB962C8B-B14F-4D97-AF65-F5344CB8AC3E}">
-        <p14:creationId xmlns:p14="http://schemas.microsoft.com/office/powerpoint/2010/main" val="1975984209"/>
+        <p14:creationId xmlns:p14="http://schemas.microsoft.com/office/powerpoint/2010/main" val="864514952"/>
       </p:ext>
     </p:extLst>
   </p:cSld>
@@ -27431,12 +31055,62 @@
           <a:chExt cx="0" cy="0"/>
         </a:xfrm>
       </p:grpSpPr>
+      <p:sp>
+        <p:nvSpPr>
+          <p:cNvPr id="2" name="Title 1">
+            <a:extLst>
+              <a:ext uri="{FF2B5EF4-FFF2-40B4-BE49-F238E27FC236}">
+                <a16:creationId xmlns:a16="http://schemas.microsoft.com/office/drawing/2014/main" id="{9C25A884-0014-7B87-1AF5-C2A758D258BB}"/>
+              </a:ext>
+            </a:extLst>
+          </p:cNvPr>
+          <p:cNvSpPr>
+            <a:spLocks noGrp="1"/>
+          </p:cNvSpPr>
+          <p:nvPr>
+            <p:ph type="title"/>
+          </p:nvPr>
+        </p:nvSpPr>
+        <p:spPr/>
+        <p:txBody>
+          <a:bodyPr/>
+          <a:lstStyle/>
+          <a:p>
+            <a:endParaRPr lang="en-GB"/>
+          </a:p>
+        </p:txBody>
+      </p:sp>
+      <p:sp>
+        <p:nvSpPr>
+          <p:cNvPr id="3" name="Content Placeholder 2">
+            <a:extLst>
+              <a:ext uri="{FF2B5EF4-FFF2-40B4-BE49-F238E27FC236}">
+                <a16:creationId xmlns:a16="http://schemas.microsoft.com/office/drawing/2014/main" id="{EFD32671-D437-757C-1EA5-C048C3504F41}"/>
+              </a:ext>
+            </a:extLst>
+          </p:cNvPr>
+          <p:cNvSpPr>
+            <a:spLocks noGrp="1"/>
+          </p:cNvSpPr>
+          <p:nvPr>
+            <p:ph idx="1"/>
+          </p:nvPr>
+        </p:nvSpPr>
+        <p:spPr/>
+        <p:txBody>
+          <a:bodyPr/>
+          <a:lstStyle/>
+          <a:p>
+            <a:endParaRPr lang="en-GB"/>
+          </a:p>
+        </p:txBody>
+      </p:sp>
       <p:pic>
         <p:nvPicPr>
-          <p:cNvPr id="5" name="Picture 4">
-            <a:extLst>
-              <a:ext uri="{FF2B5EF4-FFF2-40B4-BE49-F238E27FC236}">
-                <a16:creationId xmlns:a16="http://schemas.microsoft.com/office/drawing/2014/main" id="{E9048B29-D23C-3F4A-8CFD-CC2CD996A4A6}"/>
+          <p:cNvPr id="4" name="Picture 3">
+            <a:extLst>
+              <a:ext uri="{FF2B5EF4-FFF2-40B4-BE49-F238E27FC236}">
+                <a16:creationId xmlns:a16="http://schemas.microsoft.com/office/drawing/2014/main" id="{B7DB29C0-B5C8-8508-A26E-50B1D221C83C}"/>
               </a:ext>
             </a:extLst>
           </p:cNvPr>
@@ -27453,38 +31127,8 @@
         </p:blipFill>
         <p:spPr>
           <a:xfrm>
-            <a:off x="258426" y="0"/>
+            <a:off x="400050" y="-314325"/>
             <a:ext cx="11675147" cy="6858000"/>
-          </a:xfrm>
-          <a:prstGeom prst="rect">
-            <a:avLst/>
-          </a:prstGeom>
-        </p:spPr>
-      </p:pic>
-      <p:pic>
-        <p:nvPicPr>
-          <p:cNvPr id="3" name="Picture 2">
-            <a:extLst>
-              <a:ext uri="{FF2B5EF4-FFF2-40B4-BE49-F238E27FC236}">
-                <a16:creationId xmlns:a16="http://schemas.microsoft.com/office/drawing/2014/main" id="{4AEA4B46-C438-5924-D392-B8FE886DDBB4}"/>
-              </a:ext>
-            </a:extLst>
-          </p:cNvPr>
-          <p:cNvPicPr>
-            <a:picLocks noChangeAspect="1"/>
-          </p:cNvPicPr>
-          <p:nvPr/>
-        </p:nvPicPr>
-        <p:blipFill>
-          <a:blip r:embed="rId3"/>
-          <a:stretch>
-            <a:fillRect/>
-          </a:stretch>
-        </p:blipFill>
-        <p:spPr>
-          <a:xfrm>
-            <a:off x="3157281" y="1380830"/>
-            <a:ext cx="3667637" cy="4229690"/>
           </a:xfrm>
           <a:prstGeom prst="rect">
             <a:avLst/>
@@ -27494,7 +31138,7 @@
     </p:spTree>
     <p:extLst>
       <p:ext uri="{BB962C8B-B14F-4D97-AF65-F5344CB8AC3E}">
-        <p14:creationId xmlns:p14="http://schemas.microsoft.com/office/powerpoint/2010/main" val="4091855300"/>
+        <p14:creationId xmlns:p14="http://schemas.microsoft.com/office/powerpoint/2010/main" val="1975984209"/>
       </p:ext>
     </p:extLst>
   </p:cSld>

</xml_diff>

<commit_message>
Add draft for research framework🏦
</commit_message>
<xml_diff>
--- a/reports/Graphs/diagrams.pptx
+++ b/reports/Graphs/diagrams.pptx
@@ -7,14 +7,15 @@
   <p:sldIdLst>
     <p:sldId id="256" r:id="rId2"/>
     <p:sldId id="263" r:id="rId3"/>
-    <p:sldId id="262" r:id="rId4"/>
-    <p:sldId id="264" r:id="rId5"/>
-    <p:sldId id="265" r:id="rId6"/>
-    <p:sldId id="260" r:id="rId7"/>
-    <p:sldId id="261" r:id="rId8"/>
-    <p:sldId id="266" r:id="rId9"/>
-    <p:sldId id="259" r:id="rId10"/>
-    <p:sldId id="257" r:id="rId11"/>
+    <p:sldId id="264" r:id="rId4"/>
+    <p:sldId id="265" r:id="rId5"/>
+    <p:sldId id="267" r:id="rId6"/>
+    <p:sldId id="268" r:id="rId7"/>
+    <p:sldId id="260" r:id="rId8"/>
+    <p:sldId id="261" r:id="rId9"/>
+    <p:sldId id="266" r:id="rId10"/>
+    <p:sldId id="259" r:id="rId11"/>
+    <p:sldId id="257" r:id="rId12"/>
   </p:sldIdLst>
   <p:sldSz cx="12192000" cy="6858000"/>
   <p:notesSz cx="6858000" cy="9144000"/>
@@ -124,13 +125,547 @@
 <file path=ppt/revisionInfo.xml><?xml version="1.0" encoding="utf-8"?>
 <p1510:revInfo xmlns:a="http://schemas.openxmlformats.org/drawingml/2006/main" xmlns:r="http://schemas.openxmlformats.org/officeDocument/2006/relationships" xmlns:p1510="http://schemas.microsoft.com/office/powerpoint/2015/10/main">
   <p1510:revLst>
-    <p1510:client id="{9CD03640-CC4F-4034-8161-8D1D39C001C5}" v="17" dt="2023-04-24T16:44:44.361"/>
+    <p1510:client id="{D4AAABE4-665D-427C-806E-52B893CA3FC7}" v="38" dt="2023-05-17T09:40:28.539"/>
   </p1510:revLst>
 </p1510:revInfo>
 </file>
 
 <file path=ppt/changesInfos/changesInfo1.xml><?xml version="1.0" encoding="utf-8"?>
 <pc:chgInfo xmlns:a="http://schemas.openxmlformats.org/drawingml/2006/main" xmlns:r="http://schemas.openxmlformats.org/officeDocument/2006/relationships" xmlns:ac="http://schemas.microsoft.com/office/drawing/2013/main/command" xmlns:pc="http://schemas.microsoft.com/office/powerpoint/2013/main/command">
+  <pc:docChgLst>
+    <pc:chgData name="Markus Bilz" userId="a36021e4bdb9349f" providerId="LiveId" clId="{D4AAABE4-665D-427C-806E-52B893CA3FC7}"/>
+    <pc:docChg chg="undo custSel addSld delSld modSld">
+      <pc:chgData name="Markus Bilz" userId="a36021e4bdb9349f" providerId="LiveId" clId="{D4AAABE4-665D-427C-806E-52B893CA3FC7}" dt="2023-05-17T09:41:58.259" v="955" actId="20577"/>
+      <pc:docMkLst>
+        <pc:docMk/>
+      </pc:docMkLst>
+      <pc:sldChg chg="del">
+        <pc:chgData name="Markus Bilz" userId="a36021e4bdb9349f" providerId="LiveId" clId="{D4AAABE4-665D-427C-806E-52B893CA3FC7}" dt="2023-05-17T09:26:24.224" v="794" actId="2696"/>
+        <pc:sldMkLst>
+          <pc:docMk/>
+          <pc:sldMk cId="350462512" sldId="262"/>
+        </pc:sldMkLst>
+      </pc:sldChg>
+      <pc:sldChg chg="addSp delSp modSp new mod">
+        <pc:chgData name="Markus Bilz" userId="a36021e4bdb9349f" providerId="LiveId" clId="{D4AAABE4-665D-427C-806E-52B893CA3FC7}" dt="2023-05-17T09:36:50.117" v="922" actId="14100"/>
+        <pc:sldMkLst>
+          <pc:docMk/>
+          <pc:sldMk cId="873796926" sldId="267"/>
+        </pc:sldMkLst>
+        <pc:spChg chg="mod">
+          <ac:chgData name="Markus Bilz" userId="a36021e4bdb9349f" providerId="LiveId" clId="{D4AAABE4-665D-427C-806E-52B893CA3FC7}" dt="2023-05-17T09:23:01.778" v="776" actId="1076"/>
+          <ac:spMkLst>
+            <pc:docMk/>
+            <pc:sldMk cId="873796926" sldId="267"/>
+            <ac:spMk id="2" creationId="{683A413D-99D9-FCB9-77DB-9A11EE63A78C}"/>
+          </ac:spMkLst>
+        </pc:spChg>
+        <pc:spChg chg="del mod">
+          <ac:chgData name="Markus Bilz" userId="a36021e4bdb9349f" providerId="LiveId" clId="{D4AAABE4-665D-427C-806E-52B893CA3FC7}" dt="2023-05-17T08:01:25.335" v="2" actId="478"/>
+          <ac:spMkLst>
+            <pc:docMk/>
+            <pc:sldMk cId="873796926" sldId="267"/>
+            <ac:spMk id="3" creationId="{E483DA65-E763-68B5-BF09-36828B57565E}"/>
+          </ac:spMkLst>
+        </pc:spChg>
+        <pc:spChg chg="add del mod">
+          <ac:chgData name="Markus Bilz" userId="a36021e4bdb9349f" providerId="LiveId" clId="{D4AAABE4-665D-427C-806E-52B893CA3FC7}" dt="2023-05-17T08:09:34.364" v="27" actId="478"/>
+          <ac:spMkLst>
+            <pc:docMk/>
+            <pc:sldMk cId="873796926" sldId="267"/>
+            <ac:spMk id="5" creationId="{EF718C20-2FD4-71EF-A008-F2EA8BA68A00}"/>
+          </ac:spMkLst>
+        </pc:spChg>
+        <pc:spChg chg="add mod ord">
+          <ac:chgData name="Markus Bilz" userId="a36021e4bdb9349f" providerId="LiveId" clId="{D4AAABE4-665D-427C-806E-52B893CA3FC7}" dt="2023-05-17T09:35:43.055" v="919" actId="1076"/>
+          <ac:spMkLst>
+            <pc:docMk/>
+            <pc:sldMk cId="873796926" sldId="267"/>
+            <ac:spMk id="6" creationId="{C96ED38C-E0B1-92C2-B807-5218346FC064}"/>
+          </ac:spMkLst>
+        </pc:spChg>
+        <pc:spChg chg="add mod">
+          <ac:chgData name="Markus Bilz" userId="a36021e4bdb9349f" providerId="LiveId" clId="{D4AAABE4-665D-427C-806E-52B893CA3FC7}" dt="2023-05-17T09:23:48.016" v="786" actId="1076"/>
+          <ac:spMkLst>
+            <pc:docMk/>
+            <pc:sldMk cId="873796926" sldId="267"/>
+            <ac:spMk id="7" creationId="{A023D810-4417-2CD5-6DB9-5A58ED07DAF1}"/>
+          </ac:spMkLst>
+        </pc:spChg>
+        <pc:spChg chg="add del mod">
+          <ac:chgData name="Markus Bilz" userId="a36021e4bdb9349f" providerId="LiveId" clId="{D4AAABE4-665D-427C-806E-52B893CA3FC7}" dt="2023-05-17T08:12:52.005" v="55"/>
+          <ac:spMkLst>
+            <pc:docMk/>
+            <pc:sldMk cId="873796926" sldId="267"/>
+            <ac:spMk id="8" creationId="{237237E9-1D00-4381-F426-DD1FAE56FECA}"/>
+          </ac:spMkLst>
+        </pc:spChg>
+        <pc:spChg chg="add mod">
+          <ac:chgData name="Markus Bilz" userId="a36021e4bdb9349f" providerId="LiveId" clId="{D4AAABE4-665D-427C-806E-52B893CA3FC7}" dt="2023-05-17T09:27:52.518" v="796" actId="1076"/>
+          <ac:spMkLst>
+            <pc:docMk/>
+            <pc:sldMk cId="873796926" sldId="267"/>
+            <ac:spMk id="9" creationId="{C07D752C-D6F2-1D45-03EC-3F124EE97946}"/>
+          </ac:spMkLst>
+        </pc:spChg>
+        <pc:spChg chg="add mod">
+          <ac:chgData name="Markus Bilz" userId="a36021e4bdb9349f" providerId="LiveId" clId="{D4AAABE4-665D-427C-806E-52B893CA3FC7}" dt="2023-05-17T09:27:52.518" v="796" actId="1076"/>
+          <ac:spMkLst>
+            <pc:docMk/>
+            <pc:sldMk cId="873796926" sldId="267"/>
+            <ac:spMk id="10" creationId="{0622CB4B-1EC6-0675-AC6A-A3E25EF4A4A1}"/>
+          </ac:spMkLst>
+        </pc:spChg>
+        <pc:spChg chg="add mod">
+          <ac:chgData name="Markus Bilz" userId="a36021e4bdb9349f" providerId="LiveId" clId="{D4AAABE4-665D-427C-806E-52B893CA3FC7}" dt="2023-05-17T09:29:52.735" v="854" actId="1076"/>
+          <ac:spMkLst>
+            <pc:docMk/>
+            <pc:sldMk cId="873796926" sldId="267"/>
+            <ac:spMk id="11" creationId="{1B75BC38-F232-FB5B-95D7-76998D86AC90}"/>
+          </ac:spMkLst>
+        </pc:spChg>
+        <pc:spChg chg="add mod ord">
+          <ac:chgData name="Markus Bilz" userId="a36021e4bdb9349f" providerId="LiveId" clId="{D4AAABE4-665D-427C-806E-52B893CA3FC7}" dt="2023-05-17T09:34:38.605" v="906" actId="14100"/>
+          <ac:spMkLst>
+            <pc:docMk/>
+            <pc:sldMk cId="873796926" sldId="267"/>
+            <ac:spMk id="12" creationId="{7841179F-B9B5-2E56-DFA5-7DAA6C1BBD9D}"/>
+          </ac:spMkLst>
+        </pc:spChg>
+        <pc:spChg chg="add mod">
+          <ac:chgData name="Markus Bilz" userId="a36021e4bdb9349f" providerId="LiveId" clId="{D4AAABE4-665D-427C-806E-52B893CA3FC7}" dt="2023-05-17T09:23:48.016" v="786" actId="1076"/>
+          <ac:spMkLst>
+            <pc:docMk/>
+            <pc:sldMk cId="873796926" sldId="267"/>
+            <ac:spMk id="13" creationId="{EB67B30B-4D14-827E-5DB9-0B9167FF157A}"/>
+          </ac:spMkLst>
+        </pc:spChg>
+        <pc:spChg chg="add mod">
+          <ac:chgData name="Markus Bilz" userId="a36021e4bdb9349f" providerId="LiveId" clId="{D4AAABE4-665D-427C-806E-52B893CA3FC7}" dt="2023-05-17T09:33:34.083" v="903" actId="1076"/>
+          <ac:spMkLst>
+            <pc:docMk/>
+            <pc:sldMk cId="873796926" sldId="267"/>
+            <ac:spMk id="14" creationId="{82EAA822-CF91-407C-ED09-D5430CB97B56}"/>
+          </ac:spMkLst>
+        </pc:spChg>
+        <pc:spChg chg="add mod">
+          <ac:chgData name="Markus Bilz" userId="a36021e4bdb9349f" providerId="LiveId" clId="{D4AAABE4-665D-427C-806E-52B893CA3FC7}" dt="2023-05-17T09:35:43.055" v="919" actId="1076"/>
+          <ac:spMkLst>
+            <pc:docMk/>
+            <pc:sldMk cId="873796926" sldId="267"/>
+            <ac:spMk id="15" creationId="{B840A789-AE83-25DF-4C82-D3C7149D69EB}"/>
+          </ac:spMkLst>
+        </pc:spChg>
+        <pc:spChg chg="add mod">
+          <ac:chgData name="Markus Bilz" userId="a36021e4bdb9349f" providerId="LiveId" clId="{D4AAABE4-665D-427C-806E-52B893CA3FC7}" dt="2023-05-17T09:35:43.055" v="919" actId="1076"/>
+          <ac:spMkLst>
+            <pc:docMk/>
+            <pc:sldMk cId="873796926" sldId="267"/>
+            <ac:spMk id="16" creationId="{B314F980-CFB9-6647-E835-3991B2D65FDE}"/>
+          </ac:spMkLst>
+        </pc:spChg>
+        <pc:spChg chg="add mod ord">
+          <ac:chgData name="Markus Bilz" userId="a36021e4bdb9349f" providerId="LiveId" clId="{D4AAABE4-665D-427C-806E-52B893CA3FC7}" dt="2023-05-17T09:33:38.458" v="904" actId="1076"/>
+          <ac:spMkLst>
+            <pc:docMk/>
+            <pc:sldMk cId="873796926" sldId="267"/>
+            <ac:spMk id="24" creationId="{8921449C-B172-6825-E7FF-0DDF75F501AD}"/>
+          </ac:spMkLst>
+        </pc:spChg>
+        <pc:spChg chg="add mod">
+          <ac:chgData name="Markus Bilz" userId="a36021e4bdb9349f" providerId="LiveId" clId="{D4AAABE4-665D-427C-806E-52B893CA3FC7}" dt="2023-05-17T09:18:05.363" v="659" actId="14100"/>
+          <ac:spMkLst>
+            <pc:docMk/>
+            <pc:sldMk cId="873796926" sldId="267"/>
+            <ac:spMk id="28" creationId="{4B3CD710-AFF5-C20D-00D6-894B9ECD4CFF}"/>
+          </ac:spMkLst>
+        </pc:spChg>
+        <pc:spChg chg="add del mod">
+          <ac:chgData name="Markus Bilz" userId="a36021e4bdb9349f" providerId="LiveId" clId="{D4AAABE4-665D-427C-806E-52B893CA3FC7}" dt="2023-05-17T09:15:17.903" v="634" actId="478"/>
+          <ac:spMkLst>
+            <pc:docMk/>
+            <pc:sldMk cId="873796926" sldId="267"/>
+            <ac:spMk id="30" creationId="{D2F46992-65D1-15F3-204E-474FE52FFEA7}"/>
+          </ac:spMkLst>
+        </pc:spChg>
+        <pc:spChg chg="add mod">
+          <ac:chgData name="Markus Bilz" userId="a36021e4bdb9349f" providerId="LiveId" clId="{D4AAABE4-665D-427C-806E-52B893CA3FC7}" dt="2023-05-17T09:23:48.016" v="786" actId="1076"/>
+          <ac:spMkLst>
+            <pc:docMk/>
+            <pc:sldMk cId="873796926" sldId="267"/>
+            <ac:spMk id="31" creationId="{D3E48620-93F1-1D9E-966B-44CA6FF79461}"/>
+          </ac:spMkLst>
+        </pc:spChg>
+        <pc:spChg chg="add mod">
+          <ac:chgData name="Markus Bilz" userId="a36021e4bdb9349f" providerId="LiveId" clId="{D4AAABE4-665D-427C-806E-52B893CA3FC7}" dt="2023-05-17T09:28:04.926" v="797" actId="1076"/>
+          <ac:spMkLst>
+            <pc:docMk/>
+            <pc:sldMk cId="873796926" sldId="267"/>
+            <ac:spMk id="1038" creationId="{7D6D82FD-48ED-F01D-1A74-9047D884AECA}"/>
+          </ac:spMkLst>
+        </pc:spChg>
+        <pc:spChg chg="add mod">
+          <ac:chgData name="Markus Bilz" userId="a36021e4bdb9349f" providerId="LiveId" clId="{D4AAABE4-665D-427C-806E-52B893CA3FC7}" dt="2023-05-17T09:28:06.839" v="798" actId="1076"/>
+          <ac:spMkLst>
+            <pc:docMk/>
+            <pc:sldMk cId="873796926" sldId="267"/>
+            <ac:spMk id="1039" creationId="{EA5BC06A-2FBC-17A7-CB31-F804E1DF1253}"/>
+          </ac:spMkLst>
+        </pc:spChg>
+        <pc:spChg chg="add mod">
+          <ac:chgData name="Markus Bilz" userId="a36021e4bdb9349f" providerId="LiveId" clId="{D4AAABE4-665D-427C-806E-52B893CA3FC7}" dt="2023-05-17T09:17:50.123" v="658" actId="20577"/>
+          <ac:spMkLst>
+            <pc:docMk/>
+            <pc:sldMk cId="873796926" sldId="267"/>
+            <ac:spMk id="1045" creationId="{248F470B-6828-B453-9C17-857109741461}"/>
+          </ac:spMkLst>
+        </pc:spChg>
+        <pc:spChg chg="add del mod">
+          <ac:chgData name="Markus Bilz" userId="a36021e4bdb9349f" providerId="LiveId" clId="{D4AAABE4-665D-427C-806E-52B893CA3FC7}" dt="2023-05-17T09:04:58.380" v="585" actId="478"/>
+          <ac:spMkLst>
+            <pc:docMk/>
+            <pc:sldMk cId="873796926" sldId="267"/>
+            <ac:spMk id="1082" creationId="{25ABE639-6785-7346-836B-DE4098822C0C}"/>
+          </ac:spMkLst>
+        </pc:spChg>
+        <pc:spChg chg="add mod">
+          <ac:chgData name="Markus Bilz" userId="a36021e4bdb9349f" providerId="LiveId" clId="{D4AAABE4-665D-427C-806E-52B893CA3FC7}" dt="2023-05-17T09:24:47.629" v="792" actId="1076"/>
+          <ac:spMkLst>
+            <pc:docMk/>
+            <pc:sldMk cId="873796926" sldId="267"/>
+            <ac:spMk id="1087" creationId="{3ABA7E38-A92B-39B5-3ADF-F959A7EA04F9}"/>
+          </ac:spMkLst>
+        </pc:spChg>
+        <pc:spChg chg="add mod">
+          <ac:chgData name="Markus Bilz" userId="a36021e4bdb9349f" providerId="LiveId" clId="{D4AAABE4-665D-427C-806E-52B893CA3FC7}" dt="2023-05-17T09:19:37.959" v="730" actId="1076"/>
+          <ac:spMkLst>
+            <pc:docMk/>
+            <pc:sldMk cId="873796926" sldId="267"/>
+            <ac:spMk id="1088" creationId="{8ED72B36-51D0-895F-9960-38EFB9E127E0}"/>
+          </ac:spMkLst>
+        </pc:spChg>
+        <pc:spChg chg="add mod">
+          <ac:chgData name="Markus Bilz" userId="a36021e4bdb9349f" providerId="LiveId" clId="{D4AAABE4-665D-427C-806E-52B893CA3FC7}" dt="2023-05-17T09:24:52.115" v="793" actId="1076"/>
+          <ac:spMkLst>
+            <pc:docMk/>
+            <pc:sldMk cId="873796926" sldId="267"/>
+            <ac:spMk id="1089" creationId="{0CC40106-6295-6FC3-DB4D-60B99CFB8E3C}"/>
+          </ac:spMkLst>
+        </pc:spChg>
+        <pc:spChg chg="add mod">
+          <ac:chgData name="Markus Bilz" userId="a36021e4bdb9349f" providerId="LiveId" clId="{D4AAABE4-665D-427C-806E-52B893CA3FC7}" dt="2023-05-17T09:24:44.501" v="791" actId="1076"/>
+          <ac:spMkLst>
+            <pc:docMk/>
+            <pc:sldMk cId="873796926" sldId="267"/>
+            <ac:spMk id="1090" creationId="{3BDBA4C7-B634-2603-5CF6-AEED66974E30}"/>
+          </ac:spMkLst>
+        </pc:spChg>
+        <pc:spChg chg="add mod ord">
+          <ac:chgData name="Markus Bilz" userId="a36021e4bdb9349f" providerId="LiveId" clId="{D4AAABE4-665D-427C-806E-52B893CA3FC7}" dt="2023-05-17T09:36:50.117" v="922" actId="14100"/>
+          <ac:spMkLst>
+            <pc:docMk/>
+            <pc:sldMk cId="873796926" sldId="267"/>
+            <ac:spMk id="1117" creationId="{DE505CA9-73E5-CCB7-95F5-924561519BBB}"/>
+          </ac:spMkLst>
+        </pc:spChg>
+        <pc:spChg chg="add mod ord">
+          <ac:chgData name="Markus Bilz" userId="a36021e4bdb9349f" providerId="LiveId" clId="{D4AAABE4-665D-427C-806E-52B893CA3FC7}" dt="2023-05-17T09:32:52.038" v="897" actId="20577"/>
+          <ac:spMkLst>
+            <pc:docMk/>
+            <pc:sldMk cId="873796926" sldId="267"/>
+            <ac:spMk id="1121" creationId="{E53C962D-A3F5-9F2F-3BAD-FD3A2B5AADCC}"/>
+          </ac:spMkLst>
+        </pc:spChg>
+        <pc:spChg chg="add mod">
+          <ac:chgData name="Markus Bilz" userId="a36021e4bdb9349f" providerId="LiveId" clId="{D4AAABE4-665D-427C-806E-52B893CA3FC7}" dt="2023-05-17T09:30:01.192" v="860" actId="5793"/>
+          <ac:spMkLst>
+            <pc:docMk/>
+            <pc:sldMk cId="873796926" sldId="267"/>
+            <ac:spMk id="1125" creationId="{2AE0B6A0-64CC-643E-83FF-5424FDAE07A3}"/>
+          </ac:spMkLst>
+        </pc:spChg>
+        <pc:spChg chg="add mod ord">
+          <ac:chgData name="Markus Bilz" userId="a36021e4bdb9349f" providerId="LiveId" clId="{D4AAABE4-665D-427C-806E-52B893CA3FC7}" dt="2023-05-17T09:35:04.897" v="913" actId="14100"/>
+          <ac:spMkLst>
+            <pc:docMk/>
+            <pc:sldMk cId="873796926" sldId="267"/>
+            <ac:spMk id="1144" creationId="{525344FD-F45D-9493-2133-714401194624}"/>
+          </ac:spMkLst>
+        </pc:spChg>
+        <pc:picChg chg="add del mod">
+          <ac:chgData name="Markus Bilz" userId="a36021e4bdb9349f" providerId="LiveId" clId="{D4AAABE4-665D-427C-806E-52B893CA3FC7}" dt="2023-05-17T09:27:11.321" v="795" actId="478"/>
+          <ac:picMkLst>
+            <pc:docMk/>
+            <pc:sldMk cId="873796926" sldId="267"/>
+            <ac:picMk id="1026" creationId="{3364F0A3-52BD-1FB5-9639-A5FCE9FBAC75}"/>
+          </ac:picMkLst>
+        </pc:picChg>
+        <pc:picChg chg="add del mod">
+          <ac:chgData name="Markus Bilz" userId="a36021e4bdb9349f" providerId="LiveId" clId="{D4AAABE4-665D-427C-806E-52B893CA3FC7}" dt="2023-05-17T09:27:11.321" v="795" actId="478"/>
+          <ac:picMkLst>
+            <pc:docMk/>
+            <pc:sldMk cId="873796926" sldId="267"/>
+            <ac:picMk id="1028" creationId="{39CB445E-1E30-93C1-689D-6AF917CC781C}"/>
+          </ac:picMkLst>
+        </pc:picChg>
+        <pc:cxnChg chg="add del mod ord">
+          <ac:chgData name="Markus Bilz" userId="a36021e4bdb9349f" providerId="LiveId" clId="{D4AAABE4-665D-427C-806E-52B893CA3FC7}" dt="2023-05-17T08:48:46.442" v="547" actId="478"/>
+          <ac:cxnSpMkLst>
+            <pc:docMk/>
+            <pc:sldMk cId="873796926" sldId="267"/>
+            <ac:cxnSpMk id="18" creationId="{D57D1233-856B-6E32-603F-706BC39021B0}"/>
+          </ac:cxnSpMkLst>
+        </pc:cxnChg>
+        <pc:cxnChg chg="add del mod">
+          <ac:chgData name="Markus Bilz" userId="a36021e4bdb9349f" providerId="LiveId" clId="{D4AAABE4-665D-427C-806E-52B893CA3FC7}" dt="2023-05-17T09:34:45.579" v="910" actId="478"/>
+          <ac:cxnSpMkLst>
+            <pc:docMk/>
+            <pc:sldMk cId="873796926" sldId="267"/>
+            <ac:cxnSpMk id="20" creationId="{83AFE2A7-2B3B-2DDC-A0E1-8C31379D6E67}"/>
+          </ac:cxnSpMkLst>
+        </pc:cxnChg>
+        <pc:cxnChg chg="add mod">
+          <ac:chgData name="Markus Bilz" userId="a36021e4bdb9349f" providerId="LiveId" clId="{D4AAABE4-665D-427C-806E-52B893CA3FC7}" dt="2023-05-17T09:33:34.083" v="903" actId="1076"/>
+          <ac:cxnSpMkLst>
+            <pc:docMk/>
+            <pc:sldMk cId="873796926" sldId="267"/>
+            <ac:cxnSpMk id="26" creationId="{3AC2BFD2-B4CE-E3EF-5184-DBED244D2E76}"/>
+          </ac:cxnSpMkLst>
+        </pc:cxnChg>
+        <pc:cxnChg chg="add mod">
+          <ac:chgData name="Markus Bilz" userId="a36021e4bdb9349f" providerId="LiveId" clId="{D4AAABE4-665D-427C-806E-52B893CA3FC7}" dt="2023-05-17T09:23:48.016" v="786" actId="1076"/>
+          <ac:cxnSpMkLst>
+            <pc:docMk/>
+            <pc:sldMk cId="873796926" sldId="267"/>
+            <ac:cxnSpMk id="1049" creationId="{947672B4-A862-CD5E-8962-722CE895CD75}"/>
+          </ac:cxnSpMkLst>
+        </pc:cxnChg>
+        <pc:cxnChg chg="add mod">
+          <ac:chgData name="Markus Bilz" userId="a36021e4bdb9349f" providerId="LiveId" clId="{D4AAABE4-665D-427C-806E-52B893CA3FC7}" dt="2023-05-17T09:23:48.016" v="786" actId="1076"/>
+          <ac:cxnSpMkLst>
+            <pc:docMk/>
+            <pc:sldMk cId="873796926" sldId="267"/>
+            <ac:cxnSpMk id="1051" creationId="{F7A728D3-8722-0B93-8973-BA154348ECF1}"/>
+          </ac:cxnSpMkLst>
+        </pc:cxnChg>
+        <pc:cxnChg chg="add mod">
+          <ac:chgData name="Markus Bilz" userId="a36021e4bdb9349f" providerId="LiveId" clId="{D4AAABE4-665D-427C-806E-52B893CA3FC7}" dt="2023-05-17T09:23:48.016" v="786" actId="1076"/>
+          <ac:cxnSpMkLst>
+            <pc:docMk/>
+            <pc:sldMk cId="873796926" sldId="267"/>
+            <ac:cxnSpMk id="1053" creationId="{9D823643-CC23-9E39-C296-C46251E24A2B}"/>
+          </ac:cxnSpMkLst>
+        </pc:cxnChg>
+        <pc:cxnChg chg="add del mod">
+          <ac:chgData name="Markus Bilz" userId="a36021e4bdb9349f" providerId="LiveId" clId="{D4AAABE4-665D-427C-806E-52B893CA3FC7}" dt="2023-05-17T09:34:44.658" v="909" actId="478"/>
+          <ac:cxnSpMkLst>
+            <pc:docMk/>
+            <pc:sldMk cId="873796926" sldId="267"/>
+            <ac:cxnSpMk id="1058" creationId="{A0B11981-79DB-F861-3F50-CF408FA6991A}"/>
+          </ac:cxnSpMkLst>
+        </pc:cxnChg>
+        <pc:cxnChg chg="add mod">
+          <ac:chgData name="Markus Bilz" userId="a36021e4bdb9349f" providerId="LiveId" clId="{D4AAABE4-665D-427C-806E-52B893CA3FC7}" dt="2023-05-17T09:13:20.305" v="628" actId="1076"/>
+          <ac:cxnSpMkLst>
+            <pc:docMk/>
+            <pc:sldMk cId="873796926" sldId="267"/>
+            <ac:cxnSpMk id="1062" creationId="{E0DCA4C1-ADEB-CDDC-CBE6-65E85A9C6396}"/>
+          </ac:cxnSpMkLst>
+        </pc:cxnChg>
+        <pc:cxnChg chg="add del mod">
+          <ac:chgData name="Markus Bilz" userId="a36021e4bdb9349f" providerId="LiveId" clId="{D4AAABE4-665D-427C-806E-52B893CA3FC7}" dt="2023-05-17T08:48:27.266" v="545" actId="478"/>
+          <ac:cxnSpMkLst>
+            <pc:docMk/>
+            <pc:sldMk cId="873796926" sldId="267"/>
+            <ac:cxnSpMk id="1064" creationId="{A94A70E2-93B0-DFF0-CC1E-296D68975202}"/>
+          </ac:cxnSpMkLst>
+        </pc:cxnChg>
+        <pc:cxnChg chg="add mod">
+          <ac:chgData name="Markus Bilz" userId="a36021e4bdb9349f" providerId="LiveId" clId="{D4AAABE4-665D-427C-806E-52B893CA3FC7}" dt="2023-05-17T09:31:45.487" v="871" actId="1076"/>
+          <ac:cxnSpMkLst>
+            <pc:docMk/>
+            <pc:sldMk cId="873796926" sldId="267"/>
+            <ac:cxnSpMk id="1066" creationId="{E71BF84D-0393-4CAD-E3F4-BA5F9AE022BA}"/>
+          </ac:cxnSpMkLst>
+        </pc:cxnChg>
+        <pc:cxnChg chg="add mod">
+          <ac:chgData name="Markus Bilz" userId="a36021e4bdb9349f" providerId="LiveId" clId="{D4AAABE4-665D-427C-806E-52B893CA3FC7}" dt="2023-05-17T09:13:20.305" v="628" actId="1076"/>
+          <ac:cxnSpMkLst>
+            <pc:docMk/>
+            <pc:sldMk cId="873796926" sldId="267"/>
+            <ac:cxnSpMk id="1073" creationId="{078A6480-11C1-65A5-F130-9CA8B2071AFD}"/>
+          </ac:cxnSpMkLst>
+        </pc:cxnChg>
+        <pc:cxnChg chg="add del mod">
+          <ac:chgData name="Markus Bilz" userId="a36021e4bdb9349f" providerId="LiveId" clId="{D4AAABE4-665D-427C-806E-52B893CA3FC7}" dt="2023-05-17T09:31:22.859" v="865" actId="478"/>
+          <ac:cxnSpMkLst>
+            <pc:docMk/>
+            <pc:sldMk cId="873796926" sldId="267"/>
+            <ac:cxnSpMk id="1128" creationId="{82AF8891-BCC9-7EA7-3AF2-DF88109B9DCA}"/>
+          </ac:cxnSpMkLst>
+        </pc:cxnChg>
+        <pc:cxnChg chg="add del mod">
+          <ac:chgData name="Markus Bilz" userId="a36021e4bdb9349f" providerId="LiveId" clId="{D4AAABE4-665D-427C-806E-52B893CA3FC7}" dt="2023-05-17T09:31:21.804" v="864" actId="478"/>
+          <ac:cxnSpMkLst>
+            <pc:docMk/>
+            <pc:sldMk cId="873796926" sldId="267"/>
+            <ac:cxnSpMk id="1130" creationId="{2716F5F7-3EAD-327B-DCB6-D884634CE6AE}"/>
+          </ac:cxnSpMkLst>
+        </pc:cxnChg>
+        <pc:cxnChg chg="add del mod">
+          <ac:chgData name="Markus Bilz" userId="a36021e4bdb9349f" providerId="LiveId" clId="{D4AAABE4-665D-427C-806E-52B893CA3FC7}" dt="2023-05-17T09:34:43.032" v="907" actId="478"/>
+          <ac:cxnSpMkLst>
+            <pc:docMk/>
+            <pc:sldMk cId="873796926" sldId="267"/>
+            <ac:cxnSpMk id="1133" creationId="{48415C9E-010D-EC41-E99C-EA1A5BB6C0EA}"/>
+          </ac:cxnSpMkLst>
+        </pc:cxnChg>
+        <pc:cxnChg chg="add del mod">
+          <ac:chgData name="Markus Bilz" userId="a36021e4bdb9349f" providerId="LiveId" clId="{D4AAABE4-665D-427C-806E-52B893CA3FC7}" dt="2023-05-17T09:34:43.864" v="908" actId="478"/>
+          <ac:cxnSpMkLst>
+            <pc:docMk/>
+            <pc:sldMk cId="873796926" sldId="267"/>
+            <ac:cxnSpMk id="1135" creationId="{BF75809E-6DC9-D1FF-4C12-0A5C1FC7236F}"/>
+          </ac:cxnSpMkLst>
+        </pc:cxnChg>
+        <pc:cxnChg chg="add mod">
+          <ac:chgData name="Markus Bilz" userId="a36021e4bdb9349f" providerId="LiveId" clId="{D4AAABE4-665D-427C-806E-52B893CA3FC7}" dt="2023-05-17T09:35:43.055" v="919" actId="1076"/>
+          <ac:cxnSpMkLst>
+            <pc:docMk/>
+            <pc:sldMk cId="873796926" sldId="267"/>
+            <ac:cxnSpMk id="1146" creationId="{ED9347FE-0487-02B5-306B-DE0E802E2AA8}"/>
+          </ac:cxnSpMkLst>
+        </pc:cxnChg>
+        <pc:cxnChg chg="add">
+          <ac:chgData name="Markus Bilz" userId="a36021e4bdb9349f" providerId="LiveId" clId="{D4AAABE4-665D-427C-806E-52B893CA3FC7}" dt="2023-05-17T09:35:49.620" v="920" actId="11529"/>
+          <ac:cxnSpMkLst>
+            <pc:docMk/>
+            <pc:sldMk cId="873796926" sldId="267"/>
+            <ac:cxnSpMk id="1151" creationId="{8E7EF643-CDE0-9438-A71E-E83B00532316}"/>
+          </ac:cxnSpMkLst>
+        </pc:cxnChg>
+      </pc:sldChg>
+      <pc:sldChg chg="addSp delSp modSp add mod">
+        <pc:chgData name="Markus Bilz" userId="a36021e4bdb9349f" providerId="LiveId" clId="{D4AAABE4-665D-427C-806E-52B893CA3FC7}" dt="2023-05-17T09:41:58.259" v="955" actId="20577"/>
+        <pc:sldMkLst>
+          <pc:docMk/>
+          <pc:sldMk cId="1744557679" sldId="268"/>
+        </pc:sldMkLst>
+        <pc:spChg chg="mod">
+          <ac:chgData name="Markus Bilz" userId="a36021e4bdb9349f" providerId="LiveId" clId="{D4AAABE4-665D-427C-806E-52B893CA3FC7}" dt="2023-05-17T09:41:24.862" v="944" actId="13822"/>
+          <ac:spMkLst>
+            <pc:docMk/>
+            <pc:sldMk cId="1744557679" sldId="268"/>
+            <ac:spMk id="6" creationId="{C96ED38C-E0B1-92C2-B807-5218346FC064}"/>
+          </ac:spMkLst>
+        </pc:spChg>
+        <pc:spChg chg="mod">
+          <ac:chgData name="Markus Bilz" userId="a36021e4bdb9349f" providerId="LiveId" clId="{D4AAABE4-665D-427C-806E-52B893CA3FC7}" dt="2023-05-17T09:41:13.788" v="943" actId="1076"/>
+          <ac:spMkLst>
+            <pc:docMk/>
+            <pc:sldMk cId="1744557679" sldId="268"/>
+            <ac:spMk id="14" creationId="{82EAA822-CF91-407C-ED09-D5430CB97B56}"/>
+          </ac:spMkLst>
+        </pc:spChg>
+        <pc:spChg chg="mod">
+          <ac:chgData name="Markus Bilz" userId="a36021e4bdb9349f" providerId="LiveId" clId="{D4AAABE4-665D-427C-806E-52B893CA3FC7}" dt="2023-05-17T09:41:13.788" v="943" actId="1076"/>
+          <ac:spMkLst>
+            <pc:docMk/>
+            <pc:sldMk cId="1744557679" sldId="268"/>
+            <ac:spMk id="15" creationId="{B840A789-AE83-25DF-4C82-D3C7149D69EB}"/>
+          </ac:spMkLst>
+        </pc:spChg>
+        <pc:spChg chg="mod">
+          <ac:chgData name="Markus Bilz" userId="a36021e4bdb9349f" providerId="LiveId" clId="{D4AAABE4-665D-427C-806E-52B893CA3FC7}" dt="2023-05-17T09:41:13.788" v="943" actId="1076"/>
+          <ac:spMkLst>
+            <pc:docMk/>
+            <pc:sldMk cId="1744557679" sldId="268"/>
+            <ac:spMk id="16" creationId="{B314F980-CFB9-6647-E835-3991B2D65FDE}"/>
+          </ac:spMkLst>
+        </pc:spChg>
+        <pc:spChg chg="mod">
+          <ac:chgData name="Markus Bilz" userId="a36021e4bdb9349f" providerId="LiveId" clId="{D4AAABE4-665D-427C-806E-52B893CA3FC7}" dt="2023-05-17T09:41:13.788" v="943" actId="1076"/>
+          <ac:spMkLst>
+            <pc:docMk/>
+            <pc:sldMk cId="1744557679" sldId="268"/>
+            <ac:spMk id="24" creationId="{8921449C-B172-6825-E7FF-0DDF75F501AD}"/>
+          </ac:spMkLst>
+        </pc:spChg>
+        <pc:spChg chg="mod">
+          <ac:chgData name="Markus Bilz" userId="a36021e4bdb9349f" providerId="LiveId" clId="{D4AAABE4-665D-427C-806E-52B893CA3FC7}" dt="2023-05-17T09:41:58.259" v="955" actId="20577"/>
+          <ac:spMkLst>
+            <pc:docMk/>
+            <pc:sldMk cId="1744557679" sldId="268"/>
+            <ac:spMk id="28" creationId="{4B3CD710-AFF5-C20D-00D6-894B9ECD4CFF}"/>
+          </ac:spMkLst>
+        </pc:spChg>
+        <pc:spChg chg="mod">
+          <ac:chgData name="Markus Bilz" userId="a36021e4bdb9349f" providerId="LiveId" clId="{D4AAABE4-665D-427C-806E-52B893CA3FC7}" dt="2023-05-17T09:41:51.667" v="945" actId="20577"/>
+          <ac:spMkLst>
+            <pc:docMk/>
+            <pc:sldMk cId="1744557679" sldId="268"/>
+            <ac:spMk id="1045" creationId="{248F470B-6828-B453-9C17-857109741461}"/>
+          </ac:spMkLst>
+        </pc:spChg>
+        <pc:spChg chg="del">
+          <ac:chgData name="Markus Bilz" userId="a36021e4bdb9349f" providerId="LiveId" clId="{D4AAABE4-665D-427C-806E-52B893CA3FC7}" dt="2023-05-17T09:39:24.811" v="924" actId="478"/>
+          <ac:spMkLst>
+            <pc:docMk/>
+            <pc:sldMk cId="1744557679" sldId="268"/>
+            <ac:spMk id="1117" creationId="{DE505CA9-73E5-CCB7-95F5-924561519BBB}"/>
+          </ac:spMkLst>
+        </pc:spChg>
+        <pc:spChg chg="del">
+          <ac:chgData name="Markus Bilz" userId="a36021e4bdb9349f" providerId="LiveId" clId="{D4AAABE4-665D-427C-806E-52B893CA3FC7}" dt="2023-05-17T09:39:26.200" v="925" actId="478"/>
+          <ac:spMkLst>
+            <pc:docMk/>
+            <pc:sldMk cId="1744557679" sldId="268"/>
+            <ac:spMk id="1144" creationId="{525344FD-F45D-9493-2133-714401194624}"/>
+          </ac:spMkLst>
+        </pc:spChg>
+        <pc:cxnChg chg="add mod">
+          <ac:chgData name="Markus Bilz" userId="a36021e4bdb9349f" providerId="LiveId" clId="{D4AAABE4-665D-427C-806E-52B893CA3FC7}" dt="2023-05-17T09:41:13.788" v="943" actId="1076"/>
+          <ac:cxnSpMkLst>
+            <pc:docMk/>
+            <pc:sldMk cId="1744557679" sldId="268"/>
+            <ac:cxnSpMk id="8" creationId="{C35F85DD-DD33-C5C1-5305-69177F185EF0}"/>
+          </ac:cxnSpMkLst>
+        </pc:cxnChg>
+        <pc:cxnChg chg="add mod">
+          <ac:chgData name="Markus Bilz" userId="a36021e4bdb9349f" providerId="LiveId" clId="{D4AAABE4-665D-427C-806E-52B893CA3FC7}" dt="2023-05-17T09:41:13.788" v="943" actId="1076"/>
+          <ac:cxnSpMkLst>
+            <pc:docMk/>
+            <pc:sldMk cId="1744557679" sldId="268"/>
+            <ac:cxnSpMk id="19" creationId="{67930102-8555-421A-FDA4-82124F08B5A1}"/>
+          </ac:cxnSpMkLst>
+        </pc:cxnChg>
+        <pc:cxnChg chg="mod">
+          <ac:chgData name="Markus Bilz" userId="a36021e4bdb9349f" providerId="LiveId" clId="{D4AAABE4-665D-427C-806E-52B893CA3FC7}" dt="2023-05-17T09:41:13.788" v="943" actId="1076"/>
+          <ac:cxnSpMkLst>
+            <pc:docMk/>
+            <pc:sldMk cId="1744557679" sldId="268"/>
+            <ac:cxnSpMk id="26" creationId="{3AC2BFD2-B4CE-E3EF-5184-DBED244D2E76}"/>
+          </ac:cxnSpMkLst>
+        </pc:cxnChg>
+        <pc:cxnChg chg="mod">
+          <ac:chgData name="Markus Bilz" userId="a36021e4bdb9349f" providerId="LiveId" clId="{D4AAABE4-665D-427C-806E-52B893CA3FC7}" dt="2023-05-17T09:41:13.788" v="943" actId="1076"/>
+          <ac:cxnSpMkLst>
+            <pc:docMk/>
+            <pc:sldMk cId="1744557679" sldId="268"/>
+            <ac:cxnSpMk id="1146" creationId="{ED9347FE-0487-02B5-306B-DE0E802E2AA8}"/>
+          </ac:cxnSpMkLst>
+        </pc:cxnChg>
+        <pc:cxnChg chg="mod">
+          <ac:chgData name="Markus Bilz" userId="a36021e4bdb9349f" providerId="LiveId" clId="{D4AAABE4-665D-427C-806E-52B893CA3FC7}" dt="2023-05-17T09:41:13.788" v="943" actId="1076"/>
+          <ac:cxnSpMkLst>
+            <pc:docMk/>
+            <pc:sldMk cId="1744557679" sldId="268"/>
+            <ac:cxnSpMk id="1151" creationId="{8E7EF643-CDE0-9438-A71E-E83B00532316}"/>
+          </ac:cxnSpMkLst>
+        </pc:cxnChg>
+      </pc:sldChg>
+    </pc:docChg>
+  </pc:docChgLst>
   <pc:docChgLst>
     <pc:chgData name="Markus Bilz" userId="a36021e4bdb9349f" providerId="LiveId" clId="{F9F2BE70-AAED-47FD-A055-7B08EB1371A3}"/>
     <pc:docChg chg="undo custSel addSld modSld sldOrd">
@@ -8574,7 +9109,7 @@
           <a:p>
             <a:fld id="{D6A82EB2-151D-4EEE-ACF5-92C73278C09C}" type="datetimeFigureOut">
               <a:rPr lang="en-GB" smtClean="0"/>
-              <a:t>24/04/2023</a:t>
+              <a:t>17/05/2023</a:t>
             </a:fld>
             <a:endParaRPr lang="en-GB"/>
           </a:p>
@@ -8774,7 +9309,7 @@
           <a:p>
             <a:fld id="{D6A82EB2-151D-4EEE-ACF5-92C73278C09C}" type="datetimeFigureOut">
               <a:rPr lang="en-GB" smtClean="0"/>
-              <a:t>24/04/2023</a:t>
+              <a:t>17/05/2023</a:t>
             </a:fld>
             <a:endParaRPr lang="en-GB"/>
           </a:p>
@@ -8984,7 +9519,7 @@
           <a:p>
             <a:fld id="{D6A82EB2-151D-4EEE-ACF5-92C73278C09C}" type="datetimeFigureOut">
               <a:rPr lang="en-GB" smtClean="0"/>
-              <a:t>24/04/2023</a:t>
+              <a:t>17/05/2023</a:t>
             </a:fld>
             <a:endParaRPr lang="en-GB"/>
           </a:p>
@@ -9184,7 +9719,7 @@
           <a:p>
             <a:fld id="{D6A82EB2-151D-4EEE-ACF5-92C73278C09C}" type="datetimeFigureOut">
               <a:rPr lang="en-GB" smtClean="0"/>
-              <a:t>24/04/2023</a:t>
+              <a:t>17/05/2023</a:t>
             </a:fld>
             <a:endParaRPr lang="en-GB"/>
           </a:p>
@@ -9460,7 +9995,7 @@
           <a:p>
             <a:fld id="{D6A82EB2-151D-4EEE-ACF5-92C73278C09C}" type="datetimeFigureOut">
               <a:rPr lang="en-GB" smtClean="0"/>
-              <a:t>24/04/2023</a:t>
+              <a:t>17/05/2023</a:t>
             </a:fld>
             <a:endParaRPr lang="en-GB"/>
           </a:p>
@@ -9728,7 +10263,7 @@
           <a:p>
             <a:fld id="{D6A82EB2-151D-4EEE-ACF5-92C73278C09C}" type="datetimeFigureOut">
               <a:rPr lang="en-GB" smtClean="0"/>
-              <a:t>24/04/2023</a:t>
+              <a:t>17/05/2023</a:t>
             </a:fld>
             <a:endParaRPr lang="en-GB"/>
           </a:p>
@@ -10143,7 +10678,7 @@
           <a:p>
             <a:fld id="{D6A82EB2-151D-4EEE-ACF5-92C73278C09C}" type="datetimeFigureOut">
               <a:rPr lang="en-GB" smtClean="0"/>
-              <a:t>24/04/2023</a:t>
+              <a:t>17/05/2023</a:t>
             </a:fld>
             <a:endParaRPr lang="en-GB"/>
           </a:p>
@@ -10285,7 +10820,7 @@
           <a:p>
             <a:fld id="{D6A82EB2-151D-4EEE-ACF5-92C73278C09C}" type="datetimeFigureOut">
               <a:rPr lang="en-GB" smtClean="0"/>
-              <a:t>24/04/2023</a:t>
+              <a:t>17/05/2023</a:t>
             </a:fld>
             <a:endParaRPr lang="en-GB"/>
           </a:p>
@@ -10398,7 +10933,7 @@
           <a:p>
             <a:fld id="{D6A82EB2-151D-4EEE-ACF5-92C73278C09C}" type="datetimeFigureOut">
               <a:rPr lang="en-GB" smtClean="0"/>
-              <a:t>24/04/2023</a:t>
+              <a:t>17/05/2023</a:t>
             </a:fld>
             <a:endParaRPr lang="en-GB"/>
           </a:p>
@@ -10711,7 +11246,7 @@
           <a:p>
             <a:fld id="{D6A82EB2-151D-4EEE-ACF5-92C73278C09C}" type="datetimeFigureOut">
               <a:rPr lang="en-GB" smtClean="0"/>
-              <a:t>24/04/2023</a:t>
+              <a:t>17/05/2023</a:t>
             </a:fld>
             <a:endParaRPr lang="en-GB"/>
           </a:p>
@@ -11000,7 +11535,7 @@
           <a:p>
             <a:fld id="{D6A82EB2-151D-4EEE-ACF5-92C73278C09C}" type="datetimeFigureOut">
               <a:rPr lang="en-GB" smtClean="0"/>
-              <a:t>24/04/2023</a:t>
+              <a:t>17/05/2023</a:t>
             </a:fld>
             <a:endParaRPr lang="en-GB"/>
           </a:p>
@@ -11243,7 +11778,7 @@
           <a:p>
             <a:fld id="{D6A82EB2-151D-4EEE-ACF5-92C73278C09C}" type="datetimeFigureOut">
               <a:rPr lang="en-GB" smtClean="0"/>
-              <a:t>24/04/2023</a:t>
+              <a:t>17/05/2023</a:t>
             </a:fld>
             <a:endParaRPr lang="en-GB"/>
           </a:p>
@@ -18225,6 +18760,116 @@
           <a:chExt cx="0" cy="0"/>
         </a:xfrm>
       </p:grpSpPr>
+      <p:sp>
+        <p:nvSpPr>
+          <p:cNvPr id="2" name="Title 1">
+            <a:extLst>
+              <a:ext uri="{FF2B5EF4-FFF2-40B4-BE49-F238E27FC236}">
+                <a16:creationId xmlns:a16="http://schemas.microsoft.com/office/drawing/2014/main" id="{9C25A884-0014-7B87-1AF5-C2A758D258BB}"/>
+              </a:ext>
+            </a:extLst>
+          </p:cNvPr>
+          <p:cNvSpPr>
+            <a:spLocks noGrp="1"/>
+          </p:cNvSpPr>
+          <p:nvPr>
+            <p:ph type="title"/>
+          </p:nvPr>
+        </p:nvSpPr>
+        <p:spPr/>
+        <p:txBody>
+          <a:bodyPr/>
+          <a:lstStyle/>
+          <a:p>
+            <a:endParaRPr lang="en-GB"/>
+          </a:p>
+        </p:txBody>
+      </p:sp>
+      <p:sp>
+        <p:nvSpPr>
+          <p:cNvPr id="3" name="Content Placeholder 2">
+            <a:extLst>
+              <a:ext uri="{FF2B5EF4-FFF2-40B4-BE49-F238E27FC236}">
+                <a16:creationId xmlns:a16="http://schemas.microsoft.com/office/drawing/2014/main" id="{EFD32671-D437-757C-1EA5-C048C3504F41}"/>
+              </a:ext>
+            </a:extLst>
+          </p:cNvPr>
+          <p:cNvSpPr>
+            <a:spLocks noGrp="1"/>
+          </p:cNvSpPr>
+          <p:nvPr>
+            <p:ph idx="1"/>
+          </p:nvPr>
+        </p:nvSpPr>
+        <p:spPr/>
+        <p:txBody>
+          <a:bodyPr/>
+          <a:lstStyle/>
+          <a:p>
+            <a:endParaRPr lang="en-GB"/>
+          </a:p>
+        </p:txBody>
+      </p:sp>
+      <p:pic>
+        <p:nvPicPr>
+          <p:cNvPr id="4" name="Picture 3">
+            <a:extLst>
+              <a:ext uri="{FF2B5EF4-FFF2-40B4-BE49-F238E27FC236}">
+                <a16:creationId xmlns:a16="http://schemas.microsoft.com/office/drawing/2014/main" id="{B7DB29C0-B5C8-8508-A26E-50B1D221C83C}"/>
+              </a:ext>
+            </a:extLst>
+          </p:cNvPr>
+          <p:cNvPicPr>
+            <a:picLocks noChangeAspect="1"/>
+          </p:cNvPicPr>
+          <p:nvPr/>
+        </p:nvPicPr>
+        <p:blipFill>
+          <a:blip r:embed="rId2"/>
+          <a:stretch>
+            <a:fillRect/>
+          </a:stretch>
+        </p:blipFill>
+        <p:spPr>
+          <a:xfrm>
+            <a:off x="400050" y="-314325"/>
+            <a:ext cx="11675147" cy="6858000"/>
+          </a:xfrm>
+          <a:prstGeom prst="rect">
+            <a:avLst/>
+          </a:prstGeom>
+        </p:spPr>
+      </p:pic>
+    </p:spTree>
+    <p:extLst>
+      <p:ext uri="{BB962C8B-B14F-4D97-AF65-F5344CB8AC3E}">
+        <p14:creationId xmlns:p14="http://schemas.microsoft.com/office/powerpoint/2010/main" val="1975984209"/>
+      </p:ext>
+    </p:extLst>
+  </p:cSld>
+  <p:clrMapOvr>
+    <a:masterClrMapping/>
+  </p:clrMapOvr>
+</p:sld>
+</file>
+
+<file path=ppt/slides/slide11.xml><?xml version="1.0" encoding="utf-8"?>
+<p:sld xmlns:a="http://schemas.openxmlformats.org/drawingml/2006/main" xmlns:r="http://schemas.openxmlformats.org/officeDocument/2006/relationships" xmlns:p="http://schemas.openxmlformats.org/presentationml/2006/main">
+  <p:cSld>
+    <p:spTree>
+      <p:nvGrpSpPr>
+        <p:cNvPr id="1" name=""/>
+        <p:cNvGrpSpPr/>
+        <p:nvPr/>
+      </p:nvGrpSpPr>
+      <p:grpSpPr>
+        <a:xfrm>
+          <a:off x="0" y="0"/>
+          <a:ext cx="0" cy="0"/>
+          <a:chOff x="0" y="0"/>
+          <a:chExt cx="0" cy="0"/>
+        </a:xfrm>
+      </p:grpSpPr>
       <p:pic>
         <p:nvPicPr>
           <p:cNvPr id="5" name="Picture 4">
@@ -19939,96 +20584,6 @@
 </file>
 
 <file path=ppt/slides/slide3.xml><?xml version="1.0" encoding="utf-8"?>
-<p:sld xmlns:a="http://schemas.openxmlformats.org/drawingml/2006/main" xmlns:r="http://schemas.openxmlformats.org/officeDocument/2006/relationships" xmlns:p="http://schemas.openxmlformats.org/presentationml/2006/main">
-  <p:cSld>
-    <p:spTree>
-      <p:nvGrpSpPr>
-        <p:cNvPr id="1" name=""/>
-        <p:cNvGrpSpPr/>
-        <p:nvPr/>
-      </p:nvGrpSpPr>
-      <p:grpSpPr>
-        <a:xfrm>
-          <a:off x="0" y="0"/>
-          <a:ext cx="0" cy="0"/>
-          <a:chOff x="0" y="0"/>
-          <a:chExt cx="0" cy="0"/>
-        </a:xfrm>
-      </p:grpSpPr>
-      <p:sp>
-        <p:nvSpPr>
-          <p:cNvPr id="2" name="Title 1">
-            <a:extLst>
-              <a:ext uri="{FF2B5EF4-FFF2-40B4-BE49-F238E27FC236}">
-                <a16:creationId xmlns:a16="http://schemas.microsoft.com/office/drawing/2014/main" id="{A0293965-D629-2279-04FB-29ACD69DD2D6}"/>
-              </a:ext>
-            </a:extLst>
-          </p:cNvPr>
-          <p:cNvSpPr>
-            <a:spLocks noGrp="1"/>
-          </p:cNvSpPr>
-          <p:nvPr>
-            <p:ph type="title"/>
-          </p:nvPr>
-        </p:nvSpPr>
-        <p:spPr/>
-        <p:txBody>
-          <a:bodyPr/>
-          <a:lstStyle/>
-          <a:p>
-            <a:endParaRPr lang="en-GB" dirty="0"/>
-          </a:p>
-        </p:txBody>
-      </p:sp>
-      <p:pic>
-        <p:nvPicPr>
-          <p:cNvPr id="5" name="Content Placeholder 4" descr="Diagram&#10;&#10;Description automatically generated">
-            <a:extLst>
-              <a:ext uri="{FF2B5EF4-FFF2-40B4-BE49-F238E27FC236}">
-                <a16:creationId xmlns:a16="http://schemas.microsoft.com/office/drawing/2014/main" id="{6A20F21E-4163-B9F0-D304-FA503742EB56}"/>
-              </a:ext>
-            </a:extLst>
-          </p:cNvPr>
-          <p:cNvPicPr>
-            <a:picLocks noGrp="1" noChangeAspect="1"/>
-          </p:cNvPicPr>
-          <p:nvPr>
-            <p:ph idx="1"/>
-          </p:nvPr>
-        </p:nvPicPr>
-        <p:blipFill>
-          <a:blip r:embed="rId2">
-            <a:extLst>
-              <a:ext uri="{28A0092B-C50C-407E-A947-70E740481C1C}">
-                <a14:useLocalDpi xmlns:a14="http://schemas.microsoft.com/office/drawing/2010/main" val="0"/>
-              </a:ext>
-            </a:extLst>
-          </a:blip>
-          <a:stretch>
-            <a:fillRect/>
-          </a:stretch>
-        </p:blipFill>
-        <p:spPr>
-          <a:xfrm>
-            <a:off x="2116001" y="764575"/>
-            <a:ext cx="7735712" cy="4351338"/>
-          </a:xfrm>
-        </p:spPr>
-      </p:pic>
-    </p:spTree>
-    <p:extLst>
-      <p:ext uri="{BB962C8B-B14F-4D97-AF65-F5344CB8AC3E}">
-        <p14:creationId xmlns:p14="http://schemas.microsoft.com/office/powerpoint/2010/main" val="350462512"/>
-      </p:ext>
-    </p:extLst>
-  </p:cSld>
-  <p:clrMapOvr>
-    <a:masterClrMapping/>
-  </p:clrMapOvr>
-</p:sld>
-</file>
-
-<file path=ppt/slides/slide4.xml><?xml version="1.0" encoding="utf-8"?>
 <p:sld xmlns:a="http://schemas.openxmlformats.org/drawingml/2006/main" xmlns:r="http://schemas.openxmlformats.org/officeDocument/2006/relationships" xmlns:p="http://schemas.openxmlformats.org/presentationml/2006/main">
   <p:cSld>
     <p:spTree>
@@ -22352,7 +22907,7 @@
 </p:sld>
 </file>
 
-<file path=ppt/slides/slide5.xml><?xml version="1.0" encoding="utf-8"?>
+<file path=ppt/slides/slide4.xml><?xml version="1.0" encoding="utf-8"?>
 <p:sld xmlns:a="http://schemas.openxmlformats.org/drawingml/2006/main" xmlns:r="http://schemas.openxmlformats.org/officeDocument/2006/relationships" xmlns:p="http://schemas.openxmlformats.org/presentationml/2006/main">
   <p:cSld>
     <p:spTree>
@@ -24615,7 +25170,3397 @@
 </p:sld>
 </file>
 
+<file path=ppt/slides/slide5.xml><?xml version="1.0" encoding="utf-8"?>
+<p:sld xmlns:a="http://schemas.openxmlformats.org/drawingml/2006/main" xmlns:r="http://schemas.openxmlformats.org/officeDocument/2006/relationships" xmlns:p="http://schemas.openxmlformats.org/presentationml/2006/main">
+  <p:cSld>
+    <p:spTree>
+      <p:nvGrpSpPr>
+        <p:cNvPr id="1" name=""/>
+        <p:cNvGrpSpPr/>
+        <p:nvPr/>
+      </p:nvGrpSpPr>
+      <p:grpSpPr>
+        <a:xfrm>
+          <a:off x="0" y="0"/>
+          <a:ext cx="0" cy="0"/>
+          <a:chOff x="0" y="0"/>
+          <a:chExt cx="0" cy="0"/>
+        </a:xfrm>
+      </p:grpSpPr>
+      <p:sp>
+        <p:nvSpPr>
+          <p:cNvPr id="1144" name="Rectangle 1143">
+            <a:extLst>
+              <a:ext uri="{FF2B5EF4-FFF2-40B4-BE49-F238E27FC236}">
+                <a16:creationId xmlns:a16="http://schemas.microsoft.com/office/drawing/2014/main" id="{525344FD-F45D-9493-2133-714401194624}"/>
+              </a:ext>
+            </a:extLst>
+          </p:cNvPr>
+          <p:cNvSpPr/>
+          <p:nvPr/>
+        </p:nvSpPr>
+        <p:spPr>
+          <a:xfrm>
+            <a:off x="4145280" y="1318260"/>
+            <a:ext cx="2324100" cy="4396740"/>
+          </a:xfrm>
+          <a:prstGeom prst="rect">
+            <a:avLst/>
+          </a:prstGeom>
+        </p:spPr>
+        <p:style>
+          <a:lnRef idx="2">
+            <a:schemeClr val="accent1">
+              <a:shade val="15000"/>
+            </a:schemeClr>
+          </a:lnRef>
+          <a:fillRef idx="1">
+            <a:schemeClr val="accent1"/>
+          </a:fillRef>
+          <a:effectRef idx="0">
+            <a:schemeClr val="accent1"/>
+          </a:effectRef>
+          <a:fontRef idx="minor">
+            <a:schemeClr val="lt1"/>
+          </a:fontRef>
+        </p:style>
+        <p:txBody>
+          <a:bodyPr rtlCol="0" anchor="ctr"/>
+          <a:lstStyle/>
+          <a:p>
+            <a:pPr algn="ctr"/>
+            <a:endParaRPr lang="en-GB"/>
+          </a:p>
+        </p:txBody>
+      </p:sp>
+      <p:sp>
+        <p:nvSpPr>
+          <p:cNvPr id="1121" name="Rectangle 1120">
+            <a:extLst>
+              <a:ext uri="{FF2B5EF4-FFF2-40B4-BE49-F238E27FC236}">
+                <a16:creationId xmlns:a16="http://schemas.microsoft.com/office/drawing/2014/main" id="{E53C962D-A3F5-9F2F-3BAD-FD3A2B5AADCC}"/>
+              </a:ext>
+            </a:extLst>
+          </p:cNvPr>
+          <p:cNvSpPr/>
+          <p:nvPr/>
+        </p:nvSpPr>
+        <p:spPr>
+          <a:xfrm>
+            <a:off x="4193337" y="4321403"/>
+            <a:ext cx="2182483" cy="1342797"/>
+          </a:xfrm>
+          <a:prstGeom prst="rect">
+            <a:avLst/>
+          </a:prstGeom>
+        </p:spPr>
+        <p:style>
+          <a:lnRef idx="2">
+            <a:schemeClr val="accent3">
+              <a:shade val="15000"/>
+            </a:schemeClr>
+          </a:lnRef>
+          <a:fillRef idx="1">
+            <a:schemeClr val="accent3"/>
+          </a:fillRef>
+          <a:effectRef idx="0">
+            <a:schemeClr val="accent3"/>
+          </a:effectRef>
+          <a:fontRef idx="minor">
+            <a:schemeClr val="lt1"/>
+          </a:fontRef>
+        </p:style>
+        <p:txBody>
+          <a:bodyPr rtlCol="0" anchor="t"/>
+          <a:lstStyle/>
+          <a:p>
+            <a:pPr algn="ctr"/>
+            <a:r>
+              <a:rPr lang="de-DE" dirty="0"/>
+              <a:t>TCR</a:t>
+            </a:r>
+            <a:endParaRPr lang="en-GB" dirty="0"/>
+          </a:p>
+        </p:txBody>
+      </p:sp>
+      <p:sp>
+        <p:nvSpPr>
+          <p:cNvPr id="1117" name="Rectangle 1116">
+            <a:extLst>
+              <a:ext uri="{FF2B5EF4-FFF2-40B4-BE49-F238E27FC236}">
+                <a16:creationId xmlns:a16="http://schemas.microsoft.com/office/drawing/2014/main" id="{DE505CA9-73E5-CCB7-95F5-924561519BBB}"/>
+              </a:ext>
+            </a:extLst>
+          </p:cNvPr>
+          <p:cNvSpPr/>
+          <p:nvPr/>
+        </p:nvSpPr>
+        <p:spPr>
+          <a:xfrm>
+            <a:off x="145212" y="1314449"/>
+            <a:ext cx="3931488" cy="4430743"/>
+          </a:xfrm>
+          <a:prstGeom prst="rect">
+            <a:avLst/>
+          </a:prstGeom>
+        </p:spPr>
+        <p:style>
+          <a:lnRef idx="2">
+            <a:schemeClr val="accent3">
+              <a:shade val="15000"/>
+            </a:schemeClr>
+          </a:lnRef>
+          <a:fillRef idx="1">
+            <a:schemeClr val="accent3"/>
+          </a:fillRef>
+          <a:effectRef idx="0">
+            <a:schemeClr val="accent3"/>
+          </a:effectRef>
+          <a:fontRef idx="minor">
+            <a:schemeClr val="lt1"/>
+          </a:fontRef>
+        </p:style>
+        <p:txBody>
+          <a:bodyPr rtlCol="0" anchor="t"/>
+          <a:lstStyle/>
+          <a:p>
+            <a:pPr algn="ctr"/>
+            <a:r>
+              <a:rPr lang="de-DE" dirty="0"/>
+              <a:t>Data</a:t>
+            </a:r>
+            <a:endParaRPr lang="en-GB" dirty="0"/>
+          </a:p>
+        </p:txBody>
+      </p:sp>
+      <p:sp>
+        <p:nvSpPr>
+          <p:cNvPr id="6" name="Rectangle 5">
+            <a:extLst>
+              <a:ext uri="{FF2B5EF4-FFF2-40B4-BE49-F238E27FC236}">
+                <a16:creationId xmlns:a16="http://schemas.microsoft.com/office/drawing/2014/main" id="{C96ED38C-E0B1-92C2-B807-5218346FC064}"/>
+              </a:ext>
+            </a:extLst>
+          </p:cNvPr>
+          <p:cNvSpPr/>
+          <p:nvPr/>
+        </p:nvSpPr>
+        <p:spPr>
+          <a:xfrm>
+            <a:off x="6722745" y="2637095"/>
+            <a:ext cx="2139495" cy="1704399"/>
+          </a:xfrm>
+          <a:prstGeom prst="rect">
+            <a:avLst/>
+          </a:prstGeom>
+        </p:spPr>
+        <p:style>
+          <a:lnRef idx="2">
+            <a:schemeClr val="accent1">
+              <a:shade val="15000"/>
+            </a:schemeClr>
+          </a:lnRef>
+          <a:fillRef idx="1">
+            <a:schemeClr val="accent1"/>
+          </a:fillRef>
+          <a:effectRef idx="0">
+            <a:schemeClr val="accent1"/>
+          </a:effectRef>
+          <a:fontRef idx="minor">
+            <a:schemeClr val="lt1"/>
+          </a:fontRef>
+        </p:style>
+        <p:txBody>
+          <a:bodyPr rtlCol="0" anchor="t"/>
+          <a:lstStyle/>
+          <a:p>
+            <a:pPr algn="ctr"/>
+            <a:r>
+              <a:rPr lang="de-DE" dirty="0"/>
+              <a:t>Feature Importances</a:t>
+            </a:r>
+            <a:endParaRPr lang="en-GB" dirty="0"/>
+          </a:p>
+        </p:txBody>
+      </p:sp>
+      <p:sp>
+        <p:nvSpPr>
+          <p:cNvPr id="12" name="Rectangle 11">
+            <a:extLst>
+              <a:ext uri="{FF2B5EF4-FFF2-40B4-BE49-F238E27FC236}">
+                <a16:creationId xmlns:a16="http://schemas.microsoft.com/office/drawing/2014/main" id="{7841179F-B9B5-2E56-DFA5-7DAA6C1BBD9D}"/>
+              </a:ext>
+            </a:extLst>
+          </p:cNvPr>
+          <p:cNvSpPr/>
+          <p:nvPr/>
+        </p:nvSpPr>
+        <p:spPr>
+          <a:xfrm>
+            <a:off x="4206240" y="1432559"/>
+            <a:ext cx="2160055" cy="2825115"/>
+          </a:xfrm>
+          <a:prstGeom prst="rect">
+            <a:avLst/>
+          </a:prstGeom>
+        </p:spPr>
+        <p:style>
+          <a:lnRef idx="2">
+            <a:schemeClr val="accent3">
+              <a:shade val="15000"/>
+            </a:schemeClr>
+          </a:lnRef>
+          <a:fillRef idx="1">
+            <a:schemeClr val="accent3"/>
+          </a:fillRef>
+          <a:effectRef idx="0">
+            <a:schemeClr val="accent3"/>
+          </a:effectRef>
+          <a:fontRef idx="minor">
+            <a:schemeClr val="lt1"/>
+          </a:fontRef>
+        </p:style>
+        <p:txBody>
+          <a:bodyPr rtlCol="0" anchor="t"/>
+          <a:lstStyle/>
+          <a:p>
+            <a:pPr algn="ctr"/>
+            <a:r>
+              <a:rPr lang="de-DE" dirty="0"/>
+              <a:t>ML</a:t>
+            </a:r>
+            <a:endParaRPr lang="en-GB" dirty="0"/>
+          </a:p>
+        </p:txBody>
+      </p:sp>
+      <p:sp>
+        <p:nvSpPr>
+          <p:cNvPr id="2" name="Title 1">
+            <a:extLst>
+              <a:ext uri="{FF2B5EF4-FFF2-40B4-BE49-F238E27FC236}">
+                <a16:creationId xmlns:a16="http://schemas.microsoft.com/office/drawing/2014/main" id="{683A413D-99D9-FCB9-77DB-9A11EE63A78C}"/>
+              </a:ext>
+            </a:extLst>
+          </p:cNvPr>
+          <p:cNvSpPr>
+            <a:spLocks noGrp="1"/>
+          </p:cNvSpPr>
+          <p:nvPr>
+            <p:ph type="title"/>
+          </p:nvPr>
+        </p:nvSpPr>
+        <p:spPr>
+          <a:xfrm>
+            <a:off x="133350" y="-311150"/>
+            <a:ext cx="10515600" cy="1325563"/>
+          </a:xfrm>
+        </p:spPr>
+        <p:txBody>
+          <a:bodyPr/>
+          <a:lstStyle/>
+          <a:p>
+            <a:r>
+              <a:rPr lang="de-DE" dirty="0"/>
+              <a:t>Research Framework</a:t>
+            </a:r>
+            <a:endParaRPr lang="en-GB" dirty="0"/>
+          </a:p>
+        </p:txBody>
+      </p:sp>
+      <p:sp>
+        <p:nvSpPr>
+          <p:cNvPr id="7" name="Cylinder 6">
+            <a:extLst>
+              <a:ext uri="{FF2B5EF4-FFF2-40B4-BE49-F238E27FC236}">
+                <a16:creationId xmlns:a16="http://schemas.microsoft.com/office/drawing/2014/main" id="{A023D810-4417-2CD5-6DB9-5A58ED07DAF1}"/>
+              </a:ext>
+            </a:extLst>
+          </p:cNvPr>
+          <p:cNvSpPr/>
+          <p:nvPr/>
+        </p:nvSpPr>
+        <p:spPr>
+          <a:xfrm>
+            <a:off x="265622" y="3332312"/>
+            <a:ext cx="1043795" cy="664234"/>
+          </a:xfrm>
+          <a:prstGeom prst="can">
+            <a:avLst/>
+          </a:prstGeom>
+        </p:spPr>
+        <p:style>
+          <a:lnRef idx="2">
+            <a:schemeClr val="accent1">
+              <a:shade val="15000"/>
+            </a:schemeClr>
+          </a:lnRef>
+          <a:fillRef idx="1">
+            <a:schemeClr val="accent1"/>
+          </a:fillRef>
+          <a:effectRef idx="0">
+            <a:schemeClr val="accent1"/>
+          </a:effectRef>
+          <a:fontRef idx="minor">
+            <a:schemeClr val="lt1"/>
+          </a:fontRef>
+        </p:style>
+        <p:txBody>
+          <a:bodyPr rtlCol="0" anchor="ctr"/>
+          <a:lstStyle/>
+          <a:p>
+            <a:pPr algn="ctr"/>
+            <a:r>
+              <a:rPr lang="de-DE" dirty="0"/>
+              <a:t>Option Data</a:t>
+            </a:r>
+            <a:endParaRPr lang="en-GB" dirty="0"/>
+          </a:p>
+        </p:txBody>
+      </p:sp>
+      <p:sp>
+        <p:nvSpPr>
+          <p:cNvPr id="9" name="Rectangle 8">
+            <a:extLst>
+              <a:ext uri="{FF2B5EF4-FFF2-40B4-BE49-F238E27FC236}">
+                <a16:creationId xmlns:a16="http://schemas.microsoft.com/office/drawing/2014/main" id="{C07D752C-D6F2-1D45-03EC-3F124EE97946}"/>
+              </a:ext>
+            </a:extLst>
+          </p:cNvPr>
+          <p:cNvSpPr/>
+          <p:nvPr/>
+        </p:nvSpPr>
+        <p:spPr>
+          <a:xfrm>
+            <a:off x="4299909" y="1723665"/>
+            <a:ext cx="1935193" cy="431321"/>
+          </a:xfrm>
+          <a:prstGeom prst="rect">
+            <a:avLst/>
+          </a:prstGeom>
+          <a:solidFill>
+            <a:srgbClr val="FFBDE6"/>
+          </a:solidFill>
+        </p:spPr>
+        <p:style>
+          <a:lnRef idx="2">
+            <a:schemeClr val="accent1">
+              <a:shade val="15000"/>
+            </a:schemeClr>
+          </a:lnRef>
+          <a:fillRef idx="1">
+            <a:schemeClr val="accent1"/>
+          </a:fillRef>
+          <a:effectRef idx="0">
+            <a:schemeClr val="accent1"/>
+          </a:effectRef>
+          <a:fontRef idx="minor">
+            <a:schemeClr val="lt1"/>
+          </a:fontRef>
+        </p:style>
+        <p:txBody>
+          <a:bodyPr rtlCol="0" anchor="ctr"/>
+          <a:lstStyle/>
+          <a:p>
+            <a:pPr algn="ctr"/>
+            <a:r>
+              <a:rPr lang="de-DE" dirty="0"/>
+              <a:t>Gradient </a:t>
+            </a:r>
+            <a:r>
+              <a:rPr lang="de-DE" dirty="0" err="1"/>
+              <a:t>Boosting</a:t>
+            </a:r>
+            <a:endParaRPr lang="en-GB" dirty="0"/>
+          </a:p>
+        </p:txBody>
+      </p:sp>
+      <p:sp>
+        <p:nvSpPr>
+          <p:cNvPr id="10" name="Rectangle 9">
+            <a:extLst>
+              <a:ext uri="{FF2B5EF4-FFF2-40B4-BE49-F238E27FC236}">
+                <a16:creationId xmlns:a16="http://schemas.microsoft.com/office/drawing/2014/main" id="{0622CB4B-1EC6-0675-AC6A-A3E25EF4A4A1}"/>
+              </a:ext>
+            </a:extLst>
+          </p:cNvPr>
+          <p:cNvSpPr/>
+          <p:nvPr/>
+        </p:nvSpPr>
+        <p:spPr>
+          <a:xfrm>
+            <a:off x="4303646" y="2204875"/>
+            <a:ext cx="1935193" cy="695865"/>
+          </a:xfrm>
+          <a:prstGeom prst="rect">
+            <a:avLst/>
+          </a:prstGeom>
+          <a:solidFill>
+            <a:srgbClr val="FFBDE6"/>
+          </a:solidFill>
+        </p:spPr>
+        <p:style>
+          <a:lnRef idx="2">
+            <a:schemeClr val="accent1">
+              <a:shade val="15000"/>
+            </a:schemeClr>
+          </a:lnRef>
+          <a:fillRef idx="1">
+            <a:schemeClr val="accent1"/>
+          </a:fillRef>
+          <a:effectRef idx="0">
+            <a:schemeClr val="accent1"/>
+          </a:effectRef>
+          <a:fontRef idx="minor">
+            <a:schemeClr val="lt1"/>
+          </a:fontRef>
+        </p:style>
+        <p:txBody>
+          <a:bodyPr rtlCol="0" anchor="t"/>
+          <a:lstStyle/>
+          <a:p>
+            <a:pPr algn="ctr"/>
+            <a:r>
+              <a:rPr lang="de-DE" dirty="0"/>
+              <a:t>Gradient </a:t>
+            </a:r>
+            <a:r>
+              <a:rPr lang="de-DE" dirty="0" err="1"/>
+              <a:t>Boosting</a:t>
+            </a:r>
+            <a:r>
+              <a:rPr lang="de-DE" dirty="0"/>
+              <a:t> </a:t>
+            </a:r>
+            <a:r>
+              <a:rPr lang="de-DE" dirty="0" err="1"/>
+              <a:t>with</a:t>
+            </a:r>
+            <a:r>
+              <a:rPr lang="de-DE" dirty="0"/>
+              <a:t> Self-Training</a:t>
+            </a:r>
+            <a:endParaRPr lang="en-GB" dirty="0"/>
+          </a:p>
+        </p:txBody>
+      </p:sp>
+      <p:sp>
+        <p:nvSpPr>
+          <p:cNvPr id="11" name="Rectangle 10">
+            <a:extLst>
+              <a:ext uri="{FF2B5EF4-FFF2-40B4-BE49-F238E27FC236}">
+                <a16:creationId xmlns:a16="http://schemas.microsoft.com/office/drawing/2014/main" id="{1B75BC38-F232-FB5B-95D7-76998D86AC90}"/>
+              </a:ext>
+            </a:extLst>
+          </p:cNvPr>
+          <p:cNvSpPr/>
+          <p:nvPr/>
+        </p:nvSpPr>
+        <p:spPr>
+          <a:xfrm>
+            <a:off x="4305443" y="4658983"/>
+            <a:ext cx="1935193" cy="423558"/>
+          </a:xfrm>
+          <a:prstGeom prst="rect">
+            <a:avLst/>
+          </a:prstGeom>
+          <a:solidFill>
+            <a:schemeClr val="accent4">
+              <a:lumMod val="60000"/>
+              <a:lumOff val="40000"/>
+            </a:schemeClr>
+          </a:solidFill>
+        </p:spPr>
+        <p:style>
+          <a:lnRef idx="2">
+            <a:schemeClr val="accent1">
+              <a:shade val="15000"/>
+            </a:schemeClr>
+          </a:lnRef>
+          <a:fillRef idx="1">
+            <a:schemeClr val="accent1"/>
+          </a:fillRef>
+          <a:effectRef idx="0">
+            <a:schemeClr val="accent1"/>
+          </a:effectRef>
+          <a:fontRef idx="minor">
+            <a:schemeClr val="lt1"/>
+          </a:fontRef>
+        </p:style>
+        <p:txBody>
+          <a:bodyPr rtlCol="0" anchor="ctr"/>
+          <a:lstStyle/>
+          <a:p>
+            <a:pPr algn="ctr"/>
+            <a:r>
+              <a:rPr lang="de-DE" dirty="0"/>
+              <a:t>Lee and Ready </a:t>
+            </a:r>
+            <a:endParaRPr lang="en-GB" dirty="0"/>
+          </a:p>
+        </p:txBody>
+      </p:sp>
+      <p:sp>
+        <p:nvSpPr>
+          <p:cNvPr id="13" name="Cylinder 12">
+            <a:extLst>
+              <a:ext uri="{FF2B5EF4-FFF2-40B4-BE49-F238E27FC236}">
+                <a16:creationId xmlns:a16="http://schemas.microsoft.com/office/drawing/2014/main" id="{EB67B30B-4D14-827E-5DB9-0B9167FF157A}"/>
+              </a:ext>
+            </a:extLst>
+          </p:cNvPr>
+          <p:cNvSpPr/>
+          <p:nvPr/>
+        </p:nvSpPr>
+        <p:spPr>
+          <a:xfrm>
+            <a:off x="292219" y="1465880"/>
+            <a:ext cx="1012165" cy="874144"/>
+          </a:xfrm>
+          <a:prstGeom prst="can">
+            <a:avLst/>
+          </a:prstGeom>
+        </p:spPr>
+        <p:style>
+          <a:lnRef idx="2">
+            <a:schemeClr val="accent1">
+              <a:shade val="15000"/>
+            </a:schemeClr>
+          </a:lnRef>
+          <a:fillRef idx="1">
+            <a:schemeClr val="accent1"/>
+          </a:fillRef>
+          <a:effectRef idx="0">
+            <a:schemeClr val="accent1"/>
+          </a:effectRef>
+          <a:fontRef idx="minor">
+            <a:schemeClr val="lt1"/>
+          </a:fontRef>
+        </p:style>
+        <p:txBody>
+          <a:bodyPr rtlCol="0" anchor="ctr"/>
+          <a:lstStyle/>
+          <a:p>
+            <a:pPr algn="ctr"/>
+            <a:r>
+              <a:rPr lang="de-DE" dirty="0"/>
+              <a:t>Trade Data</a:t>
+            </a:r>
+            <a:endParaRPr lang="en-GB" dirty="0"/>
+          </a:p>
+        </p:txBody>
+      </p:sp>
+      <p:sp>
+        <p:nvSpPr>
+          <p:cNvPr id="14" name="Rectangle 13">
+            <a:extLst>
+              <a:ext uri="{FF2B5EF4-FFF2-40B4-BE49-F238E27FC236}">
+                <a16:creationId xmlns:a16="http://schemas.microsoft.com/office/drawing/2014/main" id="{82EAA822-CF91-407C-ED09-D5430CB97B56}"/>
+              </a:ext>
+            </a:extLst>
+          </p:cNvPr>
+          <p:cNvSpPr/>
+          <p:nvPr/>
+        </p:nvSpPr>
+        <p:spPr>
+          <a:xfrm>
+            <a:off x="6709482" y="1321281"/>
+            <a:ext cx="2133600" cy="698740"/>
+          </a:xfrm>
+          <a:prstGeom prst="rect">
+            <a:avLst/>
+          </a:prstGeom>
+        </p:spPr>
+        <p:style>
+          <a:lnRef idx="2">
+            <a:schemeClr val="accent1">
+              <a:shade val="15000"/>
+            </a:schemeClr>
+          </a:lnRef>
+          <a:fillRef idx="1">
+            <a:schemeClr val="accent1"/>
+          </a:fillRef>
+          <a:effectRef idx="0">
+            <a:schemeClr val="accent1"/>
+          </a:effectRef>
+          <a:fontRef idx="minor">
+            <a:schemeClr val="lt1"/>
+          </a:fontRef>
+        </p:style>
+        <p:txBody>
+          <a:bodyPr rtlCol="0" anchor="ctr"/>
+          <a:lstStyle/>
+          <a:p>
+            <a:pPr algn="ctr"/>
+            <a:r>
+              <a:rPr lang="de-DE" dirty="0" err="1"/>
+              <a:t>Predictions</a:t>
+            </a:r>
+            <a:endParaRPr lang="en-GB" dirty="0"/>
+          </a:p>
+        </p:txBody>
+      </p:sp>
+      <p:sp>
+        <p:nvSpPr>
+          <p:cNvPr id="15" name="Rectangle 14">
+            <a:extLst>
+              <a:ext uri="{FF2B5EF4-FFF2-40B4-BE49-F238E27FC236}">
+                <a16:creationId xmlns:a16="http://schemas.microsoft.com/office/drawing/2014/main" id="{B840A789-AE83-25DF-4C82-D3C7149D69EB}"/>
+              </a:ext>
+            </a:extLst>
+          </p:cNvPr>
+          <p:cNvSpPr/>
+          <p:nvPr/>
+        </p:nvSpPr>
+        <p:spPr>
+          <a:xfrm>
+            <a:off x="6956520" y="3017698"/>
+            <a:ext cx="1616016" cy="537713"/>
+          </a:xfrm>
+          <a:prstGeom prst="rect">
+            <a:avLst/>
+          </a:prstGeom>
+        </p:spPr>
+        <p:style>
+          <a:lnRef idx="2">
+            <a:schemeClr val="accent1">
+              <a:shade val="15000"/>
+            </a:schemeClr>
+          </a:lnRef>
+          <a:fillRef idx="1">
+            <a:schemeClr val="accent1"/>
+          </a:fillRef>
+          <a:effectRef idx="0">
+            <a:schemeClr val="accent1"/>
+          </a:effectRef>
+          <a:fontRef idx="minor">
+            <a:schemeClr val="lt1"/>
+          </a:fontRef>
+        </p:style>
+        <p:txBody>
+          <a:bodyPr rtlCol="0" anchor="ctr"/>
+          <a:lstStyle/>
+          <a:p>
+            <a:pPr algn="ctr"/>
+            <a:r>
+              <a:rPr lang="de-DE" dirty="0"/>
+              <a:t>Attention Maps</a:t>
+            </a:r>
+            <a:endParaRPr lang="en-GB" dirty="0"/>
+          </a:p>
+        </p:txBody>
+      </p:sp>
+      <p:sp>
+        <p:nvSpPr>
+          <p:cNvPr id="16" name="Rectangle 15">
+            <a:extLst>
+              <a:ext uri="{FF2B5EF4-FFF2-40B4-BE49-F238E27FC236}">
+                <a16:creationId xmlns:a16="http://schemas.microsoft.com/office/drawing/2014/main" id="{B314F980-CFB9-6647-E835-3991B2D65FDE}"/>
+              </a:ext>
+            </a:extLst>
+          </p:cNvPr>
+          <p:cNvSpPr/>
+          <p:nvPr/>
+        </p:nvSpPr>
+        <p:spPr>
+          <a:xfrm>
+            <a:off x="6947031" y="3672011"/>
+            <a:ext cx="1616016" cy="537713"/>
+          </a:xfrm>
+          <a:prstGeom prst="rect">
+            <a:avLst/>
+          </a:prstGeom>
+        </p:spPr>
+        <p:style>
+          <a:lnRef idx="2">
+            <a:schemeClr val="accent1">
+              <a:shade val="15000"/>
+            </a:schemeClr>
+          </a:lnRef>
+          <a:fillRef idx="1">
+            <a:schemeClr val="accent1"/>
+          </a:fillRef>
+          <a:effectRef idx="0">
+            <a:schemeClr val="accent1"/>
+          </a:effectRef>
+          <a:fontRef idx="minor">
+            <a:schemeClr val="lt1"/>
+          </a:fontRef>
+        </p:style>
+        <p:txBody>
+          <a:bodyPr rtlCol="0" anchor="ctr"/>
+          <a:lstStyle/>
+          <a:p>
+            <a:pPr algn="ctr"/>
+            <a:r>
+              <a:rPr lang="de-DE" dirty="0"/>
+              <a:t>SAGE Values</a:t>
+            </a:r>
+            <a:endParaRPr lang="en-GB" dirty="0"/>
+          </a:p>
+        </p:txBody>
+      </p:sp>
+      <p:cxnSp>
+        <p:nvCxnSpPr>
+          <p:cNvPr id="26" name="Straight Arrow Connector 25">
+            <a:extLst>
+              <a:ext uri="{FF2B5EF4-FFF2-40B4-BE49-F238E27FC236}">
+                <a16:creationId xmlns:a16="http://schemas.microsoft.com/office/drawing/2014/main" id="{3AC2BFD2-B4CE-E3EF-5184-DBED244D2E76}"/>
+              </a:ext>
+            </a:extLst>
+          </p:cNvPr>
+          <p:cNvCxnSpPr>
+            <a:cxnSpLocks/>
+            <a:stCxn id="14" idx="3"/>
+          </p:cNvCxnSpPr>
+          <p:nvPr/>
+        </p:nvCxnSpPr>
+        <p:spPr>
+          <a:xfrm>
+            <a:off x="8843082" y="1670651"/>
+            <a:ext cx="247578" cy="0"/>
+          </a:xfrm>
+          <a:prstGeom prst="straightConnector1">
+            <a:avLst/>
+          </a:prstGeom>
+          <a:ln>
+            <a:tailEnd type="triangle"/>
+          </a:ln>
+        </p:spPr>
+        <p:style>
+          <a:lnRef idx="1">
+            <a:schemeClr val="accent1"/>
+          </a:lnRef>
+          <a:fillRef idx="0">
+            <a:schemeClr val="accent1"/>
+          </a:fillRef>
+          <a:effectRef idx="0">
+            <a:schemeClr val="accent1"/>
+          </a:effectRef>
+          <a:fontRef idx="minor">
+            <a:schemeClr val="tx1"/>
+          </a:fontRef>
+        </p:style>
+      </p:cxnSp>
+      <p:sp>
+        <p:nvSpPr>
+          <p:cNvPr id="28" name="Rectangle 27">
+            <a:extLst>
+              <a:ext uri="{FF2B5EF4-FFF2-40B4-BE49-F238E27FC236}">
+                <a16:creationId xmlns:a16="http://schemas.microsoft.com/office/drawing/2014/main" id="{4B3CD710-AFF5-C20D-00D6-894B9ECD4CFF}"/>
+              </a:ext>
+            </a:extLst>
+          </p:cNvPr>
+          <p:cNvSpPr/>
+          <p:nvPr/>
+        </p:nvSpPr>
+        <p:spPr>
+          <a:xfrm>
+            <a:off x="1603075" y="1867710"/>
+            <a:ext cx="2397425" cy="665132"/>
+          </a:xfrm>
+          <a:prstGeom prst="rect">
+            <a:avLst/>
+          </a:prstGeom>
+        </p:spPr>
+        <p:style>
+          <a:lnRef idx="2">
+            <a:schemeClr val="accent1">
+              <a:shade val="15000"/>
+            </a:schemeClr>
+          </a:lnRef>
+          <a:fillRef idx="1">
+            <a:schemeClr val="accent1"/>
+          </a:fillRef>
+          <a:effectRef idx="0">
+            <a:schemeClr val="accent1"/>
+          </a:effectRef>
+          <a:fontRef idx="minor">
+            <a:schemeClr val="lt1"/>
+          </a:fontRef>
+        </p:style>
+        <p:txBody>
+          <a:bodyPr rtlCol="0" anchor="t"/>
+          <a:lstStyle/>
+          <a:p>
+            <a:pPr algn="ctr"/>
+            <a:r>
+              <a:rPr lang="de-DE" dirty="0"/>
+              <a:t>Data Collection (6.1.1)</a:t>
+            </a:r>
+            <a:endParaRPr lang="en-GB" dirty="0"/>
+          </a:p>
+        </p:txBody>
+      </p:sp>
+      <p:sp>
+        <p:nvSpPr>
+          <p:cNvPr id="24" name="Rectangle 23">
+            <a:extLst>
+              <a:ext uri="{FF2B5EF4-FFF2-40B4-BE49-F238E27FC236}">
+                <a16:creationId xmlns:a16="http://schemas.microsoft.com/office/drawing/2014/main" id="{8921449C-B172-6825-E7FF-0DDF75F501AD}"/>
+              </a:ext>
+            </a:extLst>
+          </p:cNvPr>
+          <p:cNvSpPr/>
+          <p:nvPr/>
+        </p:nvSpPr>
+        <p:spPr>
+          <a:xfrm>
+            <a:off x="9102593" y="1288213"/>
+            <a:ext cx="1713781" cy="698740"/>
+          </a:xfrm>
+          <a:prstGeom prst="rect">
+            <a:avLst/>
+          </a:prstGeom>
+        </p:spPr>
+        <p:style>
+          <a:lnRef idx="2">
+            <a:schemeClr val="accent1">
+              <a:shade val="15000"/>
+            </a:schemeClr>
+          </a:lnRef>
+          <a:fillRef idx="1">
+            <a:schemeClr val="accent1"/>
+          </a:fillRef>
+          <a:effectRef idx="0">
+            <a:schemeClr val="accent1"/>
+          </a:effectRef>
+          <a:fontRef idx="minor">
+            <a:schemeClr val="lt1"/>
+          </a:fontRef>
+        </p:style>
+        <p:txBody>
+          <a:bodyPr rtlCol="0" anchor="ctr"/>
+          <a:lstStyle/>
+          <a:p>
+            <a:pPr algn="ctr"/>
+            <a:r>
+              <a:rPr lang="de-DE" dirty="0" err="1"/>
+              <a:t>Effective</a:t>
+            </a:r>
+            <a:r>
+              <a:rPr lang="de-DE" dirty="0"/>
+              <a:t> Spread </a:t>
+            </a:r>
+            <a:r>
+              <a:rPr lang="de-DE" dirty="0" err="1"/>
+              <a:t>Calculation</a:t>
+            </a:r>
+            <a:endParaRPr lang="en-GB" dirty="0"/>
+          </a:p>
+        </p:txBody>
+      </p:sp>
+      <p:sp>
+        <p:nvSpPr>
+          <p:cNvPr id="31" name="Cylinder 30">
+            <a:extLst>
+              <a:ext uri="{FF2B5EF4-FFF2-40B4-BE49-F238E27FC236}">
+                <a16:creationId xmlns:a16="http://schemas.microsoft.com/office/drawing/2014/main" id="{D3E48620-93F1-1D9E-966B-44CA6FF79461}"/>
+              </a:ext>
+            </a:extLst>
+          </p:cNvPr>
+          <p:cNvSpPr/>
+          <p:nvPr/>
+        </p:nvSpPr>
+        <p:spPr>
+          <a:xfrm>
+            <a:off x="287547" y="2392392"/>
+            <a:ext cx="1015041" cy="874144"/>
+          </a:xfrm>
+          <a:prstGeom prst="can">
+            <a:avLst/>
+          </a:prstGeom>
+        </p:spPr>
+        <p:style>
+          <a:lnRef idx="2">
+            <a:schemeClr val="accent1">
+              <a:shade val="15000"/>
+            </a:schemeClr>
+          </a:lnRef>
+          <a:fillRef idx="1">
+            <a:schemeClr val="accent1"/>
+          </a:fillRef>
+          <a:effectRef idx="0">
+            <a:schemeClr val="accent1"/>
+          </a:effectRef>
+          <a:fontRef idx="minor">
+            <a:schemeClr val="lt1"/>
+          </a:fontRef>
+        </p:style>
+        <p:txBody>
+          <a:bodyPr rtlCol="0" anchor="ctr"/>
+          <a:lstStyle/>
+          <a:p>
+            <a:pPr algn="ctr"/>
+            <a:r>
+              <a:rPr lang="de-DE" dirty="0"/>
+              <a:t>Trade </a:t>
+            </a:r>
+            <a:r>
+              <a:rPr lang="de-DE" dirty="0" err="1"/>
+              <a:t>Volumes</a:t>
+            </a:r>
+            <a:endParaRPr lang="en-GB" dirty="0"/>
+          </a:p>
+        </p:txBody>
+      </p:sp>
+      <p:sp>
+        <p:nvSpPr>
+          <p:cNvPr id="1038" name="Rectangle 1037">
+            <a:extLst>
+              <a:ext uri="{FF2B5EF4-FFF2-40B4-BE49-F238E27FC236}">
+                <a16:creationId xmlns:a16="http://schemas.microsoft.com/office/drawing/2014/main" id="{7D6D82FD-48ED-F01D-1A74-9047D884AECA}"/>
+              </a:ext>
+            </a:extLst>
+          </p:cNvPr>
+          <p:cNvSpPr/>
+          <p:nvPr/>
+        </p:nvSpPr>
+        <p:spPr>
+          <a:xfrm>
+            <a:off x="4279922" y="3022480"/>
+            <a:ext cx="1935193" cy="396815"/>
+          </a:xfrm>
+          <a:prstGeom prst="rect">
+            <a:avLst/>
+          </a:prstGeom>
+          <a:solidFill>
+            <a:srgbClr val="BFFFBD"/>
+          </a:solidFill>
+        </p:spPr>
+        <p:style>
+          <a:lnRef idx="2">
+            <a:schemeClr val="accent1">
+              <a:shade val="15000"/>
+            </a:schemeClr>
+          </a:lnRef>
+          <a:fillRef idx="1">
+            <a:schemeClr val="accent1"/>
+          </a:fillRef>
+          <a:effectRef idx="0">
+            <a:schemeClr val="accent1"/>
+          </a:effectRef>
+          <a:fontRef idx="minor">
+            <a:schemeClr val="lt1"/>
+          </a:fontRef>
+        </p:style>
+        <p:txBody>
+          <a:bodyPr rtlCol="0" anchor="t"/>
+          <a:lstStyle/>
+          <a:p>
+            <a:pPr algn="ctr"/>
+            <a:r>
+              <a:rPr lang="de-DE" dirty="0"/>
+              <a:t>Transformer</a:t>
+            </a:r>
+            <a:endParaRPr lang="en-GB" dirty="0"/>
+          </a:p>
+        </p:txBody>
+      </p:sp>
+      <p:sp>
+        <p:nvSpPr>
+          <p:cNvPr id="1039" name="Rectangle 1038">
+            <a:extLst>
+              <a:ext uri="{FF2B5EF4-FFF2-40B4-BE49-F238E27FC236}">
+                <a16:creationId xmlns:a16="http://schemas.microsoft.com/office/drawing/2014/main" id="{EA5BC06A-2FBC-17A7-CB31-F804E1DF1253}"/>
+              </a:ext>
+            </a:extLst>
+          </p:cNvPr>
+          <p:cNvSpPr/>
+          <p:nvPr/>
+        </p:nvSpPr>
+        <p:spPr>
+          <a:xfrm>
+            <a:off x="4277047" y="3509513"/>
+            <a:ext cx="1935193" cy="658483"/>
+          </a:xfrm>
+          <a:prstGeom prst="rect">
+            <a:avLst/>
+          </a:prstGeom>
+          <a:solidFill>
+            <a:srgbClr val="BFFFBD"/>
+          </a:solidFill>
+        </p:spPr>
+        <p:style>
+          <a:lnRef idx="2">
+            <a:schemeClr val="accent1">
+              <a:shade val="15000"/>
+            </a:schemeClr>
+          </a:lnRef>
+          <a:fillRef idx="1">
+            <a:schemeClr val="accent1"/>
+          </a:fillRef>
+          <a:effectRef idx="0">
+            <a:schemeClr val="accent1"/>
+          </a:effectRef>
+          <a:fontRef idx="minor">
+            <a:schemeClr val="lt1"/>
+          </a:fontRef>
+        </p:style>
+        <p:txBody>
+          <a:bodyPr rtlCol="0" anchor="t"/>
+          <a:lstStyle/>
+          <a:p>
+            <a:pPr algn="ctr"/>
+            <a:r>
+              <a:rPr lang="de-DE" dirty="0"/>
+              <a:t>Transformer</a:t>
+            </a:r>
+          </a:p>
+          <a:p>
+            <a:pPr algn="ctr"/>
+            <a:r>
+              <a:rPr lang="de-DE" dirty="0" err="1"/>
+              <a:t>With</a:t>
+            </a:r>
+            <a:r>
+              <a:rPr lang="de-DE" dirty="0"/>
+              <a:t> </a:t>
+            </a:r>
+            <a:r>
+              <a:rPr lang="de-DE" dirty="0" err="1"/>
+              <a:t>Pre</a:t>
+            </a:r>
+            <a:r>
+              <a:rPr lang="de-DE" dirty="0"/>
+              <a:t>-Training</a:t>
+            </a:r>
+            <a:endParaRPr lang="en-GB" dirty="0"/>
+          </a:p>
+        </p:txBody>
+      </p:sp>
+      <p:sp>
+        <p:nvSpPr>
+          <p:cNvPr id="1045" name="Rectangle 1044">
+            <a:extLst>
+              <a:ext uri="{FF2B5EF4-FFF2-40B4-BE49-F238E27FC236}">
+                <a16:creationId xmlns:a16="http://schemas.microsoft.com/office/drawing/2014/main" id="{248F470B-6828-B453-9C17-857109741461}"/>
+              </a:ext>
+            </a:extLst>
+          </p:cNvPr>
+          <p:cNvSpPr/>
+          <p:nvPr/>
+        </p:nvSpPr>
+        <p:spPr>
+          <a:xfrm>
+            <a:off x="2042160" y="2823210"/>
+            <a:ext cx="1952158" cy="685800"/>
+          </a:xfrm>
+          <a:prstGeom prst="rect">
+            <a:avLst/>
+          </a:prstGeom>
+        </p:spPr>
+        <p:style>
+          <a:lnRef idx="2">
+            <a:schemeClr val="accent1">
+              <a:shade val="15000"/>
+            </a:schemeClr>
+          </a:lnRef>
+          <a:fillRef idx="1">
+            <a:schemeClr val="accent1"/>
+          </a:fillRef>
+          <a:effectRef idx="0">
+            <a:schemeClr val="accent1"/>
+          </a:effectRef>
+          <a:fontRef idx="minor">
+            <a:schemeClr val="lt1"/>
+          </a:fontRef>
+        </p:style>
+        <p:txBody>
+          <a:bodyPr rtlCol="0" anchor="ctr"/>
+          <a:lstStyle/>
+          <a:p>
+            <a:pPr algn="ctr"/>
+            <a:r>
+              <a:rPr lang="de-DE" dirty="0"/>
+              <a:t>Data </a:t>
+            </a:r>
+            <a:r>
+              <a:rPr lang="de-DE" dirty="0" err="1"/>
+              <a:t>Pre-processing</a:t>
+            </a:r>
+            <a:r>
+              <a:rPr lang="de-DE" dirty="0"/>
+              <a:t> (6.1.2)</a:t>
+            </a:r>
+            <a:endParaRPr lang="en-GB" dirty="0"/>
+          </a:p>
+        </p:txBody>
+      </p:sp>
+      <p:cxnSp>
+        <p:nvCxnSpPr>
+          <p:cNvPr id="1049" name="Straight Arrow Connector 1048">
+            <a:extLst>
+              <a:ext uri="{FF2B5EF4-FFF2-40B4-BE49-F238E27FC236}">
+                <a16:creationId xmlns:a16="http://schemas.microsoft.com/office/drawing/2014/main" id="{947672B4-A862-CD5E-8962-722CE895CD75}"/>
+              </a:ext>
+            </a:extLst>
+          </p:cNvPr>
+          <p:cNvCxnSpPr>
+            <a:cxnSpLocks/>
+            <a:stCxn id="7" idx="4"/>
+            <a:endCxn id="28" idx="1"/>
+          </p:cNvCxnSpPr>
+          <p:nvPr/>
+        </p:nvCxnSpPr>
+        <p:spPr>
+          <a:xfrm flipV="1">
+            <a:off x="1309417" y="2200276"/>
+            <a:ext cx="293658" cy="1464153"/>
+          </a:xfrm>
+          <a:prstGeom prst="straightConnector1">
+            <a:avLst/>
+          </a:prstGeom>
+          <a:ln>
+            <a:tailEnd type="triangle"/>
+          </a:ln>
+        </p:spPr>
+        <p:style>
+          <a:lnRef idx="1">
+            <a:schemeClr val="accent1"/>
+          </a:lnRef>
+          <a:fillRef idx="0">
+            <a:schemeClr val="accent1"/>
+          </a:fillRef>
+          <a:effectRef idx="0">
+            <a:schemeClr val="accent1"/>
+          </a:effectRef>
+          <a:fontRef idx="minor">
+            <a:schemeClr val="tx1"/>
+          </a:fontRef>
+        </p:style>
+      </p:cxnSp>
+      <p:cxnSp>
+        <p:nvCxnSpPr>
+          <p:cNvPr id="1051" name="Straight Arrow Connector 1050">
+            <a:extLst>
+              <a:ext uri="{FF2B5EF4-FFF2-40B4-BE49-F238E27FC236}">
+                <a16:creationId xmlns:a16="http://schemas.microsoft.com/office/drawing/2014/main" id="{F7A728D3-8722-0B93-8973-BA154348ECF1}"/>
+              </a:ext>
+            </a:extLst>
+          </p:cNvPr>
+          <p:cNvCxnSpPr>
+            <a:cxnSpLocks/>
+            <a:stCxn id="13" idx="4"/>
+            <a:endCxn id="28" idx="1"/>
+          </p:cNvCxnSpPr>
+          <p:nvPr/>
+        </p:nvCxnSpPr>
+        <p:spPr>
+          <a:xfrm>
+            <a:off x="1304384" y="1902952"/>
+            <a:ext cx="298691" cy="297324"/>
+          </a:xfrm>
+          <a:prstGeom prst="straightConnector1">
+            <a:avLst/>
+          </a:prstGeom>
+          <a:ln>
+            <a:tailEnd type="triangle"/>
+          </a:ln>
+        </p:spPr>
+        <p:style>
+          <a:lnRef idx="1">
+            <a:schemeClr val="accent1"/>
+          </a:lnRef>
+          <a:fillRef idx="0">
+            <a:schemeClr val="accent1"/>
+          </a:fillRef>
+          <a:effectRef idx="0">
+            <a:schemeClr val="accent1"/>
+          </a:effectRef>
+          <a:fontRef idx="minor">
+            <a:schemeClr val="tx1"/>
+          </a:fontRef>
+        </p:style>
+      </p:cxnSp>
+      <p:cxnSp>
+        <p:nvCxnSpPr>
+          <p:cNvPr id="1053" name="Straight Arrow Connector 1052">
+            <a:extLst>
+              <a:ext uri="{FF2B5EF4-FFF2-40B4-BE49-F238E27FC236}">
+                <a16:creationId xmlns:a16="http://schemas.microsoft.com/office/drawing/2014/main" id="{9D823643-CC23-9E39-C296-C46251E24A2B}"/>
+              </a:ext>
+            </a:extLst>
+          </p:cNvPr>
+          <p:cNvCxnSpPr>
+            <a:cxnSpLocks/>
+            <a:stCxn id="31" idx="4"/>
+            <a:endCxn id="28" idx="1"/>
+          </p:cNvCxnSpPr>
+          <p:nvPr/>
+        </p:nvCxnSpPr>
+        <p:spPr>
+          <a:xfrm flipV="1">
+            <a:off x="1302588" y="2200276"/>
+            <a:ext cx="300487" cy="629188"/>
+          </a:xfrm>
+          <a:prstGeom prst="straightConnector1">
+            <a:avLst/>
+          </a:prstGeom>
+          <a:ln>
+            <a:tailEnd type="triangle"/>
+          </a:ln>
+        </p:spPr>
+        <p:style>
+          <a:lnRef idx="1">
+            <a:schemeClr val="accent1"/>
+          </a:lnRef>
+          <a:fillRef idx="0">
+            <a:schemeClr val="accent1"/>
+          </a:fillRef>
+          <a:effectRef idx="0">
+            <a:schemeClr val="accent1"/>
+          </a:effectRef>
+          <a:fontRef idx="minor">
+            <a:schemeClr val="tx1"/>
+          </a:fontRef>
+        </p:style>
+      </p:cxnSp>
+      <p:cxnSp>
+        <p:nvCxnSpPr>
+          <p:cNvPr id="1062" name="Straight Arrow Connector 1061">
+            <a:extLst>
+              <a:ext uri="{FF2B5EF4-FFF2-40B4-BE49-F238E27FC236}">
+                <a16:creationId xmlns:a16="http://schemas.microsoft.com/office/drawing/2014/main" id="{E0DCA4C1-ADEB-CDDC-CBE6-65E85A9C6396}"/>
+              </a:ext>
+            </a:extLst>
+          </p:cNvPr>
+          <p:cNvCxnSpPr>
+            <a:cxnSpLocks/>
+            <a:endCxn id="1045" idx="0"/>
+          </p:cNvCxnSpPr>
+          <p:nvPr/>
+        </p:nvCxnSpPr>
+        <p:spPr>
+          <a:xfrm flipH="1">
+            <a:off x="3018239" y="2579370"/>
+            <a:ext cx="3810" cy="243840"/>
+          </a:xfrm>
+          <a:prstGeom prst="straightConnector1">
+            <a:avLst/>
+          </a:prstGeom>
+          <a:ln>
+            <a:tailEnd type="triangle"/>
+          </a:ln>
+        </p:spPr>
+        <p:style>
+          <a:lnRef idx="1">
+            <a:schemeClr val="accent1"/>
+          </a:lnRef>
+          <a:fillRef idx="0">
+            <a:schemeClr val="accent1"/>
+          </a:fillRef>
+          <a:effectRef idx="0">
+            <a:schemeClr val="accent1"/>
+          </a:effectRef>
+          <a:fontRef idx="minor">
+            <a:schemeClr val="tx1"/>
+          </a:fontRef>
+        </p:style>
+      </p:cxnSp>
+      <p:cxnSp>
+        <p:nvCxnSpPr>
+          <p:cNvPr id="1066" name="Connector: Elbow 1065">
+            <a:extLst>
+              <a:ext uri="{FF2B5EF4-FFF2-40B4-BE49-F238E27FC236}">
+                <a16:creationId xmlns:a16="http://schemas.microsoft.com/office/drawing/2014/main" id="{E71BF84D-0393-4CAD-E3F4-BA5F9AE022BA}"/>
+              </a:ext>
+            </a:extLst>
+          </p:cNvPr>
+          <p:cNvCxnSpPr>
+            <a:cxnSpLocks/>
+            <a:endCxn id="1121" idx="1"/>
+          </p:cNvCxnSpPr>
+          <p:nvPr/>
+        </p:nvCxnSpPr>
+        <p:spPr>
+          <a:xfrm rot="16200000" flipH="1">
+            <a:off x="1712912" y="2512377"/>
+            <a:ext cx="2544878" cy="2415972"/>
+          </a:xfrm>
+          <a:prstGeom prst="bentConnector2">
+            <a:avLst/>
+          </a:prstGeom>
+          <a:ln>
+            <a:tailEnd type="triangle"/>
+          </a:ln>
+        </p:spPr>
+        <p:style>
+          <a:lnRef idx="1">
+            <a:schemeClr val="accent1"/>
+          </a:lnRef>
+          <a:fillRef idx="0">
+            <a:schemeClr val="accent1"/>
+          </a:fillRef>
+          <a:effectRef idx="0">
+            <a:schemeClr val="accent1"/>
+          </a:effectRef>
+          <a:fontRef idx="minor">
+            <a:schemeClr val="tx1"/>
+          </a:fontRef>
+        </p:style>
+      </p:cxnSp>
+      <p:cxnSp>
+        <p:nvCxnSpPr>
+          <p:cNvPr id="1073" name="Straight Arrow Connector 1072">
+            <a:extLst>
+              <a:ext uri="{FF2B5EF4-FFF2-40B4-BE49-F238E27FC236}">
+                <a16:creationId xmlns:a16="http://schemas.microsoft.com/office/drawing/2014/main" id="{078A6480-11C1-65A5-F130-9CA8B2071AFD}"/>
+              </a:ext>
+            </a:extLst>
+          </p:cNvPr>
+          <p:cNvCxnSpPr>
+            <a:cxnSpLocks/>
+            <a:stCxn id="1045" idx="3"/>
+          </p:cNvCxnSpPr>
+          <p:nvPr/>
+        </p:nvCxnSpPr>
+        <p:spPr>
+          <a:xfrm>
+            <a:off x="3994318" y="3166110"/>
+            <a:ext cx="211922" cy="0"/>
+          </a:xfrm>
+          <a:prstGeom prst="straightConnector1">
+            <a:avLst/>
+          </a:prstGeom>
+          <a:ln>
+            <a:tailEnd type="triangle"/>
+          </a:ln>
+        </p:spPr>
+        <p:style>
+          <a:lnRef idx="1">
+            <a:schemeClr val="accent1"/>
+          </a:lnRef>
+          <a:fillRef idx="0">
+            <a:schemeClr val="accent1"/>
+          </a:fillRef>
+          <a:effectRef idx="0">
+            <a:schemeClr val="accent1"/>
+          </a:effectRef>
+          <a:fontRef idx="minor">
+            <a:schemeClr val="tx1"/>
+          </a:fontRef>
+        </p:style>
+      </p:cxnSp>
+      <p:sp>
+        <p:nvSpPr>
+          <p:cNvPr id="1087" name="TextBox 1086">
+            <a:extLst>
+              <a:ext uri="{FF2B5EF4-FFF2-40B4-BE49-F238E27FC236}">
+                <a16:creationId xmlns:a16="http://schemas.microsoft.com/office/drawing/2014/main" id="{3ABA7E38-A92B-39B5-3ADF-F959A7EA04F9}"/>
+              </a:ext>
+            </a:extLst>
+          </p:cNvPr>
+          <p:cNvSpPr txBox="1"/>
+          <p:nvPr/>
+        </p:nvSpPr>
+        <p:spPr>
+          <a:xfrm>
+            <a:off x="4168140" y="5920740"/>
+            <a:ext cx="2110740" cy="646331"/>
+          </a:xfrm>
+          <a:prstGeom prst="rect">
+            <a:avLst/>
+          </a:prstGeom>
+          <a:noFill/>
+        </p:spPr>
+        <p:txBody>
+          <a:bodyPr wrap="square" rtlCol="0">
+            <a:spAutoFit/>
+          </a:bodyPr>
+          <a:lstStyle/>
+          <a:p>
+            <a:r>
+              <a:rPr lang="de-DE" dirty="0"/>
+              <a:t>Training + Tuning</a:t>
+            </a:r>
+          </a:p>
+          <a:p>
+            <a:r>
+              <a:rPr lang="de-DE" dirty="0"/>
+              <a:t>(Ca. Chapter 6.2)</a:t>
+            </a:r>
+            <a:endParaRPr lang="en-GB" dirty="0"/>
+          </a:p>
+        </p:txBody>
+      </p:sp>
+      <p:sp>
+        <p:nvSpPr>
+          <p:cNvPr id="1088" name="TextBox 1087">
+            <a:extLst>
+              <a:ext uri="{FF2B5EF4-FFF2-40B4-BE49-F238E27FC236}">
+                <a16:creationId xmlns:a16="http://schemas.microsoft.com/office/drawing/2014/main" id="{8ED72B36-51D0-895F-9960-38EFB9E127E0}"/>
+              </a:ext>
+            </a:extLst>
+          </p:cNvPr>
+          <p:cNvSpPr txBox="1"/>
+          <p:nvPr/>
+        </p:nvSpPr>
+        <p:spPr>
+          <a:xfrm>
+            <a:off x="6777990" y="5953125"/>
+            <a:ext cx="2110740" cy="646331"/>
+          </a:xfrm>
+          <a:prstGeom prst="rect">
+            <a:avLst/>
+          </a:prstGeom>
+          <a:noFill/>
+        </p:spPr>
+        <p:txBody>
+          <a:bodyPr wrap="square" rtlCol="0">
+            <a:spAutoFit/>
+          </a:bodyPr>
+          <a:lstStyle/>
+          <a:p>
+            <a:r>
+              <a:rPr lang="de-DE" dirty="0"/>
+              <a:t>Evaluation</a:t>
+            </a:r>
+          </a:p>
+          <a:p>
+            <a:r>
+              <a:rPr lang="de-DE" dirty="0"/>
+              <a:t>(Ca. Chapter 6.3)</a:t>
+            </a:r>
+            <a:endParaRPr lang="en-GB" dirty="0"/>
+          </a:p>
+        </p:txBody>
+      </p:sp>
+      <p:sp>
+        <p:nvSpPr>
+          <p:cNvPr id="1089" name="TextBox 1088">
+            <a:extLst>
+              <a:ext uri="{FF2B5EF4-FFF2-40B4-BE49-F238E27FC236}">
+                <a16:creationId xmlns:a16="http://schemas.microsoft.com/office/drawing/2014/main" id="{0CC40106-6295-6FC3-DB4D-60B99CFB8E3C}"/>
+              </a:ext>
+            </a:extLst>
+          </p:cNvPr>
+          <p:cNvSpPr txBox="1"/>
+          <p:nvPr/>
+        </p:nvSpPr>
+        <p:spPr>
+          <a:xfrm>
+            <a:off x="9176385" y="5934075"/>
+            <a:ext cx="2110740" cy="646331"/>
+          </a:xfrm>
+          <a:prstGeom prst="rect">
+            <a:avLst/>
+          </a:prstGeom>
+          <a:noFill/>
+        </p:spPr>
+        <p:txBody>
+          <a:bodyPr wrap="square" rtlCol="0">
+            <a:spAutoFit/>
+          </a:bodyPr>
+          <a:lstStyle/>
+          <a:p>
+            <a:r>
+              <a:rPr lang="de-DE" dirty="0" err="1"/>
+              <a:t>Application</a:t>
+            </a:r>
+            <a:r>
+              <a:rPr lang="de-DE" dirty="0"/>
+              <a:t> Study</a:t>
+            </a:r>
+          </a:p>
+          <a:p>
+            <a:r>
+              <a:rPr lang="de-DE" dirty="0"/>
+              <a:t>(Ca. Chapter 8)</a:t>
+            </a:r>
+            <a:endParaRPr lang="en-GB" dirty="0"/>
+          </a:p>
+        </p:txBody>
+      </p:sp>
+      <p:sp>
+        <p:nvSpPr>
+          <p:cNvPr id="1090" name="TextBox 1089">
+            <a:extLst>
+              <a:ext uri="{FF2B5EF4-FFF2-40B4-BE49-F238E27FC236}">
+                <a16:creationId xmlns:a16="http://schemas.microsoft.com/office/drawing/2014/main" id="{3BDBA4C7-B634-2603-5CF6-AEED66974E30}"/>
+              </a:ext>
+            </a:extLst>
+          </p:cNvPr>
+          <p:cNvSpPr txBox="1"/>
+          <p:nvPr/>
+        </p:nvSpPr>
+        <p:spPr>
+          <a:xfrm>
+            <a:off x="876300" y="5899785"/>
+            <a:ext cx="2110740" cy="646331"/>
+          </a:xfrm>
+          <a:prstGeom prst="rect">
+            <a:avLst/>
+          </a:prstGeom>
+          <a:noFill/>
+        </p:spPr>
+        <p:txBody>
+          <a:bodyPr wrap="square" rtlCol="0">
+            <a:spAutoFit/>
+          </a:bodyPr>
+          <a:lstStyle/>
+          <a:p>
+            <a:r>
+              <a:rPr lang="de-DE" dirty="0"/>
+              <a:t>Data + </a:t>
+            </a:r>
+            <a:r>
+              <a:rPr lang="de-DE" dirty="0" err="1"/>
+              <a:t>Preparation</a:t>
+            </a:r>
+            <a:endParaRPr lang="de-DE" dirty="0"/>
+          </a:p>
+          <a:p>
+            <a:r>
+              <a:rPr lang="de-DE" dirty="0"/>
+              <a:t>(Ca. Chapter 6.1)</a:t>
+            </a:r>
+            <a:endParaRPr lang="en-GB" dirty="0"/>
+          </a:p>
+        </p:txBody>
+      </p:sp>
+      <p:sp>
+        <p:nvSpPr>
+          <p:cNvPr id="1125" name="Rectangle 1124">
+            <a:extLst>
+              <a:ext uri="{FF2B5EF4-FFF2-40B4-BE49-F238E27FC236}">
+                <a16:creationId xmlns:a16="http://schemas.microsoft.com/office/drawing/2014/main" id="{2AE0B6A0-64CC-643E-83FF-5424FDAE07A3}"/>
+              </a:ext>
+            </a:extLst>
+          </p:cNvPr>
+          <p:cNvSpPr/>
+          <p:nvPr/>
+        </p:nvSpPr>
+        <p:spPr>
+          <a:xfrm>
+            <a:off x="4305443" y="5154283"/>
+            <a:ext cx="1935193" cy="423558"/>
+          </a:xfrm>
+          <a:prstGeom prst="rect">
+            <a:avLst/>
+          </a:prstGeom>
+          <a:solidFill>
+            <a:schemeClr val="accent4">
+              <a:lumMod val="60000"/>
+              <a:lumOff val="40000"/>
+            </a:schemeClr>
+          </a:solidFill>
+        </p:spPr>
+        <p:style>
+          <a:lnRef idx="2">
+            <a:schemeClr val="accent1">
+              <a:shade val="15000"/>
+            </a:schemeClr>
+          </a:lnRef>
+          <a:fillRef idx="1">
+            <a:schemeClr val="accent1"/>
+          </a:fillRef>
+          <a:effectRef idx="0">
+            <a:schemeClr val="accent1"/>
+          </a:effectRef>
+          <a:fontRef idx="minor">
+            <a:schemeClr val="lt1"/>
+          </a:fontRef>
+        </p:style>
+        <p:txBody>
+          <a:bodyPr rtlCol="0" anchor="ctr"/>
+          <a:lstStyle/>
+          <a:p>
+            <a:pPr algn="ctr"/>
+            <a:r>
+              <a:rPr lang="de-DE" dirty="0"/>
+              <a:t>…</a:t>
+            </a:r>
+            <a:endParaRPr lang="en-GB" dirty="0"/>
+          </a:p>
+        </p:txBody>
+      </p:sp>
+      <p:cxnSp>
+        <p:nvCxnSpPr>
+          <p:cNvPr id="1146" name="Straight Arrow Connector 1145">
+            <a:extLst>
+              <a:ext uri="{FF2B5EF4-FFF2-40B4-BE49-F238E27FC236}">
+                <a16:creationId xmlns:a16="http://schemas.microsoft.com/office/drawing/2014/main" id="{ED9347FE-0487-02B5-306B-DE0E802E2AA8}"/>
+              </a:ext>
+            </a:extLst>
+          </p:cNvPr>
+          <p:cNvCxnSpPr>
+            <a:stCxn id="1144" idx="3"/>
+            <a:endCxn id="6" idx="1"/>
+          </p:cNvCxnSpPr>
+          <p:nvPr/>
+        </p:nvCxnSpPr>
+        <p:spPr>
+          <a:xfrm flipV="1">
+            <a:off x="6469380" y="3489295"/>
+            <a:ext cx="253365" cy="27335"/>
+          </a:xfrm>
+          <a:prstGeom prst="straightConnector1">
+            <a:avLst/>
+          </a:prstGeom>
+          <a:ln>
+            <a:tailEnd type="triangle"/>
+          </a:ln>
+        </p:spPr>
+        <p:style>
+          <a:lnRef idx="1">
+            <a:schemeClr val="accent1"/>
+          </a:lnRef>
+          <a:fillRef idx="0">
+            <a:schemeClr val="accent1"/>
+          </a:fillRef>
+          <a:effectRef idx="0">
+            <a:schemeClr val="accent1"/>
+          </a:effectRef>
+          <a:fontRef idx="minor">
+            <a:schemeClr val="tx1"/>
+          </a:fontRef>
+        </p:style>
+      </p:cxnSp>
+      <p:cxnSp>
+        <p:nvCxnSpPr>
+          <p:cNvPr id="1151" name="Straight Arrow Connector 1150">
+            <a:extLst>
+              <a:ext uri="{FF2B5EF4-FFF2-40B4-BE49-F238E27FC236}">
+                <a16:creationId xmlns:a16="http://schemas.microsoft.com/office/drawing/2014/main" id="{8E7EF643-CDE0-9438-A71E-E83B00532316}"/>
+              </a:ext>
+            </a:extLst>
+          </p:cNvPr>
+          <p:cNvCxnSpPr>
+            <a:stCxn id="1144" idx="3"/>
+            <a:endCxn id="14" idx="1"/>
+          </p:cNvCxnSpPr>
+          <p:nvPr/>
+        </p:nvCxnSpPr>
+        <p:spPr>
+          <a:xfrm flipV="1">
+            <a:off x="6469380" y="1670651"/>
+            <a:ext cx="240102" cy="1845979"/>
+          </a:xfrm>
+          <a:prstGeom prst="straightConnector1">
+            <a:avLst/>
+          </a:prstGeom>
+          <a:ln>
+            <a:tailEnd type="triangle"/>
+          </a:ln>
+        </p:spPr>
+        <p:style>
+          <a:lnRef idx="1">
+            <a:schemeClr val="accent1"/>
+          </a:lnRef>
+          <a:fillRef idx="0">
+            <a:schemeClr val="accent1"/>
+          </a:fillRef>
+          <a:effectRef idx="0">
+            <a:schemeClr val="accent1"/>
+          </a:effectRef>
+          <a:fontRef idx="minor">
+            <a:schemeClr val="tx1"/>
+          </a:fontRef>
+        </p:style>
+      </p:cxnSp>
+    </p:spTree>
+    <p:extLst>
+      <p:ext uri="{BB962C8B-B14F-4D97-AF65-F5344CB8AC3E}">
+        <p14:creationId xmlns:p14="http://schemas.microsoft.com/office/powerpoint/2010/main" val="873796926"/>
+      </p:ext>
+    </p:extLst>
+  </p:cSld>
+  <p:clrMapOvr>
+    <a:masterClrMapping/>
+  </p:clrMapOvr>
+</p:sld>
+</file>
+
 <file path=ppt/slides/slide6.xml><?xml version="1.0" encoding="utf-8"?>
+<p:sld xmlns:a="http://schemas.openxmlformats.org/drawingml/2006/main" xmlns:r="http://schemas.openxmlformats.org/officeDocument/2006/relationships" xmlns:p="http://schemas.openxmlformats.org/presentationml/2006/main">
+  <p:cSld>
+    <p:spTree>
+      <p:nvGrpSpPr>
+        <p:cNvPr id="1" name=""/>
+        <p:cNvGrpSpPr/>
+        <p:nvPr/>
+      </p:nvGrpSpPr>
+      <p:grpSpPr>
+        <a:xfrm>
+          <a:off x="0" y="0"/>
+          <a:ext cx="0" cy="0"/>
+          <a:chOff x="0" y="0"/>
+          <a:chExt cx="0" cy="0"/>
+        </a:xfrm>
+      </p:grpSpPr>
+      <p:sp>
+        <p:nvSpPr>
+          <p:cNvPr id="1121" name="Rectangle 1120">
+            <a:extLst>
+              <a:ext uri="{FF2B5EF4-FFF2-40B4-BE49-F238E27FC236}">
+                <a16:creationId xmlns:a16="http://schemas.microsoft.com/office/drawing/2014/main" id="{E53C962D-A3F5-9F2F-3BAD-FD3A2B5AADCC}"/>
+              </a:ext>
+            </a:extLst>
+          </p:cNvPr>
+          <p:cNvSpPr/>
+          <p:nvPr/>
+        </p:nvSpPr>
+        <p:spPr>
+          <a:xfrm>
+            <a:off x="4193337" y="4321403"/>
+            <a:ext cx="2182483" cy="1342797"/>
+          </a:xfrm>
+          <a:prstGeom prst="rect">
+            <a:avLst/>
+          </a:prstGeom>
+        </p:spPr>
+        <p:style>
+          <a:lnRef idx="2">
+            <a:schemeClr val="accent3">
+              <a:shade val="15000"/>
+            </a:schemeClr>
+          </a:lnRef>
+          <a:fillRef idx="1">
+            <a:schemeClr val="accent3"/>
+          </a:fillRef>
+          <a:effectRef idx="0">
+            <a:schemeClr val="accent3"/>
+          </a:effectRef>
+          <a:fontRef idx="minor">
+            <a:schemeClr val="lt1"/>
+          </a:fontRef>
+        </p:style>
+        <p:txBody>
+          <a:bodyPr rtlCol="0" anchor="t"/>
+          <a:lstStyle/>
+          <a:p>
+            <a:pPr algn="ctr"/>
+            <a:r>
+              <a:rPr lang="de-DE" dirty="0"/>
+              <a:t>TCR</a:t>
+            </a:r>
+            <a:endParaRPr lang="en-GB" dirty="0"/>
+          </a:p>
+        </p:txBody>
+      </p:sp>
+      <p:sp>
+        <p:nvSpPr>
+          <p:cNvPr id="6" name="Rectangle 5">
+            <a:extLst>
+              <a:ext uri="{FF2B5EF4-FFF2-40B4-BE49-F238E27FC236}">
+                <a16:creationId xmlns:a16="http://schemas.microsoft.com/office/drawing/2014/main" id="{C96ED38C-E0B1-92C2-B807-5218346FC064}"/>
+              </a:ext>
+            </a:extLst>
+          </p:cNvPr>
+          <p:cNvSpPr/>
+          <p:nvPr/>
+        </p:nvSpPr>
+        <p:spPr>
+          <a:xfrm>
+            <a:off x="6744635" y="2844130"/>
+            <a:ext cx="2139495" cy="1704399"/>
+          </a:xfrm>
+          <a:prstGeom prst="rect">
+            <a:avLst/>
+          </a:prstGeom>
+        </p:spPr>
+        <p:style>
+          <a:lnRef idx="2">
+            <a:schemeClr val="accent3">
+              <a:shade val="15000"/>
+            </a:schemeClr>
+          </a:lnRef>
+          <a:fillRef idx="1">
+            <a:schemeClr val="accent3"/>
+          </a:fillRef>
+          <a:effectRef idx="0">
+            <a:schemeClr val="accent3"/>
+          </a:effectRef>
+          <a:fontRef idx="minor">
+            <a:schemeClr val="lt1"/>
+          </a:fontRef>
+        </p:style>
+        <p:txBody>
+          <a:bodyPr rtlCol="0" anchor="t"/>
+          <a:lstStyle/>
+          <a:p>
+            <a:pPr algn="ctr"/>
+            <a:r>
+              <a:rPr lang="de-DE" dirty="0"/>
+              <a:t>Feature Importances</a:t>
+            </a:r>
+            <a:endParaRPr lang="en-GB" dirty="0"/>
+          </a:p>
+        </p:txBody>
+      </p:sp>
+      <p:sp>
+        <p:nvSpPr>
+          <p:cNvPr id="12" name="Rectangle 11">
+            <a:extLst>
+              <a:ext uri="{FF2B5EF4-FFF2-40B4-BE49-F238E27FC236}">
+                <a16:creationId xmlns:a16="http://schemas.microsoft.com/office/drawing/2014/main" id="{7841179F-B9B5-2E56-DFA5-7DAA6C1BBD9D}"/>
+              </a:ext>
+            </a:extLst>
+          </p:cNvPr>
+          <p:cNvSpPr/>
+          <p:nvPr/>
+        </p:nvSpPr>
+        <p:spPr>
+          <a:xfrm>
+            <a:off x="4206240" y="1432559"/>
+            <a:ext cx="2160055" cy="2825115"/>
+          </a:xfrm>
+          <a:prstGeom prst="rect">
+            <a:avLst/>
+          </a:prstGeom>
+        </p:spPr>
+        <p:style>
+          <a:lnRef idx="2">
+            <a:schemeClr val="accent3">
+              <a:shade val="15000"/>
+            </a:schemeClr>
+          </a:lnRef>
+          <a:fillRef idx="1">
+            <a:schemeClr val="accent3"/>
+          </a:fillRef>
+          <a:effectRef idx="0">
+            <a:schemeClr val="accent3"/>
+          </a:effectRef>
+          <a:fontRef idx="minor">
+            <a:schemeClr val="lt1"/>
+          </a:fontRef>
+        </p:style>
+        <p:txBody>
+          <a:bodyPr rtlCol="0" anchor="t"/>
+          <a:lstStyle/>
+          <a:p>
+            <a:pPr algn="ctr"/>
+            <a:r>
+              <a:rPr lang="de-DE" dirty="0"/>
+              <a:t>ML</a:t>
+            </a:r>
+            <a:endParaRPr lang="en-GB" dirty="0"/>
+          </a:p>
+        </p:txBody>
+      </p:sp>
+      <p:sp>
+        <p:nvSpPr>
+          <p:cNvPr id="2" name="Title 1">
+            <a:extLst>
+              <a:ext uri="{FF2B5EF4-FFF2-40B4-BE49-F238E27FC236}">
+                <a16:creationId xmlns:a16="http://schemas.microsoft.com/office/drawing/2014/main" id="{683A413D-99D9-FCB9-77DB-9A11EE63A78C}"/>
+              </a:ext>
+            </a:extLst>
+          </p:cNvPr>
+          <p:cNvSpPr>
+            <a:spLocks noGrp="1"/>
+          </p:cNvSpPr>
+          <p:nvPr>
+            <p:ph type="title"/>
+          </p:nvPr>
+        </p:nvSpPr>
+        <p:spPr>
+          <a:xfrm>
+            <a:off x="133350" y="-311150"/>
+            <a:ext cx="10515600" cy="1325563"/>
+          </a:xfrm>
+        </p:spPr>
+        <p:txBody>
+          <a:bodyPr/>
+          <a:lstStyle/>
+          <a:p>
+            <a:r>
+              <a:rPr lang="de-DE" dirty="0"/>
+              <a:t>Research Framework</a:t>
+            </a:r>
+            <a:endParaRPr lang="en-GB" dirty="0"/>
+          </a:p>
+        </p:txBody>
+      </p:sp>
+      <p:sp>
+        <p:nvSpPr>
+          <p:cNvPr id="7" name="Cylinder 6">
+            <a:extLst>
+              <a:ext uri="{FF2B5EF4-FFF2-40B4-BE49-F238E27FC236}">
+                <a16:creationId xmlns:a16="http://schemas.microsoft.com/office/drawing/2014/main" id="{A023D810-4417-2CD5-6DB9-5A58ED07DAF1}"/>
+              </a:ext>
+            </a:extLst>
+          </p:cNvPr>
+          <p:cNvSpPr/>
+          <p:nvPr/>
+        </p:nvSpPr>
+        <p:spPr>
+          <a:xfrm>
+            <a:off x="265622" y="3332312"/>
+            <a:ext cx="1043795" cy="664234"/>
+          </a:xfrm>
+          <a:prstGeom prst="can">
+            <a:avLst/>
+          </a:prstGeom>
+        </p:spPr>
+        <p:style>
+          <a:lnRef idx="2">
+            <a:schemeClr val="accent1">
+              <a:shade val="15000"/>
+            </a:schemeClr>
+          </a:lnRef>
+          <a:fillRef idx="1">
+            <a:schemeClr val="accent1"/>
+          </a:fillRef>
+          <a:effectRef idx="0">
+            <a:schemeClr val="accent1"/>
+          </a:effectRef>
+          <a:fontRef idx="minor">
+            <a:schemeClr val="lt1"/>
+          </a:fontRef>
+        </p:style>
+        <p:txBody>
+          <a:bodyPr rtlCol="0" anchor="ctr"/>
+          <a:lstStyle/>
+          <a:p>
+            <a:pPr algn="ctr"/>
+            <a:r>
+              <a:rPr lang="de-DE" dirty="0"/>
+              <a:t>Option Data</a:t>
+            </a:r>
+            <a:endParaRPr lang="en-GB" dirty="0"/>
+          </a:p>
+        </p:txBody>
+      </p:sp>
+      <p:sp>
+        <p:nvSpPr>
+          <p:cNvPr id="9" name="Rectangle 8">
+            <a:extLst>
+              <a:ext uri="{FF2B5EF4-FFF2-40B4-BE49-F238E27FC236}">
+                <a16:creationId xmlns:a16="http://schemas.microsoft.com/office/drawing/2014/main" id="{C07D752C-D6F2-1D45-03EC-3F124EE97946}"/>
+              </a:ext>
+            </a:extLst>
+          </p:cNvPr>
+          <p:cNvSpPr/>
+          <p:nvPr/>
+        </p:nvSpPr>
+        <p:spPr>
+          <a:xfrm>
+            <a:off x="4299909" y="1723665"/>
+            <a:ext cx="1935193" cy="431321"/>
+          </a:xfrm>
+          <a:prstGeom prst="rect">
+            <a:avLst/>
+          </a:prstGeom>
+          <a:solidFill>
+            <a:srgbClr val="FFBDE6"/>
+          </a:solidFill>
+        </p:spPr>
+        <p:style>
+          <a:lnRef idx="2">
+            <a:schemeClr val="accent1">
+              <a:shade val="15000"/>
+            </a:schemeClr>
+          </a:lnRef>
+          <a:fillRef idx="1">
+            <a:schemeClr val="accent1"/>
+          </a:fillRef>
+          <a:effectRef idx="0">
+            <a:schemeClr val="accent1"/>
+          </a:effectRef>
+          <a:fontRef idx="minor">
+            <a:schemeClr val="lt1"/>
+          </a:fontRef>
+        </p:style>
+        <p:txBody>
+          <a:bodyPr rtlCol="0" anchor="ctr"/>
+          <a:lstStyle/>
+          <a:p>
+            <a:pPr algn="ctr"/>
+            <a:r>
+              <a:rPr lang="de-DE" dirty="0"/>
+              <a:t>Gradient </a:t>
+            </a:r>
+            <a:r>
+              <a:rPr lang="de-DE" dirty="0" err="1"/>
+              <a:t>Boosting</a:t>
+            </a:r>
+            <a:endParaRPr lang="en-GB" dirty="0"/>
+          </a:p>
+        </p:txBody>
+      </p:sp>
+      <p:sp>
+        <p:nvSpPr>
+          <p:cNvPr id="10" name="Rectangle 9">
+            <a:extLst>
+              <a:ext uri="{FF2B5EF4-FFF2-40B4-BE49-F238E27FC236}">
+                <a16:creationId xmlns:a16="http://schemas.microsoft.com/office/drawing/2014/main" id="{0622CB4B-1EC6-0675-AC6A-A3E25EF4A4A1}"/>
+              </a:ext>
+            </a:extLst>
+          </p:cNvPr>
+          <p:cNvSpPr/>
+          <p:nvPr/>
+        </p:nvSpPr>
+        <p:spPr>
+          <a:xfrm>
+            <a:off x="4303646" y="2204875"/>
+            <a:ext cx="1935193" cy="695865"/>
+          </a:xfrm>
+          <a:prstGeom prst="rect">
+            <a:avLst/>
+          </a:prstGeom>
+          <a:solidFill>
+            <a:srgbClr val="FFBDE6"/>
+          </a:solidFill>
+        </p:spPr>
+        <p:style>
+          <a:lnRef idx="2">
+            <a:schemeClr val="accent1">
+              <a:shade val="15000"/>
+            </a:schemeClr>
+          </a:lnRef>
+          <a:fillRef idx="1">
+            <a:schemeClr val="accent1"/>
+          </a:fillRef>
+          <a:effectRef idx="0">
+            <a:schemeClr val="accent1"/>
+          </a:effectRef>
+          <a:fontRef idx="minor">
+            <a:schemeClr val="lt1"/>
+          </a:fontRef>
+        </p:style>
+        <p:txBody>
+          <a:bodyPr rtlCol="0" anchor="t"/>
+          <a:lstStyle/>
+          <a:p>
+            <a:pPr algn="ctr"/>
+            <a:r>
+              <a:rPr lang="de-DE" dirty="0"/>
+              <a:t>Gradient </a:t>
+            </a:r>
+            <a:r>
+              <a:rPr lang="de-DE" dirty="0" err="1"/>
+              <a:t>Boosting</a:t>
+            </a:r>
+            <a:r>
+              <a:rPr lang="de-DE" dirty="0"/>
+              <a:t> </a:t>
+            </a:r>
+            <a:r>
+              <a:rPr lang="de-DE" dirty="0" err="1"/>
+              <a:t>with</a:t>
+            </a:r>
+            <a:r>
+              <a:rPr lang="de-DE" dirty="0"/>
+              <a:t> Self-Training</a:t>
+            </a:r>
+            <a:endParaRPr lang="en-GB" dirty="0"/>
+          </a:p>
+        </p:txBody>
+      </p:sp>
+      <p:sp>
+        <p:nvSpPr>
+          <p:cNvPr id="11" name="Rectangle 10">
+            <a:extLst>
+              <a:ext uri="{FF2B5EF4-FFF2-40B4-BE49-F238E27FC236}">
+                <a16:creationId xmlns:a16="http://schemas.microsoft.com/office/drawing/2014/main" id="{1B75BC38-F232-FB5B-95D7-76998D86AC90}"/>
+              </a:ext>
+            </a:extLst>
+          </p:cNvPr>
+          <p:cNvSpPr/>
+          <p:nvPr/>
+        </p:nvSpPr>
+        <p:spPr>
+          <a:xfrm>
+            <a:off x="4305443" y="4658983"/>
+            <a:ext cx="1935193" cy="423558"/>
+          </a:xfrm>
+          <a:prstGeom prst="rect">
+            <a:avLst/>
+          </a:prstGeom>
+          <a:solidFill>
+            <a:schemeClr val="accent4">
+              <a:lumMod val="60000"/>
+              <a:lumOff val="40000"/>
+            </a:schemeClr>
+          </a:solidFill>
+        </p:spPr>
+        <p:style>
+          <a:lnRef idx="2">
+            <a:schemeClr val="accent1">
+              <a:shade val="15000"/>
+            </a:schemeClr>
+          </a:lnRef>
+          <a:fillRef idx="1">
+            <a:schemeClr val="accent1"/>
+          </a:fillRef>
+          <a:effectRef idx="0">
+            <a:schemeClr val="accent1"/>
+          </a:effectRef>
+          <a:fontRef idx="minor">
+            <a:schemeClr val="lt1"/>
+          </a:fontRef>
+        </p:style>
+        <p:txBody>
+          <a:bodyPr rtlCol="0" anchor="ctr"/>
+          <a:lstStyle/>
+          <a:p>
+            <a:pPr algn="ctr"/>
+            <a:r>
+              <a:rPr lang="de-DE" dirty="0"/>
+              <a:t>Lee and Ready </a:t>
+            </a:r>
+            <a:endParaRPr lang="en-GB" dirty="0"/>
+          </a:p>
+        </p:txBody>
+      </p:sp>
+      <p:sp>
+        <p:nvSpPr>
+          <p:cNvPr id="13" name="Cylinder 12">
+            <a:extLst>
+              <a:ext uri="{FF2B5EF4-FFF2-40B4-BE49-F238E27FC236}">
+                <a16:creationId xmlns:a16="http://schemas.microsoft.com/office/drawing/2014/main" id="{EB67B30B-4D14-827E-5DB9-0B9167FF157A}"/>
+              </a:ext>
+            </a:extLst>
+          </p:cNvPr>
+          <p:cNvSpPr/>
+          <p:nvPr/>
+        </p:nvSpPr>
+        <p:spPr>
+          <a:xfrm>
+            <a:off x="292219" y="1465880"/>
+            <a:ext cx="1012165" cy="874144"/>
+          </a:xfrm>
+          <a:prstGeom prst="can">
+            <a:avLst/>
+          </a:prstGeom>
+        </p:spPr>
+        <p:style>
+          <a:lnRef idx="2">
+            <a:schemeClr val="accent1">
+              <a:shade val="15000"/>
+            </a:schemeClr>
+          </a:lnRef>
+          <a:fillRef idx="1">
+            <a:schemeClr val="accent1"/>
+          </a:fillRef>
+          <a:effectRef idx="0">
+            <a:schemeClr val="accent1"/>
+          </a:effectRef>
+          <a:fontRef idx="minor">
+            <a:schemeClr val="lt1"/>
+          </a:fontRef>
+        </p:style>
+        <p:txBody>
+          <a:bodyPr rtlCol="0" anchor="ctr"/>
+          <a:lstStyle/>
+          <a:p>
+            <a:pPr algn="ctr"/>
+            <a:r>
+              <a:rPr lang="de-DE" dirty="0"/>
+              <a:t>Trade Data</a:t>
+            </a:r>
+            <a:endParaRPr lang="en-GB" dirty="0"/>
+          </a:p>
+        </p:txBody>
+      </p:sp>
+      <p:sp>
+        <p:nvSpPr>
+          <p:cNvPr id="14" name="Rectangle 13">
+            <a:extLst>
+              <a:ext uri="{FF2B5EF4-FFF2-40B4-BE49-F238E27FC236}">
+                <a16:creationId xmlns:a16="http://schemas.microsoft.com/office/drawing/2014/main" id="{82EAA822-CF91-407C-ED09-D5430CB97B56}"/>
+              </a:ext>
+            </a:extLst>
+          </p:cNvPr>
+          <p:cNvSpPr/>
+          <p:nvPr/>
+        </p:nvSpPr>
+        <p:spPr>
+          <a:xfrm>
+            <a:off x="6757251" y="1933757"/>
+            <a:ext cx="2133600" cy="698740"/>
+          </a:xfrm>
+          <a:prstGeom prst="rect">
+            <a:avLst/>
+          </a:prstGeom>
+        </p:spPr>
+        <p:style>
+          <a:lnRef idx="2">
+            <a:schemeClr val="accent1">
+              <a:shade val="15000"/>
+            </a:schemeClr>
+          </a:lnRef>
+          <a:fillRef idx="1">
+            <a:schemeClr val="accent1"/>
+          </a:fillRef>
+          <a:effectRef idx="0">
+            <a:schemeClr val="accent1"/>
+          </a:effectRef>
+          <a:fontRef idx="minor">
+            <a:schemeClr val="lt1"/>
+          </a:fontRef>
+        </p:style>
+        <p:txBody>
+          <a:bodyPr rtlCol="0" anchor="ctr"/>
+          <a:lstStyle/>
+          <a:p>
+            <a:pPr algn="ctr"/>
+            <a:r>
+              <a:rPr lang="de-DE" dirty="0" err="1"/>
+              <a:t>Predictions</a:t>
+            </a:r>
+            <a:endParaRPr lang="en-GB" dirty="0"/>
+          </a:p>
+        </p:txBody>
+      </p:sp>
+      <p:sp>
+        <p:nvSpPr>
+          <p:cNvPr id="15" name="Rectangle 14">
+            <a:extLst>
+              <a:ext uri="{FF2B5EF4-FFF2-40B4-BE49-F238E27FC236}">
+                <a16:creationId xmlns:a16="http://schemas.microsoft.com/office/drawing/2014/main" id="{B840A789-AE83-25DF-4C82-D3C7149D69EB}"/>
+              </a:ext>
+            </a:extLst>
+          </p:cNvPr>
+          <p:cNvSpPr/>
+          <p:nvPr/>
+        </p:nvSpPr>
+        <p:spPr>
+          <a:xfrm>
+            <a:off x="6978410" y="3224733"/>
+            <a:ext cx="1616016" cy="537713"/>
+          </a:xfrm>
+          <a:prstGeom prst="rect">
+            <a:avLst/>
+          </a:prstGeom>
+        </p:spPr>
+        <p:style>
+          <a:lnRef idx="2">
+            <a:schemeClr val="accent1">
+              <a:shade val="15000"/>
+            </a:schemeClr>
+          </a:lnRef>
+          <a:fillRef idx="1">
+            <a:schemeClr val="accent1"/>
+          </a:fillRef>
+          <a:effectRef idx="0">
+            <a:schemeClr val="accent1"/>
+          </a:effectRef>
+          <a:fontRef idx="minor">
+            <a:schemeClr val="lt1"/>
+          </a:fontRef>
+        </p:style>
+        <p:txBody>
+          <a:bodyPr rtlCol="0" anchor="ctr"/>
+          <a:lstStyle/>
+          <a:p>
+            <a:pPr algn="ctr"/>
+            <a:r>
+              <a:rPr lang="de-DE" dirty="0"/>
+              <a:t>Attention Maps</a:t>
+            </a:r>
+            <a:endParaRPr lang="en-GB" dirty="0"/>
+          </a:p>
+        </p:txBody>
+      </p:sp>
+      <p:sp>
+        <p:nvSpPr>
+          <p:cNvPr id="16" name="Rectangle 15">
+            <a:extLst>
+              <a:ext uri="{FF2B5EF4-FFF2-40B4-BE49-F238E27FC236}">
+                <a16:creationId xmlns:a16="http://schemas.microsoft.com/office/drawing/2014/main" id="{B314F980-CFB9-6647-E835-3991B2D65FDE}"/>
+              </a:ext>
+            </a:extLst>
+          </p:cNvPr>
+          <p:cNvSpPr/>
+          <p:nvPr/>
+        </p:nvSpPr>
+        <p:spPr>
+          <a:xfrm>
+            <a:off x="6968921" y="3879046"/>
+            <a:ext cx="1616016" cy="537713"/>
+          </a:xfrm>
+          <a:prstGeom prst="rect">
+            <a:avLst/>
+          </a:prstGeom>
+        </p:spPr>
+        <p:style>
+          <a:lnRef idx="2">
+            <a:schemeClr val="accent1">
+              <a:shade val="15000"/>
+            </a:schemeClr>
+          </a:lnRef>
+          <a:fillRef idx="1">
+            <a:schemeClr val="accent1"/>
+          </a:fillRef>
+          <a:effectRef idx="0">
+            <a:schemeClr val="accent1"/>
+          </a:effectRef>
+          <a:fontRef idx="minor">
+            <a:schemeClr val="lt1"/>
+          </a:fontRef>
+        </p:style>
+        <p:txBody>
+          <a:bodyPr rtlCol="0" anchor="ctr"/>
+          <a:lstStyle/>
+          <a:p>
+            <a:pPr algn="ctr"/>
+            <a:r>
+              <a:rPr lang="de-DE" dirty="0"/>
+              <a:t>SAGE Values</a:t>
+            </a:r>
+            <a:endParaRPr lang="en-GB" dirty="0"/>
+          </a:p>
+        </p:txBody>
+      </p:sp>
+      <p:cxnSp>
+        <p:nvCxnSpPr>
+          <p:cNvPr id="26" name="Straight Arrow Connector 25">
+            <a:extLst>
+              <a:ext uri="{FF2B5EF4-FFF2-40B4-BE49-F238E27FC236}">
+                <a16:creationId xmlns:a16="http://schemas.microsoft.com/office/drawing/2014/main" id="{3AC2BFD2-B4CE-E3EF-5184-DBED244D2E76}"/>
+              </a:ext>
+            </a:extLst>
+          </p:cNvPr>
+          <p:cNvCxnSpPr>
+            <a:cxnSpLocks/>
+            <a:stCxn id="14" idx="3"/>
+          </p:cNvCxnSpPr>
+          <p:nvPr/>
+        </p:nvCxnSpPr>
+        <p:spPr>
+          <a:xfrm>
+            <a:off x="8890851" y="2283127"/>
+            <a:ext cx="247578" cy="0"/>
+          </a:xfrm>
+          <a:prstGeom prst="straightConnector1">
+            <a:avLst/>
+          </a:prstGeom>
+          <a:ln>
+            <a:tailEnd type="triangle"/>
+          </a:ln>
+        </p:spPr>
+        <p:style>
+          <a:lnRef idx="1">
+            <a:schemeClr val="accent1"/>
+          </a:lnRef>
+          <a:fillRef idx="0">
+            <a:schemeClr val="accent1"/>
+          </a:fillRef>
+          <a:effectRef idx="0">
+            <a:schemeClr val="accent1"/>
+          </a:effectRef>
+          <a:fontRef idx="minor">
+            <a:schemeClr val="tx1"/>
+          </a:fontRef>
+        </p:style>
+      </p:cxnSp>
+      <p:sp>
+        <p:nvSpPr>
+          <p:cNvPr id="28" name="Rectangle 27">
+            <a:extLst>
+              <a:ext uri="{FF2B5EF4-FFF2-40B4-BE49-F238E27FC236}">
+                <a16:creationId xmlns:a16="http://schemas.microsoft.com/office/drawing/2014/main" id="{4B3CD710-AFF5-C20D-00D6-894B9ECD4CFF}"/>
+              </a:ext>
+            </a:extLst>
+          </p:cNvPr>
+          <p:cNvSpPr/>
+          <p:nvPr/>
+        </p:nvSpPr>
+        <p:spPr>
+          <a:xfrm>
+            <a:off x="1603075" y="1867710"/>
+            <a:ext cx="2397425" cy="665132"/>
+          </a:xfrm>
+          <a:prstGeom prst="rect">
+            <a:avLst/>
+          </a:prstGeom>
+        </p:spPr>
+        <p:style>
+          <a:lnRef idx="2">
+            <a:schemeClr val="accent1">
+              <a:shade val="15000"/>
+            </a:schemeClr>
+          </a:lnRef>
+          <a:fillRef idx="1">
+            <a:schemeClr val="accent1"/>
+          </a:fillRef>
+          <a:effectRef idx="0">
+            <a:schemeClr val="accent1"/>
+          </a:effectRef>
+          <a:fontRef idx="minor">
+            <a:schemeClr val="lt1"/>
+          </a:fontRef>
+        </p:style>
+        <p:txBody>
+          <a:bodyPr rtlCol="0" anchor="t"/>
+          <a:lstStyle/>
+          <a:p>
+            <a:pPr algn="ctr"/>
+            <a:r>
+              <a:rPr lang="de-DE" dirty="0"/>
+              <a:t>Data Collection</a:t>
+            </a:r>
+            <a:endParaRPr lang="en-GB" dirty="0"/>
+          </a:p>
+        </p:txBody>
+      </p:sp>
+      <p:sp>
+        <p:nvSpPr>
+          <p:cNvPr id="24" name="Rectangle 23">
+            <a:extLst>
+              <a:ext uri="{FF2B5EF4-FFF2-40B4-BE49-F238E27FC236}">
+                <a16:creationId xmlns:a16="http://schemas.microsoft.com/office/drawing/2014/main" id="{8921449C-B172-6825-E7FF-0DDF75F501AD}"/>
+              </a:ext>
+            </a:extLst>
+          </p:cNvPr>
+          <p:cNvSpPr/>
+          <p:nvPr/>
+        </p:nvSpPr>
+        <p:spPr>
+          <a:xfrm>
+            <a:off x="9150362" y="1900689"/>
+            <a:ext cx="1713781" cy="698740"/>
+          </a:xfrm>
+          <a:prstGeom prst="rect">
+            <a:avLst/>
+          </a:prstGeom>
+        </p:spPr>
+        <p:style>
+          <a:lnRef idx="2">
+            <a:schemeClr val="accent1">
+              <a:shade val="15000"/>
+            </a:schemeClr>
+          </a:lnRef>
+          <a:fillRef idx="1">
+            <a:schemeClr val="accent1"/>
+          </a:fillRef>
+          <a:effectRef idx="0">
+            <a:schemeClr val="accent1"/>
+          </a:effectRef>
+          <a:fontRef idx="minor">
+            <a:schemeClr val="lt1"/>
+          </a:fontRef>
+        </p:style>
+        <p:txBody>
+          <a:bodyPr rtlCol="0" anchor="ctr"/>
+          <a:lstStyle/>
+          <a:p>
+            <a:pPr algn="ctr"/>
+            <a:r>
+              <a:rPr lang="de-DE" dirty="0" err="1"/>
+              <a:t>Effective</a:t>
+            </a:r>
+            <a:r>
+              <a:rPr lang="de-DE" dirty="0"/>
+              <a:t> Spread </a:t>
+            </a:r>
+            <a:r>
+              <a:rPr lang="de-DE" dirty="0" err="1"/>
+              <a:t>Calculation</a:t>
+            </a:r>
+            <a:endParaRPr lang="en-GB" dirty="0"/>
+          </a:p>
+        </p:txBody>
+      </p:sp>
+      <p:sp>
+        <p:nvSpPr>
+          <p:cNvPr id="31" name="Cylinder 30">
+            <a:extLst>
+              <a:ext uri="{FF2B5EF4-FFF2-40B4-BE49-F238E27FC236}">
+                <a16:creationId xmlns:a16="http://schemas.microsoft.com/office/drawing/2014/main" id="{D3E48620-93F1-1D9E-966B-44CA6FF79461}"/>
+              </a:ext>
+            </a:extLst>
+          </p:cNvPr>
+          <p:cNvSpPr/>
+          <p:nvPr/>
+        </p:nvSpPr>
+        <p:spPr>
+          <a:xfrm>
+            <a:off x="287547" y="2392392"/>
+            <a:ext cx="1015041" cy="874144"/>
+          </a:xfrm>
+          <a:prstGeom prst="can">
+            <a:avLst/>
+          </a:prstGeom>
+        </p:spPr>
+        <p:style>
+          <a:lnRef idx="2">
+            <a:schemeClr val="accent1">
+              <a:shade val="15000"/>
+            </a:schemeClr>
+          </a:lnRef>
+          <a:fillRef idx="1">
+            <a:schemeClr val="accent1"/>
+          </a:fillRef>
+          <a:effectRef idx="0">
+            <a:schemeClr val="accent1"/>
+          </a:effectRef>
+          <a:fontRef idx="minor">
+            <a:schemeClr val="lt1"/>
+          </a:fontRef>
+        </p:style>
+        <p:txBody>
+          <a:bodyPr rtlCol="0" anchor="ctr"/>
+          <a:lstStyle/>
+          <a:p>
+            <a:pPr algn="ctr"/>
+            <a:r>
+              <a:rPr lang="de-DE" dirty="0"/>
+              <a:t>Trade </a:t>
+            </a:r>
+            <a:r>
+              <a:rPr lang="de-DE" dirty="0" err="1"/>
+              <a:t>Volumes</a:t>
+            </a:r>
+            <a:endParaRPr lang="en-GB" dirty="0"/>
+          </a:p>
+        </p:txBody>
+      </p:sp>
+      <p:sp>
+        <p:nvSpPr>
+          <p:cNvPr id="1038" name="Rectangle 1037">
+            <a:extLst>
+              <a:ext uri="{FF2B5EF4-FFF2-40B4-BE49-F238E27FC236}">
+                <a16:creationId xmlns:a16="http://schemas.microsoft.com/office/drawing/2014/main" id="{7D6D82FD-48ED-F01D-1A74-9047D884AECA}"/>
+              </a:ext>
+            </a:extLst>
+          </p:cNvPr>
+          <p:cNvSpPr/>
+          <p:nvPr/>
+        </p:nvSpPr>
+        <p:spPr>
+          <a:xfrm>
+            <a:off x="4279922" y="3022480"/>
+            <a:ext cx="1935193" cy="396815"/>
+          </a:xfrm>
+          <a:prstGeom prst="rect">
+            <a:avLst/>
+          </a:prstGeom>
+          <a:solidFill>
+            <a:srgbClr val="BFFFBD"/>
+          </a:solidFill>
+        </p:spPr>
+        <p:style>
+          <a:lnRef idx="2">
+            <a:schemeClr val="accent1">
+              <a:shade val="15000"/>
+            </a:schemeClr>
+          </a:lnRef>
+          <a:fillRef idx="1">
+            <a:schemeClr val="accent1"/>
+          </a:fillRef>
+          <a:effectRef idx="0">
+            <a:schemeClr val="accent1"/>
+          </a:effectRef>
+          <a:fontRef idx="minor">
+            <a:schemeClr val="lt1"/>
+          </a:fontRef>
+        </p:style>
+        <p:txBody>
+          <a:bodyPr rtlCol="0" anchor="t"/>
+          <a:lstStyle/>
+          <a:p>
+            <a:pPr algn="ctr"/>
+            <a:r>
+              <a:rPr lang="de-DE" dirty="0"/>
+              <a:t>Transformer</a:t>
+            </a:r>
+            <a:endParaRPr lang="en-GB" dirty="0"/>
+          </a:p>
+        </p:txBody>
+      </p:sp>
+      <p:sp>
+        <p:nvSpPr>
+          <p:cNvPr id="1039" name="Rectangle 1038">
+            <a:extLst>
+              <a:ext uri="{FF2B5EF4-FFF2-40B4-BE49-F238E27FC236}">
+                <a16:creationId xmlns:a16="http://schemas.microsoft.com/office/drawing/2014/main" id="{EA5BC06A-2FBC-17A7-CB31-F804E1DF1253}"/>
+              </a:ext>
+            </a:extLst>
+          </p:cNvPr>
+          <p:cNvSpPr/>
+          <p:nvPr/>
+        </p:nvSpPr>
+        <p:spPr>
+          <a:xfrm>
+            <a:off x="4277047" y="3509513"/>
+            <a:ext cx="1935193" cy="658483"/>
+          </a:xfrm>
+          <a:prstGeom prst="rect">
+            <a:avLst/>
+          </a:prstGeom>
+          <a:solidFill>
+            <a:srgbClr val="BFFFBD"/>
+          </a:solidFill>
+        </p:spPr>
+        <p:style>
+          <a:lnRef idx="2">
+            <a:schemeClr val="accent1">
+              <a:shade val="15000"/>
+            </a:schemeClr>
+          </a:lnRef>
+          <a:fillRef idx="1">
+            <a:schemeClr val="accent1"/>
+          </a:fillRef>
+          <a:effectRef idx="0">
+            <a:schemeClr val="accent1"/>
+          </a:effectRef>
+          <a:fontRef idx="minor">
+            <a:schemeClr val="lt1"/>
+          </a:fontRef>
+        </p:style>
+        <p:txBody>
+          <a:bodyPr rtlCol="0" anchor="t"/>
+          <a:lstStyle/>
+          <a:p>
+            <a:pPr algn="ctr"/>
+            <a:r>
+              <a:rPr lang="de-DE" dirty="0"/>
+              <a:t>Transformer</a:t>
+            </a:r>
+          </a:p>
+          <a:p>
+            <a:pPr algn="ctr"/>
+            <a:r>
+              <a:rPr lang="de-DE" dirty="0" err="1"/>
+              <a:t>With</a:t>
+            </a:r>
+            <a:r>
+              <a:rPr lang="de-DE" dirty="0"/>
+              <a:t> </a:t>
+            </a:r>
+            <a:r>
+              <a:rPr lang="de-DE" dirty="0" err="1"/>
+              <a:t>Pre</a:t>
+            </a:r>
+            <a:r>
+              <a:rPr lang="de-DE" dirty="0"/>
+              <a:t>-Training</a:t>
+            </a:r>
+            <a:endParaRPr lang="en-GB" dirty="0"/>
+          </a:p>
+        </p:txBody>
+      </p:sp>
+      <p:sp>
+        <p:nvSpPr>
+          <p:cNvPr id="1045" name="Rectangle 1044">
+            <a:extLst>
+              <a:ext uri="{FF2B5EF4-FFF2-40B4-BE49-F238E27FC236}">
+                <a16:creationId xmlns:a16="http://schemas.microsoft.com/office/drawing/2014/main" id="{248F470B-6828-B453-9C17-857109741461}"/>
+              </a:ext>
+            </a:extLst>
+          </p:cNvPr>
+          <p:cNvSpPr/>
+          <p:nvPr/>
+        </p:nvSpPr>
+        <p:spPr>
+          <a:xfrm>
+            <a:off x="2042160" y="2823210"/>
+            <a:ext cx="1952158" cy="685800"/>
+          </a:xfrm>
+          <a:prstGeom prst="rect">
+            <a:avLst/>
+          </a:prstGeom>
+        </p:spPr>
+        <p:style>
+          <a:lnRef idx="2">
+            <a:schemeClr val="accent1">
+              <a:shade val="15000"/>
+            </a:schemeClr>
+          </a:lnRef>
+          <a:fillRef idx="1">
+            <a:schemeClr val="accent1"/>
+          </a:fillRef>
+          <a:effectRef idx="0">
+            <a:schemeClr val="accent1"/>
+          </a:effectRef>
+          <a:fontRef idx="minor">
+            <a:schemeClr val="lt1"/>
+          </a:fontRef>
+        </p:style>
+        <p:txBody>
+          <a:bodyPr rtlCol="0" anchor="ctr"/>
+          <a:lstStyle/>
+          <a:p>
+            <a:pPr algn="ctr"/>
+            <a:r>
+              <a:rPr lang="de-DE" dirty="0"/>
+              <a:t>Data </a:t>
+            </a:r>
+            <a:r>
+              <a:rPr lang="de-DE" dirty="0" err="1"/>
+              <a:t>Pre-processing</a:t>
+            </a:r>
+            <a:endParaRPr lang="en-GB" dirty="0"/>
+          </a:p>
+        </p:txBody>
+      </p:sp>
+      <p:cxnSp>
+        <p:nvCxnSpPr>
+          <p:cNvPr id="1049" name="Straight Arrow Connector 1048">
+            <a:extLst>
+              <a:ext uri="{FF2B5EF4-FFF2-40B4-BE49-F238E27FC236}">
+                <a16:creationId xmlns:a16="http://schemas.microsoft.com/office/drawing/2014/main" id="{947672B4-A862-CD5E-8962-722CE895CD75}"/>
+              </a:ext>
+            </a:extLst>
+          </p:cNvPr>
+          <p:cNvCxnSpPr>
+            <a:cxnSpLocks/>
+            <a:stCxn id="7" idx="4"/>
+            <a:endCxn id="28" idx="1"/>
+          </p:cNvCxnSpPr>
+          <p:nvPr/>
+        </p:nvCxnSpPr>
+        <p:spPr>
+          <a:xfrm flipV="1">
+            <a:off x="1309417" y="2200276"/>
+            <a:ext cx="293658" cy="1464153"/>
+          </a:xfrm>
+          <a:prstGeom prst="straightConnector1">
+            <a:avLst/>
+          </a:prstGeom>
+          <a:ln>
+            <a:tailEnd type="triangle"/>
+          </a:ln>
+        </p:spPr>
+        <p:style>
+          <a:lnRef idx="1">
+            <a:schemeClr val="accent1"/>
+          </a:lnRef>
+          <a:fillRef idx="0">
+            <a:schemeClr val="accent1"/>
+          </a:fillRef>
+          <a:effectRef idx="0">
+            <a:schemeClr val="accent1"/>
+          </a:effectRef>
+          <a:fontRef idx="minor">
+            <a:schemeClr val="tx1"/>
+          </a:fontRef>
+        </p:style>
+      </p:cxnSp>
+      <p:cxnSp>
+        <p:nvCxnSpPr>
+          <p:cNvPr id="1051" name="Straight Arrow Connector 1050">
+            <a:extLst>
+              <a:ext uri="{FF2B5EF4-FFF2-40B4-BE49-F238E27FC236}">
+                <a16:creationId xmlns:a16="http://schemas.microsoft.com/office/drawing/2014/main" id="{F7A728D3-8722-0B93-8973-BA154348ECF1}"/>
+              </a:ext>
+            </a:extLst>
+          </p:cNvPr>
+          <p:cNvCxnSpPr>
+            <a:cxnSpLocks/>
+            <a:stCxn id="13" idx="4"/>
+            <a:endCxn id="28" idx="1"/>
+          </p:cNvCxnSpPr>
+          <p:nvPr/>
+        </p:nvCxnSpPr>
+        <p:spPr>
+          <a:xfrm>
+            <a:off x="1304384" y="1902952"/>
+            <a:ext cx="298691" cy="297324"/>
+          </a:xfrm>
+          <a:prstGeom prst="straightConnector1">
+            <a:avLst/>
+          </a:prstGeom>
+          <a:ln>
+            <a:tailEnd type="triangle"/>
+          </a:ln>
+        </p:spPr>
+        <p:style>
+          <a:lnRef idx="1">
+            <a:schemeClr val="accent1"/>
+          </a:lnRef>
+          <a:fillRef idx="0">
+            <a:schemeClr val="accent1"/>
+          </a:fillRef>
+          <a:effectRef idx="0">
+            <a:schemeClr val="accent1"/>
+          </a:effectRef>
+          <a:fontRef idx="minor">
+            <a:schemeClr val="tx1"/>
+          </a:fontRef>
+        </p:style>
+      </p:cxnSp>
+      <p:cxnSp>
+        <p:nvCxnSpPr>
+          <p:cNvPr id="1053" name="Straight Arrow Connector 1052">
+            <a:extLst>
+              <a:ext uri="{FF2B5EF4-FFF2-40B4-BE49-F238E27FC236}">
+                <a16:creationId xmlns:a16="http://schemas.microsoft.com/office/drawing/2014/main" id="{9D823643-CC23-9E39-C296-C46251E24A2B}"/>
+              </a:ext>
+            </a:extLst>
+          </p:cNvPr>
+          <p:cNvCxnSpPr>
+            <a:cxnSpLocks/>
+            <a:stCxn id="31" idx="4"/>
+            <a:endCxn id="28" idx="1"/>
+          </p:cNvCxnSpPr>
+          <p:nvPr/>
+        </p:nvCxnSpPr>
+        <p:spPr>
+          <a:xfrm flipV="1">
+            <a:off x="1302588" y="2200276"/>
+            <a:ext cx="300487" cy="629188"/>
+          </a:xfrm>
+          <a:prstGeom prst="straightConnector1">
+            <a:avLst/>
+          </a:prstGeom>
+          <a:ln>
+            <a:tailEnd type="triangle"/>
+          </a:ln>
+        </p:spPr>
+        <p:style>
+          <a:lnRef idx="1">
+            <a:schemeClr val="accent1"/>
+          </a:lnRef>
+          <a:fillRef idx="0">
+            <a:schemeClr val="accent1"/>
+          </a:fillRef>
+          <a:effectRef idx="0">
+            <a:schemeClr val="accent1"/>
+          </a:effectRef>
+          <a:fontRef idx="minor">
+            <a:schemeClr val="tx1"/>
+          </a:fontRef>
+        </p:style>
+      </p:cxnSp>
+      <p:cxnSp>
+        <p:nvCxnSpPr>
+          <p:cNvPr id="1062" name="Straight Arrow Connector 1061">
+            <a:extLst>
+              <a:ext uri="{FF2B5EF4-FFF2-40B4-BE49-F238E27FC236}">
+                <a16:creationId xmlns:a16="http://schemas.microsoft.com/office/drawing/2014/main" id="{E0DCA4C1-ADEB-CDDC-CBE6-65E85A9C6396}"/>
+              </a:ext>
+            </a:extLst>
+          </p:cNvPr>
+          <p:cNvCxnSpPr>
+            <a:cxnSpLocks/>
+            <a:endCxn id="1045" idx="0"/>
+          </p:cNvCxnSpPr>
+          <p:nvPr/>
+        </p:nvCxnSpPr>
+        <p:spPr>
+          <a:xfrm flipH="1">
+            <a:off x="3018239" y="2579370"/>
+            <a:ext cx="3810" cy="243840"/>
+          </a:xfrm>
+          <a:prstGeom prst="straightConnector1">
+            <a:avLst/>
+          </a:prstGeom>
+          <a:ln>
+            <a:tailEnd type="triangle"/>
+          </a:ln>
+        </p:spPr>
+        <p:style>
+          <a:lnRef idx="1">
+            <a:schemeClr val="accent1"/>
+          </a:lnRef>
+          <a:fillRef idx="0">
+            <a:schemeClr val="accent1"/>
+          </a:fillRef>
+          <a:effectRef idx="0">
+            <a:schemeClr val="accent1"/>
+          </a:effectRef>
+          <a:fontRef idx="minor">
+            <a:schemeClr val="tx1"/>
+          </a:fontRef>
+        </p:style>
+      </p:cxnSp>
+      <p:cxnSp>
+        <p:nvCxnSpPr>
+          <p:cNvPr id="1066" name="Connector: Elbow 1065">
+            <a:extLst>
+              <a:ext uri="{FF2B5EF4-FFF2-40B4-BE49-F238E27FC236}">
+                <a16:creationId xmlns:a16="http://schemas.microsoft.com/office/drawing/2014/main" id="{E71BF84D-0393-4CAD-E3F4-BA5F9AE022BA}"/>
+              </a:ext>
+            </a:extLst>
+          </p:cNvPr>
+          <p:cNvCxnSpPr>
+            <a:cxnSpLocks/>
+            <a:endCxn id="1121" idx="1"/>
+          </p:cNvCxnSpPr>
+          <p:nvPr/>
+        </p:nvCxnSpPr>
+        <p:spPr>
+          <a:xfrm rot="16200000" flipH="1">
+            <a:off x="1712912" y="2512377"/>
+            <a:ext cx="2544878" cy="2415972"/>
+          </a:xfrm>
+          <a:prstGeom prst="bentConnector2">
+            <a:avLst/>
+          </a:prstGeom>
+          <a:ln>
+            <a:tailEnd type="triangle"/>
+          </a:ln>
+        </p:spPr>
+        <p:style>
+          <a:lnRef idx="1">
+            <a:schemeClr val="accent1"/>
+          </a:lnRef>
+          <a:fillRef idx="0">
+            <a:schemeClr val="accent1"/>
+          </a:fillRef>
+          <a:effectRef idx="0">
+            <a:schemeClr val="accent1"/>
+          </a:effectRef>
+          <a:fontRef idx="minor">
+            <a:schemeClr val="tx1"/>
+          </a:fontRef>
+        </p:style>
+      </p:cxnSp>
+      <p:cxnSp>
+        <p:nvCxnSpPr>
+          <p:cNvPr id="1073" name="Straight Arrow Connector 1072">
+            <a:extLst>
+              <a:ext uri="{FF2B5EF4-FFF2-40B4-BE49-F238E27FC236}">
+                <a16:creationId xmlns:a16="http://schemas.microsoft.com/office/drawing/2014/main" id="{078A6480-11C1-65A5-F130-9CA8B2071AFD}"/>
+              </a:ext>
+            </a:extLst>
+          </p:cNvPr>
+          <p:cNvCxnSpPr>
+            <a:cxnSpLocks/>
+            <a:stCxn id="1045" idx="3"/>
+          </p:cNvCxnSpPr>
+          <p:nvPr/>
+        </p:nvCxnSpPr>
+        <p:spPr>
+          <a:xfrm>
+            <a:off x="3994318" y="3166110"/>
+            <a:ext cx="211922" cy="0"/>
+          </a:xfrm>
+          <a:prstGeom prst="straightConnector1">
+            <a:avLst/>
+          </a:prstGeom>
+          <a:ln>
+            <a:tailEnd type="triangle"/>
+          </a:ln>
+        </p:spPr>
+        <p:style>
+          <a:lnRef idx="1">
+            <a:schemeClr val="accent1"/>
+          </a:lnRef>
+          <a:fillRef idx="0">
+            <a:schemeClr val="accent1"/>
+          </a:fillRef>
+          <a:effectRef idx="0">
+            <a:schemeClr val="accent1"/>
+          </a:effectRef>
+          <a:fontRef idx="minor">
+            <a:schemeClr val="tx1"/>
+          </a:fontRef>
+        </p:style>
+      </p:cxnSp>
+      <p:sp>
+        <p:nvSpPr>
+          <p:cNvPr id="1087" name="TextBox 1086">
+            <a:extLst>
+              <a:ext uri="{FF2B5EF4-FFF2-40B4-BE49-F238E27FC236}">
+                <a16:creationId xmlns:a16="http://schemas.microsoft.com/office/drawing/2014/main" id="{3ABA7E38-A92B-39B5-3ADF-F959A7EA04F9}"/>
+              </a:ext>
+            </a:extLst>
+          </p:cNvPr>
+          <p:cNvSpPr txBox="1"/>
+          <p:nvPr/>
+        </p:nvSpPr>
+        <p:spPr>
+          <a:xfrm>
+            <a:off x="4168140" y="5920740"/>
+            <a:ext cx="2110740" cy="646331"/>
+          </a:xfrm>
+          <a:prstGeom prst="rect">
+            <a:avLst/>
+          </a:prstGeom>
+          <a:noFill/>
+        </p:spPr>
+        <p:txBody>
+          <a:bodyPr wrap="square" rtlCol="0">
+            <a:spAutoFit/>
+          </a:bodyPr>
+          <a:lstStyle/>
+          <a:p>
+            <a:r>
+              <a:rPr lang="de-DE" dirty="0"/>
+              <a:t>Training + Tuning</a:t>
+            </a:r>
+          </a:p>
+          <a:p>
+            <a:r>
+              <a:rPr lang="de-DE" dirty="0"/>
+              <a:t>(Ca. Chapter 6.2)</a:t>
+            </a:r>
+            <a:endParaRPr lang="en-GB" dirty="0"/>
+          </a:p>
+        </p:txBody>
+      </p:sp>
+      <p:sp>
+        <p:nvSpPr>
+          <p:cNvPr id="1088" name="TextBox 1087">
+            <a:extLst>
+              <a:ext uri="{FF2B5EF4-FFF2-40B4-BE49-F238E27FC236}">
+                <a16:creationId xmlns:a16="http://schemas.microsoft.com/office/drawing/2014/main" id="{8ED72B36-51D0-895F-9960-38EFB9E127E0}"/>
+              </a:ext>
+            </a:extLst>
+          </p:cNvPr>
+          <p:cNvSpPr txBox="1"/>
+          <p:nvPr/>
+        </p:nvSpPr>
+        <p:spPr>
+          <a:xfrm>
+            <a:off x="6777990" y="5953125"/>
+            <a:ext cx="2110740" cy="646331"/>
+          </a:xfrm>
+          <a:prstGeom prst="rect">
+            <a:avLst/>
+          </a:prstGeom>
+          <a:noFill/>
+        </p:spPr>
+        <p:txBody>
+          <a:bodyPr wrap="square" rtlCol="0">
+            <a:spAutoFit/>
+          </a:bodyPr>
+          <a:lstStyle/>
+          <a:p>
+            <a:r>
+              <a:rPr lang="de-DE" dirty="0"/>
+              <a:t>Evaluation</a:t>
+            </a:r>
+          </a:p>
+          <a:p>
+            <a:r>
+              <a:rPr lang="de-DE" dirty="0"/>
+              <a:t>(Ca. Chapter 6.3)</a:t>
+            </a:r>
+            <a:endParaRPr lang="en-GB" dirty="0"/>
+          </a:p>
+        </p:txBody>
+      </p:sp>
+      <p:sp>
+        <p:nvSpPr>
+          <p:cNvPr id="1089" name="TextBox 1088">
+            <a:extLst>
+              <a:ext uri="{FF2B5EF4-FFF2-40B4-BE49-F238E27FC236}">
+                <a16:creationId xmlns:a16="http://schemas.microsoft.com/office/drawing/2014/main" id="{0CC40106-6295-6FC3-DB4D-60B99CFB8E3C}"/>
+              </a:ext>
+            </a:extLst>
+          </p:cNvPr>
+          <p:cNvSpPr txBox="1"/>
+          <p:nvPr/>
+        </p:nvSpPr>
+        <p:spPr>
+          <a:xfrm>
+            <a:off x="9176385" y="5934075"/>
+            <a:ext cx="2110740" cy="646331"/>
+          </a:xfrm>
+          <a:prstGeom prst="rect">
+            <a:avLst/>
+          </a:prstGeom>
+          <a:noFill/>
+        </p:spPr>
+        <p:txBody>
+          <a:bodyPr wrap="square" rtlCol="0">
+            <a:spAutoFit/>
+          </a:bodyPr>
+          <a:lstStyle/>
+          <a:p>
+            <a:r>
+              <a:rPr lang="de-DE" dirty="0" err="1"/>
+              <a:t>Application</a:t>
+            </a:r>
+            <a:r>
+              <a:rPr lang="de-DE" dirty="0"/>
+              <a:t> Study</a:t>
+            </a:r>
+          </a:p>
+          <a:p>
+            <a:r>
+              <a:rPr lang="de-DE" dirty="0"/>
+              <a:t>(Ca. Chapter 8)</a:t>
+            </a:r>
+            <a:endParaRPr lang="en-GB" dirty="0"/>
+          </a:p>
+        </p:txBody>
+      </p:sp>
+      <p:sp>
+        <p:nvSpPr>
+          <p:cNvPr id="1090" name="TextBox 1089">
+            <a:extLst>
+              <a:ext uri="{FF2B5EF4-FFF2-40B4-BE49-F238E27FC236}">
+                <a16:creationId xmlns:a16="http://schemas.microsoft.com/office/drawing/2014/main" id="{3BDBA4C7-B634-2603-5CF6-AEED66974E30}"/>
+              </a:ext>
+            </a:extLst>
+          </p:cNvPr>
+          <p:cNvSpPr txBox="1"/>
+          <p:nvPr/>
+        </p:nvSpPr>
+        <p:spPr>
+          <a:xfrm>
+            <a:off x="876300" y="5899785"/>
+            <a:ext cx="2110740" cy="646331"/>
+          </a:xfrm>
+          <a:prstGeom prst="rect">
+            <a:avLst/>
+          </a:prstGeom>
+          <a:noFill/>
+        </p:spPr>
+        <p:txBody>
+          <a:bodyPr wrap="square" rtlCol="0">
+            <a:spAutoFit/>
+          </a:bodyPr>
+          <a:lstStyle/>
+          <a:p>
+            <a:r>
+              <a:rPr lang="de-DE" dirty="0"/>
+              <a:t>Data + </a:t>
+            </a:r>
+            <a:r>
+              <a:rPr lang="de-DE" dirty="0" err="1"/>
+              <a:t>Preparation</a:t>
+            </a:r>
+            <a:endParaRPr lang="de-DE" dirty="0"/>
+          </a:p>
+          <a:p>
+            <a:r>
+              <a:rPr lang="de-DE" dirty="0"/>
+              <a:t>(Ca. Chapter 6.1)</a:t>
+            </a:r>
+            <a:endParaRPr lang="en-GB" dirty="0"/>
+          </a:p>
+        </p:txBody>
+      </p:sp>
+      <p:sp>
+        <p:nvSpPr>
+          <p:cNvPr id="1125" name="Rectangle 1124">
+            <a:extLst>
+              <a:ext uri="{FF2B5EF4-FFF2-40B4-BE49-F238E27FC236}">
+                <a16:creationId xmlns:a16="http://schemas.microsoft.com/office/drawing/2014/main" id="{2AE0B6A0-64CC-643E-83FF-5424FDAE07A3}"/>
+              </a:ext>
+            </a:extLst>
+          </p:cNvPr>
+          <p:cNvSpPr/>
+          <p:nvPr/>
+        </p:nvSpPr>
+        <p:spPr>
+          <a:xfrm>
+            <a:off x="4305443" y="5154283"/>
+            <a:ext cx="1935193" cy="423558"/>
+          </a:xfrm>
+          <a:prstGeom prst="rect">
+            <a:avLst/>
+          </a:prstGeom>
+          <a:solidFill>
+            <a:schemeClr val="accent4">
+              <a:lumMod val="60000"/>
+              <a:lumOff val="40000"/>
+            </a:schemeClr>
+          </a:solidFill>
+        </p:spPr>
+        <p:style>
+          <a:lnRef idx="2">
+            <a:schemeClr val="accent1">
+              <a:shade val="15000"/>
+            </a:schemeClr>
+          </a:lnRef>
+          <a:fillRef idx="1">
+            <a:schemeClr val="accent1"/>
+          </a:fillRef>
+          <a:effectRef idx="0">
+            <a:schemeClr val="accent1"/>
+          </a:effectRef>
+          <a:fontRef idx="minor">
+            <a:schemeClr val="lt1"/>
+          </a:fontRef>
+        </p:style>
+        <p:txBody>
+          <a:bodyPr rtlCol="0" anchor="ctr"/>
+          <a:lstStyle/>
+          <a:p>
+            <a:pPr algn="ctr"/>
+            <a:r>
+              <a:rPr lang="de-DE" dirty="0"/>
+              <a:t>…</a:t>
+            </a:r>
+            <a:endParaRPr lang="en-GB" dirty="0"/>
+          </a:p>
+        </p:txBody>
+      </p:sp>
+      <p:cxnSp>
+        <p:nvCxnSpPr>
+          <p:cNvPr id="1146" name="Straight Arrow Connector 1145">
+            <a:extLst>
+              <a:ext uri="{FF2B5EF4-FFF2-40B4-BE49-F238E27FC236}">
+                <a16:creationId xmlns:a16="http://schemas.microsoft.com/office/drawing/2014/main" id="{ED9347FE-0487-02B5-306B-DE0E802E2AA8}"/>
+              </a:ext>
+            </a:extLst>
+          </p:cNvPr>
+          <p:cNvCxnSpPr>
+            <a:cxnSpLocks/>
+            <a:stCxn id="1121" idx="3"/>
+            <a:endCxn id="6" idx="1"/>
+          </p:cNvCxnSpPr>
+          <p:nvPr/>
+        </p:nvCxnSpPr>
+        <p:spPr>
+          <a:xfrm flipV="1">
+            <a:off x="6375820" y="3696330"/>
+            <a:ext cx="368815" cy="1296472"/>
+          </a:xfrm>
+          <a:prstGeom prst="straightConnector1">
+            <a:avLst/>
+          </a:prstGeom>
+          <a:ln>
+            <a:tailEnd type="triangle"/>
+          </a:ln>
+        </p:spPr>
+        <p:style>
+          <a:lnRef idx="1">
+            <a:schemeClr val="accent1"/>
+          </a:lnRef>
+          <a:fillRef idx="0">
+            <a:schemeClr val="accent1"/>
+          </a:fillRef>
+          <a:effectRef idx="0">
+            <a:schemeClr val="accent1"/>
+          </a:effectRef>
+          <a:fontRef idx="minor">
+            <a:schemeClr val="tx1"/>
+          </a:fontRef>
+        </p:style>
+      </p:cxnSp>
+      <p:cxnSp>
+        <p:nvCxnSpPr>
+          <p:cNvPr id="1151" name="Straight Arrow Connector 1150">
+            <a:extLst>
+              <a:ext uri="{FF2B5EF4-FFF2-40B4-BE49-F238E27FC236}">
+                <a16:creationId xmlns:a16="http://schemas.microsoft.com/office/drawing/2014/main" id="{8E7EF643-CDE0-9438-A71E-E83B00532316}"/>
+              </a:ext>
+            </a:extLst>
+          </p:cNvPr>
+          <p:cNvCxnSpPr>
+            <a:cxnSpLocks/>
+            <a:stCxn id="12" idx="3"/>
+            <a:endCxn id="14" idx="1"/>
+          </p:cNvCxnSpPr>
+          <p:nvPr/>
+        </p:nvCxnSpPr>
+        <p:spPr>
+          <a:xfrm flipV="1">
+            <a:off x="6366295" y="2283127"/>
+            <a:ext cx="390956" cy="561990"/>
+          </a:xfrm>
+          <a:prstGeom prst="straightConnector1">
+            <a:avLst/>
+          </a:prstGeom>
+          <a:ln>
+            <a:tailEnd type="triangle"/>
+          </a:ln>
+        </p:spPr>
+        <p:style>
+          <a:lnRef idx="1">
+            <a:schemeClr val="accent1"/>
+          </a:lnRef>
+          <a:fillRef idx="0">
+            <a:schemeClr val="accent1"/>
+          </a:fillRef>
+          <a:effectRef idx="0">
+            <a:schemeClr val="accent1"/>
+          </a:effectRef>
+          <a:fontRef idx="minor">
+            <a:schemeClr val="tx1"/>
+          </a:fontRef>
+        </p:style>
+      </p:cxnSp>
+      <p:cxnSp>
+        <p:nvCxnSpPr>
+          <p:cNvPr id="8" name="Straight Arrow Connector 7">
+            <a:extLst>
+              <a:ext uri="{FF2B5EF4-FFF2-40B4-BE49-F238E27FC236}">
+                <a16:creationId xmlns:a16="http://schemas.microsoft.com/office/drawing/2014/main" id="{C35F85DD-DD33-C5C1-5305-69177F185EF0}"/>
+              </a:ext>
+            </a:extLst>
+          </p:cNvPr>
+          <p:cNvCxnSpPr>
+            <a:cxnSpLocks/>
+            <a:stCxn id="12" idx="3"/>
+            <a:endCxn id="6" idx="1"/>
+          </p:cNvCxnSpPr>
+          <p:nvPr/>
+        </p:nvCxnSpPr>
+        <p:spPr>
+          <a:xfrm>
+            <a:off x="6366295" y="2845117"/>
+            <a:ext cx="378340" cy="851213"/>
+          </a:xfrm>
+          <a:prstGeom prst="straightConnector1">
+            <a:avLst/>
+          </a:prstGeom>
+          <a:ln>
+            <a:tailEnd type="triangle"/>
+          </a:ln>
+        </p:spPr>
+        <p:style>
+          <a:lnRef idx="1">
+            <a:schemeClr val="accent1"/>
+          </a:lnRef>
+          <a:fillRef idx="0">
+            <a:schemeClr val="accent1"/>
+          </a:fillRef>
+          <a:effectRef idx="0">
+            <a:schemeClr val="accent1"/>
+          </a:effectRef>
+          <a:fontRef idx="minor">
+            <a:schemeClr val="tx1"/>
+          </a:fontRef>
+        </p:style>
+      </p:cxnSp>
+      <p:cxnSp>
+        <p:nvCxnSpPr>
+          <p:cNvPr id="19" name="Straight Arrow Connector 18">
+            <a:extLst>
+              <a:ext uri="{FF2B5EF4-FFF2-40B4-BE49-F238E27FC236}">
+                <a16:creationId xmlns:a16="http://schemas.microsoft.com/office/drawing/2014/main" id="{67930102-8555-421A-FDA4-82124F08B5A1}"/>
+              </a:ext>
+            </a:extLst>
+          </p:cNvPr>
+          <p:cNvCxnSpPr>
+            <a:cxnSpLocks/>
+            <a:stCxn id="1121" idx="3"/>
+            <a:endCxn id="14" idx="1"/>
+          </p:cNvCxnSpPr>
+          <p:nvPr/>
+        </p:nvCxnSpPr>
+        <p:spPr>
+          <a:xfrm flipV="1">
+            <a:off x="6375820" y="2283127"/>
+            <a:ext cx="381431" cy="2709675"/>
+          </a:xfrm>
+          <a:prstGeom prst="straightConnector1">
+            <a:avLst/>
+          </a:prstGeom>
+          <a:ln>
+            <a:tailEnd type="triangle"/>
+          </a:ln>
+        </p:spPr>
+        <p:style>
+          <a:lnRef idx="1">
+            <a:schemeClr val="accent1"/>
+          </a:lnRef>
+          <a:fillRef idx="0">
+            <a:schemeClr val="accent1"/>
+          </a:fillRef>
+          <a:effectRef idx="0">
+            <a:schemeClr val="accent1"/>
+          </a:effectRef>
+          <a:fontRef idx="minor">
+            <a:schemeClr val="tx1"/>
+          </a:fontRef>
+        </p:style>
+      </p:cxnSp>
+    </p:spTree>
+    <p:extLst>
+      <p:ext uri="{BB962C8B-B14F-4D97-AF65-F5344CB8AC3E}">
+        <p14:creationId xmlns:p14="http://schemas.microsoft.com/office/powerpoint/2010/main" val="1744557679"/>
+      </p:ext>
+    </p:extLst>
+  </p:cSld>
+  <p:clrMapOvr>
+    <a:masterClrMapping/>
+  </p:clrMapOvr>
+</p:sld>
+</file>
+
+<file path=ppt/slides/slide7.xml><?xml version="1.0" encoding="utf-8"?>
 <p:sld xmlns:a="http://schemas.openxmlformats.org/drawingml/2006/main" xmlns:r="http://schemas.openxmlformats.org/officeDocument/2006/relationships" xmlns:p="http://schemas.openxmlformats.org/presentationml/2006/main">
   <p:cSld>
     <p:spTree>
@@ -26424,7 +30369,7 @@
 </p:sld>
 </file>
 
-<file path=ppt/slides/slide7.xml><?xml version="1.0" encoding="utf-8"?>
+<file path=ppt/slides/slide8.xml><?xml version="1.0" encoding="utf-8"?>
 <p:sld xmlns:a="http://schemas.openxmlformats.org/drawingml/2006/main" xmlns:r="http://schemas.openxmlformats.org/officeDocument/2006/relationships" xmlns:p="http://schemas.openxmlformats.org/presentationml/2006/main">
   <p:cSld>
     <p:spTree>
@@ -28251,7 +32196,7 @@
 </p:sld>
 </file>
 
-<file path=ppt/slides/slide8.xml><?xml version="1.0" encoding="utf-8"?>
+<file path=ppt/slides/slide9.xml><?xml version="1.0" encoding="utf-8"?>
 <p:sld xmlns:a="http://schemas.openxmlformats.org/drawingml/2006/main" xmlns:r="http://schemas.openxmlformats.org/officeDocument/2006/relationships" xmlns:p="http://schemas.openxmlformats.org/presentationml/2006/main">
   <p:cSld>
     <p:spTree>
@@ -31038,116 +34983,6 @@
 </p:sld>
 </file>
 
-<file path=ppt/slides/slide9.xml><?xml version="1.0" encoding="utf-8"?>
-<p:sld xmlns:a="http://schemas.openxmlformats.org/drawingml/2006/main" xmlns:r="http://schemas.openxmlformats.org/officeDocument/2006/relationships" xmlns:p="http://schemas.openxmlformats.org/presentationml/2006/main">
-  <p:cSld>
-    <p:spTree>
-      <p:nvGrpSpPr>
-        <p:cNvPr id="1" name=""/>
-        <p:cNvGrpSpPr/>
-        <p:nvPr/>
-      </p:nvGrpSpPr>
-      <p:grpSpPr>
-        <a:xfrm>
-          <a:off x="0" y="0"/>
-          <a:ext cx="0" cy="0"/>
-          <a:chOff x="0" y="0"/>
-          <a:chExt cx="0" cy="0"/>
-        </a:xfrm>
-      </p:grpSpPr>
-      <p:sp>
-        <p:nvSpPr>
-          <p:cNvPr id="2" name="Title 1">
-            <a:extLst>
-              <a:ext uri="{FF2B5EF4-FFF2-40B4-BE49-F238E27FC236}">
-                <a16:creationId xmlns:a16="http://schemas.microsoft.com/office/drawing/2014/main" id="{9C25A884-0014-7B87-1AF5-C2A758D258BB}"/>
-              </a:ext>
-            </a:extLst>
-          </p:cNvPr>
-          <p:cNvSpPr>
-            <a:spLocks noGrp="1"/>
-          </p:cNvSpPr>
-          <p:nvPr>
-            <p:ph type="title"/>
-          </p:nvPr>
-        </p:nvSpPr>
-        <p:spPr/>
-        <p:txBody>
-          <a:bodyPr/>
-          <a:lstStyle/>
-          <a:p>
-            <a:endParaRPr lang="en-GB"/>
-          </a:p>
-        </p:txBody>
-      </p:sp>
-      <p:sp>
-        <p:nvSpPr>
-          <p:cNvPr id="3" name="Content Placeholder 2">
-            <a:extLst>
-              <a:ext uri="{FF2B5EF4-FFF2-40B4-BE49-F238E27FC236}">
-                <a16:creationId xmlns:a16="http://schemas.microsoft.com/office/drawing/2014/main" id="{EFD32671-D437-757C-1EA5-C048C3504F41}"/>
-              </a:ext>
-            </a:extLst>
-          </p:cNvPr>
-          <p:cNvSpPr>
-            <a:spLocks noGrp="1"/>
-          </p:cNvSpPr>
-          <p:nvPr>
-            <p:ph idx="1"/>
-          </p:nvPr>
-        </p:nvSpPr>
-        <p:spPr/>
-        <p:txBody>
-          <a:bodyPr/>
-          <a:lstStyle/>
-          <a:p>
-            <a:endParaRPr lang="en-GB"/>
-          </a:p>
-        </p:txBody>
-      </p:sp>
-      <p:pic>
-        <p:nvPicPr>
-          <p:cNvPr id="4" name="Picture 3">
-            <a:extLst>
-              <a:ext uri="{FF2B5EF4-FFF2-40B4-BE49-F238E27FC236}">
-                <a16:creationId xmlns:a16="http://schemas.microsoft.com/office/drawing/2014/main" id="{B7DB29C0-B5C8-8508-A26E-50B1D221C83C}"/>
-              </a:ext>
-            </a:extLst>
-          </p:cNvPr>
-          <p:cNvPicPr>
-            <a:picLocks noChangeAspect="1"/>
-          </p:cNvPicPr>
-          <p:nvPr/>
-        </p:nvPicPr>
-        <p:blipFill>
-          <a:blip r:embed="rId2"/>
-          <a:stretch>
-            <a:fillRect/>
-          </a:stretch>
-        </p:blipFill>
-        <p:spPr>
-          <a:xfrm>
-            <a:off x="400050" y="-314325"/>
-            <a:ext cx="11675147" cy="6858000"/>
-          </a:xfrm>
-          <a:prstGeom prst="rect">
-            <a:avLst/>
-          </a:prstGeom>
-        </p:spPr>
-      </p:pic>
-    </p:spTree>
-    <p:extLst>
-      <p:ext uri="{BB962C8B-B14F-4D97-AF65-F5344CB8AC3E}">
-        <p14:creationId xmlns:p14="http://schemas.microsoft.com/office/powerpoint/2010/main" val="1975984209"/>
-      </p:ext>
-    </p:extLst>
-  </p:cSld>
-  <p:clrMapOvr>
-    <a:masterClrMapping/>
-  </p:clrMapOvr>
-</p:sld>
-</file>
-
 <file path=ppt/theme/theme1.xml><?xml version="1.0" encoding="utf-8"?>
 <a:theme xmlns:a="http://schemas.openxmlformats.org/drawingml/2006/main" name="Office Theme">
   <a:themeElements>

</xml_diff>

<commit_message>
Add chapter on Research Framework🪀 (#365)
</commit_message>
<xml_diff>
--- a/reports/Graphs/diagrams.pptx
+++ b/reports/Graphs/diagrams.pptx
@@ -7,14 +7,15 @@
   <p:sldIdLst>
     <p:sldId id="256" r:id="rId2"/>
     <p:sldId id="263" r:id="rId3"/>
-    <p:sldId id="262" r:id="rId4"/>
-    <p:sldId id="264" r:id="rId5"/>
-    <p:sldId id="265" r:id="rId6"/>
-    <p:sldId id="260" r:id="rId7"/>
-    <p:sldId id="261" r:id="rId8"/>
-    <p:sldId id="266" r:id="rId9"/>
-    <p:sldId id="259" r:id="rId10"/>
-    <p:sldId id="257" r:id="rId11"/>
+    <p:sldId id="264" r:id="rId4"/>
+    <p:sldId id="265" r:id="rId5"/>
+    <p:sldId id="267" r:id="rId6"/>
+    <p:sldId id="268" r:id="rId7"/>
+    <p:sldId id="260" r:id="rId8"/>
+    <p:sldId id="261" r:id="rId9"/>
+    <p:sldId id="266" r:id="rId10"/>
+    <p:sldId id="259" r:id="rId11"/>
+    <p:sldId id="257" r:id="rId12"/>
   </p:sldIdLst>
   <p:sldSz cx="12192000" cy="6858000"/>
   <p:notesSz cx="6858000" cy="9144000"/>
@@ -124,13 +125,547 @@
 <file path=ppt/revisionInfo.xml><?xml version="1.0" encoding="utf-8"?>
 <p1510:revInfo xmlns:a="http://schemas.openxmlformats.org/drawingml/2006/main" xmlns:r="http://schemas.openxmlformats.org/officeDocument/2006/relationships" xmlns:p1510="http://schemas.microsoft.com/office/powerpoint/2015/10/main">
   <p1510:revLst>
-    <p1510:client id="{9CD03640-CC4F-4034-8161-8D1D39C001C5}" v="17" dt="2023-04-24T16:44:44.361"/>
+    <p1510:client id="{D4AAABE4-665D-427C-806E-52B893CA3FC7}" v="38" dt="2023-05-17T09:40:28.539"/>
   </p1510:revLst>
 </p1510:revInfo>
 </file>
 
 <file path=ppt/changesInfos/changesInfo1.xml><?xml version="1.0" encoding="utf-8"?>
 <pc:chgInfo xmlns:a="http://schemas.openxmlformats.org/drawingml/2006/main" xmlns:r="http://schemas.openxmlformats.org/officeDocument/2006/relationships" xmlns:ac="http://schemas.microsoft.com/office/drawing/2013/main/command" xmlns:pc="http://schemas.microsoft.com/office/powerpoint/2013/main/command">
+  <pc:docChgLst>
+    <pc:chgData name="Markus Bilz" userId="a36021e4bdb9349f" providerId="LiveId" clId="{D4AAABE4-665D-427C-806E-52B893CA3FC7}"/>
+    <pc:docChg chg="undo custSel addSld delSld modSld">
+      <pc:chgData name="Markus Bilz" userId="a36021e4bdb9349f" providerId="LiveId" clId="{D4AAABE4-665D-427C-806E-52B893CA3FC7}" dt="2023-05-17T09:41:58.259" v="955" actId="20577"/>
+      <pc:docMkLst>
+        <pc:docMk/>
+      </pc:docMkLst>
+      <pc:sldChg chg="del">
+        <pc:chgData name="Markus Bilz" userId="a36021e4bdb9349f" providerId="LiveId" clId="{D4AAABE4-665D-427C-806E-52B893CA3FC7}" dt="2023-05-17T09:26:24.224" v="794" actId="2696"/>
+        <pc:sldMkLst>
+          <pc:docMk/>
+          <pc:sldMk cId="350462512" sldId="262"/>
+        </pc:sldMkLst>
+      </pc:sldChg>
+      <pc:sldChg chg="addSp delSp modSp new mod">
+        <pc:chgData name="Markus Bilz" userId="a36021e4bdb9349f" providerId="LiveId" clId="{D4AAABE4-665D-427C-806E-52B893CA3FC7}" dt="2023-05-17T09:36:50.117" v="922" actId="14100"/>
+        <pc:sldMkLst>
+          <pc:docMk/>
+          <pc:sldMk cId="873796926" sldId="267"/>
+        </pc:sldMkLst>
+        <pc:spChg chg="mod">
+          <ac:chgData name="Markus Bilz" userId="a36021e4bdb9349f" providerId="LiveId" clId="{D4AAABE4-665D-427C-806E-52B893CA3FC7}" dt="2023-05-17T09:23:01.778" v="776" actId="1076"/>
+          <ac:spMkLst>
+            <pc:docMk/>
+            <pc:sldMk cId="873796926" sldId="267"/>
+            <ac:spMk id="2" creationId="{683A413D-99D9-FCB9-77DB-9A11EE63A78C}"/>
+          </ac:spMkLst>
+        </pc:spChg>
+        <pc:spChg chg="del mod">
+          <ac:chgData name="Markus Bilz" userId="a36021e4bdb9349f" providerId="LiveId" clId="{D4AAABE4-665D-427C-806E-52B893CA3FC7}" dt="2023-05-17T08:01:25.335" v="2" actId="478"/>
+          <ac:spMkLst>
+            <pc:docMk/>
+            <pc:sldMk cId="873796926" sldId="267"/>
+            <ac:spMk id="3" creationId="{E483DA65-E763-68B5-BF09-36828B57565E}"/>
+          </ac:spMkLst>
+        </pc:spChg>
+        <pc:spChg chg="add del mod">
+          <ac:chgData name="Markus Bilz" userId="a36021e4bdb9349f" providerId="LiveId" clId="{D4AAABE4-665D-427C-806E-52B893CA3FC7}" dt="2023-05-17T08:09:34.364" v="27" actId="478"/>
+          <ac:spMkLst>
+            <pc:docMk/>
+            <pc:sldMk cId="873796926" sldId="267"/>
+            <ac:spMk id="5" creationId="{EF718C20-2FD4-71EF-A008-F2EA8BA68A00}"/>
+          </ac:spMkLst>
+        </pc:spChg>
+        <pc:spChg chg="add mod ord">
+          <ac:chgData name="Markus Bilz" userId="a36021e4bdb9349f" providerId="LiveId" clId="{D4AAABE4-665D-427C-806E-52B893CA3FC7}" dt="2023-05-17T09:35:43.055" v="919" actId="1076"/>
+          <ac:spMkLst>
+            <pc:docMk/>
+            <pc:sldMk cId="873796926" sldId="267"/>
+            <ac:spMk id="6" creationId="{C96ED38C-E0B1-92C2-B807-5218346FC064}"/>
+          </ac:spMkLst>
+        </pc:spChg>
+        <pc:spChg chg="add mod">
+          <ac:chgData name="Markus Bilz" userId="a36021e4bdb9349f" providerId="LiveId" clId="{D4AAABE4-665D-427C-806E-52B893CA3FC7}" dt="2023-05-17T09:23:48.016" v="786" actId="1076"/>
+          <ac:spMkLst>
+            <pc:docMk/>
+            <pc:sldMk cId="873796926" sldId="267"/>
+            <ac:spMk id="7" creationId="{A023D810-4417-2CD5-6DB9-5A58ED07DAF1}"/>
+          </ac:spMkLst>
+        </pc:spChg>
+        <pc:spChg chg="add del mod">
+          <ac:chgData name="Markus Bilz" userId="a36021e4bdb9349f" providerId="LiveId" clId="{D4AAABE4-665D-427C-806E-52B893CA3FC7}" dt="2023-05-17T08:12:52.005" v="55"/>
+          <ac:spMkLst>
+            <pc:docMk/>
+            <pc:sldMk cId="873796926" sldId="267"/>
+            <ac:spMk id="8" creationId="{237237E9-1D00-4381-F426-DD1FAE56FECA}"/>
+          </ac:spMkLst>
+        </pc:spChg>
+        <pc:spChg chg="add mod">
+          <ac:chgData name="Markus Bilz" userId="a36021e4bdb9349f" providerId="LiveId" clId="{D4AAABE4-665D-427C-806E-52B893CA3FC7}" dt="2023-05-17T09:27:52.518" v="796" actId="1076"/>
+          <ac:spMkLst>
+            <pc:docMk/>
+            <pc:sldMk cId="873796926" sldId="267"/>
+            <ac:spMk id="9" creationId="{C07D752C-D6F2-1D45-03EC-3F124EE97946}"/>
+          </ac:spMkLst>
+        </pc:spChg>
+        <pc:spChg chg="add mod">
+          <ac:chgData name="Markus Bilz" userId="a36021e4bdb9349f" providerId="LiveId" clId="{D4AAABE4-665D-427C-806E-52B893CA3FC7}" dt="2023-05-17T09:27:52.518" v="796" actId="1076"/>
+          <ac:spMkLst>
+            <pc:docMk/>
+            <pc:sldMk cId="873796926" sldId="267"/>
+            <ac:spMk id="10" creationId="{0622CB4B-1EC6-0675-AC6A-A3E25EF4A4A1}"/>
+          </ac:spMkLst>
+        </pc:spChg>
+        <pc:spChg chg="add mod">
+          <ac:chgData name="Markus Bilz" userId="a36021e4bdb9349f" providerId="LiveId" clId="{D4AAABE4-665D-427C-806E-52B893CA3FC7}" dt="2023-05-17T09:29:52.735" v="854" actId="1076"/>
+          <ac:spMkLst>
+            <pc:docMk/>
+            <pc:sldMk cId="873796926" sldId="267"/>
+            <ac:spMk id="11" creationId="{1B75BC38-F232-FB5B-95D7-76998D86AC90}"/>
+          </ac:spMkLst>
+        </pc:spChg>
+        <pc:spChg chg="add mod ord">
+          <ac:chgData name="Markus Bilz" userId="a36021e4bdb9349f" providerId="LiveId" clId="{D4AAABE4-665D-427C-806E-52B893CA3FC7}" dt="2023-05-17T09:34:38.605" v="906" actId="14100"/>
+          <ac:spMkLst>
+            <pc:docMk/>
+            <pc:sldMk cId="873796926" sldId="267"/>
+            <ac:spMk id="12" creationId="{7841179F-B9B5-2E56-DFA5-7DAA6C1BBD9D}"/>
+          </ac:spMkLst>
+        </pc:spChg>
+        <pc:spChg chg="add mod">
+          <ac:chgData name="Markus Bilz" userId="a36021e4bdb9349f" providerId="LiveId" clId="{D4AAABE4-665D-427C-806E-52B893CA3FC7}" dt="2023-05-17T09:23:48.016" v="786" actId="1076"/>
+          <ac:spMkLst>
+            <pc:docMk/>
+            <pc:sldMk cId="873796926" sldId="267"/>
+            <ac:spMk id="13" creationId="{EB67B30B-4D14-827E-5DB9-0B9167FF157A}"/>
+          </ac:spMkLst>
+        </pc:spChg>
+        <pc:spChg chg="add mod">
+          <ac:chgData name="Markus Bilz" userId="a36021e4bdb9349f" providerId="LiveId" clId="{D4AAABE4-665D-427C-806E-52B893CA3FC7}" dt="2023-05-17T09:33:34.083" v="903" actId="1076"/>
+          <ac:spMkLst>
+            <pc:docMk/>
+            <pc:sldMk cId="873796926" sldId="267"/>
+            <ac:spMk id="14" creationId="{82EAA822-CF91-407C-ED09-D5430CB97B56}"/>
+          </ac:spMkLst>
+        </pc:spChg>
+        <pc:spChg chg="add mod">
+          <ac:chgData name="Markus Bilz" userId="a36021e4bdb9349f" providerId="LiveId" clId="{D4AAABE4-665D-427C-806E-52B893CA3FC7}" dt="2023-05-17T09:35:43.055" v="919" actId="1076"/>
+          <ac:spMkLst>
+            <pc:docMk/>
+            <pc:sldMk cId="873796926" sldId="267"/>
+            <ac:spMk id="15" creationId="{B840A789-AE83-25DF-4C82-D3C7149D69EB}"/>
+          </ac:spMkLst>
+        </pc:spChg>
+        <pc:spChg chg="add mod">
+          <ac:chgData name="Markus Bilz" userId="a36021e4bdb9349f" providerId="LiveId" clId="{D4AAABE4-665D-427C-806E-52B893CA3FC7}" dt="2023-05-17T09:35:43.055" v="919" actId="1076"/>
+          <ac:spMkLst>
+            <pc:docMk/>
+            <pc:sldMk cId="873796926" sldId="267"/>
+            <ac:spMk id="16" creationId="{B314F980-CFB9-6647-E835-3991B2D65FDE}"/>
+          </ac:spMkLst>
+        </pc:spChg>
+        <pc:spChg chg="add mod ord">
+          <ac:chgData name="Markus Bilz" userId="a36021e4bdb9349f" providerId="LiveId" clId="{D4AAABE4-665D-427C-806E-52B893CA3FC7}" dt="2023-05-17T09:33:38.458" v="904" actId="1076"/>
+          <ac:spMkLst>
+            <pc:docMk/>
+            <pc:sldMk cId="873796926" sldId="267"/>
+            <ac:spMk id="24" creationId="{8921449C-B172-6825-E7FF-0DDF75F501AD}"/>
+          </ac:spMkLst>
+        </pc:spChg>
+        <pc:spChg chg="add mod">
+          <ac:chgData name="Markus Bilz" userId="a36021e4bdb9349f" providerId="LiveId" clId="{D4AAABE4-665D-427C-806E-52B893CA3FC7}" dt="2023-05-17T09:18:05.363" v="659" actId="14100"/>
+          <ac:spMkLst>
+            <pc:docMk/>
+            <pc:sldMk cId="873796926" sldId="267"/>
+            <ac:spMk id="28" creationId="{4B3CD710-AFF5-C20D-00D6-894B9ECD4CFF}"/>
+          </ac:spMkLst>
+        </pc:spChg>
+        <pc:spChg chg="add del mod">
+          <ac:chgData name="Markus Bilz" userId="a36021e4bdb9349f" providerId="LiveId" clId="{D4AAABE4-665D-427C-806E-52B893CA3FC7}" dt="2023-05-17T09:15:17.903" v="634" actId="478"/>
+          <ac:spMkLst>
+            <pc:docMk/>
+            <pc:sldMk cId="873796926" sldId="267"/>
+            <ac:spMk id="30" creationId="{D2F46992-65D1-15F3-204E-474FE52FFEA7}"/>
+          </ac:spMkLst>
+        </pc:spChg>
+        <pc:spChg chg="add mod">
+          <ac:chgData name="Markus Bilz" userId="a36021e4bdb9349f" providerId="LiveId" clId="{D4AAABE4-665D-427C-806E-52B893CA3FC7}" dt="2023-05-17T09:23:48.016" v="786" actId="1076"/>
+          <ac:spMkLst>
+            <pc:docMk/>
+            <pc:sldMk cId="873796926" sldId="267"/>
+            <ac:spMk id="31" creationId="{D3E48620-93F1-1D9E-966B-44CA6FF79461}"/>
+          </ac:spMkLst>
+        </pc:spChg>
+        <pc:spChg chg="add mod">
+          <ac:chgData name="Markus Bilz" userId="a36021e4bdb9349f" providerId="LiveId" clId="{D4AAABE4-665D-427C-806E-52B893CA3FC7}" dt="2023-05-17T09:28:04.926" v="797" actId="1076"/>
+          <ac:spMkLst>
+            <pc:docMk/>
+            <pc:sldMk cId="873796926" sldId="267"/>
+            <ac:spMk id="1038" creationId="{7D6D82FD-48ED-F01D-1A74-9047D884AECA}"/>
+          </ac:spMkLst>
+        </pc:spChg>
+        <pc:spChg chg="add mod">
+          <ac:chgData name="Markus Bilz" userId="a36021e4bdb9349f" providerId="LiveId" clId="{D4AAABE4-665D-427C-806E-52B893CA3FC7}" dt="2023-05-17T09:28:06.839" v="798" actId="1076"/>
+          <ac:spMkLst>
+            <pc:docMk/>
+            <pc:sldMk cId="873796926" sldId="267"/>
+            <ac:spMk id="1039" creationId="{EA5BC06A-2FBC-17A7-CB31-F804E1DF1253}"/>
+          </ac:spMkLst>
+        </pc:spChg>
+        <pc:spChg chg="add mod">
+          <ac:chgData name="Markus Bilz" userId="a36021e4bdb9349f" providerId="LiveId" clId="{D4AAABE4-665D-427C-806E-52B893CA3FC7}" dt="2023-05-17T09:17:50.123" v="658" actId="20577"/>
+          <ac:spMkLst>
+            <pc:docMk/>
+            <pc:sldMk cId="873796926" sldId="267"/>
+            <ac:spMk id="1045" creationId="{248F470B-6828-B453-9C17-857109741461}"/>
+          </ac:spMkLst>
+        </pc:spChg>
+        <pc:spChg chg="add del mod">
+          <ac:chgData name="Markus Bilz" userId="a36021e4bdb9349f" providerId="LiveId" clId="{D4AAABE4-665D-427C-806E-52B893CA3FC7}" dt="2023-05-17T09:04:58.380" v="585" actId="478"/>
+          <ac:spMkLst>
+            <pc:docMk/>
+            <pc:sldMk cId="873796926" sldId="267"/>
+            <ac:spMk id="1082" creationId="{25ABE639-6785-7346-836B-DE4098822C0C}"/>
+          </ac:spMkLst>
+        </pc:spChg>
+        <pc:spChg chg="add mod">
+          <ac:chgData name="Markus Bilz" userId="a36021e4bdb9349f" providerId="LiveId" clId="{D4AAABE4-665D-427C-806E-52B893CA3FC7}" dt="2023-05-17T09:24:47.629" v="792" actId="1076"/>
+          <ac:spMkLst>
+            <pc:docMk/>
+            <pc:sldMk cId="873796926" sldId="267"/>
+            <ac:spMk id="1087" creationId="{3ABA7E38-A92B-39B5-3ADF-F959A7EA04F9}"/>
+          </ac:spMkLst>
+        </pc:spChg>
+        <pc:spChg chg="add mod">
+          <ac:chgData name="Markus Bilz" userId="a36021e4bdb9349f" providerId="LiveId" clId="{D4AAABE4-665D-427C-806E-52B893CA3FC7}" dt="2023-05-17T09:19:37.959" v="730" actId="1076"/>
+          <ac:spMkLst>
+            <pc:docMk/>
+            <pc:sldMk cId="873796926" sldId="267"/>
+            <ac:spMk id="1088" creationId="{8ED72B36-51D0-895F-9960-38EFB9E127E0}"/>
+          </ac:spMkLst>
+        </pc:spChg>
+        <pc:spChg chg="add mod">
+          <ac:chgData name="Markus Bilz" userId="a36021e4bdb9349f" providerId="LiveId" clId="{D4AAABE4-665D-427C-806E-52B893CA3FC7}" dt="2023-05-17T09:24:52.115" v="793" actId="1076"/>
+          <ac:spMkLst>
+            <pc:docMk/>
+            <pc:sldMk cId="873796926" sldId="267"/>
+            <ac:spMk id="1089" creationId="{0CC40106-6295-6FC3-DB4D-60B99CFB8E3C}"/>
+          </ac:spMkLst>
+        </pc:spChg>
+        <pc:spChg chg="add mod">
+          <ac:chgData name="Markus Bilz" userId="a36021e4bdb9349f" providerId="LiveId" clId="{D4AAABE4-665D-427C-806E-52B893CA3FC7}" dt="2023-05-17T09:24:44.501" v="791" actId="1076"/>
+          <ac:spMkLst>
+            <pc:docMk/>
+            <pc:sldMk cId="873796926" sldId="267"/>
+            <ac:spMk id="1090" creationId="{3BDBA4C7-B634-2603-5CF6-AEED66974E30}"/>
+          </ac:spMkLst>
+        </pc:spChg>
+        <pc:spChg chg="add mod ord">
+          <ac:chgData name="Markus Bilz" userId="a36021e4bdb9349f" providerId="LiveId" clId="{D4AAABE4-665D-427C-806E-52B893CA3FC7}" dt="2023-05-17T09:36:50.117" v="922" actId="14100"/>
+          <ac:spMkLst>
+            <pc:docMk/>
+            <pc:sldMk cId="873796926" sldId="267"/>
+            <ac:spMk id="1117" creationId="{DE505CA9-73E5-CCB7-95F5-924561519BBB}"/>
+          </ac:spMkLst>
+        </pc:spChg>
+        <pc:spChg chg="add mod ord">
+          <ac:chgData name="Markus Bilz" userId="a36021e4bdb9349f" providerId="LiveId" clId="{D4AAABE4-665D-427C-806E-52B893CA3FC7}" dt="2023-05-17T09:32:52.038" v="897" actId="20577"/>
+          <ac:spMkLst>
+            <pc:docMk/>
+            <pc:sldMk cId="873796926" sldId="267"/>
+            <ac:spMk id="1121" creationId="{E53C962D-A3F5-9F2F-3BAD-FD3A2B5AADCC}"/>
+          </ac:spMkLst>
+        </pc:spChg>
+        <pc:spChg chg="add mod">
+          <ac:chgData name="Markus Bilz" userId="a36021e4bdb9349f" providerId="LiveId" clId="{D4AAABE4-665D-427C-806E-52B893CA3FC7}" dt="2023-05-17T09:30:01.192" v="860" actId="5793"/>
+          <ac:spMkLst>
+            <pc:docMk/>
+            <pc:sldMk cId="873796926" sldId="267"/>
+            <ac:spMk id="1125" creationId="{2AE0B6A0-64CC-643E-83FF-5424FDAE07A3}"/>
+          </ac:spMkLst>
+        </pc:spChg>
+        <pc:spChg chg="add mod ord">
+          <ac:chgData name="Markus Bilz" userId="a36021e4bdb9349f" providerId="LiveId" clId="{D4AAABE4-665D-427C-806E-52B893CA3FC7}" dt="2023-05-17T09:35:04.897" v="913" actId="14100"/>
+          <ac:spMkLst>
+            <pc:docMk/>
+            <pc:sldMk cId="873796926" sldId="267"/>
+            <ac:spMk id="1144" creationId="{525344FD-F45D-9493-2133-714401194624}"/>
+          </ac:spMkLst>
+        </pc:spChg>
+        <pc:picChg chg="add del mod">
+          <ac:chgData name="Markus Bilz" userId="a36021e4bdb9349f" providerId="LiveId" clId="{D4AAABE4-665D-427C-806E-52B893CA3FC7}" dt="2023-05-17T09:27:11.321" v="795" actId="478"/>
+          <ac:picMkLst>
+            <pc:docMk/>
+            <pc:sldMk cId="873796926" sldId="267"/>
+            <ac:picMk id="1026" creationId="{3364F0A3-52BD-1FB5-9639-A5FCE9FBAC75}"/>
+          </ac:picMkLst>
+        </pc:picChg>
+        <pc:picChg chg="add del mod">
+          <ac:chgData name="Markus Bilz" userId="a36021e4bdb9349f" providerId="LiveId" clId="{D4AAABE4-665D-427C-806E-52B893CA3FC7}" dt="2023-05-17T09:27:11.321" v="795" actId="478"/>
+          <ac:picMkLst>
+            <pc:docMk/>
+            <pc:sldMk cId="873796926" sldId="267"/>
+            <ac:picMk id="1028" creationId="{39CB445E-1E30-93C1-689D-6AF917CC781C}"/>
+          </ac:picMkLst>
+        </pc:picChg>
+        <pc:cxnChg chg="add del mod ord">
+          <ac:chgData name="Markus Bilz" userId="a36021e4bdb9349f" providerId="LiveId" clId="{D4AAABE4-665D-427C-806E-52B893CA3FC7}" dt="2023-05-17T08:48:46.442" v="547" actId="478"/>
+          <ac:cxnSpMkLst>
+            <pc:docMk/>
+            <pc:sldMk cId="873796926" sldId="267"/>
+            <ac:cxnSpMk id="18" creationId="{D57D1233-856B-6E32-603F-706BC39021B0}"/>
+          </ac:cxnSpMkLst>
+        </pc:cxnChg>
+        <pc:cxnChg chg="add del mod">
+          <ac:chgData name="Markus Bilz" userId="a36021e4bdb9349f" providerId="LiveId" clId="{D4AAABE4-665D-427C-806E-52B893CA3FC7}" dt="2023-05-17T09:34:45.579" v="910" actId="478"/>
+          <ac:cxnSpMkLst>
+            <pc:docMk/>
+            <pc:sldMk cId="873796926" sldId="267"/>
+            <ac:cxnSpMk id="20" creationId="{83AFE2A7-2B3B-2DDC-A0E1-8C31379D6E67}"/>
+          </ac:cxnSpMkLst>
+        </pc:cxnChg>
+        <pc:cxnChg chg="add mod">
+          <ac:chgData name="Markus Bilz" userId="a36021e4bdb9349f" providerId="LiveId" clId="{D4AAABE4-665D-427C-806E-52B893CA3FC7}" dt="2023-05-17T09:33:34.083" v="903" actId="1076"/>
+          <ac:cxnSpMkLst>
+            <pc:docMk/>
+            <pc:sldMk cId="873796926" sldId="267"/>
+            <ac:cxnSpMk id="26" creationId="{3AC2BFD2-B4CE-E3EF-5184-DBED244D2E76}"/>
+          </ac:cxnSpMkLst>
+        </pc:cxnChg>
+        <pc:cxnChg chg="add mod">
+          <ac:chgData name="Markus Bilz" userId="a36021e4bdb9349f" providerId="LiveId" clId="{D4AAABE4-665D-427C-806E-52B893CA3FC7}" dt="2023-05-17T09:23:48.016" v="786" actId="1076"/>
+          <ac:cxnSpMkLst>
+            <pc:docMk/>
+            <pc:sldMk cId="873796926" sldId="267"/>
+            <ac:cxnSpMk id="1049" creationId="{947672B4-A862-CD5E-8962-722CE895CD75}"/>
+          </ac:cxnSpMkLst>
+        </pc:cxnChg>
+        <pc:cxnChg chg="add mod">
+          <ac:chgData name="Markus Bilz" userId="a36021e4bdb9349f" providerId="LiveId" clId="{D4AAABE4-665D-427C-806E-52B893CA3FC7}" dt="2023-05-17T09:23:48.016" v="786" actId="1076"/>
+          <ac:cxnSpMkLst>
+            <pc:docMk/>
+            <pc:sldMk cId="873796926" sldId="267"/>
+            <ac:cxnSpMk id="1051" creationId="{F7A728D3-8722-0B93-8973-BA154348ECF1}"/>
+          </ac:cxnSpMkLst>
+        </pc:cxnChg>
+        <pc:cxnChg chg="add mod">
+          <ac:chgData name="Markus Bilz" userId="a36021e4bdb9349f" providerId="LiveId" clId="{D4AAABE4-665D-427C-806E-52B893CA3FC7}" dt="2023-05-17T09:23:48.016" v="786" actId="1076"/>
+          <ac:cxnSpMkLst>
+            <pc:docMk/>
+            <pc:sldMk cId="873796926" sldId="267"/>
+            <ac:cxnSpMk id="1053" creationId="{9D823643-CC23-9E39-C296-C46251E24A2B}"/>
+          </ac:cxnSpMkLst>
+        </pc:cxnChg>
+        <pc:cxnChg chg="add del mod">
+          <ac:chgData name="Markus Bilz" userId="a36021e4bdb9349f" providerId="LiveId" clId="{D4AAABE4-665D-427C-806E-52B893CA3FC7}" dt="2023-05-17T09:34:44.658" v="909" actId="478"/>
+          <ac:cxnSpMkLst>
+            <pc:docMk/>
+            <pc:sldMk cId="873796926" sldId="267"/>
+            <ac:cxnSpMk id="1058" creationId="{A0B11981-79DB-F861-3F50-CF408FA6991A}"/>
+          </ac:cxnSpMkLst>
+        </pc:cxnChg>
+        <pc:cxnChg chg="add mod">
+          <ac:chgData name="Markus Bilz" userId="a36021e4bdb9349f" providerId="LiveId" clId="{D4AAABE4-665D-427C-806E-52B893CA3FC7}" dt="2023-05-17T09:13:20.305" v="628" actId="1076"/>
+          <ac:cxnSpMkLst>
+            <pc:docMk/>
+            <pc:sldMk cId="873796926" sldId="267"/>
+            <ac:cxnSpMk id="1062" creationId="{E0DCA4C1-ADEB-CDDC-CBE6-65E85A9C6396}"/>
+          </ac:cxnSpMkLst>
+        </pc:cxnChg>
+        <pc:cxnChg chg="add del mod">
+          <ac:chgData name="Markus Bilz" userId="a36021e4bdb9349f" providerId="LiveId" clId="{D4AAABE4-665D-427C-806E-52B893CA3FC7}" dt="2023-05-17T08:48:27.266" v="545" actId="478"/>
+          <ac:cxnSpMkLst>
+            <pc:docMk/>
+            <pc:sldMk cId="873796926" sldId="267"/>
+            <ac:cxnSpMk id="1064" creationId="{A94A70E2-93B0-DFF0-CC1E-296D68975202}"/>
+          </ac:cxnSpMkLst>
+        </pc:cxnChg>
+        <pc:cxnChg chg="add mod">
+          <ac:chgData name="Markus Bilz" userId="a36021e4bdb9349f" providerId="LiveId" clId="{D4AAABE4-665D-427C-806E-52B893CA3FC7}" dt="2023-05-17T09:31:45.487" v="871" actId="1076"/>
+          <ac:cxnSpMkLst>
+            <pc:docMk/>
+            <pc:sldMk cId="873796926" sldId="267"/>
+            <ac:cxnSpMk id="1066" creationId="{E71BF84D-0393-4CAD-E3F4-BA5F9AE022BA}"/>
+          </ac:cxnSpMkLst>
+        </pc:cxnChg>
+        <pc:cxnChg chg="add mod">
+          <ac:chgData name="Markus Bilz" userId="a36021e4bdb9349f" providerId="LiveId" clId="{D4AAABE4-665D-427C-806E-52B893CA3FC7}" dt="2023-05-17T09:13:20.305" v="628" actId="1076"/>
+          <ac:cxnSpMkLst>
+            <pc:docMk/>
+            <pc:sldMk cId="873796926" sldId="267"/>
+            <ac:cxnSpMk id="1073" creationId="{078A6480-11C1-65A5-F130-9CA8B2071AFD}"/>
+          </ac:cxnSpMkLst>
+        </pc:cxnChg>
+        <pc:cxnChg chg="add del mod">
+          <ac:chgData name="Markus Bilz" userId="a36021e4bdb9349f" providerId="LiveId" clId="{D4AAABE4-665D-427C-806E-52B893CA3FC7}" dt="2023-05-17T09:31:22.859" v="865" actId="478"/>
+          <ac:cxnSpMkLst>
+            <pc:docMk/>
+            <pc:sldMk cId="873796926" sldId="267"/>
+            <ac:cxnSpMk id="1128" creationId="{82AF8891-BCC9-7EA7-3AF2-DF88109B9DCA}"/>
+          </ac:cxnSpMkLst>
+        </pc:cxnChg>
+        <pc:cxnChg chg="add del mod">
+          <ac:chgData name="Markus Bilz" userId="a36021e4bdb9349f" providerId="LiveId" clId="{D4AAABE4-665D-427C-806E-52B893CA3FC7}" dt="2023-05-17T09:31:21.804" v="864" actId="478"/>
+          <ac:cxnSpMkLst>
+            <pc:docMk/>
+            <pc:sldMk cId="873796926" sldId="267"/>
+            <ac:cxnSpMk id="1130" creationId="{2716F5F7-3EAD-327B-DCB6-D884634CE6AE}"/>
+          </ac:cxnSpMkLst>
+        </pc:cxnChg>
+        <pc:cxnChg chg="add del mod">
+          <ac:chgData name="Markus Bilz" userId="a36021e4bdb9349f" providerId="LiveId" clId="{D4AAABE4-665D-427C-806E-52B893CA3FC7}" dt="2023-05-17T09:34:43.032" v="907" actId="478"/>
+          <ac:cxnSpMkLst>
+            <pc:docMk/>
+            <pc:sldMk cId="873796926" sldId="267"/>
+            <ac:cxnSpMk id="1133" creationId="{48415C9E-010D-EC41-E99C-EA1A5BB6C0EA}"/>
+          </ac:cxnSpMkLst>
+        </pc:cxnChg>
+        <pc:cxnChg chg="add del mod">
+          <ac:chgData name="Markus Bilz" userId="a36021e4bdb9349f" providerId="LiveId" clId="{D4AAABE4-665D-427C-806E-52B893CA3FC7}" dt="2023-05-17T09:34:43.864" v="908" actId="478"/>
+          <ac:cxnSpMkLst>
+            <pc:docMk/>
+            <pc:sldMk cId="873796926" sldId="267"/>
+            <ac:cxnSpMk id="1135" creationId="{BF75809E-6DC9-D1FF-4C12-0A5C1FC7236F}"/>
+          </ac:cxnSpMkLst>
+        </pc:cxnChg>
+        <pc:cxnChg chg="add mod">
+          <ac:chgData name="Markus Bilz" userId="a36021e4bdb9349f" providerId="LiveId" clId="{D4AAABE4-665D-427C-806E-52B893CA3FC7}" dt="2023-05-17T09:35:43.055" v="919" actId="1076"/>
+          <ac:cxnSpMkLst>
+            <pc:docMk/>
+            <pc:sldMk cId="873796926" sldId="267"/>
+            <ac:cxnSpMk id="1146" creationId="{ED9347FE-0487-02B5-306B-DE0E802E2AA8}"/>
+          </ac:cxnSpMkLst>
+        </pc:cxnChg>
+        <pc:cxnChg chg="add">
+          <ac:chgData name="Markus Bilz" userId="a36021e4bdb9349f" providerId="LiveId" clId="{D4AAABE4-665D-427C-806E-52B893CA3FC7}" dt="2023-05-17T09:35:49.620" v="920" actId="11529"/>
+          <ac:cxnSpMkLst>
+            <pc:docMk/>
+            <pc:sldMk cId="873796926" sldId="267"/>
+            <ac:cxnSpMk id="1151" creationId="{8E7EF643-CDE0-9438-A71E-E83B00532316}"/>
+          </ac:cxnSpMkLst>
+        </pc:cxnChg>
+      </pc:sldChg>
+      <pc:sldChg chg="addSp delSp modSp add mod">
+        <pc:chgData name="Markus Bilz" userId="a36021e4bdb9349f" providerId="LiveId" clId="{D4AAABE4-665D-427C-806E-52B893CA3FC7}" dt="2023-05-17T09:41:58.259" v="955" actId="20577"/>
+        <pc:sldMkLst>
+          <pc:docMk/>
+          <pc:sldMk cId="1744557679" sldId="268"/>
+        </pc:sldMkLst>
+        <pc:spChg chg="mod">
+          <ac:chgData name="Markus Bilz" userId="a36021e4bdb9349f" providerId="LiveId" clId="{D4AAABE4-665D-427C-806E-52B893CA3FC7}" dt="2023-05-17T09:41:24.862" v="944" actId="13822"/>
+          <ac:spMkLst>
+            <pc:docMk/>
+            <pc:sldMk cId="1744557679" sldId="268"/>
+            <ac:spMk id="6" creationId="{C96ED38C-E0B1-92C2-B807-5218346FC064}"/>
+          </ac:spMkLst>
+        </pc:spChg>
+        <pc:spChg chg="mod">
+          <ac:chgData name="Markus Bilz" userId="a36021e4bdb9349f" providerId="LiveId" clId="{D4AAABE4-665D-427C-806E-52B893CA3FC7}" dt="2023-05-17T09:41:13.788" v="943" actId="1076"/>
+          <ac:spMkLst>
+            <pc:docMk/>
+            <pc:sldMk cId="1744557679" sldId="268"/>
+            <ac:spMk id="14" creationId="{82EAA822-CF91-407C-ED09-D5430CB97B56}"/>
+          </ac:spMkLst>
+        </pc:spChg>
+        <pc:spChg chg="mod">
+          <ac:chgData name="Markus Bilz" userId="a36021e4bdb9349f" providerId="LiveId" clId="{D4AAABE4-665D-427C-806E-52B893CA3FC7}" dt="2023-05-17T09:41:13.788" v="943" actId="1076"/>
+          <ac:spMkLst>
+            <pc:docMk/>
+            <pc:sldMk cId="1744557679" sldId="268"/>
+            <ac:spMk id="15" creationId="{B840A789-AE83-25DF-4C82-D3C7149D69EB}"/>
+          </ac:spMkLst>
+        </pc:spChg>
+        <pc:spChg chg="mod">
+          <ac:chgData name="Markus Bilz" userId="a36021e4bdb9349f" providerId="LiveId" clId="{D4AAABE4-665D-427C-806E-52B893CA3FC7}" dt="2023-05-17T09:41:13.788" v="943" actId="1076"/>
+          <ac:spMkLst>
+            <pc:docMk/>
+            <pc:sldMk cId="1744557679" sldId="268"/>
+            <ac:spMk id="16" creationId="{B314F980-CFB9-6647-E835-3991B2D65FDE}"/>
+          </ac:spMkLst>
+        </pc:spChg>
+        <pc:spChg chg="mod">
+          <ac:chgData name="Markus Bilz" userId="a36021e4bdb9349f" providerId="LiveId" clId="{D4AAABE4-665D-427C-806E-52B893CA3FC7}" dt="2023-05-17T09:41:13.788" v="943" actId="1076"/>
+          <ac:spMkLst>
+            <pc:docMk/>
+            <pc:sldMk cId="1744557679" sldId="268"/>
+            <ac:spMk id="24" creationId="{8921449C-B172-6825-E7FF-0DDF75F501AD}"/>
+          </ac:spMkLst>
+        </pc:spChg>
+        <pc:spChg chg="mod">
+          <ac:chgData name="Markus Bilz" userId="a36021e4bdb9349f" providerId="LiveId" clId="{D4AAABE4-665D-427C-806E-52B893CA3FC7}" dt="2023-05-17T09:41:58.259" v="955" actId="20577"/>
+          <ac:spMkLst>
+            <pc:docMk/>
+            <pc:sldMk cId="1744557679" sldId="268"/>
+            <ac:spMk id="28" creationId="{4B3CD710-AFF5-C20D-00D6-894B9ECD4CFF}"/>
+          </ac:spMkLst>
+        </pc:spChg>
+        <pc:spChg chg="mod">
+          <ac:chgData name="Markus Bilz" userId="a36021e4bdb9349f" providerId="LiveId" clId="{D4AAABE4-665D-427C-806E-52B893CA3FC7}" dt="2023-05-17T09:41:51.667" v="945" actId="20577"/>
+          <ac:spMkLst>
+            <pc:docMk/>
+            <pc:sldMk cId="1744557679" sldId="268"/>
+            <ac:spMk id="1045" creationId="{248F470B-6828-B453-9C17-857109741461}"/>
+          </ac:spMkLst>
+        </pc:spChg>
+        <pc:spChg chg="del">
+          <ac:chgData name="Markus Bilz" userId="a36021e4bdb9349f" providerId="LiveId" clId="{D4AAABE4-665D-427C-806E-52B893CA3FC7}" dt="2023-05-17T09:39:24.811" v="924" actId="478"/>
+          <ac:spMkLst>
+            <pc:docMk/>
+            <pc:sldMk cId="1744557679" sldId="268"/>
+            <ac:spMk id="1117" creationId="{DE505CA9-73E5-CCB7-95F5-924561519BBB}"/>
+          </ac:spMkLst>
+        </pc:spChg>
+        <pc:spChg chg="del">
+          <ac:chgData name="Markus Bilz" userId="a36021e4bdb9349f" providerId="LiveId" clId="{D4AAABE4-665D-427C-806E-52B893CA3FC7}" dt="2023-05-17T09:39:26.200" v="925" actId="478"/>
+          <ac:spMkLst>
+            <pc:docMk/>
+            <pc:sldMk cId="1744557679" sldId="268"/>
+            <ac:spMk id="1144" creationId="{525344FD-F45D-9493-2133-714401194624}"/>
+          </ac:spMkLst>
+        </pc:spChg>
+        <pc:cxnChg chg="add mod">
+          <ac:chgData name="Markus Bilz" userId="a36021e4bdb9349f" providerId="LiveId" clId="{D4AAABE4-665D-427C-806E-52B893CA3FC7}" dt="2023-05-17T09:41:13.788" v="943" actId="1076"/>
+          <ac:cxnSpMkLst>
+            <pc:docMk/>
+            <pc:sldMk cId="1744557679" sldId="268"/>
+            <ac:cxnSpMk id="8" creationId="{C35F85DD-DD33-C5C1-5305-69177F185EF0}"/>
+          </ac:cxnSpMkLst>
+        </pc:cxnChg>
+        <pc:cxnChg chg="add mod">
+          <ac:chgData name="Markus Bilz" userId="a36021e4bdb9349f" providerId="LiveId" clId="{D4AAABE4-665D-427C-806E-52B893CA3FC7}" dt="2023-05-17T09:41:13.788" v="943" actId="1076"/>
+          <ac:cxnSpMkLst>
+            <pc:docMk/>
+            <pc:sldMk cId="1744557679" sldId="268"/>
+            <ac:cxnSpMk id="19" creationId="{67930102-8555-421A-FDA4-82124F08B5A1}"/>
+          </ac:cxnSpMkLst>
+        </pc:cxnChg>
+        <pc:cxnChg chg="mod">
+          <ac:chgData name="Markus Bilz" userId="a36021e4bdb9349f" providerId="LiveId" clId="{D4AAABE4-665D-427C-806E-52B893CA3FC7}" dt="2023-05-17T09:41:13.788" v="943" actId="1076"/>
+          <ac:cxnSpMkLst>
+            <pc:docMk/>
+            <pc:sldMk cId="1744557679" sldId="268"/>
+            <ac:cxnSpMk id="26" creationId="{3AC2BFD2-B4CE-E3EF-5184-DBED244D2E76}"/>
+          </ac:cxnSpMkLst>
+        </pc:cxnChg>
+        <pc:cxnChg chg="mod">
+          <ac:chgData name="Markus Bilz" userId="a36021e4bdb9349f" providerId="LiveId" clId="{D4AAABE4-665D-427C-806E-52B893CA3FC7}" dt="2023-05-17T09:41:13.788" v="943" actId="1076"/>
+          <ac:cxnSpMkLst>
+            <pc:docMk/>
+            <pc:sldMk cId="1744557679" sldId="268"/>
+            <ac:cxnSpMk id="1146" creationId="{ED9347FE-0487-02B5-306B-DE0E802E2AA8}"/>
+          </ac:cxnSpMkLst>
+        </pc:cxnChg>
+        <pc:cxnChg chg="mod">
+          <ac:chgData name="Markus Bilz" userId="a36021e4bdb9349f" providerId="LiveId" clId="{D4AAABE4-665D-427C-806E-52B893CA3FC7}" dt="2023-05-17T09:41:13.788" v="943" actId="1076"/>
+          <ac:cxnSpMkLst>
+            <pc:docMk/>
+            <pc:sldMk cId="1744557679" sldId="268"/>
+            <ac:cxnSpMk id="1151" creationId="{8E7EF643-CDE0-9438-A71E-E83B00532316}"/>
+          </ac:cxnSpMkLst>
+        </pc:cxnChg>
+      </pc:sldChg>
+    </pc:docChg>
+  </pc:docChgLst>
   <pc:docChgLst>
     <pc:chgData name="Markus Bilz" userId="a36021e4bdb9349f" providerId="LiveId" clId="{F9F2BE70-AAED-47FD-A055-7B08EB1371A3}"/>
     <pc:docChg chg="undo custSel addSld modSld sldOrd">
@@ -8574,7 +9109,7 @@
           <a:p>
             <a:fld id="{D6A82EB2-151D-4EEE-ACF5-92C73278C09C}" type="datetimeFigureOut">
               <a:rPr lang="en-GB" smtClean="0"/>
-              <a:t>24/04/2023</a:t>
+              <a:t>17/05/2023</a:t>
             </a:fld>
             <a:endParaRPr lang="en-GB"/>
           </a:p>
@@ -8774,7 +9309,7 @@
           <a:p>
             <a:fld id="{D6A82EB2-151D-4EEE-ACF5-92C73278C09C}" type="datetimeFigureOut">
               <a:rPr lang="en-GB" smtClean="0"/>
-              <a:t>24/04/2023</a:t>
+              <a:t>17/05/2023</a:t>
             </a:fld>
             <a:endParaRPr lang="en-GB"/>
           </a:p>
@@ -8984,7 +9519,7 @@
           <a:p>
             <a:fld id="{D6A82EB2-151D-4EEE-ACF5-92C73278C09C}" type="datetimeFigureOut">
               <a:rPr lang="en-GB" smtClean="0"/>
-              <a:t>24/04/2023</a:t>
+              <a:t>17/05/2023</a:t>
             </a:fld>
             <a:endParaRPr lang="en-GB"/>
           </a:p>
@@ -9184,7 +9719,7 @@
           <a:p>
             <a:fld id="{D6A82EB2-151D-4EEE-ACF5-92C73278C09C}" type="datetimeFigureOut">
               <a:rPr lang="en-GB" smtClean="0"/>
-              <a:t>24/04/2023</a:t>
+              <a:t>17/05/2023</a:t>
             </a:fld>
             <a:endParaRPr lang="en-GB"/>
           </a:p>
@@ -9460,7 +9995,7 @@
           <a:p>
             <a:fld id="{D6A82EB2-151D-4EEE-ACF5-92C73278C09C}" type="datetimeFigureOut">
               <a:rPr lang="en-GB" smtClean="0"/>
-              <a:t>24/04/2023</a:t>
+              <a:t>17/05/2023</a:t>
             </a:fld>
             <a:endParaRPr lang="en-GB"/>
           </a:p>
@@ -9728,7 +10263,7 @@
           <a:p>
             <a:fld id="{D6A82EB2-151D-4EEE-ACF5-92C73278C09C}" type="datetimeFigureOut">
               <a:rPr lang="en-GB" smtClean="0"/>
-              <a:t>24/04/2023</a:t>
+              <a:t>17/05/2023</a:t>
             </a:fld>
             <a:endParaRPr lang="en-GB"/>
           </a:p>
@@ -10143,7 +10678,7 @@
           <a:p>
             <a:fld id="{D6A82EB2-151D-4EEE-ACF5-92C73278C09C}" type="datetimeFigureOut">
               <a:rPr lang="en-GB" smtClean="0"/>
-              <a:t>24/04/2023</a:t>
+              <a:t>17/05/2023</a:t>
             </a:fld>
             <a:endParaRPr lang="en-GB"/>
           </a:p>
@@ -10285,7 +10820,7 @@
           <a:p>
             <a:fld id="{D6A82EB2-151D-4EEE-ACF5-92C73278C09C}" type="datetimeFigureOut">
               <a:rPr lang="en-GB" smtClean="0"/>
-              <a:t>24/04/2023</a:t>
+              <a:t>17/05/2023</a:t>
             </a:fld>
             <a:endParaRPr lang="en-GB"/>
           </a:p>
@@ -10398,7 +10933,7 @@
           <a:p>
             <a:fld id="{D6A82EB2-151D-4EEE-ACF5-92C73278C09C}" type="datetimeFigureOut">
               <a:rPr lang="en-GB" smtClean="0"/>
-              <a:t>24/04/2023</a:t>
+              <a:t>17/05/2023</a:t>
             </a:fld>
             <a:endParaRPr lang="en-GB"/>
           </a:p>
@@ -10711,7 +11246,7 @@
           <a:p>
             <a:fld id="{D6A82EB2-151D-4EEE-ACF5-92C73278C09C}" type="datetimeFigureOut">
               <a:rPr lang="en-GB" smtClean="0"/>
-              <a:t>24/04/2023</a:t>
+              <a:t>17/05/2023</a:t>
             </a:fld>
             <a:endParaRPr lang="en-GB"/>
           </a:p>
@@ -11000,7 +11535,7 @@
           <a:p>
             <a:fld id="{D6A82EB2-151D-4EEE-ACF5-92C73278C09C}" type="datetimeFigureOut">
               <a:rPr lang="en-GB" smtClean="0"/>
-              <a:t>24/04/2023</a:t>
+              <a:t>17/05/2023</a:t>
             </a:fld>
             <a:endParaRPr lang="en-GB"/>
           </a:p>
@@ -11243,7 +11778,7 @@
           <a:p>
             <a:fld id="{D6A82EB2-151D-4EEE-ACF5-92C73278C09C}" type="datetimeFigureOut">
               <a:rPr lang="en-GB" smtClean="0"/>
-              <a:t>24/04/2023</a:t>
+              <a:t>17/05/2023</a:t>
             </a:fld>
             <a:endParaRPr lang="en-GB"/>
           </a:p>
@@ -18225,6 +18760,116 @@
           <a:chExt cx="0" cy="0"/>
         </a:xfrm>
       </p:grpSpPr>
+      <p:sp>
+        <p:nvSpPr>
+          <p:cNvPr id="2" name="Title 1">
+            <a:extLst>
+              <a:ext uri="{FF2B5EF4-FFF2-40B4-BE49-F238E27FC236}">
+                <a16:creationId xmlns:a16="http://schemas.microsoft.com/office/drawing/2014/main" id="{9C25A884-0014-7B87-1AF5-C2A758D258BB}"/>
+              </a:ext>
+            </a:extLst>
+          </p:cNvPr>
+          <p:cNvSpPr>
+            <a:spLocks noGrp="1"/>
+          </p:cNvSpPr>
+          <p:nvPr>
+            <p:ph type="title"/>
+          </p:nvPr>
+        </p:nvSpPr>
+        <p:spPr/>
+        <p:txBody>
+          <a:bodyPr/>
+          <a:lstStyle/>
+          <a:p>
+            <a:endParaRPr lang="en-GB"/>
+          </a:p>
+        </p:txBody>
+      </p:sp>
+      <p:sp>
+        <p:nvSpPr>
+          <p:cNvPr id="3" name="Content Placeholder 2">
+            <a:extLst>
+              <a:ext uri="{FF2B5EF4-FFF2-40B4-BE49-F238E27FC236}">
+                <a16:creationId xmlns:a16="http://schemas.microsoft.com/office/drawing/2014/main" id="{EFD32671-D437-757C-1EA5-C048C3504F41}"/>
+              </a:ext>
+            </a:extLst>
+          </p:cNvPr>
+          <p:cNvSpPr>
+            <a:spLocks noGrp="1"/>
+          </p:cNvSpPr>
+          <p:nvPr>
+            <p:ph idx="1"/>
+          </p:nvPr>
+        </p:nvSpPr>
+        <p:spPr/>
+        <p:txBody>
+          <a:bodyPr/>
+          <a:lstStyle/>
+          <a:p>
+            <a:endParaRPr lang="en-GB"/>
+          </a:p>
+        </p:txBody>
+      </p:sp>
+      <p:pic>
+        <p:nvPicPr>
+          <p:cNvPr id="4" name="Picture 3">
+            <a:extLst>
+              <a:ext uri="{FF2B5EF4-FFF2-40B4-BE49-F238E27FC236}">
+                <a16:creationId xmlns:a16="http://schemas.microsoft.com/office/drawing/2014/main" id="{B7DB29C0-B5C8-8508-A26E-50B1D221C83C}"/>
+              </a:ext>
+            </a:extLst>
+          </p:cNvPr>
+          <p:cNvPicPr>
+            <a:picLocks noChangeAspect="1"/>
+          </p:cNvPicPr>
+          <p:nvPr/>
+        </p:nvPicPr>
+        <p:blipFill>
+          <a:blip r:embed="rId2"/>
+          <a:stretch>
+            <a:fillRect/>
+          </a:stretch>
+        </p:blipFill>
+        <p:spPr>
+          <a:xfrm>
+            <a:off x="400050" y="-314325"/>
+            <a:ext cx="11675147" cy="6858000"/>
+          </a:xfrm>
+          <a:prstGeom prst="rect">
+            <a:avLst/>
+          </a:prstGeom>
+        </p:spPr>
+      </p:pic>
+    </p:spTree>
+    <p:extLst>
+      <p:ext uri="{BB962C8B-B14F-4D97-AF65-F5344CB8AC3E}">
+        <p14:creationId xmlns:p14="http://schemas.microsoft.com/office/powerpoint/2010/main" val="1975984209"/>
+      </p:ext>
+    </p:extLst>
+  </p:cSld>
+  <p:clrMapOvr>
+    <a:masterClrMapping/>
+  </p:clrMapOvr>
+</p:sld>
+</file>
+
+<file path=ppt/slides/slide11.xml><?xml version="1.0" encoding="utf-8"?>
+<p:sld xmlns:a="http://schemas.openxmlformats.org/drawingml/2006/main" xmlns:r="http://schemas.openxmlformats.org/officeDocument/2006/relationships" xmlns:p="http://schemas.openxmlformats.org/presentationml/2006/main">
+  <p:cSld>
+    <p:spTree>
+      <p:nvGrpSpPr>
+        <p:cNvPr id="1" name=""/>
+        <p:cNvGrpSpPr/>
+        <p:nvPr/>
+      </p:nvGrpSpPr>
+      <p:grpSpPr>
+        <a:xfrm>
+          <a:off x="0" y="0"/>
+          <a:ext cx="0" cy="0"/>
+          <a:chOff x="0" y="0"/>
+          <a:chExt cx="0" cy="0"/>
+        </a:xfrm>
+      </p:grpSpPr>
       <p:pic>
         <p:nvPicPr>
           <p:cNvPr id="5" name="Picture 4">
@@ -19939,96 +20584,6 @@
 </file>
 
 <file path=ppt/slides/slide3.xml><?xml version="1.0" encoding="utf-8"?>
-<p:sld xmlns:a="http://schemas.openxmlformats.org/drawingml/2006/main" xmlns:r="http://schemas.openxmlformats.org/officeDocument/2006/relationships" xmlns:p="http://schemas.openxmlformats.org/presentationml/2006/main">
-  <p:cSld>
-    <p:spTree>
-      <p:nvGrpSpPr>
-        <p:cNvPr id="1" name=""/>
-        <p:cNvGrpSpPr/>
-        <p:nvPr/>
-      </p:nvGrpSpPr>
-      <p:grpSpPr>
-        <a:xfrm>
-          <a:off x="0" y="0"/>
-          <a:ext cx="0" cy="0"/>
-          <a:chOff x="0" y="0"/>
-          <a:chExt cx="0" cy="0"/>
-        </a:xfrm>
-      </p:grpSpPr>
-      <p:sp>
-        <p:nvSpPr>
-          <p:cNvPr id="2" name="Title 1">
-            <a:extLst>
-              <a:ext uri="{FF2B5EF4-FFF2-40B4-BE49-F238E27FC236}">
-                <a16:creationId xmlns:a16="http://schemas.microsoft.com/office/drawing/2014/main" id="{A0293965-D629-2279-04FB-29ACD69DD2D6}"/>
-              </a:ext>
-            </a:extLst>
-          </p:cNvPr>
-          <p:cNvSpPr>
-            <a:spLocks noGrp="1"/>
-          </p:cNvSpPr>
-          <p:nvPr>
-            <p:ph type="title"/>
-          </p:nvPr>
-        </p:nvSpPr>
-        <p:spPr/>
-        <p:txBody>
-          <a:bodyPr/>
-          <a:lstStyle/>
-          <a:p>
-            <a:endParaRPr lang="en-GB" dirty="0"/>
-          </a:p>
-        </p:txBody>
-      </p:sp>
-      <p:pic>
-        <p:nvPicPr>
-          <p:cNvPr id="5" name="Content Placeholder 4" descr="Diagram&#10;&#10;Description automatically generated">
-            <a:extLst>
-              <a:ext uri="{FF2B5EF4-FFF2-40B4-BE49-F238E27FC236}">
-                <a16:creationId xmlns:a16="http://schemas.microsoft.com/office/drawing/2014/main" id="{6A20F21E-4163-B9F0-D304-FA503742EB56}"/>
-              </a:ext>
-            </a:extLst>
-          </p:cNvPr>
-          <p:cNvPicPr>
-            <a:picLocks noGrp="1" noChangeAspect="1"/>
-          </p:cNvPicPr>
-          <p:nvPr>
-            <p:ph idx="1"/>
-          </p:nvPr>
-        </p:nvPicPr>
-        <p:blipFill>
-          <a:blip r:embed="rId2">
-            <a:extLst>
-              <a:ext uri="{28A0092B-C50C-407E-A947-70E740481C1C}">
-                <a14:useLocalDpi xmlns:a14="http://schemas.microsoft.com/office/drawing/2010/main" val="0"/>
-              </a:ext>
-            </a:extLst>
-          </a:blip>
-          <a:stretch>
-            <a:fillRect/>
-          </a:stretch>
-        </p:blipFill>
-        <p:spPr>
-          <a:xfrm>
-            <a:off x="2116001" y="764575"/>
-            <a:ext cx="7735712" cy="4351338"/>
-          </a:xfrm>
-        </p:spPr>
-      </p:pic>
-    </p:spTree>
-    <p:extLst>
-      <p:ext uri="{BB962C8B-B14F-4D97-AF65-F5344CB8AC3E}">
-        <p14:creationId xmlns:p14="http://schemas.microsoft.com/office/powerpoint/2010/main" val="350462512"/>
-      </p:ext>
-    </p:extLst>
-  </p:cSld>
-  <p:clrMapOvr>
-    <a:masterClrMapping/>
-  </p:clrMapOvr>
-</p:sld>
-</file>
-
-<file path=ppt/slides/slide4.xml><?xml version="1.0" encoding="utf-8"?>
 <p:sld xmlns:a="http://schemas.openxmlformats.org/drawingml/2006/main" xmlns:r="http://schemas.openxmlformats.org/officeDocument/2006/relationships" xmlns:p="http://schemas.openxmlformats.org/presentationml/2006/main">
   <p:cSld>
     <p:spTree>
@@ -22352,7 +22907,7 @@
 </p:sld>
 </file>
 
-<file path=ppt/slides/slide5.xml><?xml version="1.0" encoding="utf-8"?>
+<file path=ppt/slides/slide4.xml><?xml version="1.0" encoding="utf-8"?>
 <p:sld xmlns:a="http://schemas.openxmlformats.org/drawingml/2006/main" xmlns:r="http://schemas.openxmlformats.org/officeDocument/2006/relationships" xmlns:p="http://schemas.openxmlformats.org/presentationml/2006/main">
   <p:cSld>
     <p:spTree>
@@ -24615,7 +25170,3397 @@
 </p:sld>
 </file>
 
+<file path=ppt/slides/slide5.xml><?xml version="1.0" encoding="utf-8"?>
+<p:sld xmlns:a="http://schemas.openxmlformats.org/drawingml/2006/main" xmlns:r="http://schemas.openxmlformats.org/officeDocument/2006/relationships" xmlns:p="http://schemas.openxmlformats.org/presentationml/2006/main">
+  <p:cSld>
+    <p:spTree>
+      <p:nvGrpSpPr>
+        <p:cNvPr id="1" name=""/>
+        <p:cNvGrpSpPr/>
+        <p:nvPr/>
+      </p:nvGrpSpPr>
+      <p:grpSpPr>
+        <a:xfrm>
+          <a:off x="0" y="0"/>
+          <a:ext cx="0" cy="0"/>
+          <a:chOff x="0" y="0"/>
+          <a:chExt cx="0" cy="0"/>
+        </a:xfrm>
+      </p:grpSpPr>
+      <p:sp>
+        <p:nvSpPr>
+          <p:cNvPr id="1144" name="Rectangle 1143">
+            <a:extLst>
+              <a:ext uri="{FF2B5EF4-FFF2-40B4-BE49-F238E27FC236}">
+                <a16:creationId xmlns:a16="http://schemas.microsoft.com/office/drawing/2014/main" id="{525344FD-F45D-9493-2133-714401194624}"/>
+              </a:ext>
+            </a:extLst>
+          </p:cNvPr>
+          <p:cNvSpPr/>
+          <p:nvPr/>
+        </p:nvSpPr>
+        <p:spPr>
+          <a:xfrm>
+            <a:off x="4145280" y="1318260"/>
+            <a:ext cx="2324100" cy="4396740"/>
+          </a:xfrm>
+          <a:prstGeom prst="rect">
+            <a:avLst/>
+          </a:prstGeom>
+        </p:spPr>
+        <p:style>
+          <a:lnRef idx="2">
+            <a:schemeClr val="accent1">
+              <a:shade val="15000"/>
+            </a:schemeClr>
+          </a:lnRef>
+          <a:fillRef idx="1">
+            <a:schemeClr val="accent1"/>
+          </a:fillRef>
+          <a:effectRef idx="0">
+            <a:schemeClr val="accent1"/>
+          </a:effectRef>
+          <a:fontRef idx="minor">
+            <a:schemeClr val="lt1"/>
+          </a:fontRef>
+        </p:style>
+        <p:txBody>
+          <a:bodyPr rtlCol="0" anchor="ctr"/>
+          <a:lstStyle/>
+          <a:p>
+            <a:pPr algn="ctr"/>
+            <a:endParaRPr lang="en-GB"/>
+          </a:p>
+        </p:txBody>
+      </p:sp>
+      <p:sp>
+        <p:nvSpPr>
+          <p:cNvPr id="1121" name="Rectangle 1120">
+            <a:extLst>
+              <a:ext uri="{FF2B5EF4-FFF2-40B4-BE49-F238E27FC236}">
+                <a16:creationId xmlns:a16="http://schemas.microsoft.com/office/drawing/2014/main" id="{E53C962D-A3F5-9F2F-3BAD-FD3A2B5AADCC}"/>
+              </a:ext>
+            </a:extLst>
+          </p:cNvPr>
+          <p:cNvSpPr/>
+          <p:nvPr/>
+        </p:nvSpPr>
+        <p:spPr>
+          <a:xfrm>
+            <a:off x="4193337" y="4321403"/>
+            <a:ext cx="2182483" cy="1342797"/>
+          </a:xfrm>
+          <a:prstGeom prst="rect">
+            <a:avLst/>
+          </a:prstGeom>
+        </p:spPr>
+        <p:style>
+          <a:lnRef idx="2">
+            <a:schemeClr val="accent3">
+              <a:shade val="15000"/>
+            </a:schemeClr>
+          </a:lnRef>
+          <a:fillRef idx="1">
+            <a:schemeClr val="accent3"/>
+          </a:fillRef>
+          <a:effectRef idx="0">
+            <a:schemeClr val="accent3"/>
+          </a:effectRef>
+          <a:fontRef idx="minor">
+            <a:schemeClr val="lt1"/>
+          </a:fontRef>
+        </p:style>
+        <p:txBody>
+          <a:bodyPr rtlCol="0" anchor="t"/>
+          <a:lstStyle/>
+          <a:p>
+            <a:pPr algn="ctr"/>
+            <a:r>
+              <a:rPr lang="de-DE" dirty="0"/>
+              <a:t>TCR</a:t>
+            </a:r>
+            <a:endParaRPr lang="en-GB" dirty="0"/>
+          </a:p>
+        </p:txBody>
+      </p:sp>
+      <p:sp>
+        <p:nvSpPr>
+          <p:cNvPr id="1117" name="Rectangle 1116">
+            <a:extLst>
+              <a:ext uri="{FF2B5EF4-FFF2-40B4-BE49-F238E27FC236}">
+                <a16:creationId xmlns:a16="http://schemas.microsoft.com/office/drawing/2014/main" id="{DE505CA9-73E5-CCB7-95F5-924561519BBB}"/>
+              </a:ext>
+            </a:extLst>
+          </p:cNvPr>
+          <p:cNvSpPr/>
+          <p:nvPr/>
+        </p:nvSpPr>
+        <p:spPr>
+          <a:xfrm>
+            <a:off x="145212" y="1314449"/>
+            <a:ext cx="3931488" cy="4430743"/>
+          </a:xfrm>
+          <a:prstGeom prst="rect">
+            <a:avLst/>
+          </a:prstGeom>
+        </p:spPr>
+        <p:style>
+          <a:lnRef idx="2">
+            <a:schemeClr val="accent3">
+              <a:shade val="15000"/>
+            </a:schemeClr>
+          </a:lnRef>
+          <a:fillRef idx="1">
+            <a:schemeClr val="accent3"/>
+          </a:fillRef>
+          <a:effectRef idx="0">
+            <a:schemeClr val="accent3"/>
+          </a:effectRef>
+          <a:fontRef idx="minor">
+            <a:schemeClr val="lt1"/>
+          </a:fontRef>
+        </p:style>
+        <p:txBody>
+          <a:bodyPr rtlCol="0" anchor="t"/>
+          <a:lstStyle/>
+          <a:p>
+            <a:pPr algn="ctr"/>
+            <a:r>
+              <a:rPr lang="de-DE" dirty="0"/>
+              <a:t>Data</a:t>
+            </a:r>
+            <a:endParaRPr lang="en-GB" dirty="0"/>
+          </a:p>
+        </p:txBody>
+      </p:sp>
+      <p:sp>
+        <p:nvSpPr>
+          <p:cNvPr id="6" name="Rectangle 5">
+            <a:extLst>
+              <a:ext uri="{FF2B5EF4-FFF2-40B4-BE49-F238E27FC236}">
+                <a16:creationId xmlns:a16="http://schemas.microsoft.com/office/drawing/2014/main" id="{C96ED38C-E0B1-92C2-B807-5218346FC064}"/>
+              </a:ext>
+            </a:extLst>
+          </p:cNvPr>
+          <p:cNvSpPr/>
+          <p:nvPr/>
+        </p:nvSpPr>
+        <p:spPr>
+          <a:xfrm>
+            <a:off x="6722745" y="2637095"/>
+            <a:ext cx="2139495" cy="1704399"/>
+          </a:xfrm>
+          <a:prstGeom prst="rect">
+            <a:avLst/>
+          </a:prstGeom>
+        </p:spPr>
+        <p:style>
+          <a:lnRef idx="2">
+            <a:schemeClr val="accent1">
+              <a:shade val="15000"/>
+            </a:schemeClr>
+          </a:lnRef>
+          <a:fillRef idx="1">
+            <a:schemeClr val="accent1"/>
+          </a:fillRef>
+          <a:effectRef idx="0">
+            <a:schemeClr val="accent1"/>
+          </a:effectRef>
+          <a:fontRef idx="minor">
+            <a:schemeClr val="lt1"/>
+          </a:fontRef>
+        </p:style>
+        <p:txBody>
+          <a:bodyPr rtlCol="0" anchor="t"/>
+          <a:lstStyle/>
+          <a:p>
+            <a:pPr algn="ctr"/>
+            <a:r>
+              <a:rPr lang="de-DE" dirty="0"/>
+              <a:t>Feature Importances</a:t>
+            </a:r>
+            <a:endParaRPr lang="en-GB" dirty="0"/>
+          </a:p>
+        </p:txBody>
+      </p:sp>
+      <p:sp>
+        <p:nvSpPr>
+          <p:cNvPr id="12" name="Rectangle 11">
+            <a:extLst>
+              <a:ext uri="{FF2B5EF4-FFF2-40B4-BE49-F238E27FC236}">
+                <a16:creationId xmlns:a16="http://schemas.microsoft.com/office/drawing/2014/main" id="{7841179F-B9B5-2E56-DFA5-7DAA6C1BBD9D}"/>
+              </a:ext>
+            </a:extLst>
+          </p:cNvPr>
+          <p:cNvSpPr/>
+          <p:nvPr/>
+        </p:nvSpPr>
+        <p:spPr>
+          <a:xfrm>
+            <a:off x="4206240" y="1432559"/>
+            <a:ext cx="2160055" cy="2825115"/>
+          </a:xfrm>
+          <a:prstGeom prst="rect">
+            <a:avLst/>
+          </a:prstGeom>
+        </p:spPr>
+        <p:style>
+          <a:lnRef idx="2">
+            <a:schemeClr val="accent3">
+              <a:shade val="15000"/>
+            </a:schemeClr>
+          </a:lnRef>
+          <a:fillRef idx="1">
+            <a:schemeClr val="accent3"/>
+          </a:fillRef>
+          <a:effectRef idx="0">
+            <a:schemeClr val="accent3"/>
+          </a:effectRef>
+          <a:fontRef idx="minor">
+            <a:schemeClr val="lt1"/>
+          </a:fontRef>
+        </p:style>
+        <p:txBody>
+          <a:bodyPr rtlCol="0" anchor="t"/>
+          <a:lstStyle/>
+          <a:p>
+            <a:pPr algn="ctr"/>
+            <a:r>
+              <a:rPr lang="de-DE" dirty="0"/>
+              <a:t>ML</a:t>
+            </a:r>
+            <a:endParaRPr lang="en-GB" dirty="0"/>
+          </a:p>
+        </p:txBody>
+      </p:sp>
+      <p:sp>
+        <p:nvSpPr>
+          <p:cNvPr id="2" name="Title 1">
+            <a:extLst>
+              <a:ext uri="{FF2B5EF4-FFF2-40B4-BE49-F238E27FC236}">
+                <a16:creationId xmlns:a16="http://schemas.microsoft.com/office/drawing/2014/main" id="{683A413D-99D9-FCB9-77DB-9A11EE63A78C}"/>
+              </a:ext>
+            </a:extLst>
+          </p:cNvPr>
+          <p:cNvSpPr>
+            <a:spLocks noGrp="1"/>
+          </p:cNvSpPr>
+          <p:nvPr>
+            <p:ph type="title"/>
+          </p:nvPr>
+        </p:nvSpPr>
+        <p:spPr>
+          <a:xfrm>
+            <a:off x="133350" y="-311150"/>
+            <a:ext cx="10515600" cy="1325563"/>
+          </a:xfrm>
+        </p:spPr>
+        <p:txBody>
+          <a:bodyPr/>
+          <a:lstStyle/>
+          <a:p>
+            <a:r>
+              <a:rPr lang="de-DE" dirty="0"/>
+              <a:t>Research Framework</a:t>
+            </a:r>
+            <a:endParaRPr lang="en-GB" dirty="0"/>
+          </a:p>
+        </p:txBody>
+      </p:sp>
+      <p:sp>
+        <p:nvSpPr>
+          <p:cNvPr id="7" name="Cylinder 6">
+            <a:extLst>
+              <a:ext uri="{FF2B5EF4-FFF2-40B4-BE49-F238E27FC236}">
+                <a16:creationId xmlns:a16="http://schemas.microsoft.com/office/drawing/2014/main" id="{A023D810-4417-2CD5-6DB9-5A58ED07DAF1}"/>
+              </a:ext>
+            </a:extLst>
+          </p:cNvPr>
+          <p:cNvSpPr/>
+          <p:nvPr/>
+        </p:nvSpPr>
+        <p:spPr>
+          <a:xfrm>
+            <a:off x="265622" y="3332312"/>
+            <a:ext cx="1043795" cy="664234"/>
+          </a:xfrm>
+          <a:prstGeom prst="can">
+            <a:avLst/>
+          </a:prstGeom>
+        </p:spPr>
+        <p:style>
+          <a:lnRef idx="2">
+            <a:schemeClr val="accent1">
+              <a:shade val="15000"/>
+            </a:schemeClr>
+          </a:lnRef>
+          <a:fillRef idx="1">
+            <a:schemeClr val="accent1"/>
+          </a:fillRef>
+          <a:effectRef idx="0">
+            <a:schemeClr val="accent1"/>
+          </a:effectRef>
+          <a:fontRef idx="minor">
+            <a:schemeClr val="lt1"/>
+          </a:fontRef>
+        </p:style>
+        <p:txBody>
+          <a:bodyPr rtlCol="0" anchor="ctr"/>
+          <a:lstStyle/>
+          <a:p>
+            <a:pPr algn="ctr"/>
+            <a:r>
+              <a:rPr lang="de-DE" dirty="0"/>
+              <a:t>Option Data</a:t>
+            </a:r>
+            <a:endParaRPr lang="en-GB" dirty="0"/>
+          </a:p>
+        </p:txBody>
+      </p:sp>
+      <p:sp>
+        <p:nvSpPr>
+          <p:cNvPr id="9" name="Rectangle 8">
+            <a:extLst>
+              <a:ext uri="{FF2B5EF4-FFF2-40B4-BE49-F238E27FC236}">
+                <a16:creationId xmlns:a16="http://schemas.microsoft.com/office/drawing/2014/main" id="{C07D752C-D6F2-1D45-03EC-3F124EE97946}"/>
+              </a:ext>
+            </a:extLst>
+          </p:cNvPr>
+          <p:cNvSpPr/>
+          <p:nvPr/>
+        </p:nvSpPr>
+        <p:spPr>
+          <a:xfrm>
+            <a:off x="4299909" y="1723665"/>
+            <a:ext cx="1935193" cy="431321"/>
+          </a:xfrm>
+          <a:prstGeom prst="rect">
+            <a:avLst/>
+          </a:prstGeom>
+          <a:solidFill>
+            <a:srgbClr val="FFBDE6"/>
+          </a:solidFill>
+        </p:spPr>
+        <p:style>
+          <a:lnRef idx="2">
+            <a:schemeClr val="accent1">
+              <a:shade val="15000"/>
+            </a:schemeClr>
+          </a:lnRef>
+          <a:fillRef idx="1">
+            <a:schemeClr val="accent1"/>
+          </a:fillRef>
+          <a:effectRef idx="0">
+            <a:schemeClr val="accent1"/>
+          </a:effectRef>
+          <a:fontRef idx="minor">
+            <a:schemeClr val="lt1"/>
+          </a:fontRef>
+        </p:style>
+        <p:txBody>
+          <a:bodyPr rtlCol="0" anchor="ctr"/>
+          <a:lstStyle/>
+          <a:p>
+            <a:pPr algn="ctr"/>
+            <a:r>
+              <a:rPr lang="de-DE" dirty="0"/>
+              <a:t>Gradient </a:t>
+            </a:r>
+            <a:r>
+              <a:rPr lang="de-DE" dirty="0" err="1"/>
+              <a:t>Boosting</a:t>
+            </a:r>
+            <a:endParaRPr lang="en-GB" dirty="0"/>
+          </a:p>
+        </p:txBody>
+      </p:sp>
+      <p:sp>
+        <p:nvSpPr>
+          <p:cNvPr id="10" name="Rectangle 9">
+            <a:extLst>
+              <a:ext uri="{FF2B5EF4-FFF2-40B4-BE49-F238E27FC236}">
+                <a16:creationId xmlns:a16="http://schemas.microsoft.com/office/drawing/2014/main" id="{0622CB4B-1EC6-0675-AC6A-A3E25EF4A4A1}"/>
+              </a:ext>
+            </a:extLst>
+          </p:cNvPr>
+          <p:cNvSpPr/>
+          <p:nvPr/>
+        </p:nvSpPr>
+        <p:spPr>
+          <a:xfrm>
+            <a:off x="4303646" y="2204875"/>
+            <a:ext cx="1935193" cy="695865"/>
+          </a:xfrm>
+          <a:prstGeom prst="rect">
+            <a:avLst/>
+          </a:prstGeom>
+          <a:solidFill>
+            <a:srgbClr val="FFBDE6"/>
+          </a:solidFill>
+        </p:spPr>
+        <p:style>
+          <a:lnRef idx="2">
+            <a:schemeClr val="accent1">
+              <a:shade val="15000"/>
+            </a:schemeClr>
+          </a:lnRef>
+          <a:fillRef idx="1">
+            <a:schemeClr val="accent1"/>
+          </a:fillRef>
+          <a:effectRef idx="0">
+            <a:schemeClr val="accent1"/>
+          </a:effectRef>
+          <a:fontRef idx="minor">
+            <a:schemeClr val="lt1"/>
+          </a:fontRef>
+        </p:style>
+        <p:txBody>
+          <a:bodyPr rtlCol="0" anchor="t"/>
+          <a:lstStyle/>
+          <a:p>
+            <a:pPr algn="ctr"/>
+            <a:r>
+              <a:rPr lang="de-DE" dirty="0"/>
+              <a:t>Gradient </a:t>
+            </a:r>
+            <a:r>
+              <a:rPr lang="de-DE" dirty="0" err="1"/>
+              <a:t>Boosting</a:t>
+            </a:r>
+            <a:r>
+              <a:rPr lang="de-DE" dirty="0"/>
+              <a:t> </a:t>
+            </a:r>
+            <a:r>
+              <a:rPr lang="de-DE" dirty="0" err="1"/>
+              <a:t>with</a:t>
+            </a:r>
+            <a:r>
+              <a:rPr lang="de-DE" dirty="0"/>
+              <a:t> Self-Training</a:t>
+            </a:r>
+            <a:endParaRPr lang="en-GB" dirty="0"/>
+          </a:p>
+        </p:txBody>
+      </p:sp>
+      <p:sp>
+        <p:nvSpPr>
+          <p:cNvPr id="11" name="Rectangle 10">
+            <a:extLst>
+              <a:ext uri="{FF2B5EF4-FFF2-40B4-BE49-F238E27FC236}">
+                <a16:creationId xmlns:a16="http://schemas.microsoft.com/office/drawing/2014/main" id="{1B75BC38-F232-FB5B-95D7-76998D86AC90}"/>
+              </a:ext>
+            </a:extLst>
+          </p:cNvPr>
+          <p:cNvSpPr/>
+          <p:nvPr/>
+        </p:nvSpPr>
+        <p:spPr>
+          <a:xfrm>
+            <a:off x="4305443" y="4658983"/>
+            <a:ext cx="1935193" cy="423558"/>
+          </a:xfrm>
+          <a:prstGeom prst="rect">
+            <a:avLst/>
+          </a:prstGeom>
+          <a:solidFill>
+            <a:schemeClr val="accent4">
+              <a:lumMod val="60000"/>
+              <a:lumOff val="40000"/>
+            </a:schemeClr>
+          </a:solidFill>
+        </p:spPr>
+        <p:style>
+          <a:lnRef idx="2">
+            <a:schemeClr val="accent1">
+              <a:shade val="15000"/>
+            </a:schemeClr>
+          </a:lnRef>
+          <a:fillRef idx="1">
+            <a:schemeClr val="accent1"/>
+          </a:fillRef>
+          <a:effectRef idx="0">
+            <a:schemeClr val="accent1"/>
+          </a:effectRef>
+          <a:fontRef idx="minor">
+            <a:schemeClr val="lt1"/>
+          </a:fontRef>
+        </p:style>
+        <p:txBody>
+          <a:bodyPr rtlCol="0" anchor="ctr"/>
+          <a:lstStyle/>
+          <a:p>
+            <a:pPr algn="ctr"/>
+            <a:r>
+              <a:rPr lang="de-DE" dirty="0"/>
+              <a:t>Lee and Ready </a:t>
+            </a:r>
+            <a:endParaRPr lang="en-GB" dirty="0"/>
+          </a:p>
+        </p:txBody>
+      </p:sp>
+      <p:sp>
+        <p:nvSpPr>
+          <p:cNvPr id="13" name="Cylinder 12">
+            <a:extLst>
+              <a:ext uri="{FF2B5EF4-FFF2-40B4-BE49-F238E27FC236}">
+                <a16:creationId xmlns:a16="http://schemas.microsoft.com/office/drawing/2014/main" id="{EB67B30B-4D14-827E-5DB9-0B9167FF157A}"/>
+              </a:ext>
+            </a:extLst>
+          </p:cNvPr>
+          <p:cNvSpPr/>
+          <p:nvPr/>
+        </p:nvSpPr>
+        <p:spPr>
+          <a:xfrm>
+            <a:off x="292219" y="1465880"/>
+            <a:ext cx="1012165" cy="874144"/>
+          </a:xfrm>
+          <a:prstGeom prst="can">
+            <a:avLst/>
+          </a:prstGeom>
+        </p:spPr>
+        <p:style>
+          <a:lnRef idx="2">
+            <a:schemeClr val="accent1">
+              <a:shade val="15000"/>
+            </a:schemeClr>
+          </a:lnRef>
+          <a:fillRef idx="1">
+            <a:schemeClr val="accent1"/>
+          </a:fillRef>
+          <a:effectRef idx="0">
+            <a:schemeClr val="accent1"/>
+          </a:effectRef>
+          <a:fontRef idx="minor">
+            <a:schemeClr val="lt1"/>
+          </a:fontRef>
+        </p:style>
+        <p:txBody>
+          <a:bodyPr rtlCol="0" anchor="ctr"/>
+          <a:lstStyle/>
+          <a:p>
+            <a:pPr algn="ctr"/>
+            <a:r>
+              <a:rPr lang="de-DE" dirty="0"/>
+              <a:t>Trade Data</a:t>
+            </a:r>
+            <a:endParaRPr lang="en-GB" dirty="0"/>
+          </a:p>
+        </p:txBody>
+      </p:sp>
+      <p:sp>
+        <p:nvSpPr>
+          <p:cNvPr id="14" name="Rectangle 13">
+            <a:extLst>
+              <a:ext uri="{FF2B5EF4-FFF2-40B4-BE49-F238E27FC236}">
+                <a16:creationId xmlns:a16="http://schemas.microsoft.com/office/drawing/2014/main" id="{82EAA822-CF91-407C-ED09-D5430CB97B56}"/>
+              </a:ext>
+            </a:extLst>
+          </p:cNvPr>
+          <p:cNvSpPr/>
+          <p:nvPr/>
+        </p:nvSpPr>
+        <p:spPr>
+          <a:xfrm>
+            <a:off x="6709482" y="1321281"/>
+            <a:ext cx="2133600" cy="698740"/>
+          </a:xfrm>
+          <a:prstGeom prst="rect">
+            <a:avLst/>
+          </a:prstGeom>
+        </p:spPr>
+        <p:style>
+          <a:lnRef idx="2">
+            <a:schemeClr val="accent1">
+              <a:shade val="15000"/>
+            </a:schemeClr>
+          </a:lnRef>
+          <a:fillRef idx="1">
+            <a:schemeClr val="accent1"/>
+          </a:fillRef>
+          <a:effectRef idx="0">
+            <a:schemeClr val="accent1"/>
+          </a:effectRef>
+          <a:fontRef idx="minor">
+            <a:schemeClr val="lt1"/>
+          </a:fontRef>
+        </p:style>
+        <p:txBody>
+          <a:bodyPr rtlCol="0" anchor="ctr"/>
+          <a:lstStyle/>
+          <a:p>
+            <a:pPr algn="ctr"/>
+            <a:r>
+              <a:rPr lang="de-DE" dirty="0" err="1"/>
+              <a:t>Predictions</a:t>
+            </a:r>
+            <a:endParaRPr lang="en-GB" dirty="0"/>
+          </a:p>
+        </p:txBody>
+      </p:sp>
+      <p:sp>
+        <p:nvSpPr>
+          <p:cNvPr id="15" name="Rectangle 14">
+            <a:extLst>
+              <a:ext uri="{FF2B5EF4-FFF2-40B4-BE49-F238E27FC236}">
+                <a16:creationId xmlns:a16="http://schemas.microsoft.com/office/drawing/2014/main" id="{B840A789-AE83-25DF-4C82-D3C7149D69EB}"/>
+              </a:ext>
+            </a:extLst>
+          </p:cNvPr>
+          <p:cNvSpPr/>
+          <p:nvPr/>
+        </p:nvSpPr>
+        <p:spPr>
+          <a:xfrm>
+            <a:off x="6956520" y="3017698"/>
+            <a:ext cx="1616016" cy="537713"/>
+          </a:xfrm>
+          <a:prstGeom prst="rect">
+            <a:avLst/>
+          </a:prstGeom>
+        </p:spPr>
+        <p:style>
+          <a:lnRef idx="2">
+            <a:schemeClr val="accent1">
+              <a:shade val="15000"/>
+            </a:schemeClr>
+          </a:lnRef>
+          <a:fillRef idx="1">
+            <a:schemeClr val="accent1"/>
+          </a:fillRef>
+          <a:effectRef idx="0">
+            <a:schemeClr val="accent1"/>
+          </a:effectRef>
+          <a:fontRef idx="minor">
+            <a:schemeClr val="lt1"/>
+          </a:fontRef>
+        </p:style>
+        <p:txBody>
+          <a:bodyPr rtlCol="0" anchor="ctr"/>
+          <a:lstStyle/>
+          <a:p>
+            <a:pPr algn="ctr"/>
+            <a:r>
+              <a:rPr lang="de-DE" dirty="0"/>
+              <a:t>Attention Maps</a:t>
+            </a:r>
+            <a:endParaRPr lang="en-GB" dirty="0"/>
+          </a:p>
+        </p:txBody>
+      </p:sp>
+      <p:sp>
+        <p:nvSpPr>
+          <p:cNvPr id="16" name="Rectangle 15">
+            <a:extLst>
+              <a:ext uri="{FF2B5EF4-FFF2-40B4-BE49-F238E27FC236}">
+                <a16:creationId xmlns:a16="http://schemas.microsoft.com/office/drawing/2014/main" id="{B314F980-CFB9-6647-E835-3991B2D65FDE}"/>
+              </a:ext>
+            </a:extLst>
+          </p:cNvPr>
+          <p:cNvSpPr/>
+          <p:nvPr/>
+        </p:nvSpPr>
+        <p:spPr>
+          <a:xfrm>
+            <a:off x="6947031" y="3672011"/>
+            <a:ext cx="1616016" cy="537713"/>
+          </a:xfrm>
+          <a:prstGeom prst="rect">
+            <a:avLst/>
+          </a:prstGeom>
+        </p:spPr>
+        <p:style>
+          <a:lnRef idx="2">
+            <a:schemeClr val="accent1">
+              <a:shade val="15000"/>
+            </a:schemeClr>
+          </a:lnRef>
+          <a:fillRef idx="1">
+            <a:schemeClr val="accent1"/>
+          </a:fillRef>
+          <a:effectRef idx="0">
+            <a:schemeClr val="accent1"/>
+          </a:effectRef>
+          <a:fontRef idx="minor">
+            <a:schemeClr val="lt1"/>
+          </a:fontRef>
+        </p:style>
+        <p:txBody>
+          <a:bodyPr rtlCol="0" anchor="ctr"/>
+          <a:lstStyle/>
+          <a:p>
+            <a:pPr algn="ctr"/>
+            <a:r>
+              <a:rPr lang="de-DE" dirty="0"/>
+              <a:t>SAGE Values</a:t>
+            </a:r>
+            <a:endParaRPr lang="en-GB" dirty="0"/>
+          </a:p>
+        </p:txBody>
+      </p:sp>
+      <p:cxnSp>
+        <p:nvCxnSpPr>
+          <p:cNvPr id="26" name="Straight Arrow Connector 25">
+            <a:extLst>
+              <a:ext uri="{FF2B5EF4-FFF2-40B4-BE49-F238E27FC236}">
+                <a16:creationId xmlns:a16="http://schemas.microsoft.com/office/drawing/2014/main" id="{3AC2BFD2-B4CE-E3EF-5184-DBED244D2E76}"/>
+              </a:ext>
+            </a:extLst>
+          </p:cNvPr>
+          <p:cNvCxnSpPr>
+            <a:cxnSpLocks/>
+            <a:stCxn id="14" idx="3"/>
+          </p:cNvCxnSpPr>
+          <p:nvPr/>
+        </p:nvCxnSpPr>
+        <p:spPr>
+          <a:xfrm>
+            <a:off x="8843082" y="1670651"/>
+            <a:ext cx="247578" cy="0"/>
+          </a:xfrm>
+          <a:prstGeom prst="straightConnector1">
+            <a:avLst/>
+          </a:prstGeom>
+          <a:ln>
+            <a:tailEnd type="triangle"/>
+          </a:ln>
+        </p:spPr>
+        <p:style>
+          <a:lnRef idx="1">
+            <a:schemeClr val="accent1"/>
+          </a:lnRef>
+          <a:fillRef idx="0">
+            <a:schemeClr val="accent1"/>
+          </a:fillRef>
+          <a:effectRef idx="0">
+            <a:schemeClr val="accent1"/>
+          </a:effectRef>
+          <a:fontRef idx="minor">
+            <a:schemeClr val="tx1"/>
+          </a:fontRef>
+        </p:style>
+      </p:cxnSp>
+      <p:sp>
+        <p:nvSpPr>
+          <p:cNvPr id="28" name="Rectangle 27">
+            <a:extLst>
+              <a:ext uri="{FF2B5EF4-FFF2-40B4-BE49-F238E27FC236}">
+                <a16:creationId xmlns:a16="http://schemas.microsoft.com/office/drawing/2014/main" id="{4B3CD710-AFF5-C20D-00D6-894B9ECD4CFF}"/>
+              </a:ext>
+            </a:extLst>
+          </p:cNvPr>
+          <p:cNvSpPr/>
+          <p:nvPr/>
+        </p:nvSpPr>
+        <p:spPr>
+          <a:xfrm>
+            <a:off x="1603075" y="1867710"/>
+            <a:ext cx="2397425" cy="665132"/>
+          </a:xfrm>
+          <a:prstGeom prst="rect">
+            <a:avLst/>
+          </a:prstGeom>
+        </p:spPr>
+        <p:style>
+          <a:lnRef idx="2">
+            <a:schemeClr val="accent1">
+              <a:shade val="15000"/>
+            </a:schemeClr>
+          </a:lnRef>
+          <a:fillRef idx="1">
+            <a:schemeClr val="accent1"/>
+          </a:fillRef>
+          <a:effectRef idx="0">
+            <a:schemeClr val="accent1"/>
+          </a:effectRef>
+          <a:fontRef idx="minor">
+            <a:schemeClr val="lt1"/>
+          </a:fontRef>
+        </p:style>
+        <p:txBody>
+          <a:bodyPr rtlCol="0" anchor="t"/>
+          <a:lstStyle/>
+          <a:p>
+            <a:pPr algn="ctr"/>
+            <a:r>
+              <a:rPr lang="de-DE" dirty="0"/>
+              <a:t>Data Collection (6.1.1)</a:t>
+            </a:r>
+            <a:endParaRPr lang="en-GB" dirty="0"/>
+          </a:p>
+        </p:txBody>
+      </p:sp>
+      <p:sp>
+        <p:nvSpPr>
+          <p:cNvPr id="24" name="Rectangle 23">
+            <a:extLst>
+              <a:ext uri="{FF2B5EF4-FFF2-40B4-BE49-F238E27FC236}">
+                <a16:creationId xmlns:a16="http://schemas.microsoft.com/office/drawing/2014/main" id="{8921449C-B172-6825-E7FF-0DDF75F501AD}"/>
+              </a:ext>
+            </a:extLst>
+          </p:cNvPr>
+          <p:cNvSpPr/>
+          <p:nvPr/>
+        </p:nvSpPr>
+        <p:spPr>
+          <a:xfrm>
+            <a:off x="9102593" y="1288213"/>
+            <a:ext cx="1713781" cy="698740"/>
+          </a:xfrm>
+          <a:prstGeom prst="rect">
+            <a:avLst/>
+          </a:prstGeom>
+        </p:spPr>
+        <p:style>
+          <a:lnRef idx="2">
+            <a:schemeClr val="accent1">
+              <a:shade val="15000"/>
+            </a:schemeClr>
+          </a:lnRef>
+          <a:fillRef idx="1">
+            <a:schemeClr val="accent1"/>
+          </a:fillRef>
+          <a:effectRef idx="0">
+            <a:schemeClr val="accent1"/>
+          </a:effectRef>
+          <a:fontRef idx="minor">
+            <a:schemeClr val="lt1"/>
+          </a:fontRef>
+        </p:style>
+        <p:txBody>
+          <a:bodyPr rtlCol="0" anchor="ctr"/>
+          <a:lstStyle/>
+          <a:p>
+            <a:pPr algn="ctr"/>
+            <a:r>
+              <a:rPr lang="de-DE" dirty="0" err="1"/>
+              <a:t>Effective</a:t>
+            </a:r>
+            <a:r>
+              <a:rPr lang="de-DE" dirty="0"/>
+              <a:t> Spread </a:t>
+            </a:r>
+            <a:r>
+              <a:rPr lang="de-DE" dirty="0" err="1"/>
+              <a:t>Calculation</a:t>
+            </a:r>
+            <a:endParaRPr lang="en-GB" dirty="0"/>
+          </a:p>
+        </p:txBody>
+      </p:sp>
+      <p:sp>
+        <p:nvSpPr>
+          <p:cNvPr id="31" name="Cylinder 30">
+            <a:extLst>
+              <a:ext uri="{FF2B5EF4-FFF2-40B4-BE49-F238E27FC236}">
+                <a16:creationId xmlns:a16="http://schemas.microsoft.com/office/drawing/2014/main" id="{D3E48620-93F1-1D9E-966B-44CA6FF79461}"/>
+              </a:ext>
+            </a:extLst>
+          </p:cNvPr>
+          <p:cNvSpPr/>
+          <p:nvPr/>
+        </p:nvSpPr>
+        <p:spPr>
+          <a:xfrm>
+            <a:off x="287547" y="2392392"/>
+            <a:ext cx="1015041" cy="874144"/>
+          </a:xfrm>
+          <a:prstGeom prst="can">
+            <a:avLst/>
+          </a:prstGeom>
+        </p:spPr>
+        <p:style>
+          <a:lnRef idx="2">
+            <a:schemeClr val="accent1">
+              <a:shade val="15000"/>
+            </a:schemeClr>
+          </a:lnRef>
+          <a:fillRef idx="1">
+            <a:schemeClr val="accent1"/>
+          </a:fillRef>
+          <a:effectRef idx="0">
+            <a:schemeClr val="accent1"/>
+          </a:effectRef>
+          <a:fontRef idx="minor">
+            <a:schemeClr val="lt1"/>
+          </a:fontRef>
+        </p:style>
+        <p:txBody>
+          <a:bodyPr rtlCol="0" anchor="ctr"/>
+          <a:lstStyle/>
+          <a:p>
+            <a:pPr algn="ctr"/>
+            <a:r>
+              <a:rPr lang="de-DE" dirty="0"/>
+              <a:t>Trade </a:t>
+            </a:r>
+            <a:r>
+              <a:rPr lang="de-DE" dirty="0" err="1"/>
+              <a:t>Volumes</a:t>
+            </a:r>
+            <a:endParaRPr lang="en-GB" dirty="0"/>
+          </a:p>
+        </p:txBody>
+      </p:sp>
+      <p:sp>
+        <p:nvSpPr>
+          <p:cNvPr id="1038" name="Rectangle 1037">
+            <a:extLst>
+              <a:ext uri="{FF2B5EF4-FFF2-40B4-BE49-F238E27FC236}">
+                <a16:creationId xmlns:a16="http://schemas.microsoft.com/office/drawing/2014/main" id="{7D6D82FD-48ED-F01D-1A74-9047D884AECA}"/>
+              </a:ext>
+            </a:extLst>
+          </p:cNvPr>
+          <p:cNvSpPr/>
+          <p:nvPr/>
+        </p:nvSpPr>
+        <p:spPr>
+          <a:xfrm>
+            <a:off x="4279922" y="3022480"/>
+            <a:ext cx="1935193" cy="396815"/>
+          </a:xfrm>
+          <a:prstGeom prst="rect">
+            <a:avLst/>
+          </a:prstGeom>
+          <a:solidFill>
+            <a:srgbClr val="BFFFBD"/>
+          </a:solidFill>
+        </p:spPr>
+        <p:style>
+          <a:lnRef idx="2">
+            <a:schemeClr val="accent1">
+              <a:shade val="15000"/>
+            </a:schemeClr>
+          </a:lnRef>
+          <a:fillRef idx="1">
+            <a:schemeClr val="accent1"/>
+          </a:fillRef>
+          <a:effectRef idx="0">
+            <a:schemeClr val="accent1"/>
+          </a:effectRef>
+          <a:fontRef idx="minor">
+            <a:schemeClr val="lt1"/>
+          </a:fontRef>
+        </p:style>
+        <p:txBody>
+          <a:bodyPr rtlCol="0" anchor="t"/>
+          <a:lstStyle/>
+          <a:p>
+            <a:pPr algn="ctr"/>
+            <a:r>
+              <a:rPr lang="de-DE" dirty="0"/>
+              <a:t>Transformer</a:t>
+            </a:r>
+            <a:endParaRPr lang="en-GB" dirty="0"/>
+          </a:p>
+        </p:txBody>
+      </p:sp>
+      <p:sp>
+        <p:nvSpPr>
+          <p:cNvPr id="1039" name="Rectangle 1038">
+            <a:extLst>
+              <a:ext uri="{FF2B5EF4-FFF2-40B4-BE49-F238E27FC236}">
+                <a16:creationId xmlns:a16="http://schemas.microsoft.com/office/drawing/2014/main" id="{EA5BC06A-2FBC-17A7-CB31-F804E1DF1253}"/>
+              </a:ext>
+            </a:extLst>
+          </p:cNvPr>
+          <p:cNvSpPr/>
+          <p:nvPr/>
+        </p:nvSpPr>
+        <p:spPr>
+          <a:xfrm>
+            <a:off x="4277047" y="3509513"/>
+            <a:ext cx="1935193" cy="658483"/>
+          </a:xfrm>
+          <a:prstGeom prst="rect">
+            <a:avLst/>
+          </a:prstGeom>
+          <a:solidFill>
+            <a:srgbClr val="BFFFBD"/>
+          </a:solidFill>
+        </p:spPr>
+        <p:style>
+          <a:lnRef idx="2">
+            <a:schemeClr val="accent1">
+              <a:shade val="15000"/>
+            </a:schemeClr>
+          </a:lnRef>
+          <a:fillRef idx="1">
+            <a:schemeClr val="accent1"/>
+          </a:fillRef>
+          <a:effectRef idx="0">
+            <a:schemeClr val="accent1"/>
+          </a:effectRef>
+          <a:fontRef idx="minor">
+            <a:schemeClr val="lt1"/>
+          </a:fontRef>
+        </p:style>
+        <p:txBody>
+          <a:bodyPr rtlCol="0" anchor="t"/>
+          <a:lstStyle/>
+          <a:p>
+            <a:pPr algn="ctr"/>
+            <a:r>
+              <a:rPr lang="de-DE" dirty="0"/>
+              <a:t>Transformer</a:t>
+            </a:r>
+          </a:p>
+          <a:p>
+            <a:pPr algn="ctr"/>
+            <a:r>
+              <a:rPr lang="de-DE" dirty="0" err="1"/>
+              <a:t>With</a:t>
+            </a:r>
+            <a:r>
+              <a:rPr lang="de-DE" dirty="0"/>
+              <a:t> </a:t>
+            </a:r>
+            <a:r>
+              <a:rPr lang="de-DE" dirty="0" err="1"/>
+              <a:t>Pre</a:t>
+            </a:r>
+            <a:r>
+              <a:rPr lang="de-DE" dirty="0"/>
+              <a:t>-Training</a:t>
+            </a:r>
+            <a:endParaRPr lang="en-GB" dirty="0"/>
+          </a:p>
+        </p:txBody>
+      </p:sp>
+      <p:sp>
+        <p:nvSpPr>
+          <p:cNvPr id="1045" name="Rectangle 1044">
+            <a:extLst>
+              <a:ext uri="{FF2B5EF4-FFF2-40B4-BE49-F238E27FC236}">
+                <a16:creationId xmlns:a16="http://schemas.microsoft.com/office/drawing/2014/main" id="{248F470B-6828-B453-9C17-857109741461}"/>
+              </a:ext>
+            </a:extLst>
+          </p:cNvPr>
+          <p:cNvSpPr/>
+          <p:nvPr/>
+        </p:nvSpPr>
+        <p:spPr>
+          <a:xfrm>
+            <a:off x="2042160" y="2823210"/>
+            <a:ext cx="1952158" cy="685800"/>
+          </a:xfrm>
+          <a:prstGeom prst="rect">
+            <a:avLst/>
+          </a:prstGeom>
+        </p:spPr>
+        <p:style>
+          <a:lnRef idx="2">
+            <a:schemeClr val="accent1">
+              <a:shade val="15000"/>
+            </a:schemeClr>
+          </a:lnRef>
+          <a:fillRef idx="1">
+            <a:schemeClr val="accent1"/>
+          </a:fillRef>
+          <a:effectRef idx="0">
+            <a:schemeClr val="accent1"/>
+          </a:effectRef>
+          <a:fontRef idx="minor">
+            <a:schemeClr val="lt1"/>
+          </a:fontRef>
+        </p:style>
+        <p:txBody>
+          <a:bodyPr rtlCol="0" anchor="ctr"/>
+          <a:lstStyle/>
+          <a:p>
+            <a:pPr algn="ctr"/>
+            <a:r>
+              <a:rPr lang="de-DE" dirty="0"/>
+              <a:t>Data </a:t>
+            </a:r>
+            <a:r>
+              <a:rPr lang="de-DE" dirty="0" err="1"/>
+              <a:t>Pre-processing</a:t>
+            </a:r>
+            <a:r>
+              <a:rPr lang="de-DE" dirty="0"/>
+              <a:t> (6.1.2)</a:t>
+            </a:r>
+            <a:endParaRPr lang="en-GB" dirty="0"/>
+          </a:p>
+        </p:txBody>
+      </p:sp>
+      <p:cxnSp>
+        <p:nvCxnSpPr>
+          <p:cNvPr id="1049" name="Straight Arrow Connector 1048">
+            <a:extLst>
+              <a:ext uri="{FF2B5EF4-FFF2-40B4-BE49-F238E27FC236}">
+                <a16:creationId xmlns:a16="http://schemas.microsoft.com/office/drawing/2014/main" id="{947672B4-A862-CD5E-8962-722CE895CD75}"/>
+              </a:ext>
+            </a:extLst>
+          </p:cNvPr>
+          <p:cNvCxnSpPr>
+            <a:cxnSpLocks/>
+            <a:stCxn id="7" idx="4"/>
+            <a:endCxn id="28" idx="1"/>
+          </p:cNvCxnSpPr>
+          <p:nvPr/>
+        </p:nvCxnSpPr>
+        <p:spPr>
+          <a:xfrm flipV="1">
+            <a:off x="1309417" y="2200276"/>
+            <a:ext cx="293658" cy="1464153"/>
+          </a:xfrm>
+          <a:prstGeom prst="straightConnector1">
+            <a:avLst/>
+          </a:prstGeom>
+          <a:ln>
+            <a:tailEnd type="triangle"/>
+          </a:ln>
+        </p:spPr>
+        <p:style>
+          <a:lnRef idx="1">
+            <a:schemeClr val="accent1"/>
+          </a:lnRef>
+          <a:fillRef idx="0">
+            <a:schemeClr val="accent1"/>
+          </a:fillRef>
+          <a:effectRef idx="0">
+            <a:schemeClr val="accent1"/>
+          </a:effectRef>
+          <a:fontRef idx="minor">
+            <a:schemeClr val="tx1"/>
+          </a:fontRef>
+        </p:style>
+      </p:cxnSp>
+      <p:cxnSp>
+        <p:nvCxnSpPr>
+          <p:cNvPr id="1051" name="Straight Arrow Connector 1050">
+            <a:extLst>
+              <a:ext uri="{FF2B5EF4-FFF2-40B4-BE49-F238E27FC236}">
+                <a16:creationId xmlns:a16="http://schemas.microsoft.com/office/drawing/2014/main" id="{F7A728D3-8722-0B93-8973-BA154348ECF1}"/>
+              </a:ext>
+            </a:extLst>
+          </p:cNvPr>
+          <p:cNvCxnSpPr>
+            <a:cxnSpLocks/>
+            <a:stCxn id="13" idx="4"/>
+            <a:endCxn id="28" idx="1"/>
+          </p:cNvCxnSpPr>
+          <p:nvPr/>
+        </p:nvCxnSpPr>
+        <p:spPr>
+          <a:xfrm>
+            <a:off x="1304384" y="1902952"/>
+            <a:ext cx="298691" cy="297324"/>
+          </a:xfrm>
+          <a:prstGeom prst="straightConnector1">
+            <a:avLst/>
+          </a:prstGeom>
+          <a:ln>
+            <a:tailEnd type="triangle"/>
+          </a:ln>
+        </p:spPr>
+        <p:style>
+          <a:lnRef idx="1">
+            <a:schemeClr val="accent1"/>
+          </a:lnRef>
+          <a:fillRef idx="0">
+            <a:schemeClr val="accent1"/>
+          </a:fillRef>
+          <a:effectRef idx="0">
+            <a:schemeClr val="accent1"/>
+          </a:effectRef>
+          <a:fontRef idx="minor">
+            <a:schemeClr val="tx1"/>
+          </a:fontRef>
+        </p:style>
+      </p:cxnSp>
+      <p:cxnSp>
+        <p:nvCxnSpPr>
+          <p:cNvPr id="1053" name="Straight Arrow Connector 1052">
+            <a:extLst>
+              <a:ext uri="{FF2B5EF4-FFF2-40B4-BE49-F238E27FC236}">
+                <a16:creationId xmlns:a16="http://schemas.microsoft.com/office/drawing/2014/main" id="{9D823643-CC23-9E39-C296-C46251E24A2B}"/>
+              </a:ext>
+            </a:extLst>
+          </p:cNvPr>
+          <p:cNvCxnSpPr>
+            <a:cxnSpLocks/>
+            <a:stCxn id="31" idx="4"/>
+            <a:endCxn id="28" idx="1"/>
+          </p:cNvCxnSpPr>
+          <p:nvPr/>
+        </p:nvCxnSpPr>
+        <p:spPr>
+          <a:xfrm flipV="1">
+            <a:off x="1302588" y="2200276"/>
+            <a:ext cx="300487" cy="629188"/>
+          </a:xfrm>
+          <a:prstGeom prst="straightConnector1">
+            <a:avLst/>
+          </a:prstGeom>
+          <a:ln>
+            <a:tailEnd type="triangle"/>
+          </a:ln>
+        </p:spPr>
+        <p:style>
+          <a:lnRef idx="1">
+            <a:schemeClr val="accent1"/>
+          </a:lnRef>
+          <a:fillRef idx="0">
+            <a:schemeClr val="accent1"/>
+          </a:fillRef>
+          <a:effectRef idx="0">
+            <a:schemeClr val="accent1"/>
+          </a:effectRef>
+          <a:fontRef idx="minor">
+            <a:schemeClr val="tx1"/>
+          </a:fontRef>
+        </p:style>
+      </p:cxnSp>
+      <p:cxnSp>
+        <p:nvCxnSpPr>
+          <p:cNvPr id="1062" name="Straight Arrow Connector 1061">
+            <a:extLst>
+              <a:ext uri="{FF2B5EF4-FFF2-40B4-BE49-F238E27FC236}">
+                <a16:creationId xmlns:a16="http://schemas.microsoft.com/office/drawing/2014/main" id="{E0DCA4C1-ADEB-CDDC-CBE6-65E85A9C6396}"/>
+              </a:ext>
+            </a:extLst>
+          </p:cNvPr>
+          <p:cNvCxnSpPr>
+            <a:cxnSpLocks/>
+            <a:endCxn id="1045" idx="0"/>
+          </p:cNvCxnSpPr>
+          <p:nvPr/>
+        </p:nvCxnSpPr>
+        <p:spPr>
+          <a:xfrm flipH="1">
+            <a:off x="3018239" y="2579370"/>
+            <a:ext cx="3810" cy="243840"/>
+          </a:xfrm>
+          <a:prstGeom prst="straightConnector1">
+            <a:avLst/>
+          </a:prstGeom>
+          <a:ln>
+            <a:tailEnd type="triangle"/>
+          </a:ln>
+        </p:spPr>
+        <p:style>
+          <a:lnRef idx="1">
+            <a:schemeClr val="accent1"/>
+          </a:lnRef>
+          <a:fillRef idx="0">
+            <a:schemeClr val="accent1"/>
+          </a:fillRef>
+          <a:effectRef idx="0">
+            <a:schemeClr val="accent1"/>
+          </a:effectRef>
+          <a:fontRef idx="minor">
+            <a:schemeClr val="tx1"/>
+          </a:fontRef>
+        </p:style>
+      </p:cxnSp>
+      <p:cxnSp>
+        <p:nvCxnSpPr>
+          <p:cNvPr id="1066" name="Connector: Elbow 1065">
+            <a:extLst>
+              <a:ext uri="{FF2B5EF4-FFF2-40B4-BE49-F238E27FC236}">
+                <a16:creationId xmlns:a16="http://schemas.microsoft.com/office/drawing/2014/main" id="{E71BF84D-0393-4CAD-E3F4-BA5F9AE022BA}"/>
+              </a:ext>
+            </a:extLst>
+          </p:cNvPr>
+          <p:cNvCxnSpPr>
+            <a:cxnSpLocks/>
+            <a:endCxn id="1121" idx="1"/>
+          </p:cNvCxnSpPr>
+          <p:nvPr/>
+        </p:nvCxnSpPr>
+        <p:spPr>
+          <a:xfrm rot="16200000" flipH="1">
+            <a:off x="1712912" y="2512377"/>
+            <a:ext cx="2544878" cy="2415972"/>
+          </a:xfrm>
+          <a:prstGeom prst="bentConnector2">
+            <a:avLst/>
+          </a:prstGeom>
+          <a:ln>
+            <a:tailEnd type="triangle"/>
+          </a:ln>
+        </p:spPr>
+        <p:style>
+          <a:lnRef idx="1">
+            <a:schemeClr val="accent1"/>
+          </a:lnRef>
+          <a:fillRef idx="0">
+            <a:schemeClr val="accent1"/>
+          </a:fillRef>
+          <a:effectRef idx="0">
+            <a:schemeClr val="accent1"/>
+          </a:effectRef>
+          <a:fontRef idx="minor">
+            <a:schemeClr val="tx1"/>
+          </a:fontRef>
+        </p:style>
+      </p:cxnSp>
+      <p:cxnSp>
+        <p:nvCxnSpPr>
+          <p:cNvPr id="1073" name="Straight Arrow Connector 1072">
+            <a:extLst>
+              <a:ext uri="{FF2B5EF4-FFF2-40B4-BE49-F238E27FC236}">
+                <a16:creationId xmlns:a16="http://schemas.microsoft.com/office/drawing/2014/main" id="{078A6480-11C1-65A5-F130-9CA8B2071AFD}"/>
+              </a:ext>
+            </a:extLst>
+          </p:cNvPr>
+          <p:cNvCxnSpPr>
+            <a:cxnSpLocks/>
+            <a:stCxn id="1045" idx="3"/>
+          </p:cNvCxnSpPr>
+          <p:nvPr/>
+        </p:nvCxnSpPr>
+        <p:spPr>
+          <a:xfrm>
+            <a:off x="3994318" y="3166110"/>
+            <a:ext cx="211922" cy="0"/>
+          </a:xfrm>
+          <a:prstGeom prst="straightConnector1">
+            <a:avLst/>
+          </a:prstGeom>
+          <a:ln>
+            <a:tailEnd type="triangle"/>
+          </a:ln>
+        </p:spPr>
+        <p:style>
+          <a:lnRef idx="1">
+            <a:schemeClr val="accent1"/>
+          </a:lnRef>
+          <a:fillRef idx="0">
+            <a:schemeClr val="accent1"/>
+          </a:fillRef>
+          <a:effectRef idx="0">
+            <a:schemeClr val="accent1"/>
+          </a:effectRef>
+          <a:fontRef idx="minor">
+            <a:schemeClr val="tx1"/>
+          </a:fontRef>
+        </p:style>
+      </p:cxnSp>
+      <p:sp>
+        <p:nvSpPr>
+          <p:cNvPr id="1087" name="TextBox 1086">
+            <a:extLst>
+              <a:ext uri="{FF2B5EF4-FFF2-40B4-BE49-F238E27FC236}">
+                <a16:creationId xmlns:a16="http://schemas.microsoft.com/office/drawing/2014/main" id="{3ABA7E38-A92B-39B5-3ADF-F959A7EA04F9}"/>
+              </a:ext>
+            </a:extLst>
+          </p:cNvPr>
+          <p:cNvSpPr txBox="1"/>
+          <p:nvPr/>
+        </p:nvSpPr>
+        <p:spPr>
+          <a:xfrm>
+            <a:off x="4168140" y="5920740"/>
+            <a:ext cx="2110740" cy="646331"/>
+          </a:xfrm>
+          <a:prstGeom prst="rect">
+            <a:avLst/>
+          </a:prstGeom>
+          <a:noFill/>
+        </p:spPr>
+        <p:txBody>
+          <a:bodyPr wrap="square" rtlCol="0">
+            <a:spAutoFit/>
+          </a:bodyPr>
+          <a:lstStyle/>
+          <a:p>
+            <a:r>
+              <a:rPr lang="de-DE" dirty="0"/>
+              <a:t>Training + Tuning</a:t>
+            </a:r>
+          </a:p>
+          <a:p>
+            <a:r>
+              <a:rPr lang="de-DE" dirty="0"/>
+              <a:t>(Ca. Chapter 6.2)</a:t>
+            </a:r>
+            <a:endParaRPr lang="en-GB" dirty="0"/>
+          </a:p>
+        </p:txBody>
+      </p:sp>
+      <p:sp>
+        <p:nvSpPr>
+          <p:cNvPr id="1088" name="TextBox 1087">
+            <a:extLst>
+              <a:ext uri="{FF2B5EF4-FFF2-40B4-BE49-F238E27FC236}">
+                <a16:creationId xmlns:a16="http://schemas.microsoft.com/office/drawing/2014/main" id="{8ED72B36-51D0-895F-9960-38EFB9E127E0}"/>
+              </a:ext>
+            </a:extLst>
+          </p:cNvPr>
+          <p:cNvSpPr txBox="1"/>
+          <p:nvPr/>
+        </p:nvSpPr>
+        <p:spPr>
+          <a:xfrm>
+            <a:off x="6777990" y="5953125"/>
+            <a:ext cx="2110740" cy="646331"/>
+          </a:xfrm>
+          <a:prstGeom prst="rect">
+            <a:avLst/>
+          </a:prstGeom>
+          <a:noFill/>
+        </p:spPr>
+        <p:txBody>
+          <a:bodyPr wrap="square" rtlCol="0">
+            <a:spAutoFit/>
+          </a:bodyPr>
+          <a:lstStyle/>
+          <a:p>
+            <a:r>
+              <a:rPr lang="de-DE" dirty="0"/>
+              <a:t>Evaluation</a:t>
+            </a:r>
+          </a:p>
+          <a:p>
+            <a:r>
+              <a:rPr lang="de-DE" dirty="0"/>
+              <a:t>(Ca. Chapter 6.3)</a:t>
+            </a:r>
+            <a:endParaRPr lang="en-GB" dirty="0"/>
+          </a:p>
+        </p:txBody>
+      </p:sp>
+      <p:sp>
+        <p:nvSpPr>
+          <p:cNvPr id="1089" name="TextBox 1088">
+            <a:extLst>
+              <a:ext uri="{FF2B5EF4-FFF2-40B4-BE49-F238E27FC236}">
+                <a16:creationId xmlns:a16="http://schemas.microsoft.com/office/drawing/2014/main" id="{0CC40106-6295-6FC3-DB4D-60B99CFB8E3C}"/>
+              </a:ext>
+            </a:extLst>
+          </p:cNvPr>
+          <p:cNvSpPr txBox="1"/>
+          <p:nvPr/>
+        </p:nvSpPr>
+        <p:spPr>
+          <a:xfrm>
+            <a:off x="9176385" y="5934075"/>
+            <a:ext cx="2110740" cy="646331"/>
+          </a:xfrm>
+          <a:prstGeom prst="rect">
+            <a:avLst/>
+          </a:prstGeom>
+          <a:noFill/>
+        </p:spPr>
+        <p:txBody>
+          <a:bodyPr wrap="square" rtlCol="0">
+            <a:spAutoFit/>
+          </a:bodyPr>
+          <a:lstStyle/>
+          <a:p>
+            <a:r>
+              <a:rPr lang="de-DE" dirty="0" err="1"/>
+              <a:t>Application</a:t>
+            </a:r>
+            <a:r>
+              <a:rPr lang="de-DE" dirty="0"/>
+              <a:t> Study</a:t>
+            </a:r>
+          </a:p>
+          <a:p>
+            <a:r>
+              <a:rPr lang="de-DE" dirty="0"/>
+              <a:t>(Ca. Chapter 8)</a:t>
+            </a:r>
+            <a:endParaRPr lang="en-GB" dirty="0"/>
+          </a:p>
+        </p:txBody>
+      </p:sp>
+      <p:sp>
+        <p:nvSpPr>
+          <p:cNvPr id="1090" name="TextBox 1089">
+            <a:extLst>
+              <a:ext uri="{FF2B5EF4-FFF2-40B4-BE49-F238E27FC236}">
+                <a16:creationId xmlns:a16="http://schemas.microsoft.com/office/drawing/2014/main" id="{3BDBA4C7-B634-2603-5CF6-AEED66974E30}"/>
+              </a:ext>
+            </a:extLst>
+          </p:cNvPr>
+          <p:cNvSpPr txBox="1"/>
+          <p:nvPr/>
+        </p:nvSpPr>
+        <p:spPr>
+          <a:xfrm>
+            <a:off x="876300" y="5899785"/>
+            <a:ext cx="2110740" cy="646331"/>
+          </a:xfrm>
+          <a:prstGeom prst="rect">
+            <a:avLst/>
+          </a:prstGeom>
+          <a:noFill/>
+        </p:spPr>
+        <p:txBody>
+          <a:bodyPr wrap="square" rtlCol="0">
+            <a:spAutoFit/>
+          </a:bodyPr>
+          <a:lstStyle/>
+          <a:p>
+            <a:r>
+              <a:rPr lang="de-DE" dirty="0"/>
+              <a:t>Data + </a:t>
+            </a:r>
+            <a:r>
+              <a:rPr lang="de-DE" dirty="0" err="1"/>
+              <a:t>Preparation</a:t>
+            </a:r>
+            <a:endParaRPr lang="de-DE" dirty="0"/>
+          </a:p>
+          <a:p>
+            <a:r>
+              <a:rPr lang="de-DE" dirty="0"/>
+              <a:t>(Ca. Chapter 6.1)</a:t>
+            </a:r>
+            <a:endParaRPr lang="en-GB" dirty="0"/>
+          </a:p>
+        </p:txBody>
+      </p:sp>
+      <p:sp>
+        <p:nvSpPr>
+          <p:cNvPr id="1125" name="Rectangle 1124">
+            <a:extLst>
+              <a:ext uri="{FF2B5EF4-FFF2-40B4-BE49-F238E27FC236}">
+                <a16:creationId xmlns:a16="http://schemas.microsoft.com/office/drawing/2014/main" id="{2AE0B6A0-64CC-643E-83FF-5424FDAE07A3}"/>
+              </a:ext>
+            </a:extLst>
+          </p:cNvPr>
+          <p:cNvSpPr/>
+          <p:nvPr/>
+        </p:nvSpPr>
+        <p:spPr>
+          <a:xfrm>
+            <a:off x="4305443" y="5154283"/>
+            <a:ext cx="1935193" cy="423558"/>
+          </a:xfrm>
+          <a:prstGeom prst="rect">
+            <a:avLst/>
+          </a:prstGeom>
+          <a:solidFill>
+            <a:schemeClr val="accent4">
+              <a:lumMod val="60000"/>
+              <a:lumOff val="40000"/>
+            </a:schemeClr>
+          </a:solidFill>
+        </p:spPr>
+        <p:style>
+          <a:lnRef idx="2">
+            <a:schemeClr val="accent1">
+              <a:shade val="15000"/>
+            </a:schemeClr>
+          </a:lnRef>
+          <a:fillRef idx="1">
+            <a:schemeClr val="accent1"/>
+          </a:fillRef>
+          <a:effectRef idx="0">
+            <a:schemeClr val="accent1"/>
+          </a:effectRef>
+          <a:fontRef idx="minor">
+            <a:schemeClr val="lt1"/>
+          </a:fontRef>
+        </p:style>
+        <p:txBody>
+          <a:bodyPr rtlCol="0" anchor="ctr"/>
+          <a:lstStyle/>
+          <a:p>
+            <a:pPr algn="ctr"/>
+            <a:r>
+              <a:rPr lang="de-DE" dirty="0"/>
+              <a:t>…</a:t>
+            </a:r>
+            <a:endParaRPr lang="en-GB" dirty="0"/>
+          </a:p>
+        </p:txBody>
+      </p:sp>
+      <p:cxnSp>
+        <p:nvCxnSpPr>
+          <p:cNvPr id="1146" name="Straight Arrow Connector 1145">
+            <a:extLst>
+              <a:ext uri="{FF2B5EF4-FFF2-40B4-BE49-F238E27FC236}">
+                <a16:creationId xmlns:a16="http://schemas.microsoft.com/office/drawing/2014/main" id="{ED9347FE-0487-02B5-306B-DE0E802E2AA8}"/>
+              </a:ext>
+            </a:extLst>
+          </p:cNvPr>
+          <p:cNvCxnSpPr>
+            <a:stCxn id="1144" idx="3"/>
+            <a:endCxn id="6" idx="1"/>
+          </p:cNvCxnSpPr>
+          <p:nvPr/>
+        </p:nvCxnSpPr>
+        <p:spPr>
+          <a:xfrm flipV="1">
+            <a:off x="6469380" y="3489295"/>
+            <a:ext cx="253365" cy="27335"/>
+          </a:xfrm>
+          <a:prstGeom prst="straightConnector1">
+            <a:avLst/>
+          </a:prstGeom>
+          <a:ln>
+            <a:tailEnd type="triangle"/>
+          </a:ln>
+        </p:spPr>
+        <p:style>
+          <a:lnRef idx="1">
+            <a:schemeClr val="accent1"/>
+          </a:lnRef>
+          <a:fillRef idx="0">
+            <a:schemeClr val="accent1"/>
+          </a:fillRef>
+          <a:effectRef idx="0">
+            <a:schemeClr val="accent1"/>
+          </a:effectRef>
+          <a:fontRef idx="minor">
+            <a:schemeClr val="tx1"/>
+          </a:fontRef>
+        </p:style>
+      </p:cxnSp>
+      <p:cxnSp>
+        <p:nvCxnSpPr>
+          <p:cNvPr id="1151" name="Straight Arrow Connector 1150">
+            <a:extLst>
+              <a:ext uri="{FF2B5EF4-FFF2-40B4-BE49-F238E27FC236}">
+                <a16:creationId xmlns:a16="http://schemas.microsoft.com/office/drawing/2014/main" id="{8E7EF643-CDE0-9438-A71E-E83B00532316}"/>
+              </a:ext>
+            </a:extLst>
+          </p:cNvPr>
+          <p:cNvCxnSpPr>
+            <a:stCxn id="1144" idx="3"/>
+            <a:endCxn id="14" idx="1"/>
+          </p:cNvCxnSpPr>
+          <p:nvPr/>
+        </p:nvCxnSpPr>
+        <p:spPr>
+          <a:xfrm flipV="1">
+            <a:off x="6469380" y="1670651"/>
+            <a:ext cx="240102" cy="1845979"/>
+          </a:xfrm>
+          <a:prstGeom prst="straightConnector1">
+            <a:avLst/>
+          </a:prstGeom>
+          <a:ln>
+            <a:tailEnd type="triangle"/>
+          </a:ln>
+        </p:spPr>
+        <p:style>
+          <a:lnRef idx="1">
+            <a:schemeClr val="accent1"/>
+          </a:lnRef>
+          <a:fillRef idx="0">
+            <a:schemeClr val="accent1"/>
+          </a:fillRef>
+          <a:effectRef idx="0">
+            <a:schemeClr val="accent1"/>
+          </a:effectRef>
+          <a:fontRef idx="minor">
+            <a:schemeClr val="tx1"/>
+          </a:fontRef>
+        </p:style>
+      </p:cxnSp>
+    </p:spTree>
+    <p:extLst>
+      <p:ext uri="{BB962C8B-B14F-4D97-AF65-F5344CB8AC3E}">
+        <p14:creationId xmlns:p14="http://schemas.microsoft.com/office/powerpoint/2010/main" val="873796926"/>
+      </p:ext>
+    </p:extLst>
+  </p:cSld>
+  <p:clrMapOvr>
+    <a:masterClrMapping/>
+  </p:clrMapOvr>
+</p:sld>
+</file>
+
 <file path=ppt/slides/slide6.xml><?xml version="1.0" encoding="utf-8"?>
+<p:sld xmlns:a="http://schemas.openxmlformats.org/drawingml/2006/main" xmlns:r="http://schemas.openxmlformats.org/officeDocument/2006/relationships" xmlns:p="http://schemas.openxmlformats.org/presentationml/2006/main">
+  <p:cSld>
+    <p:spTree>
+      <p:nvGrpSpPr>
+        <p:cNvPr id="1" name=""/>
+        <p:cNvGrpSpPr/>
+        <p:nvPr/>
+      </p:nvGrpSpPr>
+      <p:grpSpPr>
+        <a:xfrm>
+          <a:off x="0" y="0"/>
+          <a:ext cx="0" cy="0"/>
+          <a:chOff x="0" y="0"/>
+          <a:chExt cx="0" cy="0"/>
+        </a:xfrm>
+      </p:grpSpPr>
+      <p:sp>
+        <p:nvSpPr>
+          <p:cNvPr id="1121" name="Rectangle 1120">
+            <a:extLst>
+              <a:ext uri="{FF2B5EF4-FFF2-40B4-BE49-F238E27FC236}">
+                <a16:creationId xmlns:a16="http://schemas.microsoft.com/office/drawing/2014/main" id="{E53C962D-A3F5-9F2F-3BAD-FD3A2B5AADCC}"/>
+              </a:ext>
+            </a:extLst>
+          </p:cNvPr>
+          <p:cNvSpPr/>
+          <p:nvPr/>
+        </p:nvSpPr>
+        <p:spPr>
+          <a:xfrm>
+            <a:off x="4193337" y="4321403"/>
+            <a:ext cx="2182483" cy="1342797"/>
+          </a:xfrm>
+          <a:prstGeom prst="rect">
+            <a:avLst/>
+          </a:prstGeom>
+        </p:spPr>
+        <p:style>
+          <a:lnRef idx="2">
+            <a:schemeClr val="accent3">
+              <a:shade val="15000"/>
+            </a:schemeClr>
+          </a:lnRef>
+          <a:fillRef idx="1">
+            <a:schemeClr val="accent3"/>
+          </a:fillRef>
+          <a:effectRef idx="0">
+            <a:schemeClr val="accent3"/>
+          </a:effectRef>
+          <a:fontRef idx="minor">
+            <a:schemeClr val="lt1"/>
+          </a:fontRef>
+        </p:style>
+        <p:txBody>
+          <a:bodyPr rtlCol="0" anchor="t"/>
+          <a:lstStyle/>
+          <a:p>
+            <a:pPr algn="ctr"/>
+            <a:r>
+              <a:rPr lang="de-DE" dirty="0"/>
+              <a:t>TCR</a:t>
+            </a:r>
+            <a:endParaRPr lang="en-GB" dirty="0"/>
+          </a:p>
+        </p:txBody>
+      </p:sp>
+      <p:sp>
+        <p:nvSpPr>
+          <p:cNvPr id="6" name="Rectangle 5">
+            <a:extLst>
+              <a:ext uri="{FF2B5EF4-FFF2-40B4-BE49-F238E27FC236}">
+                <a16:creationId xmlns:a16="http://schemas.microsoft.com/office/drawing/2014/main" id="{C96ED38C-E0B1-92C2-B807-5218346FC064}"/>
+              </a:ext>
+            </a:extLst>
+          </p:cNvPr>
+          <p:cNvSpPr/>
+          <p:nvPr/>
+        </p:nvSpPr>
+        <p:spPr>
+          <a:xfrm>
+            <a:off x="6744635" y="2844130"/>
+            <a:ext cx="2139495" cy="1704399"/>
+          </a:xfrm>
+          <a:prstGeom prst="rect">
+            <a:avLst/>
+          </a:prstGeom>
+        </p:spPr>
+        <p:style>
+          <a:lnRef idx="2">
+            <a:schemeClr val="accent3">
+              <a:shade val="15000"/>
+            </a:schemeClr>
+          </a:lnRef>
+          <a:fillRef idx="1">
+            <a:schemeClr val="accent3"/>
+          </a:fillRef>
+          <a:effectRef idx="0">
+            <a:schemeClr val="accent3"/>
+          </a:effectRef>
+          <a:fontRef idx="minor">
+            <a:schemeClr val="lt1"/>
+          </a:fontRef>
+        </p:style>
+        <p:txBody>
+          <a:bodyPr rtlCol="0" anchor="t"/>
+          <a:lstStyle/>
+          <a:p>
+            <a:pPr algn="ctr"/>
+            <a:r>
+              <a:rPr lang="de-DE" dirty="0"/>
+              <a:t>Feature Importances</a:t>
+            </a:r>
+            <a:endParaRPr lang="en-GB" dirty="0"/>
+          </a:p>
+        </p:txBody>
+      </p:sp>
+      <p:sp>
+        <p:nvSpPr>
+          <p:cNvPr id="12" name="Rectangle 11">
+            <a:extLst>
+              <a:ext uri="{FF2B5EF4-FFF2-40B4-BE49-F238E27FC236}">
+                <a16:creationId xmlns:a16="http://schemas.microsoft.com/office/drawing/2014/main" id="{7841179F-B9B5-2E56-DFA5-7DAA6C1BBD9D}"/>
+              </a:ext>
+            </a:extLst>
+          </p:cNvPr>
+          <p:cNvSpPr/>
+          <p:nvPr/>
+        </p:nvSpPr>
+        <p:spPr>
+          <a:xfrm>
+            <a:off x="4206240" y="1432559"/>
+            <a:ext cx="2160055" cy="2825115"/>
+          </a:xfrm>
+          <a:prstGeom prst="rect">
+            <a:avLst/>
+          </a:prstGeom>
+        </p:spPr>
+        <p:style>
+          <a:lnRef idx="2">
+            <a:schemeClr val="accent3">
+              <a:shade val="15000"/>
+            </a:schemeClr>
+          </a:lnRef>
+          <a:fillRef idx="1">
+            <a:schemeClr val="accent3"/>
+          </a:fillRef>
+          <a:effectRef idx="0">
+            <a:schemeClr val="accent3"/>
+          </a:effectRef>
+          <a:fontRef idx="minor">
+            <a:schemeClr val="lt1"/>
+          </a:fontRef>
+        </p:style>
+        <p:txBody>
+          <a:bodyPr rtlCol="0" anchor="t"/>
+          <a:lstStyle/>
+          <a:p>
+            <a:pPr algn="ctr"/>
+            <a:r>
+              <a:rPr lang="de-DE" dirty="0"/>
+              <a:t>ML</a:t>
+            </a:r>
+            <a:endParaRPr lang="en-GB" dirty="0"/>
+          </a:p>
+        </p:txBody>
+      </p:sp>
+      <p:sp>
+        <p:nvSpPr>
+          <p:cNvPr id="2" name="Title 1">
+            <a:extLst>
+              <a:ext uri="{FF2B5EF4-FFF2-40B4-BE49-F238E27FC236}">
+                <a16:creationId xmlns:a16="http://schemas.microsoft.com/office/drawing/2014/main" id="{683A413D-99D9-FCB9-77DB-9A11EE63A78C}"/>
+              </a:ext>
+            </a:extLst>
+          </p:cNvPr>
+          <p:cNvSpPr>
+            <a:spLocks noGrp="1"/>
+          </p:cNvSpPr>
+          <p:nvPr>
+            <p:ph type="title"/>
+          </p:nvPr>
+        </p:nvSpPr>
+        <p:spPr>
+          <a:xfrm>
+            <a:off x="133350" y="-311150"/>
+            <a:ext cx="10515600" cy="1325563"/>
+          </a:xfrm>
+        </p:spPr>
+        <p:txBody>
+          <a:bodyPr/>
+          <a:lstStyle/>
+          <a:p>
+            <a:r>
+              <a:rPr lang="de-DE" dirty="0"/>
+              <a:t>Research Framework</a:t>
+            </a:r>
+            <a:endParaRPr lang="en-GB" dirty="0"/>
+          </a:p>
+        </p:txBody>
+      </p:sp>
+      <p:sp>
+        <p:nvSpPr>
+          <p:cNvPr id="7" name="Cylinder 6">
+            <a:extLst>
+              <a:ext uri="{FF2B5EF4-FFF2-40B4-BE49-F238E27FC236}">
+                <a16:creationId xmlns:a16="http://schemas.microsoft.com/office/drawing/2014/main" id="{A023D810-4417-2CD5-6DB9-5A58ED07DAF1}"/>
+              </a:ext>
+            </a:extLst>
+          </p:cNvPr>
+          <p:cNvSpPr/>
+          <p:nvPr/>
+        </p:nvSpPr>
+        <p:spPr>
+          <a:xfrm>
+            <a:off x="265622" y="3332312"/>
+            <a:ext cx="1043795" cy="664234"/>
+          </a:xfrm>
+          <a:prstGeom prst="can">
+            <a:avLst/>
+          </a:prstGeom>
+        </p:spPr>
+        <p:style>
+          <a:lnRef idx="2">
+            <a:schemeClr val="accent1">
+              <a:shade val="15000"/>
+            </a:schemeClr>
+          </a:lnRef>
+          <a:fillRef idx="1">
+            <a:schemeClr val="accent1"/>
+          </a:fillRef>
+          <a:effectRef idx="0">
+            <a:schemeClr val="accent1"/>
+          </a:effectRef>
+          <a:fontRef idx="minor">
+            <a:schemeClr val="lt1"/>
+          </a:fontRef>
+        </p:style>
+        <p:txBody>
+          <a:bodyPr rtlCol="0" anchor="ctr"/>
+          <a:lstStyle/>
+          <a:p>
+            <a:pPr algn="ctr"/>
+            <a:r>
+              <a:rPr lang="de-DE" dirty="0"/>
+              <a:t>Option Data</a:t>
+            </a:r>
+            <a:endParaRPr lang="en-GB" dirty="0"/>
+          </a:p>
+        </p:txBody>
+      </p:sp>
+      <p:sp>
+        <p:nvSpPr>
+          <p:cNvPr id="9" name="Rectangle 8">
+            <a:extLst>
+              <a:ext uri="{FF2B5EF4-FFF2-40B4-BE49-F238E27FC236}">
+                <a16:creationId xmlns:a16="http://schemas.microsoft.com/office/drawing/2014/main" id="{C07D752C-D6F2-1D45-03EC-3F124EE97946}"/>
+              </a:ext>
+            </a:extLst>
+          </p:cNvPr>
+          <p:cNvSpPr/>
+          <p:nvPr/>
+        </p:nvSpPr>
+        <p:spPr>
+          <a:xfrm>
+            <a:off x="4299909" y="1723665"/>
+            <a:ext cx="1935193" cy="431321"/>
+          </a:xfrm>
+          <a:prstGeom prst="rect">
+            <a:avLst/>
+          </a:prstGeom>
+          <a:solidFill>
+            <a:srgbClr val="FFBDE6"/>
+          </a:solidFill>
+        </p:spPr>
+        <p:style>
+          <a:lnRef idx="2">
+            <a:schemeClr val="accent1">
+              <a:shade val="15000"/>
+            </a:schemeClr>
+          </a:lnRef>
+          <a:fillRef idx="1">
+            <a:schemeClr val="accent1"/>
+          </a:fillRef>
+          <a:effectRef idx="0">
+            <a:schemeClr val="accent1"/>
+          </a:effectRef>
+          <a:fontRef idx="minor">
+            <a:schemeClr val="lt1"/>
+          </a:fontRef>
+        </p:style>
+        <p:txBody>
+          <a:bodyPr rtlCol="0" anchor="ctr"/>
+          <a:lstStyle/>
+          <a:p>
+            <a:pPr algn="ctr"/>
+            <a:r>
+              <a:rPr lang="de-DE" dirty="0"/>
+              <a:t>Gradient </a:t>
+            </a:r>
+            <a:r>
+              <a:rPr lang="de-DE" dirty="0" err="1"/>
+              <a:t>Boosting</a:t>
+            </a:r>
+            <a:endParaRPr lang="en-GB" dirty="0"/>
+          </a:p>
+        </p:txBody>
+      </p:sp>
+      <p:sp>
+        <p:nvSpPr>
+          <p:cNvPr id="10" name="Rectangle 9">
+            <a:extLst>
+              <a:ext uri="{FF2B5EF4-FFF2-40B4-BE49-F238E27FC236}">
+                <a16:creationId xmlns:a16="http://schemas.microsoft.com/office/drawing/2014/main" id="{0622CB4B-1EC6-0675-AC6A-A3E25EF4A4A1}"/>
+              </a:ext>
+            </a:extLst>
+          </p:cNvPr>
+          <p:cNvSpPr/>
+          <p:nvPr/>
+        </p:nvSpPr>
+        <p:spPr>
+          <a:xfrm>
+            <a:off x="4303646" y="2204875"/>
+            <a:ext cx="1935193" cy="695865"/>
+          </a:xfrm>
+          <a:prstGeom prst="rect">
+            <a:avLst/>
+          </a:prstGeom>
+          <a:solidFill>
+            <a:srgbClr val="FFBDE6"/>
+          </a:solidFill>
+        </p:spPr>
+        <p:style>
+          <a:lnRef idx="2">
+            <a:schemeClr val="accent1">
+              <a:shade val="15000"/>
+            </a:schemeClr>
+          </a:lnRef>
+          <a:fillRef idx="1">
+            <a:schemeClr val="accent1"/>
+          </a:fillRef>
+          <a:effectRef idx="0">
+            <a:schemeClr val="accent1"/>
+          </a:effectRef>
+          <a:fontRef idx="minor">
+            <a:schemeClr val="lt1"/>
+          </a:fontRef>
+        </p:style>
+        <p:txBody>
+          <a:bodyPr rtlCol="0" anchor="t"/>
+          <a:lstStyle/>
+          <a:p>
+            <a:pPr algn="ctr"/>
+            <a:r>
+              <a:rPr lang="de-DE" dirty="0"/>
+              <a:t>Gradient </a:t>
+            </a:r>
+            <a:r>
+              <a:rPr lang="de-DE" dirty="0" err="1"/>
+              <a:t>Boosting</a:t>
+            </a:r>
+            <a:r>
+              <a:rPr lang="de-DE" dirty="0"/>
+              <a:t> </a:t>
+            </a:r>
+            <a:r>
+              <a:rPr lang="de-DE" dirty="0" err="1"/>
+              <a:t>with</a:t>
+            </a:r>
+            <a:r>
+              <a:rPr lang="de-DE" dirty="0"/>
+              <a:t> Self-Training</a:t>
+            </a:r>
+            <a:endParaRPr lang="en-GB" dirty="0"/>
+          </a:p>
+        </p:txBody>
+      </p:sp>
+      <p:sp>
+        <p:nvSpPr>
+          <p:cNvPr id="11" name="Rectangle 10">
+            <a:extLst>
+              <a:ext uri="{FF2B5EF4-FFF2-40B4-BE49-F238E27FC236}">
+                <a16:creationId xmlns:a16="http://schemas.microsoft.com/office/drawing/2014/main" id="{1B75BC38-F232-FB5B-95D7-76998D86AC90}"/>
+              </a:ext>
+            </a:extLst>
+          </p:cNvPr>
+          <p:cNvSpPr/>
+          <p:nvPr/>
+        </p:nvSpPr>
+        <p:spPr>
+          <a:xfrm>
+            <a:off x="4305443" y="4658983"/>
+            <a:ext cx="1935193" cy="423558"/>
+          </a:xfrm>
+          <a:prstGeom prst="rect">
+            <a:avLst/>
+          </a:prstGeom>
+          <a:solidFill>
+            <a:schemeClr val="accent4">
+              <a:lumMod val="60000"/>
+              <a:lumOff val="40000"/>
+            </a:schemeClr>
+          </a:solidFill>
+        </p:spPr>
+        <p:style>
+          <a:lnRef idx="2">
+            <a:schemeClr val="accent1">
+              <a:shade val="15000"/>
+            </a:schemeClr>
+          </a:lnRef>
+          <a:fillRef idx="1">
+            <a:schemeClr val="accent1"/>
+          </a:fillRef>
+          <a:effectRef idx="0">
+            <a:schemeClr val="accent1"/>
+          </a:effectRef>
+          <a:fontRef idx="minor">
+            <a:schemeClr val="lt1"/>
+          </a:fontRef>
+        </p:style>
+        <p:txBody>
+          <a:bodyPr rtlCol="0" anchor="ctr"/>
+          <a:lstStyle/>
+          <a:p>
+            <a:pPr algn="ctr"/>
+            <a:r>
+              <a:rPr lang="de-DE" dirty="0"/>
+              <a:t>Lee and Ready </a:t>
+            </a:r>
+            <a:endParaRPr lang="en-GB" dirty="0"/>
+          </a:p>
+        </p:txBody>
+      </p:sp>
+      <p:sp>
+        <p:nvSpPr>
+          <p:cNvPr id="13" name="Cylinder 12">
+            <a:extLst>
+              <a:ext uri="{FF2B5EF4-FFF2-40B4-BE49-F238E27FC236}">
+                <a16:creationId xmlns:a16="http://schemas.microsoft.com/office/drawing/2014/main" id="{EB67B30B-4D14-827E-5DB9-0B9167FF157A}"/>
+              </a:ext>
+            </a:extLst>
+          </p:cNvPr>
+          <p:cNvSpPr/>
+          <p:nvPr/>
+        </p:nvSpPr>
+        <p:spPr>
+          <a:xfrm>
+            <a:off x="292219" y="1465880"/>
+            <a:ext cx="1012165" cy="874144"/>
+          </a:xfrm>
+          <a:prstGeom prst="can">
+            <a:avLst/>
+          </a:prstGeom>
+        </p:spPr>
+        <p:style>
+          <a:lnRef idx="2">
+            <a:schemeClr val="accent1">
+              <a:shade val="15000"/>
+            </a:schemeClr>
+          </a:lnRef>
+          <a:fillRef idx="1">
+            <a:schemeClr val="accent1"/>
+          </a:fillRef>
+          <a:effectRef idx="0">
+            <a:schemeClr val="accent1"/>
+          </a:effectRef>
+          <a:fontRef idx="minor">
+            <a:schemeClr val="lt1"/>
+          </a:fontRef>
+        </p:style>
+        <p:txBody>
+          <a:bodyPr rtlCol="0" anchor="ctr"/>
+          <a:lstStyle/>
+          <a:p>
+            <a:pPr algn="ctr"/>
+            <a:r>
+              <a:rPr lang="de-DE" dirty="0"/>
+              <a:t>Trade Data</a:t>
+            </a:r>
+            <a:endParaRPr lang="en-GB" dirty="0"/>
+          </a:p>
+        </p:txBody>
+      </p:sp>
+      <p:sp>
+        <p:nvSpPr>
+          <p:cNvPr id="14" name="Rectangle 13">
+            <a:extLst>
+              <a:ext uri="{FF2B5EF4-FFF2-40B4-BE49-F238E27FC236}">
+                <a16:creationId xmlns:a16="http://schemas.microsoft.com/office/drawing/2014/main" id="{82EAA822-CF91-407C-ED09-D5430CB97B56}"/>
+              </a:ext>
+            </a:extLst>
+          </p:cNvPr>
+          <p:cNvSpPr/>
+          <p:nvPr/>
+        </p:nvSpPr>
+        <p:spPr>
+          <a:xfrm>
+            <a:off x="6757251" y="1933757"/>
+            <a:ext cx="2133600" cy="698740"/>
+          </a:xfrm>
+          <a:prstGeom prst="rect">
+            <a:avLst/>
+          </a:prstGeom>
+        </p:spPr>
+        <p:style>
+          <a:lnRef idx="2">
+            <a:schemeClr val="accent1">
+              <a:shade val="15000"/>
+            </a:schemeClr>
+          </a:lnRef>
+          <a:fillRef idx="1">
+            <a:schemeClr val="accent1"/>
+          </a:fillRef>
+          <a:effectRef idx="0">
+            <a:schemeClr val="accent1"/>
+          </a:effectRef>
+          <a:fontRef idx="minor">
+            <a:schemeClr val="lt1"/>
+          </a:fontRef>
+        </p:style>
+        <p:txBody>
+          <a:bodyPr rtlCol="0" anchor="ctr"/>
+          <a:lstStyle/>
+          <a:p>
+            <a:pPr algn="ctr"/>
+            <a:r>
+              <a:rPr lang="de-DE" dirty="0" err="1"/>
+              <a:t>Predictions</a:t>
+            </a:r>
+            <a:endParaRPr lang="en-GB" dirty="0"/>
+          </a:p>
+        </p:txBody>
+      </p:sp>
+      <p:sp>
+        <p:nvSpPr>
+          <p:cNvPr id="15" name="Rectangle 14">
+            <a:extLst>
+              <a:ext uri="{FF2B5EF4-FFF2-40B4-BE49-F238E27FC236}">
+                <a16:creationId xmlns:a16="http://schemas.microsoft.com/office/drawing/2014/main" id="{B840A789-AE83-25DF-4C82-D3C7149D69EB}"/>
+              </a:ext>
+            </a:extLst>
+          </p:cNvPr>
+          <p:cNvSpPr/>
+          <p:nvPr/>
+        </p:nvSpPr>
+        <p:spPr>
+          <a:xfrm>
+            <a:off x="6978410" y="3224733"/>
+            <a:ext cx="1616016" cy="537713"/>
+          </a:xfrm>
+          <a:prstGeom prst="rect">
+            <a:avLst/>
+          </a:prstGeom>
+        </p:spPr>
+        <p:style>
+          <a:lnRef idx="2">
+            <a:schemeClr val="accent1">
+              <a:shade val="15000"/>
+            </a:schemeClr>
+          </a:lnRef>
+          <a:fillRef idx="1">
+            <a:schemeClr val="accent1"/>
+          </a:fillRef>
+          <a:effectRef idx="0">
+            <a:schemeClr val="accent1"/>
+          </a:effectRef>
+          <a:fontRef idx="minor">
+            <a:schemeClr val="lt1"/>
+          </a:fontRef>
+        </p:style>
+        <p:txBody>
+          <a:bodyPr rtlCol="0" anchor="ctr"/>
+          <a:lstStyle/>
+          <a:p>
+            <a:pPr algn="ctr"/>
+            <a:r>
+              <a:rPr lang="de-DE" dirty="0"/>
+              <a:t>Attention Maps</a:t>
+            </a:r>
+            <a:endParaRPr lang="en-GB" dirty="0"/>
+          </a:p>
+        </p:txBody>
+      </p:sp>
+      <p:sp>
+        <p:nvSpPr>
+          <p:cNvPr id="16" name="Rectangle 15">
+            <a:extLst>
+              <a:ext uri="{FF2B5EF4-FFF2-40B4-BE49-F238E27FC236}">
+                <a16:creationId xmlns:a16="http://schemas.microsoft.com/office/drawing/2014/main" id="{B314F980-CFB9-6647-E835-3991B2D65FDE}"/>
+              </a:ext>
+            </a:extLst>
+          </p:cNvPr>
+          <p:cNvSpPr/>
+          <p:nvPr/>
+        </p:nvSpPr>
+        <p:spPr>
+          <a:xfrm>
+            <a:off x="6968921" y="3879046"/>
+            <a:ext cx="1616016" cy="537713"/>
+          </a:xfrm>
+          <a:prstGeom prst="rect">
+            <a:avLst/>
+          </a:prstGeom>
+        </p:spPr>
+        <p:style>
+          <a:lnRef idx="2">
+            <a:schemeClr val="accent1">
+              <a:shade val="15000"/>
+            </a:schemeClr>
+          </a:lnRef>
+          <a:fillRef idx="1">
+            <a:schemeClr val="accent1"/>
+          </a:fillRef>
+          <a:effectRef idx="0">
+            <a:schemeClr val="accent1"/>
+          </a:effectRef>
+          <a:fontRef idx="minor">
+            <a:schemeClr val="lt1"/>
+          </a:fontRef>
+        </p:style>
+        <p:txBody>
+          <a:bodyPr rtlCol="0" anchor="ctr"/>
+          <a:lstStyle/>
+          <a:p>
+            <a:pPr algn="ctr"/>
+            <a:r>
+              <a:rPr lang="de-DE" dirty="0"/>
+              <a:t>SAGE Values</a:t>
+            </a:r>
+            <a:endParaRPr lang="en-GB" dirty="0"/>
+          </a:p>
+        </p:txBody>
+      </p:sp>
+      <p:cxnSp>
+        <p:nvCxnSpPr>
+          <p:cNvPr id="26" name="Straight Arrow Connector 25">
+            <a:extLst>
+              <a:ext uri="{FF2B5EF4-FFF2-40B4-BE49-F238E27FC236}">
+                <a16:creationId xmlns:a16="http://schemas.microsoft.com/office/drawing/2014/main" id="{3AC2BFD2-B4CE-E3EF-5184-DBED244D2E76}"/>
+              </a:ext>
+            </a:extLst>
+          </p:cNvPr>
+          <p:cNvCxnSpPr>
+            <a:cxnSpLocks/>
+            <a:stCxn id="14" idx="3"/>
+          </p:cNvCxnSpPr>
+          <p:nvPr/>
+        </p:nvCxnSpPr>
+        <p:spPr>
+          <a:xfrm>
+            <a:off x="8890851" y="2283127"/>
+            <a:ext cx="247578" cy="0"/>
+          </a:xfrm>
+          <a:prstGeom prst="straightConnector1">
+            <a:avLst/>
+          </a:prstGeom>
+          <a:ln>
+            <a:tailEnd type="triangle"/>
+          </a:ln>
+        </p:spPr>
+        <p:style>
+          <a:lnRef idx="1">
+            <a:schemeClr val="accent1"/>
+          </a:lnRef>
+          <a:fillRef idx="0">
+            <a:schemeClr val="accent1"/>
+          </a:fillRef>
+          <a:effectRef idx="0">
+            <a:schemeClr val="accent1"/>
+          </a:effectRef>
+          <a:fontRef idx="minor">
+            <a:schemeClr val="tx1"/>
+          </a:fontRef>
+        </p:style>
+      </p:cxnSp>
+      <p:sp>
+        <p:nvSpPr>
+          <p:cNvPr id="28" name="Rectangle 27">
+            <a:extLst>
+              <a:ext uri="{FF2B5EF4-FFF2-40B4-BE49-F238E27FC236}">
+                <a16:creationId xmlns:a16="http://schemas.microsoft.com/office/drawing/2014/main" id="{4B3CD710-AFF5-C20D-00D6-894B9ECD4CFF}"/>
+              </a:ext>
+            </a:extLst>
+          </p:cNvPr>
+          <p:cNvSpPr/>
+          <p:nvPr/>
+        </p:nvSpPr>
+        <p:spPr>
+          <a:xfrm>
+            <a:off x="1603075" y="1867710"/>
+            <a:ext cx="2397425" cy="665132"/>
+          </a:xfrm>
+          <a:prstGeom prst="rect">
+            <a:avLst/>
+          </a:prstGeom>
+        </p:spPr>
+        <p:style>
+          <a:lnRef idx="2">
+            <a:schemeClr val="accent1">
+              <a:shade val="15000"/>
+            </a:schemeClr>
+          </a:lnRef>
+          <a:fillRef idx="1">
+            <a:schemeClr val="accent1"/>
+          </a:fillRef>
+          <a:effectRef idx="0">
+            <a:schemeClr val="accent1"/>
+          </a:effectRef>
+          <a:fontRef idx="minor">
+            <a:schemeClr val="lt1"/>
+          </a:fontRef>
+        </p:style>
+        <p:txBody>
+          <a:bodyPr rtlCol="0" anchor="t"/>
+          <a:lstStyle/>
+          <a:p>
+            <a:pPr algn="ctr"/>
+            <a:r>
+              <a:rPr lang="de-DE" dirty="0"/>
+              <a:t>Data Collection</a:t>
+            </a:r>
+            <a:endParaRPr lang="en-GB" dirty="0"/>
+          </a:p>
+        </p:txBody>
+      </p:sp>
+      <p:sp>
+        <p:nvSpPr>
+          <p:cNvPr id="24" name="Rectangle 23">
+            <a:extLst>
+              <a:ext uri="{FF2B5EF4-FFF2-40B4-BE49-F238E27FC236}">
+                <a16:creationId xmlns:a16="http://schemas.microsoft.com/office/drawing/2014/main" id="{8921449C-B172-6825-E7FF-0DDF75F501AD}"/>
+              </a:ext>
+            </a:extLst>
+          </p:cNvPr>
+          <p:cNvSpPr/>
+          <p:nvPr/>
+        </p:nvSpPr>
+        <p:spPr>
+          <a:xfrm>
+            <a:off x="9150362" y="1900689"/>
+            <a:ext cx="1713781" cy="698740"/>
+          </a:xfrm>
+          <a:prstGeom prst="rect">
+            <a:avLst/>
+          </a:prstGeom>
+        </p:spPr>
+        <p:style>
+          <a:lnRef idx="2">
+            <a:schemeClr val="accent1">
+              <a:shade val="15000"/>
+            </a:schemeClr>
+          </a:lnRef>
+          <a:fillRef idx="1">
+            <a:schemeClr val="accent1"/>
+          </a:fillRef>
+          <a:effectRef idx="0">
+            <a:schemeClr val="accent1"/>
+          </a:effectRef>
+          <a:fontRef idx="minor">
+            <a:schemeClr val="lt1"/>
+          </a:fontRef>
+        </p:style>
+        <p:txBody>
+          <a:bodyPr rtlCol="0" anchor="ctr"/>
+          <a:lstStyle/>
+          <a:p>
+            <a:pPr algn="ctr"/>
+            <a:r>
+              <a:rPr lang="de-DE" dirty="0" err="1"/>
+              <a:t>Effective</a:t>
+            </a:r>
+            <a:r>
+              <a:rPr lang="de-DE" dirty="0"/>
+              <a:t> Spread </a:t>
+            </a:r>
+            <a:r>
+              <a:rPr lang="de-DE" dirty="0" err="1"/>
+              <a:t>Calculation</a:t>
+            </a:r>
+            <a:endParaRPr lang="en-GB" dirty="0"/>
+          </a:p>
+        </p:txBody>
+      </p:sp>
+      <p:sp>
+        <p:nvSpPr>
+          <p:cNvPr id="31" name="Cylinder 30">
+            <a:extLst>
+              <a:ext uri="{FF2B5EF4-FFF2-40B4-BE49-F238E27FC236}">
+                <a16:creationId xmlns:a16="http://schemas.microsoft.com/office/drawing/2014/main" id="{D3E48620-93F1-1D9E-966B-44CA6FF79461}"/>
+              </a:ext>
+            </a:extLst>
+          </p:cNvPr>
+          <p:cNvSpPr/>
+          <p:nvPr/>
+        </p:nvSpPr>
+        <p:spPr>
+          <a:xfrm>
+            <a:off x="287547" y="2392392"/>
+            <a:ext cx="1015041" cy="874144"/>
+          </a:xfrm>
+          <a:prstGeom prst="can">
+            <a:avLst/>
+          </a:prstGeom>
+        </p:spPr>
+        <p:style>
+          <a:lnRef idx="2">
+            <a:schemeClr val="accent1">
+              <a:shade val="15000"/>
+            </a:schemeClr>
+          </a:lnRef>
+          <a:fillRef idx="1">
+            <a:schemeClr val="accent1"/>
+          </a:fillRef>
+          <a:effectRef idx="0">
+            <a:schemeClr val="accent1"/>
+          </a:effectRef>
+          <a:fontRef idx="minor">
+            <a:schemeClr val="lt1"/>
+          </a:fontRef>
+        </p:style>
+        <p:txBody>
+          <a:bodyPr rtlCol="0" anchor="ctr"/>
+          <a:lstStyle/>
+          <a:p>
+            <a:pPr algn="ctr"/>
+            <a:r>
+              <a:rPr lang="de-DE" dirty="0"/>
+              <a:t>Trade </a:t>
+            </a:r>
+            <a:r>
+              <a:rPr lang="de-DE" dirty="0" err="1"/>
+              <a:t>Volumes</a:t>
+            </a:r>
+            <a:endParaRPr lang="en-GB" dirty="0"/>
+          </a:p>
+        </p:txBody>
+      </p:sp>
+      <p:sp>
+        <p:nvSpPr>
+          <p:cNvPr id="1038" name="Rectangle 1037">
+            <a:extLst>
+              <a:ext uri="{FF2B5EF4-FFF2-40B4-BE49-F238E27FC236}">
+                <a16:creationId xmlns:a16="http://schemas.microsoft.com/office/drawing/2014/main" id="{7D6D82FD-48ED-F01D-1A74-9047D884AECA}"/>
+              </a:ext>
+            </a:extLst>
+          </p:cNvPr>
+          <p:cNvSpPr/>
+          <p:nvPr/>
+        </p:nvSpPr>
+        <p:spPr>
+          <a:xfrm>
+            <a:off x="4279922" y="3022480"/>
+            <a:ext cx="1935193" cy="396815"/>
+          </a:xfrm>
+          <a:prstGeom prst="rect">
+            <a:avLst/>
+          </a:prstGeom>
+          <a:solidFill>
+            <a:srgbClr val="BFFFBD"/>
+          </a:solidFill>
+        </p:spPr>
+        <p:style>
+          <a:lnRef idx="2">
+            <a:schemeClr val="accent1">
+              <a:shade val="15000"/>
+            </a:schemeClr>
+          </a:lnRef>
+          <a:fillRef idx="1">
+            <a:schemeClr val="accent1"/>
+          </a:fillRef>
+          <a:effectRef idx="0">
+            <a:schemeClr val="accent1"/>
+          </a:effectRef>
+          <a:fontRef idx="minor">
+            <a:schemeClr val="lt1"/>
+          </a:fontRef>
+        </p:style>
+        <p:txBody>
+          <a:bodyPr rtlCol="0" anchor="t"/>
+          <a:lstStyle/>
+          <a:p>
+            <a:pPr algn="ctr"/>
+            <a:r>
+              <a:rPr lang="de-DE" dirty="0"/>
+              <a:t>Transformer</a:t>
+            </a:r>
+            <a:endParaRPr lang="en-GB" dirty="0"/>
+          </a:p>
+        </p:txBody>
+      </p:sp>
+      <p:sp>
+        <p:nvSpPr>
+          <p:cNvPr id="1039" name="Rectangle 1038">
+            <a:extLst>
+              <a:ext uri="{FF2B5EF4-FFF2-40B4-BE49-F238E27FC236}">
+                <a16:creationId xmlns:a16="http://schemas.microsoft.com/office/drawing/2014/main" id="{EA5BC06A-2FBC-17A7-CB31-F804E1DF1253}"/>
+              </a:ext>
+            </a:extLst>
+          </p:cNvPr>
+          <p:cNvSpPr/>
+          <p:nvPr/>
+        </p:nvSpPr>
+        <p:spPr>
+          <a:xfrm>
+            <a:off x="4277047" y="3509513"/>
+            <a:ext cx="1935193" cy="658483"/>
+          </a:xfrm>
+          <a:prstGeom prst="rect">
+            <a:avLst/>
+          </a:prstGeom>
+          <a:solidFill>
+            <a:srgbClr val="BFFFBD"/>
+          </a:solidFill>
+        </p:spPr>
+        <p:style>
+          <a:lnRef idx="2">
+            <a:schemeClr val="accent1">
+              <a:shade val="15000"/>
+            </a:schemeClr>
+          </a:lnRef>
+          <a:fillRef idx="1">
+            <a:schemeClr val="accent1"/>
+          </a:fillRef>
+          <a:effectRef idx="0">
+            <a:schemeClr val="accent1"/>
+          </a:effectRef>
+          <a:fontRef idx="minor">
+            <a:schemeClr val="lt1"/>
+          </a:fontRef>
+        </p:style>
+        <p:txBody>
+          <a:bodyPr rtlCol="0" anchor="t"/>
+          <a:lstStyle/>
+          <a:p>
+            <a:pPr algn="ctr"/>
+            <a:r>
+              <a:rPr lang="de-DE" dirty="0"/>
+              <a:t>Transformer</a:t>
+            </a:r>
+          </a:p>
+          <a:p>
+            <a:pPr algn="ctr"/>
+            <a:r>
+              <a:rPr lang="de-DE" dirty="0" err="1"/>
+              <a:t>With</a:t>
+            </a:r>
+            <a:r>
+              <a:rPr lang="de-DE" dirty="0"/>
+              <a:t> </a:t>
+            </a:r>
+            <a:r>
+              <a:rPr lang="de-DE" dirty="0" err="1"/>
+              <a:t>Pre</a:t>
+            </a:r>
+            <a:r>
+              <a:rPr lang="de-DE" dirty="0"/>
+              <a:t>-Training</a:t>
+            </a:r>
+            <a:endParaRPr lang="en-GB" dirty="0"/>
+          </a:p>
+        </p:txBody>
+      </p:sp>
+      <p:sp>
+        <p:nvSpPr>
+          <p:cNvPr id="1045" name="Rectangle 1044">
+            <a:extLst>
+              <a:ext uri="{FF2B5EF4-FFF2-40B4-BE49-F238E27FC236}">
+                <a16:creationId xmlns:a16="http://schemas.microsoft.com/office/drawing/2014/main" id="{248F470B-6828-B453-9C17-857109741461}"/>
+              </a:ext>
+            </a:extLst>
+          </p:cNvPr>
+          <p:cNvSpPr/>
+          <p:nvPr/>
+        </p:nvSpPr>
+        <p:spPr>
+          <a:xfrm>
+            <a:off x="2042160" y="2823210"/>
+            <a:ext cx="1952158" cy="685800"/>
+          </a:xfrm>
+          <a:prstGeom prst="rect">
+            <a:avLst/>
+          </a:prstGeom>
+        </p:spPr>
+        <p:style>
+          <a:lnRef idx="2">
+            <a:schemeClr val="accent1">
+              <a:shade val="15000"/>
+            </a:schemeClr>
+          </a:lnRef>
+          <a:fillRef idx="1">
+            <a:schemeClr val="accent1"/>
+          </a:fillRef>
+          <a:effectRef idx="0">
+            <a:schemeClr val="accent1"/>
+          </a:effectRef>
+          <a:fontRef idx="minor">
+            <a:schemeClr val="lt1"/>
+          </a:fontRef>
+        </p:style>
+        <p:txBody>
+          <a:bodyPr rtlCol="0" anchor="ctr"/>
+          <a:lstStyle/>
+          <a:p>
+            <a:pPr algn="ctr"/>
+            <a:r>
+              <a:rPr lang="de-DE" dirty="0"/>
+              <a:t>Data </a:t>
+            </a:r>
+            <a:r>
+              <a:rPr lang="de-DE" dirty="0" err="1"/>
+              <a:t>Pre-processing</a:t>
+            </a:r>
+            <a:endParaRPr lang="en-GB" dirty="0"/>
+          </a:p>
+        </p:txBody>
+      </p:sp>
+      <p:cxnSp>
+        <p:nvCxnSpPr>
+          <p:cNvPr id="1049" name="Straight Arrow Connector 1048">
+            <a:extLst>
+              <a:ext uri="{FF2B5EF4-FFF2-40B4-BE49-F238E27FC236}">
+                <a16:creationId xmlns:a16="http://schemas.microsoft.com/office/drawing/2014/main" id="{947672B4-A862-CD5E-8962-722CE895CD75}"/>
+              </a:ext>
+            </a:extLst>
+          </p:cNvPr>
+          <p:cNvCxnSpPr>
+            <a:cxnSpLocks/>
+            <a:stCxn id="7" idx="4"/>
+            <a:endCxn id="28" idx="1"/>
+          </p:cNvCxnSpPr>
+          <p:nvPr/>
+        </p:nvCxnSpPr>
+        <p:spPr>
+          <a:xfrm flipV="1">
+            <a:off x="1309417" y="2200276"/>
+            <a:ext cx="293658" cy="1464153"/>
+          </a:xfrm>
+          <a:prstGeom prst="straightConnector1">
+            <a:avLst/>
+          </a:prstGeom>
+          <a:ln>
+            <a:tailEnd type="triangle"/>
+          </a:ln>
+        </p:spPr>
+        <p:style>
+          <a:lnRef idx="1">
+            <a:schemeClr val="accent1"/>
+          </a:lnRef>
+          <a:fillRef idx="0">
+            <a:schemeClr val="accent1"/>
+          </a:fillRef>
+          <a:effectRef idx="0">
+            <a:schemeClr val="accent1"/>
+          </a:effectRef>
+          <a:fontRef idx="minor">
+            <a:schemeClr val="tx1"/>
+          </a:fontRef>
+        </p:style>
+      </p:cxnSp>
+      <p:cxnSp>
+        <p:nvCxnSpPr>
+          <p:cNvPr id="1051" name="Straight Arrow Connector 1050">
+            <a:extLst>
+              <a:ext uri="{FF2B5EF4-FFF2-40B4-BE49-F238E27FC236}">
+                <a16:creationId xmlns:a16="http://schemas.microsoft.com/office/drawing/2014/main" id="{F7A728D3-8722-0B93-8973-BA154348ECF1}"/>
+              </a:ext>
+            </a:extLst>
+          </p:cNvPr>
+          <p:cNvCxnSpPr>
+            <a:cxnSpLocks/>
+            <a:stCxn id="13" idx="4"/>
+            <a:endCxn id="28" idx="1"/>
+          </p:cNvCxnSpPr>
+          <p:nvPr/>
+        </p:nvCxnSpPr>
+        <p:spPr>
+          <a:xfrm>
+            <a:off x="1304384" y="1902952"/>
+            <a:ext cx="298691" cy="297324"/>
+          </a:xfrm>
+          <a:prstGeom prst="straightConnector1">
+            <a:avLst/>
+          </a:prstGeom>
+          <a:ln>
+            <a:tailEnd type="triangle"/>
+          </a:ln>
+        </p:spPr>
+        <p:style>
+          <a:lnRef idx="1">
+            <a:schemeClr val="accent1"/>
+          </a:lnRef>
+          <a:fillRef idx="0">
+            <a:schemeClr val="accent1"/>
+          </a:fillRef>
+          <a:effectRef idx="0">
+            <a:schemeClr val="accent1"/>
+          </a:effectRef>
+          <a:fontRef idx="minor">
+            <a:schemeClr val="tx1"/>
+          </a:fontRef>
+        </p:style>
+      </p:cxnSp>
+      <p:cxnSp>
+        <p:nvCxnSpPr>
+          <p:cNvPr id="1053" name="Straight Arrow Connector 1052">
+            <a:extLst>
+              <a:ext uri="{FF2B5EF4-FFF2-40B4-BE49-F238E27FC236}">
+                <a16:creationId xmlns:a16="http://schemas.microsoft.com/office/drawing/2014/main" id="{9D823643-CC23-9E39-C296-C46251E24A2B}"/>
+              </a:ext>
+            </a:extLst>
+          </p:cNvPr>
+          <p:cNvCxnSpPr>
+            <a:cxnSpLocks/>
+            <a:stCxn id="31" idx="4"/>
+            <a:endCxn id="28" idx="1"/>
+          </p:cNvCxnSpPr>
+          <p:nvPr/>
+        </p:nvCxnSpPr>
+        <p:spPr>
+          <a:xfrm flipV="1">
+            <a:off x="1302588" y="2200276"/>
+            <a:ext cx="300487" cy="629188"/>
+          </a:xfrm>
+          <a:prstGeom prst="straightConnector1">
+            <a:avLst/>
+          </a:prstGeom>
+          <a:ln>
+            <a:tailEnd type="triangle"/>
+          </a:ln>
+        </p:spPr>
+        <p:style>
+          <a:lnRef idx="1">
+            <a:schemeClr val="accent1"/>
+          </a:lnRef>
+          <a:fillRef idx="0">
+            <a:schemeClr val="accent1"/>
+          </a:fillRef>
+          <a:effectRef idx="0">
+            <a:schemeClr val="accent1"/>
+          </a:effectRef>
+          <a:fontRef idx="minor">
+            <a:schemeClr val="tx1"/>
+          </a:fontRef>
+        </p:style>
+      </p:cxnSp>
+      <p:cxnSp>
+        <p:nvCxnSpPr>
+          <p:cNvPr id="1062" name="Straight Arrow Connector 1061">
+            <a:extLst>
+              <a:ext uri="{FF2B5EF4-FFF2-40B4-BE49-F238E27FC236}">
+                <a16:creationId xmlns:a16="http://schemas.microsoft.com/office/drawing/2014/main" id="{E0DCA4C1-ADEB-CDDC-CBE6-65E85A9C6396}"/>
+              </a:ext>
+            </a:extLst>
+          </p:cNvPr>
+          <p:cNvCxnSpPr>
+            <a:cxnSpLocks/>
+            <a:endCxn id="1045" idx="0"/>
+          </p:cNvCxnSpPr>
+          <p:nvPr/>
+        </p:nvCxnSpPr>
+        <p:spPr>
+          <a:xfrm flipH="1">
+            <a:off x="3018239" y="2579370"/>
+            <a:ext cx="3810" cy="243840"/>
+          </a:xfrm>
+          <a:prstGeom prst="straightConnector1">
+            <a:avLst/>
+          </a:prstGeom>
+          <a:ln>
+            <a:tailEnd type="triangle"/>
+          </a:ln>
+        </p:spPr>
+        <p:style>
+          <a:lnRef idx="1">
+            <a:schemeClr val="accent1"/>
+          </a:lnRef>
+          <a:fillRef idx="0">
+            <a:schemeClr val="accent1"/>
+          </a:fillRef>
+          <a:effectRef idx="0">
+            <a:schemeClr val="accent1"/>
+          </a:effectRef>
+          <a:fontRef idx="minor">
+            <a:schemeClr val="tx1"/>
+          </a:fontRef>
+        </p:style>
+      </p:cxnSp>
+      <p:cxnSp>
+        <p:nvCxnSpPr>
+          <p:cNvPr id="1066" name="Connector: Elbow 1065">
+            <a:extLst>
+              <a:ext uri="{FF2B5EF4-FFF2-40B4-BE49-F238E27FC236}">
+                <a16:creationId xmlns:a16="http://schemas.microsoft.com/office/drawing/2014/main" id="{E71BF84D-0393-4CAD-E3F4-BA5F9AE022BA}"/>
+              </a:ext>
+            </a:extLst>
+          </p:cNvPr>
+          <p:cNvCxnSpPr>
+            <a:cxnSpLocks/>
+            <a:endCxn id="1121" idx="1"/>
+          </p:cNvCxnSpPr>
+          <p:nvPr/>
+        </p:nvCxnSpPr>
+        <p:spPr>
+          <a:xfrm rot="16200000" flipH="1">
+            <a:off x="1712912" y="2512377"/>
+            <a:ext cx="2544878" cy="2415972"/>
+          </a:xfrm>
+          <a:prstGeom prst="bentConnector2">
+            <a:avLst/>
+          </a:prstGeom>
+          <a:ln>
+            <a:tailEnd type="triangle"/>
+          </a:ln>
+        </p:spPr>
+        <p:style>
+          <a:lnRef idx="1">
+            <a:schemeClr val="accent1"/>
+          </a:lnRef>
+          <a:fillRef idx="0">
+            <a:schemeClr val="accent1"/>
+          </a:fillRef>
+          <a:effectRef idx="0">
+            <a:schemeClr val="accent1"/>
+          </a:effectRef>
+          <a:fontRef idx="minor">
+            <a:schemeClr val="tx1"/>
+          </a:fontRef>
+        </p:style>
+      </p:cxnSp>
+      <p:cxnSp>
+        <p:nvCxnSpPr>
+          <p:cNvPr id="1073" name="Straight Arrow Connector 1072">
+            <a:extLst>
+              <a:ext uri="{FF2B5EF4-FFF2-40B4-BE49-F238E27FC236}">
+                <a16:creationId xmlns:a16="http://schemas.microsoft.com/office/drawing/2014/main" id="{078A6480-11C1-65A5-F130-9CA8B2071AFD}"/>
+              </a:ext>
+            </a:extLst>
+          </p:cNvPr>
+          <p:cNvCxnSpPr>
+            <a:cxnSpLocks/>
+            <a:stCxn id="1045" idx="3"/>
+          </p:cNvCxnSpPr>
+          <p:nvPr/>
+        </p:nvCxnSpPr>
+        <p:spPr>
+          <a:xfrm>
+            <a:off x="3994318" y="3166110"/>
+            <a:ext cx="211922" cy="0"/>
+          </a:xfrm>
+          <a:prstGeom prst="straightConnector1">
+            <a:avLst/>
+          </a:prstGeom>
+          <a:ln>
+            <a:tailEnd type="triangle"/>
+          </a:ln>
+        </p:spPr>
+        <p:style>
+          <a:lnRef idx="1">
+            <a:schemeClr val="accent1"/>
+          </a:lnRef>
+          <a:fillRef idx="0">
+            <a:schemeClr val="accent1"/>
+          </a:fillRef>
+          <a:effectRef idx="0">
+            <a:schemeClr val="accent1"/>
+          </a:effectRef>
+          <a:fontRef idx="minor">
+            <a:schemeClr val="tx1"/>
+          </a:fontRef>
+        </p:style>
+      </p:cxnSp>
+      <p:sp>
+        <p:nvSpPr>
+          <p:cNvPr id="1087" name="TextBox 1086">
+            <a:extLst>
+              <a:ext uri="{FF2B5EF4-FFF2-40B4-BE49-F238E27FC236}">
+                <a16:creationId xmlns:a16="http://schemas.microsoft.com/office/drawing/2014/main" id="{3ABA7E38-A92B-39B5-3ADF-F959A7EA04F9}"/>
+              </a:ext>
+            </a:extLst>
+          </p:cNvPr>
+          <p:cNvSpPr txBox="1"/>
+          <p:nvPr/>
+        </p:nvSpPr>
+        <p:spPr>
+          <a:xfrm>
+            <a:off x="4168140" y="5920740"/>
+            <a:ext cx="2110740" cy="646331"/>
+          </a:xfrm>
+          <a:prstGeom prst="rect">
+            <a:avLst/>
+          </a:prstGeom>
+          <a:noFill/>
+        </p:spPr>
+        <p:txBody>
+          <a:bodyPr wrap="square" rtlCol="0">
+            <a:spAutoFit/>
+          </a:bodyPr>
+          <a:lstStyle/>
+          <a:p>
+            <a:r>
+              <a:rPr lang="de-DE" dirty="0"/>
+              <a:t>Training + Tuning</a:t>
+            </a:r>
+          </a:p>
+          <a:p>
+            <a:r>
+              <a:rPr lang="de-DE" dirty="0"/>
+              <a:t>(Ca. Chapter 6.2)</a:t>
+            </a:r>
+            <a:endParaRPr lang="en-GB" dirty="0"/>
+          </a:p>
+        </p:txBody>
+      </p:sp>
+      <p:sp>
+        <p:nvSpPr>
+          <p:cNvPr id="1088" name="TextBox 1087">
+            <a:extLst>
+              <a:ext uri="{FF2B5EF4-FFF2-40B4-BE49-F238E27FC236}">
+                <a16:creationId xmlns:a16="http://schemas.microsoft.com/office/drawing/2014/main" id="{8ED72B36-51D0-895F-9960-38EFB9E127E0}"/>
+              </a:ext>
+            </a:extLst>
+          </p:cNvPr>
+          <p:cNvSpPr txBox="1"/>
+          <p:nvPr/>
+        </p:nvSpPr>
+        <p:spPr>
+          <a:xfrm>
+            <a:off x="6777990" y="5953125"/>
+            <a:ext cx="2110740" cy="646331"/>
+          </a:xfrm>
+          <a:prstGeom prst="rect">
+            <a:avLst/>
+          </a:prstGeom>
+          <a:noFill/>
+        </p:spPr>
+        <p:txBody>
+          <a:bodyPr wrap="square" rtlCol="0">
+            <a:spAutoFit/>
+          </a:bodyPr>
+          <a:lstStyle/>
+          <a:p>
+            <a:r>
+              <a:rPr lang="de-DE" dirty="0"/>
+              <a:t>Evaluation</a:t>
+            </a:r>
+          </a:p>
+          <a:p>
+            <a:r>
+              <a:rPr lang="de-DE" dirty="0"/>
+              <a:t>(Ca. Chapter 6.3)</a:t>
+            </a:r>
+            <a:endParaRPr lang="en-GB" dirty="0"/>
+          </a:p>
+        </p:txBody>
+      </p:sp>
+      <p:sp>
+        <p:nvSpPr>
+          <p:cNvPr id="1089" name="TextBox 1088">
+            <a:extLst>
+              <a:ext uri="{FF2B5EF4-FFF2-40B4-BE49-F238E27FC236}">
+                <a16:creationId xmlns:a16="http://schemas.microsoft.com/office/drawing/2014/main" id="{0CC40106-6295-6FC3-DB4D-60B99CFB8E3C}"/>
+              </a:ext>
+            </a:extLst>
+          </p:cNvPr>
+          <p:cNvSpPr txBox="1"/>
+          <p:nvPr/>
+        </p:nvSpPr>
+        <p:spPr>
+          <a:xfrm>
+            <a:off x="9176385" y="5934075"/>
+            <a:ext cx="2110740" cy="646331"/>
+          </a:xfrm>
+          <a:prstGeom prst="rect">
+            <a:avLst/>
+          </a:prstGeom>
+          <a:noFill/>
+        </p:spPr>
+        <p:txBody>
+          <a:bodyPr wrap="square" rtlCol="0">
+            <a:spAutoFit/>
+          </a:bodyPr>
+          <a:lstStyle/>
+          <a:p>
+            <a:r>
+              <a:rPr lang="de-DE" dirty="0" err="1"/>
+              <a:t>Application</a:t>
+            </a:r>
+            <a:r>
+              <a:rPr lang="de-DE" dirty="0"/>
+              <a:t> Study</a:t>
+            </a:r>
+          </a:p>
+          <a:p>
+            <a:r>
+              <a:rPr lang="de-DE" dirty="0"/>
+              <a:t>(Ca. Chapter 8)</a:t>
+            </a:r>
+            <a:endParaRPr lang="en-GB" dirty="0"/>
+          </a:p>
+        </p:txBody>
+      </p:sp>
+      <p:sp>
+        <p:nvSpPr>
+          <p:cNvPr id="1090" name="TextBox 1089">
+            <a:extLst>
+              <a:ext uri="{FF2B5EF4-FFF2-40B4-BE49-F238E27FC236}">
+                <a16:creationId xmlns:a16="http://schemas.microsoft.com/office/drawing/2014/main" id="{3BDBA4C7-B634-2603-5CF6-AEED66974E30}"/>
+              </a:ext>
+            </a:extLst>
+          </p:cNvPr>
+          <p:cNvSpPr txBox="1"/>
+          <p:nvPr/>
+        </p:nvSpPr>
+        <p:spPr>
+          <a:xfrm>
+            <a:off x="876300" y="5899785"/>
+            <a:ext cx="2110740" cy="646331"/>
+          </a:xfrm>
+          <a:prstGeom prst="rect">
+            <a:avLst/>
+          </a:prstGeom>
+          <a:noFill/>
+        </p:spPr>
+        <p:txBody>
+          <a:bodyPr wrap="square" rtlCol="0">
+            <a:spAutoFit/>
+          </a:bodyPr>
+          <a:lstStyle/>
+          <a:p>
+            <a:r>
+              <a:rPr lang="de-DE" dirty="0"/>
+              <a:t>Data + </a:t>
+            </a:r>
+            <a:r>
+              <a:rPr lang="de-DE" dirty="0" err="1"/>
+              <a:t>Preparation</a:t>
+            </a:r>
+            <a:endParaRPr lang="de-DE" dirty="0"/>
+          </a:p>
+          <a:p>
+            <a:r>
+              <a:rPr lang="de-DE" dirty="0"/>
+              <a:t>(Ca. Chapter 6.1)</a:t>
+            </a:r>
+            <a:endParaRPr lang="en-GB" dirty="0"/>
+          </a:p>
+        </p:txBody>
+      </p:sp>
+      <p:sp>
+        <p:nvSpPr>
+          <p:cNvPr id="1125" name="Rectangle 1124">
+            <a:extLst>
+              <a:ext uri="{FF2B5EF4-FFF2-40B4-BE49-F238E27FC236}">
+                <a16:creationId xmlns:a16="http://schemas.microsoft.com/office/drawing/2014/main" id="{2AE0B6A0-64CC-643E-83FF-5424FDAE07A3}"/>
+              </a:ext>
+            </a:extLst>
+          </p:cNvPr>
+          <p:cNvSpPr/>
+          <p:nvPr/>
+        </p:nvSpPr>
+        <p:spPr>
+          <a:xfrm>
+            <a:off x="4305443" y="5154283"/>
+            <a:ext cx="1935193" cy="423558"/>
+          </a:xfrm>
+          <a:prstGeom prst="rect">
+            <a:avLst/>
+          </a:prstGeom>
+          <a:solidFill>
+            <a:schemeClr val="accent4">
+              <a:lumMod val="60000"/>
+              <a:lumOff val="40000"/>
+            </a:schemeClr>
+          </a:solidFill>
+        </p:spPr>
+        <p:style>
+          <a:lnRef idx="2">
+            <a:schemeClr val="accent1">
+              <a:shade val="15000"/>
+            </a:schemeClr>
+          </a:lnRef>
+          <a:fillRef idx="1">
+            <a:schemeClr val="accent1"/>
+          </a:fillRef>
+          <a:effectRef idx="0">
+            <a:schemeClr val="accent1"/>
+          </a:effectRef>
+          <a:fontRef idx="minor">
+            <a:schemeClr val="lt1"/>
+          </a:fontRef>
+        </p:style>
+        <p:txBody>
+          <a:bodyPr rtlCol="0" anchor="ctr"/>
+          <a:lstStyle/>
+          <a:p>
+            <a:pPr algn="ctr"/>
+            <a:r>
+              <a:rPr lang="de-DE" dirty="0"/>
+              <a:t>…</a:t>
+            </a:r>
+            <a:endParaRPr lang="en-GB" dirty="0"/>
+          </a:p>
+        </p:txBody>
+      </p:sp>
+      <p:cxnSp>
+        <p:nvCxnSpPr>
+          <p:cNvPr id="1146" name="Straight Arrow Connector 1145">
+            <a:extLst>
+              <a:ext uri="{FF2B5EF4-FFF2-40B4-BE49-F238E27FC236}">
+                <a16:creationId xmlns:a16="http://schemas.microsoft.com/office/drawing/2014/main" id="{ED9347FE-0487-02B5-306B-DE0E802E2AA8}"/>
+              </a:ext>
+            </a:extLst>
+          </p:cNvPr>
+          <p:cNvCxnSpPr>
+            <a:cxnSpLocks/>
+            <a:stCxn id="1121" idx="3"/>
+            <a:endCxn id="6" idx="1"/>
+          </p:cNvCxnSpPr>
+          <p:nvPr/>
+        </p:nvCxnSpPr>
+        <p:spPr>
+          <a:xfrm flipV="1">
+            <a:off x="6375820" y="3696330"/>
+            <a:ext cx="368815" cy="1296472"/>
+          </a:xfrm>
+          <a:prstGeom prst="straightConnector1">
+            <a:avLst/>
+          </a:prstGeom>
+          <a:ln>
+            <a:tailEnd type="triangle"/>
+          </a:ln>
+        </p:spPr>
+        <p:style>
+          <a:lnRef idx="1">
+            <a:schemeClr val="accent1"/>
+          </a:lnRef>
+          <a:fillRef idx="0">
+            <a:schemeClr val="accent1"/>
+          </a:fillRef>
+          <a:effectRef idx="0">
+            <a:schemeClr val="accent1"/>
+          </a:effectRef>
+          <a:fontRef idx="minor">
+            <a:schemeClr val="tx1"/>
+          </a:fontRef>
+        </p:style>
+      </p:cxnSp>
+      <p:cxnSp>
+        <p:nvCxnSpPr>
+          <p:cNvPr id="1151" name="Straight Arrow Connector 1150">
+            <a:extLst>
+              <a:ext uri="{FF2B5EF4-FFF2-40B4-BE49-F238E27FC236}">
+                <a16:creationId xmlns:a16="http://schemas.microsoft.com/office/drawing/2014/main" id="{8E7EF643-CDE0-9438-A71E-E83B00532316}"/>
+              </a:ext>
+            </a:extLst>
+          </p:cNvPr>
+          <p:cNvCxnSpPr>
+            <a:cxnSpLocks/>
+            <a:stCxn id="12" idx="3"/>
+            <a:endCxn id="14" idx="1"/>
+          </p:cNvCxnSpPr>
+          <p:nvPr/>
+        </p:nvCxnSpPr>
+        <p:spPr>
+          <a:xfrm flipV="1">
+            <a:off x="6366295" y="2283127"/>
+            <a:ext cx="390956" cy="561990"/>
+          </a:xfrm>
+          <a:prstGeom prst="straightConnector1">
+            <a:avLst/>
+          </a:prstGeom>
+          <a:ln>
+            <a:tailEnd type="triangle"/>
+          </a:ln>
+        </p:spPr>
+        <p:style>
+          <a:lnRef idx="1">
+            <a:schemeClr val="accent1"/>
+          </a:lnRef>
+          <a:fillRef idx="0">
+            <a:schemeClr val="accent1"/>
+          </a:fillRef>
+          <a:effectRef idx="0">
+            <a:schemeClr val="accent1"/>
+          </a:effectRef>
+          <a:fontRef idx="minor">
+            <a:schemeClr val="tx1"/>
+          </a:fontRef>
+        </p:style>
+      </p:cxnSp>
+      <p:cxnSp>
+        <p:nvCxnSpPr>
+          <p:cNvPr id="8" name="Straight Arrow Connector 7">
+            <a:extLst>
+              <a:ext uri="{FF2B5EF4-FFF2-40B4-BE49-F238E27FC236}">
+                <a16:creationId xmlns:a16="http://schemas.microsoft.com/office/drawing/2014/main" id="{C35F85DD-DD33-C5C1-5305-69177F185EF0}"/>
+              </a:ext>
+            </a:extLst>
+          </p:cNvPr>
+          <p:cNvCxnSpPr>
+            <a:cxnSpLocks/>
+            <a:stCxn id="12" idx="3"/>
+            <a:endCxn id="6" idx="1"/>
+          </p:cNvCxnSpPr>
+          <p:nvPr/>
+        </p:nvCxnSpPr>
+        <p:spPr>
+          <a:xfrm>
+            <a:off x="6366295" y="2845117"/>
+            <a:ext cx="378340" cy="851213"/>
+          </a:xfrm>
+          <a:prstGeom prst="straightConnector1">
+            <a:avLst/>
+          </a:prstGeom>
+          <a:ln>
+            <a:tailEnd type="triangle"/>
+          </a:ln>
+        </p:spPr>
+        <p:style>
+          <a:lnRef idx="1">
+            <a:schemeClr val="accent1"/>
+          </a:lnRef>
+          <a:fillRef idx="0">
+            <a:schemeClr val="accent1"/>
+          </a:fillRef>
+          <a:effectRef idx="0">
+            <a:schemeClr val="accent1"/>
+          </a:effectRef>
+          <a:fontRef idx="minor">
+            <a:schemeClr val="tx1"/>
+          </a:fontRef>
+        </p:style>
+      </p:cxnSp>
+      <p:cxnSp>
+        <p:nvCxnSpPr>
+          <p:cNvPr id="19" name="Straight Arrow Connector 18">
+            <a:extLst>
+              <a:ext uri="{FF2B5EF4-FFF2-40B4-BE49-F238E27FC236}">
+                <a16:creationId xmlns:a16="http://schemas.microsoft.com/office/drawing/2014/main" id="{67930102-8555-421A-FDA4-82124F08B5A1}"/>
+              </a:ext>
+            </a:extLst>
+          </p:cNvPr>
+          <p:cNvCxnSpPr>
+            <a:cxnSpLocks/>
+            <a:stCxn id="1121" idx="3"/>
+            <a:endCxn id="14" idx="1"/>
+          </p:cNvCxnSpPr>
+          <p:nvPr/>
+        </p:nvCxnSpPr>
+        <p:spPr>
+          <a:xfrm flipV="1">
+            <a:off x="6375820" y="2283127"/>
+            <a:ext cx="381431" cy="2709675"/>
+          </a:xfrm>
+          <a:prstGeom prst="straightConnector1">
+            <a:avLst/>
+          </a:prstGeom>
+          <a:ln>
+            <a:tailEnd type="triangle"/>
+          </a:ln>
+        </p:spPr>
+        <p:style>
+          <a:lnRef idx="1">
+            <a:schemeClr val="accent1"/>
+          </a:lnRef>
+          <a:fillRef idx="0">
+            <a:schemeClr val="accent1"/>
+          </a:fillRef>
+          <a:effectRef idx="0">
+            <a:schemeClr val="accent1"/>
+          </a:effectRef>
+          <a:fontRef idx="minor">
+            <a:schemeClr val="tx1"/>
+          </a:fontRef>
+        </p:style>
+      </p:cxnSp>
+    </p:spTree>
+    <p:extLst>
+      <p:ext uri="{BB962C8B-B14F-4D97-AF65-F5344CB8AC3E}">
+        <p14:creationId xmlns:p14="http://schemas.microsoft.com/office/powerpoint/2010/main" val="1744557679"/>
+      </p:ext>
+    </p:extLst>
+  </p:cSld>
+  <p:clrMapOvr>
+    <a:masterClrMapping/>
+  </p:clrMapOvr>
+</p:sld>
+</file>
+
+<file path=ppt/slides/slide7.xml><?xml version="1.0" encoding="utf-8"?>
 <p:sld xmlns:a="http://schemas.openxmlformats.org/drawingml/2006/main" xmlns:r="http://schemas.openxmlformats.org/officeDocument/2006/relationships" xmlns:p="http://schemas.openxmlformats.org/presentationml/2006/main">
   <p:cSld>
     <p:spTree>
@@ -26424,7 +30369,7 @@
 </p:sld>
 </file>
 
-<file path=ppt/slides/slide7.xml><?xml version="1.0" encoding="utf-8"?>
+<file path=ppt/slides/slide8.xml><?xml version="1.0" encoding="utf-8"?>
 <p:sld xmlns:a="http://schemas.openxmlformats.org/drawingml/2006/main" xmlns:r="http://schemas.openxmlformats.org/officeDocument/2006/relationships" xmlns:p="http://schemas.openxmlformats.org/presentationml/2006/main">
   <p:cSld>
     <p:spTree>
@@ -28251,7 +32196,7 @@
 </p:sld>
 </file>
 
-<file path=ppt/slides/slide8.xml><?xml version="1.0" encoding="utf-8"?>
+<file path=ppt/slides/slide9.xml><?xml version="1.0" encoding="utf-8"?>
 <p:sld xmlns:a="http://schemas.openxmlformats.org/drawingml/2006/main" xmlns:r="http://schemas.openxmlformats.org/officeDocument/2006/relationships" xmlns:p="http://schemas.openxmlformats.org/presentationml/2006/main">
   <p:cSld>
     <p:spTree>
@@ -31038,116 +34983,6 @@
 </p:sld>
 </file>
 
-<file path=ppt/slides/slide9.xml><?xml version="1.0" encoding="utf-8"?>
-<p:sld xmlns:a="http://schemas.openxmlformats.org/drawingml/2006/main" xmlns:r="http://schemas.openxmlformats.org/officeDocument/2006/relationships" xmlns:p="http://schemas.openxmlformats.org/presentationml/2006/main">
-  <p:cSld>
-    <p:spTree>
-      <p:nvGrpSpPr>
-        <p:cNvPr id="1" name=""/>
-        <p:cNvGrpSpPr/>
-        <p:nvPr/>
-      </p:nvGrpSpPr>
-      <p:grpSpPr>
-        <a:xfrm>
-          <a:off x="0" y="0"/>
-          <a:ext cx="0" cy="0"/>
-          <a:chOff x="0" y="0"/>
-          <a:chExt cx="0" cy="0"/>
-        </a:xfrm>
-      </p:grpSpPr>
-      <p:sp>
-        <p:nvSpPr>
-          <p:cNvPr id="2" name="Title 1">
-            <a:extLst>
-              <a:ext uri="{FF2B5EF4-FFF2-40B4-BE49-F238E27FC236}">
-                <a16:creationId xmlns:a16="http://schemas.microsoft.com/office/drawing/2014/main" id="{9C25A884-0014-7B87-1AF5-C2A758D258BB}"/>
-              </a:ext>
-            </a:extLst>
-          </p:cNvPr>
-          <p:cNvSpPr>
-            <a:spLocks noGrp="1"/>
-          </p:cNvSpPr>
-          <p:nvPr>
-            <p:ph type="title"/>
-          </p:nvPr>
-        </p:nvSpPr>
-        <p:spPr/>
-        <p:txBody>
-          <a:bodyPr/>
-          <a:lstStyle/>
-          <a:p>
-            <a:endParaRPr lang="en-GB"/>
-          </a:p>
-        </p:txBody>
-      </p:sp>
-      <p:sp>
-        <p:nvSpPr>
-          <p:cNvPr id="3" name="Content Placeholder 2">
-            <a:extLst>
-              <a:ext uri="{FF2B5EF4-FFF2-40B4-BE49-F238E27FC236}">
-                <a16:creationId xmlns:a16="http://schemas.microsoft.com/office/drawing/2014/main" id="{EFD32671-D437-757C-1EA5-C048C3504F41}"/>
-              </a:ext>
-            </a:extLst>
-          </p:cNvPr>
-          <p:cNvSpPr>
-            <a:spLocks noGrp="1"/>
-          </p:cNvSpPr>
-          <p:nvPr>
-            <p:ph idx="1"/>
-          </p:nvPr>
-        </p:nvSpPr>
-        <p:spPr/>
-        <p:txBody>
-          <a:bodyPr/>
-          <a:lstStyle/>
-          <a:p>
-            <a:endParaRPr lang="en-GB"/>
-          </a:p>
-        </p:txBody>
-      </p:sp>
-      <p:pic>
-        <p:nvPicPr>
-          <p:cNvPr id="4" name="Picture 3">
-            <a:extLst>
-              <a:ext uri="{FF2B5EF4-FFF2-40B4-BE49-F238E27FC236}">
-                <a16:creationId xmlns:a16="http://schemas.microsoft.com/office/drawing/2014/main" id="{B7DB29C0-B5C8-8508-A26E-50B1D221C83C}"/>
-              </a:ext>
-            </a:extLst>
-          </p:cNvPr>
-          <p:cNvPicPr>
-            <a:picLocks noChangeAspect="1"/>
-          </p:cNvPicPr>
-          <p:nvPr/>
-        </p:nvPicPr>
-        <p:blipFill>
-          <a:blip r:embed="rId2"/>
-          <a:stretch>
-            <a:fillRect/>
-          </a:stretch>
-        </p:blipFill>
-        <p:spPr>
-          <a:xfrm>
-            <a:off x="400050" y="-314325"/>
-            <a:ext cx="11675147" cy="6858000"/>
-          </a:xfrm>
-          <a:prstGeom prst="rect">
-            <a:avLst/>
-          </a:prstGeom>
-        </p:spPr>
-      </p:pic>
-    </p:spTree>
-    <p:extLst>
-      <p:ext uri="{BB962C8B-B14F-4D97-AF65-F5344CB8AC3E}">
-        <p14:creationId xmlns:p14="http://schemas.microsoft.com/office/powerpoint/2010/main" val="1975984209"/>
-      </p:ext>
-    </p:extLst>
-  </p:cSld>
-  <p:clrMapOvr>
-    <a:masterClrMapping/>
-  </p:clrMapOvr>
-</p:sld>
-</file>
-
 <file path=ppt/theme/theme1.xml><?xml version="1.0" encoding="utf-8"?>
 <a:theme xmlns:a="http://schemas.openxmlformats.org/drawingml/2006/main" name="Office Theme">
   <a:themeElements>

</xml_diff>

<commit_message>
Edit in suggestions supervisor💎
</commit_message>
<xml_diff>
--- a/reports/Graphs/diagrams.pptx
+++ b/reports/Graphs/diagrams.pptx
@@ -134,7 +134,7 @@
   <pc:docChgLst>
     <pc:chgData name="Markus Bilz" userId="a36021e4bdb9349f" providerId="LiveId" clId="{D4AAABE4-665D-427C-806E-52B893CA3FC7}"/>
     <pc:docChg chg="undo custSel addSld delSld modSld">
-      <pc:chgData name="Markus Bilz" userId="a36021e4bdb9349f" providerId="LiveId" clId="{D4AAABE4-665D-427C-806E-52B893CA3FC7}" dt="2023-05-18T13:26:36.076" v="1631" actId="2696"/>
+      <pc:chgData name="Markus Bilz" userId="a36021e4bdb9349f" providerId="LiveId" clId="{D4AAABE4-665D-427C-806E-52B893CA3FC7}" dt="2023-05-23T16:30:55.457" v="1703" actId="6549"/>
       <pc:docMkLst>
         <pc:docMk/>
       </pc:docMkLst>
@@ -1057,7 +1057,7 @@
         </pc:cxnChg>
       </pc:sldChg>
       <pc:sldChg chg="addSp delSp modSp add mod">
-        <pc:chgData name="Markus Bilz" userId="a36021e4bdb9349f" providerId="LiveId" clId="{D4AAABE4-665D-427C-806E-52B893CA3FC7}" dt="2023-05-18T13:23:33.005" v="1630" actId="14100"/>
+        <pc:chgData name="Markus Bilz" userId="a36021e4bdb9349f" providerId="LiveId" clId="{D4AAABE4-665D-427C-806E-52B893CA3FC7}" dt="2023-05-23T16:30:55.457" v="1703" actId="6549"/>
         <pc:sldMkLst>
           <pc:docMk/>
           <pc:sldMk cId="1744557679" sldId="268"/>
@@ -1095,7 +1095,7 @@
           </ac:spMkLst>
         </pc:spChg>
         <pc:spChg chg="mod">
-          <ac:chgData name="Markus Bilz" userId="a36021e4bdb9349f" providerId="LiveId" clId="{D4AAABE4-665D-427C-806E-52B893CA3FC7}" dt="2023-05-18T12:50:22.574" v="1157" actId="1076"/>
+          <ac:chgData name="Markus Bilz" userId="a36021e4bdb9349f" providerId="LiveId" clId="{D4AAABE4-665D-427C-806E-52B893CA3FC7}" dt="2023-05-23T16:30:36.466" v="1699" actId="20577"/>
           <ac:spMkLst>
             <pc:docMk/>
             <pc:sldMk cId="1744557679" sldId="268"/>
@@ -1135,7 +1135,7 @@
           </ac:spMkLst>
         </pc:spChg>
         <pc:spChg chg="mod">
-          <ac:chgData name="Markus Bilz" userId="a36021e4bdb9349f" providerId="LiveId" clId="{D4AAABE4-665D-427C-806E-52B893CA3FC7}" dt="2023-05-18T12:50:00.163" v="1152" actId="14100"/>
+          <ac:chgData name="Markus Bilz" userId="a36021e4bdb9349f" providerId="LiveId" clId="{D4AAABE4-665D-427C-806E-52B893CA3FC7}" dt="2023-05-23T16:30:55.457" v="1703" actId="6549"/>
           <ac:spMkLst>
             <pc:docMk/>
             <pc:sldMk cId="1744557679" sldId="268"/>
@@ -1231,7 +1231,7 @@
           </ac:spMkLst>
         </pc:spChg>
         <pc:spChg chg="mod">
-          <ac:chgData name="Markus Bilz" userId="a36021e4bdb9349f" providerId="LiveId" clId="{D4AAABE4-665D-427C-806E-52B893CA3FC7}" dt="2023-05-18T12:50:08.602" v="1154" actId="14100"/>
+          <ac:chgData name="Markus Bilz" userId="a36021e4bdb9349f" providerId="LiveId" clId="{D4AAABE4-665D-427C-806E-52B893CA3FC7}" dt="2023-05-23T16:30:25.218" v="1695" actId="20577"/>
           <ac:spMkLst>
             <pc:docMk/>
             <pc:sldMk cId="1744557679" sldId="268"/>
@@ -10564,7 +10564,7 @@
           <a:p>
             <a:fld id="{D6A82EB2-151D-4EEE-ACF5-92C73278C09C}" type="datetimeFigureOut">
               <a:rPr lang="en-GB" smtClean="0"/>
-              <a:t>18/05/2023</a:t>
+              <a:t>23/05/2023</a:t>
             </a:fld>
             <a:endParaRPr lang="en-GB"/>
           </a:p>
@@ -10764,7 +10764,7 @@
           <a:p>
             <a:fld id="{D6A82EB2-151D-4EEE-ACF5-92C73278C09C}" type="datetimeFigureOut">
               <a:rPr lang="en-GB" smtClean="0"/>
-              <a:t>18/05/2023</a:t>
+              <a:t>23/05/2023</a:t>
             </a:fld>
             <a:endParaRPr lang="en-GB"/>
           </a:p>
@@ -10974,7 +10974,7 @@
           <a:p>
             <a:fld id="{D6A82EB2-151D-4EEE-ACF5-92C73278C09C}" type="datetimeFigureOut">
               <a:rPr lang="en-GB" smtClean="0"/>
-              <a:t>18/05/2023</a:t>
+              <a:t>23/05/2023</a:t>
             </a:fld>
             <a:endParaRPr lang="en-GB"/>
           </a:p>
@@ -11174,7 +11174,7 @@
           <a:p>
             <a:fld id="{D6A82EB2-151D-4EEE-ACF5-92C73278C09C}" type="datetimeFigureOut">
               <a:rPr lang="en-GB" smtClean="0"/>
-              <a:t>18/05/2023</a:t>
+              <a:t>23/05/2023</a:t>
             </a:fld>
             <a:endParaRPr lang="en-GB"/>
           </a:p>
@@ -11450,7 +11450,7 @@
           <a:p>
             <a:fld id="{D6A82EB2-151D-4EEE-ACF5-92C73278C09C}" type="datetimeFigureOut">
               <a:rPr lang="en-GB" smtClean="0"/>
-              <a:t>18/05/2023</a:t>
+              <a:t>23/05/2023</a:t>
             </a:fld>
             <a:endParaRPr lang="en-GB"/>
           </a:p>
@@ -11718,7 +11718,7 @@
           <a:p>
             <a:fld id="{D6A82EB2-151D-4EEE-ACF5-92C73278C09C}" type="datetimeFigureOut">
               <a:rPr lang="en-GB" smtClean="0"/>
-              <a:t>18/05/2023</a:t>
+              <a:t>23/05/2023</a:t>
             </a:fld>
             <a:endParaRPr lang="en-GB"/>
           </a:p>
@@ -12133,7 +12133,7 @@
           <a:p>
             <a:fld id="{D6A82EB2-151D-4EEE-ACF5-92C73278C09C}" type="datetimeFigureOut">
               <a:rPr lang="en-GB" smtClean="0"/>
-              <a:t>18/05/2023</a:t>
+              <a:t>23/05/2023</a:t>
             </a:fld>
             <a:endParaRPr lang="en-GB"/>
           </a:p>
@@ -12275,7 +12275,7 @@
           <a:p>
             <a:fld id="{D6A82EB2-151D-4EEE-ACF5-92C73278C09C}" type="datetimeFigureOut">
               <a:rPr lang="en-GB" smtClean="0"/>
-              <a:t>18/05/2023</a:t>
+              <a:t>23/05/2023</a:t>
             </a:fld>
             <a:endParaRPr lang="en-GB"/>
           </a:p>
@@ -12388,7 +12388,7 @@
           <a:p>
             <a:fld id="{D6A82EB2-151D-4EEE-ACF5-92C73278C09C}" type="datetimeFigureOut">
               <a:rPr lang="en-GB" smtClean="0"/>
-              <a:t>18/05/2023</a:t>
+              <a:t>23/05/2023</a:t>
             </a:fld>
             <a:endParaRPr lang="en-GB"/>
           </a:p>
@@ -12701,7 +12701,7 @@
           <a:p>
             <a:fld id="{D6A82EB2-151D-4EEE-ACF5-92C73278C09C}" type="datetimeFigureOut">
               <a:rPr lang="en-GB" smtClean="0"/>
-              <a:t>18/05/2023</a:t>
+              <a:t>23/05/2023</a:t>
             </a:fld>
             <a:endParaRPr lang="en-GB"/>
           </a:p>
@@ -12990,7 +12990,7 @@
           <a:p>
             <a:fld id="{D6A82EB2-151D-4EEE-ACF5-92C73278C09C}" type="datetimeFigureOut">
               <a:rPr lang="en-GB" smtClean="0"/>
-              <a:t>18/05/2023</a:t>
+              <a:t>23/05/2023</a:t>
             </a:fld>
             <a:endParaRPr lang="en-GB"/>
           </a:p>
@@ -13233,7 +13233,7 @@
           <a:p>
             <a:fld id="{D6A82EB2-151D-4EEE-ACF5-92C73278C09C}" type="datetimeFigureOut">
               <a:rPr lang="en-GB" smtClean="0"/>
-              <a:t>18/05/2023</a:t>
+              <a:t>23/05/2023</a:t>
             </a:fld>
             <a:endParaRPr lang="en-GB"/>
           </a:p>
@@ -27094,6 +27094,20 @@
           <a:p>
             <a:pPr algn="ctr"/>
             <a:r>
+              <a:rPr lang="de-DE" sz="1100" dirty="0" err="1">
+                <a:latin typeface="+mj-lt"/>
+                <a:cs typeface="Arial" panose="020B0604020202020204" pitchFamily="34" charset="0"/>
+              </a:rPr>
+              <a:t>OptionMetrics</a:t>
+            </a:r>
+            <a:endParaRPr lang="de-DE" sz="1100" dirty="0">
+              <a:latin typeface="+mj-lt"/>
+              <a:cs typeface="Arial" panose="020B0604020202020204" pitchFamily="34" charset="0"/>
+            </a:endParaRPr>
+          </a:p>
+          <a:p>
+            <a:pPr algn="ctr"/>
+            <a:r>
               <a:rPr lang="de-DE" sz="1100" dirty="0">
                 <a:solidFill>
                   <a:schemeClr val="dk1"/>
@@ -27103,13 +27117,6 @@
               </a:rPr>
               <a:t>Option Data</a:t>
             </a:r>
-            <a:endParaRPr lang="en-GB" sz="1100" dirty="0">
-              <a:solidFill>
-                <a:schemeClr val="dk1"/>
-              </a:solidFill>
-              <a:latin typeface="+mj-lt"/>
-              <a:cs typeface="Arial" panose="020B0604020202020204" pitchFamily="34" charset="0"/>
-            </a:endParaRPr>
           </a:p>
         </p:txBody>
       </p:sp>
@@ -27161,6 +27168,23 @@
           <a:p>
             <a:pPr algn="ctr"/>
             <a:r>
+              <a:rPr lang="de-DE" sz="1100" dirty="0" err="1">
+                <a:latin typeface="+mj-lt"/>
+                <a:cs typeface="Arial" panose="020B0604020202020204" pitchFamily="34" charset="0"/>
+              </a:rPr>
+              <a:t>LiveVol</a:t>
+            </a:r>
+            <a:endParaRPr lang="en-GB" sz="1100" dirty="0">
+              <a:solidFill>
+                <a:schemeClr val="dk1"/>
+              </a:solidFill>
+              <a:latin typeface="+mj-lt"/>
+              <a:cs typeface="Arial" panose="020B0604020202020204" pitchFamily="34" charset="0"/>
+            </a:endParaRPr>
+          </a:p>
+          <a:p>
+            <a:pPr algn="ctr"/>
+            <a:r>
               <a:rPr lang="de-DE" sz="1100" dirty="0">
                 <a:solidFill>
                   <a:schemeClr val="dk1"/>
@@ -27170,13 +27194,6 @@
               </a:rPr>
               <a:t>Trade Data</a:t>
             </a:r>
-            <a:endParaRPr lang="en-GB" sz="1100" dirty="0">
-              <a:solidFill>
-                <a:schemeClr val="dk1"/>
-              </a:solidFill>
-              <a:latin typeface="+mj-lt"/>
-              <a:cs typeface="Arial" panose="020B0604020202020204" pitchFamily="34" charset="0"/>
-            </a:endParaRPr>
           </a:p>
         </p:txBody>
       </p:sp>
@@ -27229,23 +27246,23 @@
             <a:pPr algn="ctr"/>
             <a:r>
               <a:rPr lang="de-DE" sz="1100" dirty="0">
+                <a:latin typeface="+mj-lt"/>
+                <a:cs typeface="Arial" panose="020B0604020202020204" pitchFamily="34" charset="0"/>
+              </a:rPr>
+              <a:t>ISE Open/Close</a:t>
+            </a:r>
+          </a:p>
+          <a:p>
+            <a:pPr algn="ctr"/>
+            <a:r>
+              <a:rPr lang="de-DE" sz="1100" dirty="0">
                 <a:solidFill>
                   <a:schemeClr val="dk1"/>
                 </a:solidFill>
                 <a:latin typeface="+mj-lt"/>
                 <a:cs typeface="Arial" panose="020B0604020202020204" pitchFamily="34" charset="0"/>
               </a:rPr>
-              <a:t>Trade </a:t>
-            </a:r>
-            <a:r>
-              <a:rPr lang="de-DE" sz="1100" dirty="0" err="1">
-                <a:solidFill>
-                  <a:schemeClr val="dk1"/>
-                </a:solidFill>
-                <a:latin typeface="+mj-lt"/>
-                <a:cs typeface="Arial" panose="020B0604020202020204" pitchFamily="34" charset="0"/>
-              </a:rPr>
-              <a:t>Volumes</a:t>
+              <a:t>Trade Profile</a:t>
             </a:r>
             <a:endParaRPr lang="en-GB" sz="1100" dirty="0">
               <a:solidFill>

</xml_diff>

<commit_message>
Add in feedback from supervisor✒️ (#379)
</commit_message>
<xml_diff>
--- a/reports/Graphs/diagrams.pptx
+++ b/reports/Graphs/diagrams.pptx
@@ -134,7 +134,7 @@
   <pc:docChgLst>
     <pc:chgData name="Markus Bilz" userId="a36021e4bdb9349f" providerId="LiveId" clId="{D4AAABE4-665D-427C-806E-52B893CA3FC7}"/>
     <pc:docChg chg="undo custSel addSld delSld modSld">
-      <pc:chgData name="Markus Bilz" userId="a36021e4bdb9349f" providerId="LiveId" clId="{D4AAABE4-665D-427C-806E-52B893CA3FC7}" dt="2023-05-18T13:26:36.076" v="1631" actId="2696"/>
+      <pc:chgData name="Markus Bilz" userId="a36021e4bdb9349f" providerId="LiveId" clId="{D4AAABE4-665D-427C-806E-52B893CA3FC7}" dt="2023-05-23T16:30:55.457" v="1703" actId="6549"/>
       <pc:docMkLst>
         <pc:docMk/>
       </pc:docMkLst>
@@ -1057,7 +1057,7 @@
         </pc:cxnChg>
       </pc:sldChg>
       <pc:sldChg chg="addSp delSp modSp add mod">
-        <pc:chgData name="Markus Bilz" userId="a36021e4bdb9349f" providerId="LiveId" clId="{D4AAABE4-665D-427C-806E-52B893CA3FC7}" dt="2023-05-18T13:23:33.005" v="1630" actId="14100"/>
+        <pc:chgData name="Markus Bilz" userId="a36021e4bdb9349f" providerId="LiveId" clId="{D4AAABE4-665D-427C-806E-52B893CA3FC7}" dt="2023-05-23T16:30:55.457" v="1703" actId="6549"/>
         <pc:sldMkLst>
           <pc:docMk/>
           <pc:sldMk cId="1744557679" sldId="268"/>
@@ -1095,7 +1095,7 @@
           </ac:spMkLst>
         </pc:spChg>
         <pc:spChg chg="mod">
-          <ac:chgData name="Markus Bilz" userId="a36021e4bdb9349f" providerId="LiveId" clId="{D4AAABE4-665D-427C-806E-52B893CA3FC7}" dt="2023-05-18T12:50:22.574" v="1157" actId="1076"/>
+          <ac:chgData name="Markus Bilz" userId="a36021e4bdb9349f" providerId="LiveId" clId="{D4AAABE4-665D-427C-806E-52B893CA3FC7}" dt="2023-05-23T16:30:36.466" v="1699" actId="20577"/>
           <ac:spMkLst>
             <pc:docMk/>
             <pc:sldMk cId="1744557679" sldId="268"/>
@@ -1135,7 +1135,7 @@
           </ac:spMkLst>
         </pc:spChg>
         <pc:spChg chg="mod">
-          <ac:chgData name="Markus Bilz" userId="a36021e4bdb9349f" providerId="LiveId" clId="{D4AAABE4-665D-427C-806E-52B893CA3FC7}" dt="2023-05-18T12:50:00.163" v="1152" actId="14100"/>
+          <ac:chgData name="Markus Bilz" userId="a36021e4bdb9349f" providerId="LiveId" clId="{D4AAABE4-665D-427C-806E-52B893CA3FC7}" dt="2023-05-23T16:30:55.457" v="1703" actId="6549"/>
           <ac:spMkLst>
             <pc:docMk/>
             <pc:sldMk cId="1744557679" sldId="268"/>
@@ -1231,7 +1231,7 @@
           </ac:spMkLst>
         </pc:spChg>
         <pc:spChg chg="mod">
-          <ac:chgData name="Markus Bilz" userId="a36021e4bdb9349f" providerId="LiveId" clId="{D4AAABE4-665D-427C-806E-52B893CA3FC7}" dt="2023-05-18T12:50:08.602" v="1154" actId="14100"/>
+          <ac:chgData name="Markus Bilz" userId="a36021e4bdb9349f" providerId="LiveId" clId="{D4AAABE4-665D-427C-806E-52B893CA3FC7}" dt="2023-05-23T16:30:25.218" v="1695" actId="20577"/>
           <ac:spMkLst>
             <pc:docMk/>
             <pc:sldMk cId="1744557679" sldId="268"/>
@@ -10564,7 +10564,7 @@
           <a:p>
             <a:fld id="{D6A82EB2-151D-4EEE-ACF5-92C73278C09C}" type="datetimeFigureOut">
               <a:rPr lang="en-GB" smtClean="0"/>
-              <a:t>18/05/2023</a:t>
+              <a:t>23/05/2023</a:t>
             </a:fld>
             <a:endParaRPr lang="en-GB"/>
           </a:p>
@@ -10764,7 +10764,7 @@
           <a:p>
             <a:fld id="{D6A82EB2-151D-4EEE-ACF5-92C73278C09C}" type="datetimeFigureOut">
               <a:rPr lang="en-GB" smtClean="0"/>
-              <a:t>18/05/2023</a:t>
+              <a:t>23/05/2023</a:t>
             </a:fld>
             <a:endParaRPr lang="en-GB"/>
           </a:p>
@@ -10974,7 +10974,7 @@
           <a:p>
             <a:fld id="{D6A82EB2-151D-4EEE-ACF5-92C73278C09C}" type="datetimeFigureOut">
               <a:rPr lang="en-GB" smtClean="0"/>
-              <a:t>18/05/2023</a:t>
+              <a:t>23/05/2023</a:t>
             </a:fld>
             <a:endParaRPr lang="en-GB"/>
           </a:p>
@@ -11174,7 +11174,7 @@
           <a:p>
             <a:fld id="{D6A82EB2-151D-4EEE-ACF5-92C73278C09C}" type="datetimeFigureOut">
               <a:rPr lang="en-GB" smtClean="0"/>
-              <a:t>18/05/2023</a:t>
+              <a:t>23/05/2023</a:t>
             </a:fld>
             <a:endParaRPr lang="en-GB"/>
           </a:p>
@@ -11450,7 +11450,7 @@
           <a:p>
             <a:fld id="{D6A82EB2-151D-4EEE-ACF5-92C73278C09C}" type="datetimeFigureOut">
               <a:rPr lang="en-GB" smtClean="0"/>
-              <a:t>18/05/2023</a:t>
+              <a:t>23/05/2023</a:t>
             </a:fld>
             <a:endParaRPr lang="en-GB"/>
           </a:p>
@@ -11718,7 +11718,7 @@
           <a:p>
             <a:fld id="{D6A82EB2-151D-4EEE-ACF5-92C73278C09C}" type="datetimeFigureOut">
               <a:rPr lang="en-GB" smtClean="0"/>
-              <a:t>18/05/2023</a:t>
+              <a:t>23/05/2023</a:t>
             </a:fld>
             <a:endParaRPr lang="en-GB"/>
           </a:p>
@@ -12133,7 +12133,7 @@
           <a:p>
             <a:fld id="{D6A82EB2-151D-4EEE-ACF5-92C73278C09C}" type="datetimeFigureOut">
               <a:rPr lang="en-GB" smtClean="0"/>
-              <a:t>18/05/2023</a:t>
+              <a:t>23/05/2023</a:t>
             </a:fld>
             <a:endParaRPr lang="en-GB"/>
           </a:p>
@@ -12275,7 +12275,7 @@
           <a:p>
             <a:fld id="{D6A82EB2-151D-4EEE-ACF5-92C73278C09C}" type="datetimeFigureOut">
               <a:rPr lang="en-GB" smtClean="0"/>
-              <a:t>18/05/2023</a:t>
+              <a:t>23/05/2023</a:t>
             </a:fld>
             <a:endParaRPr lang="en-GB"/>
           </a:p>
@@ -12388,7 +12388,7 @@
           <a:p>
             <a:fld id="{D6A82EB2-151D-4EEE-ACF5-92C73278C09C}" type="datetimeFigureOut">
               <a:rPr lang="en-GB" smtClean="0"/>
-              <a:t>18/05/2023</a:t>
+              <a:t>23/05/2023</a:t>
             </a:fld>
             <a:endParaRPr lang="en-GB"/>
           </a:p>
@@ -12701,7 +12701,7 @@
           <a:p>
             <a:fld id="{D6A82EB2-151D-4EEE-ACF5-92C73278C09C}" type="datetimeFigureOut">
               <a:rPr lang="en-GB" smtClean="0"/>
-              <a:t>18/05/2023</a:t>
+              <a:t>23/05/2023</a:t>
             </a:fld>
             <a:endParaRPr lang="en-GB"/>
           </a:p>
@@ -12990,7 +12990,7 @@
           <a:p>
             <a:fld id="{D6A82EB2-151D-4EEE-ACF5-92C73278C09C}" type="datetimeFigureOut">
               <a:rPr lang="en-GB" smtClean="0"/>
-              <a:t>18/05/2023</a:t>
+              <a:t>23/05/2023</a:t>
             </a:fld>
             <a:endParaRPr lang="en-GB"/>
           </a:p>
@@ -13233,7 +13233,7 @@
           <a:p>
             <a:fld id="{D6A82EB2-151D-4EEE-ACF5-92C73278C09C}" type="datetimeFigureOut">
               <a:rPr lang="en-GB" smtClean="0"/>
-              <a:t>18/05/2023</a:t>
+              <a:t>23/05/2023</a:t>
             </a:fld>
             <a:endParaRPr lang="en-GB"/>
           </a:p>
@@ -27094,6 +27094,20 @@
           <a:p>
             <a:pPr algn="ctr"/>
             <a:r>
+              <a:rPr lang="de-DE" sz="1100" dirty="0" err="1">
+                <a:latin typeface="+mj-lt"/>
+                <a:cs typeface="Arial" panose="020B0604020202020204" pitchFamily="34" charset="0"/>
+              </a:rPr>
+              <a:t>OptionMetrics</a:t>
+            </a:r>
+            <a:endParaRPr lang="de-DE" sz="1100" dirty="0">
+              <a:latin typeface="+mj-lt"/>
+              <a:cs typeface="Arial" panose="020B0604020202020204" pitchFamily="34" charset="0"/>
+            </a:endParaRPr>
+          </a:p>
+          <a:p>
+            <a:pPr algn="ctr"/>
+            <a:r>
               <a:rPr lang="de-DE" sz="1100" dirty="0">
                 <a:solidFill>
                   <a:schemeClr val="dk1"/>
@@ -27103,13 +27117,6 @@
               </a:rPr>
               <a:t>Option Data</a:t>
             </a:r>
-            <a:endParaRPr lang="en-GB" sz="1100" dirty="0">
-              <a:solidFill>
-                <a:schemeClr val="dk1"/>
-              </a:solidFill>
-              <a:latin typeface="+mj-lt"/>
-              <a:cs typeface="Arial" panose="020B0604020202020204" pitchFamily="34" charset="0"/>
-            </a:endParaRPr>
           </a:p>
         </p:txBody>
       </p:sp>
@@ -27161,6 +27168,23 @@
           <a:p>
             <a:pPr algn="ctr"/>
             <a:r>
+              <a:rPr lang="de-DE" sz="1100" dirty="0" err="1">
+                <a:latin typeface="+mj-lt"/>
+                <a:cs typeface="Arial" panose="020B0604020202020204" pitchFamily="34" charset="0"/>
+              </a:rPr>
+              <a:t>LiveVol</a:t>
+            </a:r>
+            <a:endParaRPr lang="en-GB" sz="1100" dirty="0">
+              <a:solidFill>
+                <a:schemeClr val="dk1"/>
+              </a:solidFill>
+              <a:latin typeface="+mj-lt"/>
+              <a:cs typeface="Arial" panose="020B0604020202020204" pitchFamily="34" charset="0"/>
+            </a:endParaRPr>
+          </a:p>
+          <a:p>
+            <a:pPr algn="ctr"/>
+            <a:r>
               <a:rPr lang="de-DE" sz="1100" dirty="0">
                 <a:solidFill>
                   <a:schemeClr val="dk1"/>
@@ -27170,13 +27194,6 @@
               </a:rPr>
               <a:t>Trade Data</a:t>
             </a:r>
-            <a:endParaRPr lang="en-GB" sz="1100" dirty="0">
-              <a:solidFill>
-                <a:schemeClr val="dk1"/>
-              </a:solidFill>
-              <a:latin typeface="+mj-lt"/>
-              <a:cs typeface="Arial" panose="020B0604020202020204" pitchFamily="34" charset="0"/>
-            </a:endParaRPr>
           </a:p>
         </p:txBody>
       </p:sp>
@@ -27229,23 +27246,23 @@
             <a:pPr algn="ctr"/>
             <a:r>
               <a:rPr lang="de-DE" sz="1100" dirty="0">
+                <a:latin typeface="+mj-lt"/>
+                <a:cs typeface="Arial" panose="020B0604020202020204" pitchFamily="34" charset="0"/>
+              </a:rPr>
+              <a:t>ISE Open/Close</a:t>
+            </a:r>
+          </a:p>
+          <a:p>
+            <a:pPr algn="ctr"/>
+            <a:r>
+              <a:rPr lang="de-DE" sz="1100" dirty="0">
                 <a:solidFill>
                   <a:schemeClr val="dk1"/>
                 </a:solidFill>
                 <a:latin typeface="+mj-lt"/>
                 <a:cs typeface="Arial" panose="020B0604020202020204" pitchFamily="34" charset="0"/>
               </a:rPr>
-              <a:t>Trade </a:t>
-            </a:r>
-            <a:r>
-              <a:rPr lang="de-DE" sz="1100" dirty="0" err="1">
-                <a:solidFill>
-                  <a:schemeClr val="dk1"/>
-                </a:solidFill>
-                <a:latin typeface="+mj-lt"/>
-                <a:cs typeface="Arial" panose="020B0604020202020204" pitchFamily="34" charset="0"/>
-              </a:rPr>
-              <a:t>Volumes</a:t>
+              <a:t>Trade Profile</a:t>
             </a:r>
             <a:endParaRPr lang="en-GB" sz="1100" dirty="0">
               <a:solidFill>

</xml_diff>